<commit_message>
Initial updates for Sioux Falls presentation.
</commit_message>
<xml_diff>
--- a/Optimizer.pptx
+++ b/Optimizer.pptx
@@ -5,7 +5,7 @@
     <p:sldMasterId id="2147483648" r:id="rId1"/>
   </p:sldMasterIdLst>
   <p:notesMasterIdLst>
-    <p:notesMasterId r:id="rId56"/>
+    <p:notesMasterId r:id="rId58"/>
   </p:notesMasterIdLst>
   <p:sldIdLst>
     <p:sldId id="256" r:id="rId2"/>
@@ -39,29 +39,31 @@
     <p:sldId id="290" r:id="rId30"/>
     <p:sldId id="283" r:id="rId31"/>
     <p:sldId id="284" r:id="rId32"/>
-    <p:sldId id="314" r:id="rId33"/>
-    <p:sldId id="298" r:id="rId34"/>
-    <p:sldId id="288" r:id="rId35"/>
-    <p:sldId id="286" r:id="rId36"/>
-    <p:sldId id="294" r:id="rId37"/>
-    <p:sldId id="295" r:id="rId38"/>
-    <p:sldId id="307" r:id="rId39"/>
-    <p:sldId id="299" r:id="rId40"/>
-    <p:sldId id="300" r:id="rId41"/>
-    <p:sldId id="296" r:id="rId42"/>
-    <p:sldId id="310" r:id="rId43"/>
-    <p:sldId id="297" r:id="rId44"/>
-    <p:sldId id="311" r:id="rId45"/>
-    <p:sldId id="312" r:id="rId46"/>
-    <p:sldId id="313" r:id="rId47"/>
-    <p:sldId id="304" r:id="rId48"/>
-    <p:sldId id="301" r:id="rId49"/>
-    <p:sldId id="305" r:id="rId50"/>
-    <p:sldId id="308" r:id="rId51"/>
-    <p:sldId id="306" r:id="rId52"/>
-    <p:sldId id="279" r:id="rId53"/>
-    <p:sldId id="302" r:id="rId54"/>
-    <p:sldId id="303" r:id="rId55"/>
+    <p:sldId id="315" r:id="rId33"/>
+    <p:sldId id="314" r:id="rId34"/>
+    <p:sldId id="298" r:id="rId35"/>
+    <p:sldId id="288" r:id="rId36"/>
+    <p:sldId id="286" r:id="rId37"/>
+    <p:sldId id="294" r:id="rId38"/>
+    <p:sldId id="295" r:id="rId39"/>
+    <p:sldId id="307" r:id="rId40"/>
+    <p:sldId id="299" r:id="rId41"/>
+    <p:sldId id="300" r:id="rId42"/>
+    <p:sldId id="296" r:id="rId43"/>
+    <p:sldId id="310" r:id="rId44"/>
+    <p:sldId id="297" r:id="rId45"/>
+    <p:sldId id="311" r:id="rId46"/>
+    <p:sldId id="312" r:id="rId47"/>
+    <p:sldId id="313" r:id="rId48"/>
+    <p:sldId id="304" r:id="rId49"/>
+    <p:sldId id="301" r:id="rId50"/>
+    <p:sldId id="316" r:id="rId51"/>
+    <p:sldId id="305" r:id="rId52"/>
+    <p:sldId id="308" r:id="rId53"/>
+    <p:sldId id="306" r:id="rId54"/>
+    <p:sldId id="279" r:id="rId55"/>
+    <p:sldId id="302" r:id="rId56"/>
+    <p:sldId id="303" r:id="rId57"/>
   </p:sldIdLst>
   <p:sldSz cx="9144000" cy="6858000" type="screen4x3"/>
   <p:notesSz cx="6858000" cy="9144000"/>
@@ -261,7 +263,7 @@
           <a:p>
             <a:fld id="{2EDCB34D-5EC2-4739-9693-E425457AC201}" type="datetimeFigureOut">
               <a:rPr lang="en-US" smtClean="0"/>
-              <a:t>5/30/2016</a:t>
+              <a:t>7/12/2016</a:t>
             </a:fld>
             <a:endParaRPr lang="en-US"/>
           </a:p>
@@ -984,7 +986,7 @@
           <a:p>
             <a:fld id="{ADDBA41D-AE03-4F1C-B074-B56312AFAE46}" type="slidenum">
               <a:rPr lang="en-US" smtClean="0"/>
-              <a:t>32</a:t>
+              <a:t>33</a:t>
             </a:fld>
             <a:endParaRPr lang="en-US"/>
           </a:p>
@@ -1076,7 +1078,7 @@
           <a:p>
             <a:fld id="{ADDBA41D-AE03-4F1C-B074-B56312AFAE46}" type="slidenum">
               <a:rPr lang="en-US" smtClean="0"/>
-              <a:t>33</a:t>
+              <a:t>34</a:t>
             </a:fld>
             <a:endParaRPr lang="en-US"/>
           </a:p>
@@ -1204,7 +1206,7 @@
           <a:p>
             <a:fld id="{ADDBA41D-AE03-4F1C-B074-B56312AFAE46}" type="slidenum">
               <a:rPr lang="en-US" smtClean="0"/>
-              <a:t>35</a:t>
+              <a:t>36</a:t>
             </a:fld>
             <a:endParaRPr lang="en-US"/>
           </a:p>
@@ -1321,7 +1323,7 @@
           <a:p>
             <a:fld id="{ADDBA41D-AE03-4F1C-B074-B56312AFAE46}" type="slidenum">
               <a:rPr lang="en-US" smtClean="0"/>
-              <a:t>39</a:t>
+              <a:t>40</a:t>
             </a:fld>
             <a:endParaRPr lang="en-US"/>
           </a:p>
@@ -1422,7 +1424,7 @@
           <a:p>
             <a:fld id="{ADDBA41D-AE03-4F1C-B074-B56312AFAE46}" type="slidenum">
               <a:rPr lang="en-US" smtClean="0"/>
-              <a:t>40</a:t>
+              <a:t>41</a:t>
             </a:fld>
             <a:endParaRPr lang="en-US"/>
           </a:p>
@@ -1523,7 +1525,7 @@
           <a:p>
             <a:fld id="{ADDBA41D-AE03-4F1C-B074-B56312AFAE46}" type="slidenum">
               <a:rPr lang="en-US" smtClean="0"/>
-              <a:t>42</a:t>
+              <a:t>43</a:t>
             </a:fld>
             <a:endParaRPr lang="en-US"/>
           </a:p>
@@ -1632,7 +1634,7 @@
           <a:p>
             <a:fld id="{ADDBA41D-AE03-4F1C-B074-B56312AFAE46}" type="slidenum">
               <a:rPr lang="en-US" smtClean="0"/>
-              <a:t>43</a:t>
+              <a:t>44</a:t>
             </a:fld>
             <a:endParaRPr lang="en-US"/>
           </a:p>
@@ -1822,7 +1824,7 @@
           <a:p>
             <a:fld id="{ADDBA41D-AE03-4F1C-B074-B56312AFAE46}" type="slidenum">
               <a:rPr lang="en-US" smtClean="0"/>
-              <a:t>46</a:t>
+              <a:t>47</a:t>
             </a:fld>
             <a:endParaRPr lang="en-US"/>
           </a:p>
@@ -3180,7 +3182,7 @@
             <a:fld id="{5942B21B-2ADA-A040-A652-A7305E1B99FE}" type="datetimeFigureOut">
               <a:rPr lang="en-US" smtClean="0"/>
               <a:pPr/>
-              <a:t>5/30/2016</a:t>
+              <a:t>7/12/2016</a:t>
             </a:fld>
             <a:endParaRPr lang="en-US" dirty="0"/>
           </a:p>
@@ -3370,7 +3372,7 @@
           <a:p>
             <a:fld id="{5942B21B-2ADA-A040-A652-A7305E1B99FE}" type="datetimeFigureOut">
               <a:rPr lang="en-US" smtClean="0"/>
-              <a:t>5/30/2016</a:t>
+              <a:t>7/12/2016</a:t>
             </a:fld>
             <a:endParaRPr lang="en-US"/>
           </a:p>
@@ -3494,7 +3496,7 @@
             <a:fld id="{5942B21B-2ADA-A040-A652-A7305E1B99FE}" type="datetimeFigureOut">
               <a:rPr lang="en-US" smtClean="0"/>
               <a:pPr/>
-              <a:t>5/30/2016</a:t>
+              <a:t>7/12/2016</a:t>
             </a:fld>
             <a:r>
               <a:rPr lang="en-US"/>
@@ -3765,7 +3767,7 @@
             <a:fld id="{5942B21B-2ADA-A040-A652-A7305E1B99FE}" type="datetimeFigureOut">
               <a:rPr lang="en-US" smtClean="0"/>
               <a:pPr/>
-              <a:t>5/30/2016</a:t>
+              <a:t>7/12/2016</a:t>
             </a:fld>
             <a:r>
               <a:rPr lang="en-US" dirty="0"/>
@@ -4035,7 +4037,7 @@
             <a:fld id="{5942B21B-2ADA-A040-A652-A7305E1B99FE}" type="datetimeFigureOut">
               <a:rPr lang="en-US" smtClean="0"/>
               <a:pPr/>
-              <a:t>5/30/2016</a:t>
+              <a:t>7/12/2016</a:t>
             </a:fld>
             <a:r>
               <a:rPr lang="en-US" dirty="0"/>
@@ -4375,7 +4377,7 @@
             <a:fld id="{5942B21B-2ADA-A040-A652-A7305E1B99FE}" type="datetimeFigureOut">
               <a:rPr lang="en-US" smtClean="0"/>
               <a:pPr/>
-              <a:t>5/30/2016</a:t>
+              <a:t>7/12/2016</a:t>
             </a:fld>
             <a:r>
               <a:rPr lang="en-US" dirty="0"/>
@@ -4716,7 +4718,7 @@
             <a:fld id="{5942B21B-2ADA-A040-A652-A7305E1B99FE}" type="datetimeFigureOut">
               <a:rPr lang="en-US" smtClean="0"/>
               <a:pPr/>
-              <a:t>5/30/2016</a:t>
+              <a:t>7/12/2016</a:t>
             </a:fld>
             <a:r>
               <a:rPr lang="en-US" dirty="0"/>
@@ -5231,7 +5233,7 @@
             <a:fld id="{5942B21B-2ADA-A040-A652-A7305E1B99FE}" type="datetimeFigureOut">
               <a:rPr lang="en-US" smtClean="0"/>
               <a:pPr/>
-              <a:t>5/30/2016</a:t>
+              <a:t>7/12/2016</a:t>
             </a:fld>
             <a:r>
               <a:rPr lang="en-US" dirty="0"/>
@@ -5440,7 +5442,7 @@
             <a:fld id="{5942B21B-2ADA-A040-A652-A7305E1B99FE}" type="datetimeFigureOut">
               <a:rPr lang="en-US" smtClean="0"/>
               <a:pPr/>
-              <a:t>5/30/2016</a:t>
+              <a:t>7/12/2016</a:t>
             </a:fld>
             <a:r>
               <a:rPr lang="en-US" dirty="0"/>
@@ -5627,7 +5629,7 @@
             <a:fld id="{5942B21B-2ADA-A040-A652-A7305E1B99FE}" type="datetimeFigureOut">
               <a:rPr lang="en-US" smtClean="0"/>
               <a:pPr/>
-              <a:t>5/30/2016</a:t>
+              <a:t>7/12/2016</a:t>
             </a:fld>
             <a:r>
               <a:rPr lang="en-US" dirty="0"/>
@@ -5958,7 +5960,7 @@
             <a:fld id="{5942B21B-2ADA-A040-A652-A7305E1B99FE}" type="datetimeFigureOut">
               <a:rPr lang="en-US" smtClean="0"/>
               <a:pPr/>
-              <a:t>5/30/2016</a:t>
+              <a:t>7/12/2016</a:t>
             </a:fld>
             <a:r>
               <a:rPr lang="en-US" dirty="0"/>
@@ -6266,7 +6268,7 @@
             <a:fld id="{5942B21B-2ADA-A040-A652-A7305E1B99FE}" type="datetimeFigureOut">
               <a:rPr lang="en-US" smtClean="0"/>
               <a:pPr/>
-              <a:t>5/30/2016</a:t>
+              <a:t>7/12/2016</a:t>
             </a:fld>
             <a:r>
               <a:rPr lang="en-US" dirty="0"/>
@@ -6545,7 +6547,7 @@
             <a:fld id="{5942B21B-2ADA-A040-A652-A7305E1B99FE}" type="datetimeFigureOut">
               <a:rPr lang="en-US" smtClean="0"/>
               <a:pPr/>
-              <a:t>5/30/2016</a:t>
+              <a:t>7/12/2016</a:t>
             </a:fld>
             <a:r>
               <a:rPr lang="en-US" dirty="0"/>
@@ -7178,8 +7180,12 @@
               <a:buNone/>
             </a:pPr>
             <a:r>
+              <a:rPr lang="en-US"/>
+              <a:t>Sioux Falls, SD </a:t>
+            </a:r>
+            <a:r>
               <a:rPr lang="en-US" dirty="0"/>
-              <a:t>Iowa City, Iowa – June 11, 2016</a:t>
+              <a:t>– July 23, 2016</a:t>
             </a:r>
           </a:p>
         </p:txBody>
@@ -17725,7 +17731,7 @@
             <a:pPr lvl="1"/>
             <a:r>
               <a:rPr lang="en-US" dirty="0"/>
-              <a:t>Administration going back 6.5</a:t>
+              <a:t>Administration going back to 6.5</a:t>
             </a:r>
           </a:p>
           <a:p>
@@ -24825,6 +24831,116 @@
 </file>
 
 <file path=ppt/slides/slide32.xml><?xml version="1.0" encoding="utf-8"?>
+<p:sld xmlns:a="http://schemas.openxmlformats.org/drawingml/2006/main" xmlns:r="http://schemas.openxmlformats.org/officeDocument/2006/relationships" xmlns:p="http://schemas.openxmlformats.org/presentationml/2006/main">
+  <p:cSld>
+    <p:spTree>
+      <p:nvGrpSpPr>
+        <p:cNvPr id="1" name=""/>
+        <p:cNvGrpSpPr/>
+        <p:nvPr/>
+      </p:nvGrpSpPr>
+      <p:grpSpPr>
+        <a:xfrm>
+          <a:off x="0" y="0"/>
+          <a:ext cx="0" cy="0"/>
+          <a:chOff x="0" y="0"/>
+          <a:chExt cx="0" cy="0"/>
+        </a:xfrm>
+      </p:grpSpPr>
+      <p:sp>
+        <p:nvSpPr>
+          <p:cNvPr id="2" name="Title 1"/>
+          <p:cNvSpPr>
+            <a:spLocks noGrp="1"/>
+          </p:cNvSpPr>
+          <p:nvPr>
+            <p:ph type="title"/>
+          </p:nvPr>
+        </p:nvSpPr>
+        <p:spPr/>
+        <p:txBody>
+          <a:bodyPr/>
+          <a:lstStyle/>
+          <a:p>
+            <a:r>
+              <a:rPr lang="en-US" dirty="0"/>
+              <a:t>Smart Optimization</a:t>
+            </a:r>
+          </a:p>
+        </p:txBody>
+      </p:sp>
+      <p:pic>
+        <p:nvPicPr>
+          <p:cNvPr id="4" name="Picture 3"/>
+          <p:cNvPicPr>
+            <a:picLocks noChangeAspect="1"/>
+          </p:cNvPicPr>
+          <p:nvPr/>
+        </p:nvPicPr>
+        <p:blipFill>
+          <a:blip r:embed="rId2"/>
+          <a:stretch>
+            <a:fillRect/>
+          </a:stretch>
+        </p:blipFill>
+        <p:spPr>
+          <a:xfrm>
+            <a:off x="1554480" y="1563278"/>
+            <a:ext cx="5938786" cy="3862919"/>
+          </a:xfrm>
+          <a:prstGeom prst="rect">
+            <a:avLst/>
+          </a:prstGeom>
+        </p:spPr>
+      </p:pic>
+      <p:sp>
+        <p:nvSpPr>
+          <p:cNvPr id="5" name="TextBox 4"/>
+          <p:cNvSpPr txBox="1"/>
+          <p:nvPr/>
+        </p:nvSpPr>
+        <p:spPr>
+          <a:xfrm>
+            <a:off x="0" y="5600713"/>
+            <a:ext cx="9144000" cy="369332"/>
+          </a:xfrm>
+          <a:prstGeom prst="rect">
+            <a:avLst/>
+          </a:prstGeom>
+          <a:noFill/>
+        </p:spPr>
+        <p:txBody>
+          <a:bodyPr wrap="square" rtlCol="0">
+            <a:spAutoFit/>
+          </a:bodyPr>
+          <a:lstStyle/>
+          <a:p>
+            <a:pPr algn="r"/>
+            <a:r>
+              <a:rPr lang="en-US" dirty="0">
+                <a:solidFill>
+                  <a:schemeClr val="accent1"/>
+                </a:solidFill>
+              </a:rPr>
+              <a:t>http://imgs.xkcd.com/comics/efficiency.png</a:t>
+            </a:r>
+          </a:p>
+        </p:txBody>
+      </p:sp>
+    </p:spTree>
+    <p:extLst>
+      <p:ext uri="{BB962C8B-B14F-4D97-AF65-F5344CB8AC3E}">
+        <p14:creationId xmlns:p14="http://schemas.microsoft.com/office/powerpoint/2010/main" val="75097011"/>
+      </p:ext>
+    </p:extLst>
+  </p:cSld>
+  <p:clrMapOvr>
+    <a:masterClrMapping/>
+  </p:clrMapOvr>
+</p:sld>
+</file>
+
+<file path=ppt/slides/slide33.xml><?xml version="1.0" encoding="utf-8"?>
 <p:sld xmlns:a="http://schemas.openxmlformats.org/drawingml/2006/main" xmlns:r="http://schemas.openxmlformats.org/officeDocument/2006/relationships" xmlns:p="http://schemas.openxmlformats.org/presentationml/2006/main" show="0">
   <p:cSld>
     <p:spTree>
@@ -24863,8 +24979,8 @@
           </a:p>
         </p:txBody>
       </p:sp>
-      <mc:AlternateContent xmlns:mc="http://schemas.openxmlformats.org/markup-compatibility/2006">
-        <mc:Choice xmlns:a14="http://schemas.microsoft.com/office/drawing/2010/main" Requires="a14">
+      <mc:AlternateContent xmlns:mc="http://schemas.openxmlformats.org/markup-compatibility/2006" xmlns:a14="http://schemas.microsoft.com/office/drawing/2010/main">
+        <mc:Choice Requires="a14">
           <p:sp>
             <p:nvSpPr>
               <p:cNvPr id="3" name="Content Placeholder 2"/>
@@ -25079,7 +25195,7 @@
             </p:txBody>
           </p:sp>
         </mc:Choice>
-        <mc:Fallback>
+        <mc:Fallback xmlns="">
           <p:sp>
             <p:nvSpPr>
               <p:cNvPr id="3" name="Content Placeholder 2"/>
@@ -25126,7 +25242,7 @@
 </p:sld>
 </file>
 
-<file path=ppt/slides/slide33.xml><?xml version="1.0" encoding="utf-8"?>
+<file path=ppt/slides/slide34.xml><?xml version="1.0" encoding="utf-8"?>
 <p:sld xmlns:a="http://schemas.openxmlformats.org/drawingml/2006/main" xmlns:r="http://schemas.openxmlformats.org/officeDocument/2006/relationships" xmlns:p="http://schemas.openxmlformats.org/presentationml/2006/main">
   <p:cSld>
     <p:spTree>
@@ -25282,141 +25398,6 @@
     <p:extLst>
       <p:ext uri="{BB962C8B-B14F-4D97-AF65-F5344CB8AC3E}">
         <p14:creationId xmlns:p14="http://schemas.microsoft.com/office/powerpoint/2010/main" val="1630484383"/>
-      </p:ext>
-    </p:extLst>
-  </p:cSld>
-  <p:clrMapOvr>
-    <a:masterClrMapping/>
-  </p:clrMapOvr>
-</p:sld>
-</file>
-
-<file path=ppt/slides/slide34.xml><?xml version="1.0" encoding="utf-8"?>
-<p:sld xmlns:a="http://schemas.openxmlformats.org/drawingml/2006/main" xmlns:r="http://schemas.openxmlformats.org/officeDocument/2006/relationships" xmlns:p="http://schemas.openxmlformats.org/presentationml/2006/main">
-  <p:cSld>
-    <p:spTree>
-      <p:nvGrpSpPr>
-        <p:cNvPr id="1" name=""/>
-        <p:cNvGrpSpPr/>
-        <p:nvPr/>
-      </p:nvGrpSpPr>
-      <p:grpSpPr>
-        <a:xfrm>
-          <a:off x="0" y="0"/>
-          <a:ext cx="0" cy="0"/>
-          <a:chOff x="0" y="0"/>
-          <a:chExt cx="0" cy="0"/>
-        </a:xfrm>
-      </p:grpSpPr>
-      <p:sp>
-        <p:nvSpPr>
-          <p:cNvPr id="2" name="Title 1"/>
-          <p:cNvSpPr>
-            <a:spLocks noGrp="1"/>
-          </p:cNvSpPr>
-          <p:nvPr>
-            <p:ph type="title"/>
-          </p:nvPr>
-        </p:nvSpPr>
-        <p:spPr/>
-        <p:txBody>
-          <a:bodyPr/>
-          <a:lstStyle/>
-          <a:p>
-            <a:r>
-              <a:rPr lang="en-US" dirty="0"/>
-              <a:t>Heuristics and Transformations</a:t>
-            </a:r>
-          </a:p>
-        </p:txBody>
-      </p:sp>
-      <p:sp>
-        <p:nvSpPr>
-          <p:cNvPr id="3" name="Content Placeholder 2"/>
-          <p:cNvSpPr>
-            <a:spLocks noGrp="1"/>
-          </p:cNvSpPr>
-          <p:nvPr>
-            <p:ph idx="1"/>
-          </p:nvPr>
-        </p:nvSpPr>
-        <p:spPr/>
-        <p:txBody>
-          <a:bodyPr>
-            <a:normAutofit lnSpcReduction="10000"/>
-          </a:bodyPr>
-          <a:lstStyle/>
-          <a:p>
-            <a:r>
-              <a:rPr lang="en-US" dirty="0"/>
-              <a:t>Heuristics</a:t>
-            </a:r>
-          </a:p>
-          <a:p>
-            <a:pPr lvl="1"/>
-            <a:r>
-              <a:rPr lang="en-US" dirty="0"/>
-              <a:t>Rules that can eliminate entire branches of the search space</a:t>
-            </a:r>
-          </a:p>
-          <a:p>
-            <a:r>
-              <a:rPr lang="en-US" dirty="0"/>
-              <a:t>Transformations</a:t>
-            </a:r>
-          </a:p>
-          <a:p>
-            <a:pPr lvl="1"/>
-            <a:r>
-              <a:rPr lang="en-US" dirty="0"/>
-              <a:t>Find equivalent operations to get same output</a:t>
-            </a:r>
-          </a:p>
-          <a:p>
-            <a:pPr lvl="1"/>
-            <a:r>
-              <a:rPr lang="en-US" dirty="0"/>
-              <a:t>Rule-based</a:t>
-            </a:r>
-          </a:p>
-          <a:p>
-            <a:pPr lvl="2"/>
-            <a:r>
-              <a:rPr lang="en-US" dirty="0"/>
-              <a:t>DBCC SHOWONRULES</a:t>
-            </a:r>
-          </a:p>
-          <a:p>
-            <a:pPr lvl="2"/>
-            <a:r>
-              <a:rPr lang="en-US" dirty="0"/>
-              <a:t>DBCC RULEON / RULEOFF </a:t>
-            </a:r>
-          </a:p>
-          <a:p>
-            <a:pPr lvl="1"/>
-            <a:r>
-              <a:rPr lang="en-US" dirty="0"/>
-              <a:t>Four types</a:t>
-            </a:r>
-          </a:p>
-          <a:p>
-            <a:pPr lvl="2"/>
-            <a:r>
-              <a:rPr lang="en-US" dirty="0"/>
-              <a:t>Simplification, exploration, implementation, property enforcement</a:t>
-            </a:r>
-          </a:p>
-          <a:p>
-            <a:pPr lvl="1"/>
-            <a:endParaRPr lang="en-US" dirty="0"/>
-          </a:p>
-        </p:txBody>
-      </p:sp>
-    </p:spTree>
-    <p:extLst>
-      <p:ext uri="{BB962C8B-B14F-4D97-AF65-F5344CB8AC3E}">
-        <p14:creationId xmlns:p14="http://schemas.microsoft.com/office/powerpoint/2010/main" val="1718081727"/>
       </p:ext>
     </p:extLst>
   </p:cSld>
@@ -25460,7 +25441,7 @@
           <a:p>
             <a:r>
               <a:rPr lang="en-US" dirty="0"/>
-              <a:t>Transformations: Simplification*</a:t>
+              <a:t>Heuristics and Transformations</a:t>
             </a:r>
           </a:p>
         </p:txBody>
@@ -25477,120 +25458,81 @@
         </p:nvSpPr>
         <p:spPr/>
         <p:txBody>
-          <a:bodyPr/>
-          <a:lstStyle/>
-          <a:p>
-            <a:r>
-              <a:rPr lang="en-US" dirty="0"/>
-              <a:t>Subqueries to joins</a:t>
-            </a:r>
-          </a:p>
-          <a:p>
-            <a:r>
-              <a:rPr lang="en-US" dirty="0"/>
-              <a:t>Predicate pushdown</a:t>
-            </a:r>
-          </a:p>
-          <a:p>
-            <a:r>
-              <a:rPr lang="en-US" dirty="0"/>
-              <a:t>Foreign key table removal</a:t>
-            </a:r>
-          </a:p>
-          <a:p>
-            <a:r>
-              <a:rPr lang="en-US" dirty="0"/>
-              <a:t>Contradiction detection</a:t>
-            </a:r>
-          </a:p>
-          <a:p>
-            <a:r>
-              <a:rPr lang="en-US" dirty="0"/>
-              <a:t>Aggregates on unique keys</a:t>
-            </a:r>
-          </a:p>
-          <a:p>
-            <a:r>
-              <a:rPr lang="en-US" dirty="0"/>
-              <a:t>Convert outer join to inner</a:t>
-            </a:r>
-          </a:p>
-        </p:txBody>
-      </p:sp>
-      <p:sp>
-        <p:nvSpPr>
-          <p:cNvPr id="4" name="TextBox 3"/>
-          <p:cNvSpPr txBox="1"/>
-          <p:nvPr/>
-        </p:nvSpPr>
-        <p:spPr>
-          <a:xfrm>
-            <a:off x="1" y="6166438"/>
-            <a:ext cx="7084194" cy="646331"/>
-          </a:xfrm>
-          <a:prstGeom prst="rect">
-            <a:avLst/>
-          </a:prstGeom>
-          <a:noFill/>
-        </p:spPr>
-        <p:txBody>
-          <a:bodyPr wrap="square" rtlCol="0">
-            <a:spAutoFit/>
+          <a:bodyPr>
+            <a:normAutofit lnSpcReduction="10000"/>
           </a:bodyPr>
           <a:lstStyle/>
           <a:p>
             <a:r>
               <a:rPr lang="en-US" dirty="0"/>
-              <a:t>* A somewhat overloaded term.  Some simplification activities happen earlier in the process than others.</a:t>
-            </a:r>
-          </a:p>
-        </p:txBody>
-      </p:sp>
-      <p:sp>
-        <p:nvSpPr>
-          <p:cNvPr id="5" name="Oval 4"/>
-          <p:cNvSpPr/>
-          <p:nvPr/>
-        </p:nvSpPr>
-        <p:spPr>
-          <a:xfrm>
-            <a:off x="8215162" y="547440"/>
-            <a:ext cx="616016" cy="606391"/>
-          </a:xfrm>
-          <a:prstGeom prst="ellipse">
-            <a:avLst/>
-          </a:prstGeom>
-        </p:spPr>
-        <p:style>
-          <a:lnRef idx="1">
-            <a:schemeClr val="accent1"/>
-          </a:lnRef>
-          <a:fillRef idx="3">
-            <a:schemeClr val="accent1"/>
-          </a:fillRef>
-          <a:effectRef idx="2">
-            <a:schemeClr val="accent1"/>
-          </a:effectRef>
-          <a:fontRef idx="minor">
-            <a:schemeClr val="lt1"/>
-          </a:fontRef>
-        </p:style>
-        <p:txBody>
-          <a:bodyPr rtlCol="0" anchor="ctr"/>
-          <a:lstStyle/>
-          <a:p>
-            <a:pPr algn="ctr"/>
+              <a:t>Heuristics</a:t>
+            </a:r>
+          </a:p>
+          <a:p>
+            <a:pPr lvl="1"/>
             <a:r>
               <a:rPr lang="en-US" dirty="0"/>
-              <a:t>8</a:t>
-            </a:r>
+              <a:t>Rules that can eliminate entire branches of the search space</a:t>
+            </a:r>
+          </a:p>
+          <a:p>
+            <a:r>
+              <a:rPr lang="en-US" dirty="0"/>
+              <a:t>Transformations</a:t>
+            </a:r>
+          </a:p>
+          <a:p>
+            <a:pPr lvl="1"/>
+            <a:r>
+              <a:rPr lang="en-US" dirty="0"/>
+              <a:t>Find equivalent operations to get same output</a:t>
+            </a:r>
+          </a:p>
+          <a:p>
+            <a:pPr lvl="1"/>
+            <a:r>
+              <a:rPr lang="en-US" dirty="0"/>
+              <a:t>Rule-based</a:t>
+            </a:r>
+          </a:p>
+          <a:p>
+            <a:pPr lvl="2"/>
+            <a:r>
+              <a:rPr lang="en-US" dirty="0"/>
+              <a:t>DBCC SHOWONRULES</a:t>
+            </a:r>
+          </a:p>
+          <a:p>
+            <a:pPr lvl="2"/>
+            <a:r>
+              <a:rPr lang="en-US" dirty="0"/>
+              <a:t>DBCC RULEON / RULEOFF </a:t>
+            </a:r>
+          </a:p>
+          <a:p>
+            <a:pPr lvl="1"/>
+            <a:r>
+              <a:rPr lang="en-US" dirty="0"/>
+              <a:t>Four types</a:t>
+            </a:r>
+          </a:p>
+          <a:p>
+            <a:pPr lvl="2"/>
+            <a:r>
+              <a:rPr lang="en-US" dirty="0"/>
+              <a:t>Simplification, exploration, implementation, property enforcement</a:t>
+            </a:r>
+          </a:p>
+          <a:p>
+            <a:pPr lvl="1"/>
+            <a:endParaRPr lang="en-US" dirty="0"/>
           </a:p>
         </p:txBody>
       </p:sp>
     </p:spTree>
     <p:extLst>
       <p:ext uri="{BB962C8B-B14F-4D97-AF65-F5344CB8AC3E}">
-        <p14:creationId xmlns:p14="http://schemas.microsoft.com/office/powerpoint/2010/main" val="1200321785"/>
+        <p14:creationId xmlns:p14="http://schemas.microsoft.com/office/powerpoint/2010/main" val="1718081727"/>
       </p:ext>
     </p:extLst>
   </p:cSld>
@@ -25634,7 +25576,7 @@
           <a:p>
             <a:r>
               <a:rPr lang="en-US" dirty="0"/>
-              <a:t>Transformations: Exploration</a:t>
+              <a:t>Transformations: Simplification*</a:t>
             </a:r>
           </a:p>
         </p:txBody>
@@ -25656,73 +25598,79 @@
           <a:p>
             <a:r>
               <a:rPr lang="en-US" dirty="0"/>
-              <a:t>Start from a logical operation (may be a sub-branch of the full query): the pattern</a:t>
+              <a:t>Subqueries to joins</a:t>
             </a:r>
           </a:p>
           <a:p>
             <a:r>
               <a:rPr lang="en-US" dirty="0"/>
-              <a:t>Find equivalent logical operations: the substitute</a:t>
+              <a:t>Predicate pushdown</a:t>
             </a:r>
           </a:p>
           <a:p>
             <a:r>
               <a:rPr lang="en-US" dirty="0"/>
-              <a:t>Examples:</a:t>
-            </a:r>
-          </a:p>
-          <a:p>
-            <a:pPr lvl="1"/>
+              <a:t>Foreign key table removal</a:t>
+            </a:r>
+          </a:p>
+          <a:p>
             <a:r>
               <a:rPr lang="en-US" dirty="0"/>
-              <a:t>Join commutativity: A⋈B </a:t>
-            </a:r>
-            <a:r>
-              <a:rPr lang="en-US" dirty="0">
-                <a:sym typeface="Wingdings" panose="05000000000000000000" pitchFamily="2" charset="2"/>
-              </a:rPr>
-              <a:t></a:t>
-            </a:r>
+              <a:t>Contradiction detection</a:t>
+            </a:r>
+          </a:p>
+          <a:p>
             <a:r>
               <a:rPr lang="en-US" dirty="0"/>
-              <a:t> B⋈A</a:t>
-            </a:r>
-          </a:p>
-          <a:p>
-            <a:pPr lvl="1"/>
+              <a:t>Aggregates on unique keys</a:t>
+            </a:r>
+          </a:p>
+          <a:p>
             <a:r>
               <a:rPr lang="en-US" dirty="0"/>
-              <a:t>Join associativity: (A⋈B)⋈C </a:t>
-            </a:r>
-            <a:r>
-              <a:rPr lang="en-US" dirty="0">
-                <a:sym typeface="Wingdings" panose="05000000000000000000" pitchFamily="2" charset="2"/>
-              </a:rPr>
-              <a:t></a:t>
-            </a:r>
-            <a:r>
-              <a:rPr lang="en-US" dirty="0"/>
-              <a:t> A⋈(B⋈C)</a:t>
-            </a:r>
-          </a:p>
-          <a:p>
-            <a:pPr lvl="1"/>
-            <a:r>
-              <a:rPr lang="en-US" dirty="0"/>
-              <a:t>Aggregate before join</a:t>
+              <a:t>Convert outer join to inner</a:t>
             </a:r>
           </a:p>
         </p:txBody>
       </p:sp>
       <p:sp>
         <p:nvSpPr>
-          <p:cNvPr id="4" name="Oval 3"/>
+          <p:cNvPr id="4" name="TextBox 3"/>
+          <p:cNvSpPr txBox="1"/>
+          <p:nvPr/>
+        </p:nvSpPr>
+        <p:spPr>
+          <a:xfrm>
+            <a:off x="1" y="6166438"/>
+            <a:ext cx="7084194" cy="646331"/>
+          </a:xfrm>
+          <a:prstGeom prst="rect">
+            <a:avLst/>
+          </a:prstGeom>
+          <a:noFill/>
+        </p:spPr>
+        <p:txBody>
+          <a:bodyPr wrap="square" rtlCol="0">
+            <a:spAutoFit/>
+          </a:bodyPr>
+          <a:lstStyle/>
+          <a:p>
+            <a:r>
+              <a:rPr lang="en-US" dirty="0"/>
+              <a:t>* A somewhat overloaded term.  Some simplification activities happen earlier in the process than others.</a:t>
+            </a:r>
+          </a:p>
+        </p:txBody>
+      </p:sp>
+      <p:sp>
+        <p:nvSpPr>
+          <p:cNvPr id="5" name="Oval 4"/>
           <p:cNvSpPr/>
           <p:nvPr/>
         </p:nvSpPr>
         <p:spPr>
           <a:xfrm>
-            <a:off x="8282539" y="5159142"/>
+            <a:off x="8215162" y="547440"/>
             <a:ext cx="616016" cy="606391"/>
           </a:xfrm>
           <a:prstGeom prst="ellipse">
@@ -25750,7 +25698,7 @@
             <a:pPr algn="ctr"/>
             <a:r>
               <a:rPr lang="en-US" dirty="0"/>
-              <a:t>9</a:t>
+              <a:t>8</a:t>
             </a:r>
           </a:p>
         </p:txBody>
@@ -25758,7 +25706,7 @@
     </p:spTree>
     <p:extLst>
       <p:ext uri="{BB962C8B-B14F-4D97-AF65-F5344CB8AC3E}">
-        <p14:creationId xmlns:p14="http://schemas.microsoft.com/office/powerpoint/2010/main" val="3940448552"/>
+        <p14:creationId xmlns:p14="http://schemas.microsoft.com/office/powerpoint/2010/main" val="1200321785"/>
       </p:ext>
     </p:extLst>
   </p:cSld>
@@ -25802,7 +25750,7 @@
           <a:p>
             <a:r>
               <a:rPr lang="en-US" dirty="0"/>
-              <a:t>Transformations: Implementation</a:t>
+              <a:t>Transformations: Exploration</a:t>
             </a:r>
           </a:p>
         </p:txBody>
@@ -25824,72 +25772,101 @@
           <a:p>
             <a:r>
               <a:rPr lang="en-US" dirty="0"/>
-              <a:t>Start from a logical operation</a:t>
+              <a:t>Start from a logical operation (may be a sub-branch of the full query): the pattern</a:t>
             </a:r>
           </a:p>
           <a:p>
             <a:r>
               <a:rPr lang="en-US" dirty="0"/>
-              <a:t>Find equivalent physical operation</a:t>
+              <a:t>Find equivalent logical operations: the substitute</a:t>
             </a:r>
           </a:p>
           <a:p>
             <a:r>
               <a:rPr lang="en-US" dirty="0"/>
-              <a:t>Example:</a:t>
+              <a:t>Examples:</a:t>
             </a:r>
           </a:p>
           <a:p>
             <a:pPr lvl="1"/>
             <a:r>
               <a:rPr lang="en-US" dirty="0"/>
-              <a:t>A⋈B </a:t>
+              <a:t>Join commutativity: A⋈B </a:t>
             </a:r>
             <a:r>
               <a:rPr lang="en-US" dirty="0">
                 <a:sym typeface="Wingdings" panose="05000000000000000000" pitchFamily="2" charset="2"/>
               </a:rPr>
-              <a:t> A (nested loops join) B</a:t>
+              <a:t></a:t>
+            </a:r>
+            <a:r>
+              <a:rPr lang="en-US" dirty="0"/>
+              <a:t> B⋈A</a:t>
             </a:r>
           </a:p>
           <a:p>
             <a:pPr lvl="1"/>
             <a:r>
               <a:rPr lang="en-US" dirty="0"/>
-              <a:t>A⋈B </a:t>
+              <a:t>Join associativity: (A⋈B)⋈C </a:t>
             </a:r>
             <a:r>
               <a:rPr lang="en-US" dirty="0">
                 <a:sym typeface="Wingdings" panose="05000000000000000000" pitchFamily="2" charset="2"/>
               </a:rPr>
-              <a:t> A (merge join) B</a:t>
+              <a:t></a:t>
+            </a:r>
+            <a:r>
+              <a:rPr lang="en-US" dirty="0"/>
+              <a:t> A⋈(B⋈C)</a:t>
             </a:r>
           </a:p>
           <a:p>
             <a:pPr lvl="1"/>
             <a:r>
               <a:rPr lang="en-US" dirty="0"/>
-              <a:t>A⋈B </a:t>
-            </a:r>
-            <a:r>
-              <a:rPr lang="en-US" dirty="0">
-                <a:sym typeface="Wingdings" panose="05000000000000000000" pitchFamily="2" charset="2"/>
-              </a:rPr>
-              <a:t> A (hash join) B</a:t>
-            </a:r>
-          </a:p>
-          <a:p>
-            <a:r>
-              <a:rPr lang="en-US" dirty="0">
-                <a:sym typeface="Wingdings" panose="05000000000000000000" pitchFamily="2" charset="2"/>
-              </a:rPr>
-              <a:t>Obtain costing on physical operations</a:t>
-            </a:r>
-          </a:p>
-          <a:p>
+              <a:t>Aggregate before join</a:t>
+            </a:r>
+          </a:p>
+        </p:txBody>
+      </p:sp>
+      <p:sp>
+        <p:nvSpPr>
+          <p:cNvPr id="4" name="Oval 3"/>
+          <p:cNvSpPr/>
+          <p:nvPr/>
+        </p:nvSpPr>
+        <p:spPr>
+          <a:xfrm>
+            <a:off x="8282539" y="5159142"/>
+            <a:ext cx="616016" cy="606391"/>
+          </a:xfrm>
+          <a:prstGeom prst="ellipse">
+            <a:avLst/>
+          </a:prstGeom>
+        </p:spPr>
+        <p:style>
+          <a:lnRef idx="1">
+            <a:schemeClr val="accent1"/>
+          </a:lnRef>
+          <a:fillRef idx="3">
+            <a:schemeClr val="accent1"/>
+          </a:fillRef>
+          <a:effectRef idx="2">
+            <a:schemeClr val="accent1"/>
+          </a:effectRef>
+          <a:fontRef idx="minor">
+            <a:schemeClr val="lt1"/>
+          </a:fontRef>
+        </p:style>
+        <p:txBody>
+          <a:bodyPr rtlCol="0" anchor="ctr"/>
+          <a:lstStyle/>
+          <a:p>
+            <a:pPr algn="ctr"/>
             <a:r>
               <a:rPr lang="en-US" dirty="0"/>
-              <a:t>Can prune expensive branches from tree</a:t>
+              <a:t>9</a:t>
             </a:r>
           </a:p>
         </p:txBody>
@@ -25897,7 +25874,7 @@
     </p:spTree>
     <p:extLst>
       <p:ext uri="{BB962C8B-B14F-4D97-AF65-F5344CB8AC3E}">
-        <p14:creationId xmlns:p14="http://schemas.microsoft.com/office/powerpoint/2010/main" val="910537009"/>
+        <p14:creationId xmlns:p14="http://schemas.microsoft.com/office/powerpoint/2010/main" val="3940448552"/>
       </p:ext>
     </p:extLst>
   </p:cSld>
@@ -25941,7 +25918,7 @@
           <a:p>
             <a:r>
               <a:rPr lang="en-US" dirty="0"/>
-              <a:t>Transformations: Property Enforcement</a:t>
+              <a:t>Transformations: Implementation</a:t>
             </a:r>
           </a:p>
         </p:txBody>
@@ -25963,42 +25940,72 @@
           <a:p>
             <a:r>
               <a:rPr lang="en-US" dirty="0"/>
-              <a:t>Properties associated with parse tree nodes</a:t>
+              <a:t>Start from a logical operation</a:t>
+            </a:r>
+          </a:p>
+          <a:p>
+            <a:r>
+              <a:rPr lang="en-US" dirty="0"/>
+              <a:t>Find equivalent physical operation</a:t>
+            </a:r>
+          </a:p>
+          <a:p>
+            <a:r>
+              <a:rPr lang="en-US" dirty="0"/>
+              <a:t>Example:</a:t>
             </a:r>
           </a:p>
           <a:p>
             <a:pPr lvl="1"/>
             <a:r>
               <a:rPr lang="en-US" dirty="0"/>
-              <a:t>Uniqueness, type, </a:t>
-            </a:r>
-            <a:r>
-              <a:rPr lang="en-US" dirty="0" err="1"/>
-              <a:t>nullability</a:t>
-            </a:r>
+              <a:t>A⋈B </a:t>
+            </a:r>
+            <a:r>
+              <a:rPr lang="en-US" dirty="0">
+                <a:sym typeface="Wingdings" panose="05000000000000000000" pitchFamily="2" charset="2"/>
+              </a:rPr>
+              <a:t> A (nested loops join) B</a:t>
+            </a:r>
+          </a:p>
+          <a:p>
+            <a:pPr lvl="1"/>
             <a:r>
               <a:rPr lang="en-US" dirty="0"/>
-              <a:t>, sort order</a:t>
+              <a:t>A⋈B </a:t>
+            </a:r>
+            <a:r>
+              <a:rPr lang="en-US" dirty="0">
+                <a:sym typeface="Wingdings" panose="05000000000000000000" pitchFamily="2" charset="2"/>
+              </a:rPr>
+              <a:t> A (merge join) B</a:t>
             </a:r>
           </a:p>
           <a:p>
             <a:pPr lvl="1"/>
             <a:r>
               <a:rPr lang="en-US" dirty="0"/>
-              <a:t>Constraints on column values</a:t>
+              <a:t>A⋈B </a:t>
+            </a:r>
+            <a:r>
+              <a:rPr lang="en-US" dirty="0">
+                <a:sym typeface="Wingdings" panose="05000000000000000000" pitchFamily="2" charset="2"/>
+              </a:rPr>
+              <a:t> A (hash join) B</a:t>
+            </a:r>
+          </a:p>
+          <a:p>
+            <a:r>
+              <a:rPr lang="en-US" dirty="0">
+                <a:sym typeface="Wingdings" panose="05000000000000000000" pitchFamily="2" charset="2"/>
+              </a:rPr>
+              <a:t>Obtain costing on physical operations</a:t>
             </a:r>
           </a:p>
           <a:p>
             <a:r>
               <a:rPr lang="en-US" dirty="0"/>
-              <a:t>Transformation rules may cause certain properties to be enforced</a:t>
-            </a:r>
-          </a:p>
-          <a:p>
-            <a:pPr lvl="1"/>
-            <a:r>
-              <a:rPr lang="en-US" dirty="0"/>
-              <a:t>Example: sort order for a merge join</a:t>
+              <a:t>Can prune expensive branches from tree</a:t>
             </a:r>
           </a:p>
         </p:txBody>
@@ -26006,7 +26013,7 @@
     </p:spTree>
     <p:extLst>
       <p:ext uri="{BB962C8B-B14F-4D97-AF65-F5344CB8AC3E}">
-        <p14:creationId xmlns:p14="http://schemas.microsoft.com/office/powerpoint/2010/main" val="3566365270"/>
+        <p14:creationId xmlns:p14="http://schemas.microsoft.com/office/powerpoint/2010/main" val="910537009"/>
       </p:ext>
     </p:extLst>
   </p:cSld>
@@ -26045,16 +26052,13 @@
         </p:nvSpPr>
         <p:spPr/>
         <p:txBody>
-          <a:bodyPr>
-            <a:normAutofit fontScale="90000"/>
-          </a:bodyPr>
+          <a:bodyPr/>
           <a:lstStyle/>
           <a:p>
             <a:r>
-              <a:rPr lang="en-US" dirty="0" err="1"/>
-              <a:t>sys.dm_exec_query_transformation_stats</a:t>
-            </a:r>
-            <a:endParaRPr lang="en-US" dirty="0"/>
+              <a:rPr lang="en-US" dirty="0"/>
+              <a:t>Transformations: Property Enforcement</a:t>
+            </a:r>
           </a:p>
         </p:txBody>
       </p:sp>
@@ -26075,75 +26079,42 @@
           <a:p>
             <a:r>
               <a:rPr lang="en-US" dirty="0"/>
-              <a:t>One row per transformation rule</a:t>
+              <a:t>Properties associated with parse tree nodes</a:t>
             </a:r>
           </a:p>
           <a:p>
             <a:pPr lvl="1"/>
             <a:r>
               <a:rPr lang="en-US" dirty="0"/>
-              <a:t>“Promise” – How useful might the rule be for this query?</a:t>
+              <a:t>Uniqueness, type, </a:t>
+            </a:r>
+            <a:r>
+              <a:rPr lang="en-US" dirty="0" err="1"/>
+              <a:t>nullability</a:t>
+            </a:r>
+            <a:r>
+              <a:rPr lang="en-US" dirty="0"/>
+              <a:t>, sort order</a:t>
             </a:r>
           </a:p>
           <a:p>
             <a:pPr lvl="1"/>
             <a:r>
               <a:rPr lang="en-US" dirty="0"/>
-              <a:t>“Built-Substitute” – Number of times the rule generated an alternate tree</a:t>
+              <a:t>Constraints on column values</a:t>
+            </a:r>
+          </a:p>
+          <a:p>
+            <a:r>
+              <a:rPr lang="en-US" dirty="0"/>
+              <a:t>Transformation rules may cause certain properties to be enforced</a:t>
             </a:r>
           </a:p>
           <a:p>
             <a:pPr lvl="1"/>
             <a:r>
               <a:rPr lang="en-US" dirty="0"/>
-              <a:t>“Succeeded” – Number of times the rule was incorporated</a:t>
-            </a:r>
-          </a:p>
-          <a:p>
-            <a:r>
-              <a:rPr lang="en-US" dirty="0"/>
-              <a:t>Collect before and after images of this view on a quiet system</a:t>
-            </a:r>
-          </a:p>
-        </p:txBody>
-      </p:sp>
-      <p:sp>
-        <p:nvSpPr>
-          <p:cNvPr id="4" name="Oval 3"/>
-          <p:cNvSpPr/>
-          <p:nvPr/>
-        </p:nvSpPr>
-        <p:spPr>
-          <a:xfrm>
-            <a:off x="8378792" y="542942"/>
-            <a:ext cx="616016" cy="606391"/>
-          </a:xfrm>
-          <a:prstGeom prst="ellipse">
-            <a:avLst/>
-          </a:prstGeom>
-        </p:spPr>
-        <p:style>
-          <a:lnRef idx="1">
-            <a:schemeClr val="accent1"/>
-          </a:lnRef>
-          <a:fillRef idx="3">
-            <a:schemeClr val="accent1"/>
-          </a:fillRef>
-          <a:effectRef idx="2">
-            <a:schemeClr val="accent1"/>
-          </a:effectRef>
-          <a:fontRef idx="minor">
-            <a:schemeClr val="lt1"/>
-          </a:fontRef>
-        </p:style>
-        <p:txBody>
-          <a:bodyPr rtlCol="0" anchor="ctr"/>
-          <a:lstStyle/>
-          <a:p>
-            <a:pPr algn="ctr"/>
-            <a:r>
-              <a:rPr lang="en-US" sz="1600" dirty="0"/>
-              <a:t>10</a:t>
+              <a:t>Example: sort order for a merge join</a:t>
             </a:r>
           </a:p>
         </p:txBody>
@@ -26151,7 +26122,7 @@
     </p:spTree>
     <p:extLst>
       <p:ext uri="{BB962C8B-B14F-4D97-AF65-F5344CB8AC3E}">
-        <p14:creationId xmlns:p14="http://schemas.microsoft.com/office/powerpoint/2010/main" val="3574128401"/>
+        <p14:creationId xmlns:p14="http://schemas.microsoft.com/office/powerpoint/2010/main" val="3566365270"/>
       </p:ext>
     </p:extLst>
   </p:cSld>
@@ -26257,6 +26228,151 @@
 </file>
 
 <file path=ppt/slides/slide40.xml><?xml version="1.0" encoding="utf-8"?>
+<p:sld xmlns:a="http://schemas.openxmlformats.org/drawingml/2006/main" xmlns:r="http://schemas.openxmlformats.org/officeDocument/2006/relationships" xmlns:p="http://schemas.openxmlformats.org/presentationml/2006/main">
+  <p:cSld>
+    <p:spTree>
+      <p:nvGrpSpPr>
+        <p:cNvPr id="1" name=""/>
+        <p:cNvGrpSpPr/>
+        <p:nvPr/>
+      </p:nvGrpSpPr>
+      <p:grpSpPr>
+        <a:xfrm>
+          <a:off x="0" y="0"/>
+          <a:ext cx="0" cy="0"/>
+          <a:chOff x="0" y="0"/>
+          <a:chExt cx="0" cy="0"/>
+        </a:xfrm>
+      </p:grpSpPr>
+      <p:sp>
+        <p:nvSpPr>
+          <p:cNvPr id="2" name="Title 1"/>
+          <p:cNvSpPr>
+            <a:spLocks noGrp="1"/>
+          </p:cNvSpPr>
+          <p:nvPr>
+            <p:ph type="title"/>
+          </p:nvPr>
+        </p:nvSpPr>
+        <p:spPr/>
+        <p:txBody>
+          <a:bodyPr>
+            <a:normAutofit fontScale="90000"/>
+          </a:bodyPr>
+          <a:lstStyle/>
+          <a:p>
+            <a:r>
+              <a:rPr lang="en-US" dirty="0" err="1"/>
+              <a:t>sys.dm_exec_query_transformation_stats</a:t>
+            </a:r>
+            <a:endParaRPr lang="en-US" dirty="0"/>
+          </a:p>
+        </p:txBody>
+      </p:sp>
+      <p:sp>
+        <p:nvSpPr>
+          <p:cNvPr id="3" name="Content Placeholder 2"/>
+          <p:cNvSpPr>
+            <a:spLocks noGrp="1"/>
+          </p:cNvSpPr>
+          <p:nvPr>
+            <p:ph idx="1"/>
+          </p:nvPr>
+        </p:nvSpPr>
+        <p:spPr/>
+        <p:txBody>
+          <a:bodyPr/>
+          <a:lstStyle/>
+          <a:p>
+            <a:r>
+              <a:rPr lang="en-US" dirty="0"/>
+              <a:t>One row per transformation rule</a:t>
+            </a:r>
+          </a:p>
+          <a:p>
+            <a:pPr lvl="1"/>
+            <a:r>
+              <a:rPr lang="en-US" dirty="0"/>
+              <a:t>“Promise” – How useful might the rule be for this query?</a:t>
+            </a:r>
+          </a:p>
+          <a:p>
+            <a:pPr lvl="1"/>
+            <a:r>
+              <a:rPr lang="en-US" dirty="0"/>
+              <a:t>“Built-Substitute” – Number of times the rule generated an alternate tree</a:t>
+            </a:r>
+          </a:p>
+          <a:p>
+            <a:pPr lvl="1"/>
+            <a:r>
+              <a:rPr lang="en-US" dirty="0"/>
+              <a:t>“Succeeded” – Number of times the rule was incorporated</a:t>
+            </a:r>
+          </a:p>
+          <a:p>
+            <a:r>
+              <a:rPr lang="en-US" dirty="0"/>
+              <a:t>Collect before and after images of this view on a quiet system</a:t>
+            </a:r>
+          </a:p>
+        </p:txBody>
+      </p:sp>
+      <p:sp>
+        <p:nvSpPr>
+          <p:cNvPr id="4" name="Oval 3"/>
+          <p:cNvSpPr/>
+          <p:nvPr/>
+        </p:nvSpPr>
+        <p:spPr>
+          <a:xfrm>
+            <a:off x="8378792" y="542942"/>
+            <a:ext cx="616016" cy="606391"/>
+          </a:xfrm>
+          <a:prstGeom prst="ellipse">
+            <a:avLst/>
+          </a:prstGeom>
+        </p:spPr>
+        <p:style>
+          <a:lnRef idx="1">
+            <a:schemeClr val="accent1"/>
+          </a:lnRef>
+          <a:fillRef idx="3">
+            <a:schemeClr val="accent1"/>
+          </a:fillRef>
+          <a:effectRef idx="2">
+            <a:schemeClr val="accent1"/>
+          </a:effectRef>
+          <a:fontRef idx="minor">
+            <a:schemeClr val="lt1"/>
+          </a:fontRef>
+        </p:style>
+        <p:txBody>
+          <a:bodyPr rtlCol="0" anchor="ctr"/>
+          <a:lstStyle/>
+          <a:p>
+            <a:pPr algn="ctr"/>
+            <a:r>
+              <a:rPr lang="en-US" sz="1600" dirty="0"/>
+              <a:t>10</a:t>
+            </a:r>
+          </a:p>
+        </p:txBody>
+      </p:sp>
+    </p:spTree>
+    <p:extLst>
+      <p:ext uri="{BB962C8B-B14F-4D97-AF65-F5344CB8AC3E}">
+        <p14:creationId xmlns:p14="http://schemas.microsoft.com/office/powerpoint/2010/main" val="3574128401"/>
+      </p:ext>
+    </p:extLst>
+  </p:cSld>
+  <p:clrMapOvr>
+    <a:masterClrMapping/>
+  </p:clrMapOvr>
+</p:sld>
+</file>
+
+<file path=ppt/slides/slide41.xml><?xml version="1.0" encoding="utf-8"?>
 <p:sld xmlns:a="http://schemas.openxmlformats.org/drawingml/2006/main" xmlns:r="http://schemas.openxmlformats.org/officeDocument/2006/relationships" xmlns:p="http://schemas.openxmlformats.org/presentationml/2006/main" show="0">
   <p:cSld>
     <p:spTree>
@@ -26369,106 +26485,6 @@
     <p:extLst>
       <p:ext uri="{BB962C8B-B14F-4D97-AF65-F5344CB8AC3E}">
         <p14:creationId xmlns:p14="http://schemas.microsoft.com/office/powerpoint/2010/main" val="3650632215"/>
-      </p:ext>
-    </p:extLst>
-  </p:cSld>
-  <p:clrMapOvr>
-    <a:masterClrMapping/>
-  </p:clrMapOvr>
-</p:sld>
-</file>
-
-<file path=ppt/slides/slide41.xml><?xml version="1.0" encoding="utf-8"?>
-<p:sld xmlns:a="http://schemas.openxmlformats.org/drawingml/2006/main" xmlns:r="http://schemas.openxmlformats.org/officeDocument/2006/relationships" xmlns:p="http://schemas.openxmlformats.org/presentationml/2006/main">
-  <p:cSld>
-    <p:spTree>
-      <p:nvGrpSpPr>
-        <p:cNvPr id="1" name=""/>
-        <p:cNvGrpSpPr/>
-        <p:nvPr/>
-      </p:nvGrpSpPr>
-      <p:grpSpPr>
-        <a:xfrm>
-          <a:off x="0" y="0"/>
-          <a:ext cx="0" cy="0"/>
-          <a:chOff x="0" y="0"/>
-          <a:chExt cx="0" cy="0"/>
-        </a:xfrm>
-      </p:grpSpPr>
-      <p:sp>
-        <p:nvSpPr>
-          <p:cNvPr id="2" name="Title 1"/>
-          <p:cNvSpPr>
-            <a:spLocks noGrp="1"/>
-          </p:cNvSpPr>
-          <p:nvPr>
-            <p:ph type="title"/>
-          </p:nvPr>
-        </p:nvSpPr>
-        <p:spPr/>
-        <p:txBody>
-          <a:bodyPr/>
-          <a:lstStyle/>
-          <a:p>
-            <a:r>
-              <a:rPr lang="en-US" dirty="0"/>
-              <a:t>Parse Trees</a:t>
-            </a:r>
-          </a:p>
-        </p:txBody>
-      </p:sp>
-      <p:sp>
-        <p:nvSpPr>
-          <p:cNvPr id="3" name="Content Placeholder 2"/>
-          <p:cNvSpPr>
-            <a:spLocks noGrp="1"/>
-          </p:cNvSpPr>
-          <p:nvPr>
-            <p:ph idx="1"/>
-          </p:nvPr>
-        </p:nvSpPr>
-        <p:spPr/>
-        <p:txBody>
-          <a:bodyPr/>
-          <a:lstStyle/>
-          <a:p>
-            <a:r>
-              <a:rPr lang="en-US" dirty="0"/>
-              <a:t>Internal representation of query operation</a:t>
-            </a:r>
-          </a:p>
-          <a:p>
-            <a:r>
-              <a:rPr lang="en-US" dirty="0"/>
-              <a:t>Nodes may be logical or physical operators</a:t>
-            </a:r>
-          </a:p>
-          <a:p>
-            <a:pPr lvl="1"/>
-            <a:r>
-              <a:rPr lang="en-US" dirty="0"/>
-              <a:t>0 to infinity inputs, 1 output</a:t>
-            </a:r>
-          </a:p>
-          <a:p>
-            <a:r>
-              <a:rPr lang="en-US" dirty="0"/>
-              <a:t>SQL Server will output parse trees at various phases of optimization</a:t>
-            </a:r>
-          </a:p>
-          <a:p>
-            <a:pPr lvl="1"/>
-            <a:r>
-              <a:rPr lang="en-US" dirty="0"/>
-              <a:t>A variety of trace flags will trigger output</a:t>
-            </a:r>
-          </a:p>
-        </p:txBody>
-      </p:sp>
-    </p:spTree>
-    <p:extLst>
-      <p:ext uri="{BB962C8B-B14F-4D97-AF65-F5344CB8AC3E}">
-        <p14:creationId xmlns:p14="http://schemas.microsoft.com/office/powerpoint/2010/main" val="1114966382"/>
       </p:ext>
     </p:extLst>
   </p:cSld>
@@ -26512,1150 +26528,63 @@
           <a:p>
             <a:r>
               <a:rPr lang="en-US" dirty="0"/>
-              <a:t>Example Parse Tree</a:t>
+              <a:t>Parse Trees</a:t>
             </a:r>
           </a:p>
         </p:txBody>
       </p:sp>
       <p:sp>
         <p:nvSpPr>
-          <p:cNvPr id="5" name="TextBox 4"/>
-          <p:cNvSpPr txBox="1"/>
-          <p:nvPr/>
+          <p:cNvPr id="3" name="Content Placeholder 2"/>
+          <p:cNvSpPr>
+            <a:spLocks noGrp="1"/>
+          </p:cNvSpPr>
+          <p:nvPr>
+            <p:ph idx="1"/>
+          </p:nvPr>
         </p:nvSpPr>
-        <p:spPr>
-          <a:xfrm>
-            <a:off x="558265" y="1713297"/>
-            <a:ext cx="4025461" cy="2677656"/>
-          </a:xfrm>
-          <a:prstGeom prst="rect">
-            <a:avLst/>
-          </a:prstGeom>
-          <a:noFill/>
-        </p:spPr>
+        <p:spPr/>
         <p:txBody>
-          <a:bodyPr wrap="none" rtlCol="0">
-            <a:spAutoFit/>
-          </a:bodyPr>
+          <a:bodyPr/>
           <a:lstStyle/>
           <a:p>
             <a:r>
-              <a:rPr lang="en-US" sz="1400" dirty="0">
-                <a:solidFill>
-                  <a:srgbClr val="0000FF"/>
-                </a:solidFill>
-                <a:latin typeface="Consolas" panose="020B0609020204030204" pitchFamily="49" charset="0"/>
-              </a:rPr>
-              <a:t>select</a:t>
-            </a:r>
-            <a:r>
-              <a:rPr lang="en-US" sz="1400" dirty="0">
-                <a:solidFill>
-                  <a:prstClr val="black"/>
-                </a:solidFill>
-                <a:latin typeface="Consolas" panose="020B0609020204030204" pitchFamily="49" charset="0"/>
-              </a:rPr>
-              <a:t> </a:t>
-            </a:r>
-            <a:r>
-              <a:rPr lang="en-US" sz="1400" dirty="0">
-                <a:solidFill>
-                  <a:srgbClr val="0000FF"/>
-                </a:solidFill>
-                <a:latin typeface="Consolas" panose="020B0609020204030204" pitchFamily="49" charset="0"/>
-              </a:rPr>
-              <a:t>top</a:t>
-            </a:r>
-            <a:r>
-              <a:rPr lang="en-US" sz="1400" dirty="0">
-                <a:solidFill>
-                  <a:prstClr val="black"/>
-                </a:solidFill>
-                <a:latin typeface="Consolas" panose="020B0609020204030204" pitchFamily="49" charset="0"/>
-              </a:rPr>
-              <a:t> 10</a:t>
-            </a:r>
-          </a:p>
-          <a:p>
-            <a:r>
-              <a:rPr lang="en-US" sz="1400" dirty="0">
-                <a:solidFill>
-                  <a:srgbClr val="008080"/>
-                </a:solidFill>
-                <a:latin typeface="Consolas" panose="020B0609020204030204" pitchFamily="49" charset="0"/>
-              </a:rPr>
-              <a:t>	</a:t>
-            </a:r>
-            <a:r>
-              <a:rPr lang="en-US" sz="1400" dirty="0" err="1">
-                <a:solidFill>
-                  <a:srgbClr val="008080"/>
-                </a:solidFill>
-                <a:latin typeface="Consolas" panose="020B0609020204030204" pitchFamily="49" charset="0"/>
-              </a:rPr>
-              <a:t>od</a:t>
-            </a:r>
-            <a:r>
-              <a:rPr lang="en-US" sz="1400" dirty="0" err="1">
-                <a:solidFill>
-                  <a:srgbClr val="808080"/>
-                </a:solidFill>
-                <a:latin typeface="Consolas" panose="020B0609020204030204" pitchFamily="49" charset="0"/>
-              </a:rPr>
-              <a:t>.</a:t>
-            </a:r>
-            <a:r>
-              <a:rPr lang="en-US" sz="1400" dirty="0" err="1">
-                <a:solidFill>
-                  <a:srgbClr val="008080"/>
-                </a:solidFill>
-                <a:latin typeface="Consolas" panose="020B0609020204030204" pitchFamily="49" charset="0"/>
-              </a:rPr>
-              <a:t>ProductId</a:t>
-            </a:r>
-            <a:r>
-              <a:rPr lang="en-US" sz="1400" dirty="0">
-                <a:solidFill>
-                  <a:srgbClr val="808080"/>
-                </a:solidFill>
-                <a:latin typeface="Consolas" panose="020B0609020204030204" pitchFamily="49" charset="0"/>
-              </a:rPr>
-              <a:t>,</a:t>
-            </a:r>
-            <a:endParaRPr lang="en-US" sz="1400" dirty="0">
-              <a:solidFill>
-                <a:prstClr val="black"/>
-              </a:solidFill>
-              <a:latin typeface="Consolas" panose="020B0609020204030204" pitchFamily="49" charset="0"/>
-            </a:endParaRPr>
-          </a:p>
-          <a:p>
-            <a:r>
-              <a:rPr lang="en-US" sz="1400" dirty="0">
-                <a:solidFill>
-                  <a:srgbClr val="FF00FF"/>
-                </a:solidFill>
-                <a:latin typeface="Consolas" panose="020B0609020204030204" pitchFamily="49" charset="0"/>
-              </a:rPr>
-              <a:t>	sum</a:t>
-            </a:r>
-            <a:r>
-              <a:rPr lang="en-US" sz="1400" dirty="0">
-                <a:solidFill>
-                  <a:srgbClr val="808080"/>
-                </a:solidFill>
-                <a:latin typeface="Consolas" panose="020B0609020204030204" pitchFamily="49" charset="0"/>
-              </a:rPr>
-              <a:t>(</a:t>
-            </a:r>
-            <a:r>
-              <a:rPr lang="en-US" sz="1400" dirty="0" err="1">
-                <a:solidFill>
-                  <a:srgbClr val="008080"/>
-                </a:solidFill>
-                <a:latin typeface="Consolas" panose="020B0609020204030204" pitchFamily="49" charset="0"/>
-              </a:rPr>
-              <a:t>od</a:t>
-            </a:r>
-            <a:r>
-              <a:rPr lang="en-US" sz="1400" dirty="0" err="1">
-                <a:solidFill>
-                  <a:srgbClr val="808080"/>
-                </a:solidFill>
-                <a:latin typeface="Consolas" panose="020B0609020204030204" pitchFamily="49" charset="0"/>
-              </a:rPr>
-              <a:t>.</a:t>
-            </a:r>
-            <a:r>
-              <a:rPr lang="en-US" sz="1400" dirty="0" err="1">
-                <a:solidFill>
-                  <a:srgbClr val="008080"/>
-                </a:solidFill>
-                <a:latin typeface="Consolas" panose="020B0609020204030204" pitchFamily="49" charset="0"/>
-              </a:rPr>
-              <a:t>Quantity</a:t>
-            </a:r>
-            <a:r>
-              <a:rPr lang="en-US" sz="1400" dirty="0">
-                <a:solidFill>
-                  <a:srgbClr val="808080"/>
-                </a:solidFill>
-                <a:latin typeface="Consolas" panose="020B0609020204030204" pitchFamily="49" charset="0"/>
-              </a:rPr>
-              <a:t>)</a:t>
-            </a:r>
-            <a:r>
-              <a:rPr lang="en-US" sz="1400" dirty="0">
-                <a:solidFill>
-                  <a:prstClr val="black"/>
-                </a:solidFill>
-                <a:latin typeface="Consolas" panose="020B0609020204030204" pitchFamily="49" charset="0"/>
-              </a:rPr>
-              <a:t> </a:t>
-            </a:r>
-            <a:r>
-              <a:rPr lang="en-US" sz="1400" dirty="0">
-                <a:solidFill>
-                  <a:srgbClr val="808080"/>
-                </a:solidFill>
-                <a:latin typeface="Consolas" panose="020B0609020204030204" pitchFamily="49" charset="0"/>
-              </a:rPr>
-              <a:t>-</a:t>
-            </a:r>
-            <a:r>
-              <a:rPr lang="en-US" sz="1400" dirty="0">
-                <a:solidFill>
-                  <a:prstClr val="black"/>
-                </a:solidFill>
-                <a:latin typeface="Consolas" panose="020B0609020204030204" pitchFamily="49" charset="0"/>
-              </a:rPr>
-              <a:t> 20 </a:t>
-            </a:r>
-            <a:r>
-              <a:rPr lang="en-US" sz="1400" dirty="0" err="1">
-                <a:solidFill>
-                  <a:srgbClr val="008080"/>
-                </a:solidFill>
-                <a:latin typeface="Consolas" panose="020B0609020204030204" pitchFamily="49" charset="0"/>
-              </a:rPr>
-              <a:t>ExcessOrders</a:t>
-            </a:r>
-            <a:endParaRPr lang="en-US" sz="1400" dirty="0">
-              <a:solidFill>
-                <a:prstClr val="black"/>
-              </a:solidFill>
-              <a:latin typeface="Consolas" panose="020B0609020204030204" pitchFamily="49" charset="0"/>
-            </a:endParaRPr>
-          </a:p>
-          <a:p>
-            <a:r>
-              <a:rPr lang="en-US" sz="1400" dirty="0">
-                <a:solidFill>
-                  <a:srgbClr val="0000FF"/>
-                </a:solidFill>
-                <a:latin typeface="Consolas" panose="020B0609020204030204" pitchFamily="49" charset="0"/>
-              </a:rPr>
-              <a:t>from</a:t>
-            </a:r>
-            <a:r>
-              <a:rPr lang="en-US" sz="1400" dirty="0">
-                <a:solidFill>
-                  <a:prstClr val="black"/>
-                </a:solidFill>
-                <a:latin typeface="Consolas" panose="020B0609020204030204" pitchFamily="49" charset="0"/>
-              </a:rPr>
-              <a:t> </a:t>
-            </a:r>
-            <a:r>
-              <a:rPr lang="en-US" sz="1400" dirty="0" err="1">
-                <a:solidFill>
-                  <a:srgbClr val="008080"/>
-                </a:solidFill>
-                <a:latin typeface="Consolas" panose="020B0609020204030204" pitchFamily="49" charset="0"/>
-              </a:rPr>
-              <a:t>CorpDB</a:t>
-            </a:r>
-            <a:r>
-              <a:rPr lang="en-US" sz="1400" dirty="0" err="1">
-                <a:solidFill>
-                  <a:srgbClr val="808080"/>
-                </a:solidFill>
-                <a:latin typeface="Consolas" panose="020B0609020204030204" pitchFamily="49" charset="0"/>
-              </a:rPr>
-              <a:t>.</a:t>
-            </a:r>
-            <a:r>
-              <a:rPr lang="en-US" sz="1400" dirty="0" err="1">
-                <a:solidFill>
-                  <a:srgbClr val="008080"/>
-                </a:solidFill>
-                <a:latin typeface="Consolas" panose="020B0609020204030204" pitchFamily="49" charset="0"/>
-              </a:rPr>
-              <a:t>dbo</a:t>
-            </a:r>
-            <a:r>
-              <a:rPr lang="en-US" sz="1400" dirty="0" err="1">
-                <a:solidFill>
-                  <a:srgbClr val="808080"/>
-                </a:solidFill>
-                <a:latin typeface="Consolas" panose="020B0609020204030204" pitchFamily="49" charset="0"/>
-              </a:rPr>
-              <a:t>.</a:t>
-            </a:r>
-            <a:r>
-              <a:rPr lang="en-US" sz="1400" dirty="0" err="1">
-                <a:solidFill>
-                  <a:srgbClr val="008080"/>
-                </a:solidFill>
-                <a:latin typeface="Consolas" panose="020B0609020204030204" pitchFamily="49" charset="0"/>
-              </a:rPr>
-              <a:t>OrderHeader</a:t>
-            </a:r>
-            <a:r>
-              <a:rPr lang="en-US" sz="1400" dirty="0">
-                <a:solidFill>
-                  <a:prstClr val="black"/>
-                </a:solidFill>
-                <a:latin typeface="Consolas" panose="020B0609020204030204" pitchFamily="49" charset="0"/>
-              </a:rPr>
-              <a:t> </a:t>
-            </a:r>
-            <a:r>
-              <a:rPr lang="en-US" sz="1400" dirty="0">
-                <a:solidFill>
-                  <a:srgbClr val="008080"/>
-                </a:solidFill>
-                <a:latin typeface="Consolas" panose="020B0609020204030204" pitchFamily="49" charset="0"/>
-              </a:rPr>
-              <a:t>oh</a:t>
-            </a:r>
-            <a:endParaRPr lang="en-US" sz="1400" dirty="0">
-              <a:solidFill>
-                <a:prstClr val="black"/>
-              </a:solidFill>
-              <a:latin typeface="Consolas" panose="020B0609020204030204" pitchFamily="49" charset="0"/>
-            </a:endParaRPr>
-          </a:p>
-          <a:p>
-            <a:r>
-              <a:rPr lang="en-US" sz="1400" dirty="0">
-                <a:solidFill>
-                  <a:srgbClr val="808080"/>
-                </a:solidFill>
-                <a:latin typeface="Consolas" panose="020B0609020204030204" pitchFamily="49" charset="0"/>
-              </a:rPr>
-              <a:t>inner</a:t>
-            </a:r>
-            <a:r>
-              <a:rPr lang="en-US" sz="1400" dirty="0">
-                <a:solidFill>
-                  <a:prstClr val="black"/>
-                </a:solidFill>
-                <a:latin typeface="Consolas" panose="020B0609020204030204" pitchFamily="49" charset="0"/>
-              </a:rPr>
-              <a:t> </a:t>
-            </a:r>
-            <a:r>
-              <a:rPr lang="en-US" sz="1400" dirty="0">
-                <a:solidFill>
-                  <a:srgbClr val="808080"/>
-                </a:solidFill>
-                <a:latin typeface="Consolas" panose="020B0609020204030204" pitchFamily="49" charset="0"/>
-              </a:rPr>
-              <a:t>join</a:t>
-            </a:r>
-            <a:r>
-              <a:rPr lang="en-US" sz="1400" dirty="0">
-                <a:solidFill>
-                  <a:prstClr val="black"/>
-                </a:solidFill>
-                <a:latin typeface="Consolas" panose="020B0609020204030204" pitchFamily="49" charset="0"/>
-              </a:rPr>
-              <a:t> </a:t>
-            </a:r>
-            <a:r>
-              <a:rPr lang="en-US" sz="1400" dirty="0" err="1">
-                <a:solidFill>
-                  <a:srgbClr val="008080"/>
-                </a:solidFill>
-                <a:latin typeface="Consolas" panose="020B0609020204030204" pitchFamily="49" charset="0"/>
-              </a:rPr>
-              <a:t>CorpDB</a:t>
-            </a:r>
-            <a:r>
-              <a:rPr lang="en-US" sz="1400" dirty="0" err="1">
-                <a:solidFill>
-                  <a:srgbClr val="808080"/>
-                </a:solidFill>
-                <a:latin typeface="Consolas" panose="020B0609020204030204" pitchFamily="49" charset="0"/>
-              </a:rPr>
-              <a:t>.</a:t>
-            </a:r>
-            <a:r>
-              <a:rPr lang="en-US" sz="1400" dirty="0" err="1">
-                <a:solidFill>
-                  <a:srgbClr val="008080"/>
-                </a:solidFill>
-                <a:latin typeface="Consolas" panose="020B0609020204030204" pitchFamily="49" charset="0"/>
-              </a:rPr>
-              <a:t>dbo</a:t>
-            </a:r>
-            <a:r>
-              <a:rPr lang="en-US" sz="1400" dirty="0" err="1">
-                <a:solidFill>
-                  <a:srgbClr val="808080"/>
-                </a:solidFill>
-                <a:latin typeface="Consolas" panose="020B0609020204030204" pitchFamily="49" charset="0"/>
-              </a:rPr>
-              <a:t>.</a:t>
-            </a:r>
-            <a:r>
-              <a:rPr lang="en-US" sz="1400" dirty="0" err="1">
-                <a:solidFill>
-                  <a:srgbClr val="008080"/>
-                </a:solidFill>
-                <a:latin typeface="Consolas" panose="020B0609020204030204" pitchFamily="49" charset="0"/>
-              </a:rPr>
-              <a:t>OrderDetail</a:t>
-            </a:r>
-            <a:r>
-              <a:rPr lang="en-US" sz="1400" dirty="0">
-                <a:solidFill>
-                  <a:prstClr val="black"/>
-                </a:solidFill>
-                <a:latin typeface="Consolas" panose="020B0609020204030204" pitchFamily="49" charset="0"/>
-              </a:rPr>
-              <a:t> </a:t>
-            </a:r>
-            <a:r>
-              <a:rPr lang="en-US" sz="1400" dirty="0">
-                <a:solidFill>
-                  <a:srgbClr val="008080"/>
-                </a:solidFill>
-                <a:latin typeface="Consolas" panose="020B0609020204030204" pitchFamily="49" charset="0"/>
-              </a:rPr>
-              <a:t>od</a:t>
-            </a:r>
-            <a:endParaRPr lang="en-US" sz="1400" dirty="0">
-              <a:solidFill>
-                <a:prstClr val="black"/>
-              </a:solidFill>
-              <a:latin typeface="Consolas" panose="020B0609020204030204" pitchFamily="49" charset="0"/>
-            </a:endParaRPr>
-          </a:p>
-          <a:p>
-            <a:r>
-              <a:rPr lang="en-US" sz="1400" dirty="0">
-                <a:solidFill>
-                  <a:srgbClr val="0000FF"/>
-                </a:solidFill>
-                <a:latin typeface="Consolas" panose="020B0609020204030204" pitchFamily="49" charset="0"/>
-              </a:rPr>
-              <a:t>on</a:t>
-            </a:r>
-            <a:r>
-              <a:rPr lang="en-US" sz="1400" dirty="0">
-                <a:solidFill>
-                  <a:prstClr val="black"/>
-                </a:solidFill>
-                <a:latin typeface="Consolas" panose="020B0609020204030204" pitchFamily="49" charset="0"/>
-              </a:rPr>
-              <a:t> </a:t>
-            </a:r>
-            <a:r>
-              <a:rPr lang="en-US" sz="1400" dirty="0" err="1">
-                <a:solidFill>
-                  <a:srgbClr val="008080"/>
-                </a:solidFill>
-                <a:latin typeface="Consolas" panose="020B0609020204030204" pitchFamily="49" charset="0"/>
-              </a:rPr>
-              <a:t>oh</a:t>
-            </a:r>
-            <a:r>
-              <a:rPr lang="en-US" sz="1400" dirty="0" err="1">
-                <a:solidFill>
-                  <a:srgbClr val="808080"/>
-                </a:solidFill>
-                <a:latin typeface="Consolas" panose="020B0609020204030204" pitchFamily="49" charset="0"/>
-              </a:rPr>
-              <a:t>.</a:t>
-            </a:r>
-            <a:r>
-              <a:rPr lang="en-US" sz="1400" dirty="0" err="1">
-                <a:solidFill>
-                  <a:srgbClr val="008080"/>
-                </a:solidFill>
-                <a:latin typeface="Consolas" panose="020B0609020204030204" pitchFamily="49" charset="0"/>
-              </a:rPr>
-              <a:t>OrderId</a:t>
-            </a:r>
-            <a:r>
-              <a:rPr lang="en-US" sz="1400" dirty="0">
-                <a:solidFill>
-                  <a:prstClr val="black"/>
-                </a:solidFill>
-                <a:latin typeface="Consolas" panose="020B0609020204030204" pitchFamily="49" charset="0"/>
-              </a:rPr>
-              <a:t> </a:t>
-            </a:r>
-            <a:r>
-              <a:rPr lang="en-US" sz="1400" dirty="0">
-                <a:solidFill>
-                  <a:srgbClr val="808080"/>
-                </a:solidFill>
-                <a:latin typeface="Consolas" panose="020B0609020204030204" pitchFamily="49" charset="0"/>
-              </a:rPr>
-              <a:t>=</a:t>
-            </a:r>
-            <a:r>
-              <a:rPr lang="en-US" sz="1400" dirty="0">
-                <a:solidFill>
-                  <a:prstClr val="black"/>
-                </a:solidFill>
-                <a:latin typeface="Consolas" panose="020B0609020204030204" pitchFamily="49" charset="0"/>
-              </a:rPr>
-              <a:t> </a:t>
-            </a:r>
-            <a:r>
-              <a:rPr lang="en-US" sz="1400" dirty="0" err="1">
-                <a:solidFill>
-                  <a:srgbClr val="008080"/>
-                </a:solidFill>
-                <a:latin typeface="Consolas" panose="020B0609020204030204" pitchFamily="49" charset="0"/>
-              </a:rPr>
-              <a:t>od</a:t>
-            </a:r>
-            <a:r>
-              <a:rPr lang="en-US" sz="1400" dirty="0" err="1">
-                <a:solidFill>
-                  <a:srgbClr val="808080"/>
-                </a:solidFill>
-                <a:latin typeface="Consolas" panose="020B0609020204030204" pitchFamily="49" charset="0"/>
-              </a:rPr>
-              <a:t>.</a:t>
-            </a:r>
-            <a:r>
-              <a:rPr lang="en-US" sz="1400" dirty="0" err="1">
-                <a:solidFill>
-                  <a:srgbClr val="008080"/>
-                </a:solidFill>
-                <a:latin typeface="Consolas" panose="020B0609020204030204" pitchFamily="49" charset="0"/>
-              </a:rPr>
-              <a:t>OrderId</a:t>
-            </a:r>
-            <a:endParaRPr lang="en-US" sz="1400" dirty="0">
-              <a:solidFill>
-                <a:prstClr val="black"/>
-              </a:solidFill>
-              <a:latin typeface="Consolas" panose="020B0609020204030204" pitchFamily="49" charset="0"/>
-            </a:endParaRPr>
-          </a:p>
-          <a:p>
-            <a:r>
-              <a:rPr lang="en-US" sz="1400" dirty="0">
-                <a:solidFill>
-                  <a:srgbClr val="808080"/>
-                </a:solidFill>
-                <a:latin typeface="Consolas" panose="020B0609020204030204" pitchFamily="49" charset="0"/>
-              </a:rPr>
-              <a:t>inner</a:t>
-            </a:r>
-            <a:r>
-              <a:rPr lang="en-US" sz="1400" dirty="0">
-                <a:solidFill>
-                  <a:prstClr val="black"/>
-                </a:solidFill>
-                <a:latin typeface="Consolas" panose="020B0609020204030204" pitchFamily="49" charset="0"/>
-              </a:rPr>
-              <a:t> </a:t>
-            </a:r>
-            <a:r>
-              <a:rPr lang="en-US" sz="1400" dirty="0">
-                <a:solidFill>
-                  <a:srgbClr val="808080"/>
-                </a:solidFill>
-                <a:latin typeface="Consolas" panose="020B0609020204030204" pitchFamily="49" charset="0"/>
-              </a:rPr>
-              <a:t>join</a:t>
-            </a:r>
-            <a:r>
-              <a:rPr lang="en-US" sz="1400" dirty="0">
-                <a:solidFill>
-                  <a:prstClr val="black"/>
-                </a:solidFill>
-                <a:latin typeface="Consolas" panose="020B0609020204030204" pitchFamily="49" charset="0"/>
-              </a:rPr>
-              <a:t> </a:t>
-            </a:r>
-            <a:r>
-              <a:rPr lang="en-US" sz="1400" dirty="0" err="1">
-                <a:solidFill>
-                  <a:srgbClr val="008080"/>
-                </a:solidFill>
-                <a:latin typeface="Consolas" panose="020B0609020204030204" pitchFamily="49" charset="0"/>
-              </a:rPr>
-              <a:t>CorpDB</a:t>
-            </a:r>
-            <a:r>
-              <a:rPr lang="en-US" sz="1400" dirty="0" err="1">
-                <a:solidFill>
-                  <a:srgbClr val="808080"/>
-                </a:solidFill>
-                <a:latin typeface="Consolas" panose="020B0609020204030204" pitchFamily="49" charset="0"/>
-              </a:rPr>
-              <a:t>.</a:t>
-            </a:r>
-            <a:r>
-              <a:rPr lang="en-US" sz="1400" dirty="0" err="1">
-                <a:solidFill>
-                  <a:srgbClr val="008080"/>
-                </a:solidFill>
-                <a:latin typeface="Consolas" panose="020B0609020204030204" pitchFamily="49" charset="0"/>
-              </a:rPr>
-              <a:t>dbo</a:t>
-            </a:r>
-            <a:r>
-              <a:rPr lang="en-US" sz="1400" dirty="0" err="1">
-                <a:solidFill>
-                  <a:srgbClr val="808080"/>
-                </a:solidFill>
-                <a:latin typeface="Consolas" panose="020B0609020204030204" pitchFamily="49" charset="0"/>
-              </a:rPr>
-              <a:t>.</a:t>
-            </a:r>
-            <a:r>
-              <a:rPr lang="en-US" sz="1400" dirty="0" err="1">
-                <a:solidFill>
-                  <a:srgbClr val="008080"/>
-                </a:solidFill>
-                <a:latin typeface="Consolas" panose="020B0609020204030204" pitchFamily="49" charset="0"/>
-              </a:rPr>
-              <a:t>Customer</a:t>
-            </a:r>
-            <a:r>
-              <a:rPr lang="en-US" sz="1400" dirty="0">
-                <a:solidFill>
-                  <a:prstClr val="black"/>
-                </a:solidFill>
-                <a:latin typeface="Consolas" panose="020B0609020204030204" pitchFamily="49" charset="0"/>
-              </a:rPr>
-              <a:t> </a:t>
-            </a:r>
-            <a:r>
-              <a:rPr lang="en-US" sz="1400" dirty="0" err="1">
-                <a:solidFill>
-                  <a:srgbClr val="008080"/>
-                </a:solidFill>
-                <a:latin typeface="Consolas" panose="020B0609020204030204" pitchFamily="49" charset="0"/>
-              </a:rPr>
-              <a:t>cust</a:t>
-            </a:r>
-            <a:endParaRPr lang="en-US" sz="1400" dirty="0">
-              <a:solidFill>
-                <a:prstClr val="black"/>
-              </a:solidFill>
-              <a:latin typeface="Consolas" panose="020B0609020204030204" pitchFamily="49" charset="0"/>
-            </a:endParaRPr>
-          </a:p>
-          <a:p>
-            <a:r>
-              <a:rPr lang="en-US" sz="1400" dirty="0">
-                <a:solidFill>
-                  <a:srgbClr val="0000FF"/>
-                </a:solidFill>
-                <a:latin typeface="Consolas" panose="020B0609020204030204" pitchFamily="49" charset="0"/>
-              </a:rPr>
-              <a:t>on</a:t>
-            </a:r>
-            <a:r>
-              <a:rPr lang="en-US" sz="1400" dirty="0">
-                <a:solidFill>
-                  <a:prstClr val="black"/>
-                </a:solidFill>
-                <a:latin typeface="Consolas" panose="020B0609020204030204" pitchFamily="49" charset="0"/>
-              </a:rPr>
-              <a:t> </a:t>
-            </a:r>
-            <a:r>
-              <a:rPr lang="en-US" sz="1400" dirty="0" err="1">
-                <a:solidFill>
-                  <a:srgbClr val="008080"/>
-                </a:solidFill>
-                <a:latin typeface="Consolas" panose="020B0609020204030204" pitchFamily="49" charset="0"/>
-              </a:rPr>
-              <a:t>oh</a:t>
-            </a:r>
-            <a:r>
-              <a:rPr lang="en-US" sz="1400" dirty="0" err="1">
-                <a:solidFill>
-                  <a:srgbClr val="808080"/>
-                </a:solidFill>
-                <a:latin typeface="Consolas" panose="020B0609020204030204" pitchFamily="49" charset="0"/>
-              </a:rPr>
-              <a:t>.</a:t>
-            </a:r>
-            <a:r>
-              <a:rPr lang="en-US" sz="1400" dirty="0" err="1">
-                <a:solidFill>
-                  <a:srgbClr val="008080"/>
-                </a:solidFill>
-                <a:latin typeface="Consolas" panose="020B0609020204030204" pitchFamily="49" charset="0"/>
-              </a:rPr>
-              <a:t>CustomerId</a:t>
-            </a:r>
-            <a:r>
-              <a:rPr lang="en-US" sz="1400" dirty="0">
-                <a:solidFill>
-                  <a:prstClr val="black"/>
-                </a:solidFill>
-                <a:latin typeface="Consolas" panose="020B0609020204030204" pitchFamily="49" charset="0"/>
-              </a:rPr>
-              <a:t> </a:t>
-            </a:r>
-            <a:r>
-              <a:rPr lang="en-US" sz="1400" dirty="0">
-                <a:solidFill>
-                  <a:srgbClr val="808080"/>
-                </a:solidFill>
-                <a:latin typeface="Consolas" panose="020B0609020204030204" pitchFamily="49" charset="0"/>
-              </a:rPr>
-              <a:t>=</a:t>
-            </a:r>
-            <a:r>
-              <a:rPr lang="en-US" sz="1400" dirty="0">
-                <a:solidFill>
-                  <a:prstClr val="black"/>
-                </a:solidFill>
-                <a:latin typeface="Consolas" panose="020B0609020204030204" pitchFamily="49" charset="0"/>
-              </a:rPr>
-              <a:t> </a:t>
-            </a:r>
-            <a:r>
-              <a:rPr lang="en-US" sz="1400" dirty="0" err="1">
-                <a:solidFill>
-                  <a:srgbClr val="008080"/>
-                </a:solidFill>
-                <a:latin typeface="Consolas" panose="020B0609020204030204" pitchFamily="49" charset="0"/>
-              </a:rPr>
-              <a:t>cust</a:t>
-            </a:r>
-            <a:r>
-              <a:rPr lang="en-US" sz="1400" dirty="0" err="1">
-                <a:solidFill>
-                  <a:srgbClr val="808080"/>
-                </a:solidFill>
-                <a:latin typeface="Consolas" panose="020B0609020204030204" pitchFamily="49" charset="0"/>
-              </a:rPr>
-              <a:t>.</a:t>
-            </a:r>
-            <a:r>
-              <a:rPr lang="en-US" sz="1400" dirty="0" err="1">
-                <a:solidFill>
-                  <a:srgbClr val="008080"/>
-                </a:solidFill>
-                <a:latin typeface="Consolas" panose="020B0609020204030204" pitchFamily="49" charset="0"/>
-              </a:rPr>
-              <a:t>CustomerID</a:t>
-            </a:r>
-            <a:endParaRPr lang="en-US" sz="1400" dirty="0">
-              <a:solidFill>
-                <a:prstClr val="black"/>
-              </a:solidFill>
-              <a:latin typeface="Consolas" panose="020B0609020204030204" pitchFamily="49" charset="0"/>
-            </a:endParaRPr>
-          </a:p>
-          <a:p>
-            <a:r>
-              <a:rPr lang="en-US" sz="1400" dirty="0">
-                <a:solidFill>
-                  <a:srgbClr val="0000FF"/>
-                </a:solidFill>
-                <a:latin typeface="Consolas" panose="020B0609020204030204" pitchFamily="49" charset="0"/>
-              </a:rPr>
-              <a:t>where</a:t>
-            </a:r>
-            <a:r>
-              <a:rPr lang="en-US" sz="1400" dirty="0">
-                <a:solidFill>
-                  <a:prstClr val="black"/>
-                </a:solidFill>
-                <a:latin typeface="Consolas" panose="020B0609020204030204" pitchFamily="49" charset="0"/>
-              </a:rPr>
-              <a:t> </a:t>
-            </a:r>
-            <a:r>
-              <a:rPr lang="en-US" sz="1400" dirty="0" err="1">
-                <a:solidFill>
-                  <a:srgbClr val="008080"/>
-                </a:solidFill>
-                <a:latin typeface="Consolas" panose="020B0609020204030204" pitchFamily="49" charset="0"/>
-              </a:rPr>
-              <a:t>cust</a:t>
-            </a:r>
-            <a:r>
-              <a:rPr lang="en-US" sz="1400" dirty="0" err="1">
-                <a:solidFill>
-                  <a:srgbClr val="808080"/>
-                </a:solidFill>
-                <a:latin typeface="Consolas" panose="020B0609020204030204" pitchFamily="49" charset="0"/>
-              </a:rPr>
-              <a:t>.</a:t>
-            </a:r>
-            <a:r>
-              <a:rPr lang="en-US" sz="1400" dirty="0" err="1">
-                <a:solidFill>
-                  <a:srgbClr val="0000FF"/>
-                </a:solidFill>
-                <a:latin typeface="Consolas" panose="020B0609020204030204" pitchFamily="49" charset="0"/>
-              </a:rPr>
-              <a:t>State</a:t>
-            </a:r>
-            <a:r>
-              <a:rPr lang="en-US" sz="1400" dirty="0">
-                <a:solidFill>
-                  <a:prstClr val="black"/>
-                </a:solidFill>
-                <a:latin typeface="Consolas" panose="020B0609020204030204" pitchFamily="49" charset="0"/>
-              </a:rPr>
-              <a:t> </a:t>
-            </a:r>
-            <a:r>
-              <a:rPr lang="en-US" sz="1400" dirty="0">
-                <a:solidFill>
-                  <a:srgbClr val="808080"/>
-                </a:solidFill>
-                <a:latin typeface="Consolas" panose="020B0609020204030204" pitchFamily="49" charset="0"/>
-              </a:rPr>
-              <a:t>=</a:t>
-            </a:r>
-            <a:r>
-              <a:rPr lang="en-US" sz="1400" dirty="0">
-                <a:solidFill>
-                  <a:prstClr val="black"/>
-                </a:solidFill>
-                <a:latin typeface="Consolas" panose="020B0609020204030204" pitchFamily="49" charset="0"/>
-              </a:rPr>
-              <a:t> </a:t>
-            </a:r>
-            <a:r>
-              <a:rPr lang="en-US" sz="1400" dirty="0">
-                <a:solidFill>
-                  <a:srgbClr val="FF0000"/>
-                </a:solidFill>
-                <a:latin typeface="Consolas" panose="020B0609020204030204" pitchFamily="49" charset="0"/>
-              </a:rPr>
-              <a:t>'IA'</a:t>
-            </a:r>
-            <a:endParaRPr lang="en-US" sz="1400" dirty="0">
-              <a:solidFill>
-                <a:prstClr val="black"/>
-              </a:solidFill>
-              <a:latin typeface="Consolas" panose="020B0609020204030204" pitchFamily="49" charset="0"/>
-            </a:endParaRPr>
-          </a:p>
-          <a:p>
-            <a:r>
-              <a:rPr lang="en-US" sz="1400" dirty="0">
-                <a:solidFill>
-                  <a:srgbClr val="0000FF"/>
-                </a:solidFill>
-                <a:latin typeface="Consolas" panose="020B0609020204030204" pitchFamily="49" charset="0"/>
-              </a:rPr>
-              <a:t>group</a:t>
-            </a:r>
-            <a:r>
-              <a:rPr lang="en-US" sz="1400" dirty="0">
-                <a:solidFill>
-                  <a:prstClr val="black"/>
-                </a:solidFill>
-                <a:latin typeface="Consolas" panose="020B0609020204030204" pitchFamily="49" charset="0"/>
-              </a:rPr>
-              <a:t> </a:t>
-            </a:r>
-            <a:r>
-              <a:rPr lang="en-US" sz="1400" dirty="0">
-                <a:solidFill>
-                  <a:srgbClr val="0000FF"/>
-                </a:solidFill>
-                <a:latin typeface="Consolas" panose="020B0609020204030204" pitchFamily="49" charset="0"/>
-              </a:rPr>
-              <a:t>by</a:t>
-            </a:r>
-            <a:r>
-              <a:rPr lang="en-US" sz="1400" dirty="0">
-                <a:solidFill>
-                  <a:prstClr val="black"/>
-                </a:solidFill>
-                <a:latin typeface="Consolas" panose="020B0609020204030204" pitchFamily="49" charset="0"/>
-              </a:rPr>
-              <a:t> </a:t>
-            </a:r>
-            <a:r>
-              <a:rPr lang="en-US" sz="1400" dirty="0" err="1">
-                <a:solidFill>
-                  <a:srgbClr val="008080"/>
-                </a:solidFill>
-                <a:latin typeface="Consolas" panose="020B0609020204030204" pitchFamily="49" charset="0"/>
-              </a:rPr>
-              <a:t>od</a:t>
-            </a:r>
-            <a:r>
-              <a:rPr lang="en-US" sz="1400" dirty="0" err="1">
-                <a:solidFill>
-                  <a:srgbClr val="808080"/>
-                </a:solidFill>
-                <a:latin typeface="Consolas" panose="020B0609020204030204" pitchFamily="49" charset="0"/>
-              </a:rPr>
-              <a:t>.</a:t>
-            </a:r>
-            <a:r>
-              <a:rPr lang="en-US" sz="1400" dirty="0" err="1">
-                <a:solidFill>
-                  <a:srgbClr val="008080"/>
-                </a:solidFill>
-                <a:latin typeface="Consolas" panose="020B0609020204030204" pitchFamily="49" charset="0"/>
-              </a:rPr>
-              <a:t>ProductId</a:t>
-            </a:r>
-            <a:endParaRPr lang="en-US" sz="1400" dirty="0">
-              <a:solidFill>
-                <a:prstClr val="black"/>
-              </a:solidFill>
-              <a:latin typeface="Consolas" panose="020B0609020204030204" pitchFamily="49" charset="0"/>
-            </a:endParaRPr>
-          </a:p>
-          <a:p>
-            <a:r>
-              <a:rPr lang="en-US" sz="1400" dirty="0">
-                <a:solidFill>
-                  <a:srgbClr val="0000FF"/>
-                </a:solidFill>
-                <a:latin typeface="Consolas" panose="020B0609020204030204" pitchFamily="49" charset="0"/>
-              </a:rPr>
-              <a:t>having</a:t>
-            </a:r>
-            <a:r>
-              <a:rPr lang="en-US" sz="1400" dirty="0">
-                <a:solidFill>
-                  <a:prstClr val="black"/>
-                </a:solidFill>
-                <a:latin typeface="Consolas" panose="020B0609020204030204" pitchFamily="49" charset="0"/>
-              </a:rPr>
-              <a:t> </a:t>
-            </a:r>
-            <a:r>
-              <a:rPr lang="en-US" sz="1400" dirty="0">
-                <a:solidFill>
-                  <a:srgbClr val="FF00FF"/>
-                </a:solidFill>
-                <a:latin typeface="Consolas" panose="020B0609020204030204" pitchFamily="49" charset="0"/>
-              </a:rPr>
-              <a:t>sum</a:t>
-            </a:r>
-            <a:r>
-              <a:rPr lang="en-US" sz="1400" dirty="0">
-                <a:solidFill>
-                  <a:srgbClr val="808080"/>
-                </a:solidFill>
-                <a:latin typeface="Consolas" panose="020B0609020204030204" pitchFamily="49" charset="0"/>
-              </a:rPr>
-              <a:t>(</a:t>
-            </a:r>
-            <a:r>
-              <a:rPr lang="en-US" sz="1400" dirty="0" err="1">
-                <a:solidFill>
-                  <a:srgbClr val="008080"/>
-                </a:solidFill>
-                <a:latin typeface="Consolas" panose="020B0609020204030204" pitchFamily="49" charset="0"/>
-              </a:rPr>
-              <a:t>od</a:t>
-            </a:r>
-            <a:r>
-              <a:rPr lang="en-US" sz="1400" dirty="0" err="1">
-                <a:solidFill>
-                  <a:srgbClr val="808080"/>
-                </a:solidFill>
-                <a:latin typeface="Consolas" panose="020B0609020204030204" pitchFamily="49" charset="0"/>
-              </a:rPr>
-              <a:t>.</a:t>
-            </a:r>
-            <a:r>
-              <a:rPr lang="en-US" sz="1400" dirty="0" err="1">
-                <a:solidFill>
-                  <a:srgbClr val="008080"/>
-                </a:solidFill>
-                <a:latin typeface="Consolas" panose="020B0609020204030204" pitchFamily="49" charset="0"/>
-              </a:rPr>
-              <a:t>Quantity</a:t>
-            </a:r>
-            <a:r>
-              <a:rPr lang="en-US" sz="1400" dirty="0">
-                <a:solidFill>
-                  <a:srgbClr val="808080"/>
-                </a:solidFill>
-                <a:latin typeface="Consolas" panose="020B0609020204030204" pitchFamily="49" charset="0"/>
-              </a:rPr>
-              <a:t>)</a:t>
-            </a:r>
-            <a:r>
-              <a:rPr lang="en-US" sz="1400" dirty="0">
-                <a:solidFill>
-                  <a:prstClr val="black"/>
-                </a:solidFill>
-                <a:latin typeface="Consolas" panose="020B0609020204030204" pitchFamily="49" charset="0"/>
-              </a:rPr>
-              <a:t> </a:t>
-            </a:r>
-            <a:r>
-              <a:rPr lang="en-US" sz="1400" dirty="0">
-                <a:solidFill>
-                  <a:srgbClr val="808080"/>
-                </a:solidFill>
-                <a:latin typeface="Consolas" panose="020B0609020204030204" pitchFamily="49" charset="0"/>
-              </a:rPr>
-              <a:t>&gt;=</a:t>
-            </a:r>
-            <a:r>
-              <a:rPr lang="en-US" sz="1400" dirty="0">
-                <a:solidFill>
-                  <a:prstClr val="black"/>
-                </a:solidFill>
-                <a:latin typeface="Consolas" panose="020B0609020204030204" pitchFamily="49" charset="0"/>
-              </a:rPr>
-              <a:t> 20</a:t>
-            </a:r>
-          </a:p>
-          <a:p>
-            <a:r>
-              <a:rPr lang="en-US" sz="1400" dirty="0">
-                <a:solidFill>
-                  <a:srgbClr val="0000FF"/>
-                </a:solidFill>
-                <a:latin typeface="Consolas" panose="020B0609020204030204" pitchFamily="49" charset="0"/>
-              </a:rPr>
-              <a:t>order</a:t>
-            </a:r>
-            <a:r>
-              <a:rPr lang="en-US" sz="1400" dirty="0">
-                <a:solidFill>
-                  <a:prstClr val="black"/>
-                </a:solidFill>
-                <a:latin typeface="Consolas" panose="020B0609020204030204" pitchFamily="49" charset="0"/>
-              </a:rPr>
-              <a:t> </a:t>
-            </a:r>
-            <a:r>
-              <a:rPr lang="en-US" sz="1400" dirty="0">
-                <a:solidFill>
-                  <a:srgbClr val="0000FF"/>
-                </a:solidFill>
-                <a:latin typeface="Consolas" panose="020B0609020204030204" pitchFamily="49" charset="0"/>
-              </a:rPr>
-              <a:t>by</a:t>
-            </a:r>
-            <a:r>
-              <a:rPr lang="en-US" sz="1400" dirty="0">
-                <a:solidFill>
-                  <a:prstClr val="black"/>
-                </a:solidFill>
-                <a:latin typeface="Consolas" panose="020B0609020204030204" pitchFamily="49" charset="0"/>
-              </a:rPr>
-              <a:t> </a:t>
-            </a:r>
-            <a:r>
-              <a:rPr lang="en-US" sz="1400" dirty="0" err="1">
-                <a:solidFill>
-                  <a:srgbClr val="008080"/>
-                </a:solidFill>
-                <a:latin typeface="Consolas" panose="020B0609020204030204" pitchFamily="49" charset="0"/>
-              </a:rPr>
-              <a:t>od</a:t>
-            </a:r>
-            <a:r>
-              <a:rPr lang="en-US" sz="1400" dirty="0" err="1">
-                <a:solidFill>
-                  <a:srgbClr val="808080"/>
-                </a:solidFill>
-                <a:latin typeface="Consolas" panose="020B0609020204030204" pitchFamily="49" charset="0"/>
-              </a:rPr>
-              <a:t>.</a:t>
-            </a:r>
-            <a:r>
-              <a:rPr lang="en-US" sz="1400" dirty="0" err="1">
-                <a:solidFill>
-                  <a:srgbClr val="008080"/>
-                </a:solidFill>
-                <a:latin typeface="Consolas" panose="020B0609020204030204" pitchFamily="49" charset="0"/>
-              </a:rPr>
-              <a:t>ProductId</a:t>
-            </a:r>
-            <a:r>
-              <a:rPr lang="en-US" sz="1400" dirty="0">
-                <a:solidFill>
-                  <a:srgbClr val="808080"/>
-                </a:solidFill>
-                <a:latin typeface="Consolas" panose="020B0609020204030204" pitchFamily="49" charset="0"/>
-              </a:rPr>
-              <a:t>;</a:t>
-            </a:r>
-            <a:endParaRPr lang="en-US" sz="1400" dirty="0">
-              <a:solidFill>
-                <a:prstClr val="black"/>
-              </a:solidFill>
-              <a:latin typeface="Consolas" panose="020B0609020204030204" pitchFamily="49" charset="0"/>
-            </a:endParaRPr>
+              <a:rPr lang="en-US" dirty="0"/>
+              <a:t>Internal representation of query operation</a:t>
+            </a:r>
+          </a:p>
+          <a:p>
+            <a:r>
+              <a:rPr lang="en-US" dirty="0"/>
+              <a:t>Nodes may be logical or physical operators</a:t>
+            </a:r>
+          </a:p>
+          <a:p>
+            <a:pPr lvl="1"/>
+            <a:r>
+              <a:rPr lang="en-US" dirty="0"/>
+              <a:t>0 to infinity inputs, 1 output</a:t>
+            </a:r>
+          </a:p>
+          <a:p>
+            <a:r>
+              <a:rPr lang="en-US" dirty="0"/>
+              <a:t>SQL Server will output parse trees at various phases of optimization</a:t>
+            </a:r>
+          </a:p>
+          <a:p>
+            <a:pPr lvl="1"/>
+            <a:r>
+              <a:rPr lang="en-US" dirty="0"/>
+              <a:t>A variety of trace flags will trigger output</a:t>
+            </a:r>
           </a:p>
         </p:txBody>
       </p:sp>
-      <p:sp>
-        <p:nvSpPr>
-          <p:cNvPr id="6" name="Oval 5"/>
-          <p:cNvSpPr/>
-          <p:nvPr/>
-        </p:nvSpPr>
-        <p:spPr>
-          <a:xfrm>
-            <a:off x="8378792" y="542942"/>
-            <a:ext cx="616016" cy="606391"/>
-          </a:xfrm>
-          <a:prstGeom prst="ellipse">
-            <a:avLst/>
-          </a:prstGeom>
-        </p:spPr>
-        <p:style>
-          <a:lnRef idx="1">
-            <a:schemeClr val="accent1"/>
-          </a:lnRef>
-          <a:fillRef idx="3">
-            <a:schemeClr val="accent1"/>
-          </a:fillRef>
-          <a:effectRef idx="2">
-            <a:schemeClr val="accent1"/>
-          </a:effectRef>
-          <a:fontRef idx="minor">
-            <a:schemeClr val="lt1"/>
-          </a:fontRef>
-        </p:style>
-        <p:txBody>
-          <a:bodyPr rtlCol="0" anchor="ctr"/>
-          <a:lstStyle/>
-          <a:p>
-            <a:pPr algn="ctr"/>
-            <a:r>
-              <a:rPr lang="en-US" sz="1600" dirty="0"/>
-              <a:t>11</a:t>
-            </a:r>
-          </a:p>
-        </p:txBody>
-      </p:sp>
-      <p:pic>
-        <p:nvPicPr>
-          <p:cNvPr id="4" name="Picture 3"/>
-          <p:cNvPicPr>
-            <a:picLocks noChangeAspect="1"/>
-          </p:cNvPicPr>
-          <p:nvPr/>
-        </p:nvPicPr>
-        <p:blipFill>
-          <a:blip r:embed="rId3"/>
-          <a:stretch>
-            <a:fillRect/>
-          </a:stretch>
-        </p:blipFill>
-        <p:spPr>
-          <a:xfrm>
-            <a:off x="2895606" y="1417638"/>
-            <a:ext cx="5718472" cy="4597303"/>
-          </a:xfrm>
-          <a:prstGeom prst="rect">
-            <a:avLst/>
-          </a:prstGeom>
-        </p:spPr>
-      </p:pic>
     </p:spTree>
     <p:extLst>
       <p:ext uri="{BB962C8B-B14F-4D97-AF65-F5344CB8AC3E}">
-        <p14:creationId xmlns:p14="http://schemas.microsoft.com/office/powerpoint/2010/main" val="2851444044"/>
+        <p14:creationId xmlns:p14="http://schemas.microsoft.com/office/powerpoint/2010/main" val="1114966382"/>
       </p:ext>
     </p:extLst>
   </p:cSld>
@@ -27699,6 +26628,1193 @@
           <a:p>
             <a:r>
               <a:rPr lang="en-US" dirty="0"/>
+              <a:t>Example Parse Tree</a:t>
+            </a:r>
+          </a:p>
+        </p:txBody>
+      </p:sp>
+      <p:sp>
+        <p:nvSpPr>
+          <p:cNvPr id="5" name="TextBox 4"/>
+          <p:cNvSpPr txBox="1"/>
+          <p:nvPr/>
+        </p:nvSpPr>
+        <p:spPr>
+          <a:xfrm>
+            <a:off x="558265" y="1713297"/>
+            <a:ext cx="4025461" cy="2677656"/>
+          </a:xfrm>
+          <a:prstGeom prst="rect">
+            <a:avLst/>
+          </a:prstGeom>
+          <a:noFill/>
+        </p:spPr>
+        <p:txBody>
+          <a:bodyPr wrap="none" rtlCol="0">
+            <a:spAutoFit/>
+          </a:bodyPr>
+          <a:lstStyle/>
+          <a:p>
+            <a:r>
+              <a:rPr lang="en-US" sz="1400" dirty="0">
+                <a:solidFill>
+                  <a:srgbClr val="0000FF"/>
+                </a:solidFill>
+                <a:latin typeface="Consolas" panose="020B0609020204030204" pitchFamily="49" charset="0"/>
+              </a:rPr>
+              <a:t>select</a:t>
+            </a:r>
+            <a:r>
+              <a:rPr lang="en-US" sz="1400" dirty="0">
+                <a:solidFill>
+                  <a:prstClr val="black"/>
+                </a:solidFill>
+                <a:latin typeface="Consolas" panose="020B0609020204030204" pitchFamily="49" charset="0"/>
+              </a:rPr>
+              <a:t> </a:t>
+            </a:r>
+            <a:r>
+              <a:rPr lang="en-US" sz="1400" dirty="0">
+                <a:solidFill>
+                  <a:srgbClr val="0000FF"/>
+                </a:solidFill>
+                <a:latin typeface="Consolas" panose="020B0609020204030204" pitchFamily="49" charset="0"/>
+              </a:rPr>
+              <a:t>top</a:t>
+            </a:r>
+            <a:r>
+              <a:rPr lang="en-US" sz="1400" dirty="0">
+                <a:solidFill>
+                  <a:prstClr val="black"/>
+                </a:solidFill>
+                <a:latin typeface="Consolas" panose="020B0609020204030204" pitchFamily="49" charset="0"/>
+              </a:rPr>
+              <a:t> 10</a:t>
+            </a:r>
+          </a:p>
+          <a:p>
+            <a:r>
+              <a:rPr lang="en-US" sz="1400" dirty="0">
+                <a:solidFill>
+                  <a:srgbClr val="008080"/>
+                </a:solidFill>
+                <a:latin typeface="Consolas" panose="020B0609020204030204" pitchFamily="49" charset="0"/>
+              </a:rPr>
+              <a:t>	</a:t>
+            </a:r>
+            <a:r>
+              <a:rPr lang="en-US" sz="1400" dirty="0" err="1">
+                <a:solidFill>
+                  <a:srgbClr val="008080"/>
+                </a:solidFill>
+                <a:latin typeface="Consolas" panose="020B0609020204030204" pitchFamily="49" charset="0"/>
+              </a:rPr>
+              <a:t>od</a:t>
+            </a:r>
+            <a:r>
+              <a:rPr lang="en-US" sz="1400" dirty="0" err="1">
+                <a:solidFill>
+                  <a:srgbClr val="808080"/>
+                </a:solidFill>
+                <a:latin typeface="Consolas" panose="020B0609020204030204" pitchFamily="49" charset="0"/>
+              </a:rPr>
+              <a:t>.</a:t>
+            </a:r>
+            <a:r>
+              <a:rPr lang="en-US" sz="1400" dirty="0" err="1">
+                <a:solidFill>
+                  <a:srgbClr val="008080"/>
+                </a:solidFill>
+                <a:latin typeface="Consolas" panose="020B0609020204030204" pitchFamily="49" charset="0"/>
+              </a:rPr>
+              <a:t>ProductId</a:t>
+            </a:r>
+            <a:r>
+              <a:rPr lang="en-US" sz="1400" dirty="0">
+                <a:solidFill>
+                  <a:srgbClr val="808080"/>
+                </a:solidFill>
+                <a:latin typeface="Consolas" panose="020B0609020204030204" pitchFamily="49" charset="0"/>
+              </a:rPr>
+              <a:t>,</a:t>
+            </a:r>
+            <a:endParaRPr lang="en-US" sz="1400" dirty="0">
+              <a:solidFill>
+                <a:prstClr val="black"/>
+              </a:solidFill>
+              <a:latin typeface="Consolas" panose="020B0609020204030204" pitchFamily="49" charset="0"/>
+            </a:endParaRPr>
+          </a:p>
+          <a:p>
+            <a:r>
+              <a:rPr lang="en-US" sz="1400" dirty="0">
+                <a:solidFill>
+                  <a:srgbClr val="FF00FF"/>
+                </a:solidFill>
+                <a:latin typeface="Consolas" panose="020B0609020204030204" pitchFamily="49" charset="0"/>
+              </a:rPr>
+              <a:t>	sum</a:t>
+            </a:r>
+            <a:r>
+              <a:rPr lang="en-US" sz="1400" dirty="0">
+                <a:solidFill>
+                  <a:srgbClr val="808080"/>
+                </a:solidFill>
+                <a:latin typeface="Consolas" panose="020B0609020204030204" pitchFamily="49" charset="0"/>
+              </a:rPr>
+              <a:t>(</a:t>
+            </a:r>
+            <a:r>
+              <a:rPr lang="en-US" sz="1400" dirty="0" err="1">
+                <a:solidFill>
+                  <a:srgbClr val="008080"/>
+                </a:solidFill>
+                <a:latin typeface="Consolas" panose="020B0609020204030204" pitchFamily="49" charset="0"/>
+              </a:rPr>
+              <a:t>od</a:t>
+            </a:r>
+            <a:r>
+              <a:rPr lang="en-US" sz="1400" dirty="0" err="1">
+                <a:solidFill>
+                  <a:srgbClr val="808080"/>
+                </a:solidFill>
+                <a:latin typeface="Consolas" panose="020B0609020204030204" pitchFamily="49" charset="0"/>
+              </a:rPr>
+              <a:t>.</a:t>
+            </a:r>
+            <a:r>
+              <a:rPr lang="en-US" sz="1400" dirty="0" err="1">
+                <a:solidFill>
+                  <a:srgbClr val="008080"/>
+                </a:solidFill>
+                <a:latin typeface="Consolas" panose="020B0609020204030204" pitchFamily="49" charset="0"/>
+              </a:rPr>
+              <a:t>Quantity</a:t>
+            </a:r>
+            <a:r>
+              <a:rPr lang="en-US" sz="1400" dirty="0">
+                <a:solidFill>
+                  <a:srgbClr val="808080"/>
+                </a:solidFill>
+                <a:latin typeface="Consolas" panose="020B0609020204030204" pitchFamily="49" charset="0"/>
+              </a:rPr>
+              <a:t>)</a:t>
+            </a:r>
+            <a:r>
+              <a:rPr lang="en-US" sz="1400" dirty="0">
+                <a:solidFill>
+                  <a:prstClr val="black"/>
+                </a:solidFill>
+                <a:latin typeface="Consolas" panose="020B0609020204030204" pitchFamily="49" charset="0"/>
+              </a:rPr>
+              <a:t> </a:t>
+            </a:r>
+            <a:r>
+              <a:rPr lang="en-US" sz="1400" dirty="0">
+                <a:solidFill>
+                  <a:srgbClr val="808080"/>
+                </a:solidFill>
+                <a:latin typeface="Consolas" panose="020B0609020204030204" pitchFamily="49" charset="0"/>
+              </a:rPr>
+              <a:t>-</a:t>
+            </a:r>
+            <a:r>
+              <a:rPr lang="en-US" sz="1400" dirty="0">
+                <a:solidFill>
+                  <a:prstClr val="black"/>
+                </a:solidFill>
+                <a:latin typeface="Consolas" panose="020B0609020204030204" pitchFamily="49" charset="0"/>
+              </a:rPr>
+              <a:t> 20 </a:t>
+            </a:r>
+            <a:r>
+              <a:rPr lang="en-US" sz="1400" dirty="0" err="1">
+                <a:solidFill>
+                  <a:srgbClr val="008080"/>
+                </a:solidFill>
+                <a:latin typeface="Consolas" panose="020B0609020204030204" pitchFamily="49" charset="0"/>
+              </a:rPr>
+              <a:t>ExcessOrders</a:t>
+            </a:r>
+            <a:endParaRPr lang="en-US" sz="1400" dirty="0">
+              <a:solidFill>
+                <a:prstClr val="black"/>
+              </a:solidFill>
+              <a:latin typeface="Consolas" panose="020B0609020204030204" pitchFamily="49" charset="0"/>
+            </a:endParaRPr>
+          </a:p>
+          <a:p>
+            <a:r>
+              <a:rPr lang="en-US" sz="1400" dirty="0">
+                <a:solidFill>
+                  <a:srgbClr val="0000FF"/>
+                </a:solidFill>
+                <a:latin typeface="Consolas" panose="020B0609020204030204" pitchFamily="49" charset="0"/>
+              </a:rPr>
+              <a:t>from</a:t>
+            </a:r>
+            <a:r>
+              <a:rPr lang="en-US" sz="1400" dirty="0">
+                <a:solidFill>
+                  <a:prstClr val="black"/>
+                </a:solidFill>
+                <a:latin typeface="Consolas" panose="020B0609020204030204" pitchFamily="49" charset="0"/>
+              </a:rPr>
+              <a:t> </a:t>
+            </a:r>
+            <a:r>
+              <a:rPr lang="en-US" sz="1400" dirty="0" err="1">
+                <a:solidFill>
+                  <a:srgbClr val="008080"/>
+                </a:solidFill>
+                <a:latin typeface="Consolas" panose="020B0609020204030204" pitchFamily="49" charset="0"/>
+              </a:rPr>
+              <a:t>CorpDB</a:t>
+            </a:r>
+            <a:r>
+              <a:rPr lang="en-US" sz="1400" dirty="0" err="1">
+                <a:solidFill>
+                  <a:srgbClr val="808080"/>
+                </a:solidFill>
+                <a:latin typeface="Consolas" panose="020B0609020204030204" pitchFamily="49" charset="0"/>
+              </a:rPr>
+              <a:t>.</a:t>
+            </a:r>
+            <a:r>
+              <a:rPr lang="en-US" sz="1400" dirty="0" err="1">
+                <a:solidFill>
+                  <a:srgbClr val="008080"/>
+                </a:solidFill>
+                <a:latin typeface="Consolas" panose="020B0609020204030204" pitchFamily="49" charset="0"/>
+              </a:rPr>
+              <a:t>dbo</a:t>
+            </a:r>
+            <a:r>
+              <a:rPr lang="en-US" sz="1400" dirty="0" err="1">
+                <a:solidFill>
+                  <a:srgbClr val="808080"/>
+                </a:solidFill>
+                <a:latin typeface="Consolas" panose="020B0609020204030204" pitchFamily="49" charset="0"/>
+              </a:rPr>
+              <a:t>.</a:t>
+            </a:r>
+            <a:r>
+              <a:rPr lang="en-US" sz="1400" dirty="0" err="1">
+                <a:solidFill>
+                  <a:srgbClr val="008080"/>
+                </a:solidFill>
+                <a:latin typeface="Consolas" panose="020B0609020204030204" pitchFamily="49" charset="0"/>
+              </a:rPr>
+              <a:t>OrderHeader</a:t>
+            </a:r>
+            <a:r>
+              <a:rPr lang="en-US" sz="1400" dirty="0">
+                <a:solidFill>
+                  <a:prstClr val="black"/>
+                </a:solidFill>
+                <a:latin typeface="Consolas" panose="020B0609020204030204" pitchFamily="49" charset="0"/>
+              </a:rPr>
+              <a:t> </a:t>
+            </a:r>
+            <a:r>
+              <a:rPr lang="en-US" sz="1400" dirty="0">
+                <a:solidFill>
+                  <a:srgbClr val="008080"/>
+                </a:solidFill>
+                <a:latin typeface="Consolas" panose="020B0609020204030204" pitchFamily="49" charset="0"/>
+              </a:rPr>
+              <a:t>oh</a:t>
+            </a:r>
+            <a:endParaRPr lang="en-US" sz="1400" dirty="0">
+              <a:solidFill>
+                <a:prstClr val="black"/>
+              </a:solidFill>
+              <a:latin typeface="Consolas" panose="020B0609020204030204" pitchFamily="49" charset="0"/>
+            </a:endParaRPr>
+          </a:p>
+          <a:p>
+            <a:r>
+              <a:rPr lang="en-US" sz="1400" dirty="0">
+                <a:solidFill>
+                  <a:srgbClr val="808080"/>
+                </a:solidFill>
+                <a:latin typeface="Consolas" panose="020B0609020204030204" pitchFamily="49" charset="0"/>
+              </a:rPr>
+              <a:t>inner</a:t>
+            </a:r>
+            <a:r>
+              <a:rPr lang="en-US" sz="1400" dirty="0">
+                <a:solidFill>
+                  <a:prstClr val="black"/>
+                </a:solidFill>
+                <a:latin typeface="Consolas" panose="020B0609020204030204" pitchFamily="49" charset="0"/>
+              </a:rPr>
+              <a:t> </a:t>
+            </a:r>
+            <a:r>
+              <a:rPr lang="en-US" sz="1400" dirty="0">
+                <a:solidFill>
+                  <a:srgbClr val="808080"/>
+                </a:solidFill>
+                <a:latin typeface="Consolas" panose="020B0609020204030204" pitchFamily="49" charset="0"/>
+              </a:rPr>
+              <a:t>join</a:t>
+            </a:r>
+            <a:r>
+              <a:rPr lang="en-US" sz="1400" dirty="0">
+                <a:solidFill>
+                  <a:prstClr val="black"/>
+                </a:solidFill>
+                <a:latin typeface="Consolas" panose="020B0609020204030204" pitchFamily="49" charset="0"/>
+              </a:rPr>
+              <a:t> </a:t>
+            </a:r>
+            <a:r>
+              <a:rPr lang="en-US" sz="1400" dirty="0" err="1">
+                <a:solidFill>
+                  <a:srgbClr val="008080"/>
+                </a:solidFill>
+                <a:latin typeface="Consolas" panose="020B0609020204030204" pitchFamily="49" charset="0"/>
+              </a:rPr>
+              <a:t>CorpDB</a:t>
+            </a:r>
+            <a:r>
+              <a:rPr lang="en-US" sz="1400" dirty="0" err="1">
+                <a:solidFill>
+                  <a:srgbClr val="808080"/>
+                </a:solidFill>
+                <a:latin typeface="Consolas" panose="020B0609020204030204" pitchFamily="49" charset="0"/>
+              </a:rPr>
+              <a:t>.</a:t>
+            </a:r>
+            <a:r>
+              <a:rPr lang="en-US" sz="1400" dirty="0" err="1">
+                <a:solidFill>
+                  <a:srgbClr val="008080"/>
+                </a:solidFill>
+                <a:latin typeface="Consolas" panose="020B0609020204030204" pitchFamily="49" charset="0"/>
+              </a:rPr>
+              <a:t>dbo</a:t>
+            </a:r>
+            <a:r>
+              <a:rPr lang="en-US" sz="1400" dirty="0" err="1">
+                <a:solidFill>
+                  <a:srgbClr val="808080"/>
+                </a:solidFill>
+                <a:latin typeface="Consolas" panose="020B0609020204030204" pitchFamily="49" charset="0"/>
+              </a:rPr>
+              <a:t>.</a:t>
+            </a:r>
+            <a:r>
+              <a:rPr lang="en-US" sz="1400" dirty="0" err="1">
+                <a:solidFill>
+                  <a:srgbClr val="008080"/>
+                </a:solidFill>
+                <a:latin typeface="Consolas" panose="020B0609020204030204" pitchFamily="49" charset="0"/>
+              </a:rPr>
+              <a:t>OrderDetail</a:t>
+            </a:r>
+            <a:r>
+              <a:rPr lang="en-US" sz="1400" dirty="0">
+                <a:solidFill>
+                  <a:prstClr val="black"/>
+                </a:solidFill>
+                <a:latin typeface="Consolas" panose="020B0609020204030204" pitchFamily="49" charset="0"/>
+              </a:rPr>
+              <a:t> </a:t>
+            </a:r>
+            <a:r>
+              <a:rPr lang="en-US" sz="1400" dirty="0">
+                <a:solidFill>
+                  <a:srgbClr val="008080"/>
+                </a:solidFill>
+                <a:latin typeface="Consolas" panose="020B0609020204030204" pitchFamily="49" charset="0"/>
+              </a:rPr>
+              <a:t>od</a:t>
+            </a:r>
+            <a:endParaRPr lang="en-US" sz="1400" dirty="0">
+              <a:solidFill>
+                <a:prstClr val="black"/>
+              </a:solidFill>
+              <a:latin typeface="Consolas" panose="020B0609020204030204" pitchFamily="49" charset="0"/>
+            </a:endParaRPr>
+          </a:p>
+          <a:p>
+            <a:r>
+              <a:rPr lang="en-US" sz="1400" dirty="0">
+                <a:solidFill>
+                  <a:srgbClr val="0000FF"/>
+                </a:solidFill>
+                <a:latin typeface="Consolas" panose="020B0609020204030204" pitchFamily="49" charset="0"/>
+              </a:rPr>
+              <a:t>on</a:t>
+            </a:r>
+            <a:r>
+              <a:rPr lang="en-US" sz="1400" dirty="0">
+                <a:solidFill>
+                  <a:prstClr val="black"/>
+                </a:solidFill>
+                <a:latin typeface="Consolas" panose="020B0609020204030204" pitchFamily="49" charset="0"/>
+              </a:rPr>
+              <a:t> </a:t>
+            </a:r>
+            <a:r>
+              <a:rPr lang="en-US" sz="1400" dirty="0" err="1">
+                <a:solidFill>
+                  <a:srgbClr val="008080"/>
+                </a:solidFill>
+                <a:latin typeface="Consolas" panose="020B0609020204030204" pitchFamily="49" charset="0"/>
+              </a:rPr>
+              <a:t>oh</a:t>
+            </a:r>
+            <a:r>
+              <a:rPr lang="en-US" sz="1400" dirty="0" err="1">
+                <a:solidFill>
+                  <a:srgbClr val="808080"/>
+                </a:solidFill>
+                <a:latin typeface="Consolas" panose="020B0609020204030204" pitchFamily="49" charset="0"/>
+              </a:rPr>
+              <a:t>.</a:t>
+            </a:r>
+            <a:r>
+              <a:rPr lang="en-US" sz="1400" dirty="0" err="1">
+                <a:solidFill>
+                  <a:srgbClr val="008080"/>
+                </a:solidFill>
+                <a:latin typeface="Consolas" panose="020B0609020204030204" pitchFamily="49" charset="0"/>
+              </a:rPr>
+              <a:t>OrderId</a:t>
+            </a:r>
+            <a:r>
+              <a:rPr lang="en-US" sz="1400" dirty="0">
+                <a:solidFill>
+                  <a:prstClr val="black"/>
+                </a:solidFill>
+                <a:latin typeface="Consolas" panose="020B0609020204030204" pitchFamily="49" charset="0"/>
+              </a:rPr>
+              <a:t> </a:t>
+            </a:r>
+            <a:r>
+              <a:rPr lang="en-US" sz="1400" dirty="0">
+                <a:solidFill>
+                  <a:srgbClr val="808080"/>
+                </a:solidFill>
+                <a:latin typeface="Consolas" panose="020B0609020204030204" pitchFamily="49" charset="0"/>
+              </a:rPr>
+              <a:t>=</a:t>
+            </a:r>
+            <a:r>
+              <a:rPr lang="en-US" sz="1400" dirty="0">
+                <a:solidFill>
+                  <a:prstClr val="black"/>
+                </a:solidFill>
+                <a:latin typeface="Consolas" panose="020B0609020204030204" pitchFamily="49" charset="0"/>
+              </a:rPr>
+              <a:t> </a:t>
+            </a:r>
+            <a:r>
+              <a:rPr lang="en-US" sz="1400" dirty="0" err="1">
+                <a:solidFill>
+                  <a:srgbClr val="008080"/>
+                </a:solidFill>
+                <a:latin typeface="Consolas" panose="020B0609020204030204" pitchFamily="49" charset="0"/>
+              </a:rPr>
+              <a:t>od</a:t>
+            </a:r>
+            <a:r>
+              <a:rPr lang="en-US" sz="1400" dirty="0" err="1">
+                <a:solidFill>
+                  <a:srgbClr val="808080"/>
+                </a:solidFill>
+                <a:latin typeface="Consolas" panose="020B0609020204030204" pitchFamily="49" charset="0"/>
+              </a:rPr>
+              <a:t>.</a:t>
+            </a:r>
+            <a:r>
+              <a:rPr lang="en-US" sz="1400" dirty="0" err="1">
+                <a:solidFill>
+                  <a:srgbClr val="008080"/>
+                </a:solidFill>
+                <a:latin typeface="Consolas" panose="020B0609020204030204" pitchFamily="49" charset="0"/>
+              </a:rPr>
+              <a:t>OrderId</a:t>
+            </a:r>
+            <a:endParaRPr lang="en-US" sz="1400" dirty="0">
+              <a:solidFill>
+                <a:prstClr val="black"/>
+              </a:solidFill>
+              <a:latin typeface="Consolas" panose="020B0609020204030204" pitchFamily="49" charset="0"/>
+            </a:endParaRPr>
+          </a:p>
+          <a:p>
+            <a:r>
+              <a:rPr lang="en-US" sz="1400" dirty="0">
+                <a:solidFill>
+                  <a:srgbClr val="808080"/>
+                </a:solidFill>
+                <a:latin typeface="Consolas" panose="020B0609020204030204" pitchFamily="49" charset="0"/>
+              </a:rPr>
+              <a:t>inner</a:t>
+            </a:r>
+            <a:r>
+              <a:rPr lang="en-US" sz="1400" dirty="0">
+                <a:solidFill>
+                  <a:prstClr val="black"/>
+                </a:solidFill>
+                <a:latin typeface="Consolas" panose="020B0609020204030204" pitchFamily="49" charset="0"/>
+              </a:rPr>
+              <a:t> </a:t>
+            </a:r>
+            <a:r>
+              <a:rPr lang="en-US" sz="1400" dirty="0">
+                <a:solidFill>
+                  <a:srgbClr val="808080"/>
+                </a:solidFill>
+                <a:latin typeface="Consolas" panose="020B0609020204030204" pitchFamily="49" charset="0"/>
+              </a:rPr>
+              <a:t>join</a:t>
+            </a:r>
+            <a:r>
+              <a:rPr lang="en-US" sz="1400" dirty="0">
+                <a:solidFill>
+                  <a:prstClr val="black"/>
+                </a:solidFill>
+                <a:latin typeface="Consolas" panose="020B0609020204030204" pitchFamily="49" charset="0"/>
+              </a:rPr>
+              <a:t> </a:t>
+            </a:r>
+            <a:r>
+              <a:rPr lang="en-US" sz="1400" dirty="0" err="1">
+                <a:solidFill>
+                  <a:srgbClr val="008080"/>
+                </a:solidFill>
+                <a:latin typeface="Consolas" panose="020B0609020204030204" pitchFamily="49" charset="0"/>
+              </a:rPr>
+              <a:t>CorpDB</a:t>
+            </a:r>
+            <a:r>
+              <a:rPr lang="en-US" sz="1400" dirty="0" err="1">
+                <a:solidFill>
+                  <a:srgbClr val="808080"/>
+                </a:solidFill>
+                <a:latin typeface="Consolas" panose="020B0609020204030204" pitchFamily="49" charset="0"/>
+              </a:rPr>
+              <a:t>.</a:t>
+            </a:r>
+            <a:r>
+              <a:rPr lang="en-US" sz="1400" dirty="0" err="1">
+                <a:solidFill>
+                  <a:srgbClr val="008080"/>
+                </a:solidFill>
+                <a:latin typeface="Consolas" panose="020B0609020204030204" pitchFamily="49" charset="0"/>
+              </a:rPr>
+              <a:t>dbo</a:t>
+            </a:r>
+            <a:r>
+              <a:rPr lang="en-US" sz="1400" dirty="0" err="1">
+                <a:solidFill>
+                  <a:srgbClr val="808080"/>
+                </a:solidFill>
+                <a:latin typeface="Consolas" panose="020B0609020204030204" pitchFamily="49" charset="0"/>
+              </a:rPr>
+              <a:t>.</a:t>
+            </a:r>
+            <a:r>
+              <a:rPr lang="en-US" sz="1400" dirty="0" err="1">
+                <a:solidFill>
+                  <a:srgbClr val="008080"/>
+                </a:solidFill>
+                <a:latin typeface="Consolas" panose="020B0609020204030204" pitchFamily="49" charset="0"/>
+              </a:rPr>
+              <a:t>Customer</a:t>
+            </a:r>
+            <a:r>
+              <a:rPr lang="en-US" sz="1400" dirty="0">
+                <a:solidFill>
+                  <a:prstClr val="black"/>
+                </a:solidFill>
+                <a:latin typeface="Consolas" panose="020B0609020204030204" pitchFamily="49" charset="0"/>
+              </a:rPr>
+              <a:t> </a:t>
+            </a:r>
+            <a:r>
+              <a:rPr lang="en-US" sz="1400" dirty="0" err="1">
+                <a:solidFill>
+                  <a:srgbClr val="008080"/>
+                </a:solidFill>
+                <a:latin typeface="Consolas" panose="020B0609020204030204" pitchFamily="49" charset="0"/>
+              </a:rPr>
+              <a:t>cust</a:t>
+            </a:r>
+            <a:endParaRPr lang="en-US" sz="1400" dirty="0">
+              <a:solidFill>
+                <a:prstClr val="black"/>
+              </a:solidFill>
+              <a:latin typeface="Consolas" panose="020B0609020204030204" pitchFamily="49" charset="0"/>
+            </a:endParaRPr>
+          </a:p>
+          <a:p>
+            <a:r>
+              <a:rPr lang="en-US" sz="1400" dirty="0">
+                <a:solidFill>
+                  <a:srgbClr val="0000FF"/>
+                </a:solidFill>
+                <a:latin typeface="Consolas" panose="020B0609020204030204" pitchFamily="49" charset="0"/>
+              </a:rPr>
+              <a:t>on</a:t>
+            </a:r>
+            <a:r>
+              <a:rPr lang="en-US" sz="1400" dirty="0">
+                <a:solidFill>
+                  <a:prstClr val="black"/>
+                </a:solidFill>
+                <a:latin typeface="Consolas" panose="020B0609020204030204" pitchFamily="49" charset="0"/>
+              </a:rPr>
+              <a:t> </a:t>
+            </a:r>
+            <a:r>
+              <a:rPr lang="en-US" sz="1400" dirty="0" err="1">
+                <a:solidFill>
+                  <a:srgbClr val="008080"/>
+                </a:solidFill>
+                <a:latin typeface="Consolas" panose="020B0609020204030204" pitchFamily="49" charset="0"/>
+              </a:rPr>
+              <a:t>oh</a:t>
+            </a:r>
+            <a:r>
+              <a:rPr lang="en-US" sz="1400" dirty="0" err="1">
+                <a:solidFill>
+                  <a:srgbClr val="808080"/>
+                </a:solidFill>
+                <a:latin typeface="Consolas" panose="020B0609020204030204" pitchFamily="49" charset="0"/>
+              </a:rPr>
+              <a:t>.</a:t>
+            </a:r>
+            <a:r>
+              <a:rPr lang="en-US" sz="1400" dirty="0" err="1">
+                <a:solidFill>
+                  <a:srgbClr val="008080"/>
+                </a:solidFill>
+                <a:latin typeface="Consolas" panose="020B0609020204030204" pitchFamily="49" charset="0"/>
+              </a:rPr>
+              <a:t>CustomerId</a:t>
+            </a:r>
+            <a:r>
+              <a:rPr lang="en-US" sz="1400" dirty="0">
+                <a:solidFill>
+                  <a:prstClr val="black"/>
+                </a:solidFill>
+                <a:latin typeface="Consolas" panose="020B0609020204030204" pitchFamily="49" charset="0"/>
+              </a:rPr>
+              <a:t> </a:t>
+            </a:r>
+            <a:r>
+              <a:rPr lang="en-US" sz="1400" dirty="0">
+                <a:solidFill>
+                  <a:srgbClr val="808080"/>
+                </a:solidFill>
+                <a:latin typeface="Consolas" panose="020B0609020204030204" pitchFamily="49" charset="0"/>
+              </a:rPr>
+              <a:t>=</a:t>
+            </a:r>
+            <a:r>
+              <a:rPr lang="en-US" sz="1400" dirty="0">
+                <a:solidFill>
+                  <a:prstClr val="black"/>
+                </a:solidFill>
+                <a:latin typeface="Consolas" panose="020B0609020204030204" pitchFamily="49" charset="0"/>
+              </a:rPr>
+              <a:t> </a:t>
+            </a:r>
+            <a:r>
+              <a:rPr lang="en-US" sz="1400" dirty="0" err="1">
+                <a:solidFill>
+                  <a:srgbClr val="008080"/>
+                </a:solidFill>
+                <a:latin typeface="Consolas" panose="020B0609020204030204" pitchFamily="49" charset="0"/>
+              </a:rPr>
+              <a:t>cust</a:t>
+            </a:r>
+            <a:r>
+              <a:rPr lang="en-US" sz="1400" dirty="0" err="1">
+                <a:solidFill>
+                  <a:srgbClr val="808080"/>
+                </a:solidFill>
+                <a:latin typeface="Consolas" panose="020B0609020204030204" pitchFamily="49" charset="0"/>
+              </a:rPr>
+              <a:t>.</a:t>
+            </a:r>
+            <a:r>
+              <a:rPr lang="en-US" sz="1400" dirty="0" err="1">
+                <a:solidFill>
+                  <a:srgbClr val="008080"/>
+                </a:solidFill>
+                <a:latin typeface="Consolas" panose="020B0609020204030204" pitchFamily="49" charset="0"/>
+              </a:rPr>
+              <a:t>CustomerID</a:t>
+            </a:r>
+            <a:endParaRPr lang="en-US" sz="1400" dirty="0">
+              <a:solidFill>
+                <a:prstClr val="black"/>
+              </a:solidFill>
+              <a:latin typeface="Consolas" panose="020B0609020204030204" pitchFamily="49" charset="0"/>
+            </a:endParaRPr>
+          </a:p>
+          <a:p>
+            <a:r>
+              <a:rPr lang="en-US" sz="1400" dirty="0">
+                <a:solidFill>
+                  <a:srgbClr val="0000FF"/>
+                </a:solidFill>
+                <a:latin typeface="Consolas" panose="020B0609020204030204" pitchFamily="49" charset="0"/>
+              </a:rPr>
+              <a:t>where</a:t>
+            </a:r>
+            <a:r>
+              <a:rPr lang="en-US" sz="1400" dirty="0">
+                <a:solidFill>
+                  <a:prstClr val="black"/>
+                </a:solidFill>
+                <a:latin typeface="Consolas" panose="020B0609020204030204" pitchFamily="49" charset="0"/>
+              </a:rPr>
+              <a:t> </a:t>
+            </a:r>
+            <a:r>
+              <a:rPr lang="en-US" sz="1400" dirty="0" err="1">
+                <a:solidFill>
+                  <a:srgbClr val="008080"/>
+                </a:solidFill>
+                <a:latin typeface="Consolas" panose="020B0609020204030204" pitchFamily="49" charset="0"/>
+              </a:rPr>
+              <a:t>cust</a:t>
+            </a:r>
+            <a:r>
+              <a:rPr lang="en-US" sz="1400" dirty="0" err="1">
+                <a:solidFill>
+                  <a:srgbClr val="808080"/>
+                </a:solidFill>
+                <a:latin typeface="Consolas" panose="020B0609020204030204" pitchFamily="49" charset="0"/>
+              </a:rPr>
+              <a:t>.</a:t>
+            </a:r>
+            <a:r>
+              <a:rPr lang="en-US" sz="1400" dirty="0" err="1">
+                <a:solidFill>
+                  <a:srgbClr val="0000FF"/>
+                </a:solidFill>
+                <a:latin typeface="Consolas" panose="020B0609020204030204" pitchFamily="49" charset="0"/>
+              </a:rPr>
+              <a:t>State</a:t>
+            </a:r>
+            <a:r>
+              <a:rPr lang="en-US" sz="1400" dirty="0">
+                <a:solidFill>
+                  <a:prstClr val="black"/>
+                </a:solidFill>
+                <a:latin typeface="Consolas" panose="020B0609020204030204" pitchFamily="49" charset="0"/>
+              </a:rPr>
+              <a:t> </a:t>
+            </a:r>
+            <a:r>
+              <a:rPr lang="en-US" sz="1400" dirty="0">
+                <a:solidFill>
+                  <a:srgbClr val="808080"/>
+                </a:solidFill>
+                <a:latin typeface="Consolas" panose="020B0609020204030204" pitchFamily="49" charset="0"/>
+              </a:rPr>
+              <a:t>=</a:t>
+            </a:r>
+            <a:r>
+              <a:rPr lang="en-US" sz="1400" dirty="0">
+                <a:solidFill>
+                  <a:prstClr val="black"/>
+                </a:solidFill>
+                <a:latin typeface="Consolas" panose="020B0609020204030204" pitchFamily="49" charset="0"/>
+              </a:rPr>
+              <a:t> </a:t>
+            </a:r>
+            <a:r>
+              <a:rPr lang="en-US" sz="1400" dirty="0">
+                <a:solidFill>
+                  <a:srgbClr val="FF0000"/>
+                </a:solidFill>
+                <a:latin typeface="Consolas" panose="020B0609020204030204" pitchFamily="49" charset="0"/>
+              </a:rPr>
+              <a:t>'IA'</a:t>
+            </a:r>
+            <a:endParaRPr lang="en-US" sz="1400" dirty="0">
+              <a:solidFill>
+                <a:prstClr val="black"/>
+              </a:solidFill>
+              <a:latin typeface="Consolas" panose="020B0609020204030204" pitchFamily="49" charset="0"/>
+            </a:endParaRPr>
+          </a:p>
+          <a:p>
+            <a:r>
+              <a:rPr lang="en-US" sz="1400" dirty="0">
+                <a:solidFill>
+                  <a:srgbClr val="0000FF"/>
+                </a:solidFill>
+                <a:latin typeface="Consolas" panose="020B0609020204030204" pitchFamily="49" charset="0"/>
+              </a:rPr>
+              <a:t>group</a:t>
+            </a:r>
+            <a:r>
+              <a:rPr lang="en-US" sz="1400" dirty="0">
+                <a:solidFill>
+                  <a:prstClr val="black"/>
+                </a:solidFill>
+                <a:latin typeface="Consolas" panose="020B0609020204030204" pitchFamily="49" charset="0"/>
+              </a:rPr>
+              <a:t> </a:t>
+            </a:r>
+            <a:r>
+              <a:rPr lang="en-US" sz="1400" dirty="0">
+                <a:solidFill>
+                  <a:srgbClr val="0000FF"/>
+                </a:solidFill>
+                <a:latin typeface="Consolas" panose="020B0609020204030204" pitchFamily="49" charset="0"/>
+              </a:rPr>
+              <a:t>by</a:t>
+            </a:r>
+            <a:r>
+              <a:rPr lang="en-US" sz="1400" dirty="0">
+                <a:solidFill>
+                  <a:prstClr val="black"/>
+                </a:solidFill>
+                <a:latin typeface="Consolas" panose="020B0609020204030204" pitchFamily="49" charset="0"/>
+              </a:rPr>
+              <a:t> </a:t>
+            </a:r>
+            <a:r>
+              <a:rPr lang="en-US" sz="1400" dirty="0" err="1">
+                <a:solidFill>
+                  <a:srgbClr val="008080"/>
+                </a:solidFill>
+                <a:latin typeface="Consolas" panose="020B0609020204030204" pitchFamily="49" charset="0"/>
+              </a:rPr>
+              <a:t>od</a:t>
+            </a:r>
+            <a:r>
+              <a:rPr lang="en-US" sz="1400" dirty="0" err="1">
+                <a:solidFill>
+                  <a:srgbClr val="808080"/>
+                </a:solidFill>
+                <a:latin typeface="Consolas" panose="020B0609020204030204" pitchFamily="49" charset="0"/>
+              </a:rPr>
+              <a:t>.</a:t>
+            </a:r>
+            <a:r>
+              <a:rPr lang="en-US" sz="1400" dirty="0" err="1">
+                <a:solidFill>
+                  <a:srgbClr val="008080"/>
+                </a:solidFill>
+                <a:latin typeface="Consolas" panose="020B0609020204030204" pitchFamily="49" charset="0"/>
+              </a:rPr>
+              <a:t>ProductId</a:t>
+            </a:r>
+            <a:endParaRPr lang="en-US" sz="1400" dirty="0">
+              <a:solidFill>
+                <a:prstClr val="black"/>
+              </a:solidFill>
+              <a:latin typeface="Consolas" panose="020B0609020204030204" pitchFamily="49" charset="0"/>
+            </a:endParaRPr>
+          </a:p>
+          <a:p>
+            <a:r>
+              <a:rPr lang="en-US" sz="1400" dirty="0">
+                <a:solidFill>
+                  <a:srgbClr val="0000FF"/>
+                </a:solidFill>
+                <a:latin typeface="Consolas" panose="020B0609020204030204" pitchFamily="49" charset="0"/>
+              </a:rPr>
+              <a:t>having</a:t>
+            </a:r>
+            <a:r>
+              <a:rPr lang="en-US" sz="1400" dirty="0">
+                <a:solidFill>
+                  <a:prstClr val="black"/>
+                </a:solidFill>
+                <a:latin typeface="Consolas" panose="020B0609020204030204" pitchFamily="49" charset="0"/>
+              </a:rPr>
+              <a:t> </a:t>
+            </a:r>
+            <a:r>
+              <a:rPr lang="en-US" sz="1400" dirty="0">
+                <a:solidFill>
+                  <a:srgbClr val="FF00FF"/>
+                </a:solidFill>
+                <a:latin typeface="Consolas" panose="020B0609020204030204" pitchFamily="49" charset="0"/>
+              </a:rPr>
+              <a:t>sum</a:t>
+            </a:r>
+            <a:r>
+              <a:rPr lang="en-US" sz="1400" dirty="0">
+                <a:solidFill>
+                  <a:srgbClr val="808080"/>
+                </a:solidFill>
+                <a:latin typeface="Consolas" panose="020B0609020204030204" pitchFamily="49" charset="0"/>
+              </a:rPr>
+              <a:t>(</a:t>
+            </a:r>
+            <a:r>
+              <a:rPr lang="en-US" sz="1400" dirty="0" err="1">
+                <a:solidFill>
+                  <a:srgbClr val="008080"/>
+                </a:solidFill>
+                <a:latin typeface="Consolas" panose="020B0609020204030204" pitchFamily="49" charset="0"/>
+              </a:rPr>
+              <a:t>od</a:t>
+            </a:r>
+            <a:r>
+              <a:rPr lang="en-US" sz="1400" dirty="0" err="1">
+                <a:solidFill>
+                  <a:srgbClr val="808080"/>
+                </a:solidFill>
+                <a:latin typeface="Consolas" panose="020B0609020204030204" pitchFamily="49" charset="0"/>
+              </a:rPr>
+              <a:t>.</a:t>
+            </a:r>
+            <a:r>
+              <a:rPr lang="en-US" sz="1400" dirty="0" err="1">
+                <a:solidFill>
+                  <a:srgbClr val="008080"/>
+                </a:solidFill>
+                <a:latin typeface="Consolas" panose="020B0609020204030204" pitchFamily="49" charset="0"/>
+              </a:rPr>
+              <a:t>Quantity</a:t>
+            </a:r>
+            <a:r>
+              <a:rPr lang="en-US" sz="1400" dirty="0">
+                <a:solidFill>
+                  <a:srgbClr val="808080"/>
+                </a:solidFill>
+                <a:latin typeface="Consolas" panose="020B0609020204030204" pitchFamily="49" charset="0"/>
+              </a:rPr>
+              <a:t>)</a:t>
+            </a:r>
+            <a:r>
+              <a:rPr lang="en-US" sz="1400" dirty="0">
+                <a:solidFill>
+                  <a:prstClr val="black"/>
+                </a:solidFill>
+                <a:latin typeface="Consolas" panose="020B0609020204030204" pitchFamily="49" charset="0"/>
+              </a:rPr>
+              <a:t> </a:t>
+            </a:r>
+            <a:r>
+              <a:rPr lang="en-US" sz="1400" dirty="0">
+                <a:solidFill>
+                  <a:srgbClr val="808080"/>
+                </a:solidFill>
+                <a:latin typeface="Consolas" panose="020B0609020204030204" pitchFamily="49" charset="0"/>
+              </a:rPr>
+              <a:t>&gt;=</a:t>
+            </a:r>
+            <a:r>
+              <a:rPr lang="en-US" sz="1400" dirty="0">
+                <a:solidFill>
+                  <a:prstClr val="black"/>
+                </a:solidFill>
+                <a:latin typeface="Consolas" panose="020B0609020204030204" pitchFamily="49" charset="0"/>
+              </a:rPr>
+              <a:t> 20</a:t>
+            </a:r>
+          </a:p>
+          <a:p>
+            <a:r>
+              <a:rPr lang="en-US" sz="1400" dirty="0">
+                <a:solidFill>
+                  <a:srgbClr val="0000FF"/>
+                </a:solidFill>
+                <a:latin typeface="Consolas" panose="020B0609020204030204" pitchFamily="49" charset="0"/>
+              </a:rPr>
+              <a:t>order</a:t>
+            </a:r>
+            <a:r>
+              <a:rPr lang="en-US" sz="1400" dirty="0">
+                <a:solidFill>
+                  <a:prstClr val="black"/>
+                </a:solidFill>
+                <a:latin typeface="Consolas" panose="020B0609020204030204" pitchFamily="49" charset="0"/>
+              </a:rPr>
+              <a:t> </a:t>
+            </a:r>
+            <a:r>
+              <a:rPr lang="en-US" sz="1400" dirty="0">
+                <a:solidFill>
+                  <a:srgbClr val="0000FF"/>
+                </a:solidFill>
+                <a:latin typeface="Consolas" panose="020B0609020204030204" pitchFamily="49" charset="0"/>
+              </a:rPr>
+              <a:t>by</a:t>
+            </a:r>
+            <a:r>
+              <a:rPr lang="en-US" sz="1400" dirty="0">
+                <a:solidFill>
+                  <a:prstClr val="black"/>
+                </a:solidFill>
+                <a:latin typeface="Consolas" panose="020B0609020204030204" pitchFamily="49" charset="0"/>
+              </a:rPr>
+              <a:t> </a:t>
+            </a:r>
+            <a:r>
+              <a:rPr lang="en-US" sz="1400" dirty="0" err="1">
+                <a:solidFill>
+                  <a:srgbClr val="008080"/>
+                </a:solidFill>
+                <a:latin typeface="Consolas" panose="020B0609020204030204" pitchFamily="49" charset="0"/>
+              </a:rPr>
+              <a:t>od</a:t>
+            </a:r>
+            <a:r>
+              <a:rPr lang="en-US" sz="1400" dirty="0" err="1">
+                <a:solidFill>
+                  <a:srgbClr val="808080"/>
+                </a:solidFill>
+                <a:latin typeface="Consolas" panose="020B0609020204030204" pitchFamily="49" charset="0"/>
+              </a:rPr>
+              <a:t>.</a:t>
+            </a:r>
+            <a:r>
+              <a:rPr lang="en-US" sz="1400" dirty="0" err="1">
+                <a:solidFill>
+                  <a:srgbClr val="008080"/>
+                </a:solidFill>
+                <a:latin typeface="Consolas" panose="020B0609020204030204" pitchFamily="49" charset="0"/>
+              </a:rPr>
+              <a:t>ProductId</a:t>
+            </a:r>
+            <a:r>
+              <a:rPr lang="en-US" sz="1400" dirty="0">
+                <a:solidFill>
+                  <a:srgbClr val="808080"/>
+                </a:solidFill>
+                <a:latin typeface="Consolas" panose="020B0609020204030204" pitchFamily="49" charset="0"/>
+              </a:rPr>
+              <a:t>;</a:t>
+            </a:r>
+            <a:endParaRPr lang="en-US" sz="1400" dirty="0">
+              <a:solidFill>
+                <a:prstClr val="black"/>
+              </a:solidFill>
+              <a:latin typeface="Consolas" panose="020B0609020204030204" pitchFamily="49" charset="0"/>
+            </a:endParaRPr>
+          </a:p>
+        </p:txBody>
+      </p:sp>
+      <p:sp>
+        <p:nvSpPr>
+          <p:cNvPr id="6" name="Oval 5"/>
+          <p:cNvSpPr/>
+          <p:nvPr/>
+        </p:nvSpPr>
+        <p:spPr>
+          <a:xfrm>
+            <a:off x="8378792" y="542942"/>
+            <a:ext cx="616016" cy="606391"/>
+          </a:xfrm>
+          <a:prstGeom prst="ellipse">
+            <a:avLst/>
+          </a:prstGeom>
+        </p:spPr>
+        <p:style>
+          <a:lnRef idx="1">
+            <a:schemeClr val="accent1"/>
+          </a:lnRef>
+          <a:fillRef idx="3">
+            <a:schemeClr val="accent1"/>
+          </a:fillRef>
+          <a:effectRef idx="2">
+            <a:schemeClr val="accent1"/>
+          </a:effectRef>
+          <a:fontRef idx="minor">
+            <a:schemeClr val="lt1"/>
+          </a:fontRef>
+        </p:style>
+        <p:txBody>
+          <a:bodyPr rtlCol="0" anchor="ctr"/>
+          <a:lstStyle/>
+          <a:p>
+            <a:pPr algn="ctr"/>
+            <a:r>
+              <a:rPr lang="en-US" sz="1600" dirty="0"/>
+              <a:t>11</a:t>
+            </a:r>
+          </a:p>
+        </p:txBody>
+      </p:sp>
+      <p:pic>
+        <p:nvPicPr>
+          <p:cNvPr id="4" name="Picture 3"/>
+          <p:cNvPicPr>
+            <a:picLocks noChangeAspect="1"/>
+          </p:cNvPicPr>
+          <p:nvPr/>
+        </p:nvPicPr>
+        <p:blipFill>
+          <a:blip r:embed="rId3"/>
+          <a:stretch>
+            <a:fillRect/>
+          </a:stretch>
+        </p:blipFill>
+        <p:spPr>
+          <a:xfrm>
+            <a:off x="2895606" y="1417638"/>
+            <a:ext cx="5718472" cy="4597303"/>
+          </a:xfrm>
+          <a:prstGeom prst="rect">
+            <a:avLst/>
+          </a:prstGeom>
+        </p:spPr>
+      </p:pic>
+    </p:spTree>
+    <p:extLst>
+      <p:ext uri="{BB962C8B-B14F-4D97-AF65-F5344CB8AC3E}">
+        <p14:creationId xmlns:p14="http://schemas.microsoft.com/office/powerpoint/2010/main" val="2851444044"/>
+      </p:ext>
+    </p:extLst>
+  </p:cSld>
+  <p:clrMapOvr>
+    <a:masterClrMapping/>
+  </p:clrMapOvr>
+</p:sld>
+</file>
+
+<file path=ppt/slides/slide44.xml><?xml version="1.0" encoding="utf-8"?>
+<p:sld xmlns:a="http://schemas.openxmlformats.org/drawingml/2006/main" xmlns:r="http://schemas.openxmlformats.org/officeDocument/2006/relationships" xmlns:p="http://schemas.openxmlformats.org/presentationml/2006/main">
+  <p:cSld>
+    <p:spTree>
+      <p:nvGrpSpPr>
+        <p:cNvPr id="1" name=""/>
+        <p:cNvGrpSpPr/>
+        <p:nvPr/>
+      </p:nvGrpSpPr>
+      <p:grpSpPr>
+        <a:xfrm>
+          <a:off x="0" y="0"/>
+          <a:ext cx="0" cy="0"/>
+          <a:chOff x="0" y="0"/>
+          <a:chExt cx="0" cy="0"/>
+        </a:xfrm>
+      </p:grpSpPr>
+      <p:sp>
+        <p:nvSpPr>
+          <p:cNvPr id="2" name="Title 1"/>
+          <p:cNvSpPr>
+            <a:spLocks noGrp="1"/>
+          </p:cNvSpPr>
+          <p:nvPr>
+            <p:ph type="title"/>
+          </p:nvPr>
+        </p:nvSpPr>
+        <p:spPr/>
+        <p:txBody>
+          <a:bodyPr/>
+          <a:lstStyle/>
+          <a:p>
+            <a:r>
+              <a:rPr lang="en-US" dirty="0"/>
               <a:t>Memo Structure</a:t>
             </a:r>
           </a:p>
@@ -27771,7 +27887,7 @@
 </p:sld>
 </file>
 
-<file path=ppt/slides/slide44.xml><?xml version="1.0" encoding="utf-8"?>
+<file path=ppt/slides/slide45.xml><?xml version="1.0" encoding="utf-8"?>
 <p:sld xmlns:a="http://schemas.openxmlformats.org/drawingml/2006/main" xmlns:r="http://schemas.openxmlformats.org/officeDocument/2006/relationships" xmlns:p="http://schemas.openxmlformats.org/presentationml/2006/main">
   <p:cSld>
     <p:spTree>
@@ -29019,7 +29135,7 @@
 </p:sld>
 </file>
 
-<file path=ppt/slides/slide45.xml><?xml version="1.0" encoding="utf-8"?>
+<file path=ppt/slides/slide46.xml><?xml version="1.0" encoding="utf-8"?>
 <p:sld xmlns:a="http://schemas.openxmlformats.org/drawingml/2006/main" xmlns:r="http://schemas.openxmlformats.org/officeDocument/2006/relationships" xmlns:p="http://schemas.openxmlformats.org/presentationml/2006/main">
   <p:cSld>
     <p:spTree>
@@ -29994,7 +30110,7 @@
 </p:sld>
 </file>
 
-<file path=ppt/slides/slide46.xml><?xml version="1.0" encoding="utf-8"?>
+<file path=ppt/slides/slide47.xml><?xml version="1.0" encoding="utf-8"?>
 <p:sld xmlns:a="http://schemas.openxmlformats.org/drawingml/2006/main" xmlns:r="http://schemas.openxmlformats.org/officeDocument/2006/relationships" xmlns:p="http://schemas.openxmlformats.org/presentationml/2006/main">
   <p:cSld>
     <p:spTree>
@@ -31235,7 +31351,7 @@
 </p:sld>
 </file>
 
-<file path=ppt/slides/slide47.xml><?xml version="1.0" encoding="utf-8"?>
+<file path=ppt/slides/slide48.xml><?xml version="1.0" encoding="utf-8"?>
 <p:sld xmlns:a="http://schemas.openxmlformats.org/drawingml/2006/main" xmlns:r="http://schemas.openxmlformats.org/officeDocument/2006/relationships" xmlns:p="http://schemas.openxmlformats.org/presentationml/2006/main">
   <p:cSld>
     <p:spTree>
@@ -31381,7 +31497,7 @@
 </p:sld>
 </file>
 
-<file path=ppt/slides/slide48.xml><?xml version="1.0" encoding="utf-8"?>
+<file path=ppt/slides/slide49.xml><?xml version="1.0" encoding="utf-8"?>
 <p:sld xmlns:a="http://schemas.openxmlformats.org/drawingml/2006/main" xmlns:r="http://schemas.openxmlformats.org/officeDocument/2006/relationships" xmlns:p="http://schemas.openxmlformats.org/presentationml/2006/main">
   <p:cSld>
     <p:spTree>
@@ -31509,7 +31625,164 @@
 </p:sld>
 </file>
 
-<file path=ppt/slides/slide49.xml><?xml version="1.0" encoding="utf-8"?>
+<file path=ppt/slides/slide5.xml><?xml version="1.0" encoding="utf-8"?>
+<p:sld xmlns:a="http://schemas.openxmlformats.org/drawingml/2006/main" xmlns:r="http://schemas.openxmlformats.org/officeDocument/2006/relationships" xmlns:p="http://schemas.openxmlformats.org/presentationml/2006/main">
+  <p:cSld>
+    <p:spTree>
+      <p:nvGrpSpPr>
+        <p:cNvPr id="1" name=""/>
+        <p:cNvGrpSpPr/>
+        <p:nvPr/>
+      </p:nvGrpSpPr>
+      <p:grpSpPr>
+        <a:xfrm>
+          <a:off x="0" y="0"/>
+          <a:ext cx="0" cy="0"/>
+          <a:chOff x="0" y="0"/>
+          <a:chExt cx="0" cy="0"/>
+        </a:xfrm>
+      </p:grpSpPr>
+      <p:sp>
+        <p:nvSpPr>
+          <p:cNvPr id="2" name="Title 1"/>
+          <p:cNvSpPr>
+            <a:spLocks noGrp="1"/>
+          </p:cNvSpPr>
+          <p:nvPr>
+            <p:ph type="title"/>
+          </p:nvPr>
+        </p:nvSpPr>
+        <p:spPr/>
+        <p:txBody>
+          <a:bodyPr/>
+          <a:lstStyle/>
+          <a:p>
+            <a:r>
+              <a:rPr lang="en-US" dirty="0"/>
+              <a:t>Logical Processing Order</a:t>
+            </a:r>
+          </a:p>
+        </p:txBody>
+      </p:sp>
+      <p:sp>
+        <p:nvSpPr>
+          <p:cNvPr id="3" name="Content Placeholder 2"/>
+          <p:cNvSpPr>
+            <a:spLocks noGrp="1"/>
+          </p:cNvSpPr>
+          <p:nvPr>
+            <p:ph idx="1"/>
+          </p:nvPr>
+        </p:nvSpPr>
+        <p:spPr/>
+        <p:txBody>
+          <a:bodyPr/>
+          <a:lstStyle/>
+          <a:p>
+            <a:r>
+              <a:rPr lang="en-US" dirty="0"/>
+              <a:t>Defines the sequence in which SQL elements are logically processed</a:t>
+            </a:r>
+          </a:p>
+          <a:p>
+            <a:r>
+              <a:rPr lang="en-US" dirty="0"/>
+              <a:t>Forms the starting basis for parsing the submitted query</a:t>
+            </a:r>
+          </a:p>
+          <a:p>
+            <a:r>
+              <a:rPr lang="en-US" dirty="0"/>
+              <a:t>Usually discussed from the perspective of a SELECT query; similar for UPDATE / DELETE / INSERT / MERGE</a:t>
+            </a:r>
+          </a:p>
+        </p:txBody>
+      </p:sp>
+    </p:spTree>
+    <p:extLst>
+      <p:ext uri="{BB962C8B-B14F-4D97-AF65-F5344CB8AC3E}">
+        <p14:creationId xmlns:p14="http://schemas.microsoft.com/office/powerpoint/2010/main" val="782615263"/>
+      </p:ext>
+    </p:extLst>
+  </p:cSld>
+  <p:clrMapOvr>
+    <a:masterClrMapping/>
+  </p:clrMapOvr>
+</p:sld>
+</file>
+
+<file path=ppt/slides/slide50.xml><?xml version="1.0" encoding="utf-8"?>
+<p:sld xmlns:a="http://schemas.openxmlformats.org/drawingml/2006/main" xmlns:r="http://schemas.openxmlformats.org/officeDocument/2006/relationships" xmlns:p="http://schemas.openxmlformats.org/presentationml/2006/main">
+  <p:cSld>
+    <p:spTree>
+      <p:nvGrpSpPr>
+        <p:cNvPr id="1" name=""/>
+        <p:cNvGrpSpPr/>
+        <p:nvPr/>
+      </p:nvGrpSpPr>
+      <p:grpSpPr>
+        <a:xfrm>
+          <a:off x="0" y="0"/>
+          <a:ext cx="0" cy="0"/>
+          <a:chOff x="0" y="0"/>
+          <a:chExt cx="0" cy="0"/>
+        </a:xfrm>
+      </p:grpSpPr>
+      <p:sp>
+        <p:nvSpPr>
+          <p:cNvPr id="2" name="Title 1"/>
+          <p:cNvSpPr>
+            <a:spLocks noGrp="1"/>
+          </p:cNvSpPr>
+          <p:nvPr>
+            <p:ph type="title"/>
+          </p:nvPr>
+        </p:nvSpPr>
+        <p:spPr/>
+        <p:txBody>
+          <a:bodyPr/>
+          <a:lstStyle/>
+          <a:p>
+            <a:r>
+              <a:rPr lang="en-US" dirty="0"/>
+              <a:t>Questions?</a:t>
+            </a:r>
+          </a:p>
+        </p:txBody>
+      </p:sp>
+      <p:sp>
+        <p:nvSpPr>
+          <p:cNvPr id="3" name="Content Placeholder 2"/>
+          <p:cNvSpPr>
+            <a:spLocks noGrp="1"/>
+          </p:cNvSpPr>
+          <p:nvPr>
+            <p:ph idx="1"/>
+          </p:nvPr>
+        </p:nvSpPr>
+        <p:spPr/>
+        <p:txBody>
+          <a:bodyPr/>
+          <a:lstStyle/>
+          <a:p>
+            <a:endParaRPr lang="en-US" dirty="0"/>
+          </a:p>
+        </p:txBody>
+      </p:sp>
+    </p:spTree>
+    <p:extLst>
+      <p:ext uri="{BB962C8B-B14F-4D97-AF65-F5344CB8AC3E}">
+        <p14:creationId xmlns:p14="http://schemas.microsoft.com/office/powerpoint/2010/main" val="1049758272"/>
+      </p:ext>
+    </p:extLst>
+  </p:cSld>
+  <p:clrMapOvr>
+    <a:masterClrMapping/>
+  </p:clrMapOvr>
+</p:sld>
+</file>
+
+<file path=ppt/slides/slide51.xml><?xml version="1.0" encoding="utf-8"?>
 <p:sld xmlns:a="http://schemas.openxmlformats.org/drawingml/2006/main" xmlns:r="http://schemas.openxmlformats.org/officeDocument/2006/relationships" xmlns:p="http://schemas.openxmlformats.org/presentationml/2006/main">
   <p:cSld>
     <p:spTree>
@@ -31956,93 +32229,7 @@
 </p:sld>
 </file>
 
-<file path=ppt/slides/slide5.xml><?xml version="1.0" encoding="utf-8"?>
-<p:sld xmlns:a="http://schemas.openxmlformats.org/drawingml/2006/main" xmlns:r="http://schemas.openxmlformats.org/officeDocument/2006/relationships" xmlns:p="http://schemas.openxmlformats.org/presentationml/2006/main">
-  <p:cSld>
-    <p:spTree>
-      <p:nvGrpSpPr>
-        <p:cNvPr id="1" name=""/>
-        <p:cNvGrpSpPr/>
-        <p:nvPr/>
-      </p:nvGrpSpPr>
-      <p:grpSpPr>
-        <a:xfrm>
-          <a:off x="0" y="0"/>
-          <a:ext cx="0" cy="0"/>
-          <a:chOff x="0" y="0"/>
-          <a:chExt cx="0" cy="0"/>
-        </a:xfrm>
-      </p:grpSpPr>
-      <p:sp>
-        <p:nvSpPr>
-          <p:cNvPr id="2" name="Title 1"/>
-          <p:cNvSpPr>
-            <a:spLocks noGrp="1"/>
-          </p:cNvSpPr>
-          <p:nvPr>
-            <p:ph type="title"/>
-          </p:nvPr>
-        </p:nvSpPr>
-        <p:spPr/>
-        <p:txBody>
-          <a:bodyPr/>
-          <a:lstStyle/>
-          <a:p>
-            <a:r>
-              <a:rPr lang="en-US" dirty="0"/>
-              <a:t>Logical Processing Order</a:t>
-            </a:r>
-          </a:p>
-        </p:txBody>
-      </p:sp>
-      <p:sp>
-        <p:nvSpPr>
-          <p:cNvPr id="3" name="Content Placeholder 2"/>
-          <p:cNvSpPr>
-            <a:spLocks noGrp="1"/>
-          </p:cNvSpPr>
-          <p:nvPr>
-            <p:ph idx="1"/>
-          </p:nvPr>
-        </p:nvSpPr>
-        <p:spPr/>
-        <p:txBody>
-          <a:bodyPr/>
-          <a:lstStyle/>
-          <a:p>
-            <a:r>
-              <a:rPr lang="en-US" dirty="0"/>
-              <a:t>Defines the sequence in which SQL elements are logically processed</a:t>
-            </a:r>
-          </a:p>
-          <a:p>
-            <a:r>
-              <a:rPr lang="en-US" dirty="0"/>
-              <a:t>Forms the starting basis for parsing the submitted query</a:t>
-            </a:r>
-          </a:p>
-          <a:p>
-            <a:r>
-              <a:rPr lang="en-US" dirty="0"/>
-              <a:t>Usually discussed from the perspective of a SELECT query; similar for UPDATE / DELETE / INSERT / MERGE</a:t>
-            </a:r>
-          </a:p>
-        </p:txBody>
-      </p:sp>
-    </p:spTree>
-    <p:extLst>
-      <p:ext uri="{BB962C8B-B14F-4D97-AF65-F5344CB8AC3E}">
-        <p14:creationId xmlns:p14="http://schemas.microsoft.com/office/powerpoint/2010/main" val="782615263"/>
-      </p:ext>
-    </p:extLst>
-  </p:cSld>
-  <p:clrMapOvr>
-    <a:masterClrMapping/>
-  </p:clrMapOvr>
-</p:sld>
-</file>
-
-<file path=ppt/slides/slide50.xml><?xml version="1.0" encoding="utf-8"?>
+<file path=ppt/slides/slide52.xml><?xml version="1.0" encoding="utf-8"?>
 <p:sld xmlns:a="http://schemas.openxmlformats.org/drawingml/2006/main" xmlns:r="http://schemas.openxmlformats.org/officeDocument/2006/relationships" xmlns:p="http://schemas.openxmlformats.org/presentationml/2006/main">
   <p:cSld>
     <p:spTree>
@@ -32554,289 +32741,6 @@
 </p:sld>
 </file>
 
-<file path=ppt/slides/slide51.xml><?xml version="1.0" encoding="utf-8"?>
-<p:sld xmlns:a="http://schemas.openxmlformats.org/drawingml/2006/main" xmlns:r="http://schemas.openxmlformats.org/officeDocument/2006/relationships" xmlns:p="http://schemas.openxmlformats.org/presentationml/2006/main">
-  <p:cSld>
-    <p:spTree>
-      <p:nvGrpSpPr>
-        <p:cNvPr id="1" name=""/>
-        <p:cNvGrpSpPr/>
-        <p:nvPr/>
-      </p:nvGrpSpPr>
-      <p:grpSpPr>
-        <a:xfrm>
-          <a:off x="0" y="0"/>
-          <a:ext cx="0" cy="0"/>
-          <a:chOff x="0" y="0"/>
-          <a:chExt cx="0" cy="0"/>
-        </a:xfrm>
-      </p:grpSpPr>
-      <p:sp>
-        <p:nvSpPr>
-          <p:cNvPr id="2" name="Title 1"/>
-          <p:cNvSpPr>
-            <a:spLocks noGrp="1"/>
-          </p:cNvSpPr>
-          <p:nvPr>
-            <p:ph type="title"/>
-          </p:nvPr>
-        </p:nvSpPr>
-        <p:spPr/>
-        <p:txBody>
-          <a:bodyPr/>
-          <a:lstStyle/>
-          <a:p>
-            <a:r>
-              <a:rPr lang="en-US" dirty="0"/>
-              <a:t>Appendix: Commands</a:t>
-            </a:r>
-          </a:p>
-        </p:txBody>
-      </p:sp>
-      <p:sp>
-        <p:nvSpPr>
-          <p:cNvPr id="3" name="Content Placeholder 2"/>
-          <p:cNvSpPr>
-            <a:spLocks noGrp="1"/>
-          </p:cNvSpPr>
-          <p:nvPr>
-            <p:ph idx="1"/>
-          </p:nvPr>
-        </p:nvSpPr>
-        <p:spPr/>
-        <p:txBody>
-          <a:bodyPr/>
-          <a:lstStyle/>
-          <a:p>
-            <a:r>
-              <a:rPr lang="en-US" dirty="0"/>
-              <a:t>DBCC TRACEON / TRACEOFF</a:t>
-            </a:r>
-          </a:p>
-          <a:p>
-            <a:r>
-              <a:rPr lang="en-US" dirty="0"/>
-              <a:t>DBCC RULEON / RULEOFF</a:t>
-            </a:r>
-          </a:p>
-          <a:p>
-            <a:r>
-              <a:rPr lang="en-US" dirty="0"/>
-              <a:t>DBCC SHOWONRULES</a:t>
-            </a:r>
-          </a:p>
-          <a:p>
-            <a:r>
-              <a:rPr lang="en-US" dirty="0"/>
-              <a:t>DBCC SHOWOFFRULES</a:t>
-            </a:r>
-          </a:p>
-          <a:p>
-            <a:r>
-              <a:rPr lang="en-US" dirty="0"/>
-              <a:t>option (recompile, </a:t>
-            </a:r>
-            <a:r>
-              <a:rPr lang="en-US" dirty="0" err="1"/>
-              <a:t>querytraceon</a:t>
-            </a:r>
-            <a:r>
-              <a:rPr lang="en-US" dirty="0"/>
-              <a:t> ####)</a:t>
-            </a:r>
-          </a:p>
-          <a:p>
-            <a:r>
-              <a:rPr lang="en-US" dirty="0" err="1"/>
-              <a:t>sys.dm_exec_query_optimizer_info</a:t>
-            </a:r>
-            <a:endParaRPr lang="en-US" dirty="0"/>
-          </a:p>
-          <a:p>
-            <a:r>
-              <a:rPr lang="en-US" dirty="0" err="1"/>
-              <a:t>sys.dm_exec_query_transformation_stats</a:t>
-            </a:r>
-            <a:endParaRPr lang="en-US" dirty="0"/>
-          </a:p>
-        </p:txBody>
-      </p:sp>
-    </p:spTree>
-    <p:extLst>
-      <p:ext uri="{BB962C8B-B14F-4D97-AF65-F5344CB8AC3E}">
-        <p14:creationId xmlns:p14="http://schemas.microsoft.com/office/powerpoint/2010/main" val="400255049"/>
-      </p:ext>
-    </p:extLst>
-  </p:cSld>
-  <p:clrMapOvr>
-    <a:masterClrMapping/>
-  </p:clrMapOvr>
-</p:sld>
-</file>
-
-<file path=ppt/slides/slide52.xml><?xml version="1.0" encoding="utf-8"?>
-<p:sld xmlns:a="http://schemas.openxmlformats.org/drawingml/2006/main" xmlns:r="http://schemas.openxmlformats.org/officeDocument/2006/relationships" xmlns:p="http://schemas.openxmlformats.org/presentationml/2006/main">
-  <p:cSld>
-    <p:spTree>
-      <p:nvGrpSpPr>
-        <p:cNvPr id="1" name=""/>
-        <p:cNvGrpSpPr/>
-        <p:nvPr/>
-      </p:nvGrpSpPr>
-      <p:grpSpPr>
-        <a:xfrm>
-          <a:off x="0" y="0"/>
-          <a:ext cx="0" cy="0"/>
-          <a:chOff x="0" y="0"/>
-          <a:chExt cx="0" cy="0"/>
-        </a:xfrm>
-      </p:grpSpPr>
-      <p:sp>
-        <p:nvSpPr>
-          <p:cNvPr id="2" name="Title 1"/>
-          <p:cNvSpPr>
-            <a:spLocks noGrp="1"/>
-          </p:cNvSpPr>
-          <p:nvPr>
-            <p:ph type="title"/>
-          </p:nvPr>
-        </p:nvSpPr>
-        <p:spPr/>
-        <p:txBody>
-          <a:bodyPr/>
-          <a:lstStyle/>
-          <a:p>
-            <a:r>
-              <a:rPr lang="en-US" dirty="0"/>
-              <a:t>Appendix: History of SQL’s Optimizer</a:t>
-            </a:r>
-          </a:p>
-        </p:txBody>
-      </p:sp>
-      <p:sp>
-        <p:nvSpPr>
-          <p:cNvPr id="3" name="Content Placeholder 2"/>
-          <p:cNvSpPr>
-            <a:spLocks noGrp="1"/>
-          </p:cNvSpPr>
-          <p:nvPr>
-            <p:ph idx="1"/>
-          </p:nvPr>
-        </p:nvSpPr>
-        <p:spPr/>
-        <p:txBody>
-          <a:bodyPr/>
-          <a:lstStyle/>
-          <a:p>
-            <a:r>
-              <a:rPr lang="en-US" dirty="0"/>
-              <a:t>Volcano Optimizer (April 1993) (</a:t>
-            </a:r>
-            <a:r>
-              <a:rPr lang="en-US" dirty="0">
-                <a:hlinkClick r:id="rId2"/>
-              </a:rPr>
-              <a:t>PDF</a:t>
-            </a:r>
-            <a:r>
-              <a:rPr lang="en-US" dirty="0"/>
-              <a:t>)</a:t>
-            </a:r>
-          </a:p>
-          <a:p>
-            <a:pPr lvl="1"/>
-            <a:r>
-              <a:rPr lang="en-US" dirty="0"/>
-              <a:t>Goetz </a:t>
-            </a:r>
-            <a:r>
-              <a:rPr lang="en-US" dirty="0" err="1"/>
-              <a:t>Graefe</a:t>
-            </a:r>
-            <a:r>
-              <a:rPr lang="en-US" dirty="0"/>
-              <a:t>, William J. McKenna</a:t>
-            </a:r>
-          </a:p>
-          <a:p>
-            <a:pPr lvl="1"/>
-            <a:r>
-              <a:rPr lang="en-US" dirty="0"/>
-              <a:t>Based on </a:t>
-            </a:r>
-            <a:r>
-              <a:rPr lang="en-US" dirty="0" err="1"/>
-              <a:t>Graefe’s</a:t>
-            </a:r>
-            <a:r>
-              <a:rPr lang="en-US" dirty="0"/>
-              <a:t> earlier Exodus Optimizer</a:t>
-            </a:r>
-          </a:p>
-          <a:p>
-            <a:r>
-              <a:rPr lang="en-US" dirty="0"/>
-              <a:t>Cascades Framework (1995) (</a:t>
-            </a:r>
-            <a:r>
-              <a:rPr lang="en-US" dirty="0">
-                <a:hlinkClick r:id="rId3"/>
-              </a:rPr>
-              <a:t>PDF</a:t>
-            </a:r>
-            <a:r>
-              <a:rPr lang="en-US" dirty="0"/>
-              <a:t>)</a:t>
-            </a:r>
-          </a:p>
-          <a:p>
-            <a:pPr lvl="1"/>
-            <a:r>
-              <a:rPr lang="en-US" dirty="0"/>
-              <a:t>Goetz </a:t>
-            </a:r>
-            <a:r>
-              <a:rPr lang="en-US" dirty="0" err="1"/>
-              <a:t>Graefe</a:t>
-            </a:r>
-            <a:endParaRPr lang="en-US" dirty="0"/>
-          </a:p>
-          <a:p>
-            <a:pPr lvl="1"/>
-            <a:r>
-              <a:rPr lang="en-US" dirty="0"/>
-              <a:t>Refinement of the Volcano Optimizer</a:t>
-            </a:r>
-          </a:p>
-          <a:p>
-            <a:pPr lvl="1"/>
-            <a:r>
-              <a:rPr lang="en-US" dirty="0"/>
-              <a:t>Basis for rewritten optimizer in SQL Server 7.0</a:t>
-            </a:r>
-          </a:p>
-          <a:p>
-            <a:pPr lvl="1"/>
-            <a:r>
-              <a:rPr lang="en-US" dirty="0"/>
-              <a:t>Major innovation: the memo structure</a:t>
-            </a:r>
-          </a:p>
-        </p:txBody>
-      </p:sp>
-    </p:spTree>
-    <p:extLst>
-      <p:ext uri="{BB962C8B-B14F-4D97-AF65-F5344CB8AC3E}">
-        <p14:creationId xmlns:p14="http://schemas.microsoft.com/office/powerpoint/2010/main" val="4044722762"/>
-      </p:ext>
-    </p:extLst>
-  </p:cSld>
-  <p:clrMapOvr>
-    <a:masterClrMapping/>
-  </p:clrMapOvr>
-</p:sld>
-</file>
-
 <file path=ppt/slides/slide53.xml><?xml version="1.0" encoding="utf-8"?>
 <p:sld xmlns:a="http://schemas.openxmlformats.org/drawingml/2006/main" xmlns:r="http://schemas.openxmlformats.org/officeDocument/2006/relationships" xmlns:p="http://schemas.openxmlformats.org/presentationml/2006/main">
   <p:cSld>
@@ -32871,6 +32775,289 @@
           <a:p>
             <a:r>
               <a:rPr lang="en-US" dirty="0"/>
+              <a:t>Appendix: Commands</a:t>
+            </a:r>
+          </a:p>
+        </p:txBody>
+      </p:sp>
+      <p:sp>
+        <p:nvSpPr>
+          <p:cNvPr id="3" name="Content Placeholder 2"/>
+          <p:cNvSpPr>
+            <a:spLocks noGrp="1"/>
+          </p:cNvSpPr>
+          <p:nvPr>
+            <p:ph idx="1"/>
+          </p:nvPr>
+        </p:nvSpPr>
+        <p:spPr/>
+        <p:txBody>
+          <a:bodyPr/>
+          <a:lstStyle/>
+          <a:p>
+            <a:r>
+              <a:rPr lang="en-US" dirty="0"/>
+              <a:t>DBCC TRACEON / TRACEOFF</a:t>
+            </a:r>
+          </a:p>
+          <a:p>
+            <a:r>
+              <a:rPr lang="en-US" dirty="0"/>
+              <a:t>DBCC RULEON / RULEOFF</a:t>
+            </a:r>
+          </a:p>
+          <a:p>
+            <a:r>
+              <a:rPr lang="en-US" dirty="0"/>
+              <a:t>DBCC SHOWONRULES</a:t>
+            </a:r>
+          </a:p>
+          <a:p>
+            <a:r>
+              <a:rPr lang="en-US" dirty="0"/>
+              <a:t>DBCC SHOWOFFRULES</a:t>
+            </a:r>
+          </a:p>
+          <a:p>
+            <a:r>
+              <a:rPr lang="en-US" dirty="0"/>
+              <a:t>option (recompile, </a:t>
+            </a:r>
+            <a:r>
+              <a:rPr lang="en-US" dirty="0" err="1"/>
+              <a:t>querytraceon</a:t>
+            </a:r>
+            <a:r>
+              <a:rPr lang="en-US" dirty="0"/>
+              <a:t> ####)</a:t>
+            </a:r>
+          </a:p>
+          <a:p>
+            <a:r>
+              <a:rPr lang="en-US" dirty="0" err="1"/>
+              <a:t>sys.dm_exec_query_optimizer_info</a:t>
+            </a:r>
+            <a:endParaRPr lang="en-US" dirty="0"/>
+          </a:p>
+          <a:p>
+            <a:r>
+              <a:rPr lang="en-US" dirty="0" err="1"/>
+              <a:t>sys.dm_exec_query_transformation_stats</a:t>
+            </a:r>
+            <a:endParaRPr lang="en-US" dirty="0"/>
+          </a:p>
+        </p:txBody>
+      </p:sp>
+    </p:spTree>
+    <p:extLst>
+      <p:ext uri="{BB962C8B-B14F-4D97-AF65-F5344CB8AC3E}">
+        <p14:creationId xmlns:p14="http://schemas.microsoft.com/office/powerpoint/2010/main" val="400255049"/>
+      </p:ext>
+    </p:extLst>
+  </p:cSld>
+  <p:clrMapOvr>
+    <a:masterClrMapping/>
+  </p:clrMapOvr>
+</p:sld>
+</file>
+
+<file path=ppt/slides/slide54.xml><?xml version="1.0" encoding="utf-8"?>
+<p:sld xmlns:a="http://schemas.openxmlformats.org/drawingml/2006/main" xmlns:r="http://schemas.openxmlformats.org/officeDocument/2006/relationships" xmlns:p="http://schemas.openxmlformats.org/presentationml/2006/main">
+  <p:cSld>
+    <p:spTree>
+      <p:nvGrpSpPr>
+        <p:cNvPr id="1" name=""/>
+        <p:cNvGrpSpPr/>
+        <p:nvPr/>
+      </p:nvGrpSpPr>
+      <p:grpSpPr>
+        <a:xfrm>
+          <a:off x="0" y="0"/>
+          <a:ext cx="0" cy="0"/>
+          <a:chOff x="0" y="0"/>
+          <a:chExt cx="0" cy="0"/>
+        </a:xfrm>
+      </p:grpSpPr>
+      <p:sp>
+        <p:nvSpPr>
+          <p:cNvPr id="2" name="Title 1"/>
+          <p:cNvSpPr>
+            <a:spLocks noGrp="1"/>
+          </p:cNvSpPr>
+          <p:nvPr>
+            <p:ph type="title"/>
+          </p:nvPr>
+        </p:nvSpPr>
+        <p:spPr/>
+        <p:txBody>
+          <a:bodyPr/>
+          <a:lstStyle/>
+          <a:p>
+            <a:r>
+              <a:rPr lang="en-US" dirty="0"/>
+              <a:t>Appendix: History of SQL’s Optimizer</a:t>
+            </a:r>
+          </a:p>
+        </p:txBody>
+      </p:sp>
+      <p:sp>
+        <p:nvSpPr>
+          <p:cNvPr id="3" name="Content Placeholder 2"/>
+          <p:cNvSpPr>
+            <a:spLocks noGrp="1"/>
+          </p:cNvSpPr>
+          <p:nvPr>
+            <p:ph idx="1"/>
+          </p:nvPr>
+        </p:nvSpPr>
+        <p:spPr/>
+        <p:txBody>
+          <a:bodyPr/>
+          <a:lstStyle/>
+          <a:p>
+            <a:r>
+              <a:rPr lang="en-US" dirty="0"/>
+              <a:t>Volcano Optimizer (April 1993) (</a:t>
+            </a:r>
+            <a:r>
+              <a:rPr lang="en-US" dirty="0">
+                <a:hlinkClick r:id="rId2"/>
+              </a:rPr>
+              <a:t>PDF</a:t>
+            </a:r>
+            <a:r>
+              <a:rPr lang="en-US" dirty="0"/>
+              <a:t>)</a:t>
+            </a:r>
+          </a:p>
+          <a:p>
+            <a:pPr lvl="1"/>
+            <a:r>
+              <a:rPr lang="en-US" dirty="0"/>
+              <a:t>Goetz </a:t>
+            </a:r>
+            <a:r>
+              <a:rPr lang="en-US" dirty="0" err="1"/>
+              <a:t>Graefe</a:t>
+            </a:r>
+            <a:r>
+              <a:rPr lang="en-US" dirty="0"/>
+              <a:t>, William J. McKenna</a:t>
+            </a:r>
+          </a:p>
+          <a:p>
+            <a:pPr lvl="1"/>
+            <a:r>
+              <a:rPr lang="en-US" dirty="0"/>
+              <a:t>Based on </a:t>
+            </a:r>
+            <a:r>
+              <a:rPr lang="en-US" dirty="0" err="1"/>
+              <a:t>Graefe’s</a:t>
+            </a:r>
+            <a:r>
+              <a:rPr lang="en-US" dirty="0"/>
+              <a:t> earlier Exodus Optimizer</a:t>
+            </a:r>
+          </a:p>
+          <a:p>
+            <a:r>
+              <a:rPr lang="en-US" dirty="0"/>
+              <a:t>Cascades Framework (1995) (</a:t>
+            </a:r>
+            <a:r>
+              <a:rPr lang="en-US" dirty="0">
+                <a:hlinkClick r:id="rId3"/>
+              </a:rPr>
+              <a:t>PDF</a:t>
+            </a:r>
+            <a:r>
+              <a:rPr lang="en-US" dirty="0"/>
+              <a:t>)</a:t>
+            </a:r>
+          </a:p>
+          <a:p>
+            <a:pPr lvl="1"/>
+            <a:r>
+              <a:rPr lang="en-US" dirty="0"/>
+              <a:t>Goetz </a:t>
+            </a:r>
+            <a:r>
+              <a:rPr lang="en-US" dirty="0" err="1"/>
+              <a:t>Graefe</a:t>
+            </a:r>
+            <a:endParaRPr lang="en-US" dirty="0"/>
+          </a:p>
+          <a:p>
+            <a:pPr lvl="1"/>
+            <a:r>
+              <a:rPr lang="en-US" dirty="0"/>
+              <a:t>Refinement of the Volcano Optimizer</a:t>
+            </a:r>
+          </a:p>
+          <a:p>
+            <a:pPr lvl="1"/>
+            <a:r>
+              <a:rPr lang="en-US" dirty="0"/>
+              <a:t>Basis for rewritten optimizer in SQL Server 7.0</a:t>
+            </a:r>
+          </a:p>
+          <a:p>
+            <a:pPr lvl="1"/>
+            <a:r>
+              <a:rPr lang="en-US" dirty="0"/>
+              <a:t>Major innovation: the memo structure</a:t>
+            </a:r>
+          </a:p>
+        </p:txBody>
+      </p:sp>
+    </p:spTree>
+    <p:extLst>
+      <p:ext uri="{BB962C8B-B14F-4D97-AF65-F5344CB8AC3E}">
+        <p14:creationId xmlns:p14="http://schemas.microsoft.com/office/powerpoint/2010/main" val="4044722762"/>
+      </p:ext>
+    </p:extLst>
+  </p:cSld>
+  <p:clrMapOvr>
+    <a:masterClrMapping/>
+  </p:clrMapOvr>
+</p:sld>
+</file>
+
+<file path=ppt/slides/slide55.xml><?xml version="1.0" encoding="utf-8"?>
+<p:sld xmlns:a="http://schemas.openxmlformats.org/drawingml/2006/main" xmlns:r="http://schemas.openxmlformats.org/officeDocument/2006/relationships" xmlns:p="http://schemas.openxmlformats.org/presentationml/2006/main">
+  <p:cSld>
+    <p:spTree>
+      <p:nvGrpSpPr>
+        <p:cNvPr id="1" name=""/>
+        <p:cNvGrpSpPr/>
+        <p:nvPr/>
+      </p:nvGrpSpPr>
+      <p:grpSpPr>
+        <a:xfrm>
+          <a:off x="0" y="0"/>
+          <a:ext cx="0" cy="0"/>
+          <a:chOff x="0" y="0"/>
+          <a:chExt cx="0" cy="0"/>
+        </a:xfrm>
+      </p:grpSpPr>
+      <p:sp>
+        <p:nvSpPr>
+          <p:cNvPr id="2" name="Title 1"/>
+          <p:cNvSpPr>
+            <a:spLocks noGrp="1"/>
+          </p:cNvSpPr>
+          <p:nvPr>
+            <p:ph type="title"/>
+          </p:nvPr>
+        </p:nvSpPr>
+        <p:spPr/>
+        <p:txBody>
+          <a:bodyPr/>
+          <a:lstStyle/>
+          <a:p>
+            <a:r>
+              <a:rPr lang="en-US" dirty="0"/>
               <a:t>References</a:t>
             </a:r>
           </a:p>
@@ -33004,7 +33191,7 @@
 </p:sld>
 </file>
 
-<file path=ppt/slides/slide54.xml><?xml version="1.0" encoding="utf-8"?>
+<file path=ppt/slides/slide56.xml><?xml version="1.0" encoding="utf-8"?>
 <p:sld xmlns:a="http://schemas.openxmlformats.org/drawingml/2006/main" xmlns:r="http://schemas.openxmlformats.org/officeDocument/2006/relationships" xmlns:p="http://schemas.openxmlformats.org/presentationml/2006/main">
   <p:cSld>
     <p:spTree>

</xml_diff>

<commit_message>
Improvements to logical processing order walkthrough.
</commit_message>
<xml_diff>
--- a/Optimizer.pptx
+++ b/Optimizer.pptx
@@ -22,8 +22,8 @@
     <p:sldId id="258" r:id="rId13"/>
     <p:sldId id="264" r:id="rId14"/>
     <p:sldId id="265" r:id="rId15"/>
-    <p:sldId id="266" r:id="rId16"/>
-    <p:sldId id="267" r:id="rId17"/>
+    <p:sldId id="267" r:id="rId16"/>
+    <p:sldId id="266" r:id="rId17"/>
     <p:sldId id="268" r:id="rId18"/>
     <p:sldId id="269" r:id="rId19"/>
     <p:sldId id="270" r:id="rId20"/>
@@ -674,11 +674,11 @@
           <a:p>
             <a:r>
               <a:rPr lang="en-US" dirty="0"/>
-              <a:t>A trivial plan is one which can only be executed</a:t>
+              <a:t>Merge join generally the best performing,</a:t>
             </a:r>
             <a:r>
               <a:rPr lang="en-US" baseline="0" dirty="0"/>
-              <a:t> in one possible way.  A common example is select * from table, or select * from table where col = value (if there are no index on “col”).  The query can be relatively complex, but only contain one table.  Having a subquery or a an inequality predicate automatically make the query non-trivial.  Trivial plans can be avoided using TF8757.</a:t>
+              <a:t> but requires sorted input on join columns.  Only valid for equijoins.</a:t>
             </a:r>
           </a:p>
           <a:p>
@@ -687,7 +687,7 @@
           <a:p>
             <a:r>
               <a:rPr lang="en-US" baseline="0" dirty="0"/>
-              <a:t>The Optimization Level property on a query plan will be “Trivial” or “Full”</a:t>
+              <a:t>Nested loops best when inputs are of significantly different size.  Only join operator that works for joins using inequalities.</a:t>
             </a:r>
           </a:p>
           <a:p>
@@ -696,14 +696,9 @@
           <a:p>
             <a:r>
               <a:rPr lang="en-US" baseline="0" dirty="0"/>
-              <a:t>The concept of Statistics and Cardinality Estimation is a complex topic to itself.  It is important to note that the CE underwent a significant re-write starting in SQL Server 2014 which can lead to very different plans being selected.</a:t>
-            </a:r>
-          </a:p>
-          <a:p>
-            <a:endParaRPr lang="en-US" baseline="0" dirty="0"/>
-          </a:p>
-          <a:p>
-            <a:endParaRPr lang="en-US" baseline="0" dirty="0"/>
+              <a:t>Hash join works well with large inputs without sorted input, but is only valid for equijoins.</a:t>
+            </a:r>
+            <a:endParaRPr lang="en-US" dirty="0"/>
           </a:p>
         </p:txBody>
       </p:sp>
@@ -724,7 +719,7 @@
           <a:p>
             <a:fld id="{ADDBA41D-AE03-4F1C-B074-B56312AFAE46}" type="slidenum">
               <a:rPr lang="en-US" smtClean="0"/>
-              <a:t>29</a:t>
+              <a:t>26</a:t>
             </a:fld>
             <a:endParaRPr lang="en-US"/>
           </a:p>
@@ -733,7 +728,7 @@
     </p:spTree>
     <p:extLst>
       <p:ext uri="{BB962C8B-B14F-4D97-AF65-F5344CB8AC3E}">
-        <p14:creationId xmlns:p14="http://schemas.microsoft.com/office/powerpoint/2010/main" val="3612119290"/>
+        <p14:creationId xmlns:p14="http://schemas.microsoft.com/office/powerpoint/2010/main" val="611840543"/>
       </p:ext>
     </p:extLst>
   </p:cSld>
@@ -789,11 +784,28 @@
           <a:p>
             <a:r>
               <a:rPr lang="en-US" dirty="0"/>
-              <a:t>Point out that in reality, there will be fewer than 25,920 plans because of logical</a:t>
+              <a:t>Constant folding refers to pre-computing as much of an expression as possible, for example: 2 * pi() * radius</a:t>
             </a:r>
             <a:r>
               <a:rPr lang="en-US" baseline="0" dirty="0"/>
-              <a:t> limitations.  For instance, if a join condition is not an equality, a merge join and hash join are not possible.</a:t>
+              <a:t> =&gt; 6.28319 * radius</a:t>
+            </a:r>
+            <a:endParaRPr lang="en-US" dirty="0"/>
+          </a:p>
+          <a:p>
+            <a:r>
+              <a:rPr lang="en-US" dirty="0"/>
+              <a:t>As an</a:t>
+            </a:r>
+            <a:r>
+              <a:rPr lang="en-US" baseline="0" dirty="0"/>
+              <a:t> example, data type resolution with the UNION operator will ensure that data types between the upper expression are compatible with the lower expression.</a:t>
+            </a:r>
+          </a:p>
+          <a:p>
+            <a:r>
+              <a:rPr lang="en-US" baseline="0" dirty="0"/>
+              <a:t>Aggregate binding checks if invalid columns are referenced downstream of the GROUP BY logical processing step.</a:t>
             </a:r>
             <a:endParaRPr lang="en-US" dirty="0"/>
           </a:p>
@@ -816,7 +828,7 @@
           <a:p>
             <a:fld id="{ADDBA41D-AE03-4F1C-B074-B56312AFAE46}" type="slidenum">
               <a:rPr lang="en-US" smtClean="0"/>
-              <a:t>35</a:t>
+              <a:t>28</a:t>
             </a:fld>
             <a:endParaRPr lang="en-US"/>
           </a:p>
@@ -825,7 +837,7 @@
     </p:spTree>
     <p:extLst>
       <p:ext uri="{BB962C8B-B14F-4D97-AF65-F5344CB8AC3E}">
-        <p14:creationId xmlns:p14="http://schemas.microsoft.com/office/powerpoint/2010/main" val="1734029549"/>
+        <p14:creationId xmlns:p14="http://schemas.microsoft.com/office/powerpoint/2010/main" val="2197873287"/>
       </p:ext>
     </p:extLst>
   </p:cSld>
@@ -879,7 +891,38 @@
           <a:bodyPr/>
           <a:lstStyle/>
           <a:p>
-            <a:endParaRPr lang="en-US" dirty="0"/>
+            <a:r>
+              <a:rPr lang="en-US" dirty="0"/>
+              <a:t>A trivial plan is one which can only be executed</a:t>
+            </a:r>
+            <a:r>
+              <a:rPr lang="en-US" baseline="0" dirty="0"/>
+              <a:t> in one possible way.  A common example is select * from table, or select * from table where col = value (if there are no index on “col”).  The query can be relatively complex, but only contain one table.  Having a subquery or a an inequality predicate automatically make the query non-trivial.  Trivial plans can be avoided using TF8757.</a:t>
+            </a:r>
+          </a:p>
+          <a:p>
+            <a:endParaRPr lang="en-US" baseline="0" dirty="0"/>
+          </a:p>
+          <a:p>
+            <a:r>
+              <a:rPr lang="en-US" baseline="0" dirty="0"/>
+              <a:t>The Optimization Level property on a query plan will be “Trivial” or “Full”</a:t>
+            </a:r>
+          </a:p>
+          <a:p>
+            <a:endParaRPr lang="en-US" baseline="0" dirty="0"/>
+          </a:p>
+          <a:p>
+            <a:r>
+              <a:rPr lang="en-US" baseline="0" dirty="0"/>
+              <a:t>The concept of Statistics and Cardinality Estimation is a complex topic to itself.  It is important to note that the CE underwent a significant re-write starting in SQL Server 2014 which can lead to very different plans being selected.</a:t>
+            </a:r>
+          </a:p>
+          <a:p>
+            <a:endParaRPr lang="en-US" baseline="0" dirty="0"/>
+          </a:p>
+          <a:p>
+            <a:endParaRPr lang="en-US" baseline="0" dirty="0"/>
           </a:p>
         </p:txBody>
       </p:sp>
@@ -900,7 +943,7 @@
           <a:p>
             <a:fld id="{ADDBA41D-AE03-4F1C-B074-B56312AFAE46}" type="slidenum">
               <a:rPr lang="en-US" smtClean="0"/>
-              <a:t>37</a:t>
+              <a:t>29</a:t>
             </a:fld>
             <a:endParaRPr lang="en-US"/>
           </a:p>
@@ -909,7 +952,7 @@
     </p:spTree>
     <p:extLst>
       <p:ext uri="{BB962C8B-B14F-4D97-AF65-F5344CB8AC3E}">
-        <p14:creationId xmlns:p14="http://schemas.microsoft.com/office/powerpoint/2010/main" val="1929112360"/>
+        <p14:creationId xmlns:p14="http://schemas.microsoft.com/office/powerpoint/2010/main" val="3612119290"/>
       </p:ext>
     </p:extLst>
   </p:cSld>
@@ -965,11 +1008,11 @@
           <a:p>
             <a:r>
               <a:rPr lang="en-US" dirty="0"/>
-              <a:t>Gain will have a value from 0 to 1, where 0 means no improvement,</a:t>
+              <a:t>Point out that in reality, there will be fewer than 25,920 plans because of logical</a:t>
             </a:r>
             <a:r>
               <a:rPr lang="en-US" baseline="0" dirty="0"/>
-              <a:t> and values approaching 1 indicate significant improvement.</a:t>
+              <a:t> limitations.  For instance, if a join condition is not an equality, a merge join and hash join are not possible.</a:t>
             </a:r>
             <a:endParaRPr lang="en-US" dirty="0"/>
           </a:p>
@@ -992,7 +1035,7 @@
           <a:p>
             <a:fld id="{ADDBA41D-AE03-4F1C-B074-B56312AFAE46}" type="slidenum">
               <a:rPr lang="en-US" smtClean="0"/>
-              <a:t>39</a:t>
+              <a:t>35</a:t>
             </a:fld>
             <a:endParaRPr lang="en-US"/>
           </a:p>
@@ -1001,7 +1044,7 @@
     </p:spTree>
     <p:extLst>
       <p:ext uri="{BB962C8B-B14F-4D97-AF65-F5344CB8AC3E}">
-        <p14:creationId xmlns:p14="http://schemas.microsoft.com/office/powerpoint/2010/main" val="194171185"/>
+        <p14:creationId xmlns:p14="http://schemas.microsoft.com/office/powerpoint/2010/main" val="1734029549"/>
       </p:ext>
     </p:extLst>
   </p:cSld>
@@ -1055,14 +1098,6 @@
           <a:bodyPr/>
           <a:lstStyle/>
           <a:p>
-            <a:r>
-              <a:rPr lang="en-US" dirty="0"/>
-              <a:t>Show</a:t>
-            </a:r>
-            <a:r>
-              <a:rPr lang="en-US" baseline="0" dirty="0"/>
-              <a:t> BOL for this DMV, then show 2005 version of BOL.</a:t>
-            </a:r>
             <a:endParaRPr lang="en-US" dirty="0"/>
           </a:p>
         </p:txBody>
@@ -1084,7 +1119,7 @@
           <a:p>
             <a:fld id="{ADDBA41D-AE03-4F1C-B074-B56312AFAE46}" type="slidenum">
               <a:rPr lang="en-US" smtClean="0"/>
-              <a:t>40</a:t>
+              <a:t>37</a:t>
             </a:fld>
             <a:endParaRPr lang="en-US"/>
           </a:p>
@@ -1093,7 +1128,7 @@
     </p:spTree>
     <p:extLst>
       <p:ext uri="{BB962C8B-B14F-4D97-AF65-F5344CB8AC3E}">
-        <p14:creationId xmlns:p14="http://schemas.microsoft.com/office/powerpoint/2010/main" val="584843494"/>
+        <p14:creationId xmlns:p14="http://schemas.microsoft.com/office/powerpoint/2010/main" val="1929112360"/>
       </p:ext>
     </p:extLst>
   </p:cSld>
@@ -1149,47 +1184,11 @@
           <a:p>
             <a:r>
               <a:rPr lang="en-US" dirty="0"/>
-              <a:t>Where the simplification rules really come into play is</a:t>
+              <a:t>Gain will have a value from 0 to 1, where 0 means no improvement,</a:t>
             </a:r>
             <a:r>
               <a:rPr lang="en-US" baseline="0" dirty="0"/>
-              <a:t> with queries that are generated by tools such as Entity Framework.</a:t>
-            </a:r>
-          </a:p>
-          <a:p>
-            <a:r>
-              <a:rPr lang="en-US" baseline="0" dirty="0"/>
-              <a:t>Other examples of simplification are</a:t>
-            </a:r>
-          </a:p>
-          <a:p>
-            <a:pPr marL="171450" indent="-171450">
-              <a:buFont typeface="Arial" panose="020B0604020202020204" pitchFamily="34" charset="0"/>
-              <a:buChar char="•"/>
-            </a:pPr>
-            <a:r>
-              <a:rPr lang="en-US" baseline="0" dirty="0"/>
-              <a:t>Select collapse (remove redundancies from WHERE clause)</a:t>
-            </a:r>
-          </a:p>
-          <a:p>
-            <a:pPr marL="171450" indent="-171450">
-              <a:buFont typeface="Arial" panose="020B0604020202020204" pitchFamily="34" charset="0"/>
-              <a:buChar char="•"/>
-            </a:pPr>
-            <a:r>
-              <a:rPr lang="en-US" baseline="0" dirty="0"/>
-              <a:t>Range simplification (multiple range predicates that can be collapsed into a single range or value)</a:t>
-            </a:r>
-          </a:p>
-          <a:p>
-            <a:pPr marL="171450" indent="-171450">
-              <a:buFont typeface="Arial" panose="020B0604020202020204" pitchFamily="34" charset="0"/>
-              <a:buChar char="•"/>
-            </a:pPr>
-            <a:r>
-              <a:rPr lang="en-US" baseline="0" dirty="0"/>
-              <a:t>Computed column matching</a:t>
+              <a:t> and values approaching 1 indicate significant improvement.</a:t>
             </a:r>
             <a:endParaRPr lang="en-US" dirty="0"/>
           </a:p>
@@ -1212,7 +1211,7 @@
           <a:p>
             <a:fld id="{ADDBA41D-AE03-4F1C-B074-B56312AFAE46}" type="slidenum">
               <a:rPr lang="en-US" smtClean="0"/>
-              <a:t>42</a:t>
+              <a:t>39</a:t>
             </a:fld>
             <a:endParaRPr lang="en-US"/>
           </a:p>
@@ -1221,7 +1220,7 @@
     </p:spTree>
     <p:extLst>
       <p:ext uri="{BB962C8B-B14F-4D97-AF65-F5344CB8AC3E}">
-        <p14:creationId xmlns:p14="http://schemas.microsoft.com/office/powerpoint/2010/main" val="2879536405"/>
+        <p14:creationId xmlns:p14="http://schemas.microsoft.com/office/powerpoint/2010/main" val="194171185"/>
       </p:ext>
     </p:extLst>
   </p:cSld>
@@ -1277,36 +1276,11 @@
           <a:p>
             <a:r>
               <a:rPr lang="en-US" dirty="0"/>
-              <a:t>Unlike </a:t>
-            </a:r>
-            <a:r>
-              <a:rPr lang="en-US" dirty="0" err="1"/>
-              <a:t>sys.dm_exec_query_optimizer_info</a:t>
-            </a:r>
-            <a:r>
-              <a:rPr lang="en-US" dirty="0"/>
-              <a:t>,</a:t>
+              <a:t>Show</a:t>
             </a:r>
             <a:r>
               <a:rPr lang="en-US" baseline="0" dirty="0"/>
-              <a:t> this one is completely undocumented.</a:t>
-            </a:r>
-          </a:p>
-          <a:p>
-            <a:endParaRPr lang="en-US" baseline="0" dirty="0"/>
-          </a:p>
-          <a:p>
-            <a:r>
-              <a:rPr lang="en-US" baseline="0" dirty="0"/>
-              <a:t>“Promise” values are, presumably, </a:t>
-            </a:r>
-            <a:r>
-              <a:rPr lang="en-US" baseline="0" dirty="0" err="1"/>
-              <a:t>unitless</a:t>
-            </a:r>
-            <a:r>
-              <a:rPr lang="en-US" baseline="0" dirty="0"/>
-              <a:t>.</a:t>
+              <a:t> BOL for this DMV, then show 2005 version of BOL.</a:t>
             </a:r>
             <a:endParaRPr lang="en-US" dirty="0"/>
           </a:p>
@@ -1329,7 +1303,7 @@
           <a:p>
             <a:fld id="{ADDBA41D-AE03-4F1C-B074-B56312AFAE46}" type="slidenum">
               <a:rPr lang="en-US" smtClean="0"/>
-              <a:t>46</a:t>
+              <a:t>40</a:t>
             </a:fld>
             <a:endParaRPr lang="en-US"/>
           </a:p>
@@ -1338,7 +1312,7 @@
     </p:spTree>
     <p:extLst>
       <p:ext uri="{BB962C8B-B14F-4D97-AF65-F5344CB8AC3E}">
-        <p14:creationId xmlns:p14="http://schemas.microsoft.com/office/powerpoint/2010/main" val="2312008963"/>
+        <p14:creationId xmlns:p14="http://schemas.microsoft.com/office/powerpoint/2010/main" val="584843494"/>
       </p:ext>
     </p:extLst>
   </p:cSld>
@@ -1394,20 +1368,47 @@
           <a:p>
             <a:r>
               <a:rPr lang="en-US" dirty="0"/>
-              <a:t>Supposedly at one time there was a developer at Microsoft</a:t>
+              <a:t>Where the simplification rules really come into play is</a:t>
             </a:r>
             <a:r>
               <a:rPr lang="en-US" baseline="0" dirty="0"/>
-              <a:t> by the name of Nick who based the cost units on his development PC.  Now completely meaningless except (perhaps) to compare queries.  Not really.  May not even be valid comparison within a query.</a:t>
-            </a:r>
-          </a:p>
-          <a:p>
-            <a:endParaRPr lang="en-US" baseline="0" dirty="0"/>
+              <a:t> with queries that are generated by tools such as Entity Framework.</a:t>
+            </a:r>
           </a:p>
           <a:p>
             <a:r>
               <a:rPr lang="en-US" baseline="0" dirty="0"/>
-              <a:t>Costing doesn’t account for modern hardware.  (Story about DR exercise in Iowa City).  Is the I/O subsystem a USB 1.1 drive or a PCI solid state card?</a:t>
+              <a:t>Other examples of simplification are</a:t>
+            </a:r>
+          </a:p>
+          <a:p>
+            <a:pPr marL="171450" indent="-171450">
+              <a:buFont typeface="Arial" panose="020B0604020202020204" pitchFamily="34" charset="0"/>
+              <a:buChar char="•"/>
+            </a:pPr>
+            <a:r>
+              <a:rPr lang="en-US" baseline="0" dirty="0"/>
+              <a:t>Select collapse (remove redundancies from WHERE clause)</a:t>
+            </a:r>
+          </a:p>
+          <a:p>
+            <a:pPr marL="171450" indent="-171450">
+              <a:buFont typeface="Arial" panose="020B0604020202020204" pitchFamily="34" charset="0"/>
+              <a:buChar char="•"/>
+            </a:pPr>
+            <a:r>
+              <a:rPr lang="en-US" baseline="0" dirty="0"/>
+              <a:t>Range simplification (multiple range predicates that can be collapsed into a single range or value)</a:t>
+            </a:r>
+          </a:p>
+          <a:p>
+            <a:pPr marL="171450" indent="-171450">
+              <a:buFont typeface="Arial" panose="020B0604020202020204" pitchFamily="34" charset="0"/>
+              <a:buChar char="•"/>
+            </a:pPr>
+            <a:r>
+              <a:rPr lang="en-US" baseline="0" dirty="0"/>
+              <a:t>Computed column matching</a:t>
             </a:r>
             <a:endParaRPr lang="en-US" dirty="0"/>
           </a:p>
@@ -1430,7 +1431,7 @@
           <a:p>
             <a:fld id="{ADDBA41D-AE03-4F1C-B074-B56312AFAE46}" type="slidenum">
               <a:rPr lang="en-US" smtClean="0"/>
-              <a:t>47</a:t>
+              <a:t>42</a:t>
             </a:fld>
             <a:endParaRPr lang="en-US"/>
           </a:p>
@@ -1439,7 +1440,7 @@
     </p:spTree>
     <p:extLst>
       <p:ext uri="{BB962C8B-B14F-4D97-AF65-F5344CB8AC3E}">
-        <p14:creationId xmlns:p14="http://schemas.microsoft.com/office/powerpoint/2010/main" val="962921486"/>
+        <p14:creationId xmlns:p14="http://schemas.microsoft.com/office/powerpoint/2010/main" val="2879536405"/>
       </p:ext>
     </p:extLst>
   </p:cSld>
@@ -1495,11 +1496,19 @@
           <a:p>
             <a:r>
               <a:rPr lang="en-US" dirty="0"/>
-              <a:t>After</a:t>
+              <a:t>Unlike </a:t>
+            </a:r>
+            <a:r>
+              <a:rPr lang="en-US" dirty="0" err="1"/>
+              <a:t>sys.dm_exec_query_optimizer_info</a:t>
+            </a:r>
+            <a:r>
+              <a:rPr lang="en-US" dirty="0"/>
+              <a:t>,</a:t>
             </a:r>
             <a:r>
               <a:rPr lang="en-US" baseline="0" dirty="0"/>
-              <a:t> this slide, type in a demo!</a:t>
+              <a:t> this one is completely undocumented.</a:t>
             </a:r>
           </a:p>
           <a:p>
@@ -1508,7 +1517,15 @@
           <a:p>
             <a:r>
               <a:rPr lang="en-US" baseline="0" dirty="0"/>
-              <a:t>Then run through Parse Trees demo script.</a:t>
+              <a:t>“Promise” values are, presumably, </a:t>
+            </a:r>
+            <a:r>
+              <a:rPr lang="en-US" baseline="0" dirty="0" err="1"/>
+              <a:t>unitless</a:t>
+            </a:r>
+            <a:r>
+              <a:rPr lang="en-US" baseline="0" dirty="0"/>
+              <a:t>.</a:t>
             </a:r>
             <a:endParaRPr lang="en-US" dirty="0"/>
           </a:p>
@@ -1531,7 +1548,7 @@
           <a:p>
             <a:fld id="{ADDBA41D-AE03-4F1C-B074-B56312AFAE46}" type="slidenum">
               <a:rPr lang="en-US" smtClean="0"/>
-              <a:t>49</a:t>
+              <a:t>46</a:t>
             </a:fld>
             <a:endParaRPr lang="en-US"/>
           </a:p>
@@ -1540,7 +1557,7 @@
     </p:spTree>
     <p:extLst>
       <p:ext uri="{BB962C8B-B14F-4D97-AF65-F5344CB8AC3E}">
-        <p14:creationId xmlns:p14="http://schemas.microsoft.com/office/powerpoint/2010/main" val="2482227221"/>
+        <p14:creationId xmlns:p14="http://schemas.microsoft.com/office/powerpoint/2010/main" val="2312008963"/>
       </p:ext>
     </p:extLst>
   </p:cSld>
@@ -1596,29 +1613,21 @@
           <a:p>
             <a:r>
               <a:rPr lang="en-US" dirty="0"/>
-              <a:t>One copy of the memo structure is created for each optimization and is then destroyed when optimization is completed.</a:t>
-            </a:r>
-          </a:p>
-          <a:p>
-            <a:r>
-              <a:rPr lang="en-US" dirty="0"/>
-              <a:t>Alternatives can be either</a:t>
+              <a:t>Supposedly at one time there was a developer at Microsoft</a:t>
             </a:r>
             <a:r>
               <a:rPr lang="en-US" baseline="0" dirty="0"/>
-              <a:t> logical or physical.</a:t>
-            </a:r>
+              <a:t> by the name of Nick who based the cost units on his development PC.  Now completely meaningless except (perhaps) to compare queries.  Not really.  May not even be valid comparison within a query.</a:t>
+            </a:r>
+          </a:p>
+          <a:p>
+            <a:endParaRPr lang="en-US" baseline="0" dirty="0"/>
           </a:p>
           <a:p>
             <a:r>
               <a:rPr lang="en-US" baseline="0" dirty="0"/>
-              <a:t>New groups can be created as options are explored.</a:t>
-            </a:r>
-          </a:p>
-          <a:p>
-            <a:endParaRPr lang="en-US" baseline="0" dirty="0"/>
-          </a:p>
-          <a:p>
+              <a:t>Costing doesn’t account for modern hardware.  (Story about DR exercise in Iowa City).  Is the I/O subsystem a USB 1.1 drive or a PCI solid state card?</a:t>
+            </a:r>
             <a:endParaRPr lang="en-US" dirty="0"/>
           </a:p>
         </p:txBody>
@@ -1640,7 +1649,7 @@
           <a:p>
             <a:fld id="{ADDBA41D-AE03-4F1C-B074-B56312AFAE46}" type="slidenum">
               <a:rPr lang="en-US" smtClean="0"/>
-              <a:t>50</a:t>
+              <a:t>47</a:t>
             </a:fld>
             <a:endParaRPr lang="en-US"/>
           </a:p>
@@ -1649,7 +1658,7 @@
     </p:spTree>
     <p:extLst>
       <p:ext uri="{BB962C8B-B14F-4D97-AF65-F5344CB8AC3E}">
-        <p14:creationId xmlns:p14="http://schemas.microsoft.com/office/powerpoint/2010/main" val="4096931798"/>
+        <p14:creationId xmlns:p14="http://schemas.microsoft.com/office/powerpoint/2010/main" val="962921486"/>
       </p:ext>
     </p:extLst>
   </p:cSld>
@@ -1797,6 +1806,216 @@
           <a:p>
             <a:r>
               <a:rPr lang="en-US" dirty="0"/>
+              <a:t>After</a:t>
+            </a:r>
+            <a:r>
+              <a:rPr lang="en-US" baseline="0" dirty="0"/>
+              <a:t> this slide, type in a demo!</a:t>
+            </a:r>
+          </a:p>
+          <a:p>
+            <a:endParaRPr lang="en-US" baseline="0" dirty="0"/>
+          </a:p>
+          <a:p>
+            <a:r>
+              <a:rPr lang="en-US" baseline="0" dirty="0"/>
+              <a:t>Then run through Parse Trees demo script.</a:t>
+            </a:r>
+            <a:endParaRPr lang="en-US" dirty="0"/>
+          </a:p>
+        </p:txBody>
+      </p:sp>
+      <p:sp>
+        <p:nvSpPr>
+          <p:cNvPr id="4" name="Slide Number Placeholder 3"/>
+          <p:cNvSpPr>
+            <a:spLocks noGrp="1"/>
+          </p:cNvSpPr>
+          <p:nvPr>
+            <p:ph type="sldNum" sz="quarter" idx="10"/>
+          </p:nvPr>
+        </p:nvSpPr>
+        <p:spPr/>
+        <p:txBody>
+          <a:bodyPr/>
+          <a:lstStyle/>
+          <a:p>
+            <a:fld id="{ADDBA41D-AE03-4F1C-B074-B56312AFAE46}" type="slidenum">
+              <a:rPr lang="en-US" smtClean="0"/>
+              <a:t>49</a:t>
+            </a:fld>
+            <a:endParaRPr lang="en-US"/>
+          </a:p>
+        </p:txBody>
+      </p:sp>
+    </p:spTree>
+    <p:extLst>
+      <p:ext uri="{BB962C8B-B14F-4D97-AF65-F5344CB8AC3E}">
+        <p14:creationId xmlns:p14="http://schemas.microsoft.com/office/powerpoint/2010/main" val="2482227221"/>
+      </p:ext>
+    </p:extLst>
+  </p:cSld>
+  <p:clrMapOvr>
+    <a:masterClrMapping/>
+  </p:clrMapOvr>
+</p:notes>
+</file>
+
+<file path=ppt/notesSlides/notesSlide21.xml><?xml version="1.0" encoding="utf-8"?>
+<p:notes xmlns:a="http://schemas.openxmlformats.org/drawingml/2006/main" xmlns:r="http://schemas.openxmlformats.org/officeDocument/2006/relationships" xmlns:p="http://schemas.openxmlformats.org/presentationml/2006/main">
+  <p:cSld>
+    <p:spTree>
+      <p:nvGrpSpPr>
+        <p:cNvPr id="1" name=""/>
+        <p:cNvGrpSpPr/>
+        <p:nvPr/>
+      </p:nvGrpSpPr>
+      <p:grpSpPr>
+        <a:xfrm>
+          <a:off x="0" y="0"/>
+          <a:ext cx="0" cy="0"/>
+          <a:chOff x="0" y="0"/>
+          <a:chExt cx="0" cy="0"/>
+        </a:xfrm>
+      </p:grpSpPr>
+      <p:sp>
+        <p:nvSpPr>
+          <p:cNvPr id="2" name="Slide Image Placeholder 1"/>
+          <p:cNvSpPr>
+            <a:spLocks noGrp="1" noRot="1" noChangeAspect="1"/>
+          </p:cNvSpPr>
+          <p:nvPr>
+            <p:ph type="sldImg"/>
+          </p:nvPr>
+        </p:nvSpPr>
+        <p:spPr/>
+      </p:sp>
+      <p:sp>
+        <p:nvSpPr>
+          <p:cNvPr id="3" name="Notes Placeholder 2"/>
+          <p:cNvSpPr>
+            <a:spLocks noGrp="1"/>
+          </p:cNvSpPr>
+          <p:nvPr>
+            <p:ph type="body" idx="1"/>
+          </p:nvPr>
+        </p:nvSpPr>
+        <p:spPr/>
+        <p:txBody>
+          <a:bodyPr/>
+          <a:lstStyle/>
+          <a:p>
+            <a:r>
+              <a:rPr lang="en-US" dirty="0"/>
+              <a:t>One copy of the memo structure is created for each optimization and is then destroyed when optimization is completed.</a:t>
+            </a:r>
+          </a:p>
+          <a:p>
+            <a:r>
+              <a:rPr lang="en-US" dirty="0"/>
+              <a:t>Alternatives can be either</a:t>
+            </a:r>
+            <a:r>
+              <a:rPr lang="en-US" baseline="0" dirty="0"/>
+              <a:t> logical or physical.</a:t>
+            </a:r>
+          </a:p>
+          <a:p>
+            <a:r>
+              <a:rPr lang="en-US" baseline="0" dirty="0"/>
+              <a:t>New groups can be created as options are explored.</a:t>
+            </a:r>
+          </a:p>
+          <a:p>
+            <a:endParaRPr lang="en-US" baseline="0" dirty="0"/>
+          </a:p>
+          <a:p>
+            <a:endParaRPr lang="en-US" dirty="0"/>
+          </a:p>
+        </p:txBody>
+      </p:sp>
+      <p:sp>
+        <p:nvSpPr>
+          <p:cNvPr id="4" name="Slide Number Placeholder 3"/>
+          <p:cNvSpPr>
+            <a:spLocks noGrp="1"/>
+          </p:cNvSpPr>
+          <p:nvPr>
+            <p:ph type="sldNum" sz="quarter" idx="10"/>
+          </p:nvPr>
+        </p:nvSpPr>
+        <p:spPr/>
+        <p:txBody>
+          <a:bodyPr/>
+          <a:lstStyle/>
+          <a:p>
+            <a:fld id="{ADDBA41D-AE03-4F1C-B074-B56312AFAE46}" type="slidenum">
+              <a:rPr lang="en-US" smtClean="0"/>
+              <a:t>50</a:t>
+            </a:fld>
+            <a:endParaRPr lang="en-US"/>
+          </a:p>
+        </p:txBody>
+      </p:sp>
+    </p:spTree>
+    <p:extLst>
+      <p:ext uri="{BB962C8B-B14F-4D97-AF65-F5344CB8AC3E}">
+        <p14:creationId xmlns:p14="http://schemas.microsoft.com/office/powerpoint/2010/main" val="4096931798"/>
+      </p:ext>
+    </p:extLst>
+  </p:cSld>
+  <p:clrMapOvr>
+    <a:masterClrMapping/>
+  </p:clrMapOvr>
+</p:notes>
+</file>
+
+<file path=ppt/notesSlides/notesSlide22.xml><?xml version="1.0" encoding="utf-8"?>
+<p:notes xmlns:a="http://schemas.openxmlformats.org/drawingml/2006/main" xmlns:r="http://schemas.openxmlformats.org/officeDocument/2006/relationships" xmlns:p="http://schemas.openxmlformats.org/presentationml/2006/main">
+  <p:cSld>
+    <p:spTree>
+      <p:nvGrpSpPr>
+        <p:cNvPr id="1" name=""/>
+        <p:cNvGrpSpPr/>
+        <p:nvPr/>
+      </p:nvGrpSpPr>
+      <p:grpSpPr>
+        <a:xfrm>
+          <a:off x="0" y="0"/>
+          <a:ext cx="0" cy="0"/>
+          <a:chOff x="0" y="0"/>
+          <a:chExt cx="0" cy="0"/>
+        </a:xfrm>
+      </p:grpSpPr>
+      <p:sp>
+        <p:nvSpPr>
+          <p:cNvPr id="2" name="Slide Image Placeholder 1"/>
+          <p:cNvSpPr>
+            <a:spLocks noGrp="1" noRot="1" noChangeAspect="1"/>
+          </p:cNvSpPr>
+          <p:nvPr>
+            <p:ph type="sldImg"/>
+          </p:nvPr>
+        </p:nvSpPr>
+        <p:spPr/>
+      </p:sp>
+      <p:sp>
+        <p:nvSpPr>
+          <p:cNvPr id="3" name="Notes Placeholder 2"/>
+          <p:cNvSpPr>
+            <a:spLocks noGrp="1"/>
+          </p:cNvSpPr>
+          <p:nvPr>
+            <p:ph type="body" idx="1"/>
+          </p:nvPr>
+        </p:nvSpPr>
+        <p:spPr/>
+        <p:txBody>
+          <a:bodyPr/>
+          <a:lstStyle/>
+          <a:p>
+            <a:r>
+              <a:rPr lang="en-US" dirty="0"/>
               <a:t>Now we can imagine additional</a:t>
             </a:r>
             <a:r>
@@ -2163,13 +2382,8 @@
           <a:p>
             <a:r>
               <a:rPr lang="en-US" dirty="0"/>
-              <a:t>One interesting aspect</a:t>
-            </a:r>
-            <a:r>
-              <a:rPr lang="en-US" baseline="0" dirty="0"/>
-              <a:t> of the GROUP BY step is that it requires knowledge of future steps – specifically, what aggregations will be required downstream?</a:t>
-            </a:r>
-            <a:endParaRPr lang="en-US" dirty="0"/>
+              <a:t>That’s 12.7 quadrillion!</a:t>
+            </a:r>
           </a:p>
         </p:txBody>
       </p:sp>
@@ -2190,7 +2404,7 @@
           <a:p>
             <a:fld id="{ADDBA41D-AE03-4F1C-B074-B56312AFAE46}" type="slidenum">
               <a:rPr lang="en-US" smtClean="0"/>
-              <a:t>19</a:t>
+              <a:t>15</a:t>
             </a:fld>
             <a:endParaRPr lang="en-US"/>
           </a:p>
@@ -2199,7 +2413,7 @@
     </p:spTree>
     <p:extLst>
       <p:ext uri="{BB962C8B-B14F-4D97-AF65-F5344CB8AC3E}">
-        <p14:creationId xmlns:p14="http://schemas.microsoft.com/office/powerpoint/2010/main" val="683612466"/>
+        <p14:creationId xmlns:p14="http://schemas.microsoft.com/office/powerpoint/2010/main" val="3448175499"/>
       </p:ext>
     </p:extLst>
   </p:cSld>
@@ -2255,446 +2469,8 @@
           <a:p>
             <a:r>
               <a:rPr lang="en-US" dirty="0"/>
-              <a:t>Based</a:t>
-            </a:r>
-            <a:r>
-              <a:rPr lang="en-US" baseline="0" dirty="0"/>
-              <a:t> on the mathematics of relational algebra.</a:t>
-            </a:r>
-            <a:endParaRPr lang="en-US" dirty="0"/>
-          </a:p>
-          <a:p>
-            <a:r>
-              <a:rPr lang="en-US" dirty="0"/>
-              <a:t>Example of a semi join:</a:t>
-            </a:r>
-          </a:p>
-          <a:p>
-            <a:r>
-              <a:rPr lang="en-US" sz="1200" kern="1200" dirty="0">
-                <a:solidFill>
-                  <a:schemeClr val="tx1"/>
-                </a:solidFill>
-                <a:latin typeface="+mn-lt"/>
-                <a:ea typeface="+mn-ea"/>
-                <a:cs typeface="+mn-cs"/>
-              </a:rPr>
-              <a:t>-- Find customers who have orders.</a:t>
-            </a:r>
-          </a:p>
-          <a:p>
-            <a:r>
-              <a:rPr lang="en-US" sz="1200" kern="1200" dirty="0">
-                <a:solidFill>
-                  <a:schemeClr val="tx1"/>
-                </a:solidFill>
-                <a:latin typeface="+mn-lt"/>
-                <a:ea typeface="+mn-ea"/>
-                <a:cs typeface="+mn-cs"/>
-              </a:rPr>
-              <a:t>select *</a:t>
-            </a:r>
-          </a:p>
-          <a:p>
-            <a:r>
-              <a:rPr lang="en-US" sz="1200" kern="1200" dirty="0">
-                <a:solidFill>
-                  <a:schemeClr val="tx1"/>
-                </a:solidFill>
-                <a:latin typeface="+mn-lt"/>
-                <a:ea typeface="+mn-ea"/>
-                <a:cs typeface="+mn-cs"/>
-              </a:rPr>
-              <a:t>from </a:t>
-            </a:r>
-            <a:r>
-              <a:rPr lang="en-US" sz="1200" kern="1200" dirty="0" err="1">
-                <a:solidFill>
-                  <a:schemeClr val="tx1"/>
-                </a:solidFill>
-                <a:latin typeface="+mn-lt"/>
-                <a:ea typeface="+mn-ea"/>
-                <a:cs typeface="+mn-cs"/>
-              </a:rPr>
-              <a:t>CorpDB.dbo.Customer</a:t>
-            </a:r>
-            <a:r>
-              <a:rPr lang="en-US" sz="1200" kern="1200" dirty="0">
-                <a:solidFill>
-                  <a:schemeClr val="tx1"/>
-                </a:solidFill>
-                <a:latin typeface="+mn-lt"/>
-                <a:ea typeface="+mn-ea"/>
-                <a:cs typeface="+mn-cs"/>
-              </a:rPr>
-              <a:t> c</a:t>
-            </a:r>
-          </a:p>
-          <a:p>
-            <a:r>
-              <a:rPr lang="en-US" sz="1200" kern="1200" dirty="0">
-                <a:solidFill>
-                  <a:schemeClr val="tx1"/>
-                </a:solidFill>
-                <a:latin typeface="+mn-lt"/>
-                <a:ea typeface="+mn-ea"/>
-                <a:cs typeface="+mn-cs"/>
-              </a:rPr>
-              <a:t>where exists</a:t>
-            </a:r>
-          </a:p>
-          <a:p>
-            <a:r>
-              <a:rPr lang="en-US" sz="1200" kern="1200" dirty="0">
-                <a:solidFill>
-                  <a:schemeClr val="tx1"/>
-                </a:solidFill>
-                <a:latin typeface="+mn-lt"/>
-                <a:ea typeface="+mn-ea"/>
-                <a:cs typeface="+mn-cs"/>
-              </a:rPr>
-              <a:t>(</a:t>
-            </a:r>
-          </a:p>
-          <a:p>
-            <a:r>
-              <a:rPr lang="en-US" sz="1200" kern="1200" dirty="0">
-                <a:solidFill>
-                  <a:schemeClr val="tx1"/>
-                </a:solidFill>
-                <a:latin typeface="+mn-lt"/>
-                <a:ea typeface="+mn-ea"/>
-                <a:cs typeface="+mn-cs"/>
-              </a:rPr>
-              <a:t>select *</a:t>
-            </a:r>
-          </a:p>
-          <a:p>
-            <a:r>
-              <a:rPr lang="en-US" sz="1200" kern="1200" dirty="0">
-                <a:solidFill>
-                  <a:schemeClr val="tx1"/>
-                </a:solidFill>
-                <a:latin typeface="+mn-lt"/>
-                <a:ea typeface="+mn-ea"/>
-                <a:cs typeface="+mn-cs"/>
-              </a:rPr>
-              <a:t>from </a:t>
-            </a:r>
-            <a:r>
-              <a:rPr lang="en-US" sz="1200" kern="1200" dirty="0" err="1">
-                <a:solidFill>
-                  <a:schemeClr val="tx1"/>
-                </a:solidFill>
-                <a:latin typeface="+mn-lt"/>
-                <a:ea typeface="+mn-ea"/>
-                <a:cs typeface="+mn-cs"/>
-              </a:rPr>
-              <a:t>CorpDB.dbo.OrderHeader</a:t>
-            </a:r>
-            <a:r>
-              <a:rPr lang="en-US" sz="1200" kern="1200" dirty="0">
-                <a:solidFill>
-                  <a:schemeClr val="tx1"/>
-                </a:solidFill>
-                <a:latin typeface="+mn-lt"/>
-                <a:ea typeface="+mn-ea"/>
-                <a:cs typeface="+mn-cs"/>
-              </a:rPr>
-              <a:t> oh</a:t>
-            </a:r>
-          </a:p>
-          <a:p>
-            <a:r>
-              <a:rPr lang="en-US" sz="1200" kern="1200" dirty="0">
-                <a:solidFill>
-                  <a:schemeClr val="tx1"/>
-                </a:solidFill>
-                <a:latin typeface="+mn-lt"/>
-                <a:ea typeface="+mn-ea"/>
-                <a:cs typeface="+mn-cs"/>
-              </a:rPr>
-              <a:t>where </a:t>
-            </a:r>
-            <a:r>
-              <a:rPr lang="en-US" sz="1200" kern="1200" dirty="0" err="1">
-                <a:solidFill>
-                  <a:schemeClr val="tx1"/>
-                </a:solidFill>
-                <a:latin typeface="+mn-lt"/>
-                <a:ea typeface="+mn-ea"/>
-                <a:cs typeface="+mn-cs"/>
-              </a:rPr>
-              <a:t>oh.CustomerID</a:t>
-            </a:r>
-            <a:r>
-              <a:rPr lang="en-US" sz="1200" kern="1200" dirty="0">
-                <a:solidFill>
-                  <a:schemeClr val="tx1"/>
-                </a:solidFill>
-                <a:latin typeface="+mn-lt"/>
-                <a:ea typeface="+mn-ea"/>
-                <a:cs typeface="+mn-cs"/>
-              </a:rPr>
-              <a:t> = </a:t>
-            </a:r>
-            <a:r>
-              <a:rPr lang="en-US" sz="1200" kern="1200" dirty="0" err="1">
-                <a:solidFill>
-                  <a:schemeClr val="tx1"/>
-                </a:solidFill>
-                <a:latin typeface="+mn-lt"/>
-                <a:ea typeface="+mn-ea"/>
-                <a:cs typeface="+mn-cs"/>
-              </a:rPr>
-              <a:t>c.CustomerID</a:t>
-            </a:r>
-            <a:endParaRPr lang="en-US" sz="1200" kern="1200" dirty="0">
-              <a:solidFill>
-                <a:schemeClr val="tx1"/>
-              </a:solidFill>
-              <a:latin typeface="+mn-lt"/>
-              <a:ea typeface="+mn-ea"/>
-              <a:cs typeface="+mn-cs"/>
-            </a:endParaRPr>
-          </a:p>
-          <a:p>
-            <a:r>
-              <a:rPr lang="en-US" sz="1200" kern="1200" dirty="0">
-                <a:solidFill>
-                  <a:schemeClr val="tx1"/>
-                </a:solidFill>
-                <a:latin typeface="+mn-lt"/>
-                <a:ea typeface="+mn-ea"/>
-                <a:cs typeface="+mn-cs"/>
-              </a:rPr>
-              <a:t>);</a:t>
-            </a:r>
-          </a:p>
-          <a:p>
-            <a:endParaRPr lang="en-US" sz="1200" kern="1200" dirty="0">
-              <a:solidFill>
-                <a:schemeClr val="tx1"/>
-              </a:solidFill>
-              <a:latin typeface="+mn-lt"/>
-              <a:ea typeface="+mn-ea"/>
-              <a:cs typeface="+mn-cs"/>
-            </a:endParaRPr>
-          </a:p>
-          <a:p>
-            <a:r>
-              <a:rPr lang="en-US" dirty="0"/>
-              <a:t>Example of an anti-semi</a:t>
-            </a:r>
-            <a:r>
-              <a:rPr lang="en-US" baseline="0" dirty="0"/>
-              <a:t> join:</a:t>
-            </a:r>
-          </a:p>
-          <a:p>
-            <a:endParaRPr lang="en-US" baseline="0" dirty="0"/>
-          </a:p>
-          <a:p>
-            <a:r>
-              <a:rPr lang="en-US" sz="1200" kern="1200" dirty="0">
-                <a:solidFill>
-                  <a:schemeClr val="tx1"/>
-                </a:solidFill>
-                <a:latin typeface="+mn-lt"/>
-                <a:ea typeface="+mn-ea"/>
-                <a:cs typeface="+mn-cs"/>
-              </a:rPr>
-              <a:t>select *</a:t>
-            </a:r>
-          </a:p>
-          <a:p>
-            <a:r>
-              <a:rPr lang="en-US" sz="1200" kern="1200" dirty="0">
-                <a:solidFill>
-                  <a:schemeClr val="tx1"/>
-                </a:solidFill>
-                <a:latin typeface="+mn-lt"/>
-                <a:ea typeface="+mn-ea"/>
-                <a:cs typeface="+mn-cs"/>
-              </a:rPr>
-              <a:t>from </a:t>
-            </a:r>
-            <a:r>
-              <a:rPr lang="en-US" sz="1200" kern="1200" dirty="0" err="1">
-                <a:solidFill>
-                  <a:schemeClr val="tx1"/>
-                </a:solidFill>
-                <a:latin typeface="+mn-lt"/>
-                <a:ea typeface="+mn-ea"/>
-                <a:cs typeface="+mn-cs"/>
-              </a:rPr>
-              <a:t>CorpDB.dbo.Customer</a:t>
-            </a:r>
-            <a:r>
-              <a:rPr lang="en-US" sz="1200" kern="1200" dirty="0">
-                <a:solidFill>
-                  <a:schemeClr val="tx1"/>
-                </a:solidFill>
-                <a:latin typeface="+mn-lt"/>
-                <a:ea typeface="+mn-ea"/>
-                <a:cs typeface="+mn-cs"/>
-              </a:rPr>
-              <a:t> c</a:t>
-            </a:r>
-          </a:p>
-          <a:p>
-            <a:r>
-              <a:rPr lang="en-US" sz="1200" kern="1200" dirty="0">
-                <a:solidFill>
-                  <a:schemeClr val="tx1"/>
-                </a:solidFill>
-                <a:latin typeface="+mn-lt"/>
-                <a:ea typeface="+mn-ea"/>
-                <a:cs typeface="+mn-cs"/>
-              </a:rPr>
-              <a:t>where not exists</a:t>
-            </a:r>
-          </a:p>
-          <a:p>
-            <a:r>
-              <a:rPr lang="en-US" sz="1200" kern="1200" dirty="0">
-                <a:solidFill>
-                  <a:schemeClr val="tx1"/>
-                </a:solidFill>
-                <a:latin typeface="+mn-lt"/>
-                <a:ea typeface="+mn-ea"/>
-                <a:cs typeface="+mn-cs"/>
-              </a:rPr>
-              <a:t>(</a:t>
-            </a:r>
-          </a:p>
-          <a:p>
-            <a:r>
-              <a:rPr lang="en-US" sz="1200" kern="1200" dirty="0">
-                <a:solidFill>
-                  <a:schemeClr val="tx1"/>
-                </a:solidFill>
-                <a:latin typeface="+mn-lt"/>
-                <a:ea typeface="+mn-ea"/>
-                <a:cs typeface="+mn-cs"/>
-              </a:rPr>
-              <a:t>select *</a:t>
-            </a:r>
-          </a:p>
-          <a:p>
-            <a:r>
-              <a:rPr lang="en-US" sz="1200" kern="1200" dirty="0">
-                <a:solidFill>
-                  <a:schemeClr val="tx1"/>
-                </a:solidFill>
-                <a:latin typeface="+mn-lt"/>
-                <a:ea typeface="+mn-ea"/>
-                <a:cs typeface="+mn-cs"/>
-              </a:rPr>
-              <a:t>from </a:t>
-            </a:r>
-            <a:r>
-              <a:rPr lang="en-US" sz="1200" kern="1200" dirty="0" err="1">
-                <a:solidFill>
-                  <a:schemeClr val="tx1"/>
-                </a:solidFill>
-                <a:latin typeface="+mn-lt"/>
-                <a:ea typeface="+mn-ea"/>
-                <a:cs typeface="+mn-cs"/>
-              </a:rPr>
-              <a:t>CorpDB.dbo.OrderHeader</a:t>
-            </a:r>
-            <a:r>
-              <a:rPr lang="en-US" sz="1200" kern="1200" dirty="0">
-                <a:solidFill>
-                  <a:schemeClr val="tx1"/>
-                </a:solidFill>
-                <a:latin typeface="+mn-lt"/>
-                <a:ea typeface="+mn-ea"/>
-                <a:cs typeface="+mn-cs"/>
-              </a:rPr>
-              <a:t> oh</a:t>
-            </a:r>
-          </a:p>
-          <a:p>
-            <a:r>
-              <a:rPr lang="en-US" sz="1200" kern="1200" dirty="0">
-                <a:solidFill>
-                  <a:schemeClr val="tx1"/>
-                </a:solidFill>
-                <a:latin typeface="+mn-lt"/>
-                <a:ea typeface="+mn-ea"/>
-                <a:cs typeface="+mn-cs"/>
-              </a:rPr>
-              <a:t>where </a:t>
-            </a:r>
-            <a:r>
-              <a:rPr lang="en-US" sz="1200" kern="1200" dirty="0" err="1">
-                <a:solidFill>
-                  <a:schemeClr val="tx1"/>
-                </a:solidFill>
-                <a:latin typeface="+mn-lt"/>
-                <a:ea typeface="+mn-ea"/>
-                <a:cs typeface="+mn-cs"/>
-              </a:rPr>
-              <a:t>oh.CustomerID</a:t>
-            </a:r>
-            <a:r>
-              <a:rPr lang="en-US" sz="1200" kern="1200" dirty="0">
-                <a:solidFill>
-                  <a:schemeClr val="tx1"/>
-                </a:solidFill>
-                <a:latin typeface="+mn-lt"/>
-                <a:ea typeface="+mn-ea"/>
-                <a:cs typeface="+mn-cs"/>
-              </a:rPr>
-              <a:t> = </a:t>
-            </a:r>
-            <a:r>
-              <a:rPr lang="en-US" sz="1200" kern="1200" dirty="0" err="1">
-                <a:solidFill>
-                  <a:schemeClr val="tx1"/>
-                </a:solidFill>
-                <a:latin typeface="+mn-lt"/>
-                <a:ea typeface="+mn-ea"/>
-                <a:cs typeface="+mn-cs"/>
-              </a:rPr>
-              <a:t>c.CustomerID</a:t>
-            </a:r>
-            <a:endParaRPr lang="en-US" sz="1200" kern="1200" dirty="0">
-              <a:solidFill>
-                <a:schemeClr val="tx1"/>
-              </a:solidFill>
-              <a:latin typeface="+mn-lt"/>
-              <a:ea typeface="+mn-ea"/>
-              <a:cs typeface="+mn-cs"/>
-            </a:endParaRPr>
-          </a:p>
-          <a:p>
-            <a:r>
-              <a:rPr lang="en-US" sz="1200" kern="1200" dirty="0">
-                <a:solidFill>
-                  <a:schemeClr val="tx1"/>
-                </a:solidFill>
-                <a:latin typeface="+mn-lt"/>
-                <a:ea typeface="+mn-ea"/>
-                <a:cs typeface="+mn-cs"/>
-              </a:rPr>
-              <a:t>);</a:t>
-            </a:r>
-          </a:p>
-          <a:p>
-            <a:endParaRPr lang="en-US" sz="1200" kern="1200" dirty="0">
-              <a:solidFill>
-                <a:schemeClr val="tx1"/>
-              </a:solidFill>
-              <a:latin typeface="+mn-lt"/>
-              <a:ea typeface="+mn-ea"/>
-              <a:cs typeface="+mn-cs"/>
-            </a:endParaRPr>
-          </a:p>
-          <a:p>
-            <a:endParaRPr lang="en-US" dirty="0"/>
+              <a:t>Down to 42 billion.</a:t>
+            </a:r>
           </a:p>
         </p:txBody>
       </p:sp>
@@ -2715,7 +2491,7 @@
           <a:p>
             <a:fld id="{ADDBA41D-AE03-4F1C-B074-B56312AFAE46}" type="slidenum">
               <a:rPr lang="en-US" smtClean="0"/>
-              <a:t>24</a:t>
+              <a:t>16</a:t>
             </a:fld>
             <a:endParaRPr lang="en-US"/>
           </a:p>
@@ -2724,7 +2500,7 @@
     </p:spTree>
     <p:extLst>
       <p:ext uri="{BB962C8B-B14F-4D97-AF65-F5344CB8AC3E}">
-        <p14:creationId xmlns:p14="http://schemas.microsoft.com/office/powerpoint/2010/main" val="1452330123"/>
+        <p14:creationId xmlns:p14="http://schemas.microsoft.com/office/powerpoint/2010/main" val="3363152987"/>
       </p:ext>
     </p:extLst>
   </p:cSld>
@@ -2780,29 +2556,11 @@
           <a:p>
             <a:r>
               <a:rPr lang="en-US" dirty="0"/>
-              <a:t>Merge join generally the best performing,</a:t>
+              <a:t>One interesting aspect</a:t>
             </a:r>
             <a:r>
               <a:rPr lang="en-US" baseline="0" dirty="0"/>
-              <a:t> but requires sorted input on join columns.  Only valid for equijoins.</a:t>
-            </a:r>
-          </a:p>
-          <a:p>
-            <a:endParaRPr lang="en-US" baseline="0" dirty="0"/>
-          </a:p>
-          <a:p>
-            <a:r>
-              <a:rPr lang="en-US" baseline="0" dirty="0"/>
-              <a:t>Nested loops best when inputs are of significantly different size.  Only join operator that works for joins using inequalities.</a:t>
-            </a:r>
-          </a:p>
-          <a:p>
-            <a:endParaRPr lang="en-US" baseline="0" dirty="0"/>
-          </a:p>
-          <a:p>
-            <a:r>
-              <a:rPr lang="en-US" baseline="0" dirty="0"/>
-              <a:t>Hash join works well with large inputs without sorted input, but is only valid for equijoins.</a:t>
+              <a:t> of the GROUP BY step is that it requires knowledge of future steps – specifically, what aggregations will be required downstream?</a:t>
             </a:r>
             <a:endParaRPr lang="en-US" dirty="0"/>
           </a:p>
@@ -2825,7 +2583,7 @@
           <a:p>
             <a:fld id="{ADDBA41D-AE03-4F1C-B074-B56312AFAE46}" type="slidenum">
               <a:rPr lang="en-US" smtClean="0"/>
-              <a:t>26</a:t>
+              <a:t>19</a:t>
             </a:fld>
             <a:endParaRPr lang="en-US"/>
           </a:p>
@@ -2834,7 +2592,7 @@
     </p:spTree>
     <p:extLst>
       <p:ext uri="{BB962C8B-B14F-4D97-AF65-F5344CB8AC3E}">
-        <p14:creationId xmlns:p14="http://schemas.microsoft.com/office/powerpoint/2010/main" val="611840543"/>
+        <p14:creationId xmlns:p14="http://schemas.microsoft.com/office/powerpoint/2010/main" val="683612466"/>
       </p:ext>
     </p:extLst>
   </p:cSld>
@@ -2890,29 +2648,445 @@
           <a:p>
             <a:r>
               <a:rPr lang="en-US" dirty="0"/>
-              <a:t>Constant folding refers to pre-computing as much of an expression as possible, for example: 2 * pi() * radius</a:t>
+              <a:t>Based</a:t>
             </a:r>
             <a:r>
               <a:rPr lang="en-US" baseline="0" dirty="0"/>
-              <a:t> =&gt; 6.28319 * radius</a:t>
+              <a:t> on the mathematics of relational algebra.</a:t>
             </a:r>
             <a:endParaRPr lang="en-US" dirty="0"/>
           </a:p>
           <a:p>
             <a:r>
               <a:rPr lang="en-US" dirty="0"/>
-              <a:t>As an</a:t>
+              <a:t>Example of a semi join:</a:t>
+            </a:r>
+          </a:p>
+          <a:p>
+            <a:r>
+              <a:rPr lang="en-US" sz="1200" kern="1200" dirty="0">
+                <a:solidFill>
+                  <a:schemeClr val="tx1"/>
+                </a:solidFill>
+                <a:latin typeface="+mn-lt"/>
+                <a:ea typeface="+mn-ea"/>
+                <a:cs typeface="+mn-cs"/>
+              </a:rPr>
+              <a:t>-- Find customers who have orders.</a:t>
+            </a:r>
+          </a:p>
+          <a:p>
+            <a:r>
+              <a:rPr lang="en-US" sz="1200" kern="1200" dirty="0">
+                <a:solidFill>
+                  <a:schemeClr val="tx1"/>
+                </a:solidFill>
+                <a:latin typeface="+mn-lt"/>
+                <a:ea typeface="+mn-ea"/>
+                <a:cs typeface="+mn-cs"/>
+              </a:rPr>
+              <a:t>select *</a:t>
+            </a:r>
+          </a:p>
+          <a:p>
+            <a:r>
+              <a:rPr lang="en-US" sz="1200" kern="1200" dirty="0">
+                <a:solidFill>
+                  <a:schemeClr val="tx1"/>
+                </a:solidFill>
+                <a:latin typeface="+mn-lt"/>
+                <a:ea typeface="+mn-ea"/>
+                <a:cs typeface="+mn-cs"/>
+              </a:rPr>
+              <a:t>from </a:t>
+            </a:r>
+            <a:r>
+              <a:rPr lang="en-US" sz="1200" kern="1200" dirty="0" err="1">
+                <a:solidFill>
+                  <a:schemeClr val="tx1"/>
+                </a:solidFill>
+                <a:latin typeface="+mn-lt"/>
+                <a:ea typeface="+mn-ea"/>
+                <a:cs typeface="+mn-cs"/>
+              </a:rPr>
+              <a:t>CorpDB.dbo.Customer</a:t>
+            </a:r>
+            <a:r>
+              <a:rPr lang="en-US" sz="1200" kern="1200" dirty="0">
+                <a:solidFill>
+                  <a:schemeClr val="tx1"/>
+                </a:solidFill>
+                <a:latin typeface="+mn-lt"/>
+                <a:ea typeface="+mn-ea"/>
+                <a:cs typeface="+mn-cs"/>
+              </a:rPr>
+              <a:t> c</a:t>
+            </a:r>
+          </a:p>
+          <a:p>
+            <a:r>
+              <a:rPr lang="en-US" sz="1200" kern="1200" dirty="0">
+                <a:solidFill>
+                  <a:schemeClr val="tx1"/>
+                </a:solidFill>
+                <a:latin typeface="+mn-lt"/>
+                <a:ea typeface="+mn-ea"/>
+                <a:cs typeface="+mn-cs"/>
+              </a:rPr>
+              <a:t>where exists</a:t>
+            </a:r>
+          </a:p>
+          <a:p>
+            <a:r>
+              <a:rPr lang="en-US" sz="1200" kern="1200" dirty="0">
+                <a:solidFill>
+                  <a:schemeClr val="tx1"/>
+                </a:solidFill>
+                <a:latin typeface="+mn-lt"/>
+                <a:ea typeface="+mn-ea"/>
+                <a:cs typeface="+mn-cs"/>
+              </a:rPr>
+              <a:t>(</a:t>
+            </a:r>
+          </a:p>
+          <a:p>
+            <a:r>
+              <a:rPr lang="en-US" sz="1200" kern="1200" dirty="0">
+                <a:solidFill>
+                  <a:schemeClr val="tx1"/>
+                </a:solidFill>
+                <a:latin typeface="+mn-lt"/>
+                <a:ea typeface="+mn-ea"/>
+                <a:cs typeface="+mn-cs"/>
+              </a:rPr>
+              <a:t>select *</a:t>
+            </a:r>
+          </a:p>
+          <a:p>
+            <a:r>
+              <a:rPr lang="en-US" sz="1200" kern="1200" dirty="0">
+                <a:solidFill>
+                  <a:schemeClr val="tx1"/>
+                </a:solidFill>
+                <a:latin typeface="+mn-lt"/>
+                <a:ea typeface="+mn-ea"/>
+                <a:cs typeface="+mn-cs"/>
+              </a:rPr>
+              <a:t>from </a:t>
+            </a:r>
+            <a:r>
+              <a:rPr lang="en-US" sz="1200" kern="1200" dirty="0" err="1">
+                <a:solidFill>
+                  <a:schemeClr val="tx1"/>
+                </a:solidFill>
+                <a:latin typeface="+mn-lt"/>
+                <a:ea typeface="+mn-ea"/>
+                <a:cs typeface="+mn-cs"/>
+              </a:rPr>
+              <a:t>CorpDB.dbo.OrderHeader</a:t>
+            </a:r>
+            <a:r>
+              <a:rPr lang="en-US" sz="1200" kern="1200" dirty="0">
+                <a:solidFill>
+                  <a:schemeClr val="tx1"/>
+                </a:solidFill>
+                <a:latin typeface="+mn-lt"/>
+                <a:ea typeface="+mn-ea"/>
+                <a:cs typeface="+mn-cs"/>
+              </a:rPr>
+              <a:t> oh</a:t>
+            </a:r>
+          </a:p>
+          <a:p>
+            <a:r>
+              <a:rPr lang="en-US" sz="1200" kern="1200" dirty="0">
+                <a:solidFill>
+                  <a:schemeClr val="tx1"/>
+                </a:solidFill>
+                <a:latin typeface="+mn-lt"/>
+                <a:ea typeface="+mn-ea"/>
+                <a:cs typeface="+mn-cs"/>
+              </a:rPr>
+              <a:t>where </a:t>
+            </a:r>
+            <a:r>
+              <a:rPr lang="en-US" sz="1200" kern="1200" dirty="0" err="1">
+                <a:solidFill>
+                  <a:schemeClr val="tx1"/>
+                </a:solidFill>
+                <a:latin typeface="+mn-lt"/>
+                <a:ea typeface="+mn-ea"/>
+                <a:cs typeface="+mn-cs"/>
+              </a:rPr>
+              <a:t>oh.CustomerID</a:t>
+            </a:r>
+            <a:r>
+              <a:rPr lang="en-US" sz="1200" kern="1200" dirty="0">
+                <a:solidFill>
+                  <a:schemeClr val="tx1"/>
+                </a:solidFill>
+                <a:latin typeface="+mn-lt"/>
+                <a:ea typeface="+mn-ea"/>
+                <a:cs typeface="+mn-cs"/>
+              </a:rPr>
+              <a:t> = </a:t>
+            </a:r>
+            <a:r>
+              <a:rPr lang="en-US" sz="1200" kern="1200" dirty="0" err="1">
+                <a:solidFill>
+                  <a:schemeClr val="tx1"/>
+                </a:solidFill>
+                <a:latin typeface="+mn-lt"/>
+                <a:ea typeface="+mn-ea"/>
+                <a:cs typeface="+mn-cs"/>
+              </a:rPr>
+              <a:t>c.CustomerID</a:t>
+            </a:r>
+            <a:endParaRPr lang="en-US" sz="1200" kern="1200" dirty="0">
+              <a:solidFill>
+                <a:schemeClr val="tx1"/>
+              </a:solidFill>
+              <a:latin typeface="+mn-lt"/>
+              <a:ea typeface="+mn-ea"/>
+              <a:cs typeface="+mn-cs"/>
+            </a:endParaRPr>
+          </a:p>
+          <a:p>
+            <a:r>
+              <a:rPr lang="en-US" sz="1200" kern="1200" dirty="0">
+                <a:solidFill>
+                  <a:schemeClr val="tx1"/>
+                </a:solidFill>
+                <a:latin typeface="+mn-lt"/>
+                <a:ea typeface="+mn-ea"/>
+                <a:cs typeface="+mn-cs"/>
+              </a:rPr>
+              <a:t>);</a:t>
+            </a:r>
+          </a:p>
+          <a:p>
+            <a:endParaRPr lang="en-US" sz="1200" kern="1200" dirty="0">
+              <a:solidFill>
+                <a:schemeClr val="tx1"/>
+              </a:solidFill>
+              <a:latin typeface="+mn-lt"/>
+              <a:ea typeface="+mn-ea"/>
+              <a:cs typeface="+mn-cs"/>
+            </a:endParaRPr>
+          </a:p>
+          <a:p>
+            <a:r>
+              <a:rPr lang="en-US" dirty="0"/>
+              <a:t>Example of an anti-semi</a:t>
             </a:r>
             <a:r>
               <a:rPr lang="en-US" baseline="0" dirty="0"/>
-              <a:t> example, data type resolution with the UNION operator will ensure that data types between the upper expression are compatible with the lower expression.</a:t>
-            </a:r>
-          </a:p>
-          <a:p>
-            <a:r>
-              <a:rPr lang="en-US" baseline="0" dirty="0"/>
-              <a:t>Aggregate binding checks if invalid columns are referenced downstream of the GROUP BY logical processing step.</a:t>
-            </a:r>
+              <a:t> join:</a:t>
+            </a:r>
+          </a:p>
+          <a:p>
+            <a:endParaRPr lang="en-US" baseline="0" dirty="0"/>
+          </a:p>
+          <a:p>
+            <a:r>
+              <a:rPr lang="en-US" sz="1200" kern="1200" dirty="0">
+                <a:solidFill>
+                  <a:schemeClr val="tx1"/>
+                </a:solidFill>
+                <a:latin typeface="+mn-lt"/>
+                <a:ea typeface="+mn-ea"/>
+                <a:cs typeface="+mn-cs"/>
+              </a:rPr>
+              <a:t>select *</a:t>
+            </a:r>
+          </a:p>
+          <a:p>
+            <a:r>
+              <a:rPr lang="en-US" sz="1200" kern="1200" dirty="0">
+                <a:solidFill>
+                  <a:schemeClr val="tx1"/>
+                </a:solidFill>
+                <a:latin typeface="+mn-lt"/>
+                <a:ea typeface="+mn-ea"/>
+                <a:cs typeface="+mn-cs"/>
+              </a:rPr>
+              <a:t>from </a:t>
+            </a:r>
+            <a:r>
+              <a:rPr lang="en-US" sz="1200" kern="1200" dirty="0" err="1">
+                <a:solidFill>
+                  <a:schemeClr val="tx1"/>
+                </a:solidFill>
+                <a:latin typeface="+mn-lt"/>
+                <a:ea typeface="+mn-ea"/>
+                <a:cs typeface="+mn-cs"/>
+              </a:rPr>
+              <a:t>CorpDB.dbo.Customer</a:t>
+            </a:r>
+            <a:r>
+              <a:rPr lang="en-US" sz="1200" kern="1200" dirty="0">
+                <a:solidFill>
+                  <a:schemeClr val="tx1"/>
+                </a:solidFill>
+                <a:latin typeface="+mn-lt"/>
+                <a:ea typeface="+mn-ea"/>
+                <a:cs typeface="+mn-cs"/>
+              </a:rPr>
+              <a:t> c</a:t>
+            </a:r>
+          </a:p>
+          <a:p>
+            <a:r>
+              <a:rPr lang="en-US" sz="1200" kern="1200" dirty="0">
+                <a:solidFill>
+                  <a:schemeClr val="tx1"/>
+                </a:solidFill>
+                <a:latin typeface="+mn-lt"/>
+                <a:ea typeface="+mn-ea"/>
+                <a:cs typeface="+mn-cs"/>
+              </a:rPr>
+              <a:t>where not exists</a:t>
+            </a:r>
+          </a:p>
+          <a:p>
+            <a:r>
+              <a:rPr lang="en-US" sz="1200" kern="1200" dirty="0">
+                <a:solidFill>
+                  <a:schemeClr val="tx1"/>
+                </a:solidFill>
+                <a:latin typeface="+mn-lt"/>
+                <a:ea typeface="+mn-ea"/>
+                <a:cs typeface="+mn-cs"/>
+              </a:rPr>
+              <a:t>(</a:t>
+            </a:r>
+          </a:p>
+          <a:p>
+            <a:r>
+              <a:rPr lang="en-US" sz="1200" kern="1200" dirty="0">
+                <a:solidFill>
+                  <a:schemeClr val="tx1"/>
+                </a:solidFill>
+                <a:latin typeface="+mn-lt"/>
+                <a:ea typeface="+mn-ea"/>
+                <a:cs typeface="+mn-cs"/>
+              </a:rPr>
+              <a:t>select *</a:t>
+            </a:r>
+          </a:p>
+          <a:p>
+            <a:r>
+              <a:rPr lang="en-US" sz="1200" kern="1200" dirty="0">
+                <a:solidFill>
+                  <a:schemeClr val="tx1"/>
+                </a:solidFill>
+                <a:latin typeface="+mn-lt"/>
+                <a:ea typeface="+mn-ea"/>
+                <a:cs typeface="+mn-cs"/>
+              </a:rPr>
+              <a:t>from </a:t>
+            </a:r>
+            <a:r>
+              <a:rPr lang="en-US" sz="1200" kern="1200" dirty="0" err="1">
+                <a:solidFill>
+                  <a:schemeClr val="tx1"/>
+                </a:solidFill>
+                <a:latin typeface="+mn-lt"/>
+                <a:ea typeface="+mn-ea"/>
+                <a:cs typeface="+mn-cs"/>
+              </a:rPr>
+              <a:t>CorpDB.dbo.OrderHeader</a:t>
+            </a:r>
+            <a:r>
+              <a:rPr lang="en-US" sz="1200" kern="1200" dirty="0">
+                <a:solidFill>
+                  <a:schemeClr val="tx1"/>
+                </a:solidFill>
+                <a:latin typeface="+mn-lt"/>
+                <a:ea typeface="+mn-ea"/>
+                <a:cs typeface="+mn-cs"/>
+              </a:rPr>
+              <a:t> oh</a:t>
+            </a:r>
+          </a:p>
+          <a:p>
+            <a:r>
+              <a:rPr lang="en-US" sz="1200" kern="1200" dirty="0">
+                <a:solidFill>
+                  <a:schemeClr val="tx1"/>
+                </a:solidFill>
+                <a:latin typeface="+mn-lt"/>
+                <a:ea typeface="+mn-ea"/>
+                <a:cs typeface="+mn-cs"/>
+              </a:rPr>
+              <a:t>where </a:t>
+            </a:r>
+            <a:r>
+              <a:rPr lang="en-US" sz="1200" kern="1200" dirty="0" err="1">
+                <a:solidFill>
+                  <a:schemeClr val="tx1"/>
+                </a:solidFill>
+                <a:latin typeface="+mn-lt"/>
+                <a:ea typeface="+mn-ea"/>
+                <a:cs typeface="+mn-cs"/>
+              </a:rPr>
+              <a:t>oh.CustomerID</a:t>
+            </a:r>
+            <a:r>
+              <a:rPr lang="en-US" sz="1200" kern="1200" dirty="0">
+                <a:solidFill>
+                  <a:schemeClr val="tx1"/>
+                </a:solidFill>
+                <a:latin typeface="+mn-lt"/>
+                <a:ea typeface="+mn-ea"/>
+                <a:cs typeface="+mn-cs"/>
+              </a:rPr>
+              <a:t> = </a:t>
+            </a:r>
+            <a:r>
+              <a:rPr lang="en-US" sz="1200" kern="1200" dirty="0" err="1">
+                <a:solidFill>
+                  <a:schemeClr val="tx1"/>
+                </a:solidFill>
+                <a:latin typeface="+mn-lt"/>
+                <a:ea typeface="+mn-ea"/>
+                <a:cs typeface="+mn-cs"/>
+              </a:rPr>
+              <a:t>c.CustomerID</a:t>
+            </a:r>
+            <a:endParaRPr lang="en-US" sz="1200" kern="1200" dirty="0">
+              <a:solidFill>
+                <a:schemeClr val="tx1"/>
+              </a:solidFill>
+              <a:latin typeface="+mn-lt"/>
+              <a:ea typeface="+mn-ea"/>
+              <a:cs typeface="+mn-cs"/>
+            </a:endParaRPr>
+          </a:p>
+          <a:p>
+            <a:r>
+              <a:rPr lang="en-US" sz="1200" kern="1200" dirty="0">
+                <a:solidFill>
+                  <a:schemeClr val="tx1"/>
+                </a:solidFill>
+                <a:latin typeface="+mn-lt"/>
+                <a:ea typeface="+mn-ea"/>
+                <a:cs typeface="+mn-cs"/>
+              </a:rPr>
+              <a:t>);</a:t>
+            </a:r>
+          </a:p>
+          <a:p>
+            <a:endParaRPr lang="en-US" sz="1200" kern="1200" dirty="0">
+              <a:solidFill>
+                <a:schemeClr val="tx1"/>
+              </a:solidFill>
+              <a:latin typeface="+mn-lt"/>
+              <a:ea typeface="+mn-ea"/>
+              <a:cs typeface="+mn-cs"/>
+            </a:endParaRPr>
+          </a:p>
+          <a:p>
             <a:endParaRPr lang="en-US" dirty="0"/>
           </a:p>
         </p:txBody>
@@ -2934,7 +3108,7 @@
           <a:p>
             <a:fld id="{ADDBA41D-AE03-4F1C-B074-B56312AFAE46}" type="slidenum">
               <a:rPr lang="en-US" smtClean="0"/>
-              <a:t>28</a:t>
+              <a:t>24</a:t>
             </a:fld>
             <a:endParaRPr lang="en-US"/>
           </a:p>
@@ -2943,7 +3117,7 @@
     </p:spTree>
     <p:extLst>
       <p:ext uri="{BB962C8B-B14F-4D97-AF65-F5344CB8AC3E}">
-        <p14:creationId xmlns:p14="http://schemas.microsoft.com/office/powerpoint/2010/main" val="2197873287"/>
+        <p14:creationId xmlns:p14="http://schemas.microsoft.com/office/powerpoint/2010/main" val="1452330123"/>
       </p:ext>
     </p:extLst>
   </p:cSld>
@@ -11282,67 +11456,117 @@
             <a:r>
               <a:rPr lang="en-US" dirty="0">
                 <a:solidFill>
+                  <a:srgbClr val="0000FF"/>
+                </a:solidFill>
+                <a:latin typeface="Consolas" panose="020B0609020204030204" pitchFamily="49" charset="0"/>
+                <a:ea typeface="Calibri" panose="020F0502020204030204" pitchFamily="34" charset="0"/>
+                <a:cs typeface="Times New Roman" panose="02020603050405020304" pitchFamily="18" charset="0"/>
+              </a:rPr>
+              <a:t>on</a:t>
+            </a:r>
+            <a:r>
+              <a:rPr lang="en-US" dirty="0">
+                <a:latin typeface="Consolas" panose="020B0609020204030204" pitchFamily="49" charset="0"/>
+                <a:ea typeface="Calibri" panose="020F0502020204030204" pitchFamily="34" charset="0"/>
+                <a:cs typeface="Times New Roman" panose="02020603050405020304" pitchFamily="18" charset="0"/>
+              </a:rPr>
+              <a:t> </a:t>
+            </a:r>
+            <a:r>
+              <a:rPr lang="en-US" dirty="0" err="1">
+                <a:solidFill>
                   <a:srgbClr val="008080"/>
                 </a:solidFill>
-                <a:highlight>
-                  <a:srgbClr val="FFFF00"/>
-                </a:highlight>
-                <a:latin typeface="Consolas" panose="020B0609020204030204" pitchFamily="49" charset="0"/>
-                <a:ea typeface="Calibri" panose="020F0502020204030204" pitchFamily="34" charset="0"/>
-                <a:cs typeface="Times New Roman" panose="02020603050405020304" pitchFamily="18" charset="0"/>
-              </a:rPr>
-              <a:t>on </a:t>
+                <a:latin typeface="Consolas" panose="020B0609020204030204" pitchFamily="49" charset="0"/>
+                <a:ea typeface="Calibri" panose="020F0502020204030204" pitchFamily="34" charset="0"/>
+                <a:cs typeface="Times New Roman" panose="02020603050405020304" pitchFamily="18" charset="0"/>
+              </a:rPr>
+              <a:t>oh</a:t>
+            </a:r>
+            <a:r>
+              <a:rPr lang="en-US" dirty="0" err="1">
+                <a:solidFill>
+                  <a:srgbClr val="808080"/>
+                </a:solidFill>
+                <a:latin typeface="Consolas" panose="020B0609020204030204" pitchFamily="49" charset="0"/>
+                <a:ea typeface="Calibri" panose="020F0502020204030204" pitchFamily="34" charset="0"/>
+                <a:cs typeface="Times New Roman" panose="02020603050405020304" pitchFamily="18" charset="0"/>
+              </a:rPr>
+              <a:t>.</a:t>
             </a:r>
             <a:r>
               <a:rPr lang="en-US" dirty="0" err="1">
                 <a:solidFill>
                   <a:srgbClr val="008080"/>
                 </a:solidFill>
-                <a:highlight>
-                  <a:srgbClr val="FFFF00"/>
-                </a:highlight>
-                <a:latin typeface="Consolas" panose="020B0609020204030204" pitchFamily="49" charset="0"/>
-                <a:ea typeface="Calibri" panose="020F0502020204030204" pitchFamily="34" charset="0"/>
-                <a:cs typeface="Times New Roman" panose="02020603050405020304" pitchFamily="18" charset="0"/>
-              </a:rPr>
-              <a:t>oh.OrderId</a:t>
-            </a:r>
-            <a:r>
-              <a:rPr lang="en-US" dirty="0">
+                <a:latin typeface="Consolas" panose="020B0609020204030204" pitchFamily="49" charset="0"/>
+                <a:ea typeface="Calibri" panose="020F0502020204030204" pitchFamily="34" charset="0"/>
+                <a:cs typeface="Times New Roman" panose="02020603050405020304" pitchFamily="18" charset="0"/>
+              </a:rPr>
+              <a:t>OrderId</a:t>
+            </a:r>
+            <a:r>
+              <a:rPr lang="en-US" dirty="0">
+                <a:latin typeface="Consolas" panose="020B0609020204030204" pitchFamily="49" charset="0"/>
+                <a:ea typeface="Calibri" panose="020F0502020204030204" pitchFamily="34" charset="0"/>
+                <a:cs typeface="Times New Roman" panose="02020603050405020304" pitchFamily="18" charset="0"/>
+              </a:rPr>
+              <a:t> </a:t>
+            </a:r>
+            <a:r>
+              <a:rPr lang="en-US" dirty="0">
+                <a:solidFill>
+                  <a:srgbClr val="808080"/>
+                </a:solidFill>
+                <a:latin typeface="Consolas" panose="020B0609020204030204" pitchFamily="49" charset="0"/>
+                <a:ea typeface="Calibri" panose="020F0502020204030204" pitchFamily="34" charset="0"/>
+                <a:cs typeface="Times New Roman" panose="02020603050405020304" pitchFamily="18" charset="0"/>
+              </a:rPr>
+              <a:t>=</a:t>
+            </a:r>
+            <a:r>
+              <a:rPr lang="en-US" dirty="0">
+                <a:latin typeface="Consolas" panose="020B0609020204030204" pitchFamily="49" charset="0"/>
+                <a:ea typeface="Calibri" panose="020F0502020204030204" pitchFamily="34" charset="0"/>
+                <a:cs typeface="Times New Roman" panose="02020603050405020304" pitchFamily="18" charset="0"/>
+              </a:rPr>
+              <a:t> </a:t>
+            </a:r>
+            <a:r>
+              <a:rPr lang="en-US" dirty="0" err="1">
                 <a:solidFill>
                   <a:srgbClr val="008080"/>
                 </a:solidFill>
-                <a:highlight>
-                  <a:srgbClr val="FFFF00"/>
-                </a:highlight>
-                <a:latin typeface="Consolas" panose="020B0609020204030204" pitchFamily="49" charset="0"/>
-                <a:ea typeface="Calibri" panose="020F0502020204030204" pitchFamily="34" charset="0"/>
-                <a:cs typeface="Times New Roman" panose="02020603050405020304" pitchFamily="18" charset="0"/>
-              </a:rPr>
-              <a:t> = </a:t>
+                <a:latin typeface="Consolas" panose="020B0609020204030204" pitchFamily="49" charset="0"/>
+                <a:ea typeface="Calibri" panose="020F0502020204030204" pitchFamily="34" charset="0"/>
+                <a:cs typeface="Times New Roman" panose="02020603050405020304" pitchFamily="18" charset="0"/>
+              </a:rPr>
+              <a:t>od</a:t>
+            </a:r>
+            <a:r>
+              <a:rPr lang="en-US" dirty="0" err="1">
+                <a:solidFill>
+                  <a:srgbClr val="808080"/>
+                </a:solidFill>
+                <a:latin typeface="Consolas" panose="020B0609020204030204" pitchFamily="49" charset="0"/>
+                <a:ea typeface="Calibri" panose="020F0502020204030204" pitchFamily="34" charset="0"/>
+                <a:cs typeface="Times New Roman" panose="02020603050405020304" pitchFamily="18" charset="0"/>
+              </a:rPr>
+              <a:t>.</a:t>
             </a:r>
             <a:r>
               <a:rPr lang="en-US" dirty="0" err="1">
                 <a:solidFill>
                   <a:srgbClr val="008080"/>
                 </a:solidFill>
-                <a:highlight>
-                  <a:srgbClr val="FFFF00"/>
-                </a:highlight>
-                <a:latin typeface="Consolas" panose="020B0609020204030204" pitchFamily="49" charset="0"/>
-                <a:ea typeface="Calibri" panose="020F0502020204030204" pitchFamily="34" charset="0"/>
-                <a:cs typeface="Times New Roman" panose="02020603050405020304" pitchFamily="18" charset="0"/>
-              </a:rPr>
-              <a:t>od.OrderId</a:t>
-            </a:r>
-            <a:endParaRPr lang="en-US" dirty="0">
-              <a:solidFill>
-                <a:srgbClr val="008080"/>
-              </a:solidFill>
-              <a:highlight>
-                <a:srgbClr val="FFFF00"/>
-              </a:highlight>
-              <a:latin typeface="Consolas" panose="020B0609020204030204" pitchFamily="49" charset="0"/>
+                <a:latin typeface="Consolas" panose="020B0609020204030204" pitchFamily="49" charset="0"/>
+                <a:ea typeface="Calibri" panose="020F0502020204030204" pitchFamily="34" charset="0"/>
+                <a:cs typeface="Times New Roman" panose="02020603050405020304" pitchFamily="18" charset="0"/>
+              </a:rPr>
+              <a:t>OrderId</a:t>
+            </a:r>
+            <a:endParaRPr lang="en-US" sz="2400" dirty="0">
+              <a:latin typeface="Calibri" panose="020F0502020204030204" pitchFamily="34" charset="0"/>
               <a:ea typeface="Calibri" panose="020F0502020204030204" pitchFamily="34" charset="0"/>
               <a:cs typeface="Times New Roman" panose="02020603050405020304" pitchFamily="18" charset="0"/>
             </a:endParaRPr>
@@ -11356,16 +11580,39 @@
             <a:r>
               <a:rPr lang="en-US" dirty="0">
                 <a:solidFill>
-                  <a:srgbClr val="808080"/>
-                </a:solidFill>
-                <a:latin typeface="Consolas" panose="020B0609020204030204" pitchFamily="49" charset="0"/>
-                <a:ea typeface="Calibri" panose="020F0502020204030204" pitchFamily="34" charset="0"/>
-                <a:cs typeface="Times New Roman" panose="02020603050405020304" pitchFamily="18" charset="0"/>
-              </a:rPr>
-              <a:t>inner</a:t>
-            </a:r>
-            <a:r>
-              <a:rPr lang="en-US" dirty="0">
+                  <a:srgbClr val="008080"/>
+                </a:solidFill>
+                <a:highlight>
+                  <a:srgbClr val="FFFF00"/>
+                </a:highlight>
+                <a:latin typeface="Consolas" panose="020B0609020204030204" pitchFamily="49" charset="0"/>
+                <a:ea typeface="Calibri" panose="020F0502020204030204" pitchFamily="34" charset="0"/>
+                <a:cs typeface="Times New Roman" panose="02020603050405020304" pitchFamily="18" charset="0"/>
+              </a:rPr>
+              <a:t>inner join </a:t>
+            </a:r>
+            <a:r>
+              <a:rPr lang="en-US" dirty="0" err="1">
+                <a:solidFill>
+                  <a:srgbClr val="008080"/>
+                </a:solidFill>
+                <a:highlight>
+                  <a:srgbClr val="FFFF00"/>
+                </a:highlight>
+                <a:latin typeface="Consolas" panose="020B0609020204030204" pitchFamily="49" charset="0"/>
+                <a:ea typeface="Calibri" panose="020F0502020204030204" pitchFamily="34" charset="0"/>
+                <a:cs typeface="Times New Roman" panose="02020603050405020304" pitchFamily="18" charset="0"/>
+              </a:rPr>
+              <a:t>dbo.Customer</a:t>
+            </a:r>
+            <a:r>
+              <a:rPr lang="en-US" dirty="0">
+                <a:solidFill>
+                  <a:srgbClr val="008080"/>
+                </a:solidFill>
+                <a:highlight>
+                  <a:srgbClr val="FFFF00"/>
+                </a:highlight>
                 <a:latin typeface="Consolas" panose="020B0609020204030204" pitchFamily="49" charset="0"/>
                 <a:ea typeface="Calibri" panose="020F0502020204030204" pitchFamily="34" charset="0"/>
                 <a:cs typeface="Times New Roman" panose="02020603050405020304" pitchFamily="18" charset="0"/>
@@ -11373,78 +11620,27 @@
               <a:t> </a:t>
             </a:r>
             <a:r>
-              <a:rPr lang="en-US" dirty="0">
-                <a:solidFill>
-                  <a:srgbClr val="808080"/>
-                </a:solidFill>
-                <a:latin typeface="Consolas" panose="020B0609020204030204" pitchFamily="49" charset="0"/>
-                <a:ea typeface="Calibri" panose="020F0502020204030204" pitchFamily="34" charset="0"/>
-                <a:cs typeface="Times New Roman" panose="02020603050405020304" pitchFamily="18" charset="0"/>
-              </a:rPr>
-              <a:t>join</a:t>
-            </a:r>
-            <a:r>
-              <a:rPr lang="en-US" dirty="0">
-                <a:latin typeface="Consolas" panose="020B0609020204030204" pitchFamily="49" charset="0"/>
-                <a:ea typeface="Calibri" panose="020F0502020204030204" pitchFamily="34" charset="0"/>
-                <a:cs typeface="Times New Roman" panose="02020603050405020304" pitchFamily="18" charset="0"/>
-              </a:rPr>
-              <a:t> </a:t>
-            </a:r>
-            <a:r>
               <a:rPr lang="en-US" dirty="0" err="1">
                 <a:solidFill>
                   <a:srgbClr val="008080"/>
                 </a:solidFill>
-                <a:latin typeface="Consolas" panose="020B0609020204030204" pitchFamily="49" charset="0"/>
-                <a:ea typeface="Calibri" panose="020F0502020204030204" pitchFamily="34" charset="0"/>
-                <a:cs typeface="Times New Roman" panose="02020603050405020304" pitchFamily="18" charset="0"/>
-              </a:rPr>
-              <a:t>dbo</a:t>
-            </a:r>
-            <a:r>
-              <a:rPr lang="en-US" dirty="0" err="1">
-                <a:solidFill>
-                  <a:srgbClr val="808080"/>
-                </a:solidFill>
-                <a:latin typeface="Consolas" panose="020B0609020204030204" pitchFamily="49" charset="0"/>
-                <a:ea typeface="Calibri" panose="020F0502020204030204" pitchFamily="34" charset="0"/>
-                <a:cs typeface="Times New Roman" panose="02020603050405020304" pitchFamily="18" charset="0"/>
-              </a:rPr>
-              <a:t>.</a:t>
-            </a:r>
-            <a:r>
-              <a:rPr lang="en-US" dirty="0" err="1">
+                <a:highlight>
+                  <a:srgbClr val="FFFF00"/>
+                </a:highlight>
+                <a:latin typeface="Consolas" panose="020B0609020204030204" pitchFamily="49" charset="0"/>
+                <a:ea typeface="Calibri" panose="020F0502020204030204" pitchFamily="34" charset="0"/>
+                <a:cs typeface="Times New Roman" panose="02020603050405020304" pitchFamily="18" charset="0"/>
+              </a:rPr>
+              <a:t>cust</a:t>
+            </a:r>
+            <a:r>
+              <a:rPr lang="en-US" dirty="0">
                 <a:solidFill>
                   <a:srgbClr val="008080"/>
                 </a:solidFill>
-                <a:latin typeface="Consolas" panose="020B0609020204030204" pitchFamily="49" charset="0"/>
-                <a:ea typeface="Calibri" panose="020F0502020204030204" pitchFamily="34" charset="0"/>
-                <a:cs typeface="Times New Roman" panose="02020603050405020304" pitchFamily="18" charset="0"/>
-              </a:rPr>
-              <a:t>Customer</a:t>
-            </a:r>
-            <a:r>
-              <a:rPr lang="en-US" dirty="0">
-                <a:latin typeface="Consolas" panose="020B0609020204030204" pitchFamily="49" charset="0"/>
-                <a:ea typeface="Calibri" panose="020F0502020204030204" pitchFamily="34" charset="0"/>
-                <a:cs typeface="Times New Roman" panose="02020603050405020304" pitchFamily="18" charset="0"/>
-              </a:rPr>
-              <a:t> </a:t>
-            </a:r>
-            <a:r>
-              <a:rPr lang="en-US" dirty="0" err="1">
-                <a:solidFill>
-                  <a:srgbClr val="008080"/>
-                </a:solidFill>
-                <a:latin typeface="Consolas" panose="020B0609020204030204" pitchFamily="49" charset="0"/>
-                <a:ea typeface="Calibri" panose="020F0502020204030204" pitchFamily="34" charset="0"/>
-                <a:cs typeface="Times New Roman" panose="02020603050405020304" pitchFamily="18" charset="0"/>
-              </a:rPr>
-              <a:t>cust</a:t>
-            </a:r>
-            <a:r>
-              <a:rPr lang="en-US" dirty="0">
+                <a:highlight>
+                  <a:srgbClr val="FFFF00"/>
+                </a:highlight>
                 <a:latin typeface="Consolas" panose="020B0609020204030204" pitchFamily="49" charset="0"/>
                 <a:ea typeface="Calibri" panose="020F0502020204030204" pitchFamily="34" charset="0"/>
                 <a:cs typeface="Times New Roman" panose="02020603050405020304" pitchFamily="18" charset="0"/>
@@ -11999,7 +12195,7 @@
           <a:p>
             <a:r>
               <a:rPr lang="en-US" sz="3000" dirty="0"/>
-              <a:t>Step 2: ON</a:t>
+              <a:t>Step 2: FROM</a:t>
             </a:r>
           </a:p>
           <a:p>
@@ -12009,21 +12205,8 @@
             </a:pPr>
             <a:r>
               <a:rPr lang="en-US" sz="3000" dirty="0"/>
-              <a:t>Find rows in R1 where </a:t>
-            </a:r>
-            <a:r>
-              <a:rPr lang="en-US" sz="3000" dirty="0" err="1"/>
-              <a:t>OrderId</a:t>
-            </a:r>
-            <a:r>
-              <a:rPr lang="en-US" sz="3000" dirty="0"/>
-              <a:t> = </a:t>
-            </a:r>
-            <a:r>
-              <a:rPr lang="en-US" sz="3000" dirty="0" err="1"/>
-              <a:t>OrderId</a:t>
-            </a:r>
-            <a:endParaRPr lang="en-US" sz="3000" dirty="0"/>
+              <a:t>R1 joined to Customer (Cartesian join)</a:t>
+            </a:r>
           </a:p>
           <a:p>
             <a:pPr marL="457200" indent="-457200">
@@ -12032,7 +12215,7 @@
             </a:pPr>
             <a:r>
               <a:rPr lang="en-US" sz="3000" dirty="0"/>
-              <a:t>Result is 603,133 rows / 8 columns</a:t>
+              <a:t>Result is 12,766,280,417,359,916 rows / 14 columns</a:t>
             </a:r>
           </a:p>
           <a:p>
@@ -12050,7 +12233,7 @@
     </p:spTree>
     <p:extLst>
       <p:ext uri="{BB962C8B-B14F-4D97-AF65-F5344CB8AC3E}">
-        <p14:creationId xmlns:p14="http://schemas.microsoft.com/office/powerpoint/2010/main" val="856205788"/>
+        <p14:creationId xmlns:p14="http://schemas.microsoft.com/office/powerpoint/2010/main" val="3450529162"/>
       </p:ext>
     </p:extLst>
   </p:cSld>
@@ -12493,117 +12676,67 @@
             <a:r>
               <a:rPr lang="en-US" dirty="0">
                 <a:solidFill>
-                  <a:srgbClr val="0000FF"/>
-                </a:solidFill>
-                <a:latin typeface="Consolas" panose="020B0609020204030204" pitchFamily="49" charset="0"/>
-                <a:ea typeface="Calibri" panose="020F0502020204030204" pitchFamily="34" charset="0"/>
-                <a:cs typeface="Times New Roman" panose="02020603050405020304" pitchFamily="18" charset="0"/>
-              </a:rPr>
-              <a:t>on</a:t>
-            </a:r>
-            <a:r>
-              <a:rPr lang="en-US" dirty="0">
-                <a:latin typeface="Consolas" panose="020B0609020204030204" pitchFamily="49" charset="0"/>
-                <a:ea typeface="Calibri" panose="020F0502020204030204" pitchFamily="34" charset="0"/>
-                <a:cs typeface="Times New Roman" panose="02020603050405020304" pitchFamily="18" charset="0"/>
-              </a:rPr>
-              <a:t> </a:t>
-            </a:r>
-            <a:r>
-              <a:rPr lang="en-US" dirty="0" err="1">
-                <a:solidFill>
                   <a:srgbClr val="008080"/>
                 </a:solidFill>
-                <a:latin typeface="Consolas" panose="020B0609020204030204" pitchFamily="49" charset="0"/>
-                <a:ea typeface="Calibri" panose="020F0502020204030204" pitchFamily="34" charset="0"/>
-                <a:cs typeface="Times New Roman" panose="02020603050405020304" pitchFamily="18" charset="0"/>
-              </a:rPr>
-              <a:t>oh</a:t>
-            </a:r>
-            <a:r>
-              <a:rPr lang="en-US" dirty="0" err="1">
-                <a:solidFill>
-                  <a:srgbClr val="808080"/>
-                </a:solidFill>
-                <a:latin typeface="Consolas" panose="020B0609020204030204" pitchFamily="49" charset="0"/>
-                <a:ea typeface="Calibri" panose="020F0502020204030204" pitchFamily="34" charset="0"/>
-                <a:cs typeface="Times New Roman" panose="02020603050405020304" pitchFamily="18" charset="0"/>
-              </a:rPr>
-              <a:t>.</a:t>
+                <a:highlight>
+                  <a:srgbClr val="FFFF00"/>
+                </a:highlight>
+                <a:latin typeface="Consolas" panose="020B0609020204030204" pitchFamily="49" charset="0"/>
+                <a:ea typeface="Calibri" panose="020F0502020204030204" pitchFamily="34" charset="0"/>
+                <a:cs typeface="Times New Roman" panose="02020603050405020304" pitchFamily="18" charset="0"/>
+              </a:rPr>
+              <a:t>on </a:t>
             </a:r>
             <a:r>
               <a:rPr lang="en-US" dirty="0" err="1">
                 <a:solidFill>
                   <a:srgbClr val="008080"/>
                 </a:solidFill>
-                <a:latin typeface="Consolas" panose="020B0609020204030204" pitchFamily="49" charset="0"/>
-                <a:ea typeface="Calibri" panose="020F0502020204030204" pitchFamily="34" charset="0"/>
-                <a:cs typeface="Times New Roman" panose="02020603050405020304" pitchFamily="18" charset="0"/>
-              </a:rPr>
-              <a:t>OrderId</a:t>
-            </a:r>
-            <a:r>
-              <a:rPr lang="en-US" dirty="0">
-                <a:latin typeface="Consolas" panose="020B0609020204030204" pitchFamily="49" charset="0"/>
-                <a:ea typeface="Calibri" panose="020F0502020204030204" pitchFamily="34" charset="0"/>
-                <a:cs typeface="Times New Roman" panose="02020603050405020304" pitchFamily="18" charset="0"/>
-              </a:rPr>
-              <a:t> </a:t>
-            </a:r>
-            <a:r>
-              <a:rPr lang="en-US" dirty="0">
-                <a:solidFill>
-                  <a:srgbClr val="808080"/>
-                </a:solidFill>
-                <a:latin typeface="Consolas" panose="020B0609020204030204" pitchFamily="49" charset="0"/>
-                <a:ea typeface="Calibri" panose="020F0502020204030204" pitchFamily="34" charset="0"/>
-                <a:cs typeface="Times New Roman" panose="02020603050405020304" pitchFamily="18" charset="0"/>
-              </a:rPr>
-              <a:t>=</a:t>
-            </a:r>
-            <a:r>
-              <a:rPr lang="en-US" dirty="0">
-                <a:latin typeface="Consolas" panose="020B0609020204030204" pitchFamily="49" charset="0"/>
-                <a:ea typeface="Calibri" panose="020F0502020204030204" pitchFamily="34" charset="0"/>
-                <a:cs typeface="Times New Roman" panose="02020603050405020304" pitchFamily="18" charset="0"/>
-              </a:rPr>
-              <a:t> </a:t>
-            </a:r>
-            <a:r>
-              <a:rPr lang="en-US" dirty="0" err="1">
+                <a:highlight>
+                  <a:srgbClr val="FFFF00"/>
+                </a:highlight>
+                <a:latin typeface="Consolas" panose="020B0609020204030204" pitchFamily="49" charset="0"/>
+                <a:ea typeface="Calibri" panose="020F0502020204030204" pitchFamily="34" charset="0"/>
+                <a:cs typeface="Times New Roman" panose="02020603050405020304" pitchFamily="18" charset="0"/>
+              </a:rPr>
+              <a:t>oh.OrderId</a:t>
+            </a:r>
+            <a:r>
+              <a:rPr lang="en-US" dirty="0">
                 <a:solidFill>
                   <a:srgbClr val="008080"/>
                 </a:solidFill>
-                <a:latin typeface="Consolas" panose="020B0609020204030204" pitchFamily="49" charset="0"/>
-                <a:ea typeface="Calibri" panose="020F0502020204030204" pitchFamily="34" charset="0"/>
-                <a:cs typeface="Times New Roman" panose="02020603050405020304" pitchFamily="18" charset="0"/>
-              </a:rPr>
-              <a:t>od</a:t>
-            </a:r>
-            <a:r>
-              <a:rPr lang="en-US" dirty="0" err="1">
-                <a:solidFill>
-                  <a:srgbClr val="808080"/>
-                </a:solidFill>
-                <a:latin typeface="Consolas" panose="020B0609020204030204" pitchFamily="49" charset="0"/>
-                <a:ea typeface="Calibri" panose="020F0502020204030204" pitchFamily="34" charset="0"/>
-                <a:cs typeface="Times New Roman" panose="02020603050405020304" pitchFamily="18" charset="0"/>
-              </a:rPr>
-              <a:t>.</a:t>
+                <a:highlight>
+                  <a:srgbClr val="FFFF00"/>
+                </a:highlight>
+                <a:latin typeface="Consolas" panose="020B0609020204030204" pitchFamily="49" charset="0"/>
+                <a:ea typeface="Calibri" panose="020F0502020204030204" pitchFamily="34" charset="0"/>
+                <a:cs typeface="Times New Roman" panose="02020603050405020304" pitchFamily="18" charset="0"/>
+              </a:rPr>
+              <a:t> = </a:t>
             </a:r>
             <a:r>
               <a:rPr lang="en-US" dirty="0" err="1">
                 <a:solidFill>
                   <a:srgbClr val="008080"/>
                 </a:solidFill>
-                <a:latin typeface="Consolas" panose="020B0609020204030204" pitchFamily="49" charset="0"/>
-                <a:ea typeface="Calibri" panose="020F0502020204030204" pitchFamily="34" charset="0"/>
-                <a:cs typeface="Times New Roman" panose="02020603050405020304" pitchFamily="18" charset="0"/>
-              </a:rPr>
-              <a:t>OrderId</a:t>
-            </a:r>
-            <a:endParaRPr lang="en-US" sz="2400" dirty="0">
-              <a:latin typeface="Calibri" panose="020F0502020204030204" pitchFamily="34" charset="0"/>
+                <a:highlight>
+                  <a:srgbClr val="FFFF00"/>
+                </a:highlight>
+                <a:latin typeface="Consolas" panose="020B0609020204030204" pitchFamily="49" charset="0"/>
+                <a:ea typeface="Calibri" panose="020F0502020204030204" pitchFamily="34" charset="0"/>
+                <a:cs typeface="Times New Roman" panose="02020603050405020304" pitchFamily="18" charset="0"/>
+              </a:rPr>
+              <a:t>od.OrderId</a:t>
+            </a:r>
+            <a:endParaRPr lang="en-US" dirty="0">
+              <a:solidFill>
+                <a:srgbClr val="008080"/>
+              </a:solidFill>
+              <a:highlight>
+                <a:srgbClr val="FFFF00"/>
+              </a:highlight>
+              <a:latin typeface="Consolas" panose="020B0609020204030204" pitchFamily="49" charset="0"/>
               <a:ea typeface="Calibri" panose="020F0502020204030204" pitchFamily="34" charset="0"/>
               <a:cs typeface="Times New Roman" panose="02020603050405020304" pitchFamily="18" charset="0"/>
             </a:endParaRPr>
@@ -12617,53 +12750,87 @@
             <a:r>
               <a:rPr lang="en-US" dirty="0">
                 <a:solidFill>
+                  <a:srgbClr val="808080"/>
+                </a:solidFill>
+                <a:latin typeface="Consolas" panose="020B0609020204030204" pitchFamily="49" charset="0"/>
+                <a:ea typeface="Calibri" panose="020F0502020204030204" pitchFamily="34" charset="0"/>
+                <a:cs typeface="Times New Roman" panose="02020603050405020304" pitchFamily="18" charset="0"/>
+              </a:rPr>
+              <a:t>inner</a:t>
+            </a:r>
+            <a:r>
+              <a:rPr lang="en-US" dirty="0">
+                <a:latin typeface="Consolas" panose="020B0609020204030204" pitchFamily="49" charset="0"/>
+                <a:ea typeface="Calibri" panose="020F0502020204030204" pitchFamily="34" charset="0"/>
+                <a:cs typeface="Times New Roman" panose="02020603050405020304" pitchFamily="18" charset="0"/>
+              </a:rPr>
+              <a:t> </a:t>
+            </a:r>
+            <a:r>
+              <a:rPr lang="en-US" dirty="0">
+                <a:solidFill>
+                  <a:srgbClr val="808080"/>
+                </a:solidFill>
+                <a:latin typeface="Consolas" panose="020B0609020204030204" pitchFamily="49" charset="0"/>
+                <a:ea typeface="Calibri" panose="020F0502020204030204" pitchFamily="34" charset="0"/>
+                <a:cs typeface="Times New Roman" panose="02020603050405020304" pitchFamily="18" charset="0"/>
+              </a:rPr>
+              <a:t>join</a:t>
+            </a:r>
+            <a:r>
+              <a:rPr lang="en-US" dirty="0">
+                <a:latin typeface="Consolas" panose="020B0609020204030204" pitchFamily="49" charset="0"/>
+                <a:ea typeface="Calibri" panose="020F0502020204030204" pitchFamily="34" charset="0"/>
+                <a:cs typeface="Times New Roman" panose="02020603050405020304" pitchFamily="18" charset="0"/>
+              </a:rPr>
+              <a:t> </a:t>
+            </a:r>
+            <a:r>
+              <a:rPr lang="en-US" dirty="0" err="1">
+                <a:solidFill>
                   <a:srgbClr val="008080"/>
                 </a:solidFill>
-                <a:highlight>
-                  <a:srgbClr val="FFFF00"/>
-                </a:highlight>
-                <a:latin typeface="Consolas" panose="020B0609020204030204" pitchFamily="49" charset="0"/>
-                <a:ea typeface="Calibri" panose="020F0502020204030204" pitchFamily="34" charset="0"/>
-                <a:cs typeface="Times New Roman" panose="02020603050405020304" pitchFamily="18" charset="0"/>
-              </a:rPr>
-              <a:t>inner join </a:t>
+                <a:latin typeface="Consolas" panose="020B0609020204030204" pitchFamily="49" charset="0"/>
+                <a:ea typeface="Calibri" panose="020F0502020204030204" pitchFamily="34" charset="0"/>
+                <a:cs typeface="Times New Roman" panose="02020603050405020304" pitchFamily="18" charset="0"/>
+              </a:rPr>
+              <a:t>dbo</a:t>
+            </a:r>
+            <a:r>
+              <a:rPr lang="en-US" dirty="0" err="1">
+                <a:solidFill>
+                  <a:srgbClr val="808080"/>
+                </a:solidFill>
+                <a:latin typeface="Consolas" panose="020B0609020204030204" pitchFamily="49" charset="0"/>
+                <a:ea typeface="Calibri" panose="020F0502020204030204" pitchFamily="34" charset="0"/>
+                <a:cs typeface="Times New Roman" panose="02020603050405020304" pitchFamily="18" charset="0"/>
+              </a:rPr>
+              <a:t>.</a:t>
             </a:r>
             <a:r>
               <a:rPr lang="en-US" dirty="0" err="1">
                 <a:solidFill>
                   <a:srgbClr val="008080"/>
                 </a:solidFill>
-                <a:highlight>
-                  <a:srgbClr val="FFFF00"/>
-                </a:highlight>
-                <a:latin typeface="Consolas" panose="020B0609020204030204" pitchFamily="49" charset="0"/>
-                <a:ea typeface="Calibri" panose="020F0502020204030204" pitchFamily="34" charset="0"/>
-                <a:cs typeface="Times New Roman" panose="02020603050405020304" pitchFamily="18" charset="0"/>
-              </a:rPr>
-              <a:t>dbo.Customer</a:t>
-            </a:r>
-            <a:r>
-              <a:rPr lang="en-US" dirty="0">
+                <a:latin typeface="Consolas" panose="020B0609020204030204" pitchFamily="49" charset="0"/>
+                <a:ea typeface="Calibri" panose="020F0502020204030204" pitchFamily="34" charset="0"/>
+                <a:cs typeface="Times New Roman" panose="02020603050405020304" pitchFamily="18" charset="0"/>
+              </a:rPr>
+              <a:t>Customer</a:t>
+            </a:r>
+            <a:r>
+              <a:rPr lang="en-US" dirty="0">
+                <a:latin typeface="Consolas" panose="020B0609020204030204" pitchFamily="49" charset="0"/>
+                <a:ea typeface="Calibri" panose="020F0502020204030204" pitchFamily="34" charset="0"/>
+                <a:cs typeface="Times New Roman" panose="02020603050405020304" pitchFamily="18" charset="0"/>
+              </a:rPr>
+              <a:t> </a:t>
+            </a:r>
+            <a:r>
+              <a:rPr lang="en-US" dirty="0" err="1">
                 <a:solidFill>
                   <a:srgbClr val="008080"/>
                 </a:solidFill>
-                <a:highlight>
-                  <a:srgbClr val="FFFF00"/>
-                </a:highlight>
-                <a:latin typeface="Consolas" panose="020B0609020204030204" pitchFamily="49" charset="0"/>
-                <a:ea typeface="Calibri" panose="020F0502020204030204" pitchFamily="34" charset="0"/>
-                <a:cs typeface="Times New Roman" panose="02020603050405020304" pitchFamily="18" charset="0"/>
-              </a:rPr>
-              <a:t> </a:t>
-            </a:r>
-            <a:r>
-              <a:rPr lang="en-US" dirty="0" err="1">
-                <a:solidFill>
-                  <a:srgbClr val="008080"/>
-                </a:solidFill>
-                <a:highlight>
-                  <a:srgbClr val="FFFF00"/>
-                </a:highlight>
                 <a:latin typeface="Consolas" panose="020B0609020204030204" pitchFamily="49" charset="0"/>
                 <a:ea typeface="Calibri" panose="020F0502020204030204" pitchFamily="34" charset="0"/>
                 <a:cs typeface="Times New Roman" panose="02020603050405020304" pitchFamily="18" charset="0"/>
@@ -12672,12 +12839,6 @@
             </a:r>
             <a:r>
               <a:rPr lang="en-US" dirty="0">
-                <a:solidFill>
-                  <a:srgbClr val="008080"/>
-                </a:solidFill>
-                <a:highlight>
-                  <a:srgbClr val="FFFF00"/>
-                </a:highlight>
                 <a:latin typeface="Consolas" panose="020B0609020204030204" pitchFamily="49" charset="0"/>
                 <a:ea typeface="Calibri" panose="020F0502020204030204" pitchFamily="34" charset="0"/>
                 <a:cs typeface="Times New Roman" panose="02020603050405020304" pitchFamily="18" charset="0"/>
@@ -13232,7 +13393,7 @@
           <a:p>
             <a:r>
               <a:rPr lang="en-US" sz="3000" dirty="0"/>
-              <a:t>Step 3: FROM</a:t>
+              <a:t>Step 2: ON</a:t>
             </a:r>
           </a:p>
           <a:p>
@@ -13242,8 +13403,21 @@
             </a:pPr>
             <a:r>
               <a:rPr lang="en-US" sz="3000" dirty="0"/>
-              <a:t>R2 joined to Customer</a:t>
-            </a:r>
+              <a:t>Find rows in R2 where </a:t>
+            </a:r>
+            <a:r>
+              <a:rPr lang="en-US" sz="3000" dirty="0" err="1"/>
+              <a:t>OrderId</a:t>
+            </a:r>
+            <a:r>
+              <a:rPr lang="en-US" sz="3000" dirty="0"/>
+              <a:t> = </a:t>
+            </a:r>
+            <a:r>
+              <a:rPr lang="en-US" sz="3000" dirty="0" err="1"/>
+              <a:t>OrderId</a:t>
+            </a:r>
+            <a:endParaRPr lang="en-US" sz="3000" dirty="0"/>
           </a:p>
           <a:p>
             <a:pPr marL="457200" indent="-457200">
@@ -13252,7 +13426,7 @@
             </a:pPr>
             <a:r>
               <a:rPr lang="en-US" sz="3000" dirty="0"/>
-              <a:t>Perform Cartesian join</a:t>
+              <a:t>Result is 42,298,923,556 rows / 8 columns</a:t>
             </a:r>
           </a:p>
           <a:p>
@@ -13262,17 +13436,7 @@
             </a:pPr>
             <a:r>
               <a:rPr lang="en-US" sz="3000" dirty="0"/>
-              <a:t>Result is 42,298,923,556 rows / 14 columns</a:t>
-            </a:r>
-          </a:p>
-          <a:p>
-            <a:pPr marL="457200" indent="-457200">
-              <a:buFont typeface="Arial" panose="020B0604020202020204" pitchFamily="34" charset="0"/>
-              <a:buChar char="•"/>
-            </a:pPr>
-            <a:r>
-              <a:rPr lang="en-US" sz="3000" dirty="0"/>
-              <a:t>This is result table R3</a:t>
+              <a:t>This is result table R2</a:t>
             </a:r>
           </a:p>
         </p:txBody>
@@ -13280,7 +13444,7 @@
     </p:spTree>
     <p:extLst>
       <p:ext uri="{BB962C8B-B14F-4D97-AF65-F5344CB8AC3E}">
-        <p14:creationId xmlns:p14="http://schemas.microsoft.com/office/powerpoint/2010/main" val="3450529162"/>
+        <p14:creationId xmlns:p14="http://schemas.microsoft.com/office/powerpoint/2010/main" val="856205788"/>
       </p:ext>
     </p:extLst>
   </p:cSld>

</xml_diff>

<commit_message>
Update logical processing order counts based on query for OK.  Add helper query to get counts.
</commit_message>
<xml_diff>
--- a/Optimizer.pptx
+++ b/Optimizer.pptx
@@ -12976,8 +12976,13 @@
             </a:pPr>
             <a:r>
               <a:rPr lang="en-US" sz="3000" dirty="0"/>
-              <a:t>This is result table R2</a:t>
-            </a:r>
+              <a:t>This is result table </a:t>
+            </a:r>
+            <a:r>
+              <a:rPr lang="en-US" sz="3000" dirty="0" smtClean="0"/>
+              <a:t>R3</a:t>
+            </a:r>
+            <a:endParaRPr lang="en-US" sz="3000" dirty="0"/>
           </a:p>
         </p:txBody>
       </p:sp>
@@ -15410,8 +15415,21 @@
             </a:pPr>
             <a:r>
               <a:rPr lang="en-US" sz="3000" dirty="0"/>
-              <a:t>Find rows in R4 where State = ‘SD’</a:t>
-            </a:r>
+              <a:t>Find rows in R4 where State = </a:t>
+            </a:r>
+            <a:r>
+              <a:rPr lang="en-US" sz="3000" dirty="0" smtClean="0"/>
+              <a:t>‘</a:t>
+            </a:r>
+            <a:r>
+              <a:rPr lang="en-US" sz="3000" dirty="0" smtClean="0"/>
+              <a:t>OK</a:t>
+            </a:r>
+            <a:r>
+              <a:rPr lang="en-US" sz="3000" dirty="0" smtClean="0"/>
+              <a:t>’</a:t>
+            </a:r>
+            <a:endParaRPr lang="en-US" sz="3000" dirty="0"/>
           </a:p>
           <a:p>
             <a:pPr marL="457200" indent="-457200">
@@ -15420,7 +15438,15 @@
             </a:pPr>
             <a:r>
               <a:rPr lang="en-US" sz="3000" dirty="0"/>
-              <a:t>Result is 1,961 rows / </a:t>
+              <a:t>Result is </a:t>
+            </a:r>
+            <a:r>
+              <a:rPr lang="en-US" sz="3000" dirty="0" smtClean="0"/>
+              <a:t>8,612 </a:t>
+            </a:r>
+            <a:r>
+              <a:rPr lang="en-US" sz="3000" dirty="0"/>
+              <a:t>rows / </a:t>
             </a:r>
             <a:r>
               <a:rPr lang="en-US" sz="3000" dirty="0" smtClean="0"/>
@@ -16619,7 +16645,7 @@
         <p:spPr>
           <a:xfrm>
             <a:off x="513471" y="3249636"/>
-            <a:ext cx="8187397" cy="2504049"/>
+            <a:ext cx="8187397" cy="2715735"/>
           </a:xfrm>
           <a:prstGeom prst="rect">
             <a:avLst/>
@@ -16669,7 +16695,19 @@
             </a:pPr>
             <a:r>
               <a:rPr lang="en-US" sz="3000" dirty="0"/>
-              <a:t>Result is 1,472 rows / 2 columns</a:t>
+              <a:t>Result is </a:t>
+            </a:r>
+            <a:r>
+              <a:rPr lang="en-US" sz="3000" dirty="0" smtClean="0"/>
+              <a:t>4,409</a:t>
+            </a:r>
+            <a:r>
+              <a:rPr lang="en-US" sz="3000" dirty="0" smtClean="0"/>
+              <a:t> </a:t>
+            </a:r>
+            <a:r>
+              <a:rPr lang="en-US" sz="3000" dirty="0"/>
+              <a:t>rows / 2 columns</a:t>
             </a:r>
           </a:p>
           <a:p>
@@ -17879,7 +17917,15 @@
             </a:pPr>
             <a:r>
               <a:rPr lang="en-US" sz="3000" dirty="0"/>
-              <a:t>Result is 10 rows / 2 columns</a:t>
+              <a:t>Result is </a:t>
+            </a:r>
+            <a:r>
+              <a:rPr lang="en-US" sz="3000" dirty="0" smtClean="0"/>
+              <a:t>39 </a:t>
+            </a:r>
+            <a:r>
+              <a:rPr lang="en-US" sz="3000" dirty="0"/>
+              <a:t>rows / 2 columns</a:t>
             </a:r>
           </a:p>
           <a:p>
@@ -20117,7 +20163,19 @@
             </a:pPr>
             <a:r>
               <a:rPr lang="en-US" sz="3000" dirty="0"/>
-              <a:t>Result is 10 rows / 2 columns</a:t>
+              <a:t>Result is </a:t>
+            </a:r>
+            <a:r>
+              <a:rPr lang="en-US" sz="3000" dirty="0" smtClean="0"/>
+              <a:t>39</a:t>
+            </a:r>
+            <a:r>
+              <a:rPr lang="en-US" sz="3000" dirty="0" smtClean="0"/>
+              <a:t> </a:t>
+            </a:r>
+            <a:r>
+              <a:rPr lang="en-US" sz="3000" dirty="0"/>
+              <a:t>rows / 2 columns</a:t>
             </a:r>
           </a:p>
           <a:p>
@@ -21336,7 +21394,15 @@
             </a:pPr>
             <a:r>
               <a:rPr lang="en-US" sz="3000" dirty="0"/>
-              <a:t>Result is 10 rows / 2 columns</a:t>
+              <a:t>Result is </a:t>
+            </a:r>
+            <a:r>
+              <a:rPr lang="en-US" sz="3000" dirty="0" smtClean="0"/>
+              <a:t>5 </a:t>
+            </a:r>
+            <a:r>
+              <a:rPr lang="en-US" sz="3000" dirty="0"/>
+              <a:t>rows / 2 columns</a:t>
             </a:r>
           </a:p>
           <a:p>

</xml_diff>

<commit_message>
Changes to polling appearance.
</commit_message>
<xml_diff>
--- a/Optimizer.pptx
+++ b/Optimizer.pptx
@@ -273,7 +273,7 @@
           <a:p>
             <a:fld id="{2EDCB34D-5EC2-4739-9693-E425457AC201}" type="datetimeFigureOut">
               <a:rPr lang="en-US" smtClean="0"/>
-              <a:t>08/01/2016</a:t>
+              <a:t>8/11/2016</a:t>
             </a:fld>
             <a:endParaRPr lang="en-US"/>
           </a:p>
@@ -1581,31 +1581,31 @@
           <a:lstStyle/>
           <a:p>
             <a:r>
-              <a:rPr lang="en-US" dirty="0" smtClean="0"/>
+              <a:rPr lang="en-US" dirty="0"/>
               <a:t>Constant folding refers to pre-computing as much of an expression as possible, for example: 2 * pi() * radius</a:t>
             </a:r>
             <a:r>
-              <a:rPr lang="en-US" baseline="0" dirty="0" smtClean="0"/>
+              <a:rPr lang="en-US" baseline="0" dirty="0"/>
               <a:t> =&gt; 6.28319 * radius</a:t>
             </a:r>
-            <a:endParaRPr lang="en-US" dirty="0" smtClean="0"/>
-          </a:p>
-          <a:p>
-            <a:r>
-              <a:rPr lang="en-US" dirty="0" smtClean="0"/>
+            <a:endParaRPr lang="en-US" dirty="0"/>
+          </a:p>
+          <a:p>
+            <a:r>
+              <a:rPr lang="en-US" dirty="0"/>
               <a:t>As an</a:t>
             </a:r>
             <a:r>
-              <a:rPr lang="en-US" baseline="0" dirty="0" smtClean="0"/>
+              <a:rPr lang="en-US" baseline="0" dirty="0"/>
               <a:t> example, data type resolution with the UNION operator will ensure that data types between the upper expression are compatible with the lower expression.</a:t>
             </a:r>
           </a:p>
           <a:p>
             <a:r>
-              <a:rPr lang="en-US" baseline="0" dirty="0" smtClean="0"/>
+              <a:rPr lang="en-US" baseline="0" dirty="0"/>
               <a:t>Aggregate binding checks if invalid columns are referenced downstream of the GROUP BY logical processing step.</a:t>
             </a:r>
-            <a:endParaRPr lang="en-US" dirty="0" smtClean="0"/>
+            <a:endParaRPr lang="en-US" dirty="0"/>
           </a:p>
           <a:p>
             <a:endParaRPr lang="en-US" dirty="0"/>
@@ -3730,7 +3730,7 @@
             <a:fld id="{5942B21B-2ADA-A040-A652-A7305E1B99FE}" type="datetimeFigureOut">
               <a:rPr lang="en-US" smtClean="0"/>
               <a:pPr/>
-              <a:t>08/01/2016</a:t>
+              <a:t>8/11/2016</a:t>
             </a:fld>
             <a:endParaRPr lang="en-US" dirty="0"/>
           </a:p>
@@ -3920,7 +3920,7 @@
           <a:p>
             <a:fld id="{5942B21B-2ADA-A040-A652-A7305E1B99FE}" type="datetimeFigureOut">
               <a:rPr lang="en-US" smtClean="0"/>
-              <a:t>08/01/2016</a:t>
+              <a:t>8/11/2016</a:t>
             </a:fld>
             <a:endParaRPr lang="en-US"/>
           </a:p>
@@ -4044,7 +4044,7 @@
             <a:fld id="{5942B21B-2ADA-A040-A652-A7305E1B99FE}" type="datetimeFigureOut">
               <a:rPr lang="en-US" smtClean="0"/>
               <a:pPr/>
-              <a:t>08/01/2016</a:t>
+              <a:t>8/11/2016</a:t>
             </a:fld>
             <a:r>
               <a:rPr lang="en-US"/>
@@ -4315,7 +4315,7 @@
             <a:fld id="{5942B21B-2ADA-A040-A652-A7305E1B99FE}" type="datetimeFigureOut">
               <a:rPr lang="en-US" smtClean="0"/>
               <a:pPr/>
-              <a:t>08/01/2016</a:t>
+              <a:t>8/11/2016</a:t>
             </a:fld>
             <a:r>
               <a:rPr lang="en-US" dirty="0"/>
@@ -4585,7 +4585,7 @@
             <a:fld id="{5942B21B-2ADA-A040-A652-A7305E1B99FE}" type="datetimeFigureOut">
               <a:rPr lang="en-US" smtClean="0"/>
               <a:pPr/>
-              <a:t>08/01/2016</a:t>
+              <a:t>8/11/2016</a:t>
             </a:fld>
             <a:r>
               <a:rPr lang="en-US" dirty="0"/>
@@ -4925,7 +4925,7 @@
             <a:fld id="{5942B21B-2ADA-A040-A652-A7305E1B99FE}" type="datetimeFigureOut">
               <a:rPr lang="en-US" smtClean="0"/>
               <a:pPr/>
-              <a:t>08/01/2016</a:t>
+              <a:t>8/11/2016</a:t>
             </a:fld>
             <a:r>
               <a:rPr lang="en-US" dirty="0"/>
@@ -5266,7 +5266,7 @@
             <a:fld id="{5942B21B-2ADA-A040-A652-A7305E1B99FE}" type="datetimeFigureOut">
               <a:rPr lang="en-US" smtClean="0"/>
               <a:pPr/>
-              <a:t>08/01/2016</a:t>
+              <a:t>8/11/2016</a:t>
             </a:fld>
             <a:r>
               <a:rPr lang="en-US" dirty="0"/>
@@ -5781,7 +5781,7 @@
             <a:fld id="{5942B21B-2ADA-A040-A652-A7305E1B99FE}" type="datetimeFigureOut">
               <a:rPr lang="en-US" smtClean="0"/>
               <a:pPr/>
-              <a:t>08/01/2016</a:t>
+              <a:t>8/11/2016</a:t>
             </a:fld>
             <a:r>
               <a:rPr lang="en-US" dirty="0"/>
@@ -5990,7 +5990,7 @@
             <a:fld id="{5942B21B-2ADA-A040-A652-A7305E1B99FE}" type="datetimeFigureOut">
               <a:rPr lang="en-US" smtClean="0"/>
               <a:pPr/>
-              <a:t>08/01/2016</a:t>
+              <a:t>8/11/2016</a:t>
             </a:fld>
             <a:r>
               <a:rPr lang="en-US" dirty="0"/>
@@ -6177,7 +6177,7 @@
             <a:fld id="{5942B21B-2ADA-A040-A652-A7305E1B99FE}" type="datetimeFigureOut">
               <a:rPr lang="en-US" smtClean="0"/>
               <a:pPr/>
-              <a:t>08/01/2016</a:t>
+              <a:t>8/11/2016</a:t>
             </a:fld>
             <a:r>
               <a:rPr lang="en-US" dirty="0"/>
@@ -6508,7 +6508,7 @@
             <a:fld id="{5942B21B-2ADA-A040-A652-A7305E1B99FE}" type="datetimeFigureOut">
               <a:rPr lang="en-US" smtClean="0"/>
               <a:pPr/>
-              <a:t>08/01/2016</a:t>
+              <a:t>8/11/2016</a:t>
             </a:fld>
             <a:r>
               <a:rPr lang="en-US" dirty="0"/>
@@ -6816,7 +6816,7 @@
             <a:fld id="{5942B21B-2ADA-A040-A652-A7305E1B99FE}" type="datetimeFigureOut">
               <a:rPr lang="en-US" smtClean="0"/>
               <a:pPr/>
-              <a:t>08/01/2016</a:t>
+              <a:t>8/11/2016</a:t>
             </a:fld>
             <a:r>
               <a:rPr lang="en-US" dirty="0"/>
@@ -7095,7 +7095,7 @@
             <a:fld id="{5942B21B-2ADA-A040-A652-A7305E1B99FE}" type="datetimeFigureOut">
               <a:rPr lang="en-US" smtClean="0"/>
               <a:pPr/>
-              <a:t>08/01/2016</a:t>
+              <a:t>8/11/2016</a:t>
             </a:fld>
             <a:r>
               <a:rPr lang="en-US" dirty="0"/>
@@ -7692,20 +7692,8 @@
               <a:buNone/>
             </a:pPr>
             <a:r>
-              <a:rPr lang="en-US" dirty="0" smtClean="0"/>
-              <a:t>Oklahoma City, OK </a:t>
-            </a:r>
-            <a:r>
               <a:rPr lang="en-US" dirty="0"/>
-              <a:t>– </a:t>
-            </a:r>
-            <a:r>
-              <a:rPr lang="en-US" dirty="0" smtClean="0"/>
-              <a:t>August 27, </a:t>
-            </a:r>
-            <a:r>
-              <a:rPr lang="en-US" dirty="0"/>
-              <a:t>2016</a:t>
+              <a:t>Oklahoma City, OK – August 27, 2016</a:t>
             </a:r>
           </a:p>
         </p:txBody>
@@ -7801,6 +7789,9 @@
             <a:off x="457200" y="1600200"/>
             <a:ext cx="8229600" cy="603985"/>
           </a:xfrm>
+          <a:solidFill>
+            <a:schemeClr val="tx1"/>
+          </a:solidFill>
         </p:spPr>
         <p:txBody>
           <a:bodyPr/>
@@ -7810,7 +7801,11 @@
               <a:buNone/>
             </a:pPr>
             <a:r>
-              <a:rPr lang="en-US" dirty="0"/>
+              <a:rPr lang="en-US" b="1" dirty="0">
+                <a:solidFill>
+                  <a:schemeClr val="bg1"/>
+                </a:solidFill>
+              </a:rPr>
               <a:t>What is TF3604?</a:t>
             </a:r>
           </a:p>
@@ -7818,13 +7813,21 @@
             <a:pPr marL="0" indent="0">
               <a:buNone/>
             </a:pPr>
-            <a:endParaRPr lang="en-US" dirty="0"/>
+            <a:endParaRPr lang="en-US" b="1" dirty="0">
+              <a:solidFill>
+                <a:schemeClr val="bg1"/>
+              </a:solidFill>
+            </a:endParaRPr>
           </a:p>
           <a:p>
             <a:pPr marL="0" indent="0">
               <a:buNone/>
             </a:pPr>
-            <a:endParaRPr lang="en-US" dirty="0"/>
+            <a:endParaRPr lang="en-US" b="1" dirty="0">
+              <a:solidFill>
+                <a:schemeClr val="bg1"/>
+              </a:solidFill>
+            </a:endParaRPr>
           </a:p>
         </p:txBody>
       </p:sp>
@@ -7844,12 +7847,7 @@
           <a:prstGeom prst="rect">
             <a:avLst/>
           </a:prstGeom>
-          <a:solidFill>
-            <a:schemeClr val="accent5">
-              <a:lumMod val="20000"/>
-              <a:lumOff val="80000"/>
-            </a:schemeClr>
-          </a:solidFill>
+          <a:noFill/>
         </p:spPr>
         <p:txBody>
           <a:bodyPr vert="horz" lIns="91440" tIns="45720" rIns="91440" bIns="45720" rtlCol="0" anchor="ctr">
@@ -7993,9 +7991,9 @@
             </a:lvl9pPr>
           </a:lstStyle>
           <a:p>
-            <a:pPr marL="0" indent="0" algn="ctr">
-              <a:buFont typeface="Wingdings" charset="2"/>
-              <a:buNone/>
+            <a:pPr>
+              <a:buFont typeface="Courier New" panose="02070309020205020404" pitchFamily="49" charset="0"/>
+              <a:buChar char="o"/>
             </a:pPr>
             <a:r>
               <a:rPr lang="en-US" dirty="0"/>
@@ -8020,12 +8018,7 @@
           <a:prstGeom prst="rect">
             <a:avLst/>
           </a:prstGeom>
-          <a:solidFill>
-            <a:schemeClr val="accent5">
-              <a:lumMod val="20000"/>
-              <a:lumOff val="80000"/>
-            </a:schemeClr>
-          </a:solidFill>
+          <a:noFill/>
         </p:spPr>
         <p:txBody>
           <a:bodyPr vert="horz" lIns="91440" tIns="45720" rIns="91440" bIns="45720" rtlCol="0" anchor="ctr">
@@ -8169,9 +8162,9 @@
             </a:lvl9pPr>
           </a:lstStyle>
           <a:p>
-            <a:pPr marL="0" indent="0" algn="ctr">
-              <a:buFont typeface="Wingdings" charset="2"/>
-              <a:buNone/>
+            <a:pPr>
+              <a:buFont typeface="Courier New" panose="02070309020205020404" pitchFamily="49" charset="0"/>
+              <a:buChar char="o"/>
             </a:pPr>
             <a:r>
               <a:rPr lang="en-US" dirty="0"/>
@@ -8196,12 +8189,7 @@
           <a:prstGeom prst="rect">
             <a:avLst/>
           </a:prstGeom>
-          <a:solidFill>
-            <a:schemeClr val="accent5">
-              <a:lumMod val="20000"/>
-              <a:lumOff val="80000"/>
-            </a:schemeClr>
-          </a:solidFill>
+          <a:noFill/>
         </p:spPr>
         <p:txBody>
           <a:bodyPr vert="horz" lIns="91440" tIns="45720" rIns="91440" bIns="45720" rtlCol="0" anchor="ctr">
@@ -8345,9 +8333,9 @@
             </a:lvl9pPr>
           </a:lstStyle>
           <a:p>
-            <a:pPr marL="0" indent="0" algn="ctr">
-              <a:buFont typeface="Wingdings" charset="2"/>
-              <a:buNone/>
+            <a:pPr>
+              <a:buFont typeface="Courier New" panose="02070309020205020404" pitchFamily="49" charset="0"/>
+              <a:buChar char="o"/>
             </a:pPr>
             <a:r>
               <a:rPr lang="en-US" dirty="0"/>
@@ -8435,31 +8423,19 @@
           <a:p>
             <a:r>
               <a:rPr lang="en-US" dirty="0"/>
-              <a:t>Defines the sequence in which SQL elements are logically </a:t>
-            </a:r>
-            <a:r>
-              <a:rPr lang="en-US" dirty="0" smtClean="0"/>
-              <a:t>processed</a:t>
-            </a:r>
-          </a:p>
-          <a:p>
-            <a:r>
-              <a:rPr lang="en-US" dirty="0" smtClean="0"/>
-              <a:t>Forms </a:t>
-            </a:r>
+              <a:t>Defines the sequence in which SQL elements are logically processed</a:t>
+            </a:r>
+          </a:p>
+          <a:p>
             <a:r>
               <a:rPr lang="en-US" dirty="0"/>
-              <a:t>the starting basis for parsing the submitted query</a:t>
+              <a:t>Forms the starting basis for parsing the submitted query</a:t>
             </a:r>
           </a:p>
           <a:p>
             <a:r>
               <a:rPr lang="en-US" dirty="0"/>
-              <a:t>Usually discussed from the perspective of a SELECT query; similar for UPDATE / DELETE / INSERT / </a:t>
-            </a:r>
-            <a:r>
-              <a:rPr lang="en-US" dirty="0" smtClean="0"/>
-              <a:t>MERGE</a:t>
+              <a:t>Usually discussed from the perspective of a SELECT query; similar for UPDATE / DELETE / INSERT / MERGE</a:t>
             </a:r>
           </a:p>
           <a:p>
@@ -8472,13 +8448,8 @@
             <a:pPr lvl="1"/>
             <a:r>
               <a:rPr lang="en-US" dirty="0"/>
-              <a:t>“What” vs “How</a:t>
-            </a:r>
-            <a:r>
-              <a:rPr lang="en-US" dirty="0" smtClean="0"/>
-              <a:t>”</a:t>
-            </a:r>
-            <a:endParaRPr lang="en-US" dirty="0"/>
+              <a:t>“What” vs “How”</a:t>
+            </a:r>
           </a:p>
         </p:txBody>
       </p:sp>
@@ -8492,13 +8463,6 @@
   <p:clrMapOvr>
     <a:masterClrMapping/>
   </p:clrMapOvr>
-  <p:timing>
-    <p:tnLst>
-      <p:par>
-        <p:cTn id="1" dur="indefinite" restart="never" nodeType="tmRoot"/>
-      </p:par>
-    </p:tnLst>
-  </p:timing>
 </p:sld>
 </file>
 
@@ -8674,29 +8638,29 @@
           <a:lstStyle/>
           <a:p>
             <a:r>
-              <a:rPr lang="en-US" dirty="0" smtClean="0"/>
+              <a:rPr lang="en-US" dirty="0"/>
               <a:t>For more details, see </a:t>
             </a:r>
             <a:r>
-              <a:rPr lang="en-US" dirty="0" smtClean="0">
+              <a:rPr lang="en-US" dirty="0">
                 <a:hlinkClick r:id="rId2"/>
               </a:rPr>
               <a:t>this </a:t>
             </a:r>
             <a:r>
-              <a:rPr lang="en-US" dirty="0" smtClean="0"/>
+              <a:rPr lang="en-US" dirty="0"/>
               <a:t>and subsequent articles from </a:t>
             </a:r>
             <a:r>
-              <a:rPr lang="en-US" dirty="0" err="1" smtClean="0"/>
+              <a:rPr lang="en-US" dirty="0" err="1"/>
               <a:t>Itzik</a:t>
             </a:r>
             <a:r>
-              <a:rPr lang="en-US" dirty="0" smtClean="0"/>
+              <a:rPr lang="en-US" dirty="0"/>
               <a:t> Ben-</a:t>
             </a:r>
             <a:r>
-              <a:rPr lang="en-US" dirty="0" err="1" smtClean="0"/>
+              <a:rPr lang="en-US" dirty="0" err="1"/>
               <a:t>Gan</a:t>
             </a:r>
             <a:endParaRPr lang="en-US" dirty="0"/>
@@ -8713,13 +8677,6 @@
   <p:clrMapOvr>
     <a:masterClrMapping/>
   </p:clrMapOvr>
-  <p:timing>
-    <p:tnLst>
-      <p:par>
-        <p:cTn id="1" dur="indefinite" restart="never" nodeType="tmRoot"/>
-      </p:par>
-    </p:tnLst>
-  </p:timing>
 </p:sld>
 </file>
 
@@ -9579,7 +9536,7 @@
               <a:t> </a:t>
             </a:r>
             <a:r>
-              <a:rPr lang="en-US" dirty="0" smtClean="0">
+              <a:rPr lang="en-US" dirty="0">
                 <a:solidFill>
                   <a:srgbClr val="FF0000"/>
                 </a:solidFill>
@@ -9927,21 +9884,21 @@
                 <a:gridCol w="2764301">
                   <a:extLst>
                     <a:ext uri="{9D8B030D-6E8A-4147-A177-3AD203B41FA5}">
-                      <a16:colId xmlns:a16="http://schemas.microsoft.com/office/drawing/2014/main" xmlns="" val="234227049"/>
+                      <a16:colId xmlns:a16="http://schemas.microsoft.com/office/drawing/2014/main" val="234227049"/>
                     </a:ext>
                   </a:extLst>
                 </a:gridCol>
                 <a:gridCol w="2764301">
                   <a:extLst>
                     <a:ext uri="{9D8B030D-6E8A-4147-A177-3AD203B41FA5}">
-                      <a16:colId xmlns:a16="http://schemas.microsoft.com/office/drawing/2014/main" xmlns="" val="4053135350"/>
+                      <a16:colId xmlns:a16="http://schemas.microsoft.com/office/drawing/2014/main" val="4053135350"/>
                     </a:ext>
                   </a:extLst>
                 </a:gridCol>
                 <a:gridCol w="2764301">
                   <a:extLst>
                     <a:ext uri="{9D8B030D-6E8A-4147-A177-3AD203B41FA5}">
-                      <a16:colId xmlns:a16="http://schemas.microsoft.com/office/drawing/2014/main" xmlns="" val="672378647"/>
+                      <a16:colId xmlns:a16="http://schemas.microsoft.com/office/drawing/2014/main" val="672378647"/>
                     </a:ext>
                   </a:extLst>
                 </a:gridCol>
@@ -9991,7 +9948,7 @@
                 </a:tc>
                 <a:extLst>
                   <a:ext uri="{0D108BD9-81ED-4DB2-BD59-A6C34878D82A}">
-                    <a16:rowId xmlns:a16="http://schemas.microsoft.com/office/drawing/2014/main" xmlns="" val="2843053056"/>
+                    <a16:rowId xmlns:a16="http://schemas.microsoft.com/office/drawing/2014/main" val="2843053056"/>
                   </a:ext>
                 </a:extLst>
               </a:tr>
@@ -10041,7 +9998,7 @@
                 </a:tc>
                 <a:extLst>
                   <a:ext uri="{0D108BD9-81ED-4DB2-BD59-A6C34878D82A}">
-                    <a16:rowId xmlns:a16="http://schemas.microsoft.com/office/drawing/2014/main" xmlns="" val="3055328934"/>
+                    <a16:rowId xmlns:a16="http://schemas.microsoft.com/office/drawing/2014/main" val="3055328934"/>
                   </a:ext>
                 </a:extLst>
               </a:tr>
@@ -10091,7 +10048,7 @@
                 </a:tc>
                 <a:extLst>
                   <a:ext uri="{0D108BD9-81ED-4DB2-BD59-A6C34878D82A}">
-                    <a16:rowId xmlns:a16="http://schemas.microsoft.com/office/drawing/2014/main" xmlns="" val="1144851549"/>
+                    <a16:rowId xmlns:a16="http://schemas.microsoft.com/office/drawing/2014/main" val="1144851549"/>
                   </a:ext>
                 </a:extLst>
               </a:tr>
@@ -10140,7 +10097,7 @@
                 </a:tc>
                 <a:extLst>
                   <a:ext uri="{0D108BD9-81ED-4DB2-BD59-A6C34878D82A}">
-                    <a16:rowId xmlns:a16="http://schemas.microsoft.com/office/drawing/2014/main" xmlns="" val="4258932578"/>
+                    <a16:rowId xmlns:a16="http://schemas.microsoft.com/office/drawing/2014/main" val="4258932578"/>
                   </a:ext>
                 </a:extLst>
               </a:tr>
@@ -10158,14 +10115,6 @@
   <p:clrMapOvr>
     <a:masterClrMapping/>
   </p:clrMapOvr>
-  <mc:AlternateContent xmlns:mc="http://schemas.openxmlformats.org/markup-compatibility/2006" xmlns:p14="http://schemas.microsoft.com/office/powerpoint/2010/main">
-    <mc:Choice Requires="p14">
-      <p:transition spd="slow" p14:dur="2000"/>
-    </mc:Choice>
-    <mc:Fallback xmlns="">
-      <p:transition spd="slow"/>
-    </mc:Fallback>
-  </mc:AlternateContent>
 </p:sld>
 </file>
 
@@ -11086,7 +11035,7 @@
               <a:t> </a:t>
             </a:r>
             <a:r>
-              <a:rPr lang="en-US" dirty="0" smtClean="0">
+              <a:rPr lang="en-US" dirty="0">
                 <a:solidFill>
                   <a:srgbClr val="FF0000"/>
                 </a:solidFill>
@@ -11494,14 +11443,6 @@
   <p:clrMapOvr>
     <a:masterClrMapping/>
   </p:clrMapOvr>
-  <mc:AlternateContent xmlns:mc="http://schemas.openxmlformats.org/markup-compatibility/2006" xmlns:p14="http://schemas.microsoft.com/office/powerpoint/2010/main">
-    <mc:Choice Requires="p14">
-      <p:transition spd="slow" p14:dur="2000"/>
-    </mc:Choice>
-    <mc:Fallback xmlns="">
-      <p:transition spd="slow"/>
-    </mc:Fallback>
-  </mc:AlternateContent>
 </p:sld>
 </file>
 
@@ -12333,7 +12274,7 @@
               <a:t> </a:t>
             </a:r>
             <a:r>
-              <a:rPr lang="en-US" dirty="0" smtClean="0">
+              <a:rPr lang="en-US" dirty="0">
                 <a:solidFill>
                   <a:srgbClr val="FF0000"/>
                 </a:solidFill>
@@ -12722,14 +12663,6 @@
   <p:clrMapOvr>
     <a:masterClrMapping/>
   </p:clrMapOvr>
-  <mc:AlternateContent xmlns:mc="http://schemas.openxmlformats.org/markup-compatibility/2006" xmlns:p14="http://schemas.microsoft.com/office/powerpoint/2010/main">
-    <mc:Choice Requires="p14">
-      <p:transition spd="slow" p14:dur="2000"/>
-    </mc:Choice>
-    <mc:Fallback xmlns="">
-      <p:transition spd="slow"/>
-    </mc:Fallback>
-  </mc:AlternateContent>
 </p:sld>
 </file>
 
@@ -13539,7 +13472,7 @@
               <a:t> </a:t>
             </a:r>
             <a:r>
-              <a:rPr lang="en-US" dirty="0" smtClean="0">
+              <a:rPr lang="en-US" dirty="0">
                 <a:solidFill>
                   <a:srgbClr val="FF0000"/>
                 </a:solidFill>
@@ -13926,13 +13859,8 @@
             </a:pPr>
             <a:r>
               <a:rPr lang="en-US" sz="3000" dirty="0"/>
-              <a:t>This is result table </a:t>
-            </a:r>
-            <a:r>
-              <a:rPr lang="en-US" sz="3000" dirty="0" smtClean="0"/>
-              <a:t>R3</a:t>
-            </a:r>
-            <a:endParaRPr lang="en-US" sz="3000" dirty="0"/>
+              <a:t>This is result table R3</a:t>
+            </a:r>
           </a:p>
         </p:txBody>
       </p:sp>
@@ -13946,14 +13874,6 @@
   <p:clrMapOvr>
     <a:masterClrMapping/>
   </p:clrMapOvr>
-  <mc:AlternateContent xmlns:mc="http://schemas.openxmlformats.org/markup-compatibility/2006" xmlns:p14="http://schemas.microsoft.com/office/powerpoint/2010/main">
-    <mc:Choice Requires="p14">
-      <p:transition spd="slow" p14:dur="2000"/>
-    </mc:Choice>
-    <mc:Fallback xmlns="">
-      <p:transition spd="slow"/>
-    </mc:Fallback>
-  </mc:AlternateContent>
 </p:sld>
 </file>
 
@@ -14763,7 +14683,7 @@
               <a:t> </a:t>
             </a:r>
             <a:r>
-              <a:rPr lang="en-US" dirty="0" smtClean="0">
+              <a:rPr lang="en-US" dirty="0">
                 <a:solidFill>
                   <a:srgbClr val="FF0000"/>
                 </a:solidFill>
@@ -15165,21 +15085,6 @@
   <p:clrMapOvr>
     <a:masterClrMapping/>
   </p:clrMapOvr>
-  <mc:AlternateContent xmlns:mc="http://schemas.openxmlformats.org/markup-compatibility/2006" xmlns:p14="http://schemas.microsoft.com/office/powerpoint/2010/main">
-    <mc:Choice Requires="p14">
-      <p:transition spd="slow" p14:dur="2000"/>
-    </mc:Choice>
-    <mc:Fallback xmlns="">
-      <p:transition spd="slow"/>
-    </mc:Fallback>
-  </mc:AlternateContent>
-  <p:timing>
-    <p:tnLst>
-      <p:par>
-        <p:cTn id="1" dur="indefinite" restart="never" nodeType="tmRoot"/>
-      </p:par>
-    </p:tnLst>
-  </p:timing>
 </p:sld>
 </file>
 
@@ -15999,33 +15904,8 @@
                 <a:ea typeface="Calibri" panose="020F0502020204030204" pitchFamily="34" charset="0"/>
                 <a:cs typeface="Times New Roman" panose="02020603050405020304" pitchFamily="18" charset="0"/>
               </a:rPr>
-              <a:t> = </a:t>
-            </a:r>
-            <a:r>
-              <a:rPr lang="en-US" dirty="0" smtClean="0">
-                <a:solidFill>
-                  <a:srgbClr val="008080"/>
-                </a:solidFill>
-                <a:highlight>
-                  <a:srgbClr val="FFFF00"/>
-                </a:highlight>
-                <a:latin typeface="Consolas" panose="020B0609020204030204" pitchFamily="49" charset="0"/>
-                <a:ea typeface="Calibri" panose="020F0502020204030204" pitchFamily="34" charset="0"/>
-                <a:cs typeface="Times New Roman" panose="02020603050405020304" pitchFamily="18" charset="0"/>
-              </a:rPr>
-              <a:t>'OK'</a:t>
-            </a:r>
-            <a:endParaRPr lang="en-US" dirty="0">
-              <a:solidFill>
-                <a:srgbClr val="008080"/>
-              </a:solidFill>
-              <a:highlight>
-                <a:srgbClr val="FFFF00"/>
-              </a:highlight>
-              <a:latin typeface="Consolas" panose="020B0609020204030204" pitchFamily="49" charset="0"/>
-              <a:ea typeface="Calibri" panose="020F0502020204030204" pitchFamily="34" charset="0"/>
-              <a:cs typeface="Times New Roman" panose="02020603050405020304" pitchFamily="18" charset="0"/>
-            </a:endParaRPr>
+              <a:t> = 'OK'</a:t>
+            </a:r>
           </a:p>
           <a:p>
             <a:pPr>
@@ -16365,13 +16245,8 @@
             </a:pPr>
             <a:r>
               <a:rPr lang="en-US" sz="3000" dirty="0"/>
-              <a:t>Find rows in R4 where State = </a:t>
-            </a:r>
-            <a:r>
-              <a:rPr lang="en-US" sz="3000" dirty="0" smtClean="0"/>
-              <a:t>‘OK’</a:t>
-            </a:r>
-            <a:endParaRPr lang="en-US" sz="3000" dirty="0"/>
+              <a:t>Find rows in R4 where State = ‘OK’</a:t>
+            </a:r>
           </a:p>
           <a:p>
             <a:pPr marL="457200" indent="-457200">
@@ -16380,23 +16255,7 @@
             </a:pPr>
             <a:r>
               <a:rPr lang="en-US" sz="3000" dirty="0"/>
-              <a:t>Result is </a:t>
-            </a:r>
-            <a:r>
-              <a:rPr lang="en-US" sz="3000" dirty="0" smtClean="0"/>
-              <a:t>8,612 </a:t>
-            </a:r>
-            <a:r>
-              <a:rPr lang="en-US" sz="3000" dirty="0"/>
-              <a:t>rows / </a:t>
-            </a:r>
-            <a:r>
-              <a:rPr lang="en-US" sz="3000" dirty="0" smtClean="0"/>
-              <a:t>14 </a:t>
-            </a:r>
-            <a:r>
-              <a:rPr lang="en-US" sz="3000" dirty="0"/>
-              <a:t>columns</a:t>
+              <a:t>Result is 8,612 rows / 14 columns</a:t>
             </a:r>
           </a:p>
           <a:p>
@@ -16421,21 +16280,6 @@
   <p:clrMapOvr>
     <a:masterClrMapping/>
   </p:clrMapOvr>
-  <mc:AlternateContent xmlns:mc="http://schemas.openxmlformats.org/markup-compatibility/2006" xmlns:p14="http://schemas.microsoft.com/office/powerpoint/2010/main">
-    <mc:Choice Requires="p14">
-      <p:transition spd="slow" p14:dur="2000"/>
-    </mc:Choice>
-    <mc:Fallback xmlns="">
-      <p:transition spd="slow"/>
-    </mc:Fallback>
-  </mc:AlternateContent>
-  <p:timing>
-    <p:tnLst>
-      <p:par>
-        <p:cTn id="1" dur="indefinite" restart="never" nodeType="tmRoot"/>
-      </p:par>
-    </p:tnLst>
-  </p:timing>
 </p:sld>
 </file>
 
@@ -17295,7 +17139,7 @@
               <a:t> </a:t>
             </a:r>
             <a:r>
-              <a:rPr lang="en-US" dirty="0" smtClean="0">
+              <a:rPr lang="en-US" dirty="0">
                 <a:solidFill>
                   <a:srgbClr val="FF0000"/>
                 </a:solidFill>
@@ -17637,15 +17481,7 @@
             </a:pPr>
             <a:r>
               <a:rPr lang="en-US" sz="3000" dirty="0"/>
-              <a:t>Result is </a:t>
-            </a:r>
-            <a:r>
-              <a:rPr lang="en-US" sz="3000" dirty="0" smtClean="0"/>
-              <a:t>4,409 </a:t>
-            </a:r>
-            <a:r>
-              <a:rPr lang="en-US" sz="3000" dirty="0"/>
-              <a:t>rows / 2 columns</a:t>
+              <a:t>Result is 4,409 rows / 2 columns</a:t>
             </a:r>
           </a:p>
           <a:p>
@@ -17692,21 +17528,6 @@
   <p:clrMapOvr>
     <a:masterClrMapping/>
   </p:clrMapOvr>
-  <mc:AlternateContent xmlns:mc="http://schemas.openxmlformats.org/markup-compatibility/2006" xmlns:p14="http://schemas.microsoft.com/office/powerpoint/2010/main">
-    <mc:Choice Requires="p14">
-      <p:transition spd="slow" p14:dur="2000"/>
-    </mc:Choice>
-    <mc:Fallback xmlns="">
-      <p:transition spd="slow"/>
-    </mc:Fallback>
-  </mc:AlternateContent>
-  <p:timing>
-    <p:tnLst>
-      <p:par>
-        <p:cTn id="1" dur="indefinite" restart="never" nodeType="tmRoot"/>
-      </p:par>
-    </p:tnLst>
-  </p:timing>
 </p:sld>
 </file>
 
@@ -17926,20 +17747,8 @@
               <a:buNone/>
             </a:pPr>
             <a:r>
-              <a:rPr lang="en-US" dirty="0" smtClean="0"/>
-              <a:t>Oklahoma City, OK </a:t>
-            </a:r>
-            <a:r>
               <a:rPr lang="en-US" dirty="0"/>
-              <a:t>– </a:t>
-            </a:r>
-            <a:r>
-              <a:rPr lang="en-US" dirty="0" smtClean="0"/>
-              <a:t>August 27, </a:t>
-            </a:r>
-            <a:r>
-              <a:rPr lang="en-US" dirty="0"/>
-              <a:t>2016</a:t>
+              <a:t>Oklahoma City, OK – August 27, 2016</a:t>
             </a:r>
           </a:p>
         </p:txBody>
@@ -17954,14 +17763,6 @@
   <p:clrMapOvr>
     <a:masterClrMapping/>
   </p:clrMapOvr>
-  <mc:AlternateContent xmlns:mc="http://schemas.openxmlformats.org/markup-compatibility/2006" xmlns:p14="http://schemas.microsoft.com/office/powerpoint/2010/main">
-    <mc:Choice Requires="p14">
-      <p:transition spd="slow" p14:dur="2000"/>
-    </mc:Choice>
-    <mc:Fallback xmlns="">
-      <p:transition spd="slow"/>
-    </mc:Fallback>
-  </mc:AlternateContent>
 </p:sld>
 </file>
 
@@ -18821,7 +18622,7 @@
               <a:t> </a:t>
             </a:r>
             <a:r>
-              <a:rPr lang="en-US" dirty="0" smtClean="0">
+              <a:rPr lang="en-US" dirty="0">
                 <a:solidFill>
                   <a:srgbClr val="FF0000"/>
                 </a:solidFill>
@@ -19110,15 +18911,7 @@
             </a:pPr>
             <a:r>
               <a:rPr lang="en-US" sz="3000" dirty="0"/>
-              <a:t>Result is </a:t>
-            </a:r>
-            <a:r>
-              <a:rPr lang="en-US" sz="3000" dirty="0" smtClean="0"/>
-              <a:t>39 </a:t>
-            </a:r>
-            <a:r>
-              <a:rPr lang="en-US" sz="3000" dirty="0"/>
-              <a:t>rows / 2 columns</a:t>
+              <a:t>Result is 39 rows / 2 columns</a:t>
             </a:r>
           </a:p>
           <a:p>
@@ -19144,14 +18937,6 @@
   <p:clrMapOvr>
     <a:masterClrMapping/>
   </p:clrMapOvr>
-  <mc:AlternateContent xmlns:mc="http://schemas.openxmlformats.org/markup-compatibility/2006" xmlns:p14="http://schemas.microsoft.com/office/powerpoint/2010/main">
-    <mc:Choice Requires="p14">
-      <p:transition spd="slow" p14:dur="2000"/>
-    </mc:Choice>
-    <mc:Fallback xmlns="">
-      <p:transition spd="slow"/>
-    </mc:Fallback>
-  </mc:AlternateContent>
 </p:sld>
 </file>
 
@@ -19934,7 +19719,7 @@
               <a:t> </a:t>
             </a:r>
             <a:r>
-              <a:rPr lang="en-US" dirty="0" smtClean="0">
+              <a:rPr lang="en-US" dirty="0">
                 <a:solidFill>
                   <a:srgbClr val="FF0000"/>
                 </a:solidFill>
@@ -20346,15 +20131,7 @@
             </a:pPr>
             <a:r>
               <a:rPr lang="en-US" sz="3000" dirty="0"/>
-              <a:t>Result is </a:t>
-            </a:r>
-            <a:r>
-              <a:rPr lang="en-US" sz="3000" dirty="0" smtClean="0"/>
-              <a:t>39 </a:t>
-            </a:r>
-            <a:r>
-              <a:rPr lang="en-US" sz="3000" dirty="0"/>
-              <a:t>rows / 2 columns</a:t>
+              <a:t>Result is 39 rows / 2 columns</a:t>
             </a:r>
           </a:p>
           <a:p>
@@ -20380,14 +20157,6 @@
   <p:clrMapOvr>
     <a:masterClrMapping/>
   </p:clrMapOvr>
-  <mc:AlternateContent xmlns:mc="http://schemas.openxmlformats.org/markup-compatibility/2006" xmlns:p14="http://schemas.microsoft.com/office/powerpoint/2010/main">
-    <mc:Choice Requires="p14">
-      <p:transition spd="slow" p14:dur="2000"/>
-    </mc:Choice>
-    <mc:Fallback xmlns="">
-      <p:transition spd="slow"/>
-    </mc:Fallback>
-  </mc:AlternateContent>
 </p:sld>
 </file>
 
@@ -21247,7 +21016,7 @@
               <a:t> </a:t>
             </a:r>
             <a:r>
-              <a:rPr lang="en-US" dirty="0" smtClean="0">
+              <a:rPr lang="en-US" dirty="0">
                 <a:solidFill>
                   <a:srgbClr val="FF0000"/>
                 </a:solidFill>
@@ -21573,15 +21342,7 @@
             </a:pPr>
             <a:r>
               <a:rPr lang="en-US" sz="3000" dirty="0"/>
-              <a:t>Result is </a:t>
-            </a:r>
-            <a:r>
-              <a:rPr lang="en-US" sz="3000" dirty="0" smtClean="0"/>
-              <a:t>5 </a:t>
-            </a:r>
-            <a:r>
-              <a:rPr lang="en-US" sz="3000" dirty="0"/>
-              <a:t>rows / 2 columns</a:t>
+              <a:t>Result is 5 rows / 2 columns</a:t>
             </a:r>
           </a:p>
           <a:p>
@@ -21607,14 +21368,6 @@
   <p:clrMapOvr>
     <a:masterClrMapping/>
   </p:clrMapOvr>
-  <mc:AlternateContent xmlns:mc="http://schemas.openxmlformats.org/markup-compatibility/2006" xmlns:p14="http://schemas.microsoft.com/office/powerpoint/2010/main">
-    <mc:Choice Requires="p14">
-      <p:transition spd="slow" p14:dur="2000"/>
-    </mc:Choice>
-    <mc:Fallback xmlns="">
-      <p:transition spd="slow"/>
-    </mc:Fallback>
-  </mc:AlternateContent>
 </p:sld>
 </file>
 
@@ -22477,7 +22230,7 @@
               <a:t> </a:t>
             </a:r>
             <a:r>
-              <a:rPr lang="en-US" dirty="0" smtClean="0">
+              <a:rPr lang="en-US" dirty="0">
                 <a:solidFill>
                   <a:srgbClr val="FF0000"/>
                 </a:solidFill>
@@ -22887,14 +22640,6 @@
   <p:clrMapOvr>
     <a:masterClrMapping/>
   </p:clrMapOvr>
-  <mc:AlternateContent xmlns:mc="http://schemas.openxmlformats.org/markup-compatibility/2006" xmlns:p14="http://schemas.microsoft.com/office/powerpoint/2010/main">
-    <mc:Choice Requires="p14">
-      <p:transition spd="slow" p14:dur="2000"/>
-    </mc:Choice>
-    <mc:Fallback xmlns="">
-      <p:transition spd="slow"/>
-    </mc:Fallback>
-  </mc:AlternateContent>
 </p:sld>
 </file>
 
@@ -22933,10 +22678,9 @@
           <a:lstStyle/>
           <a:p>
             <a:r>
-              <a:rPr lang="en-US" dirty="0" smtClean="0"/>
+              <a:rPr lang="en-US" dirty="0"/>
               <a:t>How SQL Server Sees the Query</a:t>
             </a:r>
-            <a:endParaRPr lang="en-US" dirty="0"/>
           </a:p>
         </p:txBody>
       </p:sp>
@@ -22967,7 +22711,7 @@
               </a:lnSpc>
             </a:pPr>
             <a:r>
-              <a:rPr lang="en-US" dirty="0" smtClean="0">
+              <a:rPr lang="en-US" dirty="0">
                 <a:solidFill>
                   <a:srgbClr val="0000FF"/>
                 </a:solidFill>
@@ -22978,7 +22722,7 @@
               <a:t>from</a:t>
             </a:r>
             <a:r>
-              <a:rPr lang="en-US" dirty="0" smtClean="0">
+              <a:rPr lang="en-US" dirty="0">
                 <a:latin typeface="Consolas" panose="020B0609020204030204" pitchFamily="49" charset="0"/>
                 <a:ea typeface="Calibri" panose="020F0502020204030204" pitchFamily="34" charset="0"/>
                 <a:cs typeface="Times New Roman" panose="02020603050405020304" pitchFamily="18" charset="0"/>
@@ -23129,7 +22873,7 @@
               <a:t> </a:t>
             </a:r>
             <a:r>
-              <a:rPr lang="en-US" dirty="0" smtClean="0">
+              <a:rPr lang="en-US" dirty="0">
                 <a:solidFill>
                   <a:srgbClr val="008080"/>
                 </a:solidFill>
@@ -23152,7 +22896,7 @@
               </a:lnSpc>
             </a:pPr>
             <a:r>
-              <a:rPr lang="en-US" dirty="0" smtClean="0">
+              <a:rPr lang="en-US" dirty="0">
                 <a:solidFill>
                   <a:srgbClr val="808080"/>
                 </a:solidFill>
@@ -23163,7 +22907,7 @@
               <a:t>inner</a:t>
             </a:r>
             <a:r>
-              <a:rPr lang="en-US" dirty="0" smtClean="0">
+              <a:rPr lang="en-US" dirty="0">
                 <a:latin typeface="Consolas" panose="020B0609020204030204" pitchFamily="49" charset="0"/>
                 <a:ea typeface="Calibri" panose="020F0502020204030204" pitchFamily="34" charset="0"/>
                 <a:cs typeface="Times New Roman" panose="02020603050405020304" pitchFamily="18" charset="0"/>
@@ -23231,7 +22975,7 @@
               <a:t> </a:t>
             </a:r>
             <a:r>
-              <a:rPr lang="en-US" dirty="0" err="1" smtClean="0">
+              <a:rPr lang="en-US" dirty="0" err="1">
                 <a:solidFill>
                   <a:srgbClr val="008080"/>
                 </a:solidFill>
@@ -23378,7 +23122,7 @@
               </a:lnSpc>
             </a:pPr>
             <a:r>
-              <a:rPr lang="en-US" dirty="0" smtClean="0">
+              <a:rPr lang="en-US" dirty="0">
                 <a:solidFill>
                   <a:srgbClr val="0000FF"/>
                 </a:solidFill>
@@ -23389,7 +23133,7 @@
               <a:t>on</a:t>
             </a:r>
             <a:r>
-              <a:rPr lang="en-US" dirty="0" smtClean="0">
+              <a:rPr lang="en-US" dirty="0">
                 <a:latin typeface="Consolas" panose="020B0609020204030204" pitchFamily="49" charset="0"/>
                 <a:ea typeface="Calibri" panose="020F0502020204030204" pitchFamily="34" charset="0"/>
                 <a:cs typeface="Times New Roman" panose="02020603050405020304" pitchFamily="18" charset="0"/>
@@ -23581,7 +23325,7 @@
               <a:t> </a:t>
             </a:r>
             <a:r>
-              <a:rPr lang="en-US" dirty="0" smtClean="0">
+              <a:rPr lang="en-US" dirty="0">
                 <a:solidFill>
                   <a:srgbClr val="FF0000"/>
                 </a:solidFill>
@@ -23830,7 +23574,7 @@
               <a:t> </a:t>
             </a:r>
             <a:r>
-              <a:rPr lang="en-US" dirty="0" err="1" smtClean="0">
+              <a:rPr lang="en-US" dirty="0" err="1">
                 <a:solidFill>
                   <a:srgbClr val="008080"/>
                 </a:solidFill>
@@ -23841,7 +23585,7 @@
               <a:t>od</a:t>
             </a:r>
             <a:r>
-              <a:rPr lang="en-US" dirty="0" err="1" smtClean="0">
+              <a:rPr lang="en-US" dirty="0" err="1">
                 <a:solidFill>
                   <a:srgbClr val="808080"/>
                 </a:solidFill>
@@ -23852,7 +23596,7 @@
               <a:t>.</a:t>
             </a:r>
             <a:r>
-              <a:rPr lang="en-US" dirty="0" err="1" smtClean="0">
+              <a:rPr lang="en-US" dirty="0" err="1">
                 <a:solidFill>
                   <a:srgbClr val="008080"/>
                 </a:solidFill>
@@ -23998,7 +23742,7 @@
               </a:lnSpc>
             </a:pPr>
             <a:r>
-              <a:rPr lang="en-US" dirty="0" smtClean="0">
+              <a:rPr lang="en-US" dirty="0">
                 <a:solidFill>
                   <a:srgbClr val="0000FF"/>
                 </a:solidFill>
@@ -24009,7 +23753,7 @@
               <a:t>order</a:t>
             </a:r>
             <a:r>
-              <a:rPr lang="en-US" dirty="0" smtClean="0">
+              <a:rPr lang="en-US" dirty="0">
                 <a:latin typeface="Consolas" panose="020B0609020204030204" pitchFamily="49" charset="0"/>
                 <a:ea typeface="Calibri" panose="020F0502020204030204" pitchFamily="34" charset="0"/>
                 <a:cs typeface="Times New Roman" panose="02020603050405020304" pitchFamily="18" charset="0"/>
@@ -24036,7 +23780,7 @@
               <a:t> </a:t>
             </a:r>
             <a:r>
-              <a:rPr lang="en-US" dirty="0" err="1" smtClean="0">
+              <a:rPr lang="en-US" dirty="0" err="1">
                 <a:solidFill>
                   <a:srgbClr val="008080"/>
                 </a:solidFill>
@@ -24047,7 +23791,7 @@
               <a:t>od</a:t>
             </a:r>
             <a:r>
-              <a:rPr lang="en-US" dirty="0" err="1" smtClean="0">
+              <a:rPr lang="en-US" dirty="0" err="1">
                 <a:solidFill>
                   <a:srgbClr val="808080"/>
                 </a:solidFill>
@@ -24058,7 +23802,7 @@
               <a:t>.</a:t>
             </a:r>
             <a:r>
-              <a:rPr lang="en-US" dirty="0" err="1" smtClean="0">
+              <a:rPr lang="en-US" dirty="0" err="1">
                 <a:solidFill>
                   <a:srgbClr val="008080"/>
                 </a:solidFill>
@@ -24068,7 +23812,7 @@
               </a:rPr>
               <a:t>ProductId</a:t>
             </a:r>
-            <a:endParaRPr lang="en-US" dirty="0" smtClean="0">
+            <a:endParaRPr lang="en-US" dirty="0">
               <a:solidFill>
                 <a:srgbClr val="008080"/>
               </a:solidFill>
@@ -24103,7 +23847,7 @@
               <a:t> 5</a:t>
             </a:r>
             <a:r>
-              <a:rPr lang="en-US" dirty="0" smtClean="0">
+              <a:rPr lang="en-US" dirty="0">
                 <a:solidFill>
                   <a:srgbClr val="808080"/>
                 </a:solidFill>
@@ -24132,21 +23876,6 @@
   <p:clrMapOvr>
     <a:masterClrMapping/>
   </p:clrMapOvr>
-  <mc:AlternateContent xmlns:mc="http://schemas.openxmlformats.org/markup-compatibility/2006" xmlns:p14="http://schemas.microsoft.com/office/powerpoint/2010/main">
-    <mc:Choice Requires="p14">
-      <p:transition spd="slow" p14:dur="2000"/>
-    </mc:Choice>
-    <mc:Fallback xmlns="">
-      <p:transition spd="slow"/>
-    </mc:Fallback>
-  </mc:AlternateContent>
-  <p:timing>
-    <p:tnLst>
-      <p:par>
-        <p:cTn id="1" dur="indefinite" restart="never" nodeType="tmRoot"/>
-      </p:par>
-    </p:tnLst>
-  </p:timing>
 </p:sld>
 </file>
 
@@ -24183,10 +23912,9 @@
           <a:lstStyle/>
           <a:p>
             <a:r>
-              <a:rPr lang="en-US" dirty="0" smtClean="0"/>
+              <a:rPr lang="en-US" dirty="0"/>
               <a:t>Query Tree</a:t>
             </a:r>
-            <a:endParaRPr lang="en-US" dirty="0"/>
           </a:p>
         </p:txBody>
       </p:sp>
@@ -25081,7 +24809,7 @@
               <a:t> </a:t>
             </a:r>
             <a:r>
-              <a:rPr lang="en-US" sz="1400" dirty="0" err="1" smtClean="0">
+              <a:rPr lang="en-US" sz="1400" dirty="0" err="1">
                 <a:solidFill>
                   <a:srgbClr val="008080"/>
                 </a:solidFill>
@@ -25092,7 +24820,7 @@
               <a:t>od</a:t>
             </a:r>
             <a:r>
-              <a:rPr lang="en-US" sz="1400" dirty="0" err="1" smtClean="0">
+              <a:rPr lang="en-US" sz="1400" dirty="0" err="1">
                 <a:solidFill>
                   <a:srgbClr val="808080"/>
                 </a:solidFill>
@@ -25103,7 +24831,7 @@
               <a:t>.</a:t>
             </a:r>
             <a:r>
-              <a:rPr lang="en-US" sz="1400" dirty="0" err="1" smtClean="0">
+              <a:rPr lang="en-US" sz="1400" dirty="0" err="1">
                 <a:solidFill>
                   <a:srgbClr val="008080"/>
                 </a:solidFill>
@@ -25114,7 +24842,7 @@
               <a:t>ProductId</a:t>
             </a:r>
             <a:r>
-              <a:rPr lang="en-US" sz="1400" dirty="0" smtClean="0">
+              <a:rPr lang="en-US" sz="1400" dirty="0">
                 <a:solidFill>
                   <a:srgbClr val="808080"/>
                 </a:solidFill>
@@ -25124,7 +24852,7 @@
               </a:rPr>
               <a:t>,</a:t>
             </a:r>
-            <a:endParaRPr lang="en-US" sz="1400" dirty="0" smtClean="0">
+            <a:endParaRPr lang="en-US" sz="1400" dirty="0">
               <a:latin typeface="Consolas" panose="020B0609020204030204" pitchFamily="49" charset="0"/>
               <a:ea typeface="Calibri" panose="020F0502020204030204" pitchFamily="34" charset="0"/>
               <a:cs typeface="Times New Roman" panose="02020603050405020304" pitchFamily="18" charset="0"/>
@@ -25145,21 +24873,10 @@
                 <a:ea typeface="Calibri" panose="020F0502020204030204" pitchFamily="34" charset="0"/>
                 <a:cs typeface="Times New Roman" panose="02020603050405020304" pitchFamily="18" charset="0"/>
               </a:rPr>
-              <a:t>	</a:t>
-            </a:r>
-            <a:r>
-              <a:rPr lang="en-US" sz="1400" dirty="0" smtClean="0">
-                <a:solidFill>
-                  <a:srgbClr val="FF00FF"/>
-                </a:solidFill>
-                <a:latin typeface="Consolas" panose="020B0609020204030204" pitchFamily="49" charset="0"/>
-                <a:ea typeface="Calibri" panose="020F0502020204030204" pitchFamily="34" charset="0"/>
-                <a:cs typeface="Times New Roman" panose="02020603050405020304" pitchFamily="18" charset="0"/>
-              </a:rPr>
-              <a:t>sum</a:t>
-            </a:r>
-            <a:r>
-              <a:rPr lang="en-US" sz="1400" dirty="0" smtClean="0">
+              <a:t>	sum</a:t>
+            </a:r>
+            <a:r>
+              <a:rPr lang="en-US" sz="1400" dirty="0">
                 <a:solidFill>
                   <a:srgbClr val="808080"/>
                 </a:solidFill>
@@ -25170,7 +24887,7 @@
               <a:t>(</a:t>
             </a:r>
             <a:r>
-              <a:rPr lang="en-US" sz="1400" dirty="0" err="1" smtClean="0">
+              <a:rPr lang="en-US" sz="1400" dirty="0" err="1">
                 <a:solidFill>
                   <a:srgbClr val="008080"/>
                 </a:solidFill>
@@ -25181,7 +24898,7 @@
               <a:t>od</a:t>
             </a:r>
             <a:r>
-              <a:rPr lang="en-US" sz="1400" dirty="0" err="1" smtClean="0">
+              <a:rPr lang="en-US" sz="1400" dirty="0" err="1">
                 <a:solidFill>
                   <a:srgbClr val="808080"/>
                 </a:solidFill>
@@ -25192,7 +24909,7 @@
               <a:t>.</a:t>
             </a:r>
             <a:r>
-              <a:rPr lang="en-US" sz="1400" dirty="0" err="1" smtClean="0">
+              <a:rPr lang="en-US" sz="1400" dirty="0" err="1">
                 <a:solidFill>
                   <a:srgbClr val="008080"/>
                 </a:solidFill>
@@ -25421,21 +25138,6 @@
   <p:clrMapOvr>
     <a:masterClrMapping/>
   </p:clrMapOvr>
-  <mc:AlternateContent xmlns:mc="http://schemas.openxmlformats.org/markup-compatibility/2006" xmlns:p14="http://schemas.microsoft.com/office/powerpoint/2010/main">
-    <mc:Choice Requires="p14">
-      <p:transition spd="slow" p14:dur="2000"/>
-    </mc:Choice>
-    <mc:Fallback xmlns="">
-      <p:transition spd="slow"/>
-    </mc:Fallback>
-  </mc:AlternateContent>
-  <p:timing>
-    <p:tnLst>
-      <p:par>
-        <p:cTn id="1" dur="indefinite" restart="never" nodeType="tmRoot"/>
-      </p:par>
-    </p:tnLst>
-  </p:timing>
 </p:sld>
 </file>
 
@@ -25761,13 +25463,6 @@
   <p:clrMapOvr>
     <a:masterClrMapping/>
   </p:clrMapOvr>
-  <p:timing>
-    <p:tnLst>
-      <p:par>
-        <p:cTn id="1" dur="indefinite" restart="never" nodeType="tmRoot"/>
-      </p:par>
-    </p:tnLst>
-  </p:timing>
 </p:sld>
 </file>
 
@@ -26297,13 +25992,6 @@
   <p:clrMapOvr>
     <a:masterClrMapping/>
   </p:clrMapOvr>
-  <p:timing>
-    <p:tnLst>
-      <p:par>
-        <p:cTn id="1" dur="indefinite" restart="never" nodeType="tmRoot"/>
-      </p:par>
-    </p:tnLst>
-  </p:timing>
 </p:sld>
 </file>
 
@@ -26390,13 +26078,6 @@
   <p:clrMapOvr>
     <a:masterClrMapping/>
   </p:clrMapOvr>
-  <p:timing>
-    <p:tnLst>
-      <p:par>
-        <p:cTn id="1" dur="indefinite" restart="never" nodeType="tmRoot"/>
-      </p:par>
-    </p:tnLst>
-  </p:timing>
 </p:sld>
 </file>
 
@@ -27446,13 +27127,8 @@
           <a:p>
             <a:r>
               <a:rPr lang="en-US" dirty="0"/>
-              <a:t>Process of Executing a </a:t>
-            </a:r>
-            <a:r>
-              <a:rPr lang="en-US" dirty="0" smtClean="0"/>
-              <a:t>Query - Graphical</a:t>
-            </a:r>
-            <a:endParaRPr lang="en-US" dirty="0"/>
+              <a:t>Process of Executing a Query - Graphical</a:t>
+            </a:r>
           </a:p>
         </p:txBody>
       </p:sp>
@@ -27490,13 +27166,6 @@
   <p:clrMapOvr>
     <a:masterClrMapping/>
   </p:clrMapOvr>
-  <p:timing>
-    <p:tnLst>
-      <p:par>
-        <p:cTn id="1" dur="indefinite" restart="never" nodeType="tmRoot"/>
-      </p:par>
-    </p:tnLst>
-  </p:timing>
 </p:sld>
 </file>
 
@@ -27534,13 +27203,8 @@
           <a:p>
             <a:r>
               <a:rPr lang="en-US" dirty="0"/>
-              <a:t>Parsing and Binding	</a:t>
-            </a:r>
-            <a:r>
-              <a:rPr lang="en-US" dirty="0" smtClean="0"/>
-              <a:t> (1 of 3)</a:t>
-            </a:r>
-            <a:endParaRPr lang="en-US" dirty="0"/>
+              <a:t>Parsing and Binding	 (1 of 3)</a:t>
+            </a:r>
           </a:p>
         </p:txBody>
       </p:sp>
@@ -27593,13 +27257,8 @@
             <a:pPr lvl="2"/>
             <a:r>
               <a:rPr lang="en-US" dirty="0"/>
-              <a:t>Identify </a:t>
-            </a:r>
-            <a:r>
-              <a:rPr lang="en-US" dirty="0" smtClean="0"/>
-              <a:t>constants</a:t>
-            </a:r>
-            <a:endParaRPr lang="en-US" dirty="0"/>
+              <a:t>Identify constants</a:t>
+            </a:r>
           </a:p>
         </p:txBody>
       </p:sp>
@@ -27851,7 +27510,7 @@
               <a:buNone/>
             </a:pPr>
             <a:r>
-              <a:rPr lang="en-US" sz="3200" dirty="0" smtClean="0">
+              <a:rPr lang="en-US" sz="3200" dirty="0">
                 <a:solidFill>
                   <a:srgbClr val="0000FF"/>
                 </a:solidFill>
@@ -27860,7 +27519,7 @@
               <a:t>form</a:t>
             </a:r>
             <a:r>
-              <a:rPr lang="en-US" sz="3200" dirty="0" smtClean="0">
+              <a:rPr lang="en-US" sz="3200" dirty="0">
                 <a:solidFill>
                   <a:prstClr val="black"/>
                 </a:solidFill>
@@ -27892,7 +27551,7 @@
               <a:buNone/>
             </a:pPr>
             <a:r>
-              <a:rPr lang="en-US" sz="3200" dirty="0" smtClean="0">
+              <a:rPr lang="en-US" sz="3200" dirty="0">
                 <a:solidFill>
                   <a:srgbClr val="0000FF"/>
                 </a:solidFill>
@@ -27901,7 +27560,7 @@
               <a:t>wear</a:t>
             </a:r>
             <a:r>
-              <a:rPr lang="en-US" sz="3200" dirty="0" smtClean="0">
+              <a:rPr lang="en-US" sz="3200" dirty="0">
                 <a:solidFill>
                   <a:prstClr val="black"/>
                 </a:solidFill>
@@ -27954,7 +27613,7 @@
               <a:buNone/>
             </a:pPr>
             <a:r>
-              <a:rPr lang="en-US" sz="3200" dirty="0" err="1" smtClean="0">
+              <a:rPr lang="en-US" sz="3200" dirty="0" err="1">
                 <a:solidFill>
                   <a:srgbClr val="0000FF"/>
                 </a:solidFill>
@@ -27963,7 +27622,7 @@
               <a:t>orderby</a:t>
             </a:r>
             <a:r>
-              <a:rPr lang="en-US" sz="3200" dirty="0" smtClean="0">
+              <a:rPr lang="en-US" sz="3200" dirty="0">
                 <a:solidFill>
                   <a:prstClr val="black"/>
                 </a:solidFill>
@@ -28283,13 +27942,8 @@
           <a:p>
             <a:r>
               <a:rPr lang="en-US" dirty="0"/>
-              <a:t>Parsing and Binding	</a:t>
-            </a:r>
-            <a:r>
-              <a:rPr lang="en-US" dirty="0" smtClean="0"/>
-              <a:t> (2 of 3)</a:t>
-            </a:r>
-            <a:endParaRPr lang="en-US" dirty="0"/>
+              <a:t>Parsing and Binding	 (2 of 3)</a:t>
+            </a:r>
           </a:p>
         </p:txBody>
       </p:sp>
@@ -28327,10 +27981,9 @@
           <a:p>
             <a:pPr lvl="1"/>
             <a:r>
-              <a:rPr lang="en-US" dirty="0" smtClean="0"/>
+              <a:rPr lang="en-US" dirty="0"/>
               <a:t>Expand views</a:t>
             </a:r>
-            <a:endParaRPr lang="en-US" dirty="0"/>
           </a:p>
         </p:txBody>
       </p:sp>
@@ -28518,7 +28171,7 @@
               <a:t> </a:t>
             </a:r>
             <a:r>
-              <a:rPr lang="en-US" sz="1600" dirty="0" err="1" smtClean="0">
+              <a:rPr lang="en-US" sz="1600" dirty="0" err="1">
                 <a:solidFill>
                   <a:srgbClr val="008080"/>
                 </a:solidFill>
@@ -28527,7 +28180,7 @@
               <a:t>c</a:t>
             </a:r>
             <a:r>
-              <a:rPr lang="en-US" sz="1600" dirty="0" err="1" smtClean="0">
+              <a:rPr lang="en-US" sz="1600" dirty="0" err="1">
                 <a:solidFill>
                   <a:srgbClr val="808080"/>
                 </a:solidFill>
@@ -28536,7 +28189,7 @@
               <a:t>.</a:t>
             </a:r>
             <a:r>
-              <a:rPr lang="en-US" sz="1600" dirty="0" err="1" smtClean="0">
+              <a:rPr lang="en-US" sz="1600" dirty="0" err="1">
                 <a:solidFill>
                   <a:srgbClr val="008080"/>
                 </a:solidFill>
@@ -28545,7 +28198,7 @@
               <a:t>CustomerID</a:t>
             </a:r>
             <a:r>
-              <a:rPr lang="en-US" sz="1600" dirty="0" smtClean="0">
+              <a:rPr lang="en-US" sz="1600" dirty="0">
                 <a:solidFill>
                   <a:srgbClr val="808080"/>
                 </a:solidFill>
@@ -28554,7 +28207,7 @@
               <a:t>,</a:t>
             </a:r>
             <a:r>
-              <a:rPr lang="en-US" sz="1600" dirty="0" smtClean="0">
+              <a:rPr lang="en-US" sz="1600" dirty="0">
                 <a:solidFill>
                   <a:prstClr val="black"/>
                 </a:solidFill>
@@ -28563,7 +28216,7 @@
               <a:t> </a:t>
             </a:r>
             <a:r>
-              <a:rPr lang="en-US" sz="1600" dirty="0" err="1" smtClean="0">
+              <a:rPr lang="en-US" sz="1600" dirty="0" err="1">
                 <a:solidFill>
                   <a:srgbClr val="008080"/>
                 </a:solidFill>
@@ -28572,7 +28225,7 @@
               <a:t>c</a:t>
             </a:r>
             <a:r>
-              <a:rPr lang="en-US" sz="1600" dirty="0" err="1" smtClean="0">
+              <a:rPr lang="en-US" sz="1600" dirty="0" err="1">
                 <a:solidFill>
                   <a:srgbClr val="808080"/>
                 </a:solidFill>
@@ -28581,7 +28234,7 @@
               <a:t>.</a:t>
             </a:r>
             <a:r>
-              <a:rPr lang="en-US" sz="1600" dirty="0" err="1" smtClean="0">
+              <a:rPr lang="en-US" sz="1600" dirty="0" err="1">
                 <a:solidFill>
                   <a:srgbClr val="008080"/>
                 </a:solidFill>
@@ -28590,7 +28243,7 @@
               <a:t>FirstName</a:t>
             </a:r>
             <a:r>
-              <a:rPr lang="en-US" sz="1600" dirty="0" smtClean="0">
+              <a:rPr lang="en-US" sz="1600" dirty="0">
                 <a:solidFill>
                   <a:srgbClr val="808080"/>
                 </a:solidFill>
@@ -28599,7 +28252,7 @@
               <a:t>,</a:t>
             </a:r>
             <a:r>
-              <a:rPr lang="en-US" sz="1600" dirty="0" smtClean="0">
+              <a:rPr lang="en-US" sz="1600" dirty="0">
                 <a:solidFill>
                   <a:prstClr val="black"/>
                 </a:solidFill>
@@ -28608,7 +28261,7 @@
               <a:t> </a:t>
             </a:r>
             <a:r>
-              <a:rPr lang="en-US" sz="1600" dirty="0" err="1" smtClean="0">
+              <a:rPr lang="en-US" sz="1600" dirty="0" err="1">
                 <a:solidFill>
                   <a:srgbClr val="008080"/>
                 </a:solidFill>
@@ -28617,7 +28270,7 @@
               <a:t>c</a:t>
             </a:r>
             <a:r>
-              <a:rPr lang="en-US" sz="1600" dirty="0" err="1" smtClean="0">
+              <a:rPr lang="en-US" sz="1600" dirty="0" err="1">
                 <a:solidFill>
                   <a:srgbClr val="808080"/>
                 </a:solidFill>
@@ -28626,7 +28279,7 @@
               <a:t>.</a:t>
             </a:r>
             <a:r>
-              <a:rPr lang="en-US" sz="1600" dirty="0" err="1" smtClean="0">
+              <a:rPr lang="en-US" sz="1600" dirty="0" err="1">
                 <a:solidFill>
                   <a:srgbClr val="008080"/>
                 </a:solidFill>
@@ -28635,7 +28288,7 @@
               <a:t>LastName</a:t>
             </a:r>
             <a:r>
-              <a:rPr lang="en-US" sz="1600" dirty="0" smtClean="0">
+              <a:rPr lang="en-US" sz="1600" dirty="0">
                 <a:solidFill>
                   <a:srgbClr val="808080"/>
                 </a:solidFill>
@@ -28644,7 +28297,7 @@
               <a:t>,</a:t>
             </a:r>
             <a:r>
-              <a:rPr lang="en-US" sz="1600" dirty="0" smtClean="0">
+              <a:rPr lang="en-US" sz="1600" dirty="0">
                 <a:solidFill>
                   <a:prstClr val="black"/>
                 </a:solidFill>
@@ -28653,7 +28306,7 @@
               <a:t> </a:t>
             </a:r>
             <a:r>
-              <a:rPr lang="en-US" sz="1600" dirty="0" err="1" smtClean="0">
+              <a:rPr lang="en-US" sz="1600" dirty="0" err="1">
                 <a:solidFill>
                   <a:srgbClr val="008080"/>
                 </a:solidFill>
@@ -28662,7 +28315,7 @@
               <a:t>oh</a:t>
             </a:r>
             <a:r>
-              <a:rPr lang="en-US" sz="1600" dirty="0" err="1" smtClean="0">
+              <a:rPr lang="en-US" sz="1600" dirty="0" err="1">
                 <a:solidFill>
                   <a:srgbClr val="808080"/>
                 </a:solidFill>
@@ -28671,7 +28324,7 @@
               <a:t>.</a:t>
             </a:r>
             <a:r>
-              <a:rPr lang="en-US" sz="1600" dirty="0" err="1" smtClean="0">
+              <a:rPr lang="en-US" sz="1600" dirty="0" err="1">
                 <a:solidFill>
                   <a:srgbClr val="008080"/>
                 </a:solidFill>
@@ -30485,13 +30138,8 @@
           <a:p>
             <a:r>
               <a:rPr lang="en-US" dirty="0"/>
-              <a:t>Parsing and Binding	</a:t>
-            </a:r>
-            <a:r>
-              <a:rPr lang="en-US" dirty="0" smtClean="0"/>
-              <a:t> (3 of 3)</a:t>
-            </a:r>
-            <a:endParaRPr lang="en-US" dirty="0"/>
+              <a:t>Parsing and Binding	 (3 of 3)</a:t>
+            </a:r>
           </a:p>
         </p:txBody>
       </p:sp>
@@ -30524,10 +30172,9 @@
           <a:p>
             <a:pPr lvl="1"/>
             <a:r>
-              <a:rPr lang="en-US" dirty="0" smtClean="0"/>
+              <a:rPr lang="en-US" dirty="0"/>
               <a:t>Binding</a:t>
             </a:r>
-            <a:endParaRPr lang="en-US" dirty="0"/>
           </a:p>
           <a:p>
             <a:pPr lvl="2"/>
@@ -30569,13 +30216,6 @@
   <p:clrMapOvr>
     <a:masterClrMapping/>
   </p:clrMapOvr>
-  <p:timing>
-    <p:tnLst>
-      <p:par>
-        <p:cTn id="1" dur="indefinite" restart="never" nodeType="tmRoot"/>
-      </p:par>
-    </p:tnLst>
-  </p:timing>
 </p:sld>
 </file>
 
@@ -30778,13 +30418,6 @@
   <p:clrMapOvr>
     <a:masterClrMapping/>
   </p:clrMapOvr>
-  <p:timing>
-    <p:tnLst>
-      <p:par>
-        <p:cTn id="1" dur="indefinite" restart="never" nodeType="tmRoot"/>
-      </p:par>
-    </p:tnLst>
-  </p:timing>
 </p:sld>
 </file>
 
@@ -31163,21 +30796,6 @@
   <p:clrMapOvr>
     <a:masterClrMapping/>
   </p:clrMapOvr>
-  <mc:AlternateContent xmlns:mc="http://schemas.openxmlformats.org/markup-compatibility/2006" xmlns:p14="http://schemas.microsoft.com/office/powerpoint/2010/main">
-    <mc:Choice Requires="p14">
-      <p:transition spd="slow" p14:dur="2000"/>
-    </mc:Choice>
-    <mc:Fallback xmlns="">
-      <p:transition spd="slow"/>
-    </mc:Fallback>
-  </mc:AlternateContent>
-  <p:timing>
-    <p:tnLst>
-      <p:par>
-        <p:cTn id="1" dur="indefinite" restart="never" nodeType="tmRoot"/>
-      </p:par>
-    </p:tnLst>
-  </p:timing>
 </p:sld>
 </file>
 
@@ -31530,14 +31148,14 @@
                 <a:gridCol w="7632835">
                   <a:extLst>
                     <a:ext uri="{9D8B030D-6E8A-4147-A177-3AD203B41FA5}">
-                      <a16:colId xmlns:a16="http://schemas.microsoft.com/office/drawing/2014/main" xmlns="" val="3644048045"/>
+                      <a16:colId xmlns:a16="http://schemas.microsoft.com/office/drawing/2014/main" val="3644048045"/>
                     </a:ext>
                   </a:extLst>
                 </a:gridCol>
                 <a:gridCol w="606393">
                   <a:extLst>
                     <a:ext uri="{9D8B030D-6E8A-4147-A177-3AD203B41FA5}">
-                      <a16:colId xmlns:a16="http://schemas.microsoft.com/office/drawing/2014/main" xmlns="" val="2034254753"/>
+                      <a16:colId xmlns:a16="http://schemas.microsoft.com/office/drawing/2014/main" val="2034254753"/>
                     </a:ext>
                   </a:extLst>
                 </a:gridCol>
@@ -31568,7 +31186,7 @@
                 </a:tc>
                 <a:extLst>
                   <a:ext uri="{0D108BD9-81ED-4DB2-BD59-A6C34878D82A}">
-                    <a16:rowId xmlns:a16="http://schemas.microsoft.com/office/drawing/2014/main" xmlns="" val="2708275910"/>
+                    <a16:rowId xmlns:a16="http://schemas.microsoft.com/office/drawing/2014/main" val="2708275910"/>
                   </a:ext>
                 </a:extLst>
               </a:tr>
@@ -31602,7 +31220,7 @@
                 </a:tc>
                 <a:extLst>
                   <a:ext uri="{0D108BD9-81ED-4DB2-BD59-A6C34878D82A}">
-                    <a16:rowId xmlns:a16="http://schemas.microsoft.com/office/drawing/2014/main" xmlns="" val="2161984115"/>
+                    <a16:rowId xmlns:a16="http://schemas.microsoft.com/office/drawing/2014/main" val="2161984115"/>
                   </a:ext>
                 </a:extLst>
               </a:tr>
@@ -31649,7 +31267,7 @@
                 </a:tc>
                 <a:extLst>
                   <a:ext uri="{0D108BD9-81ED-4DB2-BD59-A6C34878D82A}">
-                    <a16:rowId xmlns:a16="http://schemas.microsoft.com/office/drawing/2014/main" xmlns="" val="2841678841"/>
+                    <a16:rowId xmlns:a16="http://schemas.microsoft.com/office/drawing/2014/main" val="2841678841"/>
                   </a:ext>
                 </a:extLst>
               </a:tr>
@@ -31683,7 +31301,7 @@
                 </a:tc>
                 <a:extLst>
                   <a:ext uri="{0D108BD9-81ED-4DB2-BD59-A6C34878D82A}">
-                    <a16:rowId xmlns:a16="http://schemas.microsoft.com/office/drawing/2014/main" xmlns="" val="3144998627"/>
+                    <a16:rowId xmlns:a16="http://schemas.microsoft.com/office/drawing/2014/main" val="3144998627"/>
                   </a:ext>
                 </a:extLst>
               </a:tr>
@@ -31725,7 +31343,7 @@
                 </a:tc>
                 <a:extLst>
                   <a:ext uri="{0D108BD9-81ED-4DB2-BD59-A6C34878D82A}">
-                    <a16:rowId xmlns:a16="http://schemas.microsoft.com/office/drawing/2014/main" xmlns="" val="1419261869"/>
+                    <a16:rowId xmlns:a16="http://schemas.microsoft.com/office/drawing/2014/main" val="1419261869"/>
                   </a:ext>
                 </a:extLst>
               </a:tr>
@@ -31763,7 +31381,7 @@
                 </a:tc>
                 <a:extLst>
                   <a:ext uri="{0D108BD9-81ED-4DB2-BD59-A6C34878D82A}">
-                    <a16:rowId xmlns:a16="http://schemas.microsoft.com/office/drawing/2014/main" xmlns="" val="1427391072"/>
+                    <a16:rowId xmlns:a16="http://schemas.microsoft.com/office/drawing/2014/main" val="1427391072"/>
                   </a:ext>
                 </a:extLst>
               </a:tr>
@@ -31810,7 +31428,7 @@
                 </a:tc>
                 <a:extLst>
                   <a:ext uri="{0D108BD9-81ED-4DB2-BD59-A6C34878D82A}">
-                    <a16:rowId xmlns:a16="http://schemas.microsoft.com/office/drawing/2014/main" xmlns="" val="2346539918"/>
+                    <a16:rowId xmlns:a16="http://schemas.microsoft.com/office/drawing/2014/main" val="2346539918"/>
                   </a:ext>
                 </a:extLst>
               </a:tr>
@@ -31849,7 +31467,7 @@
                 </a:tc>
                 <a:extLst>
                   <a:ext uri="{0D108BD9-81ED-4DB2-BD59-A6C34878D82A}">
-                    <a16:rowId xmlns:a16="http://schemas.microsoft.com/office/drawing/2014/main" xmlns="" val="2275483042"/>
+                    <a16:rowId xmlns:a16="http://schemas.microsoft.com/office/drawing/2014/main" val="2275483042"/>
                   </a:ext>
                 </a:extLst>
               </a:tr>
@@ -31887,7 +31505,7 @@
                 </a:tc>
                 <a:extLst>
                   <a:ext uri="{0D108BD9-81ED-4DB2-BD59-A6C34878D82A}">
-                    <a16:rowId xmlns:a16="http://schemas.microsoft.com/office/drawing/2014/main" xmlns="" val="4202569347"/>
+                    <a16:rowId xmlns:a16="http://schemas.microsoft.com/office/drawing/2014/main" val="4202569347"/>
                   </a:ext>
                 </a:extLst>
               </a:tr>
@@ -31921,7 +31539,7 @@
                 </a:tc>
                 <a:extLst>
                   <a:ext uri="{0D108BD9-81ED-4DB2-BD59-A6C34878D82A}">
-                    <a16:rowId xmlns:a16="http://schemas.microsoft.com/office/drawing/2014/main" xmlns="" val="2989839269"/>
+                    <a16:rowId xmlns:a16="http://schemas.microsoft.com/office/drawing/2014/main" val="2989839269"/>
                   </a:ext>
                 </a:extLst>
               </a:tr>
@@ -31955,7 +31573,7 @@
                 </a:tc>
                 <a:extLst>
                   <a:ext uri="{0D108BD9-81ED-4DB2-BD59-A6C34878D82A}">
-                    <a16:rowId xmlns:a16="http://schemas.microsoft.com/office/drawing/2014/main" xmlns="" val="2130545569"/>
+                    <a16:rowId xmlns:a16="http://schemas.microsoft.com/office/drawing/2014/main" val="2130545569"/>
                   </a:ext>
                 </a:extLst>
               </a:tr>
@@ -32011,7 +31629,7 @@
                 </a:tc>
                 <a:extLst>
                   <a:ext uri="{0D108BD9-81ED-4DB2-BD59-A6C34878D82A}">
-                    <a16:rowId xmlns:a16="http://schemas.microsoft.com/office/drawing/2014/main" xmlns="" val="1848127216"/>
+                    <a16:rowId xmlns:a16="http://schemas.microsoft.com/office/drawing/2014/main" val="1848127216"/>
                   </a:ext>
                 </a:extLst>
               </a:tr>
@@ -32105,21 +31723,6 @@
   <p:clrMapOvr>
     <a:masterClrMapping/>
   </p:clrMapOvr>
-  <mc:AlternateContent xmlns:mc="http://schemas.openxmlformats.org/markup-compatibility/2006" xmlns:p14="http://schemas.microsoft.com/office/powerpoint/2010/main">
-    <mc:Choice Requires="p14">
-      <p:transition spd="slow" p14:dur="2000"/>
-    </mc:Choice>
-    <mc:Fallback xmlns="">
-      <p:transition spd="slow"/>
-    </mc:Fallback>
-  </mc:AlternateContent>
-  <p:timing>
-    <p:tnLst>
-      <p:par>
-        <p:cTn id="1" dur="indefinite" restart="never" nodeType="tmRoot"/>
-      </p:par>
-    </p:tnLst>
-  </p:timing>
 </p:sld>
 </file>
 
@@ -32472,14 +32075,14 @@
                 <a:gridCol w="4119615">
                   <a:extLst>
                     <a:ext uri="{9D8B030D-6E8A-4147-A177-3AD203B41FA5}">
-                      <a16:colId xmlns:a16="http://schemas.microsoft.com/office/drawing/2014/main" xmlns="" val="3644048045"/>
+                      <a16:colId xmlns:a16="http://schemas.microsoft.com/office/drawing/2014/main" val="3644048045"/>
                     </a:ext>
                   </a:extLst>
                 </a:gridCol>
                 <a:gridCol w="4119613">
                   <a:extLst>
                     <a:ext uri="{9D8B030D-6E8A-4147-A177-3AD203B41FA5}">
-                      <a16:colId xmlns:a16="http://schemas.microsoft.com/office/drawing/2014/main" xmlns="" val="2034254753"/>
+                      <a16:colId xmlns:a16="http://schemas.microsoft.com/office/drawing/2014/main" val="2034254753"/>
                     </a:ext>
                   </a:extLst>
                 </a:gridCol>
@@ -32515,7 +32118,7 @@
                 </a:tc>
                 <a:extLst>
                   <a:ext uri="{0D108BD9-81ED-4DB2-BD59-A6C34878D82A}">
-                    <a16:rowId xmlns:a16="http://schemas.microsoft.com/office/drawing/2014/main" xmlns="" val="2708275910"/>
+                    <a16:rowId xmlns:a16="http://schemas.microsoft.com/office/drawing/2014/main" val="2708275910"/>
                   </a:ext>
                 </a:extLst>
               </a:tr>
@@ -32715,7 +32318,7 @@
                 </a:tc>
                 <a:extLst>
                   <a:ext uri="{0D108BD9-81ED-4DB2-BD59-A6C34878D82A}">
-                    <a16:rowId xmlns:a16="http://schemas.microsoft.com/office/drawing/2014/main" xmlns="" val="2161984115"/>
+                    <a16:rowId xmlns:a16="http://schemas.microsoft.com/office/drawing/2014/main" val="2161984115"/>
                   </a:ext>
                 </a:extLst>
               </a:tr>
@@ -32915,7 +32518,7 @@
                 </a:tc>
                 <a:extLst>
                   <a:ext uri="{0D108BD9-81ED-4DB2-BD59-A6C34878D82A}">
-                    <a16:rowId xmlns:a16="http://schemas.microsoft.com/office/drawing/2014/main" xmlns="" val="2841678841"/>
+                    <a16:rowId xmlns:a16="http://schemas.microsoft.com/office/drawing/2014/main" val="2841678841"/>
                   </a:ext>
                 </a:extLst>
               </a:tr>
@@ -33115,7 +32718,7 @@
                 </a:tc>
                 <a:extLst>
                   <a:ext uri="{0D108BD9-81ED-4DB2-BD59-A6C34878D82A}">
-                    <a16:rowId xmlns:a16="http://schemas.microsoft.com/office/drawing/2014/main" xmlns="" val="3144998627"/>
+                    <a16:rowId xmlns:a16="http://schemas.microsoft.com/office/drawing/2014/main" val="3144998627"/>
                   </a:ext>
                 </a:extLst>
               </a:tr>
@@ -33315,7 +32918,7 @@
                 </a:tc>
                 <a:extLst>
                   <a:ext uri="{0D108BD9-81ED-4DB2-BD59-A6C34878D82A}">
-                    <a16:rowId xmlns:a16="http://schemas.microsoft.com/office/drawing/2014/main" xmlns="" val="1419261869"/>
+                    <a16:rowId xmlns:a16="http://schemas.microsoft.com/office/drawing/2014/main" val="1419261869"/>
                   </a:ext>
                 </a:extLst>
               </a:tr>
@@ -33515,7 +33118,7 @@
                 </a:tc>
                 <a:extLst>
                   <a:ext uri="{0D108BD9-81ED-4DB2-BD59-A6C34878D82A}">
-                    <a16:rowId xmlns:a16="http://schemas.microsoft.com/office/drawing/2014/main" xmlns="" val="1427391072"/>
+                    <a16:rowId xmlns:a16="http://schemas.microsoft.com/office/drawing/2014/main" val="1427391072"/>
                   </a:ext>
                 </a:extLst>
               </a:tr>
@@ -33715,7 +33318,7 @@
                 </a:tc>
                 <a:extLst>
                   <a:ext uri="{0D108BD9-81ED-4DB2-BD59-A6C34878D82A}">
-                    <a16:rowId xmlns:a16="http://schemas.microsoft.com/office/drawing/2014/main" xmlns="" val="2346539918"/>
+                    <a16:rowId xmlns:a16="http://schemas.microsoft.com/office/drawing/2014/main" val="2346539918"/>
                   </a:ext>
                 </a:extLst>
               </a:tr>
@@ -33924,7 +33527,7 @@
                 </a:tc>
                 <a:extLst>
                   <a:ext uri="{0D108BD9-81ED-4DB2-BD59-A6C34878D82A}">
-                    <a16:rowId xmlns:a16="http://schemas.microsoft.com/office/drawing/2014/main" xmlns="" val="2275483042"/>
+                    <a16:rowId xmlns:a16="http://schemas.microsoft.com/office/drawing/2014/main" val="2275483042"/>
                   </a:ext>
                 </a:extLst>
               </a:tr>
@@ -34133,7 +33736,7 @@
                 </a:tc>
                 <a:extLst>
                   <a:ext uri="{0D108BD9-81ED-4DB2-BD59-A6C34878D82A}">
-                    <a16:rowId xmlns:a16="http://schemas.microsoft.com/office/drawing/2014/main" xmlns="" val="4202569347"/>
+                    <a16:rowId xmlns:a16="http://schemas.microsoft.com/office/drawing/2014/main" val="4202569347"/>
                   </a:ext>
                 </a:extLst>
               </a:tr>
@@ -34342,7 +33945,7 @@
                 </a:tc>
                 <a:extLst>
                   <a:ext uri="{0D108BD9-81ED-4DB2-BD59-A6C34878D82A}">
-                    <a16:rowId xmlns:a16="http://schemas.microsoft.com/office/drawing/2014/main" xmlns="" val="2989839269"/>
+                    <a16:rowId xmlns:a16="http://schemas.microsoft.com/office/drawing/2014/main" val="2989839269"/>
                   </a:ext>
                 </a:extLst>
               </a:tr>
@@ -34551,7 +34154,7 @@
                 </a:tc>
                 <a:extLst>
                   <a:ext uri="{0D108BD9-81ED-4DB2-BD59-A6C34878D82A}">
-                    <a16:rowId xmlns:a16="http://schemas.microsoft.com/office/drawing/2014/main" xmlns="" val="2130545569"/>
+                    <a16:rowId xmlns:a16="http://schemas.microsoft.com/office/drawing/2014/main" val="2130545569"/>
                   </a:ext>
                 </a:extLst>
               </a:tr>
@@ -34760,7 +34363,7 @@
                 </a:tc>
                 <a:extLst>
                   <a:ext uri="{0D108BD9-81ED-4DB2-BD59-A6C34878D82A}">
-                    <a16:rowId xmlns:a16="http://schemas.microsoft.com/office/drawing/2014/main" xmlns="" val="3045796785"/>
+                    <a16:rowId xmlns:a16="http://schemas.microsoft.com/office/drawing/2014/main" val="3045796785"/>
                   </a:ext>
                 </a:extLst>
               </a:tr>
@@ -34969,7 +34572,7 @@
                 </a:tc>
                 <a:extLst>
                   <a:ext uri="{0D108BD9-81ED-4DB2-BD59-A6C34878D82A}">
-                    <a16:rowId xmlns:a16="http://schemas.microsoft.com/office/drawing/2014/main" xmlns="" val="1091494175"/>
+                    <a16:rowId xmlns:a16="http://schemas.microsoft.com/office/drawing/2014/main" val="1091494175"/>
                   </a:ext>
                 </a:extLst>
               </a:tr>
@@ -34987,21 +34590,6 @@
   <p:clrMapOvr>
     <a:masterClrMapping/>
   </p:clrMapOvr>
-  <mc:AlternateContent xmlns:mc="http://schemas.openxmlformats.org/markup-compatibility/2006" xmlns:p14="http://schemas.microsoft.com/office/powerpoint/2010/main">
-    <mc:Choice Requires="p14">
-      <p:transition spd="slow" p14:dur="2000"/>
-    </mc:Choice>
-    <mc:Fallback xmlns="">
-      <p:transition spd="slow"/>
-    </mc:Fallback>
-  </mc:AlternateContent>
-  <p:timing>
-    <p:tnLst>
-      <p:par>
-        <p:cTn id="1" dur="indefinite" restart="never" nodeType="tmRoot"/>
-      </p:par>
-    </p:tnLst>
-  </p:timing>
 </p:sld>
 </file>
 
@@ -35114,21 +34702,6 @@
   <p:clrMapOvr>
     <a:masterClrMapping/>
   </p:clrMapOvr>
-  <mc:AlternateContent xmlns:mc="http://schemas.openxmlformats.org/markup-compatibility/2006" xmlns:p14="http://schemas.microsoft.com/office/powerpoint/2010/main">
-    <mc:Choice Requires="p14">
-      <p:transition spd="slow" p14:dur="2000"/>
-    </mc:Choice>
-    <mc:Fallback xmlns="">
-      <p:transition spd="slow"/>
-    </mc:Fallback>
-  </mc:AlternateContent>
-  <p:timing>
-    <p:tnLst>
-      <p:par>
-        <p:cTn id="1" dur="indefinite" restart="never" nodeType="tmRoot"/>
-      </p:par>
-    </p:tnLst>
-  </p:timing>
 </p:sld>
 </file>
 
@@ -35304,21 +34877,6 @@
   <p:clrMapOvr>
     <a:masterClrMapping/>
   </p:clrMapOvr>
-  <mc:AlternateContent xmlns:mc="http://schemas.openxmlformats.org/markup-compatibility/2006" xmlns:p14="http://schemas.microsoft.com/office/powerpoint/2010/main">
-    <mc:Choice Requires="p14">
-      <p:transition spd="slow" p14:dur="2000"/>
-    </mc:Choice>
-    <mc:Fallback xmlns="">
-      <p:transition spd="slow"/>
-    </mc:Fallback>
-  </mc:AlternateContent>
-  <p:timing>
-    <p:tnLst>
-      <p:par>
-        <p:cTn id="1" dur="indefinite" restart="never" nodeType="tmRoot"/>
-      </p:par>
-    </p:tnLst>
-  </p:timing>
 </p:sld>
 </file>
 
@@ -36126,21 +35684,6 @@
   <p:clrMapOvr>
     <a:masterClrMapping/>
   </p:clrMapOvr>
-  <mc:AlternateContent xmlns:mc="http://schemas.openxmlformats.org/markup-compatibility/2006" xmlns:p14="http://schemas.microsoft.com/office/powerpoint/2010/main">
-    <mc:Choice Requires="p14">
-      <p:transition spd="slow" p14:dur="2000"/>
-    </mc:Choice>
-    <mc:Fallback xmlns="">
-      <p:transition spd="slow"/>
-    </mc:Fallback>
-  </mc:AlternateContent>
-  <p:timing>
-    <p:tnLst>
-      <p:par>
-        <p:cTn id="1" dur="indefinite" restart="never" nodeType="tmRoot"/>
-      </p:par>
-    </p:tnLst>
-  </p:timing>
 </p:sld>
 </file>
 
@@ -36308,13 +35851,6 @@
   <p:clrMapOvr>
     <a:masterClrMapping/>
   </p:clrMapOvr>
-  <p:timing>
-    <p:tnLst>
-      <p:par>
-        <p:cTn id="1" dur="indefinite" restart="never" nodeType="tmRoot"/>
-      </p:par>
-    </p:tnLst>
-  </p:timing>
 </p:sld>
 </file>
 
@@ -36415,13 +35951,6 @@
   <p:clrMapOvr>
     <a:masterClrMapping/>
   </p:clrMapOvr>
-  <p:timing>
-    <p:tnLst>
-      <p:par>
-        <p:cTn id="1" dur="indefinite" restart="never" nodeType="tmRoot"/>
-      </p:par>
-    </p:tnLst>
-  </p:timing>
 </p:sld>
 </file>
 
@@ -36532,13 +36061,6 @@
   <p:clrMapOvr>
     <a:masterClrMapping/>
   </p:clrMapOvr>
-  <p:timing>
-    <p:tnLst>
-      <p:par>
-        <p:cTn id="1" dur="indefinite" restart="never" nodeType="tmRoot"/>
-      </p:par>
-    </p:tnLst>
-  </p:timing>
 </p:sld>
 </file>
 
@@ -36841,21 +36363,6 @@
   <p:clrMapOvr>
     <a:masterClrMapping/>
   </p:clrMapOvr>
-  <mc:AlternateContent xmlns:mc="http://schemas.openxmlformats.org/markup-compatibility/2006" xmlns:p14="http://schemas.microsoft.com/office/powerpoint/2010/main">
-    <mc:Choice Requires="p14">
-      <p:transition spd="slow" p14:dur="2000"/>
-    </mc:Choice>
-    <mc:Fallback xmlns="">
-      <p:transition spd="slow"/>
-    </mc:Fallback>
-  </mc:AlternateContent>
-  <p:timing>
-    <p:tnLst>
-      <p:par>
-        <p:cTn id="1" dur="indefinite" restart="never" nodeType="tmRoot"/>
-      </p:par>
-    </p:tnLst>
-  </p:timing>
 </p:sld>
 </file>
 
@@ -37021,13 +36528,6 @@
   <p:clrMapOvr>
     <a:masterClrMapping/>
   </p:clrMapOvr>
-  <p:timing>
-    <p:tnLst>
-      <p:par>
-        <p:cTn id="1" dur="indefinite" restart="never" nodeType="tmRoot"/>
-      </p:par>
-    </p:tnLst>
-  </p:timing>
 </p:sld>
 </file>
 
@@ -37163,13 +36663,6 @@
   <p:clrMapOvr>
     <a:masterClrMapping/>
   </p:clrMapOvr>
-  <p:timing>
-    <p:tnLst>
-      <p:par>
-        <p:cTn id="1" dur="indefinite" restart="never" nodeType="tmRoot"/>
-      </p:par>
-    </p:tnLst>
-  </p:timing>
 </p:sld>
 </file>
 
@@ -37344,13 +36837,6 @@
   <p:clrMapOvr>
     <a:masterClrMapping/>
   </p:clrMapOvr>
-  <p:timing>
-    <p:tnLst>
-      <p:par>
-        <p:cTn id="1" dur="indefinite" restart="never" nodeType="tmRoot"/>
-      </p:par>
-    </p:tnLst>
-  </p:timing>
 </p:sld>
 </file>
 
@@ -38142,14 +37628,6 @@
   <p:clrMapOvr>
     <a:masterClrMapping/>
   </p:clrMapOvr>
-  <mc:AlternateContent xmlns:mc="http://schemas.openxmlformats.org/markup-compatibility/2006" xmlns:p14="http://schemas.microsoft.com/office/powerpoint/2010/main">
-    <mc:Choice Requires="p14">
-      <p:transition spd="slow" p14:dur="2000"/>
-    </mc:Choice>
-    <mc:Fallback xmlns="">
-      <p:transition spd="slow"/>
-    </mc:Fallback>
-  </mc:AlternateContent>
 </p:sld>
 </file>
 
@@ -39093,7 +38571,7 @@
               <a:t> </a:t>
             </a:r>
             <a:r>
-              <a:rPr lang="en-US" sz="1400" dirty="0" smtClean="0">
+              <a:rPr lang="en-US" sz="1400" dirty="0">
                 <a:solidFill>
                   <a:srgbClr val="FF0000"/>
                 </a:solidFill>
@@ -40228,14 +39706,14 @@
                 <a:gridCol w="957714">
                   <a:extLst>
                     <a:ext uri="{9D8B030D-6E8A-4147-A177-3AD203B41FA5}">
-                      <a16:colId xmlns:a16="http://schemas.microsoft.com/office/drawing/2014/main" xmlns="" val="3940544257"/>
+                      <a16:colId xmlns:a16="http://schemas.microsoft.com/office/drawing/2014/main" val="3940544257"/>
                     </a:ext>
                   </a:extLst>
                 </a:gridCol>
                 <a:gridCol w="2464067">
                   <a:extLst>
                     <a:ext uri="{9D8B030D-6E8A-4147-A177-3AD203B41FA5}">
-                      <a16:colId xmlns:a16="http://schemas.microsoft.com/office/drawing/2014/main" xmlns="" val="3658567973"/>
+                      <a16:colId xmlns:a16="http://schemas.microsoft.com/office/drawing/2014/main" val="3658567973"/>
                     </a:ext>
                   </a:extLst>
                 </a:gridCol>
@@ -40269,7 +39747,7 @@
                 </a:tc>
                 <a:extLst>
                   <a:ext uri="{0D108BD9-81ED-4DB2-BD59-A6C34878D82A}">
-                    <a16:rowId xmlns:a16="http://schemas.microsoft.com/office/drawing/2014/main" xmlns="" val="1032275335"/>
+                    <a16:rowId xmlns:a16="http://schemas.microsoft.com/office/drawing/2014/main" val="1032275335"/>
                   </a:ext>
                 </a:extLst>
               </a:tr>
@@ -40399,7 +39877,7 @@
                 </a:tc>
                 <a:extLst>
                   <a:ext uri="{0D108BD9-81ED-4DB2-BD59-A6C34878D82A}">
-                    <a16:rowId xmlns:a16="http://schemas.microsoft.com/office/drawing/2014/main" xmlns="" val="4191484087"/>
+                    <a16:rowId xmlns:a16="http://schemas.microsoft.com/office/drawing/2014/main" val="4191484087"/>
                   </a:ext>
                 </a:extLst>
               </a:tr>
@@ -40473,7 +39951,7 @@
                 </a:tc>
                 <a:extLst>
                   <a:ext uri="{0D108BD9-81ED-4DB2-BD59-A6C34878D82A}">
-                    <a16:rowId xmlns:a16="http://schemas.microsoft.com/office/drawing/2014/main" xmlns="" val="1864588626"/>
+                    <a16:rowId xmlns:a16="http://schemas.microsoft.com/office/drawing/2014/main" val="1864588626"/>
                   </a:ext>
                 </a:extLst>
               </a:tr>
@@ -40595,7 +40073,7 @@
                 </a:tc>
                 <a:extLst>
                   <a:ext uri="{0D108BD9-81ED-4DB2-BD59-A6C34878D82A}">
-                    <a16:rowId xmlns:a16="http://schemas.microsoft.com/office/drawing/2014/main" xmlns="" val="3035259714"/>
+                    <a16:rowId xmlns:a16="http://schemas.microsoft.com/office/drawing/2014/main" val="3035259714"/>
                   </a:ext>
                 </a:extLst>
               </a:tr>
@@ -40684,7 +40162,7 @@
                 </a:tc>
                 <a:extLst>
                   <a:ext uri="{0D108BD9-81ED-4DB2-BD59-A6C34878D82A}">
-                    <a16:rowId xmlns:a16="http://schemas.microsoft.com/office/drawing/2014/main" xmlns="" val="2023621082"/>
+                    <a16:rowId xmlns:a16="http://schemas.microsoft.com/office/drawing/2014/main" val="2023621082"/>
                   </a:ext>
                 </a:extLst>
               </a:tr>
@@ -40773,7 +40251,7 @@
                 </a:tc>
                 <a:extLst>
                   <a:ext uri="{0D108BD9-81ED-4DB2-BD59-A6C34878D82A}">
-                    <a16:rowId xmlns:a16="http://schemas.microsoft.com/office/drawing/2014/main" xmlns="" val="120016333"/>
+                    <a16:rowId xmlns:a16="http://schemas.microsoft.com/office/drawing/2014/main" val="120016333"/>
                   </a:ext>
                 </a:extLst>
               </a:tr>
@@ -40918,21 +40396,21 @@
                 <a:gridCol w="960120">
                   <a:extLst>
                     <a:ext uri="{9D8B030D-6E8A-4147-A177-3AD203B41FA5}">
-                      <a16:colId xmlns:a16="http://schemas.microsoft.com/office/drawing/2014/main" xmlns="" val="392696932"/>
+                      <a16:colId xmlns:a16="http://schemas.microsoft.com/office/drawing/2014/main" val="392696932"/>
                     </a:ext>
                   </a:extLst>
                 </a:gridCol>
                 <a:gridCol w="2468880">
                   <a:extLst>
                     <a:ext uri="{9D8B030D-6E8A-4147-A177-3AD203B41FA5}">
-                      <a16:colId xmlns:a16="http://schemas.microsoft.com/office/drawing/2014/main" xmlns="" val="2769969192"/>
+                      <a16:colId xmlns:a16="http://schemas.microsoft.com/office/drawing/2014/main" val="2769969192"/>
                     </a:ext>
                   </a:extLst>
                 </a:gridCol>
                 <a:gridCol w="2468880">
                   <a:extLst>
                     <a:ext uri="{9D8B030D-6E8A-4147-A177-3AD203B41FA5}">
-                      <a16:colId xmlns:a16="http://schemas.microsoft.com/office/drawing/2014/main" xmlns="" val="2022610816"/>
+                      <a16:colId xmlns:a16="http://schemas.microsoft.com/office/drawing/2014/main" val="2022610816"/>
                     </a:ext>
                   </a:extLst>
                 </a:gridCol>
@@ -40984,7 +40462,7 @@
                 </a:tc>
                 <a:extLst>
                   <a:ext uri="{0D108BD9-81ED-4DB2-BD59-A6C34878D82A}">
-                    <a16:rowId xmlns:a16="http://schemas.microsoft.com/office/drawing/2014/main" xmlns="" val="2344937666"/>
+                    <a16:rowId xmlns:a16="http://schemas.microsoft.com/office/drawing/2014/main" val="2344937666"/>
                   </a:ext>
                 </a:extLst>
               </a:tr>
@@ -41117,7 +40595,7 @@
                 </a:tc>
                 <a:extLst>
                   <a:ext uri="{0D108BD9-81ED-4DB2-BD59-A6C34878D82A}">
-                    <a16:rowId xmlns:a16="http://schemas.microsoft.com/office/drawing/2014/main" xmlns="" val="1917341330"/>
+                    <a16:rowId xmlns:a16="http://schemas.microsoft.com/office/drawing/2014/main" val="1917341330"/>
                   </a:ext>
                 </a:extLst>
               </a:tr>
@@ -41334,7 +40812,7 @@
                 </a:tc>
                 <a:extLst>
                   <a:ext uri="{0D108BD9-81ED-4DB2-BD59-A6C34878D82A}">
-                    <a16:rowId xmlns:a16="http://schemas.microsoft.com/office/drawing/2014/main" xmlns="" val="3088042860"/>
+                    <a16:rowId xmlns:a16="http://schemas.microsoft.com/office/drawing/2014/main" val="3088042860"/>
                   </a:ext>
                 </a:extLst>
               </a:tr>
@@ -41418,7 +40896,7 @@
                 </a:tc>
                 <a:extLst>
                   <a:ext uri="{0D108BD9-81ED-4DB2-BD59-A6C34878D82A}">
-                    <a16:rowId xmlns:a16="http://schemas.microsoft.com/office/drawing/2014/main" xmlns="" val="2658530722"/>
+                    <a16:rowId xmlns:a16="http://schemas.microsoft.com/office/drawing/2014/main" val="2658530722"/>
                   </a:ext>
                 </a:extLst>
               </a:tr>
@@ -41550,7 +41028,7 @@
                 </a:tc>
                 <a:extLst>
                   <a:ext uri="{0D108BD9-81ED-4DB2-BD59-A6C34878D82A}">
-                    <a16:rowId xmlns:a16="http://schemas.microsoft.com/office/drawing/2014/main" xmlns="" val="1481886367"/>
+                    <a16:rowId xmlns:a16="http://schemas.microsoft.com/office/drawing/2014/main" val="1481886367"/>
                   </a:ext>
                 </a:extLst>
               </a:tr>
@@ -41649,7 +41127,7 @@
                 </a:tc>
                 <a:extLst>
                   <a:ext uri="{0D108BD9-81ED-4DB2-BD59-A6C34878D82A}">
-                    <a16:rowId xmlns:a16="http://schemas.microsoft.com/office/drawing/2014/main" xmlns="" val="4248384778"/>
+                    <a16:rowId xmlns:a16="http://schemas.microsoft.com/office/drawing/2014/main" val="4248384778"/>
                   </a:ext>
                 </a:extLst>
               </a:tr>
@@ -41748,7 +41226,7 @@
                 </a:tc>
                 <a:extLst>
                   <a:ext uri="{0D108BD9-81ED-4DB2-BD59-A6C34878D82A}">
-                    <a16:rowId xmlns:a16="http://schemas.microsoft.com/office/drawing/2014/main" xmlns="" val="1670483340"/>
+                    <a16:rowId xmlns:a16="http://schemas.microsoft.com/office/drawing/2014/main" val="1670483340"/>
                   </a:ext>
                 </a:extLst>
               </a:tr>
@@ -41893,28 +41371,28 @@
                 <a:gridCol w="960120">
                   <a:extLst>
                     <a:ext uri="{9D8B030D-6E8A-4147-A177-3AD203B41FA5}">
-                      <a16:colId xmlns:a16="http://schemas.microsoft.com/office/drawing/2014/main" xmlns="" val="392696932"/>
+                      <a16:colId xmlns:a16="http://schemas.microsoft.com/office/drawing/2014/main" val="392696932"/>
                     </a:ext>
                   </a:extLst>
                 </a:gridCol>
                 <a:gridCol w="2468880">
                   <a:extLst>
                     <a:ext uri="{9D8B030D-6E8A-4147-A177-3AD203B41FA5}">
-                      <a16:colId xmlns:a16="http://schemas.microsoft.com/office/drawing/2014/main" xmlns="" val="2769969192"/>
+                      <a16:colId xmlns:a16="http://schemas.microsoft.com/office/drawing/2014/main" val="2769969192"/>
                     </a:ext>
                   </a:extLst>
                 </a:gridCol>
                 <a:gridCol w="2468880">
                   <a:extLst>
                     <a:ext uri="{9D8B030D-6E8A-4147-A177-3AD203B41FA5}">
-                      <a16:colId xmlns:a16="http://schemas.microsoft.com/office/drawing/2014/main" xmlns="" val="2022610816"/>
+                      <a16:colId xmlns:a16="http://schemas.microsoft.com/office/drawing/2014/main" val="2022610816"/>
                     </a:ext>
                   </a:extLst>
                 </a:gridCol>
                 <a:gridCol w="2468880">
                   <a:extLst>
                     <a:ext uri="{9D8B030D-6E8A-4147-A177-3AD203B41FA5}">
-                      <a16:colId xmlns:a16="http://schemas.microsoft.com/office/drawing/2014/main" xmlns="" val="102813283"/>
+                      <a16:colId xmlns:a16="http://schemas.microsoft.com/office/drawing/2014/main" val="102813283"/>
                     </a:ext>
                   </a:extLst>
                 </a:gridCol>
@@ -41979,7 +41457,7 @@
                 </a:tc>
                 <a:extLst>
                   <a:ext uri="{0D108BD9-81ED-4DB2-BD59-A6C34878D82A}">
-                    <a16:rowId xmlns:a16="http://schemas.microsoft.com/office/drawing/2014/main" xmlns="" val="2344937666"/>
+                    <a16:rowId xmlns:a16="http://schemas.microsoft.com/office/drawing/2014/main" val="2344937666"/>
                   </a:ext>
                 </a:extLst>
               </a:tr>
@@ -42139,7 +41617,7 @@
                 </a:tc>
                 <a:extLst>
                   <a:ext uri="{0D108BD9-81ED-4DB2-BD59-A6C34878D82A}">
-                    <a16:rowId xmlns:a16="http://schemas.microsoft.com/office/drawing/2014/main" xmlns="" val="1917341330"/>
+                    <a16:rowId xmlns:a16="http://schemas.microsoft.com/office/drawing/2014/main" val="1917341330"/>
                   </a:ext>
                 </a:extLst>
               </a:tr>
@@ -42443,7 +41921,7 @@
                 </a:tc>
                 <a:extLst>
                   <a:ext uri="{0D108BD9-81ED-4DB2-BD59-A6C34878D82A}">
-                    <a16:rowId xmlns:a16="http://schemas.microsoft.com/office/drawing/2014/main" xmlns="" val="3088042860"/>
+                    <a16:rowId xmlns:a16="http://schemas.microsoft.com/office/drawing/2014/main" val="3088042860"/>
                   </a:ext>
                 </a:extLst>
               </a:tr>
@@ -42537,7 +42015,7 @@
                 </a:tc>
                 <a:extLst>
                   <a:ext uri="{0D108BD9-81ED-4DB2-BD59-A6C34878D82A}">
-                    <a16:rowId xmlns:a16="http://schemas.microsoft.com/office/drawing/2014/main" xmlns="" val="2658530722"/>
+                    <a16:rowId xmlns:a16="http://schemas.microsoft.com/office/drawing/2014/main" val="2658530722"/>
                   </a:ext>
                 </a:extLst>
               </a:tr>
@@ -42730,7 +42208,7 @@
                 </a:tc>
                 <a:extLst>
                   <a:ext uri="{0D108BD9-81ED-4DB2-BD59-A6C34878D82A}">
-                    <a16:rowId xmlns:a16="http://schemas.microsoft.com/office/drawing/2014/main" xmlns="" val="1481886367"/>
+                    <a16:rowId xmlns:a16="http://schemas.microsoft.com/office/drawing/2014/main" val="1481886367"/>
                   </a:ext>
                 </a:extLst>
               </a:tr>
@@ -42839,7 +42317,7 @@
                 </a:tc>
                 <a:extLst>
                   <a:ext uri="{0D108BD9-81ED-4DB2-BD59-A6C34878D82A}">
-                    <a16:rowId xmlns:a16="http://schemas.microsoft.com/office/drawing/2014/main" xmlns="" val="4248384778"/>
+                    <a16:rowId xmlns:a16="http://schemas.microsoft.com/office/drawing/2014/main" val="4248384778"/>
                   </a:ext>
                 </a:extLst>
               </a:tr>
@@ -42948,7 +42426,7 @@
                 </a:tc>
                 <a:extLst>
                   <a:ext uri="{0D108BD9-81ED-4DB2-BD59-A6C34878D82A}">
-                    <a16:rowId xmlns:a16="http://schemas.microsoft.com/office/drawing/2014/main" xmlns="" val="1670483340"/>
+                    <a16:rowId xmlns:a16="http://schemas.microsoft.com/office/drawing/2014/main" val="1670483340"/>
                   </a:ext>
                 </a:extLst>
               </a:tr>
@@ -43447,14 +42925,14 @@
                 <a:gridCol w="934278">
                   <a:extLst>
                     <a:ext uri="{9D8B030D-6E8A-4147-A177-3AD203B41FA5}">
-                      <a16:colId xmlns:a16="http://schemas.microsoft.com/office/drawing/2014/main" xmlns="" val="4198655800"/>
+                      <a16:colId xmlns:a16="http://schemas.microsoft.com/office/drawing/2014/main" val="4198655800"/>
                     </a:ext>
                   </a:extLst>
                 </a:gridCol>
                 <a:gridCol w="7295322">
                   <a:extLst>
                     <a:ext uri="{9D8B030D-6E8A-4147-A177-3AD203B41FA5}">
-                      <a16:colId xmlns:a16="http://schemas.microsoft.com/office/drawing/2014/main" xmlns="" val="135413862"/>
+                      <a16:colId xmlns:a16="http://schemas.microsoft.com/office/drawing/2014/main" val="135413862"/>
                     </a:ext>
                   </a:extLst>
                 </a:gridCol>
@@ -43488,7 +42966,7 @@
                 </a:tc>
                 <a:extLst>
                   <a:ext uri="{0D108BD9-81ED-4DB2-BD59-A6C34878D82A}">
-                    <a16:rowId xmlns:a16="http://schemas.microsoft.com/office/drawing/2014/main" xmlns="" val="3068323444"/>
+                    <a16:rowId xmlns:a16="http://schemas.microsoft.com/office/drawing/2014/main" val="3068323444"/>
                   </a:ext>
                 </a:extLst>
               </a:tr>
@@ -43521,7 +42999,7 @@
                 </a:tc>
                 <a:extLst>
                   <a:ext uri="{0D108BD9-81ED-4DB2-BD59-A6C34878D82A}">
-                    <a16:rowId xmlns:a16="http://schemas.microsoft.com/office/drawing/2014/main" xmlns="" val="1586961909"/>
+                    <a16:rowId xmlns:a16="http://schemas.microsoft.com/office/drawing/2014/main" val="1586961909"/>
                   </a:ext>
                 </a:extLst>
               </a:tr>
@@ -43559,7 +43037,7 @@
                 </a:tc>
                 <a:extLst>
                   <a:ext uri="{0D108BD9-81ED-4DB2-BD59-A6C34878D82A}">
-                    <a16:rowId xmlns:a16="http://schemas.microsoft.com/office/drawing/2014/main" xmlns="" val="2280300197"/>
+                    <a16:rowId xmlns:a16="http://schemas.microsoft.com/office/drawing/2014/main" val="2280300197"/>
                   </a:ext>
                 </a:extLst>
               </a:tr>
@@ -43597,7 +43075,7 @@
                 </a:tc>
                 <a:extLst>
                   <a:ext uri="{0D108BD9-81ED-4DB2-BD59-A6C34878D82A}">
-                    <a16:rowId xmlns:a16="http://schemas.microsoft.com/office/drawing/2014/main" xmlns="" val="1192843310"/>
+                    <a16:rowId xmlns:a16="http://schemas.microsoft.com/office/drawing/2014/main" val="1192843310"/>
                   </a:ext>
                 </a:extLst>
               </a:tr>
@@ -43635,7 +43113,7 @@
                 </a:tc>
                 <a:extLst>
                   <a:ext uri="{0D108BD9-81ED-4DB2-BD59-A6C34878D82A}">
-                    <a16:rowId xmlns:a16="http://schemas.microsoft.com/office/drawing/2014/main" xmlns="" val="2620585158"/>
+                    <a16:rowId xmlns:a16="http://schemas.microsoft.com/office/drawing/2014/main" val="2620585158"/>
                   </a:ext>
                 </a:extLst>
               </a:tr>
@@ -43668,7 +43146,7 @@
                 </a:tc>
                 <a:extLst>
                   <a:ext uri="{0D108BD9-81ED-4DB2-BD59-A6C34878D82A}">
-                    <a16:rowId xmlns:a16="http://schemas.microsoft.com/office/drawing/2014/main" xmlns="" val="1697738616"/>
+                    <a16:rowId xmlns:a16="http://schemas.microsoft.com/office/drawing/2014/main" val="1697738616"/>
                   </a:ext>
                 </a:extLst>
               </a:tr>
@@ -43706,7 +43184,7 @@
                 </a:tc>
                 <a:extLst>
                   <a:ext uri="{0D108BD9-81ED-4DB2-BD59-A6C34878D82A}">
-                    <a16:rowId xmlns:a16="http://schemas.microsoft.com/office/drawing/2014/main" xmlns="" val="316611556"/>
+                    <a16:rowId xmlns:a16="http://schemas.microsoft.com/office/drawing/2014/main" val="316611556"/>
                   </a:ext>
                 </a:extLst>
               </a:tr>
@@ -43739,7 +43217,7 @@
                 </a:tc>
                 <a:extLst>
                   <a:ext uri="{0D108BD9-81ED-4DB2-BD59-A6C34878D82A}">
-                    <a16:rowId xmlns:a16="http://schemas.microsoft.com/office/drawing/2014/main" xmlns="" val="1312814102"/>
+                    <a16:rowId xmlns:a16="http://schemas.microsoft.com/office/drawing/2014/main" val="1312814102"/>
                   </a:ext>
                 </a:extLst>
               </a:tr>
@@ -43772,7 +43250,7 @@
                 </a:tc>
                 <a:extLst>
                   <a:ext uri="{0D108BD9-81ED-4DB2-BD59-A6C34878D82A}">
-                    <a16:rowId xmlns:a16="http://schemas.microsoft.com/office/drawing/2014/main" xmlns="" val="1975533996"/>
+                    <a16:rowId xmlns:a16="http://schemas.microsoft.com/office/drawing/2014/main" val="1975533996"/>
                   </a:ext>
                 </a:extLst>
               </a:tr>
@@ -43805,7 +43283,7 @@
                 </a:tc>
                 <a:extLst>
                   <a:ext uri="{0D108BD9-81ED-4DB2-BD59-A6C34878D82A}">
-                    <a16:rowId xmlns:a16="http://schemas.microsoft.com/office/drawing/2014/main" xmlns="" val="2759032957"/>
+                    <a16:rowId xmlns:a16="http://schemas.microsoft.com/office/drawing/2014/main" val="2759032957"/>
                   </a:ext>
                 </a:extLst>
               </a:tr>
@@ -43823,13 +43301,6 @@
   <p:clrMapOvr>
     <a:masterClrMapping/>
   </p:clrMapOvr>
-  <p:timing>
-    <p:tnLst>
-      <p:par>
-        <p:cTn id="1" dur="indefinite" restart="never" nodeType="tmRoot"/>
-      </p:par>
-    </p:tnLst>
-  </p:timing>
 </p:sld>
 </file>
 
@@ -43901,14 +43372,14 @@
                 <a:gridCol w="934278">
                   <a:extLst>
                     <a:ext uri="{9D8B030D-6E8A-4147-A177-3AD203B41FA5}">
-                      <a16:colId xmlns:a16="http://schemas.microsoft.com/office/drawing/2014/main" xmlns="" val="4198655800"/>
+                      <a16:colId xmlns:a16="http://schemas.microsoft.com/office/drawing/2014/main" val="4198655800"/>
                     </a:ext>
                   </a:extLst>
                 </a:gridCol>
                 <a:gridCol w="7295322">
                   <a:extLst>
                     <a:ext uri="{9D8B030D-6E8A-4147-A177-3AD203B41FA5}">
-                      <a16:colId xmlns:a16="http://schemas.microsoft.com/office/drawing/2014/main" xmlns="" val="135413862"/>
+                      <a16:colId xmlns:a16="http://schemas.microsoft.com/office/drawing/2014/main" val="135413862"/>
                     </a:ext>
                   </a:extLst>
                 </a:gridCol>
@@ -43942,7 +43413,7 @@
                 </a:tc>
                 <a:extLst>
                   <a:ext uri="{0D108BD9-81ED-4DB2-BD59-A6C34878D82A}">
-                    <a16:rowId xmlns:a16="http://schemas.microsoft.com/office/drawing/2014/main" xmlns="" val="3068323444"/>
+                    <a16:rowId xmlns:a16="http://schemas.microsoft.com/office/drawing/2014/main" val="3068323444"/>
                   </a:ext>
                 </a:extLst>
               </a:tr>
@@ -43975,7 +43446,7 @@
                 </a:tc>
                 <a:extLst>
                   <a:ext uri="{0D108BD9-81ED-4DB2-BD59-A6C34878D82A}">
-                    <a16:rowId xmlns:a16="http://schemas.microsoft.com/office/drawing/2014/main" xmlns="" val="2484981654"/>
+                    <a16:rowId xmlns:a16="http://schemas.microsoft.com/office/drawing/2014/main" val="2484981654"/>
                   </a:ext>
                 </a:extLst>
               </a:tr>
@@ -44013,7 +43484,7 @@
                 </a:tc>
                 <a:extLst>
                   <a:ext uri="{0D108BD9-81ED-4DB2-BD59-A6C34878D82A}">
-                    <a16:rowId xmlns:a16="http://schemas.microsoft.com/office/drawing/2014/main" xmlns="" val="1377910784"/>
+                    <a16:rowId xmlns:a16="http://schemas.microsoft.com/office/drawing/2014/main" val="1377910784"/>
                   </a:ext>
                 </a:extLst>
               </a:tr>
@@ -44046,7 +43517,7 @@
                 </a:tc>
                 <a:extLst>
                   <a:ext uri="{0D108BD9-81ED-4DB2-BD59-A6C34878D82A}">
-                    <a16:rowId xmlns:a16="http://schemas.microsoft.com/office/drawing/2014/main" xmlns="" val="1387856053"/>
+                    <a16:rowId xmlns:a16="http://schemas.microsoft.com/office/drawing/2014/main" val="1387856053"/>
                   </a:ext>
                 </a:extLst>
               </a:tr>
@@ -44084,7 +43555,7 @@
                 </a:tc>
                 <a:extLst>
                   <a:ext uri="{0D108BD9-81ED-4DB2-BD59-A6C34878D82A}">
-                    <a16:rowId xmlns:a16="http://schemas.microsoft.com/office/drawing/2014/main" xmlns="" val="2599123823"/>
+                    <a16:rowId xmlns:a16="http://schemas.microsoft.com/office/drawing/2014/main" val="2599123823"/>
                   </a:ext>
                 </a:extLst>
               </a:tr>
@@ -44125,7 +43596,7 @@
                 </a:tc>
                 <a:extLst>
                   <a:ext uri="{0D108BD9-81ED-4DB2-BD59-A6C34878D82A}">
-                    <a16:rowId xmlns:a16="http://schemas.microsoft.com/office/drawing/2014/main" xmlns="" val="1232603862"/>
+                    <a16:rowId xmlns:a16="http://schemas.microsoft.com/office/drawing/2014/main" val="1232603862"/>
                   </a:ext>
                 </a:extLst>
               </a:tr>
@@ -44158,7 +43629,7 @@
                 </a:tc>
                 <a:extLst>
                   <a:ext uri="{0D108BD9-81ED-4DB2-BD59-A6C34878D82A}">
-                    <a16:rowId xmlns:a16="http://schemas.microsoft.com/office/drawing/2014/main" xmlns="" val="4145944521"/>
+                    <a16:rowId xmlns:a16="http://schemas.microsoft.com/office/drawing/2014/main" val="4145944521"/>
                   </a:ext>
                 </a:extLst>
               </a:tr>
@@ -44196,7 +43667,7 @@
                 </a:tc>
                 <a:extLst>
                   <a:ext uri="{0D108BD9-81ED-4DB2-BD59-A6C34878D82A}">
-                    <a16:rowId xmlns:a16="http://schemas.microsoft.com/office/drawing/2014/main" xmlns="" val="2954677722"/>
+                    <a16:rowId xmlns:a16="http://schemas.microsoft.com/office/drawing/2014/main" val="2954677722"/>
                   </a:ext>
                 </a:extLst>
               </a:tr>
@@ -44229,7 +43700,7 @@
                 </a:tc>
                 <a:extLst>
                   <a:ext uri="{0D108BD9-81ED-4DB2-BD59-A6C34878D82A}">
-                    <a16:rowId xmlns:a16="http://schemas.microsoft.com/office/drawing/2014/main" xmlns="" val="205903975"/>
+                    <a16:rowId xmlns:a16="http://schemas.microsoft.com/office/drawing/2014/main" val="205903975"/>
                   </a:ext>
                 </a:extLst>
               </a:tr>
@@ -44262,7 +43733,7 @@
                 </a:tc>
                 <a:extLst>
                   <a:ext uri="{0D108BD9-81ED-4DB2-BD59-A6C34878D82A}">
-                    <a16:rowId xmlns:a16="http://schemas.microsoft.com/office/drawing/2014/main" xmlns="" val="2893595017"/>
+                    <a16:rowId xmlns:a16="http://schemas.microsoft.com/office/drawing/2014/main" val="2893595017"/>
                   </a:ext>
                 </a:extLst>
               </a:tr>
@@ -44295,7 +43766,7 @@
                 </a:tc>
                 <a:extLst>
                   <a:ext uri="{0D108BD9-81ED-4DB2-BD59-A6C34878D82A}">
-                    <a16:rowId xmlns:a16="http://schemas.microsoft.com/office/drawing/2014/main" xmlns="" val="2337380595"/>
+                    <a16:rowId xmlns:a16="http://schemas.microsoft.com/office/drawing/2014/main" val="2337380595"/>
                   </a:ext>
                 </a:extLst>
               </a:tr>
@@ -44989,6 +44460,9 @@
             <a:off x="457200" y="1600200"/>
             <a:ext cx="8229600" cy="603985"/>
           </a:xfrm>
+          <a:solidFill>
+            <a:schemeClr val="tx1"/>
+          </a:solidFill>
         </p:spPr>
         <p:txBody>
           <a:bodyPr/>
@@ -44998,7 +44472,11 @@
               <a:buNone/>
             </a:pPr>
             <a:r>
-              <a:rPr lang="en-US" dirty="0"/>
+              <a:rPr lang="en-US" b="1" dirty="0">
+                <a:solidFill>
+                  <a:schemeClr val="bg1"/>
+                </a:solidFill>
+              </a:rPr>
               <a:t>What is logical processing order?</a:t>
             </a:r>
           </a:p>
@@ -45006,13 +44484,21 @@
             <a:pPr marL="0" indent="0">
               <a:buNone/>
             </a:pPr>
-            <a:endParaRPr lang="en-US" dirty="0"/>
+            <a:endParaRPr lang="en-US" b="1" dirty="0">
+              <a:solidFill>
+                <a:schemeClr val="bg1"/>
+              </a:solidFill>
+            </a:endParaRPr>
           </a:p>
           <a:p>
             <a:pPr marL="0" indent="0">
               <a:buNone/>
             </a:pPr>
-            <a:endParaRPr lang="en-US" dirty="0"/>
+            <a:endParaRPr lang="en-US" b="1" dirty="0">
+              <a:solidFill>
+                <a:schemeClr val="bg1"/>
+              </a:solidFill>
+            </a:endParaRPr>
           </a:p>
         </p:txBody>
       </p:sp>
@@ -45032,12 +44518,7 @@
           <a:prstGeom prst="rect">
             <a:avLst/>
           </a:prstGeom>
-          <a:solidFill>
-            <a:schemeClr val="accent5">
-              <a:lumMod val="20000"/>
-              <a:lumOff val="80000"/>
-            </a:schemeClr>
-          </a:solidFill>
+          <a:noFill/>
         </p:spPr>
         <p:txBody>
           <a:bodyPr vert="horz" lIns="91440" tIns="45720" rIns="91440" bIns="45720" rtlCol="0" anchor="ctr">
@@ -45181,9 +44662,10 @@
             </a:lvl9pPr>
           </a:lstStyle>
           <a:p>
-            <a:pPr marL="0" indent="0" algn="ctr">
-              <a:buFont typeface="Wingdings" charset="2"/>
-              <a:buNone/>
+            <a:pPr>
+              <a:buSzPct val="100000"/>
+              <a:buFont typeface="Courier New" panose="02070309020205020404" pitchFamily="49" charset="0"/>
+              <a:buChar char="o"/>
             </a:pPr>
             <a:r>
               <a:rPr lang="en-US" dirty="0"/>
@@ -45208,12 +44690,7 @@
           <a:prstGeom prst="rect">
             <a:avLst/>
           </a:prstGeom>
-          <a:solidFill>
-            <a:schemeClr val="accent5">
-              <a:lumMod val="20000"/>
-              <a:lumOff val="80000"/>
-            </a:schemeClr>
-          </a:solidFill>
+          <a:noFill/>
         </p:spPr>
         <p:txBody>
           <a:bodyPr vert="horz" lIns="91440" tIns="45720" rIns="91440" bIns="45720" rtlCol="0" anchor="ctr">
@@ -45357,9 +44834,10 @@
             </a:lvl9pPr>
           </a:lstStyle>
           <a:p>
-            <a:pPr marL="0" indent="0" algn="ctr">
-              <a:buFont typeface="Wingdings" charset="2"/>
-              <a:buNone/>
+            <a:pPr>
+              <a:buSzPct val="100000"/>
+              <a:buFont typeface="Courier New" panose="02070309020205020404" pitchFamily="49" charset="0"/>
+              <a:buChar char="o"/>
             </a:pPr>
             <a:r>
               <a:rPr lang="en-US" dirty="0"/>
@@ -45384,12 +44862,7 @@
           <a:prstGeom prst="rect">
             <a:avLst/>
           </a:prstGeom>
-          <a:solidFill>
-            <a:schemeClr val="accent5">
-              <a:lumMod val="20000"/>
-              <a:lumOff val="80000"/>
-            </a:schemeClr>
-          </a:solidFill>
+          <a:noFill/>
         </p:spPr>
         <p:txBody>
           <a:bodyPr vert="horz" lIns="91440" tIns="45720" rIns="91440" bIns="45720" rtlCol="0" anchor="ctr">
@@ -45533,9 +45006,10 @@
             </a:lvl9pPr>
           </a:lstStyle>
           <a:p>
-            <a:pPr marL="0" indent="0" algn="ctr">
-              <a:buFont typeface="Wingdings" charset="2"/>
-              <a:buNone/>
+            <a:pPr>
+              <a:buSzPct val="100000"/>
+              <a:buFont typeface="Courier New" panose="02070309020205020404" pitchFamily="49" charset="0"/>
+              <a:buChar char="o"/>
             </a:pPr>
             <a:r>
               <a:rPr lang="en-US" dirty="0"/>
@@ -45611,6 +45085,9 @@
             <a:off x="457200" y="1600200"/>
             <a:ext cx="8229600" cy="603985"/>
           </a:xfrm>
+          <a:solidFill>
+            <a:schemeClr val="tx1"/>
+          </a:solidFill>
         </p:spPr>
         <p:txBody>
           <a:bodyPr/>
@@ -45620,7 +45097,11 @@
               <a:buNone/>
             </a:pPr>
             <a:r>
-              <a:rPr lang="en-US" dirty="0"/>
+              <a:rPr lang="en-US" b="1" dirty="0">
+                <a:solidFill>
+                  <a:schemeClr val="bg1"/>
+                </a:solidFill>
+              </a:rPr>
               <a:t>What is a query tree?</a:t>
             </a:r>
           </a:p>
@@ -45628,13 +45109,21 @@
             <a:pPr marL="0" indent="0">
               <a:buNone/>
             </a:pPr>
-            <a:endParaRPr lang="en-US" dirty="0"/>
+            <a:endParaRPr lang="en-US" b="1" dirty="0">
+              <a:solidFill>
+                <a:schemeClr val="bg1"/>
+              </a:solidFill>
+            </a:endParaRPr>
           </a:p>
           <a:p>
             <a:pPr marL="0" indent="0">
               <a:buNone/>
             </a:pPr>
-            <a:endParaRPr lang="en-US" dirty="0"/>
+            <a:endParaRPr lang="en-US" b="1" dirty="0">
+              <a:solidFill>
+                <a:schemeClr val="bg1"/>
+              </a:solidFill>
+            </a:endParaRPr>
           </a:p>
         </p:txBody>
       </p:sp>
@@ -45654,12 +45143,7 @@
           <a:prstGeom prst="rect">
             <a:avLst/>
           </a:prstGeom>
-          <a:solidFill>
-            <a:schemeClr val="accent5">
-              <a:lumMod val="20000"/>
-              <a:lumOff val="80000"/>
-            </a:schemeClr>
-          </a:solidFill>
+          <a:noFill/>
         </p:spPr>
         <p:txBody>
           <a:bodyPr vert="horz" lIns="91440" tIns="45720" rIns="91440" bIns="45720" rtlCol="0" anchor="ctr">
@@ -45803,9 +45287,9 @@
             </a:lvl9pPr>
           </a:lstStyle>
           <a:p>
-            <a:pPr marL="0" indent="0" algn="ctr">
-              <a:buFont typeface="Wingdings" charset="2"/>
-              <a:buNone/>
+            <a:pPr>
+              <a:buFont typeface="Courier New" panose="02070309020205020404" pitchFamily="49" charset="0"/>
+              <a:buChar char="o"/>
             </a:pPr>
             <a:r>
               <a:rPr lang="en-US" dirty="0"/>
@@ -45830,12 +45314,7 @@
           <a:prstGeom prst="rect">
             <a:avLst/>
           </a:prstGeom>
-          <a:solidFill>
-            <a:schemeClr val="accent5">
-              <a:lumMod val="20000"/>
-              <a:lumOff val="80000"/>
-            </a:schemeClr>
-          </a:solidFill>
+          <a:noFill/>
         </p:spPr>
         <p:txBody>
           <a:bodyPr vert="horz" lIns="91440" tIns="45720" rIns="91440" bIns="45720" rtlCol="0" anchor="ctr">
@@ -45979,9 +45458,9 @@
             </a:lvl9pPr>
           </a:lstStyle>
           <a:p>
-            <a:pPr marL="0" indent="0" algn="ctr">
-              <a:buFont typeface="Wingdings" charset="2"/>
-              <a:buNone/>
+            <a:pPr>
+              <a:buFont typeface="Courier New" panose="02070309020205020404" pitchFamily="49" charset="0"/>
+              <a:buChar char="o"/>
             </a:pPr>
             <a:r>
               <a:rPr lang="en-US" dirty="0"/>
@@ -46006,12 +45485,7 @@
           <a:prstGeom prst="rect">
             <a:avLst/>
           </a:prstGeom>
-          <a:solidFill>
-            <a:schemeClr val="accent5">
-              <a:lumMod val="20000"/>
-              <a:lumOff val="80000"/>
-            </a:schemeClr>
-          </a:solidFill>
+          <a:noFill/>
         </p:spPr>
         <p:txBody>
           <a:bodyPr vert="horz" lIns="91440" tIns="45720" rIns="91440" bIns="45720" rtlCol="0" anchor="ctr">
@@ -46155,9 +45629,9 @@
             </a:lvl9pPr>
           </a:lstStyle>
           <a:p>
-            <a:pPr marL="0" indent="0" algn="ctr">
-              <a:buFont typeface="Wingdings" charset="2"/>
-              <a:buNone/>
+            <a:pPr>
+              <a:buFont typeface="Courier New" panose="02070309020205020404" pitchFamily="49" charset="0"/>
+              <a:buChar char="o"/>
             </a:pPr>
             <a:r>
               <a:rPr lang="en-US" dirty="0"/>
@@ -46233,6 +45707,9 @@
             <a:off x="457200" y="1600200"/>
             <a:ext cx="8229600" cy="603985"/>
           </a:xfrm>
+          <a:solidFill>
+            <a:schemeClr val="tx1"/>
+          </a:solidFill>
         </p:spPr>
         <p:txBody>
           <a:bodyPr/>
@@ -46242,7 +45719,11 @@
               <a:buNone/>
             </a:pPr>
             <a:r>
-              <a:rPr lang="en-US" dirty="0"/>
+              <a:rPr lang="en-US" b="1" dirty="0">
+                <a:solidFill>
+                  <a:schemeClr val="bg1"/>
+                </a:solidFill>
+              </a:rPr>
               <a:t>What is a memo structure in SQL Server?</a:t>
             </a:r>
           </a:p>
@@ -46250,13 +45731,21 @@
             <a:pPr marL="0" indent="0">
               <a:buNone/>
             </a:pPr>
-            <a:endParaRPr lang="en-US" dirty="0"/>
+            <a:endParaRPr lang="en-US" b="1" dirty="0">
+              <a:solidFill>
+                <a:schemeClr val="bg1"/>
+              </a:solidFill>
+            </a:endParaRPr>
           </a:p>
           <a:p>
             <a:pPr marL="0" indent="0">
               <a:buNone/>
             </a:pPr>
-            <a:endParaRPr lang="en-US" dirty="0"/>
+            <a:endParaRPr lang="en-US" b="1" dirty="0">
+              <a:solidFill>
+                <a:schemeClr val="bg1"/>
+              </a:solidFill>
+            </a:endParaRPr>
           </a:p>
         </p:txBody>
       </p:sp>
@@ -46276,12 +45765,7 @@
           <a:prstGeom prst="rect">
             <a:avLst/>
           </a:prstGeom>
-          <a:solidFill>
-            <a:schemeClr val="accent5">
-              <a:lumMod val="20000"/>
-              <a:lumOff val="80000"/>
-            </a:schemeClr>
-          </a:solidFill>
+          <a:noFill/>
         </p:spPr>
         <p:txBody>
           <a:bodyPr vert="horz" lIns="91440" tIns="45720" rIns="91440" bIns="45720" rtlCol="0" anchor="ctr">
@@ -46425,9 +45909,9 @@
             </a:lvl9pPr>
           </a:lstStyle>
           <a:p>
-            <a:pPr marL="0" indent="0" algn="ctr">
-              <a:buFont typeface="Wingdings" charset="2"/>
-              <a:buNone/>
+            <a:pPr>
+              <a:buFont typeface="Courier New" panose="02070309020205020404" pitchFamily="49" charset="0"/>
+              <a:buChar char="o"/>
             </a:pPr>
             <a:r>
               <a:rPr lang="en-US" dirty="0"/>
@@ -46452,12 +45936,7 @@
           <a:prstGeom prst="rect">
             <a:avLst/>
           </a:prstGeom>
-          <a:solidFill>
-            <a:schemeClr val="accent5">
-              <a:lumMod val="20000"/>
-              <a:lumOff val="80000"/>
-            </a:schemeClr>
-          </a:solidFill>
+          <a:noFill/>
         </p:spPr>
         <p:txBody>
           <a:bodyPr vert="horz" lIns="91440" tIns="45720" rIns="91440" bIns="45720" rtlCol="0" anchor="ctr">
@@ -46601,9 +46080,9 @@
             </a:lvl9pPr>
           </a:lstStyle>
           <a:p>
-            <a:pPr marL="0" indent="0" algn="ctr">
-              <a:buFont typeface="Wingdings" charset="2"/>
-              <a:buNone/>
+            <a:pPr>
+              <a:buFont typeface="Courier New" panose="02070309020205020404" pitchFamily="49" charset="0"/>
+              <a:buChar char="o"/>
             </a:pPr>
             <a:r>
               <a:rPr lang="en-US" dirty="0"/>
@@ -46628,12 +46107,7 @@
           <a:prstGeom prst="rect">
             <a:avLst/>
           </a:prstGeom>
-          <a:solidFill>
-            <a:schemeClr val="accent5">
-              <a:lumMod val="20000"/>
-              <a:lumOff val="80000"/>
-            </a:schemeClr>
-          </a:solidFill>
+          <a:noFill/>
         </p:spPr>
         <p:txBody>
           <a:bodyPr vert="horz" lIns="91440" tIns="45720" rIns="91440" bIns="45720" rtlCol="0" anchor="ctr">
@@ -46777,9 +46251,9 @@
             </a:lvl9pPr>
           </a:lstStyle>
           <a:p>
-            <a:pPr marL="0" indent="0" algn="ctr">
-              <a:buFont typeface="Wingdings" charset="2"/>
-              <a:buNone/>
+            <a:pPr>
+              <a:buFont typeface="Courier New" panose="02070309020205020404" pitchFamily="49" charset="0"/>
+              <a:buChar char="o"/>
             </a:pPr>
             <a:r>
               <a:rPr lang="en-US" dirty="0"/>

</xml_diff>

<commit_message>
Update slide deck for KC.
</commit_message>
<xml_diff>
--- a/Optimizer.pptx
+++ b/Optimizer.pptx
@@ -272,7 +272,7 @@
           <a:p>
             <a:fld id="{2EDCB34D-5EC2-4739-9693-E425457AC201}" type="datetimeFigureOut">
               <a:rPr lang="en-US" smtClean="0"/>
-              <a:t>8/24/2016</a:t>
+              <a:t>9/13/2016</a:t>
             </a:fld>
             <a:endParaRPr lang="en-US"/>
           </a:p>
@@ -3112,7 +3112,7 @@
             <a:fld id="{5942B21B-2ADA-A040-A652-A7305E1B99FE}" type="datetimeFigureOut">
               <a:rPr lang="en-US" smtClean="0"/>
               <a:pPr/>
-              <a:t>8/24/2016</a:t>
+              <a:t>9/13/2016</a:t>
             </a:fld>
             <a:endParaRPr lang="en-US" dirty="0"/>
           </a:p>
@@ -3302,7 +3302,7 @@
           <a:p>
             <a:fld id="{5942B21B-2ADA-A040-A652-A7305E1B99FE}" type="datetimeFigureOut">
               <a:rPr lang="en-US" smtClean="0"/>
-              <a:t>8/24/2016</a:t>
+              <a:t>9/13/2016</a:t>
             </a:fld>
             <a:endParaRPr lang="en-US"/>
           </a:p>
@@ -3426,7 +3426,7 @@
             <a:fld id="{5942B21B-2ADA-A040-A652-A7305E1B99FE}" type="datetimeFigureOut">
               <a:rPr lang="en-US" smtClean="0"/>
               <a:pPr/>
-              <a:t>8/24/2016</a:t>
+              <a:t>9/13/2016</a:t>
             </a:fld>
             <a:r>
               <a:rPr lang="en-US"/>
@@ -3697,7 +3697,7 @@
             <a:fld id="{5942B21B-2ADA-A040-A652-A7305E1B99FE}" type="datetimeFigureOut">
               <a:rPr lang="en-US" smtClean="0"/>
               <a:pPr/>
-              <a:t>8/24/2016</a:t>
+              <a:t>9/13/2016</a:t>
             </a:fld>
             <a:r>
               <a:rPr lang="en-US" dirty="0"/>
@@ -3967,7 +3967,7 @@
             <a:fld id="{5942B21B-2ADA-A040-A652-A7305E1B99FE}" type="datetimeFigureOut">
               <a:rPr lang="en-US" smtClean="0"/>
               <a:pPr/>
-              <a:t>8/24/2016</a:t>
+              <a:t>9/13/2016</a:t>
             </a:fld>
             <a:r>
               <a:rPr lang="en-US" dirty="0"/>
@@ -4307,7 +4307,7 @@
             <a:fld id="{5942B21B-2ADA-A040-A652-A7305E1B99FE}" type="datetimeFigureOut">
               <a:rPr lang="en-US" smtClean="0"/>
               <a:pPr/>
-              <a:t>8/24/2016</a:t>
+              <a:t>9/13/2016</a:t>
             </a:fld>
             <a:r>
               <a:rPr lang="en-US" dirty="0"/>
@@ -4648,7 +4648,7 @@
             <a:fld id="{5942B21B-2ADA-A040-A652-A7305E1B99FE}" type="datetimeFigureOut">
               <a:rPr lang="en-US" smtClean="0"/>
               <a:pPr/>
-              <a:t>8/24/2016</a:t>
+              <a:t>9/13/2016</a:t>
             </a:fld>
             <a:r>
               <a:rPr lang="en-US" dirty="0"/>
@@ -5163,7 +5163,7 @@
             <a:fld id="{5942B21B-2ADA-A040-A652-A7305E1B99FE}" type="datetimeFigureOut">
               <a:rPr lang="en-US" smtClean="0"/>
               <a:pPr/>
-              <a:t>8/24/2016</a:t>
+              <a:t>9/13/2016</a:t>
             </a:fld>
             <a:r>
               <a:rPr lang="en-US" dirty="0"/>
@@ -5372,7 +5372,7 @@
             <a:fld id="{5942B21B-2ADA-A040-A652-A7305E1B99FE}" type="datetimeFigureOut">
               <a:rPr lang="en-US" smtClean="0"/>
               <a:pPr/>
-              <a:t>8/24/2016</a:t>
+              <a:t>9/13/2016</a:t>
             </a:fld>
             <a:r>
               <a:rPr lang="en-US" dirty="0"/>
@@ -5559,7 +5559,7 @@
             <a:fld id="{5942B21B-2ADA-A040-A652-A7305E1B99FE}" type="datetimeFigureOut">
               <a:rPr lang="en-US" smtClean="0"/>
               <a:pPr/>
-              <a:t>8/24/2016</a:t>
+              <a:t>9/13/2016</a:t>
             </a:fld>
             <a:r>
               <a:rPr lang="en-US" dirty="0"/>
@@ -5890,7 +5890,7 @@
             <a:fld id="{5942B21B-2ADA-A040-A652-A7305E1B99FE}" type="datetimeFigureOut">
               <a:rPr lang="en-US" smtClean="0"/>
               <a:pPr/>
-              <a:t>8/24/2016</a:t>
+              <a:t>9/13/2016</a:t>
             </a:fld>
             <a:r>
               <a:rPr lang="en-US" dirty="0"/>
@@ -6198,7 +6198,7 @@
             <a:fld id="{5942B21B-2ADA-A040-A652-A7305E1B99FE}" type="datetimeFigureOut">
               <a:rPr lang="en-US" smtClean="0"/>
               <a:pPr/>
-              <a:t>8/24/2016</a:t>
+              <a:t>9/13/2016</a:t>
             </a:fld>
             <a:r>
               <a:rPr lang="en-US" dirty="0"/>
@@ -6477,7 +6477,7 @@
             <a:fld id="{5942B21B-2ADA-A040-A652-A7305E1B99FE}" type="datetimeFigureOut">
               <a:rPr lang="en-US" smtClean="0"/>
               <a:pPr/>
-              <a:t>8/24/2016</a:t>
+              <a:t>9/13/2016</a:t>
             </a:fld>
             <a:r>
               <a:rPr lang="en-US" dirty="0"/>
@@ -8289,15 +8289,15 @@
                 <a:ea typeface="Calibri" panose="020F0502020204030204" pitchFamily="34" charset="0"/>
                 <a:cs typeface="Times New Roman" panose="02020603050405020304" pitchFamily="18" charset="0"/>
               </a:rPr>
-              <a:t>=</a:t>
-            </a:r>
-            <a:r>
-              <a:rPr lang="en-US" dirty="0">
-                <a:latin typeface="Consolas" panose="020B0609020204030204" pitchFamily="49" charset="0"/>
-                <a:ea typeface="Calibri" panose="020F0502020204030204" pitchFamily="34" charset="0"/>
-                <a:cs typeface="Times New Roman" panose="02020603050405020304" pitchFamily="18" charset="0"/>
-              </a:rPr>
-              <a:t> </a:t>
+              <a:t>in</a:t>
+            </a:r>
+            <a:r>
+              <a:rPr lang="en-US" dirty="0">
+                <a:latin typeface="Consolas" panose="020B0609020204030204" pitchFamily="49" charset="0"/>
+                <a:ea typeface="Calibri" panose="020F0502020204030204" pitchFamily="34" charset="0"/>
+                <a:cs typeface="Times New Roman" panose="02020603050405020304" pitchFamily="18" charset="0"/>
+              </a:rPr>
+              <a:t> (</a:t>
             </a:r>
             <a:r>
               <a:rPr lang="en-US" dirty="0">
@@ -8308,7 +8308,15 @@
                 <a:ea typeface="Calibri" panose="020F0502020204030204" pitchFamily="34" charset="0"/>
                 <a:cs typeface="Times New Roman" panose="02020603050405020304" pitchFamily="18" charset="0"/>
               </a:rPr>
-              <a:t>'OK'</a:t>
+              <a:t>'KS', 'MO'</a:t>
+            </a:r>
+            <a:r>
+              <a:rPr lang="en-US" dirty="0">
+                <a:latin typeface="Consolas" panose="020B0609020204030204" pitchFamily="49" charset="0"/>
+                <a:ea typeface="Calibri" panose="020F0502020204030204" pitchFamily="34" charset="0"/>
+                <a:cs typeface="Times New Roman" panose="02020603050405020304" pitchFamily="18" charset="0"/>
+              </a:rPr>
+              <a:t>)</a:t>
             </a:r>
             <a:endParaRPr lang="en-US" sz="2400" dirty="0">
               <a:latin typeface="Calibri" panose="020F0502020204030204" pitchFamily="34" charset="0"/>
@@ -9788,15 +9796,15 @@
                 <a:ea typeface="Calibri" panose="020F0502020204030204" pitchFamily="34" charset="0"/>
                 <a:cs typeface="Times New Roman" panose="02020603050405020304" pitchFamily="18" charset="0"/>
               </a:rPr>
-              <a:t>=</a:t>
-            </a:r>
-            <a:r>
-              <a:rPr lang="en-US" dirty="0">
-                <a:latin typeface="Consolas" panose="020B0609020204030204" pitchFamily="49" charset="0"/>
-                <a:ea typeface="Calibri" panose="020F0502020204030204" pitchFamily="34" charset="0"/>
-                <a:cs typeface="Times New Roman" panose="02020603050405020304" pitchFamily="18" charset="0"/>
-              </a:rPr>
-              <a:t> </a:t>
+              <a:t>in</a:t>
+            </a:r>
+            <a:r>
+              <a:rPr lang="en-US" dirty="0">
+                <a:latin typeface="Consolas" panose="020B0609020204030204" pitchFamily="49" charset="0"/>
+                <a:ea typeface="Calibri" panose="020F0502020204030204" pitchFamily="34" charset="0"/>
+                <a:cs typeface="Times New Roman" panose="02020603050405020304" pitchFamily="18" charset="0"/>
+              </a:rPr>
+              <a:t> (</a:t>
             </a:r>
             <a:r>
               <a:rPr lang="en-US" dirty="0">
@@ -9807,7 +9815,15 @@
                 <a:ea typeface="Calibri" panose="020F0502020204030204" pitchFamily="34" charset="0"/>
                 <a:cs typeface="Times New Roman" panose="02020603050405020304" pitchFamily="18" charset="0"/>
               </a:rPr>
-              <a:t>'OK'</a:t>
+              <a:t>'KS', 'MO'</a:t>
+            </a:r>
+            <a:r>
+              <a:rPr lang="en-US" dirty="0">
+                <a:latin typeface="Consolas" panose="020B0609020204030204" pitchFamily="49" charset="0"/>
+                <a:ea typeface="Calibri" panose="020F0502020204030204" pitchFamily="34" charset="0"/>
+                <a:cs typeface="Times New Roman" panose="02020603050405020304" pitchFamily="18" charset="0"/>
+              </a:rPr>
+              <a:t>)</a:t>
             </a:r>
             <a:endParaRPr lang="en-US" sz="2400" dirty="0">
               <a:latin typeface="Calibri" panose="020F0502020204030204" pitchFamily="34" charset="0"/>
@@ -11012,30 +11028,33 @@
             </a:r>
             <a:r>
               <a:rPr lang="en-US" dirty="0">
-                <a:latin typeface="Consolas" panose="020B0609020204030204" pitchFamily="49" charset="0"/>
-                <a:ea typeface="Calibri" panose="020F0502020204030204" pitchFamily="34" charset="0"/>
-                <a:cs typeface="Times New Roman" panose="02020603050405020304" pitchFamily="18" charset="0"/>
-              </a:rPr>
-              <a:t> </a:t>
-            </a:r>
-            <a:r>
-              <a:rPr lang="en-US" dirty="0">
-                <a:solidFill>
-                  <a:srgbClr val="808080"/>
-                </a:solidFill>
-                <a:latin typeface="Consolas" panose="020B0609020204030204" pitchFamily="49" charset="0"/>
-                <a:ea typeface="Calibri" panose="020F0502020204030204" pitchFamily="34" charset="0"/>
-                <a:cs typeface="Times New Roman" panose="02020603050405020304" pitchFamily="18" charset="0"/>
-              </a:rPr>
-              <a:t>=</a:t>
-            </a:r>
-            <a:r>
-              <a:rPr lang="en-US" dirty="0">
-                <a:latin typeface="Consolas" panose="020B0609020204030204" pitchFamily="49" charset="0"/>
-                <a:ea typeface="Calibri" panose="020F0502020204030204" pitchFamily="34" charset="0"/>
-                <a:cs typeface="Times New Roman" panose="02020603050405020304" pitchFamily="18" charset="0"/>
-              </a:rPr>
-              <a:t> </a:t>
+                <a:solidFill>
+                  <a:srgbClr val="0000FF"/>
+                </a:solidFill>
+                <a:latin typeface="Consolas" panose="020B0609020204030204" pitchFamily="49" charset="0"/>
+                <a:ea typeface="Calibri" panose="020F0502020204030204" pitchFamily="34" charset="0"/>
+                <a:cs typeface="Times New Roman" panose="02020603050405020304" pitchFamily="18" charset="0"/>
+              </a:rPr>
+              <a:t> </a:t>
+            </a:r>
+            <a:r>
+              <a:rPr lang="en-US" dirty="0">
+                <a:solidFill>
+                  <a:srgbClr val="808080"/>
+                </a:solidFill>
+                <a:latin typeface="Consolas" panose="020B0609020204030204" pitchFamily="49" charset="0"/>
+                <a:ea typeface="Calibri" panose="020F0502020204030204" pitchFamily="34" charset="0"/>
+                <a:cs typeface="Times New Roman" panose="02020603050405020304" pitchFamily="18" charset="0"/>
+              </a:rPr>
+              <a:t>in</a:t>
+            </a:r>
+            <a:r>
+              <a:rPr lang="en-US" dirty="0">
+                <a:latin typeface="Consolas" panose="020B0609020204030204" pitchFamily="49" charset="0"/>
+                <a:ea typeface="Calibri" panose="020F0502020204030204" pitchFamily="34" charset="0"/>
+                <a:cs typeface="Times New Roman" panose="02020603050405020304" pitchFamily="18" charset="0"/>
+              </a:rPr>
+              <a:t> (</a:t>
             </a:r>
             <a:r>
               <a:rPr lang="en-US" dirty="0">
@@ -11046,13 +11065,16 @@
                 <a:ea typeface="Calibri" panose="020F0502020204030204" pitchFamily="34" charset="0"/>
                 <a:cs typeface="Times New Roman" panose="02020603050405020304" pitchFamily="18" charset="0"/>
               </a:rPr>
-              <a:t>'OK'</a:t>
-            </a:r>
-            <a:endParaRPr lang="en-US" sz="2400" dirty="0">
-              <a:latin typeface="Calibri" panose="020F0502020204030204" pitchFamily="34" charset="0"/>
-              <a:ea typeface="Calibri" panose="020F0502020204030204" pitchFamily="34" charset="0"/>
-              <a:cs typeface="Times New Roman" panose="02020603050405020304" pitchFamily="18" charset="0"/>
-            </a:endParaRPr>
+              <a:t>'KS', 'MO'</a:t>
+            </a:r>
+            <a:r>
+              <a:rPr lang="en-US" dirty="0">
+                <a:latin typeface="Consolas" panose="020B0609020204030204" pitchFamily="49" charset="0"/>
+                <a:ea typeface="Calibri" panose="020F0502020204030204" pitchFamily="34" charset="0"/>
+                <a:cs typeface="Times New Roman" panose="02020603050405020304" pitchFamily="18" charset="0"/>
+              </a:rPr>
+              <a:t>)</a:t>
+            </a:r>
           </a:p>
           <a:p>
             <a:pPr>
@@ -12225,15 +12247,15 @@
                 <a:ea typeface="Calibri" panose="020F0502020204030204" pitchFamily="34" charset="0"/>
                 <a:cs typeface="Times New Roman" panose="02020603050405020304" pitchFamily="18" charset="0"/>
               </a:rPr>
-              <a:t>=</a:t>
-            </a:r>
-            <a:r>
-              <a:rPr lang="en-US" dirty="0">
-                <a:latin typeface="Consolas" panose="020B0609020204030204" pitchFamily="49" charset="0"/>
-                <a:ea typeface="Calibri" panose="020F0502020204030204" pitchFamily="34" charset="0"/>
-                <a:cs typeface="Times New Roman" panose="02020603050405020304" pitchFamily="18" charset="0"/>
-              </a:rPr>
-              <a:t> </a:t>
+              <a:t>in</a:t>
+            </a:r>
+            <a:r>
+              <a:rPr lang="en-US" dirty="0">
+                <a:latin typeface="Consolas" panose="020B0609020204030204" pitchFamily="49" charset="0"/>
+                <a:ea typeface="Calibri" panose="020F0502020204030204" pitchFamily="34" charset="0"/>
+                <a:cs typeface="Times New Roman" panose="02020603050405020304" pitchFamily="18" charset="0"/>
+              </a:rPr>
+              <a:t> (</a:t>
             </a:r>
             <a:r>
               <a:rPr lang="en-US" dirty="0">
@@ -12244,7 +12266,15 @@
                 <a:ea typeface="Calibri" panose="020F0502020204030204" pitchFamily="34" charset="0"/>
                 <a:cs typeface="Times New Roman" panose="02020603050405020304" pitchFamily="18" charset="0"/>
               </a:rPr>
-              <a:t>'OK'</a:t>
+              <a:t>'KS', 'MO'</a:t>
+            </a:r>
+            <a:r>
+              <a:rPr lang="en-US" dirty="0">
+                <a:latin typeface="Consolas" panose="020B0609020204030204" pitchFamily="49" charset="0"/>
+                <a:ea typeface="Calibri" panose="020F0502020204030204" pitchFamily="34" charset="0"/>
+                <a:cs typeface="Times New Roman" panose="02020603050405020304" pitchFamily="18" charset="0"/>
+              </a:rPr>
+              <a:t>)</a:t>
             </a:r>
             <a:endParaRPr lang="en-US" sz="2400" dirty="0">
               <a:latin typeface="Calibri" panose="020F0502020204030204" pitchFamily="34" charset="0"/>
@@ -13436,15 +13466,15 @@
                 <a:ea typeface="Calibri" panose="020F0502020204030204" pitchFamily="34" charset="0"/>
                 <a:cs typeface="Times New Roman" panose="02020603050405020304" pitchFamily="18" charset="0"/>
               </a:rPr>
-              <a:t>=</a:t>
-            </a:r>
-            <a:r>
-              <a:rPr lang="en-US" dirty="0">
-                <a:latin typeface="Consolas" panose="020B0609020204030204" pitchFamily="49" charset="0"/>
-                <a:ea typeface="Calibri" panose="020F0502020204030204" pitchFamily="34" charset="0"/>
-                <a:cs typeface="Times New Roman" panose="02020603050405020304" pitchFamily="18" charset="0"/>
-              </a:rPr>
-              <a:t> </a:t>
+              <a:t>in</a:t>
+            </a:r>
+            <a:r>
+              <a:rPr lang="en-US" dirty="0">
+                <a:latin typeface="Consolas" panose="020B0609020204030204" pitchFamily="49" charset="0"/>
+                <a:ea typeface="Calibri" panose="020F0502020204030204" pitchFamily="34" charset="0"/>
+                <a:cs typeface="Times New Roman" panose="02020603050405020304" pitchFamily="18" charset="0"/>
+              </a:rPr>
+              <a:t> (</a:t>
             </a:r>
             <a:r>
               <a:rPr lang="en-US" dirty="0">
@@ -13455,7 +13485,15 @@
                 <a:ea typeface="Calibri" panose="020F0502020204030204" pitchFamily="34" charset="0"/>
                 <a:cs typeface="Times New Roman" panose="02020603050405020304" pitchFamily="18" charset="0"/>
               </a:rPr>
-              <a:t>'OK'</a:t>
+              <a:t>'KS', 'MO'</a:t>
+            </a:r>
+            <a:r>
+              <a:rPr lang="en-US" dirty="0">
+                <a:latin typeface="Consolas" panose="020B0609020204030204" pitchFamily="49" charset="0"/>
+                <a:ea typeface="Calibri" panose="020F0502020204030204" pitchFamily="34" charset="0"/>
+                <a:cs typeface="Times New Roman" panose="02020603050405020304" pitchFamily="18" charset="0"/>
+              </a:rPr>
+              <a:t>)</a:t>
             </a:r>
             <a:endParaRPr lang="en-US" sz="2400" dirty="0">
               <a:latin typeface="Calibri" panose="020F0502020204030204" pitchFamily="34" charset="0"/>
@@ -14668,7 +14706,7 @@
                 <a:ea typeface="Calibri" panose="020F0502020204030204" pitchFamily="34" charset="0"/>
                 <a:cs typeface="Times New Roman" panose="02020603050405020304" pitchFamily="18" charset="0"/>
               </a:rPr>
-              <a:t> = 'OK'</a:t>
+              <a:t> in ('KS', 'MO')</a:t>
             </a:r>
           </a:p>
           <a:p>
@@ -15009,7 +15047,7 @@
             </a:pPr>
             <a:r>
               <a:rPr lang="en-US" sz="3000" dirty="0"/>
-              <a:t>Find rows in R4 where State = ‘OK’</a:t>
+              <a:t>Find rows in R4 where State = ‘KS’ or ‘MO’</a:t>
             </a:r>
           </a:p>
           <a:p>
@@ -15019,7 +15057,7 @@
             </a:pPr>
             <a:r>
               <a:rPr lang="en-US" sz="3000" dirty="0"/>
-              <a:t>Result is 8,612 rows / 14 columns</a:t>
+              <a:t>Result is 19,805 rows / 14 columns</a:t>
             </a:r>
           </a:p>
           <a:p>
@@ -15892,15 +15930,15 @@
                 <a:ea typeface="Calibri" panose="020F0502020204030204" pitchFamily="34" charset="0"/>
                 <a:cs typeface="Times New Roman" panose="02020603050405020304" pitchFamily="18" charset="0"/>
               </a:rPr>
-              <a:t>=</a:t>
-            </a:r>
-            <a:r>
-              <a:rPr lang="en-US" dirty="0">
-                <a:latin typeface="Consolas" panose="020B0609020204030204" pitchFamily="49" charset="0"/>
-                <a:ea typeface="Calibri" panose="020F0502020204030204" pitchFamily="34" charset="0"/>
-                <a:cs typeface="Times New Roman" panose="02020603050405020304" pitchFamily="18" charset="0"/>
-              </a:rPr>
-              <a:t> </a:t>
+              <a:t>in</a:t>
+            </a:r>
+            <a:r>
+              <a:rPr lang="en-US" dirty="0">
+                <a:latin typeface="Consolas" panose="020B0609020204030204" pitchFamily="49" charset="0"/>
+                <a:ea typeface="Calibri" panose="020F0502020204030204" pitchFamily="34" charset="0"/>
+                <a:cs typeface="Times New Roman" panose="02020603050405020304" pitchFamily="18" charset="0"/>
+              </a:rPr>
+              <a:t> (</a:t>
             </a:r>
             <a:r>
               <a:rPr lang="en-US" dirty="0">
@@ -15911,7 +15949,15 @@
                 <a:ea typeface="Calibri" panose="020F0502020204030204" pitchFamily="34" charset="0"/>
                 <a:cs typeface="Times New Roman" panose="02020603050405020304" pitchFamily="18" charset="0"/>
               </a:rPr>
-              <a:t>'OK'</a:t>
+              <a:t>'KS', 'MO'</a:t>
+            </a:r>
+            <a:r>
+              <a:rPr lang="en-US" dirty="0">
+                <a:latin typeface="Consolas" panose="020B0609020204030204" pitchFamily="49" charset="0"/>
+                <a:ea typeface="Calibri" panose="020F0502020204030204" pitchFamily="34" charset="0"/>
+                <a:cs typeface="Times New Roman" panose="02020603050405020304" pitchFamily="18" charset="0"/>
+              </a:rPr>
+              <a:t>)</a:t>
             </a:r>
             <a:endParaRPr lang="en-US" sz="2400" dirty="0">
               <a:latin typeface="Calibri" panose="020F0502020204030204" pitchFamily="34" charset="0"/>
@@ -16245,7 +16291,7 @@
             </a:pPr>
             <a:r>
               <a:rPr lang="en-US" sz="3000" dirty="0"/>
-              <a:t>Result is 4,409 rows / 2 columns</a:t>
+              <a:t>Result is 6,464 rows / 2 columns</a:t>
             </a:r>
           </a:p>
           <a:p>
@@ -17140,15 +17186,15 @@
                 <a:ea typeface="Calibri" panose="020F0502020204030204" pitchFamily="34" charset="0"/>
                 <a:cs typeface="Times New Roman" panose="02020603050405020304" pitchFamily="18" charset="0"/>
               </a:rPr>
-              <a:t>=</a:t>
-            </a:r>
-            <a:r>
-              <a:rPr lang="en-US" dirty="0">
-                <a:latin typeface="Consolas" panose="020B0609020204030204" pitchFamily="49" charset="0"/>
-                <a:ea typeface="Calibri" panose="020F0502020204030204" pitchFamily="34" charset="0"/>
-                <a:cs typeface="Times New Roman" panose="02020603050405020304" pitchFamily="18" charset="0"/>
-              </a:rPr>
-              <a:t> </a:t>
+              <a:t>in</a:t>
+            </a:r>
+            <a:r>
+              <a:rPr lang="en-US" dirty="0">
+                <a:latin typeface="Consolas" panose="020B0609020204030204" pitchFamily="49" charset="0"/>
+                <a:ea typeface="Calibri" panose="020F0502020204030204" pitchFamily="34" charset="0"/>
+                <a:cs typeface="Times New Roman" panose="02020603050405020304" pitchFamily="18" charset="0"/>
+              </a:rPr>
+              <a:t> (</a:t>
             </a:r>
             <a:r>
               <a:rPr lang="en-US" dirty="0">
@@ -17159,7 +17205,15 @@
                 <a:ea typeface="Calibri" panose="020F0502020204030204" pitchFamily="34" charset="0"/>
                 <a:cs typeface="Times New Roman" panose="02020603050405020304" pitchFamily="18" charset="0"/>
               </a:rPr>
-              <a:t>'OK'</a:t>
+              <a:t>'KS', 'MO'</a:t>
+            </a:r>
+            <a:r>
+              <a:rPr lang="en-US" dirty="0">
+                <a:latin typeface="Consolas" panose="020B0609020204030204" pitchFamily="49" charset="0"/>
+                <a:ea typeface="Calibri" panose="020F0502020204030204" pitchFamily="34" charset="0"/>
+                <a:cs typeface="Times New Roman" panose="02020603050405020304" pitchFamily="18" charset="0"/>
+              </a:rPr>
+              <a:t>)</a:t>
             </a:r>
             <a:endParaRPr lang="en-US" sz="2400" dirty="0">
               <a:latin typeface="Calibri" panose="020F0502020204030204" pitchFamily="34" charset="0"/>
@@ -17440,7 +17494,7 @@
             </a:pPr>
             <a:r>
               <a:rPr lang="en-US" sz="3000" dirty="0"/>
-              <a:t>Result is 39 rows / 2 columns</a:t>
+              <a:t>Result is 123 rows / 2 columns</a:t>
             </a:r>
           </a:p>
           <a:p>
@@ -19247,15 +19301,15 @@
                 <a:ea typeface="Calibri" panose="020F0502020204030204" pitchFamily="34" charset="0"/>
                 <a:cs typeface="Times New Roman" panose="02020603050405020304" pitchFamily="18" charset="0"/>
               </a:rPr>
-              <a:t>=</a:t>
-            </a:r>
-            <a:r>
-              <a:rPr lang="en-US" dirty="0">
-                <a:latin typeface="Consolas" panose="020B0609020204030204" pitchFamily="49" charset="0"/>
-                <a:ea typeface="Calibri" panose="020F0502020204030204" pitchFamily="34" charset="0"/>
-                <a:cs typeface="Times New Roman" panose="02020603050405020304" pitchFamily="18" charset="0"/>
-              </a:rPr>
-              <a:t> </a:t>
+              <a:t>in</a:t>
+            </a:r>
+            <a:r>
+              <a:rPr lang="en-US" dirty="0">
+                <a:latin typeface="Consolas" panose="020B0609020204030204" pitchFamily="49" charset="0"/>
+                <a:ea typeface="Calibri" panose="020F0502020204030204" pitchFamily="34" charset="0"/>
+                <a:cs typeface="Times New Roman" panose="02020603050405020304" pitchFamily="18" charset="0"/>
+              </a:rPr>
+              <a:t> (</a:t>
             </a:r>
             <a:r>
               <a:rPr lang="en-US" dirty="0">
@@ -19266,7 +19320,15 @@
                 <a:ea typeface="Calibri" panose="020F0502020204030204" pitchFamily="34" charset="0"/>
                 <a:cs typeface="Times New Roman" panose="02020603050405020304" pitchFamily="18" charset="0"/>
               </a:rPr>
-              <a:t>'OK'</a:t>
+              <a:t>'KS', 'MO'</a:t>
+            </a:r>
+            <a:r>
+              <a:rPr lang="en-US" dirty="0">
+                <a:latin typeface="Consolas" panose="020B0609020204030204" pitchFamily="49" charset="0"/>
+                <a:ea typeface="Calibri" panose="020F0502020204030204" pitchFamily="34" charset="0"/>
+                <a:cs typeface="Times New Roman" panose="02020603050405020304" pitchFamily="18" charset="0"/>
+              </a:rPr>
+              <a:t>)</a:t>
             </a:r>
             <a:endParaRPr lang="en-US" sz="2400" dirty="0">
               <a:latin typeface="Calibri" panose="020F0502020204030204" pitchFamily="34" charset="0"/>
@@ -20544,15 +20606,15 @@
                 <a:ea typeface="Calibri" panose="020F0502020204030204" pitchFamily="34" charset="0"/>
                 <a:cs typeface="Times New Roman" panose="02020603050405020304" pitchFamily="18" charset="0"/>
               </a:rPr>
-              <a:t>=</a:t>
-            </a:r>
-            <a:r>
-              <a:rPr lang="en-US" dirty="0">
-                <a:latin typeface="Consolas" panose="020B0609020204030204" pitchFamily="49" charset="0"/>
-                <a:ea typeface="Calibri" panose="020F0502020204030204" pitchFamily="34" charset="0"/>
-                <a:cs typeface="Times New Roman" panose="02020603050405020304" pitchFamily="18" charset="0"/>
-              </a:rPr>
-              <a:t> </a:t>
+              <a:t>in</a:t>
+            </a:r>
+            <a:r>
+              <a:rPr lang="en-US" dirty="0">
+                <a:latin typeface="Consolas" panose="020B0609020204030204" pitchFamily="49" charset="0"/>
+                <a:ea typeface="Calibri" panose="020F0502020204030204" pitchFamily="34" charset="0"/>
+                <a:cs typeface="Times New Roman" panose="02020603050405020304" pitchFamily="18" charset="0"/>
+              </a:rPr>
+              <a:t> (</a:t>
             </a:r>
             <a:r>
               <a:rPr lang="en-US" dirty="0">
@@ -20563,7 +20625,15 @@
                 <a:ea typeface="Calibri" panose="020F0502020204030204" pitchFamily="34" charset="0"/>
                 <a:cs typeface="Times New Roman" panose="02020603050405020304" pitchFamily="18" charset="0"/>
               </a:rPr>
-              <a:t>'OK'</a:t>
+              <a:t>'KS', 'MO'</a:t>
+            </a:r>
+            <a:r>
+              <a:rPr lang="en-US" dirty="0">
+                <a:latin typeface="Consolas" panose="020B0609020204030204" pitchFamily="49" charset="0"/>
+                <a:ea typeface="Calibri" panose="020F0502020204030204" pitchFamily="34" charset="0"/>
+                <a:cs typeface="Times New Roman" panose="02020603050405020304" pitchFamily="18" charset="0"/>
+              </a:rPr>
+              <a:t>)</a:t>
             </a:r>
             <a:endParaRPr lang="en-US" sz="2400" dirty="0">
               <a:latin typeface="Calibri" panose="020F0502020204030204" pitchFamily="34" charset="0"/>
@@ -21758,15 +21828,15 @@
                 <a:ea typeface="Calibri" panose="020F0502020204030204" pitchFamily="34" charset="0"/>
                 <a:cs typeface="Times New Roman" panose="02020603050405020304" pitchFamily="18" charset="0"/>
               </a:rPr>
-              <a:t>=</a:t>
-            </a:r>
-            <a:r>
-              <a:rPr lang="en-US" dirty="0">
-                <a:latin typeface="Consolas" panose="020B0609020204030204" pitchFamily="49" charset="0"/>
-                <a:ea typeface="Calibri" panose="020F0502020204030204" pitchFamily="34" charset="0"/>
-                <a:cs typeface="Times New Roman" panose="02020603050405020304" pitchFamily="18" charset="0"/>
-              </a:rPr>
-              <a:t> </a:t>
+              <a:t>in</a:t>
+            </a:r>
+            <a:r>
+              <a:rPr lang="en-US" dirty="0">
+                <a:latin typeface="Consolas" panose="020B0609020204030204" pitchFamily="49" charset="0"/>
+                <a:ea typeface="Calibri" panose="020F0502020204030204" pitchFamily="34" charset="0"/>
+                <a:cs typeface="Times New Roman" panose="02020603050405020304" pitchFamily="18" charset="0"/>
+              </a:rPr>
+              <a:t> (</a:t>
             </a:r>
             <a:r>
               <a:rPr lang="en-US" dirty="0">
@@ -21777,7 +21847,15 @@
                 <a:ea typeface="Calibri" panose="020F0502020204030204" pitchFamily="34" charset="0"/>
                 <a:cs typeface="Times New Roman" panose="02020603050405020304" pitchFamily="18" charset="0"/>
               </a:rPr>
-              <a:t>'OK'</a:t>
+              <a:t>'KS', 'MO'</a:t>
+            </a:r>
+            <a:r>
+              <a:rPr lang="en-US" dirty="0">
+                <a:latin typeface="Consolas" panose="020B0609020204030204" pitchFamily="49" charset="0"/>
+                <a:ea typeface="Calibri" panose="020F0502020204030204" pitchFamily="34" charset="0"/>
+                <a:cs typeface="Times New Roman" panose="02020603050405020304" pitchFamily="18" charset="0"/>
+              </a:rPr>
+              <a:t>)</a:t>
             </a:r>
             <a:endParaRPr lang="en-US" sz="2400" dirty="0">
               <a:latin typeface="Calibri" panose="020F0502020204030204" pitchFamily="34" charset="0"/>
@@ -22853,15 +22931,15 @@
                 <a:ea typeface="Calibri" panose="020F0502020204030204" pitchFamily="34" charset="0"/>
                 <a:cs typeface="Times New Roman" panose="02020603050405020304" pitchFamily="18" charset="0"/>
               </a:rPr>
-              <a:t>=</a:t>
-            </a:r>
-            <a:r>
-              <a:rPr lang="en-US" dirty="0">
-                <a:latin typeface="Consolas" panose="020B0609020204030204" pitchFamily="49" charset="0"/>
-                <a:ea typeface="Calibri" panose="020F0502020204030204" pitchFamily="34" charset="0"/>
-                <a:cs typeface="Times New Roman" panose="02020603050405020304" pitchFamily="18" charset="0"/>
-              </a:rPr>
-              <a:t> </a:t>
+              <a:t>in</a:t>
+            </a:r>
+            <a:r>
+              <a:rPr lang="en-US" dirty="0">
+                <a:latin typeface="Consolas" panose="020B0609020204030204" pitchFamily="49" charset="0"/>
+                <a:ea typeface="Calibri" panose="020F0502020204030204" pitchFamily="34" charset="0"/>
+                <a:cs typeface="Times New Roman" panose="02020603050405020304" pitchFamily="18" charset="0"/>
+              </a:rPr>
+              <a:t> (</a:t>
             </a:r>
             <a:r>
               <a:rPr lang="en-US" dirty="0">
@@ -22872,7 +22950,15 @@
                 <a:ea typeface="Calibri" panose="020F0502020204030204" pitchFamily="34" charset="0"/>
                 <a:cs typeface="Times New Roman" panose="02020603050405020304" pitchFamily="18" charset="0"/>
               </a:rPr>
-              <a:t>'OK'</a:t>
+              <a:t>'KS', 'MO'</a:t>
+            </a:r>
+            <a:r>
+              <a:rPr lang="en-US" dirty="0">
+                <a:latin typeface="Consolas" panose="020B0609020204030204" pitchFamily="49" charset="0"/>
+                <a:ea typeface="Calibri" panose="020F0502020204030204" pitchFamily="34" charset="0"/>
+                <a:cs typeface="Times New Roman" panose="02020603050405020304" pitchFamily="18" charset="0"/>
+              </a:rPr>
+              <a:t>)</a:t>
             </a:r>
             <a:endParaRPr lang="en-US" sz="2400" dirty="0">
               <a:latin typeface="Calibri" panose="020F0502020204030204" pitchFamily="34" charset="0"/>
@@ -24088,7 +24174,7 @@
                 <a:ea typeface="Calibri" panose="020F0502020204030204" pitchFamily="34" charset="0"/>
                 <a:cs typeface="Times New Roman" panose="02020603050405020304" pitchFamily="18" charset="0"/>
               </a:rPr>
-              <a:t>=</a:t>
+              <a:t>in</a:t>
             </a:r>
             <a:r>
               <a:rPr lang="en-US" sz="1400" dirty="0">
@@ -24096,7 +24182,7 @@
                 <a:ea typeface="Calibri" panose="020F0502020204030204" pitchFamily="34" charset="0"/>
                 <a:cs typeface="Times New Roman" panose="02020603050405020304" pitchFamily="18" charset="0"/>
               </a:rPr>
-              <a:t> </a:t>
+              <a:t> (</a:t>
             </a:r>
             <a:r>
               <a:rPr lang="en-US" sz="1400" dirty="0">
@@ -24107,7 +24193,15 @@
                 <a:ea typeface="Calibri" panose="020F0502020204030204" pitchFamily="34" charset="0"/>
                 <a:cs typeface="Times New Roman" panose="02020603050405020304" pitchFamily="18" charset="0"/>
               </a:rPr>
-              <a:t>'OK'</a:t>
+              <a:t>'KS', 'MO'</a:t>
+            </a:r>
+            <a:r>
+              <a:rPr lang="en-US" sz="1400" dirty="0">
+                <a:latin typeface="Consolas" panose="020B0609020204030204" pitchFamily="49" charset="0"/>
+                <a:ea typeface="Calibri" panose="020F0502020204030204" pitchFamily="34" charset="0"/>
+                <a:cs typeface="Times New Roman" panose="02020603050405020304" pitchFamily="18" charset="0"/>
+              </a:rPr>
+              <a:t>)</a:t>
             </a:r>
             <a:endParaRPr lang="en-US" dirty="0">
               <a:latin typeface="Calibri" panose="020F0502020204030204" pitchFamily="34" charset="0"/>
@@ -24645,7 +24739,7 @@
       </p:sp>
       <p:pic>
         <p:nvPicPr>
-          <p:cNvPr id="4" name="Picture 3"/>
+          <p:cNvPr id="3" name="Picture 2"/>
           <p:cNvPicPr>
             <a:picLocks noChangeAspect="1"/>
           </p:cNvPicPr>
@@ -24659,8 +24753,8 @@
         </p:blipFill>
         <p:spPr>
           <a:xfrm>
-            <a:off x="3247268" y="542942"/>
-            <a:ext cx="5439532" cy="5681438"/>
+            <a:off x="3246120" y="539496"/>
+            <a:ext cx="5428419" cy="5678424"/>
           </a:xfrm>
           <a:prstGeom prst="rect">
             <a:avLst/>
@@ -28258,17 +28352,18 @@
                   <a:srgbClr val="808080"/>
                 </a:solidFill>
                 <a:latin typeface="Consolas" panose="020B0609020204030204" pitchFamily="49" charset="0"/>
-              </a:rPr>
-              <a:t>=</a:t>
+                <a:ea typeface="Calibri" panose="020F0502020204030204" pitchFamily="34" charset="0"/>
+                <a:cs typeface="Times New Roman" panose="02020603050405020304" pitchFamily="18" charset="0"/>
+              </a:rPr>
+              <a:t>in</a:t>
             </a:r>
             <a:r>
               <a:rPr lang="en-US" sz="1600" dirty="0">
-                <a:solidFill>
-                  <a:prstClr val="black"/>
-                </a:solidFill>
-                <a:latin typeface="Consolas" panose="020B0609020204030204" pitchFamily="49" charset="0"/>
-              </a:rPr>
-              <a:t> </a:t>
+                <a:latin typeface="Consolas" panose="020B0609020204030204" pitchFamily="49" charset="0"/>
+                <a:ea typeface="Calibri" panose="020F0502020204030204" pitchFamily="34" charset="0"/>
+                <a:cs typeface="Times New Roman" panose="02020603050405020304" pitchFamily="18" charset="0"/>
+              </a:rPr>
+              <a:t> (</a:t>
             </a:r>
             <a:r>
               <a:rPr lang="en-US" sz="1600" dirty="0">
@@ -28276,8 +28371,18 @@
                   <a:srgbClr val="FF0000"/>
                 </a:solidFill>
                 <a:latin typeface="Consolas" panose="020B0609020204030204" pitchFamily="49" charset="0"/>
-              </a:rPr>
-              <a:t>'OK'</a:t>
+                <a:ea typeface="Calibri" panose="020F0502020204030204" pitchFamily="34" charset="0"/>
+                <a:cs typeface="Times New Roman" panose="02020603050405020304" pitchFamily="18" charset="0"/>
+              </a:rPr>
+              <a:t>'KS', 'MO'</a:t>
+            </a:r>
+            <a:r>
+              <a:rPr lang="en-US" sz="1600" dirty="0">
+                <a:latin typeface="Consolas" panose="020B0609020204030204" pitchFamily="49" charset="0"/>
+                <a:ea typeface="Calibri" panose="020F0502020204030204" pitchFamily="34" charset="0"/>
+                <a:cs typeface="Times New Roman" panose="02020603050405020304" pitchFamily="18" charset="0"/>
+              </a:rPr>
+              <a:t>)</a:t>
             </a:r>
             <a:endParaRPr lang="en-US" sz="1600" dirty="0">
               <a:solidFill>
@@ -37285,17 +37390,18 @@
                   <a:srgbClr val="808080"/>
                 </a:solidFill>
                 <a:latin typeface="Consolas" panose="020B0609020204030204" pitchFamily="49" charset="0"/>
-              </a:rPr>
-              <a:t>=</a:t>
+                <a:ea typeface="Calibri" panose="020F0502020204030204" pitchFamily="34" charset="0"/>
+                <a:cs typeface="Times New Roman" panose="02020603050405020304" pitchFamily="18" charset="0"/>
+              </a:rPr>
+              <a:t>in</a:t>
             </a:r>
             <a:r>
               <a:rPr lang="en-US" sz="1400" dirty="0">
-                <a:solidFill>
-                  <a:prstClr val="black"/>
-                </a:solidFill>
-                <a:latin typeface="Consolas" panose="020B0609020204030204" pitchFamily="49" charset="0"/>
-              </a:rPr>
-              <a:t> </a:t>
+                <a:latin typeface="Consolas" panose="020B0609020204030204" pitchFamily="49" charset="0"/>
+                <a:ea typeface="Calibri" panose="020F0502020204030204" pitchFamily="34" charset="0"/>
+                <a:cs typeface="Times New Roman" panose="02020603050405020304" pitchFamily="18" charset="0"/>
+              </a:rPr>
+              <a:t> (</a:t>
             </a:r>
             <a:r>
               <a:rPr lang="en-US" sz="1400" dirty="0">
@@ -37303,8 +37409,18 @@
                   <a:srgbClr val="FF0000"/>
                 </a:solidFill>
                 <a:latin typeface="Consolas" panose="020B0609020204030204" pitchFamily="49" charset="0"/>
-              </a:rPr>
-              <a:t>'OK'</a:t>
+                <a:ea typeface="Calibri" panose="020F0502020204030204" pitchFamily="34" charset="0"/>
+                <a:cs typeface="Times New Roman" panose="02020603050405020304" pitchFamily="18" charset="0"/>
+              </a:rPr>
+              <a:t>'KS', 'MO'</a:t>
+            </a:r>
+            <a:r>
+              <a:rPr lang="en-US" sz="1400" dirty="0">
+                <a:latin typeface="Consolas" panose="020B0609020204030204" pitchFamily="49" charset="0"/>
+                <a:ea typeface="Calibri" panose="020F0502020204030204" pitchFamily="34" charset="0"/>
+                <a:cs typeface="Times New Roman" panose="02020603050405020304" pitchFamily="18" charset="0"/>
+              </a:rPr>
+              <a:t>)</a:t>
             </a:r>
             <a:endParaRPr lang="en-US" sz="1400" dirty="0">
               <a:solidFill>
@@ -37610,7 +37726,7 @@
       </p:sp>
       <p:pic>
         <p:nvPicPr>
-          <p:cNvPr id="4" name="Picture 3"/>
+          <p:cNvPr id="3" name="Picture 2"/>
           <p:cNvPicPr>
             <a:picLocks noChangeAspect="1"/>
           </p:cNvPicPr>
@@ -37624,8 +37740,8 @@
         </p:blipFill>
         <p:spPr>
           <a:xfrm>
-            <a:off x="3247268" y="542942"/>
-            <a:ext cx="5439532" cy="5681438"/>
+            <a:off x="3246120" y="539496"/>
+            <a:ext cx="5428419" cy="5678424"/>
           </a:xfrm>
           <a:prstGeom prst="rect">
             <a:avLst/>

</xml_diff>

<commit_message>
Update slides and scripts for Minnesota presentation.
</commit_message>
<xml_diff>
--- a/Optimizer.pptx
+++ b/Optimizer.pptx
@@ -272,7 +272,7 @@
           <a:p>
             <a:fld id="{2EDCB34D-5EC2-4739-9693-E425457AC201}" type="datetimeFigureOut">
               <a:rPr lang="en-US" smtClean="0"/>
-              <a:t>09/14/2016</a:t>
+              <a:t>09/26/2016</a:t>
             </a:fld>
             <a:endParaRPr lang="en-US"/>
           </a:p>
@@ -3112,7 +3112,7 @@
             <a:fld id="{5942B21B-2ADA-A040-A652-A7305E1B99FE}" type="datetimeFigureOut">
               <a:rPr lang="en-US" smtClean="0"/>
               <a:pPr/>
-              <a:t>09/14/2016</a:t>
+              <a:t>09/26/2016</a:t>
             </a:fld>
             <a:endParaRPr lang="en-US" dirty="0"/>
           </a:p>
@@ -3302,7 +3302,7 @@
           <a:p>
             <a:fld id="{5942B21B-2ADA-A040-A652-A7305E1B99FE}" type="datetimeFigureOut">
               <a:rPr lang="en-US" smtClean="0"/>
-              <a:t>09/14/2016</a:t>
+              <a:t>09/26/2016</a:t>
             </a:fld>
             <a:endParaRPr lang="en-US"/>
           </a:p>
@@ -3426,7 +3426,7 @@
             <a:fld id="{5942B21B-2ADA-A040-A652-A7305E1B99FE}" type="datetimeFigureOut">
               <a:rPr lang="en-US" smtClean="0"/>
               <a:pPr/>
-              <a:t>09/14/2016</a:t>
+              <a:t>09/26/2016</a:t>
             </a:fld>
             <a:r>
               <a:rPr lang="en-US"/>
@@ -3697,7 +3697,7 @@
             <a:fld id="{5942B21B-2ADA-A040-A652-A7305E1B99FE}" type="datetimeFigureOut">
               <a:rPr lang="en-US" smtClean="0"/>
               <a:pPr/>
-              <a:t>09/14/2016</a:t>
+              <a:t>09/26/2016</a:t>
             </a:fld>
             <a:r>
               <a:rPr lang="en-US" dirty="0"/>
@@ -3967,7 +3967,7 @@
             <a:fld id="{5942B21B-2ADA-A040-A652-A7305E1B99FE}" type="datetimeFigureOut">
               <a:rPr lang="en-US" smtClean="0"/>
               <a:pPr/>
-              <a:t>09/14/2016</a:t>
+              <a:t>09/26/2016</a:t>
             </a:fld>
             <a:r>
               <a:rPr lang="en-US" dirty="0"/>
@@ -4307,7 +4307,7 @@
             <a:fld id="{5942B21B-2ADA-A040-A652-A7305E1B99FE}" type="datetimeFigureOut">
               <a:rPr lang="en-US" smtClean="0"/>
               <a:pPr/>
-              <a:t>09/14/2016</a:t>
+              <a:t>09/26/2016</a:t>
             </a:fld>
             <a:r>
               <a:rPr lang="en-US" dirty="0"/>
@@ -4648,7 +4648,7 @@
             <a:fld id="{5942B21B-2ADA-A040-A652-A7305E1B99FE}" type="datetimeFigureOut">
               <a:rPr lang="en-US" smtClean="0"/>
               <a:pPr/>
-              <a:t>09/14/2016</a:t>
+              <a:t>09/26/2016</a:t>
             </a:fld>
             <a:r>
               <a:rPr lang="en-US" dirty="0"/>
@@ -5163,7 +5163,7 @@
             <a:fld id="{5942B21B-2ADA-A040-A652-A7305E1B99FE}" type="datetimeFigureOut">
               <a:rPr lang="en-US" smtClean="0"/>
               <a:pPr/>
-              <a:t>09/14/2016</a:t>
+              <a:t>09/26/2016</a:t>
             </a:fld>
             <a:r>
               <a:rPr lang="en-US" dirty="0"/>
@@ -5372,7 +5372,7 @@
             <a:fld id="{5942B21B-2ADA-A040-A652-A7305E1B99FE}" type="datetimeFigureOut">
               <a:rPr lang="en-US" smtClean="0"/>
               <a:pPr/>
-              <a:t>09/14/2016</a:t>
+              <a:t>09/26/2016</a:t>
             </a:fld>
             <a:r>
               <a:rPr lang="en-US" dirty="0"/>
@@ -5559,7 +5559,7 @@
             <a:fld id="{5942B21B-2ADA-A040-A652-A7305E1B99FE}" type="datetimeFigureOut">
               <a:rPr lang="en-US" smtClean="0"/>
               <a:pPr/>
-              <a:t>09/14/2016</a:t>
+              <a:t>09/26/2016</a:t>
             </a:fld>
             <a:r>
               <a:rPr lang="en-US" dirty="0"/>
@@ -5890,7 +5890,7 @@
             <a:fld id="{5942B21B-2ADA-A040-A652-A7305E1B99FE}" type="datetimeFigureOut">
               <a:rPr lang="en-US" smtClean="0"/>
               <a:pPr/>
-              <a:t>09/14/2016</a:t>
+              <a:t>09/26/2016</a:t>
             </a:fld>
             <a:r>
               <a:rPr lang="en-US" dirty="0"/>
@@ -6198,7 +6198,7 @@
             <a:fld id="{5942B21B-2ADA-A040-A652-A7305E1B99FE}" type="datetimeFigureOut">
               <a:rPr lang="en-US" smtClean="0"/>
               <a:pPr/>
-              <a:t>09/14/2016</a:t>
+              <a:t>09/26/2016</a:t>
             </a:fld>
             <a:r>
               <a:rPr lang="en-US" dirty="0"/>
@@ -6477,7 +6477,7 @@
             <a:fld id="{5942B21B-2ADA-A040-A652-A7305E1B99FE}" type="datetimeFigureOut">
               <a:rPr lang="en-US" smtClean="0"/>
               <a:pPr/>
-              <a:t>09/14/2016</a:t>
+              <a:t>09/26/2016</a:t>
             </a:fld>
             <a:r>
               <a:rPr lang="en-US" dirty="0"/>
@@ -6957,7 +6957,7 @@
         </p:spPr>
         <p:txBody>
           <a:bodyPr vert="horz" lIns="91440" tIns="45720" rIns="91440" bIns="45720" rtlCol="0">
-            <a:normAutofit fontScale="77500" lnSpcReduction="20000"/>
+            <a:normAutofit fontScale="85000" lnSpcReduction="10000"/>
           </a:bodyPr>
           <a:lstStyle>
             <a:lvl1pPr marL="342900" indent="-342900" algn="l" defTabSz="457200" rtl="0" eaLnBrk="1" latinLnBrk="0" hangingPunct="1">
@@ -7111,7 +7111,7 @@
             </a:pPr>
             <a:r>
               <a:rPr lang="en-US" dirty="0" smtClean="0"/>
-              <a:t>Kansas City, MO </a:t>
+              <a:t>Minneapolis, MN </a:t>
             </a:r>
             <a:r>
               <a:rPr lang="en-US" dirty="0"/>
@@ -7119,7 +7119,7 @@
             </a:r>
             <a:r>
               <a:rPr lang="en-US" dirty="0" smtClean="0"/>
-              <a:t>September 24, </a:t>
+              <a:t>October 1, </a:t>
             </a:r>
             <a:r>
               <a:rPr lang="en-US" dirty="0"/>
@@ -8301,18 +8301,18 @@
                 <a:ea typeface="Calibri" panose="020F0502020204030204" pitchFamily="34" charset="0"/>
                 <a:cs typeface="Times New Roman" panose="02020603050405020304" pitchFamily="18" charset="0"/>
               </a:rPr>
-              <a:t>in</a:t>
-            </a:r>
-            <a:r>
-              <a:rPr lang="en-US" dirty="0">
-                <a:latin typeface="Consolas" panose="020B0609020204030204" pitchFamily="49" charset="0"/>
-                <a:ea typeface="Calibri" panose="020F0502020204030204" pitchFamily="34" charset="0"/>
-                <a:cs typeface="Times New Roman" panose="02020603050405020304" pitchFamily="18" charset="0"/>
-              </a:rPr>
-              <a:t> (</a:t>
-            </a:r>
-            <a:r>
-              <a:rPr lang="en-US" dirty="0">
+              <a:t>=</a:t>
+            </a:r>
+            <a:r>
+              <a:rPr lang="en-US" dirty="0" smtClean="0">
+                <a:latin typeface="Consolas" panose="020B0609020204030204" pitchFamily="49" charset="0"/>
+                <a:ea typeface="Calibri" panose="020F0502020204030204" pitchFamily="34" charset="0"/>
+                <a:cs typeface="Times New Roman" panose="02020603050405020304" pitchFamily="18" charset="0"/>
+              </a:rPr>
+              <a:t> </a:t>
+            </a:r>
+            <a:r>
+              <a:rPr lang="en-US" dirty="0" smtClean="0">
                 <a:solidFill>
                   <a:srgbClr val="FF0000"/>
                 </a:solidFill>
@@ -8320,15 +8320,7 @@
                 <a:ea typeface="Calibri" panose="020F0502020204030204" pitchFamily="34" charset="0"/>
                 <a:cs typeface="Times New Roman" panose="02020603050405020304" pitchFamily="18" charset="0"/>
               </a:rPr>
-              <a:t>'KS', 'MO'</a:t>
-            </a:r>
-            <a:r>
-              <a:rPr lang="en-US" dirty="0">
-                <a:latin typeface="Consolas" panose="020B0609020204030204" pitchFamily="49" charset="0"/>
-                <a:ea typeface="Calibri" panose="020F0502020204030204" pitchFamily="34" charset="0"/>
-                <a:cs typeface="Times New Roman" panose="02020603050405020304" pitchFamily="18" charset="0"/>
-              </a:rPr>
-              <a:t>)</a:t>
+              <a:t>'MN'</a:t>
             </a:r>
             <a:endParaRPr lang="en-US" sz="2400" dirty="0">
               <a:latin typeface="Calibri" panose="020F0502020204030204" pitchFamily="34" charset="0"/>
@@ -8668,21 +8660,21 @@
                 <a:gridCol w="2764301">
                   <a:extLst>
                     <a:ext uri="{9D8B030D-6E8A-4147-A177-3AD203B41FA5}">
-                      <a16:colId xmlns:a16="http://schemas.microsoft.com/office/drawing/2014/main" xmlns="" val="234227049"/>
+                      <a16:colId xmlns="" xmlns:a16="http://schemas.microsoft.com/office/drawing/2014/main" val="234227049"/>
                     </a:ext>
                   </a:extLst>
                 </a:gridCol>
                 <a:gridCol w="2764301">
                   <a:extLst>
                     <a:ext uri="{9D8B030D-6E8A-4147-A177-3AD203B41FA5}">
-                      <a16:colId xmlns:a16="http://schemas.microsoft.com/office/drawing/2014/main" xmlns="" val="4053135350"/>
+                      <a16:colId xmlns="" xmlns:a16="http://schemas.microsoft.com/office/drawing/2014/main" val="4053135350"/>
                     </a:ext>
                   </a:extLst>
                 </a:gridCol>
                 <a:gridCol w="2764301">
                   <a:extLst>
                     <a:ext uri="{9D8B030D-6E8A-4147-A177-3AD203B41FA5}">
-                      <a16:colId xmlns:a16="http://schemas.microsoft.com/office/drawing/2014/main" xmlns="" val="672378647"/>
+                      <a16:colId xmlns="" xmlns:a16="http://schemas.microsoft.com/office/drawing/2014/main" val="672378647"/>
                     </a:ext>
                   </a:extLst>
                 </a:gridCol>
@@ -8732,7 +8724,7 @@
                 </a:tc>
                 <a:extLst>
                   <a:ext uri="{0D108BD9-81ED-4DB2-BD59-A6C34878D82A}">
-                    <a16:rowId xmlns:a16="http://schemas.microsoft.com/office/drawing/2014/main" xmlns="" val="2843053056"/>
+                    <a16:rowId xmlns="" xmlns:a16="http://schemas.microsoft.com/office/drawing/2014/main" val="2843053056"/>
                   </a:ext>
                 </a:extLst>
               </a:tr>
@@ -8782,7 +8774,7 @@
                 </a:tc>
                 <a:extLst>
                   <a:ext uri="{0D108BD9-81ED-4DB2-BD59-A6C34878D82A}">
-                    <a16:rowId xmlns:a16="http://schemas.microsoft.com/office/drawing/2014/main" xmlns="" val="3055328934"/>
+                    <a16:rowId xmlns="" xmlns:a16="http://schemas.microsoft.com/office/drawing/2014/main" val="3055328934"/>
                   </a:ext>
                 </a:extLst>
               </a:tr>
@@ -8832,7 +8824,7 @@
                 </a:tc>
                 <a:extLst>
                   <a:ext uri="{0D108BD9-81ED-4DB2-BD59-A6C34878D82A}">
-                    <a16:rowId xmlns:a16="http://schemas.microsoft.com/office/drawing/2014/main" xmlns="" val="1144851549"/>
+                    <a16:rowId xmlns="" xmlns:a16="http://schemas.microsoft.com/office/drawing/2014/main" val="1144851549"/>
                   </a:ext>
                 </a:extLst>
               </a:tr>
@@ -8881,7 +8873,7 @@
                 </a:tc>
                 <a:extLst>
                   <a:ext uri="{0D108BD9-81ED-4DB2-BD59-A6C34878D82A}">
-                    <a16:rowId xmlns:a16="http://schemas.microsoft.com/office/drawing/2014/main" xmlns="" val="4258932578"/>
+                    <a16:rowId xmlns="" xmlns:a16="http://schemas.microsoft.com/office/drawing/2014/main" val="4258932578"/>
                   </a:ext>
                 </a:extLst>
               </a:tr>
@@ -8899,11 +8891,11 @@
   <p:clrMapOvr>
     <a:masterClrMapping/>
   </p:clrMapOvr>
-  <mc:AlternateContent xmlns:mc="http://schemas.openxmlformats.org/markup-compatibility/2006">
-    <mc:Choice xmlns:p14="http://schemas.microsoft.com/office/powerpoint/2010/main" Requires="p14">
+  <mc:AlternateContent xmlns:mc="http://schemas.openxmlformats.org/markup-compatibility/2006" xmlns:p14="http://schemas.microsoft.com/office/powerpoint/2010/main">
+    <mc:Choice Requires="p14">
       <p:transition spd="slow" p14:dur="2000"/>
     </mc:Choice>
-    <mc:Fallback>
+    <mc:Fallback xmlns="">
       <p:transition spd="slow"/>
     </mc:Fallback>
   </mc:AlternateContent>
@@ -8936,7 +8928,7 @@
         <p:spPr>
           <a:xfrm>
             <a:off x="513471" y="577713"/>
-            <a:ext cx="8292904" cy="2463238"/>
+            <a:ext cx="8292904" cy="2441117"/>
           </a:xfrm>
           <a:prstGeom prst="rect">
             <a:avLst/>
@@ -9816,15 +9808,15 @@
                 <a:ea typeface="Calibri" panose="020F0502020204030204" pitchFamily="34" charset="0"/>
                 <a:cs typeface="Times New Roman" panose="02020603050405020304" pitchFamily="18" charset="0"/>
               </a:rPr>
-              <a:t>in</a:t>
-            </a:r>
-            <a:r>
-              <a:rPr lang="en-US" dirty="0">
-                <a:latin typeface="Consolas" panose="020B0609020204030204" pitchFamily="49" charset="0"/>
-                <a:ea typeface="Calibri" panose="020F0502020204030204" pitchFamily="34" charset="0"/>
-                <a:cs typeface="Times New Roman" panose="02020603050405020304" pitchFamily="18" charset="0"/>
-              </a:rPr>
-              <a:t> (</a:t>
+              <a:t>=</a:t>
+            </a:r>
+            <a:r>
+              <a:rPr lang="en-US" dirty="0">
+                <a:latin typeface="Consolas" panose="020B0609020204030204" pitchFamily="49" charset="0"/>
+                <a:ea typeface="Calibri" panose="020F0502020204030204" pitchFamily="34" charset="0"/>
+                <a:cs typeface="Times New Roman" panose="02020603050405020304" pitchFamily="18" charset="0"/>
+              </a:rPr>
+              <a:t> </a:t>
             </a:r>
             <a:r>
               <a:rPr lang="en-US" dirty="0">
@@ -9835,15 +9827,18 @@
                 <a:ea typeface="Calibri" panose="020F0502020204030204" pitchFamily="34" charset="0"/>
                 <a:cs typeface="Times New Roman" panose="02020603050405020304" pitchFamily="18" charset="0"/>
               </a:rPr>
-              <a:t>'KS', 'MO'</a:t>
-            </a:r>
-            <a:r>
-              <a:rPr lang="en-US" dirty="0">
-                <a:latin typeface="Consolas" panose="020B0609020204030204" pitchFamily="49" charset="0"/>
-                <a:ea typeface="Calibri" panose="020F0502020204030204" pitchFamily="34" charset="0"/>
-                <a:cs typeface="Times New Roman" panose="02020603050405020304" pitchFamily="18" charset="0"/>
-              </a:rPr>
-              <a:t>)</a:t>
+              <a:t>'MN</a:t>
+            </a:r>
+            <a:r>
+              <a:rPr lang="en-US" dirty="0" smtClean="0">
+                <a:solidFill>
+                  <a:srgbClr val="FF0000"/>
+                </a:solidFill>
+                <a:latin typeface="Consolas" panose="020B0609020204030204" pitchFamily="49" charset="0"/>
+                <a:ea typeface="Calibri" panose="020F0502020204030204" pitchFamily="34" charset="0"/>
+                <a:cs typeface="Times New Roman" panose="02020603050405020304" pitchFamily="18" charset="0"/>
+              </a:rPr>
+              <a:t>'</a:t>
             </a:r>
             <a:endParaRPr lang="en-US" sz="2400" dirty="0">
               <a:latin typeface="Calibri" panose="020F0502020204030204" pitchFamily="34" charset="0"/>
@@ -10243,11 +10238,11 @@
   <p:clrMapOvr>
     <a:masterClrMapping/>
   </p:clrMapOvr>
-  <mc:AlternateContent xmlns:mc="http://schemas.openxmlformats.org/markup-compatibility/2006">
-    <mc:Choice xmlns:p14="http://schemas.microsoft.com/office/powerpoint/2010/main" Requires="p14">
+  <mc:AlternateContent xmlns:mc="http://schemas.openxmlformats.org/markup-compatibility/2006" xmlns:p14="http://schemas.microsoft.com/office/powerpoint/2010/main">
+    <mc:Choice Requires="p14">
       <p:transition spd="slow" p14:dur="2000"/>
     </mc:Choice>
-    <mc:Fallback>
+    <mc:Fallback xmlns="">
       <p:transition spd="slow"/>
     </mc:Fallback>
   </mc:AlternateContent>
@@ -11056,33 +11051,30 @@
             </a:r>
             <a:r>
               <a:rPr lang="en-US" dirty="0">
-                <a:solidFill>
-                  <a:srgbClr val="0000FF"/>
-                </a:solidFill>
-                <a:latin typeface="Consolas" panose="020B0609020204030204" pitchFamily="49" charset="0"/>
-                <a:ea typeface="Calibri" panose="020F0502020204030204" pitchFamily="34" charset="0"/>
-                <a:cs typeface="Times New Roman" panose="02020603050405020304" pitchFamily="18" charset="0"/>
-              </a:rPr>
-              <a:t> </a:t>
-            </a:r>
-            <a:r>
-              <a:rPr lang="en-US" dirty="0">
-                <a:solidFill>
-                  <a:srgbClr val="808080"/>
-                </a:solidFill>
-                <a:latin typeface="Consolas" panose="020B0609020204030204" pitchFamily="49" charset="0"/>
-                <a:ea typeface="Calibri" panose="020F0502020204030204" pitchFamily="34" charset="0"/>
-                <a:cs typeface="Times New Roman" panose="02020603050405020304" pitchFamily="18" charset="0"/>
-              </a:rPr>
-              <a:t>in</a:t>
-            </a:r>
-            <a:r>
-              <a:rPr lang="en-US" dirty="0">
-                <a:latin typeface="Consolas" panose="020B0609020204030204" pitchFamily="49" charset="0"/>
-                <a:ea typeface="Calibri" panose="020F0502020204030204" pitchFamily="34" charset="0"/>
-                <a:cs typeface="Times New Roman" panose="02020603050405020304" pitchFamily="18" charset="0"/>
-              </a:rPr>
-              <a:t> (</a:t>
+                <a:latin typeface="Consolas" panose="020B0609020204030204" pitchFamily="49" charset="0"/>
+                <a:ea typeface="Calibri" panose="020F0502020204030204" pitchFamily="34" charset="0"/>
+                <a:cs typeface="Times New Roman" panose="02020603050405020304" pitchFamily="18" charset="0"/>
+              </a:rPr>
+              <a:t> </a:t>
+            </a:r>
+            <a:r>
+              <a:rPr lang="en-US" dirty="0">
+                <a:solidFill>
+                  <a:srgbClr val="808080"/>
+                </a:solidFill>
+                <a:latin typeface="Consolas" panose="020B0609020204030204" pitchFamily="49" charset="0"/>
+                <a:ea typeface="Calibri" panose="020F0502020204030204" pitchFamily="34" charset="0"/>
+                <a:cs typeface="Times New Roman" panose="02020603050405020304" pitchFamily="18" charset="0"/>
+              </a:rPr>
+              <a:t>=</a:t>
+            </a:r>
+            <a:r>
+              <a:rPr lang="en-US" dirty="0">
+                <a:latin typeface="Consolas" panose="020B0609020204030204" pitchFamily="49" charset="0"/>
+                <a:ea typeface="Calibri" panose="020F0502020204030204" pitchFamily="34" charset="0"/>
+                <a:cs typeface="Times New Roman" panose="02020603050405020304" pitchFamily="18" charset="0"/>
+              </a:rPr>
+              <a:t> </a:t>
             </a:r>
             <a:r>
               <a:rPr lang="en-US" dirty="0">
@@ -11093,16 +11085,24 @@
                 <a:ea typeface="Calibri" panose="020F0502020204030204" pitchFamily="34" charset="0"/>
                 <a:cs typeface="Times New Roman" panose="02020603050405020304" pitchFamily="18" charset="0"/>
               </a:rPr>
-              <a:t>'KS', 'MO'</a:t>
-            </a:r>
-            <a:r>
-              <a:rPr lang="en-US" dirty="0">
-                <a:latin typeface="Consolas" panose="020B0609020204030204" pitchFamily="49" charset="0"/>
-                <a:ea typeface="Calibri" panose="020F0502020204030204" pitchFamily="34" charset="0"/>
-                <a:cs typeface="Times New Roman" panose="02020603050405020304" pitchFamily="18" charset="0"/>
-              </a:rPr>
-              <a:t>)</a:t>
-            </a:r>
+              <a:t>'MN</a:t>
+            </a:r>
+            <a:r>
+              <a:rPr lang="en-US" dirty="0" smtClean="0">
+                <a:solidFill>
+                  <a:srgbClr val="FF0000"/>
+                </a:solidFill>
+                <a:latin typeface="Consolas" panose="020B0609020204030204" pitchFamily="49" charset="0"/>
+                <a:ea typeface="Calibri" panose="020F0502020204030204" pitchFamily="34" charset="0"/>
+                <a:cs typeface="Times New Roman" panose="02020603050405020304" pitchFamily="18" charset="0"/>
+              </a:rPr>
+              <a:t>'</a:t>
+            </a:r>
+            <a:endParaRPr lang="en-US" dirty="0">
+              <a:latin typeface="Consolas" panose="020B0609020204030204" pitchFamily="49" charset="0"/>
+              <a:ea typeface="Calibri" panose="020F0502020204030204" pitchFamily="34" charset="0"/>
+              <a:cs typeface="Times New Roman" panose="02020603050405020304" pitchFamily="18" charset="0"/>
+            </a:endParaRPr>
           </a:p>
           <a:p>
             <a:pPr>
@@ -11477,11 +11477,11 @@
   <p:clrMapOvr>
     <a:masterClrMapping/>
   </p:clrMapOvr>
-  <mc:AlternateContent xmlns:mc="http://schemas.openxmlformats.org/markup-compatibility/2006">
-    <mc:Choice xmlns:p14="http://schemas.microsoft.com/office/powerpoint/2010/main" Requires="p14">
+  <mc:AlternateContent xmlns:mc="http://schemas.openxmlformats.org/markup-compatibility/2006" xmlns:p14="http://schemas.microsoft.com/office/powerpoint/2010/main">
+    <mc:Choice Requires="p14">
       <p:transition spd="slow" p14:dur="2000"/>
     </mc:Choice>
-    <mc:Fallback>
+    <mc:Fallback xmlns="">
       <p:transition spd="slow"/>
     </mc:Fallback>
   </mc:AlternateContent>
@@ -12283,15 +12283,15 @@
                 <a:ea typeface="Calibri" panose="020F0502020204030204" pitchFamily="34" charset="0"/>
                 <a:cs typeface="Times New Roman" panose="02020603050405020304" pitchFamily="18" charset="0"/>
               </a:rPr>
-              <a:t>in</a:t>
-            </a:r>
-            <a:r>
-              <a:rPr lang="en-US" dirty="0">
-                <a:latin typeface="Consolas" panose="020B0609020204030204" pitchFamily="49" charset="0"/>
-                <a:ea typeface="Calibri" panose="020F0502020204030204" pitchFamily="34" charset="0"/>
-                <a:cs typeface="Times New Roman" panose="02020603050405020304" pitchFamily="18" charset="0"/>
-              </a:rPr>
-              <a:t> (</a:t>
+              <a:t>=</a:t>
+            </a:r>
+            <a:r>
+              <a:rPr lang="en-US" dirty="0">
+                <a:latin typeface="Consolas" panose="020B0609020204030204" pitchFamily="49" charset="0"/>
+                <a:ea typeface="Calibri" panose="020F0502020204030204" pitchFamily="34" charset="0"/>
+                <a:cs typeface="Times New Roman" panose="02020603050405020304" pitchFamily="18" charset="0"/>
+              </a:rPr>
+              <a:t> </a:t>
             </a:r>
             <a:r>
               <a:rPr lang="en-US" dirty="0">
@@ -12302,15 +12302,18 @@
                 <a:ea typeface="Calibri" panose="020F0502020204030204" pitchFamily="34" charset="0"/>
                 <a:cs typeface="Times New Roman" panose="02020603050405020304" pitchFamily="18" charset="0"/>
               </a:rPr>
-              <a:t>'KS', 'MO'</a:t>
-            </a:r>
-            <a:r>
-              <a:rPr lang="en-US" dirty="0">
-                <a:latin typeface="Consolas" panose="020B0609020204030204" pitchFamily="49" charset="0"/>
-                <a:ea typeface="Calibri" panose="020F0502020204030204" pitchFamily="34" charset="0"/>
-                <a:cs typeface="Times New Roman" panose="02020603050405020304" pitchFamily="18" charset="0"/>
-              </a:rPr>
-              <a:t>)</a:t>
+              <a:t>'MN</a:t>
+            </a:r>
+            <a:r>
+              <a:rPr lang="en-US" dirty="0" smtClean="0">
+                <a:solidFill>
+                  <a:srgbClr val="FF0000"/>
+                </a:solidFill>
+                <a:latin typeface="Consolas" panose="020B0609020204030204" pitchFamily="49" charset="0"/>
+                <a:ea typeface="Calibri" panose="020F0502020204030204" pitchFamily="34" charset="0"/>
+                <a:cs typeface="Times New Roman" panose="02020603050405020304" pitchFamily="18" charset="0"/>
+              </a:rPr>
+              <a:t>'</a:t>
             </a:r>
             <a:endParaRPr lang="en-US" sz="2400" dirty="0">
               <a:latin typeface="Calibri" panose="020F0502020204030204" pitchFamily="34" charset="0"/>
@@ -12704,11 +12707,11 @@
   <p:clrMapOvr>
     <a:masterClrMapping/>
   </p:clrMapOvr>
-  <mc:AlternateContent xmlns:mc="http://schemas.openxmlformats.org/markup-compatibility/2006">
-    <mc:Choice xmlns:p14="http://schemas.microsoft.com/office/powerpoint/2010/main" Requires="p14">
+  <mc:AlternateContent xmlns:mc="http://schemas.openxmlformats.org/markup-compatibility/2006" xmlns:p14="http://schemas.microsoft.com/office/powerpoint/2010/main">
+    <mc:Choice Requires="p14">
       <p:transition spd="slow" p14:dur="2000"/>
     </mc:Choice>
-    <mc:Fallback>
+    <mc:Fallback xmlns="">
       <p:transition spd="slow"/>
     </mc:Fallback>
   </mc:AlternateContent>
@@ -13510,15 +13513,15 @@
                 <a:ea typeface="Calibri" panose="020F0502020204030204" pitchFamily="34" charset="0"/>
                 <a:cs typeface="Times New Roman" panose="02020603050405020304" pitchFamily="18" charset="0"/>
               </a:rPr>
-              <a:t>in</a:t>
-            </a:r>
-            <a:r>
-              <a:rPr lang="en-US" dirty="0">
-                <a:latin typeface="Consolas" panose="020B0609020204030204" pitchFamily="49" charset="0"/>
-                <a:ea typeface="Calibri" panose="020F0502020204030204" pitchFamily="34" charset="0"/>
-                <a:cs typeface="Times New Roman" panose="02020603050405020304" pitchFamily="18" charset="0"/>
-              </a:rPr>
-              <a:t> (</a:t>
+              <a:t>=</a:t>
+            </a:r>
+            <a:r>
+              <a:rPr lang="en-US" dirty="0">
+                <a:latin typeface="Consolas" panose="020B0609020204030204" pitchFamily="49" charset="0"/>
+                <a:ea typeface="Calibri" panose="020F0502020204030204" pitchFamily="34" charset="0"/>
+                <a:cs typeface="Times New Roman" panose="02020603050405020304" pitchFamily="18" charset="0"/>
+              </a:rPr>
+              <a:t> </a:t>
             </a:r>
             <a:r>
               <a:rPr lang="en-US" dirty="0">
@@ -13529,15 +13532,18 @@
                 <a:ea typeface="Calibri" panose="020F0502020204030204" pitchFamily="34" charset="0"/>
                 <a:cs typeface="Times New Roman" panose="02020603050405020304" pitchFamily="18" charset="0"/>
               </a:rPr>
-              <a:t>'KS', 'MO'</a:t>
-            </a:r>
-            <a:r>
-              <a:rPr lang="en-US" dirty="0">
-                <a:latin typeface="Consolas" panose="020B0609020204030204" pitchFamily="49" charset="0"/>
-                <a:ea typeface="Calibri" panose="020F0502020204030204" pitchFamily="34" charset="0"/>
-                <a:cs typeface="Times New Roman" panose="02020603050405020304" pitchFamily="18" charset="0"/>
-              </a:rPr>
-              <a:t>)</a:t>
+              <a:t>'MN</a:t>
+            </a:r>
+            <a:r>
+              <a:rPr lang="en-US" dirty="0" smtClean="0">
+                <a:solidFill>
+                  <a:srgbClr val="FF0000"/>
+                </a:solidFill>
+                <a:latin typeface="Consolas" panose="020B0609020204030204" pitchFamily="49" charset="0"/>
+                <a:ea typeface="Calibri" panose="020F0502020204030204" pitchFamily="34" charset="0"/>
+                <a:cs typeface="Times New Roman" panose="02020603050405020304" pitchFamily="18" charset="0"/>
+              </a:rPr>
+              <a:t>'</a:t>
             </a:r>
             <a:endParaRPr lang="en-US" sz="2400" dirty="0">
               <a:latin typeface="Calibri" panose="020F0502020204030204" pitchFamily="34" charset="0"/>
@@ -13931,11 +13937,11 @@
   <p:clrMapOvr>
     <a:masterClrMapping/>
   </p:clrMapOvr>
-  <mc:AlternateContent xmlns:mc="http://schemas.openxmlformats.org/markup-compatibility/2006">
-    <mc:Choice xmlns:p14="http://schemas.microsoft.com/office/powerpoint/2010/main" Requires="p14">
+  <mc:AlternateContent xmlns:mc="http://schemas.openxmlformats.org/markup-compatibility/2006" xmlns:p14="http://schemas.microsoft.com/office/powerpoint/2010/main">
+    <mc:Choice Requires="p14">
       <p:transition spd="slow" p14:dur="2000"/>
     </mc:Choice>
-    <mc:Fallback>
+    <mc:Fallback xmlns="">
       <p:transition spd="slow"/>
     </mc:Fallback>
   </mc:AlternateContent>
@@ -14758,8 +14764,47 @@
                 <a:ea typeface="Calibri" panose="020F0502020204030204" pitchFamily="34" charset="0"/>
                 <a:cs typeface="Times New Roman" panose="02020603050405020304" pitchFamily="18" charset="0"/>
               </a:rPr>
-              <a:t> in ('KS', 'MO')</a:t>
-            </a:r>
+              <a:t> </a:t>
+            </a:r>
+            <a:r>
+              <a:rPr lang="en-US" dirty="0" smtClean="0">
+                <a:solidFill>
+                  <a:srgbClr val="008080"/>
+                </a:solidFill>
+                <a:highlight>
+                  <a:srgbClr val="FFFF00"/>
+                </a:highlight>
+                <a:latin typeface="Consolas" panose="020B0609020204030204" pitchFamily="49" charset="0"/>
+                <a:ea typeface="Calibri" panose="020F0502020204030204" pitchFamily="34" charset="0"/>
+                <a:cs typeface="Times New Roman" panose="02020603050405020304" pitchFamily="18" charset="0"/>
+              </a:rPr>
+              <a:t>=</a:t>
+            </a:r>
+            <a:r>
+              <a:rPr lang="en-US" dirty="0" smtClean="0">
+                <a:solidFill>
+                  <a:srgbClr val="008080"/>
+                </a:solidFill>
+                <a:highlight>
+                  <a:srgbClr val="FFFF00"/>
+                </a:highlight>
+                <a:latin typeface="Consolas" panose="020B0609020204030204" pitchFamily="49" charset="0"/>
+                <a:ea typeface="Calibri" panose="020F0502020204030204" pitchFamily="34" charset="0"/>
+                <a:cs typeface="Times New Roman" panose="02020603050405020304" pitchFamily="18" charset="0"/>
+              </a:rPr>
+              <a:t> 'MN'</a:t>
+            </a:r>
+            <a:endParaRPr lang="en-US" dirty="0">
+              <a:solidFill>
+                <a:srgbClr val="008080"/>
+              </a:solidFill>
+              <a:highlight>
+                <a:srgbClr val="FFFF00"/>
+              </a:highlight>
+              <a:latin typeface="Consolas" panose="020B0609020204030204" pitchFamily="49" charset="0"/>
+              <a:ea typeface="Calibri" panose="020F0502020204030204" pitchFamily="34" charset="0"/>
+              <a:cs typeface="Times New Roman" panose="02020603050405020304" pitchFamily="18" charset="0"/>
+            </a:endParaRPr>
           </a:p>
           <a:p>
             <a:pPr>
@@ -15099,8 +15144,13 @@
             </a:pPr>
             <a:r>
               <a:rPr lang="en-US" sz="3000" dirty="0"/>
-              <a:t>Find rows in R4 where State = ‘KS’ or ‘MO’</a:t>
-            </a:r>
+              <a:t>Find rows in R4 where State = </a:t>
+            </a:r>
+            <a:r>
+              <a:rPr lang="en-US" sz="3000" dirty="0" smtClean="0"/>
+              <a:t>‘MN’</a:t>
+            </a:r>
+            <a:endParaRPr lang="en-US" sz="3000" dirty="0"/>
           </a:p>
           <a:p>
             <a:pPr marL="457200" indent="-457200">
@@ -15109,7 +15159,15 @@
             </a:pPr>
             <a:r>
               <a:rPr lang="en-US" sz="3000" dirty="0"/>
-              <a:t>Result is 19,805 rows / 14 columns</a:t>
+              <a:t>Result is </a:t>
+            </a:r>
+            <a:r>
+              <a:rPr lang="en-US" sz="3000" dirty="0" smtClean="0"/>
+              <a:t>13,270 </a:t>
+            </a:r>
+            <a:r>
+              <a:rPr lang="en-US" sz="3000" dirty="0"/>
+              <a:t>rows / 14 columns</a:t>
             </a:r>
           </a:p>
           <a:p>
@@ -15134,11 +15192,11 @@
   <p:clrMapOvr>
     <a:masterClrMapping/>
   </p:clrMapOvr>
-  <mc:AlternateContent xmlns:mc="http://schemas.openxmlformats.org/markup-compatibility/2006">
-    <mc:Choice xmlns:p14="http://schemas.microsoft.com/office/powerpoint/2010/main" Requires="p14">
+  <mc:AlternateContent xmlns:mc="http://schemas.openxmlformats.org/markup-compatibility/2006" xmlns:p14="http://schemas.microsoft.com/office/powerpoint/2010/main">
+    <mc:Choice Requires="p14">
       <p:transition spd="slow" p14:dur="2000"/>
     </mc:Choice>
-    <mc:Fallback>
+    <mc:Fallback xmlns="">
       <p:transition spd="slow"/>
     </mc:Fallback>
   </mc:AlternateContent>
@@ -15990,18 +16048,18 @@
                 <a:ea typeface="Calibri" panose="020F0502020204030204" pitchFamily="34" charset="0"/>
                 <a:cs typeface="Times New Roman" panose="02020603050405020304" pitchFamily="18" charset="0"/>
               </a:rPr>
-              <a:t>in</a:t>
-            </a:r>
-            <a:r>
-              <a:rPr lang="en-US" dirty="0">
-                <a:latin typeface="Consolas" panose="020B0609020204030204" pitchFamily="49" charset="0"/>
-                <a:ea typeface="Calibri" panose="020F0502020204030204" pitchFamily="34" charset="0"/>
-                <a:cs typeface="Times New Roman" panose="02020603050405020304" pitchFamily="18" charset="0"/>
-              </a:rPr>
-              <a:t> (</a:t>
-            </a:r>
-            <a:r>
-              <a:rPr lang="en-US" dirty="0">
+              <a:t>=</a:t>
+            </a:r>
+            <a:r>
+              <a:rPr lang="en-US" dirty="0" smtClean="0">
+                <a:latin typeface="Consolas" panose="020B0609020204030204" pitchFamily="49" charset="0"/>
+                <a:ea typeface="Calibri" panose="020F0502020204030204" pitchFamily="34" charset="0"/>
+                <a:cs typeface="Times New Roman" panose="02020603050405020304" pitchFamily="18" charset="0"/>
+              </a:rPr>
+              <a:t> </a:t>
+            </a:r>
+            <a:r>
+              <a:rPr lang="en-US" dirty="0" smtClean="0">
                 <a:solidFill>
                   <a:srgbClr val="FF0000"/>
                 </a:solidFill>
@@ -16009,15 +16067,7 @@
                 <a:ea typeface="Calibri" panose="020F0502020204030204" pitchFamily="34" charset="0"/>
                 <a:cs typeface="Times New Roman" panose="02020603050405020304" pitchFamily="18" charset="0"/>
               </a:rPr>
-              <a:t>'KS', 'MO'</a:t>
-            </a:r>
-            <a:r>
-              <a:rPr lang="en-US" dirty="0">
-                <a:latin typeface="Consolas" panose="020B0609020204030204" pitchFamily="49" charset="0"/>
-                <a:ea typeface="Calibri" panose="020F0502020204030204" pitchFamily="34" charset="0"/>
-                <a:cs typeface="Times New Roman" panose="02020603050405020304" pitchFamily="18" charset="0"/>
-              </a:rPr>
-              <a:t>)</a:t>
+              <a:t>'MN'</a:t>
             </a:r>
             <a:endParaRPr lang="en-US" sz="2400" dirty="0">
               <a:latin typeface="Calibri" panose="020F0502020204030204" pitchFamily="34" charset="0"/>
@@ -16351,7 +16401,15 @@
             </a:pPr>
             <a:r>
               <a:rPr lang="en-US" sz="3000" dirty="0"/>
-              <a:t>Result is 6,464 rows / 2 columns</a:t>
+              <a:t>Result is </a:t>
+            </a:r>
+            <a:r>
+              <a:rPr lang="en-US" sz="3000" dirty="0" smtClean="0"/>
+              <a:t>5,563 </a:t>
+            </a:r>
+            <a:r>
+              <a:rPr lang="en-US" sz="3000" dirty="0"/>
+              <a:t>rows / 2 columns</a:t>
             </a:r>
           </a:p>
           <a:p>
@@ -16398,11 +16456,11 @@
   <p:clrMapOvr>
     <a:masterClrMapping/>
   </p:clrMapOvr>
-  <mc:AlternateContent xmlns:mc="http://schemas.openxmlformats.org/markup-compatibility/2006">
-    <mc:Choice xmlns:p14="http://schemas.microsoft.com/office/powerpoint/2010/main" Requires="p14">
+  <mc:AlternateContent xmlns:mc="http://schemas.openxmlformats.org/markup-compatibility/2006" xmlns:p14="http://schemas.microsoft.com/office/powerpoint/2010/main">
+    <mc:Choice Requires="p14">
       <p:transition spd="slow" p14:dur="2000"/>
     </mc:Choice>
-    <mc:Fallback>
+    <mc:Fallback xmlns="">
       <p:transition spd="slow"/>
     </mc:Fallback>
   </mc:AlternateContent>
@@ -17246,26 +17304,26 @@
               <a:t> </a:t>
             </a:r>
             <a:r>
-              <a:rPr lang="en-US" dirty="0">
-                <a:solidFill>
-                  <a:srgbClr val="808080"/>
-                </a:solidFill>
-                <a:latin typeface="Consolas" panose="020B0609020204030204" pitchFamily="49" charset="0"/>
-                <a:ea typeface="Calibri" panose="020F0502020204030204" pitchFamily="34" charset="0"/>
-                <a:cs typeface="Times New Roman" panose="02020603050405020304" pitchFamily="18" charset="0"/>
-              </a:rPr>
-              <a:t>in</a:t>
-            </a:r>
-            <a:r>
-              <a:rPr lang="en-US" dirty="0">
-                <a:latin typeface="Consolas" panose="020B0609020204030204" pitchFamily="49" charset="0"/>
-                <a:ea typeface="Calibri" panose="020F0502020204030204" pitchFamily="34" charset="0"/>
-                <a:cs typeface="Times New Roman" panose="02020603050405020304" pitchFamily="18" charset="0"/>
-              </a:rPr>
-              <a:t> (</a:t>
-            </a:r>
-            <a:r>
-              <a:rPr lang="en-US" dirty="0">
+              <a:rPr lang="en-US" dirty="0" smtClean="0">
+                <a:solidFill>
+                  <a:srgbClr val="808080"/>
+                </a:solidFill>
+                <a:latin typeface="Consolas" panose="020B0609020204030204" pitchFamily="49" charset="0"/>
+                <a:ea typeface="Calibri" panose="020F0502020204030204" pitchFamily="34" charset="0"/>
+                <a:cs typeface="Times New Roman" panose="02020603050405020304" pitchFamily="18" charset="0"/>
+              </a:rPr>
+              <a:t>=</a:t>
+            </a:r>
+            <a:r>
+              <a:rPr lang="en-US" dirty="0" smtClean="0">
+                <a:latin typeface="Consolas" panose="020B0609020204030204" pitchFamily="49" charset="0"/>
+                <a:ea typeface="Calibri" panose="020F0502020204030204" pitchFamily="34" charset="0"/>
+                <a:cs typeface="Times New Roman" panose="02020603050405020304" pitchFamily="18" charset="0"/>
+              </a:rPr>
+              <a:t> </a:t>
+            </a:r>
+            <a:r>
+              <a:rPr lang="en-US" dirty="0" smtClean="0">
                 <a:solidFill>
                   <a:srgbClr val="FF0000"/>
                 </a:solidFill>
@@ -17273,15 +17331,7 @@
                 <a:ea typeface="Calibri" panose="020F0502020204030204" pitchFamily="34" charset="0"/>
                 <a:cs typeface="Times New Roman" panose="02020603050405020304" pitchFamily="18" charset="0"/>
               </a:rPr>
-              <a:t>'KS', 'MO'</a:t>
-            </a:r>
-            <a:r>
-              <a:rPr lang="en-US" dirty="0">
-                <a:latin typeface="Consolas" panose="020B0609020204030204" pitchFamily="49" charset="0"/>
-                <a:ea typeface="Calibri" panose="020F0502020204030204" pitchFamily="34" charset="0"/>
-                <a:cs typeface="Times New Roman" panose="02020603050405020304" pitchFamily="18" charset="0"/>
-              </a:rPr>
-              <a:t>)</a:t>
+              <a:t>'MN'</a:t>
             </a:r>
             <a:endParaRPr lang="en-US" sz="2400" dirty="0">
               <a:latin typeface="Calibri" panose="020F0502020204030204" pitchFamily="34" charset="0"/>
@@ -17562,7 +17612,15 @@
             </a:pPr>
             <a:r>
               <a:rPr lang="en-US" sz="3000" dirty="0"/>
-              <a:t>Result is 123 rows / 2 columns</a:t>
+              <a:t>Result is </a:t>
+            </a:r>
+            <a:r>
+              <a:rPr lang="en-US" sz="3000" dirty="0" smtClean="0"/>
+              <a:t>68 rows </a:t>
+            </a:r>
+            <a:r>
+              <a:rPr lang="en-US" sz="3000" dirty="0"/>
+              <a:t>/ 2 columns</a:t>
             </a:r>
           </a:p>
           <a:p>
@@ -17588,11 +17646,11 @@
   <p:clrMapOvr>
     <a:masterClrMapping/>
   </p:clrMapOvr>
-  <mc:AlternateContent xmlns:mc="http://schemas.openxmlformats.org/markup-compatibility/2006">
-    <mc:Choice xmlns:p14="http://schemas.microsoft.com/office/powerpoint/2010/main" Requires="p14">
+  <mc:AlternateContent xmlns:mc="http://schemas.openxmlformats.org/markup-compatibility/2006" xmlns:p14="http://schemas.microsoft.com/office/powerpoint/2010/main">
+    <mc:Choice Requires="p14">
       <p:transition spd="slow" p14:dur="2000"/>
     </mc:Choice>
-    <mc:Fallback>
+    <mc:Fallback xmlns="">
       <p:transition spd="slow"/>
     </mc:Fallback>
   </mc:AlternateContent>
@@ -19369,26 +19427,26 @@
               <a:t> </a:t>
             </a:r>
             <a:r>
-              <a:rPr lang="en-US" dirty="0">
-                <a:solidFill>
-                  <a:srgbClr val="808080"/>
-                </a:solidFill>
-                <a:latin typeface="Consolas" panose="020B0609020204030204" pitchFamily="49" charset="0"/>
-                <a:ea typeface="Calibri" panose="020F0502020204030204" pitchFamily="34" charset="0"/>
-                <a:cs typeface="Times New Roman" panose="02020603050405020304" pitchFamily="18" charset="0"/>
-              </a:rPr>
-              <a:t>in</a:t>
-            </a:r>
-            <a:r>
-              <a:rPr lang="en-US" dirty="0">
-                <a:latin typeface="Consolas" panose="020B0609020204030204" pitchFamily="49" charset="0"/>
-                <a:ea typeface="Calibri" panose="020F0502020204030204" pitchFamily="34" charset="0"/>
-                <a:cs typeface="Times New Roman" panose="02020603050405020304" pitchFamily="18" charset="0"/>
-              </a:rPr>
-              <a:t> (</a:t>
-            </a:r>
-            <a:r>
-              <a:rPr lang="en-US" dirty="0">
+              <a:rPr lang="en-US" dirty="0" smtClean="0">
+                <a:solidFill>
+                  <a:srgbClr val="808080"/>
+                </a:solidFill>
+                <a:latin typeface="Consolas" panose="020B0609020204030204" pitchFamily="49" charset="0"/>
+                <a:ea typeface="Calibri" panose="020F0502020204030204" pitchFamily="34" charset="0"/>
+                <a:cs typeface="Times New Roman" panose="02020603050405020304" pitchFamily="18" charset="0"/>
+              </a:rPr>
+              <a:t>=</a:t>
+            </a:r>
+            <a:r>
+              <a:rPr lang="en-US" dirty="0" smtClean="0">
+                <a:latin typeface="Consolas" panose="020B0609020204030204" pitchFamily="49" charset="0"/>
+                <a:ea typeface="Calibri" panose="020F0502020204030204" pitchFamily="34" charset="0"/>
+                <a:cs typeface="Times New Roman" panose="02020603050405020304" pitchFamily="18" charset="0"/>
+              </a:rPr>
+              <a:t> </a:t>
+            </a:r>
+            <a:r>
+              <a:rPr lang="en-US" dirty="0" smtClean="0">
                 <a:solidFill>
                   <a:srgbClr val="FF0000"/>
                 </a:solidFill>
@@ -19396,15 +19454,7 @@
                 <a:ea typeface="Calibri" panose="020F0502020204030204" pitchFamily="34" charset="0"/>
                 <a:cs typeface="Times New Roman" panose="02020603050405020304" pitchFamily="18" charset="0"/>
               </a:rPr>
-              <a:t>'KS', 'MO'</a:t>
-            </a:r>
-            <a:r>
-              <a:rPr lang="en-US" dirty="0">
-                <a:latin typeface="Consolas" panose="020B0609020204030204" pitchFamily="49" charset="0"/>
-                <a:ea typeface="Calibri" panose="020F0502020204030204" pitchFamily="34" charset="0"/>
-                <a:cs typeface="Times New Roman" panose="02020603050405020304" pitchFamily="18" charset="0"/>
-              </a:rPr>
-              <a:t>)</a:t>
+              <a:t>'MN'</a:t>
             </a:r>
             <a:endParaRPr lang="en-US" sz="2400" dirty="0">
               <a:latin typeface="Calibri" panose="020F0502020204030204" pitchFamily="34" charset="0"/>
@@ -19808,7 +19858,15 @@
             </a:pPr>
             <a:r>
               <a:rPr lang="en-US" sz="3000" dirty="0"/>
-              <a:t>Result is 39 rows / 2 columns</a:t>
+              <a:t>Result is </a:t>
+            </a:r>
+            <a:r>
+              <a:rPr lang="en-US" sz="3000" dirty="0" smtClean="0"/>
+              <a:t>68 rows </a:t>
+            </a:r>
+            <a:r>
+              <a:rPr lang="en-US" sz="3000" dirty="0"/>
+              <a:t>/ 2 columns</a:t>
             </a:r>
           </a:p>
           <a:p>
@@ -19834,11 +19892,11 @@
   <p:clrMapOvr>
     <a:masterClrMapping/>
   </p:clrMapOvr>
-  <mc:AlternateContent xmlns:mc="http://schemas.openxmlformats.org/markup-compatibility/2006">
-    <mc:Choice xmlns:p14="http://schemas.microsoft.com/office/powerpoint/2010/main" Requires="p14">
+  <mc:AlternateContent xmlns:mc="http://schemas.openxmlformats.org/markup-compatibility/2006" xmlns:p14="http://schemas.microsoft.com/office/powerpoint/2010/main">
+    <mc:Choice Requires="p14">
       <p:transition spd="slow" p14:dur="2000"/>
     </mc:Choice>
-    <mc:Fallback>
+    <mc:Fallback xmlns="">
       <p:transition spd="slow"/>
     </mc:Fallback>
   </mc:AlternateContent>
@@ -20682,26 +20740,26 @@
               <a:t> </a:t>
             </a:r>
             <a:r>
-              <a:rPr lang="en-US" dirty="0">
-                <a:solidFill>
-                  <a:srgbClr val="808080"/>
-                </a:solidFill>
-                <a:latin typeface="Consolas" panose="020B0609020204030204" pitchFamily="49" charset="0"/>
-                <a:ea typeface="Calibri" panose="020F0502020204030204" pitchFamily="34" charset="0"/>
-                <a:cs typeface="Times New Roman" panose="02020603050405020304" pitchFamily="18" charset="0"/>
-              </a:rPr>
-              <a:t>in</a:t>
-            </a:r>
-            <a:r>
-              <a:rPr lang="en-US" dirty="0">
-                <a:latin typeface="Consolas" panose="020B0609020204030204" pitchFamily="49" charset="0"/>
-                <a:ea typeface="Calibri" panose="020F0502020204030204" pitchFamily="34" charset="0"/>
-                <a:cs typeface="Times New Roman" panose="02020603050405020304" pitchFamily="18" charset="0"/>
-              </a:rPr>
-              <a:t> (</a:t>
-            </a:r>
-            <a:r>
-              <a:rPr lang="en-US" dirty="0">
+              <a:rPr lang="en-US" dirty="0" smtClean="0">
+                <a:solidFill>
+                  <a:srgbClr val="808080"/>
+                </a:solidFill>
+                <a:latin typeface="Consolas" panose="020B0609020204030204" pitchFamily="49" charset="0"/>
+                <a:ea typeface="Calibri" panose="020F0502020204030204" pitchFamily="34" charset="0"/>
+                <a:cs typeface="Times New Roman" panose="02020603050405020304" pitchFamily="18" charset="0"/>
+              </a:rPr>
+              <a:t>=</a:t>
+            </a:r>
+            <a:r>
+              <a:rPr lang="en-US" dirty="0" smtClean="0">
+                <a:latin typeface="Consolas" panose="020B0609020204030204" pitchFamily="49" charset="0"/>
+                <a:ea typeface="Calibri" panose="020F0502020204030204" pitchFamily="34" charset="0"/>
+                <a:cs typeface="Times New Roman" panose="02020603050405020304" pitchFamily="18" charset="0"/>
+              </a:rPr>
+              <a:t> </a:t>
+            </a:r>
+            <a:r>
+              <a:rPr lang="en-US" dirty="0" smtClean="0">
                 <a:solidFill>
                   <a:srgbClr val="FF0000"/>
                 </a:solidFill>
@@ -20709,15 +20767,7 @@
                 <a:ea typeface="Calibri" panose="020F0502020204030204" pitchFamily="34" charset="0"/>
                 <a:cs typeface="Times New Roman" panose="02020603050405020304" pitchFamily="18" charset="0"/>
               </a:rPr>
-              <a:t>'KS', 'MO'</a:t>
-            </a:r>
-            <a:r>
-              <a:rPr lang="en-US" dirty="0">
-                <a:latin typeface="Consolas" panose="020B0609020204030204" pitchFamily="49" charset="0"/>
-                <a:ea typeface="Calibri" panose="020F0502020204030204" pitchFamily="34" charset="0"/>
-                <a:cs typeface="Times New Roman" panose="02020603050405020304" pitchFamily="18" charset="0"/>
-              </a:rPr>
-              <a:t>)</a:t>
+              <a:t>'MN'</a:t>
             </a:r>
             <a:endParaRPr lang="en-US" sz="2400" dirty="0">
               <a:latin typeface="Calibri" panose="020F0502020204030204" pitchFamily="34" charset="0"/>
@@ -21061,11 +21111,11 @@
   <p:clrMapOvr>
     <a:masterClrMapping/>
   </p:clrMapOvr>
-  <mc:AlternateContent xmlns:mc="http://schemas.openxmlformats.org/markup-compatibility/2006">
-    <mc:Choice xmlns:p14="http://schemas.microsoft.com/office/powerpoint/2010/main" Requires="p14">
+  <mc:AlternateContent xmlns:mc="http://schemas.openxmlformats.org/markup-compatibility/2006" xmlns:p14="http://schemas.microsoft.com/office/powerpoint/2010/main">
+    <mc:Choice Requires="p14">
       <p:transition spd="slow" p14:dur="2000"/>
     </mc:Choice>
-    <mc:Fallback>
+    <mc:Fallback xmlns="">
       <p:transition spd="slow"/>
     </mc:Fallback>
   </mc:AlternateContent>
@@ -21912,26 +21962,18 @@
               <a:t> </a:t>
             </a:r>
             <a:r>
-              <a:rPr lang="en-US" dirty="0">
-                <a:solidFill>
-                  <a:srgbClr val="808080"/>
-                </a:solidFill>
-                <a:latin typeface="Consolas" panose="020B0609020204030204" pitchFamily="49" charset="0"/>
-                <a:ea typeface="Calibri" panose="020F0502020204030204" pitchFamily="34" charset="0"/>
-                <a:cs typeface="Times New Roman" panose="02020603050405020304" pitchFamily="18" charset="0"/>
-              </a:rPr>
-              <a:t>in</a:t>
-            </a:r>
-            <a:r>
-              <a:rPr lang="en-US" dirty="0">
-                <a:latin typeface="Consolas" panose="020B0609020204030204" pitchFamily="49" charset="0"/>
-                <a:ea typeface="Calibri" panose="020F0502020204030204" pitchFamily="34" charset="0"/>
-                <a:cs typeface="Times New Roman" panose="02020603050405020304" pitchFamily="18" charset="0"/>
-              </a:rPr>
-              <a:t> (</a:t>
-            </a:r>
-            <a:r>
-              <a:rPr lang="en-US" dirty="0">
+              <a:rPr lang="en-US" dirty="0" smtClean="0">
+                <a:solidFill>
+                  <a:srgbClr val="808080"/>
+                </a:solidFill>
+                <a:latin typeface="Consolas" panose="020B0609020204030204" pitchFamily="49" charset="0"/>
+                <a:ea typeface="Calibri" panose="020F0502020204030204" pitchFamily="34" charset="0"/>
+                <a:cs typeface="Times New Roman" panose="02020603050405020304" pitchFamily="18" charset="0"/>
+              </a:rPr>
+              <a:t>= </a:t>
+            </a:r>
+            <a:r>
+              <a:rPr lang="en-US" dirty="0" smtClean="0">
                 <a:solidFill>
                   <a:srgbClr val="FF0000"/>
                 </a:solidFill>
@@ -21939,15 +21981,7 @@
                 <a:ea typeface="Calibri" panose="020F0502020204030204" pitchFamily="34" charset="0"/>
                 <a:cs typeface="Times New Roman" panose="02020603050405020304" pitchFamily="18" charset="0"/>
               </a:rPr>
-              <a:t>'KS', 'MO'</a:t>
-            </a:r>
-            <a:r>
-              <a:rPr lang="en-US" dirty="0">
-                <a:latin typeface="Consolas" panose="020B0609020204030204" pitchFamily="49" charset="0"/>
-                <a:ea typeface="Calibri" panose="020F0502020204030204" pitchFamily="34" charset="0"/>
-                <a:cs typeface="Times New Roman" panose="02020603050405020304" pitchFamily="18" charset="0"/>
-              </a:rPr>
-              <a:t>)</a:t>
+              <a:t>'MN'</a:t>
             </a:r>
             <a:endParaRPr lang="en-US" sz="2400" dirty="0">
               <a:latin typeface="Calibri" panose="020F0502020204030204" pitchFamily="34" charset="0"/>
@@ -22349,11 +22383,11 @@
   <p:clrMapOvr>
     <a:masterClrMapping/>
   </p:clrMapOvr>
-  <mc:AlternateContent xmlns:mc="http://schemas.openxmlformats.org/markup-compatibility/2006">
-    <mc:Choice xmlns:p14="http://schemas.microsoft.com/office/powerpoint/2010/main" Requires="p14">
+  <mc:AlternateContent xmlns:mc="http://schemas.openxmlformats.org/markup-compatibility/2006" xmlns:p14="http://schemas.microsoft.com/office/powerpoint/2010/main">
+    <mc:Choice Requires="p14">
       <p:transition spd="slow" p14:dur="2000"/>
     </mc:Choice>
-    <mc:Fallback>
+    <mc:Fallback xmlns="">
       <p:transition spd="slow"/>
     </mc:Fallback>
   </mc:AlternateContent>
@@ -23023,26 +23057,26 @@
               <a:t> </a:t>
             </a:r>
             <a:r>
-              <a:rPr lang="en-US" dirty="0">
-                <a:solidFill>
-                  <a:srgbClr val="808080"/>
-                </a:solidFill>
-                <a:latin typeface="Consolas" panose="020B0609020204030204" pitchFamily="49" charset="0"/>
-                <a:ea typeface="Calibri" panose="020F0502020204030204" pitchFamily="34" charset="0"/>
-                <a:cs typeface="Times New Roman" panose="02020603050405020304" pitchFamily="18" charset="0"/>
-              </a:rPr>
-              <a:t>in</a:t>
-            </a:r>
-            <a:r>
-              <a:rPr lang="en-US" dirty="0">
-                <a:latin typeface="Consolas" panose="020B0609020204030204" pitchFamily="49" charset="0"/>
-                <a:ea typeface="Calibri" panose="020F0502020204030204" pitchFamily="34" charset="0"/>
-                <a:cs typeface="Times New Roman" panose="02020603050405020304" pitchFamily="18" charset="0"/>
-              </a:rPr>
-              <a:t> (</a:t>
-            </a:r>
-            <a:r>
-              <a:rPr lang="en-US" dirty="0">
+              <a:rPr lang="en-US" dirty="0" smtClean="0">
+                <a:solidFill>
+                  <a:srgbClr val="808080"/>
+                </a:solidFill>
+                <a:latin typeface="Consolas" panose="020B0609020204030204" pitchFamily="49" charset="0"/>
+                <a:ea typeface="Calibri" panose="020F0502020204030204" pitchFamily="34" charset="0"/>
+                <a:cs typeface="Times New Roman" panose="02020603050405020304" pitchFamily="18" charset="0"/>
+              </a:rPr>
+              <a:t>=</a:t>
+            </a:r>
+            <a:r>
+              <a:rPr lang="en-US" dirty="0" smtClean="0">
+                <a:latin typeface="Consolas" panose="020B0609020204030204" pitchFamily="49" charset="0"/>
+                <a:ea typeface="Calibri" panose="020F0502020204030204" pitchFamily="34" charset="0"/>
+                <a:cs typeface="Times New Roman" panose="02020603050405020304" pitchFamily="18" charset="0"/>
+              </a:rPr>
+              <a:t> </a:t>
+            </a:r>
+            <a:r>
+              <a:rPr lang="en-US" dirty="0" smtClean="0">
                 <a:solidFill>
                   <a:srgbClr val="FF0000"/>
                 </a:solidFill>
@@ -23050,15 +23084,7 @@
                 <a:ea typeface="Calibri" panose="020F0502020204030204" pitchFamily="34" charset="0"/>
                 <a:cs typeface="Times New Roman" panose="02020603050405020304" pitchFamily="18" charset="0"/>
               </a:rPr>
-              <a:t>'KS', 'MO'</a:t>
-            </a:r>
-            <a:r>
-              <a:rPr lang="en-US" dirty="0">
-                <a:latin typeface="Consolas" panose="020B0609020204030204" pitchFamily="49" charset="0"/>
-                <a:ea typeface="Calibri" panose="020F0502020204030204" pitchFamily="34" charset="0"/>
-                <a:cs typeface="Times New Roman" panose="02020603050405020304" pitchFamily="18" charset="0"/>
-              </a:rPr>
-              <a:t>)</a:t>
+              <a:t>'MN'</a:t>
             </a:r>
             <a:endParaRPr lang="en-US" sz="2400" dirty="0">
               <a:latin typeface="Calibri" panose="020F0502020204030204" pitchFamily="34" charset="0"/>
@@ -23601,11 +23627,11 @@
   <p:clrMapOvr>
     <a:masterClrMapping/>
   </p:clrMapOvr>
-  <mc:AlternateContent xmlns:mc="http://schemas.openxmlformats.org/markup-compatibility/2006">
-    <mc:Choice xmlns:p14="http://schemas.microsoft.com/office/powerpoint/2010/main" Requires="p14">
+  <mc:AlternateContent xmlns:mc="http://schemas.openxmlformats.org/markup-compatibility/2006" xmlns:p14="http://schemas.microsoft.com/office/powerpoint/2010/main">
+    <mc:Choice Requires="p14">
       <p:transition spd="slow" p14:dur="2000"/>
     </mc:Choice>
-    <mc:Fallback>
+    <mc:Fallback xmlns="">
       <p:transition spd="slow"/>
     </mc:Fallback>
   </mc:AlternateContent>
@@ -24274,26 +24300,18 @@
               <a:t> </a:t>
             </a:r>
             <a:r>
-              <a:rPr lang="en-US" sz="1400" dirty="0">
-                <a:solidFill>
-                  <a:srgbClr val="808080"/>
-                </a:solidFill>
-                <a:latin typeface="Consolas" panose="020B0609020204030204" pitchFamily="49" charset="0"/>
-                <a:ea typeface="Calibri" panose="020F0502020204030204" pitchFamily="34" charset="0"/>
-                <a:cs typeface="Times New Roman" panose="02020603050405020304" pitchFamily="18" charset="0"/>
-              </a:rPr>
-              <a:t>in</a:t>
-            </a:r>
-            <a:r>
-              <a:rPr lang="en-US" sz="1400" dirty="0">
-                <a:latin typeface="Consolas" panose="020B0609020204030204" pitchFamily="49" charset="0"/>
-                <a:ea typeface="Calibri" panose="020F0502020204030204" pitchFamily="34" charset="0"/>
-                <a:cs typeface="Times New Roman" panose="02020603050405020304" pitchFamily="18" charset="0"/>
-              </a:rPr>
-              <a:t> (</a:t>
-            </a:r>
-            <a:r>
-              <a:rPr lang="en-US" sz="1400" dirty="0">
+              <a:rPr lang="en-US" sz="1400" dirty="0" smtClean="0">
+                <a:solidFill>
+                  <a:srgbClr val="808080"/>
+                </a:solidFill>
+                <a:latin typeface="Consolas" panose="020B0609020204030204" pitchFamily="49" charset="0"/>
+                <a:ea typeface="Calibri" panose="020F0502020204030204" pitchFamily="34" charset="0"/>
+                <a:cs typeface="Times New Roman" panose="02020603050405020304" pitchFamily="18" charset="0"/>
+              </a:rPr>
+              <a:t>= </a:t>
+            </a:r>
+            <a:r>
+              <a:rPr lang="en-US" sz="1400" dirty="0" smtClean="0">
                 <a:solidFill>
                   <a:srgbClr val="FF0000"/>
                 </a:solidFill>
@@ -24301,15 +24319,7 @@
                 <a:ea typeface="Calibri" panose="020F0502020204030204" pitchFamily="34" charset="0"/>
                 <a:cs typeface="Times New Roman" panose="02020603050405020304" pitchFamily="18" charset="0"/>
               </a:rPr>
-              <a:t>'KS', 'MO'</a:t>
-            </a:r>
-            <a:r>
-              <a:rPr lang="en-US" sz="1400" dirty="0">
-                <a:latin typeface="Consolas" panose="020B0609020204030204" pitchFamily="49" charset="0"/>
-                <a:ea typeface="Calibri" panose="020F0502020204030204" pitchFamily="34" charset="0"/>
-                <a:cs typeface="Times New Roman" panose="02020603050405020304" pitchFamily="18" charset="0"/>
-              </a:rPr>
-              <a:t>)</a:t>
+              <a:t>'MN'</a:t>
             </a:r>
             <a:endParaRPr lang="en-US" dirty="0">
               <a:latin typeface="Calibri" panose="020F0502020204030204" pitchFamily="34" charset="0"/>
@@ -24847,7 +24857,7 @@
       </p:sp>
       <p:pic>
         <p:nvPicPr>
-          <p:cNvPr id="3" name="Picture 2"/>
+          <p:cNvPr id="4" name="Picture 3"/>
           <p:cNvPicPr>
             <a:picLocks noChangeAspect="1"/>
           </p:cNvPicPr>
@@ -24862,7 +24872,7 @@
         <p:spPr>
           <a:xfrm>
             <a:off x="3246120" y="539496"/>
-            <a:ext cx="5428419" cy="5678424"/>
+            <a:ext cx="5421612" cy="5678424"/>
           </a:xfrm>
           <a:prstGeom prst="rect">
             <a:avLst/>
@@ -24879,11 +24889,11 @@
   <p:clrMapOvr>
     <a:masterClrMapping/>
   </p:clrMapOvr>
-  <mc:AlternateContent xmlns:mc="http://schemas.openxmlformats.org/markup-compatibility/2006">
-    <mc:Choice xmlns:p14="http://schemas.microsoft.com/office/powerpoint/2010/main" Requires="p14">
+  <mc:AlternateContent xmlns:mc="http://schemas.openxmlformats.org/markup-compatibility/2006" xmlns:p14="http://schemas.microsoft.com/office/powerpoint/2010/main">
+    <mc:Choice Requires="p14">
       <p:transition spd="slow" p14:dur="2000"/>
     </mc:Choice>
-    <mc:Fallback>
+    <mc:Fallback xmlns="">
       <p:transition spd="slow"/>
     </mc:Fallback>
   </mc:AlternateContent>
@@ -26769,26 +26779,18 @@
               <a:t> </a:t>
             </a:r>
             <a:r>
-              <a:rPr lang="en-US" sz="1400" dirty="0">
-                <a:solidFill>
-                  <a:srgbClr val="808080"/>
-                </a:solidFill>
-                <a:latin typeface="Consolas" panose="020B0609020204030204" pitchFamily="49" charset="0"/>
-                <a:ea typeface="Calibri" panose="020F0502020204030204" pitchFamily="34" charset="0"/>
-                <a:cs typeface="Times New Roman" panose="02020603050405020304" pitchFamily="18" charset="0"/>
-              </a:rPr>
-              <a:t>in</a:t>
-            </a:r>
-            <a:r>
-              <a:rPr lang="en-US" sz="1400" dirty="0">
-                <a:latin typeface="Consolas" panose="020B0609020204030204" pitchFamily="49" charset="0"/>
-                <a:ea typeface="Calibri" panose="020F0502020204030204" pitchFamily="34" charset="0"/>
-                <a:cs typeface="Times New Roman" panose="02020603050405020304" pitchFamily="18" charset="0"/>
-              </a:rPr>
-              <a:t> (</a:t>
-            </a:r>
-            <a:r>
-              <a:rPr lang="en-US" sz="1400" dirty="0">
+              <a:rPr lang="en-US" sz="1400" dirty="0" smtClean="0">
+                <a:solidFill>
+                  <a:srgbClr val="808080"/>
+                </a:solidFill>
+                <a:latin typeface="Consolas" panose="020B0609020204030204" pitchFamily="49" charset="0"/>
+                <a:ea typeface="Calibri" panose="020F0502020204030204" pitchFamily="34" charset="0"/>
+                <a:cs typeface="Times New Roman" panose="02020603050405020304" pitchFamily="18" charset="0"/>
+              </a:rPr>
+              <a:t>= </a:t>
+            </a:r>
+            <a:r>
+              <a:rPr lang="en-US" sz="1400" dirty="0" smtClean="0">
                 <a:solidFill>
                   <a:srgbClr val="FF0000"/>
                 </a:solidFill>
@@ -26796,15 +26798,7 @@
                 <a:ea typeface="Calibri" panose="020F0502020204030204" pitchFamily="34" charset="0"/>
                 <a:cs typeface="Times New Roman" panose="02020603050405020304" pitchFamily="18" charset="0"/>
               </a:rPr>
-              <a:t>'KS', 'MO'</a:t>
-            </a:r>
-            <a:r>
-              <a:rPr lang="en-US" sz="1400" dirty="0">
-                <a:latin typeface="Consolas" panose="020B0609020204030204" pitchFamily="49" charset="0"/>
-                <a:ea typeface="Calibri" panose="020F0502020204030204" pitchFamily="34" charset="0"/>
-                <a:cs typeface="Times New Roman" panose="02020603050405020304" pitchFamily="18" charset="0"/>
-              </a:rPr>
-              <a:t>)</a:t>
+              <a:t>'MN'</a:t>
             </a:r>
             <a:endParaRPr lang="en-US" sz="1400" dirty="0">
               <a:solidFill>
@@ -27110,7 +27104,7 @@
       </p:sp>
       <p:pic>
         <p:nvPicPr>
-          <p:cNvPr id="3" name="Picture 2"/>
+          <p:cNvPr id="4" name="Picture 3"/>
           <p:cNvPicPr>
             <a:picLocks noChangeAspect="1"/>
           </p:cNvPicPr>
@@ -27125,7 +27119,7 @@
         <p:spPr>
           <a:xfrm>
             <a:off x="3246120" y="539496"/>
-            <a:ext cx="5428419" cy="5678424"/>
+            <a:ext cx="5421612" cy="5678424"/>
           </a:xfrm>
           <a:prstGeom prst="rect">
             <a:avLst/>
@@ -27385,7 +27379,7 @@
       </p:sp>
       <p:pic>
         <p:nvPicPr>
-          <p:cNvPr id="3" name="Picture 2"/>
+          <p:cNvPr id="4" name="Picture 3"/>
           <p:cNvPicPr>
             <a:picLocks noChangeAspect="1"/>
           </p:cNvPicPr>
@@ -27399,8 +27393,8 @@
         </p:blipFill>
         <p:spPr>
           <a:xfrm>
-            <a:off x="1238865" y="1387041"/>
-            <a:ext cx="6890364" cy="4620726"/>
+            <a:off x="1243584" y="1389888"/>
+            <a:ext cx="6894576" cy="4629356"/>
           </a:xfrm>
           <a:prstGeom prst="rect">
             <a:avLst/>
@@ -31058,11 +31052,11 @@
   <p:clrMapOvr>
     <a:masterClrMapping/>
   </p:clrMapOvr>
-  <mc:AlternateContent xmlns:mc="http://schemas.openxmlformats.org/markup-compatibility/2006">
-    <mc:Choice xmlns:p14="http://schemas.microsoft.com/office/powerpoint/2010/main" Requires="p14">
+  <mc:AlternateContent xmlns:mc="http://schemas.openxmlformats.org/markup-compatibility/2006" xmlns:p14="http://schemas.microsoft.com/office/powerpoint/2010/main">
+    <mc:Choice Requires="p14">
       <p:transition spd="slow" p14:dur="2000"/>
     </mc:Choice>
-    <mc:Fallback>
+    <mc:Fallback xmlns="">
       <p:transition spd="slow"/>
     </mc:Fallback>
   </mc:AlternateContent>
@@ -31418,14 +31412,14 @@
                 <a:gridCol w="7632835">
                   <a:extLst>
                     <a:ext uri="{9D8B030D-6E8A-4147-A177-3AD203B41FA5}">
-                      <a16:colId xmlns:a16="http://schemas.microsoft.com/office/drawing/2014/main" xmlns="" val="3644048045"/>
+                      <a16:colId xmlns="" xmlns:a16="http://schemas.microsoft.com/office/drawing/2014/main" val="3644048045"/>
                     </a:ext>
                   </a:extLst>
                 </a:gridCol>
                 <a:gridCol w="606393">
                   <a:extLst>
                     <a:ext uri="{9D8B030D-6E8A-4147-A177-3AD203B41FA5}">
-                      <a16:colId xmlns:a16="http://schemas.microsoft.com/office/drawing/2014/main" xmlns="" val="2034254753"/>
+                      <a16:colId xmlns="" xmlns:a16="http://schemas.microsoft.com/office/drawing/2014/main" val="2034254753"/>
                     </a:ext>
                   </a:extLst>
                 </a:gridCol>
@@ -31456,7 +31450,7 @@
                 </a:tc>
                 <a:extLst>
                   <a:ext uri="{0D108BD9-81ED-4DB2-BD59-A6C34878D82A}">
-                    <a16:rowId xmlns:a16="http://schemas.microsoft.com/office/drawing/2014/main" xmlns="" val="2708275910"/>
+                    <a16:rowId xmlns="" xmlns:a16="http://schemas.microsoft.com/office/drawing/2014/main" val="2708275910"/>
                   </a:ext>
                 </a:extLst>
               </a:tr>
@@ -31490,7 +31484,7 @@
                 </a:tc>
                 <a:extLst>
                   <a:ext uri="{0D108BD9-81ED-4DB2-BD59-A6C34878D82A}">
-                    <a16:rowId xmlns:a16="http://schemas.microsoft.com/office/drawing/2014/main" xmlns="" val="2161984115"/>
+                    <a16:rowId xmlns="" xmlns:a16="http://schemas.microsoft.com/office/drawing/2014/main" val="2161984115"/>
                   </a:ext>
                 </a:extLst>
               </a:tr>
@@ -31537,7 +31531,7 @@
                 </a:tc>
                 <a:extLst>
                   <a:ext uri="{0D108BD9-81ED-4DB2-BD59-A6C34878D82A}">
-                    <a16:rowId xmlns:a16="http://schemas.microsoft.com/office/drawing/2014/main" xmlns="" val="2841678841"/>
+                    <a16:rowId xmlns="" xmlns:a16="http://schemas.microsoft.com/office/drawing/2014/main" val="2841678841"/>
                   </a:ext>
                 </a:extLst>
               </a:tr>
@@ -31571,7 +31565,7 @@
                 </a:tc>
                 <a:extLst>
                   <a:ext uri="{0D108BD9-81ED-4DB2-BD59-A6C34878D82A}">
-                    <a16:rowId xmlns:a16="http://schemas.microsoft.com/office/drawing/2014/main" xmlns="" val="3144998627"/>
+                    <a16:rowId xmlns="" xmlns:a16="http://schemas.microsoft.com/office/drawing/2014/main" val="3144998627"/>
                   </a:ext>
                 </a:extLst>
               </a:tr>
@@ -31613,7 +31607,7 @@
                 </a:tc>
                 <a:extLst>
                   <a:ext uri="{0D108BD9-81ED-4DB2-BD59-A6C34878D82A}">
-                    <a16:rowId xmlns:a16="http://schemas.microsoft.com/office/drawing/2014/main" xmlns="" val="1419261869"/>
+                    <a16:rowId xmlns="" xmlns:a16="http://schemas.microsoft.com/office/drawing/2014/main" val="1419261869"/>
                   </a:ext>
                 </a:extLst>
               </a:tr>
@@ -31651,7 +31645,7 @@
                 </a:tc>
                 <a:extLst>
                   <a:ext uri="{0D108BD9-81ED-4DB2-BD59-A6C34878D82A}">
-                    <a16:rowId xmlns:a16="http://schemas.microsoft.com/office/drawing/2014/main" xmlns="" val="1427391072"/>
+                    <a16:rowId xmlns="" xmlns:a16="http://schemas.microsoft.com/office/drawing/2014/main" val="1427391072"/>
                   </a:ext>
                 </a:extLst>
               </a:tr>
@@ -31698,7 +31692,7 @@
                 </a:tc>
                 <a:extLst>
                   <a:ext uri="{0D108BD9-81ED-4DB2-BD59-A6C34878D82A}">
-                    <a16:rowId xmlns:a16="http://schemas.microsoft.com/office/drawing/2014/main" xmlns="" val="2346539918"/>
+                    <a16:rowId xmlns="" xmlns:a16="http://schemas.microsoft.com/office/drawing/2014/main" val="2346539918"/>
                   </a:ext>
                 </a:extLst>
               </a:tr>
@@ -31737,7 +31731,7 @@
                 </a:tc>
                 <a:extLst>
                   <a:ext uri="{0D108BD9-81ED-4DB2-BD59-A6C34878D82A}">
-                    <a16:rowId xmlns:a16="http://schemas.microsoft.com/office/drawing/2014/main" xmlns="" val="2275483042"/>
+                    <a16:rowId xmlns="" xmlns:a16="http://schemas.microsoft.com/office/drawing/2014/main" val="2275483042"/>
                   </a:ext>
                 </a:extLst>
               </a:tr>
@@ -31775,7 +31769,7 @@
                 </a:tc>
                 <a:extLst>
                   <a:ext uri="{0D108BD9-81ED-4DB2-BD59-A6C34878D82A}">
-                    <a16:rowId xmlns:a16="http://schemas.microsoft.com/office/drawing/2014/main" xmlns="" val="4202569347"/>
+                    <a16:rowId xmlns="" xmlns:a16="http://schemas.microsoft.com/office/drawing/2014/main" val="4202569347"/>
                   </a:ext>
                 </a:extLst>
               </a:tr>
@@ -31809,7 +31803,7 @@
                 </a:tc>
                 <a:extLst>
                   <a:ext uri="{0D108BD9-81ED-4DB2-BD59-A6C34878D82A}">
-                    <a16:rowId xmlns:a16="http://schemas.microsoft.com/office/drawing/2014/main" xmlns="" val="2989839269"/>
+                    <a16:rowId xmlns="" xmlns:a16="http://schemas.microsoft.com/office/drawing/2014/main" val="2989839269"/>
                   </a:ext>
                 </a:extLst>
               </a:tr>
@@ -31843,7 +31837,7 @@
                 </a:tc>
                 <a:extLst>
                   <a:ext uri="{0D108BD9-81ED-4DB2-BD59-A6C34878D82A}">
-                    <a16:rowId xmlns:a16="http://schemas.microsoft.com/office/drawing/2014/main" xmlns="" val="2130545569"/>
+                    <a16:rowId xmlns="" xmlns:a16="http://schemas.microsoft.com/office/drawing/2014/main" val="2130545569"/>
                   </a:ext>
                 </a:extLst>
               </a:tr>
@@ -31899,7 +31893,7 @@
                 </a:tc>
                 <a:extLst>
                   <a:ext uri="{0D108BD9-81ED-4DB2-BD59-A6C34878D82A}">
-                    <a16:rowId xmlns:a16="http://schemas.microsoft.com/office/drawing/2014/main" xmlns="" val="1848127216"/>
+                    <a16:rowId xmlns="" xmlns:a16="http://schemas.microsoft.com/office/drawing/2014/main" val="1848127216"/>
                   </a:ext>
                 </a:extLst>
               </a:tr>
@@ -31993,11 +31987,11 @@
   <p:clrMapOvr>
     <a:masterClrMapping/>
   </p:clrMapOvr>
-  <mc:AlternateContent xmlns:mc="http://schemas.openxmlformats.org/markup-compatibility/2006">
-    <mc:Choice xmlns:p14="http://schemas.microsoft.com/office/powerpoint/2010/main" Requires="p14">
+  <mc:AlternateContent xmlns:mc="http://schemas.openxmlformats.org/markup-compatibility/2006" xmlns:p14="http://schemas.microsoft.com/office/powerpoint/2010/main">
+    <mc:Choice Requires="p14">
       <p:transition spd="slow" p14:dur="2000"/>
     </mc:Choice>
-    <mc:Fallback>
+    <mc:Fallback xmlns="">
       <p:transition spd="slow"/>
     </mc:Fallback>
   </mc:AlternateContent>
@@ -32353,14 +32347,14 @@
                 <a:gridCol w="4119615">
                   <a:extLst>
                     <a:ext uri="{9D8B030D-6E8A-4147-A177-3AD203B41FA5}">
-                      <a16:colId xmlns:a16="http://schemas.microsoft.com/office/drawing/2014/main" xmlns="" val="3644048045"/>
+                      <a16:colId xmlns="" xmlns:a16="http://schemas.microsoft.com/office/drawing/2014/main" val="3644048045"/>
                     </a:ext>
                   </a:extLst>
                 </a:gridCol>
                 <a:gridCol w="4119613">
                   <a:extLst>
                     <a:ext uri="{9D8B030D-6E8A-4147-A177-3AD203B41FA5}">
-                      <a16:colId xmlns:a16="http://schemas.microsoft.com/office/drawing/2014/main" xmlns="" val="2034254753"/>
+                      <a16:colId xmlns="" xmlns:a16="http://schemas.microsoft.com/office/drawing/2014/main" val="2034254753"/>
                     </a:ext>
                   </a:extLst>
                 </a:gridCol>
@@ -32396,7 +32390,7 @@
                 </a:tc>
                 <a:extLst>
                   <a:ext uri="{0D108BD9-81ED-4DB2-BD59-A6C34878D82A}">
-                    <a16:rowId xmlns:a16="http://schemas.microsoft.com/office/drawing/2014/main" xmlns="" val="2708275910"/>
+                    <a16:rowId xmlns="" xmlns:a16="http://schemas.microsoft.com/office/drawing/2014/main" val="2708275910"/>
                   </a:ext>
                 </a:extLst>
               </a:tr>
@@ -32596,7 +32590,7 @@
                 </a:tc>
                 <a:extLst>
                   <a:ext uri="{0D108BD9-81ED-4DB2-BD59-A6C34878D82A}">
-                    <a16:rowId xmlns:a16="http://schemas.microsoft.com/office/drawing/2014/main" xmlns="" val="2161984115"/>
+                    <a16:rowId xmlns="" xmlns:a16="http://schemas.microsoft.com/office/drawing/2014/main" val="2161984115"/>
                   </a:ext>
                 </a:extLst>
               </a:tr>
@@ -32796,7 +32790,7 @@
                 </a:tc>
                 <a:extLst>
                   <a:ext uri="{0D108BD9-81ED-4DB2-BD59-A6C34878D82A}">
-                    <a16:rowId xmlns:a16="http://schemas.microsoft.com/office/drawing/2014/main" xmlns="" val="2841678841"/>
+                    <a16:rowId xmlns="" xmlns:a16="http://schemas.microsoft.com/office/drawing/2014/main" val="2841678841"/>
                   </a:ext>
                 </a:extLst>
               </a:tr>
@@ -32996,7 +32990,7 @@
                 </a:tc>
                 <a:extLst>
                   <a:ext uri="{0D108BD9-81ED-4DB2-BD59-A6C34878D82A}">
-                    <a16:rowId xmlns:a16="http://schemas.microsoft.com/office/drawing/2014/main" xmlns="" val="3144998627"/>
+                    <a16:rowId xmlns="" xmlns:a16="http://schemas.microsoft.com/office/drawing/2014/main" val="3144998627"/>
                   </a:ext>
                 </a:extLst>
               </a:tr>
@@ -33196,7 +33190,7 @@
                 </a:tc>
                 <a:extLst>
                   <a:ext uri="{0D108BD9-81ED-4DB2-BD59-A6C34878D82A}">
-                    <a16:rowId xmlns:a16="http://schemas.microsoft.com/office/drawing/2014/main" xmlns="" val="1419261869"/>
+                    <a16:rowId xmlns="" xmlns:a16="http://schemas.microsoft.com/office/drawing/2014/main" val="1419261869"/>
                   </a:ext>
                 </a:extLst>
               </a:tr>
@@ -33396,7 +33390,7 @@
                 </a:tc>
                 <a:extLst>
                   <a:ext uri="{0D108BD9-81ED-4DB2-BD59-A6C34878D82A}">
-                    <a16:rowId xmlns:a16="http://schemas.microsoft.com/office/drawing/2014/main" xmlns="" val="1427391072"/>
+                    <a16:rowId xmlns="" xmlns:a16="http://schemas.microsoft.com/office/drawing/2014/main" val="1427391072"/>
                   </a:ext>
                 </a:extLst>
               </a:tr>
@@ -33596,7 +33590,7 @@
                 </a:tc>
                 <a:extLst>
                   <a:ext uri="{0D108BD9-81ED-4DB2-BD59-A6C34878D82A}">
-                    <a16:rowId xmlns:a16="http://schemas.microsoft.com/office/drawing/2014/main" xmlns="" val="2346539918"/>
+                    <a16:rowId xmlns="" xmlns:a16="http://schemas.microsoft.com/office/drawing/2014/main" val="2346539918"/>
                   </a:ext>
                 </a:extLst>
               </a:tr>
@@ -33805,7 +33799,7 @@
                 </a:tc>
                 <a:extLst>
                   <a:ext uri="{0D108BD9-81ED-4DB2-BD59-A6C34878D82A}">
-                    <a16:rowId xmlns:a16="http://schemas.microsoft.com/office/drawing/2014/main" xmlns="" val="2275483042"/>
+                    <a16:rowId xmlns="" xmlns:a16="http://schemas.microsoft.com/office/drawing/2014/main" val="2275483042"/>
                   </a:ext>
                 </a:extLst>
               </a:tr>
@@ -34014,7 +34008,7 @@
                 </a:tc>
                 <a:extLst>
                   <a:ext uri="{0D108BD9-81ED-4DB2-BD59-A6C34878D82A}">
-                    <a16:rowId xmlns:a16="http://schemas.microsoft.com/office/drawing/2014/main" xmlns="" val="4202569347"/>
+                    <a16:rowId xmlns="" xmlns:a16="http://schemas.microsoft.com/office/drawing/2014/main" val="4202569347"/>
                   </a:ext>
                 </a:extLst>
               </a:tr>
@@ -34223,7 +34217,7 @@
                 </a:tc>
                 <a:extLst>
                   <a:ext uri="{0D108BD9-81ED-4DB2-BD59-A6C34878D82A}">
-                    <a16:rowId xmlns:a16="http://schemas.microsoft.com/office/drawing/2014/main" xmlns="" val="2989839269"/>
+                    <a16:rowId xmlns="" xmlns:a16="http://schemas.microsoft.com/office/drawing/2014/main" val="2989839269"/>
                   </a:ext>
                 </a:extLst>
               </a:tr>
@@ -34432,7 +34426,7 @@
                 </a:tc>
                 <a:extLst>
                   <a:ext uri="{0D108BD9-81ED-4DB2-BD59-A6C34878D82A}">
-                    <a16:rowId xmlns:a16="http://schemas.microsoft.com/office/drawing/2014/main" xmlns="" val="2130545569"/>
+                    <a16:rowId xmlns="" xmlns:a16="http://schemas.microsoft.com/office/drawing/2014/main" val="2130545569"/>
                   </a:ext>
                 </a:extLst>
               </a:tr>
@@ -34641,7 +34635,7 @@
                 </a:tc>
                 <a:extLst>
                   <a:ext uri="{0D108BD9-81ED-4DB2-BD59-A6C34878D82A}">
-                    <a16:rowId xmlns:a16="http://schemas.microsoft.com/office/drawing/2014/main" xmlns="" val="3045796785"/>
+                    <a16:rowId xmlns="" xmlns:a16="http://schemas.microsoft.com/office/drawing/2014/main" val="3045796785"/>
                   </a:ext>
                 </a:extLst>
               </a:tr>
@@ -34850,7 +34844,7 @@
                 </a:tc>
                 <a:extLst>
                   <a:ext uri="{0D108BD9-81ED-4DB2-BD59-A6C34878D82A}">
-                    <a16:rowId xmlns:a16="http://schemas.microsoft.com/office/drawing/2014/main" xmlns="" val="1091494175"/>
+                    <a16:rowId xmlns="" xmlns:a16="http://schemas.microsoft.com/office/drawing/2014/main" val="1091494175"/>
                   </a:ext>
                 </a:extLst>
               </a:tr>
@@ -34868,11 +34862,11 @@
   <p:clrMapOvr>
     <a:masterClrMapping/>
   </p:clrMapOvr>
-  <mc:AlternateContent xmlns:mc="http://schemas.openxmlformats.org/markup-compatibility/2006">
-    <mc:Choice xmlns:p14="http://schemas.microsoft.com/office/powerpoint/2010/main" Requires="p14">
+  <mc:AlternateContent xmlns:mc="http://schemas.openxmlformats.org/markup-compatibility/2006" xmlns:p14="http://schemas.microsoft.com/office/powerpoint/2010/main">
+    <mc:Choice Requires="p14">
       <p:transition spd="slow" p14:dur="2000"/>
     </mc:Choice>
-    <mc:Fallback>
+    <mc:Fallback xmlns="">
       <p:transition spd="slow"/>
     </mc:Fallback>
   </mc:AlternateContent>
@@ -34988,11 +34982,11 @@
   <p:clrMapOvr>
     <a:masterClrMapping/>
   </p:clrMapOvr>
-  <mc:AlternateContent xmlns:mc="http://schemas.openxmlformats.org/markup-compatibility/2006">
-    <mc:Choice xmlns:p14="http://schemas.microsoft.com/office/powerpoint/2010/main" Requires="p14">
+  <mc:AlternateContent xmlns:mc="http://schemas.openxmlformats.org/markup-compatibility/2006" xmlns:p14="http://schemas.microsoft.com/office/powerpoint/2010/main">
+    <mc:Choice Requires="p14">
       <p:transition spd="slow" p14:dur="2000"/>
     </mc:Choice>
-    <mc:Fallback>
+    <mc:Fallback xmlns="">
       <p:transition spd="slow"/>
     </mc:Fallback>
   </mc:AlternateContent>
@@ -35279,11 +35273,11 @@
   <p:clrMapOvr>
     <a:masterClrMapping/>
   </p:clrMapOvr>
-  <mc:AlternateContent xmlns:mc="http://schemas.openxmlformats.org/markup-compatibility/2006">
-    <mc:Choice xmlns:p14="http://schemas.microsoft.com/office/powerpoint/2010/main" Requires="p14">
+  <mc:AlternateContent xmlns:mc="http://schemas.openxmlformats.org/markup-compatibility/2006" xmlns:p14="http://schemas.microsoft.com/office/powerpoint/2010/main">
+    <mc:Choice Requires="p14">
       <p:transition spd="slow" p14:dur="2000"/>
     </mc:Choice>
-    <mc:Fallback>
+    <mc:Fallback xmlns="">
       <p:transition spd="slow"/>
     </mc:Fallback>
   </mc:AlternateContent>
@@ -35983,11 +35977,11 @@
   <p:clrMapOvr>
     <a:masterClrMapping/>
   </p:clrMapOvr>
-  <mc:AlternateContent xmlns:mc="http://schemas.openxmlformats.org/markup-compatibility/2006">
-    <mc:Choice xmlns:p14="http://schemas.microsoft.com/office/powerpoint/2010/main" Requires="p14">
+  <mc:AlternateContent xmlns:mc="http://schemas.openxmlformats.org/markup-compatibility/2006" xmlns:p14="http://schemas.microsoft.com/office/powerpoint/2010/main">
+    <mc:Choice Requires="p14">
       <p:transition spd="slow" p14:dur="2000"/>
     </mc:Choice>
-    <mc:Fallback>
+    <mc:Fallback xmlns="">
       <p:transition spd="slow"/>
     </mc:Fallback>
   </mc:AlternateContent>
@@ -36158,11 +36152,11 @@
   <p:clrMapOvr>
     <a:masterClrMapping/>
   </p:clrMapOvr>
-  <mc:AlternateContent xmlns:mc="http://schemas.openxmlformats.org/markup-compatibility/2006">
-    <mc:Choice xmlns:p14="http://schemas.microsoft.com/office/powerpoint/2010/main" Requires="p14">
+  <mc:AlternateContent xmlns:mc="http://schemas.openxmlformats.org/markup-compatibility/2006" xmlns:p14="http://schemas.microsoft.com/office/powerpoint/2010/main">
+    <mc:Choice Requires="p14">
       <p:transition spd="slow" p14:dur="2000"/>
     </mc:Choice>
-    <mc:Fallback>
+    <mc:Fallback xmlns="">
       <p:transition spd="slow"/>
     </mc:Fallback>
   </mc:AlternateContent>
@@ -36266,11 +36260,11 @@
   <p:clrMapOvr>
     <a:masterClrMapping/>
   </p:clrMapOvr>
-  <mc:AlternateContent xmlns:mc="http://schemas.openxmlformats.org/markup-compatibility/2006">
-    <mc:Choice xmlns:p14="http://schemas.microsoft.com/office/powerpoint/2010/main" Requires="p14">
+  <mc:AlternateContent xmlns:mc="http://schemas.openxmlformats.org/markup-compatibility/2006" xmlns:p14="http://schemas.microsoft.com/office/powerpoint/2010/main">
+    <mc:Choice Requires="p14">
       <p:transition spd="slow" p14:dur="2000"/>
     </mc:Choice>
-    <mc:Fallback>
+    <mc:Fallback xmlns="">
       <p:transition spd="slow"/>
     </mc:Fallback>
   </mc:AlternateContent>
@@ -36686,11 +36680,11 @@
   <p:clrMapOvr>
     <a:masterClrMapping/>
   </p:clrMapOvr>
-  <mc:AlternateContent xmlns:mc="http://schemas.openxmlformats.org/markup-compatibility/2006">
-    <mc:Choice xmlns:p14="http://schemas.microsoft.com/office/powerpoint/2010/main" Requires="p14">
+  <mc:AlternateContent xmlns:mc="http://schemas.openxmlformats.org/markup-compatibility/2006" xmlns:p14="http://schemas.microsoft.com/office/powerpoint/2010/main">
+    <mc:Choice Requires="p14">
       <p:transition spd="slow" p14:dur="2000"/>
     </mc:Choice>
-    <mc:Fallback>
+    <mc:Fallback xmlns="">
       <p:transition spd="slow"/>
     </mc:Fallback>
   </mc:AlternateContent>
@@ -37946,11 +37940,11 @@
   <p:clrMapOvr>
     <a:masterClrMapping/>
   </p:clrMapOvr>
-  <mc:AlternateContent xmlns:mc="http://schemas.openxmlformats.org/markup-compatibility/2006">
-    <mc:Choice xmlns:p14="http://schemas.microsoft.com/office/powerpoint/2010/main" Requires="p14">
+  <mc:AlternateContent xmlns:mc="http://schemas.openxmlformats.org/markup-compatibility/2006" xmlns:p14="http://schemas.microsoft.com/office/powerpoint/2010/main">
+    <mc:Choice Requires="p14">
       <p:transition spd="slow" p14:dur="2000"/>
     </mc:Choice>
-    <mc:Fallback>
+    <mc:Fallback xmlns="">
       <p:transition spd="slow"/>
     </mc:Fallback>
   </mc:AlternateContent>
@@ -38745,14 +38739,14 @@
                 <a:gridCol w="957714">
                   <a:extLst>
                     <a:ext uri="{9D8B030D-6E8A-4147-A177-3AD203B41FA5}">
-                      <a16:colId xmlns:a16="http://schemas.microsoft.com/office/drawing/2014/main" xmlns="" val="3940544257"/>
+                      <a16:colId xmlns="" xmlns:a16="http://schemas.microsoft.com/office/drawing/2014/main" val="3940544257"/>
                     </a:ext>
                   </a:extLst>
                 </a:gridCol>
                 <a:gridCol w="2464067">
                   <a:extLst>
                     <a:ext uri="{9D8B030D-6E8A-4147-A177-3AD203B41FA5}">
-                      <a16:colId xmlns:a16="http://schemas.microsoft.com/office/drawing/2014/main" xmlns="" val="3658567973"/>
+                      <a16:colId xmlns="" xmlns:a16="http://schemas.microsoft.com/office/drawing/2014/main" val="3658567973"/>
                     </a:ext>
                   </a:extLst>
                 </a:gridCol>
@@ -38786,7 +38780,7 @@
                 </a:tc>
                 <a:extLst>
                   <a:ext uri="{0D108BD9-81ED-4DB2-BD59-A6C34878D82A}">
-                    <a16:rowId xmlns:a16="http://schemas.microsoft.com/office/drawing/2014/main" xmlns="" val="1032275335"/>
+                    <a16:rowId xmlns="" xmlns:a16="http://schemas.microsoft.com/office/drawing/2014/main" val="1032275335"/>
                   </a:ext>
                 </a:extLst>
               </a:tr>
@@ -38916,7 +38910,7 @@
                 </a:tc>
                 <a:extLst>
                   <a:ext uri="{0D108BD9-81ED-4DB2-BD59-A6C34878D82A}">
-                    <a16:rowId xmlns:a16="http://schemas.microsoft.com/office/drawing/2014/main" xmlns="" val="4191484087"/>
+                    <a16:rowId xmlns="" xmlns:a16="http://schemas.microsoft.com/office/drawing/2014/main" val="4191484087"/>
                   </a:ext>
                 </a:extLst>
               </a:tr>
@@ -38990,7 +38984,7 @@
                 </a:tc>
                 <a:extLst>
                   <a:ext uri="{0D108BD9-81ED-4DB2-BD59-A6C34878D82A}">
-                    <a16:rowId xmlns:a16="http://schemas.microsoft.com/office/drawing/2014/main" xmlns="" val="1864588626"/>
+                    <a16:rowId xmlns="" xmlns:a16="http://schemas.microsoft.com/office/drawing/2014/main" val="1864588626"/>
                   </a:ext>
                 </a:extLst>
               </a:tr>
@@ -39112,7 +39106,7 @@
                 </a:tc>
                 <a:extLst>
                   <a:ext uri="{0D108BD9-81ED-4DB2-BD59-A6C34878D82A}">
-                    <a16:rowId xmlns:a16="http://schemas.microsoft.com/office/drawing/2014/main" xmlns="" val="3035259714"/>
+                    <a16:rowId xmlns="" xmlns:a16="http://schemas.microsoft.com/office/drawing/2014/main" val="3035259714"/>
                   </a:ext>
                 </a:extLst>
               </a:tr>
@@ -39201,7 +39195,7 @@
                 </a:tc>
                 <a:extLst>
                   <a:ext uri="{0D108BD9-81ED-4DB2-BD59-A6C34878D82A}">
-                    <a16:rowId xmlns:a16="http://schemas.microsoft.com/office/drawing/2014/main" xmlns="" val="2023621082"/>
+                    <a16:rowId xmlns="" xmlns:a16="http://schemas.microsoft.com/office/drawing/2014/main" val="2023621082"/>
                   </a:ext>
                 </a:extLst>
               </a:tr>
@@ -39290,7 +39284,7 @@
                 </a:tc>
                 <a:extLst>
                   <a:ext uri="{0D108BD9-81ED-4DB2-BD59-A6C34878D82A}">
-                    <a16:rowId xmlns:a16="http://schemas.microsoft.com/office/drawing/2014/main" xmlns="" val="120016333"/>
+                    <a16:rowId xmlns="" xmlns:a16="http://schemas.microsoft.com/office/drawing/2014/main" val="120016333"/>
                   </a:ext>
                 </a:extLst>
               </a:tr>
@@ -39435,21 +39429,21 @@
                 <a:gridCol w="960120">
                   <a:extLst>
                     <a:ext uri="{9D8B030D-6E8A-4147-A177-3AD203B41FA5}">
-                      <a16:colId xmlns:a16="http://schemas.microsoft.com/office/drawing/2014/main" xmlns="" val="392696932"/>
+                      <a16:colId xmlns="" xmlns:a16="http://schemas.microsoft.com/office/drawing/2014/main" val="392696932"/>
                     </a:ext>
                   </a:extLst>
                 </a:gridCol>
                 <a:gridCol w="2468880">
                   <a:extLst>
                     <a:ext uri="{9D8B030D-6E8A-4147-A177-3AD203B41FA5}">
-                      <a16:colId xmlns:a16="http://schemas.microsoft.com/office/drawing/2014/main" xmlns="" val="2769969192"/>
+                      <a16:colId xmlns="" xmlns:a16="http://schemas.microsoft.com/office/drawing/2014/main" val="2769969192"/>
                     </a:ext>
                   </a:extLst>
                 </a:gridCol>
                 <a:gridCol w="2468880">
                   <a:extLst>
                     <a:ext uri="{9D8B030D-6E8A-4147-A177-3AD203B41FA5}">
-                      <a16:colId xmlns:a16="http://schemas.microsoft.com/office/drawing/2014/main" xmlns="" val="2022610816"/>
+                      <a16:colId xmlns="" xmlns:a16="http://schemas.microsoft.com/office/drawing/2014/main" val="2022610816"/>
                     </a:ext>
                   </a:extLst>
                 </a:gridCol>
@@ -39501,7 +39495,7 @@
                 </a:tc>
                 <a:extLst>
                   <a:ext uri="{0D108BD9-81ED-4DB2-BD59-A6C34878D82A}">
-                    <a16:rowId xmlns:a16="http://schemas.microsoft.com/office/drawing/2014/main" xmlns="" val="2344937666"/>
+                    <a16:rowId xmlns="" xmlns:a16="http://schemas.microsoft.com/office/drawing/2014/main" val="2344937666"/>
                   </a:ext>
                 </a:extLst>
               </a:tr>
@@ -39634,7 +39628,7 @@
                 </a:tc>
                 <a:extLst>
                   <a:ext uri="{0D108BD9-81ED-4DB2-BD59-A6C34878D82A}">
-                    <a16:rowId xmlns:a16="http://schemas.microsoft.com/office/drawing/2014/main" xmlns="" val="1917341330"/>
+                    <a16:rowId xmlns="" xmlns:a16="http://schemas.microsoft.com/office/drawing/2014/main" val="1917341330"/>
                   </a:ext>
                 </a:extLst>
               </a:tr>
@@ -39851,7 +39845,7 @@
                 </a:tc>
                 <a:extLst>
                   <a:ext uri="{0D108BD9-81ED-4DB2-BD59-A6C34878D82A}">
-                    <a16:rowId xmlns:a16="http://schemas.microsoft.com/office/drawing/2014/main" xmlns="" val="3088042860"/>
+                    <a16:rowId xmlns="" xmlns:a16="http://schemas.microsoft.com/office/drawing/2014/main" val="3088042860"/>
                   </a:ext>
                 </a:extLst>
               </a:tr>
@@ -39935,7 +39929,7 @@
                 </a:tc>
                 <a:extLst>
                   <a:ext uri="{0D108BD9-81ED-4DB2-BD59-A6C34878D82A}">
-                    <a16:rowId xmlns:a16="http://schemas.microsoft.com/office/drawing/2014/main" xmlns="" val="2658530722"/>
+                    <a16:rowId xmlns="" xmlns:a16="http://schemas.microsoft.com/office/drawing/2014/main" val="2658530722"/>
                   </a:ext>
                 </a:extLst>
               </a:tr>
@@ -40067,7 +40061,7 @@
                 </a:tc>
                 <a:extLst>
                   <a:ext uri="{0D108BD9-81ED-4DB2-BD59-A6C34878D82A}">
-                    <a16:rowId xmlns:a16="http://schemas.microsoft.com/office/drawing/2014/main" xmlns="" val="1481886367"/>
+                    <a16:rowId xmlns="" xmlns:a16="http://schemas.microsoft.com/office/drawing/2014/main" val="1481886367"/>
                   </a:ext>
                 </a:extLst>
               </a:tr>
@@ -40166,7 +40160,7 @@
                 </a:tc>
                 <a:extLst>
                   <a:ext uri="{0D108BD9-81ED-4DB2-BD59-A6C34878D82A}">
-                    <a16:rowId xmlns:a16="http://schemas.microsoft.com/office/drawing/2014/main" xmlns="" val="4248384778"/>
+                    <a16:rowId xmlns="" xmlns:a16="http://schemas.microsoft.com/office/drawing/2014/main" val="4248384778"/>
                   </a:ext>
                 </a:extLst>
               </a:tr>
@@ -40265,7 +40259,7 @@
                 </a:tc>
                 <a:extLst>
                   <a:ext uri="{0D108BD9-81ED-4DB2-BD59-A6C34878D82A}">
-                    <a16:rowId xmlns:a16="http://schemas.microsoft.com/office/drawing/2014/main" xmlns="" val="1670483340"/>
+                    <a16:rowId xmlns="" xmlns:a16="http://schemas.microsoft.com/office/drawing/2014/main" val="1670483340"/>
                   </a:ext>
                 </a:extLst>
               </a:tr>
@@ -40410,28 +40404,28 @@
                 <a:gridCol w="960120">
                   <a:extLst>
                     <a:ext uri="{9D8B030D-6E8A-4147-A177-3AD203B41FA5}">
-                      <a16:colId xmlns:a16="http://schemas.microsoft.com/office/drawing/2014/main" xmlns="" val="392696932"/>
+                      <a16:colId xmlns="" xmlns:a16="http://schemas.microsoft.com/office/drawing/2014/main" val="392696932"/>
                     </a:ext>
                   </a:extLst>
                 </a:gridCol>
                 <a:gridCol w="2468880">
                   <a:extLst>
                     <a:ext uri="{9D8B030D-6E8A-4147-A177-3AD203B41FA5}">
-                      <a16:colId xmlns:a16="http://schemas.microsoft.com/office/drawing/2014/main" xmlns="" val="2769969192"/>
+                      <a16:colId xmlns="" xmlns:a16="http://schemas.microsoft.com/office/drawing/2014/main" val="2769969192"/>
                     </a:ext>
                   </a:extLst>
                 </a:gridCol>
                 <a:gridCol w="2468880">
                   <a:extLst>
                     <a:ext uri="{9D8B030D-6E8A-4147-A177-3AD203B41FA5}">
-                      <a16:colId xmlns:a16="http://schemas.microsoft.com/office/drawing/2014/main" xmlns="" val="2022610816"/>
+                      <a16:colId xmlns="" xmlns:a16="http://schemas.microsoft.com/office/drawing/2014/main" val="2022610816"/>
                     </a:ext>
                   </a:extLst>
                 </a:gridCol>
                 <a:gridCol w="2468880">
                   <a:extLst>
                     <a:ext uri="{9D8B030D-6E8A-4147-A177-3AD203B41FA5}">
-                      <a16:colId xmlns:a16="http://schemas.microsoft.com/office/drawing/2014/main" xmlns="" val="102813283"/>
+                      <a16:colId xmlns="" xmlns:a16="http://schemas.microsoft.com/office/drawing/2014/main" val="102813283"/>
                     </a:ext>
                   </a:extLst>
                 </a:gridCol>
@@ -40496,7 +40490,7 @@
                 </a:tc>
                 <a:extLst>
                   <a:ext uri="{0D108BD9-81ED-4DB2-BD59-A6C34878D82A}">
-                    <a16:rowId xmlns:a16="http://schemas.microsoft.com/office/drawing/2014/main" xmlns="" val="2344937666"/>
+                    <a16:rowId xmlns="" xmlns:a16="http://schemas.microsoft.com/office/drawing/2014/main" val="2344937666"/>
                   </a:ext>
                 </a:extLst>
               </a:tr>
@@ -40656,7 +40650,7 @@
                 </a:tc>
                 <a:extLst>
                   <a:ext uri="{0D108BD9-81ED-4DB2-BD59-A6C34878D82A}">
-                    <a16:rowId xmlns:a16="http://schemas.microsoft.com/office/drawing/2014/main" xmlns="" val="1917341330"/>
+                    <a16:rowId xmlns="" xmlns:a16="http://schemas.microsoft.com/office/drawing/2014/main" val="1917341330"/>
                   </a:ext>
                 </a:extLst>
               </a:tr>
@@ -40960,7 +40954,7 @@
                 </a:tc>
                 <a:extLst>
                   <a:ext uri="{0D108BD9-81ED-4DB2-BD59-A6C34878D82A}">
-                    <a16:rowId xmlns:a16="http://schemas.microsoft.com/office/drawing/2014/main" xmlns="" val="3088042860"/>
+                    <a16:rowId xmlns="" xmlns:a16="http://schemas.microsoft.com/office/drawing/2014/main" val="3088042860"/>
                   </a:ext>
                 </a:extLst>
               </a:tr>
@@ -41054,7 +41048,7 @@
                 </a:tc>
                 <a:extLst>
                   <a:ext uri="{0D108BD9-81ED-4DB2-BD59-A6C34878D82A}">
-                    <a16:rowId xmlns:a16="http://schemas.microsoft.com/office/drawing/2014/main" xmlns="" val="2658530722"/>
+                    <a16:rowId xmlns="" xmlns:a16="http://schemas.microsoft.com/office/drawing/2014/main" val="2658530722"/>
                   </a:ext>
                 </a:extLst>
               </a:tr>
@@ -41247,7 +41241,7 @@
                 </a:tc>
                 <a:extLst>
                   <a:ext uri="{0D108BD9-81ED-4DB2-BD59-A6C34878D82A}">
-                    <a16:rowId xmlns:a16="http://schemas.microsoft.com/office/drawing/2014/main" xmlns="" val="1481886367"/>
+                    <a16:rowId xmlns="" xmlns:a16="http://schemas.microsoft.com/office/drawing/2014/main" val="1481886367"/>
                   </a:ext>
                 </a:extLst>
               </a:tr>
@@ -41356,7 +41350,7 @@
                 </a:tc>
                 <a:extLst>
                   <a:ext uri="{0D108BD9-81ED-4DB2-BD59-A6C34878D82A}">
-                    <a16:rowId xmlns:a16="http://schemas.microsoft.com/office/drawing/2014/main" xmlns="" val="4248384778"/>
+                    <a16:rowId xmlns="" xmlns:a16="http://schemas.microsoft.com/office/drawing/2014/main" val="4248384778"/>
                   </a:ext>
                 </a:extLst>
               </a:tr>
@@ -41465,7 +41459,7 @@
                 </a:tc>
                 <a:extLst>
                   <a:ext uri="{0D108BD9-81ED-4DB2-BD59-A6C34878D82A}">
-                    <a16:rowId xmlns:a16="http://schemas.microsoft.com/office/drawing/2014/main" xmlns="" val="1670483340"/>
+                    <a16:rowId xmlns="" xmlns:a16="http://schemas.microsoft.com/office/drawing/2014/main" val="1670483340"/>
                   </a:ext>
                 </a:extLst>
               </a:tr>
@@ -42423,11 +42417,11 @@
   <p:clrMapOvr>
     <a:masterClrMapping/>
   </p:clrMapOvr>
-  <mc:AlternateContent xmlns:mc="http://schemas.openxmlformats.org/markup-compatibility/2006">
-    <mc:Choice xmlns:p14="http://schemas.microsoft.com/office/powerpoint/2010/main" Requires="p14">
+  <mc:AlternateContent xmlns:mc="http://schemas.openxmlformats.org/markup-compatibility/2006" xmlns:p14="http://schemas.microsoft.com/office/powerpoint/2010/main">
+    <mc:Choice Requires="p14">
       <p:transition spd="slow" p14:dur="2000"/>
     </mc:Choice>
-    <mc:Fallback>
+    <mc:Fallback xmlns="">
       <p:transition spd="slow"/>
     </mc:Fallback>
   </mc:AlternateContent>
@@ -42502,14 +42496,14 @@
                 <a:gridCol w="934278">
                   <a:extLst>
                     <a:ext uri="{9D8B030D-6E8A-4147-A177-3AD203B41FA5}">
-                      <a16:colId xmlns:a16="http://schemas.microsoft.com/office/drawing/2014/main" xmlns="" val="4198655800"/>
+                      <a16:colId xmlns="" xmlns:a16="http://schemas.microsoft.com/office/drawing/2014/main" val="4198655800"/>
                     </a:ext>
                   </a:extLst>
                 </a:gridCol>
                 <a:gridCol w="7295322">
                   <a:extLst>
                     <a:ext uri="{9D8B030D-6E8A-4147-A177-3AD203B41FA5}">
-                      <a16:colId xmlns:a16="http://schemas.microsoft.com/office/drawing/2014/main" xmlns="" val="135413862"/>
+                      <a16:colId xmlns="" xmlns:a16="http://schemas.microsoft.com/office/drawing/2014/main" val="135413862"/>
                     </a:ext>
                   </a:extLst>
                 </a:gridCol>
@@ -42543,7 +42537,7 @@
                 </a:tc>
                 <a:extLst>
                   <a:ext uri="{0D108BD9-81ED-4DB2-BD59-A6C34878D82A}">
-                    <a16:rowId xmlns:a16="http://schemas.microsoft.com/office/drawing/2014/main" xmlns="" val="3068323444"/>
+                    <a16:rowId xmlns="" xmlns:a16="http://schemas.microsoft.com/office/drawing/2014/main" val="3068323444"/>
                   </a:ext>
                 </a:extLst>
               </a:tr>
@@ -42576,7 +42570,7 @@
                 </a:tc>
                 <a:extLst>
                   <a:ext uri="{0D108BD9-81ED-4DB2-BD59-A6C34878D82A}">
-                    <a16:rowId xmlns:a16="http://schemas.microsoft.com/office/drawing/2014/main" xmlns="" val="1586961909"/>
+                    <a16:rowId xmlns="" xmlns:a16="http://schemas.microsoft.com/office/drawing/2014/main" val="1586961909"/>
                   </a:ext>
                 </a:extLst>
               </a:tr>
@@ -42614,7 +42608,7 @@
                 </a:tc>
                 <a:extLst>
                   <a:ext uri="{0D108BD9-81ED-4DB2-BD59-A6C34878D82A}">
-                    <a16:rowId xmlns:a16="http://schemas.microsoft.com/office/drawing/2014/main" xmlns="" val="2280300197"/>
+                    <a16:rowId xmlns="" xmlns:a16="http://schemas.microsoft.com/office/drawing/2014/main" val="2280300197"/>
                   </a:ext>
                 </a:extLst>
               </a:tr>
@@ -42652,7 +42646,7 @@
                 </a:tc>
                 <a:extLst>
                   <a:ext uri="{0D108BD9-81ED-4DB2-BD59-A6C34878D82A}">
-                    <a16:rowId xmlns:a16="http://schemas.microsoft.com/office/drawing/2014/main" xmlns="" val="1192843310"/>
+                    <a16:rowId xmlns="" xmlns:a16="http://schemas.microsoft.com/office/drawing/2014/main" val="1192843310"/>
                   </a:ext>
                 </a:extLst>
               </a:tr>
@@ -42690,7 +42684,7 @@
                 </a:tc>
                 <a:extLst>
                   <a:ext uri="{0D108BD9-81ED-4DB2-BD59-A6C34878D82A}">
-                    <a16:rowId xmlns:a16="http://schemas.microsoft.com/office/drawing/2014/main" xmlns="" val="2620585158"/>
+                    <a16:rowId xmlns="" xmlns:a16="http://schemas.microsoft.com/office/drawing/2014/main" val="2620585158"/>
                   </a:ext>
                 </a:extLst>
               </a:tr>
@@ -42723,7 +42717,7 @@
                 </a:tc>
                 <a:extLst>
                   <a:ext uri="{0D108BD9-81ED-4DB2-BD59-A6C34878D82A}">
-                    <a16:rowId xmlns:a16="http://schemas.microsoft.com/office/drawing/2014/main" xmlns="" val="1697738616"/>
+                    <a16:rowId xmlns="" xmlns:a16="http://schemas.microsoft.com/office/drawing/2014/main" val="1697738616"/>
                   </a:ext>
                 </a:extLst>
               </a:tr>
@@ -42761,7 +42755,7 @@
                 </a:tc>
                 <a:extLst>
                   <a:ext uri="{0D108BD9-81ED-4DB2-BD59-A6C34878D82A}">
-                    <a16:rowId xmlns:a16="http://schemas.microsoft.com/office/drawing/2014/main" xmlns="" val="316611556"/>
+                    <a16:rowId xmlns="" xmlns:a16="http://schemas.microsoft.com/office/drawing/2014/main" val="316611556"/>
                   </a:ext>
                 </a:extLst>
               </a:tr>
@@ -42794,7 +42788,7 @@
                 </a:tc>
                 <a:extLst>
                   <a:ext uri="{0D108BD9-81ED-4DB2-BD59-A6C34878D82A}">
-                    <a16:rowId xmlns:a16="http://schemas.microsoft.com/office/drawing/2014/main" xmlns="" val="1312814102"/>
+                    <a16:rowId xmlns="" xmlns:a16="http://schemas.microsoft.com/office/drawing/2014/main" val="1312814102"/>
                   </a:ext>
                 </a:extLst>
               </a:tr>
@@ -42827,7 +42821,7 @@
                 </a:tc>
                 <a:extLst>
                   <a:ext uri="{0D108BD9-81ED-4DB2-BD59-A6C34878D82A}">
-                    <a16:rowId xmlns:a16="http://schemas.microsoft.com/office/drawing/2014/main" xmlns="" val="1975533996"/>
+                    <a16:rowId xmlns="" xmlns:a16="http://schemas.microsoft.com/office/drawing/2014/main" val="1975533996"/>
                   </a:ext>
                 </a:extLst>
               </a:tr>
@@ -42860,7 +42854,7 @@
                 </a:tc>
                 <a:extLst>
                   <a:ext uri="{0D108BD9-81ED-4DB2-BD59-A6C34878D82A}">
-                    <a16:rowId xmlns:a16="http://schemas.microsoft.com/office/drawing/2014/main" xmlns="" val="2759032957"/>
+                    <a16:rowId xmlns="" xmlns:a16="http://schemas.microsoft.com/office/drawing/2014/main" val="2759032957"/>
                   </a:ext>
                 </a:extLst>
               </a:tr>
@@ -42949,14 +42943,14 @@
                 <a:gridCol w="934278">
                   <a:extLst>
                     <a:ext uri="{9D8B030D-6E8A-4147-A177-3AD203B41FA5}">
-                      <a16:colId xmlns:a16="http://schemas.microsoft.com/office/drawing/2014/main" xmlns="" val="4198655800"/>
+                      <a16:colId xmlns="" xmlns:a16="http://schemas.microsoft.com/office/drawing/2014/main" val="4198655800"/>
                     </a:ext>
                   </a:extLst>
                 </a:gridCol>
                 <a:gridCol w="7295322">
                   <a:extLst>
                     <a:ext uri="{9D8B030D-6E8A-4147-A177-3AD203B41FA5}">
-                      <a16:colId xmlns:a16="http://schemas.microsoft.com/office/drawing/2014/main" xmlns="" val="135413862"/>
+                      <a16:colId xmlns="" xmlns:a16="http://schemas.microsoft.com/office/drawing/2014/main" val="135413862"/>
                     </a:ext>
                   </a:extLst>
                 </a:gridCol>
@@ -42990,7 +42984,7 @@
                 </a:tc>
                 <a:extLst>
                   <a:ext uri="{0D108BD9-81ED-4DB2-BD59-A6C34878D82A}">
-                    <a16:rowId xmlns:a16="http://schemas.microsoft.com/office/drawing/2014/main" xmlns="" val="3068323444"/>
+                    <a16:rowId xmlns="" xmlns:a16="http://schemas.microsoft.com/office/drawing/2014/main" val="3068323444"/>
                   </a:ext>
                 </a:extLst>
               </a:tr>
@@ -43023,7 +43017,7 @@
                 </a:tc>
                 <a:extLst>
                   <a:ext uri="{0D108BD9-81ED-4DB2-BD59-A6C34878D82A}">
-                    <a16:rowId xmlns:a16="http://schemas.microsoft.com/office/drawing/2014/main" xmlns="" val="2484981654"/>
+                    <a16:rowId xmlns="" xmlns:a16="http://schemas.microsoft.com/office/drawing/2014/main" val="2484981654"/>
                   </a:ext>
                 </a:extLst>
               </a:tr>
@@ -43061,7 +43055,7 @@
                 </a:tc>
                 <a:extLst>
                   <a:ext uri="{0D108BD9-81ED-4DB2-BD59-A6C34878D82A}">
-                    <a16:rowId xmlns:a16="http://schemas.microsoft.com/office/drawing/2014/main" xmlns="" val="1377910784"/>
+                    <a16:rowId xmlns="" xmlns:a16="http://schemas.microsoft.com/office/drawing/2014/main" val="1377910784"/>
                   </a:ext>
                 </a:extLst>
               </a:tr>
@@ -43094,7 +43088,7 @@
                 </a:tc>
                 <a:extLst>
                   <a:ext uri="{0D108BD9-81ED-4DB2-BD59-A6C34878D82A}">
-                    <a16:rowId xmlns:a16="http://schemas.microsoft.com/office/drawing/2014/main" xmlns="" val="1387856053"/>
+                    <a16:rowId xmlns="" xmlns:a16="http://schemas.microsoft.com/office/drawing/2014/main" val="1387856053"/>
                   </a:ext>
                 </a:extLst>
               </a:tr>
@@ -43132,7 +43126,7 @@
                 </a:tc>
                 <a:extLst>
                   <a:ext uri="{0D108BD9-81ED-4DB2-BD59-A6C34878D82A}">
-                    <a16:rowId xmlns:a16="http://schemas.microsoft.com/office/drawing/2014/main" xmlns="" val="2599123823"/>
+                    <a16:rowId xmlns="" xmlns:a16="http://schemas.microsoft.com/office/drawing/2014/main" val="2599123823"/>
                   </a:ext>
                 </a:extLst>
               </a:tr>
@@ -43173,7 +43167,7 @@
                 </a:tc>
                 <a:extLst>
                   <a:ext uri="{0D108BD9-81ED-4DB2-BD59-A6C34878D82A}">
-                    <a16:rowId xmlns:a16="http://schemas.microsoft.com/office/drawing/2014/main" xmlns="" val="1232603862"/>
+                    <a16:rowId xmlns="" xmlns:a16="http://schemas.microsoft.com/office/drawing/2014/main" val="1232603862"/>
                   </a:ext>
                 </a:extLst>
               </a:tr>
@@ -43206,7 +43200,7 @@
                 </a:tc>
                 <a:extLst>
                   <a:ext uri="{0D108BD9-81ED-4DB2-BD59-A6C34878D82A}">
-                    <a16:rowId xmlns:a16="http://schemas.microsoft.com/office/drawing/2014/main" xmlns="" val="4145944521"/>
+                    <a16:rowId xmlns="" xmlns:a16="http://schemas.microsoft.com/office/drawing/2014/main" val="4145944521"/>
                   </a:ext>
                 </a:extLst>
               </a:tr>
@@ -43244,7 +43238,7 @@
                 </a:tc>
                 <a:extLst>
                   <a:ext uri="{0D108BD9-81ED-4DB2-BD59-A6C34878D82A}">
-                    <a16:rowId xmlns:a16="http://schemas.microsoft.com/office/drawing/2014/main" xmlns="" val="2954677722"/>
+                    <a16:rowId xmlns="" xmlns:a16="http://schemas.microsoft.com/office/drawing/2014/main" val="2954677722"/>
                   </a:ext>
                 </a:extLst>
               </a:tr>
@@ -43277,7 +43271,7 @@
                 </a:tc>
                 <a:extLst>
                   <a:ext uri="{0D108BD9-81ED-4DB2-BD59-A6C34878D82A}">
-                    <a16:rowId xmlns:a16="http://schemas.microsoft.com/office/drawing/2014/main" xmlns="" val="205903975"/>
+                    <a16:rowId xmlns="" xmlns:a16="http://schemas.microsoft.com/office/drawing/2014/main" val="205903975"/>
                   </a:ext>
                 </a:extLst>
               </a:tr>
@@ -43310,7 +43304,7 @@
                 </a:tc>
                 <a:extLst>
                   <a:ext uri="{0D108BD9-81ED-4DB2-BD59-A6C34878D82A}">
-                    <a16:rowId xmlns:a16="http://schemas.microsoft.com/office/drawing/2014/main" xmlns="" val="2893595017"/>
+                    <a16:rowId xmlns="" xmlns:a16="http://schemas.microsoft.com/office/drawing/2014/main" val="2893595017"/>
                   </a:ext>
                 </a:extLst>
               </a:tr>
@@ -43343,7 +43337,7 @@
                 </a:tc>
                 <a:extLst>
                   <a:ext uri="{0D108BD9-81ED-4DB2-BD59-A6C34878D82A}">
-                    <a16:rowId xmlns:a16="http://schemas.microsoft.com/office/drawing/2014/main" xmlns="" val="2337380595"/>
+                    <a16:rowId xmlns="" xmlns:a16="http://schemas.microsoft.com/office/drawing/2014/main" val="2337380595"/>
                   </a:ext>
                 </a:extLst>
               </a:tr>
@@ -44602,11 +44596,11 @@
   <p:clrMapOvr>
     <a:masterClrMapping/>
   </p:clrMapOvr>
-  <mc:AlternateContent xmlns:mc="http://schemas.openxmlformats.org/markup-compatibility/2006">
-    <mc:Choice xmlns:p14="http://schemas.microsoft.com/office/powerpoint/2010/main" Requires="p14">
+  <mc:AlternateContent xmlns:mc="http://schemas.openxmlformats.org/markup-compatibility/2006" xmlns:p14="http://schemas.microsoft.com/office/powerpoint/2010/main">
+    <mc:Choice Requires="p14">
       <p:transition spd="slow" p14:dur="2000"/>
     </mc:Choice>
-    <mc:Fallback>
+    <mc:Fallback xmlns="">
       <p:transition spd="slow"/>
     </mc:Fallback>
   </mc:AlternateContent>
@@ -45232,11 +45226,11 @@
   <p:clrMapOvr>
     <a:masterClrMapping/>
   </p:clrMapOvr>
-  <mc:AlternateContent xmlns:mc="http://schemas.openxmlformats.org/markup-compatibility/2006">
-    <mc:Choice xmlns:p14="http://schemas.microsoft.com/office/powerpoint/2010/main" Requires="p14">
+  <mc:AlternateContent xmlns:mc="http://schemas.openxmlformats.org/markup-compatibility/2006" xmlns:p14="http://schemas.microsoft.com/office/powerpoint/2010/main">
+    <mc:Choice Requires="p14">
       <p:transition spd="slow" p14:dur="2000"/>
     </mc:Choice>
-    <mc:Fallback>
+    <mc:Fallback xmlns="">
       <p:transition spd="slow"/>
     </mc:Fallback>
   </mc:AlternateContent>
@@ -45870,11 +45864,11 @@
   <p:clrMapOvr>
     <a:masterClrMapping/>
   </p:clrMapOvr>
-  <mc:AlternateContent xmlns:mc="http://schemas.openxmlformats.org/markup-compatibility/2006">
-    <mc:Choice xmlns:p14="http://schemas.microsoft.com/office/powerpoint/2010/main" Requires="p14">
+  <mc:AlternateContent xmlns:mc="http://schemas.openxmlformats.org/markup-compatibility/2006" xmlns:p14="http://schemas.microsoft.com/office/powerpoint/2010/main">
+    <mc:Choice Requires="p14">
       <p:transition spd="slow" p14:dur="2000"/>
     </mc:Choice>
-    <mc:Fallback>
+    <mc:Fallback xmlns="">
       <p:transition spd="slow"/>
     </mc:Fallback>
   </mc:AlternateContent>

</xml_diff>

<commit_message>
Initial rearrangement of slides for Minnesota.
</commit_message>
<xml_diff>
--- a/Optimizer.pptx
+++ b/Optimizer.pptx
@@ -31,12 +31,12 @@
     <p:sldId id="273" r:id="rId22"/>
     <p:sldId id="274" r:id="rId23"/>
     <p:sldId id="323" r:id="rId24"/>
-    <p:sldId id="324" r:id="rId25"/>
-    <p:sldId id="331" r:id="rId26"/>
-    <p:sldId id="276" r:id="rId27"/>
-    <p:sldId id="277" r:id="rId28"/>
-    <p:sldId id="296" r:id="rId29"/>
-    <p:sldId id="325" r:id="rId30"/>
+    <p:sldId id="331" r:id="rId25"/>
+    <p:sldId id="276" r:id="rId26"/>
+    <p:sldId id="277" r:id="rId27"/>
+    <p:sldId id="296" r:id="rId28"/>
+    <p:sldId id="325" r:id="rId29"/>
+    <p:sldId id="324" r:id="rId30"/>
     <p:sldId id="280" r:id="rId31"/>
     <p:sldId id="329" r:id="rId32"/>
     <p:sldId id="281" r:id="rId33"/>
@@ -677,11 +677,11 @@
           <a:p>
             <a:r>
               <a:rPr lang="en-US" dirty="0"/>
-              <a:t>Merge join generally the best performing,</a:t>
+              <a:t>After</a:t>
             </a:r>
             <a:r>
               <a:rPr lang="en-US" baseline="0" dirty="0"/>
-              <a:t> but requires sorted input on join columns.  Only valid for equijoins.</a:t>
+              <a:t> this slide, type in a demo!</a:t>
             </a:r>
           </a:p>
           <a:p>
@@ -690,16 +690,7 @@
           <a:p>
             <a:r>
               <a:rPr lang="en-US" baseline="0" dirty="0"/>
-              <a:t>Nested loops best when inputs are of significantly different size.  Only join operator that works for joins using inequalities.</a:t>
-            </a:r>
-          </a:p>
-          <a:p>
-            <a:endParaRPr lang="en-US" baseline="0" dirty="0"/>
-          </a:p>
-          <a:p>
-            <a:r>
-              <a:rPr lang="en-US" baseline="0" dirty="0"/>
-              <a:t>Hash join works well with large inputs without sorted input, but is only valid for equijoins.</a:t>
+              <a:t>Then run through Parse Trees demo script.</a:t>
             </a:r>
             <a:endParaRPr lang="en-US" dirty="0"/>
           </a:p>
@@ -722,7 +713,7 @@
           <a:p>
             <a:fld id="{ADDBA41D-AE03-4F1C-B074-B56312AFAE46}" type="slidenum">
               <a:rPr lang="en-US" smtClean="0"/>
-              <a:t>27</a:t>
+              <a:t>28</a:t>
             </a:fld>
             <a:endParaRPr lang="en-US"/>
           </a:p>
@@ -731,7 +722,7 @@
     </p:spTree>
     <p:extLst>
       <p:ext uri="{BB962C8B-B14F-4D97-AF65-F5344CB8AC3E}">
-        <p14:creationId xmlns:p14="http://schemas.microsoft.com/office/powerpoint/2010/main" val="611840543"/>
+        <p14:creationId xmlns:p14="http://schemas.microsoft.com/office/powerpoint/2010/main" val="506269797"/>
       </p:ext>
     </p:extLst>
   </p:cSld>
@@ -832,7 +823,7 @@
     </p:spTree>
     <p:extLst>
       <p:ext uri="{BB962C8B-B14F-4D97-AF65-F5344CB8AC3E}">
-        <p14:creationId xmlns:p14="http://schemas.microsoft.com/office/powerpoint/2010/main" val="506269797"/>
+        <p14:creationId xmlns:p14="http://schemas.microsoft.com/office/powerpoint/2010/main" val="883350520"/>
       </p:ext>
     </p:extLst>
   </p:cSld>
@@ -2822,11 +2813,11 @@
           <a:p>
             <a:r>
               <a:rPr lang="en-US" dirty="0"/>
-              <a:t>After</a:t>
+              <a:t>Merge join generally the best performing,</a:t>
             </a:r>
             <a:r>
               <a:rPr lang="en-US" baseline="0" dirty="0"/>
-              <a:t> this slide, type in a demo!</a:t>
+              <a:t> but requires sorted input on join columns.  Only valid for equijoins.</a:t>
             </a:r>
           </a:p>
           <a:p>
@@ -2835,7 +2826,16 @@
           <a:p>
             <a:r>
               <a:rPr lang="en-US" baseline="0" dirty="0"/>
-              <a:t>Then run through Parse Trees demo script.</a:t>
+              <a:t>Nested loops best when inputs are of significantly different size.  Only join operator that works for joins using inequalities.</a:t>
+            </a:r>
+          </a:p>
+          <a:p>
+            <a:endParaRPr lang="en-US" baseline="0" dirty="0"/>
+          </a:p>
+          <a:p>
+            <a:r>
+              <a:rPr lang="en-US" baseline="0" dirty="0"/>
+              <a:t>Hash join works well with large inputs without sorted input, but is only valid for equijoins.</a:t>
             </a:r>
             <a:endParaRPr lang="en-US" dirty="0"/>
           </a:p>
@@ -2858,7 +2858,7 @@
           <a:p>
             <a:fld id="{ADDBA41D-AE03-4F1C-B074-B56312AFAE46}" type="slidenum">
               <a:rPr lang="en-US" smtClean="0"/>
-              <a:t>24</a:t>
+              <a:t>26</a:t>
             </a:fld>
             <a:endParaRPr lang="en-US"/>
           </a:p>
@@ -2867,7 +2867,7 @@
     </p:spTree>
     <p:extLst>
       <p:ext uri="{BB962C8B-B14F-4D97-AF65-F5344CB8AC3E}">
-        <p14:creationId xmlns:p14="http://schemas.microsoft.com/office/powerpoint/2010/main" val="883350520"/>
+        <p14:creationId xmlns:p14="http://schemas.microsoft.com/office/powerpoint/2010/main" val="611840543"/>
       </p:ext>
     </p:extLst>
   </p:cSld>
@@ -7138,6 +7138,13 @@
   <p:clrMapOvr>
     <a:masterClrMapping/>
   </p:clrMapOvr>
+  <p:timing>
+    <p:tnLst>
+      <p:par>
+        <p:cTn id="1" dur="indefinite" restart="never" nodeType="tmRoot"/>
+      </p:par>
+    </p:tnLst>
+  </p:timing>
 </p:sld>
 </file>
 
@@ -7239,6 +7246,13 @@
   <p:clrMapOvr>
     <a:masterClrMapping/>
   </p:clrMapOvr>
+  <p:timing>
+    <p:tnLst>
+      <p:par>
+        <p:cTn id="1" dur="indefinite" restart="never" nodeType="tmRoot"/>
+      </p:par>
+    </p:tnLst>
+  </p:timing>
 </p:sld>
 </file>
 
@@ -7453,6 +7467,13 @@
   <p:clrMapOvr>
     <a:masterClrMapping/>
   </p:clrMapOvr>
+  <p:timing>
+    <p:tnLst>
+      <p:par>
+        <p:cTn id="1" dur="indefinite" restart="never" nodeType="tmRoot"/>
+      </p:par>
+    </p:tnLst>
+  </p:timing>
 </p:sld>
 </file>
 
@@ -8660,21 +8681,21 @@
                 <a:gridCol w="2764301">
                   <a:extLst>
                     <a:ext uri="{9D8B030D-6E8A-4147-A177-3AD203B41FA5}">
-                      <a16:colId xmlns="" xmlns:a16="http://schemas.microsoft.com/office/drawing/2014/main" val="234227049"/>
+                      <a16:colId xmlns:a16="http://schemas.microsoft.com/office/drawing/2014/main" xmlns="" val="234227049"/>
                     </a:ext>
                   </a:extLst>
                 </a:gridCol>
                 <a:gridCol w="2764301">
                   <a:extLst>
                     <a:ext uri="{9D8B030D-6E8A-4147-A177-3AD203B41FA5}">
-                      <a16:colId xmlns="" xmlns:a16="http://schemas.microsoft.com/office/drawing/2014/main" val="4053135350"/>
+                      <a16:colId xmlns:a16="http://schemas.microsoft.com/office/drawing/2014/main" xmlns="" val="4053135350"/>
                     </a:ext>
                   </a:extLst>
                 </a:gridCol>
                 <a:gridCol w="2764301">
                   <a:extLst>
                     <a:ext uri="{9D8B030D-6E8A-4147-A177-3AD203B41FA5}">
-                      <a16:colId xmlns="" xmlns:a16="http://schemas.microsoft.com/office/drawing/2014/main" val="672378647"/>
+                      <a16:colId xmlns:a16="http://schemas.microsoft.com/office/drawing/2014/main" xmlns="" val="672378647"/>
                     </a:ext>
                   </a:extLst>
                 </a:gridCol>
@@ -8724,7 +8745,7 @@
                 </a:tc>
                 <a:extLst>
                   <a:ext uri="{0D108BD9-81ED-4DB2-BD59-A6C34878D82A}">
-                    <a16:rowId xmlns="" xmlns:a16="http://schemas.microsoft.com/office/drawing/2014/main" val="2843053056"/>
+                    <a16:rowId xmlns:a16="http://schemas.microsoft.com/office/drawing/2014/main" xmlns="" val="2843053056"/>
                   </a:ext>
                 </a:extLst>
               </a:tr>
@@ -8774,7 +8795,7 @@
                 </a:tc>
                 <a:extLst>
                   <a:ext uri="{0D108BD9-81ED-4DB2-BD59-A6C34878D82A}">
-                    <a16:rowId xmlns="" xmlns:a16="http://schemas.microsoft.com/office/drawing/2014/main" val="3055328934"/>
+                    <a16:rowId xmlns:a16="http://schemas.microsoft.com/office/drawing/2014/main" xmlns="" val="3055328934"/>
                   </a:ext>
                 </a:extLst>
               </a:tr>
@@ -8824,7 +8845,7 @@
                 </a:tc>
                 <a:extLst>
                   <a:ext uri="{0D108BD9-81ED-4DB2-BD59-A6C34878D82A}">
-                    <a16:rowId xmlns="" xmlns:a16="http://schemas.microsoft.com/office/drawing/2014/main" val="1144851549"/>
+                    <a16:rowId xmlns:a16="http://schemas.microsoft.com/office/drawing/2014/main" xmlns="" val="1144851549"/>
                   </a:ext>
                 </a:extLst>
               </a:tr>
@@ -8873,7 +8894,7 @@
                 </a:tc>
                 <a:extLst>
                   <a:ext uri="{0D108BD9-81ED-4DB2-BD59-A6C34878D82A}">
-                    <a16:rowId xmlns="" xmlns:a16="http://schemas.microsoft.com/office/drawing/2014/main" val="4258932578"/>
+                    <a16:rowId xmlns:a16="http://schemas.microsoft.com/office/drawing/2014/main" xmlns="" val="4258932578"/>
                   </a:ext>
                 </a:extLst>
               </a:tr>
@@ -8899,11 +8920,18 @@
       <p:transition spd="slow"/>
     </mc:Fallback>
   </mc:AlternateContent>
+  <p:timing>
+    <p:tnLst>
+      <p:par>
+        <p:cTn id="1" dur="indefinite" restart="never" nodeType="tmRoot"/>
+      </p:par>
+    </p:tnLst>
+  </p:timing>
 </p:sld>
 </file>
 
 <file path=ppt/slides/slide13.xml><?xml version="1.0" encoding="utf-8"?>
-<p:sld xmlns:a="http://schemas.openxmlformats.org/drawingml/2006/main" xmlns:r="http://schemas.openxmlformats.org/officeDocument/2006/relationships" xmlns:p="http://schemas.openxmlformats.org/presentationml/2006/main">
+<p:sld xmlns:a="http://schemas.openxmlformats.org/drawingml/2006/main" xmlns:r="http://schemas.openxmlformats.org/officeDocument/2006/relationships" xmlns:p="http://schemas.openxmlformats.org/presentationml/2006/main" show="0">
   <p:cSld>
     <p:spTree>
       <p:nvGrpSpPr>
@@ -10238,19 +10266,26 @@
   <p:clrMapOvr>
     <a:masterClrMapping/>
   </p:clrMapOvr>
-  <mc:AlternateContent xmlns:mc="http://schemas.openxmlformats.org/markup-compatibility/2006" xmlns:p14="http://schemas.microsoft.com/office/powerpoint/2010/main">
-    <mc:Choice Requires="p14">
+  <mc:AlternateContent xmlns:mc="http://schemas.openxmlformats.org/markup-compatibility/2006">
+    <mc:Choice xmlns:p14="http://schemas.microsoft.com/office/powerpoint/2010/main" Requires="p14">
       <p:transition spd="slow" p14:dur="2000"/>
     </mc:Choice>
-    <mc:Fallback xmlns="">
+    <mc:Fallback>
       <p:transition spd="slow"/>
     </mc:Fallback>
   </mc:AlternateContent>
+  <p:timing>
+    <p:tnLst>
+      <p:par>
+        <p:cTn id="1" dur="indefinite" restart="never" nodeType="tmRoot"/>
+      </p:par>
+    </p:tnLst>
+  </p:timing>
 </p:sld>
 </file>
 
 <file path=ppt/slides/slide14.xml><?xml version="1.0" encoding="utf-8"?>
-<p:sld xmlns:a="http://schemas.openxmlformats.org/drawingml/2006/main" xmlns:r="http://schemas.openxmlformats.org/officeDocument/2006/relationships" xmlns:p="http://schemas.openxmlformats.org/presentationml/2006/main">
+<p:sld xmlns:a="http://schemas.openxmlformats.org/drawingml/2006/main" xmlns:r="http://schemas.openxmlformats.org/officeDocument/2006/relationships" xmlns:p="http://schemas.openxmlformats.org/presentationml/2006/main" show="0">
   <p:cSld>
     <p:spTree>
       <p:nvGrpSpPr>
@@ -11477,11 +11512,11 @@
   <p:clrMapOvr>
     <a:masterClrMapping/>
   </p:clrMapOvr>
-  <mc:AlternateContent xmlns:mc="http://schemas.openxmlformats.org/markup-compatibility/2006" xmlns:p14="http://schemas.microsoft.com/office/powerpoint/2010/main">
-    <mc:Choice Requires="p14">
+  <mc:AlternateContent xmlns:mc="http://schemas.openxmlformats.org/markup-compatibility/2006">
+    <mc:Choice xmlns:p14="http://schemas.microsoft.com/office/powerpoint/2010/main" Requires="p14">
       <p:transition spd="slow" p14:dur="2000"/>
     </mc:Choice>
-    <mc:Fallback xmlns="">
+    <mc:Fallback>
       <p:transition spd="slow"/>
     </mc:Fallback>
   </mc:AlternateContent>
@@ -11489,7 +11524,7 @@
 </file>
 
 <file path=ppt/slides/slide15.xml><?xml version="1.0" encoding="utf-8"?>
-<p:sld xmlns:a="http://schemas.openxmlformats.org/drawingml/2006/main" xmlns:r="http://schemas.openxmlformats.org/officeDocument/2006/relationships" xmlns:p="http://schemas.openxmlformats.org/presentationml/2006/main">
+<p:sld xmlns:a="http://schemas.openxmlformats.org/drawingml/2006/main" xmlns:r="http://schemas.openxmlformats.org/officeDocument/2006/relationships" xmlns:p="http://schemas.openxmlformats.org/presentationml/2006/main" show="0">
   <p:cSld>
     <p:spTree>
       <p:nvGrpSpPr>
@@ -12707,11 +12742,11 @@
   <p:clrMapOvr>
     <a:masterClrMapping/>
   </p:clrMapOvr>
-  <mc:AlternateContent xmlns:mc="http://schemas.openxmlformats.org/markup-compatibility/2006" xmlns:p14="http://schemas.microsoft.com/office/powerpoint/2010/main">
-    <mc:Choice Requires="p14">
+  <mc:AlternateContent xmlns:mc="http://schemas.openxmlformats.org/markup-compatibility/2006">
+    <mc:Choice xmlns:p14="http://schemas.microsoft.com/office/powerpoint/2010/main" Requires="p14">
       <p:transition spd="slow" p14:dur="2000"/>
     </mc:Choice>
-    <mc:Fallback xmlns="">
+    <mc:Fallback>
       <p:transition spd="slow"/>
     </mc:Fallback>
   </mc:AlternateContent>
@@ -12719,7 +12754,7 @@
 </file>
 
 <file path=ppt/slides/slide16.xml><?xml version="1.0" encoding="utf-8"?>
-<p:sld xmlns:a="http://schemas.openxmlformats.org/drawingml/2006/main" xmlns:r="http://schemas.openxmlformats.org/officeDocument/2006/relationships" xmlns:p="http://schemas.openxmlformats.org/presentationml/2006/main">
+<p:sld xmlns:a="http://schemas.openxmlformats.org/drawingml/2006/main" xmlns:r="http://schemas.openxmlformats.org/officeDocument/2006/relationships" xmlns:p="http://schemas.openxmlformats.org/presentationml/2006/main" show="0">
   <p:cSld>
     <p:spTree>
       <p:nvGrpSpPr>
@@ -13937,11 +13972,11 @@
   <p:clrMapOvr>
     <a:masterClrMapping/>
   </p:clrMapOvr>
-  <mc:AlternateContent xmlns:mc="http://schemas.openxmlformats.org/markup-compatibility/2006" xmlns:p14="http://schemas.microsoft.com/office/powerpoint/2010/main">
-    <mc:Choice Requires="p14">
+  <mc:AlternateContent xmlns:mc="http://schemas.openxmlformats.org/markup-compatibility/2006">
+    <mc:Choice xmlns:p14="http://schemas.microsoft.com/office/powerpoint/2010/main" Requires="p14">
       <p:transition spd="slow" p14:dur="2000"/>
     </mc:Choice>
-    <mc:Fallback xmlns="">
+    <mc:Fallback>
       <p:transition spd="slow"/>
     </mc:Fallback>
   </mc:AlternateContent>
@@ -13949,7 +13984,7 @@
 </file>
 
 <file path=ppt/slides/slide17.xml><?xml version="1.0" encoding="utf-8"?>
-<p:sld xmlns:a="http://schemas.openxmlformats.org/drawingml/2006/main" xmlns:r="http://schemas.openxmlformats.org/officeDocument/2006/relationships" xmlns:p="http://schemas.openxmlformats.org/presentationml/2006/main">
+<p:sld xmlns:a="http://schemas.openxmlformats.org/drawingml/2006/main" xmlns:r="http://schemas.openxmlformats.org/officeDocument/2006/relationships" xmlns:p="http://schemas.openxmlformats.org/presentationml/2006/main" show="0">
   <p:cSld>
     <p:spTree>
       <p:nvGrpSpPr>
@@ -14778,21 +14813,7 @@
                 <a:ea typeface="Calibri" panose="020F0502020204030204" pitchFamily="34" charset="0"/>
                 <a:cs typeface="Times New Roman" panose="02020603050405020304" pitchFamily="18" charset="0"/>
               </a:rPr>
-              <a:t>=</a:t>
-            </a:r>
-            <a:r>
-              <a:rPr lang="en-US" dirty="0" smtClean="0">
-                <a:solidFill>
-                  <a:srgbClr val="008080"/>
-                </a:solidFill>
-                <a:highlight>
-                  <a:srgbClr val="FFFF00"/>
-                </a:highlight>
-                <a:latin typeface="Consolas" panose="020B0609020204030204" pitchFamily="49" charset="0"/>
-                <a:ea typeface="Calibri" panose="020F0502020204030204" pitchFamily="34" charset="0"/>
-                <a:cs typeface="Times New Roman" panose="02020603050405020304" pitchFamily="18" charset="0"/>
-              </a:rPr>
-              <a:t> 'MN'</a:t>
+              <a:t>= 'MN'</a:t>
             </a:r>
             <a:endParaRPr lang="en-US" dirty="0">
               <a:solidFill>
@@ -15192,11 +15213,11 @@
   <p:clrMapOvr>
     <a:masterClrMapping/>
   </p:clrMapOvr>
-  <mc:AlternateContent xmlns:mc="http://schemas.openxmlformats.org/markup-compatibility/2006" xmlns:p14="http://schemas.microsoft.com/office/powerpoint/2010/main">
-    <mc:Choice Requires="p14">
+  <mc:AlternateContent xmlns:mc="http://schemas.openxmlformats.org/markup-compatibility/2006">
+    <mc:Choice xmlns:p14="http://schemas.microsoft.com/office/powerpoint/2010/main" Requires="p14">
       <p:transition spd="slow" p14:dur="2000"/>
     </mc:Choice>
-    <mc:Fallback xmlns="">
+    <mc:Fallback>
       <p:transition spd="slow"/>
     </mc:Fallback>
   </mc:AlternateContent>
@@ -15204,7 +15225,7 @@
 </file>
 
 <file path=ppt/slides/slide18.xml><?xml version="1.0" encoding="utf-8"?>
-<p:sld xmlns:a="http://schemas.openxmlformats.org/drawingml/2006/main" xmlns:r="http://schemas.openxmlformats.org/officeDocument/2006/relationships" xmlns:p="http://schemas.openxmlformats.org/presentationml/2006/main">
+<p:sld xmlns:a="http://schemas.openxmlformats.org/drawingml/2006/main" xmlns:r="http://schemas.openxmlformats.org/officeDocument/2006/relationships" xmlns:p="http://schemas.openxmlformats.org/presentationml/2006/main" show="0">
   <p:cSld>
     <p:spTree>
       <p:nvGrpSpPr>
@@ -16456,11 +16477,11 @@
   <p:clrMapOvr>
     <a:masterClrMapping/>
   </p:clrMapOvr>
-  <mc:AlternateContent xmlns:mc="http://schemas.openxmlformats.org/markup-compatibility/2006" xmlns:p14="http://schemas.microsoft.com/office/powerpoint/2010/main">
-    <mc:Choice Requires="p14">
+  <mc:AlternateContent xmlns:mc="http://schemas.openxmlformats.org/markup-compatibility/2006">
+    <mc:Choice xmlns:p14="http://schemas.microsoft.com/office/powerpoint/2010/main" Requires="p14">
       <p:transition spd="slow" p14:dur="2000"/>
     </mc:Choice>
-    <mc:Fallback xmlns="">
+    <mc:Fallback>
       <p:transition spd="slow"/>
     </mc:Fallback>
   </mc:AlternateContent>
@@ -16468,7 +16489,7 @@
 </file>
 
 <file path=ppt/slides/slide19.xml><?xml version="1.0" encoding="utf-8"?>
-<p:sld xmlns:a="http://schemas.openxmlformats.org/drawingml/2006/main" xmlns:r="http://schemas.openxmlformats.org/officeDocument/2006/relationships" xmlns:p="http://schemas.openxmlformats.org/presentationml/2006/main">
+<p:sld xmlns:a="http://schemas.openxmlformats.org/drawingml/2006/main" xmlns:r="http://schemas.openxmlformats.org/officeDocument/2006/relationships" xmlns:p="http://schemas.openxmlformats.org/presentationml/2006/main" show="0">
   <p:cSld>
     <p:spTree>
       <p:nvGrpSpPr>
@@ -17646,11 +17667,11 @@
   <p:clrMapOvr>
     <a:masterClrMapping/>
   </p:clrMapOvr>
-  <mc:AlternateContent xmlns:mc="http://schemas.openxmlformats.org/markup-compatibility/2006" xmlns:p14="http://schemas.microsoft.com/office/powerpoint/2010/main">
-    <mc:Choice Requires="p14">
+  <mc:AlternateContent xmlns:mc="http://schemas.openxmlformats.org/markup-compatibility/2006">
+    <mc:Choice xmlns:p14="http://schemas.microsoft.com/office/powerpoint/2010/main" Requires="p14">
       <p:transition spd="slow" p14:dur="2000"/>
     </mc:Choice>
-    <mc:Fallback xmlns="">
+    <mc:Fallback>
       <p:transition spd="slow"/>
     </mc:Fallback>
   </mc:AlternateContent>
@@ -18664,11 +18685,18 @@
   <p:clrMapOvr>
     <a:masterClrMapping/>
   </p:clrMapOvr>
+  <p:timing>
+    <p:tnLst>
+      <p:par>
+        <p:cTn id="1" dur="indefinite" restart="never" nodeType="tmRoot"/>
+      </p:par>
+    </p:tnLst>
+  </p:timing>
 </p:sld>
 </file>
 
 <file path=ppt/slides/slide20.xml><?xml version="1.0" encoding="utf-8"?>
-<p:sld xmlns:a="http://schemas.openxmlformats.org/drawingml/2006/main" xmlns:r="http://schemas.openxmlformats.org/officeDocument/2006/relationships" xmlns:p="http://schemas.openxmlformats.org/presentationml/2006/main">
+<p:sld xmlns:a="http://schemas.openxmlformats.org/drawingml/2006/main" xmlns:r="http://schemas.openxmlformats.org/officeDocument/2006/relationships" xmlns:p="http://schemas.openxmlformats.org/presentationml/2006/main" show="0">
   <p:cSld>
     <p:spTree>
       <p:nvGrpSpPr>
@@ -19892,11 +19920,11 @@
   <p:clrMapOvr>
     <a:masterClrMapping/>
   </p:clrMapOvr>
-  <mc:AlternateContent xmlns:mc="http://schemas.openxmlformats.org/markup-compatibility/2006" xmlns:p14="http://schemas.microsoft.com/office/powerpoint/2010/main">
-    <mc:Choice Requires="p14">
+  <mc:AlternateContent xmlns:mc="http://schemas.openxmlformats.org/markup-compatibility/2006">
+    <mc:Choice xmlns:p14="http://schemas.microsoft.com/office/powerpoint/2010/main" Requires="p14">
       <p:transition spd="slow" p14:dur="2000"/>
     </mc:Choice>
-    <mc:Fallback xmlns="">
+    <mc:Fallback>
       <p:transition spd="slow"/>
     </mc:Fallback>
   </mc:AlternateContent>
@@ -19904,7 +19932,7 @@
 </file>
 
 <file path=ppt/slides/slide21.xml><?xml version="1.0" encoding="utf-8"?>
-<p:sld xmlns:a="http://schemas.openxmlformats.org/drawingml/2006/main" xmlns:r="http://schemas.openxmlformats.org/officeDocument/2006/relationships" xmlns:p="http://schemas.openxmlformats.org/presentationml/2006/main">
+<p:sld xmlns:a="http://schemas.openxmlformats.org/drawingml/2006/main" xmlns:r="http://schemas.openxmlformats.org/officeDocument/2006/relationships" xmlns:p="http://schemas.openxmlformats.org/presentationml/2006/main" show="0">
   <p:cSld>
     <p:spTree>
       <p:nvGrpSpPr>
@@ -21111,11 +21139,11 @@
   <p:clrMapOvr>
     <a:masterClrMapping/>
   </p:clrMapOvr>
-  <mc:AlternateContent xmlns:mc="http://schemas.openxmlformats.org/markup-compatibility/2006" xmlns:p14="http://schemas.microsoft.com/office/powerpoint/2010/main">
-    <mc:Choice Requires="p14">
+  <mc:AlternateContent xmlns:mc="http://schemas.openxmlformats.org/markup-compatibility/2006">
+    <mc:Choice xmlns:p14="http://schemas.microsoft.com/office/powerpoint/2010/main" Requires="p14">
       <p:transition spd="slow" p14:dur="2000"/>
     </mc:Choice>
-    <mc:Fallback xmlns="">
+    <mc:Fallback>
       <p:transition spd="slow"/>
     </mc:Fallback>
   </mc:AlternateContent>
@@ -21123,7 +21151,7 @@
 </file>
 
 <file path=ppt/slides/slide22.xml><?xml version="1.0" encoding="utf-8"?>
-<p:sld xmlns:a="http://schemas.openxmlformats.org/drawingml/2006/main" xmlns:r="http://schemas.openxmlformats.org/officeDocument/2006/relationships" xmlns:p="http://schemas.openxmlformats.org/presentationml/2006/main">
+<p:sld xmlns:a="http://schemas.openxmlformats.org/drawingml/2006/main" xmlns:r="http://schemas.openxmlformats.org/officeDocument/2006/relationships" xmlns:p="http://schemas.openxmlformats.org/presentationml/2006/main" show="0">
   <p:cSld>
     <p:spTree>
       <p:nvGrpSpPr>
@@ -22383,14 +22411,21 @@
   <p:clrMapOvr>
     <a:masterClrMapping/>
   </p:clrMapOvr>
-  <mc:AlternateContent xmlns:mc="http://schemas.openxmlformats.org/markup-compatibility/2006" xmlns:p14="http://schemas.microsoft.com/office/powerpoint/2010/main">
-    <mc:Choice Requires="p14">
+  <mc:AlternateContent xmlns:mc="http://schemas.openxmlformats.org/markup-compatibility/2006">
+    <mc:Choice xmlns:p14="http://schemas.microsoft.com/office/powerpoint/2010/main" Requires="p14">
       <p:transition spd="slow" p14:dur="2000"/>
     </mc:Choice>
-    <mc:Fallback xmlns="">
+    <mc:Fallback>
       <p:transition spd="slow"/>
     </mc:Fallback>
   </mc:AlternateContent>
+  <p:timing>
+    <p:tnLst>
+      <p:par>
+        <p:cTn id="1" dur="indefinite" restart="never" nodeType="tmRoot"/>
+      </p:par>
+    </p:tnLst>
+  </p:timing>
 </p:sld>
 </file>
 
@@ -23635,6 +23670,13 @@
       <p:transition spd="slow"/>
     </mc:Fallback>
   </mc:AlternateContent>
+  <p:timing>
+    <p:tnLst>
+      <p:par>
+        <p:cTn id="1" dur="indefinite" restart="never" nodeType="tmRoot"/>
+      </p:par>
+    </p:tnLst>
+  </p:timing>
 </p:sld>
 </file>
 
@@ -23672,1268 +23714,6 @@
           <a:p>
             <a:r>
               <a:rPr lang="en-US" dirty="0"/>
-              <a:t>Query Tree</a:t>
-            </a:r>
-          </a:p>
-        </p:txBody>
-      </p:sp>
-      <p:sp>
-        <p:nvSpPr>
-          <p:cNvPr id="5" name="TextBox 4"/>
-          <p:cNvSpPr txBox="1"/>
-          <p:nvPr/>
-        </p:nvSpPr>
-        <p:spPr>
-          <a:xfrm>
-            <a:off x="558265" y="1713297"/>
-            <a:ext cx="4025461" cy="2858475"/>
-          </a:xfrm>
-          <a:prstGeom prst="rect">
-            <a:avLst/>
-          </a:prstGeom>
-          <a:noFill/>
-        </p:spPr>
-        <p:txBody>
-          <a:bodyPr wrap="none" rtlCol="0">
-            <a:spAutoFit/>
-          </a:bodyPr>
-          <a:lstStyle/>
-          <a:p>
-            <a:pPr>
-              <a:lnSpc>
-                <a:spcPct val="107000"/>
-              </a:lnSpc>
-            </a:pPr>
-            <a:r>
-              <a:rPr lang="en-US" sz="1400" dirty="0">
-                <a:solidFill>
-                  <a:srgbClr val="0000FF"/>
-                </a:solidFill>
-                <a:latin typeface="Consolas" panose="020B0609020204030204" pitchFamily="49" charset="0"/>
-                <a:ea typeface="Calibri" panose="020F0502020204030204" pitchFamily="34" charset="0"/>
-                <a:cs typeface="Times New Roman" panose="02020603050405020304" pitchFamily="18" charset="0"/>
-              </a:rPr>
-              <a:t>from</a:t>
-            </a:r>
-            <a:r>
-              <a:rPr lang="en-US" sz="1400" dirty="0">
-                <a:latin typeface="Consolas" panose="020B0609020204030204" pitchFamily="49" charset="0"/>
-                <a:ea typeface="Calibri" panose="020F0502020204030204" pitchFamily="34" charset="0"/>
-                <a:cs typeface="Times New Roman" panose="02020603050405020304" pitchFamily="18" charset="0"/>
-              </a:rPr>
-              <a:t> </a:t>
-            </a:r>
-            <a:r>
-              <a:rPr lang="en-US" sz="1400" dirty="0" err="1">
-                <a:solidFill>
-                  <a:srgbClr val="008080"/>
-                </a:solidFill>
-                <a:latin typeface="Consolas" panose="020B0609020204030204" pitchFamily="49" charset="0"/>
-                <a:ea typeface="Calibri" panose="020F0502020204030204" pitchFamily="34" charset="0"/>
-                <a:cs typeface="Times New Roman" panose="02020603050405020304" pitchFamily="18" charset="0"/>
-              </a:rPr>
-              <a:t>dbo</a:t>
-            </a:r>
-            <a:r>
-              <a:rPr lang="en-US" sz="1400" dirty="0" err="1">
-                <a:solidFill>
-                  <a:srgbClr val="808080"/>
-                </a:solidFill>
-                <a:latin typeface="Consolas" panose="020B0609020204030204" pitchFamily="49" charset="0"/>
-                <a:ea typeface="Calibri" panose="020F0502020204030204" pitchFamily="34" charset="0"/>
-                <a:cs typeface="Times New Roman" panose="02020603050405020304" pitchFamily="18" charset="0"/>
-              </a:rPr>
-              <a:t>.</a:t>
-            </a:r>
-            <a:r>
-              <a:rPr lang="en-US" sz="1400" dirty="0" err="1">
-                <a:solidFill>
-                  <a:srgbClr val="008080"/>
-                </a:solidFill>
-                <a:latin typeface="Consolas" panose="020B0609020204030204" pitchFamily="49" charset="0"/>
-                <a:ea typeface="Calibri" panose="020F0502020204030204" pitchFamily="34" charset="0"/>
-                <a:cs typeface="Times New Roman" panose="02020603050405020304" pitchFamily="18" charset="0"/>
-              </a:rPr>
-              <a:t>OrderHeader</a:t>
-            </a:r>
-            <a:r>
-              <a:rPr lang="en-US" sz="1400" dirty="0">
-                <a:latin typeface="Consolas" panose="020B0609020204030204" pitchFamily="49" charset="0"/>
-                <a:ea typeface="Calibri" panose="020F0502020204030204" pitchFamily="34" charset="0"/>
-                <a:cs typeface="Times New Roman" panose="02020603050405020304" pitchFamily="18" charset="0"/>
-              </a:rPr>
-              <a:t> </a:t>
-            </a:r>
-            <a:r>
-              <a:rPr lang="en-US" sz="1400" dirty="0">
-                <a:solidFill>
-                  <a:srgbClr val="008080"/>
-                </a:solidFill>
-                <a:latin typeface="Consolas" panose="020B0609020204030204" pitchFamily="49" charset="0"/>
-                <a:ea typeface="Calibri" panose="020F0502020204030204" pitchFamily="34" charset="0"/>
-                <a:cs typeface="Times New Roman" panose="02020603050405020304" pitchFamily="18" charset="0"/>
-              </a:rPr>
-              <a:t>oh</a:t>
-            </a:r>
-            <a:endParaRPr lang="en-US" dirty="0">
-              <a:latin typeface="Calibri" panose="020F0502020204030204" pitchFamily="34" charset="0"/>
-              <a:ea typeface="Calibri" panose="020F0502020204030204" pitchFamily="34" charset="0"/>
-              <a:cs typeface="Times New Roman" panose="02020603050405020304" pitchFamily="18" charset="0"/>
-            </a:endParaRPr>
-          </a:p>
-          <a:p>
-            <a:pPr>
-              <a:lnSpc>
-                <a:spcPct val="107000"/>
-              </a:lnSpc>
-            </a:pPr>
-            <a:r>
-              <a:rPr lang="en-US" sz="1400" dirty="0">
-                <a:solidFill>
-                  <a:srgbClr val="808080"/>
-                </a:solidFill>
-                <a:latin typeface="Consolas" panose="020B0609020204030204" pitchFamily="49" charset="0"/>
-                <a:ea typeface="Calibri" panose="020F0502020204030204" pitchFamily="34" charset="0"/>
-                <a:cs typeface="Times New Roman" panose="02020603050405020304" pitchFamily="18" charset="0"/>
-              </a:rPr>
-              <a:t>inner</a:t>
-            </a:r>
-            <a:r>
-              <a:rPr lang="en-US" sz="1400" dirty="0">
-                <a:latin typeface="Consolas" panose="020B0609020204030204" pitchFamily="49" charset="0"/>
-                <a:ea typeface="Calibri" panose="020F0502020204030204" pitchFamily="34" charset="0"/>
-                <a:cs typeface="Times New Roman" panose="02020603050405020304" pitchFamily="18" charset="0"/>
-              </a:rPr>
-              <a:t> </a:t>
-            </a:r>
-            <a:r>
-              <a:rPr lang="en-US" sz="1400" dirty="0">
-                <a:solidFill>
-                  <a:srgbClr val="808080"/>
-                </a:solidFill>
-                <a:latin typeface="Consolas" panose="020B0609020204030204" pitchFamily="49" charset="0"/>
-                <a:ea typeface="Calibri" panose="020F0502020204030204" pitchFamily="34" charset="0"/>
-                <a:cs typeface="Times New Roman" panose="02020603050405020304" pitchFamily="18" charset="0"/>
-              </a:rPr>
-              <a:t>join</a:t>
-            </a:r>
-            <a:r>
-              <a:rPr lang="en-US" sz="1400" dirty="0">
-                <a:latin typeface="Consolas" panose="020B0609020204030204" pitchFamily="49" charset="0"/>
-                <a:ea typeface="Calibri" panose="020F0502020204030204" pitchFamily="34" charset="0"/>
-                <a:cs typeface="Times New Roman" panose="02020603050405020304" pitchFamily="18" charset="0"/>
-              </a:rPr>
-              <a:t> </a:t>
-            </a:r>
-            <a:r>
-              <a:rPr lang="en-US" sz="1400" dirty="0" err="1">
-                <a:solidFill>
-                  <a:srgbClr val="008080"/>
-                </a:solidFill>
-                <a:latin typeface="Consolas" panose="020B0609020204030204" pitchFamily="49" charset="0"/>
-                <a:ea typeface="Calibri" panose="020F0502020204030204" pitchFamily="34" charset="0"/>
-                <a:cs typeface="Times New Roman" panose="02020603050405020304" pitchFamily="18" charset="0"/>
-              </a:rPr>
-              <a:t>dbo</a:t>
-            </a:r>
-            <a:r>
-              <a:rPr lang="en-US" sz="1400" dirty="0" err="1">
-                <a:solidFill>
-                  <a:srgbClr val="808080"/>
-                </a:solidFill>
-                <a:latin typeface="Consolas" panose="020B0609020204030204" pitchFamily="49" charset="0"/>
-                <a:ea typeface="Calibri" panose="020F0502020204030204" pitchFamily="34" charset="0"/>
-                <a:cs typeface="Times New Roman" panose="02020603050405020304" pitchFamily="18" charset="0"/>
-              </a:rPr>
-              <a:t>.</a:t>
-            </a:r>
-            <a:r>
-              <a:rPr lang="en-US" sz="1400" dirty="0" err="1">
-                <a:solidFill>
-                  <a:srgbClr val="008080"/>
-                </a:solidFill>
-                <a:latin typeface="Consolas" panose="020B0609020204030204" pitchFamily="49" charset="0"/>
-                <a:ea typeface="Calibri" panose="020F0502020204030204" pitchFamily="34" charset="0"/>
-                <a:cs typeface="Times New Roman" panose="02020603050405020304" pitchFamily="18" charset="0"/>
-              </a:rPr>
-              <a:t>OrderDetail</a:t>
-            </a:r>
-            <a:r>
-              <a:rPr lang="en-US" sz="1400" dirty="0">
-                <a:latin typeface="Consolas" panose="020B0609020204030204" pitchFamily="49" charset="0"/>
-                <a:ea typeface="Calibri" panose="020F0502020204030204" pitchFamily="34" charset="0"/>
-                <a:cs typeface="Times New Roman" panose="02020603050405020304" pitchFamily="18" charset="0"/>
-              </a:rPr>
-              <a:t> </a:t>
-            </a:r>
-            <a:r>
-              <a:rPr lang="en-US" sz="1400" dirty="0">
-                <a:solidFill>
-                  <a:srgbClr val="008080"/>
-                </a:solidFill>
-                <a:latin typeface="Consolas" panose="020B0609020204030204" pitchFamily="49" charset="0"/>
-                <a:ea typeface="Calibri" panose="020F0502020204030204" pitchFamily="34" charset="0"/>
-                <a:cs typeface="Times New Roman" panose="02020603050405020304" pitchFamily="18" charset="0"/>
-              </a:rPr>
-              <a:t>od</a:t>
-            </a:r>
-            <a:endParaRPr lang="en-US" sz="1400" dirty="0">
-              <a:latin typeface="Consolas" panose="020B0609020204030204" pitchFamily="49" charset="0"/>
-              <a:ea typeface="Calibri" panose="020F0502020204030204" pitchFamily="34" charset="0"/>
-              <a:cs typeface="Times New Roman" panose="02020603050405020304" pitchFamily="18" charset="0"/>
-            </a:endParaRPr>
-          </a:p>
-          <a:p>
-            <a:pPr>
-              <a:lnSpc>
-                <a:spcPct val="107000"/>
-              </a:lnSpc>
-            </a:pPr>
-            <a:r>
-              <a:rPr lang="en-US" sz="1400" dirty="0">
-                <a:solidFill>
-                  <a:srgbClr val="808080"/>
-                </a:solidFill>
-                <a:latin typeface="Consolas" panose="020B0609020204030204" pitchFamily="49" charset="0"/>
-                <a:ea typeface="Calibri" panose="020F0502020204030204" pitchFamily="34" charset="0"/>
-                <a:cs typeface="Times New Roman" panose="02020603050405020304" pitchFamily="18" charset="0"/>
-              </a:rPr>
-              <a:t>inner</a:t>
-            </a:r>
-            <a:r>
-              <a:rPr lang="en-US" sz="1400" dirty="0">
-                <a:latin typeface="Consolas" panose="020B0609020204030204" pitchFamily="49" charset="0"/>
-                <a:ea typeface="Calibri" panose="020F0502020204030204" pitchFamily="34" charset="0"/>
-                <a:cs typeface="Times New Roman" panose="02020603050405020304" pitchFamily="18" charset="0"/>
-              </a:rPr>
-              <a:t> </a:t>
-            </a:r>
-            <a:r>
-              <a:rPr lang="en-US" sz="1400" dirty="0">
-                <a:solidFill>
-                  <a:srgbClr val="808080"/>
-                </a:solidFill>
-                <a:latin typeface="Consolas" panose="020B0609020204030204" pitchFamily="49" charset="0"/>
-                <a:ea typeface="Calibri" panose="020F0502020204030204" pitchFamily="34" charset="0"/>
-                <a:cs typeface="Times New Roman" panose="02020603050405020304" pitchFamily="18" charset="0"/>
-              </a:rPr>
-              <a:t>join</a:t>
-            </a:r>
-            <a:r>
-              <a:rPr lang="en-US" sz="1400" dirty="0">
-                <a:latin typeface="Consolas" panose="020B0609020204030204" pitchFamily="49" charset="0"/>
-                <a:ea typeface="Calibri" panose="020F0502020204030204" pitchFamily="34" charset="0"/>
-                <a:cs typeface="Times New Roman" panose="02020603050405020304" pitchFamily="18" charset="0"/>
-              </a:rPr>
-              <a:t> </a:t>
-            </a:r>
-            <a:r>
-              <a:rPr lang="en-US" sz="1400" dirty="0" err="1">
-                <a:solidFill>
-                  <a:srgbClr val="008080"/>
-                </a:solidFill>
-                <a:latin typeface="Consolas" panose="020B0609020204030204" pitchFamily="49" charset="0"/>
-                <a:ea typeface="Calibri" panose="020F0502020204030204" pitchFamily="34" charset="0"/>
-                <a:cs typeface="Times New Roman" panose="02020603050405020304" pitchFamily="18" charset="0"/>
-              </a:rPr>
-              <a:t>dbo</a:t>
-            </a:r>
-            <a:r>
-              <a:rPr lang="en-US" sz="1400" dirty="0" err="1">
-                <a:solidFill>
-                  <a:srgbClr val="808080"/>
-                </a:solidFill>
-                <a:latin typeface="Consolas" panose="020B0609020204030204" pitchFamily="49" charset="0"/>
-                <a:ea typeface="Calibri" panose="020F0502020204030204" pitchFamily="34" charset="0"/>
-                <a:cs typeface="Times New Roman" panose="02020603050405020304" pitchFamily="18" charset="0"/>
-              </a:rPr>
-              <a:t>.</a:t>
-            </a:r>
-            <a:r>
-              <a:rPr lang="en-US" sz="1400" dirty="0" err="1">
-                <a:solidFill>
-                  <a:srgbClr val="008080"/>
-                </a:solidFill>
-                <a:latin typeface="Consolas" panose="020B0609020204030204" pitchFamily="49" charset="0"/>
-                <a:ea typeface="Calibri" panose="020F0502020204030204" pitchFamily="34" charset="0"/>
-                <a:cs typeface="Times New Roman" panose="02020603050405020304" pitchFamily="18" charset="0"/>
-              </a:rPr>
-              <a:t>Customer</a:t>
-            </a:r>
-            <a:r>
-              <a:rPr lang="en-US" sz="1400" dirty="0">
-                <a:latin typeface="Consolas" panose="020B0609020204030204" pitchFamily="49" charset="0"/>
-                <a:ea typeface="Calibri" panose="020F0502020204030204" pitchFamily="34" charset="0"/>
-                <a:cs typeface="Times New Roman" panose="02020603050405020304" pitchFamily="18" charset="0"/>
-              </a:rPr>
-              <a:t> </a:t>
-            </a:r>
-            <a:r>
-              <a:rPr lang="en-US" sz="1400" dirty="0" err="1">
-                <a:solidFill>
-                  <a:srgbClr val="008080"/>
-                </a:solidFill>
-                <a:latin typeface="Consolas" panose="020B0609020204030204" pitchFamily="49" charset="0"/>
-                <a:ea typeface="Calibri" panose="020F0502020204030204" pitchFamily="34" charset="0"/>
-                <a:cs typeface="Times New Roman" panose="02020603050405020304" pitchFamily="18" charset="0"/>
-              </a:rPr>
-              <a:t>cust</a:t>
-            </a:r>
-            <a:endParaRPr lang="en-US" sz="1400" dirty="0">
-              <a:latin typeface="Consolas" panose="020B0609020204030204" pitchFamily="49" charset="0"/>
-              <a:ea typeface="Calibri" panose="020F0502020204030204" pitchFamily="34" charset="0"/>
-              <a:cs typeface="Times New Roman" panose="02020603050405020304" pitchFamily="18" charset="0"/>
-            </a:endParaRPr>
-          </a:p>
-          <a:p>
-            <a:pPr>
-              <a:lnSpc>
-                <a:spcPct val="107000"/>
-              </a:lnSpc>
-            </a:pPr>
-            <a:r>
-              <a:rPr lang="en-US" sz="1400" dirty="0">
-                <a:solidFill>
-                  <a:srgbClr val="0000FF"/>
-                </a:solidFill>
-                <a:latin typeface="Consolas" panose="020B0609020204030204" pitchFamily="49" charset="0"/>
-                <a:ea typeface="Calibri" panose="020F0502020204030204" pitchFamily="34" charset="0"/>
-                <a:cs typeface="Times New Roman" panose="02020603050405020304" pitchFamily="18" charset="0"/>
-              </a:rPr>
-              <a:t>on</a:t>
-            </a:r>
-            <a:r>
-              <a:rPr lang="en-US" sz="1400" dirty="0">
-                <a:latin typeface="Consolas" panose="020B0609020204030204" pitchFamily="49" charset="0"/>
-                <a:ea typeface="Calibri" panose="020F0502020204030204" pitchFamily="34" charset="0"/>
-                <a:cs typeface="Times New Roman" panose="02020603050405020304" pitchFamily="18" charset="0"/>
-              </a:rPr>
-              <a:t> </a:t>
-            </a:r>
-            <a:r>
-              <a:rPr lang="en-US" sz="1400" dirty="0" err="1">
-                <a:solidFill>
-                  <a:srgbClr val="008080"/>
-                </a:solidFill>
-                <a:latin typeface="Consolas" panose="020B0609020204030204" pitchFamily="49" charset="0"/>
-                <a:ea typeface="Calibri" panose="020F0502020204030204" pitchFamily="34" charset="0"/>
-                <a:cs typeface="Times New Roman" panose="02020603050405020304" pitchFamily="18" charset="0"/>
-              </a:rPr>
-              <a:t>oh</a:t>
-            </a:r>
-            <a:r>
-              <a:rPr lang="en-US" sz="1400" dirty="0" err="1">
-                <a:solidFill>
-                  <a:srgbClr val="808080"/>
-                </a:solidFill>
-                <a:latin typeface="Consolas" panose="020B0609020204030204" pitchFamily="49" charset="0"/>
-                <a:ea typeface="Calibri" panose="020F0502020204030204" pitchFamily="34" charset="0"/>
-                <a:cs typeface="Times New Roman" panose="02020603050405020304" pitchFamily="18" charset="0"/>
-              </a:rPr>
-              <a:t>.</a:t>
-            </a:r>
-            <a:r>
-              <a:rPr lang="en-US" sz="1400" dirty="0" err="1">
-                <a:solidFill>
-                  <a:srgbClr val="008080"/>
-                </a:solidFill>
-                <a:latin typeface="Consolas" panose="020B0609020204030204" pitchFamily="49" charset="0"/>
-                <a:ea typeface="Calibri" panose="020F0502020204030204" pitchFamily="34" charset="0"/>
-                <a:cs typeface="Times New Roman" panose="02020603050405020304" pitchFamily="18" charset="0"/>
-              </a:rPr>
-              <a:t>OrderId</a:t>
-            </a:r>
-            <a:r>
-              <a:rPr lang="en-US" sz="1400" dirty="0">
-                <a:latin typeface="Consolas" panose="020B0609020204030204" pitchFamily="49" charset="0"/>
-                <a:ea typeface="Calibri" panose="020F0502020204030204" pitchFamily="34" charset="0"/>
-                <a:cs typeface="Times New Roman" panose="02020603050405020304" pitchFamily="18" charset="0"/>
-              </a:rPr>
-              <a:t> </a:t>
-            </a:r>
-            <a:r>
-              <a:rPr lang="en-US" sz="1400" dirty="0">
-                <a:solidFill>
-                  <a:srgbClr val="808080"/>
-                </a:solidFill>
-                <a:latin typeface="Consolas" panose="020B0609020204030204" pitchFamily="49" charset="0"/>
-                <a:ea typeface="Calibri" panose="020F0502020204030204" pitchFamily="34" charset="0"/>
-                <a:cs typeface="Times New Roman" panose="02020603050405020304" pitchFamily="18" charset="0"/>
-              </a:rPr>
-              <a:t>=</a:t>
-            </a:r>
-            <a:r>
-              <a:rPr lang="en-US" sz="1400" dirty="0">
-                <a:latin typeface="Consolas" panose="020B0609020204030204" pitchFamily="49" charset="0"/>
-                <a:ea typeface="Calibri" panose="020F0502020204030204" pitchFamily="34" charset="0"/>
-                <a:cs typeface="Times New Roman" panose="02020603050405020304" pitchFamily="18" charset="0"/>
-              </a:rPr>
-              <a:t> </a:t>
-            </a:r>
-            <a:r>
-              <a:rPr lang="en-US" sz="1400" dirty="0" err="1">
-                <a:solidFill>
-                  <a:srgbClr val="008080"/>
-                </a:solidFill>
-                <a:latin typeface="Consolas" panose="020B0609020204030204" pitchFamily="49" charset="0"/>
-                <a:ea typeface="Calibri" panose="020F0502020204030204" pitchFamily="34" charset="0"/>
-                <a:cs typeface="Times New Roman" panose="02020603050405020304" pitchFamily="18" charset="0"/>
-              </a:rPr>
-              <a:t>od</a:t>
-            </a:r>
-            <a:r>
-              <a:rPr lang="en-US" sz="1400" dirty="0" err="1">
-                <a:solidFill>
-                  <a:srgbClr val="808080"/>
-                </a:solidFill>
-                <a:latin typeface="Consolas" panose="020B0609020204030204" pitchFamily="49" charset="0"/>
-                <a:ea typeface="Calibri" panose="020F0502020204030204" pitchFamily="34" charset="0"/>
-                <a:cs typeface="Times New Roman" panose="02020603050405020304" pitchFamily="18" charset="0"/>
-              </a:rPr>
-              <a:t>.</a:t>
-            </a:r>
-            <a:r>
-              <a:rPr lang="en-US" sz="1400" dirty="0" err="1">
-                <a:solidFill>
-                  <a:srgbClr val="008080"/>
-                </a:solidFill>
-                <a:latin typeface="Consolas" panose="020B0609020204030204" pitchFamily="49" charset="0"/>
-                <a:ea typeface="Calibri" panose="020F0502020204030204" pitchFamily="34" charset="0"/>
-                <a:cs typeface="Times New Roman" panose="02020603050405020304" pitchFamily="18" charset="0"/>
-              </a:rPr>
-              <a:t>OrderId</a:t>
-            </a:r>
-            <a:endParaRPr lang="en-US" dirty="0">
-              <a:latin typeface="Calibri" panose="020F0502020204030204" pitchFamily="34" charset="0"/>
-              <a:ea typeface="Calibri" panose="020F0502020204030204" pitchFamily="34" charset="0"/>
-              <a:cs typeface="Times New Roman" panose="02020603050405020304" pitchFamily="18" charset="0"/>
-            </a:endParaRPr>
-          </a:p>
-          <a:p>
-            <a:pPr>
-              <a:lnSpc>
-                <a:spcPct val="107000"/>
-              </a:lnSpc>
-            </a:pPr>
-            <a:r>
-              <a:rPr lang="en-US" sz="1400" dirty="0">
-                <a:solidFill>
-                  <a:srgbClr val="0000FF"/>
-                </a:solidFill>
-                <a:latin typeface="Consolas" panose="020B0609020204030204" pitchFamily="49" charset="0"/>
-                <a:ea typeface="Calibri" panose="020F0502020204030204" pitchFamily="34" charset="0"/>
-                <a:cs typeface="Times New Roman" panose="02020603050405020304" pitchFamily="18" charset="0"/>
-              </a:rPr>
-              <a:t>on</a:t>
-            </a:r>
-            <a:r>
-              <a:rPr lang="en-US" sz="1400" dirty="0">
-                <a:latin typeface="Consolas" panose="020B0609020204030204" pitchFamily="49" charset="0"/>
-                <a:ea typeface="Calibri" panose="020F0502020204030204" pitchFamily="34" charset="0"/>
-                <a:cs typeface="Times New Roman" panose="02020603050405020304" pitchFamily="18" charset="0"/>
-              </a:rPr>
-              <a:t> </a:t>
-            </a:r>
-            <a:r>
-              <a:rPr lang="en-US" sz="1400" dirty="0" err="1">
-                <a:solidFill>
-                  <a:srgbClr val="008080"/>
-                </a:solidFill>
-                <a:latin typeface="Consolas" panose="020B0609020204030204" pitchFamily="49" charset="0"/>
-                <a:ea typeface="Calibri" panose="020F0502020204030204" pitchFamily="34" charset="0"/>
-                <a:cs typeface="Times New Roman" panose="02020603050405020304" pitchFamily="18" charset="0"/>
-              </a:rPr>
-              <a:t>oh</a:t>
-            </a:r>
-            <a:r>
-              <a:rPr lang="en-US" sz="1400" dirty="0" err="1">
-                <a:solidFill>
-                  <a:srgbClr val="808080"/>
-                </a:solidFill>
-                <a:latin typeface="Consolas" panose="020B0609020204030204" pitchFamily="49" charset="0"/>
-                <a:ea typeface="Calibri" panose="020F0502020204030204" pitchFamily="34" charset="0"/>
-                <a:cs typeface="Times New Roman" panose="02020603050405020304" pitchFamily="18" charset="0"/>
-              </a:rPr>
-              <a:t>.</a:t>
-            </a:r>
-            <a:r>
-              <a:rPr lang="en-US" sz="1400" dirty="0" err="1">
-                <a:solidFill>
-                  <a:srgbClr val="008080"/>
-                </a:solidFill>
-                <a:latin typeface="Consolas" panose="020B0609020204030204" pitchFamily="49" charset="0"/>
-                <a:ea typeface="Calibri" panose="020F0502020204030204" pitchFamily="34" charset="0"/>
-                <a:cs typeface="Times New Roman" panose="02020603050405020304" pitchFamily="18" charset="0"/>
-              </a:rPr>
-              <a:t>CustomerId</a:t>
-            </a:r>
-            <a:r>
-              <a:rPr lang="en-US" sz="1400" dirty="0">
-                <a:latin typeface="Consolas" panose="020B0609020204030204" pitchFamily="49" charset="0"/>
-                <a:ea typeface="Calibri" panose="020F0502020204030204" pitchFamily="34" charset="0"/>
-                <a:cs typeface="Times New Roman" panose="02020603050405020304" pitchFamily="18" charset="0"/>
-              </a:rPr>
-              <a:t> </a:t>
-            </a:r>
-            <a:r>
-              <a:rPr lang="en-US" sz="1400" dirty="0">
-                <a:solidFill>
-                  <a:srgbClr val="808080"/>
-                </a:solidFill>
-                <a:latin typeface="Consolas" panose="020B0609020204030204" pitchFamily="49" charset="0"/>
-                <a:ea typeface="Calibri" panose="020F0502020204030204" pitchFamily="34" charset="0"/>
-                <a:cs typeface="Times New Roman" panose="02020603050405020304" pitchFamily="18" charset="0"/>
-              </a:rPr>
-              <a:t>=</a:t>
-            </a:r>
-            <a:r>
-              <a:rPr lang="en-US" sz="1400" dirty="0">
-                <a:latin typeface="Consolas" panose="020B0609020204030204" pitchFamily="49" charset="0"/>
-                <a:ea typeface="Calibri" panose="020F0502020204030204" pitchFamily="34" charset="0"/>
-                <a:cs typeface="Times New Roman" panose="02020603050405020304" pitchFamily="18" charset="0"/>
-              </a:rPr>
-              <a:t> </a:t>
-            </a:r>
-            <a:r>
-              <a:rPr lang="en-US" sz="1400" dirty="0" err="1">
-                <a:solidFill>
-                  <a:srgbClr val="008080"/>
-                </a:solidFill>
-                <a:latin typeface="Consolas" panose="020B0609020204030204" pitchFamily="49" charset="0"/>
-                <a:ea typeface="Calibri" panose="020F0502020204030204" pitchFamily="34" charset="0"/>
-                <a:cs typeface="Times New Roman" panose="02020603050405020304" pitchFamily="18" charset="0"/>
-              </a:rPr>
-              <a:t>cust</a:t>
-            </a:r>
-            <a:r>
-              <a:rPr lang="en-US" sz="1400" dirty="0" err="1">
-                <a:solidFill>
-                  <a:srgbClr val="808080"/>
-                </a:solidFill>
-                <a:latin typeface="Consolas" panose="020B0609020204030204" pitchFamily="49" charset="0"/>
-                <a:ea typeface="Calibri" panose="020F0502020204030204" pitchFamily="34" charset="0"/>
-                <a:cs typeface="Times New Roman" panose="02020603050405020304" pitchFamily="18" charset="0"/>
-              </a:rPr>
-              <a:t>.</a:t>
-            </a:r>
-            <a:r>
-              <a:rPr lang="en-US" sz="1400" dirty="0" err="1">
-                <a:solidFill>
-                  <a:srgbClr val="008080"/>
-                </a:solidFill>
-                <a:latin typeface="Consolas" panose="020B0609020204030204" pitchFamily="49" charset="0"/>
-                <a:ea typeface="Calibri" panose="020F0502020204030204" pitchFamily="34" charset="0"/>
-                <a:cs typeface="Times New Roman" panose="02020603050405020304" pitchFamily="18" charset="0"/>
-              </a:rPr>
-              <a:t>CustomerID</a:t>
-            </a:r>
-            <a:endParaRPr lang="en-US" dirty="0">
-              <a:latin typeface="Calibri" panose="020F0502020204030204" pitchFamily="34" charset="0"/>
-              <a:ea typeface="Calibri" panose="020F0502020204030204" pitchFamily="34" charset="0"/>
-              <a:cs typeface="Times New Roman" panose="02020603050405020304" pitchFamily="18" charset="0"/>
-            </a:endParaRPr>
-          </a:p>
-          <a:p>
-            <a:pPr>
-              <a:lnSpc>
-                <a:spcPct val="107000"/>
-              </a:lnSpc>
-            </a:pPr>
-            <a:r>
-              <a:rPr lang="en-US" sz="1400" dirty="0">
-                <a:solidFill>
-                  <a:srgbClr val="0000FF"/>
-                </a:solidFill>
-                <a:latin typeface="Consolas" panose="020B0609020204030204" pitchFamily="49" charset="0"/>
-                <a:ea typeface="Calibri" panose="020F0502020204030204" pitchFamily="34" charset="0"/>
-                <a:cs typeface="Times New Roman" panose="02020603050405020304" pitchFamily="18" charset="0"/>
-              </a:rPr>
-              <a:t>where</a:t>
-            </a:r>
-            <a:r>
-              <a:rPr lang="en-US" sz="1400" dirty="0">
-                <a:latin typeface="Consolas" panose="020B0609020204030204" pitchFamily="49" charset="0"/>
-                <a:ea typeface="Calibri" panose="020F0502020204030204" pitchFamily="34" charset="0"/>
-                <a:cs typeface="Times New Roman" panose="02020603050405020304" pitchFamily="18" charset="0"/>
-              </a:rPr>
-              <a:t> </a:t>
-            </a:r>
-            <a:r>
-              <a:rPr lang="en-US" sz="1400" dirty="0" err="1">
-                <a:solidFill>
-                  <a:srgbClr val="008080"/>
-                </a:solidFill>
-                <a:latin typeface="Consolas" panose="020B0609020204030204" pitchFamily="49" charset="0"/>
-                <a:ea typeface="Calibri" panose="020F0502020204030204" pitchFamily="34" charset="0"/>
-                <a:cs typeface="Times New Roman" panose="02020603050405020304" pitchFamily="18" charset="0"/>
-              </a:rPr>
-              <a:t>cust</a:t>
-            </a:r>
-            <a:r>
-              <a:rPr lang="en-US" sz="1400" dirty="0" err="1">
-                <a:solidFill>
-                  <a:srgbClr val="808080"/>
-                </a:solidFill>
-                <a:latin typeface="Consolas" panose="020B0609020204030204" pitchFamily="49" charset="0"/>
-                <a:ea typeface="Calibri" panose="020F0502020204030204" pitchFamily="34" charset="0"/>
-                <a:cs typeface="Times New Roman" panose="02020603050405020304" pitchFamily="18" charset="0"/>
-              </a:rPr>
-              <a:t>.</a:t>
-            </a:r>
-            <a:r>
-              <a:rPr lang="en-US" sz="1400" dirty="0" err="1">
-                <a:solidFill>
-                  <a:srgbClr val="0000FF"/>
-                </a:solidFill>
-                <a:latin typeface="Consolas" panose="020B0609020204030204" pitchFamily="49" charset="0"/>
-                <a:ea typeface="Calibri" panose="020F0502020204030204" pitchFamily="34" charset="0"/>
-                <a:cs typeface="Times New Roman" panose="02020603050405020304" pitchFamily="18" charset="0"/>
-              </a:rPr>
-              <a:t>State</a:t>
-            </a:r>
-            <a:r>
-              <a:rPr lang="en-US" sz="1400" dirty="0">
-                <a:latin typeface="Consolas" panose="020B0609020204030204" pitchFamily="49" charset="0"/>
-                <a:ea typeface="Calibri" panose="020F0502020204030204" pitchFamily="34" charset="0"/>
-                <a:cs typeface="Times New Roman" panose="02020603050405020304" pitchFamily="18" charset="0"/>
-              </a:rPr>
-              <a:t> </a:t>
-            </a:r>
-            <a:r>
-              <a:rPr lang="en-US" sz="1400" dirty="0" smtClean="0">
-                <a:solidFill>
-                  <a:srgbClr val="808080"/>
-                </a:solidFill>
-                <a:latin typeface="Consolas" panose="020B0609020204030204" pitchFamily="49" charset="0"/>
-                <a:ea typeface="Calibri" panose="020F0502020204030204" pitchFamily="34" charset="0"/>
-                <a:cs typeface="Times New Roman" panose="02020603050405020304" pitchFamily="18" charset="0"/>
-              </a:rPr>
-              <a:t>= </a:t>
-            </a:r>
-            <a:r>
-              <a:rPr lang="en-US" sz="1400" dirty="0" smtClean="0">
-                <a:solidFill>
-                  <a:srgbClr val="FF0000"/>
-                </a:solidFill>
-                <a:latin typeface="Consolas" panose="020B0609020204030204" pitchFamily="49" charset="0"/>
-                <a:ea typeface="Calibri" panose="020F0502020204030204" pitchFamily="34" charset="0"/>
-                <a:cs typeface="Times New Roman" panose="02020603050405020304" pitchFamily="18" charset="0"/>
-              </a:rPr>
-              <a:t>'MN'</a:t>
-            </a:r>
-            <a:endParaRPr lang="en-US" dirty="0">
-              <a:latin typeface="Calibri" panose="020F0502020204030204" pitchFamily="34" charset="0"/>
-              <a:ea typeface="Calibri" panose="020F0502020204030204" pitchFamily="34" charset="0"/>
-              <a:cs typeface="Times New Roman" panose="02020603050405020304" pitchFamily="18" charset="0"/>
-            </a:endParaRPr>
-          </a:p>
-          <a:p>
-            <a:pPr>
-              <a:lnSpc>
-                <a:spcPct val="107000"/>
-              </a:lnSpc>
-            </a:pPr>
-            <a:r>
-              <a:rPr lang="en-US" sz="1400" dirty="0">
-                <a:solidFill>
-                  <a:srgbClr val="0000FF"/>
-                </a:solidFill>
-                <a:latin typeface="Consolas" panose="020B0609020204030204" pitchFamily="49" charset="0"/>
-                <a:ea typeface="Calibri" panose="020F0502020204030204" pitchFamily="34" charset="0"/>
-                <a:cs typeface="Times New Roman" panose="02020603050405020304" pitchFamily="18" charset="0"/>
-              </a:rPr>
-              <a:t>group</a:t>
-            </a:r>
-            <a:r>
-              <a:rPr lang="en-US" sz="1400" dirty="0">
-                <a:latin typeface="Consolas" panose="020B0609020204030204" pitchFamily="49" charset="0"/>
-                <a:ea typeface="Calibri" panose="020F0502020204030204" pitchFamily="34" charset="0"/>
-                <a:cs typeface="Times New Roman" panose="02020603050405020304" pitchFamily="18" charset="0"/>
-              </a:rPr>
-              <a:t> </a:t>
-            </a:r>
-            <a:r>
-              <a:rPr lang="en-US" sz="1400" dirty="0">
-                <a:solidFill>
-                  <a:srgbClr val="0000FF"/>
-                </a:solidFill>
-                <a:latin typeface="Consolas" panose="020B0609020204030204" pitchFamily="49" charset="0"/>
-                <a:ea typeface="Calibri" panose="020F0502020204030204" pitchFamily="34" charset="0"/>
-                <a:cs typeface="Times New Roman" panose="02020603050405020304" pitchFamily="18" charset="0"/>
-              </a:rPr>
-              <a:t>by</a:t>
-            </a:r>
-            <a:r>
-              <a:rPr lang="en-US" sz="1400" dirty="0">
-                <a:latin typeface="Consolas" panose="020B0609020204030204" pitchFamily="49" charset="0"/>
-                <a:ea typeface="Calibri" panose="020F0502020204030204" pitchFamily="34" charset="0"/>
-                <a:cs typeface="Times New Roman" panose="02020603050405020304" pitchFamily="18" charset="0"/>
-              </a:rPr>
-              <a:t> </a:t>
-            </a:r>
-            <a:r>
-              <a:rPr lang="en-US" sz="1400" dirty="0" err="1">
-                <a:solidFill>
-                  <a:srgbClr val="008080"/>
-                </a:solidFill>
-                <a:latin typeface="Consolas" panose="020B0609020204030204" pitchFamily="49" charset="0"/>
-                <a:ea typeface="Calibri" panose="020F0502020204030204" pitchFamily="34" charset="0"/>
-                <a:cs typeface="Times New Roman" panose="02020603050405020304" pitchFamily="18" charset="0"/>
-              </a:rPr>
-              <a:t>od</a:t>
-            </a:r>
-            <a:r>
-              <a:rPr lang="en-US" sz="1400" dirty="0" err="1">
-                <a:solidFill>
-                  <a:srgbClr val="808080"/>
-                </a:solidFill>
-                <a:latin typeface="Consolas" panose="020B0609020204030204" pitchFamily="49" charset="0"/>
-                <a:ea typeface="Calibri" panose="020F0502020204030204" pitchFamily="34" charset="0"/>
-                <a:cs typeface="Times New Roman" panose="02020603050405020304" pitchFamily="18" charset="0"/>
-              </a:rPr>
-              <a:t>.</a:t>
-            </a:r>
-            <a:r>
-              <a:rPr lang="en-US" sz="1400" dirty="0" err="1">
-                <a:solidFill>
-                  <a:srgbClr val="008080"/>
-                </a:solidFill>
-                <a:latin typeface="Consolas" panose="020B0609020204030204" pitchFamily="49" charset="0"/>
-                <a:ea typeface="Calibri" panose="020F0502020204030204" pitchFamily="34" charset="0"/>
-                <a:cs typeface="Times New Roman" panose="02020603050405020304" pitchFamily="18" charset="0"/>
-              </a:rPr>
-              <a:t>ProductId</a:t>
-            </a:r>
-            <a:endParaRPr lang="en-US" dirty="0">
-              <a:latin typeface="Calibri" panose="020F0502020204030204" pitchFamily="34" charset="0"/>
-              <a:ea typeface="Calibri" panose="020F0502020204030204" pitchFamily="34" charset="0"/>
-              <a:cs typeface="Times New Roman" panose="02020603050405020304" pitchFamily="18" charset="0"/>
-            </a:endParaRPr>
-          </a:p>
-          <a:p>
-            <a:pPr>
-              <a:lnSpc>
-                <a:spcPct val="107000"/>
-              </a:lnSpc>
-            </a:pPr>
-            <a:r>
-              <a:rPr lang="en-US" sz="1400" dirty="0">
-                <a:solidFill>
-                  <a:srgbClr val="0000FF"/>
-                </a:solidFill>
-                <a:latin typeface="Consolas" panose="020B0609020204030204" pitchFamily="49" charset="0"/>
-                <a:ea typeface="Calibri" panose="020F0502020204030204" pitchFamily="34" charset="0"/>
-                <a:cs typeface="Times New Roman" panose="02020603050405020304" pitchFamily="18" charset="0"/>
-              </a:rPr>
-              <a:t>having</a:t>
-            </a:r>
-            <a:r>
-              <a:rPr lang="en-US" sz="1400" dirty="0">
-                <a:latin typeface="Consolas" panose="020B0609020204030204" pitchFamily="49" charset="0"/>
-                <a:ea typeface="Calibri" panose="020F0502020204030204" pitchFamily="34" charset="0"/>
-                <a:cs typeface="Times New Roman" panose="02020603050405020304" pitchFamily="18" charset="0"/>
-              </a:rPr>
-              <a:t> </a:t>
-            </a:r>
-            <a:r>
-              <a:rPr lang="en-US" sz="1400" dirty="0">
-                <a:solidFill>
-                  <a:srgbClr val="FF00FF"/>
-                </a:solidFill>
-                <a:latin typeface="Consolas" panose="020B0609020204030204" pitchFamily="49" charset="0"/>
-                <a:ea typeface="Calibri" panose="020F0502020204030204" pitchFamily="34" charset="0"/>
-                <a:cs typeface="Times New Roman" panose="02020603050405020304" pitchFamily="18" charset="0"/>
-              </a:rPr>
-              <a:t>sum</a:t>
-            </a:r>
-            <a:r>
-              <a:rPr lang="en-US" sz="1400" dirty="0">
-                <a:solidFill>
-                  <a:srgbClr val="808080"/>
-                </a:solidFill>
-                <a:latin typeface="Consolas" panose="020B0609020204030204" pitchFamily="49" charset="0"/>
-                <a:ea typeface="Calibri" panose="020F0502020204030204" pitchFamily="34" charset="0"/>
-                <a:cs typeface="Times New Roman" panose="02020603050405020304" pitchFamily="18" charset="0"/>
-              </a:rPr>
-              <a:t>(</a:t>
-            </a:r>
-            <a:r>
-              <a:rPr lang="en-US" sz="1400" dirty="0" err="1">
-                <a:solidFill>
-                  <a:srgbClr val="008080"/>
-                </a:solidFill>
-                <a:latin typeface="Consolas" panose="020B0609020204030204" pitchFamily="49" charset="0"/>
-                <a:ea typeface="Calibri" panose="020F0502020204030204" pitchFamily="34" charset="0"/>
-                <a:cs typeface="Times New Roman" panose="02020603050405020304" pitchFamily="18" charset="0"/>
-              </a:rPr>
-              <a:t>od</a:t>
-            </a:r>
-            <a:r>
-              <a:rPr lang="en-US" sz="1400" dirty="0" err="1">
-                <a:solidFill>
-                  <a:srgbClr val="808080"/>
-                </a:solidFill>
-                <a:latin typeface="Consolas" panose="020B0609020204030204" pitchFamily="49" charset="0"/>
-                <a:ea typeface="Calibri" panose="020F0502020204030204" pitchFamily="34" charset="0"/>
-                <a:cs typeface="Times New Roman" panose="02020603050405020304" pitchFamily="18" charset="0"/>
-              </a:rPr>
-              <a:t>.</a:t>
-            </a:r>
-            <a:r>
-              <a:rPr lang="en-US" sz="1400" dirty="0" err="1">
-                <a:solidFill>
-                  <a:srgbClr val="008080"/>
-                </a:solidFill>
-                <a:latin typeface="Consolas" panose="020B0609020204030204" pitchFamily="49" charset="0"/>
-                <a:ea typeface="Calibri" panose="020F0502020204030204" pitchFamily="34" charset="0"/>
-                <a:cs typeface="Times New Roman" panose="02020603050405020304" pitchFamily="18" charset="0"/>
-              </a:rPr>
-              <a:t>Quantity</a:t>
-            </a:r>
-            <a:r>
-              <a:rPr lang="en-US" sz="1400" dirty="0">
-                <a:solidFill>
-                  <a:srgbClr val="808080"/>
-                </a:solidFill>
-                <a:latin typeface="Consolas" panose="020B0609020204030204" pitchFamily="49" charset="0"/>
-                <a:ea typeface="Calibri" panose="020F0502020204030204" pitchFamily="34" charset="0"/>
-                <a:cs typeface="Times New Roman" panose="02020603050405020304" pitchFamily="18" charset="0"/>
-              </a:rPr>
-              <a:t>)</a:t>
-            </a:r>
-            <a:r>
-              <a:rPr lang="en-US" sz="1400" dirty="0">
-                <a:latin typeface="Consolas" panose="020B0609020204030204" pitchFamily="49" charset="0"/>
-                <a:ea typeface="Calibri" panose="020F0502020204030204" pitchFamily="34" charset="0"/>
-                <a:cs typeface="Times New Roman" panose="02020603050405020304" pitchFamily="18" charset="0"/>
-              </a:rPr>
-              <a:t> </a:t>
-            </a:r>
-            <a:r>
-              <a:rPr lang="en-US" sz="1400" dirty="0">
-                <a:solidFill>
-                  <a:srgbClr val="808080"/>
-                </a:solidFill>
-                <a:latin typeface="Consolas" panose="020B0609020204030204" pitchFamily="49" charset="0"/>
-                <a:ea typeface="Calibri" panose="020F0502020204030204" pitchFamily="34" charset="0"/>
-                <a:cs typeface="Times New Roman" panose="02020603050405020304" pitchFamily="18" charset="0"/>
-              </a:rPr>
-              <a:t>&gt;=</a:t>
-            </a:r>
-            <a:r>
-              <a:rPr lang="en-US" sz="1400" dirty="0">
-                <a:latin typeface="Consolas" panose="020B0609020204030204" pitchFamily="49" charset="0"/>
-                <a:ea typeface="Calibri" panose="020F0502020204030204" pitchFamily="34" charset="0"/>
-                <a:cs typeface="Times New Roman" panose="02020603050405020304" pitchFamily="18" charset="0"/>
-              </a:rPr>
-              <a:t> 20</a:t>
-            </a:r>
-            <a:endParaRPr lang="en-US" dirty="0">
-              <a:latin typeface="Calibri" panose="020F0502020204030204" pitchFamily="34" charset="0"/>
-              <a:ea typeface="Calibri" panose="020F0502020204030204" pitchFamily="34" charset="0"/>
-              <a:cs typeface="Times New Roman" panose="02020603050405020304" pitchFamily="18" charset="0"/>
-            </a:endParaRPr>
-          </a:p>
-          <a:p>
-            <a:pPr>
-              <a:lnSpc>
-                <a:spcPct val="107000"/>
-              </a:lnSpc>
-            </a:pPr>
-            <a:r>
-              <a:rPr lang="en-US" sz="1400" dirty="0">
-                <a:solidFill>
-                  <a:srgbClr val="0000FF"/>
-                </a:solidFill>
-                <a:latin typeface="Consolas" panose="020B0609020204030204" pitchFamily="49" charset="0"/>
-                <a:ea typeface="Calibri" panose="020F0502020204030204" pitchFamily="34" charset="0"/>
-                <a:cs typeface="Times New Roman" panose="02020603050405020304" pitchFamily="18" charset="0"/>
-              </a:rPr>
-              <a:t>select</a:t>
-            </a:r>
-            <a:r>
-              <a:rPr lang="en-US" sz="1400" dirty="0">
-                <a:latin typeface="Consolas" panose="020B0609020204030204" pitchFamily="49" charset="0"/>
-                <a:ea typeface="Calibri" panose="020F0502020204030204" pitchFamily="34" charset="0"/>
-                <a:cs typeface="Times New Roman" panose="02020603050405020304" pitchFamily="18" charset="0"/>
-              </a:rPr>
-              <a:t> </a:t>
-            </a:r>
-            <a:r>
-              <a:rPr lang="en-US" sz="1400" dirty="0" err="1">
-                <a:solidFill>
-                  <a:srgbClr val="008080"/>
-                </a:solidFill>
-                <a:latin typeface="Consolas" panose="020B0609020204030204" pitchFamily="49" charset="0"/>
-                <a:ea typeface="Calibri" panose="020F0502020204030204" pitchFamily="34" charset="0"/>
-                <a:cs typeface="Times New Roman" panose="02020603050405020304" pitchFamily="18" charset="0"/>
-              </a:rPr>
-              <a:t>od</a:t>
-            </a:r>
-            <a:r>
-              <a:rPr lang="en-US" sz="1400" dirty="0" err="1">
-                <a:solidFill>
-                  <a:srgbClr val="808080"/>
-                </a:solidFill>
-                <a:latin typeface="Consolas" panose="020B0609020204030204" pitchFamily="49" charset="0"/>
-                <a:ea typeface="Calibri" panose="020F0502020204030204" pitchFamily="34" charset="0"/>
-                <a:cs typeface="Times New Roman" panose="02020603050405020304" pitchFamily="18" charset="0"/>
-              </a:rPr>
-              <a:t>.</a:t>
-            </a:r>
-            <a:r>
-              <a:rPr lang="en-US" sz="1400" dirty="0" err="1">
-                <a:solidFill>
-                  <a:srgbClr val="008080"/>
-                </a:solidFill>
-                <a:latin typeface="Consolas" panose="020B0609020204030204" pitchFamily="49" charset="0"/>
-                <a:ea typeface="Calibri" panose="020F0502020204030204" pitchFamily="34" charset="0"/>
-                <a:cs typeface="Times New Roman" panose="02020603050405020304" pitchFamily="18" charset="0"/>
-              </a:rPr>
-              <a:t>ProductId</a:t>
-            </a:r>
-            <a:r>
-              <a:rPr lang="en-US" sz="1400" dirty="0">
-                <a:solidFill>
-                  <a:srgbClr val="808080"/>
-                </a:solidFill>
-                <a:latin typeface="Consolas" panose="020B0609020204030204" pitchFamily="49" charset="0"/>
-                <a:ea typeface="Calibri" panose="020F0502020204030204" pitchFamily="34" charset="0"/>
-                <a:cs typeface="Times New Roman" panose="02020603050405020304" pitchFamily="18" charset="0"/>
-              </a:rPr>
-              <a:t>,</a:t>
-            </a:r>
-            <a:endParaRPr lang="en-US" sz="1400" dirty="0">
-              <a:latin typeface="Consolas" panose="020B0609020204030204" pitchFamily="49" charset="0"/>
-              <a:ea typeface="Calibri" panose="020F0502020204030204" pitchFamily="34" charset="0"/>
-              <a:cs typeface="Times New Roman" panose="02020603050405020304" pitchFamily="18" charset="0"/>
-            </a:endParaRPr>
-          </a:p>
-          <a:p>
-            <a:pPr>
-              <a:lnSpc>
-                <a:spcPct val="107000"/>
-              </a:lnSpc>
-            </a:pPr>
-            <a:r>
-              <a:rPr lang="en-US" sz="1400" dirty="0">
-                <a:solidFill>
-                  <a:srgbClr val="FF00FF"/>
-                </a:solidFill>
-                <a:latin typeface="Consolas" panose="020B0609020204030204" pitchFamily="49" charset="0"/>
-                <a:ea typeface="Calibri" panose="020F0502020204030204" pitchFamily="34" charset="0"/>
-                <a:cs typeface="Times New Roman" panose="02020603050405020304" pitchFamily="18" charset="0"/>
-              </a:rPr>
-              <a:t>	sum</a:t>
-            </a:r>
-            <a:r>
-              <a:rPr lang="en-US" sz="1400" dirty="0">
-                <a:solidFill>
-                  <a:srgbClr val="808080"/>
-                </a:solidFill>
-                <a:latin typeface="Consolas" panose="020B0609020204030204" pitchFamily="49" charset="0"/>
-                <a:ea typeface="Calibri" panose="020F0502020204030204" pitchFamily="34" charset="0"/>
-                <a:cs typeface="Times New Roman" panose="02020603050405020304" pitchFamily="18" charset="0"/>
-              </a:rPr>
-              <a:t>(</a:t>
-            </a:r>
-            <a:r>
-              <a:rPr lang="en-US" sz="1400" dirty="0" err="1">
-                <a:solidFill>
-                  <a:srgbClr val="008080"/>
-                </a:solidFill>
-                <a:latin typeface="Consolas" panose="020B0609020204030204" pitchFamily="49" charset="0"/>
-                <a:ea typeface="Calibri" panose="020F0502020204030204" pitchFamily="34" charset="0"/>
-                <a:cs typeface="Times New Roman" panose="02020603050405020304" pitchFamily="18" charset="0"/>
-              </a:rPr>
-              <a:t>od</a:t>
-            </a:r>
-            <a:r>
-              <a:rPr lang="en-US" sz="1400" dirty="0" err="1">
-                <a:solidFill>
-                  <a:srgbClr val="808080"/>
-                </a:solidFill>
-                <a:latin typeface="Consolas" panose="020B0609020204030204" pitchFamily="49" charset="0"/>
-                <a:ea typeface="Calibri" panose="020F0502020204030204" pitchFamily="34" charset="0"/>
-                <a:cs typeface="Times New Roman" panose="02020603050405020304" pitchFamily="18" charset="0"/>
-              </a:rPr>
-              <a:t>.</a:t>
-            </a:r>
-            <a:r>
-              <a:rPr lang="en-US" sz="1400" dirty="0" err="1">
-                <a:solidFill>
-                  <a:srgbClr val="008080"/>
-                </a:solidFill>
-                <a:latin typeface="Consolas" panose="020B0609020204030204" pitchFamily="49" charset="0"/>
-                <a:ea typeface="Calibri" panose="020F0502020204030204" pitchFamily="34" charset="0"/>
-                <a:cs typeface="Times New Roman" panose="02020603050405020304" pitchFamily="18" charset="0"/>
-              </a:rPr>
-              <a:t>Quantity</a:t>
-            </a:r>
-            <a:r>
-              <a:rPr lang="en-US" sz="1400" dirty="0">
-                <a:solidFill>
-                  <a:srgbClr val="808080"/>
-                </a:solidFill>
-                <a:latin typeface="Consolas" panose="020B0609020204030204" pitchFamily="49" charset="0"/>
-                <a:ea typeface="Calibri" panose="020F0502020204030204" pitchFamily="34" charset="0"/>
-                <a:cs typeface="Times New Roman" panose="02020603050405020304" pitchFamily="18" charset="0"/>
-              </a:rPr>
-              <a:t>)</a:t>
-            </a:r>
-            <a:r>
-              <a:rPr lang="en-US" sz="1400" dirty="0">
-                <a:latin typeface="Consolas" panose="020B0609020204030204" pitchFamily="49" charset="0"/>
-                <a:ea typeface="Calibri" panose="020F0502020204030204" pitchFamily="34" charset="0"/>
-                <a:cs typeface="Times New Roman" panose="02020603050405020304" pitchFamily="18" charset="0"/>
-              </a:rPr>
-              <a:t> </a:t>
-            </a:r>
-            <a:r>
-              <a:rPr lang="en-US" sz="1400" dirty="0">
-                <a:solidFill>
-                  <a:srgbClr val="808080"/>
-                </a:solidFill>
-                <a:latin typeface="Consolas" panose="020B0609020204030204" pitchFamily="49" charset="0"/>
-                <a:ea typeface="Calibri" panose="020F0502020204030204" pitchFamily="34" charset="0"/>
-                <a:cs typeface="Times New Roman" panose="02020603050405020304" pitchFamily="18" charset="0"/>
-              </a:rPr>
-              <a:t>-</a:t>
-            </a:r>
-            <a:r>
-              <a:rPr lang="en-US" sz="1400" dirty="0">
-                <a:latin typeface="Consolas" panose="020B0609020204030204" pitchFamily="49" charset="0"/>
-                <a:ea typeface="Calibri" panose="020F0502020204030204" pitchFamily="34" charset="0"/>
-                <a:cs typeface="Times New Roman" panose="02020603050405020304" pitchFamily="18" charset="0"/>
-              </a:rPr>
-              <a:t> 20 </a:t>
-            </a:r>
-            <a:r>
-              <a:rPr lang="en-US" sz="1400" dirty="0" err="1">
-                <a:solidFill>
-                  <a:srgbClr val="008080"/>
-                </a:solidFill>
-                <a:latin typeface="Consolas" panose="020B0609020204030204" pitchFamily="49" charset="0"/>
-                <a:ea typeface="Calibri" panose="020F0502020204030204" pitchFamily="34" charset="0"/>
-                <a:cs typeface="Times New Roman" panose="02020603050405020304" pitchFamily="18" charset="0"/>
-              </a:rPr>
-              <a:t>ExcessOrders</a:t>
-            </a:r>
-            <a:endParaRPr lang="en-US" dirty="0">
-              <a:latin typeface="Calibri" panose="020F0502020204030204" pitchFamily="34" charset="0"/>
-              <a:ea typeface="Calibri" panose="020F0502020204030204" pitchFamily="34" charset="0"/>
-              <a:cs typeface="Times New Roman" panose="02020603050405020304" pitchFamily="18" charset="0"/>
-            </a:endParaRPr>
-          </a:p>
-          <a:p>
-            <a:pPr>
-              <a:lnSpc>
-                <a:spcPct val="107000"/>
-              </a:lnSpc>
-            </a:pPr>
-            <a:r>
-              <a:rPr lang="en-US" sz="1400" dirty="0">
-                <a:solidFill>
-                  <a:srgbClr val="0000FF"/>
-                </a:solidFill>
-                <a:latin typeface="Consolas" panose="020B0609020204030204" pitchFamily="49" charset="0"/>
-                <a:ea typeface="Calibri" panose="020F0502020204030204" pitchFamily="34" charset="0"/>
-                <a:cs typeface="Times New Roman" panose="02020603050405020304" pitchFamily="18" charset="0"/>
-              </a:rPr>
-              <a:t>order</a:t>
-            </a:r>
-            <a:r>
-              <a:rPr lang="en-US" sz="1400" dirty="0">
-                <a:latin typeface="Consolas" panose="020B0609020204030204" pitchFamily="49" charset="0"/>
-                <a:ea typeface="Calibri" panose="020F0502020204030204" pitchFamily="34" charset="0"/>
-                <a:cs typeface="Times New Roman" panose="02020603050405020304" pitchFamily="18" charset="0"/>
-              </a:rPr>
-              <a:t> </a:t>
-            </a:r>
-            <a:r>
-              <a:rPr lang="en-US" sz="1400" dirty="0">
-                <a:solidFill>
-                  <a:srgbClr val="0000FF"/>
-                </a:solidFill>
-                <a:latin typeface="Consolas" panose="020B0609020204030204" pitchFamily="49" charset="0"/>
-                <a:ea typeface="Calibri" panose="020F0502020204030204" pitchFamily="34" charset="0"/>
-                <a:cs typeface="Times New Roman" panose="02020603050405020304" pitchFamily="18" charset="0"/>
-              </a:rPr>
-              <a:t>by</a:t>
-            </a:r>
-            <a:r>
-              <a:rPr lang="en-US" sz="1400" dirty="0">
-                <a:latin typeface="Consolas" panose="020B0609020204030204" pitchFamily="49" charset="0"/>
-                <a:ea typeface="Calibri" panose="020F0502020204030204" pitchFamily="34" charset="0"/>
-                <a:cs typeface="Times New Roman" panose="02020603050405020304" pitchFamily="18" charset="0"/>
-              </a:rPr>
-              <a:t> </a:t>
-            </a:r>
-            <a:r>
-              <a:rPr lang="en-US" sz="1400" dirty="0" err="1">
-                <a:solidFill>
-                  <a:srgbClr val="008080"/>
-                </a:solidFill>
-                <a:latin typeface="Consolas" panose="020B0609020204030204" pitchFamily="49" charset="0"/>
-                <a:ea typeface="Calibri" panose="020F0502020204030204" pitchFamily="34" charset="0"/>
-                <a:cs typeface="Times New Roman" panose="02020603050405020304" pitchFamily="18" charset="0"/>
-              </a:rPr>
-              <a:t>od</a:t>
-            </a:r>
-            <a:r>
-              <a:rPr lang="en-US" sz="1400" dirty="0" err="1">
-                <a:solidFill>
-                  <a:srgbClr val="808080"/>
-                </a:solidFill>
-                <a:latin typeface="Consolas" panose="020B0609020204030204" pitchFamily="49" charset="0"/>
-                <a:ea typeface="Calibri" panose="020F0502020204030204" pitchFamily="34" charset="0"/>
-                <a:cs typeface="Times New Roman" panose="02020603050405020304" pitchFamily="18" charset="0"/>
-              </a:rPr>
-              <a:t>.</a:t>
-            </a:r>
-            <a:r>
-              <a:rPr lang="en-US" sz="1400" dirty="0" err="1">
-                <a:solidFill>
-                  <a:srgbClr val="008080"/>
-                </a:solidFill>
-                <a:latin typeface="Consolas" panose="020B0609020204030204" pitchFamily="49" charset="0"/>
-                <a:ea typeface="Calibri" panose="020F0502020204030204" pitchFamily="34" charset="0"/>
-                <a:cs typeface="Times New Roman" panose="02020603050405020304" pitchFamily="18" charset="0"/>
-              </a:rPr>
-              <a:t>ProductId</a:t>
-            </a:r>
-            <a:endParaRPr lang="en-US" sz="1400" dirty="0">
-              <a:solidFill>
-                <a:srgbClr val="008080"/>
-              </a:solidFill>
-              <a:latin typeface="Consolas" panose="020B0609020204030204" pitchFamily="49" charset="0"/>
-              <a:ea typeface="Calibri" panose="020F0502020204030204" pitchFamily="34" charset="0"/>
-              <a:cs typeface="Times New Roman" panose="02020603050405020304" pitchFamily="18" charset="0"/>
-            </a:endParaRPr>
-          </a:p>
-          <a:p>
-            <a:pPr>
-              <a:lnSpc>
-                <a:spcPct val="107000"/>
-              </a:lnSpc>
-            </a:pPr>
-            <a:r>
-              <a:rPr lang="en-US" sz="1400" dirty="0">
-                <a:solidFill>
-                  <a:srgbClr val="0000FF"/>
-                </a:solidFill>
-                <a:latin typeface="Consolas" panose="020B0609020204030204" pitchFamily="49" charset="0"/>
-                <a:ea typeface="Calibri" panose="020F0502020204030204" pitchFamily="34" charset="0"/>
-                <a:cs typeface="Times New Roman" panose="02020603050405020304" pitchFamily="18" charset="0"/>
-              </a:rPr>
-              <a:t>top</a:t>
-            </a:r>
-            <a:r>
-              <a:rPr lang="en-US" sz="1400" dirty="0">
-                <a:latin typeface="Consolas" panose="020B0609020204030204" pitchFamily="49" charset="0"/>
-                <a:ea typeface="Calibri" panose="020F0502020204030204" pitchFamily="34" charset="0"/>
-                <a:cs typeface="Times New Roman" panose="02020603050405020304" pitchFamily="18" charset="0"/>
-              </a:rPr>
-              <a:t> 5</a:t>
-            </a:r>
-            <a:r>
-              <a:rPr lang="en-US" sz="1400" dirty="0">
-                <a:solidFill>
-                  <a:srgbClr val="808080"/>
-                </a:solidFill>
-                <a:latin typeface="Consolas" panose="020B0609020204030204" pitchFamily="49" charset="0"/>
-                <a:ea typeface="Calibri" panose="020F0502020204030204" pitchFamily="34" charset="0"/>
-                <a:cs typeface="Times New Roman" panose="02020603050405020304" pitchFamily="18" charset="0"/>
-              </a:rPr>
-              <a:t>;</a:t>
-            </a:r>
-            <a:endParaRPr lang="en-US" dirty="0">
-              <a:latin typeface="Calibri" panose="020F0502020204030204" pitchFamily="34" charset="0"/>
-              <a:ea typeface="Calibri" panose="020F0502020204030204" pitchFamily="34" charset="0"/>
-              <a:cs typeface="Times New Roman" panose="02020603050405020304" pitchFamily="18" charset="0"/>
-            </a:endParaRPr>
-          </a:p>
-        </p:txBody>
-      </p:sp>
-      <p:pic>
-        <p:nvPicPr>
-          <p:cNvPr id="4" name="Picture 3"/>
-          <p:cNvPicPr>
-            <a:picLocks noChangeAspect="1"/>
-          </p:cNvPicPr>
-          <p:nvPr/>
-        </p:nvPicPr>
-        <p:blipFill>
-          <a:blip r:embed="rId3"/>
-          <a:stretch>
-            <a:fillRect/>
-          </a:stretch>
-        </p:blipFill>
-        <p:spPr>
-          <a:xfrm>
-            <a:off x="3246120" y="539496"/>
-            <a:ext cx="5421612" cy="5678424"/>
-          </a:xfrm>
-          <a:prstGeom prst="rect">
-            <a:avLst/>
-          </a:prstGeom>
-        </p:spPr>
-      </p:pic>
-    </p:spTree>
-    <p:extLst>
-      <p:ext uri="{BB962C8B-B14F-4D97-AF65-F5344CB8AC3E}">
-        <p14:creationId xmlns:p14="http://schemas.microsoft.com/office/powerpoint/2010/main" val="1565686106"/>
-      </p:ext>
-    </p:extLst>
-  </p:cSld>
-  <p:clrMapOvr>
-    <a:masterClrMapping/>
-  </p:clrMapOvr>
-  <mc:AlternateContent xmlns:mc="http://schemas.openxmlformats.org/markup-compatibility/2006" xmlns:p14="http://schemas.microsoft.com/office/powerpoint/2010/main">
-    <mc:Choice Requires="p14">
-      <p:transition spd="slow" p14:dur="2000"/>
-    </mc:Choice>
-    <mc:Fallback xmlns="">
-      <p:transition spd="slow"/>
-    </mc:Fallback>
-  </mc:AlternateContent>
-</p:sld>
-</file>
-
-<file path=ppt/slides/slide25.xml><?xml version="1.0" encoding="utf-8"?>
-<p:sld xmlns:a="http://schemas.openxmlformats.org/drawingml/2006/main" xmlns:r="http://schemas.openxmlformats.org/officeDocument/2006/relationships" xmlns:p="http://schemas.openxmlformats.org/presentationml/2006/main">
-  <p:cSld>
-    <p:spTree>
-      <p:nvGrpSpPr>
-        <p:cNvPr id="1" name=""/>
-        <p:cNvGrpSpPr/>
-        <p:nvPr/>
-      </p:nvGrpSpPr>
-      <p:grpSpPr>
-        <a:xfrm>
-          <a:off x="0" y="0"/>
-          <a:ext cx="0" cy="0"/>
-          <a:chOff x="0" y="0"/>
-          <a:chExt cx="0" cy="0"/>
-        </a:xfrm>
-      </p:grpSpPr>
-      <p:sp>
-        <p:nvSpPr>
-          <p:cNvPr id="2" name="Title 1"/>
-          <p:cNvSpPr>
-            <a:spLocks noGrp="1"/>
-          </p:cNvSpPr>
-          <p:nvPr>
-            <p:ph type="title"/>
-          </p:nvPr>
-        </p:nvSpPr>
-        <p:spPr/>
-        <p:txBody>
-          <a:bodyPr/>
-          <a:lstStyle/>
-          <a:p>
-            <a:r>
-              <a:rPr lang="en-US" dirty="0"/>
               <a:t>Logical Operators</a:t>
             </a:r>
           </a:p>
@@ -25325,10 +24105,17 @@
   <p:clrMapOvr>
     <a:masterClrMapping/>
   </p:clrMapOvr>
+  <p:timing>
+    <p:tnLst>
+      <p:par>
+        <p:cTn id="1" dur="indefinite" restart="never" nodeType="tmRoot"/>
+      </p:par>
+    </p:tnLst>
+  </p:timing>
 </p:sld>
 </file>
 
-<file path=ppt/slides/slide26.xml><?xml version="1.0" encoding="utf-8"?>
+<file path=ppt/slides/slide25.xml><?xml version="1.0" encoding="utf-8"?>
 <p:sld xmlns:a="http://schemas.openxmlformats.org/drawingml/2006/main" xmlns:r="http://schemas.openxmlformats.org/officeDocument/2006/relationships" xmlns:p="http://schemas.openxmlformats.org/presentationml/2006/main">
   <p:cSld>
     <p:spTree>
@@ -25575,10 +24362,17 @@
   <p:clrMapOvr>
     <a:masterClrMapping/>
   </p:clrMapOvr>
+  <p:timing>
+    <p:tnLst>
+      <p:par>
+        <p:cTn id="1" dur="indefinite" restart="never" nodeType="tmRoot"/>
+      </p:par>
+    </p:tnLst>
+  </p:timing>
 </p:sld>
 </file>
 
-<file path=ppt/slides/slide27.xml><?xml version="1.0" encoding="utf-8"?>
+<file path=ppt/slides/slide26.xml><?xml version="1.0" encoding="utf-8"?>
 <p:sld xmlns:a="http://schemas.openxmlformats.org/drawingml/2006/main" xmlns:r="http://schemas.openxmlformats.org/officeDocument/2006/relationships" xmlns:p="http://schemas.openxmlformats.org/presentationml/2006/main">
   <p:cSld>
     <p:spTree>
@@ -25854,6 +24648,120 @@
   <p:clrMapOvr>
     <a:masterClrMapping/>
   </p:clrMapOvr>
+  <p:timing>
+    <p:tnLst>
+      <p:par>
+        <p:cTn id="1" dur="indefinite" restart="never" nodeType="tmRoot"/>
+      </p:par>
+    </p:tnLst>
+  </p:timing>
+</p:sld>
+</file>
+
+<file path=ppt/slides/slide27.xml><?xml version="1.0" encoding="utf-8"?>
+<p:sld xmlns:a="http://schemas.openxmlformats.org/drawingml/2006/main" xmlns:r="http://schemas.openxmlformats.org/officeDocument/2006/relationships" xmlns:p="http://schemas.openxmlformats.org/presentationml/2006/main">
+  <p:cSld>
+    <p:spTree>
+      <p:nvGrpSpPr>
+        <p:cNvPr id="1" name=""/>
+        <p:cNvGrpSpPr/>
+        <p:nvPr/>
+      </p:nvGrpSpPr>
+      <p:grpSpPr>
+        <a:xfrm>
+          <a:off x="0" y="0"/>
+          <a:ext cx="0" cy="0"/>
+          <a:chOff x="0" y="0"/>
+          <a:chExt cx="0" cy="0"/>
+        </a:xfrm>
+      </p:grpSpPr>
+      <p:sp>
+        <p:nvSpPr>
+          <p:cNvPr id="2" name="Title 1"/>
+          <p:cNvSpPr>
+            <a:spLocks noGrp="1"/>
+          </p:cNvSpPr>
+          <p:nvPr>
+            <p:ph type="title"/>
+          </p:nvPr>
+        </p:nvSpPr>
+        <p:spPr/>
+        <p:txBody>
+          <a:bodyPr/>
+          <a:lstStyle/>
+          <a:p>
+            <a:r>
+              <a:rPr lang="en-US" dirty="0"/>
+              <a:t>Parse Trees</a:t>
+            </a:r>
+          </a:p>
+        </p:txBody>
+      </p:sp>
+      <p:sp>
+        <p:nvSpPr>
+          <p:cNvPr id="3" name="Content Placeholder 2"/>
+          <p:cNvSpPr>
+            <a:spLocks noGrp="1"/>
+          </p:cNvSpPr>
+          <p:nvPr>
+            <p:ph idx="1"/>
+          </p:nvPr>
+        </p:nvSpPr>
+        <p:spPr/>
+        <p:txBody>
+          <a:bodyPr/>
+          <a:lstStyle/>
+          <a:p>
+            <a:r>
+              <a:rPr lang="en-US" dirty="0"/>
+              <a:t>Internal representation of query operation</a:t>
+            </a:r>
+          </a:p>
+          <a:p>
+            <a:r>
+              <a:rPr lang="en-US" dirty="0"/>
+              <a:t>Nodes may be logical or physical operators</a:t>
+            </a:r>
+          </a:p>
+          <a:p>
+            <a:pPr lvl="1"/>
+            <a:r>
+              <a:rPr lang="en-US" dirty="0"/>
+              <a:t>0 to infinity inputs, 1 output</a:t>
+            </a:r>
+          </a:p>
+          <a:p>
+            <a:r>
+              <a:rPr lang="en-US" dirty="0"/>
+              <a:t>SQL Server will output parse trees at various phases of optimization</a:t>
+            </a:r>
+          </a:p>
+          <a:p>
+            <a:pPr lvl="1"/>
+            <a:r>
+              <a:rPr lang="en-US" dirty="0"/>
+              <a:t>A variety of trace flags will trigger output</a:t>
+            </a:r>
+          </a:p>
+        </p:txBody>
+      </p:sp>
+    </p:spTree>
+    <p:extLst>
+      <p:ext uri="{BB962C8B-B14F-4D97-AF65-F5344CB8AC3E}">
+        <p14:creationId xmlns:p14="http://schemas.microsoft.com/office/powerpoint/2010/main" val="1114966382"/>
+      </p:ext>
+    </p:extLst>
+  </p:cSld>
+  <p:clrMapOvr>
+    <a:masterClrMapping/>
+  </p:clrMapOvr>
+  <p:timing>
+    <p:tnLst>
+      <p:par>
+        <p:cTn id="1" dur="indefinite" restart="never" nodeType="tmRoot"/>
+      </p:par>
+    </p:tnLst>
+  </p:timing>
 </p:sld>
 </file>
 
@@ -25891,106 +24799,6 @@
           <a:p>
             <a:r>
               <a:rPr lang="en-US" dirty="0"/>
-              <a:t>Parse Trees</a:t>
-            </a:r>
-          </a:p>
-        </p:txBody>
-      </p:sp>
-      <p:sp>
-        <p:nvSpPr>
-          <p:cNvPr id="3" name="Content Placeholder 2"/>
-          <p:cNvSpPr>
-            <a:spLocks noGrp="1"/>
-          </p:cNvSpPr>
-          <p:nvPr>
-            <p:ph idx="1"/>
-          </p:nvPr>
-        </p:nvSpPr>
-        <p:spPr/>
-        <p:txBody>
-          <a:bodyPr/>
-          <a:lstStyle/>
-          <a:p>
-            <a:r>
-              <a:rPr lang="en-US" dirty="0"/>
-              <a:t>Internal representation of query operation</a:t>
-            </a:r>
-          </a:p>
-          <a:p>
-            <a:r>
-              <a:rPr lang="en-US" dirty="0"/>
-              <a:t>Nodes may be logical or physical operators</a:t>
-            </a:r>
-          </a:p>
-          <a:p>
-            <a:pPr lvl="1"/>
-            <a:r>
-              <a:rPr lang="en-US" dirty="0"/>
-              <a:t>0 to infinity inputs, 1 output</a:t>
-            </a:r>
-          </a:p>
-          <a:p>
-            <a:r>
-              <a:rPr lang="en-US" dirty="0"/>
-              <a:t>SQL Server will output parse trees at various phases of optimization</a:t>
-            </a:r>
-          </a:p>
-          <a:p>
-            <a:pPr lvl="1"/>
-            <a:r>
-              <a:rPr lang="en-US" dirty="0"/>
-              <a:t>A variety of trace flags will trigger output</a:t>
-            </a:r>
-          </a:p>
-        </p:txBody>
-      </p:sp>
-    </p:spTree>
-    <p:extLst>
-      <p:ext uri="{BB962C8B-B14F-4D97-AF65-F5344CB8AC3E}">
-        <p14:creationId xmlns:p14="http://schemas.microsoft.com/office/powerpoint/2010/main" val="1114966382"/>
-      </p:ext>
-    </p:extLst>
-  </p:cSld>
-  <p:clrMapOvr>
-    <a:masterClrMapping/>
-  </p:clrMapOvr>
-</p:sld>
-</file>
-
-<file path=ppt/slides/slide29.xml><?xml version="1.0" encoding="utf-8"?>
-<p:sld xmlns:a="http://schemas.openxmlformats.org/drawingml/2006/main" xmlns:r="http://schemas.openxmlformats.org/officeDocument/2006/relationships" xmlns:p="http://schemas.openxmlformats.org/presentationml/2006/main">
-  <p:cSld>
-    <p:spTree>
-      <p:nvGrpSpPr>
-        <p:cNvPr id="1" name=""/>
-        <p:cNvGrpSpPr/>
-        <p:nvPr/>
-      </p:nvGrpSpPr>
-      <p:grpSpPr>
-        <a:xfrm>
-          <a:off x="0" y="0"/>
-          <a:ext cx="0" cy="0"/>
-          <a:chOff x="0" y="0"/>
-          <a:chExt cx="0" cy="0"/>
-        </a:xfrm>
-      </p:grpSpPr>
-      <p:sp>
-        <p:nvSpPr>
-          <p:cNvPr id="2" name="Title 1"/>
-          <p:cNvSpPr>
-            <a:spLocks noGrp="1"/>
-          </p:cNvSpPr>
-          <p:nvPr>
-            <p:ph type="title"/>
-          </p:nvPr>
-        </p:nvSpPr>
-        <p:spPr/>
-        <p:txBody>
-          <a:bodyPr/>
-          <a:lstStyle/>
-          <a:p>
-            <a:r>
-              <a:rPr lang="en-US" dirty="0"/>
               <a:t>Example Parse Tree</a:t>
             </a:r>
           </a:p>
@@ -27058,47 +25866,6 @@
               </a:solidFill>
               <a:latin typeface="Consolas" panose="020B0609020204030204" pitchFamily="49" charset="0"/>
             </a:endParaRPr>
-          </a:p>
-        </p:txBody>
-      </p:sp>
-      <p:sp>
-        <p:nvSpPr>
-          <p:cNvPr id="6" name="Oval 5"/>
-          <p:cNvSpPr/>
-          <p:nvPr/>
-        </p:nvSpPr>
-        <p:spPr>
-          <a:xfrm>
-            <a:off x="8378792" y="542942"/>
-            <a:ext cx="616016" cy="606391"/>
-          </a:xfrm>
-          <a:prstGeom prst="ellipse">
-            <a:avLst/>
-          </a:prstGeom>
-        </p:spPr>
-        <p:style>
-          <a:lnRef idx="1">
-            <a:schemeClr val="accent1"/>
-          </a:lnRef>
-          <a:fillRef idx="3">
-            <a:schemeClr val="accent1"/>
-          </a:fillRef>
-          <a:effectRef idx="2">
-            <a:schemeClr val="accent1"/>
-          </a:effectRef>
-          <a:fontRef idx="minor">
-            <a:schemeClr val="lt1"/>
-          </a:fontRef>
-        </p:style>
-        <p:txBody>
-          <a:bodyPr rtlCol="0" anchor="ctr"/>
-          <a:lstStyle/>
-          <a:p>
-            <a:pPr algn="ctr"/>
-            <a:r>
-              <a:rPr lang="en-US" sz="1600" dirty="0"/>
-              <a:t>11</a:t>
-            </a:r>
           </a:p>
         </p:txBody>
       </p:sp>
@@ -27136,6 +25903,1323 @@
   <p:clrMapOvr>
     <a:masterClrMapping/>
   </p:clrMapOvr>
+  <p:timing>
+    <p:tnLst>
+      <p:par>
+        <p:cTn id="1" dur="indefinite" restart="never" nodeType="tmRoot"/>
+      </p:par>
+    </p:tnLst>
+  </p:timing>
+</p:sld>
+</file>
+
+<file path=ppt/slides/slide29.xml><?xml version="1.0" encoding="utf-8"?>
+<p:sld xmlns:a="http://schemas.openxmlformats.org/drawingml/2006/main" xmlns:r="http://schemas.openxmlformats.org/officeDocument/2006/relationships" xmlns:p="http://schemas.openxmlformats.org/presentationml/2006/main">
+  <p:cSld>
+    <p:spTree>
+      <p:nvGrpSpPr>
+        <p:cNvPr id="1" name=""/>
+        <p:cNvGrpSpPr/>
+        <p:nvPr/>
+      </p:nvGrpSpPr>
+      <p:grpSpPr>
+        <a:xfrm>
+          <a:off x="0" y="0"/>
+          <a:ext cx="0" cy="0"/>
+          <a:chOff x="0" y="0"/>
+          <a:chExt cx="0" cy="0"/>
+        </a:xfrm>
+      </p:grpSpPr>
+      <p:sp>
+        <p:nvSpPr>
+          <p:cNvPr id="2" name="Title 1"/>
+          <p:cNvSpPr>
+            <a:spLocks noGrp="1"/>
+          </p:cNvSpPr>
+          <p:nvPr>
+            <p:ph type="title"/>
+          </p:nvPr>
+        </p:nvSpPr>
+        <p:spPr/>
+        <p:txBody>
+          <a:bodyPr/>
+          <a:lstStyle/>
+          <a:p>
+            <a:r>
+              <a:rPr lang="en-US" dirty="0"/>
+              <a:t>Query Tree</a:t>
+            </a:r>
+          </a:p>
+        </p:txBody>
+      </p:sp>
+      <p:sp>
+        <p:nvSpPr>
+          <p:cNvPr id="5" name="TextBox 4"/>
+          <p:cNvSpPr txBox="1"/>
+          <p:nvPr/>
+        </p:nvSpPr>
+        <p:spPr>
+          <a:xfrm>
+            <a:off x="558265" y="1713297"/>
+            <a:ext cx="4025461" cy="2858475"/>
+          </a:xfrm>
+          <a:prstGeom prst="rect">
+            <a:avLst/>
+          </a:prstGeom>
+          <a:noFill/>
+        </p:spPr>
+        <p:txBody>
+          <a:bodyPr wrap="none" rtlCol="0">
+            <a:spAutoFit/>
+          </a:bodyPr>
+          <a:lstStyle/>
+          <a:p>
+            <a:pPr>
+              <a:lnSpc>
+                <a:spcPct val="107000"/>
+              </a:lnSpc>
+            </a:pPr>
+            <a:r>
+              <a:rPr lang="en-US" sz="1400" dirty="0">
+                <a:solidFill>
+                  <a:srgbClr val="0000FF"/>
+                </a:solidFill>
+                <a:latin typeface="Consolas" panose="020B0609020204030204" pitchFamily="49" charset="0"/>
+                <a:ea typeface="Calibri" panose="020F0502020204030204" pitchFamily="34" charset="0"/>
+                <a:cs typeface="Times New Roman" panose="02020603050405020304" pitchFamily="18" charset="0"/>
+              </a:rPr>
+              <a:t>from</a:t>
+            </a:r>
+            <a:r>
+              <a:rPr lang="en-US" sz="1400" dirty="0">
+                <a:latin typeface="Consolas" panose="020B0609020204030204" pitchFamily="49" charset="0"/>
+                <a:ea typeface="Calibri" panose="020F0502020204030204" pitchFamily="34" charset="0"/>
+                <a:cs typeface="Times New Roman" panose="02020603050405020304" pitchFamily="18" charset="0"/>
+              </a:rPr>
+              <a:t> </a:t>
+            </a:r>
+            <a:r>
+              <a:rPr lang="en-US" sz="1400" dirty="0" err="1">
+                <a:solidFill>
+                  <a:srgbClr val="008080"/>
+                </a:solidFill>
+                <a:latin typeface="Consolas" panose="020B0609020204030204" pitchFamily="49" charset="0"/>
+                <a:ea typeface="Calibri" panose="020F0502020204030204" pitchFamily="34" charset="0"/>
+                <a:cs typeface="Times New Roman" panose="02020603050405020304" pitchFamily="18" charset="0"/>
+              </a:rPr>
+              <a:t>dbo</a:t>
+            </a:r>
+            <a:r>
+              <a:rPr lang="en-US" sz="1400" dirty="0" err="1">
+                <a:solidFill>
+                  <a:srgbClr val="808080"/>
+                </a:solidFill>
+                <a:latin typeface="Consolas" panose="020B0609020204030204" pitchFamily="49" charset="0"/>
+                <a:ea typeface="Calibri" panose="020F0502020204030204" pitchFamily="34" charset="0"/>
+                <a:cs typeface="Times New Roman" panose="02020603050405020304" pitchFamily="18" charset="0"/>
+              </a:rPr>
+              <a:t>.</a:t>
+            </a:r>
+            <a:r>
+              <a:rPr lang="en-US" sz="1400" dirty="0" err="1">
+                <a:solidFill>
+                  <a:srgbClr val="008080"/>
+                </a:solidFill>
+                <a:latin typeface="Consolas" panose="020B0609020204030204" pitchFamily="49" charset="0"/>
+                <a:ea typeface="Calibri" panose="020F0502020204030204" pitchFamily="34" charset="0"/>
+                <a:cs typeface="Times New Roman" panose="02020603050405020304" pitchFamily="18" charset="0"/>
+              </a:rPr>
+              <a:t>OrderHeader</a:t>
+            </a:r>
+            <a:r>
+              <a:rPr lang="en-US" sz="1400" dirty="0">
+                <a:latin typeface="Consolas" panose="020B0609020204030204" pitchFamily="49" charset="0"/>
+                <a:ea typeface="Calibri" panose="020F0502020204030204" pitchFamily="34" charset="0"/>
+                <a:cs typeface="Times New Roman" panose="02020603050405020304" pitchFamily="18" charset="0"/>
+              </a:rPr>
+              <a:t> </a:t>
+            </a:r>
+            <a:r>
+              <a:rPr lang="en-US" sz="1400" dirty="0">
+                <a:solidFill>
+                  <a:srgbClr val="008080"/>
+                </a:solidFill>
+                <a:latin typeface="Consolas" panose="020B0609020204030204" pitchFamily="49" charset="0"/>
+                <a:ea typeface="Calibri" panose="020F0502020204030204" pitchFamily="34" charset="0"/>
+                <a:cs typeface="Times New Roman" panose="02020603050405020304" pitchFamily="18" charset="0"/>
+              </a:rPr>
+              <a:t>oh</a:t>
+            </a:r>
+            <a:endParaRPr lang="en-US" dirty="0">
+              <a:latin typeface="Calibri" panose="020F0502020204030204" pitchFamily="34" charset="0"/>
+              <a:ea typeface="Calibri" panose="020F0502020204030204" pitchFamily="34" charset="0"/>
+              <a:cs typeface="Times New Roman" panose="02020603050405020304" pitchFamily="18" charset="0"/>
+            </a:endParaRPr>
+          </a:p>
+          <a:p>
+            <a:pPr>
+              <a:lnSpc>
+                <a:spcPct val="107000"/>
+              </a:lnSpc>
+            </a:pPr>
+            <a:r>
+              <a:rPr lang="en-US" sz="1400" dirty="0">
+                <a:solidFill>
+                  <a:srgbClr val="808080"/>
+                </a:solidFill>
+                <a:latin typeface="Consolas" panose="020B0609020204030204" pitchFamily="49" charset="0"/>
+                <a:ea typeface="Calibri" panose="020F0502020204030204" pitchFamily="34" charset="0"/>
+                <a:cs typeface="Times New Roman" panose="02020603050405020304" pitchFamily="18" charset="0"/>
+              </a:rPr>
+              <a:t>inner</a:t>
+            </a:r>
+            <a:r>
+              <a:rPr lang="en-US" sz="1400" dirty="0">
+                <a:latin typeface="Consolas" panose="020B0609020204030204" pitchFamily="49" charset="0"/>
+                <a:ea typeface="Calibri" panose="020F0502020204030204" pitchFamily="34" charset="0"/>
+                <a:cs typeface="Times New Roman" panose="02020603050405020304" pitchFamily="18" charset="0"/>
+              </a:rPr>
+              <a:t> </a:t>
+            </a:r>
+            <a:r>
+              <a:rPr lang="en-US" sz="1400" dirty="0">
+                <a:solidFill>
+                  <a:srgbClr val="808080"/>
+                </a:solidFill>
+                <a:latin typeface="Consolas" panose="020B0609020204030204" pitchFamily="49" charset="0"/>
+                <a:ea typeface="Calibri" panose="020F0502020204030204" pitchFamily="34" charset="0"/>
+                <a:cs typeface="Times New Roman" panose="02020603050405020304" pitchFamily="18" charset="0"/>
+              </a:rPr>
+              <a:t>join</a:t>
+            </a:r>
+            <a:r>
+              <a:rPr lang="en-US" sz="1400" dirty="0">
+                <a:latin typeface="Consolas" panose="020B0609020204030204" pitchFamily="49" charset="0"/>
+                <a:ea typeface="Calibri" panose="020F0502020204030204" pitchFamily="34" charset="0"/>
+                <a:cs typeface="Times New Roman" panose="02020603050405020304" pitchFamily="18" charset="0"/>
+              </a:rPr>
+              <a:t> </a:t>
+            </a:r>
+            <a:r>
+              <a:rPr lang="en-US" sz="1400" dirty="0" err="1">
+                <a:solidFill>
+                  <a:srgbClr val="008080"/>
+                </a:solidFill>
+                <a:latin typeface="Consolas" panose="020B0609020204030204" pitchFamily="49" charset="0"/>
+                <a:ea typeface="Calibri" panose="020F0502020204030204" pitchFamily="34" charset="0"/>
+                <a:cs typeface="Times New Roman" panose="02020603050405020304" pitchFamily="18" charset="0"/>
+              </a:rPr>
+              <a:t>dbo</a:t>
+            </a:r>
+            <a:r>
+              <a:rPr lang="en-US" sz="1400" dirty="0" err="1">
+                <a:solidFill>
+                  <a:srgbClr val="808080"/>
+                </a:solidFill>
+                <a:latin typeface="Consolas" panose="020B0609020204030204" pitchFamily="49" charset="0"/>
+                <a:ea typeface="Calibri" panose="020F0502020204030204" pitchFamily="34" charset="0"/>
+                <a:cs typeface="Times New Roman" panose="02020603050405020304" pitchFamily="18" charset="0"/>
+              </a:rPr>
+              <a:t>.</a:t>
+            </a:r>
+            <a:r>
+              <a:rPr lang="en-US" sz="1400" dirty="0" err="1">
+                <a:solidFill>
+                  <a:srgbClr val="008080"/>
+                </a:solidFill>
+                <a:latin typeface="Consolas" panose="020B0609020204030204" pitchFamily="49" charset="0"/>
+                <a:ea typeface="Calibri" panose="020F0502020204030204" pitchFamily="34" charset="0"/>
+                <a:cs typeface="Times New Roman" panose="02020603050405020304" pitchFamily="18" charset="0"/>
+              </a:rPr>
+              <a:t>OrderDetail</a:t>
+            </a:r>
+            <a:r>
+              <a:rPr lang="en-US" sz="1400" dirty="0">
+                <a:latin typeface="Consolas" panose="020B0609020204030204" pitchFamily="49" charset="0"/>
+                <a:ea typeface="Calibri" panose="020F0502020204030204" pitchFamily="34" charset="0"/>
+                <a:cs typeface="Times New Roman" panose="02020603050405020304" pitchFamily="18" charset="0"/>
+              </a:rPr>
+              <a:t> </a:t>
+            </a:r>
+            <a:r>
+              <a:rPr lang="en-US" sz="1400" dirty="0">
+                <a:solidFill>
+                  <a:srgbClr val="008080"/>
+                </a:solidFill>
+                <a:latin typeface="Consolas" panose="020B0609020204030204" pitchFamily="49" charset="0"/>
+                <a:ea typeface="Calibri" panose="020F0502020204030204" pitchFamily="34" charset="0"/>
+                <a:cs typeface="Times New Roman" panose="02020603050405020304" pitchFamily="18" charset="0"/>
+              </a:rPr>
+              <a:t>od</a:t>
+            </a:r>
+            <a:endParaRPr lang="en-US" sz="1400" dirty="0">
+              <a:latin typeface="Consolas" panose="020B0609020204030204" pitchFamily="49" charset="0"/>
+              <a:ea typeface="Calibri" panose="020F0502020204030204" pitchFamily="34" charset="0"/>
+              <a:cs typeface="Times New Roman" panose="02020603050405020304" pitchFamily="18" charset="0"/>
+            </a:endParaRPr>
+          </a:p>
+          <a:p>
+            <a:pPr>
+              <a:lnSpc>
+                <a:spcPct val="107000"/>
+              </a:lnSpc>
+            </a:pPr>
+            <a:r>
+              <a:rPr lang="en-US" sz="1400" dirty="0">
+                <a:solidFill>
+                  <a:srgbClr val="808080"/>
+                </a:solidFill>
+                <a:latin typeface="Consolas" panose="020B0609020204030204" pitchFamily="49" charset="0"/>
+                <a:ea typeface="Calibri" panose="020F0502020204030204" pitchFamily="34" charset="0"/>
+                <a:cs typeface="Times New Roman" panose="02020603050405020304" pitchFamily="18" charset="0"/>
+              </a:rPr>
+              <a:t>inner</a:t>
+            </a:r>
+            <a:r>
+              <a:rPr lang="en-US" sz="1400" dirty="0">
+                <a:latin typeface="Consolas" panose="020B0609020204030204" pitchFamily="49" charset="0"/>
+                <a:ea typeface="Calibri" panose="020F0502020204030204" pitchFamily="34" charset="0"/>
+                <a:cs typeface="Times New Roman" panose="02020603050405020304" pitchFamily="18" charset="0"/>
+              </a:rPr>
+              <a:t> </a:t>
+            </a:r>
+            <a:r>
+              <a:rPr lang="en-US" sz="1400" dirty="0">
+                <a:solidFill>
+                  <a:srgbClr val="808080"/>
+                </a:solidFill>
+                <a:latin typeface="Consolas" panose="020B0609020204030204" pitchFamily="49" charset="0"/>
+                <a:ea typeface="Calibri" panose="020F0502020204030204" pitchFamily="34" charset="0"/>
+                <a:cs typeface="Times New Roman" panose="02020603050405020304" pitchFamily="18" charset="0"/>
+              </a:rPr>
+              <a:t>join</a:t>
+            </a:r>
+            <a:r>
+              <a:rPr lang="en-US" sz="1400" dirty="0">
+                <a:latin typeface="Consolas" panose="020B0609020204030204" pitchFamily="49" charset="0"/>
+                <a:ea typeface="Calibri" panose="020F0502020204030204" pitchFamily="34" charset="0"/>
+                <a:cs typeface="Times New Roman" panose="02020603050405020304" pitchFamily="18" charset="0"/>
+              </a:rPr>
+              <a:t> </a:t>
+            </a:r>
+            <a:r>
+              <a:rPr lang="en-US" sz="1400" dirty="0" err="1">
+                <a:solidFill>
+                  <a:srgbClr val="008080"/>
+                </a:solidFill>
+                <a:latin typeface="Consolas" panose="020B0609020204030204" pitchFamily="49" charset="0"/>
+                <a:ea typeface="Calibri" panose="020F0502020204030204" pitchFamily="34" charset="0"/>
+                <a:cs typeface="Times New Roman" panose="02020603050405020304" pitchFamily="18" charset="0"/>
+              </a:rPr>
+              <a:t>dbo</a:t>
+            </a:r>
+            <a:r>
+              <a:rPr lang="en-US" sz="1400" dirty="0" err="1">
+                <a:solidFill>
+                  <a:srgbClr val="808080"/>
+                </a:solidFill>
+                <a:latin typeface="Consolas" panose="020B0609020204030204" pitchFamily="49" charset="0"/>
+                <a:ea typeface="Calibri" panose="020F0502020204030204" pitchFamily="34" charset="0"/>
+                <a:cs typeface="Times New Roman" panose="02020603050405020304" pitchFamily="18" charset="0"/>
+              </a:rPr>
+              <a:t>.</a:t>
+            </a:r>
+            <a:r>
+              <a:rPr lang="en-US" sz="1400" dirty="0" err="1">
+                <a:solidFill>
+                  <a:srgbClr val="008080"/>
+                </a:solidFill>
+                <a:latin typeface="Consolas" panose="020B0609020204030204" pitchFamily="49" charset="0"/>
+                <a:ea typeface="Calibri" panose="020F0502020204030204" pitchFamily="34" charset="0"/>
+                <a:cs typeface="Times New Roman" panose="02020603050405020304" pitchFamily="18" charset="0"/>
+              </a:rPr>
+              <a:t>Customer</a:t>
+            </a:r>
+            <a:r>
+              <a:rPr lang="en-US" sz="1400" dirty="0">
+                <a:latin typeface="Consolas" panose="020B0609020204030204" pitchFamily="49" charset="0"/>
+                <a:ea typeface="Calibri" panose="020F0502020204030204" pitchFamily="34" charset="0"/>
+                <a:cs typeface="Times New Roman" panose="02020603050405020304" pitchFamily="18" charset="0"/>
+              </a:rPr>
+              <a:t> </a:t>
+            </a:r>
+            <a:r>
+              <a:rPr lang="en-US" sz="1400" dirty="0" err="1">
+                <a:solidFill>
+                  <a:srgbClr val="008080"/>
+                </a:solidFill>
+                <a:latin typeface="Consolas" panose="020B0609020204030204" pitchFamily="49" charset="0"/>
+                <a:ea typeface="Calibri" panose="020F0502020204030204" pitchFamily="34" charset="0"/>
+                <a:cs typeface="Times New Roman" panose="02020603050405020304" pitchFamily="18" charset="0"/>
+              </a:rPr>
+              <a:t>cust</a:t>
+            </a:r>
+            <a:endParaRPr lang="en-US" sz="1400" dirty="0">
+              <a:latin typeface="Consolas" panose="020B0609020204030204" pitchFamily="49" charset="0"/>
+              <a:ea typeface="Calibri" panose="020F0502020204030204" pitchFamily="34" charset="0"/>
+              <a:cs typeface="Times New Roman" panose="02020603050405020304" pitchFamily="18" charset="0"/>
+            </a:endParaRPr>
+          </a:p>
+          <a:p>
+            <a:pPr>
+              <a:lnSpc>
+                <a:spcPct val="107000"/>
+              </a:lnSpc>
+            </a:pPr>
+            <a:r>
+              <a:rPr lang="en-US" sz="1400" dirty="0">
+                <a:solidFill>
+                  <a:srgbClr val="0000FF"/>
+                </a:solidFill>
+                <a:latin typeface="Consolas" panose="020B0609020204030204" pitchFamily="49" charset="0"/>
+                <a:ea typeface="Calibri" panose="020F0502020204030204" pitchFamily="34" charset="0"/>
+                <a:cs typeface="Times New Roman" panose="02020603050405020304" pitchFamily="18" charset="0"/>
+              </a:rPr>
+              <a:t>on</a:t>
+            </a:r>
+            <a:r>
+              <a:rPr lang="en-US" sz="1400" dirty="0">
+                <a:latin typeface="Consolas" panose="020B0609020204030204" pitchFamily="49" charset="0"/>
+                <a:ea typeface="Calibri" panose="020F0502020204030204" pitchFamily="34" charset="0"/>
+                <a:cs typeface="Times New Roman" panose="02020603050405020304" pitchFamily="18" charset="0"/>
+              </a:rPr>
+              <a:t> </a:t>
+            </a:r>
+            <a:r>
+              <a:rPr lang="en-US" sz="1400" dirty="0" err="1">
+                <a:solidFill>
+                  <a:srgbClr val="008080"/>
+                </a:solidFill>
+                <a:latin typeface="Consolas" panose="020B0609020204030204" pitchFamily="49" charset="0"/>
+                <a:ea typeface="Calibri" panose="020F0502020204030204" pitchFamily="34" charset="0"/>
+                <a:cs typeface="Times New Roman" panose="02020603050405020304" pitchFamily="18" charset="0"/>
+              </a:rPr>
+              <a:t>oh</a:t>
+            </a:r>
+            <a:r>
+              <a:rPr lang="en-US" sz="1400" dirty="0" err="1">
+                <a:solidFill>
+                  <a:srgbClr val="808080"/>
+                </a:solidFill>
+                <a:latin typeface="Consolas" panose="020B0609020204030204" pitchFamily="49" charset="0"/>
+                <a:ea typeface="Calibri" panose="020F0502020204030204" pitchFamily="34" charset="0"/>
+                <a:cs typeface="Times New Roman" panose="02020603050405020304" pitchFamily="18" charset="0"/>
+              </a:rPr>
+              <a:t>.</a:t>
+            </a:r>
+            <a:r>
+              <a:rPr lang="en-US" sz="1400" dirty="0" err="1">
+                <a:solidFill>
+                  <a:srgbClr val="008080"/>
+                </a:solidFill>
+                <a:latin typeface="Consolas" panose="020B0609020204030204" pitchFamily="49" charset="0"/>
+                <a:ea typeface="Calibri" panose="020F0502020204030204" pitchFamily="34" charset="0"/>
+                <a:cs typeface="Times New Roman" panose="02020603050405020304" pitchFamily="18" charset="0"/>
+              </a:rPr>
+              <a:t>OrderId</a:t>
+            </a:r>
+            <a:r>
+              <a:rPr lang="en-US" sz="1400" dirty="0">
+                <a:latin typeface="Consolas" panose="020B0609020204030204" pitchFamily="49" charset="0"/>
+                <a:ea typeface="Calibri" panose="020F0502020204030204" pitchFamily="34" charset="0"/>
+                <a:cs typeface="Times New Roman" panose="02020603050405020304" pitchFamily="18" charset="0"/>
+              </a:rPr>
+              <a:t> </a:t>
+            </a:r>
+            <a:r>
+              <a:rPr lang="en-US" sz="1400" dirty="0">
+                <a:solidFill>
+                  <a:srgbClr val="808080"/>
+                </a:solidFill>
+                <a:latin typeface="Consolas" panose="020B0609020204030204" pitchFamily="49" charset="0"/>
+                <a:ea typeface="Calibri" panose="020F0502020204030204" pitchFamily="34" charset="0"/>
+                <a:cs typeface="Times New Roman" panose="02020603050405020304" pitchFamily="18" charset="0"/>
+              </a:rPr>
+              <a:t>=</a:t>
+            </a:r>
+            <a:r>
+              <a:rPr lang="en-US" sz="1400" dirty="0">
+                <a:latin typeface="Consolas" panose="020B0609020204030204" pitchFamily="49" charset="0"/>
+                <a:ea typeface="Calibri" panose="020F0502020204030204" pitchFamily="34" charset="0"/>
+                <a:cs typeface="Times New Roman" panose="02020603050405020304" pitchFamily="18" charset="0"/>
+              </a:rPr>
+              <a:t> </a:t>
+            </a:r>
+            <a:r>
+              <a:rPr lang="en-US" sz="1400" dirty="0" err="1">
+                <a:solidFill>
+                  <a:srgbClr val="008080"/>
+                </a:solidFill>
+                <a:latin typeface="Consolas" panose="020B0609020204030204" pitchFamily="49" charset="0"/>
+                <a:ea typeface="Calibri" panose="020F0502020204030204" pitchFamily="34" charset="0"/>
+                <a:cs typeface="Times New Roman" panose="02020603050405020304" pitchFamily="18" charset="0"/>
+              </a:rPr>
+              <a:t>od</a:t>
+            </a:r>
+            <a:r>
+              <a:rPr lang="en-US" sz="1400" dirty="0" err="1">
+                <a:solidFill>
+                  <a:srgbClr val="808080"/>
+                </a:solidFill>
+                <a:latin typeface="Consolas" panose="020B0609020204030204" pitchFamily="49" charset="0"/>
+                <a:ea typeface="Calibri" panose="020F0502020204030204" pitchFamily="34" charset="0"/>
+                <a:cs typeface="Times New Roman" panose="02020603050405020304" pitchFamily="18" charset="0"/>
+              </a:rPr>
+              <a:t>.</a:t>
+            </a:r>
+            <a:r>
+              <a:rPr lang="en-US" sz="1400" dirty="0" err="1">
+                <a:solidFill>
+                  <a:srgbClr val="008080"/>
+                </a:solidFill>
+                <a:latin typeface="Consolas" panose="020B0609020204030204" pitchFamily="49" charset="0"/>
+                <a:ea typeface="Calibri" panose="020F0502020204030204" pitchFamily="34" charset="0"/>
+                <a:cs typeface="Times New Roman" panose="02020603050405020304" pitchFamily="18" charset="0"/>
+              </a:rPr>
+              <a:t>OrderId</a:t>
+            </a:r>
+            <a:endParaRPr lang="en-US" dirty="0">
+              <a:latin typeface="Calibri" panose="020F0502020204030204" pitchFamily="34" charset="0"/>
+              <a:ea typeface="Calibri" panose="020F0502020204030204" pitchFamily="34" charset="0"/>
+              <a:cs typeface="Times New Roman" panose="02020603050405020304" pitchFamily="18" charset="0"/>
+            </a:endParaRPr>
+          </a:p>
+          <a:p>
+            <a:pPr>
+              <a:lnSpc>
+                <a:spcPct val="107000"/>
+              </a:lnSpc>
+            </a:pPr>
+            <a:r>
+              <a:rPr lang="en-US" sz="1400" dirty="0">
+                <a:solidFill>
+                  <a:srgbClr val="0000FF"/>
+                </a:solidFill>
+                <a:latin typeface="Consolas" panose="020B0609020204030204" pitchFamily="49" charset="0"/>
+                <a:ea typeface="Calibri" panose="020F0502020204030204" pitchFamily="34" charset="0"/>
+                <a:cs typeface="Times New Roman" panose="02020603050405020304" pitchFamily="18" charset="0"/>
+              </a:rPr>
+              <a:t>on</a:t>
+            </a:r>
+            <a:r>
+              <a:rPr lang="en-US" sz="1400" dirty="0">
+                <a:latin typeface="Consolas" panose="020B0609020204030204" pitchFamily="49" charset="0"/>
+                <a:ea typeface="Calibri" panose="020F0502020204030204" pitchFamily="34" charset="0"/>
+                <a:cs typeface="Times New Roman" panose="02020603050405020304" pitchFamily="18" charset="0"/>
+              </a:rPr>
+              <a:t> </a:t>
+            </a:r>
+            <a:r>
+              <a:rPr lang="en-US" sz="1400" dirty="0" err="1">
+                <a:solidFill>
+                  <a:srgbClr val="008080"/>
+                </a:solidFill>
+                <a:latin typeface="Consolas" panose="020B0609020204030204" pitchFamily="49" charset="0"/>
+                <a:ea typeface="Calibri" panose="020F0502020204030204" pitchFamily="34" charset="0"/>
+                <a:cs typeface="Times New Roman" panose="02020603050405020304" pitchFamily="18" charset="0"/>
+              </a:rPr>
+              <a:t>oh</a:t>
+            </a:r>
+            <a:r>
+              <a:rPr lang="en-US" sz="1400" dirty="0" err="1">
+                <a:solidFill>
+                  <a:srgbClr val="808080"/>
+                </a:solidFill>
+                <a:latin typeface="Consolas" panose="020B0609020204030204" pitchFamily="49" charset="0"/>
+                <a:ea typeface="Calibri" panose="020F0502020204030204" pitchFamily="34" charset="0"/>
+                <a:cs typeface="Times New Roman" panose="02020603050405020304" pitchFamily="18" charset="0"/>
+              </a:rPr>
+              <a:t>.</a:t>
+            </a:r>
+            <a:r>
+              <a:rPr lang="en-US" sz="1400" dirty="0" err="1">
+                <a:solidFill>
+                  <a:srgbClr val="008080"/>
+                </a:solidFill>
+                <a:latin typeface="Consolas" panose="020B0609020204030204" pitchFamily="49" charset="0"/>
+                <a:ea typeface="Calibri" panose="020F0502020204030204" pitchFamily="34" charset="0"/>
+                <a:cs typeface="Times New Roman" panose="02020603050405020304" pitchFamily="18" charset="0"/>
+              </a:rPr>
+              <a:t>CustomerId</a:t>
+            </a:r>
+            <a:r>
+              <a:rPr lang="en-US" sz="1400" dirty="0">
+                <a:latin typeface="Consolas" panose="020B0609020204030204" pitchFamily="49" charset="0"/>
+                <a:ea typeface="Calibri" panose="020F0502020204030204" pitchFamily="34" charset="0"/>
+                <a:cs typeface="Times New Roman" panose="02020603050405020304" pitchFamily="18" charset="0"/>
+              </a:rPr>
+              <a:t> </a:t>
+            </a:r>
+            <a:r>
+              <a:rPr lang="en-US" sz="1400" dirty="0">
+                <a:solidFill>
+                  <a:srgbClr val="808080"/>
+                </a:solidFill>
+                <a:latin typeface="Consolas" panose="020B0609020204030204" pitchFamily="49" charset="0"/>
+                <a:ea typeface="Calibri" panose="020F0502020204030204" pitchFamily="34" charset="0"/>
+                <a:cs typeface="Times New Roman" panose="02020603050405020304" pitchFamily="18" charset="0"/>
+              </a:rPr>
+              <a:t>=</a:t>
+            </a:r>
+            <a:r>
+              <a:rPr lang="en-US" sz="1400" dirty="0">
+                <a:latin typeface="Consolas" panose="020B0609020204030204" pitchFamily="49" charset="0"/>
+                <a:ea typeface="Calibri" panose="020F0502020204030204" pitchFamily="34" charset="0"/>
+                <a:cs typeface="Times New Roman" panose="02020603050405020304" pitchFamily="18" charset="0"/>
+              </a:rPr>
+              <a:t> </a:t>
+            </a:r>
+            <a:r>
+              <a:rPr lang="en-US" sz="1400" dirty="0" err="1">
+                <a:solidFill>
+                  <a:srgbClr val="008080"/>
+                </a:solidFill>
+                <a:latin typeface="Consolas" panose="020B0609020204030204" pitchFamily="49" charset="0"/>
+                <a:ea typeface="Calibri" panose="020F0502020204030204" pitchFamily="34" charset="0"/>
+                <a:cs typeface="Times New Roman" panose="02020603050405020304" pitchFamily="18" charset="0"/>
+              </a:rPr>
+              <a:t>cust</a:t>
+            </a:r>
+            <a:r>
+              <a:rPr lang="en-US" sz="1400" dirty="0" err="1">
+                <a:solidFill>
+                  <a:srgbClr val="808080"/>
+                </a:solidFill>
+                <a:latin typeface="Consolas" panose="020B0609020204030204" pitchFamily="49" charset="0"/>
+                <a:ea typeface="Calibri" panose="020F0502020204030204" pitchFamily="34" charset="0"/>
+                <a:cs typeface="Times New Roman" panose="02020603050405020304" pitchFamily="18" charset="0"/>
+              </a:rPr>
+              <a:t>.</a:t>
+            </a:r>
+            <a:r>
+              <a:rPr lang="en-US" sz="1400" dirty="0" err="1">
+                <a:solidFill>
+                  <a:srgbClr val="008080"/>
+                </a:solidFill>
+                <a:latin typeface="Consolas" panose="020B0609020204030204" pitchFamily="49" charset="0"/>
+                <a:ea typeface="Calibri" panose="020F0502020204030204" pitchFamily="34" charset="0"/>
+                <a:cs typeface="Times New Roman" panose="02020603050405020304" pitchFamily="18" charset="0"/>
+              </a:rPr>
+              <a:t>CustomerID</a:t>
+            </a:r>
+            <a:endParaRPr lang="en-US" dirty="0">
+              <a:latin typeface="Calibri" panose="020F0502020204030204" pitchFamily="34" charset="0"/>
+              <a:ea typeface="Calibri" panose="020F0502020204030204" pitchFamily="34" charset="0"/>
+              <a:cs typeface="Times New Roman" panose="02020603050405020304" pitchFamily="18" charset="0"/>
+            </a:endParaRPr>
+          </a:p>
+          <a:p>
+            <a:pPr>
+              <a:lnSpc>
+                <a:spcPct val="107000"/>
+              </a:lnSpc>
+            </a:pPr>
+            <a:r>
+              <a:rPr lang="en-US" sz="1400" dirty="0">
+                <a:solidFill>
+                  <a:srgbClr val="0000FF"/>
+                </a:solidFill>
+                <a:latin typeface="Consolas" panose="020B0609020204030204" pitchFamily="49" charset="0"/>
+                <a:ea typeface="Calibri" panose="020F0502020204030204" pitchFamily="34" charset="0"/>
+                <a:cs typeface="Times New Roman" panose="02020603050405020304" pitchFamily="18" charset="0"/>
+              </a:rPr>
+              <a:t>where</a:t>
+            </a:r>
+            <a:r>
+              <a:rPr lang="en-US" sz="1400" dirty="0">
+                <a:latin typeface="Consolas" panose="020B0609020204030204" pitchFamily="49" charset="0"/>
+                <a:ea typeface="Calibri" panose="020F0502020204030204" pitchFamily="34" charset="0"/>
+                <a:cs typeface="Times New Roman" panose="02020603050405020304" pitchFamily="18" charset="0"/>
+              </a:rPr>
+              <a:t> </a:t>
+            </a:r>
+            <a:r>
+              <a:rPr lang="en-US" sz="1400" dirty="0" err="1">
+                <a:solidFill>
+                  <a:srgbClr val="008080"/>
+                </a:solidFill>
+                <a:latin typeface="Consolas" panose="020B0609020204030204" pitchFamily="49" charset="0"/>
+                <a:ea typeface="Calibri" panose="020F0502020204030204" pitchFamily="34" charset="0"/>
+                <a:cs typeface="Times New Roman" panose="02020603050405020304" pitchFamily="18" charset="0"/>
+              </a:rPr>
+              <a:t>cust</a:t>
+            </a:r>
+            <a:r>
+              <a:rPr lang="en-US" sz="1400" dirty="0" err="1">
+                <a:solidFill>
+                  <a:srgbClr val="808080"/>
+                </a:solidFill>
+                <a:latin typeface="Consolas" panose="020B0609020204030204" pitchFamily="49" charset="0"/>
+                <a:ea typeface="Calibri" panose="020F0502020204030204" pitchFamily="34" charset="0"/>
+                <a:cs typeface="Times New Roman" panose="02020603050405020304" pitchFamily="18" charset="0"/>
+              </a:rPr>
+              <a:t>.</a:t>
+            </a:r>
+            <a:r>
+              <a:rPr lang="en-US" sz="1400" dirty="0" err="1">
+                <a:solidFill>
+                  <a:srgbClr val="0000FF"/>
+                </a:solidFill>
+                <a:latin typeface="Consolas" panose="020B0609020204030204" pitchFamily="49" charset="0"/>
+                <a:ea typeface="Calibri" panose="020F0502020204030204" pitchFamily="34" charset="0"/>
+                <a:cs typeface="Times New Roman" panose="02020603050405020304" pitchFamily="18" charset="0"/>
+              </a:rPr>
+              <a:t>State</a:t>
+            </a:r>
+            <a:r>
+              <a:rPr lang="en-US" sz="1400" dirty="0">
+                <a:latin typeface="Consolas" panose="020B0609020204030204" pitchFamily="49" charset="0"/>
+                <a:ea typeface="Calibri" panose="020F0502020204030204" pitchFamily="34" charset="0"/>
+                <a:cs typeface="Times New Roman" panose="02020603050405020304" pitchFamily="18" charset="0"/>
+              </a:rPr>
+              <a:t> </a:t>
+            </a:r>
+            <a:r>
+              <a:rPr lang="en-US" sz="1400" dirty="0" smtClean="0">
+                <a:solidFill>
+                  <a:srgbClr val="808080"/>
+                </a:solidFill>
+                <a:latin typeface="Consolas" panose="020B0609020204030204" pitchFamily="49" charset="0"/>
+                <a:ea typeface="Calibri" panose="020F0502020204030204" pitchFamily="34" charset="0"/>
+                <a:cs typeface="Times New Roman" panose="02020603050405020304" pitchFamily="18" charset="0"/>
+              </a:rPr>
+              <a:t>= </a:t>
+            </a:r>
+            <a:r>
+              <a:rPr lang="en-US" sz="1400" dirty="0" smtClean="0">
+                <a:solidFill>
+                  <a:srgbClr val="FF0000"/>
+                </a:solidFill>
+                <a:latin typeface="Consolas" panose="020B0609020204030204" pitchFamily="49" charset="0"/>
+                <a:ea typeface="Calibri" panose="020F0502020204030204" pitchFamily="34" charset="0"/>
+                <a:cs typeface="Times New Roman" panose="02020603050405020304" pitchFamily="18" charset="0"/>
+              </a:rPr>
+              <a:t>'MN'</a:t>
+            </a:r>
+            <a:endParaRPr lang="en-US" dirty="0">
+              <a:latin typeface="Calibri" panose="020F0502020204030204" pitchFamily="34" charset="0"/>
+              <a:ea typeface="Calibri" panose="020F0502020204030204" pitchFamily="34" charset="0"/>
+              <a:cs typeface="Times New Roman" panose="02020603050405020304" pitchFamily="18" charset="0"/>
+            </a:endParaRPr>
+          </a:p>
+          <a:p>
+            <a:pPr>
+              <a:lnSpc>
+                <a:spcPct val="107000"/>
+              </a:lnSpc>
+            </a:pPr>
+            <a:r>
+              <a:rPr lang="en-US" sz="1400" dirty="0">
+                <a:solidFill>
+                  <a:srgbClr val="0000FF"/>
+                </a:solidFill>
+                <a:latin typeface="Consolas" panose="020B0609020204030204" pitchFamily="49" charset="0"/>
+                <a:ea typeface="Calibri" panose="020F0502020204030204" pitchFamily="34" charset="0"/>
+                <a:cs typeface="Times New Roman" panose="02020603050405020304" pitchFamily="18" charset="0"/>
+              </a:rPr>
+              <a:t>group</a:t>
+            </a:r>
+            <a:r>
+              <a:rPr lang="en-US" sz="1400" dirty="0">
+                <a:latin typeface="Consolas" panose="020B0609020204030204" pitchFamily="49" charset="0"/>
+                <a:ea typeface="Calibri" panose="020F0502020204030204" pitchFamily="34" charset="0"/>
+                <a:cs typeface="Times New Roman" panose="02020603050405020304" pitchFamily="18" charset="0"/>
+              </a:rPr>
+              <a:t> </a:t>
+            </a:r>
+            <a:r>
+              <a:rPr lang="en-US" sz="1400" dirty="0">
+                <a:solidFill>
+                  <a:srgbClr val="0000FF"/>
+                </a:solidFill>
+                <a:latin typeface="Consolas" panose="020B0609020204030204" pitchFamily="49" charset="0"/>
+                <a:ea typeface="Calibri" panose="020F0502020204030204" pitchFamily="34" charset="0"/>
+                <a:cs typeface="Times New Roman" panose="02020603050405020304" pitchFamily="18" charset="0"/>
+              </a:rPr>
+              <a:t>by</a:t>
+            </a:r>
+            <a:r>
+              <a:rPr lang="en-US" sz="1400" dirty="0">
+                <a:latin typeface="Consolas" panose="020B0609020204030204" pitchFamily="49" charset="0"/>
+                <a:ea typeface="Calibri" panose="020F0502020204030204" pitchFamily="34" charset="0"/>
+                <a:cs typeface="Times New Roman" panose="02020603050405020304" pitchFamily="18" charset="0"/>
+              </a:rPr>
+              <a:t> </a:t>
+            </a:r>
+            <a:r>
+              <a:rPr lang="en-US" sz="1400" dirty="0" err="1">
+                <a:solidFill>
+                  <a:srgbClr val="008080"/>
+                </a:solidFill>
+                <a:latin typeface="Consolas" panose="020B0609020204030204" pitchFamily="49" charset="0"/>
+                <a:ea typeface="Calibri" panose="020F0502020204030204" pitchFamily="34" charset="0"/>
+                <a:cs typeface="Times New Roman" panose="02020603050405020304" pitchFamily="18" charset="0"/>
+              </a:rPr>
+              <a:t>od</a:t>
+            </a:r>
+            <a:r>
+              <a:rPr lang="en-US" sz="1400" dirty="0" err="1">
+                <a:solidFill>
+                  <a:srgbClr val="808080"/>
+                </a:solidFill>
+                <a:latin typeface="Consolas" panose="020B0609020204030204" pitchFamily="49" charset="0"/>
+                <a:ea typeface="Calibri" panose="020F0502020204030204" pitchFamily="34" charset="0"/>
+                <a:cs typeface="Times New Roman" panose="02020603050405020304" pitchFamily="18" charset="0"/>
+              </a:rPr>
+              <a:t>.</a:t>
+            </a:r>
+            <a:r>
+              <a:rPr lang="en-US" sz="1400" dirty="0" err="1">
+                <a:solidFill>
+                  <a:srgbClr val="008080"/>
+                </a:solidFill>
+                <a:latin typeface="Consolas" panose="020B0609020204030204" pitchFamily="49" charset="0"/>
+                <a:ea typeface="Calibri" panose="020F0502020204030204" pitchFamily="34" charset="0"/>
+                <a:cs typeface="Times New Roman" panose="02020603050405020304" pitchFamily="18" charset="0"/>
+              </a:rPr>
+              <a:t>ProductId</a:t>
+            </a:r>
+            <a:endParaRPr lang="en-US" dirty="0">
+              <a:latin typeface="Calibri" panose="020F0502020204030204" pitchFamily="34" charset="0"/>
+              <a:ea typeface="Calibri" panose="020F0502020204030204" pitchFamily="34" charset="0"/>
+              <a:cs typeface="Times New Roman" panose="02020603050405020304" pitchFamily="18" charset="0"/>
+            </a:endParaRPr>
+          </a:p>
+          <a:p>
+            <a:pPr>
+              <a:lnSpc>
+                <a:spcPct val="107000"/>
+              </a:lnSpc>
+            </a:pPr>
+            <a:r>
+              <a:rPr lang="en-US" sz="1400" dirty="0">
+                <a:solidFill>
+                  <a:srgbClr val="0000FF"/>
+                </a:solidFill>
+                <a:latin typeface="Consolas" panose="020B0609020204030204" pitchFamily="49" charset="0"/>
+                <a:ea typeface="Calibri" panose="020F0502020204030204" pitchFamily="34" charset="0"/>
+                <a:cs typeface="Times New Roman" panose="02020603050405020304" pitchFamily="18" charset="0"/>
+              </a:rPr>
+              <a:t>having</a:t>
+            </a:r>
+            <a:r>
+              <a:rPr lang="en-US" sz="1400" dirty="0">
+                <a:latin typeface="Consolas" panose="020B0609020204030204" pitchFamily="49" charset="0"/>
+                <a:ea typeface="Calibri" panose="020F0502020204030204" pitchFamily="34" charset="0"/>
+                <a:cs typeface="Times New Roman" panose="02020603050405020304" pitchFamily="18" charset="0"/>
+              </a:rPr>
+              <a:t> </a:t>
+            </a:r>
+            <a:r>
+              <a:rPr lang="en-US" sz="1400" dirty="0">
+                <a:solidFill>
+                  <a:srgbClr val="FF00FF"/>
+                </a:solidFill>
+                <a:latin typeface="Consolas" panose="020B0609020204030204" pitchFamily="49" charset="0"/>
+                <a:ea typeface="Calibri" panose="020F0502020204030204" pitchFamily="34" charset="0"/>
+                <a:cs typeface="Times New Roman" panose="02020603050405020304" pitchFamily="18" charset="0"/>
+              </a:rPr>
+              <a:t>sum</a:t>
+            </a:r>
+            <a:r>
+              <a:rPr lang="en-US" sz="1400" dirty="0">
+                <a:solidFill>
+                  <a:srgbClr val="808080"/>
+                </a:solidFill>
+                <a:latin typeface="Consolas" panose="020B0609020204030204" pitchFamily="49" charset="0"/>
+                <a:ea typeface="Calibri" panose="020F0502020204030204" pitchFamily="34" charset="0"/>
+                <a:cs typeface="Times New Roman" panose="02020603050405020304" pitchFamily="18" charset="0"/>
+              </a:rPr>
+              <a:t>(</a:t>
+            </a:r>
+            <a:r>
+              <a:rPr lang="en-US" sz="1400" dirty="0" err="1">
+                <a:solidFill>
+                  <a:srgbClr val="008080"/>
+                </a:solidFill>
+                <a:latin typeface="Consolas" panose="020B0609020204030204" pitchFamily="49" charset="0"/>
+                <a:ea typeface="Calibri" panose="020F0502020204030204" pitchFamily="34" charset="0"/>
+                <a:cs typeface="Times New Roman" panose="02020603050405020304" pitchFamily="18" charset="0"/>
+              </a:rPr>
+              <a:t>od</a:t>
+            </a:r>
+            <a:r>
+              <a:rPr lang="en-US" sz="1400" dirty="0" err="1">
+                <a:solidFill>
+                  <a:srgbClr val="808080"/>
+                </a:solidFill>
+                <a:latin typeface="Consolas" panose="020B0609020204030204" pitchFamily="49" charset="0"/>
+                <a:ea typeface="Calibri" panose="020F0502020204030204" pitchFamily="34" charset="0"/>
+                <a:cs typeface="Times New Roman" panose="02020603050405020304" pitchFamily="18" charset="0"/>
+              </a:rPr>
+              <a:t>.</a:t>
+            </a:r>
+            <a:r>
+              <a:rPr lang="en-US" sz="1400" dirty="0" err="1">
+                <a:solidFill>
+                  <a:srgbClr val="008080"/>
+                </a:solidFill>
+                <a:latin typeface="Consolas" panose="020B0609020204030204" pitchFamily="49" charset="0"/>
+                <a:ea typeface="Calibri" panose="020F0502020204030204" pitchFamily="34" charset="0"/>
+                <a:cs typeface="Times New Roman" panose="02020603050405020304" pitchFamily="18" charset="0"/>
+              </a:rPr>
+              <a:t>Quantity</a:t>
+            </a:r>
+            <a:r>
+              <a:rPr lang="en-US" sz="1400" dirty="0">
+                <a:solidFill>
+                  <a:srgbClr val="808080"/>
+                </a:solidFill>
+                <a:latin typeface="Consolas" panose="020B0609020204030204" pitchFamily="49" charset="0"/>
+                <a:ea typeface="Calibri" panose="020F0502020204030204" pitchFamily="34" charset="0"/>
+                <a:cs typeface="Times New Roman" panose="02020603050405020304" pitchFamily="18" charset="0"/>
+              </a:rPr>
+              <a:t>)</a:t>
+            </a:r>
+            <a:r>
+              <a:rPr lang="en-US" sz="1400" dirty="0">
+                <a:latin typeface="Consolas" panose="020B0609020204030204" pitchFamily="49" charset="0"/>
+                <a:ea typeface="Calibri" panose="020F0502020204030204" pitchFamily="34" charset="0"/>
+                <a:cs typeface="Times New Roman" panose="02020603050405020304" pitchFamily="18" charset="0"/>
+              </a:rPr>
+              <a:t> </a:t>
+            </a:r>
+            <a:r>
+              <a:rPr lang="en-US" sz="1400" dirty="0">
+                <a:solidFill>
+                  <a:srgbClr val="808080"/>
+                </a:solidFill>
+                <a:latin typeface="Consolas" panose="020B0609020204030204" pitchFamily="49" charset="0"/>
+                <a:ea typeface="Calibri" panose="020F0502020204030204" pitchFamily="34" charset="0"/>
+                <a:cs typeface="Times New Roman" panose="02020603050405020304" pitchFamily="18" charset="0"/>
+              </a:rPr>
+              <a:t>&gt;=</a:t>
+            </a:r>
+            <a:r>
+              <a:rPr lang="en-US" sz="1400" dirty="0">
+                <a:latin typeface="Consolas" panose="020B0609020204030204" pitchFamily="49" charset="0"/>
+                <a:ea typeface="Calibri" panose="020F0502020204030204" pitchFamily="34" charset="0"/>
+                <a:cs typeface="Times New Roman" panose="02020603050405020304" pitchFamily="18" charset="0"/>
+              </a:rPr>
+              <a:t> 20</a:t>
+            </a:r>
+            <a:endParaRPr lang="en-US" dirty="0">
+              <a:latin typeface="Calibri" panose="020F0502020204030204" pitchFamily="34" charset="0"/>
+              <a:ea typeface="Calibri" panose="020F0502020204030204" pitchFamily="34" charset="0"/>
+              <a:cs typeface="Times New Roman" panose="02020603050405020304" pitchFamily="18" charset="0"/>
+            </a:endParaRPr>
+          </a:p>
+          <a:p>
+            <a:pPr>
+              <a:lnSpc>
+                <a:spcPct val="107000"/>
+              </a:lnSpc>
+            </a:pPr>
+            <a:r>
+              <a:rPr lang="en-US" sz="1400" dirty="0">
+                <a:solidFill>
+                  <a:srgbClr val="0000FF"/>
+                </a:solidFill>
+                <a:latin typeface="Consolas" panose="020B0609020204030204" pitchFamily="49" charset="0"/>
+                <a:ea typeface="Calibri" panose="020F0502020204030204" pitchFamily="34" charset="0"/>
+                <a:cs typeface="Times New Roman" panose="02020603050405020304" pitchFamily="18" charset="0"/>
+              </a:rPr>
+              <a:t>select</a:t>
+            </a:r>
+            <a:r>
+              <a:rPr lang="en-US" sz="1400" dirty="0">
+                <a:latin typeface="Consolas" panose="020B0609020204030204" pitchFamily="49" charset="0"/>
+                <a:ea typeface="Calibri" panose="020F0502020204030204" pitchFamily="34" charset="0"/>
+                <a:cs typeface="Times New Roman" panose="02020603050405020304" pitchFamily="18" charset="0"/>
+              </a:rPr>
+              <a:t> </a:t>
+            </a:r>
+            <a:r>
+              <a:rPr lang="en-US" sz="1400" dirty="0" err="1">
+                <a:solidFill>
+                  <a:srgbClr val="008080"/>
+                </a:solidFill>
+                <a:latin typeface="Consolas" panose="020B0609020204030204" pitchFamily="49" charset="0"/>
+                <a:ea typeface="Calibri" panose="020F0502020204030204" pitchFamily="34" charset="0"/>
+                <a:cs typeface="Times New Roman" panose="02020603050405020304" pitchFamily="18" charset="0"/>
+              </a:rPr>
+              <a:t>od</a:t>
+            </a:r>
+            <a:r>
+              <a:rPr lang="en-US" sz="1400" dirty="0" err="1">
+                <a:solidFill>
+                  <a:srgbClr val="808080"/>
+                </a:solidFill>
+                <a:latin typeface="Consolas" panose="020B0609020204030204" pitchFamily="49" charset="0"/>
+                <a:ea typeface="Calibri" panose="020F0502020204030204" pitchFamily="34" charset="0"/>
+                <a:cs typeface="Times New Roman" panose="02020603050405020304" pitchFamily="18" charset="0"/>
+              </a:rPr>
+              <a:t>.</a:t>
+            </a:r>
+            <a:r>
+              <a:rPr lang="en-US" sz="1400" dirty="0" err="1">
+                <a:solidFill>
+                  <a:srgbClr val="008080"/>
+                </a:solidFill>
+                <a:latin typeface="Consolas" panose="020B0609020204030204" pitchFamily="49" charset="0"/>
+                <a:ea typeface="Calibri" panose="020F0502020204030204" pitchFamily="34" charset="0"/>
+                <a:cs typeface="Times New Roman" panose="02020603050405020304" pitchFamily="18" charset="0"/>
+              </a:rPr>
+              <a:t>ProductId</a:t>
+            </a:r>
+            <a:r>
+              <a:rPr lang="en-US" sz="1400" dirty="0">
+                <a:solidFill>
+                  <a:srgbClr val="808080"/>
+                </a:solidFill>
+                <a:latin typeface="Consolas" panose="020B0609020204030204" pitchFamily="49" charset="0"/>
+                <a:ea typeface="Calibri" panose="020F0502020204030204" pitchFamily="34" charset="0"/>
+                <a:cs typeface="Times New Roman" panose="02020603050405020304" pitchFamily="18" charset="0"/>
+              </a:rPr>
+              <a:t>,</a:t>
+            </a:r>
+            <a:endParaRPr lang="en-US" sz="1400" dirty="0">
+              <a:latin typeface="Consolas" panose="020B0609020204030204" pitchFamily="49" charset="0"/>
+              <a:ea typeface="Calibri" panose="020F0502020204030204" pitchFamily="34" charset="0"/>
+              <a:cs typeface="Times New Roman" panose="02020603050405020304" pitchFamily="18" charset="0"/>
+            </a:endParaRPr>
+          </a:p>
+          <a:p>
+            <a:pPr>
+              <a:lnSpc>
+                <a:spcPct val="107000"/>
+              </a:lnSpc>
+            </a:pPr>
+            <a:r>
+              <a:rPr lang="en-US" sz="1400" dirty="0">
+                <a:solidFill>
+                  <a:srgbClr val="FF00FF"/>
+                </a:solidFill>
+                <a:latin typeface="Consolas" panose="020B0609020204030204" pitchFamily="49" charset="0"/>
+                <a:ea typeface="Calibri" panose="020F0502020204030204" pitchFamily="34" charset="0"/>
+                <a:cs typeface="Times New Roman" panose="02020603050405020304" pitchFamily="18" charset="0"/>
+              </a:rPr>
+              <a:t>	sum</a:t>
+            </a:r>
+            <a:r>
+              <a:rPr lang="en-US" sz="1400" dirty="0">
+                <a:solidFill>
+                  <a:srgbClr val="808080"/>
+                </a:solidFill>
+                <a:latin typeface="Consolas" panose="020B0609020204030204" pitchFamily="49" charset="0"/>
+                <a:ea typeface="Calibri" panose="020F0502020204030204" pitchFamily="34" charset="0"/>
+                <a:cs typeface="Times New Roman" panose="02020603050405020304" pitchFamily="18" charset="0"/>
+              </a:rPr>
+              <a:t>(</a:t>
+            </a:r>
+            <a:r>
+              <a:rPr lang="en-US" sz="1400" dirty="0" err="1">
+                <a:solidFill>
+                  <a:srgbClr val="008080"/>
+                </a:solidFill>
+                <a:latin typeface="Consolas" panose="020B0609020204030204" pitchFamily="49" charset="0"/>
+                <a:ea typeface="Calibri" panose="020F0502020204030204" pitchFamily="34" charset="0"/>
+                <a:cs typeface="Times New Roman" panose="02020603050405020304" pitchFamily="18" charset="0"/>
+              </a:rPr>
+              <a:t>od</a:t>
+            </a:r>
+            <a:r>
+              <a:rPr lang="en-US" sz="1400" dirty="0" err="1">
+                <a:solidFill>
+                  <a:srgbClr val="808080"/>
+                </a:solidFill>
+                <a:latin typeface="Consolas" panose="020B0609020204030204" pitchFamily="49" charset="0"/>
+                <a:ea typeface="Calibri" panose="020F0502020204030204" pitchFamily="34" charset="0"/>
+                <a:cs typeface="Times New Roman" panose="02020603050405020304" pitchFamily="18" charset="0"/>
+              </a:rPr>
+              <a:t>.</a:t>
+            </a:r>
+            <a:r>
+              <a:rPr lang="en-US" sz="1400" dirty="0" err="1">
+                <a:solidFill>
+                  <a:srgbClr val="008080"/>
+                </a:solidFill>
+                <a:latin typeface="Consolas" panose="020B0609020204030204" pitchFamily="49" charset="0"/>
+                <a:ea typeface="Calibri" panose="020F0502020204030204" pitchFamily="34" charset="0"/>
+                <a:cs typeface="Times New Roman" panose="02020603050405020304" pitchFamily="18" charset="0"/>
+              </a:rPr>
+              <a:t>Quantity</a:t>
+            </a:r>
+            <a:r>
+              <a:rPr lang="en-US" sz="1400" dirty="0">
+                <a:solidFill>
+                  <a:srgbClr val="808080"/>
+                </a:solidFill>
+                <a:latin typeface="Consolas" panose="020B0609020204030204" pitchFamily="49" charset="0"/>
+                <a:ea typeface="Calibri" panose="020F0502020204030204" pitchFamily="34" charset="0"/>
+                <a:cs typeface="Times New Roman" panose="02020603050405020304" pitchFamily="18" charset="0"/>
+              </a:rPr>
+              <a:t>)</a:t>
+            </a:r>
+            <a:r>
+              <a:rPr lang="en-US" sz="1400" dirty="0">
+                <a:latin typeface="Consolas" panose="020B0609020204030204" pitchFamily="49" charset="0"/>
+                <a:ea typeface="Calibri" panose="020F0502020204030204" pitchFamily="34" charset="0"/>
+                <a:cs typeface="Times New Roman" panose="02020603050405020304" pitchFamily="18" charset="0"/>
+              </a:rPr>
+              <a:t> </a:t>
+            </a:r>
+            <a:r>
+              <a:rPr lang="en-US" sz="1400" dirty="0">
+                <a:solidFill>
+                  <a:srgbClr val="808080"/>
+                </a:solidFill>
+                <a:latin typeface="Consolas" panose="020B0609020204030204" pitchFamily="49" charset="0"/>
+                <a:ea typeface="Calibri" panose="020F0502020204030204" pitchFamily="34" charset="0"/>
+                <a:cs typeface="Times New Roman" panose="02020603050405020304" pitchFamily="18" charset="0"/>
+              </a:rPr>
+              <a:t>-</a:t>
+            </a:r>
+            <a:r>
+              <a:rPr lang="en-US" sz="1400" dirty="0">
+                <a:latin typeface="Consolas" panose="020B0609020204030204" pitchFamily="49" charset="0"/>
+                <a:ea typeface="Calibri" panose="020F0502020204030204" pitchFamily="34" charset="0"/>
+                <a:cs typeface="Times New Roman" panose="02020603050405020304" pitchFamily="18" charset="0"/>
+              </a:rPr>
+              <a:t> 20 </a:t>
+            </a:r>
+            <a:r>
+              <a:rPr lang="en-US" sz="1400" dirty="0" err="1">
+                <a:solidFill>
+                  <a:srgbClr val="008080"/>
+                </a:solidFill>
+                <a:latin typeface="Consolas" panose="020B0609020204030204" pitchFamily="49" charset="0"/>
+                <a:ea typeface="Calibri" panose="020F0502020204030204" pitchFamily="34" charset="0"/>
+                <a:cs typeface="Times New Roman" panose="02020603050405020304" pitchFamily="18" charset="0"/>
+              </a:rPr>
+              <a:t>ExcessOrders</a:t>
+            </a:r>
+            <a:endParaRPr lang="en-US" dirty="0">
+              <a:latin typeface="Calibri" panose="020F0502020204030204" pitchFamily="34" charset="0"/>
+              <a:ea typeface="Calibri" panose="020F0502020204030204" pitchFamily="34" charset="0"/>
+              <a:cs typeface="Times New Roman" panose="02020603050405020304" pitchFamily="18" charset="0"/>
+            </a:endParaRPr>
+          </a:p>
+          <a:p>
+            <a:pPr>
+              <a:lnSpc>
+                <a:spcPct val="107000"/>
+              </a:lnSpc>
+            </a:pPr>
+            <a:r>
+              <a:rPr lang="en-US" sz="1400" dirty="0">
+                <a:solidFill>
+                  <a:srgbClr val="0000FF"/>
+                </a:solidFill>
+                <a:latin typeface="Consolas" panose="020B0609020204030204" pitchFamily="49" charset="0"/>
+                <a:ea typeface="Calibri" panose="020F0502020204030204" pitchFamily="34" charset="0"/>
+                <a:cs typeface="Times New Roman" panose="02020603050405020304" pitchFamily="18" charset="0"/>
+              </a:rPr>
+              <a:t>order</a:t>
+            </a:r>
+            <a:r>
+              <a:rPr lang="en-US" sz="1400" dirty="0">
+                <a:latin typeface="Consolas" panose="020B0609020204030204" pitchFamily="49" charset="0"/>
+                <a:ea typeface="Calibri" panose="020F0502020204030204" pitchFamily="34" charset="0"/>
+                <a:cs typeface="Times New Roman" panose="02020603050405020304" pitchFamily="18" charset="0"/>
+              </a:rPr>
+              <a:t> </a:t>
+            </a:r>
+            <a:r>
+              <a:rPr lang="en-US" sz="1400" dirty="0">
+                <a:solidFill>
+                  <a:srgbClr val="0000FF"/>
+                </a:solidFill>
+                <a:latin typeface="Consolas" panose="020B0609020204030204" pitchFamily="49" charset="0"/>
+                <a:ea typeface="Calibri" panose="020F0502020204030204" pitchFamily="34" charset="0"/>
+                <a:cs typeface="Times New Roman" panose="02020603050405020304" pitchFamily="18" charset="0"/>
+              </a:rPr>
+              <a:t>by</a:t>
+            </a:r>
+            <a:r>
+              <a:rPr lang="en-US" sz="1400" dirty="0">
+                <a:latin typeface="Consolas" panose="020B0609020204030204" pitchFamily="49" charset="0"/>
+                <a:ea typeface="Calibri" panose="020F0502020204030204" pitchFamily="34" charset="0"/>
+                <a:cs typeface="Times New Roman" panose="02020603050405020304" pitchFamily="18" charset="0"/>
+              </a:rPr>
+              <a:t> </a:t>
+            </a:r>
+            <a:r>
+              <a:rPr lang="en-US" sz="1400" dirty="0" err="1">
+                <a:solidFill>
+                  <a:srgbClr val="008080"/>
+                </a:solidFill>
+                <a:latin typeface="Consolas" panose="020B0609020204030204" pitchFamily="49" charset="0"/>
+                <a:ea typeface="Calibri" panose="020F0502020204030204" pitchFamily="34" charset="0"/>
+                <a:cs typeface="Times New Roman" panose="02020603050405020304" pitchFamily="18" charset="0"/>
+              </a:rPr>
+              <a:t>od</a:t>
+            </a:r>
+            <a:r>
+              <a:rPr lang="en-US" sz="1400" dirty="0" err="1">
+                <a:solidFill>
+                  <a:srgbClr val="808080"/>
+                </a:solidFill>
+                <a:latin typeface="Consolas" panose="020B0609020204030204" pitchFamily="49" charset="0"/>
+                <a:ea typeface="Calibri" panose="020F0502020204030204" pitchFamily="34" charset="0"/>
+                <a:cs typeface="Times New Roman" panose="02020603050405020304" pitchFamily="18" charset="0"/>
+              </a:rPr>
+              <a:t>.</a:t>
+            </a:r>
+            <a:r>
+              <a:rPr lang="en-US" sz="1400" dirty="0" err="1">
+                <a:solidFill>
+                  <a:srgbClr val="008080"/>
+                </a:solidFill>
+                <a:latin typeface="Consolas" panose="020B0609020204030204" pitchFamily="49" charset="0"/>
+                <a:ea typeface="Calibri" panose="020F0502020204030204" pitchFamily="34" charset="0"/>
+                <a:cs typeface="Times New Roman" panose="02020603050405020304" pitchFamily="18" charset="0"/>
+              </a:rPr>
+              <a:t>ProductId</a:t>
+            </a:r>
+            <a:endParaRPr lang="en-US" sz="1400" dirty="0">
+              <a:solidFill>
+                <a:srgbClr val="008080"/>
+              </a:solidFill>
+              <a:latin typeface="Consolas" panose="020B0609020204030204" pitchFamily="49" charset="0"/>
+              <a:ea typeface="Calibri" panose="020F0502020204030204" pitchFamily="34" charset="0"/>
+              <a:cs typeface="Times New Roman" panose="02020603050405020304" pitchFamily="18" charset="0"/>
+            </a:endParaRPr>
+          </a:p>
+          <a:p>
+            <a:pPr>
+              <a:lnSpc>
+                <a:spcPct val="107000"/>
+              </a:lnSpc>
+            </a:pPr>
+            <a:r>
+              <a:rPr lang="en-US" sz="1400" dirty="0">
+                <a:solidFill>
+                  <a:srgbClr val="0000FF"/>
+                </a:solidFill>
+                <a:latin typeface="Consolas" panose="020B0609020204030204" pitchFamily="49" charset="0"/>
+                <a:ea typeface="Calibri" panose="020F0502020204030204" pitchFamily="34" charset="0"/>
+                <a:cs typeface="Times New Roman" panose="02020603050405020304" pitchFamily="18" charset="0"/>
+              </a:rPr>
+              <a:t>top</a:t>
+            </a:r>
+            <a:r>
+              <a:rPr lang="en-US" sz="1400" dirty="0">
+                <a:latin typeface="Consolas" panose="020B0609020204030204" pitchFamily="49" charset="0"/>
+                <a:ea typeface="Calibri" panose="020F0502020204030204" pitchFamily="34" charset="0"/>
+                <a:cs typeface="Times New Roman" panose="02020603050405020304" pitchFamily="18" charset="0"/>
+              </a:rPr>
+              <a:t> 5</a:t>
+            </a:r>
+            <a:r>
+              <a:rPr lang="en-US" sz="1400" dirty="0">
+                <a:solidFill>
+                  <a:srgbClr val="808080"/>
+                </a:solidFill>
+                <a:latin typeface="Consolas" panose="020B0609020204030204" pitchFamily="49" charset="0"/>
+                <a:ea typeface="Calibri" panose="020F0502020204030204" pitchFamily="34" charset="0"/>
+                <a:cs typeface="Times New Roman" panose="02020603050405020304" pitchFamily="18" charset="0"/>
+              </a:rPr>
+              <a:t>;</a:t>
+            </a:r>
+            <a:endParaRPr lang="en-US" dirty="0">
+              <a:latin typeface="Calibri" panose="020F0502020204030204" pitchFamily="34" charset="0"/>
+              <a:ea typeface="Calibri" panose="020F0502020204030204" pitchFamily="34" charset="0"/>
+              <a:cs typeface="Times New Roman" panose="02020603050405020304" pitchFamily="18" charset="0"/>
+            </a:endParaRPr>
+          </a:p>
+        </p:txBody>
+      </p:sp>
+      <p:pic>
+        <p:nvPicPr>
+          <p:cNvPr id="4" name="Picture 3"/>
+          <p:cNvPicPr>
+            <a:picLocks noChangeAspect="1"/>
+          </p:cNvPicPr>
+          <p:nvPr/>
+        </p:nvPicPr>
+        <p:blipFill>
+          <a:blip r:embed="rId3"/>
+          <a:stretch>
+            <a:fillRect/>
+          </a:stretch>
+        </p:blipFill>
+        <p:spPr>
+          <a:xfrm>
+            <a:off x="3246120" y="539496"/>
+            <a:ext cx="5421612" cy="5678424"/>
+          </a:xfrm>
+          <a:prstGeom prst="rect">
+            <a:avLst/>
+          </a:prstGeom>
+        </p:spPr>
+      </p:pic>
+      <p:sp>
+        <p:nvSpPr>
+          <p:cNvPr id="6" name="Oval 5"/>
+          <p:cNvSpPr/>
+          <p:nvPr/>
+        </p:nvSpPr>
+        <p:spPr>
+          <a:xfrm>
+            <a:off x="8388326" y="103889"/>
+            <a:ext cx="616016" cy="606391"/>
+          </a:xfrm>
+          <a:prstGeom prst="ellipse">
+            <a:avLst/>
+          </a:prstGeom>
+        </p:spPr>
+        <p:style>
+          <a:lnRef idx="1">
+            <a:schemeClr val="accent1"/>
+          </a:lnRef>
+          <a:fillRef idx="3">
+            <a:schemeClr val="accent1"/>
+          </a:fillRef>
+          <a:effectRef idx="2">
+            <a:schemeClr val="accent1"/>
+          </a:effectRef>
+          <a:fontRef idx="minor">
+            <a:schemeClr val="lt1"/>
+          </a:fontRef>
+        </p:style>
+        <p:txBody>
+          <a:bodyPr rtlCol="0" anchor="ctr"/>
+          <a:lstStyle/>
+          <a:p>
+            <a:pPr algn="ctr"/>
+            <a:r>
+              <a:rPr lang="en-US" sz="1600" dirty="0"/>
+              <a:t>11</a:t>
+            </a:r>
+          </a:p>
+        </p:txBody>
+      </p:sp>
+    </p:spTree>
+    <p:extLst>
+      <p:ext uri="{BB962C8B-B14F-4D97-AF65-F5344CB8AC3E}">
+        <p14:creationId xmlns:p14="http://schemas.microsoft.com/office/powerpoint/2010/main" val="1565686106"/>
+      </p:ext>
+    </p:extLst>
+  </p:cSld>
+  <p:clrMapOvr>
+    <a:masterClrMapping/>
+  </p:clrMapOvr>
+  <mc:AlternateContent xmlns:mc="http://schemas.openxmlformats.org/markup-compatibility/2006" xmlns:p14="http://schemas.microsoft.com/office/powerpoint/2010/main">
+    <mc:Choice Requires="p14">
+      <p:transition spd="slow" p14:dur="2000"/>
+    </mc:Choice>
+    <mc:Fallback xmlns="">
+      <p:transition spd="slow"/>
+    </mc:Fallback>
+  </mc:AlternateContent>
+  <p:timing>
+    <p:tnLst>
+      <p:par>
+        <p:cTn id="1" dur="indefinite" restart="never" nodeType="tmRoot"/>
+      </p:par>
+    </p:tnLst>
+  </p:timing>
 </p:sld>
 </file>
 
@@ -27247,6 +27331,13 @@
   <p:clrMapOvr>
     <a:masterClrMapping/>
   </p:clrMapOvr>
+  <p:timing>
+    <p:tnLst>
+      <p:par>
+        <p:cTn id="1" dur="indefinite" restart="never" nodeType="tmRoot"/>
+      </p:par>
+    </p:tnLst>
+  </p:timing>
 </p:sld>
 </file>
 
@@ -27333,6 +27424,13 @@
   <p:clrMapOvr>
     <a:masterClrMapping/>
   </p:clrMapOvr>
+  <p:timing>
+    <p:tnLst>
+      <p:par>
+        <p:cTn id="1" dur="indefinite" restart="never" nodeType="tmRoot"/>
+      </p:par>
+    </p:tnLst>
+  </p:timing>
 </p:sld>
 </file>
 
@@ -27411,6 +27509,13 @@
   <p:clrMapOvr>
     <a:masterClrMapping/>
   </p:clrMapOvr>
+  <p:timing>
+    <p:tnLst>
+      <p:par>
+        <p:cTn id="1" dur="indefinite" restart="never" nodeType="tmRoot"/>
+      </p:par>
+    </p:tnLst>
+  </p:timing>
 </p:sld>
 </file>
 
@@ -30472,6 +30577,13 @@
   <p:clrMapOvr>
     <a:masterClrMapping/>
   </p:clrMapOvr>
+  <p:timing>
+    <p:tnLst>
+      <p:par>
+        <p:cTn id="1" dur="indefinite" restart="never" nodeType="tmRoot"/>
+      </p:par>
+    </p:tnLst>
+  </p:timing>
 </p:sld>
 </file>
 
@@ -30674,6 +30786,13 @@
   <p:clrMapOvr>
     <a:masterClrMapping/>
   </p:clrMapOvr>
+  <p:timing>
+    <p:tnLst>
+      <p:par>
+        <p:cTn id="1" dur="indefinite" restart="never" nodeType="tmRoot"/>
+      </p:par>
+    </p:tnLst>
+  </p:timing>
 </p:sld>
 </file>
 
@@ -31412,14 +31531,14 @@
                 <a:gridCol w="7632835">
                   <a:extLst>
                     <a:ext uri="{9D8B030D-6E8A-4147-A177-3AD203B41FA5}">
-                      <a16:colId xmlns="" xmlns:a16="http://schemas.microsoft.com/office/drawing/2014/main" val="3644048045"/>
+                      <a16:colId xmlns:a16="http://schemas.microsoft.com/office/drawing/2014/main" xmlns="" val="3644048045"/>
                     </a:ext>
                   </a:extLst>
                 </a:gridCol>
                 <a:gridCol w="606393">
                   <a:extLst>
                     <a:ext uri="{9D8B030D-6E8A-4147-A177-3AD203B41FA5}">
-                      <a16:colId xmlns="" xmlns:a16="http://schemas.microsoft.com/office/drawing/2014/main" val="2034254753"/>
+                      <a16:colId xmlns:a16="http://schemas.microsoft.com/office/drawing/2014/main" xmlns="" val="2034254753"/>
                     </a:ext>
                   </a:extLst>
                 </a:gridCol>
@@ -31450,7 +31569,7 @@
                 </a:tc>
                 <a:extLst>
                   <a:ext uri="{0D108BD9-81ED-4DB2-BD59-A6C34878D82A}">
-                    <a16:rowId xmlns="" xmlns:a16="http://schemas.microsoft.com/office/drawing/2014/main" val="2708275910"/>
+                    <a16:rowId xmlns:a16="http://schemas.microsoft.com/office/drawing/2014/main" xmlns="" val="2708275910"/>
                   </a:ext>
                 </a:extLst>
               </a:tr>
@@ -31484,7 +31603,7 @@
                 </a:tc>
                 <a:extLst>
                   <a:ext uri="{0D108BD9-81ED-4DB2-BD59-A6C34878D82A}">
-                    <a16:rowId xmlns="" xmlns:a16="http://schemas.microsoft.com/office/drawing/2014/main" val="2161984115"/>
+                    <a16:rowId xmlns:a16="http://schemas.microsoft.com/office/drawing/2014/main" xmlns="" val="2161984115"/>
                   </a:ext>
                 </a:extLst>
               </a:tr>
@@ -31531,7 +31650,7 @@
                 </a:tc>
                 <a:extLst>
                   <a:ext uri="{0D108BD9-81ED-4DB2-BD59-A6C34878D82A}">
-                    <a16:rowId xmlns="" xmlns:a16="http://schemas.microsoft.com/office/drawing/2014/main" val="2841678841"/>
+                    <a16:rowId xmlns:a16="http://schemas.microsoft.com/office/drawing/2014/main" xmlns="" val="2841678841"/>
                   </a:ext>
                 </a:extLst>
               </a:tr>
@@ -31565,7 +31684,7 @@
                 </a:tc>
                 <a:extLst>
                   <a:ext uri="{0D108BD9-81ED-4DB2-BD59-A6C34878D82A}">
-                    <a16:rowId xmlns="" xmlns:a16="http://schemas.microsoft.com/office/drawing/2014/main" val="3144998627"/>
+                    <a16:rowId xmlns:a16="http://schemas.microsoft.com/office/drawing/2014/main" xmlns="" val="3144998627"/>
                   </a:ext>
                 </a:extLst>
               </a:tr>
@@ -31607,7 +31726,7 @@
                 </a:tc>
                 <a:extLst>
                   <a:ext uri="{0D108BD9-81ED-4DB2-BD59-A6C34878D82A}">
-                    <a16:rowId xmlns="" xmlns:a16="http://schemas.microsoft.com/office/drawing/2014/main" val="1419261869"/>
+                    <a16:rowId xmlns:a16="http://schemas.microsoft.com/office/drawing/2014/main" xmlns="" val="1419261869"/>
                   </a:ext>
                 </a:extLst>
               </a:tr>
@@ -31645,7 +31764,7 @@
                 </a:tc>
                 <a:extLst>
                   <a:ext uri="{0D108BD9-81ED-4DB2-BD59-A6C34878D82A}">
-                    <a16:rowId xmlns="" xmlns:a16="http://schemas.microsoft.com/office/drawing/2014/main" val="1427391072"/>
+                    <a16:rowId xmlns:a16="http://schemas.microsoft.com/office/drawing/2014/main" xmlns="" val="1427391072"/>
                   </a:ext>
                 </a:extLst>
               </a:tr>
@@ -31692,7 +31811,7 @@
                 </a:tc>
                 <a:extLst>
                   <a:ext uri="{0D108BD9-81ED-4DB2-BD59-A6C34878D82A}">
-                    <a16:rowId xmlns="" xmlns:a16="http://schemas.microsoft.com/office/drawing/2014/main" val="2346539918"/>
+                    <a16:rowId xmlns:a16="http://schemas.microsoft.com/office/drawing/2014/main" xmlns="" val="2346539918"/>
                   </a:ext>
                 </a:extLst>
               </a:tr>
@@ -31731,7 +31850,7 @@
                 </a:tc>
                 <a:extLst>
                   <a:ext uri="{0D108BD9-81ED-4DB2-BD59-A6C34878D82A}">
-                    <a16:rowId xmlns="" xmlns:a16="http://schemas.microsoft.com/office/drawing/2014/main" val="2275483042"/>
+                    <a16:rowId xmlns:a16="http://schemas.microsoft.com/office/drawing/2014/main" xmlns="" val="2275483042"/>
                   </a:ext>
                 </a:extLst>
               </a:tr>
@@ -31769,7 +31888,7 @@
                 </a:tc>
                 <a:extLst>
                   <a:ext uri="{0D108BD9-81ED-4DB2-BD59-A6C34878D82A}">
-                    <a16:rowId xmlns="" xmlns:a16="http://schemas.microsoft.com/office/drawing/2014/main" val="4202569347"/>
+                    <a16:rowId xmlns:a16="http://schemas.microsoft.com/office/drawing/2014/main" xmlns="" val="4202569347"/>
                   </a:ext>
                 </a:extLst>
               </a:tr>
@@ -31803,7 +31922,7 @@
                 </a:tc>
                 <a:extLst>
                   <a:ext uri="{0D108BD9-81ED-4DB2-BD59-A6C34878D82A}">
-                    <a16:rowId xmlns="" xmlns:a16="http://schemas.microsoft.com/office/drawing/2014/main" val="2989839269"/>
+                    <a16:rowId xmlns:a16="http://schemas.microsoft.com/office/drawing/2014/main" xmlns="" val="2989839269"/>
                   </a:ext>
                 </a:extLst>
               </a:tr>
@@ -31837,7 +31956,7 @@
                 </a:tc>
                 <a:extLst>
                   <a:ext uri="{0D108BD9-81ED-4DB2-BD59-A6C34878D82A}">
-                    <a16:rowId xmlns="" xmlns:a16="http://schemas.microsoft.com/office/drawing/2014/main" val="2130545569"/>
+                    <a16:rowId xmlns:a16="http://schemas.microsoft.com/office/drawing/2014/main" xmlns="" val="2130545569"/>
                   </a:ext>
                 </a:extLst>
               </a:tr>
@@ -31893,7 +32012,7 @@
                 </a:tc>
                 <a:extLst>
                   <a:ext uri="{0D108BD9-81ED-4DB2-BD59-A6C34878D82A}">
-                    <a16:rowId xmlns="" xmlns:a16="http://schemas.microsoft.com/office/drawing/2014/main" val="1848127216"/>
+                    <a16:rowId xmlns:a16="http://schemas.microsoft.com/office/drawing/2014/main" xmlns="" val="1848127216"/>
                   </a:ext>
                 </a:extLst>
               </a:tr>
@@ -32347,14 +32466,14 @@
                 <a:gridCol w="4119615">
                   <a:extLst>
                     <a:ext uri="{9D8B030D-6E8A-4147-A177-3AD203B41FA5}">
-                      <a16:colId xmlns="" xmlns:a16="http://schemas.microsoft.com/office/drawing/2014/main" val="3644048045"/>
+                      <a16:colId xmlns:a16="http://schemas.microsoft.com/office/drawing/2014/main" xmlns="" val="3644048045"/>
                     </a:ext>
                   </a:extLst>
                 </a:gridCol>
                 <a:gridCol w="4119613">
                   <a:extLst>
                     <a:ext uri="{9D8B030D-6E8A-4147-A177-3AD203B41FA5}">
-                      <a16:colId xmlns="" xmlns:a16="http://schemas.microsoft.com/office/drawing/2014/main" val="2034254753"/>
+                      <a16:colId xmlns:a16="http://schemas.microsoft.com/office/drawing/2014/main" xmlns="" val="2034254753"/>
                     </a:ext>
                   </a:extLst>
                 </a:gridCol>
@@ -32390,7 +32509,7 @@
                 </a:tc>
                 <a:extLst>
                   <a:ext uri="{0D108BD9-81ED-4DB2-BD59-A6C34878D82A}">
-                    <a16:rowId xmlns="" xmlns:a16="http://schemas.microsoft.com/office/drawing/2014/main" val="2708275910"/>
+                    <a16:rowId xmlns:a16="http://schemas.microsoft.com/office/drawing/2014/main" xmlns="" val="2708275910"/>
                   </a:ext>
                 </a:extLst>
               </a:tr>
@@ -32590,7 +32709,7 @@
                 </a:tc>
                 <a:extLst>
                   <a:ext uri="{0D108BD9-81ED-4DB2-BD59-A6C34878D82A}">
-                    <a16:rowId xmlns="" xmlns:a16="http://schemas.microsoft.com/office/drawing/2014/main" val="2161984115"/>
+                    <a16:rowId xmlns:a16="http://schemas.microsoft.com/office/drawing/2014/main" xmlns="" val="2161984115"/>
                   </a:ext>
                 </a:extLst>
               </a:tr>
@@ -32790,7 +32909,7 @@
                 </a:tc>
                 <a:extLst>
                   <a:ext uri="{0D108BD9-81ED-4DB2-BD59-A6C34878D82A}">
-                    <a16:rowId xmlns="" xmlns:a16="http://schemas.microsoft.com/office/drawing/2014/main" val="2841678841"/>
+                    <a16:rowId xmlns:a16="http://schemas.microsoft.com/office/drawing/2014/main" xmlns="" val="2841678841"/>
                   </a:ext>
                 </a:extLst>
               </a:tr>
@@ -32990,7 +33109,7 @@
                 </a:tc>
                 <a:extLst>
                   <a:ext uri="{0D108BD9-81ED-4DB2-BD59-A6C34878D82A}">
-                    <a16:rowId xmlns="" xmlns:a16="http://schemas.microsoft.com/office/drawing/2014/main" val="3144998627"/>
+                    <a16:rowId xmlns:a16="http://schemas.microsoft.com/office/drawing/2014/main" xmlns="" val="3144998627"/>
                   </a:ext>
                 </a:extLst>
               </a:tr>
@@ -33190,7 +33309,7 @@
                 </a:tc>
                 <a:extLst>
                   <a:ext uri="{0D108BD9-81ED-4DB2-BD59-A6C34878D82A}">
-                    <a16:rowId xmlns="" xmlns:a16="http://schemas.microsoft.com/office/drawing/2014/main" val="1419261869"/>
+                    <a16:rowId xmlns:a16="http://schemas.microsoft.com/office/drawing/2014/main" xmlns="" val="1419261869"/>
                   </a:ext>
                 </a:extLst>
               </a:tr>
@@ -33390,7 +33509,7 @@
                 </a:tc>
                 <a:extLst>
                   <a:ext uri="{0D108BD9-81ED-4DB2-BD59-A6C34878D82A}">
-                    <a16:rowId xmlns="" xmlns:a16="http://schemas.microsoft.com/office/drawing/2014/main" val="1427391072"/>
+                    <a16:rowId xmlns:a16="http://schemas.microsoft.com/office/drawing/2014/main" xmlns="" val="1427391072"/>
                   </a:ext>
                 </a:extLst>
               </a:tr>
@@ -33590,7 +33709,7 @@
                 </a:tc>
                 <a:extLst>
                   <a:ext uri="{0D108BD9-81ED-4DB2-BD59-A6C34878D82A}">
-                    <a16:rowId xmlns="" xmlns:a16="http://schemas.microsoft.com/office/drawing/2014/main" val="2346539918"/>
+                    <a16:rowId xmlns:a16="http://schemas.microsoft.com/office/drawing/2014/main" xmlns="" val="2346539918"/>
                   </a:ext>
                 </a:extLst>
               </a:tr>
@@ -33799,7 +33918,7 @@
                 </a:tc>
                 <a:extLst>
                   <a:ext uri="{0D108BD9-81ED-4DB2-BD59-A6C34878D82A}">
-                    <a16:rowId xmlns="" xmlns:a16="http://schemas.microsoft.com/office/drawing/2014/main" val="2275483042"/>
+                    <a16:rowId xmlns:a16="http://schemas.microsoft.com/office/drawing/2014/main" xmlns="" val="2275483042"/>
                   </a:ext>
                 </a:extLst>
               </a:tr>
@@ -34008,7 +34127,7 @@
                 </a:tc>
                 <a:extLst>
                   <a:ext uri="{0D108BD9-81ED-4DB2-BD59-A6C34878D82A}">
-                    <a16:rowId xmlns="" xmlns:a16="http://schemas.microsoft.com/office/drawing/2014/main" val="4202569347"/>
+                    <a16:rowId xmlns:a16="http://schemas.microsoft.com/office/drawing/2014/main" xmlns="" val="4202569347"/>
                   </a:ext>
                 </a:extLst>
               </a:tr>
@@ -34217,7 +34336,7 @@
                 </a:tc>
                 <a:extLst>
                   <a:ext uri="{0D108BD9-81ED-4DB2-BD59-A6C34878D82A}">
-                    <a16:rowId xmlns="" xmlns:a16="http://schemas.microsoft.com/office/drawing/2014/main" val="2989839269"/>
+                    <a16:rowId xmlns:a16="http://schemas.microsoft.com/office/drawing/2014/main" xmlns="" val="2989839269"/>
                   </a:ext>
                 </a:extLst>
               </a:tr>
@@ -34426,7 +34545,7 @@
                 </a:tc>
                 <a:extLst>
                   <a:ext uri="{0D108BD9-81ED-4DB2-BD59-A6C34878D82A}">
-                    <a16:rowId xmlns="" xmlns:a16="http://schemas.microsoft.com/office/drawing/2014/main" val="2130545569"/>
+                    <a16:rowId xmlns:a16="http://schemas.microsoft.com/office/drawing/2014/main" xmlns="" val="2130545569"/>
                   </a:ext>
                 </a:extLst>
               </a:tr>
@@ -34635,7 +34754,7 @@
                 </a:tc>
                 <a:extLst>
                   <a:ext uri="{0D108BD9-81ED-4DB2-BD59-A6C34878D82A}">
-                    <a16:rowId xmlns="" xmlns:a16="http://schemas.microsoft.com/office/drawing/2014/main" val="3045796785"/>
+                    <a16:rowId xmlns:a16="http://schemas.microsoft.com/office/drawing/2014/main" xmlns="" val="3045796785"/>
                   </a:ext>
                 </a:extLst>
               </a:tr>
@@ -34844,7 +34963,7 @@
                 </a:tc>
                 <a:extLst>
                   <a:ext uri="{0D108BD9-81ED-4DB2-BD59-A6C34878D82A}">
-                    <a16:rowId xmlns="" xmlns:a16="http://schemas.microsoft.com/office/drawing/2014/main" val="1091494175"/>
+                    <a16:rowId xmlns:a16="http://schemas.microsoft.com/office/drawing/2014/main" xmlns="" val="1091494175"/>
                   </a:ext>
                 </a:extLst>
               </a:tr>
@@ -35098,6 +35217,13 @@
   <p:clrMapOvr>
     <a:masterClrMapping/>
   </p:clrMapOvr>
+  <p:timing>
+    <p:tnLst>
+      <p:par>
+        <p:cTn id="1" dur="indefinite" restart="never" nodeType="tmRoot"/>
+      </p:par>
+    </p:tnLst>
+  </p:timing>
 </p:sld>
 </file>
 
@@ -36378,6 +36504,13 @@
   <p:clrMapOvr>
     <a:masterClrMapping/>
   </p:clrMapOvr>
+  <p:timing>
+    <p:tnLst>
+      <p:par>
+        <p:cTn id="1" dur="indefinite" restart="never" nodeType="tmRoot"/>
+      </p:par>
+    </p:tnLst>
+  </p:timing>
 </p:sld>
 </file>
 
@@ -36853,6 +36986,13 @@
   <p:clrMapOvr>
     <a:masterClrMapping/>
   </p:clrMapOvr>
+  <p:timing>
+    <p:tnLst>
+      <p:par>
+        <p:cTn id="1" dur="indefinite" restart="never" nodeType="tmRoot"/>
+      </p:par>
+    </p:tnLst>
+  </p:timing>
 </p:sld>
 </file>
 
@@ -36988,6 +37128,13 @@
   <p:clrMapOvr>
     <a:masterClrMapping/>
   </p:clrMapOvr>
+  <p:timing>
+    <p:tnLst>
+      <p:par>
+        <p:cTn id="1" dur="indefinite" restart="never" nodeType="tmRoot"/>
+      </p:par>
+    </p:tnLst>
+  </p:timing>
 </p:sld>
 </file>
 
@@ -37162,6 +37309,13 @@
   <p:clrMapOvr>
     <a:masterClrMapping/>
   </p:clrMapOvr>
+  <p:timing>
+    <p:tnLst>
+      <p:par>
+        <p:cTn id="1" dur="indefinite" restart="never" nodeType="tmRoot"/>
+      </p:par>
+    </p:tnLst>
+  </p:timing>
 </p:sld>
 </file>
 
@@ -37330,6 +37484,13 @@
   <p:clrMapOvr>
     <a:masterClrMapping/>
   </p:clrMapOvr>
+  <p:timing>
+    <p:tnLst>
+      <p:par>
+        <p:cTn id="1" dur="indefinite" restart="never" nodeType="tmRoot"/>
+      </p:par>
+    </p:tnLst>
+  </p:timing>
 </p:sld>
 </file>
 
@@ -37425,6 +37586,13 @@
   <p:clrMapOvr>
     <a:masterClrMapping/>
   </p:clrMapOvr>
+  <p:timing>
+    <p:tnLst>
+      <p:par>
+        <p:cTn id="1" dur="indefinite" restart="never" nodeType="tmRoot"/>
+      </p:par>
+    </p:tnLst>
+  </p:timing>
 </p:sld>
 </file>
 
@@ -37564,6 +37732,13 @@
   <p:clrMapOvr>
     <a:masterClrMapping/>
   </p:clrMapOvr>
+  <p:timing>
+    <p:tnLst>
+      <p:par>
+        <p:cTn id="1" dur="indefinite" restart="never" nodeType="tmRoot"/>
+      </p:par>
+    </p:tnLst>
+  </p:timing>
 </p:sld>
 </file>
 
@@ -37673,6 +37848,13 @@
   <p:clrMapOvr>
     <a:masterClrMapping/>
   </p:clrMapOvr>
+  <p:timing>
+    <p:tnLst>
+      <p:par>
+        <p:cTn id="1" dur="indefinite" restart="never" nodeType="tmRoot"/>
+      </p:par>
+    </p:tnLst>
+  </p:timing>
 </p:sld>
 </file>
 
@@ -37818,6 +38000,13 @@
   <p:clrMapOvr>
     <a:masterClrMapping/>
   </p:clrMapOvr>
+  <p:timing>
+    <p:tnLst>
+      <p:par>
+        <p:cTn id="1" dur="indefinite" restart="never" nodeType="tmRoot"/>
+      </p:par>
+    </p:tnLst>
+  </p:timing>
 </p:sld>
 </file>
 
@@ -38054,6 +38243,13 @@
   <p:clrMapOvr>
     <a:masterClrMapping/>
   </p:clrMapOvr>
+  <p:timing>
+    <p:tnLst>
+      <p:par>
+        <p:cTn id="1" dur="indefinite" restart="never" nodeType="tmRoot"/>
+      </p:par>
+    </p:tnLst>
+  </p:timing>
 </p:sld>
 </file>
 
@@ -38739,14 +38935,14 @@
                 <a:gridCol w="957714">
                   <a:extLst>
                     <a:ext uri="{9D8B030D-6E8A-4147-A177-3AD203B41FA5}">
-                      <a16:colId xmlns="" xmlns:a16="http://schemas.microsoft.com/office/drawing/2014/main" val="3940544257"/>
+                      <a16:colId xmlns:a16="http://schemas.microsoft.com/office/drawing/2014/main" xmlns="" val="3940544257"/>
                     </a:ext>
                   </a:extLst>
                 </a:gridCol>
                 <a:gridCol w="2464067">
                   <a:extLst>
                     <a:ext uri="{9D8B030D-6E8A-4147-A177-3AD203B41FA5}">
-                      <a16:colId xmlns="" xmlns:a16="http://schemas.microsoft.com/office/drawing/2014/main" val="3658567973"/>
+                      <a16:colId xmlns:a16="http://schemas.microsoft.com/office/drawing/2014/main" xmlns="" val="3658567973"/>
                     </a:ext>
                   </a:extLst>
                 </a:gridCol>
@@ -38780,7 +38976,7 @@
                 </a:tc>
                 <a:extLst>
                   <a:ext uri="{0D108BD9-81ED-4DB2-BD59-A6C34878D82A}">
-                    <a16:rowId xmlns="" xmlns:a16="http://schemas.microsoft.com/office/drawing/2014/main" val="1032275335"/>
+                    <a16:rowId xmlns:a16="http://schemas.microsoft.com/office/drawing/2014/main" xmlns="" val="1032275335"/>
                   </a:ext>
                 </a:extLst>
               </a:tr>
@@ -38910,7 +39106,7 @@
                 </a:tc>
                 <a:extLst>
                   <a:ext uri="{0D108BD9-81ED-4DB2-BD59-A6C34878D82A}">
-                    <a16:rowId xmlns="" xmlns:a16="http://schemas.microsoft.com/office/drawing/2014/main" val="4191484087"/>
+                    <a16:rowId xmlns:a16="http://schemas.microsoft.com/office/drawing/2014/main" xmlns="" val="4191484087"/>
                   </a:ext>
                 </a:extLst>
               </a:tr>
@@ -38984,7 +39180,7 @@
                 </a:tc>
                 <a:extLst>
                   <a:ext uri="{0D108BD9-81ED-4DB2-BD59-A6C34878D82A}">
-                    <a16:rowId xmlns="" xmlns:a16="http://schemas.microsoft.com/office/drawing/2014/main" val="1864588626"/>
+                    <a16:rowId xmlns:a16="http://schemas.microsoft.com/office/drawing/2014/main" xmlns="" val="1864588626"/>
                   </a:ext>
                 </a:extLst>
               </a:tr>
@@ -39106,7 +39302,7 @@
                 </a:tc>
                 <a:extLst>
                   <a:ext uri="{0D108BD9-81ED-4DB2-BD59-A6C34878D82A}">
-                    <a16:rowId xmlns="" xmlns:a16="http://schemas.microsoft.com/office/drawing/2014/main" val="3035259714"/>
+                    <a16:rowId xmlns:a16="http://schemas.microsoft.com/office/drawing/2014/main" xmlns="" val="3035259714"/>
                   </a:ext>
                 </a:extLst>
               </a:tr>
@@ -39195,7 +39391,7 @@
                 </a:tc>
                 <a:extLst>
                   <a:ext uri="{0D108BD9-81ED-4DB2-BD59-A6C34878D82A}">
-                    <a16:rowId xmlns="" xmlns:a16="http://schemas.microsoft.com/office/drawing/2014/main" val="2023621082"/>
+                    <a16:rowId xmlns:a16="http://schemas.microsoft.com/office/drawing/2014/main" xmlns="" val="2023621082"/>
                   </a:ext>
                 </a:extLst>
               </a:tr>
@@ -39284,7 +39480,7 @@
                 </a:tc>
                 <a:extLst>
                   <a:ext uri="{0D108BD9-81ED-4DB2-BD59-A6C34878D82A}">
-                    <a16:rowId xmlns="" xmlns:a16="http://schemas.microsoft.com/office/drawing/2014/main" val="120016333"/>
+                    <a16:rowId xmlns:a16="http://schemas.microsoft.com/office/drawing/2014/main" xmlns="" val="120016333"/>
                   </a:ext>
                 </a:extLst>
               </a:tr>
@@ -39302,6 +39498,13 @@
   <p:clrMapOvr>
     <a:masterClrMapping/>
   </p:clrMapOvr>
+  <p:timing>
+    <p:tnLst>
+      <p:par>
+        <p:cTn id="1" dur="indefinite" restart="never" nodeType="tmRoot"/>
+      </p:par>
+    </p:tnLst>
+  </p:timing>
 </p:sld>
 </file>
 
@@ -39429,21 +39632,21 @@
                 <a:gridCol w="960120">
                   <a:extLst>
                     <a:ext uri="{9D8B030D-6E8A-4147-A177-3AD203B41FA5}">
-                      <a16:colId xmlns="" xmlns:a16="http://schemas.microsoft.com/office/drawing/2014/main" val="392696932"/>
+                      <a16:colId xmlns:a16="http://schemas.microsoft.com/office/drawing/2014/main" xmlns="" val="392696932"/>
                     </a:ext>
                   </a:extLst>
                 </a:gridCol>
                 <a:gridCol w="2468880">
                   <a:extLst>
                     <a:ext uri="{9D8B030D-6E8A-4147-A177-3AD203B41FA5}">
-                      <a16:colId xmlns="" xmlns:a16="http://schemas.microsoft.com/office/drawing/2014/main" val="2769969192"/>
+                      <a16:colId xmlns:a16="http://schemas.microsoft.com/office/drawing/2014/main" xmlns="" val="2769969192"/>
                     </a:ext>
                   </a:extLst>
                 </a:gridCol>
                 <a:gridCol w="2468880">
                   <a:extLst>
                     <a:ext uri="{9D8B030D-6E8A-4147-A177-3AD203B41FA5}">
-                      <a16:colId xmlns="" xmlns:a16="http://schemas.microsoft.com/office/drawing/2014/main" val="2022610816"/>
+                      <a16:colId xmlns:a16="http://schemas.microsoft.com/office/drawing/2014/main" xmlns="" val="2022610816"/>
                     </a:ext>
                   </a:extLst>
                 </a:gridCol>
@@ -39495,7 +39698,7 @@
                 </a:tc>
                 <a:extLst>
                   <a:ext uri="{0D108BD9-81ED-4DB2-BD59-A6C34878D82A}">
-                    <a16:rowId xmlns="" xmlns:a16="http://schemas.microsoft.com/office/drawing/2014/main" val="2344937666"/>
+                    <a16:rowId xmlns:a16="http://schemas.microsoft.com/office/drawing/2014/main" xmlns="" val="2344937666"/>
                   </a:ext>
                 </a:extLst>
               </a:tr>
@@ -39628,7 +39831,7 @@
                 </a:tc>
                 <a:extLst>
                   <a:ext uri="{0D108BD9-81ED-4DB2-BD59-A6C34878D82A}">
-                    <a16:rowId xmlns="" xmlns:a16="http://schemas.microsoft.com/office/drawing/2014/main" val="1917341330"/>
+                    <a16:rowId xmlns:a16="http://schemas.microsoft.com/office/drawing/2014/main" xmlns="" val="1917341330"/>
                   </a:ext>
                 </a:extLst>
               </a:tr>
@@ -39845,7 +40048,7 @@
                 </a:tc>
                 <a:extLst>
                   <a:ext uri="{0D108BD9-81ED-4DB2-BD59-A6C34878D82A}">
-                    <a16:rowId xmlns="" xmlns:a16="http://schemas.microsoft.com/office/drawing/2014/main" val="3088042860"/>
+                    <a16:rowId xmlns:a16="http://schemas.microsoft.com/office/drawing/2014/main" xmlns="" val="3088042860"/>
                   </a:ext>
                 </a:extLst>
               </a:tr>
@@ -39929,7 +40132,7 @@
                 </a:tc>
                 <a:extLst>
                   <a:ext uri="{0D108BD9-81ED-4DB2-BD59-A6C34878D82A}">
-                    <a16:rowId xmlns="" xmlns:a16="http://schemas.microsoft.com/office/drawing/2014/main" val="2658530722"/>
+                    <a16:rowId xmlns:a16="http://schemas.microsoft.com/office/drawing/2014/main" xmlns="" val="2658530722"/>
                   </a:ext>
                 </a:extLst>
               </a:tr>
@@ -40061,7 +40264,7 @@
                 </a:tc>
                 <a:extLst>
                   <a:ext uri="{0D108BD9-81ED-4DB2-BD59-A6C34878D82A}">
-                    <a16:rowId xmlns="" xmlns:a16="http://schemas.microsoft.com/office/drawing/2014/main" val="1481886367"/>
+                    <a16:rowId xmlns:a16="http://schemas.microsoft.com/office/drawing/2014/main" xmlns="" val="1481886367"/>
                   </a:ext>
                 </a:extLst>
               </a:tr>
@@ -40160,7 +40363,7 @@
                 </a:tc>
                 <a:extLst>
                   <a:ext uri="{0D108BD9-81ED-4DB2-BD59-A6C34878D82A}">
-                    <a16:rowId xmlns="" xmlns:a16="http://schemas.microsoft.com/office/drawing/2014/main" val="4248384778"/>
+                    <a16:rowId xmlns:a16="http://schemas.microsoft.com/office/drawing/2014/main" xmlns="" val="4248384778"/>
                   </a:ext>
                 </a:extLst>
               </a:tr>
@@ -40259,7 +40462,7 @@
                 </a:tc>
                 <a:extLst>
                   <a:ext uri="{0D108BD9-81ED-4DB2-BD59-A6C34878D82A}">
-                    <a16:rowId xmlns="" xmlns:a16="http://schemas.microsoft.com/office/drawing/2014/main" val="1670483340"/>
+                    <a16:rowId xmlns:a16="http://schemas.microsoft.com/office/drawing/2014/main" xmlns="" val="1670483340"/>
                   </a:ext>
                 </a:extLst>
               </a:tr>
@@ -40277,6 +40480,13 @@
   <p:clrMapOvr>
     <a:masterClrMapping/>
   </p:clrMapOvr>
+  <p:timing>
+    <p:tnLst>
+      <p:par>
+        <p:cTn id="1" dur="indefinite" restart="never" nodeType="tmRoot"/>
+      </p:par>
+    </p:tnLst>
+  </p:timing>
 </p:sld>
 </file>
 
@@ -40404,28 +40614,28 @@
                 <a:gridCol w="960120">
                   <a:extLst>
                     <a:ext uri="{9D8B030D-6E8A-4147-A177-3AD203B41FA5}">
-                      <a16:colId xmlns="" xmlns:a16="http://schemas.microsoft.com/office/drawing/2014/main" val="392696932"/>
+                      <a16:colId xmlns:a16="http://schemas.microsoft.com/office/drawing/2014/main" xmlns="" val="392696932"/>
                     </a:ext>
                   </a:extLst>
                 </a:gridCol>
                 <a:gridCol w="2468880">
                   <a:extLst>
                     <a:ext uri="{9D8B030D-6E8A-4147-A177-3AD203B41FA5}">
-                      <a16:colId xmlns="" xmlns:a16="http://schemas.microsoft.com/office/drawing/2014/main" val="2769969192"/>
+                      <a16:colId xmlns:a16="http://schemas.microsoft.com/office/drawing/2014/main" xmlns="" val="2769969192"/>
                     </a:ext>
                   </a:extLst>
                 </a:gridCol>
                 <a:gridCol w="2468880">
                   <a:extLst>
                     <a:ext uri="{9D8B030D-6E8A-4147-A177-3AD203B41FA5}">
-                      <a16:colId xmlns="" xmlns:a16="http://schemas.microsoft.com/office/drawing/2014/main" val="2022610816"/>
+                      <a16:colId xmlns:a16="http://schemas.microsoft.com/office/drawing/2014/main" xmlns="" val="2022610816"/>
                     </a:ext>
                   </a:extLst>
                 </a:gridCol>
                 <a:gridCol w="2468880">
                   <a:extLst>
                     <a:ext uri="{9D8B030D-6E8A-4147-A177-3AD203B41FA5}">
-                      <a16:colId xmlns="" xmlns:a16="http://schemas.microsoft.com/office/drawing/2014/main" val="102813283"/>
+                      <a16:colId xmlns:a16="http://schemas.microsoft.com/office/drawing/2014/main" xmlns="" val="102813283"/>
                     </a:ext>
                   </a:extLst>
                 </a:gridCol>
@@ -40490,7 +40700,7 @@
                 </a:tc>
                 <a:extLst>
                   <a:ext uri="{0D108BD9-81ED-4DB2-BD59-A6C34878D82A}">
-                    <a16:rowId xmlns="" xmlns:a16="http://schemas.microsoft.com/office/drawing/2014/main" val="2344937666"/>
+                    <a16:rowId xmlns:a16="http://schemas.microsoft.com/office/drawing/2014/main" xmlns="" val="2344937666"/>
                   </a:ext>
                 </a:extLst>
               </a:tr>
@@ -40650,7 +40860,7 @@
                 </a:tc>
                 <a:extLst>
                   <a:ext uri="{0D108BD9-81ED-4DB2-BD59-A6C34878D82A}">
-                    <a16:rowId xmlns="" xmlns:a16="http://schemas.microsoft.com/office/drawing/2014/main" val="1917341330"/>
+                    <a16:rowId xmlns:a16="http://schemas.microsoft.com/office/drawing/2014/main" xmlns="" val="1917341330"/>
                   </a:ext>
                 </a:extLst>
               </a:tr>
@@ -40954,7 +41164,7 @@
                 </a:tc>
                 <a:extLst>
                   <a:ext uri="{0D108BD9-81ED-4DB2-BD59-A6C34878D82A}">
-                    <a16:rowId xmlns="" xmlns:a16="http://schemas.microsoft.com/office/drawing/2014/main" val="3088042860"/>
+                    <a16:rowId xmlns:a16="http://schemas.microsoft.com/office/drawing/2014/main" xmlns="" val="3088042860"/>
                   </a:ext>
                 </a:extLst>
               </a:tr>
@@ -41048,7 +41258,7 @@
                 </a:tc>
                 <a:extLst>
                   <a:ext uri="{0D108BD9-81ED-4DB2-BD59-A6C34878D82A}">
-                    <a16:rowId xmlns="" xmlns:a16="http://schemas.microsoft.com/office/drawing/2014/main" val="2658530722"/>
+                    <a16:rowId xmlns:a16="http://schemas.microsoft.com/office/drawing/2014/main" xmlns="" val="2658530722"/>
                   </a:ext>
                 </a:extLst>
               </a:tr>
@@ -41241,7 +41451,7 @@
                 </a:tc>
                 <a:extLst>
                   <a:ext uri="{0D108BD9-81ED-4DB2-BD59-A6C34878D82A}">
-                    <a16:rowId xmlns="" xmlns:a16="http://schemas.microsoft.com/office/drawing/2014/main" val="1481886367"/>
+                    <a16:rowId xmlns:a16="http://schemas.microsoft.com/office/drawing/2014/main" xmlns="" val="1481886367"/>
                   </a:ext>
                 </a:extLst>
               </a:tr>
@@ -41350,7 +41560,7 @@
                 </a:tc>
                 <a:extLst>
                   <a:ext uri="{0D108BD9-81ED-4DB2-BD59-A6C34878D82A}">
-                    <a16:rowId xmlns="" xmlns:a16="http://schemas.microsoft.com/office/drawing/2014/main" val="4248384778"/>
+                    <a16:rowId xmlns:a16="http://schemas.microsoft.com/office/drawing/2014/main" xmlns="" val="4248384778"/>
                   </a:ext>
                 </a:extLst>
               </a:tr>
@@ -41459,7 +41669,7 @@
                 </a:tc>
                 <a:extLst>
                   <a:ext uri="{0D108BD9-81ED-4DB2-BD59-A6C34878D82A}">
-                    <a16:rowId xmlns="" xmlns:a16="http://schemas.microsoft.com/office/drawing/2014/main" val="1670483340"/>
+                    <a16:rowId xmlns:a16="http://schemas.microsoft.com/office/drawing/2014/main" xmlns="" val="1670483340"/>
                   </a:ext>
                 </a:extLst>
               </a:tr>
@@ -41518,6 +41728,13 @@
   <p:clrMapOvr>
     <a:masterClrMapping/>
   </p:clrMapOvr>
+  <p:timing>
+    <p:tnLst>
+      <p:par>
+        <p:cTn id="1" dur="indefinite" restart="never" nodeType="tmRoot"/>
+      </p:par>
+    </p:tnLst>
+  </p:timing>
 </p:sld>
 </file>
 
@@ -41664,6 +41881,13 @@
   <p:clrMapOvr>
     <a:masterClrMapping/>
   </p:clrMapOvr>
+  <p:timing>
+    <p:tnLst>
+      <p:par>
+        <p:cTn id="1" dur="indefinite" restart="never" nodeType="tmRoot"/>
+      </p:par>
+    </p:tnLst>
+  </p:timing>
 </p:sld>
 </file>
 
@@ -41792,6 +42016,13 @@
   <p:clrMapOvr>
     <a:masterClrMapping/>
   </p:clrMapOvr>
+  <p:timing>
+    <p:tnLst>
+      <p:par>
+        <p:cTn id="1" dur="indefinite" restart="never" nodeType="tmRoot"/>
+      </p:par>
+    </p:tnLst>
+  </p:timing>
 </p:sld>
 </file>
 
@@ -42496,14 +42727,14 @@
                 <a:gridCol w="934278">
                   <a:extLst>
                     <a:ext uri="{9D8B030D-6E8A-4147-A177-3AD203B41FA5}">
-                      <a16:colId xmlns="" xmlns:a16="http://schemas.microsoft.com/office/drawing/2014/main" val="4198655800"/>
+                      <a16:colId xmlns:a16="http://schemas.microsoft.com/office/drawing/2014/main" xmlns="" val="4198655800"/>
                     </a:ext>
                   </a:extLst>
                 </a:gridCol>
                 <a:gridCol w="7295322">
                   <a:extLst>
                     <a:ext uri="{9D8B030D-6E8A-4147-A177-3AD203B41FA5}">
-                      <a16:colId xmlns="" xmlns:a16="http://schemas.microsoft.com/office/drawing/2014/main" val="135413862"/>
+                      <a16:colId xmlns:a16="http://schemas.microsoft.com/office/drawing/2014/main" xmlns="" val="135413862"/>
                     </a:ext>
                   </a:extLst>
                 </a:gridCol>
@@ -42537,7 +42768,7 @@
                 </a:tc>
                 <a:extLst>
                   <a:ext uri="{0D108BD9-81ED-4DB2-BD59-A6C34878D82A}">
-                    <a16:rowId xmlns="" xmlns:a16="http://schemas.microsoft.com/office/drawing/2014/main" val="3068323444"/>
+                    <a16:rowId xmlns:a16="http://schemas.microsoft.com/office/drawing/2014/main" xmlns="" val="3068323444"/>
                   </a:ext>
                 </a:extLst>
               </a:tr>
@@ -42570,7 +42801,7 @@
                 </a:tc>
                 <a:extLst>
                   <a:ext uri="{0D108BD9-81ED-4DB2-BD59-A6C34878D82A}">
-                    <a16:rowId xmlns="" xmlns:a16="http://schemas.microsoft.com/office/drawing/2014/main" val="1586961909"/>
+                    <a16:rowId xmlns:a16="http://schemas.microsoft.com/office/drawing/2014/main" xmlns="" val="1586961909"/>
                   </a:ext>
                 </a:extLst>
               </a:tr>
@@ -42608,7 +42839,7 @@
                 </a:tc>
                 <a:extLst>
                   <a:ext uri="{0D108BD9-81ED-4DB2-BD59-A6C34878D82A}">
-                    <a16:rowId xmlns="" xmlns:a16="http://schemas.microsoft.com/office/drawing/2014/main" val="2280300197"/>
+                    <a16:rowId xmlns:a16="http://schemas.microsoft.com/office/drawing/2014/main" xmlns="" val="2280300197"/>
                   </a:ext>
                 </a:extLst>
               </a:tr>
@@ -42646,7 +42877,7 @@
                 </a:tc>
                 <a:extLst>
                   <a:ext uri="{0D108BD9-81ED-4DB2-BD59-A6C34878D82A}">
-                    <a16:rowId xmlns="" xmlns:a16="http://schemas.microsoft.com/office/drawing/2014/main" val="1192843310"/>
+                    <a16:rowId xmlns:a16="http://schemas.microsoft.com/office/drawing/2014/main" xmlns="" val="1192843310"/>
                   </a:ext>
                 </a:extLst>
               </a:tr>
@@ -42684,7 +42915,7 @@
                 </a:tc>
                 <a:extLst>
                   <a:ext uri="{0D108BD9-81ED-4DB2-BD59-A6C34878D82A}">
-                    <a16:rowId xmlns="" xmlns:a16="http://schemas.microsoft.com/office/drawing/2014/main" val="2620585158"/>
+                    <a16:rowId xmlns:a16="http://schemas.microsoft.com/office/drawing/2014/main" xmlns="" val="2620585158"/>
                   </a:ext>
                 </a:extLst>
               </a:tr>
@@ -42717,7 +42948,7 @@
                 </a:tc>
                 <a:extLst>
                   <a:ext uri="{0D108BD9-81ED-4DB2-BD59-A6C34878D82A}">
-                    <a16:rowId xmlns="" xmlns:a16="http://schemas.microsoft.com/office/drawing/2014/main" val="1697738616"/>
+                    <a16:rowId xmlns:a16="http://schemas.microsoft.com/office/drawing/2014/main" xmlns="" val="1697738616"/>
                   </a:ext>
                 </a:extLst>
               </a:tr>
@@ -42755,7 +42986,7 @@
                 </a:tc>
                 <a:extLst>
                   <a:ext uri="{0D108BD9-81ED-4DB2-BD59-A6C34878D82A}">
-                    <a16:rowId xmlns="" xmlns:a16="http://schemas.microsoft.com/office/drawing/2014/main" val="316611556"/>
+                    <a16:rowId xmlns:a16="http://schemas.microsoft.com/office/drawing/2014/main" xmlns="" val="316611556"/>
                   </a:ext>
                 </a:extLst>
               </a:tr>
@@ -42788,7 +43019,7 @@
                 </a:tc>
                 <a:extLst>
                   <a:ext uri="{0D108BD9-81ED-4DB2-BD59-A6C34878D82A}">
-                    <a16:rowId xmlns="" xmlns:a16="http://schemas.microsoft.com/office/drawing/2014/main" val="1312814102"/>
+                    <a16:rowId xmlns:a16="http://schemas.microsoft.com/office/drawing/2014/main" xmlns="" val="1312814102"/>
                   </a:ext>
                 </a:extLst>
               </a:tr>
@@ -42821,7 +43052,7 @@
                 </a:tc>
                 <a:extLst>
                   <a:ext uri="{0D108BD9-81ED-4DB2-BD59-A6C34878D82A}">
-                    <a16:rowId xmlns="" xmlns:a16="http://schemas.microsoft.com/office/drawing/2014/main" val="1975533996"/>
+                    <a16:rowId xmlns:a16="http://schemas.microsoft.com/office/drawing/2014/main" xmlns="" val="1975533996"/>
                   </a:ext>
                 </a:extLst>
               </a:tr>
@@ -42854,7 +43085,7 @@
                 </a:tc>
                 <a:extLst>
                   <a:ext uri="{0D108BD9-81ED-4DB2-BD59-A6C34878D82A}">
-                    <a16:rowId xmlns="" xmlns:a16="http://schemas.microsoft.com/office/drawing/2014/main" val="2759032957"/>
+                    <a16:rowId xmlns:a16="http://schemas.microsoft.com/office/drawing/2014/main" xmlns="" val="2759032957"/>
                   </a:ext>
                 </a:extLst>
               </a:tr>
@@ -42872,6 +43103,13 @@
   <p:clrMapOvr>
     <a:masterClrMapping/>
   </p:clrMapOvr>
+  <p:timing>
+    <p:tnLst>
+      <p:par>
+        <p:cTn id="1" dur="indefinite" restart="never" nodeType="tmRoot"/>
+      </p:par>
+    </p:tnLst>
+  </p:timing>
 </p:sld>
 </file>
 
@@ -42943,14 +43181,14 @@
                 <a:gridCol w="934278">
                   <a:extLst>
                     <a:ext uri="{9D8B030D-6E8A-4147-A177-3AD203B41FA5}">
-                      <a16:colId xmlns="" xmlns:a16="http://schemas.microsoft.com/office/drawing/2014/main" val="4198655800"/>
+                      <a16:colId xmlns:a16="http://schemas.microsoft.com/office/drawing/2014/main" xmlns="" val="4198655800"/>
                     </a:ext>
                   </a:extLst>
                 </a:gridCol>
                 <a:gridCol w="7295322">
                   <a:extLst>
                     <a:ext uri="{9D8B030D-6E8A-4147-A177-3AD203B41FA5}">
-                      <a16:colId xmlns="" xmlns:a16="http://schemas.microsoft.com/office/drawing/2014/main" val="135413862"/>
+                      <a16:colId xmlns:a16="http://schemas.microsoft.com/office/drawing/2014/main" xmlns="" val="135413862"/>
                     </a:ext>
                   </a:extLst>
                 </a:gridCol>
@@ -42984,7 +43222,7 @@
                 </a:tc>
                 <a:extLst>
                   <a:ext uri="{0D108BD9-81ED-4DB2-BD59-A6C34878D82A}">
-                    <a16:rowId xmlns="" xmlns:a16="http://schemas.microsoft.com/office/drawing/2014/main" val="3068323444"/>
+                    <a16:rowId xmlns:a16="http://schemas.microsoft.com/office/drawing/2014/main" xmlns="" val="3068323444"/>
                   </a:ext>
                 </a:extLst>
               </a:tr>
@@ -43017,7 +43255,7 @@
                 </a:tc>
                 <a:extLst>
                   <a:ext uri="{0D108BD9-81ED-4DB2-BD59-A6C34878D82A}">
-                    <a16:rowId xmlns="" xmlns:a16="http://schemas.microsoft.com/office/drawing/2014/main" val="2484981654"/>
+                    <a16:rowId xmlns:a16="http://schemas.microsoft.com/office/drawing/2014/main" xmlns="" val="2484981654"/>
                   </a:ext>
                 </a:extLst>
               </a:tr>
@@ -43055,7 +43293,7 @@
                 </a:tc>
                 <a:extLst>
                   <a:ext uri="{0D108BD9-81ED-4DB2-BD59-A6C34878D82A}">
-                    <a16:rowId xmlns="" xmlns:a16="http://schemas.microsoft.com/office/drawing/2014/main" val="1377910784"/>
+                    <a16:rowId xmlns:a16="http://schemas.microsoft.com/office/drawing/2014/main" xmlns="" val="1377910784"/>
                   </a:ext>
                 </a:extLst>
               </a:tr>
@@ -43088,7 +43326,7 @@
                 </a:tc>
                 <a:extLst>
                   <a:ext uri="{0D108BD9-81ED-4DB2-BD59-A6C34878D82A}">
-                    <a16:rowId xmlns="" xmlns:a16="http://schemas.microsoft.com/office/drawing/2014/main" val="1387856053"/>
+                    <a16:rowId xmlns:a16="http://schemas.microsoft.com/office/drawing/2014/main" xmlns="" val="1387856053"/>
                   </a:ext>
                 </a:extLst>
               </a:tr>
@@ -43126,7 +43364,7 @@
                 </a:tc>
                 <a:extLst>
                   <a:ext uri="{0D108BD9-81ED-4DB2-BD59-A6C34878D82A}">
-                    <a16:rowId xmlns="" xmlns:a16="http://schemas.microsoft.com/office/drawing/2014/main" val="2599123823"/>
+                    <a16:rowId xmlns:a16="http://schemas.microsoft.com/office/drawing/2014/main" xmlns="" val="2599123823"/>
                   </a:ext>
                 </a:extLst>
               </a:tr>
@@ -43167,7 +43405,7 @@
                 </a:tc>
                 <a:extLst>
                   <a:ext uri="{0D108BD9-81ED-4DB2-BD59-A6C34878D82A}">
-                    <a16:rowId xmlns="" xmlns:a16="http://schemas.microsoft.com/office/drawing/2014/main" val="1232603862"/>
+                    <a16:rowId xmlns:a16="http://schemas.microsoft.com/office/drawing/2014/main" xmlns="" val="1232603862"/>
                   </a:ext>
                 </a:extLst>
               </a:tr>
@@ -43200,7 +43438,7 @@
                 </a:tc>
                 <a:extLst>
                   <a:ext uri="{0D108BD9-81ED-4DB2-BD59-A6C34878D82A}">
-                    <a16:rowId xmlns="" xmlns:a16="http://schemas.microsoft.com/office/drawing/2014/main" val="4145944521"/>
+                    <a16:rowId xmlns:a16="http://schemas.microsoft.com/office/drawing/2014/main" xmlns="" val="4145944521"/>
                   </a:ext>
                 </a:extLst>
               </a:tr>
@@ -43238,7 +43476,7 @@
                 </a:tc>
                 <a:extLst>
                   <a:ext uri="{0D108BD9-81ED-4DB2-BD59-A6C34878D82A}">
-                    <a16:rowId xmlns="" xmlns:a16="http://schemas.microsoft.com/office/drawing/2014/main" val="2954677722"/>
+                    <a16:rowId xmlns:a16="http://schemas.microsoft.com/office/drawing/2014/main" xmlns="" val="2954677722"/>
                   </a:ext>
                 </a:extLst>
               </a:tr>
@@ -43271,7 +43509,7 @@
                 </a:tc>
                 <a:extLst>
                   <a:ext uri="{0D108BD9-81ED-4DB2-BD59-A6C34878D82A}">
-                    <a16:rowId xmlns="" xmlns:a16="http://schemas.microsoft.com/office/drawing/2014/main" val="205903975"/>
+                    <a16:rowId xmlns:a16="http://schemas.microsoft.com/office/drawing/2014/main" xmlns="" val="205903975"/>
                   </a:ext>
                 </a:extLst>
               </a:tr>
@@ -43304,7 +43542,7 @@
                 </a:tc>
                 <a:extLst>
                   <a:ext uri="{0D108BD9-81ED-4DB2-BD59-A6C34878D82A}">
-                    <a16:rowId xmlns="" xmlns:a16="http://schemas.microsoft.com/office/drawing/2014/main" val="2893595017"/>
+                    <a16:rowId xmlns:a16="http://schemas.microsoft.com/office/drawing/2014/main" xmlns="" val="2893595017"/>
                   </a:ext>
                 </a:extLst>
               </a:tr>
@@ -43337,7 +43575,7 @@
                 </a:tc>
                 <a:extLst>
                   <a:ext uri="{0D108BD9-81ED-4DB2-BD59-A6C34878D82A}">
-                    <a16:rowId xmlns="" xmlns:a16="http://schemas.microsoft.com/office/drawing/2014/main" val="2337380595"/>
+                    <a16:rowId xmlns:a16="http://schemas.microsoft.com/office/drawing/2014/main" xmlns="" val="2337380595"/>
                   </a:ext>
                 </a:extLst>
               </a:tr>
@@ -43384,6 +43622,13 @@
   <p:clrMapOvr>
     <a:masterClrMapping/>
   </p:clrMapOvr>
+  <p:timing>
+    <p:tnLst>
+      <p:par>
+        <p:cTn id="1" dur="indefinite" restart="never" nodeType="tmRoot"/>
+      </p:par>
+    </p:tnLst>
+  </p:timing>
 </p:sld>
 </file>
 
@@ -43504,6 +43749,13 @@
   <p:clrMapOvr>
     <a:masterClrMapping/>
   </p:clrMapOvr>
+  <p:timing>
+    <p:tnLst>
+      <p:par>
+        <p:cTn id="1" dur="indefinite" restart="never" nodeType="tmRoot"/>
+      </p:par>
+    </p:tnLst>
+  </p:timing>
 </p:sld>
 </file>
 
@@ -43667,6 +43919,13 @@
   <p:clrMapOvr>
     <a:masterClrMapping/>
   </p:clrMapOvr>
+  <p:timing>
+    <p:tnLst>
+      <p:par>
+        <p:cTn id="1" dur="indefinite" restart="never" nodeType="tmRoot"/>
+      </p:par>
+    </p:tnLst>
+  </p:timing>
 </p:sld>
 </file>
 
@@ -43834,6 +44093,13 @@
   <p:clrMapOvr>
     <a:masterClrMapping/>
   </p:clrMapOvr>
+  <p:timing>
+    <p:tnLst>
+      <p:par>
+        <p:cTn id="1" dur="indefinite" restart="never" nodeType="tmRoot"/>
+      </p:par>
+    </p:tnLst>
+  </p:timing>
 </p:sld>
 </file>
 
@@ -43974,6 +44240,13 @@
   <p:clrMapOvr>
     <a:masterClrMapping/>
   </p:clrMapOvr>
+  <p:timing>
+    <p:tnLst>
+      <p:par>
+        <p:cTn id="1" dur="indefinite" restart="never" nodeType="tmRoot"/>
+      </p:par>
+    </p:tnLst>
+  </p:timing>
 </p:sld>
 </file>
 

</xml_diff>

<commit_message>
Examples for Parsing and Binding; visual changes.
</commit_message>
<xml_diff>
--- a/Optimizer.pptx
+++ b/Optimizer.pptx
@@ -272,7 +272,7 @@
           <a:p>
             <a:fld id="{2EDCB34D-5EC2-4739-9693-E425457AC201}" type="datetimeFigureOut">
               <a:rPr lang="en-US" smtClean="0"/>
-              <a:t>09/26/2016</a:t>
+              <a:t>09/27/2016</a:t>
             </a:fld>
             <a:endParaRPr lang="en-US"/>
           </a:p>
@@ -3112,7 +3112,7 @@
             <a:fld id="{5942B21B-2ADA-A040-A652-A7305E1B99FE}" type="datetimeFigureOut">
               <a:rPr lang="en-US" smtClean="0"/>
               <a:pPr/>
-              <a:t>09/26/2016</a:t>
+              <a:t>09/27/2016</a:t>
             </a:fld>
             <a:endParaRPr lang="en-US" dirty="0"/>
           </a:p>
@@ -3302,7 +3302,7 @@
           <a:p>
             <a:fld id="{5942B21B-2ADA-A040-A652-A7305E1B99FE}" type="datetimeFigureOut">
               <a:rPr lang="en-US" smtClean="0"/>
-              <a:t>09/26/2016</a:t>
+              <a:t>09/27/2016</a:t>
             </a:fld>
             <a:endParaRPr lang="en-US"/>
           </a:p>
@@ -3426,7 +3426,7 @@
             <a:fld id="{5942B21B-2ADA-A040-A652-A7305E1B99FE}" type="datetimeFigureOut">
               <a:rPr lang="en-US" smtClean="0"/>
               <a:pPr/>
-              <a:t>09/26/2016</a:t>
+              <a:t>09/27/2016</a:t>
             </a:fld>
             <a:r>
               <a:rPr lang="en-US"/>
@@ -3697,7 +3697,7 @@
             <a:fld id="{5942B21B-2ADA-A040-A652-A7305E1B99FE}" type="datetimeFigureOut">
               <a:rPr lang="en-US" smtClean="0"/>
               <a:pPr/>
-              <a:t>09/26/2016</a:t>
+              <a:t>09/27/2016</a:t>
             </a:fld>
             <a:r>
               <a:rPr lang="en-US" dirty="0"/>
@@ -3967,7 +3967,7 @@
             <a:fld id="{5942B21B-2ADA-A040-A652-A7305E1B99FE}" type="datetimeFigureOut">
               <a:rPr lang="en-US" smtClean="0"/>
               <a:pPr/>
-              <a:t>09/26/2016</a:t>
+              <a:t>09/27/2016</a:t>
             </a:fld>
             <a:r>
               <a:rPr lang="en-US" dirty="0"/>
@@ -4307,7 +4307,7 @@
             <a:fld id="{5942B21B-2ADA-A040-A652-A7305E1B99FE}" type="datetimeFigureOut">
               <a:rPr lang="en-US" smtClean="0"/>
               <a:pPr/>
-              <a:t>09/26/2016</a:t>
+              <a:t>09/27/2016</a:t>
             </a:fld>
             <a:r>
               <a:rPr lang="en-US" dirty="0"/>
@@ -4648,7 +4648,7 @@
             <a:fld id="{5942B21B-2ADA-A040-A652-A7305E1B99FE}" type="datetimeFigureOut">
               <a:rPr lang="en-US" smtClean="0"/>
               <a:pPr/>
-              <a:t>09/26/2016</a:t>
+              <a:t>09/27/2016</a:t>
             </a:fld>
             <a:r>
               <a:rPr lang="en-US" dirty="0"/>
@@ -5163,7 +5163,7 @@
             <a:fld id="{5942B21B-2ADA-A040-A652-A7305E1B99FE}" type="datetimeFigureOut">
               <a:rPr lang="en-US" smtClean="0"/>
               <a:pPr/>
-              <a:t>09/26/2016</a:t>
+              <a:t>09/27/2016</a:t>
             </a:fld>
             <a:r>
               <a:rPr lang="en-US" dirty="0"/>
@@ -5372,7 +5372,7 @@
             <a:fld id="{5942B21B-2ADA-A040-A652-A7305E1B99FE}" type="datetimeFigureOut">
               <a:rPr lang="en-US" smtClean="0"/>
               <a:pPr/>
-              <a:t>09/26/2016</a:t>
+              <a:t>09/27/2016</a:t>
             </a:fld>
             <a:r>
               <a:rPr lang="en-US" dirty="0"/>
@@ -5559,7 +5559,7 @@
             <a:fld id="{5942B21B-2ADA-A040-A652-A7305E1B99FE}" type="datetimeFigureOut">
               <a:rPr lang="en-US" smtClean="0"/>
               <a:pPr/>
-              <a:t>09/26/2016</a:t>
+              <a:t>09/27/2016</a:t>
             </a:fld>
             <a:r>
               <a:rPr lang="en-US" dirty="0"/>
@@ -5890,7 +5890,7 @@
             <a:fld id="{5942B21B-2ADA-A040-A652-A7305E1B99FE}" type="datetimeFigureOut">
               <a:rPr lang="en-US" smtClean="0"/>
               <a:pPr/>
-              <a:t>09/26/2016</a:t>
+              <a:t>09/27/2016</a:t>
             </a:fld>
             <a:r>
               <a:rPr lang="en-US" dirty="0"/>
@@ -6198,7 +6198,7 @@
             <a:fld id="{5942B21B-2ADA-A040-A652-A7305E1B99FE}" type="datetimeFigureOut">
               <a:rPr lang="en-US" smtClean="0"/>
               <a:pPr/>
-              <a:t>09/26/2016</a:t>
+              <a:t>09/27/2016</a:t>
             </a:fld>
             <a:r>
               <a:rPr lang="en-US" dirty="0"/>
@@ -6477,7 +6477,7 @@
             <a:fld id="{5942B21B-2ADA-A040-A652-A7305E1B99FE}" type="datetimeFigureOut">
               <a:rPr lang="en-US" smtClean="0"/>
               <a:pPr/>
-              <a:t>09/26/2016</a:t>
+              <a:t>09/27/2016</a:t>
             </a:fld>
             <a:r>
               <a:rPr lang="en-US" dirty="0"/>
@@ -8681,21 +8681,21 @@
                 <a:gridCol w="2764301">
                   <a:extLst>
                     <a:ext uri="{9D8B030D-6E8A-4147-A177-3AD203B41FA5}">
-                      <a16:colId xmlns:a16="http://schemas.microsoft.com/office/drawing/2014/main" xmlns="" val="234227049"/>
+                      <a16:colId xmlns="" xmlns:a16="http://schemas.microsoft.com/office/drawing/2014/main" val="234227049"/>
                     </a:ext>
                   </a:extLst>
                 </a:gridCol>
                 <a:gridCol w="2764301">
                   <a:extLst>
                     <a:ext uri="{9D8B030D-6E8A-4147-A177-3AD203B41FA5}">
-                      <a16:colId xmlns:a16="http://schemas.microsoft.com/office/drawing/2014/main" xmlns="" val="4053135350"/>
+                      <a16:colId xmlns="" xmlns:a16="http://schemas.microsoft.com/office/drawing/2014/main" val="4053135350"/>
                     </a:ext>
                   </a:extLst>
                 </a:gridCol>
                 <a:gridCol w="2764301">
                   <a:extLst>
                     <a:ext uri="{9D8B030D-6E8A-4147-A177-3AD203B41FA5}">
-                      <a16:colId xmlns:a16="http://schemas.microsoft.com/office/drawing/2014/main" xmlns="" val="672378647"/>
+                      <a16:colId xmlns="" xmlns:a16="http://schemas.microsoft.com/office/drawing/2014/main" val="672378647"/>
                     </a:ext>
                   </a:extLst>
                 </a:gridCol>
@@ -8745,7 +8745,7 @@
                 </a:tc>
                 <a:extLst>
                   <a:ext uri="{0D108BD9-81ED-4DB2-BD59-A6C34878D82A}">
-                    <a16:rowId xmlns:a16="http://schemas.microsoft.com/office/drawing/2014/main" xmlns="" val="2843053056"/>
+                    <a16:rowId xmlns="" xmlns:a16="http://schemas.microsoft.com/office/drawing/2014/main" val="2843053056"/>
                   </a:ext>
                 </a:extLst>
               </a:tr>
@@ -8795,7 +8795,7 @@
                 </a:tc>
                 <a:extLst>
                   <a:ext uri="{0D108BD9-81ED-4DB2-BD59-A6C34878D82A}">
-                    <a16:rowId xmlns:a16="http://schemas.microsoft.com/office/drawing/2014/main" xmlns="" val="3055328934"/>
+                    <a16:rowId xmlns="" xmlns:a16="http://schemas.microsoft.com/office/drawing/2014/main" val="3055328934"/>
                   </a:ext>
                 </a:extLst>
               </a:tr>
@@ -8845,7 +8845,7 @@
                 </a:tc>
                 <a:extLst>
                   <a:ext uri="{0D108BD9-81ED-4DB2-BD59-A6C34878D82A}">
-                    <a16:rowId xmlns:a16="http://schemas.microsoft.com/office/drawing/2014/main" xmlns="" val="1144851549"/>
+                    <a16:rowId xmlns="" xmlns:a16="http://schemas.microsoft.com/office/drawing/2014/main" val="1144851549"/>
                   </a:ext>
                 </a:extLst>
               </a:tr>
@@ -8894,7 +8894,7 @@
                 </a:tc>
                 <a:extLst>
                   <a:ext uri="{0D108BD9-81ED-4DB2-BD59-A6C34878D82A}">
-                    <a16:rowId xmlns:a16="http://schemas.microsoft.com/office/drawing/2014/main" xmlns="" val="4258932578"/>
+                    <a16:rowId xmlns="" xmlns:a16="http://schemas.microsoft.com/office/drawing/2014/main" val="4258932578"/>
                   </a:ext>
                 </a:extLst>
               </a:tr>
@@ -10266,11 +10266,11 @@
   <p:clrMapOvr>
     <a:masterClrMapping/>
   </p:clrMapOvr>
-  <mc:AlternateContent xmlns:mc="http://schemas.openxmlformats.org/markup-compatibility/2006">
-    <mc:Choice xmlns:p14="http://schemas.microsoft.com/office/powerpoint/2010/main" Requires="p14">
+  <mc:AlternateContent xmlns:mc="http://schemas.openxmlformats.org/markup-compatibility/2006" xmlns:p14="http://schemas.microsoft.com/office/powerpoint/2010/main">
+    <mc:Choice Requires="p14">
       <p:transition spd="slow" p14:dur="2000"/>
     </mc:Choice>
-    <mc:Fallback>
+    <mc:Fallback xmlns="">
       <p:transition spd="slow"/>
     </mc:Fallback>
   </mc:AlternateContent>
@@ -11512,11 +11512,11 @@
   <p:clrMapOvr>
     <a:masterClrMapping/>
   </p:clrMapOvr>
-  <mc:AlternateContent xmlns:mc="http://schemas.openxmlformats.org/markup-compatibility/2006">
-    <mc:Choice xmlns:p14="http://schemas.microsoft.com/office/powerpoint/2010/main" Requires="p14">
+  <mc:AlternateContent xmlns:mc="http://schemas.openxmlformats.org/markup-compatibility/2006" xmlns:p14="http://schemas.microsoft.com/office/powerpoint/2010/main">
+    <mc:Choice Requires="p14">
       <p:transition spd="slow" p14:dur="2000"/>
     </mc:Choice>
-    <mc:Fallback>
+    <mc:Fallback xmlns="">
       <p:transition spd="slow"/>
     </mc:Fallback>
   </mc:AlternateContent>
@@ -12742,11 +12742,11 @@
   <p:clrMapOvr>
     <a:masterClrMapping/>
   </p:clrMapOvr>
-  <mc:AlternateContent xmlns:mc="http://schemas.openxmlformats.org/markup-compatibility/2006">
-    <mc:Choice xmlns:p14="http://schemas.microsoft.com/office/powerpoint/2010/main" Requires="p14">
+  <mc:AlternateContent xmlns:mc="http://schemas.openxmlformats.org/markup-compatibility/2006" xmlns:p14="http://schemas.microsoft.com/office/powerpoint/2010/main">
+    <mc:Choice Requires="p14">
       <p:transition spd="slow" p14:dur="2000"/>
     </mc:Choice>
-    <mc:Fallback>
+    <mc:Fallback xmlns="">
       <p:transition spd="slow"/>
     </mc:Fallback>
   </mc:AlternateContent>
@@ -13972,11 +13972,11 @@
   <p:clrMapOvr>
     <a:masterClrMapping/>
   </p:clrMapOvr>
-  <mc:AlternateContent xmlns:mc="http://schemas.openxmlformats.org/markup-compatibility/2006">
-    <mc:Choice xmlns:p14="http://schemas.microsoft.com/office/powerpoint/2010/main" Requires="p14">
+  <mc:AlternateContent xmlns:mc="http://schemas.openxmlformats.org/markup-compatibility/2006" xmlns:p14="http://schemas.microsoft.com/office/powerpoint/2010/main">
+    <mc:Choice Requires="p14">
       <p:transition spd="slow" p14:dur="2000"/>
     </mc:Choice>
-    <mc:Fallback>
+    <mc:Fallback xmlns="">
       <p:transition spd="slow"/>
     </mc:Fallback>
   </mc:AlternateContent>
@@ -15213,11 +15213,11 @@
   <p:clrMapOvr>
     <a:masterClrMapping/>
   </p:clrMapOvr>
-  <mc:AlternateContent xmlns:mc="http://schemas.openxmlformats.org/markup-compatibility/2006">
-    <mc:Choice xmlns:p14="http://schemas.microsoft.com/office/powerpoint/2010/main" Requires="p14">
+  <mc:AlternateContent xmlns:mc="http://schemas.openxmlformats.org/markup-compatibility/2006" xmlns:p14="http://schemas.microsoft.com/office/powerpoint/2010/main">
+    <mc:Choice Requires="p14">
       <p:transition spd="slow" p14:dur="2000"/>
     </mc:Choice>
-    <mc:Fallback>
+    <mc:Fallback xmlns="">
       <p:transition spd="slow"/>
     </mc:Fallback>
   </mc:AlternateContent>
@@ -16477,11 +16477,11 @@
   <p:clrMapOvr>
     <a:masterClrMapping/>
   </p:clrMapOvr>
-  <mc:AlternateContent xmlns:mc="http://schemas.openxmlformats.org/markup-compatibility/2006">
-    <mc:Choice xmlns:p14="http://schemas.microsoft.com/office/powerpoint/2010/main" Requires="p14">
+  <mc:AlternateContent xmlns:mc="http://schemas.openxmlformats.org/markup-compatibility/2006" xmlns:p14="http://schemas.microsoft.com/office/powerpoint/2010/main">
+    <mc:Choice Requires="p14">
       <p:transition spd="slow" p14:dur="2000"/>
     </mc:Choice>
-    <mc:Fallback>
+    <mc:Fallback xmlns="">
       <p:transition spd="slow"/>
     </mc:Fallback>
   </mc:AlternateContent>
@@ -17667,11 +17667,11 @@
   <p:clrMapOvr>
     <a:masterClrMapping/>
   </p:clrMapOvr>
-  <mc:AlternateContent xmlns:mc="http://schemas.openxmlformats.org/markup-compatibility/2006">
-    <mc:Choice xmlns:p14="http://schemas.microsoft.com/office/powerpoint/2010/main" Requires="p14">
+  <mc:AlternateContent xmlns:mc="http://schemas.openxmlformats.org/markup-compatibility/2006" xmlns:p14="http://schemas.microsoft.com/office/powerpoint/2010/main">
+    <mc:Choice Requires="p14">
       <p:transition spd="slow" p14:dur="2000"/>
     </mc:Choice>
-    <mc:Fallback>
+    <mc:Fallback xmlns="">
       <p:transition spd="slow"/>
     </mc:Fallback>
   </mc:AlternateContent>
@@ -19920,11 +19920,11 @@
   <p:clrMapOvr>
     <a:masterClrMapping/>
   </p:clrMapOvr>
-  <mc:AlternateContent xmlns:mc="http://schemas.openxmlformats.org/markup-compatibility/2006">
-    <mc:Choice xmlns:p14="http://schemas.microsoft.com/office/powerpoint/2010/main" Requires="p14">
+  <mc:AlternateContent xmlns:mc="http://schemas.openxmlformats.org/markup-compatibility/2006" xmlns:p14="http://schemas.microsoft.com/office/powerpoint/2010/main">
+    <mc:Choice Requires="p14">
       <p:transition spd="slow" p14:dur="2000"/>
     </mc:Choice>
-    <mc:Fallback>
+    <mc:Fallback xmlns="">
       <p:transition spd="slow"/>
     </mc:Fallback>
   </mc:AlternateContent>
@@ -21139,11 +21139,11 @@
   <p:clrMapOvr>
     <a:masterClrMapping/>
   </p:clrMapOvr>
-  <mc:AlternateContent xmlns:mc="http://schemas.openxmlformats.org/markup-compatibility/2006">
-    <mc:Choice xmlns:p14="http://schemas.microsoft.com/office/powerpoint/2010/main" Requires="p14">
+  <mc:AlternateContent xmlns:mc="http://schemas.openxmlformats.org/markup-compatibility/2006" xmlns:p14="http://schemas.microsoft.com/office/powerpoint/2010/main">
+    <mc:Choice Requires="p14">
       <p:transition spd="slow" p14:dur="2000"/>
     </mc:Choice>
-    <mc:Fallback>
+    <mc:Fallback xmlns="">
       <p:transition spd="slow"/>
     </mc:Fallback>
   </mc:AlternateContent>
@@ -22411,11 +22411,11 @@
   <p:clrMapOvr>
     <a:masterClrMapping/>
   </p:clrMapOvr>
-  <mc:AlternateContent xmlns:mc="http://schemas.openxmlformats.org/markup-compatibility/2006">
-    <mc:Choice xmlns:p14="http://schemas.microsoft.com/office/powerpoint/2010/main" Requires="p14">
+  <mc:AlternateContent xmlns:mc="http://schemas.openxmlformats.org/markup-compatibility/2006" xmlns:p14="http://schemas.microsoft.com/office/powerpoint/2010/main">
+    <mc:Choice Requires="p14">
       <p:transition spd="slow" p14:dur="2000"/>
     </mc:Choice>
-    <mc:Fallback>
+    <mc:Fallback xmlns="">
       <p:transition spd="slow"/>
     </mc:Fallback>
   </mc:AlternateContent>
@@ -28310,7 +28310,7 @@
         <p:spPr>
           <a:xfrm>
             <a:off x="457200" y="1350947"/>
-            <a:ext cx="8229600" cy="1104900"/>
+            <a:ext cx="8229600" cy="573103"/>
           </a:xfrm>
         </p:spPr>
         <p:txBody>
@@ -28319,20 +28319,14 @@
           </a:bodyPr>
           <a:lstStyle/>
           <a:p>
-            <a:r>
-              <a:rPr lang="en-US" dirty="0" err="1"/>
-              <a:t>Algebrizer</a:t>
+            <a:pPr lvl="1"/>
+            <a:r>
+              <a:rPr lang="en-US" dirty="0" smtClean="0"/>
+              <a:t>Expand </a:t>
             </a:r>
             <a:r>
               <a:rPr lang="en-US" dirty="0"/>
-              <a:t> (the “normalizer” in SQL 2000)</a:t>
-            </a:r>
-          </a:p>
-          <a:p>
-            <a:pPr lvl="1"/>
-            <a:r>
-              <a:rPr lang="en-US" dirty="0"/>
-              <a:t>Expand views</a:t>
+              <a:t>views</a:t>
             </a:r>
           </a:p>
         </p:txBody>
@@ -28347,7 +28341,7 @@
         </p:nvSpPr>
         <p:spPr>
           <a:xfrm>
-            <a:off x="457200" y="2389142"/>
+            <a:off x="457200" y="2084342"/>
             <a:ext cx="8229600" cy="1123950"/>
           </a:xfrm>
           <a:prstGeom prst="rect">
@@ -29121,7 +29115,7 @@
         </p:nvSpPr>
         <p:spPr>
           <a:xfrm>
-            <a:off x="457200" y="3829051"/>
+            <a:off x="457200" y="3524251"/>
             <a:ext cx="8229600" cy="2352674"/>
           </a:xfrm>
           <a:prstGeom prst="rect">
@@ -30297,9 +30291,6 @@
                     <p:cTn id="3" fill="hold">
                       <p:stCondLst>
                         <p:cond delay="indefinite"/>
-                        <p:cond evt="onBegin" delay="0">
-                          <p:tn val="2"/>
-                        </p:cond>
                       </p:stCondLst>
                       <p:childTnLst>
                         <p:par>
@@ -30309,7 +30300,7 @@
                             </p:stCondLst>
                             <p:childTnLst>
                               <p:par>
-                                <p:cTn id="5" presetID="1" presetClass="entr" presetSubtype="0" fill="hold" grpId="0" nodeType="withEffect">
+                                <p:cTn id="5" presetID="1" presetClass="entr" presetSubtype="0" fill="hold" grpId="0" nodeType="clickEffect">
                                   <p:stCondLst>
                                     <p:cond delay="0"/>
                                   </p:stCondLst>
@@ -30322,11 +30313,7 @@
                                           </p:stCondLst>
                                         </p:cTn>
                                         <p:tgtEl>
-                                          <p:spTgt spid="3">
-                                            <p:txEl>
-                                              <p:pRg st="0" end="0"/>
-                                            </p:txEl>
-                                          </p:spTgt>
+                                          <p:spTgt spid="6"/>
                                         </p:tgtEl>
                                         <p:attrNameLst>
                                           <p:attrName>style.visibility</p:attrName>
@@ -30366,51 +30353,6 @@
                                     <p:set>
                                       <p:cBhvr>
                                         <p:cTn id="10" dur="1" fill="hold">
-                                          <p:stCondLst>
-                                            <p:cond delay="0"/>
-                                          </p:stCondLst>
-                                        </p:cTn>
-                                        <p:tgtEl>
-                                          <p:spTgt spid="6"/>
-                                        </p:tgtEl>
-                                        <p:attrNameLst>
-                                          <p:attrName>style.visibility</p:attrName>
-                                        </p:attrNameLst>
-                                      </p:cBhvr>
-                                      <p:to>
-                                        <p:strVal val="visible"/>
-                                      </p:to>
-                                    </p:set>
-                                  </p:childTnLst>
-                                </p:cTn>
-                              </p:par>
-                            </p:childTnLst>
-                          </p:cTn>
-                        </p:par>
-                      </p:childTnLst>
-                    </p:cTn>
-                  </p:par>
-                  <p:par>
-                    <p:cTn id="11" fill="hold">
-                      <p:stCondLst>
-                        <p:cond delay="indefinite"/>
-                      </p:stCondLst>
-                      <p:childTnLst>
-                        <p:par>
-                          <p:cTn id="12" fill="hold">
-                            <p:stCondLst>
-                              <p:cond delay="0"/>
-                            </p:stCondLst>
-                            <p:childTnLst>
-                              <p:par>
-                                <p:cTn id="13" presetID="1" presetClass="entr" presetSubtype="0" fill="hold" grpId="0" nodeType="clickEffect">
-                                  <p:stCondLst>
-                                    <p:cond delay="0"/>
-                                  </p:stCondLst>
-                                  <p:childTnLst>
-                                    <p:set>
-                                      <p:cBhvr>
-                                        <p:cTn id="14" dur="1" fill="hold">
                                           <p:stCondLst>
                                             <p:cond delay="0"/>
                                           </p:stCondLst>
@@ -30457,7 +30399,6 @@
       </p:par>
     </p:tnLst>
     <p:bldLst>
-      <p:bldP spid="3" grpId="0" uiExpand="1" build="p"/>
       <p:bldP spid="6" grpId="0"/>
       <p:bldP spid="7" grpId="0"/>
     </p:bldLst>
@@ -30521,21 +30462,12 @@
           </a:bodyPr>
           <a:lstStyle/>
           <a:p>
-            <a:r>
-              <a:rPr lang="en-US" dirty="0" err="1"/>
-              <a:t>Algebrizer</a:t>
-            </a:r>
-            <a:r>
-              <a:rPr lang="en-US" dirty="0"/>
-              <a:t> (the “normalizer” in SQL 2000)</a:t>
-            </a:r>
-          </a:p>
-          <a:p>
             <a:pPr lvl="1"/>
             <a:r>
-              <a:rPr lang="en-US" dirty="0"/>
+              <a:rPr lang="en-US" dirty="0" smtClean="0"/>
               <a:t>Binding</a:t>
             </a:r>
+            <a:endParaRPr lang="en-US" dirty="0"/>
           </a:p>
           <a:p>
             <a:pPr lvl="2"/>
@@ -30547,23 +30479,502 @@
           <a:p>
             <a:pPr lvl="2"/>
             <a:r>
+              <a:rPr lang="en-US" dirty="0" smtClean="0"/>
+              <a:t>Data </a:t>
+            </a:r>
+            <a:r>
               <a:rPr lang="en-US" dirty="0"/>
-              <a:t>Constant folding</a:t>
-            </a:r>
+              <a:t>type resolution (i.e., UNION</a:t>
+            </a:r>
+            <a:r>
+              <a:rPr lang="en-US" dirty="0" smtClean="0"/>
+              <a:t>)</a:t>
+            </a:r>
+          </a:p>
+          <a:p>
+            <a:pPr marL="1371600" lvl="3" indent="0">
+              <a:buNone/>
+            </a:pPr>
+            <a:r>
+              <a:rPr lang="en-US" dirty="0" smtClean="0">
+                <a:solidFill>
+                  <a:srgbClr val="0000FF"/>
+                </a:solidFill>
+                <a:highlight>
+                  <a:srgbClr val="FFFFFF"/>
+                </a:highlight>
+                <a:latin typeface="Consolas" panose="020B0609020204030204" pitchFamily="49" charset="0"/>
+              </a:rPr>
+              <a:t>select</a:t>
+            </a:r>
+            <a:r>
+              <a:rPr lang="en-US" dirty="0" smtClean="0">
+                <a:solidFill>
+                  <a:srgbClr val="000000"/>
+                </a:solidFill>
+                <a:highlight>
+                  <a:srgbClr val="FFFFFF"/>
+                </a:highlight>
+                <a:latin typeface="Consolas" panose="020B0609020204030204" pitchFamily="49" charset="0"/>
+              </a:rPr>
+              <a:t> </a:t>
+            </a:r>
+            <a:r>
+              <a:rPr lang="en-US" dirty="0">
+                <a:solidFill>
+                  <a:srgbClr val="000000"/>
+                </a:solidFill>
+                <a:highlight>
+                  <a:srgbClr val="FFFFFF"/>
+                </a:highlight>
+                <a:latin typeface="Consolas" panose="020B0609020204030204" pitchFamily="49" charset="0"/>
+              </a:rPr>
+              <a:t>1 </a:t>
+            </a:r>
+            <a:r>
+              <a:rPr lang="en-US" dirty="0">
+                <a:solidFill>
+                  <a:srgbClr val="0000FF"/>
+                </a:solidFill>
+                <a:highlight>
+                  <a:srgbClr val="FFFFFF"/>
+                </a:highlight>
+                <a:latin typeface="Consolas" panose="020B0609020204030204" pitchFamily="49" charset="0"/>
+              </a:rPr>
+              <a:t>union</a:t>
+            </a:r>
+            <a:r>
+              <a:rPr lang="en-US" dirty="0">
+                <a:solidFill>
+                  <a:srgbClr val="000000"/>
+                </a:solidFill>
+                <a:highlight>
+                  <a:srgbClr val="FFFFFF"/>
+                </a:highlight>
+                <a:latin typeface="Consolas" panose="020B0609020204030204" pitchFamily="49" charset="0"/>
+              </a:rPr>
+              <a:t> </a:t>
+            </a:r>
+            <a:r>
+              <a:rPr lang="en-US" dirty="0">
+                <a:solidFill>
+                  <a:srgbClr val="808080"/>
+                </a:solidFill>
+                <a:highlight>
+                  <a:srgbClr val="FFFFFF"/>
+                </a:highlight>
+                <a:latin typeface="Consolas" panose="020B0609020204030204" pitchFamily="49" charset="0"/>
+              </a:rPr>
+              <a:t>all</a:t>
+            </a:r>
+            <a:r>
+              <a:rPr lang="en-US" dirty="0">
+                <a:solidFill>
+                  <a:srgbClr val="000000"/>
+                </a:solidFill>
+                <a:highlight>
+                  <a:srgbClr val="FFFFFF"/>
+                </a:highlight>
+                <a:latin typeface="Consolas" panose="020B0609020204030204" pitchFamily="49" charset="0"/>
+              </a:rPr>
+              <a:t> </a:t>
+            </a:r>
+            <a:r>
+              <a:rPr lang="en-US" dirty="0">
+                <a:solidFill>
+                  <a:srgbClr val="0000FF"/>
+                </a:solidFill>
+                <a:highlight>
+                  <a:srgbClr val="FFFFFF"/>
+                </a:highlight>
+                <a:latin typeface="Consolas" panose="020B0609020204030204" pitchFamily="49" charset="0"/>
+              </a:rPr>
+              <a:t>select</a:t>
+            </a:r>
+            <a:r>
+              <a:rPr lang="en-US" dirty="0">
+                <a:solidFill>
+                  <a:srgbClr val="000000"/>
+                </a:solidFill>
+                <a:highlight>
+                  <a:srgbClr val="FFFFFF"/>
+                </a:highlight>
+                <a:latin typeface="Consolas" panose="020B0609020204030204" pitchFamily="49" charset="0"/>
+              </a:rPr>
+              <a:t> </a:t>
+            </a:r>
+            <a:r>
+              <a:rPr lang="en-US" dirty="0">
+                <a:solidFill>
+                  <a:srgbClr val="FF0000"/>
+                </a:solidFill>
+                <a:highlight>
+                  <a:srgbClr val="FFFFFF"/>
+                </a:highlight>
+                <a:latin typeface="Consolas" panose="020B0609020204030204" pitchFamily="49" charset="0"/>
+              </a:rPr>
+              <a:t>'Some text</a:t>
+            </a:r>
+            <a:r>
+              <a:rPr lang="en-US" dirty="0" smtClean="0">
+                <a:solidFill>
+                  <a:srgbClr val="FF0000"/>
+                </a:solidFill>
+                <a:highlight>
+                  <a:srgbClr val="FFFFFF"/>
+                </a:highlight>
+                <a:latin typeface="Consolas" panose="020B0609020204030204" pitchFamily="49" charset="0"/>
+              </a:rPr>
+              <a:t>'</a:t>
+            </a:r>
+            <a:r>
+              <a:rPr lang="en-US" dirty="0" smtClean="0">
+                <a:solidFill>
+                  <a:srgbClr val="808080"/>
+                </a:solidFill>
+                <a:highlight>
+                  <a:srgbClr val="FFFFFF"/>
+                </a:highlight>
+                <a:latin typeface="Consolas" panose="020B0609020204030204" pitchFamily="49" charset="0"/>
+              </a:rPr>
+              <a:t>;</a:t>
+            </a:r>
+          </a:p>
+          <a:p>
+            <a:pPr marL="1714500" lvl="4" indent="0">
+              <a:buNone/>
+            </a:pPr>
+            <a:r>
+              <a:rPr lang="en-US" sz="2000" dirty="0" smtClean="0">
+                <a:solidFill>
+                  <a:srgbClr val="FF0000"/>
+                </a:solidFill>
+                <a:highlight>
+                  <a:srgbClr val="FFFFFF"/>
+                </a:highlight>
+                <a:latin typeface="Consolas" panose="020B0609020204030204" pitchFamily="49" charset="0"/>
+              </a:rPr>
+              <a:t>Conversion failed when converting the varchar value 'Some text' to data type int.</a:t>
+            </a:r>
+            <a:endParaRPr lang="en-US" sz="2000" dirty="0">
+              <a:solidFill>
+                <a:srgbClr val="FF0000"/>
+              </a:solidFill>
+            </a:endParaRPr>
           </a:p>
           <a:p>
             <a:pPr lvl="2"/>
             <a:r>
               <a:rPr lang="en-US" dirty="0"/>
-              <a:t>Data type resolution (i.e., UNION)</a:t>
-            </a:r>
-          </a:p>
-          <a:p>
-            <a:pPr lvl="2"/>
-            <a:r>
-              <a:rPr lang="en-US" dirty="0"/>
-              <a:t>Aggregate binding</a:t>
-            </a:r>
+              <a:t>Aggregate </a:t>
+            </a:r>
+            <a:r>
+              <a:rPr lang="en-US" dirty="0" smtClean="0"/>
+              <a:t>binding</a:t>
+            </a:r>
+          </a:p>
+          <a:p>
+            <a:pPr marL="1371600" lvl="3" indent="0">
+              <a:buNone/>
+            </a:pPr>
+            <a:r>
+              <a:rPr lang="en-US" dirty="0">
+                <a:solidFill>
+                  <a:srgbClr val="0000FF"/>
+                </a:solidFill>
+                <a:highlight>
+                  <a:srgbClr val="FFFFFF"/>
+                </a:highlight>
+                <a:latin typeface="Consolas" panose="020B0609020204030204" pitchFamily="49" charset="0"/>
+              </a:rPr>
+              <a:t>select</a:t>
+            </a:r>
+            <a:r>
+              <a:rPr lang="en-US" dirty="0">
+                <a:solidFill>
+                  <a:srgbClr val="000000"/>
+                </a:solidFill>
+                <a:highlight>
+                  <a:srgbClr val="FFFFFF"/>
+                </a:highlight>
+                <a:latin typeface="Consolas" panose="020B0609020204030204" pitchFamily="49" charset="0"/>
+              </a:rPr>
+              <a:t> </a:t>
+            </a:r>
+            <a:r>
+              <a:rPr lang="en-US" dirty="0" err="1">
+                <a:solidFill>
+                  <a:srgbClr val="000000"/>
+                </a:solidFill>
+                <a:highlight>
+                  <a:srgbClr val="FFFFFF"/>
+                </a:highlight>
+                <a:latin typeface="Consolas" panose="020B0609020204030204" pitchFamily="49" charset="0"/>
+              </a:rPr>
+              <a:t>LastName</a:t>
+            </a:r>
+            <a:r>
+              <a:rPr lang="en-US" dirty="0">
+                <a:solidFill>
+                  <a:srgbClr val="808080"/>
+                </a:solidFill>
+                <a:highlight>
+                  <a:srgbClr val="FFFFFF"/>
+                </a:highlight>
+                <a:latin typeface="Consolas" panose="020B0609020204030204" pitchFamily="49" charset="0"/>
+              </a:rPr>
+              <a:t>,</a:t>
+            </a:r>
+            <a:r>
+              <a:rPr lang="en-US" dirty="0">
+                <a:solidFill>
+                  <a:srgbClr val="000000"/>
+                </a:solidFill>
+                <a:highlight>
+                  <a:srgbClr val="FFFFFF"/>
+                </a:highlight>
+                <a:latin typeface="Consolas" panose="020B0609020204030204" pitchFamily="49" charset="0"/>
+              </a:rPr>
+              <a:t> </a:t>
+            </a:r>
+            <a:r>
+              <a:rPr lang="en-US" dirty="0" err="1">
+                <a:solidFill>
+                  <a:srgbClr val="000000"/>
+                </a:solidFill>
+                <a:highlight>
+                  <a:srgbClr val="FFFFFF"/>
+                </a:highlight>
+                <a:latin typeface="Consolas" panose="020B0609020204030204" pitchFamily="49" charset="0"/>
+              </a:rPr>
+              <a:t>CustomerID</a:t>
+            </a:r>
+            <a:r>
+              <a:rPr lang="en-US" dirty="0">
+                <a:solidFill>
+                  <a:srgbClr val="808080"/>
+                </a:solidFill>
+                <a:highlight>
+                  <a:srgbClr val="FFFFFF"/>
+                </a:highlight>
+                <a:latin typeface="Consolas" panose="020B0609020204030204" pitchFamily="49" charset="0"/>
+              </a:rPr>
+              <a:t>,</a:t>
+            </a:r>
+            <a:r>
+              <a:rPr lang="en-US" dirty="0">
+                <a:solidFill>
+                  <a:srgbClr val="000000"/>
+                </a:solidFill>
+                <a:highlight>
+                  <a:srgbClr val="FFFFFF"/>
+                </a:highlight>
+                <a:latin typeface="Consolas" panose="020B0609020204030204" pitchFamily="49" charset="0"/>
+              </a:rPr>
+              <a:t> </a:t>
+            </a:r>
+            <a:r>
+              <a:rPr lang="en-US" dirty="0">
+                <a:solidFill>
+                  <a:srgbClr val="FF00FF"/>
+                </a:solidFill>
+                <a:highlight>
+                  <a:srgbClr val="FFFFFF"/>
+                </a:highlight>
+                <a:latin typeface="Consolas" panose="020B0609020204030204" pitchFamily="49" charset="0"/>
+              </a:rPr>
+              <a:t>count</a:t>
+            </a:r>
+            <a:r>
+              <a:rPr lang="en-US" dirty="0">
+                <a:solidFill>
+                  <a:srgbClr val="808080"/>
+                </a:solidFill>
+                <a:highlight>
+                  <a:srgbClr val="FFFFFF"/>
+                </a:highlight>
+                <a:latin typeface="Consolas" panose="020B0609020204030204" pitchFamily="49" charset="0"/>
+              </a:rPr>
+              <a:t>(*)</a:t>
+            </a:r>
+            <a:r>
+              <a:rPr lang="en-US" dirty="0">
+                <a:solidFill>
+                  <a:srgbClr val="000000"/>
+                </a:solidFill>
+                <a:highlight>
+                  <a:srgbClr val="FFFFFF"/>
+                </a:highlight>
+                <a:latin typeface="Consolas" panose="020B0609020204030204" pitchFamily="49" charset="0"/>
+              </a:rPr>
+              <a:t> </a:t>
+            </a:r>
+            <a:r>
+              <a:rPr lang="en-US" dirty="0" err="1">
+                <a:solidFill>
+                  <a:srgbClr val="000000"/>
+                </a:solidFill>
+                <a:highlight>
+                  <a:srgbClr val="FFFFFF"/>
+                </a:highlight>
+                <a:latin typeface="Consolas" panose="020B0609020204030204" pitchFamily="49" charset="0"/>
+              </a:rPr>
+              <a:t>Nbr</a:t>
+            </a:r>
+            <a:r>
+              <a:rPr lang="en-US" dirty="0">
+                <a:solidFill>
+                  <a:srgbClr val="000000"/>
+                </a:solidFill>
+                <a:highlight>
+                  <a:srgbClr val="FFFFFF"/>
+                </a:highlight>
+                <a:latin typeface="Consolas" panose="020B0609020204030204" pitchFamily="49" charset="0"/>
+              </a:rPr>
+              <a:t> </a:t>
+            </a:r>
+            <a:r>
+              <a:rPr lang="en-US" dirty="0">
+                <a:solidFill>
+                  <a:srgbClr val="0000FF"/>
+                </a:solidFill>
+                <a:highlight>
+                  <a:srgbClr val="FFFFFF"/>
+                </a:highlight>
+                <a:latin typeface="Consolas" panose="020B0609020204030204" pitchFamily="49" charset="0"/>
+              </a:rPr>
+              <a:t>from</a:t>
+            </a:r>
+            <a:r>
+              <a:rPr lang="en-US" dirty="0">
+                <a:solidFill>
+                  <a:srgbClr val="000000"/>
+                </a:solidFill>
+                <a:highlight>
+                  <a:srgbClr val="FFFFFF"/>
+                </a:highlight>
+                <a:latin typeface="Consolas" panose="020B0609020204030204" pitchFamily="49" charset="0"/>
+              </a:rPr>
+              <a:t> Customer </a:t>
+            </a:r>
+            <a:r>
+              <a:rPr lang="en-US" dirty="0">
+                <a:solidFill>
+                  <a:srgbClr val="0000FF"/>
+                </a:solidFill>
+                <a:highlight>
+                  <a:srgbClr val="FFFFFF"/>
+                </a:highlight>
+                <a:latin typeface="Consolas" panose="020B0609020204030204" pitchFamily="49" charset="0"/>
+              </a:rPr>
+              <a:t>group</a:t>
+            </a:r>
+            <a:r>
+              <a:rPr lang="en-US" dirty="0">
+                <a:solidFill>
+                  <a:srgbClr val="000000"/>
+                </a:solidFill>
+                <a:highlight>
+                  <a:srgbClr val="FFFFFF"/>
+                </a:highlight>
+                <a:latin typeface="Consolas" panose="020B0609020204030204" pitchFamily="49" charset="0"/>
+              </a:rPr>
+              <a:t> </a:t>
+            </a:r>
+            <a:r>
+              <a:rPr lang="en-US" dirty="0">
+                <a:solidFill>
+                  <a:srgbClr val="0000FF"/>
+                </a:solidFill>
+                <a:highlight>
+                  <a:srgbClr val="FFFFFF"/>
+                </a:highlight>
+                <a:latin typeface="Consolas" panose="020B0609020204030204" pitchFamily="49" charset="0"/>
+              </a:rPr>
+              <a:t>by</a:t>
+            </a:r>
+            <a:r>
+              <a:rPr lang="en-US" dirty="0">
+                <a:solidFill>
+                  <a:srgbClr val="000000"/>
+                </a:solidFill>
+                <a:highlight>
+                  <a:srgbClr val="FFFFFF"/>
+                </a:highlight>
+                <a:latin typeface="Consolas" panose="020B0609020204030204" pitchFamily="49" charset="0"/>
+              </a:rPr>
+              <a:t> </a:t>
+            </a:r>
+            <a:r>
+              <a:rPr lang="en-US" dirty="0" err="1">
+                <a:solidFill>
+                  <a:srgbClr val="000000"/>
+                </a:solidFill>
+                <a:highlight>
+                  <a:srgbClr val="FFFFFF"/>
+                </a:highlight>
+                <a:latin typeface="Consolas" panose="020B0609020204030204" pitchFamily="49" charset="0"/>
+              </a:rPr>
+              <a:t>LastName</a:t>
+            </a:r>
+            <a:r>
+              <a:rPr lang="en-US" dirty="0" smtClean="0">
+                <a:solidFill>
+                  <a:srgbClr val="808080"/>
+                </a:solidFill>
+                <a:highlight>
+                  <a:srgbClr val="FFFFFF"/>
+                </a:highlight>
+                <a:latin typeface="Consolas" panose="020B0609020204030204" pitchFamily="49" charset="0"/>
+              </a:rPr>
+              <a:t>;</a:t>
+            </a:r>
+          </a:p>
+          <a:p>
+            <a:pPr marL="1828800" lvl="4" indent="0">
+              <a:buNone/>
+            </a:pPr>
+            <a:r>
+              <a:rPr lang="en-US" dirty="0">
+                <a:solidFill>
+                  <a:srgbClr val="FF0000"/>
+                </a:solidFill>
+                <a:highlight>
+                  <a:srgbClr val="FFFFFF"/>
+                </a:highlight>
+                <a:latin typeface="Consolas" panose="020B0609020204030204" pitchFamily="49" charset="0"/>
+              </a:rPr>
+              <a:t>Column '</a:t>
+            </a:r>
+            <a:r>
+              <a:rPr lang="en-US" dirty="0" err="1">
+                <a:solidFill>
+                  <a:srgbClr val="FF0000"/>
+                </a:solidFill>
+                <a:highlight>
+                  <a:srgbClr val="FFFFFF"/>
+                </a:highlight>
+                <a:latin typeface="Consolas" panose="020B0609020204030204" pitchFamily="49" charset="0"/>
+              </a:rPr>
+              <a:t>Customer.CustomerID</a:t>
+            </a:r>
+            <a:r>
+              <a:rPr lang="en-US" dirty="0">
+                <a:solidFill>
+                  <a:srgbClr val="FF0000"/>
+                </a:solidFill>
+                <a:highlight>
+                  <a:srgbClr val="FFFFFF"/>
+                </a:highlight>
+                <a:latin typeface="Consolas" panose="020B0609020204030204" pitchFamily="49" charset="0"/>
+              </a:rPr>
+              <a:t>' is invalid in the select list because it is not contained in either an aggregate function or the GROUP BY clause.</a:t>
+            </a:r>
+            <a:endParaRPr lang="en-US" dirty="0">
+              <a:solidFill>
+                <a:srgbClr val="FF0000"/>
+              </a:solidFill>
+            </a:endParaRPr>
           </a:p>
         </p:txBody>
       </p:sp>
@@ -30580,7 +30991,275 @@
   <p:timing>
     <p:tnLst>
       <p:par>
-        <p:cTn id="1" dur="indefinite" restart="never" nodeType="tmRoot"/>
+        <p:cTn id="1" dur="indefinite" restart="never" nodeType="tmRoot">
+          <p:childTnLst>
+            <p:seq concurrent="1" nextAc="seek">
+              <p:cTn id="2" dur="indefinite" nodeType="mainSeq">
+                <p:childTnLst>
+                  <p:par>
+                    <p:cTn id="3" fill="hold">
+                      <p:stCondLst>
+                        <p:cond delay="indefinite"/>
+                      </p:stCondLst>
+                      <p:childTnLst>
+                        <p:par>
+                          <p:cTn id="4" fill="hold">
+                            <p:stCondLst>
+                              <p:cond delay="0"/>
+                            </p:stCondLst>
+                            <p:childTnLst>
+                              <p:par>
+                                <p:cTn id="5" presetID="1" presetClass="entr" presetSubtype="0" fill="hold" nodeType="clickEffect">
+                                  <p:stCondLst>
+                                    <p:cond delay="0"/>
+                                  </p:stCondLst>
+                                  <p:childTnLst>
+                                    <p:set>
+                                      <p:cBhvr>
+                                        <p:cTn id="6" dur="1" fill="hold">
+                                          <p:stCondLst>
+                                            <p:cond delay="0"/>
+                                          </p:stCondLst>
+                                        </p:cTn>
+                                        <p:tgtEl>
+                                          <p:spTgt spid="3">
+                                            <p:txEl>
+                                              <p:pRg st="3" end="3"/>
+                                            </p:txEl>
+                                          </p:spTgt>
+                                        </p:tgtEl>
+                                        <p:attrNameLst>
+                                          <p:attrName>style.visibility</p:attrName>
+                                        </p:attrNameLst>
+                                      </p:cBhvr>
+                                      <p:to>
+                                        <p:strVal val="visible"/>
+                                      </p:to>
+                                    </p:set>
+                                  </p:childTnLst>
+                                </p:cTn>
+                              </p:par>
+                            </p:childTnLst>
+                          </p:cTn>
+                        </p:par>
+                      </p:childTnLst>
+                    </p:cTn>
+                  </p:par>
+                  <p:par>
+                    <p:cTn id="7" fill="hold">
+                      <p:stCondLst>
+                        <p:cond delay="indefinite"/>
+                      </p:stCondLst>
+                      <p:childTnLst>
+                        <p:par>
+                          <p:cTn id="8" fill="hold">
+                            <p:stCondLst>
+                              <p:cond delay="0"/>
+                            </p:stCondLst>
+                            <p:childTnLst>
+                              <p:par>
+                                <p:cTn id="9" presetID="1" presetClass="entr" presetSubtype="0" fill="hold" nodeType="clickEffect">
+                                  <p:stCondLst>
+                                    <p:cond delay="0"/>
+                                  </p:stCondLst>
+                                  <p:childTnLst>
+                                    <p:set>
+                                      <p:cBhvr>
+                                        <p:cTn id="10" dur="1" fill="hold">
+                                          <p:stCondLst>
+                                            <p:cond delay="0"/>
+                                          </p:stCondLst>
+                                        </p:cTn>
+                                        <p:tgtEl>
+                                          <p:spTgt spid="3">
+                                            <p:txEl>
+                                              <p:pRg st="4" end="4"/>
+                                            </p:txEl>
+                                          </p:spTgt>
+                                        </p:tgtEl>
+                                        <p:attrNameLst>
+                                          <p:attrName>style.visibility</p:attrName>
+                                        </p:attrNameLst>
+                                      </p:cBhvr>
+                                      <p:to>
+                                        <p:strVal val="visible"/>
+                                      </p:to>
+                                    </p:set>
+                                  </p:childTnLst>
+                                </p:cTn>
+                              </p:par>
+                            </p:childTnLst>
+                          </p:cTn>
+                        </p:par>
+                      </p:childTnLst>
+                    </p:cTn>
+                  </p:par>
+                  <p:par>
+                    <p:cTn id="11" fill="hold">
+                      <p:stCondLst>
+                        <p:cond delay="indefinite"/>
+                      </p:stCondLst>
+                      <p:childTnLst>
+                        <p:par>
+                          <p:cTn id="12" fill="hold">
+                            <p:stCondLst>
+                              <p:cond delay="0"/>
+                            </p:stCondLst>
+                            <p:childTnLst>
+                              <p:par>
+                                <p:cTn id="13" presetID="1" presetClass="entr" presetSubtype="0" fill="hold" nodeType="clickEffect">
+                                  <p:stCondLst>
+                                    <p:cond delay="0"/>
+                                  </p:stCondLst>
+                                  <p:childTnLst>
+                                    <p:set>
+                                      <p:cBhvr>
+                                        <p:cTn id="14" dur="1" fill="hold">
+                                          <p:stCondLst>
+                                            <p:cond delay="0"/>
+                                          </p:stCondLst>
+                                        </p:cTn>
+                                        <p:tgtEl>
+                                          <p:spTgt spid="3">
+                                            <p:txEl>
+                                              <p:pRg st="5" end="5"/>
+                                            </p:txEl>
+                                          </p:spTgt>
+                                        </p:tgtEl>
+                                        <p:attrNameLst>
+                                          <p:attrName>style.visibility</p:attrName>
+                                        </p:attrNameLst>
+                                      </p:cBhvr>
+                                      <p:to>
+                                        <p:strVal val="visible"/>
+                                      </p:to>
+                                    </p:set>
+                                  </p:childTnLst>
+                                </p:cTn>
+                              </p:par>
+                            </p:childTnLst>
+                          </p:cTn>
+                        </p:par>
+                      </p:childTnLst>
+                    </p:cTn>
+                  </p:par>
+                  <p:par>
+                    <p:cTn id="15" fill="hold">
+                      <p:stCondLst>
+                        <p:cond delay="indefinite"/>
+                      </p:stCondLst>
+                      <p:childTnLst>
+                        <p:par>
+                          <p:cTn id="16" fill="hold">
+                            <p:stCondLst>
+                              <p:cond delay="0"/>
+                            </p:stCondLst>
+                            <p:childTnLst>
+                              <p:par>
+                                <p:cTn id="17" presetID="1" presetClass="entr" presetSubtype="0" fill="hold" nodeType="clickEffect">
+                                  <p:stCondLst>
+                                    <p:cond delay="0"/>
+                                  </p:stCondLst>
+                                  <p:childTnLst>
+                                    <p:set>
+                                      <p:cBhvr>
+                                        <p:cTn id="18" dur="1" fill="hold">
+                                          <p:stCondLst>
+                                            <p:cond delay="0"/>
+                                          </p:stCondLst>
+                                        </p:cTn>
+                                        <p:tgtEl>
+                                          <p:spTgt spid="3">
+                                            <p:txEl>
+                                              <p:pRg st="6" end="6"/>
+                                            </p:txEl>
+                                          </p:spTgt>
+                                        </p:tgtEl>
+                                        <p:attrNameLst>
+                                          <p:attrName>style.visibility</p:attrName>
+                                        </p:attrNameLst>
+                                      </p:cBhvr>
+                                      <p:to>
+                                        <p:strVal val="visible"/>
+                                      </p:to>
+                                    </p:set>
+                                  </p:childTnLst>
+                                </p:cTn>
+                              </p:par>
+                            </p:childTnLst>
+                          </p:cTn>
+                        </p:par>
+                      </p:childTnLst>
+                    </p:cTn>
+                  </p:par>
+                  <p:par>
+                    <p:cTn id="19" fill="hold">
+                      <p:stCondLst>
+                        <p:cond delay="indefinite"/>
+                      </p:stCondLst>
+                      <p:childTnLst>
+                        <p:par>
+                          <p:cTn id="20" fill="hold">
+                            <p:stCondLst>
+                              <p:cond delay="0"/>
+                            </p:stCondLst>
+                            <p:childTnLst>
+                              <p:par>
+                                <p:cTn id="21" presetID="1" presetClass="entr" presetSubtype="0" fill="hold" nodeType="clickEffect">
+                                  <p:stCondLst>
+                                    <p:cond delay="0"/>
+                                  </p:stCondLst>
+                                  <p:childTnLst>
+                                    <p:set>
+                                      <p:cBhvr>
+                                        <p:cTn id="22" dur="1" fill="hold">
+                                          <p:stCondLst>
+                                            <p:cond delay="0"/>
+                                          </p:stCondLst>
+                                        </p:cTn>
+                                        <p:tgtEl>
+                                          <p:spTgt spid="3">
+                                            <p:txEl>
+                                              <p:pRg st="7" end="7"/>
+                                            </p:txEl>
+                                          </p:spTgt>
+                                        </p:tgtEl>
+                                        <p:attrNameLst>
+                                          <p:attrName>style.visibility</p:attrName>
+                                        </p:attrNameLst>
+                                      </p:cBhvr>
+                                      <p:to>
+                                        <p:strVal val="visible"/>
+                                      </p:to>
+                                    </p:set>
+                                  </p:childTnLst>
+                                </p:cTn>
+                              </p:par>
+                            </p:childTnLst>
+                          </p:cTn>
+                        </p:par>
+                      </p:childTnLst>
+                    </p:cTn>
+                  </p:par>
+                </p:childTnLst>
+              </p:cTn>
+              <p:prevCondLst>
+                <p:cond evt="onPrev" delay="0">
+                  <p:tgtEl>
+                    <p:sldTgt/>
+                  </p:tgtEl>
+                </p:cond>
+              </p:prevCondLst>
+              <p:nextCondLst>
+                <p:cond evt="onNext" delay="0">
+                  <p:tgtEl>
+                    <p:sldTgt/>
+                  </p:tgtEl>
+                </p:cond>
+              </p:nextCondLst>
+            </p:seq>
+          </p:childTnLst>
+        </p:cTn>
       </p:par>
     </p:tnLst>
   </p:timing>
@@ -31531,14 +32210,14 @@
                 <a:gridCol w="7632835">
                   <a:extLst>
                     <a:ext uri="{9D8B030D-6E8A-4147-A177-3AD203B41FA5}">
-                      <a16:colId xmlns:a16="http://schemas.microsoft.com/office/drawing/2014/main" xmlns="" val="3644048045"/>
+                      <a16:colId xmlns="" xmlns:a16="http://schemas.microsoft.com/office/drawing/2014/main" val="3644048045"/>
                     </a:ext>
                   </a:extLst>
                 </a:gridCol>
                 <a:gridCol w="606393">
                   <a:extLst>
                     <a:ext uri="{9D8B030D-6E8A-4147-A177-3AD203B41FA5}">
-                      <a16:colId xmlns:a16="http://schemas.microsoft.com/office/drawing/2014/main" xmlns="" val="2034254753"/>
+                      <a16:colId xmlns="" xmlns:a16="http://schemas.microsoft.com/office/drawing/2014/main" val="2034254753"/>
                     </a:ext>
                   </a:extLst>
                 </a:gridCol>
@@ -31569,7 +32248,7 @@
                 </a:tc>
                 <a:extLst>
                   <a:ext uri="{0D108BD9-81ED-4DB2-BD59-A6C34878D82A}">
-                    <a16:rowId xmlns:a16="http://schemas.microsoft.com/office/drawing/2014/main" xmlns="" val="2708275910"/>
+                    <a16:rowId xmlns="" xmlns:a16="http://schemas.microsoft.com/office/drawing/2014/main" val="2708275910"/>
                   </a:ext>
                 </a:extLst>
               </a:tr>
@@ -31603,7 +32282,7 @@
                 </a:tc>
                 <a:extLst>
                   <a:ext uri="{0D108BD9-81ED-4DB2-BD59-A6C34878D82A}">
-                    <a16:rowId xmlns:a16="http://schemas.microsoft.com/office/drawing/2014/main" xmlns="" val="2161984115"/>
+                    <a16:rowId xmlns="" xmlns:a16="http://schemas.microsoft.com/office/drawing/2014/main" val="2161984115"/>
                   </a:ext>
                 </a:extLst>
               </a:tr>
@@ -31650,7 +32329,7 @@
                 </a:tc>
                 <a:extLst>
                   <a:ext uri="{0D108BD9-81ED-4DB2-BD59-A6C34878D82A}">
-                    <a16:rowId xmlns:a16="http://schemas.microsoft.com/office/drawing/2014/main" xmlns="" val="2841678841"/>
+                    <a16:rowId xmlns="" xmlns:a16="http://schemas.microsoft.com/office/drawing/2014/main" val="2841678841"/>
                   </a:ext>
                 </a:extLst>
               </a:tr>
@@ -31684,7 +32363,7 @@
                 </a:tc>
                 <a:extLst>
                   <a:ext uri="{0D108BD9-81ED-4DB2-BD59-A6C34878D82A}">
-                    <a16:rowId xmlns:a16="http://schemas.microsoft.com/office/drawing/2014/main" xmlns="" val="3144998627"/>
+                    <a16:rowId xmlns="" xmlns:a16="http://schemas.microsoft.com/office/drawing/2014/main" val="3144998627"/>
                   </a:ext>
                 </a:extLst>
               </a:tr>
@@ -31726,7 +32405,7 @@
                 </a:tc>
                 <a:extLst>
                   <a:ext uri="{0D108BD9-81ED-4DB2-BD59-A6C34878D82A}">
-                    <a16:rowId xmlns:a16="http://schemas.microsoft.com/office/drawing/2014/main" xmlns="" val="1419261869"/>
+                    <a16:rowId xmlns="" xmlns:a16="http://schemas.microsoft.com/office/drawing/2014/main" val="1419261869"/>
                   </a:ext>
                 </a:extLst>
               </a:tr>
@@ -31764,7 +32443,7 @@
                 </a:tc>
                 <a:extLst>
                   <a:ext uri="{0D108BD9-81ED-4DB2-BD59-A6C34878D82A}">
-                    <a16:rowId xmlns:a16="http://schemas.microsoft.com/office/drawing/2014/main" xmlns="" val="1427391072"/>
+                    <a16:rowId xmlns="" xmlns:a16="http://schemas.microsoft.com/office/drawing/2014/main" val="1427391072"/>
                   </a:ext>
                 </a:extLst>
               </a:tr>
@@ -31811,7 +32490,7 @@
                 </a:tc>
                 <a:extLst>
                   <a:ext uri="{0D108BD9-81ED-4DB2-BD59-A6C34878D82A}">
-                    <a16:rowId xmlns:a16="http://schemas.microsoft.com/office/drawing/2014/main" xmlns="" val="2346539918"/>
+                    <a16:rowId xmlns="" xmlns:a16="http://schemas.microsoft.com/office/drawing/2014/main" val="2346539918"/>
                   </a:ext>
                 </a:extLst>
               </a:tr>
@@ -31850,7 +32529,7 @@
                 </a:tc>
                 <a:extLst>
                   <a:ext uri="{0D108BD9-81ED-4DB2-BD59-A6C34878D82A}">
-                    <a16:rowId xmlns:a16="http://schemas.microsoft.com/office/drawing/2014/main" xmlns="" val="2275483042"/>
+                    <a16:rowId xmlns="" xmlns:a16="http://schemas.microsoft.com/office/drawing/2014/main" val="2275483042"/>
                   </a:ext>
                 </a:extLst>
               </a:tr>
@@ -31888,7 +32567,7 @@
                 </a:tc>
                 <a:extLst>
                   <a:ext uri="{0D108BD9-81ED-4DB2-BD59-A6C34878D82A}">
-                    <a16:rowId xmlns:a16="http://schemas.microsoft.com/office/drawing/2014/main" xmlns="" val="4202569347"/>
+                    <a16:rowId xmlns="" xmlns:a16="http://schemas.microsoft.com/office/drawing/2014/main" val="4202569347"/>
                   </a:ext>
                 </a:extLst>
               </a:tr>
@@ -31922,7 +32601,7 @@
                 </a:tc>
                 <a:extLst>
                   <a:ext uri="{0D108BD9-81ED-4DB2-BD59-A6C34878D82A}">
-                    <a16:rowId xmlns:a16="http://schemas.microsoft.com/office/drawing/2014/main" xmlns="" val="2989839269"/>
+                    <a16:rowId xmlns="" xmlns:a16="http://schemas.microsoft.com/office/drawing/2014/main" val="2989839269"/>
                   </a:ext>
                 </a:extLst>
               </a:tr>
@@ -31956,7 +32635,7 @@
                 </a:tc>
                 <a:extLst>
                   <a:ext uri="{0D108BD9-81ED-4DB2-BD59-A6C34878D82A}">
-                    <a16:rowId xmlns:a16="http://schemas.microsoft.com/office/drawing/2014/main" xmlns="" val="2130545569"/>
+                    <a16:rowId xmlns="" xmlns:a16="http://schemas.microsoft.com/office/drawing/2014/main" val="2130545569"/>
                   </a:ext>
                 </a:extLst>
               </a:tr>
@@ -32012,7 +32691,7 @@
                 </a:tc>
                 <a:extLst>
                   <a:ext uri="{0D108BD9-81ED-4DB2-BD59-A6C34878D82A}">
-                    <a16:rowId xmlns:a16="http://schemas.microsoft.com/office/drawing/2014/main" xmlns="" val="1848127216"/>
+                    <a16:rowId xmlns="" xmlns:a16="http://schemas.microsoft.com/office/drawing/2014/main" val="1848127216"/>
                   </a:ext>
                 </a:extLst>
               </a:tr>
@@ -32466,14 +33145,14 @@
                 <a:gridCol w="4119615">
                   <a:extLst>
                     <a:ext uri="{9D8B030D-6E8A-4147-A177-3AD203B41FA5}">
-                      <a16:colId xmlns:a16="http://schemas.microsoft.com/office/drawing/2014/main" xmlns="" val="3644048045"/>
+                      <a16:colId xmlns="" xmlns:a16="http://schemas.microsoft.com/office/drawing/2014/main" val="3644048045"/>
                     </a:ext>
                   </a:extLst>
                 </a:gridCol>
                 <a:gridCol w="4119613">
                   <a:extLst>
                     <a:ext uri="{9D8B030D-6E8A-4147-A177-3AD203B41FA5}">
-                      <a16:colId xmlns:a16="http://schemas.microsoft.com/office/drawing/2014/main" xmlns="" val="2034254753"/>
+                      <a16:colId xmlns="" xmlns:a16="http://schemas.microsoft.com/office/drawing/2014/main" val="2034254753"/>
                     </a:ext>
                   </a:extLst>
                 </a:gridCol>
@@ -32509,7 +33188,7 @@
                 </a:tc>
                 <a:extLst>
                   <a:ext uri="{0D108BD9-81ED-4DB2-BD59-A6C34878D82A}">
-                    <a16:rowId xmlns:a16="http://schemas.microsoft.com/office/drawing/2014/main" xmlns="" val="2708275910"/>
+                    <a16:rowId xmlns="" xmlns:a16="http://schemas.microsoft.com/office/drawing/2014/main" val="2708275910"/>
                   </a:ext>
                 </a:extLst>
               </a:tr>
@@ -32709,7 +33388,7 @@
                 </a:tc>
                 <a:extLst>
                   <a:ext uri="{0D108BD9-81ED-4DB2-BD59-A6C34878D82A}">
-                    <a16:rowId xmlns:a16="http://schemas.microsoft.com/office/drawing/2014/main" xmlns="" val="2161984115"/>
+                    <a16:rowId xmlns="" xmlns:a16="http://schemas.microsoft.com/office/drawing/2014/main" val="2161984115"/>
                   </a:ext>
                 </a:extLst>
               </a:tr>
@@ -32909,7 +33588,7 @@
                 </a:tc>
                 <a:extLst>
                   <a:ext uri="{0D108BD9-81ED-4DB2-BD59-A6C34878D82A}">
-                    <a16:rowId xmlns:a16="http://schemas.microsoft.com/office/drawing/2014/main" xmlns="" val="2841678841"/>
+                    <a16:rowId xmlns="" xmlns:a16="http://schemas.microsoft.com/office/drawing/2014/main" val="2841678841"/>
                   </a:ext>
                 </a:extLst>
               </a:tr>
@@ -33109,7 +33788,7 @@
                 </a:tc>
                 <a:extLst>
                   <a:ext uri="{0D108BD9-81ED-4DB2-BD59-A6C34878D82A}">
-                    <a16:rowId xmlns:a16="http://schemas.microsoft.com/office/drawing/2014/main" xmlns="" val="3144998627"/>
+                    <a16:rowId xmlns="" xmlns:a16="http://schemas.microsoft.com/office/drawing/2014/main" val="3144998627"/>
                   </a:ext>
                 </a:extLst>
               </a:tr>
@@ -33309,7 +33988,7 @@
                 </a:tc>
                 <a:extLst>
                   <a:ext uri="{0D108BD9-81ED-4DB2-BD59-A6C34878D82A}">
-                    <a16:rowId xmlns:a16="http://schemas.microsoft.com/office/drawing/2014/main" xmlns="" val="1419261869"/>
+                    <a16:rowId xmlns="" xmlns:a16="http://schemas.microsoft.com/office/drawing/2014/main" val="1419261869"/>
                   </a:ext>
                 </a:extLst>
               </a:tr>
@@ -33509,7 +34188,7 @@
                 </a:tc>
                 <a:extLst>
                   <a:ext uri="{0D108BD9-81ED-4DB2-BD59-A6C34878D82A}">
-                    <a16:rowId xmlns:a16="http://schemas.microsoft.com/office/drawing/2014/main" xmlns="" val="1427391072"/>
+                    <a16:rowId xmlns="" xmlns:a16="http://schemas.microsoft.com/office/drawing/2014/main" val="1427391072"/>
                   </a:ext>
                 </a:extLst>
               </a:tr>
@@ -33709,7 +34388,7 @@
                 </a:tc>
                 <a:extLst>
                   <a:ext uri="{0D108BD9-81ED-4DB2-BD59-A6C34878D82A}">
-                    <a16:rowId xmlns:a16="http://schemas.microsoft.com/office/drawing/2014/main" xmlns="" val="2346539918"/>
+                    <a16:rowId xmlns="" xmlns:a16="http://schemas.microsoft.com/office/drawing/2014/main" val="2346539918"/>
                   </a:ext>
                 </a:extLst>
               </a:tr>
@@ -33918,7 +34597,7 @@
                 </a:tc>
                 <a:extLst>
                   <a:ext uri="{0D108BD9-81ED-4DB2-BD59-A6C34878D82A}">
-                    <a16:rowId xmlns:a16="http://schemas.microsoft.com/office/drawing/2014/main" xmlns="" val="2275483042"/>
+                    <a16:rowId xmlns="" xmlns:a16="http://schemas.microsoft.com/office/drawing/2014/main" val="2275483042"/>
                   </a:ext>
                 </a:extLst>
               </a:tr>
@@ -34127,7 +34806,7 @@
                 </a:tc>
                 <a:extLst>
                   <a:ext uri="{0D108BD9-81ED-4DB2-BD59-A6C34878D82A}">
-                    <a16:rowId xmlns:a16="http://schemas.microsoft.com/office/drawing/2014/main" xmlns="" val="4202569347"/>
+                    <a16:rowId xmlns="" xmlns:a16="http://schemas.microsoft.com/office/drawing/2014/main" val="4202569347"/>
                   </a:ext>
                 </a:extLst>
               </a:tr>
@@ -34336,7 +35015,7 @@
                 </a:tc>
                 <a:extLst>
                   <a:ext uri="{0D108BD9-81ED-4DB2-BD59-A6C34878D82A}">
-                    <a16:rowId xmlns:a16="http://schemas.microsoft.com/office/drawing/2014/main" xmlns="" val="2989839269"/>
+                    <a16:rowId xmlns="" xmlns:a16="http://schemas.microsoft.com/office/drawing/2014/main" val="2989839269"/>
                   </a:ext>
                 </a:extLst>
               </a:tr>
@@ -34545,7 +35224,7 @@
                 </a:tc>
                 <a:extLst>
                   <a:ext uri="{0D108BD9-81ED-4DB2-BD59-A6C34878D82A}">
-                    <a16:rowId xmlns:a16="http://schemas.microsoft.com/office/drawing/2014/main" xmlns="" val="2130545569"/>
+                    <a16:rowId xmlns="" xmlns:a16="http://schemas.microsoft.com/office/drawing/2014/main" val="2130545569"/>
                   </a:ext>
                 </a:extLst>
               </a:tr>
@@ -34754,7 +35433,7 @@
                 </a:tc>
                 <a:extLst>
                   <a:ext uri="{0D108BD9-81ED-4DB2-BD59-A6C34878D82A}">
-                    <a16:rowId xmlns:a16="http://schemas.microsoft.com/office/drawing/2014/main" xmlns="" val="3045796785"/>
+                    <a16:rowId xmlns="" xmlns:a16="http://schemas.microsoft.com/office/drawing/2014/main" val="3045796785"/>
                   </a:ext>
                 </a:extLst>
               </a:tr>
@@ -34963,7 +35642,7 @@
                 </a:tc>
                 <a:extLst>
                   <a:ext uri="{0D108BD9-81ED-4DB2-BD59-A6C34878D82A}">
-                    <a16:rowId xmlns:a16="http://schemas.microsoft.com/office/drawing/2014/main" xmlns="" val="1091494175"/>
+                    <a16:rowId xmlns="" xmlns:a16="http://schemas.microsoft.com/office/drawing/2014/main" val="1091494175"/>
                   </a:ext>
                 </a:extLst>
               </a:tr>
@@ -38935,14 +39614,14 @@
                 <a:gridCol w="957714">
                   <a:extLst>
                     <a:ext uri="{9D8B030D-6E8A-4147-A177-3AD203B41FA5}">
-                      <a16:colId xmlns:a16="http://schemas.microsoft.com/office/drawing/2014/main" xmlns="" val="3940544257"/>
+                      <a16:colId xmlns="" xmlns:a16="http://schemas.microsoft.com/office/drawing/2014/main" val="3940544257"/>
                     </a:ext>
                   </a:extLst>
                 </a:gridCol>
                 <a:gridCol w="2464067">
                   <a:extLst>
                     <a:ext uri="{9D8B030D-6E8A-4147-A177-3AD203B41FA5}">
-                      <a16:colId xmlns:a16="http://schemas.microsoft.com/office/drawing/2014/main" xmlns="" val="3658567973"/>
+                      <a16:colId xmlns="" xmlns:a16="http://schemas.microsoft.com/office/drawing/2014/main" val="3658567973"/>
                     </a:ext>
                   </a:extLst>
                 </a:gridCol>
@@ -38976,7 +39655,7 @@
                 </a:tc>
                 <a:extLst>
                   <a:ext uri="{0D108BD9-81ED-4DB2-BD59-A6C34878D82A}">
-                    <a16:rowId xmlns:a16="http://schemas.microsoft.com/office/drawing/2014/main" xmlns="" val="1032275335"/>
+                    <a16:rowId xmlns="" xmlns:a16="http://schemas.microsoft.com/office/drawing/2014/main" val="1032275335"/>
                   </a:ext>
                 </a:extLst>
               </a:tr>
@@ -39106,7 +39785,7 @@
                 </a:tc>
                 <a:extLst>
                   <a:ext uri="{0D108BD9-81ED-4DB2-BD59-A6C34878D82A}">
-                    <a16:rowId xmlns:a16="http://schemas.microsoft.com/office/drawing/2014/main" xmlns="" val="4191484087"/>
+                    <a16:rowId xmlns="" xmlns:a16="http://schemas.microsoft.com/office/drawing/2014/main" val="4191484087"/>
                   </a:ext>
                 </a:extLst>
               </a:tr>
@@ -39180,7 +39859,7 @@
                 </a:tc>
                 <a:extLst>
                   <a:ext uri="{0D108BD9-81ED-4DB2-BD59-A6C34878D82A}">
-                    <a16:rowId xmlns:a16="http://schemas.microsoft.com/office/drawing/2014/main" xmlns="" val="1864588626"/>
+                    <a16:rowId xmlns="" xmlns:a16="http://schemas.microsoft.com/office/drawing/2014/main" val="1864588626"/>
                   </a:ext>
                 </a:extLst>
               </a:tr>
@@ -39302,7 +39981,7 @@
                 </a:tc>
                 <a:extLst>
                   <a:ext uri="{0D108BD9-81ED-4DB2-BD59-A6C34878D82A}">
-                    <a16:rowId xmlns:a16="http://schemas.microsoft.com/office/drawing/2014/main" xmlns="" val="3035259714"/>
+                    <a16:rowId xmlns="" xmlns:a16="http://schemas.microsoft.com/office/drawing/2014/main" val="3035259714"/>
                   </a:ext>
                 </a:extLst>
               </a:tr>
@@ -39391,7 +40070,7 @@
                 </a:tc>
                 <a:extLst>
                   <a:ext uri="{0D108BD9-81ED-4DB2-BD59-A6C34878D82A}">
-                    <a16:rowId xmlns:a16="http://schemas.microsoft.com/office/drawing/2014/main" xmlns="" val="2023621082"/>
+                    <a16:rowId xmlns="" xmlns:a16="http://schemas.microsoft.com/office/drawing/2014/main" val="2023621082"/>
                   </a:ext>
                 </a:extLst>
               </a:tr>
@@ -39480,7 +40159,7 @@
                 </a:tc>
                 <a:extLst>
                   <a:ext uri="{0D108BD9-81ED-4DB2-BD59-A6C34878D82A}">
-                    <a16:rowId xmlns:a16="http://schemas.microsoft.com/office/drawing/2014/main" xmlns="" val="120016333"/>
+                    <a16:rowId xmlns="" xmlns:a16="http://schemas.microsoft.com/office/drawing/2014/main" val="120016333"/>
                   </a:ext>
                 </a:extLst>
               </a:tr>
@@ -39632,21 +40311,21 @@
                 <a:gridCol w="960120">
                   <a:extLst>
                     <a:ext uri="{9D8B030D-6E8A-4147-A177-3AD203B41FA5}">
-                      <a16:colId xmlns:a16="http://schemas.microsoft.com/office/drawing/2014/main" xmlns="" val="392696932"/>
+                      <a16:colId xmlns="" xmlns:a16="http://schemas.microsoft.com/office/drawing/2014/main" val="392696932"/>
                     </a:ext>
                   </a:extLst>
                 </a:gridCol>
                 <a:gridCol w="2468880">
                   <a:extLst>
                     <a:ext uri="{9D8B030D-6E8A-4147-A177-3AD203B41FA5}">
-                      <a16:colId xmlns:a16="http://schemas.microsoft.com/office/drawing/2014/main" xmlns="" val="2769969192"/>
+                      <a16:colId xmlns="" xmlns:a16="http://schemas.microsoft.com/office/drawing/2014/main" val="2769969192"/>
                     </a:ext>
                   </a:extLst>
                 </a:gridCol>
                 <a:gridCol w="2468880">
                   <a:extLst>
                     <a:ext uri="{9D8B030D-6E8A-4147-A177-3AD203B41FA5}">
-                      <a16:colId xmlns:a16="http://schemas.microsoft.com/office/drawing/2014/main" xmlns="" val="2022610816"/>
+                      <a16:colId xmlns="" xmlns:a16="http://schemas.microsoft.com/office/drawing/2014/main" val="2022610816"/>
                     </a:ext>
                   </a:extLst>
                 </a:gridCol>
@@ -39698,7 +40377,7 @@
                 </a:tc>
                 <a:extLst>
                   <a:ext uri="{0D108BD9-81ED-4DB2-BD59-A6C34878D82A}">
-                    <a16:rowId xmlns:a16="http://schemas.microsoft.com/office/drawing/2014/main" xmlns="" val="2344937666"/>
+                    <a16:rowId xmlns="" xmlns:a16="http://schemas.microsoft.com/office/drawing/2014/main" val="2344937666"/>
                   </a:ext>
                 </a:extLst>
               </a:tr>
@@ -39831,7 +40510,7 @@
                 </a:tc>
                 <a:extLst>
                   <a:ext uri="{0D108BD9-81ED-4DB2-BD59-A6C34878D82A}">
-                    <a16:rowId xmlns:a16="http://schemas.microsoft.com/office/drawing/2014/main" xmlns="" val="1917341330"/>
+                    <a16:rowId xmlns="" xmlns:a16="http://schemas.microsoft.com/office/drawing/2014/main" val="1917341330"/>
                   </a:ext>
                 </a:extLst>
               </a:tr>
@@ -40048,7 +40727,7 @@
                 </a:tc>
                 <a:extLst>
                   <a:ext uri="{0D108BD9-81ED-4DB2-BD59-A6C34878D82A}">
-                    <a16:rowId xmlns:a16="http://schemas.microsoft.com/office/drawing/2014/main" xmlns="" val="3088042860"/>
+                    <a16:rowId xmlns="" xmlns:a16="http://schemas.microsoft.com/office/drawing/2014/main" val="3088042860"/>
                   </a:ext>
                 </a:extLst>
               </a:tr>
@@ -40132,7 +40811,7 @@
                 </a:tc>
                 <a:extLst>
                   <a:ext uri="{0D108BD9-81ED-4DB2-BD59-A6C34878D82A}">
-                    <a16:rowId xmlns:a16="http://schemas.microsoft.com/office/drawing/2014/main" xmlns="" val="2658530722"/>
+                    <a16:rowId xmlns="" xmlns:a16="http://schemas.microsoft.com/office/drawing/2014/main" val="2658530722"/>
                   </a:ext>
                 </a:extLst>
               </a:tr>
@@ -40264,7 +40943,7 @@
                 </a:tc>
                 <a:extLst>
                   <a:ext uri="{0D108BD9-81ED-4DB2-BD59-A6C34878D82A}">
-                    <a16:rowId xmlns:a16="http://schemas.microsoft.com/office/drawing/2014/main" xmlns="" val="1481886367"/>
+                    <a16:rowId xmlns="" xmlns:a16="http://schemas.microsoft.com/office/drawing/2014/main" val="1481886367"/>
                   </a:ext>
                 </a:extLst>
               </a:tr>
@@ -40363,7 +41042,7 @@
                 </a:tc>
                 <a:extLst>
                   <a:ext uri="{0D108BD9-81ED-4DB2-BD59-A6C34878D82A}">
-                    <a16:rowId xmlns:a16="http://schemas.microsoft.com/office/drawing/2014/main" xmlns="" val="4248384778"/>
+                    <a16:rowId xmlns="" xmlns:a16="http://schemas.microsoft.com/office/drawing/2014/main" val="4248384778"/>
                   </a:ext>
                 </a:extLst>
               </a:tr>
@@ -40462,7 +41141,7 @@
                 </a:tc>
                 <a:extLst>
                   <a:ext uri="{0D108BD9-81ED-4DB2-BD59-A6C34878D82A}">
-                    <a16:rowId xmlns:a16="http://schemas.microsoft.com/office/drawing/2014/main" xmlns="" val="1670483340"/>
+                    <a16:rowId xmlns="" xmlns:a16="http://schemas.microsoft.com/office/drawing/2014/main" val="1670483340"/>
                   </a:ext>
                 </a:extLst>
               </a:tr>
@@ -40614,28 +41293,28 @@
                 <a:gridCol w="960120">
                   <a:extLst>
                     <a:ext uri="{9D8B030D-6E8A-4147-A177-3AD203B41FA5}">
-                      <a16:colId xmlns:a16="http://schemas.microsoft.com/office/drawing/2014/main" xmlns="" val="392696932"/>
+                      <a16:colId xmlns="" xmlns:a16="http://schemas.microsoft.com/office/drawing/2014/main" val="392696932"/>
                     </a:ext>
                   </a:extLst>
                 </a:gridCol>
                 <a:gridCol w="2468880">
                   <a:extLst>
                     <a:ext uri="{9D8B030D-6E8A-4147-A177-3AD203B41FA5}">
-                      <a16:colId xmlns:a16="http://schemas.microsoft.com/office/drawing/2014/main" xmlns="" val="2769969192"/>
+                      <a16:colId xmlns="" xmlns:a16="http://schemas.microsoft.com/office/drawing/2014/main" val="2769969192"/>
                     </a:ext>
                   </a:extLst>
                 </a:gridCol>
                 <a:gridCol w="2468880">
                   <a:extLst>
                     <a:ext uri="{9D8B030D-6E8A-4147-A177-3AD203B41FA5}">
-                      <a16:colId xmlns:a16="http://schemas.microsoft.com/office/drawing/2014/main" xmlns="" val="2022610816"/>
+                      <a16:colId xmlns="" xmlns:a16="http://schemas.microsoft.com/office/drawing/2014/main" val="2022610816"/>
                     </a:ext>
                   </a:extLst>
                 </a:gridCol>
                 <a:gridCol w="2468880">
                   <a:extLst>
                     <a:ext uri="{9D8B030D-6E8A-4147-A177-3AD203B41FA5}">
-                      <a16:colId xmlns:a16="http://schemas.microsoft.com/office/drawing/2014/main" xmlns="" val="102813283"/>
+                      <a16:colId xmlns="" xmlns:a16="http://schemas.microsoft.com/office/drawing/2014/main" val="102813283"/>
                     </a:ext>
                   </a:extLst>
                 </a:gridCol>
@@ -40700,7 +41379,7 @@
                 </a:tc>
                 <a:extLst>
                   <a:ext uri="{0D108BD9-81ED-4DB2-BD59-A6C34878D82A}">
-                    <a16:rowId xmlns:a16="http://schemas.microsoft.com/office/drawing/2014/main" xmlns="" val="2344937666"/>
+                    <a16:rowId xmlns="" xmlns:a16="http://schemas.microsoft.com/office/drawing/2014/main" val="2344937666"/>
                   </a:ext>
                 </a:extLst>
               </a:tr>
@@ -40860,7 +41539,7 @@
                 </a:tc>
                 <a:extLst>
                   <a:ext uri="{0D108BD9-81ED-4DB2-BD59-A6C34878D82A}">
-                    <a16:rowId xmlns:a16="http://schemas.microsoft.com/office/drawing/2014/main" xmlns="" val="1917341330"/>
+                    <a16:rowId xmlns="" xmlns:a16="http://schemas.microsoft.com/office/drawing/2014/main" val="1917341330"/>
                   </a:ext>
                 </a:extLst>
               </a:tr>
@@ -41164,7 +41843,7 @@
                 </a:tc>
                 <a:extLst>
                   <a:ext uri="{0D108BD9-81ED-4DB2-BD59-A6C34878D82A}">
-                    <a16:rowId xmlns:a16="http://schemas.microsoft.com/office/drawing/2014/main" xmlns="" val="3088042860"/>
+                    <a16:rowId xmlns="" xmlns:a16="http://schemas.microsoft.com/office/drawing/2014/main" val="3088042860"/>
                   </a:ext>
                 </a:extLst>
               </a:tr>
@@ -41258,7 +41937,7 @@
                 </a:tc>
                 <a:extLst>
                   <a:ext uri="{0D108BD9-81ED-4DB2-BD59-A6C34878D82A}">
-                    <a16:rowId xmlns:a16="http://schemas.microsoft.com/office/drawing/2014/main" xmlns="" val="2658530722"/>
+                    <a16:rowId xmlns="" xmlns:a16="http://schemas.microsoft.com/office/drawing/2014/main" val="2658530722"/>
                   </a:ext>
                 </a:extLst>
               </a:tr>
@@ -41451,7 +42130,7 @@
                 </a:tc>
                 <a:extLst>
                   <a:ext uri="{0D108BD9-81ED-4DB2-BD59-A6C34878D82A}">
-                    <a16:rowId xmlns:a16="http://schemas.microsoft.com/office/drawing/2014/main" xmlns="" val="1481886367"/>
+                    <a16:rowId xmlns="" xmlns:a16="http://schemas.microsoft.com/office/drawing/2014/main" val="1481886367"/>
                   </a:ext>
                 </a:extLst>
               </a:tr>
@@ -41560,7 +42239,7 @@
                 </a:tc>
                 <a:extLst>
                   <a:ext uri="{0D108BD9-81ED-4DB2-BD59-A6C34878D82A}">
-                    <a16:rowId xmlns:a16="http://schemas.microsoft.com/office/drawing/2014/main" xmlns="" val="4248384778"/>
+                    <a16:rowId xmlns="" xmlns:a16="http://schemas.microsoft.com/office/drawing/2014/main" val="4248384778"/>
                   </a:ext>
                 </a:extLst>
               </a:tr>
@@ -41669,7 +42348,7 @@
                 </a:tc>
                 <a:extLst>
                   <a:ext uri="{0D108BD9-81ED-4DB2-BD59-A6C34878D82A}">
-                    <a16:rowId xmlns:a16="http://schemas.microsoft.com/office/drawing/2014/main" xmlns="" val="1670483340"/>
+                    <a16:rowId xmlns="" xmlns:a16="http://schemas.microsoft.com/office/drawing/2014/main" val="1670483340"/>
                   </a:ext>
                 </a:extLst>
               </a:tr>
@@ -42727,14 +43406,14 @@
                 <a:gridCol w="934278">
                   <a:extLst>
                     <a:ext uri="{9D8B030D-6E8A-4147-A177-3AD203B41FA5}">
-                      <a16:colId xmlns:a16="http://schemas.microsoft.com/office/drawing/2014/main" xmlns="" val="4198655800"/>
+                      <a16:colId xmlns="" xmlns:a16="http://schemas.microsoft.com/office/drawing/2014/main" val="4198655800"/>
                     </a:ext>
                   </a:extLst>
                 </a:gridCol>
                 <a:gridCol w="7295322">
                   <a:extLst>
                     <a:ext uri="{9D8B030D-6E8A-4147-A177-3AD203B41FA5}">
-                      <a16:colId xmlns:a16="http://schemas.microsoft.com/office/drawing/2014/main" xmlns="" val="135413862"/>
+                      <a16:colId xmlns="" xmlns:a16="http://schemas.microsoft.com/office/drawing/2014/main" val="135413862"/>
                     </a:ext>
                   </a:extLst>
                 </a:gridCol>
@@ -42768,7 +43447,7 @@
                 </a:tc>
                 <a:extLst>
                   <a:ext uri="{0D108BD9-81ED-4DB2-BD59-A6C34878D82A}">
-                    <a16:rowId xmlns:a16="http://schemas.microsoft.com/office/drawing/2014/main" xmlns="" val="3068323444"/>
+                    <a16:rowId xmlns="" xmlns:a16="http://schemas.microsoft.com/office/drawing/2014/main" val="3068323444"/>
                   </a:ext>
                 </a:extLst>
               </a:tr>
@@ -42801,7 +43480,7 @@
                 </a:tc>
                 <a:extLst>
                   <a:ext uri="{0D108BD9-81ED-4DB2-BD59-A6C34878D82A}">
-                    <a16:rowId xmlns:a16="http://schemas.microsoft.com/office/drawing/2014/main" xmlns="" val="1586961909"/>
+                    <a16:rowId xmlns="" xmlns:a16="http://schemas.microsoft.com/office/drawing/2014/main" val="1586961909"/>
                   </a:ext>
                 </a:extLst>
               </a:tr>
@@ -42839,7 +43518,7 @@
                 </a:tc>
                 <a:extLst>
                   <a:ext uri="{0D108BD9-81ED-4DB2-BD59-A6C34878D82A}">
-                    <a16:rowId xmlns:a16="http://schemas.microsoft.com/office/drawing/2014/main" xmlns="" val="2280300197"/>
+                    <a16:rowId xmlns="" xmlns:a16="http://schemas.microsoft.com/office/drawing/2014/main" val="2280300197"/>
                   </a:ext>
                 </a:extLst>
               </a:tr>
@@ -42877,7 +43556,7 @@
                 </a:tc>
                 <a:extLst>
                   <a:ext uri="{0D108BD9-81ED-4DB2-BD59-A6C34878D82A}">
-                    <a16:rowId xmlns:a16="http://schemas.microsoft.com/office/drawing/2014/main" xmlns="" val="1192843310"/>
+                    <a16:rowId xmlns="" xmlns:a16="http://schemas.microsoft.com/office/drawing/2014/main" val="1192843310"/>
                   </a:ext>
                 </a:extLst>
               </a:tr>
@@ -42915,7 +43594,7 @@
                 </a:tc>
                 <a:extLst>
                   <a:ext uri="{0D108BD9-81ED-4DB2-BD59-A6C34878D82A}">
-                    <a16:rowId xmlns:a16="http://schemas.microsoft.com/office/drawing/2014/main" xmlns="" val="2620585158"/>
+                    <a16:rowId xmlns="" xmlns:a16="http://schemas.microsoft.com/office/drawing/2014/main" val="2620585158"/>
                   </a:ext>
                 </a:extLst>
               </a:tr>
@@ -42948,7 +43627,7 @@
                 </a:tc>
                 <a:extLst>
                   <a:ext uri="{0D108BD9-81ED-4DB2-BD59-A6C34878D82A}">
-                    <a16:rowId xmlns:a16="http://schemas.microsoft.com/office/drawing/2014/main" xmlns="" val="1697738616"/>
+                    <a16:rowId xmlns="" xmlns:a16="http://schemas.microsoft.com/office/drawing/2014/main" val="1697738616"/>
                   </a:ext>
                 </a:extLst>
               </a:tr>
@@ -42986,7 +43665,7 @@
                 </a:tc>
                 <a:extLst>
                   <a:ext uri="{0D108BD9-81ED-4DB2-BD59-A6C34878D82A}">
-                    <a16:rowId xmlns:a16="http://schemas.microsoft.com/office/drawing/2014/main" xmlns="" val="316611556"/>
+                    <a16:rowId xmlns="" xmlns:a16="http://schemas.microsoft.com/office/drawing/2014/main" val="316611556"/>
                   </a:ext>
                 </a:extLst>
               </a:tr>
@@ -43019,7 +43698,7 @@
                 </a:tc>
                 <a:extLst>
                   <a:ext uri="{0D108BD9-81ED-4DB2-BD59-A6C34878D82A}">
-                    <a16:rowId xmlns:a16="http://schemas.microsoft.com/office/drawing/2014/main" xmlns="" val="1312814102"/>
+                    <a16:rowId xmlns="" xmlns:a16="http://schemas.microsoft.com/office/drawing/2014/main" val="1312814102"/>
                   </a:ext>
                 </a:extLst>
               </a:tr>
@@ -43052,7 +43731,7 @@
                 </a:tc>
                 <a:extLst>
                   <a:ext uri="{0D108BD9-81ED-4DB2-BD59-A6C34878D82A}">
-                    <a16:rowId xmlns:a16="http://schemas.microsoft.com/office/drawing/2014/main" xmlns="" val="1975533996"/>
+                    <a16:rowId xmlns="" xmlns:a16="http://schemas.microsoft.com/office/drawing/2014/main" val="1975533996"/>
                   </a:ext>
                 </a:extLst>
               </a:tr>
@@ -43085,7 +43764,7 @@
                 </a:tc>
                 <a:extLst>
                   <a:ext uri="{0D108BD9-81ED-4DB2-BD59-A6C34878D82A}">
-                    <a16:rowId xmlns:a16="http://schemas.microsoft.com/office/drawing/2014/main" xmlns="" val="2759032957"/>
+                    <a16:rowId xmlns="" xmlns:a16="http://schemas.microsoft.com/office/drawing/2014/main" val="2759032957"/>
                   </a:ext>
                 </a:extLst>
               </a:tr>
@@ -43181,14 +43860,14 @@
                 <a:gridCol w="934278">
                   <a:extLst>
                     <a:ext uri="{9D8B030D-6E8A-4147-A177-3AD203B41FA5}">
-                      <a16:colId xmlns:a16="http://schemas.microsoft.com/office/drawing/2014/main" xmlns="" val="4198655800"/>
+                      <a16:colId xmlns="" xmlns:a16="http://schemas.microsoft.com/office/drawing/2014/main" val="4198655800"/>
                     </a:ext>
                   </a:extLst>
                 </a:gridCol>
                 <a:gridCol w="7295322">
                   <a:extLst>
                     <a:ext uri="{9D8B030D-6E8A-4147-A177-3AD203B41FA5}">
-                      <a16:colId xmlns:a16="http://schemas.microsoft.com/office/drawing/2014/main" xmlns="" val="135413862"/>
+                      <a16:colId xmlns="" xmlns:a16="http://schemas.microsoft.com/office/drawing/2014/main" val="135413862"/>
                     </a:ext>
                   </a:extLst>
                 </a:gridCol>
@@ -43222,7 +43901,7 @@
                 </a:tc>
                 <a:extLst>
                   <a:ext uri="{0D108BD9-81ED-4DB2-BD59-A6C34878D82A}">
-                    <a16:rowId xmlns:a16="http://schemas.microsoft.com/office/drawing/2014/main" xmlns="" val="3068323444"/>
+                    <a16:rowId xmlns="" xmlns:a16="http://schemas.microsoft.com/office/drawing/2014/main" val="3068323444"/>
                   </a:ext>
                 </a:extLst>
               </a:tr>
@@ -43255,7 +43934,7 @@
                 </a:tc>
                 <a:extLst>
                   <a:ext uri="{0D108BD9-81ED-4DB2-BD59-A6C34878D82A}">
-                    <a16:rowId xmlns:a16="http://schemas.microsoft.com/office/drawing/2014/main" xmlns="" val="2484981654"/>
+                    <a16:rowId xmlns="" xmlns:a16="http://schemas.microsoft.com/office/drawing/2014/main" val="2484981654"/>
                   </a:ext>
                 </a:extLst>
               </a:tr>
@@ -43293,7 +43972,7 @@
                 </a:tc>
                 <a:extLst>
                   <a:ext uri="{0D108BD9-81ED-4DB2-BD59-A6C34878D82A}">
-                    <a16:rowId xmlns:a16="http://schemas.microsoft.com/office/drawing/2014/main" xmlns="" val="1377910784"/>
+                    <a16:rowId xmlns="" xmlns:a16="http://schemas.microsoft.com/office/drawing/2014/main" val="1377910784"/>
                   </a:ext>
                 </a:extLst>
               </a:tr>
@@ -43326,7 +44005,7 @@
                 </a:tc>
                 <a:extLst>
                   <a:ext uri="{0D108BD9-81ED-4DB2-BD59-A6C34878D82A}">
-                    <a16:rowId xmlns:a16="http://schemas.microsoft.com/office/drawing/2014/main" xmlns="" val="1387856053"/>
+                    <a16:rowId xmlns="" xmlns:a16="http://schemas.microsoft.com/office/drawing/2014/main" val="1387856053"/>
                   </a:ext>
                 </a:extLst>
               </a:tr>
@@ -43364,7 +44043,7 @@
                 </a:tc>
                 <a:extLst>
                   <a:ext uri="{0D108BD9-81ED-4DB2-BD59-A6C34878D82A}">
-                    <a16:rowId xmlns:a16="http://schemas.microsoft.com/office/drawing/2014/main" xmlns="" val="2599123823"/>
+                    <a16:rowId xmlns="" xmlns:a16="http://schemas.microsoft.com/office/drawing/2014/main" val="2599123823"/>
                   </a:ext>
                 </a:extLst>
               </a:tr>
@@ -43405,7 +44084,7 @@
                 </a:tc>
                 <a:extLst>
                   <a:ext uri="{0D108BD9-81ED-4DB2-BD59-A6C34878D82A}">
-                    <a16:rowId xmlns:a16="http://schemas.microsoft.com/office/drawing/2014/main" xmlns="" val="1232603862"/>
+                    <a16:rowId xmlns="" xmlns:a16="http://schemas.microsoft.com/office/drawing/2014/main" val="1232603862"/>
                   </a:ext>
                 </a:extLst>
               </a:tr>
@@ -43438,7 +44117,7 @@
                 </a:tc>
                 <a:extLst>
                   <a:ext uri="{0D108BD9-81ED-4DB2-BD59-A6C34878D82A}">
-                    <a16:rowId xmlns:a16="http://schemas.microsoft.com/office/drawing/2014/main" xmlns="" val="4145944521"/>
+                    <a16:rowId xmlns="" xmlns:a16="http://schemas.microsoft.com/office/drawing/2014/main" val="4145944521"/>
                   </a:ext>
                 </a:extLst>
               </a:tr>
@@ -43476,7 +44155,7 @@
                 </a:tc>
                 <a:extLst>
                   <a:ext uri="{0D108BD9-81ED-4DB2-BD59-A6C34878D82A}">
-                    <a16:rowId xmlns:a16="http://schemas.microsoft.com/office/drawing/2014/main" xmlns="" val="2954677722"/>
+                    <a16:rowId xmlns="" xmlns:a16="http://schemas.microsoft.com/office/drawing/2014/main" val="2954677722"/>
                   </a:ext>
                 </a:extLst>
               </a:tr>
@@ -43509,7 +44188,7 @@
                 </a:tc>
                 <a:extLst>
                   <a:ext uri="{0D108BD9-81ED-4DB2-BD59-A6C34878D82A}">
-                    <a16:rowId xmlns:a16="http://schemas.microsoft.com/office/drawing/2014/main" xmlns="" val="205903975"/>
+                    <a16:rowId xmlns="" xmlns:a16="http://schemas.microsoft.com/office/drawing/2014/main" val="205903975"/>
                   </a:ext>
                 </a:extLst>
               </a:tr>
@@ -43542,7 +44221,7 @@
                 </a:tc>
                 <a:extLst>
                   <a:ext uri="{0D108BD9-81ED-4DB2-BD59-A6C34878D82A}">
-                    <a16:rowId xmlns:a16="http://schemas.microsoft.com/office/drawing/2014/main" xmlns="" val="2893595017"/>
+                    <a16:rowId xmlns="" xmlns:a16="http://schemas.microsoft.com/office/drawing/2014/main" val="2893595017"/>
                   </a:ext>
                 </a:extLst>
               </a:tr>
@@ -43575,7 +44254,7 @@
                 </a:tc>
                 <a:extLst>
                   <a:ext uri="{0D108BD9-81ED-4DB2-BD59-A6C34878D82A}">
-                    <a16:rowId xmlns:a16="http://schemas.microsoft.com/office/drawing/2014/main" xmlns="" val="2337380595"/>
+                    <a16:rowId xmlns="" xmlns:a16="http://schemas.microsoft.com/office/drawing/2014/main" val="2337380595"/>
                   </a:ext>
                 </a:extLst>
               </a:tr>

</xml_diff>

<commit_message>
Updated presentation for NE.
</commit_message>
<xml_diff>
--- a/Optimizer.pptx
+++ b/Optimizer.pptx
@@ -268,7 +268,7 @@
           <a:p>
             <a:fld id="{2EDCB34D-5EC2-4739-9693-E425457AC201}" type="datetimeFigureOut">
               <a:rPr lang="en-US" smtClean="0"/>
-              <a:t>10/04/2016</a:t>
+              <a:t>10/05/2016</a:t>
             </a:fld>
             <a:endParaRPr lang="en-US"/>
           </a:p>
@@ -3095,7 +3095,7 @@
             <a:fld id="{5942B21B-2ADA-A040-A652-A7305E1B99FE}" type="datetimeFigureOut">
               <a:rPr lang="en-US" smtClean="0"/>
               <a:pPr/>
-              <a:t>10/04/2016</a:t>
+              <a:t>10/05/2016</a:t>
             </a:fld>
             <a:endParaRPr lang="en-US" dirty="0"/>
           </a:p>
@@ -3285,7 +3285,7 @@
           <a:p>
             <a:fld id="{5942B21B-2ADA-A040-A652-A7305E1B99FE}" type="datetimeFigureOut">
               <a:rPr lang="en-US" smtClean="0"/>
-              <a:t>10/04/2016</a:t>
+              <a:t>10/05/2016</a:t>
             </a:fld>
             <a:endParaRPr lang="en-US"/>
           </a:p>
@@ -3409,7 +3409,7 @@
             <a:fld id="{5942B21B-2ADA-A040-A652-A7305E1B99FE}" type="datetimeFigureOut">
               <a:rPr lang="en-US" smtClean="0"/>
               <a:pPr/>
-              <a:t>10/04/2016</a:t>
+              <a:t>10/05/2016</a:t>
             </a:fld>
             <a:r>
               <a:rPr lang="en-US"/>
@@ -3680,7 +3680,7 @@
             <a:fld id="{5942B21B-2ADA-A040-A652-A7305E1B99FE}" type="datetimeFigureOut">
               <a:rPr lang="en-US" smtClean="0"/>
               <a:pPr/>
-              <a:t>10/04/2016</a:t>
+              <a:t>10/05/2016</a:t>
             </a:fld>
             <a:r>
               <a:rPr lang="en-US" dirty="0"/>
@@ -3950,7 +3950,7 @@
             <a:fld id="{5942B21B-2ADA-A040-A652-A7305E1B99FE}" type="datetimeFigureOut">
               <a:rPr lang="en-US" smtClean="0"/>
               <a:pPr/>
-              <a:t>10/04/2016</a:t>
+              <a:t>10/05/2016</a:t>
             </a:fld>
             <a:r>
               <a:rPr lang="en-US" dirty="0"/>
@@ -4290,7 +4290,7 @@
             <a:fld id="{5942B21B-2ADA-A040-A652-A7305E1B99FE}" type="datetimeFigureOut">
               <a:rPr lang="en-US" smtClean="0"/>
               <a:pPr/>
-              <a:t>10/04/2016</a:t>
+              <a:t>10/05/2016</a:t>
             </a:fld>
             <a:r>
               <a:rPr lang="en-US" dirty="0"/>
@@ -4631,7 +4631,7 @@
             <a:fld id="{5942B21B-2ADA-A040-A652-A7305E1B99FE}" type="datetimeFigureOut">
               <a:rPr lang="en-US" smtClean="0"/>
               <a:pPr/>
-              <a:t>10/04/2016</a:t>
+              <a:t>10/05/2016</a:t>
             </a:fld>
             <a:r>
               <a:rPr lang="en-US" dirty="0"/>
@@ -5146,7 +5146,7 @@
             <a:fld id="{5942B21B-2ADA-A040-A652-A7305E1B99FE}" type="datetimeFigureOut">
               <a:rPr lang="en-US" smtClean="0"/>
               <a:pPr/>
-              <a:t>10/04/2016</a:t>
+              <a:t>10/05/2016</a:t>
             </a:fld>
             <a:r>
               <a:rPr lang="en-US" dirty="0"/>
@@ -5355,7 +5355,7 @@
             <a:fld id="{5942B21B-2ADA-A040-A652-A7305E1B99FE}" type="datetimeFigureOut">
               <a:rPr lang="en-US" smtClean="0"/>
               <a:pPr/>
-              <a:t>10/04/2016</a:t>
+              <a:t>10/05/2016</a:t>
             </a:fld>
             <a:r>
               <a:rPr lang="en-US" dirty="0"/>
@@ -5542,7 +5542,7 @@
             <a:fld id="{5942B21B-2ADA-A040-A652-A7305E1B99FE}" type="datetimeFigureOut">
               <a:rPr lang="en-US" smtClean="0"/>
               <a:pPr/>
-              <a:t>10/04/2016</a:t>
+              <a:t>10/05/2016</a:t>
             </a:fld>
             <a:r>
               <a:rPr lang="en-US" dirty="0"/>
@@ -5873,7 +5873,7 @@
             <a:fld id="{5942B21B-2ADA-A040-A652-A7305E1B99FE}" type="datetimeFigureOut">
               <a:rPr lang="en-US" smtClean="0"/>
               <a:pPr/>
-              <a:t>10/04/2016</a:t>
+              <a:t>10/05/2016</a:t>
             </a:fld>
             <a:r>
               <a:rPr lang="en-US" dirty="0"/>
@@ -6181,7 +6181,7 @@
             <a:fld id="{5942B21B-2ADA-A040-A652-A7305E1B99FE}" type="datetimeFigureOut">
               <a:rPr lang="en-US" smtClean="0"/>
               <a:pPr/>
-              <a:t>10/04/2016</a:t>
+              <a:t>10/05/2016</a:t>
             </a:fld>
             <a:r>
               <a:rPr lang="en-US" dirty="0"/>
@@ -6460,7 +6460,7 @@
             <a:fld id="{5942B21B-2ADA-A040-A652-A7305E1B99FE}" type="datetimeFigureOut">
               <a:rPr lang="en-US" smtClean="0"/>
               <a:pPr/>
-              <a:t>10/04/2016</a:t>
+              <a:t>10/05/2016</a:t>
             </a:fld>
             <a:r>
               <a:rPr lang="en-US" dirty="0"/>
@@ -7940,7 +7940,7 @@
               <a:t> </a:t>
             </a:r>
             <a:r>
-              <a:rPr lang="en-US" dirty="0">
+              <a:rPr lang="en-US" dirty="0" smtClean="0">
                 <a:solidFill>
                   <a:srgbClr val="FF0000"/>
                 </a:solidFill>
@@ -7948,7 +7948,7 @@
                 <a:ea typeface="Calibri" panose="020F0502020204030204" pitchFamily="34" charset="0"/>
                 <a:cs typeface="Times New Roman" panose="02020603050405020304" pitchFamily="18" charset="0"/>
               </a:rPr>
-              <a:t>'MN'</a:t>
+              <a:t>'NE'</a:t>
             </a:r>
             <a:endParaRPr lang="en-US" dirty="0">
               <a:latin typeface="Consolas" panose="020B0609020204030204" pitchFamily="49" charset="0"/>
@@ -8329,11 +8329,11 @@
   <p:clrMapOvr>
     <a:masterClrMapping/>
   </p:clrMapOvr>
-  <mc:AlternateContent xmlns:mc="http://schemas.openxmlformats.org/markup-compatibility/2006">
-    <mc:Choice xmlns:p14="http://schemas.microsoft.com/office/powerpoint/2010/main" Requires="p14">
+  <mc:AlternateContent xmlns:mc="http://schemas.openxmlformats.org/markup-compatibility/2006" xmlns:p14="http://schemas.microsoft.com/office/powerpoint/2010/main">
+    <mc:Choice Requires="p14">
       <p:transition spd="slow" p14:dur="2000"/>
     </mc:Choice>
-    <mc:Fallback>
+    <mc:Fallback xmlns="">
       <p:transition spd="slow"/>
     </mc:Fallback>
   </mc:AlternateContent>
@@ -9146,7 +9146,7 @@
               <a:t> </a:t>
             </a:r>
             <a:r>
-              <a:rPr lang="en-US" dirty="0">
+              <a:rPr lang="en-US" dirty="0" smtClean="0">
                 <a:solidFill>
                   <a:srgbClr val="FF0000"/>
                 </a:solidFill>
@@ -9154,7 +9154,7 @@
                 <a:ea typeface="Calibri" panose="020F0502020204030204" pitchFamily="34" charset="0"/>
                 <a:cs typeface="Times New Roman" panose="02020603050405020304" pitchFamily="18" charset="0"/>
               </a:rPr>
-              <a:t>'MN'</a:t>
+              <a:t>'NE'</a:t>
             </a:r>
             <a:endParaRPr lang="en-US" sz="2400" dirty="0">
               <a:latin typeface="Calibri" panose="020F0502020204030204" pitchFamily="34" charset="0"/>
@@ -9548,11 +9548,11 @@
   <p:clrMapOvr>
     <a:masterClrMapping/>
   </p:clrMapOvr>
-  <mc:AlternateContent xmlns:mc="http://schemas.openxmlformats.org/markup-compatibility/2006">
-    <mc:Choice xmlns:p14="http://schemas.microsoft.com/office/powerpoint/2010/main" Requires="p14">
+  <mc:AlternateContent xmlns:mc="http://schemas.openxmlformats.org/markup-compatibility/2006" xmlns:p14="http://schemas.microsoft.com/office/powerpoint/2010/main">
+    <mc:Choice Requires="p14">
       <p:transition spd="slow" p14:dur="2000"/>
     </mc:Choice>
-    <mc:Fallback>
+    <mc:Fallback xmlns="">
       <p:transition spd="slow"/>
     </mc:Fallback>
   </mc:AlternateContent>
@@ -10365,7 +10365,7 @@
               <a:t> </a:t>
             </a:r>
             <a:r>
-              <a:rPr lang="en-US" dirty="0">
+              <a:rPr lang="en-US" dirty="0" smtClean="0">
                 <a:solidFill>
                   <a:srgbClr val="FF0000"/>
                 </a:solidFill>
@@ -10373,7 +10373,7 @@
                 <a:ea typeface="Calibri" panose="020F0502020204030204" pitchFamily="34" charset="0"/>
                 <a:cs typeface="Times New Roman" panose="02020603050405020304" pitchFamily="18" charset="0"/>
               </a:rPr>
-              <a:t>'MN'</a:t>
+              <a:t>'NE'</a:t>
             </a:r>
             <a:endParaRPr lang="en-US" sz="2400" dirty="0">
               <a:latin typeface="Calibri" panose="020F0502020204030204" pitchFamily="34" charset="0"/>
@@ -10767,11 +10767,11 @@
   <p:clrMapOvr>
     <a:masterClrMapping/>
   </p:clrMapOvr>
-  <mc:AlternateContent xmlns:mc="http://schemas.openxmlformats.org/markup-compatibility/2006">
-    <mc:Choice xmlns:p14="http://schemas.microsoft.com/office/powerpoint/2010/main" Requires="p14">
+  <mc:AlternateContent xmlns:mc="http://schemas.openxmlformats.org/markup-compatibility/2006" xmlns:p14="http://schemas.microsoft.com/office/powerpoint/2010/main">
+    <mc:Choice Requires="p14">
       <p:transition spd="slow" p14:dur="2000"/>
     </mc:Choice>
-    <mc:Fallback>
+    <mc:Fallback xmlns="">
       <p:transition spd="slow"/>
     </mc:Fallback>
   </mc:AlternateContent>
@@ -11594,8 +11594,33 @@
                 <a:ea typeface="Calibri" panose="020F0502020204030204" pitchFamily="34" charset="0"/>
                 <a:cs typeface="Times New Roman" panose="02020603050405020304" pitchFamily="18" charset="0"/>
               </a:rPr>
-              <a:t> = 'MN'</a:t>
-            </a:r>
+              <a:t> = </a:t>
+            </a:r>
+            <a:r>
+              <a:rPr lang="en-US" dirty="0" smtClean="0">
+                <a:solidFill>
+                  <a:srgbClr val="008080"/>
+                </a:solidFill>
+                <a:highlight>
+                  <a:srgbClr val="FFFF00"/>
+                </a:highlight>
+                <a:latin typeface="Consolas" panose="020B0609020204030204" pitchFamily="49" charset="0"/>
+                <a:ea typeface="Calibri" panose="020F0502020204030204" pitchFamily="34" charset="0"/>
+                <a:cs typeface="Times New Roman" panose="02020603050405020304" pitchFamily="18" charset="0"/>
+              </a:rPr>
+              <a:t>'NE'</a:t>
+            </a:r>
+            <a:endParaRPr lang="en-US" dirty="0">
+              <a:solidFill>
+                <a:srgbClr val="008080"/>
+              </a:solidFill>
+              <a:highlight>
+                <a:srgbClr val="FFFF00"/>
+              </a:highlight>
+              <a:latin typeface="Consolas" panose="020B0609020204030204" pitchFamily="49" charset="0"/>
+              <a:ea typeface="Calibri" panose="020F0502020204030204" pitchFamily="34" charset="0"/>
+              <a:cs typeface="Times New Roman" panose="02020603050405020304" pitchFamily="18" charset="0"/>
+            </a:endParaRPr>
           </a:p>
           <a:p>
             <a:pPr>
@@ -11935,8 +11960,13 @@
             </a:pPr>
             <a:r>
               <a:rPr lang="en-US" sz="3000" dirty="0"/>
-              <a:t>Find rows in R4 where State = ‘MN’</a:t>
-            </a:r>
+              <a:t>Find rows in R4 where State = </a:t>
+            </a:r>
+            <a:r>
+              <a:rPr lang="en-US" sz="3000" dirty="0" smtClean="0"/>
+              <a:t>'NE'</a:t>
+            </a:r>
+            <a:endParaRPr lang="en-US" sz="3000" dirty="0"/>
           </a:p>
           <a:p>
             <a:pPr marL="457200" indent="-457200">
@@ -11970,11 +12000,11 @@
   <p:clrMapOvr>
     <a:masterClrMapping/>
   </p:clrMapOvr>
-  <mc:AlternateContent xmlns:mc="http://schemas.openxmlformats.org/markup-compatibility/2006">
-    <mc:Choice xmlns:p14="http://schemas.microsoft.com/office/powerpoint/2010/main" Requires="p14">
+  <mc:AlternateContent xmlns:mc="http://schemas.openxmlformats.org/markup-compatibility/2006" xmlns:p14="http://schemas.microsoft.com/office/powerpoint/2010/main">
+    <mc:Choice Requires="p14">
       <p:transition spd="slow" p14:dur="2000"/>
     </mc:Choice>
-    <mc:Fallback>
+    <mc:Fallback xmlns="">
       <p:transition spd="slow"/>
     </mc:Fallback>
   </mc:AlternateContent>
@@ -12837,7 +12867,7 @@
               <a:t> </a:t>
             </a:r>
             <a:r>
-              <a:rPr lang="en-US" dirty="0">
+              <a:rPr lang="en-US" dirty="0" smtClean="0">
                 <a:solidFill>
                   <a:srgbClr val="FF0000"/>
                 </a:solidFill>
@@ -12845,7 +12875,7 @@
                 <a:ea typeface="Calibri" panose="020F0502020204030204" pitchFamily="34" charset="0"/>
                 <a:cs typeface="Times New Roman" panose="02020603050405020304" pitchFamily="18" charset="0"/>
               </a:rPr>
-              <a:t>'MN'</a:t>
+              <a:t>'NE'</a:t>
             </a:r>
             <a:endParaRPr lang="en-US" sz="2400" dirty="0">
               <a:latin typeface="Calibri" panose="020F0502020204030204" pitchFamily="34" charset="0"/>
@@ -13226,11 +13256,11 @@
   <p:clrMapOvr>
     <a:masterClrMapping/>
   </p:clrMapOvr>
-  <mc:AlternateContent xmlns:mc="http://schemas.openxmlformats.org/markup-compatibility/2006">
-    <mc:Choice xmlns:p14="http://schemas.microsoft.com/office/powerpoint/2010/main" Requires="p14">
+  <mc:AlternateContent xmlns:mc="http://schemas.openxmlformats.org/markup-compatibility/2006" xmlns:p14="http://schemas.microsoft.com/office/powerpoint/2010/main">
+    <mc:Choice Requires="p14">
       <p:transition spd="slow" p14:dur="2000"/>
     </mc:Choice>
-    <mc:Fallback>
+    <mc:Fallback xmlns="">
       <p:transition spd="slow"/>
     </mc:Fallback>
   </mc:AlternateContent>
@@ -14093,7 +14123,7 @@
               <a:t> </a:t>
             </a:r>
             <a:r>
-              <a:rPr lang="en-US" dirty="0">
+              <a:rPr lang="en-US" dirty="0" smtClean="0">
                 <a:solidFill>
                   <a:srgbClr val="FF0000"/>
                 </a:solidFill>
@@ -14101,7 +14131,7 @@
                 <a:ea typeface="Calibri" panose="020F0502020204030204" pitchFamily="34" charset="0"/>
                 <a:cs typeface="Times New Roman" panose="02020603050405020304" pitchFamily="18" charset="0"/>
               </a:rPr>
-              <a:t>'MN'</a:t>
+              <a:t>'NE'</a:t>
             </a:r>
             <a:endParaRPr lang="en-US" sz="2400" dirty="0">
               <a:latin typeface="Calibri" panose="020F0502020204030204" pitchFamily="34" charset="0"/>
@@ -14408,11 +14438,11 @@
   <p:clrMapOvr>
     <a:masterClrMapping/>
   </p:clrMapOvr>
-  <mc:AlternateContent xmlns:mc="http://schemas.openxmlformats.org/markup-compatibility/2006">
-    <mc:Choice xmlns:p14="http://schemas.microsoft.com/office/powerpoint/2010/main" Requires="p14">
+  <mc:AlternateContent xmlns:mc="http://schemas.openxmlformats.org/markup-compatibility/2006" xmlns:p14="http://schemas.microsoft.com/office/powerpoint/2010/main">
+    <mc:Choice Requires="p14">
       <p:transition spd="slow" p14:dur="2000"/>
     </mc:Choice>
-    <mc:Fallback>
+    <mc:Fallback xmlns="">
       <p:transition spd="slow"/>
     </mc:Fallback>
   </mc:AlternateContent>
@@ -15198,7 +15228,7 @@
               <a:t> </a:t>
             </a:r>
             <a:r>
-              <a:rPr lang="en-US" dirty="0">
+              <a:rPr lang="en-US" dirty="0" smtClean="0">
                 <a:solidFill>
                   <a:srgbClr val="FF0000"/>
                 </a:solidFill>
@@ -15206,7 +15236,7 @@
                 <a:ea typeface="Calibri" panose="020F0502020204030204" pitchFamily="34" charset="0"/>
                 <a:cs typeface="Times New Roman" panose="02020603050405020304" pitchFamily="18" charset="0"/>
               </a:rPr>
-              <a:t>'MN'</a:t>
+              <a:t>'NE'</a:t>
             </a:r>
             <a:endParaRPr lang="en-US" sz="2400" dirty="0">
               <a:latin typeface="Calibri" panose="020F0502020204030204" pitchFamily="34" charset="0"/>
@@ -15636,11 +15666,11 @@
   <p:clrMapOvr>
     <a:masterClrMapping/>
   </p:clrMapOvr>
-  <mc:AlternateContent xmlns:mc="http://schemas.openxmlformats.org/markup-compatibility/2006">
-    <mc:Choice xmlns:p14="http://schemas.microsoft.com/office/powerpoint/2010/main" Requires="p14">
+  <mc:AlternateContent xmlns:mc="http://schemas.openxmlformats.org/markup-compatibility/2006" xmlns:p14="http://schemas.microsoft.com/office/powerpoint/2010/main">
+    <mc:Choice Requires="p14">
       <p:transition spd="slow" p14:dur="2000"/>
     </mc:Choice>
-    <mc:Fallback>
+    <mc:Fallback xmlns="">
       <p:transition spd="slow"/>
     </mc:Fallback>
   </mc:AlternateContent>
@@ -16503,7 +16533,7 @@
               <a:t> </a:t>
             </a:r>
             <a:r>
-              <a:rPr lang="en-US" dirty="0">
+              <a:rPr lang="en-US" dirty="0" smtClean="0">
                 <a:solidFill>
                   <a:srgbClr val="FF0000"/>
                 </a:solidFill>
@@ -16511,7 +16541,7 @@
                 <a:ea typeface="Calibri" panose="020F0502020204030204" pitchFamily="34" charset="0"/>
                 <a:cs typeface="Times New Roman" panose="02020603050405020304" pitchFamily="18" charset="0"/>
               </a:rPr>
-              <a:t>'MN'</a:t>
+              <a:t>'NE'</a:t>
             </a:r>
             <a:endParaRPr lang="en-US" sz="2400" dirty="0">
               <a:latin typeface="Calibri" panose="020F0502020204030204" pitchFamily="34" charset="0"/>
@@ -16855,11 +16885,11 @@
   <p:clrMapOvr>
     <a:masterClrMapping/>
   </p:clrMapOvr>
-  <mc:AlternateContent xmlns:mc="http://schemas.openxmlformats.org/markup-compatibility/2006">
-    <mc:Choice xmlns:p14="http://schemas.microsoft.com/office/powerpoint/2010/main" Requires="p14">
+  <mc:AlternateContent xmlns:mc="http://schemas.openxmlformats.org/markup-compatibility/2006" xmlns:p14="http://schemas.microsoft.com/office/powerpoint/2010/main">
+    <mc:Choice Requires="p14">
       <p:transition spd="slow" p14:dur="2000"/>
     </mc:Choice>
-    <mc:Fallback>
+    <mc:Fallback xmlns="">
       <p:transition spd="slow"/>
     </mc:Fallback>
   </mc:AlternateContent>
@@ -17717,7 +17747,7 @@
               <a:t>= </a:t>
             </a:r>
             <a:r>
-              <a:rPr lang="en-US" dirty="0">
+              <a:rPr lang="en-US" dirty="0" smtClean="0">
                 <a:solidFill>
                   <a:srgbClr val="FF0000"/>
                 </a:solidFill>
@@ -17725,7 +17755,7 @@
                 <a:ea typeface="Calibri" panose="020F0502020204030204" pitchFamily="34" charset="0"/>
                 <a:cs typeface="Times New Roman" panose="02020603050405020304" pitchFamily="18" charset="0"/>
               </a:rPr>
-              <a:t>'MN'</a:t>
+              <a:t>'NE'</a:t>
             </a:r>
             <a:endParaRPr lang="en-US" sz="2400" dirty="0">
               <a:latin typeface="Calibri" panose="020F0502020204030204" pitchFamily="34" charset="0"/>
@@ -18127,11 +18157,11 @@
   <p:clrMapOvr>
     <a:masterClrMapping/>
   </p:clrMapOvr>
-  <mc:AlternateContent xmlns:mc="http://schemas.openxmlformats.org/markup-compatibility/2006">
-    <mc:Choice xmlns:p14="http://schemas.microsoft.com/office/powerpoint/2010/main" Requires="p14">
+  <mc:AlternateContent xmlns:mc="http://schemas.openxmlformats.org/markup-compatibility/2006" xmlns:p14="http://schemas.microsoft.com/office/powerpoint/2010/main">
+    <mc:Choice Requires="p14">
       <p:transition spd="slow" p14:dur="2000"/>
     </mc:Choice>
-    <mc:Fallback>
+    <mc:Fallback xmlns="">
       <p:transition spd="slow"/>
     </mc:Fallback>
   </mc:AlternateContent>
@@ -18820,7 +18850,7 @@
               <a:t> </a:t>
             </a:r>
             <a:r>
-              <a:rPr lang="en-US" dirty="0">
+              <a:rPr lang="en-US" dirty="0" smtClean="0">
                 <a:solidFill>
                   <a:srgbClr val="FF0000"/>
                 </a:solidFill>
@@ -18828,7 +18858,7 @@
                 <a:ea typeface="Calibri" panose="020F0502020204030204" pitchFamily="34" charset="0"/>
                 <a:cs typeface="Times New Roman" panose="02020603050405020304" pitchFamily="18" charset="0"/>
               </a:rPr>
-              <a:t>'MN'</a:t>
+              <a:t>'NE'</a:t>
             </a:r>
             <a:endParaRPr lang="en-US" sz="2400" dirty="0">
               <a:latin typeface="Calibri" panose="020F0502020204030204" pitchFamily="34" charset="0"/>
@@ -21470,7 +21500,7 @@
       </p:sp>
       <p:pic>
         <p:nvPicPr>
-          <p:cNvPr id="4" name="Picture 3"/>
+          <p:cNvPr id="3" name="Picture 2"/>
           <p:cNvPicPr>
             <a:picLocks noChangeAspect="1"/>
           </p:cNvPicPr>
@@ -21485,7 +21515,7 @@
         <p:spPr>
           <a:xfrm>
             <a:off x="1243584" y="1389888"/>
-            <a:ext cx="6894576" cy="4629356"/>
+            <a:ext cx="6890865" cy="4626864"/>
           </a:xfrm>
           <a:prstGeom prst="rect">
             <a:avLst/>
@@ -23836,26 +23866,26 @@
               <a:t> </a:t>
             </a:r>
             <a:r>
-              <a:rPr lang="en-US" sz="1600" dirty="0">
-                <a:solidFill>
-                  <a:srgbClr val="808080"/>
-                </a:solidFill>
-                <a:latin typeface="Consolas" panose="020B0609020204030204" pitchFamily="49" charset="0"/>
-                <a:ea typeface="Calibri" panose="020F0502020204030204" pitchFamily="34" charset="0"/>
-                <a:cs typeface="Times New Roman" panose="02020603050405020304" pitchFamily="18" charset="0"/>
-              </a:rPr>
-              <a:t>in</a:t>
-            </a:r>
-            <a:r>
-              <a:rPr lang="en-US" sz="1600" dirty="0">
-                <a:latin typeface="Consolas" panose="020B0609020204030204" pitchFamily="49" charset="0"/>
-                <a:ea typeface="Calibri" panose="020F0502020204030204" pitchFamily="34" charset="0"/>
-                <a:cs typeface="Times New Roman" panose="02020603050405020304" pitchFamily="18" charset="0"/>
-              </a:rPr>
-              <a:t> (</a:t>
-            </a:r>
-            <a:r>
-              <a:rPr lang="en-US" sz="1600" dirty="0">
+              <a:rPr lang="en-US" sz="1600" dirty="0" smtClean="0">
+                <a:solidFill>
+                  <a:srgbClr val="808080"/>
+                </a:solidFill>
+                <a:latin typeface="Consolas" panose="020B0609020204030204" pitchFamily="49" charset="0"/>
+                <a:ea typeface="Calibri" panose="020F0502020204030204" pitchFamily="34" charset="0"/>
+                <a:cs typeface="Times New Roman" panose="02020603050405020304" pitchFamily="18" charset="0"/>
+              </a:rPr>
+              <a:t>=</a:t>
+            </a:r>
+            <a:r>
+              <a:rPr lang="en-US" sz="1600" dirty="0" smtClean="0">
+                <a:latin typeface="Consolas" panose="020B0609020204030204" pitchFamily="49" charset="0"/>
+                <a:ea typeface="Calibri" panose="020F0502020204030204" pitchFamily="34" charset="0"/>
+                <a:cs typeface="Times New Roman" panose="02020603050405020304" pitchFamily="18" charset="0"/>
+              </a:rPr>
+              <a:t> </a:t>
+            </a:r>
+            <a:r>
+              <a:rPr lang="en-US" sz="1600" dirty="0" smtClean="0">
                 <a:solidFill>
                   <a:srgbClr val="FF0000"/>
                 </a:solidFill>
@@ -23863,10 +23893,10 @@
                 <a:ea typeface="Calibri" panose="020F0502020204030204" pitchFamily="34" charset="0"/>
                 <a:cs typeface="Times New Roman" panose="02020603050405020304" pitchFamily="18" charset="0"/>
               </a:rPr>
-              <a:t>'KS', 'MO'</a:t>
-            </a:r>
-            <a:r>
-              <a:rPr lang="en-US" sz="1600" dirty="0">
+              <a:t>'NE'</a:t>
+            </a:r>
+            <a:r>
+              <a:rPr lang="en-US" sz="1600" dirty="0" smtClean="0">
                 <a:latin typeface="Consolas" panose="020B0609020204030204" pitchFamily="49" charset="0"/>
                 <a:ea typeface="Calibri" panose="020F0502020204030204" pitchFamily="34" charset="0"/>
                 <a:cs typeface="Times New Roman" panose="02020603050405020304" pitchFamily="18" charset="0"/>
@@ -26179,7 +26209,7 @@
               <a:t>= </a:t>
             </a:r>
             <a:r>
-              <a:rPr lang="en-US" sz="1400" dirty="0">
+              <a:rPr lang="en-US" sz="1400" dirty="0" smtClean="0">
                 <a:solidFill>
                   <a:srgbClr val="FF0000"/>
                 </a:solidFill>
@@ -26187,7 +26217,7 @@
                 <a:ea typeface="Calibri" panose="020F0502020204030204" pitchFamily="34" charset="0"/>
                 <a:cs typeface="Times New Roman" panose="02020603050405020304" pitchFamily="18" charset="0"/>
               </a:rPr>
-              <a:t>'MN'</a:t>
+              <a:t>'NE'</a:t>
             </a:r>
             <a:endParaRPr lang="en-US" sz="1400" dirty="0">
               <a:solidFill>
@@ -26452,7 +26482,7 @@
       </p:sp>
       <p:pic>
         <p:nvPicPr>
-          <p:cNvPr id="4" name="Picture 3"/>
+          <p:cNvPr id="3" name="Picture 2"/>
           <p:cNvPicPr>
             <a:picLocks noChangeAspect="1"/>
           </p:cNvPicPr>
@@ -27283,7 +27313,7 @@
               <a:t>= </a:t>
             </a:r>
             <a:r>
-              <a:rPr lang="en-US" sz="1400" dirty="0">
+              <a:rPr lang="en-US" sz="1400" dirty="0" smtClean="0">
                 <a:solidFill>
                   <a:srgbClr val="FF0000"/>
                 </a:solidFill>
@@ -27291,7 +27321,7 @@
                 <a:ea typeface="Calibri" panose="020F0502020204030204" pitchFamily="34" charset="0"/>
                 <a:cs typeface="Times New Roman" panose="02020603050405020304" pitchFamily="18" charset="0"/>
               </a:rPr>
-              <a:t>'MN'</a:t>
+              <a:t>'NE'</a:t>
             </a:r>
             <a:endParaRPr lang="en-US" dirty="0">
               <a:latin typeface="Calibri" panose="020F0502020204030204" pitchFamily="34" charset="0"/>
@@ -27827,30 +27857,6 @@
           </a:p>
         </p:txBody>
       </p:sp>
-      <p:pic>
-        <p:nvPicPr>
-          <p:cNvPr id="4" name="Picture 3"/>
-          <p:cNvPicPr>
-            <a:picLocks noChangeAspect="1"/>
-          </p:cNvPicPr>
-          <p:nvPr/>
-        </p:nvPicPr>
-        <p:blipFill>
-          <a:blip r:embed="rId3"/>
-          <a:stretch>
-            <a:fillRect/>
-          </a:stretch>
-        </p:blipFill>
-        <p:spPr>
-          <a:xfrm>
-            <a:off x="3246120" y="539496"/>
-            <a:ext cx="5421612" cy="5678424"/>
-          </a:xfrm>
-          <a:prstGeom prst="rect">
-            <a:avLst/>
-          </a:prstGeom>
-        </p:spPr>
-      </p:pic>
       <p:sp>
         <p:nvSpPr>
           <p:cNvPr id="6" name="Oval 5"/>
@@ -27892,6 +27898,30 @@
           </a:p>
         </p:txBody>
       </p:sp>
+      <p:pic>
+        <p:nvPicPr>
+          <p:cNvPr id="3" name="Picture 2"/>
+          <p:cNvPicPr>
+            <a:picLocks noChangeAspect="1"/>
+          </p:cNvPicPr>
+          <p:nvPr/>
+        </p:nvPicPr>
+        <p:blipFill>
+          <a:blip r:embed="rId3"/>
+          <a:stretch>
+            <a:fillRect/>
+          </a:stretch>
+        </p:blipFill>
+        <p:spPr>
+          <a:xfrm>
+            <a:off x="3246120" y="539496"/>
+            <a:ext cx="5421612" cy="5678424"/>
+          </a:xfrm>
+          <a:prstGeom prst="rect">
+            <a:avLst/>
+          </a:prstGeom>
+        </p:spPr>
+      </p:pic>
     </p:spTree>
     <p:extLst>
       <p:ext uri="{BB962C8B-B14F-4D97-AF65-F5344CB8AC3E}">
@@ -28748,11 +28778,11 @@
   <p:clrMapOvr>
     <a:masterClrMapping/>
   </p:clrMapOvr>
-  <mc:AlternateContent xmlns:mc="http://schemas.openxmlformats.org/markup-compatibility/2006">
-    <mc:Choice xmlns:p14="http://schemas.microsoft.com/office/powerpoint/2010/main" Requires="p14">
+  <mc:AlternateContent xmlns:mc="http://schemas.openxmlformats.org/markup-compatibility/2006" xmlns:p14="http://schemas.microsoft.com/office/powerpoint/2010/main">
+    <mc:Choice Requires="p14">
       <p:transition spd="slow" p14:dur="2000"/>
     </mc:Choice>
-    <mc:Fallback>
+    <mc:Fallback xmlns="">
       <p:transition spd="slow"/>
     </mc:Fallback>
   </mc:AlternateContent>
@@ -29108,14 +29138,14 @@
                 <a:gridCol w="7632835">
                   <a:extLst>
                     <a:ext uri="{9D8B030D-6E8A-4147-A177-3AD203B41FA5}">
-                      <a16:colId xmlns:a16="http://schemas.microsoft.com/office/drawing/2014/main" xmlns="" val="3644048045"/>
+                      <a16:colId xmlns="" xmlns:a16="http://schemas.microsoft.com/office/drawing/2014/main" val="3644048045"/>
                     </a:ext>
                   </a:extLst>
                 </a:gridCol>
                 <a:gridCol w="606393">
                   <a:extLst>
                     <a:ext uri="{9D8B030D-6E8A-4147-A177-3AD203B41FA5}">
-                      <a16:colId xmlns:a16="http://schemas.microsoft.com/office/drawing/2014/main" xmlns="" val="2034254753"/>
+                      <a16:colId xmlns="" xmlns:a16="http://schemas.microsoft.com/office/drawing/2014/main" val="2034254753"/>
                     </a:ext>
                   </a:extLst>
                 </a:gridCol>
@@ -29146,7 +29176,7 @@
                 </a:tc>
                 <a:extLst>
                   <a:ext uri="{0D108BD9-81ED-4DB2-BD59-A6C34878D82A}">
-                    <a16:rowId xmlns:a16="http://schemas.microsoft.com/office/drawing/2014/main" xmlns="" val="2708275910"/>
+                    <a16:rowId xmlns="" xmlns:a16="http://schemas.microsoft.com/office/drawing/2014/main" val="2708275910"/>
                   </a:ext>
                 </a:extLst>
               </a:tr>
@@ -29180,7 +29210,7 @@
                 </a:tc>
                 <a:extLst>
                   <a:ext uri="{0D108BD9-81ED-4DB2-BD59-A6C34878D82A}">
-                    <a16:rowId xmlns:a16="http://schemas.microsoft.com/office/drawing/2014/main" xmlns="" val="2161984115"/>
+                    <a16:rowId xmlns="" xmlns:a16="http://schemas.microsoft.com/office/drawing/2014/main" val="2161984115"/>
                   </a:ext>
                 </a:extLst>
               </a:tr>
@@ -29227,7 +29257,7 @@
                 </a:tc>
                 <a:extLst>
                   <a:ext uri="{0D108BD9-81ED-4DB2-BD59-A6C34878D82A}">
-                    <a16:rowId xmlns:a16="http://schemas.microsoft.com/office/drawing/2014/main" xmlns="" val="2841678841"/>
+                    <a16:rowId xmlns="" xmlns:a16="http://schemas.microsoft.com/office/drawing/2014/main" val="2841678841"/>
                   </a:ext>
                 </a:extLst>
               </a:tr>
@@ -29261,7 +29291,7 @@
                 </a:tc>
                 <a:extLst>
                   <a:ext uri="{0D108BD9-81ED-4DB2-BD59-A6C34878D82A}">
-                    <a16:rowId xmlns:a16="http://schemas.microsoft.com/office/drawing/2014/main" xmlns="" val="3144998627"/>
+                    <a16:rowId xmlns="" xmlns:a16="http://schemas.microsoft.com/office/drawing/2014/main" val="3144998627"/>
                   </a:ext>
                 </a:extLst>
               </a:tr>
@@ -29303,7 +29333,7 @@
                 </a:tc>
                 <a:extLst>
                   <a:ext uri="{0D108BD9-81ED-4DB2-BD59-A6C34878D82A}">
-                    <a16:rowId xmlns:a16="http://schemas.microsoft.com/office/drawing/2014/main" xmlns="" val="1419261869"/>
+                    <a16:rowId xmlns="" xmlns:a16="http://schemas.microsoft.com/office/drawing/2014/main" val="1419261869"/>
                   </a:ext>
                 </a:extLst>
               </a:tr>
@@ -29341,7 +29371,7 @@
                 </a:tc>
                 <a:extLst>
                   <a:ext uri="{0D108BD9-81ED-4DB2-BD59-A6C34878D82A}">
-                    <a16:rowId xmlns:a16="http://schemas.microsoft.com/office/drawing/2014/main" xmlns="" val="1427391072"/>
+                    <a16:rowId xmlns="" xmlns:a16="http://schemas.microsoft.com/office/drawing/2014/main" val="1427391072"/>
                   </a:ext>
                 </a:extLst>
               </a:tr>
@@ -29388,7 +29418,7 @@
                 </a:tc>
                 <a:extLst>
                   <a:ext uri="{0D108BD9-81ED-4DB2-BD59-A6C34878D82A}">
-                    <a16:rowId xmlns:a16="http://schemas.microsoft.com/office/drawing/2014/main" xmlns="" val="2346539918"/>
+                    <a16:rowId xmlns="" xmlns:a16="http://schemas.microsoft.com/office/drawing/2014/main" val="2346539918"/>
                   </a:ext>
                 </a:extLst>
               </a:tr>
@@ -29427,7 +29457,7 @@
                 </a:tc>
                 <a:extLst>
                   <a:ext uri="{0D108BD9-81ED-4DB2-BD59-A6C34878D82A}">
-                    <a16:rowId xmlns:a16="http://schemas.microsoft.com/office/drawing/2014/main" xmlns="" val="2275483042"/>
+                    <a16:rowId xmlns="" xmlns:a16="http://schemas.microsoft.com/office/drawing/2014/main" val="2275483042"/>
                   </a:ext>
                 </a:extLst>
               </a:tr>
@@ -29465,7 +29495,7 @@
                 </a:tc>
                 <a:extLst>
                   <a:ext uri="{0D108BD9-81ED-4DB2-BD59-A6C34878D82A}">
-                    <a16:rowId xmlns:a16="http://schemas.microsoft.com/office/drawing/2014/main" xmlns="" val="4202569347"/>
+                    <a16:rowId xmlns="" xmlns:a16="http://schemas.microsoft.com/office/drawing/2014/main" val="4202569347"/>
                   </a:ext>
                 </a:extLst>
               </a:tr>
@@ -29499,7 +29529,7 @@
                 </a:tc>
                 <a:extLst>
                   <a:ext uri="{0D108BD9-81ED-4DB2-BD59-A6C34878D82A}">
-                    <a16:rowId xmlns:a16="http://schemas.microsoft.com/office/drawing/2014/main" xmlns="" val="2989839269"/>
+                    <a16:rowId xmlns="" xmlns:a16="http://schemas.microsoft.com/office/drawing/2014/main" val="2989839269"/>
                   </a:ext>
                 </a:extLst>
               </a:tr>
@@ -29533,7 +29563,7 @@
                 </a:tc>
                 <a:extLst>
                   <a:ext uri="{0D108BD9-81ED-4DB2-BD59-A6C34878D82A}">
-                    <a16:rowId xmlns:a16="http://schemas.microsoft.com/office/drawing/2014/main" xmlns="" val="2130545569"/>
+                    <a16:rowId xmlns="" xmlns:a16="http://schemas.microsoft.com/office/drawing/2014/main" val="2130545569"/>
                   </a:ext>
                 </a:extLst>
               </a:tr>
@@ -29589,7 +29619,7 @@
                 </a:tc>
                 <a:extLst>
                   <a:ext uri="{0D108BD9-81ED-4DB2-BD59-A6C34878D82A}">
-                    <a16:rowId xmlns:a16="http://schemas.microsoft.com/office/drawing/2014/main" xmlns="" val="1848127216"/>
+                    <a16:rowId xmlns="" xmlns:a16="http://schemas.microsoft.com/office/drawing/2014/main" val="1848127216"/>
                   </a:ext>
                 </a:extLst>
               </a:tr>
@@ -29683,11 +29713,11 @@
   <p:clrMapOvr>
     <a:masterClrMapping/>
   </p:clrMapOvr>
-  <mc:AlternateContent xmlns:mc="http://schemas.openxmlformats.org/markup-compatibility/2006">
-    <mc:Choice xmlns:p14="http://schemas.microsoft.com/office/powerpoint/2010/main" Requires="p14">
+  <mc:AlternateContent xmlns:mc="http://schemas.openxmlformats.org/markup-compatibility/2006" xmlns:p14="http://schemas.microsoft.com/office/powerpoint/2010/main">
+    <mc:Choice Requires="p14">
       <p:transition spd="slow" p14:dur="2000"/>
     </mc:Choice>
-    <mc:Fallback>
+    <mc:Fallback xmlns="">
       <p:transition spd="slow"/>
     </mc:Fallback>
   </mc:AlternateContent>
@@ -30043,14 +30073,14 @@
                 <a:gridCol w="4119615">
                   <a:extLst>
                     <a:ext uri="{9D8B030D-6E8A-4147-A177-3AD203B41FA5}">
-                      <a16:colId xmlns:a16="http://schemas.microsoft.com/office/drawing/2014/main" xmlns="" val="3644048045"/>
+                      <a16:colId xmlns="" xmlns:a16="http://schemas.microsoft.com/office/drawing/2014/main" val="3644048045"/>
                     </a:ext>
                   </a:extLst>
                 </a:gridCol>
                 <a:gridCol w="4119613">
                   <a:extLst>
                     <a:ext uri="{9D8B030D-6E8A-4147-A177-3AD203B41FA5}">
-                      <a16:colId xmlns:a16="http://schemas.microsoft.com/office/drawing/2014/main" xmlns="" val="2034254753"/>
+                      <a16:colId xmlns="" xmlns:a16="http://schemas.microsoft.com/office/drawing/2014/main" val="2034254753"/>
                     </a:ext>
                   </a:extLst>
                 </a:gridCol>
@@ -30086,7 +30116,7 @@
                 </a:tc>
                 <a:extLst>
                   <a:ext uri="{0D108BD9-81ED-4DB2-BD59-A6C34878D82A}">
-                    <a16:rowId xmlns:a16="http://schemas.microsoft.com/office/drawing/2014/main" xmlns="" val="2708275910"/>
+                    <a16:rowId xmlns="" xmlns:a16="http://schemas.microsoft.com/office/drawing/2014/main" val="2708275910"/>
                   </a:ext>
                 </a:extLst>
               </a:tr>
@@ -30286,7 +30316,7 @@
                 </a:tc>
                 <a:extLst>
                   <a:ext uri="{0D108BD9-81ED-4DB2-BD59-A6C34878D82A}">
-                    <a16:rowId xmlns:a16="http://schemas.microsoft.com/office/drawing/2014/main" xmlns="" val="2161984115"/>
+                    <a16:rowId xmlns="" xmlns:a16="http://schemas.microsoft.com/office/drawing/2014/main" val="2161984115"/>
                   </a:ext>
                 </a:extLst>
               </a:tr>
@@ -30486,7 +30516,7 @@
                 </a:tc>
                 <a:extLst>
                   <a:ext uri="{0D108BD9-81ED-4DB2-BD59-A6C34878D82A}">
-                    <a16:rowId xmlns:a16="http://schemas.microsoft.com/office/drawing/2014/main" xmlns="" val="2841678841"/>
+                    <a16:rowId xmlns="" xmlns:a16="http://schemas.microsoft.com/office/drawing/2014/main" val="2841678841"/>
                   </a:ext>
                 </a:extLst>
               </a:tr>
@@ -30686,7 +30716,7 @@
                 </a:tc>
                 <a:extLst>
                   <a:ext uri="{0D108BD9-81ED-4DB2-BD59-A6C34878D82A}">
-                    <a16:rowId xmlns:a16="http://schemas.microsoft.com/office/drawing/2014/main" xmlns="" val="3144998627"/>
+                    <a16:rowId xmlns="" xmlns:a16="http://schemas.microsoft.com/office/drawing/2014/main" val="3144998627"/>
                   </a:ext>
                 </a:extLst>
               </a:tr>
@@ -30886,7 +30916,7 @@
                 </a:tc>
                 <a:extLst>
                   <a:ext uri="{0D108BD9-81ED-4DB2-BD59-A6C34878D82A}">
-                    <a16:rowId xmlns:a16="http://schemas.microsoft.com/office/drawing/2014/main" xmlns="" val="1419261869"/>
+                    <a16:rowId xmlns="" xmlns:a16="http://schemas.microsoft.com/office/drawing/2014/main" val="1419261869"/>
                   </a:ext>
                 </a:extLst>
               </a:tr>
@@ -31086,7 +31116,7 @@
                 </a:tc>
                 <a:extLst>
                   <a:ext uri="{0D108BD9-81ED-4DB2-BD59-A6C34878D82A}">
-                    <a16:rowId xmlns:a16="http://schemas.microsoft.com/office/drawing/2014/main" xmlns="" val="1427391072"/>
+                    <a16:rowId xmlns="" xmlns:a16="http://schemas.microsoft.com/office/drawing/2014/main" val="1427391072"/>
                   </a:ext>
                 </a:extLst>
               </a:tr>
@@ -31286,7 +31316,7 @@
                 </a:tc>
                 <a:extLst>
                   <a:ext uri="{0D108BD9-81ED-4DB2-BD59-A6C34878D82A}">
-                    <a16:rowId xmlns:a16="http://schemas.microsoft.com/office/drawing/2014/main" xmlns="" val="2346539918"/>
+                    <a16:rowId xmlns="" xmlns:a16="http://schemas.microsoft.com/office/drawing/2014/main" val="2346539918"/>
                   </a:ext>
                 </a:extLst>
               </a:tr>
@@ -31495,7 +31525,7 @@
                 </a:tc>
                 <a:extLst>
                   <a:ext uri="{0D108BD9-81ED-4DB2-BD59-A6C34878D82A}">
-                    <a16:rowId xmlns:a16="http://schemas.microsoft.com/office/drawing/2014/main" xmlns="" val="2275483042"/>
+                    <a16:rowId xmlns="" xmlns:a16="http://schemas.microsoft.com/office/drawing/2014/main" val="2275483042"/>
                   </a:ext>
                 </a:extLst>
               </a:tr>
@@ -31704,7 +31734,7 @@
                 </a:tc>
                 <a:extLst>
                   <a:ext uri="{0D108BD9-81ED-4DB2-BD59-A6C34878D82A}">
-                    <a16:rowId xmlns:a16="http://schemas.microsoft.com/office/drawing/2014/main" xmlns="" val="4202569347"/>
+                    <a16:rowId xmlns="" xmlns:a16="http://schemas.microsoft.com/office/drawing/2014/main" val="4202569347"/>
                   </a:ext>
                 </a:extLst>
               </a:tr>
@@ -31913,7 +31943,7 @@
                 </a:tc>
                 <a:extLst>
                   <a:ext uri="{0D108BD9-81ED-4DB2-BD59-A6C34878D82A}">
-                    <a16:rowId xmlns:a16="http://schemas.microsoft.com/office/drawing/2014/main" xmlns="" val="2989839269"/>
+                    <a16:rowId xmlns="" xmlns:a16="http://schemas.microsoft.com/office/drawing/2014/main" val="2989839269"/>
                   </a:ext>
                 </a:extLst>
               </a:tr>
@@ -32122,7 +32152,7 @@
                 </a:tc>
                 <a:extLst>
                   <a:ext uri="{0D108BD9-81ED-4DB2-BD59-A6C34878D82A}">
-                    <a16:rowId xmlns:a16="http://schemas.microsoft.com/office/drawing/2014/main" xmlns="" val="2130545569"/>
+                    <a16:rowId xmlns="" xmlns:a16="http://schemas.microsoft.com/office/drawing/2014/main" val="2130545569"/>
                   </a:ext>
                 </a:extLst>
               </a:tr>
@@ -32331,7 +32361,7 @@
                 </a:tc>
                 <a:extLst>
                   <a:ext uri="{0D108BD9-81ED-4DB2-BD59-A6C34878D82A}">
-                    <a16:rowId xmlns:a16="http://schemas.microsoft.com/office/drawing/2014/main" xmlns="" val="3045796785"/>
+                    <a16:rowId xmlns="" xmlns:a16="http://schemas.microsoft.com/office/drawing/2014/main" val="3045796785"/>
                   </a:ext>
                 </a:extLst>
               </a:tr>
@@ -32540,7 +32570,7 @@
                 </a:tc>
                 <a:extLst>
                   <a:ext uri="{0D108BD9-81ED-4DB2-BD59-A6C34878D82A}">
-                    <a16:rowId xmlns:a16="http://schemas.microsoft.com/office/drawing/2014/main" xmlns="" val="1091494175"/>
+                    <a16:rowId xmlns="" xmlns:a16="http://schemas.microsoft.com/office/drawing/2014/main" val="1091494175"/>
                   </a:ext>
                 </a:extLst>
               </a:tr>
@@ -32558,11 +32588,11 @@
   <p:clrMapOvr>
     <a:masterClrMapping/>
   </p:clrMapOvr>
-  <mc:AlternateContent xmlns:mc="http://schemas.openxmlformats.org/markup-compatibility/2006">
-    <mc:Choice xmlns:p14="http://schemas.microsoft.com/office/powerpoint/2010/main" Requires="p14">
+  <mc:AlternateContent xmlns:mc="http://schemas.openxmlformats.org/markup-compatibility/2006" xmlns:p14="http://schemas.microsoft.com/office/powerpoint/2010/main">
+    <mc:Choice Requires="p14">
       <p:transition spd="slow" p14:dur="2000"/>
     </mc:Choice>
-    <mc:Fallback>
+    <mc:Fallback xmlns="">
       <p:transition spd="slow"/>
     </mc:Fallback>
   </mc:AlternateContent>
@@ -32678,11 +32708,11 @@
   <p:clrMapOvr>
     <a:masterClrMapping/>
   </p:clrMapOvr>
-  <mc:AlternateContent xmlns:mc="http://schemas.openxmlformats.org/markup-compatibility/2006">
-    <mc:Choice xmlns:p14="http://schemas.microsoft.com/office/powerpoint/2010/main" Requires="p14">
+  <mc:AlternateContent xmlns:mc="http://schemas.openxmlformats.org/markup-compatibility/2006" xmlns:p14="http://schemas.microsoft.com/office/powerpoint/2010/main">
+    <mc:Choice Requires="p14">
       <p:transition spd="slow" p14:dur="2000"/>
     </mc:Choice>
-    <mc:Fallback>
+    <mc:Fallback xmlns="">
       <p:transition spd="slow"/>
     </mc:Fallback>
   </mc:AlternateContent>
@@ -32861,11 +32891,11 @@
   <p:clrMapOvr>
     <a:masterClrMapping/>
   </p:clrMapOvr>
-  <mc:AlternateContent xmlns:mc="http://schemas.openxmlformats.org/markup-compatibility/2006">
-    <mc:Choice xmlns:p14="http://schemas.microsoft.com/office/powerpoint/2010/main" Requires="p14">
+  <mc:AlternateContent xmlns:mc="http://schemas.openxmlformats.org/markup-compatibility/2006" xmlns:p14="http://schemas.microsoft.com/office/powerpoint/2010/main">
+    <mc:Choice Requires="p14">
       <p:transition spd="slow" p14:dur="2000"/>
     </mc:Choice>
-    <mc:Fallback>
+    <mc:Fallback xmlns="">
       <p:transition spd="slow"/>
     </mc:Fallback>
   </mc:AlternateContent>
@@ -33565,11 +33595,11 @@
   <p:clrMapOvr>
     <a:masterClrMapping/>
   </p:clrMapOvr>
-  <mc:AlternateContent xmlns:mc="http://schemas.openxmlformats.org/markup-compatibility/2006">
-    <mc:Choice xmlns:p14="http://schemas.microsoft.com/office/powerpoint/2010/main" Requires="p14">
+  <mc:AlternateContent xmlns:mc="http://schemas.openxmlformats.org/markup-compatibility/2006" xmlns:p14="http://schemas.microsoft.com/office/powerpoint/2010/main">
+    <mc:Choice Requires="p14">
       <p:transition spd="slow" p14:dur="2000"/>
     </mc:Choice>
-    <mc:Fallback>
+    <mc:Fallback xmlns="">
       <p:transition spd="slow"/>
     </mc:Fallback>
   </mc:AlternateContent>
@@ -33740,11 +33770,11 @@
   <p:clrMapOvr>
     <a:masterClrMapping/>
   </p:clrMapOvr>
-  <mc:AlternateContent xmlns:mc="http://schemas.openxmlformats.org/markup-compatibility/2006">
-    <mc:Choice xmlns:p14="http://schemas.microsoft.com/office/powerpoint/2010/main" Requires="p14">
+  <mc:AlternateContent xmlns:mc="http://schemas.openxmlformats.org/markup-compatibility/2006" xmlns:p14="http://schemas.microsoft.com/office/powerpoint/2010/main">
+    <mc:Choice Requires="p14">
       <p:transition spd="slow" p14:dur="2000"/>
     </mc:Choice>
-    <mc:Fallback>
+    <mc:Fallback xmlns="">
       <p:transition spd="slow"/>
     </mc:Fallback>
   </mc:AlternateContent>
@@ -33956,11 +33986,11 @@
   <p:clrMapOvr>
     <a:masterClrMapping/>
   </p:clrMapOvr>
-  <mc:AlternateContent xmlns:mc="http://schemas.openxmlformats.org/markup-compatibility/2006">
-    <mc:Choice xmlns:p14="http://schemas.microsoft.com/office/powerpoint/2010/main" Requires="p14">
+  <mc:AlternateContent xmlns:mc="http://schemas.openxmlformats.org/markup-compatibility/2006" xmlns:p14="http://schemas.microsoft.com/office/powerpoint/2010/main">
+    <mc:Choice Requires="p14">
       <p:transition spd="slow" p14:dur="2000"/>
     </mc:Choice>
-    <mc:Fallback>
+    <mc:Fallback xmlns="">
       <p:transition spd="slow"/>
     </mc:Fallback>
   </mc:AlternateContent>
@@ -34376,11 +34406,11 @@
   <p:clrMapOvr>
     <a:masterClrMapping/>
   </p:clrMapOvr>
-  <mc:AlternateContent xmlns:mc="http://schemas.openxmlformats.org/markup-compatibility/2006">
-    <mc:Choice xmlns:p14="http://schemas.microsoft.com/office/powerpoint/2010/main" Requires="p14">
+  <mc:AlternateContent xmlns:mc="http://schemas.openxmlformats.org/markup-compatibility/2006" xmlns:p14="http://schemas.microsoft.com/office/powerpoint/2010/main">
+    <mc:Choice Requires="p14">
       <p:transition spd="slow" p14:dur="2000"/>
     </mc:Choice>
-    <mc:Fallback>
+    <mc:Fallback xmlns="">
       <p:transition spd="slow"/>
     </mc:Fallback>
   </mc:AlternateContent>
@@ -35367,11 +35397,11 @@
   <p:clrMapOvr>
     <a:masterClrMapping/>
   </p:clrMapOvr>
-  <mc:AlternateContent xmlns:mc="http://schemas.openxmlformats.org/markup-compatibility/2006">
-    <mc:Choice xmlns:p14="http://schemas.microsoft.com/office/powerpoint/2010/main" Requires="p14">
+  <mc:AlternateContent xmlns:mc="http://schemas.openxmlformats.org/markup-compatibility/2006" xmlns:p14="http://schemas.microsoft.com/office/powerpoint/2010/main">
+    <mc:Choice Requires="p14">
       <p:transition spd="slow" p14:dur="2000"/>
     </mc:Choice>
-    <mc:Fallback>
+    <mc:Fallback xmlns="">
       <p:transition spd="slow"/>
     </mc:Fallback>
   </mc:AlternateContent>
@@ -36261,14 +36291,14 @@
                 <a:gridCol w="957714">
                   <a:extLst>
                     <a:ext uri="{9D8B030D-6E8A-4147-A177-3AD203B41FA5}">
-                      <a16:colId xmlns:a16="http://schemas.microsoft.com/office/drawing/2014/main" xmlns="" val="3940544257"/>
+                      <a16:colId xmlns="" xmlns:a16="http://schemas.microsoft.com/office/drawing/2014/main" val="3940544257"/>
                     </a:ext>
                   </a:extLst>
                 </a:gridCol>
                 <a:gridCol w="2464067">
                   <a:extLst>
                     <a:ext uri="{9D8B030D-6E8A-4147-A177-3AD203B41FA5}">
-                      <a16:colId xmlns:a16="http://schemas.microsoft.com/office/drawing/2014/main" xmlns="" val="3658567973"/>
+                      <a16:colId xmlns="" xmlns:a16="http://schemas.microsoft.com/office/drawing/2014/main" val="3658567973"/>
                     </a:ext>
                   </a:extLst>
                 </a:gridCol>
@@ -36302,7 +36332,7 @@
                 </a:tc>
                 <a:extLst>
                   <a:ext uri="{0D108BD9-81ED-4DB2-BD59-A6C34878D82A}">
-                    <a16:rowId xmlns:a16="http://schemas.microsoft.com/office/drawing/2014/main" xmlns="" val="1032275335"/>
+                    <a16:rowId xmlns="" xmlns:a16="http://schemas.microsoft.com/office/drawing/2014/main" val="1032275335"/>
                   </a:ext>
                 </a:extLst>
               </a:tr>
@@ -36432,7 +36462,7 @@
                 </a:tc>
                 <a:extLst>
                   <a:ext uri="{0D108BD9-81ED-4DB2-BD59-A6C34878D82A}">
-                    <a16:rowId xmlns:a16="http://schemas.microsoft.com/office/drawing/2014/main" xmlns="" val="4191484087"/>
+                    <a16:rowId xmlns="" xmlns:a16="http://schemas.microsoft.com/office/drawing/2014/main" val="4191484087"/>
                   </a:ext>
                 </a:extLst>
               </a:tr>
@@ -36506,7 +36536,7 @@
                 </a:tc>
                 <a:extLst>
                   <a:ext uri="{0D108BD9-81ED-4DB2-BD59-A6C34878D82A}">
-                    <a16:rowId xmlns:a16="http://schemas.microsoft.com/office/drawing/2014/main" xmlns="" val="1864588626"/>
+                    <a16:rowId xmlns="" xmlns:a16="http://schemas.microsoft.com/office/drawing/2014/main" val="1864588626"/>
                   </a:ext>
                 </a:extLst>
               </a:tr>
@@ -36628,7 +36658,7 @@
                 </a:tc>
                 <a:extLst>
                   <a:ext uri="{0D108BD9-81ED-4DB2-BD59-A6C34878D82A}">
-                    <a16:rowId xmlns:a16="http://schemas.microsoft.com/office/drawing/2014/main" xmlns="" val="3035259714"/>
+                    <a16:rowId xmlns="" xmlns:a16="http://schemas.microsoft.com/office/drawing/2014/main" val="3035259714"/>
                   </a:ext>
                 </a:extLst>
               </a:tr>
@@ -36717,7 +36747,7 @@
                 </a:tc>
                 <a:extLst>
                   <a:ext uri="{0D108BD9-81ED-4DB2-BD59-A6C34878D82A}">
-                    <a16:rowId xmlns:a16="http://schemas.microsoft.com/office/drawing/2014/main" xmlns="" val="2023621082"/>
+                    <a16:rowId xmlns="" xmlns:a16="http://schemas.microsoft.com/office/drawing/2014/main" val="2023621082"/>
                   </a:ext>
                 </a:extLst>
               </a:tr>
@@ -36806,7 +36836,7 @@
                 </a:tc>
                 <a:extLst>
                   <a:ext uri="{0D108BD9-81ED-4DB2-BD59-A6C34878D82A}">
-                    <a16:rowId xmlns:a16="http://schemas.microsoft.com/office/drawing/2014/main" xmlns="" val="120016333"/>
+                    <a16:rowId xmlns="" xmlns:a16="http://schemas.microsoft.com/office/drawing/2014/main" val="120016333"/>
                   </a:ext>
                 </a:extLst>
               </a:tr>
@@ -36951,21 +36981,21 @@
                 <a:gridCol w="960120">
                   <a:extLst>
                     <a:ext uri="{9D8B030D-6E8A-4147-A177-3AD203B41FA5}">
-                      <a16:colId xmlns:a16="http://schemas.microsoft.com/office/drawing/2014/main" xmlns="" val="392696932"/>
+                      <a16:colId xmlns="" xmlns:a16="http://schemas.microsoft.com/office/drawing/2014/main" val="392696932"/>
                     </a:ext>
                   </a:extLst>
                 </a:gridCol>
                 <a:gridCol w="2468880">
                   <a:extLst>
                     <a:ext uri="{9D8B030D-6E8A-4147-A177-3AD203B41FA5}">
-                      <a16:colId xmlns:a16="http://schemas.microsoft.com/office/drawing/2014/main" xmlns="" val="2769969192"/>
+                      <a16:colId xmlns="" xmlns:a16="http://schemas.microsoft.com/office/drawing/2014/main" val="2769969192"/>
                     </a:ext>
                   </a:extLst>
                 </a:gridCol>
                 <a:gridCol w="2468880">
                   <a:extLst>
                     <a:ext uri="{9D8B030D-6E8A-4147-A177-3AD203B41FA5}">
-                      <a16:colId xmlns:a16="http://schemas.microsoft.com/office/drawing/2014/main" xmlns="" val="2022610816"/>
+                      <a16:colId xmlns="" xmlns:a16="http://schemas.microsoft.com/office/drawing/2014/main" val="2022610816"/>
                     </a:ext>
                   </a:extLst>
                 </a:gridCol>
@@ -37017,7 +37047,7 @@
                 </a:tc>
                 <a:extLst>
                   <a:ext uri="{0D108BD9-81ED-4DB2-BD59-A6C34878D82A}">
-                    <a16:rowId xmlns:a16="http://schemas.microsoft.com/office/drawing/2014/main" xmlns="" val="2344937666"/>
+                    <a16:rowId xmlns="" xmlns:a16="http://schemas.microsoft.com/office/drawing/2014/main" val="2344937666"/>
                   </a:ext>
                 </a:extLst>
               </a:tr>
@@ -37150,7 +37180,7 @@
                 </a:tc>
                 <a:extLst>
                   <a:ext uri="{0D108BD9-81ED-4DB2-BD59-A6C34878D82A}">
-                    <a16:rowId xmlns:a16="http://schemas.microsoft.com/office/drawing/2014/main" xmlns="" val="1917341330"/>
+                    <a16:rowId xmlns="" xmlns:a16="http://schemas.microsoft.com/office/drawing/2014/main" val="1917341330"/>
                   </a:ext>
                 </a:extLst>
               </a:tr>
@@ -37367,7 +37397,7 @@
                 </a:tc>
                 <a:extLst>
                   <a:ext uri="{0D108BD9-81ED-4DB2-BD59-A6C34878D82A}">
-                    <a16:rowId xmlns:a16="http://schemas.microsoft.com/office/drawing/2014/main" xmlns="" val="3088042860"/>
+                    <a16:rowId xmlns="" xmlns:a16="http://schemas.microsoft.com/office/drawing/2014/main" val="3088042860"/>
                   </a:ext>
                 </a:extLst>
               </a:tr>
@@ -37451,7 +37481,7 @@
                 </a:tc>
                 <a:extLst>
                   <a:ext uri="{0D108BD9-81ED-4DB2-BD59-A6C34878D82A}">
-                    <a16:rowId xmlns:a16="http://schemas.microsoft.com/office/drawing/2014/main" xmlns="" val="2658530722"/>
+                    <a16:rowId xmlns="" xmlns:a16="http://schemas.microsoft.com/office/drawing/2014/main" val="2658530722"/>
                   </a:ext>
                 </a:extLst>
               </a:tr>
@@ -37583,7 +37613,7 @@
                 </a:tc>
                 <a:extLst>
                   <a:ext uri="{0D108BD9-81ED-4DB2-BD59-A6C34878D82A}">
-                    <a16:rowId xmlns:a16="http://schemas.microsoft.com/office/drawing/2014/main" xmlns="" val="1481886367"/>
+                    <a16:rowId xmlns="" xmlns:a16="http://schemas.microsoft.com/office/drawing/2014/main" val="1481886367"/>
                   </a:ext>
                 </a:extLst>
               </a:tr>
@@ -37682,7 +37712,7 @@
                 </a:tc>
                 <a:extLst>
                   <a:ext uri="{0D108BD9-81ED-4DB2-BD59-A6C34878D82A}">
-                    <a16:rowId xmlns:a16="http://schemas.microsoft.com/office/drawing/2014/main" xmlns="" val="4248384778"/>
+                    <a16:rowId xmlns="" xmlns:a16="http://schemas.microsoft.com/office/drawing/2014/main" val="4248384778"/>
                   </a:ext>
                 </a:extLst>
               </a:tr>
@@ -37781,7 +37811,7 @@
                 </a:tc>
                 <a:extLst>
                   <a:ext uri="{0D108BD9-81ED-4DB2-BD59-A6C34878D82A}">
-                    <a16:rowId xmlns:a16="http://schemas.microsoft.com/office/drawing/2014/main" xmlns="" val="1670483340"/>
+                    <a16:rowId xmlns="" xmlns:a16="http://schemas.microsoft.com/office/drawing/2014/main" val="1670483340"/>
                   </a:ext>
                 </a:extLst>
               </a:tr>
@@ -37926,28 +37956,28 @@
                 <a:gridCol w="960120">
                   <a:extLst>
                     <a:ext uri="{9D8B030D-6E8A-4147-A177-3AD203B41FA5}">
-                      <a16:colId xmlns:a16="http://schemas.microsoft.com/office/drawing/2014/main" xmlns="" val="392696932"/>
+                      <a16:colId xmlns="" xmlns:a16="http://schemas.microsoft.com/office/drawing/2014/main" val="392696932"/>
                     </a:ext>
                   </a:extLst>
                 </a:gridCol>
                 <a:gridCol w="2468880">
                   <a:extLst>
                     <a:ext uri="{9D8B030D-6E8A-4147-A177-3AD203B41FA5}">
-                      <a16:colId xmlns:a16="http://schemas.microsoft.com/office/drawing/2014/main" xmlns="" val="2769969192"/>
+                      <a16:colId xmlns="" xmlns:a16="http://schemas.microsoft.com/office/drawing/2014/main" val="2769969192"/>
                     </a:ext>
                   </a:extLst>
                 </a:gridCol>
                 <a:gridCol w="2468880">
                   <a:extLst>
                     <a:ext uri="{9D8B030D-6E8A-4147-A177-3AD203B41FA5}">
-                      <a16:colId xmlns:a16="http://schemas.microsoft.com/office/drawing/2014/main" xmlns="" val="2022610816"/>
+                      <a16:colId xmlns="" xmlns:a16="http://schemas.microsoft.com/office/drawing/2014/main" val="2022610816"/>
                     </a:ext>
                   </a:extLst>
                 </a:gridCol>
                 <a:gridCol w="2468880">
                   <a:extLst>
                     <a:ext uri="{9D8B030D-6E8A-4147-A177-3AD203B41FA5}">
-                      <a16:colId xmlns:a16="http://schemas.microsoft.com/office/drawing/2014/main" xmlns="" val="102813283"/>
+                      <a16:colId xmlns="" xmlns:a16="http://schemas.microsoft.com/office/drawing/2014/main" val="102813283"/>
                     </a:ext>
                   </a:extLst>
                 </a:gridCol>
@@ -38012,7 +38042,7 @@
                 </a:tc>
                 <a:extLst>
                   <a:ext uri="{0D108BD9-81ED-4DB2-BD59-A6C34878D82A}">
-                    <a16:rowId xmlns:a16="http://schemas.microsoft.com/office/drawing/2014/main" xmlns="" val="2344937666"/>
+                    <a16:rowId xmlns="" xmlns:a16="http://schemas.microsoft.com/office/drawing/2014/main" val="2344937666"/>
                   </a:ext>
                 </a:extLst>
               </a:tr>
@@ -38172,7 +38202,7 @@
                 </a:tc>
                 <a:extLst>
                   <a:ext uri="{0D108BD9-81ED-4DB2-BD59-A6C34878D82A}">
-                    <a16:rowId xmlns:a16="http://schemas.microsoft.com/office/drawing/2014/main" xmlns="" val="1917341330"/>
+                    <a16:rowId xmlns="" xmlns:a16="http://schemas.microsoft.com/office/drawing/2014/main" val="1917341330"/>
                   </a:ext>
                 </a:extLst>
               </a:tr>
@@ -38476,7 +38506,7 @@
                 </a:tc>
                 <a:extLst>
                   <a:ext uri="{0D108BD9-81ED-4DB2-BD59-A6C34878D82A}">
-                    <a16:rowId xmlns:a16="http://schemas.microsoft.com/office/drawing/2014/main" xmlns="" val="3088042860"/>
+                    <a16:rowId xmlns="" xmlns:a16="http://schemas.microsoft.com/office/drawing/2014/main" val="3088042860"/>
                   </a:ext>
                 </a:extLst>
               </a:tr>
@@ -38570,7 +38600,7 @@
                 </a:tc>
                 <a:extLst>
                   <a:ext uri="{0D108BD9-81ED-4DB2-BD59-A6C34878D82A}">
-                    <a16:rowId xmlns:a16="http://schemas.microsoft.com/office/drawing/2014/main" xmlns="" val="2658530722"/>
+                    <a16:rowId xmlns="" xmlns:a16="http://schemas.microsoft.com/office/drawing/2014/main" val="2658530722"/>
                   </a:ext>
                 </a:extLst>
               </a:tr>
@@ -38763,7 +38793,7 @@
                 </a:tc>
                 <a:extLst>
                   <a:ext uri="{0D108BD9-81ED-4DB2-BD59-A6C34878D82A}">
-                    <a16:rowId xmlns:a16="http://schemas.microsoft.com/office/drawing/2014/main" xmlns="" val="1481886367"/>
+                    <a16:rowId xmlns="" xmlns:a16="http://schemas.microsoft.com/office/drawing/2014/main" val="1481886367"/>
                   </a:ext>
                 </a:extLst>
               </a:tr>
@@ -38872,7 +38902,7 @@
                 </a:tc>
                 <a:extLst>
                   <a:ext uri="{0D108BD9-81ED-4DB2-BD59-A6C34878D82A}">
-                    <a16:rowId xmlns:a16="http://schemas.microsoft.com/office/drawing/2014/main" xmlns="" val="4248384778"/>
+                    <a16:rowId xmlns="" xmlns:a16="http://schemas.microsoft.com/office/drawing/2014/main" val="4248384778"/>
                   </a:ext>
                 </a:extLst>
               </a:tr>
@@ -38981,7 +39011,7 @@
                 </a:tc>
                 <a:extLst>
                   <a:ext uri="{0D108BD9-81ED-4DB2-BD59-A6C34878D82A}">
-                    <a16:rowId xmlns:a16="http://schemas.microsoft.com/office/drawing/2014/main" xmlns="" val="1670483340"/>
+                    <a16:rowId xmlns="" xmlns:a16="http://schemas.microsoft.com/office/drawing/2014/main" val="1670483340"/>
                   </a:ext>
                 </a:extLst>
               </a:tr>
@@ -39385,14 +39415,14 @@
                 <a:gridCol w="934278">
                   <a:extLst>
                     <a:ext uri="{9D8B030D-6E8A-4147-A177-3AD203B41FA5}">
-                      <a16:colId xmlns:a16="http://schemas.microsoft.com/office/drawing/2014/main" xmlns="" val="4198655800"/>
+                      <a16:colId xmlns="" xmlns:a16="http://schemas.microsoft.com/office/drawing/2014/main" val="4198655800"/>
                     </a:ext>
                   </a:extLst>
                 </a:gridCol>
                 <a:gridCol w="7295322">
                   <a:extLst>
                     <a:ext uri="{9D8B030D-6E8A-4147-A177-3AD203B41FA5}">
-                      <a16:colId xmlns:a16="http://schemas.microsoft.com/office/drawing/2014/main" xmlns="" val="135413862"/>
+                      <a16:colId xmlns="" xmlns:a16="http://schemas.microsoft.com/office/drawing/2014/main" val="135413862"/>
                     </a:ext>
                   </a:extLst>
                 </a:gridCol>
@@ -39426,7 +39456,7 @@
                 </a:tc>
                 <a:extLst>
                   <a:ext uri="{0D108BD9-81ED-4DB2-BD59-A6C34878D82A}">
-                    <a16:rowId xmlns:a16="http://schemas.microsoft.com/office/drawing/2014/main" xmlns="" val="3068323444"/>
+                    <a16:rowId xmlns="" xmlns:a16="http://schemas.microsoft.com/office/drawing/2014/main" val="3068323444"/>
                   </a:ext>
                 </a:extLst>
               </a:tr>
@@ -39459,7 +39489,7 @@
                 </a:tc>
                 <a:extLst>
                   <a:ext uri="{0D108BD9-81ED-4DB2-BD59-A6C34878D82A}">
-                    <a16:rowId xmlns:a16="http://schemas.microsoft.com/office/drawing/2014/main" xmlns="" val="1586961909"/>
+                    <a16:rowId xmlns="" xmlns:a16="http://schemas.microsoft.com/office/drawing/2014/main" val="1586961909"/>
                   </a:ext>
                 </a:extLst>
               </a:tr>
@@ -39497,7 +39527,7 @@
                 </a:tc>
                 <a:extLst>
                   <a:ext uri="{0D108BD9-81ED-4DB2-BD59-A6C34878D82A}">
-                    <a16:rowId xmlns:a16="http://schemas.microsoft.com/office/drawing/2014/main" xmlns="" val="2280300197"/>
+                    <a16:rowId xmlns="" xmlns:a16="http://schemas.microsoft.com/office/drawing/2014/main" val="2280300197"/>
                   </a:ext>
                 </a:extLst>
               </a:tr>
@@ -39535,7 +39565,7 @@
                 </a:tc>
                 <a:extLst>
                   <a:ext uri="{0D108BD9-81ED-4DB2-BD59-A6C34878D82A}">
-                    <a16:rowId xmlns:a16="http://schemas.microsoft.com/office/drawing/2014/main" xmlns="" val="1192843310"/>
+                    <a16:rowId xmlns="" xmlns:a16="http://schemas.microsoft.com/office/drawing/2014/main" val="1192843310"/>
                   </a:ext>
                 </a:extLst>
               </a:tr>
@@ -39573,7 +39603,7 @@
                 </a:tc>
                 <a:extLst>
                   <a:ext uri="{0D108BD9-81ED-4DB2-BD59-A6C34878D82A}">
-                    <a16:rowId xmlns:a16="http://schemas.microsoft.com/office/drawing/2014/main" xmlns="" val="2620585158"/>
+                    <a16:rowId xmlns="" xmlns:a16="http://schemas.microsoft.com/office/drawing/2014/main" val="2620585158"/>
                   </a:ext>
                 </a:extLst>
               </a:tr>
@@ -39606,7 +39636,7 @@
                 </a:tc>
                 <a:extLst>
                   <a:ext uri="{0D108BD9-81ED-4DB2-BD59-A6C34878D82A}">
-                    <a16:rowId xmlns:a16="http://schemas.microsoft.com/office/drawing/2014/main" xmlns="" val="1697738616"/>
+                    <a16:rowId xmlns="" xmlns:a16="http://schemas.microsoft.com/office/drawing/2014/main" val="1697738616"/>
                   </a:ext>
                 </a:extLst>
               </a:tr>
@@ -39644,7 +39674,7 @@
                 </a:tc>
                 <a:extLst>
                   <a:ext uri="{0D108BD9-81ED-4DB2-BD59-A6C34878D82A}">
-                    <a16:rowId xmlns:a16="http://schemas.microsoft.com/office/drawing/2014/main" xmlns="" val="316611556"/>
+                    <a16:rowId xmlns="" xmlns:a16="http://schemas.microsoft.com/office/drawing/2014/main" val="316611556"/>
                   </a:ext>
                 </a:extLst>
               </a:tr>
@@ -39677,7 +39707,7 @@
                 </a:tc>
                 <a:extLst>
                   <a:ext uri="{0D108BD9-81ED-4DB2-BD59-A6C34878D82A}">
-                    <a16:rowId xmlns:a16="http://schemas.microsoft.com/office/drawing/2014/main" xmlns="" val="1312814102"/>
+                    <a16:rowId xmlns="" xmlns:a16="http://schemas.microsoft.com/office/drawing/2014/main" val="1312814102"/>
                   </a:ext>
                 </a:extLst>
               </a:tr>
@@ -39710,7 +39740,7 @@
                 </a:tc>
                 <a:extLst>
                   <a:ext uri="{0D108BD9-81ED-4DB2-BD59-A6C34878D82A}">
-                    <a16:rowId xmlns:a16="http://schemas.microsoft.com/office/drawing/2014/main" xmlns="" val="1975533996"/>
+                    <a16:rowId xmlns="" xmlns:a16="http://schemas.microsoft.com/office/drawing/2014/main" val="1975533996"/>
                   </a:ext>
                 </a:extLst>
               </a:tr>
@@ -39743,7 +39773,7 @@
                 </a:tc>
                 <a:extLst>
                   <a:ext uri="{0D108BD9-81ED-4DB2-BD59-A6C34878D82A}">
-                    <a16:rowId xmlns:a16="http://schemas.microsoft.com/office/drawing/2014/main" xmlns="" val="2759032957"/>
+                    <a16:rowId xmlns="" xmlns:a16="http://schemas.microsoft.com/office/drawing/2014/main" val="2759032957"/>
                   </a:ext>
                 </a:extLst>
               </a:tr>
@@ -39832,14 +39862,14 @@
                 <a:gridCol w="934278">
                   <a:extLst>
                     <a:ext uri="{9D8B030D-6E8A-4147-A177-3AD203B41FA5}">
-                      <a16:colId xmlns:a16="http://schemas.microsoft.com/office/drawing/2014/main" xmlns="" val="4198655800"/>
+                      <a16:colId xmlns="" xmlns:a16="http://schemas.microsoft.com/office/drawing/2014/main" val="4198655800"/>
                     </a:ext>
                   </a:extLst>
                 </a:gridCol>
                 <a:gridCol w="7295322">
                   <a:extLst>
                     <a:ext uri="{9D8B030D-6E8A-4147-A177-3AD203B41FA5}">
-                      <a16:colId xmlns:a16="http://schemas.microsoft.com/office/drawing/2014/main" xmlns="" val="135413862"/>
+                      <a16:colId xmlns="" xmlns:a16="http://schemas.microsoft.com/office/drawing/2014/main" val="135413862"/>
                     </a:ext>
                   </a:extLst>
                 </a:gridCol>
@@ -39873,7 +39903,7 @@
                 </a:tc>
                 <a:extLst>
                   <a:ext uri="{0D108BD9-81ED-4DB2-BD59-A6C34878D82A}">
-                    <a16:rowId xmlns:a16="http://schemas.microsoft.com/office/drawing/2014/main" xmlns="" val="3068323444"/>
+                    <a16:rowId xmlns="" xmlns:a16="http://schemas.microsoft.com/office/drawing/2014/main" val="3068323444"/>
                   </a:ext>
                 </a:extLst>
               </a:tr>
@@ -39906,7 +39936,7 @@
                 </a:tc>
                 <a:extLst>
                   <a:ext uri="{0D108BD9-81ED-4DB2-BD59-A6C34878D82A}">
-                    <a16:rowId xmlns:a16="http://schemas.microsoft.com/office/drawing/2014/main" xmlns="" val="2484981654"/>
+                    <a16:rowId xmlns="" xmlns:a16="http://schemas.microsoft.com/office/drawing/2014/main" val="2484981654"/>
                   </a:ext>
                 </a:extLst>
               </a:tr>
@@ -39944,7 +39974,7 @@
                 </a:tc>
                 <a:extLst>
                   <a:ext uri="{0D108BD9-81ED-4DB2-BD59-A6C34878D82A}">
-                    <a16:rowId xmlns:a16="http://schemas.microsoft.com/office/drawing/2014/main" xmlns="" val="1377910784"/>
+                    <a16:rowId xmlns="" xmlns:a16="http://schemas.microsoft.com/office/drawing/2014/main" val="1377910784"/>
                   </a:ext>
                 </a:extLst>
               </a:tr>
@@ -39977,7 +40007,7 @@
                 </a:tc>
                 <a:extLst>
                   <a:ext uri="{0D108BD9-81ED-4DB2-BD59-A6C34878D82A}">
-                    <a16:rowId xmlns:a16="http://schemas.microsoft.com/office/drawing/2014/main" xmlns="" val="1387856053"/>
+                    <a16:rowId xmlns="" xmlns:a16="http://schemas.microsoft.com/office/drawing/2014/main" val="1387856053"/>
                   </a:ext>
                 </a:extLst>
               </a:tr>
@@ -40015,7 +40045,7 @@
                 </a:tc>
                 <a:extLst>
                   <a:ext uri="{0D108BD9-81ED-4DB2-BD59-A6C34878D82A}">
-                    <a16:rowId xmlns:a16="http://schemas.microsoft.com/office/drawing/2014/main" xmlns="" val="2599123823"/>
+                    <a16:rowId xmlns="" xmlns:a16="http://schemas.microsoft.com/office/drawing/2014/main" val="2599123823"/>
                   </a:ext>
                 </a:extLst>
               </a:tr>
@@ -40056,7 +40086,7 @@
                 </a:tc>
                 <a:extLst>
                   <a:ext uri="{0D108BD9-81ED-4DB2-BD59-A6C34878D82A}">
-                    <a16:rowId xmlns:a16="http://schemas.microsoft.com/office/drawing/2014/main" xmlns="" val="1232603862"/>
+                    <a16:rowId xmlns="" xmlns:a16="http://schemas.microsoft.com/office/drawing/2014/main" val="1232603862"/>
                   </a:ext>
                 </a:extLst>
               </a:tr>
@@ -40089,7 +40119,7 @@
                 </a:tc>
                 <a:extLst>
                   <a:ext uri="{0D108BD9-81ED-4DB2-BD59-A6C34878D82A}">
-                    <a16:rowId xmlns:a16="http://schemas.microsoft.com/office/drawing/2014/main" xmlns="" val="4145944521"/>
+                    <a16:rowId xmlns="" xmlns:a16="http://schemas.microsoft.com/office/drawing/2014/main" val="4145944521"/>
                   </a:ext>
                 </a:extLst>
               </a:tr>
@@ -40127,7 +40157,7 @@
                 </a:tc>
                 <a:extLst>
                   <a:ext uri="{0D108BD9-81ED-4DB2-BD59-A6C34878D82A}">
-                    <a16:rowId xmlns:a16="http://schemas.microsoft.com/office/drawing/2014/main" xmlns="" val="2954677722"/>
+                    <a16:rowId xmlns="" xmlns:a16="http://schemas.microsoft.com/office/drawing/2014/main" val="2954677722"/>
                   </a:ext>
                 </a:extLst>
               </a:tr>
@@ -40160,7 +40190,7 @@
                 </a:tc>
                 <a:extLst>
                   <a:ext uri="{0D108BD9-81ED-4DB2-BD59-A6C34878D82A}">
-                    <a16:rowId xmlns:a16="http://schemas.microsoft.com/office/drawing/2014/main" xmlns="" val="205903975"/>
+                    <a16:rowId xmlns="" xmlns:a16="http://schemas.microsoft.com/office/drawing/2014/main" val="205903975"/>
                   </a:ext>
                 </a:extLst>
               </a:tr>
@@ -40193,7 +40223,7 @@
                 </a:tc>
                 <a:extLst>
                   <a:ext uri="{0D108BD9-81ED-4DB2-BD59-A6C34878D82A}">
-                    <a16:rowId xmlns:a16="http://schemas.microsoft.com/office/drawing/2014/main" xmlns="" val="2893595017"/>
+                    <a16:rowId xmlns="" xmlns:a16="http://schemas.microsoft.com/office/drawing/2014/main" val="2893595017"/>
                   </a:ext>
                 </a:extLst>
               </a:tr>
@@ -40226,7 +40256,7 @@
                 </a:tc>
                 <a:extLst>
                   <a:ext uri="{0D108BD9-81ED-4DB2-BD59-A6C34878D82A}">
-                    <a16:rowId xmlns:a16="http://schemas.microsoft.com/office/drawing/2014/main" xmlns="" val="2337380595"/>
+                    <a16:rowId xmlns="" xmlns:a16="http://schemas.microsoft.com/office/drawing/2014/main" val="2337380595"/>
                   </a:ext>
                 </a:extLst>
               </a:tr>
@@ -42037,7 +42067,7 @@
               <a:t> </a:t>
             </a:r>
             <a:r>
-              <a:rPr lang="en-US" dirty="0">
+              <a:rPr lang="en-US" dirty="0" smtClean="0">
                 <a:solidFill>
                   <a:srgbClr val="FF0000"/>
                 </a:solidFill>
@@ -42045,7 +42075,7 @@
                 <a:ea typeface="Calibri" panose="020F0502020204030204" pitchFamily="34" charset="0"/>
                 <a:cs typeface="Times New Roman" panose="02020603050405020304" pitchFamily="18" charset="0"/>
               </a:rPr>
-              <a:t>'MN'</a:t>
+              <a:t>'NE'</a:t>
             </a:r>
             <a:endParaRPr lang="en-US" sz="2400" dirty="0">
               <a:latin typeface="Calibri" panose="020F0502020204030204" pitchFamily="34" charset="0"/>
@@ -42385,21 +42415,21 @@
                 <a:gridCol w="2764301">
                   <a:extLst>
                     <a:ext uri="{9D8B030D-6E8A-4147-A177-3AD203B41FA5}">
-                      <a16:colId xmlns:a16="http://schemas.microsoft.com/office/drawing/2014/main" xmlns="" val="234227049"/>
+                      <a16:colId xmlns="" xmlns:a16="http://schemas.microsoft.com/office/drawing/2014/main" val="234227049"/>
                     </a:ext>
                   </a:extLst>
                 </a:gridCol>
                 <a:gridCol w="2764301">
                   <a:extLst>
                     <a:ext uri="{9D8B030D-6E8A-4147-A177-3AD203B41FA5}">
-                      <a16:colId xmlns:a16="http://schemas.microsoft.com/office/drawing/2014/main" xmlns="" val="4053135350"/>
+                      <a16:colId xmlns="" xmlns:a16="http://schemas.microsoft.com/office/drawing/2014/main" val="4053135350"/>
                     </a:ext>
                   </a:extLst>
                 </a:gridCol>
                 <a:gridCol w="2764301">
                   <a:extLst>
                     <a:ext uri="{9D8B030D-6E8A-4147-A177-3AD203B41FA5}">
-                      <a16:colId xmlns:a16="http://schemas.microsoft.com/office/drawing/2014/main" xmlns="" val="672378647"/>
+                      <a16:colId xmlns="" xmlns:a16="http://schemas.microsoft.com/office/drawing/2014/main" val="672378647"/>
                     </a:ext>
                   </a:extLst>
                 </a:gridCol>
@@ -42449,7 +42479,7 @@
                 </a:tc>
                 <a:extLst>
                   <a:ext uri="{0D108BD9-81ED-4DB2-BD59-A6C34878D82A}">
-                    <a16:rowId xmlns:a16="http://schemas.microsoft.com/office/drawing/2014/main" xmlns="" val="2843053056"/>
+                    <a16:rowId xmlns="" xmlns:a16="http://schemas.microsoft.com/office/drawing/2014/main" val="2843053056"/>
                   </a:ext>
                 </a:extLst>
               </a:tr>
@@ -42499,7 +42529,7 @@
                 </a:tc>
                 <a:extLst>
                   <a:ext uri="{0D108BD9-81ED-4DB2-BD59-A6C34878D82A}">
-                    <a16:rowId xmlns:a16="http://schemas.microsoft.com/office/drawing/2014/main" xmlns="" val="3055328934"/>
+                    <a16:rowId xmlns="" xmlns:a16="http://schemas.microsoft.com/office/drawing/2014/main" val="3055328934"/>
                   </a:ext>
                 </a:extLst>
               </a:tr>
@@ -42549,7 +42579,7 @@
                 </a:tc>
                 <a:extLst>
                   <a:ext uri="{0D108BD9-81ED-4DB2-BD59-A6C34878D82A}">
-                    <a16:rowId xmlns:a16="http://schemas.microsoft.com/office/drawing/2014/main" xmlns="" val="1144851549"/>
+                    <a16:rowId xmlns="" xmlns:a16="http://schemas.microsoft.com/office/drawing/2014/main" val="1144851549"/>
                   </a:ext>
                 </a:extLst>
               </a:tr>
@@ -42598,7 +42628,7 @@
                 </a:tc>
                 <a:extLst>
                   <a:ext uri="{0D108BD9-81ED-4DB2-BD59-A6C34878D82A}">
-                    <a16:rowId xmlns:a16="http://schemas.microsoft.com/office/drawing/2014/main" xmlns="" val="4258932578"/>
+                    <a16:rowId xmlns="" xmlns:a16="http://schemas.microsoft.com/office/drawing/2014/main" val="4258932578"/>
                   </a:ext>
                 </a:extLst>
               </a:tr>
@@ -43536,7 +43566,7 @@
               <a:t> </a:t>
             </a:r>
             <a:r>
-              <a:rPr lang="en-US" dirty="0">
+              <a:rPr lang="en-US" dirty="0" smtClean="0">
                 <a:solidFill>
                   <a:srgbClr val="FF0000"/>
                 </a:solidFill>
@@ -43544,7 +43574,7 @@
                 <a:ea typeface="Calibri" panose="020F0502020204030204" pitchFamily="34" charset="0"/>
                 <a:cs typeface="Times New Roman" panose="02020603050405020304" pitchFamily="18" charset="0"/>
               </a:rPr>
-              <a:t>'MN'</a:t>
+              <a:t>'NE'</a:t>
             </a:r>
             <a:endParaRPr lang="en-US" sz="2400" dirty="0">
               <a:latin typeface="Calibri" panose="020F0502020204030204" pitchFamily="34" charset="0"/>
@@ -43944,11 +43974,11 @@
   <p:clrMapOvr>
     <a:masterClrMapping/>
   </p:clrMapOvr>
-  <mc:AlternateContent xmlns:mc="http://schemas.openxmlformats.org/markup-compatibility/2006">
-    <mc:Choice xmlns:p14="http://schemas.microsoft.com/office/powerpoint/2010/main" Requires="p14">
+  <mc:AlternateContent xmlns:mc="http://schemas.openxmlformats.org/markup-compatibility/2006" xmlns:p14="http://schemas.microsoft.com/office/powerpoint/2010/main">
+    <mc:Choice Requires="p14">
       <p:transition spd="slow" p14:dur="2000"/>
     </mc:Choice>
-    <mc:Fallback>
+    <mc:Fallback xmlns="">
       <p:transition spd="slow"/>
     </mc:Fallback>
   </mc:AlternateContent>

</xml_diff>

<commit_message>
Add a query plan in to the 'Process of executing a query' slide.
</commit_message>
<xml_diff>
--- a/Optimizer.pptx
+++ b/Optimizer.pptx
@@ -266,7 +266,7 @@
           <a:p>
             <a:fld id="{2EDCB34D-5EC2-4739-9693-E425457AC201}" type="datetimeFigureOut">
               <a:rPr lang="en-US" smtClean="0"/>
-              <a:t>10/05/2016</a:t>
+              <a:t>10/6/2016</a:t>
             </a:fld>
             <a:endParaRPr lang="en-US"/>
           </a:p>
@@ -2917,7 +2917,7 @@
             <a:fld id="{5942B21B-2ADA-A040-A652-A7305E1B99FE}" type="datetimeFigureOut">
               <a:rPr lang="en-US" smtClean="0"/>
               <a:pPr/>
-              <a:t>10/05/2016</a:t>
+              <a:t>10/6/2016</a:t>
             </a:fld>
             <a:endParaRPr lang="en-US" dirty="0"/>
           </a:p>
@@ -3107,7 +3107,7 @@
           <a:p>
             <a:fld id="{5942B21B-2ADA-A040-A652-A7305E1B99FE}" type="datetimeFigureOut">
               <a:rPr lang="en-US" smtClean="0"/>
-              <a:t>10/05/2016</a:t>
+              <a:t>10/6/2016</a:t>
             </a:fld>
             <a:endParaRPr lang="en-US"/>
           </a:p>
@@ -3231,7 +3231,7 @@
             <a:fld id="{5942B21B-2ADA-A040-A652-A7305E1B99FE}" type="datetimeFigureOut">
               <a:rPr lang="en-US" smtClean="0"/>
               <a:pPr/>
-              <a:t>10/05/2016</a:t>
+              <a:t>10/6/2016</a:t>
             </a:fld>
             <a:r>
               <a:rPr lang="en-US"/>
@@ -3502,7 +3502,7 @@
             <a:fld id="{5942B21B-2ADA-A040-A652-A7305E1B99FE}" type="datetimeFigureOut">
               <a:rPr lang="en-US" smtClean="0"/>
               <a:pPr/>
-              <a:t>10/05/2016</a:t>
+              <a:t>10/6/2016</a:t>
             </a:fld>
             <a:r>
               <a:rPr lang="en-US" dirty="0"/>
@@ -3772,7 +3772,7 @@
             <a:fld id="{5942B21B-2ADA-A040-A652-A7305E1B99FE}" type="datetimeFigureOut">
               <a:rPr lang="en-US" smtClean="0"/>
               <a:pPr/>
-              <a:t>10/05/2016</a:t>
+              <a:t>10/6/2016</a:t>
             </a:fld>
             <a:r>
               <a:rPr lang="en-US" dirty="0"/>
@@ -4112,7 +4112,7 @@
             <a:fld id="{5942B21B-2ADA-A040-A652-A7305E1B99FE}" type="datetimeFigureOut">
               <a:rPr lang="en-US" smtClean="0"/>
               <a:pPr/>
-              <a:t>10/05/2016</a:t>
+              <a:t>10/6/2016</a:t>
             </a:fld>
             <a:r>
               <a:rPr lang="en-US" dirty="0"/>
@@ -4453,7 +4453,7 @@
             <a:fld id="{5942B21B-2ADA-A040-A652-A7305E1B99FE}" type="datetimeFigureOut">
               <a:rPr lang="en-US" smtClean="0"/>
               <a:pPr/>
-              <a:t>10/05/2016</a:t>
+              <a:t>10/6/2016</a:t>
             </a:fld>
             <a:r>
               <a:rPr lang="en-US" dirty="0"/>
@@ -4968,7 +4968,7 @@
             <a:fld id="{5942B21B-2ADA-A040-A652-A7305E1B99FE}" type="datetimeFigureOut">
               <a:rPr lang="en-US" smtClean="0"/>
               <a:pPr/>
-              <a:t>10/05/2016</a:t>
+              <a:t>10/6/2016</a:t>
             </a:fld>
             <a:r>
               <a:rPr lang="en-US" dirty="0"/>
@@ -5177,7 +5177,7 @@
             <a:fld id="{5942B21B-2ADA-A040-A652-A7305E1B99FE}" type="datetimeFigureOut">
               <a:rPr lang="en-US" smtClean="0"/>
               <a:pPr/>
-              <a:t>10/05/2016</a:t>
+              <a:t>10/6/2016</a:t>
             </a:fld>
             <a:r>
               <a:rPr lang="en-US" dirty="0"/>
@@ -5364,7 +5364,7 @@
             <a:fld id="{5942B21B-2ADA-A040-A652-A7305E1B99FE}" type="datetimeFigureOut">
               <a:rPr lang="en-US" smtClean="0"/>
               <a:pPr/>
-              <a:t>10/05/2016</a:t>
+              <a:t>10/6/2016</a:t>
             </a:fld>
             <a:r>
               <a:rPr lang="en-US" dirty="0"/>
@@ -5695,7 +5695,7 @@
             <a:fld id="{5942B21B-2ADA-A040-A652-A7305E1B99FE}" type="datetimeFigureOut">
               <a:rPr lang="en-US" smtClean="0"/>
               <a:pPr/>
-              <a:t>10/05/2016</a:t>
+              <a:t>10/6/2016</a:t>
             </a:fld>
             <a:r>
               <a:rPr lang="en-US" dirty="0"/>
@@ -6003,7 +6003,7 @@
             <a:fld id="{5942B21B-2ADA-A040-A652-A7305E1B99FE}" type="datetimeFigureOut">
               <a:rPr lang="en-US" smtClean="0"/>
               <a:pPr/>
-              <a:t>10/05/2016</a:t>
+              <a:t>10/6/2016</a:t>
             </a:fld>
             <a:r>
               <a:rPr lang="en-US" dirty="0"/>
@@ -6282,7 +6282,7 @@
             <a:fld id="{5942B21B-2ADA-A040-A652-A7305E1B99FE}" type="datetimeFigureOut">
               <a:rPr lang="en-US" smtClean="0"/>
               <a:pPr/>
-              <a:t>10/05/2016</a:t>
+              <a:t>10/6/2016</a:t>
             </a:fld>
             <a:r>
               <a:rPr lang="en-US" dirty="0"/>
@@ -6753,8 +6753,8 @@
         </p:nvSpPr>
         <p:spPr>
           <a:xfrm>
-            <a:off x="458408" y="5605933"/>
-            <a:ext cx="5711386" cy="1045124"/>
+            <a:off x="458407" y="5605933"/>
+            <a:ext cx="6576573" cy="1045124"/>
           </a:xfrm>
           <a:prstGeom prst="rect">
             <a:avLst/>
@@ -6762,7 +6762,7 @@
         </p:spPr>
         <p:txBody>
           <a:bodyPr vert="horz" lIns="91440" tIns="45720" rIns="91440" bIns="45720" rtlCol="0">
-            <a:normAutofit fontScale="85000" lnSpcReduction="10000"/>
+            <a:normAutofit lnSpcReduction="10000"/>
           </a:bodyPr>
           <a:lstStyle>
             <a:lvl1pPr marL="342900" indent="-342900" algn="l" defTabSz="457200" rtl="0" eaLnBrk="1" latinLnBrk="0" hangingPunct="1">
@@ -6916,7 +6916,7 @@
             </a:pPr>
             <a:r>
               <a:rPr lang="en-US" dirty="0"/>
-              <a:t>Minneapolis, MN – October 1, 2016</a:t>
+              <a:t>Lincoln, NE – November 19, 2016</a:t>
             </a:r>
           </a:p>
         </p:txBody>
@@ -7740,7 +7740,7 @@
               <a:t> </a:t>
             </a:r>
             <a:r>
-              <a:rPr lang="en-US" dirty="0" smtClean="0">
+              <a:rPr lang="en-US" dirty="0">
                 <a:solidFill>
                   <a:srgbClr val="FF0000"/>
                 </a:solidFill>
@@ -8142,14 +8142,6 @@
   <p:clrMapOvr>
     <a:masterClrMapping/>
   </p:clrMapOvr>
-  <mc:AlternateContent xmlns:mc="http://schemas.openxmlformats.org/markup-compatibility/2006" xmlns:p14="http://schemas.microsoft.com/office/powerpoint/2010/main">
-    <mc:Choice Requires="p14">
-      <p:transition spd="slow" p14:dur="2000"/>
-    </mc:Choice>
-    <mc:Fallback xmlns="">
-      <p:transition spd="slow"/>
-    </mc:Fallback>
-  </mc:AlternateContent>
 </p:sld>
 </file>
 
@@ -8959,7 +8951,7 @@
               <a:t> </a:t>
             </a:r>
             <a:r>
-              <a:rPr lang="en-US" dirty="0" smtClean="0">
+              <a:rPr lang="en-US" dirty="0">
                 <a:solidFill>
                   <a:srgbClr val="FF0000"/>
                 </a:solidFill>
@@ -9361,14 +9353,6 @@
   <p:clrMapOvr>
     <a:masterClrMapping/>
   </p:clrMapOvr>
-  <mc:AlternateContent xmlns:mc="http://schemas.openxmlformats.org/markup-compatibility/2006" xmlns:p14="http://schemas.microsoft.com/office/powerpoint/2010/main">
-    <mc:Choice Requires="p14">
-      <p:transition spd="slow" p14:dur="2000"/>
-    </mc:Choice>
-    <mc:Fallback xmlns="">
-      <p:transition spd="slow"/>
-    </mc:Fallback>
-  </mc:AlternateContent>
 </p:sld>
 </file>
 
@@ -10188,33 +10172,8 @@
                 <a:ea typeface="Calibri" panose="020F0502020204030204" pitchFamily="34" charset="0"/>
                 <a:cs typeface="Times New Roman" panose="02020603050405020304" pitchFamily="18" charset="0"/>
               </a:rPr>
-              <a:t> = </a:t>
-            </a:r>
-            <a:r>
-              <a:rPr lang="en-US" dirty="0" smtClean="0">
-                <a:solidFill>
-                  <a:srgbClr val="008080"/>
-                </a:solidFill>
-                <a:highlight>
-                  <a:srgbClr val="FFFF00"/>
-                </a:highlight>
-                <a:latin typeface="Consolas" panose="020B0609020204030204" pitchFamily="49" charset="0"/>
-                <a:ea typeface="Calibri" panose="020F0502020204030204" pitchFamily="34" charset="0"/>
-                <a:cs typeface="Times New Roman" panose="02020603050405020304" pitchFamily="18" charset="0"/>
-              </a:rPr>
-              <a:t>'NE'</a:t>
-            </a:r>
-            <a:endParaRPr lang="en-US" dirty="0">
-              <a:solidFill>
-                <a:srgbClr val="008080"/>
-              </a:solidFill>
-              <a:highlight>
-                <a:srgbClr val="FFFF00"/>
-              </a:highlight>
-              <a:latin typeface="Consolas" panose="020B0609020204030204" pitchFamily="49" charset="0"/>
-              <a:ea typeface="Calibri" panose="020F0502020204030204" pitchFamily="34" charset="0"/>
-              <a:cs typeface="Times New Roman" panose="02020603050405020304" pitchFamily="18" charset="0"/>
-            </a:endParaRPr>
+              <a:t> = 'NE'</a:t>
+            </a:r>
           </a:p>
           <a:p>
             <a:pPr>
@@ -10554,13 +10513,8 @@
             </a:pPr>
             <a:r>
               <a:rPr lang="en-US" sz="3000" dirty="0"/>
-              <a:t>Find rows in R4 where State = </a:t>
-            </a:r>
-            <a:r>
-              <a:rPr lang="en-US" sz="3000" dirty="0" smtClean="0"/>
-              <a:t>'NE'</a:t>
-            </a:r>
-            <a:endParaRPr lang="en-US" sz="3000" dirty="0"/>
+              <a:t>Find rows in R4 where State = 'NE'</a:t>
+            </a:r>
           </a:p>
           <a:p>
             <a:pPr marL="457200" indent="-457200">
@@ -10594,14 +10548,6 @@
   <p:clrMapOvr>
     <a:masterClrMapping/>
   </p:clrMapOvr>
-  <mc:AlternateContent xmlns:mc="http://schemas.openxmlformats.org/markup-compatibility/2006" xmlns:p14="http://schemas.microsoft.com/office/powerpoint/2010/main">
-    <mc:Choice Requires="p14">
-      <p:transition spd="slow" p14:dur="2000"/>
-    </mc:Choice>
-    <mc:Fallback xmlns="">
-      <p:transition spd="slow"/>
-    </mc:Fallback>
-  </mc:AlternateContent>
 </p:sld>
 </file>
 
@@ -11461,7 +11407,7 @@
               <a:t> </a:t>
             </a:r>
             <a:r>
-              <a:rPr lang="en-US" dirty="0" smtClean="0">
+              <a:rPr lang="en-US" dirty="0">
                 <a:solidFill>
                   <a:srgbClr val="FF0000"/>
                 </a:solidFill>
@@ -11850,14 +11796,6 @@
   <p:clrMapOvr>
     <a:masterClrMapping/>
   </p:clrMapOvr>
-  <mc:AlternateContent xmlns:mc="http://schemas.openxmlformats.org/markup-compatibility/2006" xmlns:p14="http://schemas.microsoft.com/office/powerpoint/2010/main">
-    <mc:Choice Requires="p14">
-      <p:transition spd="slow" p14:dur="2000"/>
-    </mc:Choice>
-    <mc:Fallback xmlns="">
-      <p:transition spd="slow"/>
-    </mc:Fallback>
-  </mc:AlternateContent>
 </p:sld>
 </file>
 
@@ -12717,7 +12655,7 @@
               <a:t> </a:t>
             </a:r>
             <a:r>
-              <a:rPr lang="en-US" dirty="0" smtClean="0">
+              <a:rPr lang="en-US" dirty="0">
                 <a:solidFill>
                   <a:srgbClr val="FF0000"/>
                 </a:solidFill>
@@ -13032,14 +12970,6 @@
   <p:clrMapOvr>
     <a:masterClrMapping/>
   </p:clrMapOvr>
-  <mc:AlternateContent xmlns:mc="http://schemas.openxmlformats.org/markup-compatibility/2006" xmlns:p14="http://schemas.microsoft.com/office/powerpoint/2010/main">
-    <mc:Choice Requires="p14">
-      <p:transition spd="slow" p14:dur="2000"/>
-    </mc:Choice>
-    <mc:Fallback xmlns="">
-      <p:transition spd="slow"/>
-    </mc:Fallback>
-  </mc:AlternateContent>
 </p:sld>
 </file>
 
@@ -13822,7 +13752,7 @@
               <a:t> </a:t>
             </a:r>
             <a:r>
-              <a:rPr lang="en-US" dirty="0" smtClean="0">
+              <a:rPr lang="en-US" dirty="0">
                 <a:solidFill>
                   <a:srgbClr val="FF0000"/>
                 </a:solidFill>
@@ -14260,14 +14190,6 @@
   <p:clrMapOvr>
     <a:masterClrMapping/>
   </p:clrMapOvr>
-  <mc:AlternateContent xmlns:mc="http://schemas.openxmlformats.org/markup-compatibility/2006" xmlns:p14="http://schemas.microsoft.com/office/powerpoint/2010/main">
-    <mc:Choice Requires="p14">
-      <p:transition spd="slow" p14:dur="2000"/>
-    </mc:Choice>
-    <mc:Fallback xmlns="">
-      <p:transition spd="slow"/>
-    </mc:Fallback>
-  </mc:AlternateContent>
 </p:sld>
 </file>
 
@@ -15127,7 +15049,7 @@
               <a:t> </a:t>
             </a:r>
             <a:r>
-              <a:rPr lang="en-US" dirty="0" smtClean="0">
+              <a:rPr lang="en-US" dirty="0">
                 <a:solidFill>
                   <a:srgbClr val="FF0000"/>
                 </a:solidFill>
@@ -15479,14 +15401,6 @@
   <p:clrMapOvr>
     <a:masterClrMapping/>
   </p:clrMapOvr>
-  <mc:AlternateContent xmlns:mc="http://schemas.openxmlformats.org/markup-compatibility/2006" xmlns:p14="http://schemas.microsoft.com/office/powerpoint/2010/main">
-    <mc:Choice Requires="p14">
-      <p:transition spd="slow" p14:dur="2000"/>
-    </mc:Choice>
-    <mc:Fallback xmlns="">
-      <p:transition spd="slow"/>
-    </mc:Fallback>
-  </mc:AlternateContent>
 </p:sld>
 </file>
 
@@ -16341,7 +16255,7 @@
               <a:t>= </a:t>
             </a:r>
             <a:r>
-              <a:rPr lang="en-US" dirty="0" smtClean="0">
+              <a:rPr lang="en-US" dirty="0">
                 <a:solidFill>
                   <a:srgbClr val="FF0000"/>
                 </a:solidFill>
@@ -16751,14 +16665,6 @@
   <p:clrMapOvr>
     <a:masterClrMapping/>
   </p:clrMapOvr>
-  <mc:AlternateContent xmlns:mc="http://schemas.openxmlformats.org/markup-compatibility/2006" xmlns:p14="http://schemas.microsoft.com/office/powerpoint/2010/main">
-    <mc:Choice Requires="p14">
-      <p:transition spd="slow" p14:dur="2000"/>
-    </mc:Choice>
-    <mc:Fallback xmlns="">
-      <p:transition spd="slow"/>
-    </mc:Fallback>
-  </mc:AlternateContent>
 </p:sld>
 </file>
 
@@ -17444,7 +17350,7 @@
               <a:t> </a:t>
             </a:r>
             <a:r>
-              <a:rPr lang="en-US" dirty="0" smtClean="0">
+              <a:rPr lang="en-US" dirty="0">
                 <a:solidFill>
                   <a:srgbClr val="FF0000"/>
                 </a:solidFill>
@@ -20094,7 +20000,7 @@
       </p:sp>
       <p:pic>
         <p:nvPicPr>
-          <p:cNvPr id="3" name="Picture 2"/>
+          <p:cNvPr id="5" name="Picture 4"/>
           <p:cNvPicPr>
             <a:picLocks noChangeAspect="1"/>
           </p:cNvPicPr>
@@ -20108,8 +20014,8 @@
         </p:blipFill>
         <p:spPr>
           <a:xfrm>
-            <a:off x="1243584" y="1389888"/>
-            <a:ext cx="6890865" cy="4626864"/>
+            <a:off x="420329" y="1417638"/>
+            <a:ext cx="8303342" cy="4289163"/>
           </a:xfrm>
           <a:prstGeom prst="rect">
             <a:avLst/>
@@ -22460,7 +22366,7 @@
               <a:t> </a:t>
             </a:r>
             <a:r>
-              <a:rPr lang="en-US" sz="1600" dirty="0" smtClean="0">
+              <a:rPr lang="en-US" sz="1600" dirty="0">
                 <a:solidFill>
                   <a:srgbClr val="808080"/>
                 </a:solidFill>
@@ -22471,15 +22377,15 @@
               <a:t>=</a:t>
             </a:r>
             <a:r>
-              <a:rPr lang="en-US" sz="1600" dirty="0" smtClean="0">
-                <a:latin typeface="Consolas" panose="020B0609020204030204" pitchFamily="49" charset="0"/>
-                <a:ea typeface="Calibri" panose="020F0502020204030204" pitchFamily="34" charset="0"/>
-                <a:cs typeface="Times New Roman" panose="02020603050405020304" pitchFamily="18" charset="0"/>
-              </a:rPr>
-              <a:t> </a:t>
-            </a:r>
-            <a:r>
-              <a:rPr lang="en-US" sz="1600" dirty="0" smtClean="0">
+              <a:rPr lang="en-US" sz="1600" dirty="0">
+                <a:latin typeface="Consolas" panose="020B0609020204030204" pitchFamily="49" charset="0"/>
+                <a:ea typeface="Calibri" panose="020F0502020204030204" pitchFamily="34" charset="0"/>
+                <a:cs typeface="Times New Roman" panose="02020603050405020304" pitchFamily="18" charset="0"/>
+              </a:rPr>
+              <a:t> </a:t>
+            </a:r>
+            <a:r>
+              <a:rPr lang="en-US" sz="1600" dirty="0">
                 <a:solidFill>
                   <a:srgbClr val="FF0000"/>
                 </a:solidFill>
@@ -22490,7 +22396,7 @@
               <a:t>'NE'</a:t>
             </a:r>
             <a:r>
-              <a:rPr lang="en-US" sz="1600" dirty="0" smtClean="0">
+              <a:rPr lang="en-US" sz="1600" dirty="0">
                 <a:latin typeface="Consolas" panose="020B0609020204030204" pitchFamily="49" charset="0"/>
                 <a:ea typeface="Calibri" panose="020F0502020204030204" pitchFamily="34" charset="0"/>
                 <a:cs typeface="Times New Roman" panose="02020603050405020304" pitchFamily="18" charset="0"/>
@@ -23868,10 +23774,9 @@
           <a:lstStyle/>
           <a:p>
             <a:r>
-              <a:rPr lang="en-US" dirty="0" smtClean="0"/>
+              <a:rPr lang="en-US" dirty="0"/>
               <a:t>Plan Cache</a:t>
             </a:r>
-            <a:endParaRPr lang="en-US" dirty="0"/>
           </a:p>
         </p:txBody>
       </p:sp>
@@ -23941,13 +23846,8 @@
           <a:p>
             <a:r>
               <a:rPr lang="en-US" dirty="0"/>
-              <a:t>Parse </a:t>
-            </a:r>
-            <a:r>
-              <a:rPr lang="en-US" dirty="0" smtClean="0"/>
-              <a:t>Trees*</a:t>
-            </a:r>
-            <a:endParaRPr lang="en-US" dirty="0"/>
+              <a:t>Parse Trees*</a:t>
+            </a:r>
           </a:p>
         </p:txBody>
       </p:sp>
@@ -24022,10 +23922,9 @@
           <a:lstStyle/>
           <a:p>
             <a:r>
-              <a:rPr lang="en-US" dirty="0" smtClean="0"/>
+              <a:rPr lang="en-US" dirty="0"/>
               <a:t>* Or query trees, or relational trees</a:t>
             </a:r>
-            <a:endParaRPr lang="en-US" dirty="0"/>
           </a:p>
         </p:txBody>
       </p:sp>
@@ -24875,7 +24774,7 @@
               <a:t>= </a:t>
             </a:r>
             <a:r>
-              <a:rPr lang="en-US" sz="1400" dirty="0" smtClean="0">
+              <a:rPr lang="en-US" sz="1400" dirty="0">
                 <a:solidFill>
                   <a:srgbClr val="FF0000"/>
                 </a:solidFill>
@@ -25269,20 +25168,15 @@
             <a:pPr lvl="1"/>
             <a:r>
               <a:rPr lang="en-US" dirty="0"/>
-              <a:t>Additional understanding of SQL Server </a:t>
-            </a:r>
-            <a:r>
-              <a:rPr lang="en-US" dirty="0" smtClean="0"/>
-              <a:t>internals</a:t>
+              <a:t>Additional understanding of SQL Server internals</a:t>
             </a:r>
           </a:p>
           <a:p>
             <a:pPr lvl="1"/>
             <a:r>
-              <a:rPr lang="en-US" dirty="0" smtClean="0"/>
+              <a:rPr lang="en-US" dirty="0"/>
               <a:t>Understanding to help write better queries</a:t>
             </a:r>
-            <a:endParaRPr lang="en-US" dirty="0"/>
           </a:p>
           <a:p>
             <a:pPr lvl="1"/>
@@ -25979,7 +25873,7 @@
               <a:t>= </a:t>
             </a:r>
             <a:r>
-              <a:rPr lang="en-US" sz="1400" dirty="0" smtClean="0">
+              <a:rPr lang="en-US" sz="1400" dirty="0">
                 <a:solidFill>
                   <a:srgbClr val="FF0000"/>
                 </a:solidFill>
@@ -26634,10 +26528,9 @@
           <a:lstStyle/>
           <a:p>
             <a:r>
-              <a:rPr lang="en-US" dirty="0" smtClean="0"/>
+              <a:rPr lang="en-US" dirty="0"/>
               <a:t>Optimization (1 of 2)</a:t>
             </a:r>
-            <a:endParaRPr lang="en-US" dirty="0"/>
           </a:p>
         </p:txBody>
       </p:sp>
@@ -26659,14 +26552,14 @@
           <a:lstStyle/>
           <a:p>
             <a:r>
-              <a:rPr lang="en-US" dirty="0" smtClean="0"/>
+              <a:rPr lang="en-US" dirty="0"/>
               <a:t>Simplification*</a:t>
             </a:r>
           </a:p>
           <a:p>
             <a:pPr lvl="1"/>
             <a:r>
-              <a:rPr lang="en-US" dirty="0" smtClean="0"/>
+              <a:rPr lang="en-US" dirty="0"/>
               <a:t>Standardize queries, remove redundancies</a:t>
             </a:r>
           </a:p>
@@ -26693,21 +26586,16 @@
           </a:p>
           <a:p>
             <a:r>
-              <a:rPr lang="en-US" dirty="0" smtClean="0"/>
-              <a:t>Trivial </a:t>
-            </a:r>
-            <a:r>
               <a:rPr lang="en-US" dirty="0"/>
-              <a:t>plan</a:t>
+              <a:t>Trivial plan</a:t>
             </a:r>
           </a:p>
           <a:p>
             <a:pPr lvl="1"/>
             <a:r>
-              <a:rPr lang="en-US" dirty="0" smtClean="0"/>
+              <a:rPr lang="en-US" dirty="0"/>
               <a:t>Only one possible way to execute query</a:t>
             </a:r>
-            <a:endParaRPr lang="en-US" dirty="0"/>
           </a:p>
           <a:p>
             <a:r>
@@ -26719,20 +26607,15 @@
             <a:pPr lvl="1"/>
             <a:r>
               <a:rPr lang="en-US" dirty="0"/>
-              <a:t>Create / update auto </a:t>
-            </a:r>
-            <a:r>
-              <a:rPr lang="en-US" dirty="0" smtClean="0"/>
-              <a:t>stats</a:t>
+              <a:t>Create / update auto stats</a:t>
             </a:r>
           </a:p>
           <a:p>
             <a:pPr lvl="1"/>
             <a:r>
-              <a:rPr lang="en-US" dirty="0" smtClean="0"/>
+              <a:rPr lang="en-US" dirty="0"/>
               <a:t>SQL Server 7 vs 2014 CE engine</a:t>
             </a:r>
-            <a:endParaRPr lang="en-US" dirty="0" smtClean="0"/>
           </a:p>
           <a:p>
             <a:pPr lvl="1"/>
@@ -27011,19 +26894,19 @@
           </a:lstStyle>
           <a:p>
             <a:r>
-              <a:rPr lang="en-US" sz="2900" dirty="0" smtClean="0"/>
+              <a:rPr lang="en-US" sz="2900" dirty="0"/>
               <a:t>Contradiction detection</a:t>
             </a:r>
           </a:p>
           <a:p>
             <a:r>
-              <a:rPr lang="en-US" sz="2900" dirty="0" smtClean="0"/>
+              <a:rPr lang="en-US" sz="2900" dirty="0"/>
               <a:t>Aggregates on unique keys</a:t>
             </a:r>
           </a:p>
           <a:p>
             <a:r>
-              <a:rPr lang="en-US" sz="2900" dirty="0" smtClean="0"/>
+              <a:rPr lang="en-US" sz="2900" dirty="0"/>
               <a:t>Convert outer join to inner</a:t>
             </a:r>
           </a:p>
@@ -27079,10 +26962,9 @@
           <a:lstStyle/>
           <a:p>
             <a:r>
-              <a:rPr lang="en-US" dirty="0" smtClean="0"/>
+              <a:rPr lang="en-US" dirty="0"/>
               <a:t>Optimization (2 of 2)</a:t>
             </a:r>
-            <a:endParaRPr lang="en-US" dirty="0"/>
           </a:p>
         </p:txBody>
       </p:sp>
@@ -27104,80 +26986,62 @@
           <a:lstStyle/>
           <a:p>
             <a:r>
-              <a:rPr lang="en-US" dirty="0" smtClean="0"/>
-              <a:t>Search </a:t>
-            </a:r>
-            <a:r>
               <a:rPr lang="en-US" dirty="0"/>
-              <a:t>phases 0 through </a:t>
-            </a:r>
-            <a:r>
-              <a:rPr lang="en-US" dirty="0" smtClean="0"/>
-              <a:t>2</a:t>
+              <a:t>Search phases 0 through 2</a:t>
             </a:r>
           </a:p>
           <a:p>
             <a:pPr lvl="1"/>
             <a:r>
-              <a:rPr lang="en-US" dirty="0" smtClean="0"/>
+              <a:rPr lang="en-US" dirty="0"/>
               <a:t>Search 0: “Transaction Processing”</a:t>
             </a:r>
           </a:p>
           <a:p>
             <a:pPr lvl="2"/>
             <a:r>
-              <a:rPr lang="en-US" dirty="0" smtClean="0"/>
+              <a:rPr lang="en-US" dirty="0"/>
               <a:t>Simple, basic tests; internal cost threshold</a:t>
             </a:r>
           </a:p>
           <a:p>
             <a:pPr lvl="1"/>
             <a:r>
-              <a:rPr lang="en-US" dirty="0" smtClean="0"/>
+              <a:rPr lang="en-US" dirty="0"/>
               <a:t>Search 1: “Quick Plan”</a:t>
             </a:r>
           </a:p>
           <a:p>
             <a:pPr lvl="2"/>
             <a:r>
-              <a:rPr lang="en-US" dirty="0" smtClean="0"/>
+              <a:rPr lang="en-US" dirty="0"/>
               <a:t>More rules, parallel exploration; internal cost threshold</a:t>
             </a:r>
           </a:p>
           <a:p>
             <a:pPr lvl="1"/>
             <a:r>
-              <a:rPr lang="en-US" dirty="0" smtClean="0"/>
+              <a:rPr lang="en-US" dirty="0"/>
               <a:t>Search 2: “Full Optimization”</a:t>
             </a:r>
           </a:p>
           <a:p>
             <a:pPr lvl="2"/>
             <a:r>
-              <a:rPr lang="en-US" dirty="0" smtClean="0"/>
+              <a:rPr lang="en-US" dirty="0"/>
               <a:t>Full set of rules; usually exits on timeout</a:t>
             </a:r>
-            <a:endParaRPr lang="en-US" dirty="0"/>
           </a:p>
           <a:p>
             <a:r>
               <a:rPr lang="en-US" dirty="0"/>
-              <a:t>Construct execution </a:t>
-            </a:r>
-            <a:r>
-              <a:rPr lang="en-US" dirty="0" smtClean="0"/>
-              <a:t>plan</a:t>
-            </a:r>
-            <a:endParaRPr lang="en-US" dirty="0"/>
-          </a:p>
-          <a:p>
-            <a:r>
-              <a:rPr lang="en-US" dirty="0" smtClean="0"/>
-              <a:t>Plan caching </a:t>
-            </a:r>
+              <a:t>Construct execution plan</a:t>
+            </a:r>
+          </a:p>
+          <a:p>
             <a:r>
               <a:rPr lang="en-US" dirty="0"/>
-              <a:t>(query text hash, set options)</a:t>
+              <a:t>Plan caching (query text hash, set options)</a:t>
             </a:r>
           </a:p>
         </p:txBody>
@@ -27611,14 +27475,6 @@
   <p:clrMapOvr>
     <a:masterClrMapping/>
   </p:clrMapOvr>
-  <mc:AlternateContent xmlns:mc="http://schemas.openxmlformats.org/markup-compatibility/2006" xmlns:p14="http://schemas.microsoft.com/office/powerpoint/2010/main">
-    <mc:Choice Requires="p14">
-      <p:transition spd="slow" p14:dur="2000"/>
-    </mc:Choice>
-    <mc:Fallback xmlns="">
-      <p:transition spd="slow"/>
-    </mc:Fallback>
-  </mc:AlternateContent>
 </p:sld>
 </file>
 
@@ -27971,14 +27827,14 @@
                 <a:gridCol w="7632835">
                   <a:extLst>
                     <a:ext uri="{9D8B030D-6E8A-4147-A177-3AD203B41FA5}">
-                      <a16:colId xmlns="" xmlns:a16="http://schemas.microsoft.com/office/drawing/2014/main" val="3644048045"/>
+                      <a16:colId xmlns:a16="http://schemas.microsoft.com/office/drawing/2014/main" val="3644048045"/>
                     </a:ext>
                   </a:extLst>
                 </a:gridCol>
                 <a:gridCol w="606393">
                   <a:extLst>
                     <a:ext uri="{9D8B030D-6E8A-4147-A177-3AD203B41FA5}">
-                      <a16:colId xmlns="" xmlns:a16="http://schemas.microsoft.com/office/drawing/2014/main" val="2034254753"/>
+                      <a16:colId xmlns:a16="http://schemas.microsoft.com/office/drawing/2014/main" val="2034254753"/>
                     </a:ext>
                   </a:extLst>
                 </a:gridCol>
@@ -28009,7 +27865,7 @@
                 </a:tc>
                 <a:extLst>
                   <a:ext uri="{0D108BD9-81ED-4DB2-BD59-A6C34878D82A}">
-                    <a16:rowId xmlns="" xmlns:a16="http://schemas.microsoft.com/office/drawing/2014/main" val="2708275910"/>
+                    <a16:rowId xmlns:a16="http://schemas.microsoft.com/office/drawing/2014/main" val="2708275910"/>
                   </a:ext>
                 </a:extLst>
               </a:tr>
@@ -28043,7 +27899,7 @@
                 </a:tc>
                 <a:extLst>
                   <a:ext uri="{0D108BD9-81ED-4DB2-BD59-A6C34878D82A}">
-                    <a16:rowId xmlns="" xmlns:a16="http://schemas.microsoft.com/office/drawing/2014/main" val="2161984115"/>
+                    <a16:rowId xmlns:a16="http://schemas.microsoft.com/office/drawing/2014/main" val="2161984115"/>
                   </a:ext>
                 </a:extLst>
               </a:tr>
@@ -28090,7 +27946,7 @@
                 </a:tc>
                 <a:extLst>
                   <a:ext uri="{0D108BD9-81ED-4DB2-BD59-A6C34878D82A}">
-                    <a16:rowId xmlns="" xmlns:a16="http://schemas.microsoft.com/office/drawing/2014/main" val="2841678841"/>
+                    <a16:rowId xmlns:a16="http://schemas.microsoft.com/office/drawing/2014/main" val="2841678841"/>
                   </a:ext>
                 </a:extLst>
               </a:tr>
@@ -28124,7 +27980,7 @@
                 </a:tc>
                 <a:extLst>
                   <a:ext uri="{0D108BD9-81ED-4DB2-BD59-A6C34878D82A}">
-                    <a16:rowId xmlns="" xmlns:a16="http://schemas.microsoft.com/office/drawing/2014/main" val="3144998627"/>
+                    <a16:rowId xmlns:a16="http://schemas.microsoft.com/office/drawing/2014/main" val="3144998627"/>
                   </a:ext>
                 </a:extLst>
               </a:tr>
@@ -28166,7 +28022,7 @@
                 </a:tc>
                 <a:extLst>
                   <a:ext uri="{0D108BD9-81ED-4DB2-BD59-A6C34878D82A}">
-                    <a16:rowId xmlns="" xmlns:a16="http://schemas.microsoft.com/office/drawing/2014/main" val="1419261869"/>
+                    <a16:rowId xmlns:a16="http://schemas.microsoft.com/office/drawing/2014/main" val="1419261869"/>
                   </a:ext>
                 </a:extLst>
               </a:tr>
@@ -28204,7 +28060,7 @@
                 </a:tc>
                 <a:extLst>
                   <a:ext uri="{0D108BD9-81ED-4DB2-BD59-A6C34878D82A}">
-                    <a16:rowId xmlns="" xmlns:a16="http://schemas.microsoft.com/office/drawing/2014/main" val="1427391072"/>
+                    <a16:rowId xmlns:a16="http://schemas.microsoft.com/office/drawing/2014/main" val="1427391072"/>
                   </a:ext>
                 </a:extLst>
               </a:tr>
@@ -28251,7 +28107,7 @@
                 </a:tc>
                 <a:extLst>
                   <a:ext uri="{0D108BD9-81ED-4DB2-BD59-A6C34878D82A}">
-                    <a16:rowId xmlns="" xmlns:a16="http://schemas.microsoft.com/office/drawing/2014/main" val="2346539918"/>
+                    <a16:rowId xmlns:a16="http://schemas.microsoft.com/office/drawing/2014/main" val="2346539918"/>
                   </a:ext>
                 </a:extLst>
               </a:tr>
@@ -28290,7 +28146,7 @@
                 </a:tc>
                 <a:extLst>
                   <a:ext uri="{0D108BD9-81ED-4DB2-BD59-A6C34878D82A}">
-                    <a16:rowId xmlns="" xmlns:a16="http://schemas.microsoft.com/office/drawing/2014/main" val="2275483042"/>
+                    <a16:rowId xmlns:a16="http://schemas.microsoft.com/office/drawing/2014/main" val="2275483042"/>
                   </a:ext>
                 </a:extLst>
               </a:tr>
@@ -28328,7 +28184,7 @@
                 </a:tc>
                 <a:extLst>
                   <a:ext uri="{0D108BD9-81ED-4DB2-BD59-A6C34878D82A}">
-                    <a16:rowId xmlns="" xmlns:a16="http://schemas.microsoft.com/office/drawing/2014/main" val="4202569347"/>
+                    <a16:rowId xmlns:a16="http://schemas.microsoft.com/office/drawing/2014/main" val="4202569347"/>
                   </a:ext>
                 </a:extLst>
               </a:tr>
@@ -28362,7 +28218,7 @@
                 </a:tc>
                 <a:extLst>
                   <a:ext uri="{0D108BD9-81ED-4DB2-BD59-A6C34878D82A}">
-                    <a16:rowId xmlns="" xmlns:a16="http://schemas.microsoft.com/office/drawing/2014/main" val="2989839269"/>
+                    <a16:rowId xmlns:a16="http://schemas.microsoft.com/office/drawing/2014/main" val="2989839269"/>
                   </a:ext>
                 </a:extLst>
               </a:tr>
@@ -28396,7 +28252,7 @@
                 </a:tc>
                 <a:extLst>
                   <a:ext uri="{0D108BD9-81ED-4DB2-BD59-A6C34878D82A}">
-                    <a16:rowId xmlns="" xmlns:a16="http://schemas.microsoft.com/office/drawing/2014/main" val="2130545569"/>
+                    <a16:rowId xmlns:a16="http://schemas.microsoft.com/office/drawing/2014/main" val="2130545569"/>
                   </a:ext>
                 </a:extLst>
               </a:tr>
@@ -28452,7 +28308,7 @@
                 </a:tc>
                 <a:extLst>
                   <a:ext uri="{0D108BD9-81ED-4DB2-BD59-A6C34878D82A}">
-                    <a16:rowId xmlns="" xmlns:a16="http://schemas.microsoft.com/office/drawing/2014/main" val="1848127216"/>
+                    <a16:rowId xmlns:a16="http://schemas.microsoft.com/office/drawing/2014/main" val="1848127216"/>
                   </a:ext>
                 </a:extLst>
               </a:tr>
@@ -28546,14 +28402,6 @@
   <p:clrMapOvr>
     <a:masterClrMapping/>
   </p:clrMapOvr>
-  <mc:AlternateContent xmlns:mc="http://schemas.openxmlformats.org/markup-compatibility/2006" xmlns:p14="http://schemas.microsoft.com/office/powerpoint/2010/main">
-    <mc:Choice Requires="p14">
-      <p:transition spd="slow" p14:dur="2000"/>
-    </mc:Choice>
-    <mc:Fallback xmlns="">
-      <p:transition spd="slow"/>
-    </mc:Fallback>
-  </mc:AlternateContent>
 </p:sld>
 </file>
 
@@ -28906,14 +28754,14 @@
                 <a:gridCol w="4119615">
                   <a:extLst>
                     <a:ext uri="{9D8B030D-6E8A-4147-A177-3AD203B41FA5}">
-                      <a16:colId xmlns="" xmlns:a16="http://schemas.microsoft.com/office/drawing/2014/main" val="3644048045"/>
+                      <a16:colId xmlns:a16="http://schemas.microsoft.com/office/drawing/2014/main" val="3644048045"/>
                     </a:ext>
                   </a:extLst>
                 </a:gridCol>
                 <a:gridCol w="4119613">
                   <a:extLst>
                     <a:ext uri="{9D8B030D-6E8A-4147-A177-3AD203B41FA5}">
-                      <a16:colId xmlns="" xmlns:a16="http://schemas.microsoft.com/office/drawing/2014/main" val="2034254753"/>
+                      <a16:colId xmlns:a16="http://schemas.microsoft.com/office/drawing/2014/main" val="2034254753"/>
                     </a:ext>
                   </a:extLst>
                 </a:gridCol>
@@ -28949,7 +28797,7 @@
                 </a:tc>
                 <a:extLst>
                   <a:ext uri="{0D108BD9-81ED-4DB2-BD59-A6C34878D82A}">
-                    <a16:rowId xmlns="" xmlns:a16="http://schemas.microsoft.com/office/drawing/2014/main" val="2708275910"/>
+                    <a16:rowId xmlns:a16="http://schemas.microsoft.com/office/drawing/2014/main" val="2708275910"/>
                   </a:ext>
                 </a:extLst>
               </a:tr>
@@ -29149,7 +28997,7 @@
                 </a:tc>
                 <a:extLst>
                   <a:ext uri="{0D108BD9-81ED-4DB2-BD59-A6C34878D82A}">
-                    <a16:rowId xmlns="" xmlns:a16="http://schemas.microsoft.com/office/drawing/2014/main" val="2161984115"/>
+                    <a16:rowId xmlns:a16="http://schemas.microsoft.com/office/drawing/2014/main" val="2161984115"/>
                   </a:ext>
                 </a:extLst>
               </a:tr>
@@ -29349,7 +29197,7 @@
                 </a:tc>
                 <a:extLst>
                   <a:ext uri="{0D108BD9-81ED-4DB2-BD59-A6C34878D82A}">
-                    <a16:rowId xmlns="" xmlns:a16="http://schemas.microsoft.com/office/drawing/2014/main" val="2841678841"/>
+                    <a16:rowId xmlns:a16="http://schemas.microsoft.com/office/drawing/2014/main" val="2841678841"/>
                   </a:ext>
                 </a:extLst>
               </a:tr>
@@ -29549,7 +29397,7 @@
                 </a:tc>
                 <a:extLst>
                   <a:ext uri="{0D108BD9-81ED-4DB2-BD59-A6C34878D82A}">
-                    <a16:rowId xmlns="" xmlns:a16="http://schemas.microsoft.com/office/drawing/2014/main" val="3144998627"/>
+                    <a16:rowId xmlns:a16="http://schemas.microsoft.com/office/drawing/2014/main" val="3144998627"/>
                   </a:ext>
                 </a:extLst>
               </a:tr>
@@ -29749,7 +29597,7 @@
                 </a:tc>
                 <a:extLst>
                   <a:ext uri="{0D108BD9-81ED-4DB2-BD59-A6C34878D82A}">
-                    <a16:rowId xmlns="" xmlns:a16="http://schemas.microsoft.com/office/drawing/2014/main" val="1419261869"/>
+                    <a16:rowId xmlns:a16="http://schemas.microsoft.com/office/drawing/2014/main" val="1419261869"/>
                   </a:ext>
                 </a:extLst>
               </a:tr>
@@ -29949,7 +29797,7 @@
                 </a:tc>
                 <a:extLst>
                   <a:ext uri="{0D108BD9-81ED-4DB2-BD59-A6C34878D82A}">
-                    <a16:rowId xmlns="" xmlns:a16="http://schemas.microsoft.com/office/drawing/2014/main" val="1427391072"/>
+                    <a16:rowId xmlns:a16="http://schemas.microsoft.com/office/drawing/2014/main" val="1427391072"/>
                   </a:ext>
                 </a:extLst>
               </a:tr>
@@ -30149,7 +29997,7 @@
                 </a:tc>
                 <a:extLst>
                   <a:ext uri="{0D108BD9-81ED-4DB2-BD59-A6C34878D82A}">
-                    <a16:rowId xmlns="" xmlns:a16="http://schemas.microsoft.com/office/drawing/2014/main" val="2346539918"/>
+                    <a16:rowId xmlns:a16="http://schemas.microsoft.com/office/drawing/2014/main" val="2346539918"/>
                   </a:ext>
                 </a:extLst>
               </a:tr>
@@ -30358,7 +30206,7 @@
                 </a:tc>
                 <a:extLst>
                   <a:ext uri="{0D108BD9-81ED-4DB2-BD59-A6C34878D82A}">
-                    <a16:rowId xmlns="" xmlns:a16="http://schemas.microsoft.com/office/drawing/2014/main" val="2275483042"/>
+                    <a16:rowId xmlns:a16="http://schemas.microsoft.com/office/drawing/2014/main" val="2275483042"/>
                   </a:ext>
                 </a:extLst>
               </a:tr>
@@ -30567,7 +30415,7 @@
                 </a:tc>
                 <a:extLst>
                   <a:ext uri="{0D108BD9-81ED-4DB2-BD59-A6C34878D82A}">
-                    <a16:rowId xmlns="" xmlns:a16="http://schemas.microsoft.com/office/drawing/2014/main" val="4202569347"/>
+                    <a16:rowId xmlns:a16="http://schemas.microsoft.com/office/drawing/2014/main" val="4202569347"/>
                   </a:ext>
                 </a:extLst>
               </a:tr>
@@ -30776,7 +30624,7 @@
                 </a:tc>
                 <a:extLst>
                   <a:ext uri="{0D108BD9-81ED-4DB2-BD59-A6C34878D82A}">
-                    <a16:rowId xmlns="" xmlns:a16="http://schemas.microsoft.com/office/drawing/2014/main" val="2989839269"/>
+                    <a16:rowId xmlns:a16="http://schemas.microsoft.com/office/drawing/2014/main" val="2989839269"/>
                   </a:ext>
                 </a:extLst>
               </a:tr>
@@ -30985,7 +30833,7 @@
                 </a:tc>
                 <a:extLst>
                   <a:ext uri="{0D108BD9-81ED-4DB2-BD59-A6C34878D82A}">
-                    <a16:rowId xmlns="" xmlns:a16="http://schemas.microsoft.com/office/drawing/2014/main" val="2130545569"/>
+                    <a16:rowId xmlns:a16="http://schemas.microsoft.com/office/drawing/2014/main" val="2130545569"/>
                   </a:ext>
                 </a:extLst>
               </a:tr>
@@ -31194,7 +31042,7 @@
                 </a:tc>
                 <a:extLst>
                   <a:ext uri="{0D108BD9-81ED-4DB2-BD59-A6C34878D82A}">
-                    <a16:rowId xmlns="" xmlns:a16="http://schemas.microsoft.com/office/drawing/2014/main" val="3045796785"/>
+                    <a16:rowId xmlns:a16="http://schemas.microsoft.com/office/drawing/2014/main" val="3045796785"/>
                   </a:ext>
                 </a:extLst>
               </a:tr>
@@ -31403,7 +31251,7 @@
                 </a:tc>
                 <a:extLst>
                   <a:ext uri="{0D108BD9-81ED-4DB2-BD59-A6C34878D82A}">
-                    <a16:rowId xmlns="" xmlns:a16="http://schemas.microsoft.com/office/drawing/2014/main" val="1091494175"/>
+                    <a16:rowId xmlns:a16="http://schemas.microsoft.com/office/drawing/2014/main" val="1091494175"/>
                   </a:ext>
                 </a:extLst>
               </a:tr>
@@ -31421,14 +31269,6 @@
   <p:clrMapOvr>
     <a:masterClrMapping/>
   </p:clrMapOvr>
-  <mc:AlternateContent xmlns:mc="http://schemas.openxmlformats.org/markup-compatibility/2006" xmlns:p14="http://schemas.microsoft.com/office/powerpoint/2010/main">
-    <mc:Choice Requires="p14">
-      <p:transition spd="slow" p14:dur="2000"/>
-    </mc:Choice>
-    <mc:Fallback xmlns="">
-      <p:transition spd="slow"/>
-    </mc:Fallback>
-  </mc:AlternateContent>
 </p:sld>
 </file>
 
@@ -31541,14 +31381,6 @@
   <p:clrMapOvr>
     <a:masterClrMapping/>
   </p:clrMapOvr>
-  <mc:AlternateContent xmlns:mc="http://schemas.openxmlformats.org/markup-compatibility/2006" xmlns:p14="http://schemas.microsoft.com/office/powerpoint/2010/main">
-    <mc:Choice Requires="p14">
-      <p:transition spd="slow" p14:dur="2000"/>
-    </mc:Choice>
-    <mc:Fallback xmlns="">
-      <p:transition spd="slow"/>
-    </mc:Fallback>
-  </mc:AlternateContent>
 </p:sld>
 </file>
 
@@ -31724,14 +31556,6 @@
   <p:clrMapOvr>
     <a:masterClrMapping/>
   </p:clrMapOvr>
-  <mc:AlternateContent xmlns:mc="http://schemas.openxmlformats.org/markup-compatibility/2006" xmlns:p14="http://schemas.microsoft.com/office/powerpoint/2010/main">
-    <mc:Choice Requires="p14">
-      <p:transition spd="slow" p14:dur="2000"/>
-    </mc:Choice>
-    <mc:Fallback xmlns="">
-      <p:transition spd="slow"/>
-    </mc:Fallback>
-  </mc:AlternateContent>
 </p:sld>
 </file>
 
@@ -32428,14 +32252,6 @@
   <p:clrMapOvr>
     <a:masterClrMapping/>
   </p:clrMapOvr>
-  <mc:AlternateContent xmlns:mc="http://schemas.openxmlformats.org/markup-compatibility/2006" xmlns:p14="http://schemas.microsoft.com/office/powerpoint/2010/main">
-    <mc:Choice Requires="p14">
-      <p:transition spd="slow" p14:dur="2000"/>
-    </mc:Choice>
-    <mc:Fallback xmlns="">
-      <p:transition spd="slow"/>
-    </mc:Fallback>
-  </mc:AlternateContent>
 </p:sld>
 </file>
 
@@ -32956,14 +32772,6 @@
   <p:clrMapOvr>
     <a:masterClrMapping/>
   </p:clrMapOvr>
-  <mc:AlternateContent xmlns:mc="http://schemas.openxmlformats.org/markup-compatibility/2006" xmlns:p14="http://schemas.microsoft.com/office/powerpoint/2010/main">
-    <mc:Choice Requires="p14">
-      <p:transition spd="slow" p14:dur="2000"/>
-    </mc:Choice>
-    <mc:Fallback xmlns="">
-      <p:transition spd="slow"/>
-    </mc:Fallback>
-  </mc:AlternateContent>
 </p:sld>
 </file>
 
@@ -33947,14 +33755,6 @@
   <p:clrMapOvr>
     <a:masterClrMapping/>
   </p:clrMapOvr>
-  <mc:AlternateContent xmlns:mc="http://schemas.openxmlformats.org/markup-compatibility/2006" xmlns:p14="http://schemas.microsoft.com/office/powerpoint/2010/main">
-    <mc:Choice Requires="p14">
-      <p:transition spd="slow" p14:dur="2000"/>
-    </mc:Choice>
-    <mc:Fallback xmlns="">
-      <p:transition spd="slow"/>
-    </mc:Fallback>
-  </mc:AlternateContent>
 </p:sld>
 </file>
 
@@ -34746,14 +34546,14 @@
                 <a:gridCol w="957714">
                   <a:extLst>
                     <a:ext uri="{9D8B030D-6E8A-4147-A177-3AD203B41FA5}">
-                      <a16:colId xmlns="" xmlns:a16="http://schemas.microsoft.com/office/drawing/2014/main" val="3940544257"/>
+                      <a16:colId xmlns:a16="http://schemas.microsoft.com/office/drawing/2014/main" val="3940544257"/>
                     </a:ext>
                   </a:extLst>
                 </a:gridCol>
                 <a:gridCol w="2464067">
                   <a:extLst>
                     <a:ext uri="{9D8B030D-6E8A-4147-A177-3AD203B41FA5}">
-                      <a16:colId xmlns="" xmlns:a16="http://schemas.microsoft.com/office/drawing/2014/main" val="3658567973"/>
+                      <a16:colId xmlns:a16="http://schemas.microsoft.com/office/drawing/2014/main" val="3658567973"/>
                     </a:ext>
                   </a:extLst>
                 </a:gridCol>
@@ -34787,7 +34587,7 @@
                 </a:tc>
                 <a:extLst>
                   <a:ext uri="{0D108BD9-81ED-4DB2-BD59-A6C34878D82A}">
-                    <a16:rowId xmlns="" xmlns:a16="http://schemas.microsoft.com/office/drawing/2014/main" val="1032275335"/>
+                    <a16:rowId xmlns:a16="http://schemas.microsoft.com/office/drawing/2014/main" val="1032275335"/>
                   </a:ext>
                 </a:extLst>
               </a:tr>
@@ -34917,7 +34717,7 @@
                 </a:tc>
                 <a:extLst>
                   <a:ext uri="{0D108BD9-81ED-4DB2-BD59-A6C34878D82A}">
-                    <a16:rowId xmlns="" xmlns:a16="http://schemas.microsoft.com/office/drawing/2014/main" val="4191484087"/>
+                    <a16:rowId xmlns:a16="http://schemas.microsoft.com/office/drawing/2014/main" val="4191484087"/>
                   </a:ext>
                 </a:extLst>
               </a:tr>
@@ -34991,7 +34791,7 @@
                 </a:tc>
                 <a:extLst>
                   <a:ext uri="{0D108BD9-81ED-4DB2-BD59-A6C34878D82A}">
-                    <a16:rowId xmlns="" xmlns:a16="http://schemas.microsoft.com/office/drawing/2014/main" val="1864588626"/>
+                    <a16:rowId xmlns:a16="http://schemas.microsoft.com/office/drawing/2014/main" val="1864588626"/>
                   </a:ext>
                 </a:extLst>
               </a:tr>
@@ -35113,7 +34913,7 @@
                 </a:tc>
                 <a:extLst>
                   <a:ext uri="{0D108BD9-81ED-4DB2-BD59-A6C34878D82A}">
-                    <a16:rowId xmlns="" xmlns:a16="http://schemas.microsoft.com/office/drawing/2014/main" val="3035259714"/>
+                    <a16:rowId xmlns:a16="http://schemas.microsoft.com/office/drawing/2014/main" val="3035259714"/>
                   </a:ext>
                 </a:extLst>
               </a:tr>
@@ -35202,7 +35002,7 @@
                 </a:tc>
                 <a:extLst>
                   <a:ext uri="{0D108BD9-81ED-4DB2-BD59-A6C34878D82A}">
-                    <a16:rowId xmlns="" xmlns:a16="http://schemas.microsoft.com/office/drawing/2014/main" val="2023621082"/>
+                    <a16:rowId xmlns:a16="http://schemas.microsoft.com/office/drawing/2014/main" val="2023621082"/>
                   </a:ext>
                 </a:extLst>
               </a:tr>
@@ -35291,7 +35091,7 @@
                 </a:tc>
                 <a:extLst>
                   <a:ext uri="{0D108BD9-81ED-4DB2-BD59-A6C34878D82A}">
-                    <a16:rowId xmlns="" xmlns:a16="http://schemas.microsoft.com/office/drawing/2014/main" val="120016333"/>
+                    <a16:rowId xmlns:a16="http://schemas.microsoft.com/office/drawing/2014/main" val="120016333"/>
                   </a:ext>
                 </a:extLst>
               </a:tr>
@@ -35537,21 +35337,21 @@
                 <a:gridCol w="960120">
                   <a:extLst>
                     <a:ext uri="{9D8B030D-6E8A-4147-A177-3AD203B41FA5}">
-                      <a16:colId xmlns="" xmlns:a16="http://schemas.microsoft.com/office/drawing/2014/main" val="392696932"/>
+                      <a16:colId xmlns:a16="http://schemas.microsoft.com/office/drawing/2014/main" val="392696932"/>
                     </a:ext>
                   </a:extLst>
                 </a:gridCol>
                 <a:gridCol w="2468880">
                   <a:extLst>
                     <a:ext uri="{9D8B030D-6E8A-4147-A177-3AD203B41FA5}">
-                      <a16:colId xmlns="" xmlns:a16="http://schemas.microsoft.com/office/drawing/2014/main" val="2769969192"/>
+                      <a16:colId xmlns:a16="http://schemas.microsoft.com/office/drawing/2014/main" val="2769969192"/>
                     </a:ext>
                   </a:extLst>
                 </a:gridCol>
                 <a:gridCol w="2468880">
                   <a:extLst>
                     <a:ext uri="{9D8B030D-6E8A-4147-A177-3AD203B41FA5}">
-                      <a16:colId xmlns="" xmlns:a16="http://schemas.microsoft.com/office/drawing/2014/main" val="2022610816"/>
+                      <a16:colId xmlns:a16="http://schemas.microsoft.com/office/drawing/2014/main" val="2022610816"/>
                     </a:ext>
                   </a:extLst>
                 </a:gridCol>
@@ -35603,7 +35403,7 @@
                 </a:tc>
                 <a:extLst>
                   <a:ext uri="{0D108BD9-81ED-4DB2-BD59-A6C34878D82A}">
-                    <a16:rowId xmlns="" xmlns:a16="http://schemas.microsoft.com/office/drawing/2014/main" val="2344937666"/>
+                    <a16:rowId xmlns:a16="http://schemas.microsoft.com/office/drawing/2014/main" val="2344937666"/>
                   </a:ext>
                 </a:extLst>
               </a:tr>
@@ -35736,7 +35536,7 @@
                 </a:tc>
                 <a:extLst>
                   <a:ext uri="{0D108BD9-81ED-4DB2-BD59-A6C34878D82A}">
-                    <a16:rowId xmlns="" xmlns:a16="http://schemas.microsoft.com/office/drawing/2014/main" val="1917341330"/>
+                    <a16:rowId xmlns:a16="http://schemas.microsoft.com/office/drawing/2014/main" val="1917341330"/>
                   </a:ext>
                 </a:extLst>
               </a:tr>
@@ -35953,7 +35753,7 @@
                 </a:tc>
                 <a:extLst>
                   <a:ext uri="{0D108BD9-81ED-4DB2-BD59-A6C34878D82A}">
-                    <a16:rowId xmlns="" xmlns:a16="http://schemas.microsoft.com/office/drawing/2014/main" val="3088042860"/>
+                    <a16:rowId xmlns:a16="http://schemas.microsoft.com/office/drawing/2014/main" val="3088042860"/>
                   </a:ext>
                 </a:extLst>
               </a:tr>
@@ -36037,7 +35837,7 @@
                 </a:tc>
                 <a:extLst>
                   <a:ext uri="{0D108BD9-81ED-4DB2-BD59-A6C34878D82A}">
-                    <a16:rowId xmlns="" xmlns:a16="http://schemas.microsoft.com/office/drawing/2014/main" val="2658530722"/>
+                    <a16:rowId xmlns:a16="http://schemas.microsoft.com/office/drawing/2014/main" val="2658530722"/>
                   </a:ext>
                 </a:extLst>
               </a:tr>
@@ -36169,7 +35969,7 @@
                 </a:tc>
                 <a:extLst>
                   <a:ext uri="{0D108BD9-81ED-4DB2-BD59-A6C34878D82A}">
-                    <a16:rowId xmlns="" xmlns:a16="http://schemas.microsoft.com/office/drawing/2014/main" val="1481886367"/>
+                    <a16:rowId xmlns:a16="http://schemas.microsoft.com/office/drawing/2014/main" val="1481886367"/>
                   </a:ext>
                 </a:extLst>
               </a:tr>
@@ -36268,7 +36068,7 @@
                 </a:tc>
                 <a:extLst>
                   <a:ext uri="{0D108BD9-81ED-4DB2-BD59-A6C34878D82A}">
-                    <a16:rowId xmlns="" xmlns:a16="http://schemas.microsoft.com/office/drawing/2014/main" val="4248384778"/>
+                    <a16:rowId xmlns:a16="http://schemas.microsoft.com/office/drawing/2014/main" val="4248384778"/>
                   </a:ext>
                 </a:extLst>
               </a:tr>
@@ -36367,7 +36167,7 @@
                 </a:tc>
                 <a:extLst>
                   <a:ext uri="{0D108BD9-81ED-4DB2-BD59-A6C34878D82A}">
-                    <a16:rowId xmlns="" xmlns:a16="http://schemas.microsoft.com/office/drawing/2014/main" val="1670483340"/>
+                    <a16:rowId xmlns:a16="http://schemas.microsoft.com/office/drawing/2014/main" val="1670483340"/>
                   </a:ext>
                 </a:extLst>
               </a:tr>
@@ -36512,28 +36312,28 @@
                 <a:gridCol w="960120">
                   <a:extLst>
                     <a:ext uri="{9D8B030D-6E8A-4147-A177-3AD203B41FA5}">
-                      <a16:colId xmlns="" xmlns:a16="http://schemas.microsoft.com/office/drawing/2014/main" val="392696932"/>
+                      <a16:colId xmlns:a16="http://schemas.microsoft.com/office/drawing/2014/main" val="392696932"/>
                     </a:ext>
                   </a:extLst>
                 </a:gridCol>
                 <a:gridCol w="2468880">
                   <a:extLst>
                     <a:ext uri="{9D8B030D-6E8A-4147-A177-3AD203B41FA5}">
-                      <a16:colId xmlns="" xmlns:a16="http://schemas.microsoft.com/office/drawing/2014/main" val="2769969192"/>
+                      <a16:colId xmlns:a16="http://schemas.microsoft.com/office/drawing/2014/main" val="2769969192"/>
                     </a:ext>
                   </a:extLst>
                 </a:gridCol>
                 <a:gridCol w="2468880">
                   <a:extLst>
                     <a:ext uri="{9D8B030D-6E8A-4147-A177-3AD203B41FA5}">
-                      <a16:colId xmlns="" xmlns:a16="http://schemas.microsoft.com/office/drawing/2014/main" val="2022610816"/>
+                      <a16:colId xmlns:a16="http://schemas.microsoft.com/office/drawing/2014/main" val="2022610816"/>
                     </a:ext>
                   </a:extLst>
                 </a:gridCol>
                 <a:gridCol w="2468880">
                   <a:extLst>
                     <a:ext uri="{9D8B030D-6E8A-4147-A177-3AD203B41FA5}">
-                      <a16:colId xmlns="" xmlns:a16="http://schemas.microsoft.com/office/drawing/2014/main" val="102813283"/>
+                      <a16:colId xmlns:a16="http://schemas.microsoft.com/office/drawing/2014/main" val="102813283"/>
                     </a:ext>
                   </a:extLst>
                 </a:gridCol>
@@ -36598,7 +36398,7 @@
                 </a:tc>
                 <a:extLst>
                   <a:ext uri="{0D108BD9-81ED-4DB2-BD59-A6C34878D82A}">
-                    <a16:rowId xmlns="" xmlns:a16="http://schemas.microsoft.com/office/drawing/2014/main" val="2344937666"/>
+                    <a16:rowId xmlns:a16="http://schemas.microsoft.com/office/drawing/2014/main" val="2344937666"/>
                   </a:ext>
                 </a:extLst>
               </a:tr>
@@ -36758,7 +36558,7 @@
                 </a:tc>
                 <a:extLst>
                   <a:ext uri="{0D108BD9-81ED-4DB2-BD59-A6C34878D82A}">
-                    <a16:rowId xmlns="" xmlns:a16="http://schemas.microsoft.com/office/drawing/2014/main" val="1917341330"/>
+                    <a16:rowId xmlns:a16="http://schemas.microsoft.com/office/drawing/2014/main" val="1917341330"/>
                   </a:ext>
                 </a:extLst>
               </a:tr>
@@ -37062,7 +36862,7 @@
                 </a:tc>
                 <a:extLst>
                   <a:ext uri="{0D108BD9-81ED-4DB2-BD59-A6C34878D82A}">
-                    <a16:rowId xmlns="" xmlns:a16="http://schemas.microsoft.com/office/drawing/2014/main" val="3088042860"/>
+                    <a16:rowId xmlns:a16="http://schemas.microsoft.com/office/drawing/2014/main" val="3088042860"/>
                   </a:ext>
                 </a:extLst>
               </a:tr>
@@ -37156,7 +36956,7 @@
                 </a:tc>
                 <a:extLst>
                   <a:ext uri="{0D108BD9-81ED-4DB2-BD59-A6C34878D82A}">
-                    <a16:rowId xmlns="" xmlns:a16="http://schemas.microsoft.com/office/drawing/2014/main" val="2658530722"/>
+                    <a16:rowId xmlns:a16="http://schemas.microsoft.com/office/drawing/2014/main" val="2658530722"/>
                   </a:ext>
                 </a:extLst>
               </a:tr>
@@ -37349,7 +37149,7 @@
                 </a:tc>
                 <a:extLst>
                   <a:ext uri="{0D108BD9-81ED-4DB2-BD59-A6C34878D82A}">
-                    <a16:rowId xmlns="" xmlns:a16="http://schemas.microsoft.com/office/drawing/2014/main" val="1481886367"/>
+                    <a16:rowId xmlns:a16="http://schemas.microsoft.com/office/drawing/2014/main" val="1481886367"/>
                   </a:ext>
                 </a:extLst>
               </a:tr>
@@ -37458,7 +37258,7 @@
                 </a:tc>
                 <a:extLst>
                   <a:ext uri="{0D108BD9-81ED-4DB2-BD59-A6C34878D82A}">
-                    <a16:rowId xmlns="" xmlns:a16="http://schemas.microsoft.com/office/drawing/2014/main" val="4248384778"/>
+                    <a16:rowId xmlns:a16="http://schemas.microsoft.com/office/drawing/2014/main" val="4248384778"/>
                   </a:ext>
                 </a:extLst>
               </a:tr>
@@ -37567,7 +37367,7 @@
                 </a:tc>
                 <a:extLst>
                   <a:ext uri="{0D108BD9-81ED-4DB2-BD59-A6C34878D82A}">
-                    <a16:rowId xmlns="" xmlns:a16="http://schemas.microsoft.com/office/drawing/2014/main" val="1670483340"/>
+                    <a16:rowId xmlns:a16="http://schemas.microsoft.com/office/drawing/2014/main" val="1670483340"/>
                   </a:ext>
                 </a:extLst>
               </a:tr>
@@ -37971,14 +37771,14 @@
                 <a:gridCol w="934278">
                   <a:extLst>
                     <a:ext uri="{9D8B030D-6E8A-4147-A177-3AD203B41FA5}">
-                      <a16:colId xmlns="" xmlns:a16="http://schemas.microsoft.com/office/drawing/2014/main" val="4198655800"/>
+                      <a16:colId xmlns:a16="http://schemas.microsoft.com/office/drawing/2014/main" val="4198655800"/>
                     </a:ext>
                   </a:extLst>
                 </a:gridCol>
                 <a:gridCol w="7295322">
                   <a:extLst>
                     <a:ext uri="{9D8B030D-6E8A-4147-A177-3AD203B41FA5}">
-                      <a16:colId xmlns="" xmlns:a16="http://schemas.microsoft.com/office/drawing/2014/main" val="135413862"/>
+                      <a16:colId xmlns:a16="http://schemas.microsoft.com/office/drawing/2014/main" val="135413862"/>
                     </a:ext>
                   </a:extLst>
                 </a:gridCol>
@@ -38012,7 +37812,7 @@
                 </a:tc>
                 <a:extLst>
                   <a:ext uri="{0D108BD9-81ED-4DB2-BD59-A6C34878D82A}">
-                    <a16:rowId xmlns="" xmlns:a16="http://schemas.microsoft.com/office/drawing/2014/main" val="3068323444"/>
+                    <a16:rowId xmlns:a16="http://schemas.microsoft.com/office/drawing/2014/main" val="3068323444"/>
                   </a:ext>
                 </a:extLst>
               </a:tr>
@@ -38045,7 +37845,7 @@
                 </a:tc>
                 <a:extLst>
                   <a:ext uri="{0D108BD9-81ED-4DB2-BD59-A6C34878D82A}">
-                    <a16:rowId xmlns="" xmlns:a16="http://schemas.microsoft.com/office/drawing/2014/main" val="1586961909"/>
+                    <a16:rowId xmlns:a16="http://schemas.microsoft.com/office/drawing/2014/main" val="1586961909"/>
                   </a:ext>
                 </a:extLst>
               </a:tr>
@@ -38083,7 +37883,7 @@
                 </a:tc>
                 <a:extLst>
                   <a:ext uri="{0D108BD9-81ED-4DB2-BD59-A6C34878D82A}">
-                    <a16:rowId xmlns="" xmlns:a16="http://schemas.microsoft.com/office/drawing/2014/main" val="2280300197"/>
+                    <a16:rowId xmlns:a16="http://schemas.microsoft.com/office/drawing/2014/main" val="2280300197"/>
                   </a:ext>
                 </a:extLst>
               </a:tr>
@@ -38121,7 +37921,7 @@
                 </a:tc>
                 <a:extLst>
                   <a:ext uri="{0D108BD9-81ED-4DB2-BD59-A6C34878D82A}">
-                    <a16:rowId xmlns="" xmlns:a16="http://schemas.microsoft.com/office/drawing/2014/main" val="1192843310"/>
+                    <a16:rowId xmlns:a16="http://schemas.microsoft.com/office/drawing/2014/main" val="1192843310"/>
                   </a:ext>
                 </a:extLst>
               </a:tr>
@@ -38159,7 +37959,7 @@
                 </a:tc>
                 <a:extLst>
                   <a:ext uri="{0D108BD9-81ED-4DB2-BD59-A6C34878D82A}">
-                    <a16:rowId xmlns="" xmlns:a16="http://schemas.microsoft.com/office/drawing/2014/main" val="2620585158"/>
+                    <a16:rowId xmlns:a16="http://schemas.microsoft.com/office/drawing/2014/main" val="2620585158"/>
                   </a:ext>
                 </a:extLst>
               </a:tr>
@@ -38192,7 +37992,7 @@
                 </a:tc>
                 <a:extLst>
                   <a:ext uri="{0D108BD9-81ED-4DB2-BD59-A6C34878D82A}">
-                    <a16:rowId xmlns="" xmlns:a16="http://schemas.microsoft.com/office/drawing/2014/main" val="1697738616"/>
+                    <a16:rowId xmlns:a16="http://schemas.microsoft.com/office/drawing/2014/main" val="1697738616"/>
                   </a:ext>
                 </a:extLst>
               </a:tr>
@@ -38230,7 +38030,7 @@
                 </a:tc>
                 <a:extLst>
                   <a:ext uri="{0D108BD9-81ED-4DB2-BD59-A6C34878D82A}">
-                    <a16:rowId xmlns="" xmlns:a16="http://schemas.microsoft.com/office/drawing/2014/main" val="316611556"/>
+                    <a16:rowId xmlns:a16="http://schemas.microsoft.com/office/drawing/2014/main" val="316611556"/>
                   </a:ext>
                 </a:extLst>
               </a:tr>
@@ -38263,7 +38063,7 @@
                 </a:tc>
                 <a:extLst>
                   <a:ext uri="{0D108BD9-81ED-4DB2-BD59-A6C34878D82A}">
-                    <a16:rowId xmlns="" xmlns:a16="http://schemas.microsoft.com/office/drawing/2014/main" val="1312814102"/>
+                    <a16:rowId xmlns:a16="http://schemas.microsoft.com/office/drawing/2014/main" val="1312814102"/>
                   </a:ext>
                 </a:extLst>
               </a:tr>
@@ -38296,7 +38096,7 @@
                 </a:tc>
                 <a:extLst>
                   <a:ext uri="{0D108BD9-81ED-4DB2-BD59-A6C34878D82A}">
-                    <a16:rowId xmlns="" xmlns:a16="http://schemas.microsoft.com/office/drawing/2014/main" val="1975533996"/>
+                    <a16:rowId xmlns:a16="http://schemas.microsoft.com/office/drawing/2014/main" val="1975533996"/>
                   </a:ext>
                 </a:extLst>
               </a:tr>
@@ -38329,7 +38129,7 @@
                 </a:tc>
                 <a:extLst>
                   <a:ext uri="{0D108BD9-81ED-4DB2-BD59-A6C34878D82A}">
-                    <a16:rowId xmlns="" xmlns:a16="http://schemas.microsoft.com/office/drawing/2014/main" val="2759032957"/>
+                    <a16:rowId xmlns:a16="http://schemas.microsoft.com/office/drawing/2014/main" val="2759032957"/>
                   </a:ext>
                 </a:extLst>
               </a:tr>
@@ -38418,14 +38218,14 @@
                 <a:gridCol w="934278">
                   <a:extLst>
                     <a:ext uri="{9D8B030D-6E8A-4147-A177-3AD203B41FA5}">
-                      <a16:colId xmlns="" xmlns:a16="http://schemas.microsoft.com/office/drawing/2014/main" val="4198655800"/>
+                      <a16:colId xmlns:a16="http://schemas.microsoft.com/office/drawing/2014/main" val="4198655800"/>
                     </a:ext>
                   </a:extLst>
                 </a:gridCol>
                 <a:gridCol w="7295322">
                   <a:extLst>
                     <a:ext uri="{9D8B030D-6E8A-4147-A177-3AD203B41FA5}">
-                      <a16:colId xmlns="" xmlns:a16="http://schemas.microsoft.com/office/drawing/2014/main" val="135413862"/>
+                      <a16:colId xmlns:a16="http://schemas.microsoft.com/office/drawing/2014/main" val="135413862"/>
                     </a:ext>
                   </a:extLst>
                 </a:gridCol>
@@ -38459,7 +38259,7 @@
                 </a:tc>
                 <a:extLst>
                   <a:ext uri="{0D108BD9-81ED-4DB2-BD59-A6C34878D82A}">
-                    <a16:rowId xmlns="" xmlns:a16="http://schemas.microsoft.com/office/drawing/2014/main" val="3068323444"/>
+                    <a16:rowId xmlns:a16="http://schemas.microsoft.com/office/drawing/2014/main" val="3068323444"/>
                   </a:ext>
                 </a:extLst>
               </a:tr>
@@ -38492,7 +38292,7 @@
                 </a:tc>
                 <a:extLst>
                   <a:ext uri="{0D108BD9-81ED-4DB2-BD59-A6C34878D82A}">
-                    <a16:rowId xmlns="" xmlns:a16="http://schemas.microsoft.com/office/drawing/2014/main" val="2484981654"/>
+                    <a16:rowId xmlns:a16="http://schemas.microsoft.com/office/drawing/2014/main" val="2484981654"/>
                   </a:ext>
                 </a:extLst>
               </a:tr>
@@ -38530,7 +38330,7 @@
                 </a:tc>
                 <a:extLst>
                   <a:ext uri="{0D108BD9-81ED-4DB2-BD59-A6C34878D82A}">
-                    <a16:rowId xmlns="" xmlns:a16="http://schemas.microsoft.com/office/drawing/2014/main" val="1377910784"/>
+                    <a16:rowId xmlns:a16="http://schemas.microsoft.com/office/drawing/2014/main" val="1377910784"/>
                   </a:ext>
                 </a:extLst>
               </a:tr>
@@ -38563,7 +38363,7 @@
                 </a:tc>
                 <a:extLst>
                   <a:ext uri="{0D108BD9-81ED-4DB2-BD59-A6C34878D82A}">
-                    <a16:rowId xmlns="" xmlns:a16="http://schemas.microsoft.com/office/drawing/2014/main" val="1387856053"/>
+                    <a16:rowId xmlns:a16="http://schemas.microsoft.com/office/drawing/2014/main" val="1387856053"/>
                   </a:ext>
                 </a:extLst>
               </a:tr>
@@ -38601,7 +38401,7 @@
                 </a:tc>
                 <a:extLst>
                   <a:ext uri="{0D108BD9-81ED-4DB2-BD59-A6C34878D82A}">
-                    <a16:rowId xmlns="" xmlns:a16="http://schemas.microsoft.com/office/drawing/2014/main" val="2599123823"/>
+                    <a16:rowId xmlns:a16="http://schemas.microsoft.com/office/drawing/2014/main" val="2599123823"/>
                   </a:ext>
                 </a:extLst>
               </a:tr>
@@ -38642,7 +38442,7 @@
                 </a:tc>
                 <a:extLst>
                   <a:ext uri="{0D108BD9-81ED-4DB2-BD59-A6C34878D82A}">
-                    <a16:rowId xmlns="" xmlns:a16="http://schemas.microsoft.com/office/drawing/2014/main" val="1232603862"/>
+                    <a16:rowId xmlns:a16="http://schemas.microsoft.com/office/drawing/2014/main" val="1232603862"/>
                   </a:ext>
                 </a:extLst>
               </a:tr>
@@ -38675,7 +38475,7 @@
                 </a:tc>
                 <a:extLst>
                   <a:ext uri="{0D108BD9-81ED-4DB2-BD59-A6C34878D82A}">
-                    <a16:rowId xmlns="" xmlns:a16="http://schemas.microsoft.com/office/drawing/2014/main" val="4145944521"/>
+                    <a16:rowId xmlns:a16="http://schemas.microsoft.com/office/drawing/2014/main" val="4145944521"/>
                   </a:ext>
                 </a:extLst>
               </a:tr>
@@ -38713,7 +38513,7 @@
                 </a:tc>
                 <a:extLst>
                   <a:ext uri="{0D108BD9-81ED-4DB2-BD59-A6C34878D82A}">
-                    <a16:rowId xmlns="" xmlns:a16="http://schemas.microsoft.com/office/drawing/2014/main" val="2954677722"/>
+                    <a16:rowId xmlns:a16="http://schemas.microsoft.com/office/drawing/2014/main" val="2954677722"/>
                   </a:ext>
                 </a:extLst>
               </a:tr>
@@ -38746,7 +38546,7 @@
                 </a:tc>
                 <a:extLst>
                   <a:ext uri="{0D108BD9-81ED-4DB2-BD59-A6C34878D82A}">
-                    <a16:rowId xmlns="" xmlns:a16="http://schemas.microsoft.com/office/drawing/2014/main" val="205903975"/>
+                    <a16:rowId xmlns:a16="http://schemas.microsoft.com/office/drawing/2014/main" val="205903975"/>
                   </a:ext>
                 </a:extLst>
               </a:tr>
@@ -38779,7 +38579,7 @@
                 </a:tc>
                 <a:extLst>
                   <a:ext uri="{0D108BD9-81ED-4DB2-BD59-A6C34878D82A}">
-                    <a16:rowId xmlns="" xmlns:a16="http://schemas.microsoft.com/office/drawing/2014/main" val="2893595017"/>
+                    <a16:rowId xmlns:a16="http://schemas.microsoft.com/office/drawing/2014/main" val="2893595017"/>
                   </a:ext>
                 </a:extLst>
               </a:tr>
@@ -38812,7 +38612,7 @@
                 </a:tc>
                 <a:extLst>
                   <a:ext uri="{0D108BD9-81ED-4DB2-BD59-A6C34878D82A}">
-                    <a16:rowId xmlns="" xmlns:a16="http://schemas.microsoft.com/office/drawing/2014/main" val="2337380595"/>
+                    <a16:rowId xmlns:a16="http://schemas.microsoft.com/office/drawing/2014/main" val="2337380595"/>
                   </a:ext>
                 </a:extLst>
               </a:tr>
@@ -40522,7 +40322,7 @@
               <a:t> </a:t>
             </a:r>
             <a:r>
-              <a:rPr lang="en-US" dirty="0" smtClean="0">
+              <a:rPr lang="en-US" dirty="0">
                 <a:solidFill>
                   <a:srgbClr val="FF0000"/>
                 </a:solidFill>
@@ -40870,21 +40670,21 @@
                 <a:gridCol w="2764301">
                   <a:extLst>
                     <a:ext uri="{9D8B030D-6E8A-4147-A177-3AD203B41FA5}">
-                      <a16:colId xmlns="" xmlns:a16="http://schemas.microsoft.com/office/drawing/2014/main" val="234227049"/>
+                      <a16:colId xmlns:a16="http://schemas.microsoft.com/office/drawing/2014/main" val="234227049"/>
                     </a:ext>
                   </a:extLst>
                 </a:gridCol>
                 <a:gridCol w="2764301">
                   <a:extLst>
                     <a:ext uri="{9D8B030D-6E8A-4147-A177-3AD203B41FA5}">
-                      <a16:colId xmlns="" xmlns:a16="http://schemas.microsoft.com/office/drawing/2014/main" val="4053135350"/>
+                      <a16:colId xmlns:a16="http://schemas.microsoft.com/office/drawing/2014/main" val="4053135350"/>
                     </a:ext>
                   </a:extLst>
                 </a:gridCol>
                 <a:gridCol w="2764301">
                   <a:extLst>
                     <a:ext uri="{9D8B030D-6E8A-4147-A177-3AD203B41FA5}">
-                      <a16:colId xmlns="" xmlns:a16="http://schemas.microsoft.com/office/drawing/2014/main" val="672378647"/>
+                      <a16:colId xmlns:a16="http://schemas.microsoft.com/office/drawing/2014/main" val="672378647"/>
                     </a:ext>
                   </a:extLst>
                 </a:gridCol>
@@ -40934,7 +40734,7 @@
                 </a:tc>
                 <a:extLst>
                   <a:ext uri="{0D108BD9-81ED-4DB2-BD59-A6C34878D82A}">
-                    <a16:rowId xmlns="" xmlns:a16="http://schemas.microsoft.com/office/drawing/2014/main" val="2843053056"/>
+                    <a16:rowId xmlns:a16="http://schemas.microsoft.com/office/drawing/2014/main" val="2843053056"/>
                   </a:ext>
                 </a:extLst>
               </a:tr>
@@ -40984,7 +40784,7 @@
                 </a:tc>
                 <a:extLst>
                   <a:ext uri="{0D108BD9-81ED-4DB2-BD59-A6C34878D82A}">
-                    <a16:rowId xmlns="" xmlns:a16="http://schemas.microsoft.com/office/drawing/2014/main" val="3055328934"/>
+                    <a16:rowId xmlns:a16="http://schemas.microsoft.com/office/drawing/2014/main" val="3055328934"/>
                   </a:ext>
                 </a:extLst>
               </a:tr>
@@ -41034,7 +40834,7 @@
                 </a:tc>
                 <a:extLst>
                   <a:ext uri="{0D108BD9-81ED-4DB2-BD59-A6C34878D82A}">
-                    <a16:rowId xmlns="" xmlns:a16="http://schemas.microsoft.com/office/drawing/2014/main" val="1144851549"/>
+                    <a16:rowId xmlns:a16="http://schemas.microsoft.com/office/drawing/2014/main" val="1144851549"/>
                   </a:ext>
                 </a:extLst>
               </a:tr>
@@ -41083,7 +40883,7 @@
                 </a:tc>
                 <a:extLst>
                   <a:ext uri="{0D108BD9-81ED-4DB2-BD59-A6C34878D82A}">
-                    <a16:rowId xmlns="" xmlns:a16="http://schemas.microsoft.com/office/drawing/2014/main" val="4258932578"/>
+                    <a16:rowId xmlns:a16="http://schemas.microsoft.com/office/drawing/2014/main" val="4258932578"/>
                   </a:ext>
                 </a:extLst>
               </a:tr>
@@ -42021,7 +41821,7 @@
               <a:t> </a:t>
             </a:r>
             <a:r>
-              <a:rPr lang="en-US" dirty="0" smtClean="0">
+              <a:rPr lang="en-US" dirty="0">
                 <a:solidFill>
                   <a:srgbClr val="FF0000"/>
                 </a:solidFill>
@@ -42429,14 +42229,6 @@
   <p:clrMapOvr>
     <a:masterClrMapping/>
   </p:clrMapOvr>
-  <mc:AlternateContent xmlns:mc="http://schemas.openxmlformats.org/markup-compatibility/2006" xmlns:p14="http://schemas.microsoft.com/office/powerpoint/2010/main">
-    <mc:Choice Requires="p14">
-      <p:transition spd="slow" p14:dur="2000"/>
-    </mc:Choice>
-    <mc:Fallback xmlns="">
-      <p:transition spd="slow"/>
-    </mc:Fallback>
-  </mc:AlternateContent>
 </p:sld>
 </file>
 
@@ -43268,7 +43060,7 @@
               <a:t> </a:t>
             </a:r>
             <a:r>
-              <a:rPr lang="en-US" dirty="0" smtClean="0">
+              <a:rPr lang="en-US" dirty="0">
                 <a:solidFill>
                   <a:srgbClr val="FF0000"/>
                 </a:solidFill>
@@ -43657,14 +43449,6 @@
   <p:clrMapOvr>
     <a:masterClrMapping/>
   </p:clrMapOvr>
-  <mc:AlternateContent xmlns:mc="http://schemas.openxmlformats.org/markup-compatibility/2006" xmlns:p14="http://schemas.microsoft.com/office/powerpoint/2010/main">
-    <mc:Choice Requires="p14">
-      <p:transition spd="slow" p14:dur="2000"/>
-    </mc:Choice>
-    <mc:Fallback xmlns="">
-      <p:transition spd="slow"/>
-    </mc:Fallback>
-  </mc:AlternateContent>
 </p:sld>
 </file>
 

</xml_diff>

<commit_message>
Clarification on column meanings for transformation stats DMV.
</commit_message>
<xml_diff>
--- a/Optimizer.pptx
+++ b/Optimizer.pptx
@@ -266,7 +266,7 @@
           <a:p>
             <a:fld id="{2EDCB34D-5EC2-4739-9693-E425457AC201}" type="datetimeFigureOut">
               <a:rPr lang="en-US" smtClean="0"/>
-              <a:t>10/6/2016</a:t>
+              <a:t>10/19/2016</a:t>
             </a:fld>
             <a:endParaRPr lang="en-US"/>
           </a:p>
@@ -1596,15 +1596,41 @@
           <a:p>
             <a:r>
               <a:rPr lang="en-US" baseline="0" dirty="0"/>
-              <a:t>“Promise” values are, presumably, </a:t>
+              <a:t>“</a:t>
+            </a:r>
+            <a:r>
+              <a:rPr lang="en-US" baseline="0" dirty="0" smtClean="0"/>
+              <a:t>Promise Total” </a:t>
+            </a:r>
+            <a:r>
+              <a:rPr lang="en-US" baseline="0" dirty="0"/>
+              <a:t>values are, presumably, </a:t>
             </a:r>
             <a:r>
               <a:rPr lang="en-US" baseline="0" dirty="0" err="1"/>
               <a:t>unitless</a:t>
             </a:r>
             <a:r>
-              <a:rPr lang="en-US" baseline="0" dirty="0"/>
+              <a:rPr lang="en-US" baseline="0" dirty="0" smtClean="0"/>
               <a:t>.</a:t>
+            </a:r>
+          </a:p>
+          <a:p>
+            <a:r>
+              <a:rPr lang="en-US" baseline="0" dirty="0" smtClean="0"/>
+              <a:t>Promised = number of times rule’s usefulness evaluated; </a:t>
+            </a:r>
+            <a:r>
+              <a:rPr lang="en-US" baseline="0" dirty="0" err="1" smtClean="0"/>
+              <a:t>promise_total</a:t>
+            </a:r>
+            <a:r>
+              <a:rPr lang="en-US" baseline="0" dirty="0" smtClean="0"/>
+              <a:t> = sum of computed </a:t>
+            </a:r>
+            <a:r>
+              <a:rPr lang="en-US" baseline="0" smtClean="0"/>
+              <a:t>“value”</a:t>
             </a:r>
             <a:endParaRPr lang="en-US" dirty="0"/>
           </a:p>
@@ -2917,7 +2943,7 @@
             <a:fld id="{5942B21B-2ADA-A040-A652-A7305E1B99FE}" type="datetimeFigureOut">
               <a:rPr lang="en-US" smtClean="0"/>
               <a:pPr/>
-              <a:t>10/6/2016</a:t>
+              <a:t>10/19/2016</a:t>
             </a:fld>
             <a:endParaRPr lang="en-US" dirty="0"/>
           </a:p>
@@ -3107,7 +3133,7 @@
           <a:p>
             <a:fld id="{5942B21B-2ADA-A040-A652-A7305E1B99FE}" type="datetimeFigureOut">
               <a:rPr lang="en-US" smtClean="0"/>
-              <a:t>10/6/2016</a:t>
+              <a:t>10/19/2016</a:t>
             </a:fld>
             <a:endParaRPr lang="en-US"/>
           </a:p>
@@ -3231,7 +3257,7 @@
             <a:fld id="{5942B21B-2ADA-A040-A652-A7305E1B99FE}" type="datetimeFigureOut">
               <a:rPr lang="en-US" smtClean="0"/>
               <a:pPr/>
-              <a:t>10/6/2016</a:t>
+              <a:t>10/19/2016</a:t>
             </a:fld>
             <a:r>
               <a:rPr lang="en-US"/>
@@ -3502,7 +3528,7 @@
             <a:fld id="{5942B21B-2ADA-A040-A652-A7305E1B99FE}" type="datetimeFigureOut">
               <a:rPr lang="en-US" smtClean="0"/>
               <a:pPr/>
-              <a:t>10/6/2016</a:t>
+              <a:t>10/19/2016</a:t>
             </a:fld>
             <a:r>
               <a:rPr lang="en-US" dirty="0"/>
@@ -3772,7 +3798,7 @@
             <a:fld id="{5942B21B-2ADA-A040-A652-A7305E1B99FE}" type="datetimeFigureOut">
               <a:rPr lang="en-US" smtClean="0"/>
               <a:pPr/>
-              <a:t>10/6/2016</a:t>
+              <a:t>10/19/2016</a:t>
             </a:fld>
             <a:r>
               <a:rPr lang="en-US" dirty="0"/>
@@ -4112,7 +4138,7 @@
             <a:fld id="{5942B21B-2ADA-A040-A652-A7305E1B99FE}" type="datetimeFigureOut">
               <a:rPr lang="en-US" smtClean="0"/>
               <a:pPr/>
-              <a:t>10/6/2016</a:t>
+              <a:t>10/19/2016</a:t>
             </a:fld>
             <a:r>
               <a:rPr lang="en-US" dirty="0"/>
@@ -4453,7 +4479,7 @@
             <a:fld id="{5942B21B-2ADA-A040-A652-A7305E1B99FE}" type="datetimeFigureOut">
               <a:rPr lang="en-US" smtClean="0"/>
               <a:pPr/>
-              <a:t>10/6/2016</a:t>
+              <a:t>10/19/2016</a:t>
             </a:fld>
             <a:r>
               <a:rPr lang="en-US" dirty="0"/>
@@ -4968,7 +4994,7 @@
             <a:fld id="{5942B21B-2ADA-A040-A652-A7305E1B99FE}" type="datetimeFigureOut">
               <a:rPr lang="en-US" smtClean="0"/>
               <a:pPr/>
-              <a:t>10/6/2016</a:t>
+              <a:t>10/19/2016</a:t>
             </a:fld>
             <a:r>
               <a:rPr lang="en-US" dirty="0"/>
@@ -5177,7 +5203,7 @@
             <a:fld id="{5942B21B-2ADA-A040-A652-A7305E1B99FE}" type="datetimeFigureOut">
               <a:rPr lang="en-US" smtClean="0"/>
               <a:pPr/>
-              <a:t>10/6/2016</a:t>
+              <a:t>10/19/2016</a:t>
             </a:fld>
             <a:r>
               <a:rPr lang="en-US" dirty="0"/>
@@ -5364,7 +5390,7 @@
             <a:fld id="{5942B21B-2ADA-A040-A652-A7305E1B99FE}" type="datetimeFigureOut">
               <a:rPr lang="en-US" smtClean="0"/>
               <a:pPr/>
-              <a:t>10/6/2016</a:t>
+              <a:t>10/19/2016</a:t>
             </a:fld>
             <a:r>
               <a:rPr lang="en-US" dirty="0"/>
@@ -5695,7 +5721,7 @@
             <a:fld id="{5942B21B-2ADA-A040-A652-A7305E1B99FE}" type="datetimeFigureOut">
               <a:rPr lang="en-US" smtClean="0"/>
               <a:pPr/>
-              <a:t>10/6/2016</a:t>
+              <a:t>10/19/2016</a:t>
             </a:fld>
             <a:r>
               <a:rPr lang="en-US" dirty="0"/>
@@ -6003,7 +6029,7 @@
             <a:fld id="{5942B21B-2ADA-A040-A652-A7305E1B99FE}" type="datetimeFigureOut">
               <a:rPr lang="en-US" smtClean="0"/>
               <a:pPr/>
-              <a:t>10/6/2016</a:t>
+              <a:t>10/19/2016</a:t>
             </a:fld>
             <a:r>
               <a:rPr lang="en-US" dirty="0"/>
@@ -6282,7 +6308,7 @@
             <a:fld id="{5942B21B-2ADA-A040-A652-A7305E1B99FE}" type="datetimeFigureOut">
               <a:rPr lang="en-US" smtClean="0"/>
               <a:pPr/>
-              <a:t>10/6/2016</a:t>
+              <a:t>10/19/2016</a:t>
             </a:fld>
             <a:r>
               <a:rPr lang="en-US" dirty="0"/>
@@ -8142,6 +8168,14 @@
   <p:clrMapOvr>
     <a:masterClrMapping/>
   </p:clrMapOvr>
+  <mc:AlternateContent xmlns:mc="http://schemas.openxmlformats.org/markup-compatibility/2006">
+    <mc:Choice xmlns:p14="http://schemas.microsoft.com/office/powerpoint/2010/main" Requires="p14">
+      <p:transition spd="slow" p14:dur="2000"/>
+    </mc:Choice>
+    <mc:Fallback>
+      <p:transition spd="slow"/>
+    </mc:Fallback>
+  </mc:AlternateContent>
 </p:sld>
 </file>
 
@@ -9353,6 +9387,14 @@
   <p:clrMapOvr>
     <a:masterClrMapping/>
   </p:clrMapOvr>
+  <mc:AlternateContent xmlns:mc="http://schemas.openxmlformats.org/markup-compatibility/2006">
+    <mc:Choice xmlns:p14="http://schemas.microsoft.com/office/powerpoint/2010/main" Requires="p14">
+      <p:transition spd="slow" p14:dur="2000"/>
+    </mc:Choice>
+    <mc:Fallback>
+      <p:transition spd="slow"/>
+    </mc:Fallback>
+  </mc:AlternateContent>
 </p:sld>
 </file>
 
@@ -10548,6 +10590,14 @@
   <p:clrMapOvr>
     <a:masterClrMapping/>
   </p:clrMapOvr>
+  <mc:AlternateContent xmlns:mc="http://schemas.openxmlformats.org/markup-compatibility/2006">
+    <mc:Choice xmlns:p14="http://schemas.microsoft.com/office/powerpoint/2010/main" Requires="p14">
+      <p:transition spd="slow" p14:dur="2000"/>
+    </mc:Choice>
+    <mc:Fallback>
+      <p:transition spd="slow"/>
+    </mc:Fallback>
+  </mc:AlternateContent>
 </p:sld>
 </file>
 
@@ -11796,6 +11846,14 @@
   <p:clrMapOvr>
     <a:masterClrMapping/>
   </p:clrMapOvr>
+  <mc:AlternateContent xmlns:mc="http://schemas.openxmlformats.org/markup-compatibility/2006">
+    <mc:Choice xmlns:p14="http://schemas.microsoft.com/office/powerpoint/2010/main" Requires="p14">
+      <p:transition spd="slow" p14:dur="2000"/>
+    </mc:Choice>
+    <mc:Fallback>
+      <p:transition spd="slow"/>
+    </mc:Fallback>
+  </mc:AlternateContent>
 </p:sld>
 </file>
 
@@ -12970,6 +13028,14 @@
   <p:clrMapOvr>
     <a:masterClrMapping/>
   </p:clrMapOvr>
+  <mc:AlternateContent xmlns:mc="http://schemas.openxmlformats.org/markup-compatibility/2006">
+    <mc:Choice xmlns:p14="http://schemas.microsoft.com/office/powerpoint/2010/main" Requires="p14">
+      <p:transition spd="slow" p14:dur="2000"/>
+    </mc:Choice>
+    <mc:Fallback>
+      <p:transition spd="slow"/>
+    </mc:Fallback>
+  </mc:AlternateContent>
 </p:sld>
 </file>
 
@@ -14190,6 +14256,14 @@
   <p:clrMapOvr>
     <a:masterClrMapping/>
   </p:clrMapOvr>
+  <mc:AlternateContent xmlns:mc="http://schemas.openxmlformats.org/markup-compatibility/2006">
+    <mc:Choice xmlns:p14="http://schemas.microsoft.com/office/powerpoint/2010/main" Requires="p14">
+      <p:transition spd="slow" p14:dur="2000"/>
+    </mc:Choice>
+    <mc:Fallback>
+      <p:transition spd="slow"/>
+    </mc:Fallback>
+  </mc:AlternateContent>
 </p:sld>
 </file>
 
@@ -15401,6 +15475,14 @@
   <p:clrMapOvr>
     <a:masterClrMapping/>
   </p:clrMapOvr>
+  <mc:AlternateContent xmlns:mc="http://schemas.openxmlformats.org/markup-compatibility/2006">
+    <mc:Choice xmlns:p14="http://schemas.microsoft.com/office/powerpoint/2010/main" Requires="p14">
+      <p:transition spd="slow" p14:dur="2000"/>
+    </mc:Choice>
+    <mc:Fallback>
+      <p:transition spd="slow"/>
+    </mc:Fallback>
+  </mc:AlternateContent>
 </p:sld>
 </file>
 
@@ -16665,6 +16747,14 @@
   <p:clrMapOvr>
     <a:masterClrMapping/>
   </p:clrMapOvr>
+  <mc:AlternateContent xmlns:mc="http://schemas.openxmlformats.org/markup-compatibility/2006">
+    <mc:Choice xmlns:p14="http://schemas.microsoft.com/office/powerpoint/2010/main" Requires="p14">
+      <p:transition spd="slow" p14:dur="2000"/>
+    </mc:Choice>
+    <mc:Fallback>
+      <p:transition spd="slow"/>
+    </mc:Fallback>
+  </mc:AlternateContent>
 </p:sld>
 </file>
 
@@ -27475,6 +27565,14 @@
   <p:clrMapOvr>
     <a:masterClrMapping/>
   </p:clrMapOvr>
+  <mc:AlternateContent xmlns:mc="http://schemas.openxmlformats.org/markup-compatibility/2006">
+    <mc:Choice xmlns:p14="http://schemas.microsoft.com/office/powerpoint/2010/main" Requires="p14">
+      <p:transition spd="slow" p14:dur="2000"/>
+    </mc:Choice>
+    <mc:Fallback>
+      <p:transition spd="slow"/>
+    </mc:Fallback>
+  </mc:AlternateContent>
 </p:sld>
 </file>
 
@@ -27827,14 +27925,14 @@
                 <a:gridCol w="7632835">
                   <a:extLst>
                     <a:ext uri="{9D8B030D-6E8A-4147-A177-3AD203B41FA5}">
-                      <a16:colId xmlns:a16="http://schemas.microsoft.com/office/drawing/2014/main" val="3644048045"/>
+                      <a16:colId xmlns:a16="http://schemas.microsoft.com/office/drawing/2014/main" xmlns="" val="3644048045"/>
                     </a:ext>
                   </a:extLst>
                 </a:gridCol>
                 <a:gridCol w="606393">
                   <a:extLst>
                     <a:ext uri="{9D8B030D-6E8A-4147-A177-3AD203B41FA5}">
-                      <a16:colId xmlns:a16="http://schemas.microsoft.com/office/drawing/2014/main" val="2034254753"/>
+                      <a16:colId xmlns:a16="http://schemas.microsoft.com/office/drawing/2014/main" xmlns="" val="2034254753"/>
                     </a:ext>
                   </a:extLst>
                 </a:gridCol>
@@ -27865,7 +27963,7 @@
                 </a:tc>
                 <a:extLst>
                   <a:ext uri="{0D108BD9-81ED-4DB2-BD59-A6C34878D82A}">
-                    <a16:rowId xmlns:a16="http://schemas.microsoft.com/office/drawing/2014/main" val="2708275910"/>
+                    <a16:rowId xmlns:a16="http://schemas.microsoft.com/office/drawing/2014/main" xmlns="" val="2708275910"/>
                   </a:ext>
                 </a:extLst>
               </a:tr>
@@ -27899,7 +27997,7 @@
                 </a:tc>
                 <a:extLst>
                   <a:ext uri="{0D108BD9-81ED-4DB2-BD59-A6C34878D82A}">
-                    <a16:rowId xmlns:a16="http://schemas.microsoft.com/office/drawing/2014/main" val="2161984115"/>
+                    <a16:rowId xmlns:a16="http://schemas.microsoft.com/office/drawing/2014/main" xmlns="" val="2161984115"/>
                   </a:ext>
                 </a:extLst>
               </a:tr>
@@ -27946,7 +28044,7 @@
                 </a:tc>
                 <a:extLst>
                   <a:ext uri="{0D108BD9-81ED-4DB2-BD59-A6C34878D82A}">
-                    <a16:rowId xmlns:a16="http://schemas.microsoft.com/office/drawing/2014/main" val="2841678841"/>
+                    <a16:rowId xmlns:a16="http://schemas.microsoft.com/office/drawing/2014/main" xmlns="" val="2841678841"/>
                   </a:ext>
                 </a:extLst>
               </a:tr>
@@ -27980,7 +28078,7 @@
                 </a:tc>
                 <a:extLst>
                   <a:ext uri="{0D108BD9-81ED-4DB2-BD59-A6C34878D82A}">
-                    <a16:rowId xmlns:a16="http://schemas.microsoft.com/office/drawing/2014/main" val="3144998627"/>
+                    <a16:rowId xmlns:a16="http://schemas.microsoft.com/office/drawing/2014/main" xmlns="" val="3144998627"/>
                   </a:ext>
                 </a:extLst>
               </a:tr>
@@ -28022,7 +28120,7 @@
                 </a:tc>
                 <a:extLst>
                   <a:ext uri="{0D108BD9-81ED-4DB2-BD59-A6C34878D82A}">
-                    <a16:rowId xmlns:a16="http://schemas.microsoft.com/office/drawing/2014/main" val="1419261869"/>
+                    <a16:rowId xmlns:a16="http://schemas.microsoft.com/office/drawing/2014/main" xmlns="" val="1419261869"/>
                   </a:ext>
                 </a:extLst>
               </a:tr>
@@ -28060,7 +28158,7 @@
                 </a:tc>
                 <a:extLst>
                   <a:ext uri="{0D108BD9-81ED-4DB2-BD59-A6C34878D82A}">
-                    <a16:rowId xmlns:a16="http://schemas.microsoft.com/office/drawing/2014/main" val="1427391072"/>
+                    <a16:rowId xmlns:a16="http://schemas.microsoft.com/office/drawing/2014/main" xmlns="" val="1427391072"/>
                   </a:ext>
                 </a:extLst>
               </a:tr>
@@ -28107,7 +28205,7 @@
                 </a:tc>
                 <a:extLst>
                   <a:ext uri="{0D108BD9-81ED-4DB2-BD59-A6C34878D82A}">
-                    <a16:rowId xmlns:a16="http://schemas.microsoft.com/office/drawing/2014/main" val="2346539918"/>
+                    <a16:rowId xmlns:a16="http://schemas.microsoft.com/office/drawing/2014/main" xmlns="" val="2346539918"/>
                   </a:ext>
                 </a:extLst>
               </a:tr>
@@ -28146,7 +28244,7 @@
                 </a:tc>
                 <a:extLst>
                   <a:ext uri="{0D108BD9-81ED-4DB2-BD59-A6C34878D82A}">
-                    <a16:rowId xmlns:a16="http://schemas.microsoft.com/office/drawing/2014/main" val="2275483042"/>
+                    <a16:rowId xmlns:a16="http://schemas.microsoft.com/office/drawing/2014/main" xmlns="" val="2275483042"/>
                   </a:ext>
                 </a:extLst>
               </a:tr>
@@ -28184,7 +28282,7 @@
                 </a:tc>
                 <a:extLst>
                   <a:ext uri="{0D108BD9-81ED-4DB2-BD59-A6C34878D82A}">
-                    <a16:rowId xmlns:a16="http://schemas.microsoft.com/office/drawing/2014/main" val="4202569347"/>
+                    <a16:rowId xmlns:a16="http://schemas.microsoft.com/office/drawing/2014/main" xmlns="" val="4202569347"/>
                   </a:ext>
                 </a:extLst>
               </a:tr>
@@ -28218,7 +28316,7 @@
                 </a:tc>
                 <a:extLst>
                   <a:ext uri="{0D108BD9-81ED-4DB2-BD59-A6C34878D82A}">
-                    <a16:rowId xmlns:a16="http://schemas.microsoft.com/office/drawing/2014/main" val="2989839269"/>
+                    <a16:rowId xmlns:a16="http://schemas.microsoft.com/office/drawing/2014/main" xmlns="" val="2989839269"/>
                   </a:ext>
                 </a:extLst>
               </a:tr>
@@ -28252,7 +28350,7 @@
                 </a:tc>
                 <a:extLst>
                   <a:ext uri="{0D108BD9-81ED-4DB2-BD59-A6C34878D82A}">
-                    <a16:rowId xmlns:a16="http://schemas.microsoft.com/office/drawing/2014/main" val="2130545569"/>
+                    <a16:rowId xmlns:a16="http://schemas.microsoft.com/office/drawing/2014/main" xmlns="" val="2130545569"/>
                   </a:ext>
                 </a:extLst>
               </a:tr>
@@ -28308,7 +28406,7 @@
                 </a:tc>
                 <a:extLst>
                   <a:ext uri="{0D108BD9-81ED-4DB2-BD59-A6C34878D82A}">
-                    <a16:rowId xmlns:a16="http://schemas.microsoft.com/office/drawing/2014/main" val="1848127216"/>
+                    <a16:rowId xmlns:a16="http://schemas.microsoft.com/office/drawing/2014/main" xmlns="" val="1848127216"/>
                   </a:ext>
                 </a:extLst>
               </a:tr>
@@ -28402,6 +28500,14 @@
   <p:clrMapOvr>
     <a:masterClrMapping/>
   </p:clrMapOvr>
+  <mc:AlternateContent xmlns:mc="http://schemas.openxmlformats.org/markup-compatibility/2006">
+    <mc:Choice xmlns:p14="http://schemas.microsoft.com/office/powerpoint/2010/main" Requires="p14">
+      <p:transition spd="slow" p14:dur="2000"/>
+    </mc:Choice>
+    <mc:Fallback>
+      <p:transition spd="slow"/>
+    </mc:Fallback>
+  </mc:AlternateContent>
 </p:sld>
 </file>
 
@@ -28754,14 +28860,14 @@
                 <a:gridCol w="4119615">
                   <a:extLst>
                     <a:ext uri="{9D8B030D-6E8A-4147-A177-3AD203B41FA5}">
-                      <a16:colId xmlns:a16="http://schemas.microsoft.com/office/drawing/2014/main" val="3644048045"/>
+                      <a16:colId xmlns:a16="http://schemas.microsoft.com/office/drawing/2014/main" xmlns="" val="3644048045"/>
                     </a:ext>
                   </a:extLst>
                 </a:gridCol>
                 <a:gridCol w="4119613">
                   <a:extLst>
                     <a:ext uri="{9D8B030D-6E8A-4147-A177-3AD203B41FA5}">
-                      <a16:colId xmlns:a16="http://schemas.microsoft.com/office/drawing/2014/main" val="2034254753"/>
+                      <a16:colId xmlns:a16="http://schemas.microsoft.com/office/drawing/2014/main" xmlns="" val="2034254753"/>
                     </a:ext>
                   </a:extLst>
                 </a:gridCol>
@@ -28797,7 +28903,7 @@
                 </a:tc>
                 <a:extLst>
                   <a:ext uri="{0D108BD9-81ED-4DB2-BD59-A6C34878D82A}">
-                    <a16:rowId xmlns:a16="http://schemas.microsoft.com/office/drawing/2014/main" val="2708275910"/>
+                    <a16:rowId xmlns:a16="http://schemas.microsoft.com/office/drawing/2014/main" xmlns="" val="2708275910"/>
                   </a:ext>
                 </a:extLst>
               </a:tr>
@@ -28997,7 +29103,7 @@
                 </a:tc>
                 <a:extLst>
                   <a:ext uri="{0D108BD9-81ED-4DB2-BD59-A6C34878D82A}">
-                    <a16:rowId xmlns:a16="http://schemas.microsoft.com/office/drawing/2014/main" val="2161984115"/>
+                    <a16:rowId xmlns:a16="http://schemas.microsoft.com/office/drawing/2014/main" xmlns="" val="2161984115"/>
                   </a:ext>
                 </a:extLst>
               </a:tr>
@@ -29197,7 +29303,7 @@
                 </a:tc>
                 <a:extLst>
                   <a:ext uri="{0D108BD9-81ED-4DB2-BD59-A6C34878D82A}">
-                    <a16:rowId xmlns:a16="http://schemas.microsoft.com/office/drawing/2014/main" val="2841678841"/>
+                    <a16:rowId xmlns:a16="http://schemas.microsoft.com/office/drawing/2014/main" xmlns="" val="2841678841"/>
                   </a:ext>
                 </a:extLst>
               </a:tr>
@@ -29397,7 +29503,7 @@
                 </a:tc>
                 <a:extLst>
                   <a:ext uri="{0D108BD9-81ED-4DB2-BD59-A6C34878D82A}">
-                    <a16:rowId xmlns:a16="http://schemas.microsoft.com/office/drawing/2014/main" val="3144998627"/>
+                    <a16:rowId xmlns:a16="http://schemas.microsoft.com/office/drawing/2014/main" xmlns="" val="3144998627"/>
                   </a:ext>
                 </a:extLst>
               </a:tr>
@@ -29597,7 +29703,7 @@
                 </a:tc>
                 <a:extLst>
                   <a:ext uri="{0D108BD9-81ED-4DB2-BD59-A6C34878D82A}">
-                    <a16:rowId xmlns:a16="http://schemas.microsoft.com/office/drawing/2014/main" val="1419261869"/>
+                    <a16:rowId xmlns:a16="http://schemas.microsoft.com/office/drawing/2014/main" xmlns="" val="1419261869"/>
                   </a:ext>
                 </a:extLst>
               </a:tr>
@@ -29797,7 +29903,7 @@
                 </a:tc>
                 <a:extLst>
                   <a:ext uri="{0D108BD9-81ED-4DB2-BD59-A6C34878D82A}">
-                    <a16:rowId xmlns:a16="http://schemas.microsoft.com/office/drawing/2014/main" val="1427391072"/>
+                    <a16:rowId xmlns:a16="http://schemas.microsoft.com/office/drawing/2014/main" xmlns="" val="1427391072"/>
                   </a:ext>
                 </a:extLst>
               </a:tr>
@@ -29997,7 +30103,7 @@
                 </a:tc>
                 <a:extLst>
                   <a:ext uri="{0D108BD9-81ED-4DB2-BD59-A6C34878D82A}">
-                    <a16:rowId xmlns:a16="http://schemas.microsoft.com/office/drawing/2014/main" val="2346539918"/>
+                    <a16:rowId xmlns:a16="http://schemas.microsoft.com/office/drawing/2014/main" xmlns="" val="2346539918"/>
                   </a:ext>
                 </a:extLst>
               </a:tr>
@@ -30206,7 +30312,7 @@
                 </a:tc>
                 <a:extLst>
                   <a:ext uri="{0D108BD9-81ED-4DB2-BD59-A6C34878D82A}">
-                    <a16:rowId xmlns:a16="http://schemas.microsoft.com/office/drawing/2014/main" val="2275483042"/>
+                    <a16:rowId xmlns:a16="http://schemas.microsoft.com/office/drawing/2014/main" xmlns="" val="2275483042"/>
                   </a:ext>
                 </a:extLst>
               </a:tr>
@@ -30415,7 +30521,7 @@
                 </a:tc>
                 <a:extLst>
                   <a:ext uri="{0D108BD9-81ED-4DB2-BD59-A6C34878D82A}">
-                    <a16:rowId xmlns:a16="http://schemas.microsoft.com/office/drawing/2014/main" val="4202569347"/>
+                    <a16:rowId xmlns:a16="http://schemas.microsoft.com/office/drawing/2014/main" xmlns="" val="4202569347"/>
                   </a:ext>
                 </a:extLst>
               </a:tr>
@@ -30624,7 +30730,7 @@
                 </a:tc>
                 <a:extLst>
                   <a:ext uri="{0D108BD9-81ED-4DB2-BD59-A6C34878D82A}">
-                    <a16:rowId xmlns:a16="http://schemas.microsoft.com/office/drawing/2014/main" val="2989839269"/>
+                    <a16:rowId xmlns:a16="http://schemas.microsoft.com/office/drawing/2014/main" xmlns="" val="2989839269"/>
                   </a:ext>
                 </a:extLst>
               </a:tr>
@@ -30833,7 +30939,7 @@
                 </a:tc>
                 <a:extLst>
                   <a:ext uri="{0D108BD9-81ED-4DB2-BD59-A6C34878D82A}">
-                    <a16:rowId xmlns:a16="http://schemas.microsoft.com/office/drawing/2014/main" val="2130545569"/>
+                    <a16:rowId xmlns:a16="http://schemas.microsoft.com/office/drawing/2014/main" xmlns="" val="2130545569"/>
                   </a:ext>
                 </a:extLst>
               </a:tr>
@@ -31042,7 +31148,7 @@
                 </a:tc>
                 <a:extLst>
                   <a:ext uri="{0D108BD9-81ED-4DB2-BD59-A6C34878D82A}">
-                    <a16:rowId xmlns:a16="http://schemas.microsoft.com/office/drawing/2014/main" val="3045796785"/>
+                    <a16:rowId xmlns:a16="http://schemas.microsoft.com/office/drawing/2014/main" xmlns="" val="3045796785"/>
                   </a:ext>
                 </a:extLst>
               </a:tr>
@@ -31251,7 +31357,7 @@
                 </a:tc>
                 <a:extLst>
                   <a:ext uri="{0D108BD9-81ED-4DB2-BD59-A6C34878D82A}">
-                    <a16:rowId xmlns:a16="http://schemas.microsoft.com/office/drawing/2014/main" val="1091494175"/>
+                    <a16:rowId xmlns:a16="http://schemas.microsoft.com/office/drawing/2014/main" xmlns="" val="1091494175"/>
                   </a:ext>
                 </a:extLst>
               </a:tr>
@@ -31269,6 +31375,14 @@
   <p:clrMapOvr>
     <a:masterClrMapping/>
   </p:clrMapOvr>
+  <mc:AlternateContent xmlns:mc="http://schemas.openxmlformats.org/markup-compatibility/2006">
+    <mc:Choice xmlns:p14="http://schemas.microsoft.com/office/powerpoint/2010/main" Requires="p14">
+      <p:transition spd="slow" p14:dur="2000"/>
+    </mc:Choice>
+    <mc:Fallback>
+      <p:transition spd="slow"/>
+    </mc:Fallback>
+  </mc:AlternateContent>
 </p:sld>
 </file>
 
@@ -31381,6 +31495,14 @@
   <p:clrMapOvr>
     <a:masterClrMapping/>
   </p:clrMapOvr>
+  <mc:AlternateContent xmlns:mc="http://schemas.openxmlformats.org/markup-compatibility/2006">
+    <mc:Choice xmlns:p14="http://schemas.microsoft.com/office/powerpoint/2010/main" Requires="p14">
+      <p:transition spd="slow" p14:dur="2000"/>
+    </mc:Choice>
+    <mc:Fallback>
+      <p:transition spd="slow"/>
+    </mc:Fallback>
+  </mc:AlternateContent>
 </p:sld>
 </file>
 
@@ -31556,6 +31678,14 @@
   <p:clrMapOvr>
     <a:masterClrMapping/>
   </p:clrMapOvr>
+  <mc:AlternateContent xmlns:mc="http://schemas.openxmlformats.org/markup-compatibility/2006">
+    <mc:Choice xmlns:p14="http://schemas.microsoft.com/office/powerpoint/2010/main" Requires="p14">
+      <p:transition spd="slow" p14:dur="2000"/>
+    </mc:Choice>
+    <mc:Fallback>
+      <p:transition spd="slow"/>
+    </mc:Fallback>
+  </mc:AlternateContent>
 </p:sld>
 </file>
 
@@ -32252,6 +32382,14 @@
   <p:clrMapOvr>
     <a:masterClrMapping/>
   </p:clrMapOvr>
+  <mc:AlternateContent xmlns:mc="http://schemas.openxmlformats.org/markup-compatibility/2006">
+    <mc:Choice xmlns:p14="http://schemas.microsoft.com/office/powerpoint/2010/main" Requires="p14">
+      <p:transition spd="slow" p14:dur="2000"/>
+    </mc:Choice>
+    <mc:Fallback>
+      <p:transition spd="slow"/>
+    </mc:Fallback>
+  </mc:AlternateContent>
 </p:sld>
 </file>
 
@@ -32772,6 +32910,14 @@
   <p:clrMapOvr>
     <a:masterClrMapping/>
   </p:clrMapOvr>
+  <mc:AlternateContent xmlns:mc="http://schemas.openxmlformats.org/markup-compatibility/2006">
+    <mc:Choice xmlns:p14="http://schemas.microsoft.com/office/powerpoint/2010/main" Requires="p14">
+      <p:transition spd="slow" p14:dur="2000"/>
+    </mc:Choice>
+    <mc:Fallback>
+      <p:transition spd="slow"/>
+    </mc:Fallback>
+  </mc:AlternateContent>
 </p:sld>
 </file>
 
@@ -33557,22 +33703,64 @@
             <a:pPr lvl="1"/>
             <a:r>
               <a:rPr lang="en-US" dirty="0"/>
-              <a:t>“Promise” – How useful might the rule be for this query?</a:t>
-            </a:r>
+              <a:t>“</a:t>
+            </a:r>
+            <a:r>
+              <a:rPr lang="en-US" dirty="0" err="1" smtClean="0"/>
+              <a:t>Promise_Total</a:t>
+            </a:r>
+            <a:r>
+              <a:rPr lang="en-US" dirty="0" smtClean="0"/>
+              <a:t>” </a:t>
+            </a:r>
+            <a:r>
+              <a:rPr lang="en-US" dirty="0"/>
+              <a:t>– </a:t>
+            </a:r>
+            <a:r>
+              <a:rPr lang="en-US" dirty="0" smtClean="0"/>
+              <a:t>Estimate of how </a:t>
+            </a:r>
+            <a:r>
+              <a:rPr lang="en-US" dirty="0"/>
+              <a:t>useful might the rule be for this </a:t>
+            </a:r>
+            <a:r>
+              <a:rPr lang="en-US" dirty="0" smtClean="0"/>
+              <a:t>query</a:t>
+            </a:r>
+            <a:endParaRPr lang="en-US" dirty="0"/>
           </a:p>
           <a:p>
             <a:pPr lvl="1"/>
             <a:r>
               <a:rPr lang="en-US" dirty="0"/>
-              <a:t>“Built-Substitute” – Number of times the rule generated an alternate tree</a:t>
+              <a:t>“</a:t>
+            </a:r>
+            <a:r>
+              <a:rPr lang="en-US" dirty="0" err="1" smtClean="0"/>
+              <a:t>Built_Substitute</a:t>
+            </a:r>
+            <a:r>
+              <a:rPr lang="en-US" dirty="0"/>
+              <a:t>” – Number of times the rule generated an alternate tree</a:t>
             </a:r>
           </a:p>
           <a:p>
             <a:pPr lvl="1"/>
             <a:r>
               <a:rPr lang="en-US" dirty="0"/>
-              <a:t>“Succeeded” – Number of times the rule was incorporated</a:t>
-            </a:r>
+              <a:t>“Succeeded” – Number of times the rule was </a:t>
+            </a:r>
+            <a:r>
+              <a:rPr lang="en-US" dirty="0" smtClean="0"/>
+              <a:t>incorporated into </a:t>
+            </a:r>
+            <a:r>
+              <a:rPr lang="en-US" smtClean="0"/>
+              <a:t>search space</a:t>
+            </a:r>
+            <a:endParaRPr lang="en-US" dirty="0"/>
           </a:p>
           <a:p>
             <a:r>
@@ -33755,6 +33943,14 @@
   <p:clrMapOvr>
     <a:masterClrMapping/>
   </p:clrMapOvr>
+  <mc:AlternateContent xmlns:mc="http://schemas.openxmlformats.org/markup-compatibility/2006">
+    <mc:Choice xmlns:p14="http://schemas.microsoft.com/office/powerpoint/2010/main" Requires="p14">
+      <p:transition spd="slow" p14:dur="2000"/>
+    </mc:Choice>
+    <mc:Fallback>
+      <p:transition spd="slow"/>
+    </mc:Fallback>
+  </mc:AlternateContent>
 </p:sld>
 </file>
 
@@ -34546,14 +34742,14 @@
                 <a:gridCol w="957714">
                   <a:extLst>
                     <a:ext uri="{9D8B030D-6E8A-4147-A177-3AD203B41FA5}">
-                      <a16:colId xmlns:a16="http://schemas.microsoft.com/office/drawing/2014/main" val="3940544257"/>
+                      <a16:colId xmlns:a16="http://schemas.microsoft.com/office/drawing/2014/main" xmlns="" val="3940544257"/>
                     </a:ext>
                   </a:extLst>
                 </a:gridCol>
                 <a:gridCol w="2464067">
                   <a:extLst>
                     <a:ext uri="{9D8B030D-6E8A-4147-A177-3AD203B41FA5}">
-                      <a16:colId xmlns:a16="http://schemas.microsoft.com/office/drawing/2014/main" val="3658567973"/>
+                      <a16:colId xmlns:a16="http://schemas.microsoft.com/office/drawing/2014/main" xmlns="" val="3658567973"/>
                     </a:ext>
                   </a:extLst>
                 </a:gridCol>
@@ -34587,7 +34783,7 @@
                 </a:tc>
                 <a:extLst>
                   <a:ext uri="{0D108BD9-81ED-4DB2-BD59-A6C34878D82A}">
-                    <a16:rowId xmlns:a16="http://schemas.microsoft.com/office/drawing/2014/main" val="1032275335"/>
+                    <a16:rowId xmlns:a16="http://schemas.microsoft.com/office/drawing/2014/main" xmlns="" val="1032275335"/>
                   </a:ext>
                 </a:extLst>
               </a:tr>
@@ -34717,7 +34913,7 @@
                 </a:tc>
                 <a:extLst>
                   <a:ext uri="{0D108BD9-81ED-4DB2-BD59-A6C34878D82A}">
-                    <a16:rowId xmlns:a16="http://schemas.microsoft.com/office/drawing/2014/main" val="4191484087"/>
+                    <a16:rowId xmlns:a16="http://schemas.microsoft.com/office/drawing/2014/main" xmlns="" val="4191484087"/>
                   </a:ext>
                 </a:extLst>
               </a:tr>
@@ -34791,7 +34987,7 @@
                 </a:tc>
                 <a:extLst>
                   <a:ext uri="{0D108BD9-81ED-4DB2-BD59-A6C34878D82A}">
-                    <a16:rowId xmlns:a16="http://schemas.microsoft.com/office/drawing/2014/main" val="1864588626"/>
+                    <a16:rowId xmlns:a16="http://schemas.microsoft.com/office/drawing/2014/main" xmlns="" val="1864588626"/>
                   </a:ext>
                 </a:extLst>
               </a:tr>
@@ -34913,7 +35109,7 @@
                 </a:tc>
                 <a:extLst>
                   <a:ext uri="{0D108BD9-81ED-4DB2-BD59-A6C34878D82A}">
-                    <a16:rowId xmlns:a16="http://schemas.microsoft.com/office/drawing/2014/main" val="3035259714"/>
+                    <a16:rowId xmlns:a16="http://schemas.microsoft.com/office/drawing/2014/main" xmlns="" val="3035259714"/>
                   </a:ext>
                 </a:extLst>
               </a:tr>
@@ -35002,7 +35198,7 @@
                 </a:tc>
                 <a:extLst>
                   <a:ext uri="{0D108BD9-81ED-4DB2-BD59-A6C34878D82A}">
-                    <a16:rowId xmlns:a16="http://schemas.microsoft.com/office/drawing/2014/main" val="2023621082"/>
+                    <a16:rowId xmlns:a16="http://schemas.microsoft.com/office/drawing/2014/main" xmlns="" val="2023621082"/>
                   </a:ext>
                 </a:extLst>
               </a:tr>
@@ -35091,7 +35287,7 @@
                 </a:tc>
                 <a:extLst>
                   <a:ext uri="{0D108BD9-81ED-4DB2-BD59-A6C34878D82A}">
-                    <a16:rowId xmlns:a16="http://schemas.microsoft.com/office/drawing/2014/main" val="120016333"/>
+                    <a16:rowId xmlns:a16="http://schemas.microsoft.com/office/drawing/2014/main" xmlns="" val="120016333"/>
                   </a:ext>
                 </a:extLst>
               </a:tr>
@@ -35337,21 +35533,21 @@
                 <a:gridCol w="960120">
                   <a:extLst>
                     <a:ext uri="{9D8B030D-6E8A-4147-A177-3AD203B41FA5}">
-                      <a16:colId xmlns:a16="http://schemas.microsoft.com/office/drawing/2014/main" val="392696932"/>
+                      <a16:colId xmlns:a16="http://schemas.microsoft.com/office/drawing/2014/main" xmlns="" val="392696932"/>
                     </a:ext>
                   </a:extLst>
                 </a:gridCol>
                 <a:gridCol w="2468880">
                   <a:extLst>
                     <a:ext uri="{9D8B030D-6E8A-4147-A177-3AD203B41FA5}">
-                      <a16:colId xmlns:a16="http://schemas.microsoft.com/office/drawing/2014/main" val="2769969192"/>
+                      <a16:colId xmlns:a16="http://schemas.microsoft.com/office/drawing/2014/main" xmlns="" val="2769969192"/>
                     </a:ext>
                   </a:extLst>
                 </a:gridCol>
                 <a:gridCol w="2468880">
                   <a:extLst>
                     <a:ext uri="{9D8B030D-6E8A-4147-A177-3AD203B41FA5}">
-                      <a16:colId xmlns:a16="http://schemas.microsoft.com/office/drawing/2014/main" val="2022610816"/>
+                      <a16:colId xmlns:a16="http://schemas.microsoft.com/office/drawing/2014/main" xmlns="" val="2022610816"/>
                     </a:ext>
                   </a:extLst>
                 </a:gridCol>
@@ -35403,7 +35599,7 @@
                 </a:tc>
                 <a:extLst>
                   <a:ext uri="{0D108BD9-81ED-4DB2-BD59-A6C34878D82A}">
-                    <a16:rowId xmlns:a16="http://schemas.microsoft.com/office/drawing/2014/main" val="2344937666"/>
+                    <a16:rowId xmlns:a16="http://schemas.microsoft.com/office/drawing/2014/main" xmlns="" val="2344937666"/>
                   </a:ext>
                 </a:extLst>
               </a:tr>
@@ -35536,7 +35732,7 @@
                 </a:tc>
                 <a:extLst>
                   <a:ext uri="{0D108BD9-81ED-4DB2-BD59-A6C34878D82A}">
-                    <a16:rowId xmlns:a16="http://schemas.microsoft.com/office/drawing/2014/main" val="1917341330"/>
+                    <a16:rowId xmlns:a16="http://schemas.microsoft.com/office/drawing/2014/main" xmlns="" val="1917341330"/>
                   </a:ext>
                 </a:extLst>
               </a:tr>
@@ -35753,7 +35949,7 @@
                 </a:tc>
                 <a:extLst>
                   <a:ext uri="{0D108BD9-81ED-4DB2-BD59-A6C34878D82A}">
-                    <a16:rowId xmlns:a16="http://schemas.microsoft.com/office/drawing/2014/main" val="3088042860"/>
+                    <a16:rowId xmlns:a16="http://schemas.microsoft.com/office/drawing/2014/main" xmlns="" val="3088042860"/>
                   </a:ext>
                 </a:extLst>
               </a:tr>
@@ -35837,7 +36033,7 @@
                 </a:tc>
                 <a:extLst>
                   <a:ext uri="{0D108BD9-81ED-4DB2-BD59-A6C34878D82A}">
-                    <a16:rowId xmlns:a16="http://schemas.microsoft.com/office/drawing/2014/main" val="2658530722"/>
+                    <a16:rowId xmlns:a16="http://schemas.microsoft.com/office/drawing/2014/main" xmlns="" val="2658530722"/>
                   </a:ext>
                 </a:extLst>
               </a:tr>
@@ -35969,7 +36165,7 @@
                 </a:tc>
                 <a:extLst>
                   <a:ext uri="{0D108BD9-81ED-4DB2-BD59-A6C34878D82A}">
-                    <a16:rowId xmlns:a16="http://schemas.microsoft.com/office/drawing/2014/main" val="1481886367"/>
+                    <a16:rowId xmlns:a16="http://schemas.microsoft.com/office/drawing/2014/main" xmlns="" val="1481886367"/>
                   </a:ext>
                 </a:extLst>
               </a:tr>
@@ -36068,7 +36264,7 @@
                 </a:tc>
                 <a:extLst>
                   <a:ext uri="{0D108BD9-81ED-4DB2-BD59-A6C34878D82A}">
-                    <a16:rowId xmlns:a16="http://schemas.microsoft.com/office/drawing/2014/main" val="4248384778"/>
+                    <a16:rowId xmlns:a16="http://schemas.microsoft.com/office/drawing/2014/main" xmlns="" val="4248384778"/>
                   </a:ext>
                 </a:extLst>
               </a:tr>
@@ -36167,7 +36363,7 @@
                 </a:tc>
                 <a:extLst>
                   <a:ext uri="{0D108BD9-81ED-4DB2-BD59-A6C34878D82A}">
-                    <a16:rowId xmlns:a16="http://schemas.microsoft.com/office/drawing/2014/main" val="1670483340"/>
+                    <a16:rowId xmlns:a16="http://schemas.microsoft.com/office/drawing/2014/main" xmlns="" val="1670483340"/>
                   </a:ext>
                 </a:extLst>
               </a:tr>
@@ -36312,28 +36508,28 @@
                 <a:gridCol w="960120">
                   <a:extLst>
                     <a:ext uri="{9D8B030D-6E8A-4147-A177-3AD203B41FA5}">
-                      <a16:colId xmlns:a16="http://schemas.microsoft.com/office/drawing/2014/main" val="392696932"/>
+                      <a16:colId xmlns:a16="http://schemas.microsoft.com/office/drawing/2014/main" xmlns="" val="392696932"/>
                     </a:ext>
                   </a:extLst>
                 </a:gridCol>
                 <a:gridCol w="2468880">
                   <a:extLst>
                     <a:ext uri="{9D8B030D-6E8A-4147-A177-3AD203B41FA5}">
-                      <a16:colId xmlns:a16="http://schemas.microsoft.com/office/drawing/2014/main" val="2769969192"/>
+                      <a16:colId xmlns:a16="http://schemas.microsoft.com/office/drawing/2014/main" xmlns="" val="2769969192"/>
                     </a:ext>
                   </a:extLst>
                 </a:gridCol>
                 <a:gridCol w="2468880">
                   <a:extLst>
                     <a:ext uri="{9D8B030D-6E8A-4147-A177-3AD203B41FA5}">
-                      <a16:colId xmlns:a16="http://schemas.microsoft.com/office/drawing/2014/main" val="2022610816"/>
+                      <a16:colId xmlns:a16="http://schemas.microsoft.com/office/drawing/2014/main" xmlns="" val="2022610816"/>
                     </a:ext>
                   </a:extLst>
                 </a:gridCol>
                 <a:gridCol w="2468880">
                   <a:extLst>
                     <a:ext uri="{9D8B030D-6E8A-4147-A177-3AD203B41FA5}">
-                      <a16:colId xmlns:a16="http://schemas.microsoft.com/office/drawing/2014/main" val="102813283"/>
+                      <a16:colId xmlns:a16="http://schemas.microsoft.com/office/drawing/2014/main" xmlns="" val="102813283"/>
                     </a:ext>
                   </a:extLst>
                 </a:gridCol>
@@ -36398,7 +36594,7 @@
                 </a:tc>
                 <a:extLst>
                   <a:ext uri="{0D108BD9-81ED-4DB2-BD59-A6C34878D82A}">
-                    <a16:rowId xmlns:a16="http://schemas.microsoft.com/office/drawing/2014/main" val="2344937666"/>
+                    <a16:rowId xmlns:a16="http://schemas.microsoft.com/office/drawing/2014/main" xmlns="" val="2344937666"/>
                   </a:ext>
                 </a:extLst>
               </a:tr>
@@ -36558,7 +36754,7 @@
                 </a:tc>
                 <a:extLst>
                   <a:ext uri="{0D108BD9-81ED-4DB2-BD59-A6C34878D82A}">
-                    <a16:rowId xmlns:a16="http://schemas.microsoft.com/office/drawing/2014/main" val="1917341330"/>
+                    <a16:rowId xmlns:a16="http://schemas.microsoft.com/office/drawing/2014/main" xmlns="" val="1917341330"/>
                   </a:ext>
                 </a:extLst>
               </a:tr>
@@ -36862,7 +37058,7 @@
                 </a:tc>
                 <a:extLst>
                   <a:ext uri="{0D108BD9-81ED-4DB2-BD59-A6C34878D82A}">
-                    <a16:rowId xmlns:a16="http://schemas.microsoft.com/office/drawing/2014/main" val="3088042860"/>
+                    <a16:rowId xmlns:a16="http://schemas.microsoft.com/office/drawing/2014/main" xmlns="" val="3088042860"/>
                   </a:ext>
                 </a:extLst>
               </a:tr>
@@ -36956,7 +37152,7 @@
                 </a:tc>
                 <a:extLst>
                   <a:ext uri="{0D108BD9-81ED-4DB2-BD59-A6C34878D82A}">
-                    <a16:rowId xmlns:a16="http://schemas.microsoft.com/office/drawing/2014/main" val="2658530722"/>
+                    <a16:rowId xmlns:a16="http://schemas.microsoft.com/office/drawing/2014/main" xmlns="" val="2658530722"/>
                   </a:ext>
                 </a:extLst>
               </a:tr>
@@ -37149,7 +37345,7 @@
                 </a:tc>
                 <a:extLst>
                   <a:ext uri="{0D108BD9-81ED-4DB2-BD59-A6C34878D82A}">
-                    <a16:rowId xmlns:a16="http://schemas.microsoft.com/office/drawing/2014/main" val="1481886367"/>
+                    <a16:rowId xmlns:a16="http://schemas.microsoft.com/office/drawing/2014/main" xmlns="" val="1481886367"/>
                   </a:ext>
                 </a:extLst>
               </a:tr>
@@ -37258,7 +37454,7 @@
                 </a:tc>
                 <a:extLst>
                   <a:ext uri="{0D108BD9-81ED-4DB2-BD59-A6C34878D82A}">
-                    <a16:rowId xmlns:a16="http://schemas.microsoft.com/office/drawing/2014/main" val="4248384778"/>
+                    <a16:rowId xmlns:a16="http://schemas.microsoft.com/office/drawing/2014/main" xmlns="" val="4248384778"/>
                   </a:ext>
                 </a:extLst>
               </a:tr>
@@ -37367,7 +37563,7 @@
                 </a:tc>
                 <a:extLst>
                   <a:ext uri="{0D108BD9-81ED-4DB2-BD59-A6C34878D82A}">
-                    <a16:rowId xmlns:a16="http://schemas.microsoft.com/office/drawing/2014/main" val="1670483340"/>
+                    <a16:rowId xmlns:a16="http://schemas.microsoft.com/office/drawing/2014/main" xmlns="" val="1670483340"/>
                   </a:ext>
                 </a:extLst>
               </a:tr>
@@ -37771,14 +37967,14 @@
                 <a:gridCol w="934278">
                   <a:extLst>
                     <a:ext uri="{9D8B030D-6E8A-4147-A177-3AD203B41FA5}">
-                      <a16:colId xmlns:a16="http://schemas.microsoft.com/office/drawing/2014/main" val="4198655800"/>
+                      <a16:colId xmlns:a16="http://schemas.microsoft.com/office/drawing/2014/main" xmlns="" val="4198655800"/>
                     </a:ext>
                   </a:extLst>
                 </a:gridCol>
                 <a:gridCol w="7295322">
                   <a:extLst>
                     <a:ext uri="{9D8B030D-6E8A-4147-A177-3AD203B41FA5}">
-                      <a16:colId xmlns:a16="http://schemas.microsoft.com/office/drawing/2014/main" val="135413862"/>
+                      <a16:colId xmlns:a16="http://schemas.microsoft.com/office/drawing/2014/main" xmlns="" val="135413862"/>
                     </a:ext>
                   </a:extLst>
                 </a:gridCol>
@@ -37812,7 +38008,7 @@
                 </a:tc>
                 <a:extLst>
                   <a:ext uri="{0D108BD9-81ED-4DB2-BD59-A6C34878D82A}">
-                    <a16:rowId xmlns:a16="http://schemas.microsoft.com/office/drawing/2014/main" val="3068323444"/>
+                    <a16:rowId xmlns:a16="http://schemas.microsoft.com/office/drawing/2014/main" xmlns="" val="3068323444"/>
                   </a:ext>
                 </a:extLst>
               </a:tr>
@@ -37845,7 +38041,7 @@
                 </a:tc>
                 <a:extLst>
                   <a:ext uri="{0D108BD9-81ED-4DB2-BD59-A6C34878D82A}">
-                    <a16:rowId xmlns:a16="http://schemas.microsoft.com/office/drawing/2014/main" val="1586961909"/>
+                    <a16:rowId xmlns:a16="http://schemas.microsoft.com/office/drawing/2014/main" xmlns="" val="1586961909"/>
                   </a:ext>
                 </a:extLst>
               </a:tr>
@@ -37883,7 +38079,7 @@
                 </a:tc>
                 <a:extLst>
                   <a:ext uri="{0D108BD9-81ED-4DB2-BD59-A6C34878D82A}">
-                    <a16:rowId xmlns:a16="http://schemas.microsoft.com/office/drawing/2014/main" val="2280300197"/>
+                    <a16:rowId xmlns:a16="http://schemas.microsoft.com/office/drawing/2014/main" xmlns="" val="2280300197"/>
                   </a:ext>
                 </a:extLst>
               </a:tr>
@@ -37921,7 +38117,7 @@
                 </a:tc>
                 <a:extLst>
                   <a:ext uri="{0D108BD9-81ED-4DB2-BD59-A6C34878D82A}">
-                    <a16:rowId xmlns:a16="http://schemas.microsoft.com/office/drawing/2014/main" val="1192843310"/>
+                    <a16:rowId xmlns:a16="http://schemas.microsoft.com/office/drawing/2014/main" xmlns="" val="1192843310"/>
                   </a:ext>
                 </a:extLst>
               </a:tr>
@@ -37959,7 +38155,7 @@
                 </a:tc>
                 <a:extLst>
                   <a:ext uri="{0D108BD9-81ED-4DB2-BD59-A6C34878D82A}">
-                    <a16:rowId xmlns:a16="http://schemas.microsoft.com/office/drawing/2014/main" val="2620585158"/>
+                    <a16:rowId xmlns:a16="http://schemas.microsoft.com/office/drawing/2014/main" xmlns="" val="2620585158"/>
                   </a:ext>
                 </a:extLst>
               </a:tr>
@@ -37992,7 +38188,7 @@
                 </a:tc>
                 <a:extLst>
                   <a:ext uri="{0D108BD9-81ED-4DB2-BD59-A6C34878D82A}">
-                    <a16:rowId xmlns:a16="http://schemas.microsoft.com/office/drawing/2014/main" val="1697738616"/>
+                    <a16:rowId xmlns:a16="http://schemas.microsoft.com/office/drawing/2014/main" xmlns="" val="1697738616"/>
                   </a:ext>
                 </a:extLst>
               </a:tr>
@@ -38030,7 +38226,7 @@
                 </a:tc>
                 <a:extLst>
                   <a:ext uri="{0D108BD9-81ED-4DB2-BD59-A6C34878D82A}">
-                    <a16:rowId xmlns:a16="http://schemas.microsoft.com/office/drawing/2014/main" val="316611556"/>
+                    <a16:rowId xmlns:a16="http://schemas.microsoft.com/office/drawing/2014/main" xmlns="" val="316611556"/>
                   </a:ext>
                 </a:extLst>
               </a:tr>
@@ -38063,7 +38259,7 @@
                 </a:tc>
                 <a:extLst>
                   <a:ext uri="{0D108BD9-81ED-4DB2-BD59-A6C34878D82A}">
-                    <a16:rowId xmlns:a16="http://schemas.microsoft.com/office/drawing/2014/main" val="1312814102"/>
+                    <a16:rowId xmlns:a16="http://schemas.microsoft.com/office/drawing/2014/main" xmlns="" val="1312814102"/>
                   </a:ext>
                 </a:extLst>
               </a:tr>
@@ -38096,7 +38292,7 @@
                 </a:tc>
                 <a:extLst>
                   <a:ext uri="{0D108BD9-81ED-4DB2-BD59-A6C34878D82A}">
-                    <a16:rowId xmlns:a16="http://schemas.microsoft.com/office/drawing/2014/main" val="1975533996"/>
+                    <a16:rowId xmlns:a16="http://schemas.microsoft.com/office/drawing/2014/main" xmlns="" val="1975533996"/>
                   </a:ext>
                 </a:extLst>
               </a:tr>
@@ -38129,7 +38325,7 @@
                 </a:tc>
                 <a:extLst>
                   <a:ext uri="{0D108BD9-81ED-4DB2-BD59-A6C34878D82A}">
-                    <a16:rowId xmlns:a16="http://schemas.microsoft.com/office/drawing/2014/main" val="2759032957"/>
+                    <a16:rowId xmlns:a16="http://schemas.microsoft.com/office/drawing/2014/main" xmlns="" val="2759032957"/>
                   </a:ext>
                 </a:extLst>
               </a:tr>
@@ -38218,14 +38414,14 @@
                 <a:gridCol w="934278">
                   <a:extLst>
                     <a:ext uri="{9D8B030D-6E8A-4147-A177-3AD203B41FA5}">
-                      <a16:colId xmlns:a16="http://schemas.microsoft.com/office/drawing/2014/main" val="4198655800"/>
+                      <a16:colId xmlns:a16="http://schemas.microsoft.com/office/drawing/2014/main" xmlns="" val="4198655800"/>
                     </a:ext>
                   </a:extLst>
                 </a:gridCol>
                 <a:gridCol w="7295322">
                   <a:extLst>
                     <a:ext uri="{9D8B030D-6E8A-4147-A177-3AD203B41FA5}">
-                      <a16:colId xmlns:a16="http://schemas.microsoft.com/office/drawing/2014/main" val="135413862"/>
+                      <a16:colId xmlns:a16="http://schemas.microsoft.com/office/drawing/2014/main" xmlns="" val="135413862"/>
                     </a:ext>
                   </a:extLst>
                 </a:gridCol>
@@ -38259,7 +38455,7 @@
                 </a:tc>
                 <a:extLst>
                   <a:ext uri="{0D108BD9-81ED-4DB2-BD59-A6C34878D82A}">
-                    <a16:rowId xmlns:a16="http://schemas.microsoft.com/office/drawing/2014/main" val="3068323444"/>
+                    <a16:rowId xmlns:a16="http://schemas.microsoft.com/office/drawing/2014/main" xmlns="" val="3068323444"/>
                   </a:ext>
                 </a:extLst>
               </a:tr>
@@ -38292,7 +38488,7 @@
                 </a:tc>
                 <a:extLst>
                   <a:ext uri="{0D108BD9-81ED-4DB2-BD59-A6C34878D82A}">
-                    <a16:rowId xmlns:a16="http://schemas.microsoft.com/office/drawing/2014/main" val="2484981654"/>
+                    <a16:rowId xmlns:a16="http://schemas.microsoft.com/office/drawing/2014/main" xmlns="" val="2484981654"/>
                   </a:ext>
                 </a:extLst>
               </a:tr>
@@ -38330,7 +38526,7 @@
                 </a:tc>
                 <a:extLst>
                   <a:ext uri="{0D108BD9-81ED-4DB2-BD59-A6C34878D82A}">
-                    <a16:rowId xmlns:a16="http://schemas.microsoft.com/office/drawing/2014/main" val="1377910784"/>
+                    <a16:rowId xmlns:a16="http://schemas.microsoft.com/office/drawing/2014/main" xmlns="" val="1377910784"/>
                   </a:ext>
                 </a:extLst>
               </a:tr>
@@ -38363,7 +38559,7 @@
                 </a:tc>
                 <a:extLst>
                   <a:ext uri="{0D108BD9-81ED-4DB2-BD59-A6C34878D82A}">
-                    <a16:rowId xmlns:a16="http://schemas.microsoft.com/office/drawing/2014/main" val="1387856053"/>
+                    <a16:rowId xmlns:a16="http://schemas.microsoft.com/office/drawing/2014/main" xmlns="" val="1387856053"/>
                   </a:ext>
                 </a:extLst>
               </a:tr>
@@ -38401,7 +38597,7 @@
                 </a:tc>
                 <a:extLst>
                   <a:ext uri="{0D108BD9-81ED-4DB2-BD59-A6C34878D82A}">
-                    <a16:rowId xmlns:a16="http://schemas.microsoft.com/office/drawing/2014/main" val="2599123823"/>
+                    <a16:rowId xmlns:a16="http://schemas.microsoft.com/office/drawing/2014/main" xmlns="" val="2599123823"/>
                   </a:ext>
                 </a:extLst>
               </a:tr>
@@ -38442,7 +38638,7 @@
                 </a:tc>
                 <a:extLst>
                   <a:ext uri="{0D108BD9-81ED-4DB2-BD59-A6C34878D82A}">
-                    <a16:rowId xmlns:a16="http://schemas.microsoft.com/office/drawing/2014/main" val="1232603862"/>
+                    <a16:rowId xmlns:a16="http://schemas.microsoft.com/office/drawing/2014/main" xmlns="" val="1232603862"/>
                   </a:ext>
                 </a:extLst>
               </a:tr>
@@ -38475,7 +38671,7 @@
                 </a:tc>
                 <a:extLst>
                   <a:ext uri="{0D108BD9-81ED-4DB2-BD59-A6C34878D82A}">
-                    <a16:rowId xmlns:a16="http://schemas.microsoft.com/office/drawing/2014/main" val="4145944521"/>
+                    <a16:rowId xmlns:a16="http://schemas.microsoft.com/office/drawing/2014/main" xmlns="" val="4145944521"/>
                   </a:ext>
                 </a:extLst>
               </a:tr>
@@ -38513,7 +38709,7 @@
                 </a:tc>
                 <a:extLst>
                   <a:ext uri="{0D108BD9-81ED-4DB2-BD59-A6C34878D82A}">
-                    <a16:rowId xmlns:a16="http://schemas.microsoft.com/office/drawing/2014/main" val="2954677722"/>
+                    <a16:rowId xmlns:a16="http://schemas.microsoft.com/office/drawing/2014/main" xmlns="" val="2954677722"/>
                   </a:ext>
                 </a:extLst>
               </a:tr>
@@ -38546,7 +38742,7 @@
                 </a:tc>
                 <a:extLst>
                   <a:ext uri="{0D108BD9-81ED-4DB2-BD59-A6C34878D82A}">
-                    <a16:rowId xmlns:a16="http://schemas.microsoft.com/office/drawing/2014/main" val="205903975"/>
+                    <a16:rowId xmlns:a16="http://schemas.microsoft.com/office/drawing/2014/main" xmlns="" val="205903975"/>
                   </a:ext>
                 </a:extLst>
               </a:tr>
@@ -38579,7 +38775,7 @@
                 </a:tc>
                 <a:extLst>
                   <a:ext uri="{0D108BD9-81ED-4DB2-BD59-A6C34878D82A}">
-                    <a16:rowId xmlns:a16="http://schemas.microsoft.com/office/drawing/2014/main" val="2893595017"/>
+                    <a16:rowId xmlns:a16="http://schemas.microsoft.com/office/drawing/2014/main" xmlns="" val="2893595017"/>
                   </a:ext>
                 </a:extLst>
               </a:tr>
@@ -38612,7 +38808,7 @@
                 </a:tc>
                 <a:extLst>
                   <a:ext uri="{0D108BD9-81ED-4DB2-BD59-A6C34878D82A}">
-                    <a16:rowId xmlns:a16="http://schemas.microsoft.com/office/drawing/2014/main" val="2337380595"/>
+                    <a16:rowId xmlns:a16="http://schemas.microsoft.com/office/drawing/2014/main" xmlns="" val="2337380595"/>
                   </a:ext>
                 </a:extLst>
               </a:tr>
@@ -40670,21 +40866,21 @@
                 <a:gridCol w="2764301">
                   <a:extLst>
                     <a:ext uri="{9D8B030D-6E8A-4147-A177-3AD203B41FA5}">
-                      <a16:colId xmlns:a16="http://schemas.microsoft.com/office/drawing/2014/main" val="234227049"/>
+                      <a16:colId xmlns:a16="http://schemas.microsoft.com/office/drawing/2014/main" xmlns="" val="234227049"/>
                     </a:ext>
                   </a:extLst>
                 </a:gridCol>
                 <a:gridCol w="2764301">
                   <a:extLst>
                     <a:ext uri="{9D8B030D-6E8A-4147-A177-3AD203B41FA5}">
-                      <a16:colId xmlns:a16="http://schemas.microsoft.com/office/drawing/2014/main" val="4053135350"/>
+                      <a16:colId xmlns:a16="http://schemas.microsoft.com/office/drawing/2014/main" xmlns="" val="4053135350"/>
                     </a:ext>
                   </a:extLst>
                 </a:gridCol>
                 <a:gridCol w="2764301">
                   <a:extLst>
                     <a:ext uri="{9D8B030D-6E8A-4147-A177-3AD203B41FA5}">
-                      <a16:colId xmlns:a16="http://schemas.microsoft.com/office/drawing/2014/main" val="672378647"/>
+                      <a16:colId xmlns:a16="http://schemas.microsoft.com/office/drawing/2014/main" xmlns="" val="672378647"/>
                     </a:ext>
                   </a:extLst>
                 </a:gridCol>
@@ -40734,7 +40930,7 @@
                 </a:tc>
                 <a:extLst>
                   <a:ext uri="{0D108BD9-81ED-4DB2-BD59-A6C34878D82A}">
-                    <a16:rowId xmlns:a16="http://schemas.microsoft.com/office/drawing/2014/main" val="2843053056"/>
+                    <a16:rowId xmlns:a16="http://schemas.microsoft.com/office/drawing/2014/main" xmlns="" val="2843053056"/>
                   </a:ext>
                 </a:extLst>
               </a:tr>
@@ -40784,7 +40980,7 @@
                 </a:tc>
                 <a:extLst>
                   <a:ext uri="{0D108BD9-81ED-4DB2-BD59-A6C34878D82A}">
-                    <a16:rowId xmlns:a16="http://schemas.microsoft.com/office/drawing/2014/main" val="3055328934"/>
+                    <a16:rowId xmlns:a16="http://schemas.microsoft.com/office/drawing/2014/main" xmlns="" val="3055328934"/>
                   </a:ext>
                 </a:extLst>
               </a:tr>
@@ -40834,7 +41030,7 @@
                 </a:tc>
                 <a:extLst>
                   <a:ext uri="{0D108BD9-81ED-4DB2-BD59-A6C34878D82A}">
-                    <a16:rowId xmlns:a16="http://schemas.microsoft.com/office/drawing/2014/main" val="1144851549"/>
+                    <a16:rowId xmlns:a16="http://schemas.microsoft.com/office/drawing/2014/main" xmlns="" val="1144851549"/>
                   </a:ext>
                 </a:extLst>
               </a:tr>
@@ -40883,7 +41079,7 @@
                 </a:tc>
                 <a:extLst>
                   <a:ext uri="{0D108BD9-81ED-4DB2-BD59-A6C34878D82A}">
-                    <a16:rowId xmlns:a16="http://schemas.microsoft.com/office/drawing/2014/main" val="4258932578"/>
+                    <a16:rowId xmlns:a16="http://schemas.microsoft.com/office/drawing/2014/main" xmlns="" val="4258932578"/>
                   </a:ext>
                 </a:extLst>
               </a:tr>
@@ -42229,6 +42425,14 @@
   <p:clrMapOvr>
     <a:masterClrMapping/>
   </p:clrMapOvr>
+  <mc:AlternateContent xmlns:mc="http://schemas.openxmlformats.org/markup-compatibility/2006">
+    <mc:Choice xmlns:p14="http://schemas.microsoft.com/office/powerpoint/2010/main" Requires="p14">
+      <p:transition spd="slow" p14:dur="2000"/>
+    </mc:Choice>
+    <mc:Fallback>
+      <p:transition spd="slow"/>
+    </mc:Fallback>
+  </mc:AlternateContent>
 </p:sld>
 </file>
 
@@ -43449,6 +43653,14 @@
   <p:clrMapOvr>
     <a:masterClrMapping/>
   </p:clrMapOvr>
+  <mc:AlternateContent xmlns:mc="http://schemas.openxmlformats.org/markup-compatibility/2006">
+    <mc:Choice xmlns:p14="http://schemas.microsoft.com/office/powerpoint/2010/main" Requires="p14">
+      <p:transition spd="slow" p14:dur="2000"/>
+    </mc:Choice>
+    <mc:Fallback>
+      <p:transition spd="slow"/>
+    </mc:Fallback>
+  </mc:AlternateContent>
 </p:sld>
 </file>
 

</xml_diff>

<commit_message>
A bit on physical properties in slide deck; demo for join-collapse.
</commit_message>
<xml_diff>
--- a/Optimizer.pptx
+++ b/Optimizer.pptx
@@ -754,19 +754,12 @@
           <a:lstStyle/>
           <a:p>
             <a:r>
+              <a:rPr lang="en-US" dirty="0" smtClean="0"/>
+              <a:t>As </a:t>
+            </a:r>
+            <a:r>
               <a:rPr lang="en-US" dirty="0"/>
-              <a:t>Constant folding refers to pre-computing as much of an expression as possible, for example: 2 * pi() * radius</a:t>
-            </a:r>
-            <a:r>
-              <a:rPr lang="en-US" baseline="0" dirty="0"/>
-              <a:t> =&gt; 6.28319 * radius</a:t>
-            </a:r>
-            <a:endParaRPr lang="en-US" dirty="0"/>
-          </a:p>
-          <a:p>
-            <a:r>
-              <a:rPr lang="en-US" dirty="0"/>
-              <a:t>As an</a:t>
+              <a:t>an</a:t>
             </a:r>
             <a:r>
               <a:rPr lang="en-US" baseline="0" dirty="0"/>
@@ -1098,7 +1091,60 @@
             <a:endParaRPr lang="en-US" baseline="0" dirty="0"/>
           </a:p>
           <a:p>
-            <a:endParaRPr lang="en-US" baseline="0" dirty="0"/>
+            <a:pPr marL="0" marR="0" lvl="0" indent="0" algn="l" defTabSz="914400" rtl="0" eaLnBrk="1" fontAlgn="auto" latinLnBrk="0" hangingPunct="1">
+              <a:lnSpc>
+                <a:spcPct val="100000"/>
+              </a:lnSpc>
+              <a:spcBef>
+                <a:spcPts val="0"/>
+              </a:spcBef>
+              <a:spcAft>
+                <a:spcPts val="0"/>
+              </a:spcAft>
+              <a:buClrTx/>
+              <a:buSzTx/>
+              <a:buFontTx/>
+              <a:buNone/>
+              <a:tabLst/>
+              <a:defRPr/>
+            </a:pPr>
+            <a:r>
+              <a:rPr lang="en-US" dirty="0" smtClean="0"/>
+              <a:t>Examples of physical properties: heap</a:t>
+            </a:r>
+            <a:r>
+              <a:rPr lang="en-US" baseline="0" dirty="0" smtClean="0"/>
+              <a:t> vs. clustered </a:t>
+            </a:r>
+            <a:r>
+              <a:rPr lang="en-US" baseline="0" dirty="0" err="1" smtClean="0"/>
+              <a:t>idx</a:t>
+            </a:r>
+            <a:r>
+              <a:rPr lang="en-US" baseline="0" dirty="0" smtClean="0"/>
+              <a:t>, </a:t>
+            </a:r>
+            <a:r>
+              <a:rPr lang="en-US" baseline="0" dirty="0" err="1" smtClean="0"/>
+              <a:t>nonclustered</a:t>
+            </a:r>
+            <a:r>
+              <a:rPr lang="en-US" baseline="0" dirty="0" smtClean="0"/>
+              <a:t> </a:t>
+            </a:r>
+            <a:r>
+              <a:rPr lang="en-US" baseline="0" dirty="0" err="1" smtClean="0"/>
+              <a:t>idx</a:t>
+            </a:r>
+            <a:r>
+              <a:rPr lang="en-US" baseline="0" dirty="0" smtClean="0"/>
+              <a:t>, sort orders, </a:t>
+            </a:r>
+            <a:r>
+              <a:rPr lang="en-US" baseline="0" smtClean="0"/>
+              <a:t>etc.</a:t>
+            </a:r>
+            <a:endParaRPr lang="en-US" smtClean="0"/>
           </a:p>
         </p:txBody>
       </p:sp>
@@ -8168,11 +8214,11 @@
   <p:clrMapOvr>
     <a:masterClrMapping/>
   </p:clrMapOvr>
-  <mc:AlternateContent xmlns:mc="http://schemas.openxmlformats.org/markup-compatibility/2006">
-    <mc:Choice xmlns:p14="http://schemas.microsoft.com/office/powerpoint/2010/main" Requires="p14">
+  <mc:AlternateContent xmlns:mc="http://schemas.openxmlformats.org/markup-compatibility/2006" xmlns:p14="http://schemas.microsoft.com/office/powerpoint/2010/main">
+    <mc:Choice Requires="p14">
       <p:transition spd="slow" p14:dur="2000"/>
     </mc:Choice>
-    <mc:Fallback>
+    <mc:Fallback xmlns="">
       <p:transition spd="slow"/>
     </mc:Fallback>
   </mc:AlternateContent>
@@ -9387,11 +9433,11 @@
   <p:clrMapOvr>
     <a:masterClrMapping/>
   </p:clrMapOvr>
-  <mc:AlternateContent xmlns:mc="http://schemas.openxmlformats.org/markup-compatibility/2006">
-    <mc:Choice xmlns:p14="http://schemas.microsoft.com/office/powerpoint/2010/main" Requires="p14">
+  <mc:AlternateContent xmlns:mc="http://schemas.openxmlformats.org/markup-compatibility/2006" xmlns:p14="http://schemas.microsoft.com/office/powerpoint/2010/main">
+    <mc:Choice Requires="p14">
       <p:transition spd="slow" p14:dur="2000"/>
     </mc:Choice>
-    <mc:Fallback>
+    <mc:Fallback xmlns="">
       <p:transition spd="slow"/>
     </mc:Fallback>
   </mc:AlternateContent>
@@ -10590,11 +10636,11 @@
   <p:clrMapOvr>
     <a:masterClrMapping/>
   </p:clrMapOvr>
-  <mc:AlternateContent xmlns:mc="http://schemas.openxmlformats.org/markup-compatibility/2006">
-    <mc:Choice xmlns:p14="http://schemas.microsoft.com/office/powerpoint/2010/main" Requires="p14">
+  <mc:AlternateContent xmlns:mc="http://schemas.openxmlformats.org/markup-compatibility/2006" xmlns:p14="http://schemas.microsoft.com/office/powerpoint/2010/main">
+    <mc:Choice Requires="p14">
       <p:transition spd="slow" p14:dur="2000"/>
     </mc:Choice>
-    <mc:Fallback>
+    <mc:Fallback xmlns="">
       <p:transition spd="slow"/>
     </mc:Fallback>
   </mc:AlternateContent>
@@ -11846,11 +11892,11 @@
   <p:clrMapOvr>
     <a:masterClrMapping/>
   </p:clrMapOvr>
-  <mc:AlternateContent xmlns:mc="http://schemas.openxmlformats.org/markup-compatibility/2006">
-    <mc:Choice xmlns:p14="http://schemas.microsoft.com/office/powerpoint/2010/main" Requires="p14">
+  <mc:AlternateContent xmlns:mc="http://schemas.openxmlformats.org/markup-compatibility/2006" xmlns:p14="http://schemas.microsoft.com/office/powerpoint/2010/main">
+    <mc:Choice Requires="p14">
       <p:transition spd="slow" p14:dur="2000"/>
     </mc:Choice>
-    <mc:Fallback>
+    <mc:Fallback xmlns="">
       <p:transition spd="slow"/>
     </mc:Fallback>
   </mc:AlternateContent>
@@ -13028,11 +13074,11 @@
   <p:clrMapOvr>
     <a:masterClrMapping/>
   </p:clrMapOvr>
-  <mc:AlternateContent xmlns:mc="http://schemas.openxmlformats.org/markup-compatibility/2006">
-    <mc:Choice xmlns:p14="http://schemas.microsoft.com/office/powerpoint/2010/main" Requires="p14">
+  <mc:AlternateContent xmlns:mc="http://schemas.openxmlformats.org/markup-compatibility/2006" xmlns:p14="http://schemas.microsoft.com/office/powerpoint/2010/main">
+    <mc:Choice Requires="p14">
       <p:transition spd="slow" p14:dur="2000"/>
     </mc:Choice>
-    <mc:Fallback>
+    <mc:Fallback xmlns="">
       <p:transition spd="slow"/>
     </mc:Fallback>
   </mc:AlternateContent>
@@ -14256,11 +14302,11 @@
   <p:clrMapOvr>
     <a:masterClrMapping/>
   </p:clrMapOvr>
-  <mc:AlternateContent xmlns:mc="http://schemas.openxmlformats.org/markup-compatibility/2006">
-    <mc:Choice xmlns:p14="http://schemas.microsoft.com/office/powerpoint/2010/main" Requires="p14">
+  <mc:AlternateContent xmlns:mc="http://schemas.openxmlformats.org/markup-compatibility/2006" xmlns:p14="http://schemas.microsoft.com/office/powerpoint/2010/main">
+    <mc:Choice Requires="p14">
       <p:transition spd="slow" p14:dur="2000"/>
     </mc:Choice>
-    <mc:Fallback>
+    <mc:Fallback xmlns="">
       <p:transition spd="slow"/>
     </mc:Fallback>
   </mc:AlternateContent>
@@ -15475,11 +15521,11 @@
   <p:clrMapOvr>
     <a:masterClrMapping/>
   </p:clrMapOvr>
-  <mc:AlternateContent xmlns:mc="http://schemas.openxmlformats.org/markup-compatibility/2006">
-    <mc:Choice xmlns:p14="http://schemas.microsoft.com/office/powerpoint/2010/main" Requires="p14">
+  <mc:AlternateContent xmlns:mc="http://schemas.openxmlformats.org/markup-compatibility/2006" xmlns:p14="http://schemas.microsoft.com/office/powerpoint/2010/main">
+    <mc:Choice Requires="p14">
       <p:transition spd="slow" p14:dur="2000"/>
     </mc:Choice>
-    <mc:Fallback>
+    <mc:Fallback xmlns="">
       <p:transition spd="slow"/>
     </mc:Fallback>
   </mc:AlternateContent>
@@ -16747,11 +16793,11 @@
   <p:clrMapOvr>
     <a:masterClrMapping/>
   </p:clrMapOvr>
-  <mc:AlternateContent xmlns:mc="http://schemas.openxmlformats.org/markup-compatibility/2006">
-    <mc:Choice xmlns:p14="http://schemas.microsoft.com/office/powerpoint/2010/main" Requires="p14">
+  <mc:AlternateContent xmlns:mc="http://schemas.openxmlformats.org/markup-compatibility/2006" xmlns:p14="http://schemas.microsoft.com/office/powerpoint/2010/main">
+    <mc:Choice Requires="p14">
       <p:transition spd="slow" p14:dur="2000"/>
     </mc:Choice>
-    <mc:Fallback>
+    <mc:Fallback xmlns="">
       <p:transition spd="slow"/>
     </mc:Fallback>
   </mc:AlternateContent>
@@ -23074,13 +23120,17 @@
             <a:pPr lvl="2"/>
             <a:r>
               <a:rPr lang="en-US" dirty="0"/>
-              <a:t>Metadata discovery / name resolution</a:t>
+              <a:t>Metadata discovery / name </a:t>
+            </a:r>
+            <a:r>
+              <a:rPr lang="en-US" dirty="0" smtClean="0"/>
+              <a:t>resolution</a:t>
             </a:r>
           </a:p>
           <a:p>
             <a:pPr lvl="2"/>
             <a:r>
-              <a:rPr lang="en-US" dirty="0"/>
+              <a:rPr lang="en-US" dirty="0" smtClean="0"/>
               <a:t>Data type resolution (i.e., UNION)</a:t>
             </a:r>
           </a:p>
@@ -23089,7 +23139,7 @@
               <a:buNone/>
             </a:pPr>
             <a:r>
-              <a:rPr lang="en-US" dirty="0">
+              <a:rPr lang="en-US" dirty="0" smtClean="0">
                 <a:solidFill>
                   <a:srgbClr val="0000FF"/>
                 </a:solidFill>
@@ -23101,7 +23151,7 @@
               <a:t>select</a:t>
             </a:r>
             <a:r>
-              <a:rPr lang="en-US" dirty="0">
+              <a:rPr lang="en-US" dirty="0" smtClean="0">
                 <a:solidFill>
                   <a:srgbClr val="000000"/>
                 </a:solidFill>
@@ -23110,7 +23160,19 @@
                 </a:highlight>
                 <a:latin typeface="Consolas" panose="020B0609020204030204" pitchFamily="49" charset="0"/>
               </a:rPr>
-              <a:t> 1 </a:t>
+              <a:t> </a:t>
+            </a:r>
+            <a:r>
+              <a:rPr lang="en-US" dirty="0">
+                <a:solidFill>
+                  <a:srgbClr val="000000"/>
+                </a:solidFill>
+                <a:highlight>
+                  <a:srgbClr val="FFFFFF"/>
+                </a:highlight>
+                <a:latin typeface="Consolas" panose="020B0609020204030204" pitchFamily="49" charset="0"/>
+              </a:rPr>
+              <a:t>1 </a:t>
             </a:r>
             <a:r>
               <a:rPr lang="en-US" dirty="0">
@@ -26637,7 +26699,7 @@
         <p:spPr/>
         <p:txBody>
           <a:bodyPr>
-            <a:normAutofit lnSpcReduction="10000"/>
+            <a:normAutofit fontScale="92500" lnSpcReduction="10000"/>
           </a:bodyPr>
           <a:lstStyle/>
           <a:p>
@@ -26704,8 +26766,20 @@
             <a:pPr lvl="1"/>
             <a:r>
               <a:rPr lang="en-US" dirty="0"/>
-              <a:t>SQL Server 7 vs 2014 CE engine</a:t>
-            </a:r>
+              <a:t>SQL Server 7 vs 2014 CE </a:t>
+            </a:r>
+            <a:r>
+              <a:rPr lang="en-US" dirty="0" smtClean="0"/>
+              <a:t>engine</a:t>
+            </a:r>
+          </a:p>
+          <a:p>
+            <a:pPr lvl="1"/>
+            <a:r>
+              <a:rPr lang="en-US" dirty="0" smtClean="0"/>
+              <a:t>Other physical properties</a:t>
+            </a:r>
+            <a:endParaRPr lang="en-US" dirty="0"/>
           </a:p>
           <a:p>
             <a:pPr lvl="1"/>
@@ -26721,7 +26795,7 @@
         </p:nvSpPr>
         <p:spPr>
           <a:xfrm>
-            <a:off x="8316227" y="3921625"/>
+            <a:off x="8316227" y="3618429"/>
             <a:ext cx="616016" cy="606391"/>
           </a:xfrm>
           <a:prstGeom prst="ellipse">
@@ -26834,8 +26908,8 @@
         </p:nvSpPr>
         <p:spPr>
           <a:xfrm>
-            <a:off x="5018572" y="2553333"/>
-            <a:ext cx="3790950" cy="1488926"/>
+            <a:off x="5018572" y="2426362"/>
+            <a:ext cx="3790950" cy="1275717"/>
           </a:xfrm>
           <a:prstGeom prst="rect">
             <a:avLst/>
@@ -26843,7 +26917,7 @@
         </p:spPr>
         <p:txBody>
           <a:bodyPr vert="horz" lIns="91440" tIns="45720" rIns="91440" bIns="45720" rtlCol="0">
-            <a:normAutofit fontScale="77500" lnSpcReduction="20000"/>
+            <a:normAutofit/>
           </a:bodyPr>
           <a:lstStyle>
             <a:lvl1pPr marL="342900" indent="-342900" algn="l" defTabSz="457200" rtl="0" eaLnBrk="1" latinLnBrk="0" hangingPunct="1">
@@ -26984,25 +27058,26 @@
           </a:lstStyle>
           <a:p>
             <a:r>
-              <a:rPr lang="en-US" sz="2900" dirty="0"/>
+              <a:rPr lang="en-US" sz="2000" dirty="0"/>
               <a:t>Contradiction detection</a:t>
             </a:r>
           </a:p>
           <a:p>
             <a:r>
-              <a:rPr lang="en-US" sz="2900" dirty="0"/>
+              <a:rPr lang="en-US" sz="2000" dirty="0"/>
               <a:t>Aggregates on unique keys</a:t>
             </a:r>
           </a:p>
           <a:p>
             <a:r>
-              <a:rPr lang="en-US" sz="2900" dirty="0"/>
-              <a:t>Convert outer join to inner</a:t>
-            </a:r>
-          </a:p>
-          <a:p>
-            <a:pPr lvl="1"/>
-            <a:endParaRPr lang="en-US" dirty="0"/>
+              <a:rPr lang="en-US" sz="2000" dirty="0"/>
+              <a:t>Convert outer join to </a:t>
+            </a:r>
+            <a:r>
+              <a:rPr lang="en-US" sz="2000" dirty="0" smtClean="0"/>
+              <a:t>inner</a:t>
+            </a:r>
+            <a:endParaRPr lang="en-US" sz="2000" dirty="0"/>
           </a:p>
         </p:txBody>
       </p:sp>
@@ -27565,11 +27640,11 @@
   <p:clrMapOvr>
     <a:masterClrMapping/>
   </p:clrMapOvr>
-  <mc:AlternateContent xmlns:mc="http://schemas.openxmlformats.org/markup-compatibility/2006">
-    <mc:Choice xmlns:p14="http://schemas.microsoft.com/office/powerpoint/2010/main" Requires="p14">
+  <mc:AlternateContent xmlns:mc="http://schemas.openxmlformats.org/markup-compatibility/2006" xmlns:p14="http://schemas.microsoft.com/office/powerpoint/2010/main">
+    <mc:Choice Requires="p14">
       <p:transition spd="slow" p14:dur="2000"/>
     </mc:Choice>
-    <mc:Fallback>
+    <mc:Fallback xmlns="">
       <p:transition spd="slow"/>
     </mc:Fallback>
   </mc:AlternateContent>
@@ -27925,14 +28000,14 @@
                 <a:gridCol w="7632835">
                   <a:extLst>
                     <a:ext uri="{9D8B030D-6E8A-4147-A177-3AD203B41FA5}">
-                      <a16:colId xmlns:a16="http://schemas.microsoft.com/office/drawing/2014/main" xmlns="" val="3644048045"/>
+                      <a16:colId xmlns="" xmlns:a16="http://schemas.microsoft.com/office/drawing/2014/main" val="3644048045"/>
                     </a:ext>
                   </a:extLst>
                 </a:gridCol>
                 <a:gridCol w="606393">
                   <a:extLst>
                     <a:ext uri="{9D8B030D-6E8A-4147-A177-3AD203B41FA5}">
-                      <a16:colId xmlns:a16="http://schemas.microsoft.com/office/drawing/2014/main" xmlns="" val="2034254753"/>
+                      <a16:colId xmlns="" xmlns:a16="http://schemas.microsoft.com/office/drawing/2014/main" val="2034254753"/>
                     </a:ext>
                   </a:extLst>
                 </a:gridCol>
@@ -27963,7 +28038,7 @@
                 </a:tc>
                 <a:extLst>
                   <a:ext uri="{0D108BD9-81ED-4DB2-BD59-A6C34878D82A}">
-                    <a16:rowId xmlns:a16="http://schemas.microsoft.com/office/drawing/2014/main" xmlns="" val="2708275910"/>
+                    <a16:rowId xmlns="" xmlns:a16="http://schemas.microsoft.com/office/drawing/2014/main" val="2708275910"/>
                   </a:ext>
                 </a:extLst>
               </a:tr>
@@ -27997,7 +28072,7 @@
                 </a:tc>
                 <a:extLst>
                   <a:ext uri="{0D108BD9-81ED-4DB2-BD59-A6C34878D82A}">
-                    <a16:rowId xmlns:a16="http://schemas.microsoft.com/office/drawing/2014/main" xmlns="" val="2161984115"/>
+                    <a16:rowId xmlns="" xmlns:a16="http://schemas.microsoft.com/office/drawing/2014/main" val="2161984115"/>
                   </a:ext>
                 </a:extLst>
               </a:tr>
@@ -28044,7 +28119,7 @@
                 </a:tc>
                 <a:extLst>
                   <a:ext uri="{0D108BD9-81ED-4DB2-BD59-A6C34878D82A}">
-                    <a16:rowId xmlns:a16="http://schemas.microsoft.com/office/drawing/2014/main" xmlns="" val="2841678841"/>
+                    <a16:rowId xmlns="" xmlns:a16="http://schemas.microsoft.com/office/drawing/2014/main" val="2841678841"/>
                   </a:ext>
                 </a:extLst>
               </a:tr>
@@ -28078,7 +28153,7 @@
                 </a:tc>
                 <a:extLst>
                   <a:ext uri="{0D108BD9-81ED-4DB2-BD59-A6C34878D82A}">
-                    <a16:rowId xmlns:a16="http://schemas.microsoft.com/office/drawing/2014/main" xmlns="" val="3144998627"/>
+                    <a16:rowId xmlns="" xmlns:a16="http://schemas.microsoft.com/office/drawing/2014/main" val="3144998627"/>
                   </a:ext>
                 </a:extLst>
               </a:tr>
@@ -28120,7 +28195,7 @@
                 </a:tc>
                 <a:extLst>
                   <a:ext uri="{0D108BD9-81ED-4DB2-BD59-A6C34878D82A}">
-                    <a16:rowId xmlns:a16="http://schemas.microsoft.com/office/drawing/2014/main" xmlns="" val="1419261869"/>
+                    <a16:rowId xmlns="" xmlns:a16="http://schemas.microsoft.com/office/drawing/2014/main" val="1419261869"/>
                   </a:ext>
                 </a:extLst>
               </a:tr>
@@ -28158,7 +28233,7 @@
                 </a:tc>
                 <a:extLst>
                   <a:ext uri="{0D108BD9-81ED-4DB2-BD59-A6C34878D82A}">
-                    <a16:rowId xmlns:a16="http://schemas.microsoft.com/office/drawing/2014/main" xmlns="" val="1427391072"/>
+                    <a16:rowId xmlns="" xmlns:a16="http://schemas.microsoft.com/office/drawing/2014/main" val="1427391072"/>
                   </a:ext>
                 </a:extLst>
               </a:tr>
@@ -28205,7 +28280,7 @@
                 </a:tc>
                 <a:extLst>
                   <a:ext uri="{0D108BD9-81ED-4DB2-BD59-A6C34878D82A}">
-                    <a16:rowId xmlns:a16="http://schemas.microsoft.com/office/drawing/2014/main" xmlns="" val="2346539918"/>
+                    <a16:rowId xmlns="" xmlns:a16="http://schemas.microsoft.com/office/drawing/2014/main" val="2346539918"/>
                   </a:ext>
                 </a:extLst>
               </a:tr>
@@ -28244,7 +28319,7 @@
                 </a:tc>
                 <a:extLst>
                   <a:ext uri="{0D108BD9-81ED-4DB2-BD59-A6C34878D82A}">
-                    <a16:rowId xmlns:a16="http://schemas.microsoft.com/office/drawing/2014/main" xmlns="" val="2275483042"/>
+                    <a16:rowId xmlns="" xmlns:a16="http://schemas.microsoft.com/office/drawing/2014/main" val="2275483042"/>
                   </a:ext>
                 </a:extLst>
               </a:tr>
@@ -28282,7 +28357,7 @@
                 </a:tc>
                 <a:extLst>
                   <a:ext uri="{0D108BD9-81ED-4DB2-BD59-A6C34878D82A}">
-                    <a16:rowId xmlns:a16="http://schemas.microsoft.com/office/drawing/2014/main" xmlns="" val="4202569347"/>
+                    <a16:rowId xmlns="" xmlns:a16="http://schemas.microsoft.com/office/drawing/2014/main" val="4202569347"/>
                   </a:ext>
                 </a:extLst>
               </a:tr>
@@ -28316,7 +28391,7 @@
                 </a:tc>
                 <a:extLst>
                   <a:ext uri="{0D108BD9-81ED-4DB2-BD59-A6C34878D82A}">
-                    <a16:rowId xmlns:a16="http://schemas.microsoft.com/office/drawing/2014/main" xmlns="" val="2989839269"/>
+                    <a16:rowId xmlns="" xmlns:a16="http://schemas.microsoft.com/office/drawing/2014/main" val="2989839269"/>
                   </a:ext>
                 </a:extLst>
               </a:tr>
@@ -28350,7 +28425,7 @@
                 </a:tc>
                 <a:extLst>
                   <a:ext uri="{0D108BD9-81ED-4DB2-BD59-A6C34878D82A}">
-                    <a16:rowId xmlns:a16="http://schemas.microsoft.com/office/drawing/2014/main" xmlns="" val="2130545569"/>
+                    <a16:rowId xmlns="" xmlns:a16="http://schemas.microsoft.com/office/drawing/2014/main" val="2130545569"/>
                   </a:ext>
                 </a:extLst>
               </a:tr>
@@ -28406,7 +28481,7 @@
                 </a:tc>
                 <a:extLst>
                   <a:ext uri="{0D108BD9-81ED-4DB2-BD59-A6C34878D82A}">
-                    <a16:rowId xmlns:a16="http://schemas.microsoft.com/office/drawing/2014/main" xmlns="" val="1848127216"/>
+                    <a16:rowId xmlns="" xmlns:a16="http://schemas.microsoft.com/office/drawing/2014/main" val="1848127216"/>
                   </a:ext>
                 </a:extLst>
               </a:tr>
@@ -28500,11 +28575,11 @@
   <p:clrMapOvr>
     <a:masterClrMapping/>
   </p:clrMapOvr>
-  <mc:AlternateContent xmlns:mc="http://schemas.openxmlformats.org/markup-compatibility/2006">
-    <mc:Choice xmlns:p14="http://schemas.microsoft.com/office/powerpoint/2010/main" Requires="p14">
+  <mc:AlternateContent xmlns:mc="http://schemas.openxmlformats.org/markup-compatibility/2006" xmlns:p14="http://schemas.microsoft.com/office/powerpoint/2010/main">
+    <mc:Choice Requires="p14">
       <p:transition spd="slow" p14:dur="2000"/>
     </mc:Choice>
-    <mc:Fallback>
+    <mc:Fallback xmlns="">
       <p:transition spd="slow"/>
     </mc:Fallback>
   </mc:AlternateContent>
@@ -28860,14 +28935,14 @@
                 <a:gridCol w="4119615">
                   <a:extLst>
                     <a:ext uri="{9D8B030D-6E8A-4147-A177-3AD203B41FA5}">
-                      <a16:colId xmlns:a16="http://schemas.microsoft.com/office/drawing/2014/main" xmlns="" val="3644048045"/>
+                      <a16:colId xmlns="" xmlns:a16="http://schemas.microsoft.com/office/drawing/2014/main" val="3644048045"/>
                     </a:ext>
                   </a:extLst>
                 </a:gridCol>
                 <a:gridCol w="4119613">
                   <a:extLst>
                     <a:ext uri="{9D8B030D-6E8A-4147-A177-3AD203B41FA5}">
-                      <a16:colId xmlns:a16="http://schemas.microsoft.com/office/drawing/2014/main" xmlns="" val="2034254753"/>
+                      <a16:colId xmlns="" xmlns:a16="http://schemas.microsoft.com/office/drawing/2014/main" val="2034254753"/>
                     </a:ext>
                   </a:extLst>
                 </a:gridCol>
@@ -28903,7 +28978,7 @@
                 </a:tc>
                 <a:extLst>
                   <a:ext uri="{0D108BD9-81ED-4DB2-BD59-A6C34878D82A}">
-                    <a16:rowId xmlns:a16="http://schemas.microsoft.com/office/drawing/2014/main" xmlns="" val="2708275910"/>
+                    <a16:rowId xmlns="" xmlns:a16="http://schemas.microsoft.com/office/drawing/2014/main" val="2708275910"/>
                   </a:ext>
                 </a:extLst>
               </a:tr>
@@ -29103,7 +29178,7 @@
                 </a:tc>
                 <a:extLst>
                   <a:ext uri="{0D108BD9-81ED-4DB2-BD59-A6C34878D82A}">
-                    <a16:rowId xmlns:a16="http://schemas.microsoft.com/office/drawing/2014/main" xmlns="" val="2161984115"/>
+                    <a16:rowId xmlns="" xmlns:a16="http://schemas.microsoft.com/office/drawing/2014/main" val="2161984115"/>
                   </a:ext>
                 </a:extLst>
               </a:tr>
@@ -29303,7 +29378,7 @@
                 </a:tc>
                 <a:extLst>
                   <a:ext uri="{0D108BD9-81ED-4DB2-BD59-A6C34878D82A}">
-                    <a16:rowId xmlns:a16="http://schemas.microsoft.com/office/drawing/2014/main" xmlns="" val="2841678841"/>
+                    <a16:rowId xmlns="" xmlns:a16="http://schemas.microsoft.com/office/drawing/2014/main" val="2841678841"/>
                   </a:ext>
                 </a:extLst>
               </a:tr>
@@ -29503,7 +29578,7 @@
                 </a:tc>
                 <a:extLst>
                   <a:ext uri="{0D108BD9-81ED-4DB2-BD59-A6C34878D82A}">
-                    <a16:rowId xmlns:a16="http://schemas.microsoft.com/office/drawing/2014/main" xmlns="" val="3144998627"/>
+                    <a16:rowId xmlns="" xmlns:a16="http://schemas.microsoft.com/office/drawing/2014/main" val="3144998627"/>
                   </a:ext>
                 </a:extLst>
               </a:tr>
@@ -29703,7 +29778,7 @@
                 </a:tc>
                 <a:extLst>
                   <a:ext uri="{0D108BD9-81ED-4DB2-BD59-A6C34878D82A}">
-                    <a16:rowId xmlns:a16="http://schemas.microsoft.com/office/drawing/2014/main" xmlns="" val="1419261869"/>
+                    <a16:rowId xmlns="" xmlns:a16="http://schemas.microsoft.com/office/drawing/2014/main" val="1419261869"/>
                   </a:ext>
                 </a:extLst>
               </a:tr>
@@ -29903,7 +29978,7 @@
                 </a:tc>
                 <a:extLst>
                   <a:ext uri="{0D108BD9-81ED-4DB2-BD59-A6C34878D82A}">
-                    <a16:rowId xmlns:a16="http://schemas.microsoft.com/office/drawing/2014/main" xmlns="" val="1427391072"/>
+                    <a16:rowId xmlns="" xmlns:a16="http://schemas.microsoft.com/office/drawing/2014/main" val="1427391072"/>
                   </a:ext>
                 </a:extLst>
               </a:tr>
@@ -30103,7 +30178,7 @@
                 </a:tc>
                 <a:extLst>
                   <a:ext uri="{0D108BD9-81ED-4DB2-BD59-A6C34878D82A}">
-                    <a16:rowId xmlns:a16="http://schemas.microsoft.com/office/drawing/2014/main" xmlns="" val="2346539918"/>
+                    <a16:rowId xmlns="" xmlns:a16="http://schemas.microsoft.com/office/drawing/2014/main" val="2346539918"/>
                   </a:ext>
                 </a:extLst>
               </a:tr>
@@ -30312,7 +30387,7 @@
                 </a:tc>
                 <a:extLst>
                   <a:ext uri="{0D108BD9-81ED-4DB2-BD59-A6C34878D82A}">
-                    <a16:rowId xmlns:a16="http://schemas.microsoft.com/office/drawing/2014/main" xmlns="" val="2275483042"/>
+                    <a16:rowId xmlns="" xmlns:a16="http://schemas.microsoft.com/office/drawing/2014/main" val="2275483042"/>
                   </a:ext>
                 </a:extLst>
               </a:tr>
@@ -30521,7 +30596,7 @@
                 </a:tc>
                 <a:extLst>
                   <a:ext uri="{0D108BD9-81ED-4DB2-BD59-A6C34878D82A}">
-                    <a16:rowId xmlns:a16="http://schemas.microsoft.com/office/drawing/2014/main" xmlns="" val="4202569347"/>
+                    <a16:rowId xmlns="" xmlns:a16="http://schemas.microsoft.com/office/drawing/2014/main" val="4202569347"/>
                   </a:ext>
                 </a:extLst>
               </a:tr>
@@ -30730,7 +30805,7 @@
                 </a:tc>
                 <a:extLst>
                   <a:ext uri="{0D108BD9-81ED-4DB2-BD59-A6C34878D82A}">
-                    <a16:rowId xmlns:a16="http://schemas.microsoft.com/office/drawing/2014/main" xmlns="" val="2989839269"/>
+                    <a16:rowId xmlns="" xmlns:a16="http://schemas.microsoft.com/office/drawing/2014/main" val="2989839269"/>
                   </a:ext>
                 </a:extLst>
               </a:tr>
@@ -30939,7 +31014,7 @@
                 </a:tc>
                 <a:extLst>
                   <a:ext uri="{0D108BD9-81ED-4DB2-BD59-A6C34878D82A}">
-                    <a16:rowId xmlns:a16="http://schemas.microsoft.com/office/drawing/2014/main" xmlns="" val="2130545569"/>
+                    <a16:rowId xmlns="" xmlns:a16="http://schemas.microsoft.com/office/drawing/2014/main" val="2130545569"/>
                   </a:ext>
                 </a:extLst>
               </a:tr>
@@ -31148,7 +31223,7 @@
                 </a:tc>
                 <a:extLst>
                   <a:ext uri="{0D108BD9-81ED-4DB2-BD59-A6C34878D82A}">
-                    <a16:rowId xmlns:a16="http://schemas.microsoft.com/office/drawing/2014/main" xmlns="" val="3045796785"/>
+                    <a16:rowId xmlns="" xmlns:a16="http://schemas.microsoft.com/office/drawing/2014/main" val="3045796785"/>
                   </a:ext>
                 </a:extLst>
               </a:tr>
@@ -31357,7 +31432,7 @@
                 </a:tc>
                 <a:extLst>
                   <a:ext uri="{0D108BD9-81ED-4DB2-BD59-A6C34878D82A}">
-                    <a16:rowId xmlns:a16="http://schemas.microsoft.com/office/drawing/2014/main" xmlns="" val="1091494175"/>
+                    <a16:rowId xmlns="" xmlns:a16="http://schemas.microsoft.com/office/drawing/2014/main" val="1091494175"/>
                   </a:ext>
                 </a:extLst>
               </a:tr>
@@ -31375,11 +31450,11 @@
   <p:clrMapOvr>
     <a:masterClrMapping/>
   </p:clrMapOvr>
-  <mc:AlternateContent xmlns:mc="http://schemas.openxmlformats.org/markup-compatibility/2006">
-    <mc:Choice xmlns:p14="http://schemas.microsoft.com/office/powerpoint/2010/main" Requires="p14">
+  <mc:AlternateContent xmlns:mc="http://schemas.openxmlformats.org/markup-compatibility/2006" xmlns:p14="http://schemas.microsoft.com/office/powerpoint/2010/main">
+    <mc:Choice Requires="p14">
       <p:transition spd="slow" p14:dur="2000"/>
     </mc:Choice>
-    <mc:Fallback>
+    <mc:Fallback xmlns="">
       <p:transition spd="slow"/>
     </mc:Fallback>
   </mc:AlternateContent>
@@ -31495,11 +31570,11 @@
   <p:clrMapOvr>
     <a:masterClrMapping/>
   </p:clrMapOvr>
-  <mc:AlternateContent xmlns:mc="http://schemas.openxmlformats.org/markup-compatibility/2006">
-    <mc:Choice xmlns:p14="http://schemas.microsoft.com/office/powerpoint/2010/main" Requires="p14">
+  <mc:AlternateContent xmlns:mc="http://schemas.openxmlformats.org/markup-compatibility/2006" xmlns:p14="http://schemas.microsoft.com/office/powerpoint/2010/main">
+    <mc:Choice Requires="p14">
       <p:transition spd="slow" p14:dur="2000"/>
     </mc:Choice>
-    <mc:Fallback>
+    <mc:Fallback xmlns="">
       <p:transition spd="slow"/>
     </mc:Fallback>
   </mc:AlternateContent>
@@ -31678,11 +31753,11 @@
   <p:clrMapOvr>
     <a:masterClrMapping/>
   </p:clrMapOvr>
-  <mc:AlternateContent xmlns:mc="http://schemas.openxmlformats.org/markup-compatibility/2006">
-    <mc:Choice xmlns:p14="http://schemas.microsoft.com/office/powerpoint/2010/main" Requires="p14">
+  <mc:AlternateContent xmlns:mc="http://schemas.openxmlformats.org/markup-compatibility/2006" xmlns:p14="http://schemas.microsoft.com/office/powerpoint/2010/main">
+    <mc:Choice Requires="p14">
       <p:transition spd="slow" p14:dur="2000"/>
     </mc:Choice>
-    <mc:Fallback>
+    <mc:Fallback xmlns="">
       <p:transition spd="slow"/>
     </mc:Fallback>
   </mc:AlternateContent>
@@ -32382,11 +32457,11 @@
   <p:clrMapOvr>
     <a:masterClrMapping/>
   </p:clrMapOvr>
-  <mc:AlternateContent xmlns:mc="http://schemas.openxmlformats.org/markup-compatibility/2006">
-    <mc:Choice xmlns:p14="http://schemas.microsoft.com/office/powerpoint/2010/main" Requires="p14">
+  <mc:AlternateContent xmlns:mc="http://schemas.openxmlformats.org/markup-compatibility/2006" xmlns:p14="http://schemas.microsoft.com/office/powerpoint/2010/main">
+    <mc:Choice Requires="p14">
       <p:transition spd="slow" p14:dur="2000"/>
     </mc:Choice>
-    <mc:Fallback>
+    <mc:Fallback xmlns="">
       <p:transition spd="slow"/>
     </mc:Fallback>
   </mc:AlternateContent>
@@ -32910,11 +32985,11 @@
   <p:clrMapOvr>
     <a:masterClrMapping/>
   </p:clrMapOvr>
-  <mc:AlternateContent xmlns:mc="http://schemas.openxmlformats.org/markup-compatibility/2006">
-    <mc:Choice xmlns:p14="http://schemas.microsoft.com/office/powerpoint/2010/main" Requires="p14">
+  <mc:AlternateContent xmlns:mc="http://schemas.openxmlformats.org/markup-compatibility/2006" xmlns:p14="http://schemas.microsoft.com/office/powerpoint/2010/main">
+    <mc:Choice Requires="p14">
       <p:transition spd="slow" p14:dur="2000"/>
     </mc:Choice>
-    <mc:Fallback>
+    <mc:Fallback xmlns="">
       <p:transition spd="slow"/>
     </mc:Fallback>
   </mc:AlternateContent>
@@ -33943,11 +34018,11 @@
   <p:clrMapOvr>
     <a:masterClrMapping/>
   </p:clrMapOvr>
-  <mc:AlternateContent xmlns:mc="http://schemas.openxmlformats.org/markup-compatibility/2006">
-    <mc:Choice xmlns:p14="http://schemas.microsoft.com/office/powerpoint/2010/main" Requires="p14">
+  <mc:AlternateContent xmlns:mc="http://schemas.openxmlformats.org/markup-compatibility/2006" xmlns:p14="http://schemas.microsoft.com/office/powerpoint/2010/main">
+    <mc:Choice Requires="p14">
       <p:transition spd="slow" p14:dur="2000"/>
     </mc:Choice>
-    <mc:Fallback>
+    <mc:Fallback xmlns="">
       <p:transition spd="slow"/>
     </mc:Fallback>
   </mc:AlternateContent>
@@ -34742,14 +34817,14 @@
                 <a:gridCol w="957714">
                   <a:extLst>
                     <a:ext uri="{9D8B030D-6E8A-4147-A177-3AD203B41FA5}">
-                      <a16:colId xmlns:a16="http://schemas.microsoft.com/office/drawing/2014/main" xmlns="" val="3940544257"/>
+                      <a16:colId xmlns="" xmlns:a16="http://schemas.microsoft.com/office/drawing/2014/main" val="3940544257"/>
                     </a:ext>
                   </a:extLst>
                 </a:gridCol>
                 <a:gridCol w="2464067">
                   <a:extLst>
                     <a:ext uri="{9D8B030D-6E8A-4147-A177-3AD203B41FA5}">
-                      <a16:colId xmlns:a16="http://schemas.microsoft.com/office/drawing/2014/main" xmlns="" val="3658567973"/>
+                      <a16:colId xmlns="" xmlns:a16="http://schemas.microsoft.com/office/drawing/2014/main" val="3658567973"/>
                     </a:ext>
                   </a:extLst>
                 </a:gridCol>
@@ -34783,7 +34858,7 @@
                 </a:tc>
                 <a:extLst>
                   <a:ext uri="{0D108BD9-81ED-4DB2-BD59-A6C34878D82A}">
-                    <a16:rowId xmlns:a16="http://schemas.microsoft.com/office/drawing/2014/main" xmlns="" val="1032275335"/>
+                    <a16:rowId xmlns="" xmlns:a16="http://schemas.microsoft.com/office/drawing/2014/main" val="1032275335"/>
                   </a:ext>
                 </a:extLst>
               </a:tr>
@@ -34913,7 +34988,7 @@
                 </a:tc>
                 <a:extLst>
                   <a:ext uri="{0D108BD9-81ED-4DB2-BD59-A6C34878D82A}">
-                    <a16:rowId xmlns:a16="http://schemas.microsoft.com/office/drawing/2014/main" xmlns="" val="4191484087"/>
+                    <a16:rowId xmlns="" xmlns:a16="http://schemas.microsoft.com/office/drawing/2014/main" val="4191484087"/>
                   </a:ext>
                 </a:extLst>
               </a:tr>
@@ -34987,7 +35062,7 @@
                 </a:tc>
                 <a:extLst>
                   <a:ext uri="{0D108BD9-81ED-4DB2-BD59-A6C34878D82A}">
-                    <a16:rowId xmlns:a16="http://schemas.microsoft.com/office/drawing/2014/main" xmlns="" val="1864588626"/>
+                    <a16:rowId xmlns="" xmlns:a16="http://schemas.microsoft.com/office/drawing/2014/main" val="1864588626"/>
                   </a:ext>
                 </a:extLst>
               </a:tr>
@@ -35109,7 +35184,7 @@
                 </a:tc>
                 <a:extLst>
                   <a:ext uri="{0D108BD9-81ED-4DB2-BD59-A6C34878D82A}">
-                    <a16:rowId xmlns:a16="http://schemas.microsoft.com/office/drawing/2014/main" xmlns="" val="3035259714"/>
+                    <a16:rowId xmlns="" xmlns:a16="http://schemas.microsoft.com/office/drawing/2014/main" val="3035259714"/>
                   </a:ext>
                 </a:extLst>
               </a:tr>
@@ -35198,7 +35273,7 @@
                 </a:tc>
                 <a:extLst>
                   <a:ext uri="{0D108BD9-81ED-4DB2-BD59-A6C34878D82A}">
-                    <a16:rowId xmlns:a16="http://schemas.microsoft.com/office/drawing/2014/main" xmlns="" val="2023621082"/>
+                    <a16:rowId xmlns="" xmlns:a16="http://schemas.microsoft.com/office/drawing/2014/main" val="2023621082"/>
                   </a:ext>
                 </a:extLst>
               </a:tr>
@@ -35287,7 +35362,7 @@
                 </a:tc>
                 <a:extLst>
                   <a:ext uri="{0D108BD9-81ED-4DB2-BD59-A6C34878D82A}">
-                    <a16:rowId xmlns:a16="http://schemas.microsoft.com/office/drawing/2014/main" xmlns="" val="120016333"/>
+                    <a16:rowId xmlns="" xmlns:a16="http://schemas.microsoft.com/office/drawing/2014/main" val="120016333"/>
                   </a:ext>
                 </a:extLst>
               </a:tr>
@@ -35533,21 +35608,21 @@
                 <a:gridCol w="960120">
                   <a:extLst>
                     <a:ext uri="{9D8B030D-6E8A-4147-A177-3AD203B41FA5}">
-                      <a16:colId xmlns:a16="http://schemas.microsoft.com/office/drawing/2014/main" xmlns="" val="392696932"/>
+                      <a16:colId xmlns="" xmlns:a16="http://schemas.microsoft.com/office/drawing/2014/main" val="392696932"/>
                     </a:ext>
                   </a:extLst>
                 </a:gridCol>
                 <a:gridCol w="2468880">
                   <a:extLst>
                     <a:ext uri="{9D8B030D-6E8A-4147-A177-3AD203B41FA5}">
-                      <a16:colId xmlns:a16="http://schemas.microsoft.com/office/drawing/2014/main" xmlns="" val="2769969192"/>
+                      <a16:colId xmlns="" xmlns:a16="http://schemas.microsoft.com/office/drawing/2014/main" val="2769969192"/>
                     </a:ext>
                   </a:extLst>
                 </a:gridCol>
                 <a:gridCol w="2468880">
                   <a:extLst>
                     <a:ext uri="{9D8B030D-6E8A-4147-A177-3AD203B41FA5}">
-                      <a16:colId xmlns:a16="http://schemas.microsoft.com/office/drawing/2014/main" xmlns="" val="2022610816"/>
+                      <a16:colId xmlns="" xmlns:a16="http://schemas.microsoft.com/office/drawing/2014/main" val="2022610816"/>
                     </a:ext>
                   </a:extLst>
                 </a:gridCol>
@@ -35599,7 +35674,7 @@
                 </a:tc>
                 <a:extLst>
                   <a:ext uri="{0D108BD9-81ED-4DB2-BD59-A6C34878D82A}">
-                    <a16:rowId xmlns:a16="http://schemas.microsoft.com/office/drawing/2014/main" xmlns="" val="2344937666"/>
+                    <a16:rowId xmlns="" xmlns:a16="http://schemas.microsoft.com/office/drawing/2014/main" val="2344937666"/>
                   </a:ext>
                 </a:extLst>
               </a:tr>
@@ -35732,7 +35807,7 @@
                 </a:tc>
                 <a:extLst>
                   <a:ext uri="{0D108BD9-81ED-4DB2-BD59-A6C34878D82A}">
-                    <a16:rowId xmlns:a16="http://schemas.microsoft.com/office/drawing/2014/main" xmlns="" val="1917341330"/>
+                    <a16:rowId xmlns="" xmlns:a16="http://schemas.microsoft.com/office/drawing/2014/main" val="1917341330"/>
                   </a:ext>
                 </a:extLst>
               </a:tr>
@@ -35949,7 +36024,7 @@
                 </a:tc>
                 <a:extLst>
                   <a:ext uri="{0D108BD9-81ED-4DB2-BD59-A6C34878D82A}">
-                    <a16:rowId xmlns:a16="http://schemas.microsoft.com/office/drawing/2014/main" xmlns="" val="3088042860"/>
+                    <a16:rowId xmlns="" xmlns:a16="http://schemas.microsoft.com/office/drawing/2014/main" val="3088042860"/>
                   </a:ext>
                 </a:extLst>
               </a:tr>
@@ -36033,7 +36108,7 @@
                 </a:tc>
                 <a:extLst>
                   <a:ext uri="{0D108BD9-81ED-4DB2-BD59-A6C34878D82A}">
-                    <a16:rowId xmlns:a16="http://schemas.microsoft.com/office/drawing/2014/main" xmlns="" val="2658530722"/>
+                    <a16:rowId xmlns="" xmlns:a16="http://schemas.microsoft.com/office/drawing/2014/main" val="2658530722"/>
                   </a:ext>
                 </a:extLst>
               </a:tr>
@@ -36165,7 +36240,7 @@
                 </a:tc>
                 <a:extLst>
                   <a:ext uri="{0D108BD9-81ED-4DB2-BD59-A6C34878D82A}">
-                    <a16:rowId xmlns:a16="http://schemas.microsoft.com/office/drawing/2014/main" xmlns="" val="1481886367"/>
+                    <a16:rowId xmlns="" xmlns:a16="http://schemas.microsoft.com/office/drawing/2014/main" val="1481886367"/>
                   </a:ext>
                 </a:extLst>
               </a:tr>
@@ -36264,7 +36339,7 @@
                 </a:tc>
                 <a:extLst>
                   <a:ext uri="{0D108BD9-81ED-4DB2-BD59-A6C34878D82A}">
-                    <a16:rowId xmlns:a16="http://schemas.microsoft.com/office/drawing/2014/main" xmlns="" val="4248384778"/>
+                    <a16:rowId xmlns="" xmlns:a16="http://schemas.microsoft.com/office/drawing/2014/main" val="4248384778"/>
                   </a:ext>
                 </a:extLst>
               </a:tr>
@@ -36363,7 +36438,7 @@
                 </a:tc>
                 <a:extLst>
                   <a:ext uri="{0D108BD9-81ED-4DB2-BD59-A6C34878D82A}">
-                    <a16:rowId xmlns:a16="http://schemas.microsoft.com/office/drawing/2014/main" xmlns="" val="1670483340"/>
+                    <a16:rowId xmlns="" xmlns:a16="http://schemas.microsoft.com/office/drawing/2014/main" val="1670483340"/>
                   </a:ext>
                 </a:extLst>
               </a:tr>
@@ -36508,28 +36583,28 @@
                 <a:gridCol w="960120">
                   <a:extLst>
                     <a:ext uri="{9D8B030D-6E8A-4147-A177-3AD203B41FA5}">
-                      <a16:colId xmlns:a16="http://schemas.microsoft.com/office/drawing/2014/main" xmlns="" val="392696932"/>
+                      <a16:colId xmlns="" xmlns:a16="http://schemas.microsoft.com/office/drawing/2014/main" val="392696932"/>
                     </a:ext>
                   </a:extLst>
                 </a:gridCol>
                 <a:gridCol w="2468880">
                   <a:extLst>
                     <a:ext uri="{9D8B030D-6E8A-4147-A177-3AD203B41FA5}">
-                      <a16:colId xmlns:a16="http://schemas.microsoft.com/office/drawing/2014/main" xmlns="" val="2769969192"/>
+                      <a16:colId xmlns="" xmlns:a16="http://schemas.microsoft.com/office/drawing/2014/main" val="2769969192"/>
                     </a:ext>
                   </a:extLst>
                 </a:gridCol>
                 <a:gridCol w="2468880">
                   <a:extLst>
                     <a:ext uri="{9D8B030D-6E8A-4147-A177-3AD203B41FA5}">
-                      <a16:colId xmlns:a16="http://schemas.microsoft.com/office/drawing/2014/main" xmlns="" val="2022610816"/>
+                      <a16:colId xmlns="" xmlns:a16="http://schemas.microsoft.com/office/drawing/2014/main" val="2022610816"/>
                     </a:ext>
                   </a:extLst>
                 </a:gridCol>
                 <a:gridCol w="2468880">
                   <a:extLst>
                     <a:ext uri="{9D8B030D-6E8A-4147-A177-3AD203B41FA5}">
-                      <a16:colId xmlns:a16="http://schemas.microsoft.com/office/drawing/2014/main" xmlns="" val="102813283"/>
+                      <a16:colId xmlns="" xmlns:a16="http://schemas.microsoft.com/office/drawing/2014/main" val="102813283"/>
                     </a:ext>
                   </a:extLst>
                 </a:gridCol>
@@ -36594,7 +36669,7 @@
                 </a:tc>
                 <a:extLst>
                   <a:ext uri="{0D108BD9-81ED-4DB2-BD59-A6C34878D82A}">
-                    <a16:rowId xmlns:a16="http://schemas.microsoft.com/office/drawing/2014/main" xmlns="" val="2344937666"/>
+                    <a16:rowId xmlns="" xmlns:a16="http://schemas.microsoft.com/office/drawing/2014/main" val="2344937666"/>
                   </a:ext>
                 </a:extLst>
               </a:tr>
@@ -36754,7 +36829,7 @@
                 </a:tc>
                 <a:extLst>
                   <a:ext uri="{0D108BD9-81ED-4DB2-BD59-A6C34878D82A}">
-                    <a16:rowId xmlns:a16="http://schemas.microsoft.com/office/drawing/2014/main" xmlns="" val="1917341330"/>
+                    <a16:rowId xmlns="" xmlns:a16="http://schemas.microsoft.com/office/drawing/2014/main" val="1917341330"/>
                   </a:ext>
                 </a:extLst>
               </a:tr>
@@ -37058,7 +37133,7 @@
                 </a:tc>
                 <a:extLst>
                   <a:ext uri="{0D108BD9-81ED-4DB2-BD59-A6C34878D82A}">
-                    <a16:rowId xmlns:a16="http://schemas.microsoft.com/office/drawing/2014/main" xmlns="" val="3088042860"/>
+                    <a16:rowId xmlns="" xmlns:a16="http://schemas.microsoft.com/office/drawing/2014/main" val="3088042860"/>
                   </a:ext>
                 </a:extLst>
               </a:tr>
@@ -37152,7 +37227,7 @@
                 </a:tc>
                 <a:extLst>
                   <a:ext uri="{0D108BD9-81ED-4DB2-BD59-A6C34878D82A}">
-                    <a16:rowId xmlns:a16="http://schemas.microsoft.com/office/drawing/2014/main" xmlns="" val="2658530722"/>
+                    <a16:rowId xmlns="" xmlns:a16="http://schemas.microsoft.com/office/drawing/2014/main" val="2658530722"/>
                   </a:ext>
                 </a:extLst>
               </a:tr>
@@ -37345,7 +37420,7 @@
                 </a:tc>
                 <a:extLst>
                   <a:ext uri="{0D108BD9-81ED-4DB2-BD59-A6C34878D82A}">
-                    <a16:rowId xmlns:a16="http://schemas.microsoft.com/office/drawing/2014/main" xmlns="" val="1481886367"/>
+                    <a16:rowId xmlns="" xmlns:a16="http://schemas.microsoft.com/office/drawing/2014/main" val="1481886367"/>
                   </a:ext>
                 </a:extLst>
               </a:tr>
@@ -37454,7 +37529,7 @@
                 </a:tc>
                 <a:extLst>
                   <a:ext uri="{0D108BD9-81ED-4DB2-BD59-A6C34878D82A}">
-                    <a16:rowId xmlns:a16="http://schemas.microsoft.com/office/drawing/2014/main" xmlns="" val="4248384778"/>
+                    <a16:rowId xmlns="" xmlns:a16="http://schemas.microsoft.com/office/drawing/2014/main" val="4248384778"/>
                   </a:ext>
                 </a:extLst>
               </a:tr>
@@ -37563,7 +37638,7 @@
                 </a:tc>
                 <a:extLst>
                   <a:ext uri="{0D108BD9-81ED-4DB2-BD59-A6C34878D82A}">
-                    <a16:rowId xmlns:a16="http://schemas.microsoft.com/office/drawing/2014/main" xmlns="" val="1670483340"/>
+                    <a16:rowId xmlns="" xmlns:a16="http://schemas.microsoft.com/office/drawing/2014/main" val="1670483340"/>
                   </a:ext>
                 </a:extLst>
               </a:tr>
@@ -37967,14 +38042,14 @@
                 <a:gridCol w="934278">
                   <a:extLst>
                     <a:ext uri="{9D8B030D-6E8A-4147-A177-3AD203B41FA5}">
-                      <a16:colId xmlns:a16="http://schemas.microsoft.com/office/drawing/2014/main" xmlns="" val="4198655800"/>
+                      <a16:colId xmlns="" xmlns:a16="http://schemas.microsoft.com/office/drawing/2014/main" val="4198655800"/>
                     </a:ext>
                   </a:extLst>
                 </a:gridCol>
                 <a:gridCol w="7295322">
                   <a:extLst>
                     <a:ext uri="{9D8B030D-6E8A-4147-A177-3AD203B41FA5}">
-                      <a16:colId xmlns:a16="http://schemas.microsoft.com/office/drawing/2014/main" xmlns="" val="135413862"/>
+                      <a16:colId xmlns="" xmlns:a16="http://schemas.microsoft.com/office/drawing/2014/main" val="135413862"/>
                     </a:ext>
                   </a:extLst>
                 </a:gridCol>
@@ -38008,7 +38083,7 @@
                 </a:tc>
                 <a:extLst>
                   <a:ext uri="{0D108BD9-81ED-4DB2-BD59-A6C34878D82A}">
-                    <a16:rowId xmlns:a16="http://schemas.microsoft.com/office/drawing/2014/main" xmlns="" val="3068323444"/>
+                    <a16:rowId xmlns="" xmlns:a16="http://schemas.microsoft.com/office/drawing/2014/main" val="3068323444"/>
                   </a:ext>
                 </a:extLst>
               </a:tr>
@@ -38041,7 +38116,7 @@
                 </a:tc>
                 <a:extLst>
                   <a:ext uri="{0D108BD9-81ED-4DB2-BD59-A6C34878D82A}">
-                    <a16:rowId xmlns:a16="http://schemas.microsoft.com/office/drawing/2014/main" xmlns="" val="1586961909"/>
+                    <a16:rowId xmlns="" xmlns:a16="http://schemas.microsoft.com/office/drawing/2014/main" val="1586961909"/>
                   </a:ext>
                 </a:extLst>
               </a:tr>
@@ -38079,7 +38154,7 @@
                 </a:tc>
                 <a:extLst>
                   <a:ext uri="{0D108BD9-81ED-4DB2-BD59-A6C34878D82A}">
-                    <a16:rowId xmlns:a16="http://schemas.microsoft.com/office/drawing/2014/main" xmlns="" val="2280300197"/>
+                    <a16:rowId xmlns="" xmlns:a16="http://schemas.microsoft.com/office/drawing/2014/main" val="2280300197"/>
                   </a:ext>
                 </a:extLst>
               </a:tr>
@@ -38117,7 +38192,7 @@
                 </a:tc>
                 <a:extLst>
                   <a:ext uri="{0D108BD9-81ED-4DB2-BD59-A6C34878D82A}">
-                    <a16:rowId xmlns:a16="http://schemas.microsoft.com/office/drawing/2014/main" xmlns="" val="1192843310"/>
+                    <a16:rowId xmlns="" xmlns:a16="http://schemas.microsoft.com/office/drawing/2014/main" val="1192843310"/>
                   </a:ext>
                 </a:extLst>
               </a:tr>
@@ -38155,7 +38230,7 @@
                 </a:tc>
                 <a:extLst>
                   <a:ext uri="{0D108BD9-81ED-4DB2-BD59-A6C34878D82A}">
-                    <a16:rowId xmlns:a16="http://schemas.microsoft.com/office/drawing/2014/main" xmlns="" val="2620585158"/>
+                    <a16:rowId xmlns="" xmlns:a16="http://schemas.microsoft.com/office/drawing/2014/main" val="2620585158"/>
                   </a:ext>
                 </a:extLst>
               </a:tr>
@@ -38188,7 +38263,7 @@
                 </a:tc>
                 <a:extLst>
                   <a:ext uri="{0D108BD9-81ED-4DB2-BD59-A6C34878D82A}">
-                    <a16:rowId xmlns:a16="http://schemas.microsoft.com/office/drawing/2014/main" xmlns="" val="1697738616"/>
+                    <a16:rowId xmlns="" xmlns:a16="http://schemas.microsoft.com/office/drawing/2014/main" val="1697738616"/>
                   </a:ext>
                 </a:extLst>
               </a:tr>
@@ -38226,7 +38301,7 @@
                 </a:tc>
                 <a:extLst>
                   <a:ext uri="{0D108BD9-81ED-4DB2-BD59-A6C34878D82A}">
-                    <a16:rowId xmlns:a16="http://schemas.microsoft.com/office/drawing/2014/main" xmlns="" val="316611556"/>
+                    <a16:rowId xmlns="" xmlns:a16="http://schemas.microsoft.com/office/drawing/2014/main" val="316611556"/>
                   </a:ext>
                 </a:extLst>
               </a:tr>
@@ -38259,7 +38334,7 @@
                 </a:tc>
                 <a:extLst>
                   <a:ext uri="{0D108BD9-81ED-4DB2-BD59-A6C34878D82A}">
-                    <a16:rowId xmlns:a16="http://schemas.microsoft.com/office/drawing/2014/main" xmlns="" val="1312814102"/>
+                    <a16:rowId xmlns="" xmlns:a16="http://schemas.microsoft.com/office/drawing/2014/main" val="1312814102"/>
                   </a:ext>
                 </a:extLst>
               </a:tr>
@@ -38292,7 +38367,7 @@
                 </a:tc>
                 <a:extLst>
                   <a:ext uri="{0D108BD9-81ED-4DB2-BD59-A6C34878D82A}">
-                    <a16:rowId xmlns:a16="http://schemas.microsoft.com/office/drawing/2014/main" xmlns="" val="1975533996"/>
+                    <a16:rowId xmlns="" xmlns:a16="http://schemas.microsoft.com/office/drawing/2014/main" val="1975533996"/>
                   </a:ext>
                 </a:extLst>
               </a:tr>
@@ -38325,7 +38400,7 @@
                 </a:tc>
                 <a:extLst>
                   <a:ext uri="{0D108BD9-81ED-4DB2-BD59-A6C34878D82A}">
-                    <a16:rowId xmlns:a16="http://schemas.microsoft.com/office/drawing/2014/main" xmlns="" val="2759032957"/>
+                    <a16:rowId xmlns="" xmlns:a16="http://schemas.microsoft.com/office/drawing/2014/main" val="2759032957"/>
                   </a:ext>
                 </a:extLst>
               </a:tr>
@@ -38414,14 +38489,14 @@
                 <a:gridCol w="934278">
                   <a:extLst>
                     <a:ext uri="{9D8B030D-6E8A-4147-A177-3AD203B41FA5}">
-                      <a16:colId xmlns:a16="http://schemas.microsoft.com/office/drawing/2014/main" xmlns="" val="4198655800"/>
+                      <a16:colId xmlns="" xmlns:a16="http://schemas.microsoft.com/office/drawing/2014/main" val="4198655800"/>
                     </a:ext>
                   </a:extLst>
                 </a:gridCol>
                 <a:gridCol w="7295322">
                   <a:extLst>
                     <a:ext uri="{9D8B030D-6E8A-4147-A177-3AD203B41FA5}">
-                      <a16:colId xmlns:a16="http://schemas.microsoft.com/office/drawing/2014/main" xmlns="" val="135413862"/>
+                      <a16:colId xmlns="" xmlns:a16="http://schemas.microsoft.com/office/drawing/2014/main" val="135413862"/>
                     </a:ext>
                   </a:extLst>
                 </a:gridCol>
@@ -38455,7 +38530,7 @@
                 </a:tc>
                 <a:extLst>
                   <a:ext uri="{0D108BD9-81ED-4DB2-BD59-A6C34878D82A}">
-                    <a16:rowId xmlns:a16="http://schemas.microsoft.com/office/drawing/2014/main" xmlns="" val="3068323444"/>
+                    <a16:rowId xmlns="" xmlns:a16="http://schemas.microsoft.com/office/drawing/2014/main" val="3068323444"/>
                   </a:ext>
                 </a:extLst>
               </a:tr>
@@ -38488,7 +38563,7 @@
                 </a:tc>
                 <a:extLst>
                   <a:ext uri="{0D108BD9-81ED-4DB2-BD59-A6C34878D82A}">
-                    <a16:rowId xmlns:a16="http://schemas.microsoft.com/office/drawing/2014/main" xmlns="" val="2484981654"/>
+                    <a16:rowId xmlns="" xmlns:a16="http://schemas.microsoft.com/office/drawing/2014/main" val="2484981654"/>
                   </a:ext>
                 </a:extLst>
               </a:tr>
@@ -38526,7 +38601,7 @@
                 </a:tc>
                 <a:extLst>
                   <a:ext uri="{0D108BD9-81ED-4DB2-BD59-A6C34878D82A}">
-                    <a16:rowId xmlns:a16="http://schemas.microsoft.com/office/drawing/2014/main" xmlns="" val="1377910784"/>
+                    <a16:rowId xmlns="" xmlns:a16="http://schemas.microsoft.com/office/drawing/2014/main" val="1377910784"/>
                   </a:ext>
                 </a:extLst>
               </a:tr>
@@ -38559,7 +38634,7 @@
                 </a:tc>
                 <a:extLst>
                   <a:ext uri="{0D108BD9-81ED-4DB2-BD59-A6C34878D82A}">
-                    <a16:rowId xmlns:a16="http://schemas.microsoft.com/office/drawing/2014/main" xmlns="" val="1387856053"/>
+                    <a16:rowId xmlns="" xmlns:a16="http://schemas.microsoft.com/office/drawing/2014/main" val="1387856053"/>
                   </a:ext>
                 </a:extLst>
               </a:tr>
@@ -38597,7 +38672,7 @@
                 </a:tc>
                 <a:extLst>
                   <a:ext uri="{0D108BD9-81ED-4DB2-BD59-A6C34878D82A}">
-                    <a16:rowId xmlns:a16="http://schemas.microsoft.com/office/drawing/2014/main" xmlns="" val="2599123823"/>
+                    <a16:rowId xmlns="" xmlns:a16="http://schemas.microsoft.com/office/drawing/2014/main" val="2599123823"/>
                   </a:ext>
                 </a:extLst>
               </a:tr>
@@ -38638,7 +38713,7 @@
                 </a:tc>
                 <a:extLst>
                   <a:ext uri="{0D108BD9-81ED-4DB2-BD59-A6C34878D82A}">
-                    <a16:rowId xmlns:a16="http://schemas.microsoft.com/office/drawing/2014/main" xmlns="" val="1232603862"/>
+                    <a16:rowId xmlns="" xmlns:a16="http://schemas.microsoft.com/office/drawing/2014/main" val="1232603862"/>
                   </a:ext>
                 </a:extLst>
               </a:tr>
@@ -38671,7 +38746,7 @@
                 </a:tc>
                 <a:extLst>
                   <a:ext uri="{0D108BD9-81ED-4DB2-BD59-A6C34878D82A}">
-                    <a16:rowId xmlns:a16="http://schemas.microsoft.com/office/drawing/2014/main" xmlns="" val="4145944521"/>
+                    <a16:rowId xmlns="" xmlns:a16="http://schemas.microsoft.com/office/drawing/2014/main" val="4145944521"/>
                   </a:ext>
                 </a:extLst>
               </a:tr>
@@ -38709,7 +38784,7 @@
                 </a:tc>
                 <a:extLst>
                   <a:ext uri="{0D108BD9-81ED-4DB2-BD59-A6C34878D82A}">
-                    <a16:rowId xmlns:a16="http://schemas.microsoft.com/office/drawing/2014/main" xmlns="" val="2954677722"/>
+                    <a16:rowId xmlns="" xmlns:a16="http://schemas.microsoft.com/office/drawing/2014/main" val="2954677722"/>
                   </a:ext>
                 </a:extLst>
               </a:tr>
@@ -38742,7 +38817,7 @@
                 </a:tc>
                 <a:extLst>
                   <a:ext uri="{0D108BD9-81ED-4DB2-BD59-A6C34878D82A}">
-                    <a16:rowId xmlns:a16="http://schemas.microsoft.com/office/drawing/2014/main" xmlns="" val="205903975"/>
+                    <a16:rowId xmlns="" xmlns:a16="http://schemas.microsoft.com/office/drawing/2014/main" val="205903975"/>
                   </a:ext>
                 </a:extLst>
               </a:tr>
@@ -38775,7 +38850,7 @@
                 </a:tc>
                 <a:extLst>
                   <a:ext uri="{0D108BD9-81ED-4DB2-BD59-A6C34878D82A}">
-                    <a16:rowId xmlns:a16="http://schemas.microsoft.com/office/drawing/2014/main" xmlns="" val="2893595017"/>
+                    <a16:rowId xmlns="" xmlns:a16="http://schemas.microsoft.com/office/drawing/2014/main" val="2893595017"/>
                   </a:ext>
                 </a:extLst>
               </a:tr>
@@ -38808,7 +38883,7 @@
                 </a:tc>
                 <a:extLst>
                   <a:ext uri="{0D108BD9-81ED-4DB2-BD59-A6C34878D82A}">
-                    <a16:rowId xmlns:a16="http://schemas.microsoft.com/office/drawing/2014/main" xmlns="" val="2337380595"/>
+                    <a16:rowId xmlns="" xmlns:a16="http://schemas.microsoft.com/office/drawing/2014/main" val="2337380595"/>
                   </a:ext>
                 </a:extLst>
               </a:tr>
@@ -40866,21 +40941,21 @@
                 <a:gridCol w="2764301">
                   <a:extLst>
                     <a:ext uri="{9D8B030D-6E8A-4147-A177-3AD203B41FA5}">
-                      <a16:colId xmlns:a16="http://schemas.microsoft.com/office/drawing/2014/main" xmlns="" val="234227049"/>
+                      <a16:colId xmlns="" xmlns:a16="http://schemas.microsoft.com/office/drawing/2014/main" val="234227049"/>
                     </a:ext>
                   </a:extLst>
                 </a:gridCol>
                 <a:gridCol w="2764301">
                   <a:extLst>
                     <a:ext uri="{9D8B030D-6E8A-4147-A177-3AD203B41FA5}">
-                      <a16:colId xmlns:a16="http://schemas.microsoft.com/office/drawing/2014/main" xmlns="" val="4053135350"/>
+                      <a16:colId xmlns="" xmlns:a16="http://schemas.microsoft.com/office/drawing/2014/main" val="4053135350"/>
                     </a:ext>
                   </a:extLst>
                 </a:gridCol>
                 <a:gridCol w="2764301">
                   <a:extLst>
                     <a:ext uri="{9D8B030D-6E8A-4147-A177-3AD203B41FA5}">
-                      <a16:colId xmlns:a16="http://schemas.microsoft.com/office/drawing/2014/main" xmlns="" val="672378647"/>
+                      <a16:colId xmlns="" xmlns:a16="http://schemas.microsoft.com/office/drawing/2014/main" val="672378647"/>
                     </a:ext>
                   </a:extLst>
                 </a:gridCol>
@@ -40930,7 +41005,7 @@
                 </a:tc>
                 <a:extLst>
                   <a:ext uri="{0D108BD9-81ED-4DB2-BD59-A6C34878D82A}">
-                    <a16:rowId xmlns:a16="http://schemas.microsoft.com/office/drawing/2014/main" xmlns="" val="2843053056"/>
+                    <a16:rowId xmlns="" xmlns:a16="http://schemas.microsoft.com/office/drawing/2014/main" val="2843053056"/>
                   </a:ext>
                 </a:extLst>
               </a:tr>
@@ -40980,7 +41055,7 @@
                 </a:tc>
                 <a:extLst>
                   <a:ext uri="{0D108BD9-81ED-4DB2-BD59-A6C34878D82A}">
-                    <a16:rowId xmlns:a16="http://schemas.microsoft.com/office/drawing/2014/main" xmlns="" val="3055328934"/>
+                    <a16:rowId xmlns="" xmlns:a16="http://schemas.microsoft.com/office/drawing/2014/main" val="3055328934"/>
                   </a:ext>
                 </a:extLst>
               </a:tr>
@@ -41030,7 +41105,7 @@
                 </a:tc>
                 <a:extLst>
                   <a:ext uri="{0D108BD9-81ED-4DB2-BD59-A6C34878D82A}">
-                    <a16:rowId xmlns:a16="http://schemas.microsoft.com/office/drawing/2014/main" xmlns="" val="1144851549"/>
+                    <a16:rowId xmlns="" xmlns:a16="http://schemas.microsoft.com/office/drawing/2014/main" val="1144851549"/>
                   </a:ext>
                 </a:extLst>
               </a:tr>
@@ -41079,7 +41154,7 @@
                 </a:tc>
                 <a:extLst>
                   <a:ext uri="{0D108BD9-81ED-4DB2-BD59-A6C34878D82A}">
-                    <a16:rowId xmlns:a16="http://schemas.microsoft.com/office/drawing/2014/main" xmlns="" val="4258932578"/>
+                    <a16:rowId xmlns="" xmlns:a16="http://schemas.microsoft.com/office/drawing/2014/main" val="4258932578"/>
                   </a:ext>
                 </a:extLst>
               </a:tr>
@@ -42425,11 +42500,11 @@
   <p:clrMapOvr>
     <a:masterClrMapping/>
   </p:clrMapOvr>
-  <mc:AlternateContent xmlns:mc="http://schemas.openxmlformats.org/markup-compatibility/2006">
-    <mc:Choice xmlns:p14="http://schemas.microsoft.com/office/powerpoint/2010/main" Requires="p14">
+  <mc:AlternateContent xmlns:mc="http://schemas.openxmlformats.org/markup-compatibility/2006" xmlns:p14="http://schemas.microsoft.com/office/powerpoint/2010/main">
+    <mc:Choice Requires="p14">
       <p:transition spd="slow" p14:dur="2000"/>
     </mc:Choice>
-    <mc:Fallback>
+    <mc:Fallback xmlns="">
       <p:transition spd="slow"/>
     </mc:Fallback>
   </mc:AlternateContent>
@@ -43653,11 +43728,11 @@
   <p:clrMapOvr>
     <a:masterClrMapping/>
   </p:clrMapOvr>
-  <mc:AlternateContent xmlns:mc="http://schemas.openxmlformats.org/markup-compatibility/2006">
-    <mc:Choice xmlns:p14="http://schemas.microsoft.com/office/powerpoint/2010/main" Requires="p14">
+  <mc:AlternateContent xmlns:mc="http://schemas.openxmlformats.org/markup-compatibility/2006" xmlns:p14="http://schemas.microsoft.com/office/powerpoint/2010/main">
+    <mc:Choice Requires="p14">
       <p:transition spd="slow" p14:dur="2000"/>
     </mc:Choice>
-    <mc:Fallback>
+    <mc:Fallback xmlns="">
       <p:transition spd="slow"/>
     </mc:Fallback>
   </mc:AlternateContent>

</xml_diff>

<commit_message>
A bit on window functions.
</commit_message>
<xml_diff>
--- a/Optimizer.pptx
+++ b/Optimizer.pptx
@@ -266,7 +266,7 @@
           <a:p>
             <a:fld id="{2EDCB34D-5EC2-4739-9693-E425457AC201}" type="datetimeFigureOut">
               <a:rPr lang="en-US" smtClean="0"/>
-              <a:t>10/20/2016</a:t>
+              <a:t>10/26/2016</a:t>
             </a:fld>
             <a:endParaRPr lang="en-US"/>
           </a:p>
@@ -754,12 +754,8 @@
           <a:lstStyle/>
           <a:p>
             <a:r>
-              <a:rPr lang="en-US" dirty="0" smtClean="0"/>
-              <a:t>As </a:t>
-            </a:r>
-            <a:r>
               <a:rPr lang="en-US" dirty="0"/>
-              <a:t>an</a:t>
+              <a:t>As an</a:t>
             </a:r>
             <a:r>
               <a:rPr lang="en-US" baseline="0" dirty="0"/>
@@ -1109,42 +1105,42 @@
               <a:defRPr/>
             </a:pPr>
             <a:r>
-              <a:rPr lang="en-US" dirty="0" smtClean="0"/>
+              <a:rPr lang="en-US" dirty="0"/>
               <a:t>Examples of physical properties: heap</a:t>
             </a:r>
             <a:r>
-              <a:rPr lang="en-US" baseline="0" dirty="0" smtClean="0"/>
+              <a:rPr lang="en-US" baseline="0" dirty="0"/>
               <a:t> vs. clustered </a:t>
             </a:r>
             <a:r>
-              <a:rPr lang="en-US" baseline="0" dirty="0" err="1" smtClean="0"/>
+              <a:rPr lang="en-US" baseline="0" dirty="0" err="1"/>
               <a:t>idx</a:t>
             </a:r>
             <a:r>
-              <a:rPr lang="en-US" baseline="0" dirty="0" smtClean="0"/>
+              <a:rPr lang="en-US" baseline="0" dirty="0"/>
               <a:t>, </a:t>
             </a:r>
             <a:r>
-              <a:rPr lang="en-US" baseline="0" dirty="0" err="1" smtClean="0"/>
+              <a:rPr lang="en-US" baseline="0" dirty="0" err="1"/>
               <a:t>nonclustered</a:t>
             </a:r>
             <a:r>
-              <a:rPr lang="en-US" baseline="0" dirty="0" smtClean="0"/>
-              <a:t> </a:t>
-            </a:r>
-            <a:r>
-              <a:rPr lang="en-US" baseline="0" dirty="0" err="1" smtClean="0"/>
+              <a:rPr lang="en-US" baseline="0" dirty="0"/>
+              <a:t> </a:t>
+            </a:r>
+            <a:r>
+              <a:rPr lang="en-US" baseline="0" dirty="0" err="1"/>
               <a:t>idx</a:t>
             </a:r>
             <a:r>
-              <a:rPr lang="en-US" baseline="0" dirty="0" smtClean="0"/>
+              <a:rPr lang="en-US" baseline="0" dirty="0"/>
               <a:t>, sort orders, </a:t>
             </a:r>
             <a:r>
-              <a:rPr lang="en-US" baseline="0" smtClean="0"/>
+              <a:rPr lang="en-US" baseline="0"/>
               <a:t>etc.</a:t>
             </a:r>
-            <a:endParaRPr lang="en-US" smtClean="0"/>
+            <a:endParaRPr lang="en-US"/>
           </a:p>
         </p:txBody>
       </p:sp>
@@ -1642,40 +1638,32 @@
           <a:p>
             <a:r>
               <a:rPr lang="en-US" baseline="0" dirty="0"/>
-              <a:t>“</a:t>
-            </a:r>
-            <a:r>
-              <a:rPr lang="en-US" baseline="0" dirty="0" smtClean="0"/>
-              <a:t>Promise Total” </a:t>
-            </a:r>
-            <a:r>
-              <a:rPr lang="en-US" baseline="0" dirty="0"/>
-              <a:t>values are, presumably, </a:t>
+              <a:t>“Promise Total” values are, presumably, </a:t>
             </a:r>
             <a:r>
               <a:rPr lang="en-US" baseline="0" dirty="0" err="1"/>
               <a:t>unitless</a:t>
             </a:r>
             <a:r>
-              <a:rPr lang="en-US" baseline="0" dirty="0" smtClean="0"/>
+              <a:rPr lang="en-US" baseline="0" dirty="0"/>
               <a:t>.</a:t>
             </a:r>
           </a:p>
           <a:p>
             <a:r>
-              <a:rPr lang="en-US" baseline="0" dirty="0" smtClean="0"/>
+              <a:rPr lang="en-US" baseline="0" dirty="0"/>
               <a:t>Promised = number of times rule’s usefulness evaluated; </a:t>
             </a:r>
             <a:r>
-              <a:rPr lang="en-US" baseline="0" dirty="0" err="1" smtClean="0"/>
+              <a:rPr lang="en-US" baseline="0" dirty="0" err="1"/>
               <a:t>promise_total</a:t>
             </a:r>
             <a:r>
-              <a:rPr lang="en-US" baseline="0" dirty="0" smtClean="0"/>
+              <a:rPr lang="en-US" baseline="0" dirty="0"/>
               <a:t> = sum of computed </a:t>
             </a:r>
             <a:r>
-              <a:rPr lang="en-US" baseline="0" smtClean="0"/>
+              <a:rPr lang="en-US" baseline="0"/>
               <a:t>“value”</a:t>
             </a:r>
             <a:endParaRPr lang="en-US" dirty="0"/>
@@ -3073,7 +3061,7 @@
             <a:fld id="{5942B21B-2ADA-A040-A652-A7305E1B99FE}" type="datetimeFigureOut">
               <a:rPr lang="en-US" smtClean="0"/>
               <a:pPr/>
-              <a:t>10/20/2016</a:t>
+              <a:t>10/26/2016</a:t>
             </a:fld>
             <a:endParaRPr lang="en-US" dirty="0"/>
           </a:p>
@@ -3263,7 +3251,7 @@
           <a:p>
             <a:fld id="{5942B21B-2ADA-A040-A652-A7305E1B99FE}" type="datetimeFigureOut">
               <a:rPr lang="en-US" smtClean="0"/>
-              <a:t>10/20/2016</a:t>
+              <a:t>10/26/2016</a:t>
             </a:fld>
             <a:endParaRPr lang="en-US"/>
           </a:p>
@@ -3387,7 +3375,7 @@
             <a:fld id="{5942B21B-2ADA-A040-A652-A7305E1B99FE}" type="datetimeFigureOut">
               <a:rPr lang="en-US" smtClean="0"/>
               <a:pPr/>
-              <a:t>10/20/2016</a:t>
+              <a:t>10/26/2016</a:t>
             </a:fld>
             <a:r>
               <a:rPr lang="en-US"/>
@@ -3658,7 +3646,7 @@
             <a:fld id="{5942B21B-2ADA-A040-A652-A7305E1B99FE}" type="datetimeFigureOut">
               <a:rPr lang="en-US" smtClean="0"/>
               <a:pPr/>
-              <a:t>10/20/2016</a:t>
+              <a:t>10/26/2016</a:t>
             </a:fld>
             <a:r>
               <a:rPr lang="en-US" dirty="0"/>
@@ -3928,7 +3916,7 @@
             <a:fld id="{5942B21B-2ADA-A040-A652-A7305E1B99FE}" type="datetimeFigureOut">
               <a:rPr lang="en-US" smtClean="0"/>
               <a:pPr/>
-              <a:t>10/20/2016</a:t>
+              <a:t>10/26/2016</a:t>
             </a:fld>
             <a:r>
               <a:rPr lang="en-US" dirty="0"/>
@@ -4268,7 +4256,7 @@
             <a:fld id="{5942B21B-2ADA-A040-A652-A7305E1B99FE}" type="datetimeFigureOut">
               <a:rPr lang="en-US" smtClean="0"/>
               <a:pPr/>
-              <a:t>10/20/2016</a:t>
+              <a:t>10/26/2016</a:t>
             </a:fld>
             <a:r>
               <a:rPr lang="en-US" dirty="0"/>
@@ -4609,7 +4597,7 @@
             <a:fld id="{5942B21B-2ADA-A040-A652-A7305E1B99FE}" type="datetimeFigureOut">
               <a:rPr lang="en-US" smtClean="0"/>
               <a:pPr/>
-              <a:t>10/20/2016</a:t>
+              <a:t>10/26/2016</a:t>
             </a:fld>
             <a:r>
               <a:rPr lang="en-US" dirty="0"/>
@@ -5124,7 +5112,7 @@
             <a:fld id="{5942B21B-2ADA-A040-A652-A7305E1B99FE}" type="datetimeFigureOut">
               <a:rPr lang="en-US" smtClean="0"/>
               <a:pPr/>
-              <a:t>10/20/2016</a:t>
+              <a:t>10/26/2016</a:t>
             </a:fld>
             <a:r>
               <a:rPr lang="en-US" dirty="0"/>
@@ -5333,7 +5321,7 @@
             <a:fld id="{5942B21B-2ADA-A040-A652-A7305E1B99FE}" type="datetimeFigureOut">
               <a:rPr lang="en-US" smtClean="0"/>
               <a:pPr/>
-              <a:t>10/20/2016</a:t>
+              <a:t>10/26/2016</a:t>
             </a:fld>
             <a:r>
               <a:rPr lang="en-US" dirty="0"/>
@@ -5520,7 +5508,7 @@
             <a:fld id="{5942B21B-2ADA-A040-A652-A7305E1B99FE}" type="datetimeFigureOut">
               <a:rPr lang="en-US" smtClean="0"/>
               <a:pPr/>
-              <a:t>10/20/2016</a:t>
+              <a:t>10/26/2016</a:t>
             </a:fld>
             <a:r>
               <a:rPr lang="en-US" dirty="0"/>
@@ -5851,7 +5839,7 @@
             <a:fld id="{5942B21B-2ADA-A040-A652-A7305E1B99FE}" type="datetimeFigureOut">
               <a:rPr lang="en-US" smtClean="0"/>
               <a:pPr/>
-              <a:t>10/20/2016</a:t>
+              <a:t>10/26/2016</a:t>
             </a:fld>
             <a:r>
               <a:rPr lang="en-US" dirty="0"/>
@@ -6159,7 +6147,7 @@
             <a:fld id="{5942B21B-2ADA-A040-A652-A7305E1B99FE}" type="datetimeFigureOut">
               <a:rPr lang="en-US" smtClean="0"/>
               <a:pPr/>
-              <a:t>10/20/2016</a:t>
+              <a:t>10/26/2016</a:t>
             </a:fld>
             <a:r>
               <a:rPr lang="en-US" dirty="0"/>
@@ -6438,7 +6426,7 @@
             <a:fld id="{5942B21B-2ADA-A040-A652-A7305E1B99FE}" type="datetimeFigureOut">
               <a:rPr lang="en-US" smtClean="0"/>
               <a:pPr/>
-              <a:t>10/20/2016</a:t>
+              <a:t>10/26/2016</a:t>
             </a:fld>
             <a:r>
               <a:rPr lang="en-US" dirty="0"/>
@@ -8298,14 +8286,6 @@
   <p:clrMapOvr>
     <a:masterClrMapping/>
   </p:clrMapOvr>
-  <mc:AlternateContent xmlns:mc="http://schemas.openxmlformats.org/markup-compatibility/2006" xmlns:p14="http://schemas.microsoft.com/office/powerpoint/2010/main">
-    <mc:Choice Requires="p14">
-      <p:transition spd="slow" p14:dur="2000"/>
-    </mc:Choice>
-    <mc:Fallback xmlns="">
-      <p:transition spd="slow"/>
-    </mc:Fallback>
-  </mc:AlternateContent>
 </p:sld>
 </file>
 
@@ -9517,14 +9497,6 @@
   <p:clrMapOvr>
     <a:masterClrMapping/>
   </p:clrMapOvr>
-  <mc:AlternateContent xmlns:mc="http://schemas.openxmlformats.org/markup-compatibility/2006" xmlns:p14="http://schemas.microsoft.com/office/powerpoint/2010/main">
-    <mc:Choice Requires="p14">
-      <p:transition spd="slow" p14:dur="2000"/>
-    </mc:Choice>
-    <mc:Fallback xmlns="">
-      <p:transition spd="slow"/>
-    </mc:Fallback>
-  </mc:AlternateContent>
 </p:sld>
 </file>
 
@@ -10720,14 +10692,6 @@
   <p:clrMapOvr>
     <a:masterClrMapping/>
   </p:clrMapOvr>
-  <mc:AlternateContent xmlns:mc="http://schemas.openxmlformats.org/markup-compatibility/2006" xmlns:p14="http://schemas.microsoft.com/office/powerpoint/2010/main">
-    <mc:Choice Requires="p14">
-      <p:transition spd="slow" p14:dur="2000"/>
-    </mc:Choice>
-    <mc:Fallback xmlns="">
-      <p:transition spd="slow"/>
-    </mc:Fallback>
-  </mc:AlternateContent>
 </p:sld>
 </file>
 
@@ -11976,14 +11940,6 @@
   <p:clrMapOvr>
     <a:masterClrMapping/>
   </p:clrMapOvr>
-  <mc:AlternateContent xmlns:mc="http://schemas.openxmlformats.org/markup-compatibility/2006" xmlns:p14="http://schemas.microsoft.com/office/powerpoint/2010/main">
-    <mc:Choice Requires="p14">
-      <p:transition spd="slow" p14:dur="2000"/>
-    </mc:Choice>
-    <mc:Fallback xmlns="">
-      <p:transition spd="slow"/>
-    </mc:Fallback>
-  </mc:AlternateContent>
 </p:sld>
 </file>
 
@@ -13158,14 +13114,6 @@
   <p:clrMapOvr>
     <a:masterClrMapping/>
   </p:clrMapOvr>
-  <mc:AlternateContent xmlns:mc="http://schemas.openxmlformats.org/markup-compatibility/2006" xmlns:p14="http://schemas.microsoft.com/office/powerpoint/2010/main">
-    <mc:Choice Requires="p14">
-      <p:transition spd="slow" p14:dur="2000"/>
-    </mc:Choice>
-    <mc:Fallback xmlns="">
-      <p:transition spd="slow"/>
-    </mc:Fallback>
-  </mc:AlternateContent>
 </p:sld>
 </file>
 
@@ -14386,14 +14334,6 @@
   <p:clrMapOvr>
     <a:masterClrMapping/>
   </p:clrMapOvr>
-  <mc:AlternateContent xmlns:mc="http://schemas.openxmlformats.org/markup-compatibility/2006" xmlns:p14="http://schemas.microsoft.com/office/powerpoint/2010/main">
-    <mc:Choice Requires="p14">
-      <p:transition spd="slow" p14:dur="2000"/>
-    </mc:Choice>
-    <mc:Fallback xmlns="">
-      <p:transition spd="slow"/>
-    </mc:Fallback>
-  </mc:AlternateContent>
 </p:sld>
 </file>
 
@@ -15605,14 +15545,6 @@
   <p:clrMapOvr>
     <a:masterClrMapping/>
   </p:clrMapOvr>
-  <mc:AlternateContent xmlns:mc="http://schemas.openxmlformats.org/markup-compatibility/2006" xmlns:p14="http://schemas.microsoft.com/office/powerpoint/2010/main">
-    <mc:Choice Requires="p14">
-      <p:transition spd="slow" p14:dur="2000"/>
-    </mc:Choice>
-    <mc:Fallback xmlns="">
-      <p:transition spd="slow"/>
-    </mc:Fallback>
-  </mc:AlternateContent>
 </p:sld>
 </file>
 
@@ -16877,14 +16809,6 @@
   <p:clrMapOvr>
     <a:masterClrMapping/>
   </p:clrMapOvr>
-  <mc:AlternateContent xmlns:mc="http://schemas.openxmlformats.org/markup-compatibility/2006" xmlns:p14="http://schemas.microsoft.com/office/powerpoint/2010/main">
-    <mc:Choice Requires="p14">
-      <p:transition spd="slow" p14:dur="2000"/>
-    </mc:Choice>
-    <mc:Fallback xmlns="">
-      <p:transition spd="slow"/>
-    </mc:Fallback>
-  </mc:AlternateContent>
 </p:sld>
 </file>
 
@@ -23204,17 +23128,13 @@
             <a:pPr lvl="2"/>
             <a:r>
               <a:rPr lang="en-US" dirty="0"/>
-              <a:t>Metadata discovery / name </a:t>
-            </a:r>
-            <a:r>
-              <a:rPr lang="en-US" dirty="0" smtClean="0"/>
-              <a:t>resolution</a:t>
+              <a:t>Metadata discovery / name resolution</a:t>
             </a:r>
           </a:p>
           <a:p>
             <a:pPr lvl="2"/>
             <a:r>
-              <a:rPr lang="en-US" dirty="0" smtClean="0"/>
+              <a:rPr lang="en-US" dirty="0"/>
               <a:t>Data type resolution (i.e., UNION)</a:t>
             </a:r>
           </a:p>
@@ -23223,7 +23143,7 @@
               <a:buNone/>
             </a:pPr>
             <a:r>
-              <a:rPr lang="en-US" dirty="0" smtClean="0">
+              <a:rPr lang="en-US" dirty="0">
                 <a:solidFill>
                   <a:srgbClr val="0000FF"/>
                 </a:solidFill>
@@ -23235,7 +23155,7 @@
               <a:t>select</a:t>
             </a:r>
             <a:r>
-              <a:rPr lang="en-US" dirty="0" smtClean="0">
+              <a:rPr lang="en-US" dirty="0">
                 <a:solidFill>
                   <a:srgbClr val="000000"/>
                 </a:solidFill>
@@ -23244,19 +23164,7 @@
                 </a:highlight>
                 <a:latin typeface="Consolas" panose="020B0609020204030204" pitchFamily="49" charset="0"/>
               </a:rPr>
-              <a:t> </a:t>
-            </a:r>
-            <a:r>
-              <a:rPr lang="en-US" dirty="0">
-                <a:solidFill>
-                  <a:srgbClr val="000000"/>
-                </a:solidFill>
-                <a:highlight>
-                  <a:srgbClr val="FFFFFF"/>
-                </a:highlight>
-                <a:latin typeface="Consolas" panose="020B0609020204030204" pitchFamily="49" charset="0"/>
-              </a:rPr>
-              <a:t>1 </a:t>
+              <a:t> 1 </a:t>
             </a:r>
             <a:r>
               <a:rPr lang="en-US" dirty="0">
@@ -26850,20 +26758,15 @@
             <a:pPr lvl="1"/>
             <a:r>
               <a:rPr lang="en-US" dirty="0"/>
-              <a:t>SQL Server 7 vs 2014 CE </a:t>
-            </a:r>
-            <a:r>
-              <a:rPr lang="en-US" dirty="0" smtClean="0"/>
-              <a:t>engine</a:t>
+              <a:t>SQL Server 7 vs 2014 CE engine</a:t>
             </a:r>
           </a:p>
           <a:p>
             <a:pPr lvl="1"/>
             <a:r>
-              <a:rPr lang="en-US" dirty="0" smtClean="0"/>
+              <a:rPr lang="en-US" dirty="0"/>
               <a:t>Other physical properties</a:t>
             </a:r>
-            <a:endParaRPr lang="en-US" dirty="0"/>
           </a:p>
           <a:p>
             <a:pPr lvl="1"/>
@@ -27155,13 +27058,8 @@
           <a:p>
             <a:r>
               <a:rPr lang="en-US" sz="2000" dirty="0"/>
-              <a:t>Convert outer join to </a:t>
-            </a:r>
-            <a:r>
-              <a:rPr lang="en-US" sz="2000" dirty="0" smtClean="0"/>
-              <a:t>inner</a:t>
-            </a:r>
-            <a:endParaRPr lang="en-US" sz="2000" dirty="0"/>
+              <a:t>Convert outer join to inner</a:t>
+            </a:r>
           </a:p>
         </p:txBody>
       </p:sp>
@@ -27724,14 +27622,6 @@
   <p:clrMapOvr>
     <a:masterClrMapping/>
   </p:clrMapOvr>
-  <mc:AlternateContent xmlns:mc="http://schemas.openxmlformats.org/markup-compatibility/2006" xmlns:p14="http://schemas.microsoft.com/office/powerpoint/2010/main">
-    <mc:Choice Requires="p14">
-      <p:transition spd="slow" p14:dur="2000"/>
-    </mc:Choice>
-    <mc:Fallback xmlns="">
-      <p:transition spd="slow"/>
-    </mc:Fallback>
-  </mc:AlternateContent>
 </p:sld>
 </file>
 
@@ -28084,14 +27974,14 @@
                 <a:gridCol w="7632835">
                   <a:extLst>
                     <a:ext uri="{9D8B030D-6E8A-4147-A177-3AD203B41FA5}">
-                      <a16:colId xmlns:a16="http://schemas.microsoft.com/office/drawing/2014/main" xmlns="" val="3644048045"/>
+                      <a16:colId xmlns:a16="http://schemas.microsoft.com/office/drawing/2014/main" val="3644048045"/>
                     </a:ext>
                   </a:extLst>
                 </a:gridCol>
                 <a:gridCol w="606393">
                   <a:extLst>
                     <a:ext uri="{9D8B030D-6E8A-4147-A177-3AD203B41FA5}">
-                      <a16:colId xmlns:a16="http://schemas.microsoft.com/office/drawing/2014/main" xmlns="" val="2034254753"/>
+                      <a16:colId xmlns:a16="http://schemas.microsoft.com/office/drawing/2014/main" val="2034254753"/>
                     </a:ext>
                   </a:extLst>
                 </a:gridCol>
@@ -28122,7 +28012,7 @@
                 </a:tc>
                 <a:extLst>
                   <a:ext uri="{0D108BD9-81ED-4DB2-BD59-A6C34878D82A}">
-                    <a16:rowId xmlns:a16="http://schemas.microsoft.com/office/drawing/2014/main" xmlns="" val="2708275910"/>
+                    <a16:rowId xmlns:a16="http://schemas.microsoft.com/office/drawing/2014/main" val="2708275910"/>
                   </a:ext>
                 </a:extLst>
               </a:tr>
@@ -28156,7 +28046,7 @@
                 </a:tc>
                 <a:extLst>
                   <a:ext uri="{0D108BD9-81ED-4DB2-BD59-A6C34878D82A}">
-                    <a16:rowId xmlns:a16="http://schemas.microsoft.com/office/drawing/2014/main" xmlns="" val="2161984115"/>
+                    <a16:rowId xmlns:a16="http://schemas.microsoft.com/office/drawing/2014/main" val="2161984115"/>
                   </a:ext>
                 </a:extLst>
               </a:tr>
@@ -28203,7 +28093,7 @@
                 </a:tc>
                 <a:extLst>
                   <a:ext uri="{0D108BD9-81ED-4DB2-BD59-A6C34878D82A}">
-                    <a16:rowId xmlns:a16="http://schemas.microsoft.com/office/drawing/2014/main" xmlns="" val="2841678841"/>
+                    <a16:rowId xmlns:a16="http://schemas.microsoft.com/office/drawing/2014/main" val="2841678841"/>
                   </a:ext>
                 </a:extLst>
               </a:tr>
@@ -28237,7 +28127,7 @@
                 </a:tc>
                 <a:extLst>
                   <a:ext uri="{0D108BD9-81ED-4DB2-BD59-A6C34878D82A}">
-                    <a16:rowId xmlns:a16="http://schemas.microsoft.com/office/drawing/2014/main" xmlns="" val="3144998627"/>
+                    <a16:rowId xmlns:a16="http://schemas.microsoft.com/office/drawing/2014/main" val="3144998627"/>
                   </a:ext>
                 </a:extLst>
               </a:tr>
@@ -28279,7 +28169,7 @@
                 </a:tc>
                 <a:extLst>
                   <a:ext uri="{0D108BD9-81ED-4DB2-BD59-A6C34878D82A}">
-                    <a16:rowId xmlns:a16="http://schemas.microsoft.com/office/drawing/2014/main" xmlns="" val="1419261869"/>
+                    <a16:rowId xmlns:a16="http://schemas.microsoft.com/office/drawing/2014/main" val="1419261869"/>
                   </a:ext>
                 </a:extLst>
               </a:tr>
@@ -28317,7 +28207,7 @@
                 </a:tc>
                 <a:extLst>
                   <a:ext uri="{0D108BD9-81ED-4DB2-BD59-A6C34878D82A}">
-                    <a16:rowId xmlns:a16="http://schemas.microsoft.com/office/drawing/2014/main" xmlns="" val="1427391072"/>
+                    <a16:rowId xmlns:a16="http://schemas.microsoft.com/office/drawing/2014/main" val="1427391072"/>
                   </a:ext>
                 </a:extLst>
               </a:tr>
@@ -28364,7 +28254,7 @@
                 </a:tc>
                 <a:extLst>
                   <a:ext uri="{0D108BD9-81ED-4DB2-BD59-A6C34878D82A}">
-                    <a16:rowId xmlns:a16="http://schemas.microsoft.com/office/drawing/2014/main" xmlns="" val="2346539918"/>
+                    <a16:rowId xmlns:a16="http://schemas.microsoft.com/office/drawing/2014/main" val="2346539918"/>
                   </a:ext>
                 </a:extLst>
               </a:tr>
@@ -28403,7 +28293,7 @@
                 </a:tc>
                 <a:extLst>
                   <a:ext uri="{0D108BD9-81ED-4DB2-BD59-A6C34878D82A}">
-                    <a16:rowId xmlns:a16="http://schemas.microsoft.com/office/drawing/2014/main" xmlns="" val="2275483042"/>
+                    <a16:rowId xmlns:a16="http://schemas.microsoft.com/office/drawing/2014/main" val="2275483042"/>
                   </a:ext>
                 </a:extLst>
               </a:tr>
@@ -28441,7 +28331,7 @@
                 </a:tc>
                 <a:extLst>
                   <a:ext uri="{0D108BD9-81ED-4DB2-BD59-A6C34878D82A}">
-                    <a16:rowId xmlns:a16="http://schemas.microsoft.com/office/drawing/2014/main" xmlns="" val="4202569347"/>
+                    <a16:rowId xmlns:a16="http://schemas.microsoft.com/office/drawing/2014/main" val="4202569347"/>
                   </a:ext>
                 </a:extLst>
               </a:tr>
@@ -28475,7 +28365,7 @@
                 </a:tc>
                 <a:extLst>
                   <a:ext uri="{0D108BD9-81ED-4DB2-BD59-A6C34878D82A}">
-                    <a16:rowId xmlns:a16="http://schemas.microsoft.com/office/drawing/2014/main" xmlns="" val="2989839269"/>
+                    <a16:rowId xmlns:a16="http://schemas.microsoft.com/office/drawing/2014/main" val="2989839269"/>
                   </a:ext>
                 </a:extLst>
               </a:tr>
@@ -28509,7 +28399,7 @@
                 </a:tc>
                 <a:extLst>
                   <a:ext uri="{0D108BD9-81ED-4DB2-BD59-A6C34878D82A}">
-                    <a16:rowId xmlns:a16="http://schemas.microsoft.com/office/drawing/2014/main" xmlns="" val="2130545569"/>
+                    <a16:rowId xmlns:a16="http://schemas.microsoft.com/office/drawing/2014/main" val="2130545569"/>
                   </a:ext>
                 </a:extLst>
               </a:tr>
@@ -28565,7 +28455,7 @@
                 </a:tc>
                 <a:extLst>
                   <a:ext uri="{0D108BD9-81ED-4DB2-BD59-A6C34878D82A}">
-                    <a16:rowId xmlns:a16="http://schemas.microsoft.com/office/drawing/2014/main" xmlns="" val="1848127216"/>
+                    <a16:rowId xmlns:a16="http://schemas.microsoft.com/office/drawing/2014/main" val="1848127216"/>
                   </a:ext>
                 </a:extLst>
               </a:tr>
@@ -28659,14 +28549,6 @@
   <p:clrMapOvr>
     <a:masterClrMapping/>
   </p:clrMapOvr>
-  <mc:AlternateContent xmlns:mc="http://schemas.openxmlformats.org/markup-compatibility/2006" xmlns:p14="http://schemas.microsoft.com/office/powerpoint/2010/main">
-    <mc:Choice Requires="p14">
-      <p:transition spd="slow" p14:dur="2000"/>
-    </mc:Choice>
-    <mc:Fallback xmlns="">
-      <p:transition spd="slow"/>
-    </mc:Fallback>
-  </mc:AlternateContent>
 </p:sld>
 </file>
 
@@ -29019,14 +28901,14 @@
                 <a:gridCol w="4119615">
                   <a:extLst>
                     <a:ext uri="{9D8B030D-6E8A-4147-A177-3AD203B41FA5}">
-                      <a16:colId xmlns:a16="http://schemas.microsoft.com/office/drawing/2014/main" xmlns="" val="3644048045"/>
+                      <a16:colId xmlns:a16="http://schemas.microsoft.com/office/drawing/2014/main" val="3644048045"/>
                     </a:ext>
                   </a:extLst>
                 </a:gridCol>
                 <a:gridCol w="4119613">
                   <a:extLst>
                     <a:ext uri="{9D8B030D-6E8A-4147-A177-3AD203B41FA5}">
-                      <a16:colId xmlns:a16="http://schemas.microsoft.com/office/drawing/2014/main" xmlns="" val="2034254753"/>
+                      <a16:colId xmlns:a16="http://schemas.microsoft.com/office/drawing/2014/main" val="2034254753"/>
                     </a:ext>
                   </a:extLst>
                 </a:gridCol>
@@ -29062,7 +28944,7 @@
                 </a:tc>
                 <a:extLst>
                   <a:ext uri="{0D108BD9-81ED-4DB2-BD59-A6C34878D82A}">
-                    <a16:rowId xmlns:a16="http://schemas.microsoft.com/office/drawing/2014/main" xmlns="" val="2708275910"/>
+                    <a16:rowId xmlns:a16="http://schemas.microsoft.com/office/drawing/2014/main" val="2708275910"/>
                   </a:ext>
                 </a:extLst>
               </a:tr>
@@ -29262,7 +29144,7 @@
                 </a:tc>
                 <a:extLst>
                   <a:ext uri="{0D108BD9-81ED-4DB2-BD59-A6C34878D82A}">
-                    <a16:rowId xmlns:a16="http://schemas.microsoft.com/office/drawing/2014/main" xmlns="" val="2161984115"/>
+                    <a16:rowId xmlns:a16="http://schemas.microsoft.com/office/drawing/2014/main" val="2161984115"/>
                   </a:ext>
                 </a:extLst>
               </a:tr>
@@ -29462,7 +29344,7 @@
                 </a:tc>
                 <a:extLst>
                   <a:ext uri="{0D108BD9-81ED-4DB2-BD59-A6C34878D82A}">
-                    <a16:rowId xmlns:a16="http://schemas.microsoft.com/office/drawing/2014/main" xmlns="" val="2841678841"/>
+                    <a16:rowId xmlns:a16="http://schemas.microsoft.com/office/drawing/2014/main" val="2841678841"/>
                   </a:ext>
                 </a:extLst>
               </a:tr>
@@ -29662,7 +29544,7 @@
                 </a:tc>
                 <a:extLst>
                   <a:ext uri="{0D108BD9-81ED-4DB2-BD59-A6C34878D82A}">
-                    <a16:rowId xmlns:a16="http://schemas.microsoft.com/office/drawing/2014/main" xmlns="" val="3144998627"/>
+                    <a16:rowId xmlns:a16="http://schemas.microsoft.com/office/drawing/2014/main" val="3144998627"/>
                   </a:ext>
                 </a:extLst>
               </a:tr>
@@ -29862,7 +29744,7 @@
                 </a:tc>
                 <a:extLst>
                   <a:ext uri="{0D108BD9-81ED-4DB2-BD59-A6C34878D82A}">
-                    <a16:rowId xmlns:a16="http://schemas.microsoft.com/office/drawing/2014/main" xmlns="" val="1419261869"/>
+                    <a16:rowId xmlns:a16="http://schemas.microsoft.com/office/drawing/2014/main" val="1419261869"/>
                   </a:ext>
                 </a:extLst>
               </a:tr>
@@ -30062,7 +29944,7 @@
                 </a:tc>
                 <a:extLst>
                   <a:ext uri="{0D108BD9-81ED-4DB2-BD59-A6C34878D82A}">
-                    <a16:rowId xmlns:a16="http://schemas.microsoft.com/office/drawing/2014/main" xmlns="" val="1427391072"/>
+                    <a16:rowId xmlns:a16="http://schemas.microsoft.com/office/drawing/2014/main" val="1427391072"/>
                   </a:ext>
                 </a:extLst>
               </a:tr>
@@ -30262,7 +30144,7 @@
                 </a:tc>
                 <a:extLst>
                   <a:ext uri="{0D108BD9-81ED-4DB2-BD59-A6C34878D82A}">
-                    <a16:rowId xmlns:a16="http://schemas.microsoft.com/office/drawing/2014/main" xmlns="" val="2346539918"/>
+                    <a16:rowId xmlns:a16="http://schemas.microsoft.com/office/drawing/2014/main" val="2346539918"/>
                   </a:ext>
                 </a:extLst>
               </a:tr>
@@ -30471,7 +30353,7 @@
                 </a:tc>
                 <a:extLst>
                   <a:ext uri="{0D108BD9-81ED-4DB2-BD59-A6C34878D82A}">
-                    <a16:rowId xmlns:a16="http://schemas.microsoft.com/office/drawing/2014/main" xmlns="" val="2275483042"/>
+                    <a16:rowId xmlns:a16="http://schemas.microsoft.com/office/drawing/2014/main" val="2275483042"/>
                   </a:ext>
                 </a:extLst>
               </a:tr>
@@ -30680,7 +30562,7 @@
                 </a:tc>
                 <a:extLst>
                   <a:ext uri="{0D108BD9-81ED-4DB2-BD59-A6C34878D82A}">
-                    <a16:rowId xmlns:a16="http://schemas.microsoft.com/office/drawing/2014/main" xmlns="" val="4202569347"/>
+                    <a16:rowId xmlns:a16="http://schemas.microsoft.com/office/drawing/2014/main" val="4202569347"/>
                   </a:ext>
                 </a:extLst>
               </a:tr>
@@ -30889,7 +30771,7 @@
                 </a:tc>
                 <a:extLst>
                   <a:ext uri="{0D108BD9-81ED-4DB2-BD59-A6C34878D82A}">
-                    <a16:rowId xmlns:a16="http://schemas.microsoft.com/office/drawing/2014/main" xmlns="" val="2989839269"/>
+                    <a16:rowId xmlns:a16="http://schemas.microsoft.com/office/drawing/2014/main" val="2989839269"/>
                   </a:ext>
                 </a:extLst>
               </a:tr>
@@ -31098,7 +30980,7 @@
                 </a:tc>
                 <a:extLst>
                   <a:ext uri="{0D108BD9-81ED-4DB2-BD59-A6C34878D82A}">
-                    <a16:rowId xmlns:a16="http://schemas.microsoft.com/office/drawing/2014/main" xmlns="" val="2130545569"/>
+                    <a16:rowId xmlns:a16="http://schemas.microsoft.com/office/drawing/2014/main" val="2130545569"/>
                   </a:ext>
                 </a:extLst>
               </a:tr>
@@ -31307,7 +31189,7 @@
                 </a:tc>
                 <a:extLst>
                   <a:ext uri="{0D108BD9-81ED-4DB2-BD59-A6C34878D82A}">
-                    <a16:rowId xmlns:a16="http://schemas.microsoft.com/office/drawing/2014/main" xmlns="" val="3045796785"/>
+                    <a16:rowId xmlns:a16="http://schemas.microsoft.com/office/drawing/2014/main" val="3045796785"/>
                   </a:ext>
                 </a:extLst>
               </a:tr>
@@ -31516,7 +31398,7 @@
                 </a:tc>
                 <a:extLst>
                   <a:ext uri="{0D108BD9-81ED-4DB2-BD59-A6C34878D82A}">
-                    <a16:rowId xmlns:a16="http://schemas.microsoft.com/office/drawing/2014/main" xmlns="" val="1091494175"/>
+                    <a16:rowId xmlns:a16="http://schemas.microsoft.com/office/drawing/2014/main" val="1091494175"/>
                   </a:ext>
                 </a:extLst>
               </a:tr>
@@ -31534,14 +31416,6 @@
   <p:clrMapOvr>
     <a:masterClrMapping/>
   </p:clrMapOvr>
-  <mc:AlternateContent xmlns:mc="http://schemas.openxmlformats.org/markup-compatibility/2006" xmlns:p14="http://schemas.microsoft.com/office/powerpoint/2010/main">
-    <mc:Choice Requires="p14">
-      <p:transition spd="slow" p14:dur="2000"/>
-    </mc:Choice>
-    <mc:Fallback xmlns="">
-      <p:transition spd="slow"/>
-    </mc:Fallback>
-  </mc:AlternateContent>
 </p:sld>
 </file>
 
@@ -31654,14 +31528,6 @@
   <p:clrMapOvr>
     <a:masterClrMapping/>
   </p:clrMapOvr>
-  <mc:AlternateContent xmlns:mc="http://schemas.openxmlformats.org/markup-compatibility/2006" xmlns:p14="http://schemas.microsoft.com/office/powerpoint/2010/main">
-    <mc:Choice Requires="p14">
-      <p:transition spd="slow" p14:dur="2000"/>
-    </mc:Choice>
-    <mc:Fallback xmlns="">
-      <p:transition spd="slow"/>
-    </mc:Fallback>
-  </mc:AlternateContent>
 </p:sld>
 </file>
 
@@ -31837,14 +31703,6 @@
   <p:clrMapOvr>
     <a:masterClrMapping/>
   </p:clrMapOvr>
-  <mc:AlternateContent xmlns:mc="http://schemas.openxmlformats.org/markup-compatibility/2006" xmlns:p14="http://schemas.microsoft.com/office/powerpoint/2010/main">
-    <mc:Choice Requires="p14">
-      <p:transition spd="slow" p14:dur="2000"/>
-    </mc:Choice>
-    <mc:Fallback xmlns="">
-      <p:transition spd="slow"/>
-    </mc:Fallback>
-  </mc:AlternateContent>
 </p:sld>
 </file>
 
@@ -32541,14 +32399,6 @@
   <p:clrMapOvr>
     <a:masterClrMapping/>
   </p:clrMapOvr>
-  <mc:AlternateContent xmlns:mc="http://schemas.openxmlformats.org/markup-compatibility/2006" xmlns:p14="http://schemas.microsoft.com/office/powerpoint/2010/main">
-    <mc:Choice Requires="p14">
-      <p:transition spd="slow" p14:dur="2000"/>
-    </mc:Choice>
-    <mc:Fallback xmlns="">
-      <p:transition spd="slow"/>
-    </mc:Fallback>
-  </mc:AlternateContent>
 </p:sld>
 </file>
 
@@ -33069,14 +32919,6 @@
   <p:clrMapOvr>
     <a:masterClrMapping/>
   </p:clrMapOvr>
-  <mc:AlternateContent xmlns:mc="http://schemas.openxmlformats.org/markup-compatibility/2006" xmlns:p14="http://schemas.microsoft.com/office/powerpoint/2010/main">
-    <mc:Choice Requires="p14">
-      <p:transition spd="slow" p14:dur="2000"/>
-    </mc:Choice>
-    <mc:Fallback xmlns="">
-      <p:transition spd="slow"/>
-    </mc:Fallback>
-  </mc:AlternateContent>
 </p:sld>
 </file>
 
@@ -33865,30 +33707,13 @@
               <a:t>“</a:t>
             </a:r>
             <a:r>
-              <a:rPr lang="en-US" dirty="0" err="1" smtClean="0"/>
+              <a:rPr lang="en-US" dirty="0" err="1"/>
               <a:t>Promise_Total</a:t>
             </a:r>
             <a:r>
-              <a:rPr lang="en-US" dirty="0" smtClean="0"/>
-              <a:t>” </a:t>
-            </a:r>
-            <a:r>
               <a:rPr lang="en-US" dirty="0"/>
-              <a:t>– </a:t>
-            </a:r>
-            <a:r>
-              <a:rPr lang="en-US" dirty="0" smtClean="0"/>
-              <a:t>Estimate of how </a:t>
-            </a:r>
-            <a:r>
-              <a:rPr lang="en-US" dirty="0"/>
-              <a:t>useful might the rule be for this </a:t>
-            </a:r>
-            <a:r>
-              <a:rPr lang="en-US" dirty="0" smtClean="0"/>
-              <a:t>query</a:t>
-            </a:r>
-            <a:endParaRPr lang="en-US" dirty="0"/>
+              <a:t>” – Estimate of how useful might the rule be for this query</a:t>
+            </a:r>
           </a:p>
           <a:p>
             <a:pPr lvl="1"/>
@@ -33897,7 +33722,7 @@
               <a:t>“</a:t>
             </a:r>
             <a:r>
-              <a:rPr lang="en-US" dirty="0" err="1" smtClean="0"/>
+              <a:rPr lang="en-US" dirty="0" err="1"/>
               <a:t>Built_Substitute</a:t>
             </a:r>
             <a:r>
@@ -33909,14 +33734,10 @@
             <a:pPr lvl="1"/>
             <a:r>
               <a:rPr lang="en-US" dirty="0"/>
-              <a:t>“Succeeded” – Number of times the rule was </a:t>
-            </a:r>
-            <a:r>
-              <a:rPr lang="en-US" dirty="0" smtClean="0"/>
-              <a:t>incorporated into </a:t>
-            </a:r>
-            <a:r>
-              <a:rPr lang="en-US" smtClean="0"/>
+              <a:t>“Succeeded” – Number of times the rule was incorporated into </a:t>
+            </a:r>
+            <a:r>
+              <a:rPr lang="en-US"/>
               <a:t>search space</a:t>
             </a:r>
             <a:endParaRPr lang="en-US" dirty="0"/>
@@ -34102,14 +33923,6 @@
   <p:clrMapOvr>
     <a:masterClrMapping/>
   </p:clrMapOvr>
-  <mc:AlternateContent xmlns:mc="http://schemas.openxmlformats.org/markup-compatibility/2006" xmlns:p14="http://schemas.microsoft.com/office/powerpoint/2010/main">
-    <mc:Choice Requires="p14">
-      <p:transition spd="slow" p14:dur="2000"/>
-    </mc:Choice>
-    <mc:Fallback xmlns="">
-      <p:transition spd="slow"/>
-    </mc:Fallback>
-  </mc:AlternateContent>
 </p:sld>
 </file>
 
@@ -34901,14 +34714,14 @@
                 <a:gridCol w="957714">
                   <a:extLst>
                     <a:ext uri="{9D8B030D-6E8A-4147-A177-3AD203B41FA5}">
-                      <a16:colId xmlns:a16="http://schemas.microsoft.com/office/drawing/2014/main" xmlns="" val="3940544257"/>
+                      <a16:colId xmlns:a16="http://schemas.microsoft.com/office/drawing/2014/main" val="3940544257"/>
                     </a:ext>
                   </a:extLst>
                 </a:gridCol>
                 <a:gridCol w="2464067">
                   <a:extLst>
                     <a:ext uri="{9D8B030D-6E8A-4147-A177-3AD203B41FA5}">
-                      <a16:colId xmlns:a16="http://schemas.microsoft.com/office/drawing/2014/main" xmlns="" val="3658567973"/>
+                      <a16:colId xmlns:a16="http://schemas.microsoft.com/office/drawing/2014/main" val="3658567973"/>
                     </a:ext>
                   </a:extLst>
                 </a:gridCol>
@@ -34942,7 +34755,7 @@
                 </a:tc>
                 <a:extLst>
                   <a:ext uri="{0D108BD9-81ED-4DB2-BD59-A6C34878D82A}">
-                    <a16:rowId xmlns:a16="http://schemas.microsoft.com/office/drawing/2014/main" xmlns="" val="1032275335"/>
+                    <a16:rowId xmlns:a16="http://schemas.microsoft.com/office/drawing/2014/main" val="1032275335"/>
                   </a:ext>
                 </a:extLst>
               </a:tr>
@@ -35072,7 +34885,7 @@
                 </a:tc>
                 <a:extLst>
                   <a:ext uri="{0D108BD9-81ED-4DB2-BD59-A6C34878D82A}">
-                    <a16:rowId xmlns:a16="http://schemas.microsoft.com/office/drawing/2014/main" xmlns="" val="4191484087"/>
+                    <a16:rowId xmlns:a16="http://schemas.microsoft.com/office/drawing/2014/main" val="4191484087"/>
                   </a:ext>
                 </a:extLst>
               </a:tr>
@@ -35146,7 +34959,7 @@
                 </a:tc>
                 <a:extLst>
                   <a:ext uri="{0D108BD9-81ED-4DB2-BD59-A6C34878D82A}">
-                    <a16:rowId xmlns:a16="http://schemas.microsoft.com/office/drawing/2014/main" xmlns="" val="1864588626"/>
+                    <a16:rowId xmlns:a16="http://schemas.microsoft.com/office/drawing/2014/main" val="1864588626"/>
                   </a:ext>
                 </a:extLst>
               </a:tr>
@@ -35268,7 +35081,7 @@
                 </a:tc>
                 <a:extLst>
                   <a:ext uri="{0D108BD9-81ED-4DB2-BD59-A6C34878D82A}">
-                    <a16:rowId xmlns:a16="http://schemas.microsoft.com/office/drawing/2014/main" xmlns="" val="3035259714"/>
+                    <a16:rowId xmlns:a16="http://schemas.microsoft.com/office/drawing/2014/main" val="3035259714"/>
                   </a:ext>
                 </a:extLst>
               </a:tr>
@@ -35357,7 +35170,7 @@
                 </a:tc>
                 <a:extLst>
                   <a:ext uri="{0D108BD9-81ED-4DB2-BD59-A6C34878D82A}">
-                    <a16:rowId xmlns:a16="http://schemas.microsoft.com/office/drawing/2014/main" xmlns="" val="2023621082"/>
+                    <a16:rowId xmlns:a16="http://schemas.microsoft.com/office/drawing/2014/main" val="2023621082"/>
                   </a:ext>
                 </a:extLst>
               </a:tr>
@@ -35446,7 +35259,7 @@
                 </a:tc>
                 <a:extLst>
                   <a:ext uri="{0D108BD9-81ED-4DB2-BD59-A6C34878D82A}">
-                    <a16:rowId xmlns:a16="http://schemas.microsoft.com/office/drawing/2014/main" xmlns="" val="120016333"/>
+                    <a16:rowId xmlns:a16="http://schemas.microsoft.com/office/drawing/2014/main" val="120016333"/>
                   </a:ext>
                 </a:extLst>
               </a:tr>
@@ -35692,21 +35505,21 @@
                 <a:gridCol w="960120">
                   <a:extLst>
                     <a:ext uri="{9D8B030D-6E8A-4147-A177-3AD203B41FA5}">
-                      <a16:colId xmlns:a16="http://schemas.microsoft.com/office/drawing/2014/main" xmlns="" val="392696932"/>
+                      <a16:colId xmlns:a16="http://schemas.microsoft.com/office/drawing/2014/main" val="392696932"/>
                     </a:ext>
                   </a:extLst>
                 </a:gridCol>
                 <a:gridCol w="2468880">
                   <a:extLst>
                     <a:ext uri="{9D8B030D-6E8A-4147-A177-3AD203B41FA5}">
-                      <a16:colId xmlns:a16="http://schemas.microsoft.com/office/drawing/2014/main" xmlns="" val="2769969192"/>
+                      <a16:colId xmlns:a16="http://schemas.microsoft.com/office/drawing/2014/main" val="2769969192"/>
                     </a:ext>
                   </a:extLst>
                 </a:gridCol>
                 <a:gridCol w="2468880">
                   <a:extLst>
                     <a:ext uri="{9D8B030D-6E8A-4147-A177-3AD203B41FA5}">
-                      <a16:colId xmlns:a16="http://schemas.microsoft.com/office/drawing/2014/main" xmlns="" val="2022610816"/>
+                      <a16:colId xmlns:a16="http://schemas.microsoft.com/office/drawing/2014/main" val="2022610816"/>
                     </a:ext>
                   </a:extLst>
                 </a:gridCol>
@@ -35758,7 +35571,7 @@
                 </a:tc>
                 <a:extLst>
                   <a:ext uri="{0D108BD9-81ED-4DB2-BD59-A6C34878D82A}">
-                    <a16:rowId xmlns:a16="http://schemas.microsoft.com/office/drawing/2014/main" xmlns="" val="2344937666"/>
+                    <a16:rowId xmlns:a16="http://schemas.microsoft.com/office/drawing/2014/main" val="2344937666"/>
                   </a:ext>
                 </a:extLst>
               </a:tr>
@@ -35891,7 +35704,7 @@
                 </a:tc>
                 <a:extLst>
                   <a:ext uri="{0D108BD9-81ED-4DB2-BD59-A6C34878D82A}">
-                    <a16:rowId xmlns:a16="http://schemas.microsoft.com/office/drawing/2014/main" xmlns="" val="1917341330"/>
+                    <a16:rowId xmlns:a16="http://schemas.microsoft.com/office/drawing/2014/main" val="1917341330"/>
                   </a:ext>
                 </a:extLst>
               </a:tr>
@@ -36108,7 +35921,7 @@
                 </a:tc>
                 <a:extLst>
                   <a:ext uri="{0D108BD9-81ED-4DB2-BD59-A6C34878D82A}">
-                    <a16:rowId xmlns:a16="http://schemas.microsoft.com/office/drawing/2014/main" xmlns="" val="3088042860"/>
+                    <a16:rowId xmlns:a16="http://schemas.microsoft.com/office/drawing/2014/main" val="3088042860"/>
                   </a:ext>
                 </a:extLst>
               </a:tr>
@@ -36192,7 +36005,7 @@
                 </a:tc>
                 <a:extLst>
                   <a:ext uri="{0D108BD9-81ED-4DB2-BD59-A6C34878D82A}">
-                    <a16:rowId xmlns:a16="http://schemas.microsoft.com/office/drawing/2014/main" xmlns="" val="2658530722"/>
+                    <a16:rowId xmlns:a16="http://schemas.microsoft.com/office/drawing/2014/main" val="2658530722"/>
                   </a:ext>
                 </a:extLst>
               </a:tr>
@@ -36324,7 +36137,7 @@
                 </a:tc>
                 <a:extLst>
                   <a:ext uri="{0D108BD9-81ED-4DB2-BD59-A6C34878D82A}">
-                    <a16:rowId xmlns:a16="http://schemas.microsoft.com/office/drawing/2014/main" xmlns="" val="1481886367"/>
+                    <a16:rowId xmlns:a16="http://schemas.microsoft.com/office/drawing/2014/main" val="1481886367"/>
                   </a:ext>
                 </a:extLst>
               </a:tr>
@@ -36423,7 +36236,7 @@
                 </a:tc>
                 <a:extLst>
                   <a:ext uri="{0D108BD9-81ED-4DB2-BD59-A6C34878D82A}">
-                    <a16:rowId xmlns:a16="http://schemas.microsoft.com/office/drawing/2014/main" xmlns="" val="4248384778"/>
+                    <a16:rowId xmlns:a16="http://schemas.microsoft.com/office/drawing/2014/main" val="4248384778"/>
                   </a:ext>
                 </a:extLst>
               </a:tr>
@@ -36522,7 +36335,7 @@
                 </a:tc>
                 <a:extLst>
                   <a:ext uri="{0D108BD9-81ED-4DB2-BD59-A6C34878D82A}">
-                    <a16:rowId xmlns:a16="http://schemas.microsoft.com/office/drawing/2014/main" xmlns="" val="1670483340"/>
+                    <a16:rowId xmlns:a16="http://schemas.microsoft.com/office/drawing/2014/main" val="1670483340"/>
                   </a:ext>
                 </a:extLst>
               </a:tr>
@@ -36667,28 +36480,28 @@
                 <a:gridCol w="960120">
                   <a:extLst>
                     <a:ext uri="{9D8B030D-6E8A-4147-A177-3AD203B41FA5}">
-                      <a16:colId xmlns:a16="http://schemas.microsoft.com/office/drawing/2014/main" xmlns="" val="392696932"/>
+                      <a16:colId xmlns:a16="http://schemas.microsoft.com/office/drawing/2014/main" val="392696932"/>
                     </a:ext>
                   </a:extLst>
                 </a:gridCol>
                 <a:gridCol w="2468880">
                   <a:extLst>
                     <a:ext uri="{9D8B030D-6E8A-4147-A177-3AD203B41FA5}">
-                      <a16:colId xmlns:a16="http://schemas.microsoft.com/office/drawing/2014/main" xmlns="" val="2769969192"/>
+                      <a16:colId xmlns:a16="http://schemas.microsoft.com/office/drawing/2014/main" val="2769969192"/>
                     </a:ext>
                   </a:extLst>
                 </a:gridCol>
                 <a:gridCol w="2468880">
                   <a:extLst>
                     <a:ext uri="{9D8B030D-6E8A-4147-A177-3AD203B41FA5}">
-                      <a16:colId xmlns:a16="http://schemas.microsoft.com/office/drawing/2014/main" xmlns="" val="2022610816"/>
+                      <a16:colId xmlns:a16="http://schemas.microsoft.com/office/drawing/2014/main" val="2022610816"/>
                     </a:ext>
                   </a:extLst>
                 </a:gridCol>
                 <a:gridCol w="2468880">
                   <a:extLst>
                     <a:ext uri="{9D8B030D-6E8A-4147-A177-3AD203B41FA5}">
-                      <a16:colId xmlns:a16="http://schemas.microsoft.com/office/drawing/2014/main" xmlns="" val="102813283"/>
+                      <a16:colId xmlns:a16="http://schemas.microsoft.com/office/drawing/2014/main" val="102813283"/>
                     </a:ext>
                   </a:extLst>
                 </a:gridCol>
@@ -36753,7 +36566,7 @@
                 </a:tc>
                 <a:extLst>
                   <a:ext uri="{0D108BD9-81ED-4DB2-BD59-A6C34878D82A}">
-                    <a16:rowId xmlns:a16="http://schemas.microsoft.com/office/drawing/2014/main" xmlns="" val="2344937666"/>
+                    <a16:rowId xmlns:a16="http://schemas.microsoft.com/office/drawing/2014/main" val="2344937666"/>
                   </a:ext>
                 </a:extLst>
               </a:tr>
@@ -36913,7 +36726,7 @@
                 </a:tc>
                 <a:extLst>
                   <a:ext uri="{0D108BD9-81ED-4DB2-BD59-A6C34878D82A}">
-                    <a16:rowId xmlns:a16="http://schemas.microsoft.com/office/drawing/2014/main" xmlns="" val="1917341330"/>
+                    <a16:rowId xmlns:a16="http://schemas.microsoft.com/office/drawing/2014/main" val="1917341330"/>
                   </a:ext>
                 </a:extLst>
               </a:tr>
@@ -37217,7 +37030,7 @@
                 </a:tc>
                 <a:extLst>
                   <a:ext uri="{0D108BD9-81ED-4DB2-BD59-A6C34878D82A}">
-                    <a16:rowId xmlns:a16="http://schemas.microsoft.com/office/drawing/2014/main" xmlns="" val="3088042860"/>
+                    <a16:rowId xmlns:a16="http://schemas.microsoft.com/office/drawing/2014/main" val="3088042860"/>
                   </a:ext>
                 </a:extLst>
               </a:tr>
@@ -37311,7 +37124,7 @@
                 </a:tc>
                 <a:extLst>
                   <a:ext uri="{0D108BD9-81ED-4DB2-BD59-A6C34878D82A}">
-                    <a16:rowId xmlns:a16="http://schemas.microsoft.com/office/drawing/2014/main" xmlns="" val="2658530722"/>
+                    <a16:rowId xmlns:a16="http://schemas.microsoft.com/office/drawing/2014/main" val="2658530722"/>
                   </a:ext>
                 </a:extLst>
               </a:tr>
@@ -37504,7 +37317,7 @@
                 </a:tc>
                 <a:extLst>
                   <a:ext uri="{0D108BD9-81ED-4DB2-BD59-A6C34878D82A}">
-                    <a16:rowId xmlns:a16="http://schemas.microsoft.com/office/drawing/2014/main" xmlns="" val="1481886367"/>
+                    <a16:rowId xmlns:a16="http://schemas.microsoft.com/office/drawing/2014/main" val="1481886367"/>
                   </a:ext>
                 </a:extLst>
               </a:tr>
@@ -37613,7 +37426,7 @@
                 </a:tc>
                 <a:extLst>
                   <a:ext uri="{0D108BD9-81ED-4DB2-BD59-A6C34878D82A}">
-                    <a16:rowId xmlns:a16="http://schemas.microsoft.com/office/drawing/2014/main" xmlns="" val="4248384778"/>
+                    <a16:rowId xmlns:a16="http://schemas.microsoft.com/office/drawing/2014/main" val="4248384778"/>
                   </a:ext>
                 </a:extLst>
               </a:tr>
@@ -37722,7 +37535,7 @@
                 </a:tc>
                 <a:extLst>
                   <a:ext uri="{0D108BD9-81ED-4DB2-BD59-A6C34878D82A}">
-                    <a16:rowId xmlns:a16="http://schemas.microsoft.com/office/drawing/2014/main" xmlns="" val="1670483340"/>
+                    <a16:rowId xmlns:a16="http://schemas.microsoft.com/office/drawing/2014/main" val="1670483340"/>
                   </a:ext>
                 </a:extLst>
               </a:tr>
@@ -37889,8 +37702,12 @@
           <a:p>
             <a:pPr lvl="1"/>
             <a:r>
+              <a:rPr lang="en-US" sz="2200"/>
+              <a:t>Window functions, partitioned </a:t>
+            </a:r>
+            <a:r>
               <a:rPr lang="en-US" sz="2200" dirty="0"/>
-              <a:t>Partitioned tables, </a:t>
+              <a:t>tables, </a:t>
             </a:r>
             <a:r>
               <a:rPr lang="en-US" sz="2200" dirty="0" err="1"/>
@@ -38126,14 +37943,14 @@
                 <a:gridCol w="934278">
                   <a:extLst>
                     <a:ext uri="{9D8B030D-6E8A-4147-A177-3AD203B41FA5}">
-                      <a16:colId xmlns:a16="http://schemas.microsoft.com/office/drawing/2014/main" xmlns="" val="4198655800"/>
+                      <a16:colId xmlns:a16="http://schemas.microsoft.com/office/drawing/2014/main" val="4198655800"/>
                     </a:ext>
                   </a:extLst>
                 </a:gridCol>
                 <a:gridCol w="7295322">
                   <a:extLst>
                     <a:ext uri="{9D8B030D-6E8A-4147-A177-3AD203B41FA5}">
-                      <a16:colId xmlns:a16="http://schemas.microsoft.com/office/drawing/2014/main" xmlns="" val="135413862"/>
+                      <a16:colId xmlns:a16="http://schemas.microsoft.com/office/drawing/2014/main" val="135413862"/>
                     </a:ext>
                   </a:extLst>
                 </a:gridCol>
@@ -38167,7 +37984,7 @@
                 </a:tc>
                 <a:extLst>
                   <a:ext uri="{0D108BD9-81ED-4DB2-BD59-A6C34878D82A}">
-                    <a16:rowId xmlns:a16="http://schemas.microsoft.com/office/drawing/2014/main" xmlns="" val="3068323444"/>
+                    <a16:rowId xmlns:a16="http://schemas.microsoft.com/office/drawing/2014/main" val="3068323444"/>
                   </a:ext>
                 </a:extLst>
               </a:tr>
@@ -38200,7 +38017,7 @@
                 </a:tc>
                 <a:extLst>
                   <a:ext uri="{0D108BD9-81ED-4DB2-BD59-A6C34878D82A}">
-                    <a16:rowId xmlns:a16="http://schemas.microsoft.com/office/drawing/2014/main" xmlns="" val="1586961909"/>
+                    <a16:rowId xmlns:a16="http://schemas.microsoft.com/office/drawing/2014/main" val="1586961909"/>
                   </a:ext>
                 </a:extLst>
               </a:tr>
@@ -38238,7 +38055,7 @@
                 </a:tc>
                 <a:extLst>
                   <a:ext uri="{0D108BD9-81ED-4DB2-BD59-A6C34878D82A}">
-                    <a16:rowId xmlns:a16="http://schemas.microsoft.com/office/drawing/2014/main" xmlns="" val="2280300197"/>
+                    <a16:rowId xmlns:a16="http://schemas.microsoft.com/office/drawing/2014/main" val="2280300197"/>
                   </a:ext>
                 </a:extLst>
               </a:tr>
@@ -38276,7 +38093,7 @@
                 </a:tc>
                 <a:extLst>
                   <a:ext uri="{0D108BD9-81ED-4DB2-BD59-A6C34878D82A}">
-                    <a16:rowId xmlns:a16="http://schemas.microsoft.com/office/drawing/2014/main" xmlns="" val="1192843310"/>
+                    <a16:rowId xmlns:a16="http://schemas.microsoft.com/office/drawing/2014/main" val="1192843310"/>
                   </a:ext>
                 </a:extLst>
               </a:tr>
@@ -38314,7 +38131,7 @@
                 </a:tc>
                 <a:extLst>
                   <a:ext uri="{0D108BD9-81ED-4DB2-BD59-A6C34878D82A}">
-                    <a16:rowId xmlns:a16="http://schemas.microsoft.com/office/drawing/2014/main" xmlns="" val="2620585158"/>
+                    <a16:rowId xmlns:a16="http://schemas.microsoft.com/office/drawing/2014/main" val="2620585158"/>
                   </a:ext>
                 </a:extLst>
               </a:tr>
@@ -38347,7 +38164,7 @@
                 </a:tc>
                 <a:extLst>
                   <a:ext uri="{0D108BD9-81ED-4DB2-BD59-A6C34878D82A}">
-                    <a16:rowId xmlns:a16="http://schemas.microsoft.com/office/drawing/2014/main" xmlns="" val="1697738616"/>
+                    <a16:rowId xmlns:a16="http://schemas.microsoft.com/office/drawing/2014/main" val="1697738616"/>
                   </a:ext>
                 </a:extLst>
               </a:tr>
@@ -38385,7 +38202,7 @@
                 </a:tc>
                 <a:extLst>
                   <a:ext uri="{0D108BD9-81ED-4DB2-BD59-A6C34878D82A}">
-                    <a16:rowId xmlns:a16="http://schemas.microsoft.com/office/drawing/2014/main" xmlns="" val="316611556"/>
+                    <a16:rowId xmlns:a16="http://schemas.microsoft.com/office/drawing/2014/main" val="316611556"/>
                   </a:ext>
                 </a:extLst>
               </a:tr>
@@ -38418,7 +38235,7 @@
                 </a:tc>
                 <a:extLst>
                   <a:ext uri="{0D108BD9-81ED-4DB2-BD59-A6C34878D82A}">
-                    <a16:rowId xmlns:a16="http://schemas.microsoft.com/office/drawing/2014/main" xmlns="" val="1312814102"/>
+                    <a16:rowId xmlns:a16="http://schemas.microsoft.com/office/drawing/2014/main" val="1312814102"/>
                   </a:ext>
                 </a:extLst>
               </a:tr>
@@ -38451,7 +38268,7 @@
                 </a:tc>
                 <a:extLst>
                   <a:ext uri="{0D108BD9-81ED-4DB2-BD59-A6C34878D82A}">
-                    <a16:rowId xmlns:a16="http://schemas.microsoft.com/office/drawing/2014/main" xmlns="" val="1975533996"/>
+                    <a16:rowId xmlns:a16="http://schemas.microsoft.com/office/drawing/2014/main" val="1975533996"/>
                   </a:ext>
                 </a:extLst>
               </a:tr>
@@ -38484,7 +38301,7 @@
                 </a:tc>
                 <a:extLst>
                   <a:ext uri="{0D108BD9-81ED-4DB2-BD59-A6C34878D82A}">
-                    <a16:rowId xmlns:a16="http://schemas.microsoft.com/office/drawing/2014/main" xmlns="" val="2759032957"/>
+                    <a16:rowId xmlns:a16="http://schemas.microsoft.com/office/drawing/2014/main" val="2759032957"/>
                   </a:ext>
                 </a:extLst>
               </a:tr>
@@ -38573,14 +38390,14 @@
                 <a:gridCol w="934278">
                   <a:extLst>
                     <a:ext uri="{9D8B030D-6E8A-4147-A177-3AD203B41FA5}">
-                      <a16:colId xmlns:a16="http://schemas.microsoft.com/office/drawing/2014/main" xmlns="" val="4198655800"/>
+                      <a16:colId xmlns:a16="http://schemas.microsoft.com/office/drawing/2014/main" val="4198655800"/>
                     </a:ext>
                   </a:extLst>
                 </a:gridCol>
                 <a:gridCol w="7295322">
                   <a:extLst>
                     <a:ext uri="{9D8B030D-6E8A-4147-A177-3AD203B41FA5}">
-                      <a16:colId xmlns:a16="http://schemas.microsoft.com/office/drawing/2014/main" xmlns="" val="135413862"/>
+                      <a16:colId xmlns:a16="http://schemas.microsoft.com/office/drawing/2014/main" val="135413862"/>
                     </a:ext>
                   </a:extLst>
                 </a:gridCol>
@@ -38614,7 +38431,7 @@
                 </a:tc>
                 <a:extLst>
                   <a:ext uri="{0D108BD9-81ED-4DB2-BD59-A6C34878D82A}">
-                    <a16:rowId xmlns:a16="http://schemas.microsoft.com/office/drawing/2014/main" xmlns="" val="3068323444"/>
+                    <a16:rowId xmlns:a16="http://schemas.microsoft.com/office/drawing/2014/main" val="3068323444"/>
                   </a:ext>
                 </a:extLst>
               </a:tr>
@@ -38647,7 +38464,7 @@
                 </a:tc>
                 <a:extLst>
                   <a:ext uri="{0D108BD9-81ED-4DB2-BD59-A6C34878D82A}">
-                    <a16:rowId xmlns:a16="http://schemas.microsoft.com/office/drawing/2014/main" xmlns="" val="2484981654"/>
+                    <a16:rowId xmlns:a16="http://schemas.microsoft.com/office/drawing/2014/main" val="2484981654"/>
                   </a:ext>
                 </a:extLst>
               </a:tr>
@@ -38685,7 +38502,7 @@
                 </a:tc>
                 <a:extLst>
                   <a:ext uri="{0D108BD9-81ED-4DB2-BD59-A6C34878D82A}">
-                    <a16:rowId xmlns:a16="http://schemas.microsoft.com/office/drawing/2014/main" xmlns="" val="1377910784"/>
+                    <a16:rowId xmlns:a16="http://schemas.microsoft.com/office/drawing/2014/main" val="1377910784"/>
                   </a:ext>
                 </a:extLst>
               </a:tr>
@@ -38718,7 +38535,7 @@
                 </a:tc>
                 <a:extLst>
                   <a:ext uri="{0D108BD9-81ED-4DB2-BD59-A6C34878D82A}">
-                    <a16:rowId xmlns:a16="http://schemas.microsoft.com/office/drawing/2014/main" xmlns="" val="1387856053"/>
+                    <a16:rowId xmlns:a16="http://schemas.microsoft.com/office/drawing/2014/main" val="1387856053"/>
                   </a:ext>
                 </a:extLst>
               </a:tr>
@@ -38756,7 +38573,7 @@
                 </a:tc>
                 <a:extLst>
                   <a:ext uri="{0D108BD9-81ED-4DB2-BD59-A6C34878D82A}">
-                    <a16:rowId xmlns:a16="http://schemas.microsoft.com/office/drawing/2014/main" xmlns="" val="2599123823"/>
+                    <a16:rowId xmlns:a16="http://schemas.microsoft.com/office/drawing/2014/main" val="2599123823"/>
                   </a:ext>
                 </a:extLst>
               </a:tr>
@@ -38797,7 +38614,7 @@
                 </a:tc>
                 <a:extLst>
                   <a:ext uri="{0D108BD9-81ED-4DB2-BD59-A6C34878D82A}">
-                    <a16:rowId xmlns:a16="http://schemas.microsoft.com/office/drawing/2014/main" xmlns="" val="1232603862"/>
+                    <a16:rowId xmlns:a16="http://schemas.microsoft.com/office/drawing/2014/main" val="1232603862"/>
                   </a:ext>
                 </a:extLst>
               </a:tr>
@@ -38830,7 +38647,7 @@
                 </a:tc>
                 <a:extLst>
                   <a:ext uri="{0D108BD9-81ED-4DB2-BD59-A6C34878D82A}">
-                    <a16:rowId xmlns:a16="http://schemas.microsoft.com/office/drawing/2014/main" xmlns="" val="4145944521"/>
+                    <a16:rowId xmlns:a16="http://schemas.microsoft.com/office/drawing/2014/main" val="4145944521"/>
                   </a:ext>
                 </a:extLst>
               </a:tr>
@@ -38868,7 +38685,7 @@
                 </a:tc>
                 <a:extLst>
                   <a:ext uri="{0D108BD9-81ED-4DB2-BD59-A6C34878D82A}">
-                    <a16:rowId xmlns:a16="http://schemas.microsoft.com/office/drawing/2014/main" xmlns="" val="2954677722"/>
+                    <a16:rowId xmlns:a16="http://schemas.microsoft.com/office/drawing/2014/main" val="2954677722"/>
                   </a:ext>
                 </a:extLst>
               </a:tr>
@@ -38901,7 +38718,7 @@
                 </a:tc>
                 <a:extLst>
                   <a:ext uri="{0D108BD9-81ED-4DB2-BD59-A6C34878D82A}">
-                    <a16:rowId xmlns:a16="http://schemas.microsoft.com/office/drawing/2014/main" xmlns="" val="205903975"/>
+                    <a16:rowId xmlns:a16="http://schemas.microsoft.com/office/drawing/2014/main" val="205903975"/>
                   </a:ext>
                 </a:extLst>
               </a:tr>
@@ -38934,7 +38751,7 @@
                 </a:tc>
                 <a:extLst>
                   <a:ext uri="{0D108BD9-81ED-4DB2-BD59-A6C34878D82A}">
-                    <a16:rowId xmlns:a16="http://schemas.microsoft.com/office/drawing/2014/main" xmlns="" val="2893595017"/>
+                    <a16:rowId xmlns:a16="http://schemas.microsoft.com/office/drawing/2014/main" val="2893595017"/>
                   </a:ext>
                 </a:extLst>
               </a:tr>
@@ -38967,7 +38784,7 @@
                 </a:tc>
                 <a:extLst>
                   <a:ext uri="{0D108BD9-81ED-4DB2-BD59-A6C34878D82A}">
-                    <a16:rowId xmlns:a16="http://schemas.microsoft.com/office/drawing/2014/main" xmlns="" val="2337380595"/>
+                    <a16:rowId xmlns:a16="http://schemas.microsoft.com/office/drawing/2014/main" val="2337380595"/>
                   </a:ext>
                 </a:extLst>
               </a:tr>
@@ -39105,21 +38922,16 @@
             </a:r>
             <a:r>
               <a:rPr lang="en-US" dirty="0"/>
-              <a:t> </a:t>
-            </a:r>
-            <a:r>
-              <a:rPr lang="en-US" dirty="0" smtClean="0"/>
-              <a:t>####, </a:t>
-            </a:r>
-            <a:r>
-              <a:rPr lang="en-US" dirty="0" err="1" smtClean="0"/>
+              <a:t> ####, </a:t>
+            </a:r>
+            <a:r>
+              <a:rPr lang="en-US" dirty="0" err="1"/>
               <a:t>queryruleoff</a:t>
             </a:r>
             <a:r>
-              <a:rPr lang="en-US" dirty="0" smtClean="0"/>
+              <a:rPr lang="en-US" dirty="0"/>
               <a:t> ‘xxx’)</a:t>
             </a:r>
-            <a:endParaRPr lang="en-US" dirty="0"/>
           </a:p>
           <a:p>
             <a:r>
@@ -41038,21 +40850,21 @@
                 <a:gridCol w="2764301">
                   <a:extLst>
                     <a:ext uri="{9D8B030D-6E8A-4147-A177-3AD203B41FA5}">
-                      <a16:colId xmlns:a16="http://schemas.microsoft.com/office/drawing/2014/main" xmlns="" val="234227049"/>
+                      <a16:colId xmlns:a16="http://schemas.microsoft.com/office/drawing/2014/main" val="234227049"/>
                     </a:ext>
                   </a:extLst>
                 </a:gridCol>
                 <a:gridCol w="2764301">
                   <a:extLst>
                     <a:ext uri="{9D8B030D-6E8A-4147-A177-3AD203B41FA5}">
-                      <a16:colId xmlns:a16="http://schemas.microsoft.com/office/drawing/2014/main" xmlns="" val="4053135350"/>
+                      <a16:colId xmlns:a16="http://schemas.microsoft.com/office/drawing/2014/main" val="4053135350"/>
                     </a:ext>
                   </a:extLst>
                 </a:gridCol>
                 <a:gridCol w="2764301">
                   <a:extLst>
                     <a:ext uri="{9D8B030D-6E8A-4147-A177-3AD203B41FA5}">
-                      <a16:colId xmlns:a16="http://schemas.microsoft.com/office/drawing/2014/main" xmlns="" val="672378647"/>
+                      <a16:colId xmlns:a16="http://schemas.microsoft.com/office/drawing/2014/main" val="672378647"/>
                     </a:ext>
                   </a:extLst>
                 </a:gridCol>
@@ -41102,7 +40914,7 @@
                 </a:tc>
                 <a:extLst>
                   <a:ext uri="{0D108BD9-81ED-4DB2-BD59-A6C34878D82A}">
-                    <a16:rowId xmlns:a16="http://schemas.microsoft.com/office/drawing/2014/main" xmlns="" val="2843053056"/>
+                    <a16:rowId xmlns:a16="http://schemas.microsoft.com/office/drawing/2014/main" val="2843053056"/>
                   </a:ext>
                 </a:extLst>
               </a:tr>
@@ -41152,7 +40964,7 @@
                 </a:tc>
                 <a:extLst>
                   <a:ext uri="{0D108BD9-81ED-4DB2-BD59-A6C34878D82A}">
-                    <a16:rowId xmlns:a16="http://schemas.microsoft.com/office/drawing/2014/main" xmlns="" val="3055328934"/>
+                    <a16:rowId xmlns:a16="http://schemas.microsoft.com/office/drawing/2014/main" val="3055328934"/>
                   </a:ext>
                 </a:extLst>
               </a:tr>
@@ -41202,7 +41014,7 @@
                 </a:tc>
                 <a:extLst>
                   <a:ext uri="{0D108BD9-81ED-4DB2-BD59-A6C34878D82A}">
-                    <a16:rowId xmlns:a16="http://schemas.microsoft.com/office/drawing/2014/main" xmlns="" val="1144851549"/>
+                    <a16:rowId xmlns:a16="http://schemas.microsoft.com/office/drawing/2014/main" val="1144851549"/>
                   </a:ext>
                 </a:extLst>
               </a:tr>
@@ -41251,7 +41063,7 @@
                 </a:tc>
                 <a:extLst>
                   <a:ext uri="{0D108BD9-81ED-4DB2-BD59-A6C34878D82A}">
-                    <a16:rowId xmlns:a16="http://schemas.microsoft.com/office/drawing/2014/main" xmlns="" val="4258932578"/>
+                    <a16:rowId xmlns:a16="http://schemas.microsoft.com/office/drawing/2014/main" val="4258932578"/>
                   </a:ext>
                 </a:extLst>
               </a:tr>
@@ -42597,14 +42409,6 @@
   <p:clrMapOvr>
     <a:masterClrMapping/>
   </p:clrMapOvr>
-  <mc:AlternateContent xmlns:mc="http://schemas.openxmlformats.org/markup-compatibility/2006" xmlns:p14="http://schemas.microsoft.com/office/powerpoint/2010/main">
-    <mc:Choice Requires="p14">
-      <p:transition spd="slow" p14:dur="2000"/>
-    </mc:Choice>
-    <mc:Fallback xmlns="">
-      <p:transition spd="slow"/>
-    </mc:Fallback>
-  </mc:AlternateContent>
 </p:sld>
 </file>
 
@@ -43825,14 +43629,6 @@
   <p:clrMapOvr>
     <a:masterClrMapping/>
   </p:clrMapOvr>
-  <mc:AlternateContent xmlns:mc="http://schemas.openxmlformats.org/markup-compatibility/2006" xmlns:p14="http://schemas.microsoft.com/office/powerpoint/2010/main">
-    <mc:Choice Requires="p14">
-      <p:transition spd="slow" p14:dur="2000"/>
-    </mc:Choice>
-    <mc:Fallback xmlns="">
-      <p:transition spd="slow"/>
-    </mc:Fallback>
-  </mc:AlternateContent>
 </p:sld>
 </file>
 

</xml_diff>

<commit_message>
Add stub slides for various join types.
</commit_message>
<xml_diff>
--- a/Optimizer.pptx
+++ b/Optimizer.pptx
@@ -5,7 +5,7 @@
     <p:sldMasterId id="2147483648" r:id="rId1"/>
   </p:sldMasterIdLst>
   <p:notesMasterIdLst>
-    <p:notesMasterId r:id="rId62"/>
+    <p:notesMasterId r:id="rId66"/>
   </p:notesMasterIdLst>
   <p:sldIdLst>
     <p:sldId id="328" r:id="rId2"/>
@@ -28,46 +28,50 @@
     <p:sldId id="274" r:id="rId19"/>
     <p:sldId id="323" r:id="rId20"/>
     <p:sldId id="331" r:id="rId21"/>
-    <p:sldId id="276" r:id="rId22"/>
-    <p:sldId id="277" r:id="rId23"/>
-    <p:sldId id="280" r:id="rId24"/>
-    <p:sldId id="329" r:id="rId25"/>
-    <p:sldId id="281" r:id="rId26"/>
-    <p:sldId id="327" r:id="rId27"/>
-    <p:sldId id="326" r:id="rId28"/>
-    <p:sldId id="333" r:id="rId29"/>
-    <p:sldId id="296" r:id="rId30"/>
-    <p:sldId id="325" r:id="rId31"/>
-    <p:sldId id="324" r:id="rId32"/>
-    <p:sldId id="282" r:id="rId33"/>
-    <p:sldId id="332" r:id="rId34"/>
-    <p:sldId id="287" r:id="rId35"/>
-    <p:sldId id="289" r:id="rId36"/>
-    <p:sldId id="291" r:id="rId37"/>
-    <p:sldId id="292" r:id="rId38"/>
-    <p:sldId id="293" r:id="rId39"/>
-    <p:sldId id="290" r:id="rId40"/>
-    <p:sldId id="315" r:id="rId41"/>
-    <p:sldId id="314" r:id="rId42"/>
-    <p:sldId id="298" r:id="rId43"/>
-    <p:sldId id="288" r:id="rId44"/>
-    <p:sldId id="294" r:id="rId45"/>
-    <p:sldId id="295" r:id="rId46"/>
-    <p:sldId id="307" r:id="rId47"/>
-    <p:sldId id="299" r:id="rId48"/>
-    <p:sldId id="300" r:id="rId49"/>
-    <p:sldId id="297" r:id="rId50"/>
-    <p:sldId id="311" r:id="rId51"/>
-    <p:sldId id="312" r:id="rId52"/>
-    <p:sldId id="313" r:id="rId53"/>
-    <p:sldId id="304" r:id="rId54"/>
-    <p:sldId id="301" r:id="rId55"/>
-    <p:sldId id="305" r:id="rId56"/>
-    <p:sldId id="308" r:id="rId57"/>
-    <p:sldId id="306" r:id="rId58"/>
-    <p:sldId id="279" r:id="rId59"/>
-    <p:sldId id="302" r:id="rId60"/>
-    <p:sldId id="303" r:id="rId61"/>
+    <p:sldId id="335" r:id="rId22"/>
+    <p:sldId id="336" r:id="rId23"/>
+    <p:sldId id="337" r:id="rId24"/>
+    <p:sldId id="338" r:id="rId25"/>
+    <p:sldId id="276" r:id="rId26"/>
+    <p:sldId id="277" r:id="rId27"/>
+    <p:sldId id="280" r:id="rId28"/>
+    <p:sldId id="329" r:id="rId29"/>
+    <p:sldId id="281" r:id="rId30"/>
+    <p:sldId id="327" r:id="rId31"/>
+    <p:sldId id="326" r:id="rId32"/>
+    <p:sldId id="333" r:id="rId33"/>
+    <p:sldId id="296" r:id="rId34"/>
+    <p:sldId id="325" r:id="rId35"/>
+    <p:sldId id="324" r:id="rId36"/>
+    <p:sldId id="282" r:id="rId37"/>
+    <p:sldId id="332" r:id="rId38"/>
+    <p:sldId id="287" r:id="rId39"/>
+    <p:sldId id="289" r:id="rId40"/>
+    <p:sldId id="291" r:id="rId41"/>
+    <p:sldId id="292" r:id="rId42"/>
+    <p:sldId id="293" r:id="rId43"/>
+    <p:sldId id="290" r:id="rId44"/>
+    <p:sldId id="315" r:id="rId45"/>
+    <p:sldId id="314" r:id="rId46"/>
+    <p:sldId id="298" r:id="rId47"/>
+    <p:sldId id="288" r:id="rId48"/>
+    <p:sldId id="294" r:id="rId49"/>
+    <p:sldId id="295" r:id="rId50"/>
+    <p:sldId id="307" r:id="rId51"/>
+    <p:sldId id="299" r:id="rId52"/>
+    <p:sldId id="300" r:id="rId53"/>
+    <p:sldId id="297" r:id="rId54"/>
+    <p:sldId id="311" r:id="rId55"/>
+    <p:sldId id="312" r:id="rId56"/>
+    <p:sldId id="313" r:id="rId57"/>
+    <p:sldId id="304" r:id="rId58"/>
+    <p:sldId id="301" r:id="rId59"/>
+    <p:sldId id="305" r:id="rId60"/>
+    <p:sldId id="308" r:id="rId61"/>
+    <p:sldId id="306" r:id="rId62"/>
+    <p:sldId id="279" r:id="rId63"/>
+    <p:sldId id="302" r:id="rId64"/>
+    <p:sldId id="303" r:id="rId65"/>
   </p:sldIdLst>
   <p:sldSz cx="9144000" cy="6858000" type="screen4x3"/>
   <p:notesSz cx="6858000" cy="9144000"/>
@@ -267,7 +271,7 @@
           <a:p>
             <a:fld id="{2EDCB34D-5EC2-4739-9693-E425457AC201}" type="datetimeFigureOut">
               <a:rPr lang="en-US" smtClean="0"/>
-              <a:t>11/21/2016</a:t>
+              <a:t>11/25/2016</a:t>
             </a:fld>
             <a:endParaRPr lang="en-US"/>
           </a:p>
@@ -691,7 +695,7 @@
           <a:p>
             <a:fld id="{ADDBA41D-AE03-4F1C-B074-B56312AFAE46}" type="slidenum">
               <a:rPr lang="en-US" smtClean="0"/>
-              <a:t>26</a:t>
+              <a:t>30</a:t>
             </a:fld>
             <a:endParaRPr lang="en-US"/>
           </a:p>
@@ -792,7 +796,7 @@
           <a:p>
             <a:fld id="{ADDBA41D-AE03-4F1C-B074-B56312AFAE46}" type="slidenum">
               <a:rPr lang="en-US" smtClean="0"/>
-              <a:t>27</a:t>
+              <a:t>31</a:t>
             </a:fld>
             <a:endParaRPr lang="en-US"/>
           </a:p>
@@ -893,7 +897,7 @@
           <a:p>
             <a:fld id="{ADDBA41D-AE03-4F1C-B074-B56312AFAE46}" type="slidenum">
               <a:rPr lang="en-US" smtClean="0"/>
-              <a:t>30</a:t>
+              <a:t>34</a:t>
             </a:fld>
             <a:endParaRPr lang="en-US"/>
           </a:p>
@@ -994,7 +998,7 @@
           <a:p>
             <a:fld id="{ADDBA41D-AE03-4F1C-B074-B56312AFAE46}" type="slidenum">
               <a:rPr lang="en-US" smtClean="0"/>
-              <a:t>31</a:t>
+              <a:t>35</a:t>
             </a:fld>
             <a:endParaRPr lang="en-US"/>
           </a:p>
@@ -1162,7 +1166,7 @@
           <a:p>
             <a:fld id="{ADDBA41D-AE03-4F1C-B074-B56312AFAE46}" type="slidenum">
               <a:rPr lang="en-US" smtClean="0"/>
-              <a:t>32</a:t>
+              <a:t>36</a:t>
             </a:fld>
             <a:endParaRPr lang="en-US"/>
           </a:p>
@@ -1277,7 +1281,7 @@
           <a:p>
             <a:fld id="{ADDBA41D-AE03-4F1C-B074-B56312AFAE46}" type="slidenum">
               <a:rPr lang="en-US" smtClean="0"/>
-              <a:t>33</a:t>
+              <a:t>37</a:t>
             </a:fld>
             <a:endParaRPr lang="en-US"/>
           </a:p>
@@ -1369,7 +1373,7 @@
           <a:p>
             <a:fld id="{ADDBA41D-AE03-4F1C-B074-B56312AFAE46}" type="slidenum">
               <a:rPr lang="en-US" smtClean="0"/>
-              <a:t>39</a:t>
+              <a:t>43</a:t>
             </a:fld>
             <a:endParaRPr lang="en-US"/>
           </a:p>
@@ -1461,7 +1465,7 @@
           <a:p>
             <a:fld id="{ADDBA41D-AE03-4F1C-B074-B56312AFAE46}" type="slidenum">
               <a:rPr lang="en-US" smtClean="0"/>
-              <a:t>41</a:t>
+              <a:t>45</a:t>
             </a:fld>
             <a:endParaRPr lang="en-US"/>
           </a:p>
@@ -1553,7 +1557,7 @@
           <a:p>
             <a:fld id="{ADDBA41D-AE03-4F1C-B074-B56312AFAE46}" type="slidenum">
               <a:rPr lang="en-US" smtClean="0"/>
-              <a:t>42</a:t>
+              <a:t>46</a:t>
             </a:fld>
             <a:endParaRPr lang="en-US"/>
           </a:p>
@@ -1688,7 +1692,7 @@
           <a:p>
             <a:fld id="{ADDBA41D-AE03-4F1C-B074-B56312AFAE46}" type="slidenum">
               <a:rPr lang="en-US" smtClean="0"/>
-              <a:t>47</a:t>
+              <a:t>51</a:t>
             </a:fld>
             <a:endParaRPr lang="en-US"/>
           </a:p>
@@ -1752,11 +1756,11 @@
           <a:lstStyle/>
           <a:p>
             <a:r>
-              <a:rPr lang="en-US" dirty="0" smtClean="0"/>
+              <a:rPr lang="en-US" dirty="0"/>
               <a:t>Include here a</a:t>
             </a:r>
             <a:r>
-              <a:rPr lang="en-US" baseline="0" dirty="0" smtClean="0"/>
+              <a:rPr lang="en-US" baseline="0" dirty="0"/>
               <a:t> word of warning (and a word of encouragement) regarding undocumented functionality in SQL Server.</a:t>
             </a:r>
             <a:endParaRPr lang="en-US" dirty="0"/>
@@ -1881,7 +1885,7 @@
           <a:p>
             <a:fld id="{ADDBA41D-AE03-4F1C-B074-B56312AFAE46}" type="slidenum">
               <a:rPr lang="en-US" smtClean="0"/>
-              <a:t>48</a:t>
+              <a:t>52</a:t>
             </a:fld>
             <a:endParaRPr lang="en-US"/>
           </a:p>
@@ -1990,7 +1994,7 @@
           <a:p>
             <a:fld id="{ADDBA41D-AE03-4F1C-B074-B56312AFAE46}" type="slidenum">
               <a:rPr lang="en-US" smtClean="0"/>
-              <a:t>49</a:t>
+              <a:t>53</a:t>
             </a:fld>
             <a:endParaRPr lang="en-US"/>
           </a:p>
@@ -2088,7 +2092,7 @@
           <a:p>
             <a:fld id="{ADDBA41D-AE03-4F1C-B074-B56312AFAE46}" type="slidenum">
               <a:rPr lang="en-US" smtClean="0"/>
-              <a:t>52</a:t>
+              <a:t>56</a:t>
             </a:fld>
             <a:endParaRPr lang="en-US"/>
           </a:p>
@@ -2172,7 +2176,7 @@
           <a:p>
             <a:fld id="{ADDBA41D-AE03-4F1C-B074-B56312AFAE46}" type="slidenum">
               <a:rPr lang="en-US" smtClean="0"/>
-              <a:t>57</a:t>
+              <a:t>61</a:t>
             </a:fld>
             <a:endParaRPr lang="en-US"/>
           </a:p>
@@ -2724,7 +2728,7 @@
           <a:p>
             <a:fld id="{ADDBA41D-AE03-4F1C-B074-B56312AFAE46}" type="slidenum">
               <a:rPr lang="en-US" smtClean="0"/>
-              <a:t>22</a:t>
+              <a:t>26</a:t>
             </a:fld>
             <a:endParaRPr lang="en-US"/>
           </a:p>
@@ -2808,7 +2812,7 @@
           <a:p>
             <a:fld id="{ADDBA41D-AE03-4F1C-B074-B56312AFAE46}" type="slidenum">
               <a:rPr lang="en-US" smtClean="0"/>
-              <a:t>25</a:t>
+              <a:t>29</a:t>
             </a:fld>
             <a:endParaRPr lang="en-US"/>
           </a:p>
@@ -3062,7 +3066,7 @@
             <a:fld id="{5942B21B-2ADA-A040-A652-A7305E1B99FE}" type="datetimeFigureOut">
               <a:rPr lang="en-US" smtClean="0"/>
               <a:pPr/>
-              <a:t>11/21/2016</a:t>
+              <a:t>11/25/2016</a:t>
             </a:fld>
             <a:endParaRPr lang="en-US" dirty="0"/>
           </a:p>
@@ -3252,7 +3256,7 @@
           <a:p>
             <a:fld id="{5942B21B-2ADA-A040-A652-A7305E1B99FE}" type="datetimeFigureOut">
               <a:rPr lang="en-US" smtClean="0"/>
-              <a:t>11/21/2016</a:t>
+              <a:t>11/25/2016</a:t>
             </a:fld>
             <a:endParaRPr lang="en-US"/>
           </a:p>
@@ -3376,7 +3380,7 @@
             <a:fld id="{5942B21B-2ADA-A040-A652-A7305E1B99FE}" type="datetimeFigureOut">
               <a:rPr lang="en-US" smtClean="0"/>
               <a:pPr/>
-              <a:t>11/21/2016</a:t>
+              <a:t>11/25/2016</a:t>
             </a:fld>
             <a:r>
               <a:rPr lang="en-US"/>
@@ -3647,7 +3651,7 @@
             <a:fld id="{5942B21B-2ADA-A040-A652-A7305E1B99FE}" type="datetimeFigureOut">
               <a:rPr lang="en-US" smtClean="0"/>
               <a:pPr/>
-              <a:t>11/21/2016</a:t>
+              <a:t>11/25/2016</a:t>
             </a:fld>
             <a:r>
               <a:rPr lang="en-US" dirty="0"/>
@@ -3917,7 +3921,7 @@
             <a:fld id="{5942B21B-2ADA-A040-A652-A7305E1B99FE}" type="datetimeFigureOut">
               <a:rPr lang="en-US" smtClean="0"/>
               <a:pPr/>
-              <a:t>11/21/2016</a:t>
+              <a:t>11/25/2016</a:t>
             </a:fld>
             <a:r>
               <a:rPr lang="en-US" dirty="0"/>
@@ -4257,7 +4261,7 @@
             <a:fld id="{5942B21B-2ADA-A040-A652-A7305E1B99FE}" type="datetimeFigureOut">
               <a:rPr lang="en-US" smtClean="0"/>
               <a:pPr/>
-              <a:t>11/21/2016</a:t>
+              <a:t>11/25/2016</a:t>
             </a:fld>
             <a:r>
               <a:rPr lang="en-US" dirty="0"/>
@@ -4598,7 +4602,7 @@
             <a:fld id="{5942B21B-2ADA-A040-A652-A7305E1B99FE}" type="datetimeFigureOut">
               <a:rPr lang="en-US" smtClean="0"/>
               <a:pPr/>
-              <a:t>11/21/2016</a:t>
+              <a:t>11/25/2016</a:t>
             </a:fld>
             <a:r>
               <a:rPr lang="en-US" dirty="0"/>
@@ -5113,7 +5117,7 @@
             <a:fld id="{5942B21B-2ADA-A040-A652-A7305E1B99FE}" type="datetimeFigureOut">
               <a:rPr lang="en-US" smtClean="0"/>
               <a:pPr/>
-              <a:t>11/21/2016</a:t>
+              <a:t>11/25/2016</a:t>
             </a:fld>
             <a:r>
               <a:rPr lang="en-US" dirty="0"/>
@@ -5322,7 +5326,7 @@
             <a:fld id="{5942B21B-2ADA-A040-A652-A7305E1B99FE}" type="datetimeFigureOut">
               <a:rPr lang="en-US" smtClean="0"/>
               <a:pPr/>
-              <a:t>11/21/2016</a:t>
+              <a:t>11/25/2016</a:t>
             </a:fld>
             <a:r>
               <a:rPr lang="en-US" dirty="0"/>
@@ -5509,7 +5513,7 @@
             <a:fld id="{5942B21B-2ADA-A040-A652-A7305E1B99FE}" type="datetimeFigureOut">
               <a:rPr lang="en-US" smtClean="0"/>
               <a:pPr/>
-              <a:t>11/21/2016</a:t>
+              <a:t>11/25/2016</a:t>
             </a:fld>
             <a:r>
               <a:rPr lang="en-US" dirty="0"/>
@@ -5840,7 +5844,7 @@
             <a:fld id="{5942B21B-2ADA-A040-A652-A7305E1B99FE}" type="datetimeFigureOut">
               <a:rPr lang="en-US" smtClean="0"/>
               <a:pPr/>
-              <a:t>11/21/2016</a:t>
+              <a:t>11/25/2016</a:t>
             </a:fld>
             <a:r>
               <a:rPr lang="en-US" dirty="0"/>
@@ -6148,7 +6152,7 @@
             <a:fld id="{5942B21B-2ADA-A040-A652-A7305E1B99FE}" type="datetimeFigureOut">
               <a:rPr lang="en-US" smtClean="0"/>
               <a:pPr/>
-              <a:t>11/21/2016</a:t>
+              <a:t>11/25/2016</a:t>
             </a:fld>
             <a:r>
               <a:rPr lang="en-US" dirty="0"/>
@@ -6427,7 +6431,7 @@
             <a:fld id="{5942B21B-2ADA-A040-A652-A7305E1B99FE}" type="datetimeFigureOut">
               <a:rPr lang="en-US" smtClean="0"/>
               <a:pPr/>
-              <a:t>11/21/2016</a:t>
+              <a:t>11/25/2016</a:t>
             </a:fld>
             <a:r>
               <a:rPr lang="en-US" dirty="0"/>
@@ -7076,13 +7080,6 @@
   <p:clrMapOvr>
     <a:masterClrMapping/>
   </p:clrMapOvr>
-  <p:timing>
-    <p:tnLst>
-      <p:par>
-        <p:cTn id="1" dur="indefinite" restart="never" nodeType="tmRoot"/>
-      </p:par>
-    </p:tnLst>
-  </p:timing>
 </p:sld>
 </file>
 
@@ -8303,14 +8300,6 @@
   <p:clrMapOvr>
     <a:masterClrMapping/>
   </p:clrMapOvr>
-  <mc:AlternateContent xmlns:mc="http://schemas.openxmlformats.org/markup-compatibility/2006" xmlns:p14="http://schemas.microsoft.com/office/powerpoint/2010/main">
-    <mc:Choice Requires="p14">
-      <p:transition spd="slow" p14:dur="2000"/>
-    </mc:Choice>
-    <mc:Fallback xmlns="">
-      <p:transition spd="slow"/>
-    </mc:Fallback>
-  </mc:AlternateContent>
 </p:sld>
 </file>
 
@@ -9522,14 +9511,6 @@
   <p:clrMapOvr>
     <a:masterClrMapping/>
   </p:clrMapOvr>
-  <mc:AlternateContent xmlns:mc="http://schemas.openxmlformats.org/markup-compatibility/2006" xmlns:p14="http://schemas.microsoft.com/office/powerpoint/2010/main">
-    <mc:Choice Requires="p14">
-      <p:transition spd="slow" p14:dur="2000"/>
-    </mc:Choice>
-    <mc:Fallback xmlns="">
-      <p:transition spd="slow"/>
-    </mc:Fallback>
-  </mc:AlternateContent>
 </p:sld>
 </file>
 
@@ -10741,14 +10722,6 @@
   <p:clrMapOvr>
     <a:masterClrMapping/>
   </p:clrMapOvr>
-  <mc:AlternateContent xmlns:mc="http://schemas.openxmlformats.org/markup-compatibility/2006" xmlns:p14="http://schemas.microsoft.com/office/powerpoint/2010/main">
-    <mc:Choice Requires="p14">
-      <p:transition spd="slow" p14:dur="2000"/>
-    </mc:Choice>
-    <mc:Fallback xmlns="">
-      <p:transition spd="slow"/>
-    </mc:Fallback>
-  </mc:AlternateContent>
 </p:sld>
 </file>
 
@@ -11944,14 +11917,6 @@
   <p:clrMapOvr>
     <a:masterClrMapping/>
   </p:clrMapOvr>
-  <mc:AlternateContent xmlns:mc="http://schemas.openxmlformats.org/markup-compatibility/2006" xmlns:p14="http://schemas.microsoft.com/office/powerpoint/2010/main">
-    <mc:Choice Requires="p14">
-      <p:transition spd="slow" p14:dur="2000"/>
-    </mc:Choice>
-    <mc:Fallback xmlns="">
-      <p:transition spd="slow"/>
-    </mc:Fallback>
-  </mc:AlternateContent>
 </p:sld>
 </file>
 
@@ -13200,14 +13165,6 @@
   <p:clrMapOvr>
     <a:masterClrMapping/>
   </p:clrMapOvr>
-  <mc:AlternateContent xmlns:mc="http://schemas.openxmlformats.org/markup-compatibility/2006" xmlns:p14="http://schemas.microsoft.com/office/powerpoint/2010/main">
-    <mc:Choice Requires="p14">
-      <p:transition spd="slow" p14:dur="2000"/>
-    </mc:Choice>
-    <mc:Fallback xmlns="">
-      <p:transition spd="slow"/>
-    </mc:Fallback>
-  </mc:AlternateContent>
 </p:sld>
 </file>
 
@@ -14382,14 +14339,6 @@
   <p:clrMapOvr>
     <a:masterClrMapping/>
   </p:clrMapOvr>
-  <mc:AlternateContent xmlns:mc="http://schemas.openxmlformats.org/markup-compatibility/2006" xmlns:p14="http://schemas.microsoft.com/office/powerpoint/2010/main">
-    <mc:Choice Requires="p14">
-      <p:transition spd="slow" p14:dur="2000"/>
-    </mc:Choice>
-    <mc:Fallback xmlns="">
-      <p:transition spd="slow"/>
-    </mc:Fallback>
-  </mc:AlternateContent>
 </p:sld>
 </file>
 
@@ -15610,14 +15559,6 @@
   <p:clrMapOvr>
     <a:masterClrMapping/>
   </p:clrMapOvr>
-  <mc:AlternateContent xmlns:mc="http://schemas.openxmlformats.org/markup-compatibility/2006" xmlns:p14="http://schemas.microsoft.com/office/powerpoint/2010/main">
-    <mc:Choice Requires="p14">
-      <p:transition spd="slow" p14:dur="2000"/>
-    </mc:Choice>
-    <mc:Fallback xmlns="">
-      <p:transition spd="slow"/>
-    </mc:Fallback>
-  </mc:AlternateContent>
 </p:sld>
 </file>
 
@@ -16829,14 +16770,6 @@
   <p:clrMapOvr>
     <a:masterClrMapping/>
   </p:clrMapOvr>
-  <mc:AlternateContent xmlns:mc="http://schemas.openxmlformats.org/markup-compatibility/2006" xmlns:p14="http://schemas.microsoft.com/office/powerpoint/2010/main">
-    <mc:Choice Requires="p14">
-      <p:transition spd="slow" p14:dur="2000"/>
-    </mc:Choice>
-    <mc:Fallback xmlns="">
-      <p:transition spd="slow"/>
-    </mc:Fallback>
-  </mc:AlternateContent>
 </p:sld>
 </file>
 
@@ -18101,21 +18034,6 @@
   <p:clrMapOvr>
     <a:masterClrMapping/>
   </p:clrMapOvr>
-  <mc:AlternateContent xmlns:mc="http://schemas.openxmlformats.org/markup-compatibility/2006" xmlns:p14="http://schemas.microsoft.com/office/powerpoint/2010/main">
-    <mc:Choice Requires="p14">
-      <p:transition spd="slow" p14:dur="2000"/>
-    </mc:Choice>
-    <mc:Fallback xmlns="">
-      <p:transition spd="slow"/>
-    </mc:Fallback>
-  </mc:AlternateContent>
-  <p:timing>
-    <p:tnLst>
-      <p:par>
-        <p:cTn id="1" dur="indefinite" restart="never" nodeType="tmRoot"/>
-      </p:par>
-    </p:tnLst>
-  </p:timing>
 </p:sld>
 </file>
 
@@ -19352,13 +19270,6 @@
   <p:clrMapOvr>
     <a:masterClrMapping/>
   </p:clrMapOvr>
-  <p:timing>
-    <p:tnLst>
-      <p:par>
-        <p:cTn id="1" dur="indefinite" restart="never" nodeType="tmRoot"/>
-      </p:par>
-    </p:tnLst>
-  </p:timing>
 </p:sld>
 </file>
 
@@ -20369,13 +20280,6 @@
   <p:clrMapOvr>
     <a:masterClrMapping/>
   </p:clrMapOvr>
-  <p:timing>
-    <p:tnLst>
-      <p:par>
-        <p:cTn id="1" dur="indefinite" restart="never" nodeType="tmRoot"/>
-      </p:par>
-    </p:tnLst>
-  </p:timing>
 </p:sld>
 </file>
 
@@ -20804,17 +20708,294 @@
   <p:clrMapOvr>
     <a:masterClrMapping/>
   </p:clrMapOvr>
-  <p:timing>
-    <p:tnLst>
-      <p:par>
-        <p:cTn id="1" dur="indefinite" restart="never" nodeType="tmRoot"/>
-      </p:par>
-    </p:tnLst>
-  </p:timing>
 </p:sld>
 </file>
 
 <file path=ppt/slides/slide21.xml><?xml version="1.0" encoding="utf-8"?>
+<p:sld xmlns:a="http://schemas.openxmlformats.org/drawingml/2006/main" xmlns:r="http://schemas.openxmlformats.org/officeDocument/2006/relationships" xmlns:p="http://schemas.openxmlformats.org/presentationml/2006/main">
+  <p:cSld>
+    <p:spTree>
+      <p:nvGrpSpPr>
+        <p:cNvPr id="1" name=""/>
+        <p:cNvGrpSpPr/>
+        <p:nvPr/>
+      </p:nvGrpSpPr>
+      <p:grpSpPr>
+        <a:xfrm>
+          <a:off x="0" y="0"/>
+          <a:ext cx="0" cy="0"/>
+          <a:chOff x="0" y="0"/>
+          <a:chExt cx="0" cy="0"/>
+        </a:xfrm>
+      </p:grpSpPr>
+      <p:sp>
+        <p:nvSpPr>
+          <p:cNvPr id="2" name="Title 1"/>
+          <p:cNvSpPr>
+            <a:spLocks noGrp="1"/>
+          </p:cNvSpPr>
+          <p:nvPr>
+            <p:ph type="title"/>
+          </p:nvPr>
+        </p:nvSpPr>
+        <p:spPr/>
+        <p:txBody>
+          <a:bodyPr/>
+          <a:lstStyle/>
+          <a:p>
+            <a:r>
+              <a:rPr lang="en-US" dirty="0"/>
+              <a:t>Inner Join</a:t>
+            </a:r>
+          </a:p>
+        </p:txBody>
+      </p:sp>
+      <p:sp>
+        <p:nvSpPr>
+          <p:cNvPr id="3" name="Content Placeholder 2"/>
+          <p:cNvSpPr>
+            <a:spLocks noGrp="1"/>
+          </p:cNvSpPr>
+          <p:nvPr>
+            <p:ph idx="1"/>
+          </p:nvPr>
+        </p:nvSpPr>
+        <p:spPr/>
+        <p:txBody>
+          <a:bodyPr/>
+          <a:lstStyle/>
+          <a:p>
+            <a:endParaRPr lang="en-US"/>
+          </a:p>
+        </p:txBody>
+      </p:sp>
+    </p:spTree>
+    <p:extLst>
+      <p:ext uri="{BB962C8B-B14F-4D97-AF65-F5344CB8AC3E}">
+        <p14:creationId xmlns:p14="http://schemas.microsoft.com/office/powerpoint/2010/main" val="2316170008"/>
+      </p:ext>
+    </p:extLst>
+  </p:cSld>
+  <p:clrMapOvr>
+    <a:masterClrMapping/>
+  </p:clrMapOvr>
+</p:sld>
+</file>
+
+<file path=ppt/slides/slide22.xml><?xml version="1.0" encoding="utf-8"?>
+<p:sld xmlns:a="http://schemas.openxmlformats.org/drawingml/2006/main" xmlns:r="http://schemas.openxmlformats.org/officeDocument/2006/relationships" xmlns:p="http://schemas.openxmlformats.org/presentationml/2006/main">
+  <p:cSld>
+    <p:spTree>
+      <p:nvGrpSpPr>
+        <p:cNvPr id="1" name=""/>
+        <p:cNvGrpSpPr/>
+        <p:nvPr/>
+      </p:nvGrpSpPr>
+      <p:grpSpPr>
+        <a:xfrm>
+          <a:off x="0" y="0"/>
+          <a:ext cx="0" cy="0"/>
+          <a:chOff x="0" y="0"/>
+          <a:chExt cx="0" cy="0"/>
+        </a:xfrm>
+      </p:grpSpPr>
+      <p:sp>
+        <p:nvSpPr>
+          <p:cNvPr id="2" name="Title 1"/>
+          <p:cNvSpPr>
+            <a:spLocks noGrp="1"/>
+          </p:cNvSpPr>
+          <p:nvPr>
+            <p:ph type="title"/>
+          </p:nvPr>
+        </p:nvSpPr>
+        <p:spPr/>
+        <p:txBody>
+          <a:bodyPr/>
+          <a:lstStyle/>
+          <a:p>
+            <a:r>
+              <a:rPr lang="en-US" dirty="0"/>
+              <a:t>Outer Join</a:t>
+            </a:r>
+          </a:p>
+        </p:txBody>
+      </p:sp>
+      <p:sp>
+        <p:nvSpPr>
+          <p:cNvPr id="3" name="Content Placeholder 2"/>
+          <p:cNvSpPr>
+            <a:spLocks noGrp="1"/>
+          </p:cNvSpPr>
+          <p:nvPr>
+            <p:ph idx="1"/>
+          </p:nvPr>
+        </p:nvSpPr>
+        <p:spPr/>
+        <p:txBody>
+          <a:bodyPr/>
+          <a:lstStyle/>
+          <a:p>
+            <a:endParaRPr lang="en-US"/>
+          </a:p>
+        </p:txBody>
+      </p:sp>
+    </p:spTree>
+    <p:extLst>
+      <p:ext uri="{BB962C8B-B14F-4D97-AF65-F5344CB8AC3E}">
+        <p14:creationId xmlns:p14="http://schemas.microsoft.com/office/powerpoint/2010/main" val="658279311"/>
+      </p:ext>
+    </p:extLst>
+  </p:cSld>
+  <p:clrMapOvr>
+    <a:masterClrMapping/>
+  </p:clrMapOvr>
+</p:sld>
+</file>
+
+<file path=ppt/slides/slide23.xml><?xml version="1.0" encoding="utf-8"?>
+<p:sld xmlns:a="http://schemas.openxmlformats.org/drawingml/2006/main" xmlns:r="http://schemas.openxmlformats.org/officeDocument/2006/relationships" xmlns:p="http://schemas.openxmlformats.org/presentationml/2006/main">
+  <p:cSld>
+    <p:spTree>
+      <p:nvGrpSpPr>
+        <p:cNvPr id="1" name=""/>
+        <p:cNvGrpSpPr/>
+        <p:nvPr/>
+      </p:nvGrpSpPr>
+      <p:grpSpPr>
+        <a:xfrm>
+          <a:off x="0" y="0"/>
+          <a:ext cx="0" cy="0"/>
+          <a:chOff x="0" y="0"/>
+          <a:chExt cx="0" cy="0"/>
+        </a:xfrm>
+      </p:grpSpPr>
+      <p:sp>
+        <p:nvSpPr>
+          <p:cNvPr id="2" name="Title 1"/>
+          <p:cNvSpPr>
+            <a:spLocks noGrp="1"/>
+          </p:cNvSpPr>
+          <p:nvPr>
+            <p:ph type="title"/>
+          </p:nvPr>
+        </p:nvSpPr>
+        <p:spPr/>
+        <p:txBody>
+          <a:bodyPr/>
+          <a:lstStyle/>
+          <a:p>
+            <a:r>
+              <a:rPr lang="en-US" dirty="0"/>
+              <a:t>Semi Join</a:t>
+            </a:r>
+          </a:p>
+        </p:txBody>
+      </p:sp>
+      <p:sp>
+        <p:nvSpPr>
+          <p:cNvPr id="3" name="Content Placeholder 2"/>
+          <p:cNvSpPr>
+            <a:spLocks noGrp="1"/>
+          </p:cNvSpPr>
+          <p:nvPr>
+            <p:ph idx="1"/>
+          </p:nvPr>
+        </p:nvSpPr>
+        <p:spPr/>
+        <p:txBody>
+          <a:bodyPr/>
+          <a:lstStyle/>
+          <a:p>
+            <a:endParaRPr lang="en-US"/>
+          </a:p>
+        </p:txBody>
+      </p:sp>
+    </p:spTree>
+    <p:extLst>
+      <p:ext uri="{BB962C8B-B14F-4D97-AF65-F5344CB8AC3E}">
+        <p14:creationId xmlns:p14="http://schemas.microsoft.com/office/powerpoint/2010/main" val="4128606856"/>
+      </p:ext>
+    </p:extLst>
+  </p:cSld>
+  <p:clrMapOvr>
+    <a:masterClrMapping/>
+  </p:clrMapOvr>
+</p:sld>
+</file>
+
+<file path=ppt/slides/slide24.xml><?xml version="1.0" encoding="utf-8"?>
+<p:sld xmlns:a="http://schemas.openxmlformats.org/drawingml/2006/main" xmlns:r="http://schemas.openxmlformats.org/officeDocument/2006/relationships" xmlns:p="http://schemas.openxmlformats.org/presentationml/2006/main">
+  <p:cSld>
+    <p:spTree>
+      <p:nvGrpSpPr>
+        <p:cNvPr id="1" name=""/>
+        <p:cNvGrpSpPr/>
+        <p:nvPr/>
+      </p:nvGrpSpPr>
+      <p:grpSpPr>
+        <a:xfrm>
+          <a:off x="0" y="0"/>
+          <a:ext cx="0" cy="0"/>
+          <a:chOff x="0" y="0"/>
+          <a:chExt cx="0" cy="0"/>
+        </a:xfrm>
+      </p:grpSpPr>
+      <p:sp>
+        <p:nvSpPr>
+          <p:cNvPr id="2" name="Title 1"/>
+          <p:cNvSpPr>
+            <a:spLocks noGrp="1"/>
+          </p:cNvSpPr>
+          <p:nvPr>
+            <p:ph type="title"/>
+          </p:nvPr>
+        </p:nvSpPr>
+        <p:spPr/>
+        <p:txBody>
+          <a:bodyPr/>
+          <a:lstStyle/>
+          <a:p>
+            <a:r>
+              <a:rPr lang="en-US" dirty="0"/>
+              <a:t>Anti-semi Join</a:t>
+            </a:r>
+          </a:p>
+        </p:txBody>
+      </p:sp>
+      <p:sp>
+        <p:nvSpPr>
+          <p:cNvPr id="3" name="Content Placeholder 2"/>
+          <p:cNvSpPr>
+            <a:spLocks noGrp="1"/>
+          </p:cNvSpPr>
+          <p:nvPr>
+            <p:ph idx="1"/>
+          </p:nvPr>
+        </p:nvSpPr>
+        <p:spPr/>
+        <p:txBody>
+          <a:bodyPr/>
+          <a:lstStyle/>
+          <a:p>
+            <a:endParaRPr lang="en-US"/>
+          </a:p>
+        </p:txBody>
+      </p:sp>
+    </p:spTree>
+    <p:extLst>
+      <p:ext uri="{BB962C8B-B14F-4D97-AF65-F5344CB8AC3E}">
+        <p14:creationId xmlns:p14="http://schemas.microsoft.com/office/powerpoint/2010/main" val="3409113817"/>
+      </p:ext>
+    </p:extLst>
+  </p:cSld>
+  <p:clrMapOvr>
+    <a:masterClrMapping/>
+  </p:clrMapOvr>
+</p:sld>
+</file>
+
+<file path=ppt/slides/slide25.xml><?xml version="1.0" encoding="utf-8"?>
 <p:sld xmlns:a="http://schemas.openxmlformats.org/drawingml/2006/main" xmlns:r="http://schemas.openxmlformats.org/officeDocument/2006/relationships" xmlns:p="http://schemas.openxmlformats.org/presentationml/2006/main">
   <p:cSld>
     <p:spTree>
@@ -21061,17 +21242,10 @@
   <p:clrMapOvr>
     <a:masterClrMapping/>
   </p:clrMapOvr>
-  <p:timing>
-    <p:tnLst>
-      <p:par>
-        <p:cTn id="1" dur="indefinite" restart="never" nodeType="tmRoot"/>
-      </p:par>
-    </p:tnLst>
-  </p:timing>
 </p:sld>
 </file>
 
-<file path=ppt/slides/slide22.xml><?xml version="1.0" encoding="utf-8"?>
+<file path=ppt/slides/slide26.xml><?xml version="1.0" encoding="utf-8"?>
 <p:sld xmlns:a="http://schemas.openxmlformats.org/drawingml/2006/main" xmlns:r="http://schemas.openxmlformats.org/officeDocument/2006/relationships" xmlns:p="http://schemas.openxmlformats.org/presentationml/2006/main">
   <p:cSld>
     <p:spTree>
@@ -21347,17 +21521,10 @@
   <p:clrMapOvr>
     <a:masterClrMapping/>
   </p:clrMapOvr>
-  <p:timing>
-    <p:tnLst>
-      <p:par>
-        <p:cTn id="1" dur="indefinite" restart="never" nodeType="tmRoot"/>
-      </p:par>
-    </p:tnLst>
-  </p:timing>
 </p:sld>
 </file>
 
-<file path=ppt/slides/slide23.xml><?xml version="1.0" encoding="utf-8"?>
+<file path=ppt/slides/slide27.xml><?xml version="1.0" encoding="utf-8"?>
 <p:sld xmlns:a="http://schemas.openxmlformats.org/drawingml/2006/main" xmlns:r="http://schemas.openxmlformats.org/officeDocument/2006/relationships" xmlns:p="http://schemas.openxmlformats.org/presentationml/2006/main">
   <p:cSld>
     <p:spTree>
@@ -21440,17 +21607,10 @@
   <p:clrMapOvr>
     <a:masterClrMapping/>
   </p:clrMapOvr>
-  <p:timing>
-    <p:tnLst>
-      <p:par>
-        <p:cTn id="1" dur="indefinite" restart="never" nodeType="tmRoot"/>
-      </p:par>
-    </p:tnLst>
-  </p:timing>
 </p:sld>
 </file>
 
-<file path=ppt/slides/slide24.xml><?xml version="1.0" encoding="utf-8"?>
+<file path=ppt/slides/slide28.xml><?xml version="1.0" encoding="utf-8"?>
 <p:sld xmlns:a="http://schemas.openxmlformats.org/drawingml/2006/main" xmlns:r="http://schemas.openxmlformats.org/officeDocument/2006/relationships" xmlns:p="http://schemas.openxmlformats.org/presentationml/2006/main">
   <p:cSld>
     <p:spTree>
@@ -21525,17 +21685,10 @@
   <p:clrMapOvr>
     <a:masterClrMapping/>
   </p:clrMapOvr>
-  <p:timing>
-    <p:tnLst>
-      <p:par>
-        <p:cTn id="1" dur="indefinite" restart="never" nodeType="tmRoot"/>
-      </p:par>
-    </p:tnLst>
-  </p:timing>
 </p:sld>
 </file>
 
-<file path=ppt/slides/slide25.xml><?xml version="1.0" encoding="utf-8"?>
+<file path=ppt/slides/slide29.xml><?xml version="1.0" encoding="utf-8"?>
 <p:sld xmlns:a="http://schemas.openxmlformats.org/drawingml/2006/main" xmlns:r="http://schemas.openxmlformats.org/officeDocument/2006/relationships" xmlns:p="http://schemas.openxmlformats.org/presentationml/2006/main">
   <p:cSld>
     <p:spTree>
@@ -22274,7 +22427,125 @@
 </p:sld>
 </file>
 
-<file path=ppt/slides/slide26.xml><?xml version="1.0" encoding="utf-8"?>
+<file path=ppt/slides/slide3.xml><?xml version="1.0" encoding="utf-8"?>
+<p:sld xmlns:a="http://schemas.openxmlformats.org/drawingml/2006/main" xmlns:r="http://schemas.openxmlformats.org/officeDocument/2006/relationships" xmlns:p="http://schemas.openxmlformats.org/presentationml/2006/main">
+  <p:cSld>
+    <p:spTree>
+      <p:nvGrpSpPr>
+        <p:cNvPr id="1" name=""/>
+        <p:cNvGrpSpPr/>
+        <p:nvPr/>
+      </p:nvGrpSpPr>
+      <p:grpSpPr>
+        <a:xfrm>
+          <a:off x="0" y="0"/>
+          <a:ext cx="0" cy="0"/>
+          <a:chOff x="0" y="0"/>
+          <a:chExt cx="0" cy="0"/>
+        </a:xfrm>
+      </p:grpSpPr>
+      <p:sp>
+        <p:nvSpPr>
+          <p:cNvPr id="2" name="Title 1"/>
+          <p:cNvSpPr>
+            <a:spLocks noGrp="1"/>
+          </p:cNvSpPr>
+          <p:nvPr>
+            <p:ph type="title"/>
+          </p:nvPr>
+        </p:nvSpPr>
+        <p:spPr/>
+        <p:txBody>
+          <a:bodyPr/>
+          <a:lstStyle/>
+          <a:p>
+            <a:r>
+              <a:rPr lang="en-US" dirty="0"/>
+              <a:t>About This Session</a:t>
+            </a:r>
+          </a:p>
+        </p:txBody>
+      </p:sp>
+      <p:sp>
+        <p:nvSpPr>
+          <p:cNvPr id="3" name="Content Placeholder 2"/>
+          <p:cNvSpPr>
+            <a:spLocks noGrp="1"/>
+          </p:cNvSpPr>
+          <p:nvPr>
+            <p:ph idx="1"/>
+          </p:nvPr>
+        </p:nvSpPr>
+        <p:spPr/>
+        <p:txBody>
+          <a:bodyPr/>
+          <a:lstStyle/>
+          <a:p>
+            <a:r>
+              <a:rPr lang="en-US" dirty="0"/>
+              <a:t>What this session is not</a:t>
+            </a:r>
+          </a:p>
+          <a:p>
+            <a:pPr lvl="1"/>
+            <a:r>
+              <a:rPr lang="en-US" dirty="0"/>
+              <a:t>An end-to-end optimizer session</a:t>
+            </a:r>
+          </a:p>
+          <a:p>
+            <a:pPr lvl="1"/>
+            <a:r>
+              <a:rPr lang="en-US" dirty="0"/>
+              <a:t>A performance tuning session</a:t>
+            </a:r>
+          </a:p>
+          <a:p>
+            <a:endParaRPr lang="en-US" dirty="0"/>
+          </a:p>
+          <a:p>
+            <a:r>
+              <a:rPr lang="en-US" dirty="0"/>
+              <a:t>Goals of this session</a:t>
+            </a:r>
+          </a:p>
+          <a:p>
+            <a:pPr lvl="1"/>
+            <a:r>
+              <a:rPr lang="en-US" dirty="0"/>
+              <a:t>Additional understanding of SQL Server internals</a:t>
+            </a:r>
+          </a:p>
+          <a:p>
+            <a:pPr lvl="1"/>
+            <a:r>
+              <a:rPr lang="en-US" dirty="0"/>
+              <a:t>Understanding to help write better queries</a:t>
+            </a:r>
+          </a:p>
+          <a:p>
+            <a:pPr lvl="1"/>
+            <a:r>
+              <a:rPr lang="en-US" dirty="0"/>
+              <a:t>Provide an additional skill for performance tuning</a:t>
+            </a:r>
+          </a:p>
+        </p:txBody>
+      </p:sp>
+    </p:spTree>
+    <p:extLst>
+      <p:ext uri="{BB962C8B-B14F-4D97-AF65-F5344CB8AC3E}">
+        <p14:creationId xmlns:p14="http://schemas.microsoft.com/office/powerpoint/2010/main" val="1507468022"/>
+      </p:ext>
+    </p:extLst>
+  </p:cSld>
+  <p:clrMapOvr>
+    <a:masterClrMapping/>
+  </p:clrMapOvr>
+</p:sld>
+</file>
+
+<file path=ppt/slides/slide30.xml><?xml version="1.0" encoding="utf-8"?>
 <p:sld xmlns:a="http://schemas.openxmlformats.org/drawingml/2006/main" xmlns:r="http://schemas.openxmlformats.org/officeDocument/2006/relationships" xmlns:p="http://schemas.openxmlformats.org/presentationml/2006/main">
   <p:cSld>
     <p:spTree>
@@ -24418,7 +24689,7 @@
 </p:sld>
 </file>
 
-<file path=ppt/slides/slide27.xml><?xml version="1.0" encoding="utf-8"?>
+<file path=ppt/slides/slide31.xml><?xml version="1.0" encoding="utf-8"?>
 <p:sld xmlns:a="http://schemas.openxmlformats.org/drawingml/2006/main" xmlns:r="http://schemas.openxmlformats.org/officeDocument/2006/relationships" xmlns:p="http://schemas.openxmlformats.org/presentationml/2006/main">
   <p:cSld>
     <p:spTree>
@@ -25241,7 +25512,7 @@
 </p:sld>
 </file>
 
-<file path=ppt/slides/slide28.xml><?xml version="1.0" encoding="utf-8"?>
+<file path=ppt/slides/slide32.xml><?xml version="1.0" encoding="utf-8"?>
 <p:sld xmlns:a="http://schemas.openxmlformats.org/drawingml/2006/main" xmlns:r="http://schemas.openxmlformats.org/officeDocument/2006/relationships" xmlns:p="http://schemas.openxmlformats.org/presentationml/2006/main" show="0">
   <p:cSld>
     <p:spTree>
@@ -25309,25 +25580,10 @@
   <p:clrMapOvr>
     <a:masterClrMapping/>
   </p:clrMapOvr>
-  <mc:AlternateContent xmlns:mc="http://schemas.openxmlformats.org/markup-compatibility/2006" xmlns:p14="http://schemas.microsoft.com/office/powerpoint/2010/main">
-    <mc:Choice Requires="p14">
-      <p:transition spd="slow" p14:dur="2000"/>
-    </mc:Choice>
-    <mc:Fallback xmlns="">
-      <p:transition spd="slow"/>
-    </mc:Fallback>
-  </mc:AlternateContent>
-  <p:timing>
-    <p:tnLst>
-      <p:par>
-        <p:cTn id="1" dur="indefinite" restart="never" nodeType="tmRoot"/>
-      </p:par>
-    </p:tnLst>
-  </p:timing>
 </p:sld>
 </file>
 
-<file path=ppt/slides/slide29.xml><?xml version="1.0" encoding="utf-8"?>
+<file path=ppt/slides/slide33.xml><?xml version="1.0" encoding="utf-8"?>
 <p:sld xmlns:a="http://schemas.openxmlformats.org/drawingml/2006/main" xmlns:r="http://schemas.openxmlformats.org/officeDocument/2006/relationships" xmlns:p="http://schemas.openxmlformats.org/presentationml/2006/main">
   <p:cSld>
     <p:spTree>
@@ -25453,142 +25709,10 @@
   <p:clrMapOvr>
     <a:masterClrMapping/>
   </p:clrMapOvr>
-  <p:timing>
-    <p:tnLst>
-      <p:par>
-        <p:cTn id="1" dur="indefinite" restart="never" nodeType="tmRoot"/>
-      </p:par>
-    </p:tnLst>
-  </p:timing>
 </p:sld>
 </file>
 
-<file path=ppt/slides/slide3.xml><?xml version="1.0" encoding="utf-8"?>
-<p:sld xmlns:a="http://schemas.openxmlformats.org/drawingml/2006/main" xmlns:r="http://schemas.openxmlformats.org/officeDocument/2006/relationships" xmlns:p="http://schemas.openxmlformats.org/presentationml/2006/main">
-  <p:cSld>
-    <p:spTree>
-      <p:nvGrpSpPr>
-        <p:cNvPr id="1" name=""/>
-        <p:cNvGrpSpPr/>
-        <p:nvPr/>
-      </p:nvGrpSpPr>
-      <p:grpSpPr>
-        <a:xfrm>
-          <a:off x="0" y="0"/>
-          <a:ext cx="0" cy="0"/>
-          <a:chOff x="0" y="0"/>
-          <a:chExt cx="0" cy="0"/>
-        </a:xfrm>
-      </p:grpSpPr>
-      <p:sp>
-        <p:nvSpPr>
-          <p:cNvPr id="2" name="Title 1"/>
-          <p:cNvSpPr>
-            <a:spLocks noGrp="1"/>
-          </p:cNvSpPr>
-          <p:nvPr>
-            <p:ph type="title"/>
-          </p:nvPr>
-        </p:nvSpPr>
-        <p:spPr/>
-        <p:txBody>
-          <a:bodyPr/>
-          <a:lstStyle/>
-          <a:p>
-            <a:r>
-              <a:rPr lang="en-US" dirty="0"/>
-              <a:t>About This Session</a:t>
-            </a:r>
-          </a:p>
-        </p:txBody>
-      </p:sp>
-      <p:sp>
-        <p:nvSpPr>
-          <p:cNvPr id="3" name="Content Placeholder 2"/>
-          <p:cNvSpPr>
-            <a:spLocks noGrp="1"/>
-          </p:cNvSpPr>
-          <p:nvPr>
-            <p:ph idx="1"/>
-          </p:nvPr>
-        </p:nvSpPr>
-        <p:spPr/>
-        <p:txBody>
-          <a:bodyPr/>
-          <a:lstStyle/>
-          <a:p>
-            <a:r>
-              <a:rPr lang="en-US" dirty="0"/>
-              <a:t>What this session is not</a:t>
-            </a:r>
-          </a:p>
-          <a:p>
-            <a:pPr lvl="1"/>
-            <a:r>
-              <a:rPr lang="en-US" dirty="0"/>
-              <a:t>An end-to-end optimizer session</a:t>
-            </a:r>
-          </a:p>
-          <a:p>
-            <a:pPr lvl="1"/>
-            <a:r>
-              <a:rPr lang="en-US" dirty="0"/>
-              <a:t>A performance tuning session</a:t>
-            </a:r>
-          </a:p>
-          <a:p>
-            <a:endParaRPr lang="en-US" dirty="0"/>
-          </a:p>
-          <a:p>
-            <a:r>
-              <a:rPr lang="en-US" dirty="0"/>
-              <a:t>Goals of this session</a:t>
-            </a:r>
-          </a:p>
-          <a:p>
-            <a:pPr lvl="1"/>
-            <a:r>
-              <a:rPr lang="en-US" dirty="0"/>
-              <a:t>Additional understanding of SQL Server internals</a:t>
-            </a:r>
-          </a:p>
-          <a:p>
-            <a:pPr lvl="1"/>
-            <a:r>
-              <a:rPr lang="en-US" dirty="0"/>
-              <a:t>Understanding to help write better queries</a:t>
-            </a:r>
-          </a:p>
-          <a:p>
-            <a:pPr lvl="1"/>
-            <a:r>
-              <a:rPr lang="en-US" dirty="0"/>
-              <a:t>Provide an additional skill for performance tuning</a:t>
-            </a:r>
-          </a:p>
-        </p:txBody>
-      </p:sp>
-    </p:spTree>
-    <p:extLst>
-      <p:ext uri="{BB962C8B-B14F-4D97-AF65-F5344CB8AC3E}">
-        <p14:creationId xmlns:p14="http://schemas.microsoft.com/office/powerpoint/2010/main" val="1507468022"/>
-      </p:ext>
-    </p:extLst>
-  </p:cSld>
-  <p:clrMapOvr>
-    <a:masterClrMapping/>
-  </p:clrMapOvr>
-  <p:timing>
-    <p:tnLst>
-      <p:par>
-        <p:cTn id="1" dur="indefinite" restart="never" nodeType="tmRoot"/>
-      </p:par>
-    </p:tnLst>
-  </p:timing>
-</p:sld>
-</file>
-
-<file path=ppt/slides/slide30.xml><?xml version="1.0" encoding="utf-8"?>
+<file path=ppt/slides/slide34.xml><?xml version="1.0" encoding="utf-8"?>
 <p:sld xmlns:a="http://schemas.openxmlformats.org/drawingml/2006/main" xmlns:r="http://schemas.openxmlformats.org/officeDocument/2006/relationships" xmlns:p="http://schemas.openxmlformats.org/presentationml/2006/main">
   <p:cSld>
     <p:spTree>
@@ -26726,17 +26850,10 @@
   <p:clrMapOvr>
     <a:masterClrMapping/>
   </p:clrMapOvr>
-  <p:timing>
-    <p:tnLst>
-      <p:par>
-        <p:cTn id="1" dur="indefinite" restart="never" nodeType="tmRoot"/>
-      </p:par>
-    </p:tnLst>
-  </p:timing>
 </p:sld>
 </file>
 
-<file path=ppt/slides/slide31.xml><?xml version="1.0" encoding="utf-8"?>
+<file path=ppt/slides/slide35.xml><?xml version="1.0" encoding="utf-8"?>
 <p:sld xmlns:a="http://schemas.openxmlformats.org/drawingml/2006/main" xmlns:r="http://schemas.openxmlformats.org/officeDocument/2006/relationships" xmlns:p="http://schemas.openxmlformats.org/presentationml/2006/main">
   <p:cSld>
     <p:spTree>
@@ -28028,17 +28145,10 @@
   <p:clrMapOvr>
     <a:masterClrMapping/>
   </p:clrMapOvr>
-  <p:timing>
-    <p:tnLst>
-      <p:par>
-        <p:cTn id="1" dur="indefinite" restart="never" nodeType="tmRoot"/>
-      </p:par>
-    </p:tnLst>
-  </p:timing>
 </p:sld>
 </file>
 
-<file path=ppt/slides/slide32.xml><?xml version="1.0" encoding="utf-8"?>
+<file path=ppt/slides/slide36.xml><?xml version="1.0" encoding="utf-8"?>
 <p:sld xmlns:a="http://schemas.openxmlformats.org/drawingml/2006/main" xmlns:r="http://schemas.openxmlformats.org/officeDocument/2006/relationships" xmlns:p="http://schemas.openxmlformats.org/presentationml/2006/main">
   <p:cSld>
     <p:spTree>
@@ -28472,17 +28582,10 @@
   <p:clrMapOvr>
     <a:masterClrMapping/>
   </p:clrMapOvr>
-  <p:timing>
-    <p:tnLst>
-      <p:par>
-        <p:cTn id="1" dur="indefinite" restart="never" nodeType="tmRoot"/>
-      </p:par>
-    </p:tnLst>
-  </p:timing>
 </p:sld>
 </file>
 
-<file path=ppt/slides/slide33.xml><?xml version="1.0" encoding="utf-8"?>
+<file path=ppt/slides/slide37.xml><?xml version="1.0" encoding="utf-8"?>
 <p:sld xmlns:a="http://schemas.openxmlformats.org/drawingml/2006/main" xmlns:r="http://schemas.openxmlformats.org/officeDocument/2006/relationships" xmlns:p="http://schemas.openxmlformats.org/presentationml/2006/main">
   <p:cSld>
     <p:spTree>
@@ -28650,17 +28753,10 @@
   <p:clrMapOvr>
     <a:masterClrMapping/>
   </p:clrMapOvr>
-  <p:timing>
-    <p:tnLst>
-      <p:par>
-        <p:cTn id="1" dur="indefinite" restart="never" nodeType="tmRoot"/>
-      </p:par>
-    </p:tnLst>
-  </p:timing>
 </p:sld>
 </file>
 
-<file path=ppt/slides/slide34.xml><?xml version="1.0" encoding="utf-8"?>
+<file path=ppt/slides/slide38.xml><?xml version="1.0" encoding="utf-8"?>
 <p:sld xmlns:a="http://schemas.openxmlformats.org/drawingml/2006/main" xmlns:r="http://schemas.openxmlformats.org/officeDocument/2006/relationships" xmlns:p="http://schemas.openxmlformats.org/presentationml/2006/main" show="0">
   <p:cSld>
     <p:spTree>
@@ -29035,25 +29131,10 @@
   <p:clrMapOvr>
     <a:masterClrMapping/>
   </p:clrMapOvr>
-  <mc:AlternateContent xmlns:mc="http://schemas.openxmlformats.org/markup-compatibility/2006" xmlns:p14="http://schemas.microsoft.com/office/powerpoint/2010/main">
-    <mc:Choice Requires="p14">
-      <p:transition spd="slow" p14:dur="2000"/>
-    </mc:Choice>
-    <mc:Fallback xmlns="">
-      <p:transition spd="slow"/>
-    </mc:Fallback>
-  </mc:AlternateContent>
-  <p:timing>
-    <p:tnLst>
-      <p:par>
-        <p:cTn id="1" dur="indefinite" restart="never" nodeType="tmRoot"/>
-      </p:par>
-    </p:tnLst>
-  </p:timing>
 </p:sld>
 </file>
 
-<file path=ppt/slides/slide35.xml><?xml version="1.0" encoding="utf-8"?>
+<file path=ppt/slides/slide39.xml><?xml version="1.0" encoding="utf-8"?>
 <p:sld xmlns:a="http://schemas.openxmlformats.org/drawingml/2006/main" xmlns:r="http://schemas.openxmlformats.org/officeDocument/2006/relationships" xmlns:p="http://schemas.openxmlformats.org/presentationml/2006/main" show="0">
   <p:cSld>
     <p:spTree>
@@ -29402,14 +29483,14 @@
                 <a:gridCol w="7632835">
                   <a:extLst>
                     <a:ext uri="{9D8B030D-6E8A-4147-A177-3AD203B41FA5}">
-                      <a16:colId xmlns:a16="http://schemas.microsoft.com/office/drawing/2014/main" xmlns="" val="3644048045"/>
+                      <a16:colId xmlns:a16="http://schemas.microsoft.com/office/drawing/2014/main" val="3644048045"/>
                     </a:ext>
                   </a:extLst>
                 </a:gridCol>
                 <a:gridCol w="606393">
                   <a:extLst>
                     <a:ext uri="{9D8B030D-6E8A-4147-A177-3AD203B41FA5}">
-                      <a16:colId xmlns:a16="http://schemas.microsoft.com/office/drawing/2014/main" xmlns="" val="2034254753"/>
+                      <a16:colId xmlns:a16="http://schemas.microsoft.com/office/drawing/2014/main" val="2034254753"/>
                     </a:ext>
                   </a:extLst>
                 </a:gridCol>
@@ -29440,7 +29521,7 @@
                 </a:tc>
                 <a:extLst>
                   <a:ext uri="{0D108BD9-81ED-4DB2-BD59-A6C34878D82A}">
-                    <a16:rowId xmlns:a16="http://schemas.microsoft.com/office/drawing/2014/main" xmlns="" val="2708275910"/>
+                    <a16:rowId xmlns:a16="http://schemas.microsoft.com/office/drawing/2014/main" val="2708275910"/>
                   </a:ext>
                 </a:extLst>
               </a:tr>
@@ -29474,7 +29555,7 @@
                 </a:tc>
                 <a:extLst>
                   <a:ext uri="{0D108BD9-81ED-4DB2-BD59-A6C34878D82A}">
-                    <a16:rowId xmlns:a16="http://schemas.microsoft.com/office/drawing/2014/main" xmlns="" val="2161984115"/>
+                    <a16:rowId xmlns:a16="http://schemas.microsoft.com/office/drawing/2014/main" val="2161984115"/>
                   </a:ext>
                 </a:extLst>
               </a:tr>
@@ -29521,7 +29602,7 @@
                 </a:tc>
                 <a:extLst>
                   <a:ext uri="{0D108BD9-81ED-4DB2-BD59-A6C34878D82A}">
-                    <a16:rowId xmlns:a16="http://schemas.microsoft.com/office/drawing/2014/main" xmlns="" val="2841678841"/>
+                    <a16:rowId xmlns:a16="http://schemas.microsoft.com/office/drawing/2014/main" val="2841678841"/>
                   </a:ext>
                 </a:extLst>
               </a:tr>
@@ -29555,7 +29636,7 @@
                 </a:tc>
                 <a:extLst>
                   <a:ext uri="{0D108BD9-81ED-4DB2-BD59-A6C34878D82A}">
-                    <a16:rowId xmlns:a16="http://schemas.microsoft.com/office/drawing/2014/main" xmlns="" val="3144998627"/>
+                    <a16:rowId xmlns:a16="http://schemas.microsoft.com/office/drawing/2014/main" val="3144998627"/>
                   </a:ext>
                 </a:extLst>
               </a:tr>
@@ -29597,7 +29678,7 @@
                 </a:tc>
                 <a:extLst>
                   <a:ext uri="{0D108BD9-81ED-4DB2-BD59-A6C34878D82A}">
-                    <a16:rowId xmlns:a16="http://schemas.microsoft.com/office/drawing/2014/main" xmlns="" val="1419261869"/>
+                    <a16:rowId xmlns:a16="http://schemas.microsoft.com/office/drawing/2014/main" val="1419261869"/>
                   </a:ext>
                 </a:extLst>
               </a:tr>
@@ -29635,7 +29716,7 @@
                 </a:tc>
                 <a:extLst>
                   <a:ext uri="{0D108BD9-81ED-4DB2-BD59-A6C34878D82A}">
-                    <a16:rowId xmlns:a16="http://schemas.microsoft.com/office/drawing/2014/main" xmlns="" val="1427391072"/>
+                    <a16:rowId xmlns:a16="http://schemas.microsoft.com/office/drawing/2014/main" val="1427391072"/>
                   </a:ext>
                 </a:extLst>
               </a:tr>
@@ -29682,7 +29763,7 @@
                 </a:tc>
                 <a:extLst>
                   <a:ext uri="{0D108BD9-81ED-4DB2-BD59-A6C34878D82A}">
-                    <a16:rowId xmlns:a16="http://schemas.microsoft.com/office/drawing/2014/main" xmlns="" val="2346539918"/>
+                    <a16:rowId xmlns:a16="http://schemas.microsoft.com/office/drawing/2014/main" val="2346539918"/>
                   </a:ext>
                 </a:extLst>
               </a:tr>
@@ -29721,7 +29802,7 @@
                 </a:tc>
                 <a:extLst>
                   <a:ext uri="{0D108BD9-81ED-4DB2-BD59-A6C34878D82A}">
-                    <a16:rowId xmlns:a16="http://schemas.microsoft.com/office/drawing/2014/main" xmlns="" val="2275483042"/>
+                    <a16:rowId xmlns:a16="http://schemas.microsoft.com/office/drawing/2014/main" val="2275483042"/>
                   </a:ext>
                 </a:extLst>
               </a:tr>
@@ -29759,7 +29840,7 @@
                 </a:tc>
                 <a:extLst>
                   <a:ext uri="{0D108BD9-81ED-4DB2-BD59-A6C34878D82A}">
-                    <a16:rowId xmlns:a16="http://schemas.microsoft.com/office/drawing/2014/main" xmlns="" val="4202569347"/>
+                    <a16:rowId xmlns:a16="http://schemas.microsoft.com/office/drawing/2014/main" val="4202569347"/>
                   </a:ext>
                 </a:extLst>
               </a:tr>
@@ -29793,7 +29874,7 @@
                 </a:tc>
                 <a:extLst>
                   <a:ext uri="{0D108BD9-81ED-4DB2-BD59-A6C34878D82A}">
-                    <a16:rowId xmlns:a16="http://schemas.microsoft.com/office/drawing/2014/main" xmlns="" val="2989839269"/>
+                    <a16:rowId xmlns:a16="http://schemas.microsoft.com/office/drawing/2014/main" val="2989839269"/>
                   </a:ext>
                 </a:extLst>
               </a:tr>
@@ -29827,7 +29908,7 @@
                 </a:tc>
                 <a:extLst>
                   <a:ext uri="{0D108BD9-81ED-4DB2-BD59-A6C34878D82A}">
-                    <a16:rowId xmlns:a16="http://schemas.microsoft.com/office/drawing/2014/main" xmlns="" val="2130545569"/>
+                    <a16:rowId xmlns:a16="http://schemas.microsoft.com/office/drawing/2014/main" val="2130545569"/>
                   </a:ext>
                 </a:extLst>
               </a:tr>
@@ -29883,7 +29964,7 @@
                 </a:tc>
                 <a:extLst>
                   <a:ext uri="{0D108BD9-81ED-4DB2-BD59-A6C34878D82A}">
-                    <a16:rowId xmlns:a16="http://schemas.microsoft.com/office/drawing/2014/main" xmlns="" val="1848127216"/>
+                    <a16:rowId xmlns:a16="http://schemas.microsoft.com/office/drawing/2014/main" val="1848127216"/>
                   </a:ext>
                 </a:extLst>
               </a:tr>
@@ -29977,18 +30058,118 @@
   <p:clrMapOvr>
     <a:masterClrMapping/>
   </p:clrMapOvr>
-  <mc:AlternateContent xmlns:mc="http://schemas.openxmlformats.org/markup-compatibility/2006" xmlns:p14="http://schemas.microsoft.com/office/powerpoint/2010/main">
-    <mc:Choice Requires="p14">
-      <p:transition spd="slow" p14:dur="2000"/>
-    </mc:Choice>
-    <mc:Fallback xmlns="">
-      <p:transition spd="slow"/>
-    </mc:Fallback>
-  </mc:AlternateContent>
 </p:sld>
 </file>
 
-<file path=ppt/slides/slide36.xml><?xml version="1.0" encoding="utf-8"?>
+<file path=ppt/slides/slide4.xml><?xml version="1.0" encoding="utf-8"?>
+<p:sld xmlns:a="http://schemas.openxmlformats.org/drawingml/2006/main" xmlns:r="http://schemas.openxmlformats.org/officeDocument/2006/relationships" xmlns:p="http://schemas.openxmlformats.org/presentationml/2006/main">
+  <p:cSld>
+    <p:spTree>
+      <p:nvGrpSpPr>
+        <p:cNvPr id="1" name=""/>
+        <p:cNvGrpSpPr/>
+        <p:nvPr/>
+      </p:nvGrpSpPr>
+      <p:grpSpPr>
+        <a:xfrm>
+          <a:off x="0" y="0"/>
+          <a:ext cx="0" cy="0"/>
+          <a:chOff x="0" y="0"/>
+          <a:chExt cx="0" cy="0"/>
+        </a:xfrm>
+      </p:grpSpPr>
+      <p:sp>
+        <p:nvSpPr>
+          <p:cNvPr id="2" name="Title 1"/>
+          <p:cNvSpPr>
+            <a:spLocks noGrp="1"/>
+          </p:cNvSpPr>
+          <p:nvPr>
+            <p:ph type="title"/>
+          </p:nvPr>
+        </p:nvSpPr>
+        <p:spPr/>
+        <p:txBody>
+          <a:bodyPr/>
+          <a:lstStyle/>
+          <a:p>
+            <a:r>
+              <a:rPr lang="en-US" dirty="0"/>
+              <a:t>Agenda</a:t>
+            </a:r>
+          </a:p>
+        </p:txBody>
+      </p:sp>
+      <p:sp>
+        <p:nvSpPr>
+          <p:cNvPr id="3" name="Content Placeholder 2"/>
+          <p:cNvSpPr>
+            <a:spLocks noGrp="1"/>
+          </p:cNvSpPr>
+          <p:nvPr>
+            <p:ph idx="1"/>
+          </p:nvPr>
+        </p:nvSpPr>
+        <p:spPr/>
+        <p:txBody>
+          <a:bodyPr>
+            <a:normAutofit/>
+          </a:bodyPr>
+          <a:lstStyle/>
+          <a:p>
+            <a:r>
+              <a:rPr lang="en-US" dirty="0"/>
+              <a:t>Background:</a:t>
+            </a:r>
+          </a:p>
+          <a:p>
+            <a:pPr lvl="1"/>
+            <a:r>
+              <a:rPr lang="en-US" dirty="0"/>
+              <a:t>Logical processing order</a:t>
+            </a:r>
+          </a:p>
+          <a:p>
+            <a:pPr lvl="1"/>
+            <a:r>
+              <a:rPr lang="en-US" dirty="0"/>
+              <a:t>Physical processing considerations</a:t>
+            </a:r>
+          </a:p>
+          <a:p>
+            <a:r>
+              <a:rPr lang="en-US" dirty="0"/>
+              <a:t>Executing a query: parse, bind, transform, optimize, execute</a:t>
+            </a:r>
+          </a:p>
+          <a:p>
+            <a:r>
+              <a:rPr lang="en-US" dirty="0"/>
+              <a:t>Heuristics, transformation rules, parse trees, memos</a:t>
+            </a:r>
+          </a:p>
+          <a:p>
+            <a:r>
+              <a:rPr lang="en-US" dirty="0"/>
+              <a:t>Limitations &amp; DMVs</a:t>
+            </a:r>
+          </a:p>
+        </p:txBody>
+      </p:sp>
+    </p:spTree>
+    <p:extLst>
+      <p:ext uri="{BB962C8B-B14F-4D97-AF65-F5344CB8AC3E}">
+        <p14:creationId xmlns:p14="http://schemas.microsoft.com/office/powerpoint/2010/main" val="675647204"/>
+      </p:ext>
+    </p:extLst>
+  </p:cSld>
+  <p:clrMapOvr>
+    <a:masterClrMapping/>
+  </p:clrMapOvr>
+</p:sld>
+</file>
+
+<file path=ppt/slides/slide40.xml><?xml version="1.0" encoding="utf-8"?>
 <p:sld xmlns:a="http://schemas.openxmlformats.org/drawingml/2006/main" xmlns:r="http://schemas.openxmlformats.org/officeDocument/2006/relationships" xmlns:p="http://schemas.openxmlformats.org/presentationml/2006/main" show="0">
   <p:cSld>
     <p:spTree>
@@ -30337,14 +30518,14 @@
                 <a:gridCol w="4119615">
                   <a:extLst>
                     <a:ext uri="{9D8B030D-6E8A-4147-A177-3AD203B41FA5}">
-                      <a16:colId xmlns:a16="http://schemas.microsoft.com/office/drawing/2014/main" xmlns="" val="3644048045"/>
+                      <a16:colId xmlns:a16="http://schemas.microsoft.com/office/drawing/2014/main" val="3644048045"/>
                     </a:ext>
                   </a:extLst>
                 </a:gridCol>
                 <a:gridCol w="4119613">
                   <a:extLst>
                     <a:ext uri="{9D8B030D-6E8A-4147-A177-3AD203B41FA5}">
-                      <a16:colId xmlns:a16="http://schemas.microsoft.com/office/drawing/2014/main" xmlns="" val="2034254753"/>
+                      <a16:colId xmlns:a16="http://schemas.microsoft.com/office/drawing/2014/main" val="2034254753"/>
                     </a:ext>
                   </a:extLst>
                 </a:gridCol>
@@ -30380,7 +30561,7 @@
                 </a:tc>
                 <a:extLst>
                   <a:ext uri="{0D108BD9-81ED-4DB2-BD59-A6C34878D82A}">
-                    <a16:rowId xmlns:a16="http://schemas.microsoft.com/office/drawing/2014/main" xmlns="" val="2708275910"/>
+                    <a16:rowId xmlns:a16="http://schemas.microsoft.com/office/drawing/2014/main" val="2708275910"/>
                   </a:ext>
                 </a:extLst>
               </a:tr>
@@ -30580,7 +30761,7 @@
                 </a:tc>
                 <a:extLst>
                   <a:ext uri="{0D108BD9-81ED-4DB2-BD59-A6C34878D82A}">
-                    <a16:rowId xmlns:a16="http://schemas.microsoft.com/office/drawing/2014/main" xmlns="" val="2161984115"/>
+                    <a16:rowId xmlns:a16="http://schemas.microsoft.com/office/drawing/2014/main" val="2161984115"/>
                   </a:ext>
                 </a:extLst>
               </a:tr>
@@ -30780,7 +30961,7 @@
                 </a:tc>
                 <a:extLst>
                   <a:ext uri="{0D108BD9-81ED-4DB2-BD59-A6C34878D82A}">
-                    <a16:rowId xmlns:a16="http://schemas.microsoft.com/office/drawing/2014/main" xmlns="" val="2841678841"/>
+                    <a16:rowId xmlns:a16="http://schemas.microsoft.com/office/drawing/2014/main" val="2841678841"/>
                   </a:ext>
                 </a:extLst>
               </a:tr>
@@ -30980,7 +31161,7 @@
                 </a:tc>
                 <a:extLst>
                   <a:ext uri="{0D108BD9-81ED-4DB2-BD59-A6C34878D82A}">
-                    <a16:rowId xmlns:a16="http://schemas.microsoft.com/office/drawing/2014/main" xmlns="" val="3144998627"/>
+                    <a16:rowId xmlns:a16="http://schemas.microsoft.com/office/drawing/2014/main" val="3144998627"/>
                   </a:ext>
                 </a:extLst>
               </a:tr>
@@ -31180,7 +31361,7 @@
                 </a:tc>
                 <a:extLst>
                   <a:ext uri="{0D108BD9-81ED-4DB2-BD59-A6C34878D82A}">
-                    <a16:rowId xmlns:a16="http://schemas.microsoft.com/office/drawing/2014/main" xmlns="" val="1419261869"/>
+                    <a16:rowId xmlns:a16="http://schemas.microsoft.com/office/drawing/2014/main" val="1419261869"/>
                   </a:ext>
                 </a:extLst>
               </a:tr>
@@ -31380,7 +31561,7 @@
                 </a:tc>
                 <a:extLst>
                   <a:ext uri="{0D108BD9-81ED-4DB2-BD59-A6C34878D82A}">
-                    <a16:rowId xmlns:a16="http://schemas.microsoft.com/office/drawing/2014/main" xmlns="" val="1427391072"/>
+                    <a16:rowId xmlns:a16="http://schemas.microsoft.com/office/drawing/2014/main" val="1427391072"/>
                   </a:ext>
                 </a:extLst>
               </a:tr>
@@ -31580,7 +31761,7 @@
                 </a:tc>
                 <a:extLst>
                   <a:ext uri="{0D108BD9-81ED-4DB2-BD59-A6C34878D82A}">
-                    <a16:rowId xmlns:a16="http://schemas.microsoft.com/office/drawing/2014/main" xmlns="" val="2346539918"/>
+                    <a16:rowId xmlns:a16="http://schemas.microsoft.com/office/drawing/2014/main" val="2346539918"/>
                   </a:ext>
                 </a:extLst>
               </a:tr>
@@ -31789,7 +31970,7 @@
                 </a:tc>
                 <a:extLst>
                   <a:ext uri="{0D108BD9-81ED-4DB2-BD59-A6C34878D82A}">
-                    <a16:rowId xmlns:a16="http://schemas.microsoft.com/office/drawing/2014/main" xmlns="" val="2275483042"/>
+                    <a16:rowId xmlns:a16="http://schemas.microsoft.com/office/drawing/2014/main" val="2275483042"/>
                   </a:ext>
                 </a:extLst>
               </a:tr>
@@ -31998,7 +32179,7 @@
                 </a:tc>
                 <a:extLst>
                   <a:ext uri="{0D108BD9-81ED-4DB2-BD59-A6C34878D82A}">
-                    <a16:rowId xmlns:a16="http://schemas.microsoft.com/office/drawing/2014/main" xmlns="" val="4202569347"/>
+                    <a16:rowId xmlns:a16="http://schemas.microsoft.com/office/drawing/2014/main" val="4202569347"/>
                   </a:ext>
                 </a:extLst>
               </a:tr>
@@ -32207,7 +32388,7 @@
                 </a:tc>
                 <a:extLst>
                   <a:ext uri="{0D108BD9-81ED-4DB2-BD59-A6C34878D82A}">
-                    <a16:rowId xmlns:a16="http://schemas.microsoft.com/office/drawing/2014/main" xmlns="" val="2989839269"/>
+                    <a16:rowId xmlns:a16="http://schemas.microsoft.com/office/drawing/2014/main" val="2989839269"/>
                   </a:ext>
                 </a:extLst>
               </a:tr>
@@ -32416,7 +32597,7 @@
                 </a:tc>
                 <a:extLst>
                   <a:ext uri="{0D108BD9-81ED-4DB2-BD59-A6C34878D82A}">
-                    <a16:rowId xmlns:a16="http://schemas.microsoft.com/office/drawing/2014/main" xmlns="" val="2130545569"/>
+                    <a16:rowId xmlns:a16="http://schemas.microsoft.com/office/drawing/2014/main" val="2130545569"/>
                   </a:ext>
                 </a:extLst>
               </a:tr>
@@ -32625,7 +32806,7 @@
                 </a:tc>
                 <a:extLst>
                   <a:ext uri="{0D108BD9-81ED-4DB2-BD59-A6C34878D82A}">
-                    <a16:rowId xmlns:a16="http://schemas.microsoft.com/office/drawing/2014/main" xmlns="" val="3045796785"/>
+                    <a16:rowId xmlns:a16="http://schemas.microsoft.com/office/drawing/2014/main" val="3045796785"/>
                   </a:ext>
                 </a:extLst>
               </a:tr>
@@ -32834,7 +33015,7 @@
                 </a:tc>
                 <a:extLst>
                   <a:ext uri="{0D108BD9-81ED-4DB2-BD59-A6C34878D82A}">
-                    <a16:rowId xmlns:a16="http://schemas.microsoft.com/office/drawing/2014/main" xmlns="" val="1091494175"/>
+                    <a16:rowId xmlns:a16="http://schemas.microsoft.com/office/drawing/2014/main" val="1091494175"/>
                   </a:ext>
                 </a:extLst>
               </a:tr>
@@ -32852,18 +33033,10 @@
   <p:clrMapOvr>
     <a:masterClrMapping/>
   </p:clrMapOvr>
-  <mc:AlternateContent xmlns:mc="http://schemas.openxmlformats.org/markup-compatibility/2006" xmlns:p14="http://schemas.microsoft.com/office/powerpoint/2010/main">
-    <mc:Choice Requires="p14">
-      <p:transition spd="slow" p14:dur="2000"/>
-    </mc:Choice>
-    <mc:Fallback xmlns="">
-      <p:transition spd="slow"/>
-    </mc:Fallback>
-  </mc:AlternateContent>
 </p:sld>
 </file>
 
-<file path=ppt/slides/slide37.xml><?xml version="1.0" encoding="utf-8"?>
+<file path=ppt/slides/slide41.xml><?xml version="1.0" encoding="utf-8"?>
 <p:sld xmlns:a="http://schemas.openxmlformats.org/drawingml/2006/main" xmlns:r="http://schemas.openxmlformats.org/officeDocument/2006/relationships" xmlns:p="http://schemas.openxmlformats.org/presentationml/2006/main" show="0">
   <p:cSld>
     <p:spTree>
@@ -32972,18 +33145,10 @@
   <p:clrMapOvr>
     <a:masterClrMapping/>
   </p:clrMapOvr>
-  <mc:AlternateContent xmlns:mc="http://schemas.openxmlformats.org/markup-compatibility/2006" xmlns:p14="http://schemas.microsoft.com/office/powerpoint/2010/main">
-    <mc:Choice Requires="p14">
-      <p:transition spd="slow" p14:dur="2000"/>
-    </mc:Choice>
-    <mc:Fallback xmlns="">
-      <p:transition spd="slow"/>
-    </mc:Fallback>
-  </mc:AlternateContent>
 </p:sld>
 </file>
 
-<file path=ppt/slides/slide38.xml><?xml version="1.0" encoding="utf-8"?>
+<file path=ppt/slides/slide42.xml><?xml version="1.0" encoding="utf-8"?>
 <p:sld xmlns:a="http://schemas.openxmlformats.org/drawingml/2006/main" xmlns:r="http://schemas.openxmlformats.org/officeDocument/2006/relationships" xmlns:p="http://schemas.openxmlformats.org/presentationml/2006/main" show="0">
   <p:cSld>
     <p:spTree>
@@ -33155,18 +33320,10 @@
   <p:clrMapOvr>
     <a:masterClrMapping/>
   </p:clrMapOvr>
-  <mc:AlternateContent xmlns:mc="http://schemas.openxmlformats.org/markup-compatibility/2006" xmlns:p14="http://schemas.microsoft.com/office/powerpoint/2010/main">
-    <mc:Choice Requires="p14">
-      <p:transition spd="slow" p14:dur="2000"/>
-    </mc:Choice>
-    <mc:Fallback xmlns="">
-      <p:transition spd="slow"/>
-    </mc:Fallback>
-  </mc:AlternateContent>
 </p:sld>
 </file>
 
-<file path=ppt/slides/slide39.xml><?xml version="1.0" encoding="utf-8"?>
+<file path=ppt/slides/slide43.xml><?xml version="1.0" encoding="utf-8"?>
 <p:sld xmlns:a="http://schemas.openxmlformats.org/drawingml/2006/main" xmlns:r="http://schemas.openxmlformats.org/officeDocument/2006/relationships" xmlns:p="http://schemas.openxmlformats.org/presentationml/2006/main" show="0">
   <p:cSld>
     <p:spTree>
@@ -33859,140 +34016,10 @@
   <p:clrMapOvr>
     <a:masterClrMapping/>
   </p:clrMapOvr>
-  <mc:AlternateContent xmlns:mc="http://schemas.openxmlformats.org/markup-compatibility/2006" xmlns:p14="http://schemas.microsoft.com/office/powerpoint/2010/main">
-    <mc:Choice Requires="p14">
-      <p:transition spd="slow" p14:dur="2000"/>
-    </mc:Choice>
-    <mc:Fallback xmlns="">
-      <p:transition spd="slow"/>
-    </mc:Fallback>
-  </mc:AlternateContent>
-  <p:timing>
-    <p:tnLst>
-      <p:par>
-        <p:cTn id="1" dur="indefinite" restart="never" nodeType="tmRoot"/>
-      </p:par>
-    </p:tnLst>
-  </p:timing>
 </p:sld>
 </file>
 
-<file path=ppt/slides/slide4.xml><?xml version="1.0" encoding="utf-8"?>
-<p:sld xmlns:a="http://schemas.openxmlformats.org/drawingml/2006/main" xmlns:r="http://schemas.openxmlformats.org/officeDocument/2006/relationships" xmlns:p="http://schemas.openxmlformats.org/presentationml/2006/main">
-  <p:cSld>
-    <p:spTree>
-      <p:nvGrpSpPr>
-        <p:cNvPr id="1" name=""/>
-        <p:cNvGrpSpPr/>
-        <p:nvPr/>
-      </p:nvGrpSpPr>
-      <p:grpSpPr>
-        <a:xfrm>
-          <a:off x="0" y="0"/>
-          <a:ext cx="0" cy="0"/>
-          <a:chOff x="0" y="0"/>
-          <a:chExt cx="0" cy="0"/>
-        </a:xfrm>
-      </p:grpSpPr>
-      <p:sp>
-        <p:nvSpPr>
-          <p:cNvPr id="2" name="Title 1"/>
-          <p:cNvSpPr>
-            <a:spLocks noGrp="1"/>
-          </p:cNvSpPr>
-          <p:nvPr>
-            <p:ph type="title"/>
-          </p:nvPr>
-        </p:nvSpPr>
-        <p:spPr/>
-        <p:txBody>
-          <a:bodyPr/>
-          <a:lstStyle/>
-          <a:p>
-            <a:r>
-              <a:rPr lang="en-US" dirty="0"/>
-              <a:t>Agenda</a:t>
-            </a:r>
-          </a:p>
-        </p:txBody>
-      </p:sp>
-      <p:sp>
-        <p:nvSpPr>
-          <p:cNvPr id="3" name="Content Placeholder 2"/>
-          <p:cNvSpPr>
-            <a:spLocks noGrp="1"/>
-          </p:cNvSpPr>
-          <p:nvPr>
-            <p:ph idx="1"/>
-          </p:nvPr>
-        </p:nvSpPr>
-        <p:spPr/>
-        <p:txBody>
-          <a:bodyPr>
-            <a:normAutofit/>
-          </a:bodyPr>
-          <a:lstStyle/>
-          <a:p>
-            <a:r>
-              <a:rPr lang="en-US" dirty="0"/>
-              <a:t>Background:</a:t>
-            </a:r>
-          </a:p>
-          <a:p>
-            <a:pPr lvl="1"/>
-            <a:r>
-              <a:rPr lang="en-US" dirty="0"/>
-              <a:t>Logical processing order</a:t>
-            </a:r>
-          </a:p>
-          <a:p>
-            <a:pPr lvl="1"/>
-            <a:r>
-              <a:rPr lang="en-US" dirty="0"/>
-              <a:t>Physical processing considerations</a:t>
-            </a:r>
-          </a:p>
-          <a:p>
-            <a:r>
-              <a:rPr lang="en-US" dirty="0"/>
-              <a:t>Executing a query: parse, bind, transform, optimize, execute</a:t>
-            </a:r>
-          </a:p>
-          <a:p>
-            <a:r>
-              <a:rPr lang="en-US" dirty="0"/>
-              <a:t>Heuristics, transformation rules, parse trees, memos</a:t>
-            </a:r>
-          </a:p>
-          <a:p>
-            <a:r>
-              <a:rPr lang="en-US" dirty="0"/>
-              <a:t>Limitations &amp; DMVs</a:t>
-            </a:r>
-          </a:p>
-        </p:txBody>
-      </p:sp>
-    </p:spTree>
-    <p:extLst>
-      <p:ext uri="{BB962C8B-B14F-4D97-AF65-F5344CB8AC3E}">
-        <p14:creationId xmlns:p14="http://schemas.microsoft.com/office/powerpoint/2010/main" val="675647204"/>
-      </p:ext>
-    </p:extLst>
-  </p:cSld>
-  <p:clrMapOvr>
-    <a:masterClrMapping/>
-  </p:clrMapOvr>
-  <p:timing>
-    <p:tnLst>
-      <p:par>
-        <p:cTn id="1" dur="indefinite" restart="never" nodeType="tmRoot"/>
-      </p:par>
-    </p:tnLst>
-  </p:timing>
-</p:sld>
-</file>
-
-<file path=ppt/slides/slide40.xml><?xml version="1.0" encoding="utf-8"?>
+<file path=ppt/slides/slide44.xml><?xml version="1.0" encoding="utf-8"?>
 <p:sld xmlns:a="http://schemas.openxmlformats.org/drawingml/2006/main" xmlns:r="http://schemas.openxmlformats.org/officeDocument/2006/relationships" xmlns:p="http://schemas.openxmlformats.org/presentationml/2006/main">
   <p:cSld>
     <p:spTree>
@@ -34099,17 +34126,10 @@
   <p:clrMapOvr>
     <a:masterClrMapping/>
   </p:clrMapOvr>
-  <p:timing>
-    <p:tnLst>
-      <p:par>
-        <p:cTn id="1" dur="indefinite" restart="never" nodeType="tmRoot"/>
-      </p:par>
-    </p:tnLst>
-  </p:timing>
 </p:sld>
 </file>
 
-<file path=ppt/slides/slide41.xml><?xml version="1.0" encoding="utf-8"?>
+<file path=ppt/slides/slide45.xml><?xml version="1.0" encoding="utf-8"?>
 <p:sld xmlns:a="http://schemas.openxmlformats.org/drawingml/2006/main" xmlns:r="http://schemas.openxmlformats.org/officeDocument/2006/relationships" xmlns:p="http://schemas.openxmlformats.org/presentationml/2006/main" show="0">
   <p:cSld>
     <p:spTree>
@@ -34408,25 +34428,10 @@
   <p:clrMapOvr>
     <a:masterClrMapping/>
   </p:clrMapOvr>
-  <mc:AlternateContent xmlns:mc="http://schemas.openxmlformats.org/markup-compatibility/2006" xmlns:p14="http://schemas.microsoft.com/office/powerpoint/2010/main">
-    <mc:Choice Requires="p14">
-      <p:transition spd="slow" p14:dur="2000"/>
-    </mc:Choice>
-    <mc:Fallback xmlns="">
-      <p:transition spd="slow"/>
-    </mc:Fallback>
-  </mc:AlternateContent>
-  <p:timing>
-    <p:tnLst>
-      <p:par>
-        <p:cTn id="1" dur="indefinite" restart="never" nodeType="tmRoot"/>
-      </p:par>
-    </p:tnLst>
-  </p:timing>
 </p:sld>
 </file>
 
-<file path=ppt/slides/slide42.xml><?xml version="1.0" encoding="utf-8"?>
+<file path=ppt/slides/slide46.xml><?xml version="1.0" encoding="utf-8"?>
 <p:sld xmlns:a="http://schemas.openxmlformats.org/drawingml/2006/main" xmlns:r="http://schemas.openxmlformats.org/officeDocument/2006/relationships" xmlns:p="http://schemas.openxmlformats.org/presentationml/2006/main">
   <p:cSld>
     <p:spTree>
@@ -34588,17 +34593,10 @@
   <p:clrMapOvr>
     <a:masterClrMapping/>
   </p:clrMapOvr>
-  <p:timing>
-    <p:tnLst>
-      <p:par>
-        <p:cTn id="1" dur="indefinite" restart="never" nodeType="tmRoot"/>
-      </p:par>
-    </p:tnLst>
-  </p:timing>
 </p:sld>
 </file>
 
-<file path=ppt/slides/slide43.xml><?xml version="1.0" encoding="utf-8"?>
+<file path=ppt/slides/slide47.xml><?xml version="1.0" encoding="utf-8"?>
 <p:sld xmlns:a="http://schemas.openxmlformats.org/drawingml/2006/main" xmlns:r="http://schemas.openxmlformats.org/officeDocument/2006/relationships" xmlns:p="http://schemas.openxmlformats.org/presentationml/2006/main">
   <p:cSld>
     <p:spTree>
@@ -34730,17 +34728,10 @@
   <p:clrMapOvr>
     <a:masterClrMapping/>
   </p:clrMapOvr>
-  <p:timing>
-    <p:tnLst>
-      <p:par>
-        <p:cTn id="1" dur="indefinite" restart="never" nodeType="tmRoot"/>
-      </p:par>
-    </p:tnLst>
-  </p:timing>
 </p:sld>
 </file>
 
-<file path=ppt/slides/slide44.xml><?xml version="1.0" encoding="utf-8"?>
+<file path=ppt/slides/slide48.xml><?xml version="1.0" encoding="utf-8"?>
 <p:sld xmlns:a="http://schemas.openxmlformats.org/drawingml/2006/main" xmlns:r="http://schemas.openxmlformats.org/officeDocument/2006/relationships" xmlns:p="http://schemas.openxmlformats.org/presentationml/2006/main">
   <p:cSld>
     <p:spTree>
@@ -34905,17 +34896,10 @@
   <p:clrMapOvr>
     <a:masterClrMapping/>
   </p:clrMapOvr>
-  <p:timing>
-    <p:tnLst>
-      <p:par>
-        <p:cTn id="1" dur="indefinite" restart="never" nodeType="tmRoot"/>
-      </p:par>
-    </p:tnLst>
-  </p:timing>
 </p:sld>
 </file>
 
-<file path=ppt/slides/slide45.xml><?xml version="1.0" encoding="utf-8"?>
+<file path=ppt/slides/slide49.xml><?xml version="1.0" encoding="utf-8"?>
 <p:sld xmlns:a="http://schemas.openxmlformats.org/drawingml/2006/main" xmlns:r="http://schemas.openxmlformats.org/officeDocument/2006/relationships" xmlns:p="http://schemas.openxmlformats.org/presentationml/2006/main">
   <p:cSld>
     <p:spTree>
@@ -35051,17 +35035,10 @@
   <p:clrMapOvr>
     <a:masterClrMapping/>
   </p:clrMapOvr>
-  <p:timing>
-    <p:tnLst>
-      <p:par>
-        <p:cTn id="1" dur="indefinite" restart="never" nodeType="tmRoot"/>
-      </p:par>
-    </p:tnLst>
-  </p:timing>
 </p:sld>
 </file>
 
-<file path=ppt/slides/slide46.xml><?xml version="1.0" encoding="utf-8"?>
+<file path=ppt/slides/slide5.xml><?xml version="1.0" encoding="utf-8"?>
 <p:sld xmlns:a="http://schemas.openxmlformats.org/drawingml/2006/main" xmlns:r="http://schemas.openxmlformats.org/officeDocument/2006/relationships" xmlns:p="http://schemas.openxmlformats.org/presentationml/2006/main">
   <p:cSld>
     <p:spTree>
@@ -35095,7 +35072,7 @@
           <a:p>
             <a:r>
               <a:rPr lang="en-US" dirty="0"/>
-              <a:t>Transformations: Property Enforcement</a:t>
+              <a:t>This Is Only the Foundation</a:t>
             </a:r>
           </a:p>
         </p:txBody>
@@ -35117,6 +35094,98 @@
           <a:p>
             <a:r>
               <a:rPr lang="en-US" dirty="0"/>
+              <a:t>The materials we are covering here will only skim the surface of what is possible.</a:t>
+            </a:r>
+          </a:p>
+          <a:p>
+            <a:r>
+              <a:rPr lang="en-US" dirty="0"/>
+              <a:t>Understanding optimizer internals takes time and study.</a:t>
+            </a:r>
+          </a:p>
+          <a:p>
+            <a:r>
+              <a:rPr lang="en-US" dirty="0"/>
+              <a:t>Many features you run across have minimal available information out there.</a:t>
+            </a:r>
+          </a:p>
+          <a:p>
+            <a:r>
+              <a:rPr lang="en-US" dirty="0"/>
+              <a:t>Don’t get frustrated … just keep on diving in (if this is interesting to you)!</a:t>
+            </a:r>
+          </a:p>
+        </p:txBody>
+      </p:sp>
+    </p:spTree>
+    <p:extLst>
+      <p:ext uri="{BB962C8B-B14F-4D97-AF65-F5344CB8AC3E}">
+        <p14:creationId xmlns:p14="http://schemas.microsoft.com/office/powerpoint/2010/main" val="3795359134"/>
+      </p:ext>
+    </p:extLst>
+  </p:cSld>
+  <p:clrMapOvr>
+    <a:masterClrMapping/>
+  </p:clrMapOvr>
+</p:sld>
+</file>
+
+<file path=ppt/slides/slide50.xml><?xml version="1.0" encoding="utf-8"?>
+<p:sld xmlns:a="http://schemas.openxmlformats.org/drawingml/2006/main" xmlns:r="http://schemas.openxmlformats.org/officeDocument/2006/relationships" xmlns:p="http://schemas.openxmlformats.org/presentationml/2006/main">
+  <p:cSld>
+    <p:spTree>
+      <p:nvGrpSpPr>
+        <p:cNvPr id="1" name=""/>
+        <p:cNvGrpSpPr/>
+        <p:nvPr/>
+      </p:nvGrpSpPr>
+      <p:grpSpPr>
+        <a:xfrm>
+          <a:off x="0" y="0"/>
+          <a:ext cx="0" cy="0"/>
+          <a:chOff x="0" y="0"/>
+          <a:chExt cx="0" cy="0"/>
+        </a:xfrm>
+      </p:grpSpPr>
+      <p:sp>
+        <p:nvSpPr>
+          <p:cNvPr id="2" name="Title 1"/>
+          <p:cNvSpPr>
+            <a:spLocks noGrp="1"/>
+          </p:cNvSpPr>
+          <p:nvPr>
+            <p:ph type="title"/>
+          </p:nvPr>
+        </p:nvSpPr>
+        <p:spPr/>
+        <p:txBody>
+          <a:bodyPr/>
+          <a:lstStyle/>
+          <a:p>
+            <a:r>
+              <a:rPr lang="en-US" dirty="0"/>
+              <a:t>Transformations: Property Enforcement</a:t>
+            </a:r>
+          </a:p>
+        </p:txBody>
+      </p:sp>
+      <p:sp>
+        <p:nvSpPr>
+          <p:cNvPr id="3" name="Content Placeholder 2"/>
+          <p:cNvSpPr>
+            <a:spLocks noGrp="1"/>
+          </p:cNvSpPr>
+          <p:nvPr>
+            <p:ph idx="1"/>
+          </p:nvPr>
+        </p:nvSpPr>
+        <p:spPr/>
+        <p:txBody>
+          <a:bodyPr/>
+          <a:lstStyle/>
+          <a:p>
+            <a:r>
+              <a:rPr lang="en-US" dirty="0"/>
               <a:t>Properties associated with parse tree nodes</a:t>
             </a:r>
           </a:p>
@@ -35167,17 +35236,10 @@
   <p:clrMapOvr>
     <a:masterClrMapping/>
   </p:clrMapOvr>
-  <p:timing>
-    <p:tnLst>
-      <p:par>
-        <p:cTn id="1" dur="indefinite" restart="never" nodeType="tmRoot"/>
-      </p:par>
-    </p:tnLst>
-  </p:timing>
 </p:sld>
 </file>
 
-<file path=ppt/slides/slide47.xml><?xml version="1.0" encoding="utf-8"?>
+<file path=ppt/slides/slide51.xml><?xml version="1.0" encoding="utf-8"?>
 <p:sld xmlns:a="http://schemas.openxmlformats.org/drawingml/2006/main" xmlns:r="http://schemas.openxmlformats.org/officeDocument/2006/relationships" xmlns:p="http://schemas.openxmlformats.org/presentationml/2006/main">
   <p:cSld>
     <p:spTree>
@@ -35340,17 +35402,10 @@
   <p:clrMapOvr>
     <a:masterClrMapping/>
   </p:clrMapOvr>
-  <p:timing>
-    <p:tnLst>
-      <p:par>
-        <p:cTn id="1" dur="indefinite" restart="never" nodeType="tmRoot"/>
-      </p:par>
-    </p:tnLst>
-  </p:timing>
 </p:sld>
 </file>
 
-<file path=ppt/slides/slide48.xml><?xml version="1.0" encoding="utf-8"?>
+<file path=ppt/slides/slide52.xml><?xml version="1.0" encoding="utf-8"?>
 <p:sld xmlns:a="http://schemas.openxmlformats.org/drawingml/2006/main" xmlns:r="http://schemas.openxmlformats.org/officeDocument/2006/relationships" xmlns:p="http://schemas.openxmlformats.org/presentationml/2006/main" show="0">
   <p:cSld>
     <p:spTree>
@@ -35469,25 +35524,10 @@
   <p:clrMapOvr>
     <a:masterClrMapping/>
   </p:clrMapOvr>
-  <mc:AlternateContent xmlns:mc="http://schemas.openxmlformats.org/markup-compatibility/2006" xmlns:p14="http://schemas.microsoft.com/office/powerpoint/2010/main">
-    <mc:Choice Requires="p14">
-      <p:transition spd="slow" p14:dur="2000"/>
-    </mc:Choice>
-    <mc:Fallback xmlns="">
-      <p:transition spd="slow"/>
-    </mc:Fallback>
-  </mc:AlternateContent>
-  <p:timing>
-    <p:tnLst>
-      <p:par>
-        <p:cTn id="1" dur="indefinite" restart="never" nodeType="tmRoot"/>
-      </p:par>
-    </p:tnLst>
-  </p:timing>
 </p:sld>
 </file>
 
-<file path=ppt/slides/slide49.xml><?xml version="1.0" encoding="utf-8"?>
+<file path=ppt/slides/slide53.xml><?xml version="1.0" encoding="utf-8"?>
 <p:sld xmlns:a="http://schemas.openxmlformats.org/drawingml/2006/main" xmlns:r="http://schemas.openxmlformats.org/officeDocument/2006/relationships" xmlns:p="http://schemas.openxmlformats.org/presentationml/2006/main">
   <p:cSld>
     <p:spTree>
@@ -35590,17 +35630,10 @@
   <p:clrMapOvr>
     <a:masterClrMapping/>
   </p:clrMapOvr>
-  <p:timing>
-    <p:tnLst>
-      <p:par>
-        <p:cTn id="1" dur="indefinite" restart="never" nodeType="tmRoot"/>
-      </p:par>
-    </p:tnLst>
-  </p:timing>
 </p:sld>
 </file>
 
-<file path=ppt/slides/slide5.xml><?xml version="1.0" encoding="utf-8"?>
+<file path=ppt/slides/slide54.xml><?xml version="1.0" encoding="utf-8"?>
 <p:sld xmlns:a="http://schemas.openxmlformats.org/drawingml/2006/main" xmlns:r="http://schemas.openxmlformats.org/officeDocument/2006/relationships" xmlns:p="http://schemas.openxmlformats.org/presentationml/2006/main">
   <p:cSld>
     <p:spTree>
@@ -35633,107 +35666,6 @@
           <a:lstStyle/>
           <a:p>
             <a:r>
-              <a:rPr lang="en-US" dirty="0" smtClean="0"/>
-              <a:t>This Is Only the Foundation</a:t>
-            </a:r>
-            <a:endParaRPr lang="en-US" dirty="0"/>
-          </a:p>
-        </p:txBody>
-      </p:sp>
-      <p:sp>
-        <p:nvSpPr>
-          <p:cNvPr id="3" name="Content Placeholder 2"/>
-          <p:cNvSpPr>
-            <a:spLocks noGrp="1"/>
-          </p:cNvSpPr>
-          <p:nvPr>
-            <p:ph idx="1"/>
-          </p:nvPr>
-        </p:nvSpPr>
-        <p:spPr/>
-        <p:txBody>
-          <a:bodyPr/>
-          <a:lstStyle/>
-          <a:p>
-            <a:r>
-              <a:rPr lang="en-US" dirty="0" smtClean="0"/>
-              <a:t>The materials we are covering here will only skim the surface of what is possible.</a:t>
-            </a:r>
-          </a:p>
-          <a:p>
-            <a:r>
-              <a:rPr lang="en-US" dirty="0" smtClean="0"/>
-              <a:t>Understanding optimizer internals takes time and study.</a:t>
-            </a:r>
-          </a:p>
-          <a:p>
-            <a:r>
-              <a:rPr lang="en-US" dirty="0" smtClean="0"/>
-              <a:t>Many features you run across have minimal available information out there.</a:t>
-            </a:r>
-          </a:p>
-          <a:p>
-            <a:r>
-              <a:rPr lang="en-US" dirty="0" smtClean="0"/>
-              <a:t>Don’t get frustrated … just keep on diving in (if this is interesting to you)!</a:t>
-            </a:r>
-            <a:endParaRPr lang="en-US" dirty="0"/>
-          </a:p>
-        </p:txBody>
-      </p:sp>
-    </p:spTree>
-    <p:extLst>
-      <p:ext uri="{BB962C8B-B14F-4D97-AF65-F5344CB8AC3E}">
-        <p14:creationId xmlns:p14="http://schemas.microsoft.com/office/powerpoint/2010/main" val="3795359134"/>
-      </p:ext>
-    </p:extLst>
-  </p:cSld>
-  <p:clrMapOvr>
-    <a:masterClrMapping/>
-  </p:clrMapOvr>
-  <p:timing>
-    <p:tnLst>
-      <p:par>
-        <p:cTn id="1" dur="indefinite" restart="never" nodeType="tmRoot"/>
-      </p:par>
-    </p:tnLst>
-  </p:timing>
-</p:sld>
-</file>
-
-<file path=ppt/slides/slide50.xml><?xml version="1.0" encoding="utf-8"?>
-<p:sld xmlns:a="http://schemas.openxmlformats.org/drawingml/2006/main" xmlns:r="http://schemas.openxmlformats.org/officeDocument/2006/relationships" xmlns:p="http://schemas.openxmlformats.org/presentationml/2006/main">
-  <p:cSld>
-    <p:spTree>
-      <p:nvGrpSpPr>
-        <p:cNvPr id="1" name=""/>
-        <p:cNvGrpSpPr/>
-        <p:nvPr/>
-      </p:nvGrpSpPr>
-      <p:grpSpPr>
-        <a:xfrm>
-          <a:off x="0" y="0"/>
-          <a:ext cx="0" cy="0"/>
-          <a:chOff x="0" y="0"/>
-          <a:chExt cx="0" cy="0"/>
-        </a:xfrm>
-      </p:grpSpPr>
-      <p:sp>
-        <p:nvSpPr>
-          <p:cNvPr id="2" name="Title 1"/>
-          <p:cNvSpPr>
-            <a:spLocks noGrp="1"/>
-          </p:cNvSpPr>
-          <p:nvPr>
-            <p:ph type="title"/>
-          </p:nvPr>
-        </p:nvSpPr>
-        <p:spPr/>
-        <p:txBody>
-          <a:bodyPr/>
-          <a:lstStyle/>
-          <a:p>
-            <a:r>
               <a:rPr lang="en-US" dirty="0"/>
               <a:t>Example Memo</a:t>
             </a:r>
@@ -36383,14 +36315,14 @@
                 <a:gridCol w="957714">
                   <a:extLst>
                     <a:ext uri="{9D8B030D-6E8A-4147-A177-3AD203B41FA5}">
-                      <a16:colId xmlns:a16="http://schemas.microsoft.com/office/drawing/2014/main" xmlns="" val="3940544257"/>
+                      <a16:colId xmlns:a16="http://schemas.microsoft.com/office/drawing/2014/main" val="3940544257"/>
                     </a:ext>
                   </a:extLst>
                 </a:gridCol>
                 <a:gridCol w="2464067">
                   <a:extLst>
                     <a:ext uri="{9D8B030D-6E8A-4147-A177-3AD203B41FA5}">
-                      <a16:colId xmlns:a16="http://schemas.microsoft.com/office/drawing/2014/main" xmlns="" val="3658567973"/>
+                      <a16:colId xmlns:a16="http://schemas.microsoft.com/office/drawing/2014/main" val="3658567973"/>
                     </a:ext>
                   </a:extLst>
                 </a:gridCol>
@@ -36424,7 +36356,7 @@
                 </a:tc>
                 <a:extLst>
                   <a:ext uri="{0D108BD9-81ED-4DB2-BD59-A6C34878D82A}">
-                    <a16:rowId xmlns:a16="http://schemas.microsoft.com/office/drawing/2014/main" xmlns="" val="1032275335"/>
+                    <a16:rowId xmlns:a16="http://schemas.microsoft.com/office/drawing/2014/main" val="1032275335"/>
                   </a:ext>
                 </a:extLst>
               </a:tr>
@@ -36554,7 +36486,7 @@
                 </a:tc>
                 <a:extLst>
                   <a:ext uri="{0D108BD9-81ED-4DB2-BD59-A6C34878D82A}">
-                    <a16:rowId xmlns:a16="http://schemas.microsoft.com/office/drawing/2014/main" xmlns="" val="4191484087"/>
+                    <a16:rowId xmlns:a16="http://schemas.microsoft.com/office/drawing/2014/main" val="4191484087"/>
                   </a:ext>
                 </a:extLst>
               </a:tr>
@@ -36628,7 +36560,7 @@
                 </a:tc>
                 <a:extLst>
                   <a:ext uri="{0D108BD9-81ED-4DB2-BD59-A6C34878D82A}">
-                    <a16:rowId xmlns:a16="http://schemas.microsoft.com/office/drawing/2014/main" xmlns="" val="1864588626"/>
+                    <a16:rowId xmlns:a16="http://schemas.microsoft.com/office/drawing/2014/main" val="1864588626"/>
                   </a:ext>
                 </a:extLst>
               </a:tr>
@@ -36750,7 +36682,7 @@
                 </a:tc>
                 <a:extLst>
                   <a:ext uri="{0D108BD9-81ED-4DB2-BD59-A6C34878D82A}">
-                    <a16:rowId xmlns:a16="http://schemas.microsoft.com/office/drawing/2014/main" xmlns="" val="3035259714"/>
+                    <a16:rowId xmlns:a16="http://schemas.microsoft.com/office/drawing/2014/main" val="3035259714"/>
                   </a:ext>
                 </a:extLst>
               </a:tr>
@@ -36839,7 +36771,7 @@
                 </a:tc>
                 <a:extLst>
                   <a:ext uri="{0D108BD9-81ED-4DB2-BD59-A6C34878D82A}">
-                    <a16:rowId xmlns:a16="http://schemas.microsoft.com/office/drawing/2014/main" xmlns="" val="2023621082"/>
+                    <a16:rowId xmlns:a16="http://schemas.microsoft.com/office/drawing/2014/main" val="2023621082"/>
                   </a:ext>
                 </a:extLst>
               </a:tr>
@@ -36928,7 +36860,7 @@
                 </a:tc>
                 <a:extLst>
                   <a:ext uri="{0D108BD9-81ED-4DB2-BD59-A6C34878D82A}">
-                    <a16:rowId xmlns:a16="http://schemas.microsoft.com/office/drawing/2014/main" xmlns="" val="120016333"/>
+                    <a16:rowId xmlns:a16="http://schemas.microsoft.com/office/drawing/2014/main" val="120016333"/>
                   </a:ext>
                 </a:extLst>
               </a:tr>
@@ -36946,17 +36878,10 @@
   <p:clrMapOvr>
     <a:masterClrMapping/>
   </p:clrMapOvr>
-  <p:timing>
-    <p:tnLst>
-      <p:par>
-        <p:cTn id="1" dur="indefinite" restart="never" nodeType="tmRoot"/>
-      </p:par>
-    </p:tnLst>
-  </p:timing>
 </p:sld>
 </file>
 
-<file path=ppt/slides/slide51.xml><?xml version="1.0" encoding="utf-8"?>
+<file path=ppt/slides/slide55.xml><?xml version="1.0" encoding="utf-8"?>
 <p:sld xmlns:a="http://schemas.openxmlformats.org/drawingml/2006/main" xmlns:r="http://schemas.openxmlformats.org/officeDocument/2006/relationships" xmlns:p="http://schemas.openxmlformats.org/presentationml/2006/main">
   <p:cSld>
     <p:spTree>
@@ -37080,21 +37005,21 @@
                 <a:gridCol w="960120">
                   <a:extLst>
                     <a:ext uri="{9D8B030D-6E8A-4147-A177-3AD203B41FA5}">
-                      <a16:colId xmlns:a16="http://schemas.microsoft.com/office/drawing/2014/main" xmlns="" val="392696932"/>
+                      <a16:colId xmlns:a16="http://schemas.microsoft.com/office/drawing/2014/main" val="392696932"/>
                     </a:ext>
                   </a:extLst>
                 </a:gridCol>
                 <a:gridCol w="2468880">
                   <a:extLst>
                     <a:ext uri="{9D8B030D-6E8A-4147-A177-3AD203B41FA5}">
-                      <a16:colId xmlns:a16="http://schemas.microsoft.com/office/drawing/2014/main" xmlns="" val="2769969192"/>
+                      <a16:colId xmlns:a16="http://schemas.microsoft.com/office/drawing/2014/main" val="2769969192"/>
                     </a:ext>
                   </a:extLst>
                 </a:gridCol>
                 <a:gridCol w="2468880">
                   <a:extLst>
                     <a:ext uri="{9D8B030D-6E8A-4147-A177-3AD203B41FA5}">
-                      <a16:colId xmlns:a16="http://schemas.microsoft.com/office/drawing/2014/main" xmlns="" val="2022610816"/>
+                      <a16:colId xmlns:a16="http://schemas.microsoft.com/office/drawing/2014/main" val="2022610816"/>
                     </a:ext>
                   </a:extLst>
                 </a:gridCol>
@@ -37146,7 +37071,7 @@
                 </a:tc>
                 <a:extLst>
                   <a:ext uri="{0D108BD9-81ED-4DB2-BD59-A6C34878D82A}">
-                    <a16:rowId xmlns:a16="http://schemas.microsoft.com/office/drawing/2014/main" xmlns="" val="2344937666"/>
+                    <a16:rowId xmlns:a16="http://schemas.microsoft.com/office/drawing/2014/main" val="2344937666"/>
                   </a:ext>
                 </a:extLst>
               </a:tr>
@@ -37279,7 +37204,7 @@
                 </a:tc>
                 <a:extLst>
                   <a:ext uri="{0D108BD9-81ED-4DB2-BD59-A6C34878D82A}">
-                    <a16:rowId xmlns:a16="http://schemas.microsoft.com/office/drawing/2014/main" xmlns="" val="1917341330"/>
+                    <a16:rowId xmlns:a16="http://schemas.microsoft.com/office/drawing/2014/main" val="1917341330"/>
                   </a:ext>
                 </a:extLst>
               </a:tr>
@@ -37496,7 +37421,7 @@
                 </a:tc>
                 <a:extLst>
                   <a:ext uri="{0D108BD9-81ED-4DB2-BD59-A6C34878D82A}">
-                    <a16:rowId xmlns:a16="http://schemas.microsoft.com/office/drawing/2014/main" xmlns="" val="3088042860"/>
+                    <a16:rowId xmlns:a16="http://schemas.microsoft.com/office/drawing/2014/main" val="3088042860"/>
                   </a:ext>
                 </a:extLst>
               </a:tr>
@@ -37580,7 +37505,7 @@
                 </a:tc>
                 <a:extLst>
                   <a:ext uri="{0D108BD9-81ED-4DB2-BD59-A6C34878D82A}">
-                    <a16:rowId xmlns:a16="http://schemas.microsoft.com/office/drawing/2014/main" xmlns="" val="2658530722"/>
+                    <a16:rowId xmlns:a16="http://schemas.microsoft.com/office/drawing/2014/main" val="2658530722"/>
                   </a:ext>
                 </a:extLst>
               </a:tr>
@@ -37712,7 +37637,7 @@
                 </a:tc>
                 <a:extLst>
                   <a:ext uri="{0D108BD9-81ED-4DB2-BD59-A6C34878D82A}">
-                    <a16:rowId xmlns:a16="http://schemas.microsoft.com/office/drawing/2014/main" xmlns="" val="1481886367"/>
+                    <a16:rowId xmlns:a16="http://schemas.microsoft.com/office/drawing/2014/main" val="1481886367"/>
                   </a:ext>
                 </a:extLst>
               </a:tr>
@@ -37811,7 +37736,7 @@
                 </a:tc>
                 <a:extLst>
                   <a:ext uri="{0D108BD9-81ED-4DB2-BD59-A6C34878D82A}">
-                    <a16:rowId xmlns:a16="http://schemas.microsoft.com/office/drawing/2014/main" xmlns="" val="4248384778"/>
+                    <a16:rowId xmlns:a16="http://schemas.microsoft.com/office/drawing/2014/main" val="4248384778"/>
                   </a:ext>
                 </a:extLst>
               </a:tr>
@@ -37910,7 +37835,7 @@
                 </a:tc>
                 <a:extLst>
                   <a:ext uri="{0D108BD9-81ED-4DB2-BD59-A6C34878D82A}">
-                    <a16:rowId xmlns:a16="http://schemas.microsoft.com/office/drawing/2014/main" xmlns="" val="1670483340"/>
+                    <a16:rowId xmlns:a16="http://schemas.microsoft.com/office/drawing/2014/main" val="1670483340"/>
                   </a:ext>
                 </a:extLst>
               </a:tr>
@@ -37928,17 +37853,10 @@
   <p:clrMapOvr>
     <a:masterClrMapping/>
   </p:clrMapOvr>
-  <p:timing>
-    <p:tnLst>
-      <p:par>
-        <p:cTn id="1" dur="indefinite" restart="never" nodeType="tmRoot"/>
-      </p:par>
-    </p:tnLst>
-  </p:timing>
 </p:sld>
 </file>
 
-<file path=ppt/slides/slide52.xml><?xml version="1.0" encoding="utf-8"?>
+<file path=ppt/slides/slide56.xml><?xml version="1.0" encoding="utf-8"?>
 <p:sld xmlns:a="http://schemas.openxmlformats.org/drawingml/2006/main" xmlns:r="http://schemas.openxmlformats.org/officeDocument/2006/relationships" xmlns:p="http://schemas.openxmlformats.org/presentationml/2006/main">
   <p:cSld>
     <p:spTree>
@@ -38062,28 +37980,28 @@
                 <a:gridCol w="960120">
                   <a:extLst>
                     <a:ext uri="{9D8B030D-6E8A-4147-A177-3AD203B41FA5}">
-                      <a16:colId xmlns:a16="http://schemas.microsoft.com/office/drawing/2014/main" xmlns="" val="392696932"/>
+                      <a16:colId xmlns:a16="http://schemas.microsoft.com/office/drawing/2014/main" val="392696932"/>
                     </a:ext>
                   </a:extLst>
                 </a:gridCol>
                 <a:gridCol w="2468880">
                   <a:extLst>
                     <a:ext uri="{9D8B030D-6E8A-4147-A177-3AD203B41FA5}">
-                      <a16:colId xmlns:a16="http://schemas.microsoft.com/office/drawing/2014/main" xmlns="" val="2769969192"/>
+                      <a16:colId xmlns:a16="http://schemas.microsoft.com/office/drawing/2014/main" val="2769969192"/>
                     </a:ext>
                   </a:extLst>
                 </a:gridCol>
                 <a:gridCol w="2468880">
                   <a:extLst>
                     <a:ext uri="{9D8B030D-6E8A-4147-A177-3AD203B41FA5}">
-                      <a16:colId xmlns:a16="http://schemas.microsoft.com/office/drawing/2014/main" xmlns="" val="2022610816"/>
+                      <a16:colId xmlns:a16="http://schemas.microsoft.com/office/drawing/2014/main" val="2022610816"/>
                     </a:ext>
                   </a:extLst>
                 </a:gridCol>
                 <a:gridCol w="2468880">
                   <a:extLst>
                     <a:ext uri="{9D8B030D-6E8A-4147-A177-3AD203B41FA5}">
-                      <a16:colId xmlns:a16="http://schemas.microsoft.com/office/drawing/2014/main" xmlns="" val="102813283"/>
+                      <a16:colId xmlns:a16="http://schemas.microsoft.com/office/drawing/2014/main" val="102813283"/>
                     </a:ext>
                   </a:extLst>
                 </a:gridCol>
@@ -38148,7 +38066,7 @@
                 </a:tc>
                 <a:extLst>
                   <a:ext uri="{0D108BD9-81ED-4DB2-BD59-A6C34878D82A}">
-                    <a16:rowId xmlns:a16="http://schemas.microsoft.com/office/drawing/2014/main" xmlns="" val="2344937666"/>
+                    <a16:rowId xmlns:a16="http://schemas.microsoft.com/office/drawing/2014/main" val="2344937666"/>
                   </a:ext>
                 </a:extLst>
               </a:tr>
@@ -38308,7 +38226,7 @@
                 </a:tc>
                 <a:extLst>
                   <a:ext uri="{0D108BD9-81ED-4DB2-BD59-A6C34878D82A}">
-                    <a16:rowId xmlns:a16="http://schemas.microsoft.com/office/drawing/2014/main" xmlns="" val="1917341330"/>
+                    <a16:rowId xmlns:a16="http://schemas.microsoft.com/office/drawing/2014/main" val="1917341330"/>
                   </a:ext>
                 </a:extLst>
               </a:tr>
@@ -38612,7 +38530,7 @@
                 </a:tc>
                 <a:extLst>
                   <a:ext uri="{0D108BD9-81ED-4DB2-BD59-A6C34878D82A}">
-                    <a16:rowId xmlns:a16="http://schemas.microsoft.com/office/drawing/2014/main" xmlns="" val="3088042860"/>
+                    <a16:rowId xmlns:a16="http://schemas.microsoft.com/office/drawing/2014/main" val="3088042860"/>
                   </a:ext>
                 </a:extLst>
               </a:tr>
@@ -38706,7 +38624,7 @@
                 </a:tc>
                 <a:extLst>
                   <a:ext uri="{0D108BD9-81ED-4DB2-BD59-A6C34878D82A}">
-                    <a16:rowId xmlns:a16="http://schemas.microsoft.com/office/drawing/2014/main" xmlns="" val="2658530722"/>
+                    <a16:rowId xmlns:a16="http://schemas.microsoft.com/office/drawing/2014/main" val="2658530722"/>
                   </a:ext>
                 </a:extLst>
               </a:tr>
@@ -38899,7 +38817,7 @@
                 </a:tc>
                 <a:extLst>
                   <a:ext uri="{0D108BD9-81ED-4DB2-BD59-A6C34878D82A}">
-                    <a16:rowId xmlns:a16="http://schemas.microsoft.com/office/drawing/2014/main" xmlns="" val="1481886367"/>
+                    <a16:rowId xmlns:a16="http://schemas.microsoft.com/office/drawing/2014/main" val="1481886367"/>
                   </a:ext>
                 </a:extLst>
               </a:tr>
@@ -39008,7 +38926,7 @@
                 </a:tc>
                 <a:extLst>
                   <a:ext uri="{0D108BD9-81ED-4DB2-BD59-A6C34878D82A}">
-                    <a16:rowId xmlns:a16="http://schemas.microsoft.com/office/drawing/2014/main" xmlns="" val="4248384778"/>
+                    <a16:rowId xmlns:a16="http://schemas.microsoft.com/office/drawing/2014/main" val="4248384778"/>
                   </a:ext>
                 </a:extLst>
               </a:tr>
@@ -39117,7 +39035,7 @@
                 </a:tc>
                 <a:extLst>
                   <a:ext uri="{0D108BD9-81ED-4DB2-BD59-A6C34878D82A}">
-                    <a16:rowId xmlns:a16="http://schemas.microsoft.com/office/drawing/2014/main" xmlns="" val="1670483340"/>
+                    <a16:rowId xmlns:a16="http://schemas.microsoft.com/office/drawing/2014/main" val="1670483340"/>
                   </a:ext>
                 </a:extLst>
               </a:tr>
@@ -39176,17 +39094,10 @@
   <p:clrMapOvr>
     <a:masterClrMapping/>
   </p:clrMapOvr>
-  <p:timing>
-    <p:tnLst>
-      <p:par>
-        <p:cTn id="1" dur="indefinite" restart="never" nodeType="tmRoot"/>
-      </p:par>
-    </p:tnLst>
-  </p:timing>
 </p:sld>
 </file>
 
-<file path=ppt/slides/slide53.xml><?xml version="1.0" encoding="utf-8"?>
+<file path=ppt/slides/slide57.xml><?xml version="1.0" encoding="utf-8"?>
 <p:sld xmlns:a="http://schemas.openxmlformats.org/drawingml/2006/main" xmlns:r="http://schemas.openxmlformats.org/officeDocument/2006/relationships" xmlns:p="http://schemas.openxmlformats.org/presentationml/2006/main">
   <p:cSld>
     <p:spTree>
@@ -39333,17 +39244,10 @@
   <p:clrMapOvr>
     <a:masterClrMapping/>
   </p:clrMapOvr>
-  <p:timing>
-    <p:tnLst>
-      <p:par>
-        <p:cTn id="1" dur="indefinite" restart="never" nodeType="tmRoot"/>
-      </p:par>
-    </p:tnLst>
-  </p:timing>
 </p:sld>
 </file>
 
-<file path=ppt/slides/slide54.xml><?xml version="1.0" encoding="utf-8"?>
+<file path=ppt/slides/slide58.xml><?xml version="1.0" encoding="utf-8"?>
 <p:sld xmlns:a="http://schemas.openxmlformats.org/drawingml/2006/main" xmlns:r="http://schemas.openxmlformats.org/officeDocument/2006/relationships" xmlns:p="http://schemas.openxmlformats.org/presentationml/2006/main">
   <p:cSld>
     <p:spTree>
@@ -39468,17 +39372,10 @@
   <p:clrMapOvr>
     <a:masterClrMapping/>
   </p:clrMapOvr>
-  <p:timing>
-    <p:tnLst>
-      <p:par>
-        <p:cTn id="1" dur="indefinite" restart="never" nodeType="tmRoot"/>
-      </p:par>
-    </p:tnLst>
-  </p:timing>
 </p:sld>
 </file>
 
-<file path=ppt/slides/slide55.xml><?xml version="1.0" encoding="utf-8"?>
+<file path=ppt/slides/slide59.xml><?xml version="1.0" encoding="utf-8"?>
 <p:sld xmlns:a="http://schemas.openxmlformats.org/drawingml/2006/main" xmlns:r="http://schemas.openxmlformats.org/officeDocument/2006/relationships" xmlns:p="http://schemas.openxmlformats.org/presentationml/2006/main">
   <p:cSld>
     <p:spTree>
@@ -39546,14 +39443,14 @@
                 <a:gridCol w="934278">
                   <a:extLst>
                     <a:ext uri="{9D8B030D-6E8A-4147-A177-3AD203B41FA5}">
-                      <a16:colId xmlns:a16="http://schemas.microsoft.com/office/drawing/2014/main" xmlns="" val="4198655800"/>
+                      <a16:colId xmlns:a16="http://schemas.microsoft.com/office/drawing/2014/main" val="4198655800"/>
                     </a:ext>
                   </a:extLst>
                 </a:gridCol>
                 <a:gridCol w="7295322">
                   <a:extLst>
                     <a:ext uri="{9D8B030D-6E8A-4147-A177-3AD203B41FA5}">
-                      <a16:colId xmlns:a16="http://schemas.microsoft.com/office/drawing/2014/main" xmlns="" val="135413862"/>
+                      <a16:colId xmlns:a16="http://schemas.microsoft.com/office/drawing/2014/main" val="135413862"/>
                     </a:ext>
                   </a:extLst>
                 </a:gridCol>
@@ -39587,7 +39484,7 @@
                 </a:tc>
                 <a:extLst>
                   <a:ext uri="{0D108BD9-81ED-4DB2-BD59-A6C34878D82A}">
-                    <a16:rowId xmlns:a16="http://schemas.microsoft.com/office/drawing/2014/main" xmlns="" val="3068323444"/>
+                    <a16:rowId xmlns:a16="http://schemas.microsoft.com/office/drawing/2014/main" val="3068323444"/>
                   </a:ext>
                 </a:extLst>
               </a:tr>
@@ -39620,7 +39517,7 @@
                 </a:tc>
                 <a:extLst>
                   <a:ext uri="{0D108BD9-81ED-4DB2-BD59-A6C34878D82A}">
-                    <a16:rowId xmlns:a16="http://schemas.microsoft.com/office/drawing/2014/main" xmlns="" val="1586961909"/>
+                    <a16:rowId xmlns:a16="http://schemas.microsoft.com/office/drawing/2014/main" val="1586961909"/>
                   </a:ext>
                 </a:extLst>
               </a:tr>
@@ -39658,7 +39555,7 @@
                 </a:tc>
                 <a:extLst>
                   <a:ext uri="{0D108BD9-81ED-4DB2-BD59-A6C34878D82A}">
-                    <a16:rowId xmlns:a16="http://schemas.microsoft.com/office/drawing/2014/main" xmlns="" val="2280300197"/>
+                    <a16:rowId xmlns:a16="http://schemas.microsoft.com/office/drawing/2014/main" val="2280300197"/>
                   </a:ext>
                 </a:extLst>
               </a:tr>
@@ -39696,7 +39593,7 @@
                 </a:tc>
                 <a:extLst>
                   <a:ext uri="{0D108BD9-81ED-4DB2-BD59-A6C34878D82A}">
-                    <a16:rowId xmlns:a16="http://schemas.microsoft.com/office/drawing/2014/main" xmlns="" val="1192843310"/>
+                    <a16:rowId xmlns:a16="http://schemas.microsoft.com/office/drawing/2014/main" val="1192843310"/>
                   </a:ext>
                 </a:extLst>
               </a:tr>
@@ -39734,7 +39631,7 @@
                 </a:tc>
                 <a:extLst>
                   <a:ext uri="{0D108BD9-81ED-4DB2-BD59-A6C34878D82A}">
-                    <a16:rowId xmlns:a16="http://schemas.microsoft.com/office/drawing/2014/main" xmlns="" val="2620585158"/>
+                    <a16:rowId xmlns:a16="http://schemas.microsoft.com/office/drawing/2014/main" val="2620585158"/>
                   </a:ext>
                 </a:extLst>
               </a:tr>
@@ -39767,7 +39664,7 @@
                 </a:tc>
                 <a:extLst>
                   <a:ext uri="{0D108BD9-81ED-4DB2-BD59-A6C34878D82A}">
-                    <a16:rowId xmlns:a16="http://schemas.microsoft.com/office/drawing/2014/main" xmlns="" val="1697738616"/>
+                    <a16:rowId xmlns:a16="http://schemas.microsoft.com/office/drawing/2014/main" val="1697738616"/>
                   </a:ext>
                 </a:extLst>
               </a:tr>
@@ -39805,7 +39702,7 @@
                 </a:tc>
                 <a:extLst>
                   <a:ext uri="{0D108BD9-81ED-4DB2-BD59-A6C34878D82A}">
-                    <a16:rowId xmlns:a16="http://schemas.microsoft.com/office/drawing/2014/main" xmlns="" val="316611556"/>
+                    <a16:rowId xmlns:a16="http://schemas.microsoft.com/office/drawing/2014/main" val="316611556"/>
                   </a:ext>
                 </a:extLst>
               </a:tr>
@@ -39838,7 +39735,7 @@
                 </a:tc>
                 <a:extLst>
                   <a:ext uri="{0D108BD9-81ED-4DB2-BD59-A6C34878D82A}">
-                    <a16:rowId xmlns:a16="http://schemas.microsoft.com/office/drawing/2014/main" xmlns="" val="1312814102"/>
+                    <a16:rowId xmlns:a16="http://schemas.microsoft.com/office/drawing/2014/main" val="1312814102"/>
                   </a:ext>
                 </a:extLst>
               </a:tr>
@@ -39871,7 +39768,7 @@
                 </a:tc>
                 <a:extLst>
                   <a:ext uri="{0D108BD9-81ED-4DB2-BD59-A6C34878D82A}">
-                    <a16:rowId xmlns:a16="http://schemas.microsoft.com/office/drawing/2014/main" xmlns="" val="1975533996"/>
+                    <a16:rowId xmlns:a16="http://schemas.microsoft.com/office/drawing/2014/main" val="1975533996"/>
                   </a:ext>
                 </a:extLst>
               </a:tr>
@@ -39904,7 +39801,7 @@
                 </a:tc>
                 <a:extLst>
                   <a:ext uri="{0D108BD9-81ED-4DB2-BD59-A6C34878D82A}">
-                    <a16:rowId xmlns:a16="http://schemas.microsoft.com/office/drawing/2014/main" xmlns="" val="2759032957"/>
+                    <a16:rowId xmlns:a16="http://schemas.microsoft.com/office/drawing/2014/main" val="2759032957"/>
                   </a:ext>
                 </a:extLst>
               </a:tr>
@@ -39922,17 +39819,111 @@
   <p:clrMapOvr>
     <a:masterClrMapping/>
   </p:clrMapOvr>
-  <p:timing>
-    <p:tnLst>
-      <p:par>
-        <p:cTn id="1" dur="indefinite" restart="never" nodeType="tmRoot"/>
-      </p:par>
-    </p:tnLst>
-  </p:timing>
 </p:sld>
 </file>
 
-<file path=ppt/slides/slide56.xml><?xml version="1.0" encoding="utf-8"?>
+<file path=ppt/slides/slide6.xml><?xml version="1.0" encoding="utf-8"?>
+<p:sld xmlns:a="http://schemas.openxmlformats.org/drawingml/2006/main" xmlns:r="http://schemas.openxmlformats.org/officeDocument/2006/relationships" xmlns:p="http://schemas.openxmlformats.org/presentationml/2006/main">
+  <p:cSld>
+    <p:spTree>
+      <p:nvGrpSpPr>
+        <p:cNvPr id="1" name=""/>
+        <p:cNvGrpSpPr/>
+        <p:nvPr/>
+      </p:nvGrpSpPr>
+      <p:grpSpPr>
+        <a:xfrm>
+          <a:off x="0" y="0"/>
+          <a:ext cx="0" cy="0"/>
+          <a:chOff x="0" y="0"/>
+          <a:chExt cx="0" cy="0"/>
+        </a:xfrm>
+      </p:grpSpPr>
+      <p:sp>
+        <p:nvSpPr>
+          <p:cNvPr id="2" name="Title 1"/>
+          <p:cNvSpPr>
+            <a:spLocks noGrp="1"/>
+          </p:cNvSpPr>
+          <p:nvPr>
+            <p:ph type="title"/>
+          </p:nvPr>
+        </p:nvSpPr>
+        <p:spPr/>
+        <p:txBody>
+          <a:bodyPr/>
+          <a:lstStyle/>
+          <a:p>
+            <a:r>
+              <a:rPr lang="en-US" dirty="0"/>
+              <a:t>Logical Processing Order</a:t>
+            </a:r>
+          </a:p>
+        </p:txBody>
+      </p:sp>
+      <p:sp>
+        <p:nvSpPr>
+          <p:cNvPr id="3" name="Content Placeholder 2"/>
+          <p:cNvSpPr>
+            <a:spLocks noGrp="1"/>
+          </p:cNvSpPr>
+          <p:nvPr>
+            <p:ph idx="1"/>
+          </p:nvPr>
+        </p:nvSpPr>
+        <p:spPr/>
+        <p:txBody>
+          <a:bodyPr>
+            <a:normAutofit/>
+          </a:bodyPr>
+          <a:lstStyle/>
+          <a:p>
+            <a:r>
+              <a:rPr lang="en-US" dirty="0"/>
+              <a:t>Defines the sequence in which SQL elements are logically processed</a:t>
+            </a:r>
+          </a:p>
+          <a:p>
+            <a:r>
+              <a:rPr lang="en-US" dirty="0"/>
+              <a:t>Forms the starting basis for parsing the submitted query</a:t>
+            </a:r>
+          </a:p>
+          <a:p>
+            <a:r>
+              <a:rPr lang="en-US" dirty="0"/>
+              <a:t>Usually discussed from the perspective of a SELECT query; similar for UPDATE / DELETE / INSERT / MERGE</a:t>
+            </a:r>
+          </a:p>
+          <a:p>
+            <a:r>
+              <a:rPr lang="en-US" dirty="0"/>
+              <a:t>Declarative vs procedural programming</a:t>
+            </a:r>
+          </a:p>
+          <a:p>
+            <a:pPr lvl="1"/>
+            <a:r>
+              <a:rPr lang="en-US" dirty="0"/>
+              <a:t>“What” vs “How”</a:t>
+            </a:r>
+          </a:p>
+        </p:txBody>
+      </p:sp>
+    </p:spTree>
+    <p:extLst>
+      <p:ext uri="{BB962C8B-B14F-4D97-AF65-F5344CB8AC3E}">
+        <p14:creationId xmlns:p14="http://schemas.microsoft.com/office/powerpoint/2010/main" val="782615263"/>
+      </p:ext>
+    </p:extLst>
+  </p:cSld>
+  <p:clrMapOvr>
+    <a:masterClrMapping/>
+  </p:clrMapOvr>
+</p:sld>
+</file>
+
+<file path=ppt/slides/slide60.xml><?xml version="1.0" encoding="utf-8"?>
 <p:sld xmlns:a="http://schemas.openxmlformats.org/drawingml/2006/main" xmlns:r="http://schemas.openxmlformats.org/officeDocument/2006/relationships" xmlns:p="http://schemas.openxmlformats.org/presentationml/2006/main">
   <p:cSld>
     <p:spTree>
@@ -40000,14 +39991,14 @@
                 <a:gridCol w="934278">
                   <a:extLst>
                     <a:ext uri="{9D8B030D-6E8A-4147-A177-3AD203B41FA5}">
-                      <a16:colId xmlns:a16="http://schemas.microsoft.com/office/drawing/2014/main" xmlns="" val="4198655800"/>
+                      <a16:colId xmlns:a16="http://schemas.microsoft.com/office/drawing/2014/main" val="4198655800"/>
                     </a:ext>
                   </a:extLst>
                 </a:gridCol>
                 <a:gridCol w="7295322">
                   <a:extLst>
                     <a:ext uri="{9D8B030D-6E8A-4147-A177-3AD203B41FA5}">
-                      <a16:colId xmlns:a16="http://schemas.microsoft.com/office/drawing/2014/main" xmlns="" val="135413862"/>
+                      <a16:colId xmlns:a16="http://schemas.microsoft.com/office/drawing/2014/main" val="135413862"/>
                     </a:ext>
                   </a:extLst>
                 </a:gridCol>
@@ -40041,7 +40032,7 @@
                 </a:tc>
                 <a:extLst>
                   <a:ext uri="{0D108BD9-81ED-4DB2-BD59-A6C34878D82A}">
-                    <a16:rowId xmlns:a16="http://schemas.microsoft.com/office/drawing/2014/main" xmlns="" val="3068323444"/>
+                    <a16:rowId xmlns:a16="http://schemas.microsoft.com/office/drawing/2014/main" val="3068323444"/>
                   </a:ext>
                 </a:extLst>
               </a:tr>
@@ -40074,7 +40065,7 @@
                 </a:tc>
                 <a:extLst>
                   <a:ext uri="{0D108BD9-81ED-4DB2-BD59-A6C34878D82A}">
-                    <a16:rowId xmlns:a16="http://schemas.microsoft.com/office/drawing/2014/main" xmlns="" val="2484981654"/>
+                    <a16:rowId xmlns:a16="http://schemas.microsoft.com/office/drawing/2014/main" val="2484981654"/>
                   </a:ext>
                 </a:extLst>
               </a:tr>
@@ -40112,7 +40103,7 @@
                 </a:tc>
                 <a:extLst>
                   <a:ext uri="{0D108BD9-81ED-4DB2-BD59-A6C34878D82A}">
-                    <a16:rowId xmlns:a16="http://schemas.microsoft.com/office/drawing/2014/main" xmlns="" val="1377910784"/>
+                    <a16:rowId xmlns:a16="http://schemas.microsoft.com/office/drawing/2014/main" val="1377910784"/>
                   </a:ext>
                 </a:extLst>
               </a:tr>
@@ -40145,7 +40136,7 @@
                 </a:tc>
                 <a:extLst>
                   <a:ext uri="{0D108BD9-81ED-4DB2-BD59-A6C34878D82A}">
-                    <a16:rowId xmlns:a16="http://schemas.microsoft.com/office/drawing/2014/main" xmlns="" val="1387856053"/>
+                    <a16:rowId xmlns:a16="http://schemas.microsoft.com/office/drawing/2014/main" val="1387856053"/>
                   </a:ext>
                 </a:extLst>
               </a:tr>
@@ -40183,7 +40174,7 @@
                 </a:tc>
                 <a:extLst>
                   <a:ext uri="{0D108BD9-81ED-4DB2-BD59-A6C34878D82A}">
-                    <a16:rowId xmlns:a16="http://schemas.microsoft.com/office/drawing/2014/main" xmlns="" val="2599123823"/>
+                    <a16:rowId xmlns:a16="http://schemas.microsoft.com/office/drawing/2014/main" val="2599123823"/>
                   </a:ext>
                 </a:extLst>
               </a:tr>
@@ -40224,7 +40215,7 @@
                 </a:tc>
                 <a:extLst>
                   <a:ext uri="{0D108BD9-81ED-4DB2-BD59-A6C34878D82A}">
-                    <a16:rowId xmlns:a16="http://schemas.microsoft.com/office/drawing/2014/main" xmlns="" val="1232603862"/>
+                    <a16:rowId xmlns:a16="http://schemas.microsoft.com/office/drawing/2014/main" val="1232603862"/>
                   </a:ext>
                 </a:extLst>
               </a:tr>
@@ -40257,7 +40248,7 @@
                 </a:tc>
                 <a:extLst>
                   <a:ext uri="{0D108BD9-81ED-4DB2-BD59-A6C34878D82A}">
-                    <a16:rowId xmlns:a16="http://schemas.microsoft.com/office/drawing/2014/main" xmlns="" val="4145944521"/>
+                    <a16:rowId xmlns:a16="http://schemas.microsoft.com/office/drawing/2014/main" val="4145944521"/>
                   </a:ext>
                 </a:extLst>
               </a:tr>
@@ -40295,7 +40286,7 @@
                 </a:tc>
                 <a:extLst>
                   <a:ext uri="{0D108BD9-81ED-4DB2-BD59-A6C34878D82A}">
-                    <a16:rowId xmlns:a16="http://schemas.microsoft.com/office/drawing/2014/main" xmlns="" val="2954677722"/>
+                    <a16:rowId xmlns:a16="http://schemas.microsoft.com/office/drawing/2014/main" val="2954677722"/>
                   </a:ext>
                 </a:extLst>
               </a:tr>
@@ -40328,7 +40319,7 @@
                 </a:tc>
                 <a:extLst>
                   <a:ext uri="{0D108BD9-81ED-4DB2-BD59-A6C34878D82A}">
-                    <a16:rowId xmlns:a16="http://schemas.microsoft.com/office/drawing/2014/main" xmlns="" val="205903975"/>
+                    <a16:rowId xmlns:a16="http://schemas.microsoft.com/office/drawing/2014/main" val="205903975"/>
                   </a:ext>
                 </a:extLst>
               </a:tr>
@@ -40361,7 +40352,7 @@
                 </a:tc>
                 <a:extLst>
                   <a:ext uri="{0D108BD9-81ED-4DB2-BD59-A6C34878D82A}">
-                    <a16:rowId xmlns:a16="http://schemas.microsoft.com/office/drawing/2014/main" xmlns="" val="2893595017"/>
+                    <a16:rowId xmlns:a16="http://schemas.microsoft.com/office/drawing/2014/main" val="2893595017"/>
                   </a:ext>
                 </a:extLst>
               </a:tr>
@@ -40394,7 +40385,7 @@
                 </a:tc>
                 <a:extLst>
                   <a:ext uri="{0D108BD9-81ED-4DB2-BD59-A6C34878D82A}">
-                    <a16:rowId xmlns:a16="http://schemas.microsoft.com/office/drawing/2014/main" xmlns="" val="2337380595"/>
+                    <a16:rowId xmlns:a16="http://schemas.microsoft.com/office/drawing/2014/main" val="2337380595"/>
                   </a:ext>
                 </a:extLst>
               </a:tr>
@@ -40441,17 +40432,10 @@
   <p:clrMapOvr>
     <a:masterClrMapping/>
   </p:clrMapOvr>
-  <p:timing>
-    <p:tnLst>
-      <p:par>
-        <p:cTn id="1" dur="indefinite" restart="never" nodeType="tmRoot"/>
-      </p:par>
-    </p:tnLst>
-  </p:timing>
 </p:sld>
 </file>
 
-<file path=ppt/slides/slide57.xml><?xml version="1.0" encoding="utf-8"?>
+<file path=ppt/slides/slide61.xml><?xml version="1.0" encoding="utf-8"?>
 <p:sld xmlns:a="http://schemas.openxmlformats.org/drawingml/2006/main" xmlns:r="http://schemas.openxmlformats.org/officeDocument/2006/relationships" xmlns:p="http://schemas.openxmlformats.org/presentationml/2006/main">
   <p:cSld>
     <p:spTree>
@@ -40576,17 +40560,10 @@
   <p:clrMapOvr>
     <a:masterClrMapping/>
   </p:clrMapOvr>
-  <p:timing>
-    <p:tnLst>
-      <p:par>
-        <p:cTn id="1" dur="indefinite" restart="never" nodeType="tmRoot"/>
-      </p:par>
-    </p:tnLst>
-  </p:timing>
 </p:sld>
 </file>
 
-<file path=ppt/slides/slide58.xml><?xml version="1.0" encoding="utf-8"?>
+<file path=ppt/slides/slide62.xml><?xml version="1.0" encoding="utf-8"?>
 <p:sld xmlns:a="http://schemas.openxmlformats.org/drawingml/2006/main" xmlns:r="http://schemas.openxmlformats.org/officeDocument/2006/relationships" xmlns:p="http://schemas.openxmlformats.org/presentationml/2006/main">
   <p:cSld>
     <p:spTree>
@@ -40746,17 +40723,10 @@
   <p:clrMapOvr>
     <a:masterClrMapping/>
   </p:clrMapOvr>
-  <p:timing>
-    <p:tnLst>
-      <p:par>
-        <p:cTn id="1" dur="indefinite" restart="never" nodeType="tmRoot"/>
-      </p:par>
-    </p:tnLst>
-  </p:timing>
 </p:sld>
 </file>
 
-<file path=ppt/slides/slide59.xml><?xml version="1.0" encoding="utf-8"?>
+<file path=ppt/slides/slide63.xml><?xml version="1.0" encoding="utf-8"?>
 <p:sld xmlns:a="http://schemas.openxmlformats.org/drawingml/2006/main" xmlns:r="http://schemas.openxmlformats.org/officeDocument/2006/relationships" xmlns:p="http://schemas.openxmlformats.org/presentationml/2006/main">
   <p:cSld>
     <p:spTree>
@@ -40920,17 +40890,10 @@
   <p:clrMapOvr>
     <a:masterClrMapping/>
   </p:clrMapOvr>
-  <p:timing>
-    <p:tnLst>
-      <p:par>
-        <p:cTn id="1" dur="indefinite" restart="never" nodeType="tmRoot"/>
-      </p:par>
-    </p:tnLst>
-  </p:timing>
 </p:sld>
 </file>
 
-<file path=ppt/slides/slide6.xml><?xml version="1.0" encoding="utf-8"?>
+<file path=ppt/slides/slide64.xml><?xml version="1.0" encoding="utf-8"?>
 <p:sld xmlns:a="http://schemas.openxmlformats.org/drawingml/2006/main" xmlns:r="http://schemas.openxmlformats.org/officeDocument/2006/relationships" xmlns:p="http://schemas.openxmlformats.org/presentationml/2006/main">
   <p:cSld>
     <p:spTree>
@@ -40964,7 +40927,7 @@
           <a:p>
             <a:r>
               <a:rPr lang="en-US" dirty="0"/>
-              <a:t>Logical Processing Order</a:t>
+              <a:t>Thank You</a:t>
             </a:r>
           </a:p>
         </p:txBody>
@@ -40988,114 +40951,6 @@
           <a:p>
             <a:r>
               <a:rPr lang="en-US" dirty="0"/>
-              <a:t>Defines the sequence in which SQL elements are logically processed</a:t>
-            </a:r>
-          </a:p>
-          <a:p>
-            <a:r>
-              <a:rPr lang="en-US" dirty="0"/>
-              <a:t>Forms the starting basis for parsing the submitted query</a:t>
-            </a:r>
-          </a:p>
-          <a:p>
-            <a:r>
-              <a:rPr lang="en-US" dirty="0"/>
-              <a:t>Usually discussed from the perspective of a SELECT query; similar for UPDATE / DELETE / INSERT / MERGE</a:t>
-            </a:r>
-          </a:p>
-          <a:p>
-            <a:r>
-              <a:rPr lang="en-US" dirty="0"/>
-              <a:t>Declarative vs procedural programming</a:t>
-            </a:r>
-          </a:p>
-          <a:p>
-            <a:pPr lvl="1"/>
-            <a:r>
-              <a:rPr lang="en-US" dirty="0"/>
-              <a:t>“What” vs “How”</a:t>
-            </a:r>
-          </a:p>
-        </p:txBody>
-      </p:sp>
-    </p:spTree>
-    <p:extLst>
-      <p:ext uri="{BB962C8B-B14F-4D97-AF65-F5344CB8AC3E}">
-        <p14:creationId xmlns:p14="http://schemas.microsoft.com/office/powerpoint/2010/main" val="782615263"/>
-      </p:ext>
-    </p:extLst>
-  </p:cSld>
-  <p:clrMapOvr>
-    <a:masterClrMapping/>
-  </p:clrMapOvr>
-  <p:timing>
-    <p:tnLst>
-      <p:par>
-        <p:cTn id="1" dur="indefinite" restart="never" nodeType="tmRoot"/>
-      </p:par>
-    </p:tnLst>
-  </p:timing>
-</p:sld>
-</file>
-
-<file path=ppt/slides/slide60.xml><?xml version="1.0" encoding="utf-8"?>
-<p:sld xmlns:a="http://schemas.openxmlformats.org/drawingml/2006/main" xmlns:r="http://schemas.openxmlformats.org/officeDocument/2006/relationships" xmlns:p="http://schemas.openxmlformats.org/presentationml/2006/main">
-  <p:cSld>
-    <p:spTree>
-      <p:nvGrpSpPr>
-        <p:cNvPr id="1" name=""/>
-        <p:cNvGrpSpPr/>
-        <p:nvPr/>
-      </p:nvGrpSpPr>
-      <p:grpSpPr>
-        <a:xfrm>
-          <a:off x="0" y="0"/>
-          <a:ext cx="0" cy="0"/>
-          <a:chOff x="0" y="0"/>
-          <a:chExt cx="0" cy="0"/>
-        </a:xfrm>
-      </p:grpSpPr>
-      <p:sp>
-        <p:nvSpPr>
-          <p:cNvPr id="2" name="Title 1"/>
-          <p:cNvSpPr>
-            <a:spLocks noGrp="1"/>
-          </p:cNvSpPr>
-          <p:nvPr>
-            <p:ph type="title"/>
-          </p:nvPr>
-        </p:nvSpPr>
-        <p:spPr/>
-        <p:txBody>
-          <a:bodyPr/>
-          <a:lstStyle/>
-          <a:p>
-            <a:r>
-              <a:rPr lang="en-US" dirty="0"/>
-              <a:t>Thank You</a:t>
-            </a:r>
-          </a:p>
-        </p:txBody>
-      </p:sp>
-      <p:sp>
-        <p:nvSpPr>
-          <p:cNvPr id="3" name="Content Placeholder 2"/>
-          <p:cNvSpPr>
-            <a:spLocks noGrp="1"/>
-          </p:cNvSpPr>
-          <p:nvPr>
-            <p:ph idx="1"/>
-          </p:nvPr>
-        </p:nvSpPr>
-        <p:spPr/>
-        <p:txBody>
-          <a:bodyPr>
-            <a:normAutofit/>
-          </a:bodyPr>
-          <a:lstStyle/>
-          <a:p>
-            <a:r>
-              <a:rPr lang="en-US" dirty="0"/>
               <a:t>This presentation and supporting materials can be found at </a:t>
             </a:r>
             <a:r>
@@ -41175,13 +41030,6 @@
   <p:clrMapOvr>
     <a:masterClrMapping/>
   </p:clrMapOvr>
-  <p:timing>
-    <p:tnLst>
-      <p:par>
-        <p:cTn id="1" dur="indefinite" restart="never" nodeType="tmRoot"/>
-      </p:par>
-    </p:tnLst>
-  </p:timing>
 </p:sld>
 </file>
 
@@ -41396,13 +41244,6 @@
   <p:clrMapOvr>
     <a:masterClrMapping/>
   </p:clrMapOvr>
-  <p:timing>
-    <p:tnLst>
-      <p:par>
-        <p:cTn id="1" dur="indefinite" restart="never" nodeType="tmRoot"/>
-      </p:par>
-    </p:tnLst>
-  </p:timing>
 </p:sld>
 </file>
 
@@ -42610,21 +42451,21 @@
                 <a:gridCol w="2764301">
                   <a:extLst>
                     <a:ext uri="{9D8B030D-6E8A-4147-A177-3AD203B41FA5}">
-                      <a16:colId xmlns:a16="http://schemas.microsoft.com/office/drawing/2014/main" xmlns="" val="234227049"/>
+                      <a16:colId xmlns:a16="http://schemas.microsoft.com/office/drawing/2014/main" val="234227049"/>
                     </a:ext>
                   </a:extLst>
                 </a:gridCol>
                 <a:gridCol w="2764301">
                   <a:extLst>
                     <a:ext uri="{9D8B030D-6E8A-4147-A177-3AD203B41FA5}">
-                      <a16:colId xmlns:a16="http://schemas.microsoft.com/office/drawing/2014/main" xmlns="" val="4053135350"/>
+                      <a16:colId xmlns:a16="http://schemas.microsoft.com/office/drawing/2014/main" val="4053135350"/>
                     </a:ext>
                   </a:extLst>
                 </a:gridCol>
                 <a:gridCol w="2764301">
                   <a:extLst>
                     <a:ext uri="{9D8B030D-6E8A-4147-A177-3AD203B41FA5}">
-                      <a16:colId xmlns:a16="http://schemas.microsoft.com/office/drawing/2014/main" xmlns="" val="672378647"/>
+                      <a16:colId xmlns:a16="http://schemas.microsoft.com/office/drawing/2014/main" val="672378647"/>
                     </a:ext>
                   </a:extLst>
                 </a:gridCol>
@@ -42674,7 +42515,7 @@
                 </a:tc>
                 <a:extLst>
                   <a:ext uri="{0D108BD9-81ED-4DB2-BD59-A6C34878D82A}">
-                    <a16:rowId xmlns:a16="http://schemas.microsoft.com/office/drawing/2014/main" xmlns="" val="2843053056"/>
+                    <a16:rowId xmlns:a16="http://schemas.microsoft.com/office/drawing/2014/main" val="2843053056"/>
                   </a:ext>
                 </a:extLst>
               </a:tr>
@@ -42724,7 +42565,7 @@
                 </a:tc>
                 <a:extLst>
                   <a:ext uri="{0D108BD9-81ED-4DB2-BD59-A6C34878D82A}">
-                    <a16:rowId xmlns:a16="http://schemas.microsoft.com/office/drawing/2014/main" xmlns="" val="3055328934"/>
+                    <a16:rowId xmlns:a16="http://schemas.microsoft.com/office/drawing/2014/main" val="3055328934"/>
                   </a:ext>
                 </a:extLst>
               </a:tr>
@@ -42774,7 +42615,7 @@
                 </a:tc>
                 <a:extLst>
                   <a:ext uri="{0D108BD9-81ED-4DB2-BD59-A6C34878D82A}">
-                    <a16:rowId xmlns:a16="http://schemas.microsoft.com/office/drawing/2014/main" xmlns="" val="1144851549"/>
+                    <a16:rowId xmlns:a16="http://schemas.microsoft.com/office/drawing/2014/main" val="1144851549"/>
                   </a:ext>
                 </a:extLst>
               </a:tr>
@@ -42823,7 +42664,7 @@
                 </a:tc>
                 <a:extLst>
                   <a:ext uri="{0D108BD9-81ED-4DB2-BD59-A6C34878D82A}">
-                    <a16:rowId xmlns:a16="http://schemas.microsoft.com/office/drawing/2014/main" xmlns="" val="4258932578"/>
+                    <a16:rowId xmlns:a16="http://schemas.microsoft.com/office/drawing/2014/main" val="4258932578"/>
                   </a:ext>
                 </a:extLst>
               </a:tr>
@@ -42841,13 +42682,6 @@
   <p:clrMapOvr>
     <a:masterClrMapping/>
   </p:clrMapOvr>
-  <p:timing>
-    <p:tnLst>
-      <p:par>
-        <p:cTn id="1" dur="indefinite" restart="never" nodeType="tmRoot"/>
-      </p:par>
-    </p:tnLst>
-  </p:timing>
 </p:sld>
 </file>
 
@@ -44176,21 +44010,6 @@
   <p:clrMapOvr>
     <a:masterClrMapping/>
   </p:clrMapOvr>
-  <mc:AlternateContent xmlns:mc="http://schemas.openxmlformats.org/markup-compatibility/2006" xmlns:p14="http://schemas.microsoft.com/office/powerpoint/2010/main">
-    <mc:Choice Requires="p14">
-      <p:transition spd="slow" p14:dur="2000"/>
-    </mc:Choice>
-    <mc:Fallback xmlns="">
-      <p:transition spd="slow"/>
-    </mc:Fallback>
-  </mc:AlternateContent>
-  <p:timing>
-    <p:tnLst>
-      <p:par>
-        <p:cTn id="1" dur="indefinite" restart="never" nodeType="tmRoot"/>
-      </p:par>
-    </p:tnLst>
-  </p:timing>
 </p:sld>
 </file>
 

</xml_diff>

<commit_message>
A bit of detail on physical property derivation.
</commit_message>
<xml_diff>
--- a/Optimizer.pptx
+++ b/Optimizer.pptx
@@ -269,7 +269,7 @@
           <a:p>
             <a:fld id="{2EDCB34D-5EC2-4739-9693-E425457AC201}" type="datetimeFigureOut">
               <a:rPr lang="en-US" smtClean="0"/>
-              <a:t>12/13/2016</a:t>
+              <a:t>12/27/2016</a:t>
             </a:fld>
             <a:endParaRPr lang="en-US"/>
           </a:p>
@@ -1137,13 +1137,9 @@
             </a:r>
             <a:r>
               <a:rPr lang="en-US" baseline="0" dirty="0"/>
-              <a:t>, sort orders, </a:t>
-            </a:r>
-            <a:r>
-              <a:rPr lang="en-US" baseline="0"/>
-              <a:t>etc.</a:t>
-            </a:r>
-            <a:endParaRPr lang="en-US"/>
+              <a:t>, sort orders, etc.</a:t>
+            </a:r>
+            <a:endParaRPr lang="en-US" dirty="0"/>
           </a:p>
         </p:txBody>
       </p:sp>
@@ -3064,7 +3060,7 @@
             <a:fld id="{5942B21B-2ADA-A040-A652-A7305E1B99FE}" type="datetimeFigureOut">
               <a:rPr lang="en-US" smtClean="0"/>
               <a:pPr/>
-              <a:t>12/13/2016</a:t>
+              <a:t>12/27/2016</a:t>
             </a:fld>
             <a:endParaRPr lang="en-US" dirty="0"/>
           </a:p>
@@ -3254,7 +3250,7 @@
           <a:p>
             <a:fld id="{5942B21B-2ADA-A040-A652-A7305E1B99FE}" type="datetimeFigureOut">
               <a:rPr lang="en-US" smtClean="0"/>
-              <a:t>12/13/2016</a:t>
+              <a:t>12/27/2016</a:t>
             </a:fld>
             <a:endParaRPr lang="en-US"/>
           </a:p>
@@ -3378,7 +3374,7 @@
             <a:fld id="{5942B21B-2ADA-A040-A652-A7305E1B99FE}" type="datetimeFigureOut">
               <a:rPr lang="en-US" smtClean="0"/>
               <a:pPr/>
-              <a:t>12/13/2016</a:t>
+              <a:t>12/27/2016</a:t>
             </a:fld>
             <a:r>
               <a:rPr lang="en-US"/>
@@ -3649,7 +3645,7 @@
             <a:fld id="{5942B21B-2ADA-A040-A652-A7305E1B99FE}" type="datetimeFigureOut">
               <a:rPr lang="en-US" smtClean="0"/>
               <a:pPr/>
-              <a:t>12/13/2016</a:t>
+              <a:t>12/27/2016</a:t>
             </a:fld>
             <a:r>
               <a:rPr lang="en-US" dirty="0"/>
@@ -3919,7 +3915,7 @@
             <a:fld id="{5942B21B-2ADA-A040-A652-A7305E1B99FE}" type="datetimeFigureOut">
               <a:rPr lang="en-US" smtClean="0"/>
               <a:pPr/>
-              <a:t>12/13/2016</a:t>
+              <a:t>12/27/2016</a:t>
             </a:fld>
             <a:r>
               <a:rPr lang="en-US" dirty="0"/>
@@ -4259,7 +4255,7 @@
             <a:fld id="{5942B21B-2ADA-A040-A652-A7305E1B99FE}" type="datetimeFigureOut">
               <a:rPr lang="en-US" smtClean="0"/>
               <a:pPr/>
-              <a:t>12/13/2016</a:t>
+              <a:t>12/27/2016</a:t>
             </a:fld>
             <a:r>
               <a:rPr lang="en-US" dirty="0"/>
@@ -4600,7 +4596,7 @@
             <a:fld id="{5942B21B-2ADA-A040-A652-A7305E1B99FE}" type="datetimeFigureOut">
               <a:rPr lang="en-US" smtClean="0"/>
               <a:pPr/>
-              <a:t>12/13/2016</a:t>
+              <a:t>12/27/2016</a:t>
             </a:fld>
             <a:r>
               <a:rPr lang="en-US" dirty="0"/>
@@ -5115,7 +5111,7 @@
             <a:fld id="{5942B21B-2ADA-A040-A652-A7305E1B99FE}" type="datetimeFigureOut">
               <a:rPr lang="en-US" smtClean="0"/>
               <a:pPr/>
-              <a:t>12/13/2016</a:t>
+              <a:t>12/27/2016</a:t>
             </a:fld>
             <a:r>
               <a:rPr lang="en-US" dirty="0"/>
@@ -5324,7 +5320,7 @@
             <a:fld id="{5942B21B-2ADA-A040-A652-A7305E1B99FE}" type="datetimeFigureOut">
               <a:rPr lang="en-US" smtClean="0"/>
               <a:pPr/>
-              <a:t>12/13/2016</a:t>
+              <a:t>12/27/2016</a:t>
             </a:fld>
             <a:r>
               <a:rPr lang="en-US" dirty="0"/>
@@ -5511,7 +5507,7 @@
             <a:fld id="{5942B21B-2ADA-A040-A652-A7305E1B99FE}" type="datetimeFigureOut">
               <a:rPr lang="en-US" smtClean="0"/>
               <a:pPr/>
-              <a:t>12/13/2016</a:t>
+              <a:t>12/27/2016</a:t>
             </a:fld>
             <a:r>
               <a:rPr lang="en-US" dirty="0"/>
@@ -5842,7 +5838,7 @@
             <a:fld id="{5942B21B-2ADA-A040-A652-A7305E1B99FE}" type="datetimeFigureOut">
               <a:rPr lang="en-US" smtClean="0"/>
               <a:pPr/>
-              <a:t>12/13/2016</a:t>
+              <a:t>12/27/2016</a:t>
             </a:fld>
             <a:r>
               <a:rPr lang="en-US" dirty="0"/>
@@ -6150,7 +6146,7 @@
             <a:fld id="{5942B21B-2ADA-A040-A652-A7305E1B99FE}" type="datetimeFigureOut">
               <a:rPr lang="en-US" smtClean="0"/>
               <a:pPr/>
-              <a:t>12/13/2016</a:t>
+              <a:t>12/27/2016</a:t>
             </a:fld>
             <a:r>
               <a:rPr lang="en-US" dirty="0"/>
@@ -6429,7 +6425,7 @@
             <a:fld id="{5942B21B-2ADA-A040-A652-A7305E1B99FE}" type="datetimeFigureOut">
               <a:rPr lang="en-US" smtClean="0"/>
               <a:pPr/>
-              <a:t>12/13/2016</a:t>
+              <a:t>12/27/2016</a:t>
             </a:fld>
             <a:r>
               <a:rPr lang="en-US" dirty="0"/>
@@ -8298,6 +8294,14 @@
   <p:clrMapOvr>
     <a:masterClrMapping/>
   </p:clrMapOvr>
+  <mc:AlternateContent xmlns:mc="http://schemas.openxmlformats.org/markup-compatibility/2006">
+    <mc:Choice xmlns:p14="http://schemas.microsoft.com/office/powerpoint/2010/main" Requires="p14">
+      <p:transition spd="slow" p14:dur="2000"/>
+    </mc:Choice>
+    <mc:Fallback>
+      <p:transition spd="slow"/>
+    </mc:Fallback>
+  </mc:AlternateContent>
 </p:sld>
 </file>
 
@@ -9509,6 +9513,14 @@
   <p:clrMapOvr>
     <a:masterClrMapping/>
   </p:clrMapOvr>
+  <mc:AlternateContent xmlns:mc="http://schemas.openxmlformats.org/markup-compatibility/2006">
+    <mc:Choice xmlns:p14="http://schemas.microsoft.com/office/powerpoint/2010/main" Requires="p14">
+      <p:transition spd="slow" p14:dur="2000"/>
+    </mc:Choice>
+    <mc:Fallback>
+      <p:transition spd="slow"/>
+    </mc:Fallback>
+  </mc:AlternateContent>
 </p:sld>
 </file>
 
@@ -10720,6 +10732,14 @@
   <p:clrMapOvr>
     <a:masterClrMapping/>
   </p:clrMapOvr>
+  <mc:AlternateContent xmlns:mc="http://schemas.openxmlformats.org/markup-compatibility/2006">
+    <mc:Choice xmlns:p14="http://schemas.microsoft.com/office/powerpoint/2010/main" Requires="p14">
+      <p:transition spd="slow" p14:dur="2000"/>
+    </mc:Choice>
+    <mc:Fallback>
+      <p:transition spd="slow"/>
+    </mc:Fallback>
+  </mc:AlternateContent>
 </p:sld>
 </file>
 
@@ -11915,6 +11935,14 @@
   <p:clrMapOvr>
     <a:masterClrMapping/>
   </p:clrMapOvr>
+  <mc:AlternateContent xmlns:mc="http://schemas.openxmlformats.org/markup-compatibility/2006">
+    <mc:Choice xmlns:p14="http://schemas.microsoft.com/office/powerpoint/2010/main" Requires="p14">
+      <p:transition spd="slow" p14:dur="2000"/>
+    </mc:Choice>
+    <mc:Fallback>
+      <p:transition spd="slow"/>
+    </mc:Fallback>
+  </mc:AlternateContent>
 </p:sld>
 </file>
 
@@ -13163,6 +13191,14 @@
   <p:clrMapOvr>
     <a:masterClrMapping/>
   </p:clrMapOvr>
+  <mc:AlternateContent xmlns:mc="http://schemas.openxmlformats.org/markup-compatibility/2006">
+    <mc:Choice xmlns:p14="http://schemas.microsoft.com/office/powerpoint/2010/main" Requires="p14">
+      <p:transition spd="slow" p14:dur="2000"/>
+    </mc:Choice>
+    <mc:Fallback>
+      <p:transition spd="slow"/>
+    </mc:Fallback>
+  </mc:AlternateContent>
 </p:sld>
 </file>
 
@@ -14337,6 +14373,14 @@
   <p:clrMapOvr>
     <a:masterClrMapping/>
   </p:clrMapOvr>
+  <mc:AlternateContent xmlns:mc="http://schemas.openxmlformats.org/markup-compatibility/2006">
+    <mc:Choice xmlns:p14="http://schemas.microsoft.com/office/powerpoint/2010/main" Requires="p14">
+      <p:transition spd="slow" p14:dur="2000"/>
+    </mc:Choice>
+    <mc:Fallback>
+      <p:transition spd="slow"/>
+    </mc:Fallback>
+  </mc:AlternateContent>
 </p:sld>
 </file>
 
@@ -15557,6 +15601,14 @@
   <p:clrMapOvr>
     <a:masterClrMapping/>
   </p:clrMapOvr>
+  <mc:AlternateContent xmlns:mc="http://schemas.openxmlformats.org/markup-compatibility/2006">
+    <mc:Choice xmlns:p14="http://schemas.microsoft.com/office/powerpoint/2010/main" Requires="p14">
+      <p:transition spd="slow" p14:dur="2000"/>
+    </mc:Choice>
+    <mc:Fallback>
+      <p:transition spd="slow"/>
+    </mc:Fallback>
+  </mc:AlternateContent>
 </p:sld>
 </file>
 
@@ -16768,6 +16820,14 @@
   <p:clrMapOvr>
     <a:masterClrMapping/>
   </p:clrMapOvr>
+  <mc:AlternateContent xmlns:mc="http://schemas.openxmlformats.org/markup-compatibility/2006">
+    <mc:Choice xmlns:p14="http://schemas.microsoft.com/office/powerpoint/2010/main" Requires="p14">
+      <p:transition spd="slow" p14:dur="2000"/>
+    </mc:Choice>
+    <mc:Fallback>
+      <p:transition spd="slow"/>
+    </mc:Fallback>
+  </mc:AlternateContent>
 </p:sld>
 </file>
 
@@ -18032,6 +18092,14 @@
   <p:clrMapOvr>
     <a:masterClrMapping/>
   </p:clrMapOvr>
+  <mc:AlternateContent xmlns:mc="http://schemas.openxmlformats.org/markup-compatibility/2006">
+    <mc:Choice xmlns:p14="http://schemas.microsoft.com/office/powerpoint/2010/main" Requires="p14">
+      <p:transition spd="slow" p14:dur="2000"/>
+    </mc:Choice>
+    <mc:Fallback>
+      <p:transition spd="slow"/>
+    </mc:Fallback>
+  </mc:AlternateContent>
 </p:sld>
 </file>
 
@@ -20776,28 +20844,28 @@
                 <a:gridCol w="1638752">
                   <a:extLst>
                     <a:ext uri="{9D8B030D-6E8A-4147-A177-3AD203B41FA5}">
-                      <a16:colId xmlns:a16="http://schemas.microsoft.com/office/drawing/2014/main" val="20000"/>
+                      <a16:colId xmlns:a16="http://schemas.microsoft.com/office/drawing/2014/main" xmlns="" val="20000"/>
                     </a:ext>
                   </a:extLst>
                 </a:gridCol>
                 <a:gridCol w="4787153">
                   <a:extLst>
                     <a:ext uri="{9D8B030D-6E8A-4147-A177-3AD203B41FA5}">
-                      <a16:colId xmlns:a16="http://schemas.microsoft.com/office/drawing/2014/main" val="20001"/>
+                      <a16:colId xmlns:a16="http://schemas.microsoft.com/office/drawing/2014/main" xmlns="" val="20001"/>
                     </a:ext>
                   </a:extLst>
                 </a:gridCol>
                 <a:gridCol w="851647">
                   <a:extLst>
                     <a:ext uri="{9D8B030D-6E8A-4147-A177-3AD203B41FA5}">
-                      <a16:colId xmlns:a16="http://schemas.microsoft.com/office/drawing/2014/main" val="20002"/>
+                      <a16:colId xmlns:a16="http://schemas.microsoft.com/office/drawing/2014/main" xmlns="" val="20002"/>
                     </a:ext>
                   </a:extLst>
                 </a:gridCol>
                 <a:gridCol w="779930">
                   <a:extLst>
                     <a:ext uri="{9D8B030D-6E8A-4147-A177-3AD203B41FA5}">
-                      <a16:colId xmlns:a16="http://schemas.microsoft.com/office/drawing/2014/main" val="20003"/>
+                      <a16:colId xmlns:a16="http://schemas.microsoft.com/office/drawing/2014/main" xmlns="" val="20003"/>
                     </a:ext>
                   </a:extLst>
                 </a:gridCol>
@@ -20857,7 +20925,7 @@
                 </a:tc>
                 <a:extLst>
                   <a:ext uri="{0D108BD9-81ED-4DB2-BD59-A6C34878D82A}">
-                    <a16:rowId xmlns:a16="http://schemas.microsoft.com/office/drawing/2014/main" val="10000"/>
+                    <a16:rowId xmlns:a16="http://schemas.microsoft.com/office/drawing/2014/main" xmlns="" val="10000"/>
                   </a:ext>
                 </a:extLst>
               </a:tr>
@@ -20922,7 +20990,7 @@
                 </a:tc>
                 <a:extLst>
                   <a:ext uri="{0D108BD9-81ED-4DB2-BD59-A6C34878D82A}">
-                    <a16:rowId xmlns:a16="http://schemas.microsoft.com/office/drawing/2014/main" val="10001"/>
+                    <a16:rowId xmlns:a16="http://schemas.microsoft.com/office/drawing/2014/main" xmlns="" val="10001"/>
                   </a:ext>
                 </a:extLst>
               </a:tr>
@@ -20999,7 +21067,7 @@
                 </a:tc>
                 <a:extLst>
                   <a:ext uri="{0D108BD9-81ED-4DB2-BD59-A6C34878D82A}">
-                    <a16:rowId xmlns:a16="http://schemas.microsoft.com/office/drawing/2014/main" val="10002"/>
+                    <a16:rowId xmlns:a16="http://schemas.microsoft.com/office/drawing/2014/main" xmlns="" val="10002"/>
                   </a:ext>
                 </a:extLst>
               </a:tr>
@@ -21065,7 +21133,7 @@
                 </a:tc>
                 <a:extLst>
                   <a:ext uri="{0D108BD9-81ED-4DB2-BD59-A6C34878D82A}">
-                    <a16:rowId xmlns:a16="http://schemas.microsoft.com/office/drawing/2014/main" val="10003"/>
+                    <a16:rowId xmlns:a16="http://schemas.microsoft.com/office/drawing/2014/main" xmlns="" val="10003"/>
                   </a:ext>
                 </a:extLst>
               </a:tr>
@@ -21154,7 +21222,7 @@
                 </a:tc>
                 <a:extLst>
                   <a:ext uri="{0D108BD9-81ED-4DB2-BD59-A6C34878D82A}">
-                    <a16:rowId xmlns:a16="http://schemas.microsoft.com/office/drawing/2014/main" val="10004"/>
+                    <a16:rowId xmlns:a16="http://schemas.microsoft.com/office/drawing/2014/main" xmlns="" val="10004"/>
                   </a:ext>
                 </a:extLst>
               </a:tr>
@@ -21225,7 +21293,7 @@
                 </a:tc>
                 <a:extLst>
                   <a:ext uri="{0D108BD9-81ED-4DB2-BD59-A6C34878D82A}">
-                    <a16:rowId xmlns:a16="http://schemas.microsoft.com/office/drawing/2014/main" val="10005"/>
+                    <a16:rowId xmlns:a16="http://schemas.microsoft.com/office/drawing/2014/main" xmlns="" val="10005"/>
                   </a:ext>
                 </a:extLst>
               </a:tr>
@@ -21291,7 +21359,7 @@
                 </a:tc>
                 <a:extLst>
                   <a:ext uri="{0D108BD9-81ED-4DB2-BD59-A6C34878D82A}">
-                    <a16:rowId xmlns:a16="http://schemas.microsoft.com/office/drawing/2014/main" val="10006"/>
+                    <a16:rowId xmlns:a16="http://schemas.microsoft.com/office/drawing/2014/main" xmlns="" val="10006"/>
                   </a:ext>
                 </a:extLst>
               </a:tr>
@@ -25779,6 +25847,14 @@
   <p:clrMapOvr>
     <a:masterClrMapping/>
   </p:clrMapOvr>
+  <mc:AlternateContent xmlns:mc="http://schemas.openxmlformats.org/markup-compatibility/2006">
+    <mc:Choice xmlns:p14="http://schemas.microsoft.com/office/powerpoint/2010/main" Requires="p14">
+      <p:transition spd="slow" p14:dur="2000"/>
+    </mc:Choice>
+    <mc:Fallback>
+      <p:transition spd="slow"/>
+    </mc:Fallback>
+  </mc:AlternateContent>
 </p:sld>
 </file>
 
@@ -28560,13 +28636,8 @@
           <a:p>
             <a:r>
               <a:rPr lang="en-US" dirty="0"/>
-              <a:t>Logical </a:t>
-            </a:r>
-            <a:r>
-              <a:rPr lang="en-US"/>
-              <a:t>operators only</a:t>
-            </a:r>
-            <a:endParaRPr lang="en-US" dirty="0"/>
+              <a:t>Logical operators only</a:t>
+            </a:r>
           </a:p>
         </p:txBody>
       </p:sp>
@@ -28709,8 +28780,25 @@
             <a:pPr lvl="1"/>
             <a:r>
               <a:rPr lang="en-US" dirty="0"/>
-              <a:t>Other physical properties</a:t>
-            </a:r>
+              <a:t>Other physical </a:t>
+            </a:r>
+            <a:r>
+              <a:rPr lang="en-US" dirty="0" smtClean="0"/>
+              <a:t>properties (</a:t>
+            </a:r>
+            <a:r>
+              <a:rPr lang="en-US" dirty="0" err="1" smtClean="0"/>
+              <a:t>nullability</a:t>
+            </a:r>
+            <a:r>
+              <a:rPr lang="en-US" smtClean="0"/>
+              <a:t>, constraints</a:t>
+            </a:r>
+            <a:r>
+              <a:rPr lang="en-US" dirty="0" smtClean="0"/>
+              <a:t>)</a:t>
+            </a:r>
+            <a:endParaRPr lang="en-US" dirty="0"/>
           </a:p>
           <a:p>
             <a:pPr lvl="1"/>
@@ -29566,6 +29654,14 @@
   <p:clrMapOvr>
     <a:masterClrMapping/>
   </p:clrMapOvr>
+  <mc:AlternateContent xmlns:mc="http://schemas.openxmlformats.org/markup-compatibility/2006">
+    <mc:Choice xmlns:p14="http://schemas.microsoft.com/office/powerpoint/2010/main" Requires="p14">
+      <p:transition spd="slow" p14:dur="2000"/>
+    </mc:Choice>
+    <mc:Fallback>
+      <p:transition spd="slow"/>
+    </mc:Fallback>
+  </mc:AlternateContent>
 </p:sld>
 </file>
 
@@ -29918,14 +30014,14 @@
                 <a:gridCol w="7632835">
                   <a:extLst>
                     <a:ext uri="{9D8B030D-6E8A-4147-A177-3AD203B41FA5}">
-                      <a16:colId xmlns:a16="http://schemas.microsoft.com/office/drawing/2014/main" val="3644048045"/>
+                      <a16:colId xmlns:a16="http://schemas.microsoft.com/office/drawing/2014/main" xmlns="" val="3644048045"/>
                     </a:ext>
                   </a:extLst>
                 </a:gridCol>
                 <a:gridCol w="606393">
                   <a:extLst>
                     <a:ext uri="{9D8B030D-6E8A-4147-A177-3AD203B41FA5}">
-                      <a16:colId xmlns:a16="http://schemas.microsoft.com/office/drawing/2014/main" val="2034254753"/>
+                      <a16:colId xmlns:a16="http://schemas.microsoft.com/office/drawing/2014/main" xmlns="" val="2034254753"/>
                     </a:ext>
                   </a:extLst>
                 </a:gridCol>
@@ -29956,7 +30052,7 @@
                 </a:tc>
                 <a:extLst>
                   <a:ext uri="{0D108BD9-81ED-4DB2-BD59-A6C34878D82A}">
-                    <a16:rowId xmlns:a16="http://schemas.microsoft.com/office/drawing/2014/main" val="2708275910"/>
+                    <a16:rowId xmlns:a16="http://schemas.microsoft.com/office/drawing/2014/main" xmlns="" val="2708275910"/>
                   </a:ext>
                 </a:extLst>
               </a:tr>
@@ -29990,7 +30086,7 @@
                 </a:tc>
                 <a:extLst>
                   <a:ext uri="{0D108BD9-81ED-4DB2-BD59-A6C34878D82A}">
-                    <a16:rowId xmlns:a16="http://schemas.microsoft.com/office/drawing/2014/main" val="2161984115"/>
+                    <a16:rowId xmlns:a16="http://schemas.microsoft.com/office/drawing/2014/main" xmlns="" val="2161984115"/>
                   </a:ext>
                 </a:extLst>
               </a:tr>
@@ -30037,7 +30133,7 @@
                 </a:tc>
                 <a:extLst>
                   <a:ext uri="{0D108BD9-81ED-4DB2-BD59-A6C34878D82A}">
-                    <a16:rowId xmlns:a16="http://schemas.microsoft.com/office/drawing/2014/main" val="2841678841"/>
+                    <a16:rowId xmlns:a16="http://schemas.microsoft.com/office/drawing/2014/main" xmlns="" val="2841678841"/>
                   </a:ext>
                 </a:extLst>
               </a:tr>
@@ -30071,7 +30167,7 @@
                 </a:tc>
                 <a:extLst>
                   <a:ext uri="{0D108BD9-81ED-4DB2-BD59-A6C34878D82A}">
-                    <a16:rowId xmlns:a16="http://schemas.microsoft.com/office/drawing/2014/main" val="3144998627"/>
+                    <a16:rowId xmlns:a16="http://schemas.microsoft.com/office/drawing/2014/main" xmlns="" val="3144998627"/>
                   </a:ext>
                 </a:extLst>
               </a:tr>
@@ -30113,7 +30209,7 @@
                 </a:tc>
                 <a:extLst>
                   <a:ext uri="{0D108BD9-81ED-4DB2-BD59-A6C34878D82A}">
-                    <a16:rowId xmlns:a16="http://schemas.microsoft.com/office/drawing/2014/main" val="1419261869"/>
+                    <a16:rowId xmlns:a16="http://schemas.microsoft.com/office/drawing/2014/main" xmlns="" val="1419261869"/>
                   </a:ext>
                 </a:extLst>
               </a:tr>
@@ -30151,7 +30247,7 @@
                 </a:tc>
                 <a:extLst>
                   <a:ext uri="{0D108BD9-81ED-4DB2-BD59-A6C34878D82A}">
-                    <a16:rowId xmlns:a16="http://schemas.microsoft.com/office/drawing/2014/main" val="1427391072"/>
+                    <a16:rowId xmlns:a16="http://schemas.microsoft.com/office/drawing/2014/main" xmlns="" val="1427391072"/>
                   </a:ext>
                 </a:extLst>
               </a:tr>
@@ -30198,7 +30294,7 @@
                 </a:tc>
                 <a:extLst>
                   <a:ext uri="{0D108BD9-81ED-4DB2-BD59-A6C34878D82A}">
-                    <a16:rowId xmlns:a16="http://schemas.microsoft.com/office/drawing/2014/main" val="2346539918"/>
+                    <a16:rowId xmlns:a16="http://schemas.microsoft.com/office/drawing/2014/main" xmlns="" val="2346539918"/>
                   </a:ext>
                 </a:extLst>
               </a:tr>
@@ -30237,7 +30333,7 @@
                 </a:tc>
                 <a:extLst>
                   <a:ext uri="{0D108BD9-81ED-4DB2-BD59-A6C34878D82A}">
-                    <a16:rowId xmlns:a16="http://schemas.microsoft.com/office/drawing/2014/main" val="2275483042"/>
+                    <a16:rowId xmlns:a16="http://schemas.microsoft.com/office/drawing/2014/main" xmlns="" val="2275483042"/>
                   </a:ext>
                 </a:extLst>
               </a:tr>
@@ -30275,7 +30371,7 @@
                 </a:tc>
                 <a:extLst>
                   <a:ext uri="{0D108BD9-81ED-4DB2-BD59-A6C34878D82A}">
-                    <a16:rowId xmlns:a16="http://schemas.microsoft.com/office/drawing/2014/main" val="4202569347"/>
+                    <a16:rowId xmlns:a16="http://schemas.microsoft.com/office/drawing/2014/main" xmlns="" val="4202569347"/>
                   </a:ext>
                 </a:extLst>
               </a:tr>
@@ -30309,7 +30405,7 @@
                 </a:tc>
                 <a:extLst>
                   <a:ext uri="{0D108BD9-81ED-4DB2-BD59-A6C34878D82A}">
-                    <a16:rowId xmlns:a16="http://schemas.microsoft.com/office/drawing/2014/main" val="2989839269"/>
+                    <a16:rowId xmlns:a16="http://schemas.microsoft.com/office/drawing/2014/main" xmlns="" val="2989839269"/>
                   </a:ext>
                 </a:extLst>
               </a:tr>
@@ -30343,7 +30439,7 @@
                 </a:tc>
                 <a:extLst>
                   <a:ext uri="{0D108BD9-81ED-4DB2-BD59-A6C34878D82A}">
-                    <a16:rowId xmlns:a16="http://schemas.microsoft.com/office/drawing/2014/main" val="2130545569"/>
+                    <a16:rowId xmlns:a16="http://schemas.microsoft.com/office/drawing/2014/main" xmlns="" val="2130545569"/>
                   </a:ext>
                 </a:extLst>
               </a:tr>
@@ -30399,7 +30495,7 @@
                 </a:tc>
                 <a:extLst>
                   <a:ext uri="{0D108BD9-81ED-4DB2-BD59-A6C34878D82A}">
-                    <a16:rowId xmlns:a16="http://schemas.microsoft.com/office/drawing/2014/main" val="1848127216"/>
+                    <a16:rowId xmlns:a16="http://schemas.microsoft.com/office/drawing/2014/main" xmlns="" val="1848127216"/>
                   </a:ext>
                 </a:extLst>
               </a:tr>
@@ -30493,6 +30589,14 @@
   <p:clrMapOvr>
     <a:masterClrMapping/>
   </p:clrMapOvr>
+  <mc:AlternateContent xmlns:mc="http://schemas.openxmlformats.org/markup-compatibility/2006">
+    <mc:Choice xmlns:p14="http://schemas.microsoft.com/office/powerpoint/2010/main" Requires="p14">
+      <p:transition spd="slow" p14:dur="2000"/>
+    </mc:Choice>
+    <mc:Fallback>
+      <p:transition spd="slow"/>
+    </mc:Fallback>
+  </mc:AlternateContent>
 </p:sld>
 </file>
 
@@ -30845,14 +30949,14 @@
                 <a:gridCol w="4119615">
                   <a:extLst>
                     <a:ext uri="{9D8B030D-6E8A-4147-A177-3AD203B41FA5}">
-                      <a16:colId xmlns:a16="http://schemas.microsoft.com/office/drawing/2014/main" val="3644048045"/>
+                      <a16:colId xmlns:a16="http://schemas.microsoft.com/office/drawing/2014/main" xmlns="" val="3644048045"/>
                     </a:ext>
                   </a:extLst>
                 </a:gridCol>
                 <a:gridCol w="4119613">
                   <a:extLst>
                     <a:ext uri="{9D8B030D-6E8A-4147-A177-3AD203B41FA5}">
-                      <a16:colId xmlns:a16="http://schemas.microsoft.com/office/drawing/2014/main" val="2034254753"/>
+                      <a16:colId xmlns:a16="http://schemas.microsoft.com/office/drawing/2014/main" xmlns="" val="2034254753"/>
                     </a:ext>
                   </a:extLst>
                 </a:gridCol>
@@ -30888,7 +30992,7 @@
                 </a:tc>
                 <a:extLst>
                   <a:ext uri="{0D108BD9-81ED-4DB2-BD59-A6C34878D82A}">
-                    <a16:rowId xmlns:a16="http://schemas.microsoft.com/office/drawing/2014/main" val="2708275910"/>
+                    <a16:rowId xmlns:a16="http://schemas.microsoft.com/office/drawing/2014/main" xmlns="" val="2708275910"/>
                   </a:ext>
                 </a:extLst>
               </a:tr>
@@ -31088,7 +31192,7 @@
                 </a:tc>
                 <a:extLst>
                   <a:ext uri="{0D108BD9-81ED-4DB2-BD59-A6C34878D82A}">
-                    <a16:rowId xmlns:a16="http://schemas.microsoft.com/office/drawing/2014/main" val="2161984115"/>
+                    <a16:rowId xmlns:a16="http://schemas.microsoft.com/office/drawing/2014/main" xmlns="" val="2161984115"/>
                   </a:ext>
                 </a:extLst>
               </a:tr>
@@ -31288,7 +31392,7 @@
                 </a:tc>
                 <a:extLst>
                   <a:ext uri="{0D108BD9-81ED-4DB2-BD59-A6C34878D82A}">
-                    <a16:rowId xmlns:a16="http://schemas.microsoft.com/office/drawing/2014/main" val="2841678841"/>
+                    <a16:rowId xmlns:a16="http://schemas.microsoft.com/office/drawing/2014/main" xmlns="" val="2841678841"/>
                   </a:ext>
                 </a:extLst>
               </a:tr>
@@ -31488,7 +31592,7 @@
                 </a:tc>
                 <a:extLst>
                   <a:ext uri="{0D108BD9-81ED-4DB2-BD59-A6C34878D82A}">
-                    <a16:rowId xmlns:a16="http://schemas.microsoft.com/office/drawing/2014/main" val="3144998627"/>
+                    <a16:rowId xmlns:a16="http://schemas.microsoft.com/office/drawing/2014/main" xmlns="" val="3144998627"/>
                   </a:ext>
                 </a:extLst>
               </a:tr>
@@ -31688,7 +31792,7 @@
                 </a:tc>
                 <a:extLst>
                   <a:ext uri="{0D108BD9-81ED-4DB2-BD59-A6C34878D82A}">
-                    <a16:rowId xmlns:a16="http://schemas.microsoft.com/office/drawing/2014/main" val="1419261869"/>
+                    <a16:rowId xmlns:a16="http://schemas.microsoft.com/office/drawing/2014/main" xmlns="" val="1419261869"/>
                   </a:ext>
                 </a:extLst>
               </a:tr>
@@ -31888,7 +31992,7 @@
                 </a:tc>
                 <a:extLst>
                   <a:ext uri="{0D108BD9-81ED-4DB2-BD59-A6C34878D82A}">
-                    <a16:rowId xmlns:a16="http://schemas.microsoft.com/office/drawing/2014/main" val="1427391072"/>
+                    <a16:rowId xmlns:a16="http://schemas.microsoft.com/office/drawing/2014/main" xmlns="" val="1427391072"/>
                   </a:ext>
                 </a:extLst>
               </a:tr>
@@ -32088,7 +32192,7 @@
                 </a:tc>
                 <a:extLst>
                   <a:ext uri="{0D108BD9-81ED-4DB2-BD59-A6C34878D82A}">
-                    <a16:rowId xmlns:a16="http://schemas.microsoft.com/office/drawing/2014/main" val="2346539918"/>
+                    <a16:rowId xmlns:a16="http://schemas.microsoft.com/office/drawing/2014/main" xmlns="" val="2346539918"/>
                   </a:ext>
                 </a:extLst>
               </a:tr>
@@ -32297,7 +32401,7 @@
                 </a:tc>
                 <a:extLst>
                   <a:ext uri="{0D108BD9-81ED-4DB2-BD59-A6C34878D82A}">
-                    <a16:rowId xmlns:a16="http://schemas.microsoft.com/office/drawing/2014/main" val="2275483042"/>
+                    <a16:rowId xmlns:a16="http://schemas.microsoft.com/office/drawing/2014/main" xmlns="" val="2275483042"/>
                   </a:ext>
                 </a:extLst>
               </a:tr>
@@ -32506,7 +32610,7 @@
                 </a:tc>
                 <a:extLst>
                   <a:ext uri="{0D108BD9-81ED-4DB2-BD59-A6C34878D82A}">
-                    <a16:rowId xmlns:a16="http://schemas.microsoft.com/office/drawing/2014/main" val="4202569347"/>
+                    <a16:rowId xmlns:a16="http://schemas.microsoft.com/office/drawing/2014/main" xmlns="" val="4202569347"/>
                   </a:ext>
                 </a:extLst>
               </a:tr>
@@ -32715,7 +32819,7 @@
                 </a:tc>
                 <a:extLst>
                   <a:ext uri="{0D108BD9-81ED-4DB2-BD59-A6C34878D82A}">
-                    <a16:rowId xmlns:a16="http://schemas.microsoft.com/office/drawing/2014/main" val="2989839269"/>
+                    <a16:rowId xmlns:a16="http://schemas.microsoft.com/office/drawing/2014/main" xmlns="" val="2989839269"/>
                   </a:ext>
                 </a:extLst>
               </a:tr>
@@ -32924,7 +33028,7 @@
                 </a:tc>
                 <a:extLst>
                   <a:ext uri="{0D108BD9-81ED-4DB2-BD59-A6C34878D82A}">
-                    <a16:rowId xmlns:a16="http://schemas.microsoft.com/office/drawing/2014/main" val="2130545569"/>
+                    <a16:rowId xmlns:a16="http://schemas.microsoft.com/office/drawing/2014/main" xmlns="" val="2130545569"/>
                   </a:ext>
                 </a:extLst>
               </a:tr>
@@ -33133,7 +33237,7 @@
                 </a:tc>
                 <a:extLst>
                   <a:ext uri="{0D108BD9-81ED-4DB2-BD59-A6C34878D82A}">
-                    <a16:rowId xmlns:a16="http://schemas.microsoft.com/office/drawing/2014/main" val="3045796785"/>
+                    <a16:rowId xmlns:a16="http://schemas.microsoft.com/office/drawing/2014/main" xmlns="" val="3045796785"/>
                   </a:ext>
                 </a:extLst>
               </a:tr>
@@ -33342,7 +33446,7 @@
                 </a:tc>
                 <a:extLst>
                   <a:ext uri="{0D108BD9-81ED-4DB2-BD59-A6C34878D82A}">
-                    <a16:rowId xmlns:a16="http://schemas.microsoft.com/office/drawing/2014/main" val="1091494175"/>
+                    <a16:rowId xmlns:a16="http://schemas.microsoft.com/office/drawing/2014/main" xmlns="" val="1091494175"/>
                   </a:ext>
                 </a:extLst>
               </a:tr>
@@ -33360,6 +33464,14 @@
   <p:clrMapOvr>
     <a:masterClrMapping/>
   </p:clrMapOvr>
+  <mc:AlternateContent xmlns:mc="http://schemas.openxmlformats.org/markup-compatibility/2006">
+    <mc:Choice xmlns:p14="http://schemas.microsoft.com/office/powerpoint/2010/main" Requires="p14">
+      <p:transition spd="slow" p14:dur="2000"/>
+    </mc:Choice>
+    <mc:Fallback>
+      <p:transition spd="slow"/>
+    </mc:Fallback>
+  </mc:AlternateContent>
 </p:sld>
 </file>
 
@@ -33472,6 +33584,14 @@
   <p:clrMapOvr>
     <a:masterClrMapping/>
   </p:clrMapOvr>
+  <mc:AlternateContent xmlns:mc="http://schemas.openxmlformats.org/markup-compatibility/2006">
+    <mc:Choice xmlns:p14="http://schemas.microsoft.com/office/powerpoint/2010/main" Requires="p14">
+      <p:transition spd="slow" p14:dur="2000"/>
+    </mc:Choice>
+    <mc:Fallback>
+      <p:transition spd="slow"/>
+    </mc:Fallback>
+  </mc:AlternateContent>
 </p:sld>
 </file>
 
@@ -33755,6 +33875,14 @@
   <p:clrMapOvr>
     <a:masterClrMapping/>
   </p:clrMapOvr>
+  <mc:AlternateContent xmlns:mc="http://schemas.openxmlformats.org/markup-compatibility/2006">
+    <mc:Choice xmlns:p14="http://schemas.microsoft.com/office/powerpoint/2010/main" Requires="p14">
+      <p:transition spd="slow" p14:dur="2000"/>
+    </mc:Choice>
+    <mc:Fallback>
+      <p:transition spd="slow"/>
+    </mc:Fallback>
+  </mc:AlternateContent>
 </p:sld>
 </file>
 
@@ -34451,6 +34579,14 @@
   <p:clrMapOvr>
     <a:masterClrMapping/>
   </p:clrMapOvr>
+  <mc:AlternateContent xmlns:mc="http://schemas.openxmlformats.org/markup-compatibility/2006">
+    <mc:Choice xmlns:p14="http://schemas.microsoft.com/office/powerpoint/2010/main" Requires="p14">
+      <p:transition spd="slow" p14:dur="2000"/>
+    </mc:Choice>
+    <mc:Fallback>
+      <p:transition spd="slow"/>
+    </mc:Fallback>
+  </mc:AlternateContent>
 </p:sld>
 </file>
 
@@ -34863,6 +34999,14 @@
   <p:clrMapOvr>
     <a:masterClrMapping/>
   </p:clrMapOvr>
+  <mc:AlternateContent xmlns:mc="http://schemas.openxmlformats.org/markup-compatibility/2006">
+    <mc:Choice xmlns:p14="http://schemas.microsoft.com/office/powerpoint/2010/main" Requires="p14">
+      <p:transition spd="slow" p14:dur="2000"/>
+    </mc:Choice>
+    <mc:Fallback>
+      <p:transition spd="slow"/>
+    </mc:Fallback>
+  </mc:AlternateContent>
 </p:sld>
 </file>
 
@@ -35959,6 +36103,14 @@
   <p:clrMapOvr>
     <a:masterClrMapping/>
   </p:clrMapOvr>
+  <mc:AlternateContent xmlns:mc="http://schemas.openxmlformats.org/markup-compatibility/2006">
+    <mc:Choice xmlns:p14="http://schemas.microsoft.com/office/powerpoint/2010/main" Requires="p14">
+      <p:transition spd="slow" p14:dur="2000"/>
+    </mc:Choice>
+    <mc:Fallback>
+      <p:transition spd="slow"/>
+    </mc:Fallback>
+  </mc:AlternateContent>
 </p:sld>
 </file>
 
@@ -36750,14 +36902,14 @@
                 <a:gridCol w="957714">
                   <a:extLst>
                     <a:ext uri="{9D8B030D-6E8A-4147-A177-3AD203B41FA5}">
-                      <a16:colId xmlns:a16="http://schemas.microsoft.com/office/drawing/2014/main" val="3940544257"/>
+                      <a16:colId xmlns:a16="http://schemas.microsoft.com/office/drawing/2014/main" xmlns="" val="3940544257"/>
                     </a:ext>
                   </a:extLst>
                 </a:gridCol>
                 <a:gridCol w="2464067">
                   <a:extLst>
                     <a:ext uri="{9D8B030D-6E8A-4147-A177-3AD203B41FA5}">
-                      <a16:colId xmlns:a16="http://schemas.microsoft.com/office/drawing/2014/main" val="3658567973"/>
+                      <a16:colId xmlns:a16="http://schemas.microsoft.com/office/drawing/2014/main" xmlns="" val="3658567973"/>
                     </a:ext>
                   </a:extLst>
                 </a:gridCol>
@@ -36791,7 +36943,7 @@
                 </a:tc>
                 <a:extLst>
                   <a:ext uri="{0D108BD9-81ED-4DB2-BD59-A6C34878D82A}">
-                    <a16:rowId xmlns:a16="http://schemas.microsoft.com/office/drawing/2014/main" val="1032275335"/>
+                    <a16:rowId xmlns:a16="http://schemas.microsoft.com/office/drawing/2014/main" xmlns="" val="1032275335"/>
                   </a:ext>
                 </a:extLst>
               </a:tr>
@@ -36921,7 +37073,7 @@
                 </a:tc>
                 <a:extLst>
                   <a:ext uri="{0D108BD9-81ED-4DB2-BD59-A6C34878D82A}">
-                    <a16:rowId xmlns:a16="http://schemas.microsoft.com/office/drawing/2014/main" val="4191484087"/>
+                    <a16:rowId xmlns:a16="http://schemas.microsoft.com/office/drawing/2014/main" xmlns="" val="4191484087"/>
                   </a:ext>
                 </a:extLst>
               </a:tr>
@@ -36995,7 +37147,7 @@
                 </a:tc>
                 <a:extLst>
                   <a:ext uri="{0D108BD9-81ED-4DB2-BD59-A6C34878D82A}">
-                    <a16:rowId xmlns:a16="http://schemas.microsoft.com/office/drawing/2014/main" val="1864588626"/>
+                    <a16:rowId xmlns:a16="http://schemas.microsoft.com/office/drawing/2014/main" xmlns="" val="1864588626"/>
                   </a:ext>
                 </a:extLst>
               </a:tr>
@@ -37117,7 +37269,7 @@
                 </a:tc>
                 <a:extLst>
                   <a:ext uri="{0D108BD9-81ED-4DB2-BD59-A6C34878D82A}">
-                    <a16:rowId xmlns:a16="http://schemas.microsoft.com/office/drawing/2014/main" val="3035259714"/>
+                    <a16:rowId xmlns:a16="http://schemas.microsoft.com/office/drawing/2014/main" xmlns="" val="3035259714"/>
                   </a:ext>
                 </a:extLst>
               </a:tr>
@@ -37206,7 +37358,7 @@
                 </a:tc>
                 <a:extLst>
                   <a:ext uri="{0D108BD9-81ED-4DB2-BD59-A6C34878D82A}">
-                    <a16:rowId xmlns:a16="http://schemas.microsoft.com/office/drawing/2014/main" val="2023621082"/>
+                    <a16:rowId xmlns:a16="http://schemas.microsoft.com/office/drawing/2014/main" xmlns="" val="2023621082"/>
                   </a:ext>
                 </a:extLst>
               </a:tr>
@@ -37295,7 +37447,7 @@
                 </a:tc>
                 <a:extLst>
                   <a:ext uri="{0D108BD9-81ED-4DB2-BD59-A6C34878D82A}">
-                    <a16:rowId xmlns:a16="http://schemas.microsoft.com/office/drawing/2014/main" val="120016333"/>
+                    <a16:rowId xmlns:a16="http://schemas.microsoft.com/office/drawing/2014/main" xmlns="" val="120016333"/>
                   </a:ext>
                 </a:extLst>
               </a:tr>
@@ -37440,21 +37592,21 @@
                 <a:gridCol w="960120">
                   <a:extLst>
                     <a:ext uri="{9D8B030D-6E8A-4147-A177-3AD203B41FA5}">
-                      <a16:colId xmlns:a16="http://schemas.microsoft.com/office/drawing/2014/main" val="392696932"/>
+                      <a16:colId xmlns:a16="http://schemas.microsoft.com/office/drawing/2014/main" xmlns="" val="392696932"/>
                     </a:ext>
                   </a:extLst>
                 </a:gridCol>
                 <a:gridCol w="2468880">
                   <a:extLst>
                     <a:ext uri="{9D8B030D-6E8A-4147-A177-3AD203B41FA5}">
-                      <a16:colId xmlns:a16="http://schemas.microsoft.com/office/drawing/2014/main" val="2769969192"/>
+                      <a16:colId xmlns:a16="http://schemas.microsoft.com/office/drawing/2014/main" xmlns="" val="2769969192"/>
                     </a:ext>
                   </a:extLst>
                 </a:gridCol>
                 <a:gridCol w="2468880">
                   <a:extLst>
                     <a:ext uri="{9D8B030D-6E8A-4147-A177-3AD203B41FA5}">
-                      <a16:colId xmlns:a16="http://schemas.microsoft.com/office/drawing/2014/main" val="2022610816"/>
+                      <a16:colId xmlns:a16="http://schemas.microsoft.com/office/drawing/2014/main" xmlns="" val="2022610816"/>
                     </a:ext>
                   </a:extLst>
                 </a:gridCol>
@@ -37506,7 +37658,7 @@
                 </a:tc>
                 <a:extLst>
                   <a:ext uri="{0D108BD9-81ED-4DB2-BD59-A6C34878D82A}">
-                    <a16:rowId xmlns:a16="http://schemas.microsoft.com/office/drawing/2014/main" val="2344937666"/>
+                    <a16:rowId xmlns:a16="http://schemas.microsoft.com/office/drawing/2014/main" xmlns="" val="2344937666"/>
                   </a:ext>
                 </a:extLst>
               </a:tr>
@@ -37639,7 +37791,7 @@
                 </a:tc>
                 <a:extLst>
                   <a:ext uri="{0D108BD9-81ED-4DB2-BD59-A6C34878D82A}">
-                    <a16:rowId xmlns:a16="http://schemas.microsoft.com/office/drawing/2014/main" val="1917341330"/>
+                    <a16:rowId xmlns:a16="http://schemas.microsoft.com/office/drawing/2014/main" xmlns="" val="1917341330"/>
                   </a:ext>
                 </a:extLst>
               </a:tr>
@@ -37856,7 +38008,7 @@
                 </a:tc>
                 <a:extLst>
                   <a:ext uri="{0D108BD9-81ED-4DB2-BD59-A6C34878D82A}">
-                    <a16:rowId xmlns:a16="http://schemas.microsoft.com/office/drawing/2014/main" val="3088042860"/>
+                    <a16:rowId xmlns:a16="http://schemas.microsoft.com/office/drawing/2014/main" xmlns="" val="3088042860"/>
                   </a:ext>
                 </a:extLst>
               </a:tr>
@@ -37940,7 +38092,7 @@
                 </a:tc>
                 <a:extLst>
                   <a:ext uri="{0D108BD9-81ED-4DB2-BD59-A6C34878D82A}">
-                    <a16:rowId xmlns:a16="http://schemas.microsoft.com/office/drawing/2014/main" val="2658530722"/>
+                    <a16:rowId xmlns:a16="http://schemas.microsoft.com/office/drawing/2014/main" xmlns="" val="2658530722"/>
                   </a:ext>
                 </a:extLst>
               </a:tr>
@@ -38072,7 +38224,7 @@
                 </a:tc>
                 <a:extLst>
                   <a:ext uri="{0D108BD9-81ED-4DB2-BD59-A6C34878D82A}">
-                    <a16:rowId xmlns:a16="http://schemas.microsoft.com/office/drawing/2014/main" val="1481886367"/>
+                    <a16:rowId xmlns:a16="http://schemas.microsoft.com/office/drawing/2014/main" xmlns="" val="1481886367"/>
                   </a:ext>
                 </a:extLst>
               </a:tr>
@@ -38171,7 +38323,7 @@
                 </a:tc>
                 <a:extLst>
                   <a:ext uri="{0D108BD9-81ED-4DB2-BD59-A6C34878D82A}">
-                    <a16:rowId xmlns:a16="http://schemas.microsoft.com/office/drawing/2014/main" val="4248384778"/>
+                    <a16:rowId xmlns:a16="http://schemas.microsoft.com/office/drawing/2014/main" xmlns="" val="4248384778"/>
                   </a:ext>
                 </a:extLst>
               </a:tr>
@@ -38270,7 +38422,7 @@
                 </a:tc>
                 <a:extLst>
                   <a:ext uri="{0D108BD9-81ED-4DB2-BD59-A6C34878D82A}">
-                    <a16:rowId xmlns:a16="http://schemas.microsoft.com/office/drawing/2014/main" val="1670483340"/>
+                    <a16:rowId xmlns:a16="http://schemas.microsoft.com/office/drawing/2014/main" xmlns="" val="1670483340"/>
                   </a:ext>
                 </a:extLst>
               </a:tr>
@@ -38415,28 +38567,28 @@
                 <a:gridCol w="960120">
                   <a:extLst>
                     <a:ext uri="{9D8B030D-6E8A-4147-A177-3AD203B41FA5}">
-                      <a16:colId xmlns:a16="http://schemas.microsoft.com/office/drawing/2014/main" val="392696932"/>
+                      <a16:colId xmlns:a16="http://schemas.microsoft.com/office/drawing/2014/main" xmlns="" val="392696932"/>
                     </a:ext>
                   </a:extLst>
                 </a:gridCol>
                 <a:gridCol w="2468880">
                   <a:extLst>
                     <a:ext uri="{9D8B030D-6E8A-4147-A177-3AD203B41FA5}">
-                      <a16:colId xmlns:a16="http://schemas.microsoft.com/office/drawing/2014/main" val="2769969192"/>
+                      <a16:colId xmlns:a16="http://schemas.microsoft.com/office/drawing/2014/main" xmlns="" val="2769969192"/>
                     </a:ext>
                   </a:extLst>
                 </a:gridCol>
                 <a:gridCol w="2468880">
                   <a:extLst>
                     <a:ext uri="{9D8B030D-6E8A-4147-A177-3AD203B41FA5}">
-                      <a16:colId xmlns:a16="http://schemas.microsoft.com/office/drawing/2014/main" val="2022610816"/>
+                      <a16:colId xmlns:a16="http://schemas.microsoft.com/office/drawing/2014/main" xmlns="" val="2022610816"/>
                     </a:ext>
                   </a:extLst>
                 </a:gridCol>
                 <a:gridCol w="2468880">
                   <a:extLst>
                     <a:ext uri="{9D8B030D-6E8A-4147-A177-3AD203B41FA5}">
-                      <a16:colId xmlns:a16="http://schemas.microsoft.com/office/drawing/2014/main" val="102813283"/>
+                      <a16:colId xmlns:a16="http://schemas.microsoft.com/office/drawing/2014/main" xmlns="" val="102813283"/>
                     </a:ext>
                   </a:extLst>
                 </a:gridCol>
@@ -38501,7 +38653,7 @@
                 </a:tc>
                 <a:extLst>
                   <a:ext uri="{0D108BD9-81ED-4DB2-BD59-A6C34878D82A}">
-                    <a16:rowId xmlns:a16="http://schemas.microsoft.com/office/drawing/2014/main" val="2344937666"/>
+                    <a16:rowId xmlns:a16="http://schemas.microsoft.com/office/drawing/2014/main" xmlns="" val="2344937666"/>
                   </a:ext>
                 </a:extLst>
               </a:tr>
@@ -38661,7 +38813,7 @@
                 </a:tc>
                 <a:extLst>
                   <a:ext uri="{0D108BD9-81ED-4DB2-BD59-A6C34878D82A}">
-                    <a16:rowId xmlns:a16="http://schemas.microsoft.com/office/drawing/2014/main" val="1917341330"/>
+                    <a16:rowId xmlns:a16="http://schemas.microsoft.com/office/drawing/2014/main" xmlns="" val="1917341330"/>
                   </a:ext>
                 </a:extLst>
               </a:tr>
@@ -38965,7 +39117,7 @@
                 </a:tc>
                 <a:extLst>
                   <a:ext uri="{0D108BD9-81ED-4DB2-BD59-A6C34878D82A}">
-                    <a16:rowId xmlns:a16="http://schemas.microsoft.com/office/drawing/2014/main" val="3088042860"/>
+                    <a16:rowId xmlns:a16="http://schemas.microsoft.com/office/drawing/2014/main" xmlns="" val="3088042860"/>
                   </a:ext>
                 </a:extLst>
               </a:tr>
@@ -39059,7 +39211,7 @@
                 </a:tc>
                 <a:extLst>
                   <a:ext uri="{0D108BD9-81ED-4DB2-BD59-A6C34878D82A}">
-                    <a16:rowId xmlns:a16="http://schemas.microsoft.com/office/drawing/2014/main" val="2658530722"/>
+                    <a16:rowId xmlns:a16="http://schemas.microsoft.com/office/drawing/2014/main" xmlns="" val="2658530722"/>
                   </a:ext>
                 </a:extLst>
               </a:tr>
@@ -39252,7 +39404,7 @@
                 </a:tc>
                 <a:extLst>
                   <a:ext uri="{0D108BD9-81ED-4DB2-BD59-A6C34878D82A}">
-                    <a16:rowId xmlns:a16="http://schemas.microsoft.com/office/drawing/2014/main" val="1481886367"/>
+                    <a16:rowId xmlns:a16="http://schemas.microsoft.com/office/drawing/2014/main" xmlns="" val="1481886367"/>
                   </a:ext>
                 </a:extLst>
               </a:tr>
@@ -39361,7 +39513,7 @@
                 </a:tc>
                 <a:extLst>
                   <a:ext uri="{0D108BD9-81ED-4DB2-BD59-A6C34878D82A}">
-                    <a16:rowId xmlns:a16="http://schemas.microsoft.com/office/drawing/2014/main" val="4248384778"/>
+                    <a16:rowId xmlns:a16="http://schemas.microsoft.com/office/drawing/2014/main" xmlns="" val="4248384778"/>
                   </a:ext>
                 </a:extLst>
               </a:tr>
@@ -39470,7 +39622,7 @@
                 </a:tc>
                 <a:extLst>
                   <a:ext uri="{0D108BD9-81ED-4DB2-BD59-A6C34878D82A}">
-                    <a16:rowId xmlns:a16="http://schemas.microsoft.com/office/drawing/2014/main" val="1670483340"/>
+                    <a16:rowId xmlns:a16="http://schemas.microsoft.com/office/drawing/2014/main" xmlns="" val="1670483340"/>
                   </a:ext>
                 </a:extLst>
               </a:tr>
@@ -39878,14 +40030,14 @@
                 <a:gridCol w="934278">
                   <a:extLst>
                     <a:ext uri="{9D8B030D-6E8A-4147-A177-3AD203B41FA5}">
-                      <a16:colId xmlns:a16="http://schemas.microsoft.com/office/drawing/2014/main" val="4198655800"/>
+                      <a16:colId xmlns:a16="http://schemas.microsoft.com/office/drawing/2014/main" xmlns="" val="4198655800"/>
                     </a:ext>
                   </a:extLst>
                 </a:gridCol>
                 <a:gridCol w="7295322">
                   <a:extLst>
                     <a:ext uri="{9D8B030D-6E8A-4147-A177-3AD203B41FA5}">
-                      <a16:colId xmlns:a16="http://schemas.microsoft.com/office/drawing/2014/main" val="135413862"/>
+                      <a16:colId xmlns:a16="http://schemas.microsoft.com/office/drawing/2014/main" xmlns="" val="135413862"/>
                     </a:ext>
                   </a:extLst>
                 </a:gridCol>
@@ -39919,7 +40071,7 @@
                 </a:tc>
                 <a:extLst>
                   <a:ext uri="{0D108BD9-81ED-4DB2-BD59-A6C34878D82A}">
-                    <a16:rowId xmlns:a16="http://schemas.microsoft.com/office/drawing/2014/main" val="3068323444"/>
+                    <a16:rowId xmlns:a16="http://schemas.microsoft.com/office/drawing/2014/main" xmlns="" val="3068323444"/>
                   </a:ext>
                 </a:extLst>
               </a:tr>
@@ -39952,7 +40104,7 @@
                 </a:tc>
                 <a:extLst>
                   <a:ext uri="{0D108BD9-81ED-4DB2-BD59-A6C34878D82A}">
-                    <a16:rowId xmlns:a16="http://schemas.microsoft.com/office/drawing/2014/main" val="1586961909"/>
+                    <a16:rowId xmlns:a16="http://schemas.microsoft.com/office/drawing/2014/main" xmlns="" val="1586961909"/>
                   </a:ext>
                 </a:extLst>
               </a:tr>
@@ -39990,7 +40142,7 @@
                 </a:tc>
                 <a:extLst>
                   <a:ext uri="{0D108BD9-81ED-4DB2-BD59-A6C34878D82A}">
-                    <a16:rowId xmlns:a16="http://schemas.microsoft.com/office/drawing/2014/main" val="2280300197"/>
+                    <a16:rowId xmlns:a16="http://schemas.microsoft.com/office/drawing/2014/main" xmlns="" val="2280300197"/>
                   </a:ext>
                 </a:extLst>
               </a:tr>
@@ -40028,7 +40180,7 @@
                 </a:tc>
                 <a:extLst>
                   <a:ext uri="{0D108BD9-81ED-4DB2-BD59-A6C34878D82A}">
-                    <a16:rowId xmlns:a16="http://schemas.microsoft.com/office/drawing/2014/main" val="1192843310"/>
+                    <a16:rowId xmlns:a16="http://schemas.microsoft.com/office/drawing/2014/main" xmlns="" val="1192843310"/>
                   </a:ext>
                 </a:extLst>
               </a:tr>
@@ -40066,7 +40218,7 @@
                 </a:tc>
                 <a:extLst>
                   <a:ext uri="{0D108BD9-81ED-4DB2-BD59-A6C34878D82A}">
-                    <a16:rowId xmlns:a16="http://schemas.microsoft.com/office/drawing/2014/main" val="2620585158"/>
+                    <a16:rowId xmlns:a16="http://schemas.microsoft.com/office/drawing/2014/main" xmlns="" val="2620585158"/>
                   </a:ext>
                 </a:extLst>
               </a:tr>
@@ -40099,7 +40251,7 @@
                 </a:tc>
                 <a:extLst>
                   <a:ext uri="{0D108BD9-81ED-4DB2-BD59-A6C34878D82A}">
-                    <a16:rowId xmlns:a16="http://schemas.microsoft.com/office/drawing/2014/main" val="1697738616"/>
+                    <a16:rowId xmlns:a16="http://schemas.microsoft.com/office/drawing/2014/main" xmlns="" val="1697738616"/>
                   </a:ext>
                 </a:extLst>
               </a:tr>
@@ -40137,7 +40289,7 @@
                 </a:tc>
                 <a:extLst>
                   <a:ext uri="{0D108BD9-81ED-4DB2-BD59-A6C34878D82A}">
-                    <a16:rowId xmlns:a16="http://schemas.microsoft.com/office/drawing/2014/main" val="316611556"/>
+                    <a16:rowId xmlns:a16="http://schemas.microsoft.com/office/drawing/2014/main" xmlns="" val="316611556"/>
                   </a:ext>
                 </a:extLst>
               </a:tr>
@@ -40170,7 +40322,7 @@
                 </a:tc>
                 <a:extLst>
                   <a:ext uri="{0D108BD9-81ED-4DB2-BD59-A6C34878D82A}">
-                    <a16:rowId xmlns:a16="http://schemas.microsoft.com/office/drawing/2014/main" val="1312814102"/>
+                    <a16:rowId xmlns:a16="http://schemas.microsoft.com/office/drawing/2014/main" xmlns="" val="1312814102"/>
                   </a:ext>
                 </a:extLst>
               </a:tr>
@@ -40203,7 +40355,7 @@
                 </a:tc>
                 <a:extLst>
                   <a:ext uri="{0D108BD9-81ED-4DB2-BD59-A6C34878D82A}">
-                    <a16:rowId xmlns:a16="http://schemas.microsoft.com/office/drawing/2014/main" val="1975533996"/>
+                    <a16:rowId xmlns:a16="http://schemas.microsoft.com/office/drawing/2014/main" xmlns="" val="1975533996"/>
                   </a:ext>
                 </a:extLst>
               </a:tr>
@@ -40236,7 +40388,7 @@
                 </a:tc>
                 <a:extLst>
                   <a:ext uri="{0D108BD9-81ED-4DB2-BD59-A6C34878D82A}">
-                    <a16:rowId xmlns:a16="http://schemas.microsoft.com/office/drawing/2014/main" val="2759032957"/>
+                    <a16:rowId xmlns:a16="http://schemas.microsoft.com/office/drawing/2014/main" xmlns="" val="2759032957"/>
                   </a:ext>
                 </a:extLst>
               </a:tr>
@@ -40325,14 +40477,14 @@
                 <a:gridCol w="934278">
                   <a:extLst>
                     <a:ext uri="{9D8B030D-6E8A-4147-A177-3AD203B41FA5}">
-                      <a16:colId xmlns:a16="http://schemas.microsoft.com/office/drawing/2014/main" val="4198655800"/>
+                      <a16:colId xmlns:a16="http://schemas.microsoft.com/office/drawing/2014/main" xmlns="" val="4198655800"/>
                     </a:ext>
                   </a:extLst>
                 </a:gridCol>
                 <a:gridCol w="7295322">
                   <a:extLst>
                     <a:ext uri="{9D8B030D-6E8A-4147-A177-3AD203B41FA5}">
-                      <a16:colId xmlns:a16="http://schemas.microsoft.com/office/drawing/2014/main" val="135413862"/>
+                      <a16:colId xmlns:a16="http://schemas.microsoft.com/office/drawing/2014/main" xmlns="" val="135413862"/>
                     </a:ext>
                   </a:extLst>
                 </a:gridCol>
@@ -40366,7 +40518,7 @@
                 </a:tc>
                 <a:extLst>
                   <a:ext uri="{0D108BD9-81ED-4DB2-BD59-A6C34878D82A}">
-                    <a16:rowId xmlns:a16="http://schemas.microsoft.com/office/drawing/2014/main" val="3068323444"/>
+                    <a16:rowId xmlns:a16="http://schemas.microsoft.com/office/drawing/2014/main" xmlns="" val="3068323444"/>
                   </a:ext>
                 </a:extLst>
               </a:tr>
@@ -40399,7 +40551,7 @@
                 </a:tc>
                 <a:extLst>
                   <a:ext uri="{0D108BD9-81ED-4DB2-BD59-A6C34878D82A}">
-                    <a16:rowId xmlns:a16="http://schemas.microsoft.com/office/drawing/2014/main" val="2484981654"/>
+                    <a16:rowId xmlns:a16="http://schemas.microsoft.com/office/drawing/2014/main" xmlns="" val="2484981654"/>
                   </a:ext>
                 </a:extLst>
               </a:tr>
@@ -40437,7 +40589,7 @@
                 </a:tc>
                 <a:extLst>
                   <a:ext uri="{0D108BD9-81ED-4DB2-BD59-A6C34878D82A}">
-                    <a16:rowId xmlns:a16="http://schemas.microsoft.com/office/drawing/2014/main" val="1377910784"/>
+                    <a16:rowId xmlns:a16="http://schemas.microsoft.com/office/drawing/2014/main" xmlns="" val="1377910784"/>
                   </a:ext>
                 </a:extLst>
               </a:tr>
@@ -40470,7 +40622,7 @@
                 </a:tc>
                 <a:extLst>
                   <a:ext uri="{0D108BD9-81ED-4DB2-BD59-A6C34878D82A}">
-                    <a16:rowId xmlns:a16="http://schemas.microsoft.com/office/drawing/2014/main" val="1387856053"/>
+                    <a16:rowId xmlns:a16="http://schemas.microsoft.com/office/drawing/2014/main" xmlns="" val="1387856053"/>
                   </a:ext>
                 </a:extLst>
               </a:tr>
@@ -40508,7 +40660,7 @@
                 </a:tc>
                 <a:extLst>
                   <a:ext uri="{0D108BD9-81ED-4DB2-BD59-A6C34878D82A}">
-                    <a16:rowId xmlns:a16="http://schemas.microsoft.com/office/drawing/2014/main" val="2599123823"/>
+                    <a16:rowId xmlns:a16="http://schemas.microsoft.com/office/drawing/2014/main" xmlns="" val="2599123823"/>
                   </a:ext>
                 </a:extLst>
               </a:tr>
@@ -40549,7 +40701,7 @@
                 </a:tc>
                 <a:extLst>
                   <a:ext uri="{0D108BD9-81ED-4DB2-BD59-A6C34878D82A}">
-                    <a16:rowId xmlns:a16="http://schemas.microsoft.com/office/drawing/2014/main" val="1232603862"/>
+                    <a16:rowId xmlns:a16="http://schemas.microsoft.com/office/drawing/2014/main" xmlns="" val="1232603862"/>
                   </a:ext>
                 </a:extLst>
               </a:tr>
@@ -40582,7 +40734,7 @@
                 </a:tc>
                 <a:extLst>
                   <a:ext uri="{0D108BD9-81ED-4DB2-BD59-A6C34878D82A}">
-                    <a16:rowId xmlns:a16="http://schemas.microsoft.com/office/drawing/2014/main" val="4145944521"/>
+                    <a16:rowId xmlns:a16="http://schemas.microsoft.com/office/drawing/2014/main" xmlns="" val="4145944521"/>
                   </a:ext>
                 </a:extLst>
               </a:tr>
@@ -40620,7 +40772,7 @@
                 </a:tc>
                 <a:extLst>
                   <a:ext uri="{0D108BD9-81ED-4DB2-BD59-A6C34878D82A}">
-                    <a16:rowId xmlns:a16="http://schemas.microsoft.com/office/drawing/2014/main" val="2954677722"/>
+                    <a16:rowId xmlns:a16="http://schemas.microsoft.com/office/drawing/2014/main" xmlns="" val="2954677722"/>
                   </a:ext>
                 </a:extLst>
               </a:tr>
@@ -40653,7 +40805,7 @@
                 </a:tc>
                 <a:extLst>
                   <a:ext uri="{0D108BD9-81ED-4DB2-BD59-A6C34878D82A}">
-                    <a16:rowId xmlns:a16="http://schemas.microsoft.com/office/drawing/2014/main" val="205903975"/>
+                    <a16:rowId xmlns:a16="http://schemas.microsoft.com/office/drawing/2014/main" xmlns="" val="205903975"/>
                   </a:ext>
                 </a:extLst>
               </a:tr>
@@ -40686,7 +40838,7 @@
                 </a:tc>
                 <a:extLst>
                   <a:ext uri="{0D108BD9-81ED-4DB2-BD59-A6C34878D82A}">
-                    <a16:rowId xmlns:a16="http://schemas.microsoft.com/office/drawing/2014/main" val="2893595017"/>
+                    <a16:rowId xmlns:a16="http://schemas.microsoft.com/office/drawing/2014/main" xmlns="" val="2893595017"/>
                   </a:ext>
                 </a:extLst>
               </a:tr>
@@ -40719,7 +40871,7 @@
                 </a:tc>
                 <a:extLst>
                   <a:ext uri="{0D108BD9-81ED-4DB2-BD59-A6C34878D82A}">
-                    <a16:rowId xmlns:a16="http://schemas.microsoft.com/office/drawing/2014/main" val="2337380595"/>
+                    <a16:rowId xmlns:a16="http://schemas.microsoft.com/office/drawing/2014/main" xmlns="" val="2337380595"/>
                   </a:ext>
                 </a:extLst>
               </a:tr>
@@ -42886,21 +43038,21 @@
                 <a:gridCol w="2764301">
                   <a:extLst>
                     <a:ext uri="{9D8B030D-6E8A-4147-A177-3AD203B41FA5}">
-                      <a16:colId xmlns:a16="http://schemas.microsoft.com/office/drawing/2014/main" val="234227049"/>
+                      <a16:colId xmlns:a16="http://schemas.microsoft.com/office/drawing/2014/main" xmlns="" val="234227049"/>
                     </a:ext>
                   </a:extLst>
                 </a:gridCol>
                 <a:gridCol w="2764301">
                   <a:extLst>
                     <a:ext uri="{9D8B030D-6E8A-4147-A177-3AD203B41FA5}">
-                      <a16:colId xmlns:a16="http://schemas.microsoft.com/office/drawing/2014/main" val="4053135350"/>
+                      <a16:colId xmlns:a16="http://schemas.microsoft.com/office/drawing/2014/main" xmlns="" val="4053135350"/>
                     </a:ext>
                   </a:extLst>
                 </a:gridCol>
                 <a:gridCol w="2764301">
                   <a:extLst>
                     <a:ext uri="{9D8B030D-6E8A-4147-A177-3AD203B41FA5}">
-                      <a16:colId xmlns:a16="http://schemas.microsoft.com/office/drawing/2014/main" val="672378647"/>
+                      <a16:colId xmlns:a16="http://schemas.microsoft.com/office/drawing/2014/main" xmlns="" val="672378647"/>
                     </a:ext>
                   </a:extLst>
                 </a:gridCol>
@@ -42950,7 +43102,7 @@
                 </a:tc>
                 <a:extLst>
                   <a:ext uri="{0D108BD9-81ED-4DB2-BD59-A6C34878D82A}">
-                    <a16:rowId xmlns:a16="http://schemas.microsoft.com/office/drawing/2014/main" val="2843053056"/>
+                    <a16:rowId xmlns:a16="http://schemas.microsoft.com/office/drawing/2014/main" xmlns="" val="2843053056"/>
                   </a:ext>
                 </a:extLst>
               </a:tr>
@@ -43000,7 +43152,7 @@
                 </a:tc>
                 <a:extLst>
                   <a:ext uri="{0D108BD9-81ED-4DB2-BD59-A6C34878D82A}">
-                    <a16:rowId xmlns:a16="http://schemas.microsoft.com/office/drawing/2014/main" val="3055328934"/>
+                    <a16:rowId xmlns:a16="http://schemas.microsoft.com/office/drawing/2014/main" xmlns="" val="3055328934"/>
                   </a:ext>
                 </a:extLst>
               </a:tr>
@@ -43050,7 +43202,7 @@
                 </a:tc>
                 <a:extLst>
                   <a:ext uri="{0D108BD9-81ED-4DB2-BD59-A6C34878D82A}">
-                    <a16:rowId xmlns:a16="http://schemas.microsoft.com/office/drawing/2014/main" val="1144851549"/>
+                    <a16:rowId xmlns:a16="http://schemas.microsoft.com/office/drawing/2014/main" xmlns="" val="1144851549"/>
                   </a:ext>
                 </a:extLst>
               </a:tr>
@@ -43099,7 +43251,7 @@
                 </a:tc>
                 <a:extLst>
                   <a:ext uri="{0D108BD9-81ED-4DB2-BD59-A6C34878D82A}">
-                    <a16:rowId xmlns:a16="http://schemas.microsoft.com/office/drawing/2014/main" val="4258932578"/>
+                    <a16:rowId xmlns:a16="http://schemas.microsoft.com/office/drawing/2014/main" xmlns="" val="4258932578"/>
                   </a:ext>
                 </a:extLst>
               </a:tr>
@@ -44445,6 +44597,14 @@
   <p:clrMapOvr>
     <a:masterClrMapping/>
   </p:clrMapOvr>
+  <mc:AlternateContent xmlns:mc="http://schemas.openxmlformats.org/markup-compatibility/2006">
+    <mc:Choice xmlns:p14="http://schemas.microsoft.com/office/powerpoint/2010/main" Requires="p14">
+      <p:transition spd="slow" p14:dur="2000"/>
+    </mc:Choice>
+    <mc:Fallback>
+      <p:transition spd="slow"/>
+    </mc:Fallback>
+  </mc:AlternateContent>
 </p:sld>
 </file>
 

</xml_diff>

<commit_message>
Change title slide to Madison.
</commit_message>
<xml_diff>
--- a/Optimizer.pptx
+++ b/Optimizer.pptx
@@ -269,7 +269,7 @@
           <a:p>
             <a:fld id="{2EDCB34D-5EC2-4739-9693-E425457AC201}" type="datetimeFigureOut">
               <a:rPr lang="en-US" smtClean="0"/>
-              <a:t>12/27/2016</a:t>
+              <a:t>3/14/2017</a:t>
             </a:fld>
             <a:endParaRPr lang="en-US"/>
           </a:p>
@@ -3060,7 +3060,7 @@
             <a:fld id="{5942B21B-2ADA-A040-A652-A7305E1B99FE}" type="datetimeFigureOut">
               <a:rPr lang="en-US" smtClean="0"/>
               <a:pPr/>
-              <a:t>12/27/2016</a:t>
+              <a:t>3/14/2017</a:t>
             </a:fld>
             <a:endParaRPr lang="en-US" dirty="0"/>
           </a:p>
@@ -3250,7 +3250,7 @@
           <a:p>
             <a:fld id="{5942B21B-2ADA-A040-A652-A7305E1B99FE}" type="datetimeFigureOut">
               <a:rPr lang="en-US" smtClean="0"/>
-              <a:t>12/27/2016</a:t>
+              <a:t>3/14/2017</a:t>
             </a:fld>
             <a:endParaRPr lang="en-US"/>
           </a:p>
@@ -3374,7 +3374,7 @@
             <a:fld id="{5942B21B-2ADA-A040-A652-A7305E1B99FE}" type="datetimeFigureOut">
               <a:rPr lang="en-US" smtClean="0"/>
               <a:pPr/>
-              <a:t>12/27/2016</a:t>
+              <a:t>3/14/2017</a:t>
             </a:fld>
             <a:r>
               <a:rPr lang="en-US"/>
@@ -3645,7 +3645,7 @@
             <a:fld id="{5942B21B-2ADA-A040-A652-A7305E1B99FE}" type="datetimeFigureOut">
               <a:rPr lang="en-US" smtClean="0"/>
               <a:pPr/>
-              <a:t>12/27/2016</a:t>
+              <a:t>3/14/2017</a:t>
             </a:fld>
             <a:r>
               <a:rPr lang="en-US" dirty="0"/>
@@ -3915,7 +3915,7 @@
             <a:fld id="{5942B21B-2ADA-A040-A652-A7305E1B99FE}" type="datetimeFigureOut">
               <a:rPr lang="en-US" smtClean="0"/>
               <a:pPr/>
-              <a:t>12/27/2016</a:t>
+              <a:t>3/14/2017</a:t>
             </a:fld>
             <a:r>
               <a:rPr lang="en-US" dirty="0"/>
@@ -4255,7 +4255,7 @@
             <a:fld id="{5942B21B-2ADA-A040-A652-A7305E1B99FE}" type="datetimeFigureOut">
               <a:rPr lang="en-US" smtClean="0"/>
               <a:pPr/>
-              <a:t>12/27/2016</a:t>
+              <a:t>3/14/2017</a:t>
             </a:fld>
             <a:r>
               <a:rPr lang="en-US" dirty="0"/>
@@ -4596,7 +4596,7 @@
             <a:fld id="{5942B21B-2ADA-A040-A652-A7305E1B99FE}" type="datetimeFigureOut">
               <a:rPr lang="en-US" smtClean="0"/>
               <a:pPr/>
-              <a:t>12/27/2016</a:t>
+              <a:t>3/14/2017</a:t>
             </a:fld>
             <a:r>
               <a:rPr lang="en-US" dirty="0"/>
@@ -5111,7 +5111,7 @@
             <a:fld id="{5942B21B-2ADA-A040-A652-A7305E1B99FE}" type="datetimeFigureOut">
               <a:rPr lang="en-US" smtClean="0"/>
               <a:pPr/>
-              <a:t>12/27/2016</a:t>
+              <a:t>3/14/2017</a:t>
             </a:fld>
             <a:r>
               <a:rPr lang="en-US" dirty="0"/>
@@ -5320,7 +5320,7 @@
             <a:fld id="{5942B21B-2ADA-A040-A652-A7305E1B99FE}" type="datetimeFigureOut">
               <a:rPr lang="en-US" smtClean="0"/>
               <a:pPr/>
-              <a:t>12/27/2016</a:t>
+              <a:t>3/14/2017</a:t>
             </a:fld>
             <a:r>
               <a:rPr lang="en-US" dirty="0"/>
@@ -5507,7 +5507,7 @@
             <a:fld id="{5942B21B-2ADA-A040-A652-A7305E1B99FE}" type="datetimeFigureOut">
               <a:rPr lang="en-US" smtClean="0"/>
               <a:pPr/>
-              <a:t>12/27/2016</a:t>
+              <a:t>3/14/2017</a:t>
             </a:fld>
             <a:r>
               <a:rPr lang="en-US" dirty="0"/>
@@ -5838,7 +5838,7 @@
             <a:fld id="{5942B21B-2ADA-A040-A652-A7305E1B99FE}" type="datetimeFigureOut">
               <a:rPr lang="en-US" smtClean="0"/>
               <a:pPr/>
-              <a:t>12/27/2016</a:t>
+              <a:t>3/14/2017</a:t>
             </a:fld>
             <a:r>
               <a:rPr lang="en-US" dirty="0"/>
@@ -6146,7 +6146,7 @@
             <a:fld id="{5942B21B-2ADA-A040-A652-A7305E1B99FE}" type="datetimeFigureOut">
               <a:rPr lang="en-US" smtClean="0"/>
               <a:pPr/>
-              <a:t>12/27/2016</a:t>
+              <a:t>3/14/2017</a:t>
             </a:fld>
             <a:r>
               <a:rPr lang="en-US" dirty="0"/>
@@ -6425,7 +6425,7 @@
             <a:fld id="{5942B21B-2ADA-A040-A652-A7305E1B99FE}" type="datetimeFigureOut">
               <a:rPr lang="en-US" smtClean="0"/>
               <a:pPr/>
-              <a:t>12/27/2016</a:t>
+              <a:t>3/14/2017</a:t>
             </a:fld>
             <a:r>
               <a:rPr lang="en-US" dirty="0"/>
@@ -7059,8 +7059,13 @@
             </a:pPr>
             <a:r>
               <a:rPr lang="en-US" dirty="0"/>
-              <a:t>Lincoln, NE – November 19, 2016</a:t>
-            </a:r>
+              <a:t>Madison, WI – April 8</a:t>
+            </a:r>
+            <a:r>
+              <a:rPr lang="en-US"/>
+              <a:t>, 2017</a:t>
+            </a:r>
+            <a:endParaRPr lang="en-US" dirty="0"/>
           </a:p>
         </p:txBody>
       </p:sp>
@@ -8294,14 +8299,6 @@
   <p:clrMapOvr>
     <a:masterClrMapping/>
   </p:clrMapOvr>
-  <mc:AlternateContent xmlns:mc="http://schemas.openxmlformats.org/markup-compatibility/2006">
-    <mc:Choice xmlns:p14="http://schemas.microsoft.com/office/powerpoint/2010/main" Requires="p14">
-      <p:transition spd="slow" p14:dur="2000"/>
-    </mc:Choice>
-    <mc:Fallback>
-      <p:transition spd="slow"/>
-    </mc:Fallback>
-  </mc:AlternateContent>
 </p:sld>
 </file>
 
@@ -9513,14 +9510,6 @@
   <p:clrMapOvr>
     <a:masterClrMapping/>
   </p:clrMapOvr>
-  <mc:AlternateContent xmlns:mc="http://schemas.openxmlformats.org/markup-compatibility/2006">
-    <mc:Choice xmlns:p14="http://schemas.microsoft.com/office/powerpoint/2010/main" Requires="p14">
-      <p:transition spd="slow" p14:dur="2000"/>
-    </mc:Choice>
-    <mc:Fallback>
-      <p:transition spd="slow"/>
-    </mc:Fallback>
-  </mc:AlternateContent>
 </p:sld>
 </file>
 
@@ -10732,14 +10721,6 @@
   <p:clrMapOvr>
     <a:masterClrMapping/>
   </p:clrMapOvr>
-  <mc:AlternateContent xmlns:mc="http://schemas.openxmlformats.org/markup-compatibility/2006">
-    <mc:Choice xmlns:p14="http://schemas.microsoft.com/office/powerpoint/2010/main" Requires="p14">
-      <p:transition spd="slow" p14:dur="2000"/>
-    </mc:Choice>
-    <mc:Fallback>
-      <p:transition spd="slow"/>
-    </mc:Fallback>
-  </mc:AlternateContent>
 </p:sld>
 </file>
 
@@ -11935,14 +11916,6 @@
   <p:clrMapOvr>
     <a:masterClrMapping/>
   </p:clrMapOvr>
-  <mc:AlternateContent xmlns:mc="http://schemas.openxmlformats.org/markup-compatibility/2006">
-    <mc:Choice xmlns:p14="http://schemas.microsoft.com/office/powerpoint/2010/main" Requires="p14">
-      <p:transition spd="slow" p14:dur="2000"/>
-    </mc:Choice>
-    <mc:Fallback>
-      <p:transition spd="slow"/>
-    </mc:Fallback>
-  </mc:AlternateContent>
 </p:sld>
 </file>
 
@@ -13191,14 +13164,6 @@
   <p:clrMapOvr>
     <a:masterClrMapping/>
   </p:clrMapOvr>
-  <mc:AlternateContent xmlns:mc="http://schemas.openxmlformats.org/markup-compatibility/2006">
-    <mc:Choice xmlns:p14="http://schemas.microsoft.com/office/powerpoint/2010/main" Requires="p14">
-      <p:transition spd="slow" p14:dur="2000"/>
-    </mc:Choice>
-    <mc:Fallback>
-      <p:transition spd="slow"/>
-    </mc:Fallback>
-  </mc:AlternateContent>
 </p:sld>
 </file>
 
@@ -14373,14 +14338,6 @@
   <p:clrMapOvr>
     <a:masterClrMapping/>
   </p:clrMapOvr>
-  <mc:AlternateContent xmlns:mc="http://schemas.openxmlformats.org/markup-compatibility/2006">
-    <mc:Choice xmlns:p14="http://schemas.microsoft.com/office/powerpoint/2010/main" Requires="p14">
-      <p:transition spd="slow" p14:dur="2000"/>
-    </mc:Choice>
-    <mc:Fallback>
-      <p:transition spd="slow"/>
-    </mc:Fallback>
-  </mc:AlternateContent>
 </p:sld>
 </file>
 
@@ -15601,14 +15558,6 @@
   <p:clrMapOvr>
     <a:masterClrMapping/>
   </p:clrMapOvr>
-  <mc:AlternateContent xmlns:mc="http://schemas.openxmlformats.org/markup-compatibility/2006">
-    <mc:Choice xmlns:p14="http://schemas.microsoft.com/office/powerpoint/2010/main" Requires="p14">
-      <p:transition spd="slow" p14:dur="2000"/>
-    </mc:Choice>
-    <mc:Fallback>
-      <p:transition spd="slow"/>
-    </mc:Fallback>
-  </mc:AlternateContent>
 </p:sld>
 </file>
 
@@ -16820,14 +16769,6 @@
   <p:clrMapOvr>
     <a:masterClrMapping/>
   </p:clrMapOvr>
-  <mc:AlternateContent xmlns:mc="http://schemas.openxmlformats.org/markup-compatibility/2006">
-    <mc:Choice xmlns:p14="http://schemas.microsoft.com/office/powerpoint/2010/main" Requires="p14">
-      <p:transition spd="slow" p14:dur="2000"/>
-    </mc:Choice>
-    <mc:Fallback>
-      <p:transition spd="slow"/>
-    </mc:Fallback>
-  </mc:AlternateContent>
 </p:sld>
 </file>
 
@@ -18092,14 +18033,6 @@
   <p:clrMapOvr>
     <a:masterClrMapping/>
   </p:clrMapOvr>
-  <mc:AlternateContent xmlns:mc="http://schemas.openxmlformats.org/markup-compatibility/2006">
-    <mc:Choice xmlns:p14="http://schemas.microsoft.com/office/powerpoint/2010/main" Requires="p14">
-      <p:transition spd="slow" p14:dur="2000"/>
-    </mc:Choice>
-    <mc:Fallback>
-      <p:transition spd="slow"/>
-    </mc:Fallback>
-  </mc:AlternateContent>
 </p:sld>
 </file>
 
@@ -20844,28 +20777,28 @@
                 <a:gridCol w="1638752">
                   <a:extLst>
                     <a:ext uri="{9D8B030D-6E8A-4147-A177-3AD203B41FA5}">
-                      <a16:colId xmlns:a16="http://schemas.microsoft.com/office/drawing/2014/main" xmlns="" val="20000"/>
+                      <a16:colId xmlns:a16="http://schemas.microsoft.com/office/drawing/2014/main" val="20000"/>
                     </a:ext>
                   </a:extLst>
                 </a:gridCol>
                 <a:gridCol w="4787153">
                   <a:extLst>
                     <a:ext uri="{9D8B030D-6E8A-4147-A177-3AD203B41FA5}">
-                      <a16:colId xmlns:a16="http://schemas.microsoft.com/office/drawing/2014/main" xmlns="" val="20001"/>
+                      <a16:colId xmlns:a16="http://schemas.microsoft.com/office/drawing/2014/main" val="20001"/>
                     </a:ext>
                   </a:extLst>
                 </a:gridCol>
                 <a:gridCol w="851647">
                   <a:extLst>
                     <a:ext uri="{9D8B030D-6E8A-4147-A177-3AD203B41FA5}">
-                      <a16:colId xmlns:a16="http://schemas.microsoft.com/office/drawing/2014/main" xmlns="" val="20002"/>
+                      <a16:colId xmlns:a16="http://schemas.microsoft.com/office/drawing/2014/main" val="20002"/>
                     </a:ext>
                   </a:extLst>
                 </a:gridCol>
                 <a:gridCol w="779930">
                   <a:extLst>
                     <a:ext uri="{9D8B030D-6E8A-4147-A177-3AD203B41FA5}">
-                      <a16:colId xmlns:a16="http://schemas.microsoft.com/office/drawing/2014/main" xmlns="" val="20003"/>
+                      <a16:colId xmlns:a16="http://schemas.microsoft.com/office/drawing/2014/main" val="20003"/>
                     </a:ext>
                   </a:extLst>
                 </a:gridCol>
@@ -20925,7 +20858,7 @@
                 </a:tc>
                 <a:extLst>
                   <a:ext uri="{0D108BD9-81ED-4DB2-BD59-A6C34878D82A}">
-                    <a16:rowId xmlns:a16="http://schemas.microsoft.com/office/drawing/2014/main" xmlns="" val="10000"/>
+                    <a16:rowId xmlns:a16="http://schemas.microsoft.com/office/drawing/2014/main" val="10000"/>
                   </a:ext>
                 </a:extLst>
               </a:tr>
@@ -20990,7 +20923,7 @@
                 </a:tc>
                 <a:extLst>
                   <a:ext uri="{0D108BD9-81ED-4DB2-BD59-A6C34878D82A}">
-                    <a16:rowId xmlns:a16="http://schemas.microsoft.com/office/drawing/2014/main" xmlns="" val="10001"/>
+                    <a16:rowId xmlns:a16="http://schemas.microsoft.com/office/drawing/2014/main" val="10001"/>
                   </a:ext>
                 </a:extLst>
               </a:tr>
@@ -21067,7 +21000,7 @@
                 </a:tc>
                 <a:extLst>
                   <a:ext uri="{0D108BD9-81ED-4DB2-BD59-A6C34878D82A}">
-                    <a16:rowId xmlns:a16="http://schemas.microsoft.com/office/drawing/2014/main" xmlns="" val="10002"/>
+                    <a16:rowId xmlns:a16="http://schemas.microsoft.com/office/drawing/2014/main" val="10002"/>
                   </a:ext>
                 </a:extLst>
               </a:tr>
@@ -21133,7 +21066,7 @@
                 </a:tc>
                 <a:extLst>
                   <a:ext uri="{0D108BD9-81ED-4DB2-BD59-A6C34878D82A}">
-                    <a16:rowId xmlns:a16="http://schemas.microsoft.com/office/drawing/2014/main" xmlns="" val="10003"/>
+                    <a16:rowId xmlns:a16="http://schemas.microsoft.com/office/drawing/2014/main" val="10003"/>
                   </a:ext>
                 </a:extLst>
               </a:tr>
@@ -21222,7 +21155,7 @@
                 </a:tc>
                 <a:extLst>
                   <a:ext uri="{0D108BD9-81ED-4DB2-BD59-A6C34878D82A}">
-                    <a16:rowId xmlns:a16="http://schemas.microsoft.com/office/drawing/2014/main" xmlns="" val="10004"/>
+                    <a16:rowId xmlns:a16="http://schemas.microsoft.com/office/drawing/2014/main" val="10004"/>
                   </a:ext>
                 </a:extLst>
               </a:tr>
@@ -21293,7 +21226,7 @@
                 </a:tc>
                 <a:extLst>
                   <a:ext uri="{0D108BD9-81ED-4DB2-BD59-A6C34878D82A}">
-                    <a16:rowId xmlns:a16="http://schemas.microsoft.com/office/drawing/2014/main" xmlns="" val="10005"/>
+                    <a16:rowId xmlns:a16="http://schemas.microsoft.com/office/drawing/2014/main" val="10005"/>
                   </a:ext>
                 </a:extLst>
               </a:tr>
@@ -21359,7 +21292,7 @@
                 </a:tc>
                 <a:extLst>
                   <a:ext uri="{0D108BD9-81ED-4DB2-BD59-A6C34878D82A}">
-                    <a16:rowId xmlns:a16="http://schemas.microsoft.com/office/drawing/2014/main" xmlns="" val="10006"/>
+                    <a16:rowId xmlns:a16="http://schemas.microsoft.com/office/drawing/2014/main" val="10006"/>
                   </a:ext>
                 </a:extLst>
               </a:tr>
@@ -25847,14 +25780,6 @@
   <p:clrMapOvr>
     <a:masterClrMapping/>
   </p:clrMapOvr>
-  <mc:AlternateContent xmlns:mc="http://schemas.openxmlformats.org/markup-compatibility/2006">
-    <mc:Choice xmlns:p14="http://schemas.microsoft.com/office/powerpoint/2010/main" Requires="p14">
-      <p:transition spd="slow" p14:dur="2000"/>
-    </mc:Choice>
-    <mc:Fallback>
-      <p:transition spd="slow"/>
-    </mc:Fallback>
-  </mc:AlternateContent>
 </p:sld>
 </file>
 
@@ -28780,25 +28705,20 @@
             <a:pPr lvl="1"/>
             <a:r>
               <a:rPr lang="en-US" dirty="0"/>
-              <a:t>Other physical </a:t>
-            </a:r>
-            <a:r>
-              <a:rPr lang="en-US" dirty="0" smtClean="0"/>
-              <a:t>properties (</a:t>
-            </a:r>
-            <a:r>
-              <a:rPr lang="en-US" dirty="0" err="1" smtClean="0"/>
+              <a:t>Other physical properties (</a:t>
+            </a:r>
+            <a:r>
+              <a:rPr lang="en-US" dirty="0" err="1"/>
               <a:t>nullability</a:t>
             </a:r>
             <a:r>
-              <a:rPr lang="en-US" smtClean="0"/>
+              <a:rPr lang="en-US"/>
               <a:t>, constraints</a:t>
             </a:r>
             <a:r>
-              <a:rPr lang="en-US" dirty="0" smtClean="0"/>
+              <a:rPr lang="en-US" dirty="0"/>
               <a:t>)</a:t>
             </a:r>
-            <a:endParaRPr lang="en-US" dirty="0"/>
           </a:p>
           <a:p>
             <a:pPr lvl="1"/>
@@ -29654,14 +29574,6 @@
   <p:clrMapOvr>
     <a:masterClrMapping/>
   </p:clrMapOvr>
-  <mc:AlternateContent xmlns:mc="http://schemas.openxmlformats.org/markup-compatibility/2006">
-    <mc:Choice xmlns:p14="http://schemas.microsoft.com/office/powerpoint/2010/main" Requires="p14">
-      <p:transition spd="slow" p14:dur="2000"/>
-    </mc:Choice>
-    <mc:Fallback>
-      <p:transition spd="slow"/>
-    </mc:Fallback>
-  </mc:AlternateContent>
 </p:sld>
 </file>
 
@@ -30014,14 +29926,14 @@
                 <a:gridCol w="7632835">
                   <a:extLst>
                     <a:ext uri="{9D8B030D-6E8A-4147-A177-3AD203B41FA5}">
-                      <a16:colId xmlns:a16="http://schemas.microsoft.com/office/drawing/2014/main" xmlns="" val="3644048045"/>
+                      <a16:colId xmlns:a16="http://schemas.microsoft.com/office/drawing/2014/main" val="3644048045"/>
                     </a:ext>
                   </a:extLst>
                 </a:gridCol>
                 <a:gridCol w="606393">
                   <a:extLst>
                     <a:ext uri="{9D8B030D-6E8A-4147-A177-3AD203B41FA5}">
-                      <a16:colId xmlns:a16="http://schemas.microsoft.com/office/drawing/2014/main" xmlns="" val="2034254753"/>
+                      <a16:colId xmlns:a16="http://schemas.microsoft.com/office/drawing/2014/main" val="2034254753"/>
                     </a:ext>
                   </a:extLst>
                 </a:gridCol>
@@ -30052,7 +29964,7 @@
                 </a:tc>
                 <a:extLst>
                   <a:ext uri="{0D108BD9-81ED-4DB2-BD59-A6C34878D82A}">
-                    <a16:rowId xmlns:a16="http://schemas.microsoft.com/office/drawing/2014/main" xmlns="" val="2708275910"/>
+                    <a16:rowId xmlns:a16="http://schemas.microsoft.com/office/drawing/2014/main" val="2708275910"/>
                   </a:ext>
                 </a:extLst>
               </a:tr>
@@ -30086,7 +29998,7 @@
                 </a:tc>
                 <a:extLst>
                   <a:ext uri="{0D108BD9-81ED-4DB2-BD59-A6C34878D82A}">
-                    <a16:rowId xmlns:a16="http://schemas.microsoft.com/office/drawing/2014/main" xmlns="" val="2161984115"/>
+                    <a16:rowId xmlns:a16="http://schemas.microsoft.com/office/drawing/2014/main" val="2161984115"/>
                   </a:ext>
                 </a:extLst>
               </a:tr>
@@ -30133,7 +30045,7 @@
                 </a:tc>
                 <a:extLst>
                   <a:ext uri="{0D108BD9-81ED-4DB2-BD59-A6C34878D82A}">
-                    <a16:rowId xmlns:a16="http://schemas.microsoft.com/office/drawing/2014/main" xmlns="" val="2841678841"/>
+                    <a16:rowId xmlns:a16="http://schemas.microsoft.com/office/drawing/2014/main" val="2841678841"/>
                   </a:ext>
                 </a:extLst>
               </a:tr>
@@ -30167,7 +30079,7 @@
                 </a:tc>
                 <a:extLst>
                   <a:ext uri="{0D108BD9-81ED-4DB2-BD59-A6C34878D82A}">
-                    <a16:rowId xmlns:a16="http://schemas.microsoft.com/office/drawing/2014/main" xmlns="" val="3144998627"/>
+                    <a16:rowId xmlns:a16="http://schemas.microsoft.com/office/drawing/2014/main" val="3144998627"/>
                   </a:ext>
                 </a:extLst>
               </a:tr>
@@ -30209,7 +30121,7 @@
                 </a:tc>
                 <a:extLst>
                   <a:ext uri="{0D108BD9-81ED-4DB2-BD59-A6C34878D82A}">
-                    <a16:rowId xmlns:a16="http://schemas.microsoft.com/office/drawing/2014/main" xmlns="" val="1419261869"/>
+                    <a16:rowId xmlns:a16="http://schemas.microsoft.com/office/drawing/2014/main" val="1419261869"/>
                   </a:ext>
                 </a:extLst>
               </a:tr>
@@ -30247,7 +30159,7 @@
                 </a:tc>
                 <a:extLst>
                   <a:ext uri="{0D108BD9-81ED-4DB2-BD59-A6C34878D82A}">
-                    <a16:rowId xmlns:a16="http://schemas.microsoft.com/office/drawing/2014/main" xmlns="" val="1427391072"/>
+                    <a16:rowId xmlns:a16="http://schemas.microsoft.com/office/drawing/2014/main" val="1427391072"/>
                   </a:ext>
                 </a:extLst>
               </a:tr>
@@ -30294,7 +30206,7 @@
                 </a:tc>
                 <a:extLst>
                   <a:ext uri="{0D108BD9-81ED-4DB2-BD59-A6C34878D82A}">
-                    <a16:rowId xmlns:a16="http://schemas.microsoft.com/office/drawing/2014/main" xmlns="" val="2346539918"/>
+                    <a16:rowId xmlns:a16="http://schemas.microsoft.com/office/drawing/2014/main" val="2346539918"/>
                   </a:ext>
                 </a:extLst>
               </a:tr>
@@ -30333,7 +30245,7 @@
                 </a:tc>
                 <a:extLst>
                   <a:ext uri="{0D108BD9-81ED-4DB2-BD59-A6C34878D82A}">
-                    <a16:rowId xmlns:a16="http://schemas.microsoft.com/office/drawing/2014/main" xmlns="" val="2275483042"/>
+                    <a16:rowId xmlns:a16="http://schemas.microsoft.com/office/drawing/2014/main" val="2275483042"/>
                   </a:ext>
                 </a:extLst>
               </a:tr>
@@ -30371,7 +30283,7 @@
                 </a:tc>
                 <a:extLst>
                   <a:ext uri="{0D108BD9-81ED-4DB2-BD59-A6C34878D82A}">
-                    <a16:rowId xmlns:a16="http://schemas.microsoft.com/office/drawing/2014/main" xmlns="" val="4202569347"/>
+                    <a16:rowId xmlns:a16="http://schemas.microsoft.com/office/drawing/2014/main" val="4202569347"/>
                   </a:ext>
                 </a:extLst>
               </a:tr>
@@ -30405,7 +30317,7 @@
                 </a:tc>
                 <a:extLst>
                   <a:ext uri="{0D108BD9-81ED-4DB2-BD59-A6C34878D82A}">
-                    <a16:rowId xmlns:a16="http://schemas.microsoft.com/office/drawing/2014/main" xmlns="" val="2989839269"/>
+                    <a16:rowId xmlns:a16="http://schemas.microsoft.com/office/drawing/2014/main" val="2989839269"/>
                   </a:ext>
                 </a:extLst>
               </a:tr>
@@ -30439,7 +30351,7 @@
                 </a:tc>
                 <a:extLst>
                   <a:ext uri="{0D108BD9-81ED-4DB2-BD59-A6C34878D82A}">
-                    <a16:rowId xmlns:a16="http://schemas.microsoft.com/office/drawing/2014/main" xmlns="" val="2130545569"/>
+                    <a16:rowId xmlns:a16="http://schemas.microsoft.com/office/drawing/2014/main" val="2130545569"/>
                   </a:ext>
                 </a:extLst>
               </a:tr>
@@ -30495,7 +30407,7 @@
                 </a:tc>
                 <a:extLst>
                   <a:ext uri="{0D108BD9-81ED-4DB2-BD59-A6C34878D82A}">
-                    <a16:rowId xmlns:a16="http://schemas.microsoft.com/office/drawing/2014/main" xmlns="" val="1848127216"/>
+                    <a16:rowId xmlns:a16="http://schemas.microsoft.com/office/drawing/2014/main" val="1848127216"/>
                   </a:ext>
                 </a:extLst>
               </a:tr>
@@ -30589,14 +30501,6 @@
   <p:clrMapOvr>
     <a:masterClrMapping/>
   </p:clrMapOvr>
-  <mc:AlternateContent xmlns:mc="http://schemas.openxmlformats.org/markup-compatibility/2006">
-    <mc:Choice xmlns:p14="http://schemas.microsoft.com/office/powerpoint/2010/main" Requires="p14">
-      <p:transition spd="slow" p14:dur="2000"/>
-    </mc:Choice>
-    <mc:Fallback>
-      <p:transition spd="slow"/>
-    </mc:Fallback>
-  </mc:AlternateContent>
 </p:sld>
 </file>
 
@@ -30949,14 +30853,14 @@
                 <a:gridCol w="4119615">
                   <a:extLst>
                     <a:ext uri="{9D8B030D-6E8A-4147-A177-3AD203B41FA5}">
-                      <a16:colId xmlns:a16="http://schemas.microsoft.com/office/drawing/2014/main" xmlns="" val="3644048045"/>
+                      <a16:colId xmlns:a16="http://schemas.microsoft.com/office/drawing/2014/main" val="3644048045"/>
                     </a:ext>
                   </a:extLst>
                 </a:gridCol>
                 <a:gridCol w="4119613">
                   <a:extLst>
                     <a:ext uri="{9D8B030D-6E8A-4147-A177-3AD203B41FA5}">
-                      <a16:colId xmlns:a16="http://schemas.microsoft.com/office/drawing/2014/main" xmlns="" val="2034254753"/>
+                      <a16:colId xmlns:a16="http://schemas.microsoft.com/office/drawing/2014/main" val="2034254753"/>
                     </a:ext>
                   </a:extLst>
                 </a:gridCol>
@@ -30992,7 +30896,7 @@
                 </a:tc>
                 <a:extLst>
                   <a:ext uri="{0D108BD9-81ED-4DB2-BD59-A6C34878D82A}">
-                    <a16:rowId xmlns:a16="http://schemas.microsoft.com/office/drawing/2014/main" xmlns="" val="2708275910"/>
+                    <a16:rowId xmlns:a16="http://schemas.microsoft.com/office/drawing/2014/main" val="2708275910"/>
                   </a:ext>
                 </a:extLst>
               </a:tr>
@@ -31192,7 +31096,7 @@
                 </a:tc>
                 <a:extLst>
                   <a:ext uri="{0D108BD9-81ED-4DB2-BD59-A6C34878D82A}">
-                    <a16:rowId xmlns:a16="http://schemas.microsoft.com/office/drawing/2014/main" xmlns="" val="2161984115"/>
+                    <a16:rowId xmlns:a16="http://schemas.microsoft.com/office/drawing/2014/main" val="2161984115"/>
                   </a:ext>
                 </a:extLst>
               </a:tr>
@@ -31392,7 +31296,7 @@
                 </a:tc>
                 <a:extLst>
                   <a:ext uri="{0D108BD9-81ED-4DB2-BD59-A6C34878D82A}">
-                    <a16:rowId xmlns:a16="http://schemas.microsoft.com/office/drawing/2014/main" xmlns="" val="2841678841"/>
+                    <a16:rowId xmlns:a16="http://schemas.microsoft.com/office/drawing/2014/main" val="2841678841"/>
                   </a:ext>
                 </a:extLst>
               </a:tr>
@@ -31592,7 +31496,7 @@
                 </a:tc>
                 <a:extLst>
                   <a:ext uri="{0D108BD9-81ED-4DB2-BD59-A6C34878D82A}">
-                    <a16:rowId xmlns:a16="http://schemas.microsoft.com/office/drawing/2014/main" xmlns="" val="3144998627"/>
+                    <a16:rowId xmlns:a16="http://schemas.microsoft.com/office/drawing/2014/main" val="3144998627"/>
                   </a:ext>
                 </a:extLst>
               </a:tr>
@@ -31792,7 +31696,7 @@
                 </a:tc>
                 <a:extLst>
                   <a:ext uri="{0D108BD9-81ED-4DB2-BD59-A6C34878D82A}">
-                    <a16:rowId xmlns:a16="http://schemas.microsoft.com/office/drawing/2014/main" xmlns="" val="1419261869"/>
+                    <a16:rowId xmlns:a16="http://schemas.microsoft.com/office/drawing/2014/main" val="1419261869"/>
                   </a:ext>
                 </a:extLst>
               </a:tr>
@@ -31992,7 +31896,7 @@
                 </a:tc>
                 <a:extLst>
                   <a:ext uri="{0D108BD9-81ED-4DB2-BD59-A6C34878D82A}">
-                    <a16:rowId xmlns:a16="http://schemas.microsoft.com/office/drawing/2014/main" xmlns="" val="1427391072"/>
+                    <a16:rowId xmlns:a16="http://schemas.microsoft.com/office/drawing/2014/main" val="1427391072"/>
                   </a:ext>
                 </a:extLst>
               </a:tr>
@@ -32192,7 +32096,7 @@
                 </a:tc>
                 <a:extLst>
                   <a:ext uri="{0D108BD9-81ED-4DB2-BD59-A6C34878D82A}">
-                    <a16:rowId xmlns:a16="http://schemas.microsoft.com/office/drawing/2014/main" xmlns="" val="2346539918"/>
+                    <a16:rowId xmlns:a16="http://schemas.microsoft.com/office/drawing/2014/main" val="2346539918"/>
                   </a:ext>
                 </a:extLst>
               </a:tr>
@@ -32401,7 +32305,7 @@
                 </a:tc>
                 <a:extLst>
                   <a:ext uri="{0D108BD9-81ED-4DB2-BD59-A6C34878D82A}">
-                    <a16:rowId xmlns:a16="http://schemas.microsoft.com/office/drawing/2014/main" xmlns="" val="2275483042"/>
+                    <a16:rowId xmlns:a16="http://schemas.microsoft.com/office/drawing/2014/main" val="2275483042"/>
                   </a:ext>
                 </a:extLst>
               </a:tr>
@@ -32610,7 +32514,7 @@
                 </a:tc>
                 <a:extLst>
                   <a:ext uri="{0D108BD9-81ED-4DB2-BD59-A6C34878D82A}">
-                    <a16:rowId xmlns:a16="http://schemas.microsoft.com/office/drawing/2014/main" xmlns="" val="4202569347"/>
+                    <a16:rowId xmlns:a16="http://schemas.microsoft.com/office/drawing/2014/main" val="4202569347"/>
                   </a:ext>
                 </a:extLst>
               </a:tr>
@@ -32819,7 +32723,7 @@
                 </a:tc>
                 <a:extLst>
                   <a:ext uri="{0D108BD9-81ED-4DB2-BD59-A6C34878D82A}">
-                    <a16:rowId xmlns:a16="http://schemas.microsoft.com/office/drawing/2014/main" xmlns="" val="2989839269"/>
+                    <a16:rowId xmlns:a16="http://schemas.microsoft.com/office/drawing/2014/main" val="2989839269"/>
                   </a:ext>
                 </a:extLst>
               </a:tr>
@@ -33028,7 +32932,7 @@
                 </a:tc>
                 <a:extLst>
                   <a:ext uri="{0D108BD9-81ED-4DB2-BD59-A6C34878D82A}">
-                    <a16:rowId xmlns:a16="http://schemas.microsoft.com/office/drawing/2014/main" xmlns="" val="2130545569"/>
+                    <a16:rowId xmlns:a16="http://schemas.microsoft.com/office/drawing/2014/main" val="2130545569"/>
                   </a:ext>
                 </a:extLst>
               </a:tr>
@@ -33237,7 +33141,7 @@
                 </a:tc>
                 <a:extLst>
                   <a:ext uri="{0D108BD9-81ED-4DB2-BD59-A6C34878D82A}">
-                    <a16:rowId xmlns:a16="http://schemas.microsoft.com/office/drawing/2014/main" xmlns="" val="3045796785"/>
+                    <a16:rowId xmlns:a16="http://schemas.microsoft.com/office/drawing/2014/main" val="3045796785"/>
                   </a:ext>
                 </a:extLst>
               </a:tr>
@@ -33446,7 +33350,7 @@
                 </a:tc>
                 <a:extLst>
                   <a:ext uri="{0D108BD9-81ED-4DB2-BD59-A6C34878D82A}">
-                    <a16:rowId xmlns:a16="http://schemas.microsoft.com/office/drawing/2014/main" xmlns="" val="1091494175"/>
+                    <a16:rowId xmlns:a16="http://schemas.microsoft.com/office/drawing/2014/main" val="1091494175"/>
                   </a:ext>
                 </a:extLst>
               </a:tr>
@@ -33464,14 +33368,6 @@
   <p:clrMapOvr>
     <a:masterClrMapping/>
   </p:clrMapOvr>
-  <mc:AlternateContent xmlns:mc="http://schemas.openxmlformats.org/markup-compatibility/2006">
-    <mc:Choice xmlns:p14="http://schemas.microsoft.com/office/powerpoint/2010/main" Requires="p14">
-      <p:transition spd="slow" p14:dur="2000"/>
-    </mc:Choice>
-    <mc:Fallback>
-      <p:transition spd="slow"/>
-    </mc:Fallback>
-  </mc:AlternateContent>
 </p:sld>
 </file>
 
@@ -33584,14 +33480,6 @@
   <p:clrMapOvr>
     <a:masterClrMapping/>
   </p:clrMapOvr>
-  <mc:AlternateContent xmlns:mc="http://schemas.openxmlformats.org/markup-compatibility/2006">
-    <mc:Choice xmlns:p14="http://schemas.microsoft.com/office/powerpoint/2010/main" Requires="p14">
-      <p:transition spd="slow" p14:dur="2000"/>
-    </mc:Choice>
-    <mc:Fallback>
-      <p:transition spd="slow"/>
-    </mc:Fallback>
-  </mc:AlternateContent>
 </p:sld>
 </file>
 
@@ -33875,14 +33763,6 @@
   <p:clrMapOvr>
     <a:masterClrMapping/>
   </p:clrMapOvr>
-  <mc:AlternateContent xmlns:mc="http://schemas.openxmlformats.org/markup-compatibility/2006">
-    <mc:Choice xmlns:p14="http://schemas.microsoft.com/office/powerpoint/2010/main" Requires="p14">
-      <p:transition spd="slow" p14:dur="2000"/>
-    </mc:Choice>
-    <mc:Fallback>
-      <p:transition spd="slow"/>
-    </mc:Fallback>
-  </mc:AlternateContent>
 </p:sld>
 </file>
 
@@ -34579,14 +34459,6 @@
   <p:clrMapOvr>
     <a:masterClrMapping/>
   </p:clrMapOvr>
-  <mc:AlternateContent xmlns:mc="http://schemas.openxmlformats.org/markup-compatibility/2006">
-    <mc:Choice xmlns:p14="http://schemas.microsoft.com/office/powerpoint/2010/main" Requires="p14">
-      <p:transition spd="slow" p14:dur="2000"/>
-    </mc:Choice>
-    <mc:Fallback>
-      <p:transition spd="slow"/>
-    </mc:Fallback>
-  </mc:AlternateContent>
 </p:sld>
 </file>
 
@@ -34999,14 +34871,6 @@
   <p:clrMapOvr>
     <a:masterClrMapping/>
   </p:clrMapOvr>
-  <mc:AlternateContent xmlns:mc="http://schemas.openxmlformats.org/markup-compatibility/2006">
-    <mc:Choice xmlns:p14="http://schemas.microsoft.com/office/powerpoint/2010/main" Requires="p14">
-      <p:transition spd="slow" p14:dur="2000"/>
-    </mc:Choice>
-    <mc:Fallback>
-      <p:transition spd="slow"/>
-    </mc:Fallback>
-  </mc:AlternateContent>
 </p:sld>
 </file>
 
@@ -36103,14 +35967,6 @@
   <p:clrMapOvr>
     <a:masterClrMapping/>
   </p:clrMapOvr>
-  <mc:AlternateContent xmlns:mc="http://schemas.openxmlformats.org/markup-compatibility/2006">
-    <mc:Choice xmlns:p14="http://schemas.microsoft.com/office/powerpoint/2010/main" Requires="p14">
-      <p:transition spd="slow" p14:dur="2000"/>
-    </mc:Choice>
-    <mc:Fallback>
-      <p:transition spd="slow"/>
-    </mc:Fallback>
-  </mc:AlternateContent>
 </p:sld>
 </file>
 
@@ -36902,14 +36758,14 @@
                 <a:gridCol w="957714">
                   <a:extLst>
                     <a:ext uri="{9D8B030D-6E8A-4147-A177-3AD203B41FA5}">
-                      <a16:colId xmlns:a16="http://schemas.microsoft.com/office/drawing/2014/main" xmlns="" val="3940544257"/>
+                      <a16:colId xmlns:a16="http://schemas.microsoft.com/office/drawing/2014/main" val="3940544257"/>
                     </a:ext>
                   </a:extLst>
                 </a:gridCol>
                 <a:gridCol w="2464067">
                   <a:extLst>
                     <a:ext uri="{9D8B030D-6E8A-4147-A177-3AD203B41FA5}">
-                      <a16:colId xmlns:a16="http://schemas.microsoft.com/office/drawing/2014/main" xmlns="" val="3658567973"/>
+                      <a16:colId xmlns:a16="http://schemas.microsoft.com/office/drawing/2014/main" val="3658567973"/>
                     </a:ext>
                   </a:extLst>
                 </a:gridCol>
@@ -36943,7 +36799,7 @@
                 </a:tc>
                 <a:extLst>
                   <a:ext uri="{0D108BD9-81ED-4DB2-BD59-A6C34878D82A}">
-                    <a16:rowId xmlns:a16="http://schemas.microsoft.com/office/drawing/2014/main" xmlns="" val="1032275335"/>
+                    <a16:rowId xmlns:a16="http://schemas.microsoft.com/office/drawing/2014/main" val="1032275335"/>
                   </a:ext>
                 </a:extLst>
               </a:tr>
@@ -37073,7 +36929,7 @@
                 </a:tc>
                 <a:extLst>
                   <a:ext uri="{0D108BD9-81ED-4DB2-BD59-A6C34878D82A}">
-                    <a16:rowId xmlns:a16="http://schemas.microsoft.com/office/drawing/2014/main" xmlns="" val="4191484087"/>
+                    <a16:rowId xmlns:a16="http://schemas.microsoft.com/office/drawing/2014/main" val="4191484087"/>
                   </a:ext>
                 </a:extLst>
               </a:tr>
@@ -37147,7 +37003,7 @@
                 </a:tc>
                 <a:extLst>
                   <a:ext uri="{0D108BD9-81ED-4DB2-BD59-A6C34878D82A}">
-                    <a16:rowId xmlns:a16="http://schemas.microsoft.com/office/drawing/2014/main" xmlns="" val="1864588626"/>
+                    <a16:rowId xmlns:a16="http://schemas.microsoft.com/office/drawing/2014/main" val="1864588626"/>
                   </a:ext>
                 </a:extLst>
               </a:tr>
@@ -37269,7 +37125,7 @@
                 </a:tc>
                 <a:extLst>
                   <a:ext uri="{0D108BD9-81ED-4DB2-BD59-A6C34878D82A}">
-                    <a16:rowId xmlns:a16="http://schemas.microsoft.com/office/drawing/2014/main" xmlns="" val="3035259714"/>
+                    <a16:rowId xmlns:a16="http://schemas.microsoft.com/office/drawing/2014/main" val="3035259714"/>
                   </a:ext>
                 </a:extLst>
               </a:tr>
@@ -37358,7 +37214,7 @@
                 </a:tc>
                 <a:extLst>
                   <a:ext uri="{0D108BD9-81ED-4DB2-BD59-A6C34878D82A}">
-                    <a16:rowId xmlns:a16="http://schemas.microsoft.com/office/drawing/2014/main" xmlns="" val="2023621082"/>
+                    <a16:rowId xmlns:a16="http://schemas.microsoft.com/office/drawing/2014/main" val="2023621082"/>
                   </a:ext>
                 </a:extLst>
               </a:tr>
@@ -37447,7 +37303,7 @@
                 </a:tc>
                 <a:extLst>
                   <a:ext uri="{0D108BD9-81ED-4DB2-BD59-A6C34878D82A}">
-                    <a16:rowId xmlns:a16="http://schemas.microsoft.com/office/drawing/2014/main" xmlns="" val="120016333"/>
+                    <a16:rowId xmlns:a16="http://schemas.microsoft.com/office/drawing/2014/main" val="120016333"/>
                   </a:ext>
                 </a:extLst>
               </a:tr>
@@ -37592,21 +37448,21 @@
                 <a:gridCol w="960120">
                   <a:extLst>
                     <a:ext uri="{9D8B030D-6E8A-4147-A177-3AD203B41FA5}">
-                      <a16:colId xmlns:a16="http://schemas.microsoft.com/office/drawing/2014/main" xmlns="" val="392696932"/>
+                      <a16:colId xmlns:a16="http://schemas.microsoft.com/office/drawing/2014/main" val="392696932"/>
                     </a:ext>
                   </a:extLst>
                 </a:gridCol>
                 <a:gridCol w="2468880">
                   <a:extLst>
                     <a:ext uri="{9D8B030D-6E8A-4147-A177-3AD203B41FA5}">
-                      <a16:colId xmlns:a16="http://schemas.microsoft.com/office/drawing/2014/main" xmlns="" val="2769969192"/>
+                      <a16:colId xmlns:a16="http://schemas.microsoft.com/office/drawing/2014/main" val="2769969192"/>
                     </a:ext>
                   </a:extLst>
                 </a:gridCol>
                 <a:gridCol w="2468880">
                   <a:extLst>
                     <a:ext uri="{9D8B030D-6E8A-4147-A177-3AD203B41FA5}">
-                      <a16:colId xmlns:a16="http://schemas.microsoft.com/office/drawing/2014/main" xmlns="" val="2022610816"/>
+                      <a16:colId xmlns:a16="http://schemas.microsoft.com/office/drawing/2014/main" val="2022610816"/>
                     </a:ext>
                   </a:extLst>
                 </a:gridCol>
@@ -37658,7 +37514,7 @@
                 </a:tc>
                 <a:extLst>
                   <a:ext uri="{0D108BD9-81ED-4DB2-BD59-A6C34878D82A}">
-                    <a16:rowId xmlns:a16="http://schemas.microsoft.com/office/drawing/2014/main" xmlns="" val="2344937666"/>
+                    <a16:rowId xmlns:a16="http://schemas.microsoft.com/office/drawing/2014/main" val="2344937666"/>
                   </a:ext>
                 </a:extLst>
               </a:tr>
@@ -37791,7 +37647,7 @@
                 </a:tc>
                 <a:extLst>
                   <a:ext uri="{0D108BD9-81ED-4DB2-BD59-A6C34878D82A}">
-                    <a16:rowId xmlns:a16="http://schemas.microsoft.com/office/drawing/2014/main" xmlns="" val="1917341330"/>
+                    <a16:rowId xmlns:a16="http://schemas.microsoft.com/office/drawing/2014/main" val="1917341330"/>
                   </a:ext>
                 </a:extLst>
               </a:tr>
@@ -38008,7 +37864,7 @@
                 </a:tc>
                 <a:extLst>
                   <a:ext uri="{0D108BD9-81ED-4DB2-BD59-A6C34878D82A}">
-                    <a16:rowId xmlns:a16="http://schemas.microsoft.com/office/drawing/2014/main" xmlns="" val="3088042860"/>
+                    <a16:rowId xmlns:a16="http://schemas.microsoft.com/office/drawing/2014/main" val="3088042860"/>
                   </a:ext>
                 </a:extLst>
               </a:tr>
@@ -38092,7 +37948,7 @@
                 </a:tc>
                 <a:extLst>
                   <a:ext uri="{0D108BD9-81ED-4DB2-BD59-A6C34878D82A}">
-                    <a16:rowId xmlns:a16="http://schemas.microsoft.com/office/drawing/2014/main" xmlns="" val="2658530722"/>
+                    <a16:rowId xmlns:a16="http://schemas.microsoft.com/office/drawing/2014/main" val="2658530722"/>
                   </a:ext>
                 </a:extLst>
               </a:tr>
@@ -38224,7 +38080,7 @@
                 </a:tc>
                 <a:extLst>
                   <a:ext uri="{0D108BD9-81ED-4DB2-BD59-A6C34878D82A}">
-                    <a16:rowId xmlns:a16="http://schemas.microsoft.com/office/drawing/2014/main" xmlns="" val="1481886367"/>
+                    <a16:rowId xmlns:a16="http://schemas.microsoft.com/office/drawing/2014/main" val="1481886367"/>
                   </a:ext>
                 </a:extLst>
               </a:tr>
@@ -38323,7 +38179,7 @@
                 </a:tc>
                 <a:extLst>
                   <a:ext uri="{0D108BD9-81ED-4DB2-BD59-A6C34878D82A}">
-                    <a16:rowId xmlns:a16="http://schemas.microsoft.com/office/drawing/2014/main" xmlns="" val="4248384778"/>
+                    <a16:rowId xmlns:a16="http://schemas.microsoft.com/office/drawing/2014/main" val="4248384778"/>
                   </a:ext>
                 </a:extLst>
               </a:tr>
@@ -38422,7 +38278,7 @@
                 </a:tc>
                 <a:extLst>
                   <a:ext uri="{0D108BD9-81ED-4DB2-BD59-A6C34878D82A}">
-                    <a16:rowId xmlns:a16="http://schemas.microsoft.com/office/drawing/2014/main" xmlns="" val="1670483340"/>
+                    <a16:rowId xmlns:a16="http://schemas.microsoft.com/office/drawing/2014/main" val="1670483340"/>
                   </a:ext>
                 </a:extLst>
               </a:tr>
@@ -38567,28 +38423,28 @@
                 <a:gridCol w="960120">
                   <a:extLst>
                     <a:ext uri="{9D8B030D-6E8A-4147-A177-3AD203B41FA5}">
-                      <a16:colId xmlns:a16="http://schemas.microsoft.com/office/drawing/2014/main" xmlns="" val="392696932"/>
+                      <a16:colId xmlns:a16="http://schemas.microsoft.com/office/drawing/2014/main" val="392696932"/>
                     </a:ext>
                   </a:extLst>
                 </a:gridCol>
                 <a:gridCol w="2468880">
                   <a:extLst>
                     <a:ext uri="{9D8B030D-6E8A-4147-A177-3AD203B41FA5}">
-                      <a16:colId xmlns:a16="http://schemas.microsoft.com/office/drawing/2014/main" xmlns="" val="2769969192"/>
+                      <a16:colId xmlns:a16="http://schemas.microsoft.com/office/drawing/2014/main" val="2769969192"/>
                     </a:ext>
                   </a:extLst>
                 </a:gridCol>
                 <a:gridCol w="2468880">
                   <a:extLst>
                     <a:ext uri="{9D8B030D-6E8A-4147-A177-3AD203B41FA5}">
-                      <a16:colId xmlns:a16="http://schemas.microsoft.com/office/drawing/2014/main" xmlns="" val="2022610816"/>
+                      <a16:colId xmlns:a16="http://schemas.microsoft.com/office/drawing/2014/main" val="2022610816"/>
                     </a:ext>
                   </a:extLst>
                 </a:gridCol>
                 <a:gridCol w="2468880">
                   <a:extLst>
                     <a:ext uri="{9D8B030D-6E8A-4147-A177-3AD203B41FA5}">
-                      <a16:colId xmlns:a16="http://schemas.microsoft.com/office/drawing/2014/main" xmlns="" val="102813283"/>
+                      <a16:colId xmlns:a16="http://schemas.microsoft.com/office/drawing/2014/main" val="102813283"/>
                     </a:ext>
                   </a:extLst>
                 </a:gridCol>
@@ -38653,7 +38509,7 @@
                 </a:tc>
                 <a:extLst>
                   <a:ext uri="{0D108BD9-81ED-4DB2-BD59-A6C34878D82A}">
-                    <a16:rowId xmlns:a16="http://schemas.microsoft.com/office/drawing/2014/main" xmlns="" val="2344937666"/>
+                    <a16:rowId xmlns:a16="http://schemas.microsoft.com/office/drawing/2014/main" val="2344937666"/>
                   </a:ext>
                 </a:extLst>
               </a:tr>
@@ -38813,7 +38669,7 @@
                 </a:tc>
                 <a:extLst>
                   <a:ext uri="{0D108BD9-81ED-4DB2-BD59-A6C34878D82A}">
-                    <a16:rowId xmlns:a16="http://schemas.microsoft.com/office/drawing/2014/main" xmlns="" val="1917341330"/>
+                    <a16:rowId xmlns:a16="http://schemas.microsoft.com/office/drawing/2014/main" val="1917341330"/>
                   </a:ext>
                 </a:extLst>
               </a:tr>
@@ -39117,7 +38973,7 @@
                 </a:tc>
                 <a:extLst>
                   <a:ext uri="{0D108BD9-81ED-4DB2-BD59-A6C34878D82A}">
-                    <a16:rowId xmlns:a16="http://schemas.microsoft.com/office/drawing/2014/main" xmlns="" val="3088042860"/>
+                    <a16:rowId xmlns:a16="http://schemas.microsoft.com/office/drawing/2014/main" val="3088042860"/>
                   </a:ext>
                 </a:extLst>
               </a:tr>
@@ -39211,7 +39067,7 @@
                 </a:tc>
                 <a:extLst>
                   <a:ext uri="{0D108BD9-81ED-4DB2-BD59-A6C34878D82A}">
-                    <a16:rowId xmlns:a16="http://schemas.microsoft.com/office/drawing/2014/main" xmlns="" val="2658530722"/>
+                    <a16:rowId xmlns:a16="http://schemas.microsoft.com/office/drawing/2014/main" val="2658530722"/>
                   </a:ext>
                 </a:extLst>
               </a:tr>
@@ -39404,7 +39260,7 @@
                 </a:tc>
                 <a:extLst>
                   <a:ext uri="{0D108BD9-81ED-4DB2-BD59-A6C34878D82A}">
-                    <a16:rowId xmlns:a16="http://schemas.microsoft.com/office/drawing/2014/main" xmlns="" val="1481886367"/>
+                    <a16:rowId xmlns:a16="http://schemas.microsoft.com/office/drawing/2014/main" val="1481886367"/>
                   </a:ext>
                 </a:extLst>
               </a:tr>
@@ -39513,7 +39369,7 @@
                 </a:tc>
                 <a:extLst>
                   <a:ext uri="{0D108BD9-81ED-4DB2-BD59-A6C34878D82A}">
-                    <a16:rowId xmlns:a16="http://schemas.microsoft.com/office/drawing/2014/main" xmlns="" val="4248384778"/>
+                    <a16:rowId xmlns:a16="http://schemas.microsoft.com/office/drawing/2014/main" val="4248384778"/>
                   </a:ext>
                 </a:extLst>
               </a:tr>
@@ -39622,7 +39478,7 @@
                 </a:tc>
                 <a:extLst>
                   <a:ext uri="{0D108BD9-81ED-4DB2-BD59-A6C34878D82A}">
-                    <a16:rowId xmlns:a16="http://schemas.microsoft.com/office/drawing/2014/main" xmlns="" val="1670483340"/>
+                    <a16:rowId xmlns:a16="http://schemas.microsoft.com/office/drawing/2014/main" val="1670483340"/>
                   </a:ext>
                 </a:extLst>
               </a:tr>
@@ -40030,14 +39886,14 @@
                 <a:gridCol w="934278">
                   <a:extLst>
                     <a:ext uri="{9D8B030D-6E8A-4147-A177-3AD203B41FA5}">
-                      <a16:colId xmlns:a16="http://schemas.microsoft.com/office/drawing/2014/main" xmlns="" val="4198655800"/>
+                      <a16:colId xmlns:a16="http://schemas.microsoft.com/office/drawing/2014/main" val="4198655800"/>
                     </a:ext>
                   </a:extLst>
                 </a:gridCol>
                 <a:gridCol w="7295322">
                   <a:extLst>
                     <a:ext uri="{9D8B030D-6E8A-4147-A177-3AD203B41FA5}">
-                      <a16:colId xmlns:a16="http://schemas.microsoft.com/office/drawing/2014/main" xmlns="" val="135413862"/>
+                      <a16:colId xmlns:a16="http://schemas.microsoft.com/office/drawing/2014/main" val="135413862"/>
                     </a:ext>
                   </a:extLst>
                 </a:gridCol>
@@ -40071,7 +39927,7 @@
                 </a:tc>
                 <a:extLst>
                   <a:ext uri="{0D108BD9-81ED-4DB2-BD59-A6C34878D82A}">
-                    <a16:rowId xmlns:a16="http://schemas.microsoft.com/office/drawing/2014/main" xmlns="" val="3068323444"/>
+                    <a16:rowId xmlns:a16="http://schemas.microsoft.com/office/drawing/2014/main" val="3068323444"/>
                   </a:ext>
                 </a:extLst>
               </a:tr>
@@ -40104,7 +39960,7 @@
                 </a:tc>
                 <a:extLst>
                   <a:ext uri="{0D108BD9-81ED-4DB2-BD59-A6C34878D82A}">
-                    <a16:rowId xmlns:a16="http://schemas.microsoft.com/office/drawing/2014/main" xmlns="" val="1586961909"/>
+                    <a16:rowId xmlns:a16="http://schemas.microsoft.com/office/drawing/2014/main" val="1586961909"/>
                   </a:ext>
                 </a:extLst>
               </a:tr>
@@ -40142,7 +39998,7 @@
                 </a:tc>
                 <a:extLst>
                   <a:ext uri="{0D108BD9-81ED-4DB2-BD59-A6C34878D82A}">
-                    <a16:rowId xmlns:a16="http://schemas.microsoft.com/office/drawing/2014/main" xmlns="" val="2280300197"/>
+                    <a16:rowId xmlns:a16="http://schemas.microsoft.com/office/drawing/2014/main" val="2280300197"/>
                   </a:ext>
                 </a:extLst>
               </a:tr>
@@ -40180,7 +40036,7 @@
                 </a:tc>
                 <a:extLst>
                   <a:ext uri="{0D108BD9-81ED-4DB2-BD59-A6C34878D82A}">
-                    <a16:rowId xmlns:a16="http://schemas.microsoft.com/office/drawing/2014/main" xmlns="" val="1192843310"/>
+                    <a16:rowId xmlns:a16="http://schemas.microsoft.com/office/drawing/2014/main" val="1192843310"/>
                   </a:ext>
                 </a:extLst>
               </a:tr>
@@ -40218,7 +40074,7 @@
                 </a:tc>
                 <a:extLst>
                   <a:ext uri="{0D108BD9-81ED-4DB2-BD59-A6C34878D82A}">
-                    <a16:rowId xmlns:a16="http://schemas.microsoft.com/office/drawing/2014/main" xmlns="" val="2620585158"/>
+                    <a16:rowId xmlns:a16="http://schemas.microsoft.com/office/drawing/2014/main" val="2620585158"/>
                   </a:ext>
                 </a:extLst>
               </a:tr>
@@ -40251,7 +40107,7 @@
                 </a:tc>
                 <a:extLst>
                   <a:ext uri="{0D108BD9-81ED-4DB2-BD59-A6C34878D82A}">
-                    <a16:rowId xmlns:a16="http://schemas.microsoft.com/office/drawing/2014/main" xmlns="" val="1697738616"/>
+                    <a16:rowId xmlns:a16="http://schemas.microsoft.com/office/drawing/2014/main" val="1697738616"/>
                   </a:ext>
                 </a:extLst>
               </a:tr>
@@ -40289,7 +40145,7 @@
                 </a:tc>
                 <a:extLst>
                   <a:ext uri="{0D108BD9-81ED-4DB2-BD59-A6C34878D82A}">
-                    <a16:rowId xmlns:a16="http://schemas.microsoft.com/office/drawing/2014/main" xmlns="" val="316611556"/>
+                    <a16:rowId xmlns:a16="http://schemas.microsoft.com/office/drawing/2014/main" val="316611556"/>
                   </a:ext>
                 </a:extLst>
               </a:tr>
@@ -40322,7 +40178,7 @@
                 </a:tc>
                 <a:extLst>
                   <a:ext uri="{0D108BD9-81ED-4DB2-BD59-A6C34878D82A}">
-                    <a16:rowId xmlns:a16="http://schemas.microsoft.com/office/drawing/2014/main" xmlns="" val="1312814102"/>
+                    <a16:rowId xmlns:a16="http://schemas.microsoft.com/office/drawing/2014/main" val="1312814102"/>
                   </a:ext>
                 </a:extLst>
               </a:tr>
@@ -40355,7 +40211,7 @@
                 </a:tc>
                 <a:extLst>
                   <a:ext uri="{0D108BD9-81ED-4DB2-BD59-A6C34878D82A}">
-                    <a16:rowId xmlns:a16="http://schemas.microsoft.com/office/drawing/2014/main" xmlns="" val="1975533996"/>
+                    <a16:rowId xmlns:a16="http://schemas.microsoft.com/office/drawing/2014/main" val="1975533996"/>
                   </a:ext>
                 </a:extLst>
               </a:tr>
@@ -40388,7 +40244,7 @@
                 </a:tc>
                 <a:extLst>
                   <a:ext uri="{0D108BD9-81ED-4DB2-BD59-A6C34878D82A}">
-                    <a16:rowId xmlns:a16="http://schemas.microsoft.com/office/drawing/2014/main" xmlns="" val="2759032957"/>
+                    <a16:rowId xmlns:a16="http://schemas.microsoft.com/office/drawing/2014/main" val="2759032957"/>
                   </a:ext>
                 </a:extLst>
               </a:tr>
@@ -40477,14 +40333,14 @@
                 <a:gridCol w="934278">
                   <a:extLst>
                     <a:ext uri="{9D8B030D-6E8A-4147-A177-3AD203B41FA5}">
-                      <a16:colId xmlns:a16="http://schemas.microsoft.com/office/drawing/2014/main" xmlns="" val="4198655800"/>
+                      <a16:colId xmlns:a16="http://schemas.microsoft.com/office/drawing/2014/main" val="4198655800"/>
                     </a:ext>
                   </a:extLst>
                 </a:gridCol>
                 <a:gridCol w="7295322">
                   <a:extLst>
                     <a:ext uri="{9D8B030D-6E8A-4147-A177-3AD203B41FA5}">
-                      <a16:colId xmlns:a16="http://schemas.microsoft.com/office/drawing/2014/main" xmlns="" val="135413862"/>
+                      <a16:colId xmlns:a16="http://schemas.microsoft.com/office/drawing/2014/main" val="135413862"/>
                     </a:ext>
                   </a:extLst>
                 </a:gridCol>
@@ -40518,7 +40374,7 @@
                 </a:tc>
                 <a:extLst>
                   <a:ext uri="{0D108BD9-81ED-4DB2-BD59-A6C34878D82A}">
-                    <a16:rowId xmlns:a16="http://schemas.microsoft.com/office/drawing/2014/main" xmlns="" val="3068323444"/>
+                    <a16:rowId xmlns:a16="http://schemas.microsoft.com/office/drawing/2014/main" val="3068323444"/>
                   </a:ext>
                 </a:extLst>
               </a:tr>
@@ -40551,7 +40407,7 @@
                 </a:tc>
                 <a:extLst>
                   <a:ext uri="{0D108BD9-81ED-4DB2-BD59-A6C34878D82A}">
-                    <a16:rowId xmlns:a16="http://schemas.microsoft.com/office/drawing/2014/main" xmlns="" val="2484981654"/>
+                    <a16:rowId xmlns:a16="http://schemas.microsoft.com/office/drawing/2014/main" val="2484981654"/>
                   </a:ext>
                 </a:extLst>
               </a:tr>
@@ -40589,7 +40445,7 @@
                 </a:tc>
                 <a:extLst>
                   <a:ext uri="{0D108BD9-81ED-4DB2-BD59-A6C34878D82A}">
-                    <a16:rowId xmlns:a16="http://schemas.microsoft.com/office/drawing/2014/main" xmlns="" val="1377910784"/>
+                    <a16:rowId xmlns:a16="http://schemas.microsoft.com/office/drawing/2014/main" val="1377910784"/>
                   </a:ext>
                 </a:extLst>
               </a:tr>
@@ -40622,7 +40478,7 @@
                 </a:tc>
                 <a:extLst>
                   <a:ext uri="{0D108BD9-81ED-4DB2-BD59-A6C34878D82A}">
-                    <a16:rowId xmlns:a16="http://schemas.microsoft.com/office/drawing/2014/main" xmlns="" val="1387856053"/>
+                    <a16:rowId xmlns:a16="http://schemas.microsoft.com/office/drawing/2014/main" val="1387856053"/>
                   </a:ext>
                 </a:extLst>
               </a:tr>
@@ -40660,7 +40516,7 @@
                 </a:tc>
                 <a:extLst>
                   <a:ext uri="{0D108BD9-81ED-4DB2-BD59-A6C34878D82A}">
-                    <a16:rowId xmlns:a16="http://schemas.microsoft.com/office/drawing/2014/main" xmlns="" val="2599123823"/>
+                    <a16:rowId xmlns:a16="http://schemas.microsoft.com/office/drawing/2014/main" val="2599123823"/>
                   </a:ext>
                 </a:extLst>
               </a:tr>
@@ -40701,7 +40557,7 @@
                 </a:tc>
                 <a:extLst>
                   <a:ext uri="{0D108BD9-81ED-4DB2-BD59-A6C34878D82A}">
-                    <a16:rowId xmlns:a16="http://schemas.microsoft.com/office/drawing/2014/main" xmlns="" val="1232603862"/>
+                    <a16:rowId xmlns:a16="http://schemas.microsoft.com/office/drawing/2014/main" val="1232603862"/>
                   </a:ext>
                 </a:extLst>
               </a:tr>
@@ -40734,7 +40590,7 @@
                 </a:tc>
                 <a:extLst>
                   <a:ext uri="{0D108BD9-81ED-4DB2-BD59-A6C34878D82A}">
-                    <a16:rowId xmlns:a16="http://schemas.microsoft.com/office/drawing/2014/main" xmlns="" val="4145944521"/>
+                    <a16:rowId xmlns:a16="http://schemas.microsoft.com/office/drawing/2014/main" val="4145944521"/>
                   </a:ext>
                 </a:extLst>
               </a:tr>
@@ -40772,7 +40628,7 @@
                 </a:tc>
                 <a:extLst>
                   <a:ext uri="{0D108BD9-81ED-4DB2-BD59-A6C34878D82A}">
-                    <a16:rowId xmlns:a16="http://schemas.microsoft.com/office/drawing/2014/main" xmlns="" val="2954677722"/>
+                    <a16:rowId xmlns:a16="http://schemas.microsoft.com/office/drawing/2014/main" val="2954677722"/>
                   </a:ext>
                 </a:extLst>
               </a:tr>
@@ -40805,7 +40661,7 @@
                 </a:tc>
                 <a:extLst>
                   <a:ext uri="{0D108BD9-81ED-4DB2-BD59-A6C34878D82A}">
-                    <a16:rowId xmlns:a16="http://schemas.microsoft.com/office/drawing/2014/main" xmlns="" val="205903975"/>
+                    <a16:rowId xmlns:a16="http://schemas.microsoft.com/office/drawing/2014/main" val="205903975"/>
                   </a:ext>
                 </a:extLst>
               </a:tr>
@@ -40838,7 +40694,7 @@
                 </a:tc>
                 <a:extLst>
                   <a:ext uri="{0D108BD9-81ED-4DB2-BD59-A6C34878D82A}">
-                    <a16:rowId xmlns:a16="http://schemas.microsoft.com/office/drawing/2014/main" xmlns="" val="2893595017"/>
+                    <a16:rowId xmlns:a16="http://schemas.microsoft.com/office/drawing/2014/main" val="2893595017"/>
                   </a:ext>
                 </a:extLst>
               </a:tr>
@@ -40871,7 +40727,7 @@
                 </a:tc>
                 <a:extLst>
                   <a:ext uri="{0D108BD9-81ED-4DB2-BD59-A6C34878D82A}">
-                    <a16:rowId xmlns:a16="http://schemas.microsoft.com/office/drawing/2014/main" xmlns="" val="2337380595"/>
+                    <a16:rowId xmlns:a16="http://schemas.microsoft.com/office/drawing/2014/main" val="2337380595"/>
                   </a:ext>
                 </a:extLst>
               </a:tr>
@@ -43038,21 +42894,21 @@
                 <a:gridCol w="2764301">
                   <a:extLst>
                     <a:ext uri="{9D8B030D-6E8A-4147-A177-3AD203B41FA5}">
-                      <a16:colId xmlns:a16="http://schemas.microsoft.com/office/drawing/2014/main" xmlns="" val="234227049"/>
+                      <a16:colId xmlns:a16="http://schemas.microsoft.com/office/drawing/2014/main" val="234227049"/>
                     </a:ext>
                   </a:extLst>
                 </a:gridCol>
                 <a:gridCol w="2764301">
                   <a:extLst>
                     <a:ext uri="{9D8B030D-6E8A-4147-A177-3AD203B41FA5}">
-                      <a16:colId xmlns:a16="http://schemas.microsoft.com/office/drawing/2014/main" xmlns="" val="4053135350"/>
+                      <a16:colId xmlns:a16="http://schemas.microsoft.com/office/drawing/2014/main" val="4053135350"/>
                     </a:ext>
                   </a:extLst>
                 </a:gridCol>
                 <a:gridCol w="2764301">
                   <a:extLst>
                     <a:ext uri="{9D8B030D-6E8A-4147-A177-3AD203B41FA5}">
-                      <a16:colId xmlns:a16="http://schemas.microsoft.com/office/drawing/2014/main" xmlns="" val="672378647"/>
+                      <a16:colId xmlns:a16="http://schemas.microsoft.com/office/drawing/2014/main" val="672378647"/>
                     </a:ext>
                   </a:extLst>
                 </a:gridCol>
@@ -43102,7 +42958,7 @@
                 </a:tc>
                 <a:extLst>
                   <a:ext uri="{0D108BD9-81ED-4DB2-BD59-A6C34878D82A}">
-                    <a16:rowId xmlns:a16="http://schemas.microsoft.com/office/drawing/2014/main" xmlns="" val="2843053056"/>
+                    <a16:rowId xmlns:a16="http://schemas.microsoft.com/office/drawing/2014/main" val="2843053056"/>
                   </a:ext>
                 </a:extLst>
               </a:tr>
@@ -43152,7 +43008,7 @@
                 </a:tc>
                 <a:extLst>
                   <a:ext uri="{0D108BD9-81ED-4DB2-BD59-A6C34878D82A}">
-                    <a16:rowId xmlns:a16="http://schemas.microsoft.com/office/drawing/2014/main" xmlns="" val="3055328934"/>
+                    <a16:rowId xmlns:a16="http://schemas.microsoft.com/office/drawing/2014/main" val="3055328934"/>
                   </a:ext>
                 </a:extLst>
               </a:tr>
@@ -43202,7 +43058,7 @@
                 </a:tc>
                 <a:extLst>
                   <a:ext uri="{0D108BD9-81ED-4DB2-BD59-A6C34878D82A}">
-                    <a16:rowId xmlns:a16="http://schemas.microsoft.com/office/drawing/2014/main" xmlns="" val="1144851549"/>
+                    <a16:rowId xmlns:a16="http://schemas.microsoft.com/office/drawing/2014/main" val="1144851549"/>
                   </a:ext>
                 </a:extLst>
               </a:tr>
@@ -43251,7 +43107,7 @@
                 </a:tc>
                 <a:extLst>
                   <a:ext uri="{0D108BD9-81ED-4DB2-BD59-A6C34878D82A}">
-                    <a16:rowId xmlns:a16="http://schemas.microsoft.com/office/drawing/2014/main" xmlns="" val="4258932578"/>
+                    <a16:rowId xmlns:a16="http://schemas.microsoft.com/office/drawing/2014/main" val="4258932578"/>
                   </a:ext>
                 </a:extLst>
               </a:tr>
@@ -44597,14 +44453,6 @@
   <p:clrMapOvr>
     <a:masterClrMapping/>
   </p:clrMapOvr>
-  <mc:AlternateContent xmlns:mc="http://schemas.openxmlformats.org/markup-compatibility/2006">
-    <mc:Choice xmlns:p14="http://schemas.microsoft.com/office/powerpoint/2010/main" Requires="p14">
-      <p:transition spd="slow" p14:dur="2000"/>
-    </mc:Choice>
-    <mc:Fallback>
-      <p:transition spd="slow"/>
-    </mc:Fallback>
-  </mc:AlternateContent>
 </p:sld>
 </file>
 

</xml_diff>

<commit_message>
Algebrizer checks user permissions; search 2 use of heuristics.
</commit_message>
<xml_diff>
--- a/Optimizer.pptx
+++ b/Optimizer.pptx
@@ -22057,13 +22057,13 @@
         </p:nvSpPr>
         <p:spPr>
           <a:xfrm>
-            <a:off x="457200" y="1600201"/>
-            <a:ext cx="8229600" cy="1847850"/>
+            <a:off x="457200" y="1600200"/>
+            <a:ext cx="8229600" cy="2042651"/>
           </a:xfrm>
         </p:spPr>
         <p:txBody>
           <a:bodyPr>
-            <a:normAutofit/>
+            <a:normAutofit fontScale="92500" lnSpcReduction="10000"/>
           </a:bodyPr>
           <a:lstStyle/>
           <a:p>
@@ -22096,6 +22096,17 @@
               <a:rPr lang="en-US" dirty="0"/>
               <a:t>Identify constants</a:t>
             </a:r>
+          </a:p>
+          <a:p>
+            <a:pPr lvl="2"/>
+            <a:r>
+              <a:rPr lang="en-US" dirty="0"/>
+              <a:t>Check user permissions</a:t>
+            </a:r>
+          </a:p>
+          <a:p>
+            <a:pPr lvl="2"/>
+            <a:endParaRPr lang="en-US" dirty="0"/>
           </a:p>
         </p:txBody>
       </p:sp>
@@ -22150,7 +22161,7 @@
         </p:nvSpPr>
         <p:spPr>
           <a:xfrm>
-            <a:off x="2495550" y="3630613"/>
+            <a:off x="2495550" y="3763349"/>
             <a:ext cx="6191250" cy="2322511"/>
           </a:xfrm>
           <a:prstGeom prst="rect">
@@ -22306,13 +22317,13 @@
               <a:buNone/>
             </a:pPr>
             <a:r>
-              <a:rPr lang="en-US" sz="3200" dirty="0">
+              <a:rPr lang="en-US" sz="3200" dirty="0" err="1">
                 <a:solidFill>
                   <a:srgbClr val="0000FF"/>
                 </a:solidFill>
                 <a:latin typeface="Consolas" panose="020B0609020204030204" pitchFamily="49" charset="0"/>
               </a:rPr>
-              <a:t>select</a:t>
+              <a:t>selekt</a:t>
             </a:r>
             <a:r>
               <a:rPr lang="en-US" sz="3200" dirty="0">
@@ -22665,6 +22676,37 @@
                                   </p:childTnLst>
                                 </p:cTn>
                               </p:par>
+                              <p:par>
+                                <p:cTn id="13" presetID="1" presetClass="entr" presetSubtype="0" fill="hold" grpId="0" nodeType="withEffect">
+                                  <p:stCondLst>
+                                    <p:cond delay="0"/>
+                                  </p:stCondLst>
+                                  <p:childTnLst>
+                                    <p:set>
+                                      <p:cBhvr>
+                                        <p:cTn id="14" dur="1" fill="hold">
+                                          <p:stCondLst>
+                                            <p:cond delay="0"/>
+                                          </p:stCondLst>
+                                        </p:cTn>
+                                        <p:tgtEl>
+                                          <p:spTgt spid="3">
+                                            <p:txEl>
+                                              <p:pRg st="4" end="4"/>
+                                            </p:txEl>
+                                          </p:spTgt>
+                                        </p:tgtEl>
+                                        <p:attrNameLst>
+                                          <p:attrName>style.visibility</p:attrName>
+                                        </p:attrNameLst>
+                                      </p:cBhvr>
+                                      <p:to>
+                                        <p:strVal val="visible"/>
+                                      </p:to>
+                                    </p:set>
+                                  </p:childTnLst>
+                                </p:cTn>
+                              </p:par>
                             </p:childTnLst>
                           </p:cTn>
                         </p:par>
@@ -22672,26 +22714,26 @@
                     </p:cTn>
                   </p:par>
                   <p:par>
-                    <p:cTn id="13" fill="hold">
+                    <p:cTn id="15" fill="hold">
                       <p:stCondLst>
                         <p:cond delay="indefinite"/>
                       </p:stCondLst>
                       <p:childTnLst>
                         <p:par>
-                          <p:cTn id="14" fill="hold">
+                          <p:cTn id="16" fill="hold">
                             <p:stCondLst>
                               <p:cond delay="0"/>
                             </p:stCondLst>
                             <p:childTnLst>
                               <p:par>
-                                <p:cTn id="15" presetID="1" presetClass="entr" presetSubtype="0" fill="hold" grpId="0" nodeType="clickEffect">
+                                <p:cTn id="17" presetID="1" presetClass="entr" presetSubtype="0" fill="hold" grpId="0" nodeType="clickEffect">
                                   <p:stCondLst>
                                     <p:cond delay="0"/>
                                   </p:stCondLst>
                                   <p:childTnLst>
                                     <p:set>
                                       <p:cBhvr>
-                                        <p:cTn id="16" dur="1" fill="hold">
+                                        <p:cTn id="18" dur="1" fill="hold">
                                           <p:stCondLst>
                                             <p:cond delay="0"/>
                                           </p:stCondLst>
@@ -29080,7 +29122,7 @@
         <p:spPr/>
         <p:txBody>
           <a:bodyPr>
-            <a:normAutofit/>
+            <a:normAutofit lnSpcReduction="10000"/>
           </a:bodyPr>
           <a:lstStyle/>
           <a:p>
@@ -29130,6 +29172,22 @@
               <a:rPr lang="en-US" dirty="0"/>
               <a:t>Full set of rules; usually exits on timeout</a:t>
             </a:r>
+          </a:p>
+          <a:p>
+            <a:pPr lvl="2"/>
+            <a:r>
+              <a:rPr lang="en-US" dirty="0"/>
+              <a:t>Extensive use of heuristics to prune </a:t>
+            </a:r>
+            <a:r>
+              <a:rPr lang="en-US"/>
+              <a:t>search spac</a:t>
+            </a:r>
+            <a:r>
+              <a:rPr lang="en-US"/>
+              <a:t>e</a:t>
+            </a:r>
+            <a:endParaRPr lang="en-US" dirty="0"/>
           </a:p>
           <a:p>
             <a:r>

</xml_diff>

<commit_message>
Fix English on Goals slide; constraint management.
</commit_message>
<xml_diff>
--- a/Optimizer.pptx
+++ b/Optimizer.pptx
@@ -25918,7 +25918,7 @@
             <a:pPr lvl="1"/>
             <a:r>
               <a:rPr lang="en-US" dirty="0"/>
-              <a:t>Understanding to help write better queries</a:t>
+              <a:t>Deeper understanding: write better queries!</a:t>
             </a:r>
           </a:p>
           <a:p>
@@ -29181,11 +29181,7 @@
             </a:r>
             <a:r>
               <a:rPr lang="en-US"/>
-              <a:t>search spac</a:t>
-            </a:r>
-            <a:r>
-              <a:rPr lang="en-US"/>
-              <a:t>e</a:t>
+              <a:t>search space</a:t>
             </a:r>
             <a:endParaRPr lang="en-US" dirty="0"/>
           </a:p>
@@ -39652,7 +39648,7 @@
         <p:spPr/>
         <p:txBody>
           <a:bodyPr>
-            <a:normAutofit/>
+            <a:normAutofit lnSpcReduction="10000"/>
           </a:bodyPr>
           <a:lstStyle/>
           <a:p>
@@ -39672,7 +39668,7 @@
             <a:pPr lvl="2"/>
             <a:r>
               <a:rPr lang="en-US" sz="2000" dirty="0"/>
-              <a:t>Halloween protection, triggers, index updates</a:t>
+              <a:t>Halloween protection, triggers, index updates, constraint management</a:t>
             </a:r>
           </a:p>
           <a:p>
@@ -39703,12 +39699,8 @@
           <a:p>
             <a:pPr lvl="1"/>
             <a:r>
-              <a:rPr lang="en-US" sz="2200"/>
-              <a:t>Window functions, partitioned </a:t>
-            </a:r>
-            <a:r>
               <a:rPr lang="en-US" sz="2200" dirty="0"/>
-              <a:t>tables, </a:t>
+              <a:t>Window functions, partitioned tables, </a:t>
             </a:r>
             <a:r>
               <a:rPr lang="en-US" sz="2200" dirty="0" err="1"/>
@@ -41490,7 +41482,7 @@
             <a:pPr lvl="1"/>
             <a:r>
               <a:rPr lang="en-US" dirty="0"/>
-              <a:t>SQL Server Parse Tree Viewer binaries &amp; source</a:t>
+              <a:t>SQL Server Query Tree Viewer binaries &amp; source</a:t>
             </a:r>
           </a:p>
           <a:p>

</xml_diff>

<commit_message>
New slide with info on TF8780.
</commit_message>
<xml_diff>
--- a/Optimizer.pptx
+++ b/Optimizer.pptx
@@ -5,7 +5,7 @@
     <p:sldMasterId id="2147483648" r:id="rId1"/>
   </p:sldMasterIdLst>
   <p:notesMasterIdLst>
-    <p:notesMasterId r:id="rId64"/>
+    <p:notesMasterId r:id="rId65"/>
   </p:notesMasterIdLst>
   <p:sldIdLst>
     <p:sldId id="328" r:id="rId2"/>
@@ -49,27 +49,28 @@
     <p:sldId id="292" r:id="rId40"/>
     <p:sldId id="293" r:id="rId41"/>
     <p:sldId id="290" r:id="rId42"/>
-    <p:sldId id="315" r:id="rId43"/>
-    <p:sldId id="314" r:id="rId44"/>
-    <p:sldId id="298" r:id="rId45"/>
-    <p:sldId id="288" r:id="rId46"/>
-    <p:sldId id="294" r:id="rId47"/>
-    <p:sldId id="295" r:id="rId48"/>
-    <p:sldId id="307" r:id="rId49"/>
-    <p:sldId id="299" r:id="rId50"/>
-    <p:sldId id="300" r:id="rId51"/>
-    <p:sldId id="297" r:id="rId52"/>
-    <p:sldId id="311" r:id="rId53"/>
-    <p:sldId id="312" r:id="rId54"/>
-    <p:sldId id="313" r:id="rId55"/>
-    <p:sldId id="304" r:id="rId56"/>
-    <p:sldId id="301" r:id="rId57"/>
-    <p:sldId id="305" r:id="rId58"/>
-    <p:sldId id="308" r:id="rId59"/>
-    <p:sldId id="306" r:id="rId60"/>
-    <p:sldId id="279" r:id="rId61"/>
-    <p:sldId id="302" r:id="rId62"/>
-    <p:sldId id="303" r:id="rId63"/>
+    <p:sldId id="298" r:id="rId43"/>
+    <p:sldId id="315" r:id="rId44"/>
+    <p:sldId id="341" r:id="rId45"/>
+    <p:sldId id="314" r:id="rId46"/>
+    <p:sldId id="288" r:id="rId47"/>
+    <p:sldId id="294" r:id="rId48"/>
+    <p:sldId id="295" r:id="rId49"/>
+    <p:sldId id="307" r:id="rId50"/>
+    <p:sldId id="299" r:id="rId51"/>
+    <p:sldId id="300" r:id="rId52"/>
+    <p:sldId id="297" r:id="rId53"/>
+    <p:sldId id="311" r:id="rId54"/>
+    <p:sldId id="312" r:id="rId55"/>
+    <p:sldId id="313" r:id="rId56"/>
+    <p:sldId id="304" r:id="rId57"/>
+    <p:sldId id="301" r:id="rId58"/>
+    <p:sldId id="305" r:id="rId59"/>
+    <p:sldId id="308" r:id="rId60"/>
+    <p:sldId id="306" r:id="rId61"/>
+    <p:sldId id="279" r:id="rId62"/>
+    <p:sldId id="302" r:id="rId63"/>
+    <p:sldId id="303" r:id="rId64"/>
   </p:sldIdLst>
   <p:sldSz cx="9144000" cy="6858000" type="screen4x3"/>
   <p:notesSz cx="6858000" cy="9144000"/>
@@ -269,7 +270,7 @@
           <a:p>
             <a:fld id="{2EDCB34D-5EC2-4739-9693-E425457AC201}" type="datetimeFigureOut">
               <a:rPr lang="en-US" smtClean="0"/>
-              <a:t>3/14/2017</a:t>
+              <a:t>03/14/2017</a:t>
             </a:fld>
             <a:endParaRPr lang="en-US"/>
           </a:p>
@@ -1432,11 +1433,11 @@
           <a:p>
             <a:r>
               <a:rPr lang="en-US" dirty="0"/>
-              <a:t>Gain will have a value from 0 to 1, where 0 means no improvement,</a:t>
+              <a:t>Show</a:t>
             </a:r>
             <a:r>
               <a:rPr lang="en-US" baseline="0" dirty="0"/>
-              <a:t> and values approaching 1 indicate significant improvement.</a:t>
+              <a:t> BOL for this DMV, then show 2005 version of BOL.</a:t>
             </a:r>
             <a:endParaRPr lang="en-US" dirty="0"/>
           </a:p>
@@ -1459,7 +1460,7 @@
           <a:p>
             <a:fld id="{ADDBA41D-AE03-4F1C-B074-B56312AFAE46}" type="slidenum">
               <a:rPr lang="en-US" smtClean="0"/>
-              <a:t>43</a:t>
+              <a:t>42</a:t>
             </a:fld>
             <a:endParaRPr lang="en-US"/>
           </a:p>
@@ -1468,7 +1469,7 @@
     </p:spTree>
     <p:extLst>
       <p:ext uri="{BB962C8B-B14F-4D97-AF65-F5344CB8AC3E}">
-        <p14:creationId xmlns:p14="http://schemas.microsoft.com/office/powerpoint/2010/main" val="194171185"/>
+        <p14:creationId xmlns:p14="http://schemas.microsoft.com/office/powerpoint/2010/main" val="584843494"/>
       </p:ext>
     </p:extLst>
   </p:cSld>
@@ -1524,11 +1525,11 @@
           <a:p>
             <a:r>
               <a:rPr lang="en-US" dirty="0"/>
-              <a:t>Show</a:t>
+              <a:t>Gain will have a value from 0 to 1, where 0 means no improvement,</a:t>
             </a:r>
             <a:r>
               <a:rPr lang="en-US" baseline="0" dirty="0"/>
-              <a:t> BOL for this DMV, then show 2005 version of BOL.</a:t>
+              <a:t> and values approaching 1 indicate significant improvement.</a:t>
             </a:r>
             <a:endParaRPr lang="en-US" dirty="0"/>
           </a:p>
@@ -1551,7 +1552,7 @@
           <a:p>
             <a:fld id="{ADDBA41D-AE03-4F1C-B074-B56312AFAE46}" type="slidenum">
               <a:rPr lang="en-US" smtClean="0"/>
-              <a:t>44</a:t>
+              <a:t>45</a:t>
             </a:fld>
             <a:endParaRPr lang="en-US"/>
           </a:p>
@@ -1560,7 +1561,7 @@
     </p:spTree>
     <p:extLst>
       <p:ext uri="{BB962C8B-B14F-4D97-AF65-F5344CB8AC3E}">
-        <p14:creationId xmlns:p14="http://schemas.microsoft.com/office/powerpoint/2010/main" val="584843494"/>
+        <p14:creationId xmlns:p14="http://schemas.microsoft.com/office/powerpoint/2010/main" val="194171185"/>
       </p:ext>
     </p:extLst>
   </p:cSld>
@@ -1686,7 +1687,7 @@
           <a:p>
             <a:fld id="{ADDBA41D-AE03-4F1C-B074-B56312AFAE46}" type="slidenum">
               <a:rPr lang="en-US" smtClean="0"/>
-              <a:t>49</a:t>
+              <a:t>50</a:t>
             </a:fld>
             <a:endParaRPr lang="en-US"/>
           </a:p>
@@ -1879,7 +1880,7 @@
           <a:p>
             <a:fld id="{ADDBA41D-AE03-4F1C-B074-B56312AFAE46}" type="slidenum">
               <a:rPr lang="en-US" smtClean="0"/>
-              <a:t>50</a:t>
+              <a:t>51</a:t>
             </a:fld>
             <a:endParaRPr lang="en-US"/>
           </a:p>
@@ -1988,7 +1989,7 @@
           <a:p>
             <a:fld id="{ADDBA41D-AE03-4F1C-B074-B56312AFAE46}" type="slidenum">
               <a:rPr lang="en-US" smtClean="0"/>
-              <a:t>51</a:t>
+              <a:t>52</a:t>
             </a:fld>
             <a:endParaRPr lang="en-US"/>
           </a:p>
@@ -2086,7 +2087,7 @@
           <a:p>
             <a:fld id="{ADDBA41D-AE03-4F1C-B074-B56312AFAE46}" type="slidenum">
               <a:rPr lang="en-US" smtClean="0"/>
-              <a:t>54</a:t>
+              <a:t>55</a:t>
             </a:fld>
             <a:endParaRPr lang="en-US"/>
           </a:p>
@@ -2170,7 +2171,7 @@
           <a:p>
             <a:fld id="{ADDBA41D-AE03-4F1C-B074-B56312AFAE46}" type="slidenum">
               <a:rPr lang="en-US" smtClean="0"/>
-              <a:t>59</a:t>
+              <a:t>60</a:t>
             </a:fld>
             <a:endParaRPr lang="en-US"/>
           </a:p>
@@ -3060,7 +3061,7 @@
             <a:fld id="{5942B21B-2ADA-A040-A652-A7305E1B99FE}" type="datetimeFigureOut">
               <a:rPr lang="en-US" smtClean="0"/>
               <a:pPr/>
-              <a:t>3/14/2017</a:t>
+              <a:t>03/14/2017</a:t>
             </a:fld>
             <a:endParaRPr lang="en-US" dirty="0"/>
           </a:p>
@@ -3250,7 +3251,7 @@
           <a:p>
             <a:fld id="{5942B21B-2ADA-A040-A652-A7305E1B99FE}" type="datetimeFigureOut">
               <a:rPr lang="en-US" smtClean="0"/>
-              <a:t>3/14/2017</a:t>
+              <a:t>03/14/2017</a:t>
             </a:fld>
             <a:endParaRPr lang="en-US"/>
           </a:p>
@@ -3374,7 +3375,7 @@
             <a:fld id="{5942B21B-2ADA-A040-A652-A7305E1B99FE}" type="datetimeFigureOut">
               <a:rPr lang="en-US" smtClean="0"/>
               <a:pPr/>
-              <a:t>3/14/2017</a:t>
+              <a:t>03/14/2017</a:t>
             </a:fld>
             <a:r>
               <a:rPr lang="en-US"/>
@@ -3645,7 +3646,7 @@
             <a:fld id="{5942B21B-2ADA-A040-A652-A7305E1B99FE}" type="datetimeFigureOut">
               <a:rPr lang="en-US" smtClean="0"/>
               <a:pPr/>
-              <a:t>3/14/2017</a:t>
+              <a:t>03/14/2017</a:t>
             </a:fld>
             <a:r>
               <a:rPr lang="en-US" dirty="0"/>
@@ -3915,7 +3916,7 @@
             <a:fld id="{5942B21B-2ADA-A040-A652-A7305E1B99FE}" type="datetimeFigureOut">
               <a:rPr lang="en-US" smtClean="0"/>
               <a:pPr/>
-              <a:t>3/14/2017</a:t>
+              <a:t>03/14/2017</a:t>
             </a:fld>
             <a:r>
               <a:rPr lang="en-US" dirty="0"/>
@@ -4255,7 +4256,7 @@
             <a:fld id="{5942B21B-2ADA-A040-A652-A7305E1B99FE}" type="datetimeFigureOut">
               <a:rPr lang="en-US" smtClean="0"/>
               <a:pPr/>
-              <a:t>3/14/2017</a:t>
+              <a:t>03/14/2017</a:t>
             </a:fld>
             <a:r>
               <a:rPr lang="en-US" dirty="0"/>
@@ -4596,7 +4597,7 @@
             <a:fld id="{5942B21B-2ADA-A040-A652-A7305E1B99FE}" type="datetimeFigureOut">
               <a:rPr lang="en-US" smtClean="0"/>
               <a:pPr/>
-              <a:t>3/14/2017</a:t>
+              <a:t>03/14/2017</a:t>
             </a:fld>
             <a:r>
               <a:rPr lang="en-US" dirty="0"/>
@@ -5111,7 +5112,7 @@
             <a:fld id="{5942B21B-2ADA-A040-A652-A7305E1B99FE}" type="datetimeFigureOut">
               <a:rPr lang="en-US" smtClean="0"/>
               <a:pPr/>
-              <a:t>3/14/2017</a:t>
+              <a:t>03/14/2017</a:t>
             </a:fld>
             <a:r>
               <a:rPr lang="en-US" dirty="0"/>
@@ -5320,7 +5321,7 @@
             <a:fld id="{5942B21B-2ADA-A040-A652-A7305E1B99FE}" type="datetimeFigureOut">
               <a:rPr lang="en-US" smtClean="0"/>
               <a:pPr/>
-              <a:t>3/14/2017</a:t>
+              <a:t>03/14/2017</a:t>
             </a:fld>
             <a:r>
               <a:rPr lang="en-US" dirty="0"/>
@@ -5507,7 +5508,7 @@
             <a:fld id="{5942B21B-2ADA-A040-A652-A7305E1B99FE}" type="datetimeFigureOut">
               <a:rPr lang="en-US" smtClean="0"/>
               <a:pPr/>
-              <a:t>3/14/2017</a:t>
+              <a:t>03/14/2017</a:t>
             </a:fld>
             <a:r>
               <a:rPr lang="en-US" dirty="0"/>
@@ -5838,7 +5839,7 @@
             <a:fld id="{5942B21B-2ADA-A040-A652-A7305E1B99FE}" type="datetimeFigureOut">
               <a:rPr lang="en-US" smtClean="0"/>
               <a:pPr/>
-              <a:t>3/14/2017</a:t>
+              <a:t>03/14/2017</a:t>
             </a:fld>
             <a:r>
               <a:rPr lang="en-US" dirty="0"/>
@@ -6146,7 +6147,7 @@
             <a:fld id="{5942B21B-2ADA-A040-A652-A7305E1B99FE}" type="datetimeFigureOut">
               <a:rPr lang="en-US" smtClean="0"/>
               <a:pPr/>
-              <a:t>3/14/2017</a:t>
+              <a:t>03/14/2017</a:t>
             </a:fld>
             <a:r>
               <a:rPr lang="en-US" dirty="0"/>
@@ -6425,7 +6426,7 @@
             <a:fld id="{5942B21B-2ADA-A040-A652-A7305E1B99FE}" type="datetimeFigureOut">
               <a:rPr lang="en-US" smtClean="0"/>
               <a:pPr/>
-              <a:t>3/14/2017</a:t>
+              <a:t>03/14/2017</a:t>
             </a:fld>
             <a:r>
               <a:rPr lang="en-US" dirty="0"/>
@@ -8299,6 +8300,14 @@
   <p:clrMapOvr>
     <a:masterClrMapping/>
   </p:clrMapOvr>
+  <mc:AlternateContent xmlns:mc="http://schemas.openxmlformats.org/markup-compatibility/2006">
+    <mc:Choice xmlns:p14="http://schemas.microsoft.com/office/powerpoint/2010/main" Requires="p14">
+      <p:transition spd="slow" p14:dur="2000"/>
+    </mc:Choice>
+    <mc:Fallback>
+      <p:transition spd="slow"/>
+    </mc:Fallback>
+  </mc:AlternateContent>
 </p:sld>
 </file>
 
@@ -9510,6 +9519,14 @@
   <p:clrMapOvr>
     <a:masterClrMapping/>
   </p:clrMapOvr>
+  <mc:AlternateContent xmlns:mc="http://schemas.openxmlformats.org/markup-compatibility/2006">
+    <mc:Choice xmlns:p14="http://schemas.microsoft.com/office/powerpoint/2010/main" Requires="p14">
+      <p:transition spd="slow" p14:dur="2000"/>
+    </mc:Choice>
+    <mc:Fallback>
+      <p:transition spd="slow"/>
+    </mc:Fallback>
+  </mc:AlternateContent>
 </p:sld>
 </file>
 
@@ -10721,6 +10738,14 @@
   <p:clrMapOvr>
     <a:masterClrMapping/>
   </p:clrMapOvr>
+  <mc:AlternateContent xmlns:mc="http://schemas.openxmlformats.org/markup-compatibility/2006">
+    <mc:Choice xmlns:p14="http://schemas.microsoft.com/office/powerpoint/2010/main" Requires="p14">
+      <p:transition spd="slow" p14:dur="2000"/>
+    </mc:Choice>
+    <mc:Fallback>
+      <p:transition spd="slow"/>
+    </mc:Fallback>
+  </mc:AlternateContent>
 </p:sld>
 </file>
 
@@ -11916,6 +11941,14 @@
   <p:clrMapOvr>
     <a:masterClrMapping/>
   </p:clrMapOvr>
+  <mc:AlternateContent xmlns:mc="http://schemas.openxmlformats.org/markup-compatibility/2006">
+    <mc:Choice xmlns:p14="http://schemas.microsoft.com/office/powerpoint/2010/main" Requires="p14">
+      <p:transition spd="slow" p14:dur="2000"/>
+    </mc:Choice>
+    <mc:Fallback>
+      <p:transition spd="slow"/>
+    </mc:Fallback>
+  </mc:AlternateContent>
 </p:sld>
 </file>
 
@@ -13164,6 +13197,14 @@
   <p:clrMapOvr>
     <a:masterClrMapping/>
   </p:clrMapOvr>
+  <mc:AlternateContent xmlns:mc="http://schemas.openxmlformats.org/markup-compatibility/2006">
+    <mc:Choice xmlns:p14="http://schemas.microsoft.com/office/powerpoint/2010/main" Requires="p14">
+      <p:transition spd="slow" p14:dur="2000"/>
+    </mc:Choice>
+    <mc:Fallback>
+      <p:transition spd="slow"/>
+    </mc:Fallback>
+  </mc:AlternateContent>
 </p:sld>
 </file>
 
@@ -14338,6 +14379,14 @@
   <p:clrMapOvr>
     <a:masterClrMapping/>
   </p:clrMapOvr>
+  <mc:AlternateContent xmlns:mc="http://schemas.openxmlformats.org/markup-compatibility/2006">
+    <mc:Choice xmlns:p14="http://schemas.microsoft.com/office/powerpoint/2010/main" Requires="p14">
+      <p:transition spd="slow" p14:dur="2000"/>
+    </mc:Choice>
+    <mc:Fallback>
+      <p:transition spd="slow"/>
+    </mc:Fallback>
+  </mc:AlternateContent>
 </p:sld>
 </file>
 
@@ -15558,6 +15607,14 @@
   <p:clrMapOvr>
     <a:masterClrMapping/>
   </p:clrMapOvr>
+  <mc:AlternateContent xmlns:mc="http://schemas.openxmlformats.org/markup-compatibility/2006">
+    <mc:Choice xmlns:p14="http://schemas.microsoft.com/office/powerpoint/2010/main" Requires="p14">
+      <p:transition spd="slow" p14:dur="2000"/>
+    </mc:Choice>
+    <mc:Fallback>
+      <p:transition spd="slow"/>
+    </mc:Fallback>
+  </mc:AlternateContent>
 </p:sld>
 </file>
 
@@ -16769,6 +16826,14 @@
   <p:clrMapOvr>
     <a:masterClrMapping/>
   </p:clrMapOvr>
+  <mc:AlternateContent xmlns:mc="http://schemas.openxmlformats.org/markup-compatibility/2006">
+    <mc:Choice xmlns:p14="http://schemas.microsoft.com/office/powerpoint/2010/main" Requires="p14">
+      <p:transition spd="slow" p14:dur="2000"/>
+    </mc:Choice>
+    <mc:Fallback>
+      <p:transition spd="slow"/>
+    </mc:Fallback>
+  </mc:AlternateContent>
 </p:sld>
 </file>
 
@@ -18033,6 +18098,14 @@
   <p:clrMapOvr>
     <a:masterClrMapping/>
   </p:clrMapOvr>
+  <mc:AlternateContent xmlns:mc="http://schemas.openxmlformats.org/markup-compatibility/2006">
+    <mc:Choice xmlns:p14="http://schemas.microsoft.com/office/powerpoint/2010/main" Requires="p14">
+      <p:transition spd="slow" p14:dur="2000"/>
+    </mc:Choice>
+    <mc:Fallback>
+      <p:transition spd="slow"/>
+    </mc:Fallback>
+  </mc:AlternateContent>
 </p:sld>
 </file>
 
@@ -20777,28 +20850,28 @@
                 <a:gridCol w="1638752">
                   <a:extLst>
                     <a:ext uri="{9D8B030D-6E8A-4147-A177-3AD203B41FA5}">
-                      <a16:colId xmlns:a16="http://schemas.microsoft.com/office/drawing/2014/main" val="20000"/>
+                      <a16:colId xmlns:a16="http://schemas.microsoft.com/office/drawing/2014/main" xmlns="" val="20000"/>
                     </a:ext>
                   </a:extLst>
                 </a:gridCol>
                 <a:gridCol w="4787153">
                   <a:extLst>
                     <a:ext uri="{9D8B030D-6E8A-4147-A177-3AD203B41FA5}">
-                      <a16:colId xmlns:a16="http://schemas.microsoft.com/office/drawing/2014/main" val="20001"/>
+                      <a16:colId xmlns:a16="http://schemas.microsoft.com/office/drawing/2014/main" xmlns="" val="20001"/>
                     </a:ext>
                   </a:extLst>
                 </a:gridCol>
                 <a:gridCol w="851647">
                   <a:extLst>
                     <a:ext uri="{9D8B030D-6E8A-4147-A177-3AD203B41FA5}">
-                      <a16:colId xmlns:a16="http://schemas.microsoft.com/office/drawing/2014/main" val="20002"/>
+                      <a16:colId xmlns:a16="http://schemas.microsoft.com/office/drawing/2014/main" xmlns="" val="20002"/>
                     </a:ext>
                   </a:extLst>
                 </a:gridCol>
                 <a:gridCol w="779930">
                   <a:extLst>
                     <a:ext uri="{9D8B030D-6E8A-4147-A177-3AD203B41FA5}">
-                      <a16:colId xmlns:a16="http://schemas.microsoft.com/office/drawing/2014/main" val="20003"/>
+                      <a16:colId xmlns:a16="http://schemas.microsoft.com/office/drawing/2014/main" xmlns="" val="20003"/>
                     </a:ext>
                   </a:extLst>
                 </a:gridCol>
@@ -20858,7 +20931,7 @@
                 </a:tc>
                 <a:extLst>
                   <a:ext uri="{0D108BD9-81ED-4DB2-BD59-A6C34878D82A}">
-                    <a16:rowId xmlns:a16="http://schemas.microsoft.com/office/drawing/2014/main" val="10000"/>
+                    <a16:rowId xmlns:a16="http://schemas.microsoft.com/office/drawing/2014/main" xmlns="" val="10000"/>
                   </a:ext>
                 </a:extLst>
               </a:tr>
@@ -20923,7 +20996,7 @@
                 </a:tc>
                 <a:extLst>
                   <a:ext uri="{0D108BD9-81ED-4DB2-BD59-A6C34878D82A}">
-                    <a16:rowId xmlns:a16="http://schemas.microsoft.com/office/drawing/2014/main" val="10001"/>
+                    <a16:rowId xmlns:a16="http://schemas.microsoft.com/office/drawing/2014/main" xmlns="" val="10001"/>
                   </a:ext>
                 </a:extLst>
               </a:tr>
@@ -21000,7 +21073,7 @@
                 </a:tc>
                 <a:extLst>
                   <a:ext uri="{0D108BD9-81ED-4DB2-BD59-A6C34878D82A}">
-                    <a16:rowId xmlns:a16="http://schemas.microsoft.com/office/drawing/2014/main" val="10002"/>
+                    <a16:rowId xmlns:a16="http://schemas.microsoft.com/office/drawing/2014/main" xmlns="" val="10002"/>
                   </a:ext>
                 </a:extLst>
               </a:tr>
@@ -21066,7 +21139,7 @@
                 </a:tc>
                 <a:extLst>
                   <a:ext uri="{0D108BD9-81ED-4DB2-BD59-A6C34878D82A}">
-                    <a16:rowId xmlns:a16="http://schemas.microsoft.com/office/drawing/2014/main" val="10003"/>
+                    <a16:rowId xmlns:a16="http://schemas.microsoft.com/office/drawing/2014/main" xmlns="" val="10003"/>
                   </a:ext>
                 </a:extLst>
               </a:tr>
@@ -21155,7 +21228,7 @@
                 </a:tc>
                 <a:extLst>
                   <a:ext uri="{0D108BD9-81ED-4DB2-BD59-A6C34878D82A}">
-                    <a16:rowId xmlns:a16="http://schemas.microsoft.com/office/drawing/2014/main" val="10004"/>
+                    <a16:rowId xmlns:a16="http://schemas.microsoft.com/office/drawing/2014/main" xmlns="" val="10004"/>
                   </a:ext>
                 </a:extLst>
               </a:tr>
@@ -21226,7 +21299,7 @@
                 </a:tc>
                 <a:extLst>
                   <a:ext uri="{0D108BD9-81ED-4DB2-BD59-A6C34878D82A}">
-                    <a16:rowId xmlns:a16="http://schemas.microsoft.com/office/drawing/2014/main" val="10005"/>
+                    <a16:rowId xmlns:a16="http://schemas.microsoft.com/office/drawing/2014/main" xmlns="" val="10005"/>
                   </a:ext>
                 </a:extLst>
               </a:tr>
@@ -21292,7 +21365,7 @@
                 </a:tc>
                 <a:extLst>
                   <a:ext uri="{0D108BD9-81ED-4DB2-BD59-A6C34878D82A}">
-                    <a16:rowId xmlns:a16="http://schemas.microsoft.com/office/drawing/2014/main" val="10006"/>
+                    <a16:rowId xmlns:a16="http://schemas.microsoft.com/office/drawing/2014/main" xmlns="" val="10006"/>
                   </a:ext>
                 </a:extLst>
               </a:tr>
@@ -25822,6 +25895,14 @@
   <p:clrMapOvr>
     <a:masterClrMapping/>
   </p:clrMapOvr>
+  <mc:AlternateContent xmlns:mc="http://schemas.openxmlformats.org/markup-compatibility/2006">
+    <mc:Choice xmlns:p14="http://schemas.microsoft.com/office/powerpoint/2010/main" Requires="p14">
+      <p:transition spd="slow" p14:dur="2000"/>
+    </mc:Choice>
+    <mc:Fallback>
+      <p:transition spd="slow"/>
+    </mc:Fallback>
+  </mc:AlternateContent>
 </p:sld>
 </file>
 
@@ -29628,6 +29709,14 @@
   <p:clrMapOvr>
     <a:masterClrMapping/>
   </p:clrMapOvr>
+  <mc:AlternateContent xmlns:mc="http://schemas.openxmlformats.org/markup-compatibility/2006">
+    <mc:Choice xmlns:p14="http://schemas.microsoft.com/office/powerpoint/2010/main" Requires="p14">
+      <p:transition spd="slow" p14:dur="2000"/>
+    </mc:Choice>
+    <mc:Fallback>
+      <p:transition spd="slow"/>
+    </mc:Fallback>
+  </mc:AlternateContent>
 </p:sld>
 </file>
 
@@ -29980,14 +30069,14 @@
                 <a:gridCol w="7632835">
                   <a:extLst>
                     <a:ext uri="{9D8B030D-6E8A-4147-A177-3AD203B41FA5}">
-                      <a16:colId xmlns:a16="http://schemas.microsoft.com/office/drawing/2014/main" val="3644048045"/>
+                      <a16:colId xmlns:a16="http://schemas.microsoft.com/office/drawing/2014/main" xmlns="" val="3644048045"/>
                     </a:ext>
                   </a:extLst>
                 </a:gridCol>
                 <a:gridCol w="606393">
                   <a:extLst>
                     <a:ext uri="{9D8B030D-6E8A-4147-A177-3AD203B41FA5}">
-                      <a16:colId xmlns:a16="http://schemas.microsoft.com/office/drawing/2014/main" val="2034254753"/>
+                      <a16:colId xmlns:a16="http://schemas.microsoft.com/office/drawing/2014/main" xmlns="" val="2034254753"/>
                     </a:ext>
                   </a:extLst>
                 </a:gridCol>
@@ -30018,7 +30107,7 @@
                 </a:tc>
                 <a:extLst>
                   <a:ext uri="{0D108BD9-81ED-4DB2-BD59-A6C34878D82A}">
-                    <a16:rowId xmlns:a16="http://schemas.microsoft.com/office/drawing/2014/main" val="2708275910"/>
+                    <a16:rowId xmlns:a16="http://schemas.microsoft.com/office/drawing/2014/main" xmlns="" val="2708275910"/>
                   </a:ext>
                 </a:extLst>
               </a:tr>
@@ -30052,7 +30141,7 @@
                 </a:tc>
                 <a:extLst>
                   <a:ext uri="{0D108BD9-81ED-4DB2-BD59-A6C34878D82A}">
-                    <a16:rowId xmlns:a16="http://schemas.microsoft.com/office/drawing/2014/main" val="2161984115"/>
+                    <a16:rowId xmlns:a16="http://schemas.microsoft.com/office/drawing/2014/main" xmlns="" val="2161984115"/>
                   </a:ext>
                 </a:extLst>
               </a:tr>
@@ -30099,7 +30188,7 @@
                 </a:tc>
                 <a:extLst>
                   <a:ext uri="{0D108BD9-81ED-4DB2-BD59-A6C34878D82A}">
-                    <a16:rowId xmlns:a16="http://schemas.microsoft.com/office/drawing/2014/main" val="2841678841"/>
+                    <a16:rowId xmlns:a16="http://schemas.microsoft.com/office/drawing/2014/main" xmlns="" val="2841678841"/>
                   </a:ext>
                 </a:extLst>
               </a:tr>
@@ -30133,7 +30222,7 @@
                 </a:tc>
                 <a:extLst>
                   <a:ext uri="{0D108BD9-81ED-4DB2-BD59-A6C34878D82A}">
-                    <a16:rowId xmlns:a16="http://schemas.microsoft.com/office/drawing/2014/main" val="3144998627"/>
+                    <a16:rowId xmlns:a16="http://schemas.microsoft.com/office/drawing/2014/main" xmlns="" val="3144998627"/>
                   </a:ext>
                 </a:extLst>
               </a:tr>
@@ -30175,7 +30264,7 @@
                 </a:tc>
                 <a:extLst>
                   <a:ext uri="{0D108BD9-81ED-4DB2-BD59-A6C34878D82A}">
-                    <a16:rowId xmlns:a16="http://schemas.microsoft.com/office/drawing/2014/main" val="1419261869"/>
+                    <a16:rowId xmlns:a16="http://schemas.microsoft.com/office/drawing/2014/main" xmlns="" val="1419261869"/>
                   </a:ext>
                 </a:extLst>
               </a:tr>
@@ -30213,7 +30302,7 @@
                 </a:tc>
                 <a:extLst>
                   <a:ext uri="{0D108BD9-81ED-4DB2-BD59-A6C34878D82A}">
-                    <a16:rowId xmlns:a16="http://schemas.microsoft.com/office/drawing/2014/main" val="1427391072"/>
+                    <a16:rowId xmlns:a16="http://schemas.microsoft.com/office/drawing/2014/main" xmlns="" val="1427391072"/>
                   </a:ext>
                 </a:extLst>
               </a:tr>
@@ -30260,7 +30349,7 @@
                 </a:tc>
                 <a:extLst>
                   <a:ext uri="{0D108BD9-81ED-4DB2-BD59-A6C34878D82A}">
-                    <a16:rowId xmlns:a16="http://schemas.microsoft.com/office/drawing/2014/main" val="2346539918"/>
+                    <a16:rowId xmlns:a16="http://schemas.microsoft.com/office/drawing/2014/main" xmlns="" val="2346539918"/>
                   </a:ext>
                 </a:extLst>
               </a:tr>
@@ -30299,7 +30388,7 @@
                 </a:tc>
                 <a:extLst>
                   <a:ext uri="{0D108BD9-81ED-4DB2-BD59-A6C34878D82A}">
-                    <a16:rowId xmlns:a16="http://schemas.microsoft.com/office/drawing/2014/main" val="2275483042"/>
+                    <a16:rowId xmlns:a16="http://schemas.microsoft.com/office/drawing/2014/main" xmlns="" val="2275483042"/>
                   </a:ext>
                 </a:extLst>
               </a:tr>
@@ -30337,7 +30426,7 @@
                 </a:tc>
                 <a:extLst>
                   <a:ext uri="{0D108BD9-81ED-4DB2-BD59-A6C34878D82A}">
-                    <a16:rowId xmlns:a16="http://schemas.microsoft.com/office/drawing/2014/main" val="4202569347"/>
+                    <a16:rowId xmlns:a16="http://schemas.microsoft.com/office/drawing/2014/main" xmlns="" val="4202569347"/>
                   </a:ext>
                 </a:extLst>
               </a:tr>
@@ -30371,7 +30460,7 @@
                 </a:tc>
                 <a:extLst>
                   <a:ext uri="{0D108BD9-81ED-4DB2-BD59-A6C34878D82A}">
-                    <a16:rowId xmlns:a16="http://schemas.microsoft.com/office/drawing/2014/main" val="2989839269"/>
+                    <a16:rowId xmlns:a16="http://schemas.microsoft.com/office/drawing/2014/main" xmlns="" val="2989839269"/>
                   </a:ext>
                 </a:extLst>
               </a:tr>
@@ -30405,7 +30494,7 @@
                 </a:tc>
                 <a:extLst>
                   <a:ext uri="{0D108BD9-81ED-4DB2-BD59-A6C34878D82A}">
-                    <a16:rowId xmlns:a16="http://schemas.microsoft.com/office/drawing/2014/main" val="2130545569"/>
+                    <a16:rowId xmlns:a16="http://schemas.microsoft.com/office/drawing/2014/main" xmlns="" val="2130545569"/>
                   </a:ext>
                 </a:extLst>
               </a:tr>
@@ -30461,7 +30550,7 @@
                 </a:tc>
                 <a:extLst>
                   <a:ext uri="{0D108BD9-81ED-4DB2-BD59-A6C34878D82A}">
-                    <a16:rowId xmlns:a16="http://schemas.microsoft.com/office/drawing/2014/main" val="1848127216"/>
+                    <a16:rowId xmlns:a16="http://schemas.microsoft.com/office/drawing/2014/main" xmlns="" val="1848127216"/>
                   </a:ext>
                 </a:extLst>
               </a:tr>
@@ -30555,6 +30644,14 @@
   <p:clrMapOvr>
     <a:masterClrMapping/>
   </p:clrMapOvr>
+  <mc:AlternateContent xmlns:mc="http://schemas.openxmlformats.org/markup-compatibility/2006">
+    <mc:Choice xmlns:p14="http://schemas.microsoft.com/office/powerpoint/2010/main" Requires="p14">
+      <p:transition spd="slow" p14:dur="2000"/>
+    </mc:Choice>
+    <mc:Fallback>
+      <p:transition spd="slow"/>
+    </mc:Fallback>
+  </mc:AlternateContent>
 </p:sld>
 </file>
 
@@ -30907,14 +31004,14 @@
                 <a:gridCol w="4119615">
                   <a:extLst>
                     <a:ext uri="{9D8B030D-6E8A-4147-A177-3AD203B41FA5}">
-                      <a16:colId xmlns:a16="http://schemas.microsoft.com/office/drawing/2014/main" val="3644048045"/>
+                      <a16:colId xmlns:a16="http://schemas.microsoft.com/office/drawing/2014/main" xmlns="" val="3644048045"/>
                     </a:ext>
                   </a:extLst>
                 </a:gridCol>
                 <a:gridCol w="4119613">
                   <a:extLst>
                     <a:ext uri="{9D8B030D-6E8A-4147-A177-3AD203B41FA5}">
-                      <a16:colId xmlns:a16="http://schemas.microsoft.com/office/drawing/2014/main" val="2034254753"/>
+                      <a16:colId xmlns:a16="http://schemas.microsoft.com/office/drawing/2014/main" xmlns="" val="2034254753"/>
                     </a:ext>
                   </a:extLst>
                 </a:gridCol>
@@ -30950,7 +31047,7 @@
                 </a:tc>
                 <a:extLst>
                   <a:ext uri="{0D108BD9-81ED-4DB2-BD59-A6C34878D82A}">
-                    <a16:rowId xmlns:a16="http://schemas.microsoft.com/office/drawing/2014/main" val="2708275910"/>
+                    <a16:rowId xmlns:a16="http://schemas.microsoft.com/office/drawing/2014/main" xmlns="" val="2708275910"/>
                   </a:ext>
                 </a:extLst>
               </a:tr>
@@ -31150,7 +31247,7 @@
                 </a:tc>
                 <a:extLst>
                   <a:ext uri="{0D108BD9-81ED-4DB2-BD59-A6C34878D82A}">
-                    <a16:rowId xmlns:a16="http://schemas.microsoft.com/office/drawing/2014/main" val="2161984115"/>
+                    <a16:rowId xmlns:a16="http://schemas.microsoft.com/office/drawing/2014/main" xmlns="" val="2161984115"/>
                   </a:ext>
                 </a:extLst>
               </a:tr>
@@ -31350,7 +31447,7 @@
                 </a:tc>
                 <a:extLst>
                   <a:ext uri="{0D108BD9-81ED-4DB2-BD59-A6C34878D82A}">
-                    <a16:rowId xmlns:a16="http://schemas.microsoft.com/office/drawing/2014/main" val="2841678841"/>
+                    <a16:rowId xmlns:a16="http://schemas.microsoft.com/office/drawing/2014/main" xmlns="" val="2841678841"/>
                   </a:ext>
                 </a:extLst>
               </a:tr>
@@ -31550,7 +31647,7 @@
                 </a:tc>
                 <a:extLst>
                   <a:ext uri="{0D108BD9-81ED-4DB2-BD59-A6C34878D82A}">
-                    <a16:rowId xmlns:a16="http://schemas.microsoft.com/office/drawing/2014/main" val="3144998627"/>
+                    <a16:rowId xmlns:a16="http://schemas.microsoft.com/office/drawing/2014/main" xmlns="" val="3144998627"/>
                   </a:ext>
                 </a:extLst>
               </a:tr>
@@ -31750,7 +31847,7 @@
                 </a:tc>
                 <a:extLst>
                   <a:ext uri="{0D108BD9-81ED-4DB2-BD59-A6C34878D82A}">
-                    <a16:rowId xmlns:a16="http://schemas.microsoft.com/office/drawing/2014/main" val="1419261869"/>
+                    <a16:rowId xmlns:a16="http://schemas.microsoft.com/office/drawing/2014/main" xmlns="" val="1419261869"/>
                   </a:ext>
                 </a:extLst>
               </a:tr>
@@ -31950,7 +32047,7 @@
                 </a:tc>
                 <a:extLst>
                   <a:ext uri="{0D108BD9-81ED-4DB2-BD59-A6C34878D82A}">
-                    <a16:rowId xmlns:a16="http://schemas.microsoft.com/office/drawing/2014/main" val="1427391072"/>
+                    <a16:rowId xmlns:a16="http://schemas.microsoft.com/office/drawing/2014/main" xmlns="" val="1427391072"/>
                   </a:ext>
                 </a:extLst>
               </a:tr>
@@ -32150,7 +32247,7 @@
                 </a:tc>
                 <a:extLst>
                   <a:ext uri="{0D108BD9-81ED-4DB2-BD59-A6C34878D82A}">
-                    <a16:rowId xmlns:a16="http://schemas.microsoft.com/office/drawing/2014/main" val="2346539918"/>
+                    <a16:rowId xmlns:a16="http://schemas.microsoft.com/office/drawing/2014/main" xmlns="" val="2346539918"/>
                   </a:ext>
                 </a:extLst>
               </a:tr>
@@ -32359,7 +32456,7 @@
                 </a:tc>
                 <a:extLst>
                   <a:ext uri="{0D108BD9-81ED-4DB2-BD59-A6C34878D82A}">
-                    <a16:rowId xmlns:a16="http://schemas.microsoft.com/office/drawing/2014/main" val="2275483042"/>
+                    <a16:rowId xmlns:a16="http://schemas.microsoft.com/office/drawing/2014/main" xmlns="" val="2275483042"/>
                   </a:ext>
                 </a:extLst>
               </a:tr>
@@ -32568,7 +32665,7 @@
                 </a:tc>
                 <a:extLst>
                   <a:ext uri="{0D108BD9-81ED-4DB2-BD59-A6C34878D82A}">
-                    <a16:rowId xmlns:a16="http://schemas.microsoft.com/office/drawing/2014/main" val="4202569347"/>
+                    <a16:rowId xmlns:a16="http://schemas.microsoft.com/office/drawing/2014/main" xmlns="" val="4202569347"/>
                   </a:ext>
                 </a:extLst>
               </a:tr>
@@ -32777,7 +32874,7 @@
                 </a:tc>
                 <a:extLst>
                   <a:ext uri="{0D108BD9-81ED-4DB2-BD59-A6C34878D82A}">
-                    <a16:rowId xmlns:a16="http://schemas.microsoft.com/office/drawing/2014/main" val="2989839269"/>
+                    <a16:rowId xmlns:a16="http://schemas.microsoft.com/office/drawing/2014/main" xmlns="" val="2989839269"/>
                   </a:ext>
                 </a:extLst>
               </a:tr>
@@ -32986,7 +33083,7 @@
                 </a:tc>
                 <a:extLst>
                   <a:ext uri="{0D108BD9-81ED-4DB2-BD59-A6C34878D82A}">
-                    <a16:rowId xmlns:a16="http://schemas.microsoft.com/office/drawing/2014/main" val="2130545569"/>
+                    <a16:rowId xmlns:a16="http://schemas.microsoft.com/office/drawing/2014/main" xmlns="" val="2130545569"/>
                   </a:ext>
                 </a:extLst>
               </a:tr>
@@ -33195,7 +33292,7 @@
                 </a:tc>
                 <a:extLst>
                   <a:ext uri="{0D108BD9-81ED-4DB2-BD59-A6C34878D82A}">
-                    <a16:rowId xmlns:a16="http://schemas.microsoft.com/office/drawing/2014/main" val="3045796785"/>
+                    <a16:rowId xmlns:a16="http://schemas.microsoft.com/office/drawing/2014/main" xmlns="" val="3045796785"/>
                   </a:ext>
                 </a:extLst>
               </a:tr>
@@ -33404,7 +33501,7 @@
                 </a:tc>
                 <a:extLst>
                   <a:ext uri="{0D108BD9-81ED-4DB2-BD59-A6C34878D82A}">
-                    <a16:rowId xmlns:a16="http://schemas.microsoft.com/office/drawing/2014/main" val="1091494175"/>
+                    <a16:rowId xmlns:a16="http://schemas.microsoft.com/office/drawing/2014/main" xmlns="" val="1091494175"/>
                   </a:ext>
                 </a:extLst>
               </a:tr>
@@ -33422,6 +33519,14 @@
   <p:clrMapOvr>
     <a:masterClrMapping/>
   </p:clrMapOvr>
+  <mc:AlternateContent xmlns:mc="http://schemas.openxmlformats.org/markup-compatibility/2006">
+    <mc:Choice xmlns:p14="http://schemas.microsoft.com/office/powerpoint/2010/main" Requires="p14">
+      <p:transition spd="slow" p14:dur="2000"/>
+    </mc:Choice>
+    <mc:Fallback>
+      <p:transition spd="slow"/>
+    </mc:Fallback>
+  </mc:AlternateContent>
 </p:sld>
 </file>
 
@@ -33534,6 +33639,14 @@
   <p:clrMapOvr>
     <a:masterClrMapping/>
   </p:clrMapOvr>
+  <mc:AlternateContent xmlns:mc="http://schemas.openxmlformats.org/markup-compatibility/2006">
+    <mc:Choice xmlns:p14="http://schemas.microsoft.com/office/powerpoint/2010/main" Requires="p14">
+      <p:transition spd="slow" p14:dur="2000"/>
+    </mc:Choice>
+    <mc:Fallback>
+      <p:transition spd="slow"/>
+    </mc:Fallback>
+  </mc:AlternateContent>
 </p:sld>
 </file>
 
@@ -33817,6 +33930,14 @@
   <p:clrMapOvr>
     <a:masterClrMapping/>
   </p:clrMapOvr>
+  <mc:AlternateContent xmlns:mc="http://schemas.openxmlformats.org/markup-compatibility/2006">
+    <mc:Choice xmlns:p14="http://schemas.microsoft.com/office/powerpoint/2010/main" Requires="p14">
+      <p:transition spd="slow" p14:dur="2000"/>
+    </mc:Choice>
+    <mc:Fallback>
+      <p:transition spd="slow"/>
+    </mc:Fallback>
+  </mc:AlternateContent>
 </p:sld>
 </file>
 
@@ -34513,10 +34634,183 @@
   <p:clrMapOvr>
     <a:masterClrMapping/>
   </p:clrMapOvr>
+  <mc:AlternateContent xmlns:mc="http://schemas.openxmlformats.org/markup-compatibility/2006">
+    <mc:Choice xmlns:p14="http://schemas.microsoft.com/office/powerpoint/2010/main" Requires="p14">
+      <p:transition spd="slow" p14:dur="2000"/>
+    </mc:Choice>
+    <mc:Fallback>
+      <p:transition spd="slow"/>
+    </mc:Fallback>
+  </mc:AlternateContent>
 </p:sld>
 </file>
 
 <file path=ppt/slides/slide42.xml><?xml version="1.0" encoding="utf-8"?>
+<p:sld xmlns:a="http://schemas.openxmlformats.org/drawingml/2006/main" xmlns:r="http://schemas.openxmlformats.org/officeDocument/2006/relationships" xmlns:p="http://schemas.openxmlformats.org/presentationml/2006/main">
+  <p:cSld>
+    <p:spTree>
+      <p:nvGrpSpPr>
+        <p:cNvPr id="1" name=""/>
+        <p:cNvGrpSpPr/>
+        <p:nvPr/>
+      </p:nvGrpSpPr>
+      <p:grpSpPr>
+        <a:xfrm>
+          <a:off x="0" y="0"/>
+          <a:ext cx="0" cy="0"/>
+          <a:chOff x="0" y="0"/>
+          <a:chExt cx="0" cy="0"/>
+        </a:xfrm>
+      </p:grpSpPr>
+      <p:sp>
+        <p:nvSpPr>
+          <p:cNvPr id="2" name="Title 1"/>
+          <p:cNvSpPr>
+            <a:spLocks noGrp="1"/>
+          </p:cNvSpPr>
+          <p:nvPr>
+            <p:ph type="title"/>
+          </p:nvPr>
+        </p:nvSpPr>
+        <p:spPr/>
+        <p:txBody>
+          <a:bodyPr/>
+          <a:lstStyle/>
+          <a:p>
+            <a:r>
+              <a:rPr lang="en-US" dirty="0" err="1"/>
+              <a:t>sys.dm_exec_query_optimizer_info</a:t>
+            </a:r>
+            <a:endParaRPr lang="en-US" dirty="0"/>
+          </a:p>
+        </p:txBody>
+      </p:sp>
+      <p:sp>
+        <p:nvSpPr>
+          <p:cNvPr id="3" name="Content Placeholder 2"/>
+          <p:cNvSpPr>
+            <a:spLocks noGrp="1"/>
+          </p:cNvSpPr>
+          <p:nvPr>
+            <p:ph idx="1"/>
+          </p:nvPr>
+        </p:nvSpPr>
+        <p:spPr/>
+        <p:txBody>
+          <a:bodyPr/>
+          <a:lstStyle/>
+          <a:p>
+            <a:r>
+              <a:rPr lang="en-US" dirty="0"/>
+              <a:t>Documented.  Sort of.</a:t>
+            </a:r>
+          </a:p>
+          <a:p>
+            <a:r>
+              <a:rPr lang="en-US" dirty="0"/>
+              <a:t>Three columns:</a:t>
+            </a:r>
+          </a:p>
+          <a:p>
+            <a:pPr lvl="1"/>
+            <a:r>
+              <a:rPr lang="en-US" i="1" dirty="0"/>
+              <a:t>counter</a:t>
+            </a:r>
+            <a:r>
+              <a:rPr lang="en-US" dirty="0"/>
+              <a:t>: Name of the observation</a:t>
+            </a:r>
+          </a:p>
+          <a:p>
+            <a:pPr lvl="1"/>
+            <a:r>
+              <a:rPr lang="en-US" i="1" dirty="0"/>
+              <a:t>occurrence: </a:t>
+            </a:r>
+            <a:r>
+              <a:rPr lang="en-US" dirty="0"/>
+              <a:t>Number of times observation was recorded</a:t>
+            </a:r>
+          </a:p>
+          <a:p>
+            <a:pPr lvl="1"/>
+            <a:r>
+              <a:rPr lang="en-US" i="1" dirty="0"/>
+              <a:t>value</a:t>
+            </a:r>
+            <a:r>
+              <a:rPr lang="en-US" dirty="0"/>
+              <a:t>: Average per occurrence</a:t>
+            </a:r>
+            <a:endParaRPr lang="en-US" i="1" dirty="0"/>
+          </a:p>
+          <a:p>
+            <a:r>
+              <a:rPr lang="en-US" dirty="0"/>
+              <a:t>Collect before and after images of this view on a quiet system</a:t>
+            </a:r>
+          </a:p>
+          <a:p>
+            <a:endParaRPr lang="en-US" dirty="0"/>
+          </a:p>
+        </p:txBody>
+      </p:sp>
+      <p:sp>
+        <p:nvSpPr>
+          <p:cNvPr id="4" name="Oval 3"/>
+          <p:cNvSpPr/>
+          <p:nvPr/>
+        </p:nvSpPr>
+        <p:spPr>
+          <a:xfrm>
+            <a:off x="8162223" y="599333"/>
+            <a:ext cx="616016" cy="606391"/>
+          </a:xfrm>
+          <a:prstGeom prst="ellipse">
+            <a:avLst/>
+          </a:prstGeom>
+        </p:spPr>
+        <p:style>
+          <a:lnRef idx="1">
+            <a:schemeClr val="accent1"/>
+          </a:lnRef>
+          <a:fillRef idx="3">
+            <a:schemeClr val="accent1"/>
+          </a:fillRef>
+          <a:effectRef idx="2">
+            <a:schemeClr val="accent1"/>
+          </a:effectRef>
+          <a:fontRef idx="minor">
+            <a:schemeClr val="lt1"/>
+          </a:fontRef>
+        </p:style>
+        <p:txBody>
+          <a:bodyPr rtlCol="0" anchor="ctr"/>
+          <a:lstStyle/>
+          <a:p>
+            <a:pPr algn="ctr"/>
+            <a:r>
+              <a:rPr lang="en-US" dirty="0"/>
+              <a:t>7</a:t>
+            </a:r>
+          </a:p>
+        </p:txBody>
+      </p:sp>
+    </p:spTree>
+    <p:extLst>
+      <p:ext uri="{BB962C8B-B14F-4D97-AF65-F5344CB8AC3E}">
+        <p14:creationId xmlns:p14="http://schemas.microsoft.com/office/powerpoint/2010/main" val="1630484383"/>
+      </p:ext>
+    </p:extLst>
+  </p:cSld>
+  <p:clrMapOvr>
+    <a:masterClrMapping/>
+  </p:clrMapOvr>
+</p:sld>
+</file>
+
+<file path=ppt/slides/slide43.xml><?xml version="1.0" encoding="utf-8"?>
 <p:sld xmlns:a="http://schemas.openxmlformats.org/drawingml/2006/main" xmlns:r="http://schemas.openxmlformats.org/officeDocument/2006/relationships" xmlns:p="http://schemas.openxmlformats.org/presentationml/2006/main">
   <p:cSld>
     <p:spTree>
@@ -34626,7 +34920,314 @@
 </p:sld>
 </file>
 
-<file path=ppt/slides/slide43.xml><?xml version="1.0" encoding="utf-8"?>
+<file path=ppt/slides/slide44.xml><?xml version="1.0" encoding="utf-8"?>
+<p:sld xmlns:a="http://schemas.openxmlformats.org/drawingml/2006/main" xmlns:r="http://schemas.openxmlformats.org/officeDocument/2006/relationships" xmlns:p="http://schemas.openxmlformats.org/presentationml/2006/main">
+  <p:cSld>
+    <p:spTree>
+      <p:nvGrpSpPr>
+        <p:cNvPr id="1" name=""/>
+        <p:cNvGrpSpPr/>
+        <p:nvPr/>
+      </p:nvGrpSpPr>
+      <p:grpSpPr>
+        <a:xfrm>
+          <a:off x="0" y="0"/>
+          <a:ext cx="0" cy="0"/>
+          <a:chOff x="0" y="0"/>
+          <a:chExt cx="0" cy="0"/>
+        </a:xfrm>
+      </p:grpSpPr>
+      <p:sp>
+        <p:nvSpPr>
+          <p:cNvPr id="2" name="Title 1"/>
+          <p:cNvSpPr>
+            <a:spLocks noGrp="1"/>
+          </p:cNvSpPr>
+          <p:nvPr>
+            <p:ph type="title"/>
+          </p:nvPr>
+        </p:nvSpPr>
+        <p:spPr/>
+        <p:txBody>
+          <a:bodyPr>
+            <a:normAutofit/>
+          </a:bodyPr>
+          <a:lstStyle/>
+          <a:p>
+            <a:r>
+              <a:rPr lang="en-US" dirty="0" smtClean="0"/>
+              <a:t>Can the Optimizer Dig a Bit Deeper?</a:t>
+            </a:r>
+            <a:endParaRPr lang="en-US" dirty="0"/>
+          </a:p>
+        </p:txBody>
+      </p:sp>
+      <p:sp>
+        <p:nvSpPr>
+          <p:cNvPr id="3" name="Content Placeholder 2"/>
+          <p:cNvSpPr>
+            <a:spLocks noGrp="1"/>
+          </p:cNvSpPr>
+          <p:nvPr>
+            <p:ph idx="1"/>
+          </p:nvPr>
+        </p:nvSpPr>
+        <p:spPr>
+          <a:xfrm>
+            <a:off x="457200" y="1600201"/>
+            <a:ext cx="5562802" cy="1466850"/>
+          </a:xfrm>
+        </p:spPr>
+        <p:txBody>
+          <a:bodyPr>
+            <a:normAutofit/>
+          </a:bodyPr>
+          <a:lstStyle/>
+          <a:p>
+            <a:r>
+              <a:rPr lang="en-US" dirty="0" smtClean="0"/>
+              <a:t>Trace flag 8780:</a:t>
+            </a:r>
+          </a:p>
+          <a:p>
+            <a:pPr lvl="1"/>
+            <a:r>
+              <a:rPr lang="en-US" dirty="0" smtClean="0"/>
+              <a:t>Considerably more attempts in Search 2</a:t>
+            </a:r>
+          </a:p>
+        </p:txBody>
+      </p:sp>
+      <p:sp>
+        <p:nvSpPr>
+          <p:cNvPr id="6" name="Content Placeholder 2"/>
+          <p:cNvSpPr txBox="1">
+            <a:spLocks/>
+          </p:cNvSpPr>
+          <p:nvPr/>
+        </p:nvSpPr>
+        <p:spPr>
+          <a:xfrm>
+            <a:off x="457200" y="2928774"/>
+            <a:ext cx="2533448" cy="4525963"/>
+          </a:xfrm>
+          <a:prstGeom prst="rect">
+            <a:avLst/>
+          </a:prstGeom>
+        </p:spPr>
+        <p:txBody>
+          <a:bodyPr vert="horz" lIns="91440" tIns="45720" rIns="91440" bIns="45720" rtlCol="0">
+            <a:normAutofit/>
+          </a:bodyPr>
+          <a:lstStyle>
+            <a:lvl1pPr marL="342900" indent="-342900" algn="l" defTabSz="457200" rtl="0" eaLnBrk="1" latinLnBrk="0" hangingPunct="1">
+              <a:spcBef>
+                <a:spcPct val="20000"/>
+              </a:spcBef>
+              <a:buFont typeface="Wingdings" charset="2"/>
+              <a:buChar char="§"/>
+              <a:defRPr sz="3000" kern="1200">
+                <a:solidFill>
+                  <a:schemeClr val="tx2"/>
+                </a:solidFill>
+                <a:latin typeface="+mn-lt"/>
+                <a:ea typeface="+mn-ea"/>
+                <a:cs typeface="+mn-cs"/>
+              </a:defRPr>
+            </a:lvl1pPr>
+            <a:lvl2pPr marL="742950" indent="-285750" algn="l" defTabSz="457200" rtl="0" eaLnBrk="1" latinLnBrk="0" hangingPunct="1">
+              <a:spcBef>
+                <a:spcPct val="20000"/>
+              </a:spcBef>
+              <a:buFont typeface="Wingdings" charset="2"/>
+              <a:buChar char="§"/>
+              <a:defRPr sz="2600" kern="1200">
+                <a:solidFill>
+                  <a:srgbClr val="474947"/>
+                </a:solidFill>
+                <a:latin typeface="+mn-lt"/>
+                <a:ea typeface="+mn-ea"/>
+                <a:cs typeface="+mn-cs"/>
+              </a:defRPr>
+            </a:lvl2pPr>
+            <a:lvl3pPr marL="1143000" indent="-228600" algn="l" defTabSz="457200" rtl="0" eaLnBrk="1" latinLnBrk="0" hangingPunct="1">
+              <a:spcBef>
+                <a:spcPct val="20000"/>
+              </a:spcBef>
+              <a:buFont typeface="Wingdings" charset="2"/>
+              <a:buChar char="§"/>
+              <a:defRPr sz="2200" kern="1200">
+                <a:solidFill>
+                  <a:srgbClr val="474947"/>
+                </a:solidFill>
+                <a:latin typeface="+mn-lt"/>
+                <a:ea typeface="+mn-ea"/>
+                <a:cs typeface="+mn-cs"/>
+              </a:defRPr>
+            </a:lvl3pPr>
+            <a:lvl4pPr marL="1600200" indent="-228600" algn="l" defTabSz="457200" rtl="0" eaLnBrk="1" latinLnBrk="0" hangingPunct="1">
+              <a:spcBef>
+                <a:spcPct val="20000"/>
+              </a:spcBef>
+              <a:buFont typeface="Wingdings" charset="2"/>
+              <a:buChar char="§"/>
+              <a:defRPr sz="2000" kern="1200">
+                <a:solidFill>
+                  <a:srgbClr val="474947"/>
+                </a:solidFill>
+                <a:latin typeface="+mn-lt"/>
+                <a:ea typeface="+mn-ea"/>
+                <a:cs typeface="+mn-cs"/>
+              </a:defRPr>
+            </a:lvl4pPr>
+            <a:lvl5pPr marL="2057400" indent="-228600" algn="l" defTabSz="457200" rtl="0" eaLnBrk="1" latinLnBrk="0" hangingPunct="1">
+              <a:spcBef>
+                <a:spcPct val="20000"/>
+              </a:spcBef>
+              <a:buFont typeface="Wingdings" charset="2"/>
+              <a:buChar char="§"/>
+              <a:defRPr sz="1800" kern="1200">
+                <a:solidFill>
+                  <a:srgbClr val="474947"/>
+                </a:solidFill>
+                <a:latin typeface="+mn-lt"/>
+                <a:ea typeface="+mn-ea"/>
+                <a:cs typeface="+mn-cs"/>
+              </a:defRPr>
+            </a:lvl5pPr>
+            <a:lvl6pPr marL="2514600" indent="-228600" algn="l" defTabSz="457200" rtl="0" eaLnBrk="1" latinLnBrk="0" hangingPunct="1">
+              <a:spcBef>
+                <a:spcPct val="20000"/>
+              </a:spcBef>
+              <a:buFont typeface="Arial"/>
+              <a:buChar char="•"/>
+              <a:defRPr sz="2000" kern="1200">
+                <a:solidFill>
+                  <a:schemeClr val="tx1"/>
+                </a:solidFill>
+                <a:latin typeface="+mn-lt"/>
+                <a:ea typeface="+mn-ea"/>
+                <a:cs typeface="+mn-cs"/>
+              </a:defRPr>
+            </a:lvl6pPr>
+            <a:lvl7pPr marL="2971800" indent="-228600" algn="l" defTabSz="457200" rtl="0" eaLnBrk="1" latinLnBrk="0" hangingPunct="1">
+              <a:spcBef>
+                <a:spcPct val="20000"/>
+              </a:spcBef>
+              <a:buFont typeface="Arial"/>
+              <a:buChar char="•"/>
+              <a:defRPr sz="2000" kern="1200">
+                <a:solidFill>
+                  <a:schemeClr val="tx1"/>
+                </a:solidFill>
+                <a:latin typeface="+mn-lt"/>
+                <a:ea typeface="+mn-ea"/>
+                <a:cs typeface="+mn-cs"/>
+              </a:defRPr>
+            </a:lvl7pPr>
+            <a:lvl8pPr marL="3429000" indent="-228600" algn="l" defTabSz="457200" rtl="0" eaLnBrk="1" latinLnBrk="0" hangingPunct="1">
+              <a:spcBef>
+                <a:spcPct val="20000"/>
+              </a:spcBef>
+              <a:buFont typeface="Arial"/>
+              <a:buChar char="•"/>
+              <a:defRPr sz="2000" kern="1200">
+                <a:solidFill>
+                  <a:schemeClr val="tx1"/>
+                </a:solidFill>
+                <a:latin typeface="+mn-lt"/>
+                <a:ea typeface="+mn-ea"/>
+                <a:cs typeface="+mn-cs"/>
+              </a:defRPr>
+            </a:lvl8pPr>
+            <a:lvl9pPr marL="3886200" indent="-228600" algn="l" defTabSz="457200" rtl="0" eaLnBrk="1" latinLnBrk="0" hangingPunct="1">
+              <a:spcBef>
+                <a:spcPct val="20000"/>
+              </a:spcBef>
+              <a:buFont typeface="Arial"/>
+              <a:buChar char="•"/>
+              <a:defRPr sz="2000" kern="1200">
+                <a:solidFill>
+                  <a:schemeClr val="tx1"/>
+                </a:solidFill>
+                <a:latin typeface="+mn-lt"/>
+                <a:ea typeface="+mn-ea"/>
+                <a:cs typeface="+mn-cs"/>
+              </a:defRPr>
+            </a:lvl9pPr>
+          </a:lstStyle>
+          <a:p>
+            <a:pPr lvl="1"/>
+            <a:r>
+              <a:rPr lang="en-US" dirty="0" smtClean="0"/>
+              <a:t>Very often still won’t come up with a different (or better) plan</a:t>
+            </a:r>
+            <a:endParaRPr lang="en-US" dirty="0"/>
+          </a:p>
+        </p:txBody>
+      </p:sp>
+      <p:pic>
+        <p:nvPicPr>
+          <p:cNvPr id="8" name="Picture 7"/>
+          <p:cNvPicPr>
+            <a:picLocks noChangeAspect="1"/>
+          </p:cNvPicPr>
+          <p:nvPr/>
+        </p:nvPicPr>
+        <p:blipFill>
+          <a:blip r:embed="rId2"/>
+          <a:stretch>
+            <a:fillRect/>
+          </a:stretch>
+        </p:blipFill>
+        <p:spPr>
+          <a:xfrm>
+            <a:off x="6020002" y="2333626"/>
+            <a:ext cx="2896004" cy="3600953"/>
+          </a:xfrm>
+          <a:prstGeom prst="rect">
+            <a:avLst/>
+          </a:prstGeom>
+        </p:spPr>
+      </p:pic>
+      <p:pic>
+        <p:nvPicPr>
+          <p:cNvPr id="9" name="Picture 8"/>
+          <p:cNvPicPr>
+            <a:picLocks noChangeAspect="1"/>
+          </p:cNvPicPr>
+          <p:nvPr/>
+        </p:nvPicPr>
+        <p:blipFill>
+          <a:blip r:embed="rId3"/>
+          <a:stretch>
+            <a:fillRect/>
+          </a:stretch>
+        </p:blipFill>
+        <p:spPr>
+          <a:xfrm>
+            <a:off x="2990648" y="2962364"/>
+            <a:ext cx="2896004" cy="2972215"/>
+          </a:xfrm>
+          <a:prstGeom prst="rect">
+            <a:avLst/>
+          </a:prstGeom>
+        </p:spPr>
+      </p:pic>
+    </p:spTree>
+    <p:extLst>
+      <p:ext uri="{BB962C8B-B14F-4D97-AF65-F5344CB8AC3E}">
+        <p14:creationId xmlns:p14="http://schemas.microsoft.com/office/powerpoint/2010/main" val="2031101993"/>
+      </p:ext>
+    </p:extLst>
+  </p:cSld>
+  <p:clrMapOvr>
+    <a:masterClrMapping/>
+  </p:clrMapOvr>
+</p:sld>
+</file>
+
+<file path=ppt/slides/slide45.xml><?xml version="1.0" encoding="utf-8"?>
 <p:sld xmlns:a="http://schemas.openxmlformats.org/drawingml/2006/main" xmlns:r="http://schemas.openxmlformats.org/officeDocument/2006/relationships" xmlns:p="http://schemas.openxmlformats.org/presentationml/2006/main" show="0">
   <p:cSld>
     <p:spTree>
@@ -34925,306 +35526,14 @@
   <p:clrMapOvr>
     <a:masterClrMapping/>
   </p:clrMapOvr>
-</p:sld>
-</file>
-
-<file path=ppt/slides/slide44.xml><?xml version="1.0" encoding="utf-8"?>
-<p:sld xmlns:a="http://schemas.openxmlformats.org/drawingml/2006/main" xmlns:r="http://schemas.openxmlformats.org/officeDocument/2006/relationships" xmlns:p="http://schemas.openxmlformats.org/presentationml/2006/main">
-  <p:cSld>
-    <p:spTree>
-      <p:nvGrpSpPr>
-        <p:cNvPr id="1" name=""/>
-        <p:cNvGrpSpPr/>
-        <p:nvPr/>
-      </p:nvGrpSpPr>
-      <p:grpSpPr>
-        <a:xfrm>
-          <a:off x="0" y="0"/>
-          <a:ext cx="0" cy="0"/>
-          <a:chOff x="0" y="0"/>
-          <a:chExt cx="0" cy="0"/>
-        </a:xfrm>
-      </p:grpSpPr>
-      <p:sp>
-        <p:nvSpPr>
-          <p:cNvPr id="2" name="Title 1"/>
-          <p:cNvSpPr>
-            <a:spLocks noGrp="1"/>
-          </p:cNvSpPr>
-          <p:nvPr>
-            <p:ph type="title"/>
-          </p:nvPr>
-        </p:nvSpPr>
-        <p:spPr/>
-        <p:txBody>
-          <a:bodyPr/>
-          <a:lstStyle/>
-          <a:p>
-            <a:r>
-              <a:rPr lang="en-US" dirty="0" err="1"/>
-              <a:t>sys.dm_exec_query_optimizer_info</a:t>
-            </a:r>
-            <a:endParaRPr lang="en-US" dirty="0"/>
-          </a:p>
-        </p:txBody>
-      </p:sp>
-      <p:sp>
-        <p:nvSpPr>
-          <p:cNvPr id="3" name="Content Placeholder 2"/>
-          <p:cNvSpPr>
-            <a:spLocks noGrp="1"/>
-          </p:cNvSpPr>
-          <p:nvPr>
-            <p:ph idx="1"/>
-          </p:nvPr>
-        </p:nvSpPr>
-        <p:spPr/>
-        <p:txBody>
-          <a:bodyPr/>
-          <a:lstStyle/>
-          <a:p>
-            <a:r>
-              <a:rPr lang="en-US" dirty="0"/>
-              <a:t>Documented.  Sort of.</a:t>
-            </a:r>
-          </a:p>
-          <a:p>
-            <a:r>
-              <a:rPr lang="en-US" dirty="0"/>
-              <a:t>Three columns:</a:t>
-            </a:r>
-          </a:p>
-          <a:p>
-            <a:pPr lvl="1"/>
-            <a:r>
-              <a:rPr lang="en-US" i="1" dirty="0"/>
-              <a:t>counter</a:t>
-            </a:r>
-            <a:r>
-              <a:rPr lang="en-US" dirty="0"/>
-              <a:t>: Name of the observation</a:t>
-            </a:r>
-          </a:p>
-          <a:p>
-            <a:pPr lvl="1"/>
-            <a:r>
-              <a:rPr lang="en-US" i="1" dirty="0"/>
-              <a:t>occurrence: </a:t>
-            </a:r>
-            <a:r>
-              <a:rPr lang="en-US" dirty="0"/>
-              <a:t>Number of times observation was recorded</a:t>
-            </a:r>
-          </a:p>
-          <a:p>
-            <a:pPr lvl="1"/>
-            <a:r>
-              <a:rPr lang="en-US" i="1" dirty="0"/>
-              <a:t>value</a:t>
-            </a:r>
-            <a:r>
-              <a:rPr lang="en-US" dirty="0"/>
-              <a:t>: Average per occurrence</a:t>
-            </a:r>
-            <a:endParaRPr lang="en-US" i="1" dirty="0"/>
-          </a:p>
-          <a:p>
-            <a:r>
-              <a:rPr lang="en-US" dirty="0"/>
-              <a:t>Collect before and after images of this view on a quiet system</a:t>
-            </a:r>
-          </a:p>
-          <a:p>
-            <a:endParaRPr lang="en-US" dirty="0"/>
-          </a:p>
-        </p:txBody>
-      </p:sp>
-      <p:sp>
-        <p:nvSpPr>
-          <p:cNvPr id="4" name="Oval 3"/>
-          <p:cNvSpPr/>
-          <p:nvPr/>
-        </p:nvSpPr>
-        <p:spPr>
-          <a:xfrm>
-            <a:off x="8162223" y="599333"/>
-            <a:ext cx="616016" cy="606391"/>
-          </a:xfrm>
-          <a:prstGeom prst="ellipse">
-            <a:avLst/>
-          </a:prstGeom>
-        </p:spPr>
-        <p:style>
-          <a:lnRef idx="1">
-            <a:schemeClr val="accent1"/>
-          </a:lnRef>
-          <a:fillRef idx="3">
-            <a:schemeClr val="accent1"/>
-          </a:fillRef>
-          <a:effectRef idx="2">
-            <a:schemeClr val="accent1"/>
-          </a:effectRef>
-          <a:fontRef idx="minor">
-            <a:schemeClr val="lt1"/>
-          </a:fontRef>
-        </p:style>
-        <p:txBody>
-          <a:bodyPr rtlCol="0" anchor="ctr"/>
-          <a:lstStyle/>
-          <a:p>
-            <a:pPr algn="ctr"/>
-            <a:r>
-              <a:rPr lang="en-US" dirty="0"/>
-              <a:t>7</a:t>
-            </a:r>
-          </a:p>
-        </p:txBody>
-      </p:sp>
-    </p:spTree>
-    <p:extLst>
-      <p:ext uri="{BB962C8B-B14F-4D97-AF65-F5344CB8AC3E}">
-        <p14:creationId xmlns:p14="http://schemas.microsoft.com/office/powerpoint/2010/main" val="1630484383"/>
-      </p:ext>
-    </p:extLst>
-  </p:cSld>
-  <p:clrMapOvr>
-    <a:masterClrMapping/>
-  </p:clrMapOvr>
-</p:sld>
-</file>
-
-<file path=ppt/slides/slide45.xml><?xml version="1.0" encoding="utf-8"?>
-<p:sld xmlns:a="http://schemas.openxmlformats.org/drawingml/2006/main" xmlns:r="http://schemas.openxmlformats.org/officeDocument/2006/relationships" xmlns:p="http://schemas.openxmlformats.org/presentationml/2006/main">
-  <p:cSld>
-    <p:spTree>
-      <p:nvGrpSpPr>
-        <p:cNvPr id="1" name=""/>
-        <p:cNvGrpSpPr/>
-        <p:nvPr/>
-      </p:nvGrpSpPr>
-      <p:grpSpPr>
-        <a:xfrm>
-          <a:off x="0" y="0"/>
-          <a:ext cx="0" cy="0"/>
-          <a:chOff x="0" y="0"/>
-          <a:chExt cx="0" cy="0"/>
-        </a:xfrm>
-      </p:grpSpPr>
-      <p:sp>
-        <p:nvSpPr>
-          <p:cNvPr id="2" name="Title 1"/>
-          <p:cNvSpPr>
-            <a:spLocks noGrp="1"/>
-          </p:cNvSpPr>
-          <p:nvPr>
-            <p:ph type="title"/>
-          </p:nvPr>
-        </p:nvSpPr>
-        <p:spPr/>
-        <p:txBody>
-          <a:bodyPr/>
-          <a:lstStyle/>
-          <a:p>
-            <a:r>
-              <a:rPr lang="en-US" dirty="0"/>
-              <a:t>Heuristics and Transformations</a:t>
-            </a:r>
-          </a:p>
-        </p:txBody>
-      </p:sp>
-      <p:sp>
-        <p:nvSpPr>
-          <p:cNvPr id="3" name="Content Placeholder 2"/>
-          <p:cNvSpPr>
-            <a:spLocks noGrp="1"/>
-          </p:cNvSpPr>
-          <p:nvPr>
-            <p:ph idx="1"/>
-          </p:nvPr>
-        </p:nvSpPr>
-        <p:spPr/>
-        <p:txBody>
-          <a:bodyPr>
-            <a:normAutofit lnSpcReduction="10000"/>
-          </a:bodyPr>
-          <a:lstStyle/>
-          <a:p>
-            <a:r>
-              <a:rPr lang="en-US" dirty="0"/>
-              <a:t>Heuristics</a:t>
-            </a:r>
-          </a:p>
-          <a:p>
-            <a:pPr lvl="1"/>
-            <a:r>
-              <a:rPr lang="en-US" dirty="0"/>
-              <a:t>Rules that can eliminate entire branches of the search space</a:t>
-            </a:r>
-          </a:p>
-          <a:p>
-            <a:r>
-              <a:rPr lang="en-US" dirty="0"/>
-              <a:t>Transformations</a:t>
-            </a:r>
-          </a:p>
-          <a:p>
-            <a:pPr lvl="1"/>
-            <a:r>
-              <a:rPr lang="en-US" dirty="0"/>
-              <a:t>Find equivalent operations to get same output</a:t>
-            </a:r>
-          </a:p>
-          <a:p>
-            <a:pPr lvl="1"/>
-            <a:r>
-              <a:rPr lang="en-US" dirty="0"/>
-              <a:t>Rule-based</a:t>
-            </a:r>
-          </a:p>
-          <a:p>
-            <a:pPr lvl="2"/>
-            <a:r>
-              <a:rPr lang="en-US" dirty="0"/>
-              <a:t>DBCC SHOWONRULES</a:t>
-            </a:r>
-          </a:p>
-          <a:p>
-            <a:pPr lvl="2"/>
-            <a:r>
-              <a:rPr lang="en-US" dirty="0"/>
-              <a:t>DBCC RULEON / RULEOFF </a:t>
-            </a:r>
-          </a:p>
-          <a:p>
-            <a:pPr lvl="1"/>
-            <a:r>
-              <a:rPr lang="en-US" dirty="0"/>
-              <a:t>Four types</a:t>
-            </a:r>
-          </a:p>
-          <a:p>
-            <a:pPr lvl="2"/>
-            <a:r>
-              <a:rPr lang="en-US" dirty="0"/>
-              <a:t>Simplification, exploration, implementation, property enforcement</a:t>
-            </a:r>
-          </a:p>
-          <a:p>
-            <a:pPr lvl="1"/>
-            <a:endParaRPr lang="en-US" dirty="0"/>
-          </a:p>
-        </p:txBody>
-      </p:sp>
-    </p:spTree>
-    <p:extLst>
-      <p:ext uri="{BB962C8B-B14F-4D97-AF65-F5344CB8AC3E}">
-        <p14:creationId xmlns:p14="http://schemas.microsoft.com/office/powerpoint/2010/main" val="1718081727"/>
-      </p:ext>
-    </p:extLst>
-  </p:cSld>
-  <p:clrMapOvr>
-    <a:masterClrMapping/>
-  </p:clrMapOvr>
+  <mc:AlternateContent xmlns:mc="http://schemas.openxmlformats.org/markup-compatibility/2006">
+    <mc:Choice xmlns:p14="http://schemas.microsoft.com/office/powerpoint/2010/main" Requires="p14">
+      <p:transition spd="slow" p14:dur="2000"/>
+    </mc:Choice>
+    <mc:Fallback>
+      <p:transition spd="slow"/>
+    </mc:Fallback>
+  </mc:AlternateContent>
 </p:sld>
 </file>
 
@@ -35262,7 +35571,7 @@
           <a:p>
             <a:r>
               <a:rPr lang="en-US" dirty="0"/>
-              <a:t>Transformations: Exploration</a:t>
+              <a:t>Heuristics and Transformations</a:t>
             </a:r>
           </a:p>
         </p:txBody>
@@ -35279,114 +35588,81 @@
         </p:nvSpPr>
         <p:spPr/>
         <p:txBody>
-          <a:bodyPr/>
+          <a:bodyPr>
+            <a:normAutofit lnSpcReduction="10000"/>
+          </a:bodyPr>
           <a:lstStyle/>
           <a:p>
             <a:r>
               <a:rPr lang="en-US" dirty="0"/>
-              <a:t>Start from a logical operation (may be a sub-branch of the full query): the pattern</a:t>
-            </a:r>
-          </a:p>
-          <a:p>
+              <a:t>Heuristics</a:t>
+            </a:r>
+          </a:p>
+          <a:p>
+            <a:pPr lvl="1"/>
             <a:r>
               <a:rPr lang="en-US" dirty="0"/>
-              <a:t>Find equivalent logical operations: the substitute</a:t>
+              <a:t>Rules that can eliminate entire branches of the search space</a:t>
             </a:r>
           </a:p>
           <a:p>
             <a:r>
               <a:rPr lang="en-US" dirty="0"/>
-              <a:t>Examples:</a:t>
+              <a:t>Transformations</a:t>
             </a:r>
           </a:p>
           <a:p>
             <a:pPr lvl="1"/>
             <a:r>
               <a:rPr lang="en-US" dirty="0"/>
-              <a:t>Join commutativity: A⋈B </a:t>
-            </a:r>
-            <a:r>
-              <a:rPr lang="en-US" dirty="0">
-                <a:sym typeface="Wingdings" panose="05000000000000000000" pitchFamily="2" charset="2"/>
-              </a:rPr>
-              <a:t></a:t>
-            </a:r>
+              <a:t>Find equivalent operations to get same output</a:t>
+            </a:r>
+          </a:p>
+          <a:p>
+            <a:pPr lvl="1"/>
             <a:r>
               <a:rPr lang="en-US" dirty="0"/>
-              <a:t> B⋈A</a:t>
+              <a:t>Rule-based</a:t>
+            </a:r>
+          </a:p>
+          <a:p>
+            <a:pPr lvl="2"/>
+            <a:r>
+              <a:rPr lang="en-US" dirty="0"/>
+              <a:t>DBCC SHOWONRULES</a:t>
+            </a:r>
+          </a:p>
+          <a:p>
+            <a:pPr lvl="2"/>
+            <a:r>
+              <a:rPr lang="en-US" dirty="0"/>
+              <a:t>DBCC RULEON / RULEOFF </a:t>
             </a:r>
           </a:p>
           <a:p>
             <a:pPr lvl="1"/>
             <a:r>
               <a:rPr lang="en-US" dirty="0"/>
-              <a:t>Join associativity: (A⋈B)⋈C </a:t>
-            </a:r>
-            <a:r>
-              <a:rPr lang="en-US" dirty="0">
-                <a:sym typeface="Wingdings" panose="05000000000000000000" pitchFamily="2" charset="2"/>
-              </a:rPr>
-              <a:t></a:t>
-            </a:r>
+              <a:t>Four types</a:t>
+            </a:r>
+          </a:p>
+          <a:p>
+            <a:pPr lvl="2"/>
             <a:r>
               <a:rPr lang="en-US" dirty="0"/>
-              <a:t> A⋈(B⋈C)</a:t>
+              <a:t>Simplification, exploration, implementation, property enforcement</a:t>
             </a:r>
           </a:p>
           <a:p>
             <a:pPr lvl="1"/>
-            <a:r>
-              <a:rPr lang="en-US" dirty="0"/>
-              <a:t>Aggregate before join</a:t>
-            </a:r>
-          </a:p>
-        </p:txBody>
-      </p:sp>
-      <p:sp>
-        <p:nvSpPr>
-          <p:cNvPr id="4" name="Oval 3"/>
-          <p:cNvSpPr/>
-          <p:nvPr/>
-        </p:nvSpPr>
-        <p:spPr>
-          <a:xfrm>
-            <a:off x="8282539" y="5159142"/>
-            <a:ext cx="616016" cy="606391"/>
-          </a:xfrm>
-          <a:prstGeom prst="ellipse">
-            <a:avLst/>
-          </a:prstGeom>
-        </p:spPr>
-        <p:style>
-          <a:lnRef idx="1">
-            <a:schemeClr val="accent1"/>
-          </a:lnRef>
-          <a:fillRef idx="3">
-            <a:schemeClr val="accent1"/>
-          </a:fillRef>
-          <a:effectRef idx="2">
-            <a:schemeClr val="accent1"/>
-          </a:effectRef>
-          <a:fontRef idx="minor">
-            <a:schemeClr val="lt1"/>
-          </a:fontRef>
-        </p:style>
-        <p:txBody>
-          <a:bodyPr rtlCol="0" anchor="ctr"/>
-          <a:lstStyle/>
-          <a:p>
-            <a:pPr algn="ctr"/>
-            <a:r>
-              <a:rPr lang="en-US" dirty="0"/>
-              <a:t>9</a:t>
-            </a:r>
+            <a:endParaRPr lang="en-US" dirty="0"/>
           </a:p>
         </p:txBody>
       </p:sp>
     </p:spTree>
     <p:extLst>
       <p:ext uri="{BB962C8B-B14F-4D97-AF65-F5344CB8AC3E}">
-        <p14:creationId xmlns:p14="http://schemas.microsoft.com/office/powerpoint/2010/main" val="3940448552"/>
+        <p14:creationId xmlns:p14="http://schemas.microsoft.com/office/powerpoint/2010/main" val="1718081727"/>
       </p:ext>
     </p:extLst>
   </p:cSld>
@@ -35430,7 +35706,7 @@
           <a:p>
             <a:r>
               <a:rPr lang="en-US" dirty="0"/>
-              <a:t>Transformations: Implementation</a:t>
+              <a:t>Transformations: Exploration</a:t>
             </a:r>
           </a:p>
         </p:txBody>
@@ -35452,72 +35728,101 @@
           <a:p>
             <a:r>
               <a:rPr lang="en-US" dirty="0"/>
-              <a:t>Start from a logical operation</a:t>
+              <a:t>Start from a logical operation (may be a sub-branch of the full query): the pattern</a:t>
             </a:r>
           </a:p>
           <a:p>
             <a:r>
               <a:rPr lang="en-US" dirty="0"/>
-              <a:t>Find equivalent physical operation</a:t>
+              <a:t>Find equivalent logical operations: the substitute</a:t>
             </a:r>
           </a:p>
           <a:p>
             <a:r>
               <a:rPr lang="en-US" dirty="0"/>
-              <a:t>Example:</a:t>
+              <a:t>Examples:</a:t>
             </a:r>
           </a:p>
           <a:p>
             <a:pPr lvl="1"/>
             <a:r>
               <a:rPr lang="en-US" dirty="0"/>
-              <a:t>A⋈B </a:t>
+              <a:t>Join commutativity: A⋈B </a:t>
             </a:r>
             <a:r>
               <a:rPr lang="en-US" dirty="0">
                 <a:sym typeface="Wingdings" panose="05000000000000000000" pitchFamily="2" charset="2"/>
               </a:rPr>
-              <a:t> A (nested loops join) B</a:t>
+              <a:t></a:t>
+            </a:r>
+            <a:r>
+              <a:rPr lang="en-US" dirty="0"/>
+              <a:t> B⋈A</a:t>
             </a:r>
           </a:p>
           <a:p>
             <a:pPr lvl="1"/>
             <a:r>
               <a:rPr lang="en-US" dirty="0"/>
-              <a:t>A⋈B </a:t>
+              <a:t>Join associativity: (A⋈B)⋈C </a:t>
             </a:r>
             <a:r>
               <a:rPr lang="en-US" dirty="0">
                 <a:sym typeface="Wingdings" panose="05000000000000000000" pitchFamily="2" charset="2"/>
               </a:rPr>
-              <a:t> A (merge join) B</a:t>
+              <a:t></a:t>
+            </a:r>
+            <a:r>
+              <a:rPr lang="en-US" dirty="0"/>
+              <a:t> A⋈(B⋈C)</a:t>
             </a:r>
           </a:p>
           <a:p>
             <a:pPr lvl="1"/>
             <a:r>
               <a:rPr lang="en-US" dirty="0"/>
-              <a:t>A⋈B </a:t>
-            </a:r>
-            <a:r>
-              <a:rPr lang="en-US" dirty="0">
-                <a:sym typeface="Wingdings" panose="05000000000000000000" pitchFamily="2" charset="2"/>
-              </a:rPr>
-              <a:t> A (hash join) B</a:t>
-            </a:r>
-          </a:p>
-          <a:p>
-            <a:r>
-              <a:rPr lang="en-US" dirty="0">
-                <a:sym typeface="Wingdings" panose="05000000000000000000" pitchFamily="2" charset="2"/>
-              </a:rPr>
-              <a:t>Obtain costing on physical operations</a:t>
-            </a:r>
-          </a:p>
-          <a:p>
+              <a:t>Aggregate before join</a:t>
+            </a:r>
+          </a:p>
+        </p:txBody>
+      </p:sp>
+      <p:sp>
+        <p:nvSpPr>
+          <p:cNvPr id="4" name="Oval 3"/>
+          <p:cNvSpPr/>
+          <p:nvPr/>
+        </p:nvSpPr>
+        <p:spPr>
+          <a:xfrm>
+            <a:off x="8282539" y="5159142"/>
+            <a:ext cx="616016" cy="606391"/>
+          </a:xfrm>
+          <a:prstGeom prst="ellipse">
+            <a:avLst/>
+          </a:prstGeom>
+        </p:spPr>
+        <p:style>
+          <a:lnRef idx="1">
+            <a:schemeClr val="accent1"/>
+          </a:lnRef>
+          <a:fillRef idx="3">
+            <a:schemeClr val="accent1"/>
+          </a:fillRef>
+          <a:effectRef idx="2">
+            <a:schemeClr val="accent1"/>
+          </a:effectRef>
+          <a:fontRef idx="minor">
+            <a:schemeClr val="lt1"/>
+          </a:fontRef>
+        </p:style>
+        <p:txBody>
+          <a:bodyPr rtlCol="0" anchor="ctr"/>
+          <a:lstStyle/>
+          <a:p>
+            <a:pPr algn="ctr"/>
             <a:r>
               <a:rPr lang="en-US" dirty="0"/>
-              <a:t>Can prune expensive branches from tree</a:t>
+              <a:t>9</a:t>
             </a:r>
           </a:p>
         </p:txBody>
@@ -35525,7 +35830,7 @@
     </p:spTree>
     <p:extLst>
       <p:ext uri="{BB962C8B-B14F-4D97-AF65-F5344CB8AC3E}">
-        <p14:creationId xmlns:p14="http://schemas.microsoft.com/office/powerpoint/2010/main" val="910537009"/>
+        <p14:creationId xmlns:p14="http://schemas.microsoft.com/office/powerpoint/2010/main" val="3940448552"/>
       </p:ext>
     </p:extLst>
   </p:cSld>
@@ -35569,7 +35874,7 @@
           <a:p>
             <a:r>
               <a:rPr lang="en-US" dirty="0"/>
-              <a:t>Transformations: Property Enforcement</a:t>
+              <a:t>Transformations: Implementation</a:t>
             </a:r>
           </a:p>
         </p:txBody>
@@ -35591,42 +35896,72 @@
           <a:p>
             <a:r>
               <a:rPr lang="en-US" dirty="0"/>
-              <a:t>Properties associated with parse tree nodes</a:t>
+              <a:t>Start from a logical operation</a:t>
+            </a:r>
+          </a:p>
+          <a:p>
+            <a:r>
+              <a:rPr lang="en-US" dirty="0"/>
+              <a:t>Find equivalent physical operation</a:t>
+            </a:r>
+          </a:p>
+          <a:p>
+            <a:r>
+              <a:rPr lang="en-US" dirty="0"/>
+              <a:t>Example:</a:t>
             </a:r>
           </a:p>
           <a:p>
             <a:pPr lvl="1"/>
             <a:r>
               <a:rPr lang="en-US" dirty="0"/>
-              <a:t>Uniqueness, type, </a:t>
-            </a:r>
-            <a:r>
-              <a:rPr lang="en-US" dirty="0" err="1"/>
-              <a:t>nullability</a:t>
-            </a:r>
+              <a:t>A⋈B </a:t>
+            </a:r>
+            <a:r>
+              <a:rPr lang="en-US" dirty="0">
+                <a:sym typeface="Wingdings" panose="05000000000000000000" pitchFamily="2" charset="2"/>
+              </a:rPr>
+              <a:t> A (nested loops join) B</a:t>
+            </a:r>
+          </a:p>
+          <a:p>
+            <a:pPr lvl="1"/>
             <a:r>
               <a:rPr lang="en-US" dirty="0"/>
-              <a:t>, sort order</a:t>
+              <a:t>A⋈B </a:t>
+            </a:r>
+            <a:r>
+              <a:rPr lang="en-US" dirty="0">
+                <a:sym typeface="Wingdings" panose="05000000000000000000" pitchFamily="2" charset="2"/>
+              </a:rPr>
+              <a:t> A (merge join) B</a:t>
             </a:r>
           </a:p>
           <a:p>
             <a:pPr lvl="1"/>
             <a:r>
               <a:rPr lang="en-US" dirty="0"/>
-              <a:t>Constraints on column values</a:t>
+              <a:t>A⋈B </a:t>
+            </a:r>
+            <a:r>
+              <a:rPr lang="en-US" dirty="0">
+                <a:sym typeface="Wingdings" panose="05000000000000000000" pitchFamily="2" charset="2"/>
+              </a:rPr>
+              <a:t> A (hash join) B</a:t>
+            </a:r>
+          </a:p>
+          <a:p>
+            <a:r>
+              <a:rPr lang="en-US" dirty="0">
+                <a:sym typeface="Wingdings" panose="05000000000000000000" pitchFamily="2" charset="2"/>
+              </a:rPr>
+              <a:t>Obtain costing on physical operations</a:t>
             </a:r>
           </a:p>
           <a:p>
             <a:r>
               <a:rPr lang="en-US" dirty="0"/>
-              <a:t>Transformation rules may cause certain properties to be enforced</a:t>
-            </a:r>
-          </a:p>
-          <a:p>
-            <a:pPr lvl="1"/>
-            <a:r>
-              <a:rPr lang="en-US" dirty="0"/>
-              <a:t>Example: sort order for a merge join</a:t>
+              <a:t>Can prune expensive branches from tree</a:t>
             </a:r>
           </a:p>
         </p:txBody>
@@ -35634,7 +35969,7 @@
     </p:spTree>
     <p:extLst>
       <p:ext uri="{BB962C8B-B14F-4D97-AF65-F5344CB8AC3E}">
-        <p14:creationId xmlns:p14="http://schemas.microsoft.com/office/powerpoint/2010/main" val="3566365270"/>
+        <p14:creationId xmlns:p14="http://schemas.microsoft.com/office/powerpoint/2010/main" val="910537009"/>
       </p:ext>
     </p:extLst>
   </p:cSld>
@@ -35673,16 +36008,13 @@
         </p:nvSpPr>
         <p:spPr/>
         <p:txBody>
-          <a:bodyPr>
-            <a:normAutofit fontScale="90000"/>
-          </a:bodyPr>
+          <a:bodyPr/>
           <a:lstStyle/>
           <a:p>
             <a:r>
-              <a:rPr lang="en-US" dirty="0" err="1"/>
-              <a:t>sys.dm_exec_query_transformation_stats</a:t>
-            </a:r>
-            <a:endParaRPr lang="en-US" dirty="0"/>
+              <a:rPr lang="en-US" dirty="0"/>
+              <a:t>Transformations: Property Enforcement</a:t>
+            </a:r>
           </a:p>
         </p:txBody>
       </p:sp>
@@ -35703,96 +36035,42 @@
           <a:p>
             <a:r>
               <a:rPr lang="en-US" dirty="0"/>
-              <a:t>One row per transformation rule</a:t>
+              <a:t>Properties associated with parse tree nodes</a:t>
             </a:r>
           </a:p>
           <a:p>
             <a:pPr lvl="1"/>
             <a:r>
               <a:rPr lang="en-US" dirty="0"/>
-              <a:t>“</a:t>
+              <a:t>Uniqueness, type, </a:t>
             </a:r>
             <a:r>
               <a:rPr lang="en-US" dirty="0" err="1"/>
-              <a:t>Promise_Total</a:t>
+              <a:t>nullability</a:t>
             </a:r>
             <a:r>
               <a:rPr lang="en-US" dirty="0"/>
-              <a:t>” – Estimate of how useful might the rule be for this query</a:t>
+              <a:t>, sort order</a:t>
             </a:r>
           </a:p>
           <a:p>
             <a:pPr lvl="1"/>
             <a:r>
               <a:rPr lang="en-US" dirty="0"/>
-              <a:t>“</a:t>
-            </a:r>
-            <a:r>
-              <a:rPr lang="en-US" dirty="0" err="1"/>
-              <a:t>Built_Substitute</a:t>
-            </a:r>
+              <a:t>Constraints on column values</a:t>
+            </a:r>
+          </a:p>
+          <a:p>
             <a:r>
               <a:rPr lang="en-US" dirty="0"/>
-              <a:t>” – Number of times the rule generated an alternate tree</a:t>
+              <a:t>Transformation rules may cause certain properties to be enforced</a:t>
             </a:r>
           </a:p>
           <a:p>
             <a:pPr lvl="1"/>
             <a:r>
               <a:rPr lang="en-US" dirty="0"/>
-              <a:t>“Succeeded” – Number of times the rule was incorporated into </a:t>
-            </a:r>
-            <a:r>
-              <a:rPr lang="en-US"/>
-              <a:t>search space</a:t>
-            </a:r>
-            <a:endParaRPr lang="en-US" dirty="0"/>
-          </a:p>
-          <a:p>
-            <a:r>
-              <a:rPr lang="en-US" dirty="0"/>
-              <a:t>Collect before and after images of this view on a quiet system</a:t>
-            </a:r>
-          </a:p>
-        </p:txBody>
-      </p:sp>
-      <p:sp>
-        <p:nvSpPr>
-          <p:cNvPr id="4" name="Oval 3"/>
-          <p:cNvSpPr/>
-          <p:nvPr/>
-        </p:nvSpPr>
-        <p:spPr>
-          <a:xfrm>
-            <a:off x="8378792" y="542942"/>
-            <a:ext cx="616016" cy="606391"/>
-          </a:xfrm>
-          <a:prstGeom prst="ellipse">
-            <a:avLst/>
-          </a:prstGeom>
-        </p:spPr>
-        <p:style>
-          <a:lnRef idx="1">
-            <a:schemeClr val="accent1"/>
-          </a:lnRef>
-          <a:fillRef idx="3">
-            <a:schemeClr val="accent1"/>
-          </a:fillRef>
-          <a:effectRef idx="2">
-            <a:schemeClr val="accent1"/>
-          </a:effectRef>
-          <a:fontRef idx="minor">
-            <a:schemeClr val="lt1"/>
-          </a:fontRef>
-        </p:style>
-        <p:txBody>
-          <a:bodyPr rtlCol="0" anchor="ctr"/>
-          <a:lstStyle/>
-          <a:p>
-            <a:pPr algn="ctr"/>
-            <a:r>
-              <a:rPr lang="en-US" sz="1600" dirty="0"/>
-              <a:t>10</a:t>
+              <a:t>Example: sort order for a merge join</a:t>
             </a:r>
           </a:p>
         </p:txBody>
@@ -35800,7 +36078,7 @@
     </p:spTree>
     <p:extLst>
       <p:ext uri="{BB962C8B-B14F-4D97-AF65-F5344CB8AC3E}">
-        <p14:creationId xmlns:p14="http://schemas.microsoft.com/office/powerpoint/2010/main" val="3574128401"/>
+        <p14:creationId xmlns:p14="http://schemas.microsoft.com/office/powerpoint/2010/main" val="3566365270"/>
       </p:ext>
     </p:extLst>
   </p:cSld>
@@ -35903,6 +36181,172 @@
 </file>
 
 <file path=ppt/slides/slide50.xml><?xml version="1.0" encoding="utf-8"?>
+<p:sld xmlns:a="http://schemas.openxmlformats.org/drawingml/2006/main" xmlns:r="http://schemas.openxmlformats.org/officeDocument/2006/relationships" xmlns:p="http://schemas.openxmlformats.org/presentationml/2006/main">
+  <p:cSld>
+    <p:spTree>
+      <p:nvGrpSpPr>
+        <p:cNvPr id="1" name=""/>
+        <p:cNvGrpSpPr/>
+        <p:nvPr/>
+      </p:nvGrpSpPr>
+      <p:grpSpPr>
+        <a:xfrm>
+          <a:off x="0" y="0"/>
+          <a:ext cx="0" cy="0"/>
+          <a:chOff x="0" y="0"/>
+          <a:chExt cx="0" cy="0"/>
+        </a:xfrm>
+      </p:grpSpPr>
+      <p:sp>
+        <p:nvSpPr>
+          <p:cNvPr id="2" name="Title 1"/>
+          <p:cNvSpPr>
+            <a:spLocks noGrp="1"/>
+          </p:cNvSpPr>
+          <p:nvPr>
+            <p:ph type="title"/>
+          </p:nvPr>
+        </p:nvSpPr>
+        <p:spPr/>
+        <p:txBody>
+          <a:bodyPr>
+            <a:normAutofit fontScale="90000"/>
+          </a:bodyPr>
+          <a:lstStyle/>
+          <a:p>
+            <a:r>
+              <a:rPr lang="en-US" dirty="0" err="1"/>
+              <a:t>sys.dm_exec_query_transformation_stats</a:t>
+            </a:r>
+            <a:endParaRPr lang="en-US" dirty="0"/>
+          </a:p>
+        </p:txBody>
+      </p:sp>
+      <p:sp>
+        <p:nvSpPr>
+          <p:cNvPr id="3" name="Content Placeholder 2"/>
+          <p:cNvSpPr>
+            <a:spLocks noGrp="1"/>
+          </p:cNvSpPr>
+          <p:nvPr>
+            <p:ph idx="1"/>
+          </p:nvPr>
+        </p:nvSpPr>
+        <p:spPr/>
+        <p:txBody>
+          <a:bodyPr/>
+          <a:lstStyle/>
+          <a:p>
+            <a:r>
+              <a:rPr lang="en-US" dirty="0"/>
+              <a:t>One row per transformation rule</a:t>
+            </a:r>
+          </a:p>
+          <a:p>
+            <a:pPr lvl="1"/>
+            <a:r>
+              <a:rPr lang="en-US" dirty="0"/>
+              <a:t>“</a:t>
+            </a:r>
+            <a:r>
+              <a:rPr lang="en-US" dirty="0" err="1"/>
+              <a:t>Promise_Total</a:t>
+            </a:r>
+            <a:r>
+              <a:rPr lang="en-US" dirty="0"/>
+              <a:t>” – Estimate of how useful might the rule be for this query</a:t>
+            </a:r>
+          </a:p>
+          <a:p>
+            <a:pPr lvl="1"/>
+            <a:r>
+              <a:rPr lang="en-US" dirty="0"/>
+              <a:t>“</a:t>
+            </a:r>
+            <a:r>
+              <a:rPr lang="en-US" dirty="0" err="1"/>
+              <a:t>Built_Substitute</a:t>
+            </a:r>
+            <a:r>
+              <a:rPr lang="en-US" dirty="0"/>
+              <a:t>” – Number of times the rule generated an alternate tree</a:t>
+            </a:r>
+          </a:p>
+          <a:p>
+            <a:pPr lvl="1"/>
+            <a:r>
+              <a:rPr lang="en-US" dirty="0"/>
+              <a:t>“Succeeded” – Number of times the rule was incorporated into </a:t>
+            </a:r>
+            <a:r>
+              <a:rPr lang="en-US"/>
+              <a:t>search space</a:t>
+            </a:r>
+            <a:endParaRPr lang="en-US" dirty="0"/>
+          </a:p>
+          <a:p>
+            <a:r>
+              <a:rPr lang="en-US" dirty="0"/>
+              <a:t>Collect before and after images of this view on a quiet system</a:t>
+            </a:r>
+          </a:p>
+        </p:txBody>
+      </p:sp>
+      <p:sp>
+        <p:nvSpPr>
+          <p:cNvPr id="4" name="Oval 3"/>
+          <p:cNvSpPr/>
+          <p:nvPr/>
+        </p:nvSpPr>
+        <p:spPr>
+          <a:xfrm>
+            <a:off x="8378792" y="542942"/>
+            <a:ext cx="616016" cy="606391"/>
+          </a:xfrm>
+          <a:prstGeom prst="ellipse">
+            <a:avLst/>
+          </a:prstGeom>
+        </p:spPr>
+        <p:style>
+          <a:lnRef idx="1">
+            <a:schemeClr val="accent1"/>
+          </a:lnRef>
+          <a:fillRef idx="3">
+            <a:schemeClr val="accent1"/>
+          </a:fillRef>
+          <a:effectRef idx="2">
+            <a:schemeClr val="accent1"/>
+          </a:effectRef>
+          <a:fontRef idx="minor">
+            <a:schemeClr val="lt1"/>
+          </a:fontRef>
+        </p:style>
+        <p:txBody>
+          <a:bodyPr rtlCol="0" anchor="ctr"/>
+          <a:lstStyle/>
+          <a:p>
+            <a:pPr algn="ctr"/>
+            <a:r>
+              <a:rPr lang="en-US" sz="1600" dirty="0"/>
+              <a:t>10</a:t>
+            </a:r>
+          </a:p>
+        </p:txBody>
+      </p:sp>
+    </p:spTree>
+    <p:extLst>
+      <p:ext uri="{BB962C8B-B14F-4D97-AF65-F5344CB8AC3E}">
+        <p14:creationId xmlns:p14="http://schemas.microsoft.com/office/powerpoint/2010/main" val="3574128401"/>
+      </p:ext>
+    </p:extLst>
+  </p:cSld>
+  <p:clrMapOvr>
+    <a:masterClrMapping/>
+  </p:clrMapOvr>
+</p:sld>
+</file>
+
+<file path=ppt/slides/slide51.xml><?xml version="1.0" encoding="utf-8"?>
 <p:sld xmlns:a="http://schemas.openxmlformats.org/drawingml/2006/main" xmlns:r="http://schemas.openxmlformats.org/officeDocument/2006/relationships" xmlns:p="http://schemas.openxmlformats.org/presentationml/2006/main" show="0">
   <p:cSld>
     <p:spTree>
@@ -36021,112 +36465,14 @@
   <p:clrMapOvr>
     <a:masterClrMapping/>
   </p:clrMapOvr>
-</p:sld>
-</file>
-
-<file path=ppt/slides/slide51.xml><?xml version="1.0" encoding="utf-8"?>
-<p:sld xmlns:a="http://schemas.openxmlformats.org/drawingml/2006/main" xmlns:r="http://schemas.openxmlformats.org/officeDocument/2006/relationships" xmlns:p="http://schemas.openxmlformats.org/presentationml/2006/main">
-  <p:cSld>
-    <p:spTree>
-      <p:nvGrpSpPr>
-        <p:cNvPr id="1" name=""/>
-        <p:cNvGrpSpPr/>
-        <p:nvPr/>
-      </p:nvGrpSpPr>
-      <p:grpSpPr>
-        <a:xfrm>
-          <a:off x="0" y="0"/>
-          <a:ext cx="0" cy="0"/>
-          <a:chOff x="0" y="0"/>
-          <a:chExt cx="0" cy="0"/>
-        </a:xfrm>
-      </p:grpSpPr>
-      <p:sp>
-        <p:nvSpPr>
-          <p:cNvPr id="2" name="Title 1"/>
-          <p:cNvSpPr>
-            <a:spLocks noGrp="1"/>
-          </p:cNvSpPr>
-          <p:nvPr>
-            <p:ph type="title"/>
-          </p:nvPr>
-        </p:nvSpPr>
-        <p:spPr/>
-        <p:txBody>
-          <a:bodyPr/>
-          <a:lstStyle/>
-          <a:p>
-            <a:r>
-              <a:rPr lang="en-US" dirty="0"/>
-              <a:t>Memo Structure</a:t>
-            </a:r>
-          </a:p>
-        </p:txBody>
-      </p:sp>
-      <p:sp>
-        <p:nvSpPr>
-          <p:cNvPr id="3" name="Content Placeholder 2"/>
-          <p:cNvSpPr>
-            <a:spLocks noGrp="1"/>
-          </p:cNvSpPr>
-          <p:nvPr>
-            <p:ph idx="1"/>
-          </p:nvPr>
-        </p:nvSpPr>
-        <p:spPr/>
-        <p:txBody>
-          <a:bodyPr/>
-          <a:lstStyle/>
-          <a:p>
-            <a:r>
-              <a:rPr lang="en-US" dirty="0"/>
-              <a:t>Used to explore different alternatives to a portion of the query tree</a:t>
-            </a:r>
-          </a:p>
-          <a:p>
-            <a:r>
-              <a:rPr lang="en-US" dirty="0"/>
-              <a:t>Can think of it as a matrix</a:t>
-            </a:r>
-          </a:p>
-          <a:p>
-            <a:pPr lvl="1"/>
-            <a:r>
-              <a:rPr lang="en-US" dirty="0"/>
-              <a:t>Rows (groups) represent substitutes – each entry is logically equivalent</a:t>
-            </a:r>
-          </a:p>
-          <a:p>
-            <a:pPr lvl="1"/>
-            <a:r>
-              <a:rPr lang="en-US" dirty="0"/>
-              <a:t>Columns represent application of a transformation rule</a:t>
-            </a:r>
-          </a:p>
-          <a:p>
-            <a:r>
-              <a:rPr lang="en-US" dirty="0"/>
-              <a:t>Each entry is hashed to prevent duplication</a:t>
-            </a:r>
-          </a:p>
-          <a:p>
-            <a:r>
-              <a:rPr lang="en-US" dirty="0"/>
-              <a:t>Physical substitutes are costed</a:t>
-            </a:r>
-          </a:p>
-        </p:txBody>
-      </p:sp>
-    </p:spTree>
-    <p:extLst>
-      <p:ext uri="{BB962C8B-B14F-4D97-AF65-F5344CB8AC3E}">
-        <p14:creationId xmlns:p14="http://schemas.microsoft.com/office/powerpoint/2010/main" val="3817045267"/>
-      </p:ext>
-    </p:extLst>
-  </p:cSld>
-  <p:clrMapOvr>
-    <a:masterClrMapping/>
-  </p:clrMapOvr>
+  <mc:AlternateContent xmlns:mc="http://schemas.openxmlformats.org/markup-compatibility/2006">
+    <mc:Choice xmlns:p14="http://schemas.microsoft.com/office/powerpoint/2010/main" Requires="p14">
+      <p:transition spd="slow" p14:dur="2000"/>
+    </mc:Choice>
+    <mc:Fallback>
+      <p:transition spd="slow"/>
+    </mc:Fallback>
+  </mc:AlternateContent>
 </p:sld>
 </file>
 
@@ -36164,6 +36510,112 @@
           <a:p>
             <a:r>
               <a:rPr lang="en-US" dirty="0"/>
+              <a:t>Memo Structure</a:t>
+            </a:r>
+          </a:p>
+        </p:txBody>
+      </p:sp>
+      <p:sp>
+        <p:nvSpPr>
+          <p:cNvPr id="3" name="Content Placeholder 2"/>
+          <p:cNvSpPr>
+            <a:spLocks noGrp="1"/>
+          </p:cNvSpPr>
+          <p:nvPr>
+            <p:ph idx="1"/>
+          </p:nvPr>
+        </p:nvSpPr>
+        <p:spPr/>
+        <p:txBody>
+          <a:bodyPr/>
+          <a:lstStyle/>
+          <a:p>
+            <a:r>
+              <a:rPr lang="en-US" dirty="0"/>
+              <a:t>Used to explore different alternatives to a portion of the query tree</a:t>
+            </a:r>
+          </a:p>
+          <a:p>
+            <a:r>
+              <a:rPr lang="en-US" dirty="0"/>
+              <a:t>Can think of it as a matrix</a:t>
+            </a:r>
+          </a:p>
+          <a:p>
+            <a:pPr lvl="1"/>
+            <a:r>
+              <a:rPr lang="en-US" dirty="0"/>
+              <a:t>Rows (groups) represent substitutes – each entry is logically equivalent</a:t>
+            </a:r>
+          </a:p>
+          <a:p>
+            <a:pPr lvl="1"/>
+            <a:r>
+              <a:rPr lang="en-US" dirty="0"/>
+              <a:t>Columns represent application of a transformation rule</a:t>
+            </a:r>
+          </a:p>
+          <a:p>
+            <a:r>
+              <a:rPr lang="en-US" dirty="0"/>
+              <a:t>Each entry is hashed to prevent duplication</a:t>
+            </a:r>
+          </a:p>
+          <a:p>
+            <a:r>
+              <a:rPr lang="en-US" dirty="0"/>
+              <a:t>Physical substitutes are costed</a:t>
+            </a:r>
+          </a:p>
+        </p:txBody>
+      </p:sp>
+    </p:spTree>
+    <p:extLst>
+      <p:ext uri="{BB962C8B-B14F-4D97-AF65-F5344CB8AC3E}">
+        <p14:creationId xmlns:p14="http://schemas.microsoft.com/office/powerpoint/2010/main" val="3817045267"/>
+      </p:ext>
+    </p:extLst>
+  </p:cSld>
+  <p:clrMapOvr>
+    <a:masterClrMapping/>
+  </p:clrMapOvr>
+</p:sld>
+</file>
+
+<file path=ppt/slides/slide53.xml><?xml version="1.0" encoding="utf-8"?>
+<p:sld xmlns:a="http://schemas.openxmlformats.org/drawingml/2006/main" xmlns:r="http://schemas.openxmlformats.org/officeDocument/2006/relationships" xmlns:p="http://schemas.openxmlformats.org/presentationml/2006/main">
+  <p:cSld>
+    <p:spTree>
+      <p:nvGrpSpPr>
+        <p:cNvPr id="1" name=""/>
+        <p:cNvGrpSpPr/>
+        <p:nvPr/>
+      </p:nvGrpSpPr>
+      <p:grpSpPr>
+        <a:xfrm>
+          <a:off x="0" y="0"/>
+          <a:ext cx="0" cy="0"/>
+          <a:chOff x="0" y="0"/>
+          <a:chExt cx="0" cy="0"/>
+        </a:xfrm>
+      </p:grpSpPr>
+      <p:sp>
+        <p:nvSpPr>
+          <p:cNvPr id="2" name="Title 1"/>
+          <p:cNvSpPr>
+            <a:spLocks noGrp="1"/>
+          </p:cNvSpPr>
+          <p:nvPr>
+            <p:ph type="title"/>
+          </p:nvPr>
+        </p:nvSpPr>
+        <p:spPr/>
+        <p:txBody>
+          <a:bodyPr/>
+          <a:lstStyle/>
+          <a:p>
+            <a:r>
+              <a:rPr lang="en-US" dirty="0"/>
               <a:t>Example Memo</a:t>
             </a:r>
           </a:p>
@@ -36812,14 +37264,14 @@
                 <a:gridCol w="957714">
                   <a:extLst>
                     <a:ext uri="{9D8B030D-6E8A-4147-A177-3AD203B41FA5}">
-                      <a16:colId xmlns:a16="http://schemas.microsoft.com/office/drawing/2014/main" val="3940544257"/>
+                      <a16:colId xmlns:a16="http://schemas.microsoft.com/office/drawing/2014/main" xmlns="" val="3940544257"/>
                     </a:ext>
                   </a:extLst>
                 </a:gridCol>
                 <a:gridCol w="2464067">
                   <a:extLst>
                     <a:ext uri="{9D8B030D-6E8A-4147-A177-3AD203B41FA5}">
-                      <a16:colId xmlns:a16="http://schemas.microsoft.com/office/drawing/2014/main" val="3658567973"/>
+                      <a16:colId xmlns:a16="http://schemas.microsoft.com/office/drawing/2014/main" xmlns="" val="3658567973"/>
                     </a:ext>
                   </a:extLst>
                 </a:gridCol>
@@ -36853,7 +37305,7 @@
                 </a:tc>
                 <a:extLst>
                   <a:ext uri="{0D108BD9-81ED-4DB2-BD59-A6C34878D82A}">
-                    <a16:rowId xmlns:a16="http://schemas.microsoft.com/office/drawing/2014/main" val="1032275335"/>
+                    <a16:rowId xmlns:a16="http://schemas.microsoft.com/office/drawing/2014/main" xmlns="" val="1032275335"/>
                   </a:ext>
                 </a:extLst>
               </a:tr>
@@ -36983,7 +37435,7 @@
                 </a:tc>
                 <a:extLst>
                   <a:ext uri="{0D108BD9-81ED-4DB2-BD59-A6C34878D82A}">
-                    <a16:rowId xmlns:a16="http://schemas.microsoft.com/office/drawing/2014/main" val="4191484087"/>
+                    <a16:rowId xmlns:a16="http://schemas.microsoft.com/office/drawing/2014/main" xmlns="" val="4191484087"/>
                   </a:ext>
                 </a:extLst>
               </a:tr>
@@ -37057,7 +37509,7 @@
                 </a:tc>
                 <a:extLst>
                   <a:ext uri="{0D108BD9-81ED-4DB2-BD59-A6C34878D82A}">
-                    <a16:rowId xmlns:a16="http://schemas.microsoft.com/office/drawing/2014/main" val="1864588626"/>
+                    <a16:rowId xmlns:a16="http://schemas.microsoft.com/office/drawing/2014/main" xmlns="" val="1864588626"/>
                   </a:ext>
                 </a:extLst>
               </a:tr>
@@ -37179,7 +37631,7 @@
                 </a:tc>
                 <a:extLst>
                   <a:ext uri="{0D108BD9-81ED-4DB2-BD59-A6C34878D82A}">
-                    <a16:rowId xmlns:a16="http://schemas.microsoft.com/office/drawing/2014/main" val="3035259714"/>
+                    <a16:rowId xmlns:a16="http://schemas.microsoft.com/office/drawing/2014/main" xmlns="" val="3035259714"/>
                   </a:ext>
                 </a:extLst>
               </a:tr>
@@ -37268,7 +37720,7 @@
                 </a:tc>
                 <a:extLst>
                   <a:ext uri="{0D108BD9-81ED-4DB2-BD59-A6C34878D82A}">
-                    <a16:rowId xmlns:a16="http://schemas.microsoft.com/office/drawing/2014/main" val="2023621082"/>
+                    <a16:rowId xmlns:a16="http://schemas.microsoft.com/office/drawing/2014/main" xmlns="" val="2023621082"/>
                   </a:ext>
                 </a:extLst>
               </a:tr>
@@ -37357,7 +37809,7 @@
                 </a:tc>
                 <a:extLst>
                   <a:ext uri="{0D108BD9-81ED-4DB2-BD59-A6C34878D82A}">
-                    <a16:rowId xmlns:a16="http://schemas.microsoft.com/office/drawing/2014/main" val="120016333"/>
+                    <a16:rowId xmlns:a16="http://schemas.microsoft.com/office/drawing/2014/main" xmlns="" val="120016333"/>
                   </a:ext>
                 </a:extLst>
               </a:tr>
@@ -37378,7 +37830,7 @@
 </p:sld>
 </file>
 
-<file path=ppt/slides/slide53.xml><?xml version="1.0" encoding="utf-8"?>
+<file path=ppt/slides/slide54.xml><?xml version="1.0" encoding="utf-8"?>
 <p:sld xmlns:a="http://schemas.openxmlformats.org/drawingml/2006/main" xmlns:r="http://schemas.openxmlformats.org/officeDocument/2006/relationships" xmlns:p="http://schemas.openxmlformats.org/presentationml/2006/main">
   <p:cSld>
     <p:spTree>
@@ -37502,21 +37954,21 @@
                 <a:gridCol w="960120">
                   <a:extLst>
                     <a:ext uri="{9D8B030D-6E8A-4147-A177-3AD203B41FA5}">
-                      <a16:colId xmlns:a16="http://schemas.microsoft.com/office/drawing/2014/main" val="392696932"/>
+                      <a16:colId xmlns:a16="http://schemas.microsoft.com/office/drawing/2014/main" xmlns="" val="392696932"/>
                     </a:ext>
                   </a:extLst>
                 </a:gridCol>
                 <a:gridCol w="2468880">
                   <a:extLst>
                     <a:ext uri="{9D8B030D-6E8A-4147-A177-3AD203B41FA5}">
-                      <a16:colId xmlns:a16="http://schemas.microsoft.com/office/drawing/2014/main" val="2769969192"/>
+                      <a16:colId xmlns:a16="http://schemas.microsoft.com/office/drawing/2014/main" xmlns="" val="2769969192"/>
                     </a:ext>
                   </a:extLst>
                 </a:gridCol>
                 <a:gridCol w="2468880">
                   <a:extLst>
                     <a:ext uri="{9D8B030D-6E8A-4147-A177-3AD203B41FA5}">
-                      <a16:colId xmlns:a16="http://schemas.microsoft.com/office/drawing/2014/main" val="2022610816"/>
+                      <a16:colId xmlns:a16="http://schemas.microsoft.com/office/drawing/2014/main" xmlns="" val="2022610816"/>
                     </a:ext>
                   </a:extLst>
                 </a:gridCol>
@@ -37568,7 +38020,7 @@
                 </a:tc>
                 <a:extLst>
                   <a:ext uri="{0D108BD9-81ED-4DB2-BD59-A6C34878D82A}">
-                    <a16:rowId xmlns:a16="http://schemas.microsoft.com/office/drawing/2014/main" val="2344937666"/>
+                    <a16:rowId xmlns:a16="http://schemas.microsoft.com/office/drawing/2014/main" xmlns="" val="2344937666"/>
                   </a:ext>
                 </a:extLst>
               </a:tr>
@@ -37701,7 +38153,7 @@
                 </a:tc>
                 <a:extLst>
                   <a:ext uri="{0D108BD9-81ED-4DB2-BD59-A6C34878D82A}">
-                    <a16:rowId xmlns:a16="http://schemas.microsoft.com/office/drawing/2014/main" val="1917341330"/>
+                    <a16:rowId xmlns:a16="http://schemas.microsoft.com/office/drawing/2014/main" xmlns="" val="1917341330"/>
                   </a:ext>
                 </a:extLst>
               </a:tr>
@@ -37918,7 +38370,7 @@
                 </a:tc>
                 <a:extLst>
                   <a:ext uri="{0D108BD9-81ED-4DB2-BD59-A6C34878D82A}">
-                    <a16:rowId xmlns:a16="http://schemas.microsoft.com/office/drawing/2014/main" val="3088042860"/>
+                    <a16:rowId xmlns:a16="http://schemas.microsoft.com/office/drawing/2014/main" xmlns="" val="3088042860"/>
                   </a:ext>
                 </a:extLst>
               </a:tr>
@@ -38002,7 +38454,7 @@
                 </a:tc>
                 <a:extLst>
                   <a:ext uri="{0D108BD9-81ED-4DB2-BD59-A6C34878D82A}">
-                    <a16:rowId xmlns:a16="http://schemas.microsoft.com/office/drawing/2014/main" val="2658530722"/>
+                    <a16:rowId xmlns:a16="http://schemas.microsoft.com/office/drawing/2014/main" xmlns="" val="2658530722"/>
                   </a:ext>
                 </a:extLst>
               </a:tr>
@@ -38134,7 +38586,7 @@
                 </a:tc>
                 <a:extLst>
                   <a:ext uri="{0D108BD9-81ED-4DB2-BD59-A6C34878D82A}">
-                    <a16:rowId xmlns:a16="http://schemas.microsoft.com/office/drawing/2014/main" val="1481886367"/>
+                    <a16:rowId xmlns:a16="http://schemas.microsoft.com/office/drawing/2014/main" xmlns="" val="1481886367"/>
                   </a:ext>
                 </a:extLst>
               </a:tr>
@@ -38233,7 +38685,7 @@
                 </a:tc>
                 <a:extLst>
                   <a:ext uri="{0D108BD9-81ED-4DB2-BD59-A6C34878D82A}">
-                    <a16:rowId xmlns:a16="http://schemas.microsoft.com/office/drawing/2014/main" val="4248384778"/>
+                    <a16:rowId xmlns:a16="http://schemas.microsoft.com/office/drawing/2014/main" xmlns="" val="4248384778"/>
                   </a:ext>
                 </a:extLst>
               </a:tr>
@@ -38332,7 +38784,7 @@
                 </a:tc>
                 <a:extLst>
                   <a:ext uri="{0D108BD9-81ED-4DB2-BD59-A6C34878D82A}">
-                    <a16:rowId xmlns:a16="http://schemas.microsoft.com/office/drawing/2014/main" val="1670483340"/>
+                    <a16:rowId xmlns:a16="http://schemas.microsoft.com/office/drawing/2014/main" xmlns="" val="1670483340"/>
                   </a:ext>
                 </a:extLst>
               </a:tr>
@@ -38353,7 +38805,7 @@
 </p:sld>
 </file>
 
-<file path=ppt/slides/slide54.xml><?xml version="1.0" encoding="utf-8"?>
+<file path=ppt/slides/slide55.xml><?xml version="1.0" encoding="utf-8"?>
 <p:sld xmlns:a="http://schemas.openxmlformats.org/drawingml/2006/main" xmlns:r="http://schemas.openxmlformats.org/officeDocument/2006/relationships" xmlns:p="http://schemas.openxmlformats.org/presentationml/2006/main">
   <p:cSld>
     <p:spTree>
@@ -38477,28 +38929,28 @@
                 <a:gridCol w="960120">
                   <a:extLst>
                     <a:ext uri="{9D8B030D-6E8A-4147-A177-3AD203B41FA5}">
-                      <a16:colId xmlns:a16="http://schemas.microsoft.com/office/drawing/2014/main" val="392696932"/>
+                      <a16:colId xmlns:a16="http://schemas.microsoft.com/office/drawing/2014/main" xmlns="" val="392696932"/>
                     </a:ext>
                   </a:extLst>
                 </a:gridCol>
                 <a:gridCol w="2468880">
                   <a:extLst>
                     <a:ext uri="{9D8B030D-6E8A-4147-A177-3AD203B41FA5}">
-                      <a16:colId xmlns:a16="http://schemas.microsoft.com/office/drawing/2014/main" val="2769969192"/>
+                      <a16:colId xmlns:a16="http://schemas.microsoft.com/office/drawing/2014/main" xmlns="" val="2769969192"/>
                     </a:ext>
                   </a:extLst>
                 </a:gridCol>
                 <a:gridCol w="2468880">
                   <a:extLst>
                     <a:ext uri="{9D8B030D-6E8A-4147-A177-3AD203B41FA5}">
-                      <a16:colId xmlns:a16="http://schemas.microsoft.com/office/drawing/2014/main" val="2022610816"/>
+                      <a16:colId xmlns:a16="http://schemas.microsoft.com/office/drawing/2014/main" xmlns="" val="2022610816"/>
                     </a:ext>
                   </a:extLst>
                 </a:gridCol>
                 <a:gridCol w="2468880">
                   <a:extLst>
                     <a:ext uri="{9D8B030D-6E8A-4147-A177-3AD203B41FA5}">
-                      <a16:colId xmlns:a16="http://schemas.microsoft.com/office/drawing/2014/main" val="102813283"/>
+                      <a16:colId xmlns:a16="http://schemas.microsoft.com/office/drawing/2014/main" xmlns="" val="102813283"/>
                     </a:ext>
                   </a:extLst>
                 </a:gridCol>
@@ -38563,7 +39015,7 @@
                 </a:tc>
                 <a:extLst>
                   <a:ext uri="{0D108BD9-81ED-4DB2-BD59-A6C34878D82A}">
-                    <a16:rowId xmlns:a16="http://schemas.microsoft.com/office/drawing/2014/main" val="2344937666"/>
+                    <a16:rowId xmlns:a16="http://schemas.microsoft.com/office/drawing/2014/main" xmlns="" val="2344937666"/>
                   </a:ext>
                 </a:extLst>
               </a:tr>
@@ -38723,7 +39175,7 @@
                 </a:tc>
                 <a:extLst>
                   <a:ext uri="{0D108BD9-81ED-4DB2-BD59-A6C34878D82A}">
-                    <a16:rowId xmlns:a16="http://schemas.microsoft.com/office/drawing/2014/main" val="1917341330"/>
+                    <a16:rowId xmlns:a16="http://schemas.microsoft.com/office/drawing/2014/main" xmlns="" val="1917341330"/>
                   </a:ext>
                 </a:extLst>
               </a:tr>
@@ -39027,7 +39479,7 @@
                 </a:tc>
                 <a:extLst>
                   <a:ext uri="{0D108BD9-81ED-4DB2-BD59-A6C34878D82A}">
-                    <a16:rowId xmlns:a16="http://schemas.microsoft.com/office/drawing/2014/main" val="3088042860"/>
+                    <a16:rowId xmlns:a16="http://schemas.microsoft.com/office/drawing/2014/main" xmlns="" val="3088042860"/>
                   </a:ext>
                 </a:extLst>
               </a:tr>
@@ -39121,7 +39573,7 @@
                 </a:tc>
                 <a:extLst>
                   <a:ext uri="{0D108BD9-81ED-4DB2-BD59-A6C34878D82A}">
-                    <a16:rowId xmlns:a16="http://schemas.microsoft.com/office/drawing/2014/main" val="2658530722"/>
+                    <a16:rowId xmlns:a16="http://schemas.microsoft.com/office/drawing/2014/main" xmlns="" val="2658530722"/>
                   </a:ext>
                 </a:extLst>
               </a:tr>
@@ -39314,7 +39766,7 @@
                 </a:tc>
                 <a:extLst>
                   <a:ext uri="{0D108BD9-81ED-4DB2-BD59-A6C34878D82A}">
-                    <a16:rowId xmlns:a16="http://schemas.microsoft.com/office/drawing/2014/main" val="1481886367"/>
+                    <a16:rowId xmlns:a16="http://schemas.microsoft.com/office/drawing/2014/main" xmlns="" val="1481886367"/>
                   </a:ext>
                 </a:extLst>
               </a:tr>
@@ -39423,7 +39875,7 @@
                 </a:tc>
                 <a:extLst>
                   <a:ext uri="{0D108BD9-81ED-4DB2-BD59-A6C34878D82A}">
-                    <a16:rowId xmlns:a16="http://schemas.microsoft.com/office/drawing/2014/main" val="4248384778"/>
+                    <a16:rowId xmlns:a16="http://schemas.microsoft.com/office/drawing/2014/main" xmlns="" val="4248384778"/>
                   </a:ext>
                 </a:extLst>
               </a:tr>
@@ -39532,7 +39984,7 @@
                 </a:tc>
                 <a:extLst>
                   <a:ext uri="{0D108BD9-81ED-4DB2-BD59-A6C34878D82A}">
-                    <a16:rowId xmlns:a16="http://schemas.microsoft.com/office/drawing/2014/main" val="1670483340"/>
+                    <a16:rowId xmlns:a16="http://schemas.microsoft.com/office/drawing/2014/main" xmlns="" val="1670483340"/>
                   </a:ext>
                 </a:extLst>
               </a:tr>
@@ -39594,7 +40046,7 @@
 </p:sld>
 </file>
 
-<file path=ppt/slides/slide55.xml><?xml version="1.0" encoding="utf-8"?>
+<file path=ppt/slides/slide56.xml><?xml version="1.0" encoding="utf-8"?>
 <p:sld xmlns:a="http://schemas.openxmlformats.org/drawingml/2006/main" xmlns:r="http://schemas.openxmlformats.org/officeDocument/2006/relationships" xmlns:p="http://schemas.openxmlformats.org/presentationml/2006/main">
   <p:cSld>
     <p:spTree>
@@ -39731,134 +40183,6 @@
     <p:extLst>
       <p:ext uri="{BB962C8B-B14F-4D97-AF65-F5344CB8AC3E}">
         <p14:creationId xmlns:p14="http://schemas.microsoft.com/office/powerpoint/2010/main" val="2101516933"/>
-      </p:ext>
-    </p:extLst>
-  </p:cSld>
-  <p:clrMapOvr>
-    <a:masterClrMapping/>
-  </p:clrMapOvr>
-</p:sld>
-</file>
-
-<file path=ppt/slides/slide56.xml><?xml version="1.0" encoding="utf-8"?>
-<p:sld xmlns:a="http://schemas.openxmlformats.org/drawingml/2006/main" xmlns:r="http://schemas.openxmlformats.org/officeDocument/2006/relationships" xmlns:p="http://schemas.openxmlformats.org/presentationml/2006/main">
-  <p:cSld>
-    <p:spTree>
-      <p:nvGrpSpPr>
-        <p:cNvPr id="1" name=""/>
-        <p:cNvGrpSpPr/>
-        <p:nvPr/>
-      </p:nvGrpSpPr>
-      <p:grpSpPr>
-        <a:xfrm>
-          <a:off x="0" y="0"/>
-          <a:ext cx="0" cy="0"/>
-          <a:chOff x="0" y="0"/>
-          <a:chExt cx="0" cy="0"/>
-        </a:xfrm>
-      </p:grpSpPr>
-      <p:sp>
-        <p:nvSpPr>
-          <p:cNvPr id="2" name="Title 1"/>
-          <p:cNvSpPr>
-            <a:spLocks noGrp="1"/>
-          </p:cNvSpPr>
-          <p:nvPr>
-            <p:ph type="title"/>
-          </p:nvPr>
-        </p:nvSpPr>
-        <p:spPr/>
-        <p:txBody>
-          <a:bodyPr/>
-          <a:lstStyle/>
-          <a:p>
-            <a:r>
-              <a:rPr lang="en-US" dirty="0"/>
-              <a:t>Conclusions</a:t>
-            </a:r>
-          </a:p>
-        </p:txBody>
-      </p:sp>
-      <p:sp>
-        <p:nvSpPr>
-          <p:cNvPr id="3" name="Content Placeholder 2"/>
-          <p:cNvSpPr>
-            <a:spLocks noGrp="1"/>
-          </p:cNvSpPr>
-          <p:nvPr>
-            <p:ph idx="1"/>
-          </p:nvPr>
-        </p:nvSpPr>
-        <p:spPr/>
-        <p:txBody>
-          <a:bodyPr/>
-          <a:lstStyle/>
-          <a:p>
-            <a:r>
-              <a:rPr lang="en-US" dirty="0"/>
-              <a:t>SQL is a declarative language</a:t>
-            </a:r>
-          </a:p>
-          <a:p>
-            <a:pPr lvl="1"/>
-            <a:r>
-              <a:rPr lang="en-US" dirty="0"/>
-              <a:t>In theory, it shouldn’t matter how SQL is written</a:t>
-            </a:r>
-          </a:p>
-          <a:p>
-            <a:pPr lvl="2"/>
-            <a:r>
-              <a:rPr lang="en-US" dirty="0"/>
-              <a:t>We are effectively giving SQL Server a set of requirements and asking it to write a program for us</a:t>
-            </a:r>
-          </a:p>
-          <a:p>
-            <a:pPr lvl="1"/>
-            <a:r>
-              <a:rPr lang="en-US" dirty="0"/>
-              <a:t>In practice, it does matter because no optimizer is perfect</a:t>
-            </a:r>
-          </a:p>
-          <a:p>
-            <a:pPr lvl="2"/>
-            <a:r>
-              <a:rPr lang="en-US" dirty="0"/>
-              <a:t>It will give us correct results</a:t>
-            </a:r>
-          </a:p>
-          <a:p>
-            <a:pPr lvl="2"/>
-            <a:r>
-              <a:rPr lang="en-US" dirty="0"/>
-              <a:t>In the real world, efficiency matters</a:t>
-            </a:r>
-          </a:p>
-          <a:p>
-            <a:r>
-              <a:rPr lang="en-US" dirty="0"/>
-              <a:t>Writing “better” queries</a:t>
-            </a:r>
-          </a:p>
-          <a:p>
-            <a:pPr lvl="1"/>
-            <a:r>
-              <a:rPr lang="en-US" dirty="0"/>
-              <a:t>Sometimes we need to “out-smart” the optimizer</a:t>
-            </a:r>
-          </a:p>
-          <a:p>
-            <a:pPr marL="0" indent="0">
-              <a:buNone/>
-            </a:pPr>
-            <a:endParaRPr lang="en-US" dirty="0"/>
-          </a:p>
-        </p:txBody>
-      </p:sp>
-    </p:spTree>
-    <p:extLst>
-      <p:ext uri="{BB962C8B-B14F-4D97-AF65-F5344CB8AC3E}">
-        <p14:creationId xmlns:p14="http://schemas.microsoft.com/office/powerpoint/2010/main" val="2736690025"/>
       </p:ext>
     </p:extLst>
   </p:cSld>
@@ -39902,410 +40226,91 @@
           <a:p>
             <a:r>
               <a:rPr lang="en-US" dirty="0"/>
-              <a:t>Appendix: Trace Flags</a:t>
+              <a:t>Conclusions</a:t>
             </a:r>
           </a:p>
         </p:txBody>
       </p:sp>
-      <p:graphicFrame>
-        <p:nvGraphicFramePr>
-          <p:cNvPr id="4" name="Content Placeholder 3"/>
-          <p:cNvGraphicFramePr>
-            <a:graphicFrameLocks noGrp="1"/>
-          </p:cNvGraphicFramePr>
+      <p:sp>
+        <p:nvSpPr>
+          <p:cNvPr id="3" name="Content Placeholder 2"/>
+          <p:cNvSpPr>
+            <a:spLocks noGrp="1"/>
+          </p:cNvSpPr>
           <p:nvPr>
             <p:ph idx="1"/>
-            <p:extLst>
-              <p:ext uri="{D42A27DB-BD31-4B8C-83A1-F6EECF244321}">
-                <p14:modId xmlns:p14="http://schemas.microsoft.com/office/powerpoint/2010/main" val="2106636005"/>
-              </p:ext>
-            </p:extLst>
           </p:nvPr>
-        </p:nvGraphicFramePr>
-        <p:xfrm>
-          <a:off x="457200" y="1417638"/>
-          <a:ext cx="8229600" cy="3977640"/>
-        </p:xfrm>
-        <a:graphic>
-          <a:graphicData uri="http://schemas.openxmlformats.org/drawingml/2006/table">
-            <a:tbl>
-              <a:tblPr firstRow="1" bandRow="1">
-                <a:tableStyleId>{5C22544A-7EE6-4342-B048-85BDC9FD1C3A}</a:tableStyleId>
-              </a:tblPr>
-              <a:tblGrid>
-                <a:gridCol w="934278">
-                  <a:extLst>
-                    <a:ext uri="{9D8B030D-6E8A-4147-A177-3AD203B41FA5}">
-                      <a16:colId xmlns:a16="http://schemas.microsoft.com/office/drawing/2014/main" val="4198655800"/>
-                    </a:ext>
-                  </a:extLst>
-                </a:gridCol>
-                <a:gridCol w="7295322">
-                  <a:extLst>
-                    <a:ext uri="{9D8B030D-6E8A-4147-A177-3AD203B41FA5}">
-                      <a16:colId xmlns:a16="http://schemas.microsoft.com/office/drawing/2014/main" val="135413862"/>
-                    </a:ext>
-                  </a:extLst>
-                </a:gridCol>
-              </a:tblGrid>
-              <a:tr h="370840">
-                <a:tc>
-                  <a:txBody>
-                    <a:bodyPr/>
-                    <a:lstStyle/>
-                    <a:p>
-                      <a:r>
-                        <a:rPr lang="en-US" dirty="0"/>
-                        <a:t>TF</a:t>
-                      </a:r>
-                    </a:p>
-                  </a:txBody>
-                  <a:tcPr/>
-                </a:tc>
-                <a:tc>
-                  <a:txBody>
-                    <a:bodyPr/>
-                    <a:lstStyle/>
-                    <a:p>
-                      <a:r>
-                        <a:rPr lang="en-US" dirty="0"/>
-                        <a:t>Meaning</a:t>
-                      </a:r>
-                    </a:p>
-                  </a:txBody>
-                  <a:tcPr/>
-                </a:tc>
-                <a:extLst>
-                  <a:ext uri="{0D108BD9-81ED-4DB2-BD59-A6C34878D82A}">
-                    <a16:rowId xmlns:a16="http://schemas.microsoft.com/office/drawing/2014/main" val="3068323444"/>
-                  </a:ext>
-                </a:extLst>
-              </a:tr>
-              <a:tr h="370840">
-                <a:tc>
-                  <a:txBody>
-                    <a:bodyPr/>
-                    <a:lstStyle/>
-                    <a:p>
-                      <a:r>
-                        <a:rPr lang="en-US" dirty="0"/>
-                        <a:t>2372</a:t>
-                      </a:r>
-                    </a:p>
-                  </a:txBody>
-                  <a:tcPr/>
-                </a:tc>
-                <a:tc>
-                  <a:txBody>
-                    <a:bodyPr/>
-                    <a:lstStyle/>
-                    <a:p>
-                      <a:r>
-                        <a:rPr lang="en-US" dirty="0"/>
-                        <a:t>Show memory usage at each phase</a:t>
-                      </a:r>
-                    </a:p>
-                  </a:txBody>
-                  <a:tcPr/>
-                </a:tc>
-                <a:extLst>
-                  <a:ext uri="{0D108BD9-81ED-4DB2-BD59-A6C34878D82A}">
-                    <a16:rowId xmlns:a16="http://schemas.microsoft.com/office/drawing/2014/main" val="1586961909"/>
-                  </a:ext>
-                </a:extLst>
-              </a:tr>
-              <a:tr h="370840">
-                <a:tc>
-                  <a:txBody>
-                    <a:bodyPr/>
-                    <a:lstStyle/>
-                    <a:p>
-                      <a:r>
-                        <a:rPr lang="en-US" dirty="0"/>
-                        <a:t>2373</a:t>
-                      </a:r>
-                    </a:p>
-                  </a:txBody>
-                  <a:tcPr/>
-                </a:tc>
-                <a:tc>
-                  <a:txBody>
-                    <a:bodyPr/>
-                    <a:lstStyle/>
-                    <a:p>
-                      <a:r>
-                        <a:rPr lang="en-US" dirty="0"/>
-                        <a:t>Show</a:t>
-                      </a:r>
-                      <a:r>
-                        <a:rPr lang="en-US" baseline="0" dirty="0"/>
-                        <a:t> memory usage for rules and properties</a:t>
-                      </a:r>
-                      <a:endParaRPr lang="en-US" dirty="0"/>
-                    </a:p>
-                  </a:txBody>
-                  <a:tcPr/>
-                </a:tc>
-                <a:extLst>
-                  <a:ext uri="{0D108BD9-81ED-4DB2-BD59-A6C34878D82A}">
-                    <a16:rowId xmlns:a16="http://schemas.microsoft.com/office/drawing/2014/main" val="2280300197"/>
-                  </a:ext>
-                </a:extLst>
-              </a:tr>
-              <a:tr h="370840">
-                <a:tc>
-                  <a:txBody>
-                    <a:bodyPr/>
-                    <a:lstStyle/>
-                    <a:p>
-                      <a:r>
-                        <a:rPr lang="en-US" dirty="0"/>
-                        <a:t>3604</a:t>
-                      </a:r>
-                    </a:p>
-                  </a:txBody>
-                  <a:tcPr/>
-                </a:tc>
-                <a:tc>
-                  <a:txBody>
-                    <a:bodyPr/>
-                    <a:lstStyle/>
-                    <a:p>
-                      <a:r>
-                        <a:rPr lang="en-US" dirty="0"/>
-                        <a:t>Output</a:t>
-                      </a:r>
-                      <a:r>
-                        <a:rPr lang="en-US" baseline="0" dirty="0"/>
-                        <a:t> to client (“Messages” tab)</a:t>
-                      </a:r>
-                      <a:endParaRPr lang="en-US" dirty="0"/>
-                    </a:p>
-                  </a:txBody>
-                  <a:tcPr/>
-                </a:tc>
-                <a:extLst>
-                  <a:ext uri="{0D108BD9-81ED-4DB2-BD59-A6C34878D82A}">
-                    <a16:rowId xmlns:a16="http://schemas.microsoft.com/office/drawing/2014/main" val="1192843310"/>
-                  </a:ext>
-                </a:extLst>
-              </a:tr>
-              <a:tr h="370840">
-                <a:tc>
-                  <a:txBody>
-                    <a:bodyPr/>
-                    <a:lstStyle/>
-                    <a:p>
-                      <a:r>
-                        <a:rPr lang="en-US" dirty="0"/>
-                        <a:t>7352</a:t>
-                      </a:r>
-                    </a:p>
-                  </a:txBody>
-                  <a:tcPr/>
-                </a:tc>
-                <a:tc>
-                  <a:txBody>
-                    <a:bodyPr/>
-                    <a:lstStyle/>
-                    <a:p>
-                      <a:r>
-                        <a:rPr lang="en-US" dirty="0"/>
-                        <a:t>Show final</a:t>
-                      </a:r>
-                      <a:r>
-                        <a:rPr lang="en-US" baseline="0" dirty="0"/>
-                        <a:t> query tree (post-optimization rewrites)</a:t>
-                      </a:r>
-                      <a:endParaRPr lang="en-US" dirty="0"/>
-                    </a:p>
-                  </a:txBody>
-                  <a:tcPr/>
-                </a:tc>
-                <a:extLst>
-                  <a:ext uri="{0D108BD9-81ED-4DB2-BD59-A6C34878D82A}">
-                    <a16:rowId xmlns:a16="http://schemas.microsoft.com/office/drawing/2014/main" val="2620585158"/>
-                  </a:ext>
-                </a:extLst>
-              </a:tr>
-              <a:tr h="370840">
-                <a:tc>
-                  <a:txBody>
-                    <a:bodyPr/>
-                    <a:lstStyle/>
-                    <a:p>
-                      <a:r>
-                        <a:rPr lang="en-US" dirty="0"/>
-                        <a:t>8605</a:t>
-                      </a:r>
-                    </a:p>
-                  </a:txBody>
-                  <a:tcPr/>
-                </a:tc>
-                <a:tc>
-                  <a:txBody>
-                    <a:bodyPr/>
-                    <a:lstStyle/>
-                    <a:p>
-                      <a:r>
-                        <a:rPr lang="en-US" dirty="0"/>
-                        <a:t>Show initial parse tree (converted)</a:t>
-                      </a:r>
-                    </a:p>
-                  </a:txBody>
-                  <a:tcPr/>
-                </a:tc>
-                <a:extLst>
-                  <a:ext uri="{0D108BD9-81ED-4DB2-BD59-A6C34878D82A}">
-                    <a16:rowId xmlns:a16="http://schemas.microsoft.com/office/drawing/2014/main" val="1697738616"/>
-                  </a:ext>
-                </a:extLst>
-              </a:tr>
-              <a:tr h="370840">
-                <a:tc>
-                  <a:txBody>
-                    <a:bodyPr/>
-                    <a:lstStyle/>
-                    <a:p>
-                      <a:r>
-                        <a:rPr lang="en-US" dirty="0"/>
-                        <a:t>8606</a:t>
-                      </a:r>
-                    </a:p>
-                  </a:txBody>
-                  <a:tcPr/>
-                </a:tc>
-                <a:tc>
-                  <a:txBody>
-                    <a:bodyPr/>
-                    <a:lstStyle/>
-                    <a:p>
-                      <a:r>
-                        <a:rPr lang="en-US" dirty="0"/>
-                        <a:t>Show transformed parse trees (input,</a:t>
-                      </a:r>
-                      <a:r>
-                        <a:rPr lang="en-US" baseline="0" dirty="0"/>
-                        <a:t> simplified, join-collapsed, normalized)</a:t>
-                      </a:r>
-                      <a:endParaRPr lang="en-US" dirty="0"/>
-                    </a:p>
-                  </a:txBody>
-                  <a:tcPr/>
-                </a:tc>
-                <a:extLst>
-                  <a:ext uri="{0D108BD9-81ED-4DB2-BD59-A6C34878D82A}">
-                    <a16:rowId xmlns:a16="http://schemas.microsoft.com/office/drawing/2014/main" val="316611556"/>
-                  </a:ext>
-                </a:extLst>
-              </a:tr>
-              <a:tr h="370840">
-                <a:tc>
-                  <a:txBody>
-                    <a:bodyPr/>
-                    <a:lstStyle/>
-                    <a:p>
-                      <a:r>
-                        <a:rPr lang="en-US" dirty="0"/>
-                        <a:t>8607</a:t>
-                      </a:r>
-                    </a:p>
-                  </a:txBody>
-                  <a:tcPr/>
-                </a:tc>
-                <a:tc>
-                  <a:txBody>
-                    <a:bodyPr/>
-                    <a:lstStyle/>
-                    <a:p>
-                      <a:r>
-                        <a:rPr lang="en-US" dirty="0"/>
-                        <a:t>Show output tree</a:t>
-                      </a:r>
-                    </a:p>
-                  </a:txBody>
-                  <a:tcPr/>
-                </a:tc>
-                <a:extLst>
-                  <a:ext uri="{0D108BD9-81ED-4DB2-BD59-A6C34878D82A}">
-                    <a16:rowId xmlns:a16="http://schemas.microsoft.com/office/drawing/2014/main" val="1312814102"/>
-                  </a:ext>
-                </a:extLst>
-              </a:tr>
-              <a:tr h="370840">
-                <a:tc>
-                  <a:txBody>
-                    <a:bodyPr/>
-                    <a:lstStyle/>
-                    <a:p>
-                      <a:r>
-                        <a:rPr lang="en-US" dirty="0"/>
-                        <a:t>8608</a:t>
-                      </a:r>
-                    </a:p>
-                  </a:txBody>
-                  <a:tcPr/>
-                </a:tc>
-                <a:tc>
-                  <a:txBody>
-                    <a:bodyPr/>
-                    <a:lstStyle/>
-                    <a:p>
-                      <a:r>
-                        <a:rPr lang="en-US" dirty="0"/>
-                        <a:t>Show initial memo structure</a:t>
-                      </a:r>
-                    </a:p>
-                  </a:txBody>
-                  <a:tcPr/>
-                </a:tc>
-                <a:extLst>
-                  <a:ext uri="{0D108BD9-81ED-4DB2-BD59-A6C34878D82A}">
-                    <a16:rowId xmlns:a16="http://schemas.microsoft.com/office/drawing/2014/main" val="1975533996"/>
-                  </a:ext>
-                </a:extLst>
-              </a:tr>
-              <a:tr h="370840">
-                <a:tc>
-                  <a:txBody>
-                    <a:bodyPr/>
-                    <a:lstStyle/>
-                    <a:p>
-                      <a:r>
-                        <a:rPr lang="en-US" dirty="0"/>
-                        <a:t>8609</a:t>
-                      </a:r>
-                    </a:p>
-                  </a:txBody>
-                  <a:tcPr/>
-                </a:tc>
-                <a:tc>
-                  <a:txBody>
-                    <a:bodyPr/>
-                    <a:lstStyle/>
-                    <a:p>
-                      <a:r>
-                        <a:rPr lang="en-US" dirty="0"/>
-                        <a:t>Show task and operation type counts</a:t>
-                      </a:r>
-                    </a:p>
-                  </a:txBody>
-                  <a:tcPr/>
-                </a:tc>
-                <a:extLst>
-                  <a:ext uri="{0D108BD9-81ED-4DB2-BD59-A6C34878D82A}">
-                    <a16:rowId xmlns:a16="http://schemas.microsoft.com/office/drawing/2014/main" val="2759032957"/>
-                  </a:ext>
-                </a:extLst>
-              </a:tr>
-            </a:tbl>
-          </a:graphicData>
-        </a:graphic>
-      </p:graphicFrame>
+        </p:nvSpPr>
+        <p:spPr/>
+        <p:txBody>
+          <a:bodyPr/>
+          <a:lstStyle/>
+          <a:p>
+            <a:r>
+              <a:rPr lang="en-US" dirty="0"/>
+              <a:t>SQL is a declarative language</a:t>
+            </a:r>
+          </a:p>
+          <a:p>
+            <a:pPr lvl="1"/>
+            <a:r>
+              <a:rPr lang="en-US" dirty="0"/>
+              <a:t>In theory, it shouldn’t matter how SQL is written</a:t>
+            </a:r>
+          </a:p>
+          <a:p>
+            <a:pPr lvl="2"/>
+            <a:r>
+              <a:rPr lang="en-US" dirty="0"/>
+              <a:t>We are effectively giving SQL Server a set of requirements and asking it to write a program for us</a:t>
+            </a:r>
+          </a:p>
+          <a:p>
+            <a:pPr lvl="1"/>
+            <a:r>
+              <a:rPr lang="en-US" dirty="0"/>
+              <a:t>In practice, it does matter because no optimizer is perfect</a:t>
+            </a:r>
+          </a:p>
+          <a:p>
+            <a:pPr lvl="2"/>
+            <a:r>
+              <a:rPr lang="en-US" dirty="0"/>
+              <a:t>It will give us correct results</a:t>
+            </a:r>
+          </a:p>
+          <a:p>
+            <a:pPr lvl="2"/>
+            <a:r>
+              <a:rPr lang="en-US" dirty="0"/>
+              <a:t>In the real world, efficiency matters</a:t>
+            </a:r>
+          </a:p>
+          <a:p>
+            <a:r>
+              <a:rPr lang="en-US" dirty="0"/>
+              <a:t>Writing “better” queries</a:t>
+            </a:r>
+          </a:p>
+          <a:p>
+            <a:pPr lvl="1"/>
+            <a:r>
+              <a:rPr lang="en-US" dirty="0"/>
+              <a:t>Sometimes we need to “out-smart” the optimizer</a:t>
+            </a:r>
+          </a:p>
+          <a:p>
+            <a:pPr marL="0" indent="0">
+              <a:buNone/>
+            </a:pPr>
+            <a:endParaRPr lang="en-US" dirty="0"/>
+          </a:p>
+        </p:txBody>
+      </p:sp>
     </p:spTree>
     <p:extLst>
       <p:ext uri="{BB962C8B-B14F-4D97-AF65-F5344CB8AC3E}">
-        <p14:creationId xmlns:p14="http://schemas.microsoft.com/office/powerpoint/2010/main" val="3312030923"/>
+        <p14:creationId xmlns:p14="http://schemas.microsoft.com/office/powerpoint/2010/main" val="2736690025"/>
       </p:ext>
     </p:extLst>
   </p:cSld>
@@ -40349,7 +40354,7 @@
           <a:p>
             <a:r>
               <a:rPr lang="en-US" dirty="0"/>
-              <a:t>Appendix: Trace Flags, continued</a:t>
+              <a:t>Appendix: Trace Flags</a:t>
             </a:r>
           </a:p>
         </p:txBody>
@@ -40364,14 +40369,14 @@
             <p:ph idx="1"/>
             <p:extLst>
               <p:ext uri="{D42A27DB-BD31-4B8C-83A1-F6EECF244321}">
-                <p14:modId xmlns:p14="http://schemas.microsoft.com/office/powerpoint/2010/main" val="4276326502"/>
+                <p14:modId xmlns:p14="http://schemas.microsoft.com/office/powerpoint/2010/main" val="2106636005"/>
               </p:ext>
             </p:extLst>
           </p:nvPr>
         </p:nvGraphicFramePr>
         <p:xfrm>
           <a:off x="457200" y="1417638"/>
-          <a:ext cx="8229600" cy="4079240"/>
+          <a:ext cx="8229600" cy="3977640"/>
         </p:xfrm>
         <a:graphic>
           <a:graphicData uri="http://schemas.openxmlformats.org/drawingml/2006/table">
@@ -40383,14 +40388,14 @@
                 <a:gridCol w="934278">
                   <a:extLst>
                     <a:ext uri="{9D8B030D-6E8A-4147-A177-3AD203B41FA5}">
-                      <a16:colId xmlns:a16="http://schemas.microsoft.com/office/drawing/2014/main" val="4198655800"/>
+                      <a16:colId xmlns:a16="http://schemas.microsoft.com/office/drawing/2014/main" xmlns="" val="4198655800"/>
                     </a:ext>
                   </a:extLst>
                 </a:gridCol>
                 <a:gridCol w="7295322">
                   <a:extLst>
                     <a:ext uri="{9D8B030D-6E8A-4147-A177-3AD203B41FA5}">
-                      <a16:colId xmlns:a16="http://schemas.microsoft.com/office/drawing/2014/main" val="135413862"/>
+                      <a16:colId xmlns:a16="http://schemas.microsoft.com/office/drawing/2014/main" xmlns="" val="135413862"/>
                     </a:ext>
                   </a:extLst>
                 </a:gridCol>
@@ -40424,7 +40429,454 @@
                 </a:tc>
                 <a:extLst>
                   <a:ext uri="{0D108BD9-81ED-4DB2-BD59-A6C34878D82A}">
-                    <a16:rowId xmlns:a16="http://schemas.microsoft.com/office/drawing/2014/main" val="3068323444"/>
+                    <a16:rowId xmlns:a16="http://schemas.microsoft.com/office/drawing/2014/main" xmlns="" val="3068323444"/>
+                  </a:ext>
+                </a:extLst>
+              </a:tr>
+              <a:tr h="370840">
+                <a:tc>
+                  <a:txBody>
+                    <a:bodyPr/>
+                    <a:lstStyle/>
+                    <a:p>
+                      <a:r>
+                        <a:rPr lang="en-US" dirty="0"/>
+                        <a:t>2372</a:t>
+                      </a:r>
+                    </a:p>
+                  </a:txBody>
+                  <a:tcPr/>
+                </a:tc>
+                <a:tc>
+                  <a:txBody>
+                    <a:bodyPr/>
+                    <a:lstStyle/>
+                    <a:p>
+                      <a:r>
+                        <a:rPr lang="en-US" dirty="0"/>
+                        <a:t>Show memory usage at each phase</a:t>
+                      </a:r>
+                    </a:p>
+                  </a:txBody>
+                  <a:tcPr/>
+                </a:tc>
+                <a:extLst>
+                  <a:ext uri="{0D108BD9-81ED-4DB2-BD59-A6C34878D82A}">
+                    <a16:rowId xmlns:a16="http://schemas.microsoft.com/office/drawing/2014/main" xmlns="" val="1586961909"/>
+                  </a:ext>
+                </a:extLst>
+              </a:tr>
+              <a:tr h="370840">
+                <a:tc>
+                  <a:txBody>
+                    <a:bodyPr/>
+                    <a:lstStyle/>
+                    <a:p>
+                      <a:r>
+                        <a:rPr lang="en-US" dirty="0"/>
+                        <a:t>2373</a:t>
+                      </a:r>
+                    </a:p>
+                  </a:txBody>
+                  <a:tcPr/>
+                </a:tc>
+                <a:tc>
+                  <a:txBody>
+                    <a:bodyPr/>
+                    <a:lstStyle/>
+                    <a:p>
+                      <a:r>
+                        <a:rPr lang="en-US" dirty="0"/>
+                        <a:t>Show</a:t>
+                      </a:r>
+                      <a:r>
+                        <a:rPr lang="en-US" baseline="0" dirty="0"/>
+                        <a:t> memory usage for rules and properties</a:t>
+                      </a:r>
+                      <a:endParaRPr lang="en-US" dirty="0"/>
+                    </a:p>
+                  </a:txBody>
+                  <a:tcPr/>
+                </a:tc>
+                <a:extLst>
+                  <a:ext uri="{0D108BD9-81ED-4DB2-BD59-A6C34878D82A}">
+                    <a16:rowId xmlns:a16="http://schemas.microsoft.com/office/drawing/2014/main" xmlns="" val="2280300197"/>
+                  </a:ext>
+                </a:extLst>
+              </a:tr>
+              <a:tr h="370840">
+                <a:tc>
+                  <a:txBody>
+                    <a:bodyPr/>
+                    <a:lstStyle/>
+                    <a:p>
+                      <a:r>
+                        <a:rPr lang="en-US" dirty="0"/>
+                        <a:t>3604</a:t>
+                      </a:r>
+                    </a:p>
+                  </a:txBody>
+                  <a:tcPr/>
+                </a:tc>
+                <a:tc>
+                  <a:txBody>
+                    <a:bodyPr/>
+                    <a:lstStyle/>
+                    <a:p>
+                      <a:r>
+                        <a:rPr lang="en-US" dirty="0"/>
+                        <a:t>Output</a:t>
+                      </a:r>
+                      <a:r>
+                        <a:rPr lang="en-US" baseline="0" dirty="0"/>
+                        <a:t> to client (“Messages” tab)</a:t>
+                      </a:r>
+                      <a:endParaRPr lang="en-US" dirty="0"/>
+                    </a:p>
+                  </a:txBody>
+                  <a:tcPr/>
+                </a:tc>
+                <a:extLst>
+                  <a:ext uri="{0D108BD9-81ED-4DB2-BD59-A6C34878D82A}">
+                    <a16:rowId xmlns:a16="http://schemas.microsoft.com/office/drawing/2014/main" xmlns="" val="1192843310"/>
+                  </a:ext>
+                </a:extLst>
+              </a:tr>
+              <a:tr h="370840">
+                <a:tc>
+                  <a:txBody>
+                    <a:bodyPr/>
+                    <a:lstStyle/>
+                    <a:p>
+                      <a:r>
+                        <a:rPr lang="en-US" dirty="0"/>
+                        <a:t>7352</a:t>
+                      </a:r>
+                    </a:p>
+                  </a:txBody>
+                  <a:tcPr/>
+                </a:tc>
+                <a:tc>
+                  <a:txBody>
+                    <a:bodyPr/>
+                    <a:lstStyle/>
+                    <a:p>
+                      <a:r>
+                        <a:rPr lang="en-US" dirty="0"/>
+                        <a:t>Show final</a:t>
+                      </a:r>
+                      <a:r>
+                        <a:rPr lang="en-US" baseline="0" dirty="0"/>
+                        <a:t> query tree (post-optimization rewrites)</a:t>
+                      </a:r>
+                      <a:endParaRPr lang="en-US" dirty="0"/>
+                    </a:p>
+                  </a:txBody>
+                  <a:tcPr/>
+                </a:tc>
+                <a:extLst>
+                  <a:ext uri="{0D108BD9-81ED-4DB2-BD59-A6C34878D82A}">
+                    <a16:rowId xmlns:a16="http://schemas.microsoft.com/office/drawing/2014/main" xmlns="" val="2620585158"/>
+                  </a:ext>
+                </a:extLst>
+              </a:tr>
+              <a:tr h="370840">
+                <a:tc>
+                  <a:txBody>
+                    <a:bodyPr/>
+                    <a:lstStyle/>
+                    <a:p>
+                      <a:r>
+                        <a:rPr lang="en-US" dirty="0"/>
+                        <a:t>8605</a:t>
+                      </a:r>
+                    </a:p>
+                  </a:txBody>
+                  <a:tcPr/>
+                </a:tc>
+                <a:tc>
+                  <a:txBody>
+                    <a:bodyPr/>
+                    <a:lstStyle/>
+                    <a:p>
+                      <a:r>
+                        <a:rPr lang="en-US" dirty="0"/>
+                        <a:t>Show initial parse tree (converted)</a:t>
+                      </a:r>
+                    </a:p>
+                  </a:txBody>
+                  <a:tcPr/>
+                </a:tc>
+                <a:extLst>
+                  <a:ext uri="{0D108BD9-81ED-4DB2-BD59-A6C34878D82A}">
+                    <a16:rowId xmlns:a16="http://schemas.microsoft.com/office/drawing/2014/main" xmlns="" val="1697738616"/>
+                  </a:ext>
+                </a:extLst>
+              </a:tr>
+              <a:tr h="370840">
+                <a:tc>
+                  <a:txBody>
+                    <a:bodyPr/>
+                    <a:lstStyle/>
+                    <a:p>
+                      <a:r>
+                        <a:rPr lang="en-US" dirty="0"/>
+                        <a:t>8606</a:t>
+                      </a:r>
+                    </a:p>
+                  </a:txBody>
+                  <a:tcPr/>
+                </a:tc>
+                <a:tc>
+                  <a:txBody>
+                    <a:bodyPr/>
+                    <a:lstStyle/>
+                    <a:p>
+                      <a:r>
+                        <a:rPr lang="en-US" dirty="0"/>
+                        <a:t>Show transformed parse trees (input,</a:t>
+                      </a:r>
+                      <a:r>
+                        <a:rPr lang="en-US" baseline="0" dirty="0"/>
+                        <a:t> simplified, join-collapsed, normalized)</a:t>
+                      </a:r>
+                      <a:endParaRPr lang="en-US" dirty="0"/>
+                    </a:p>
+                  </a:txBody>
+                  <a:tcPr/>
+                </a:tc>
+                <a:extLst>
+                  <a:ext uri="{0D108BD9-81ED-4DB2-BD59-A6C34878D82A}">
+                    <a16:rowId xmlns:a16="http://schemas.microsoft.com/office/drawing/2014/main" xmlns="" val="316611556"/>
+                  </a:ext>
+                </a:extLst>
+              </a:tr>
+              <a:tr h="370840">
+                <a:tc>
+                  <a:txBody>
+                    <a:bodyPr/>
+                    <a:lstStyle/>
+                    <a:p>
+                      <a:r>
+                        <a:rPr lang="en-US" dirty="0"/>
+                        <a:t>8607</a:t>
+                      </a:r>
+                    </a:p>
+                  </a:txBody>
+                  <a:tcPr/>
+                </a:tc>
+                <a:tc>
+                  <a:txBody>
+                    <a:bodyPr/>
+                    <a:lstStyle/>
+                    <a:p>
+                      <a:r>
+                        <a:rPr lang="en-US" dirty="0"/>
+                        <a:t>Show output tree</a:t>
+                      </a:r>
+                    </a:p>
+                  </a:txBody>
+                  <a:tcPr/>
+                </a:tc>
+                <a:extLst>
+                  <a:ext uri="{0D108BD9-81ED-4DB2-BD59-A6C34878D82A}">
+                    <a16:rowId xmlns:a16="http://schemas.microsoft.com/office/drawing/2014/main" xmlns="" val="1312814102"/>
+                  </a:ext>
+                </a:extLst>
+              </a:tr>
+              <a:tr h="370840">
+                <a:tc>
+                  <a:txBody>
+                    <a:bodyPr/>
+                    <a:lstStyle/>
+                    <a:p>
+                      <a:r>
+                        <a:rPr lang="en-US" dirty="0"/>
+                        <a:t>8608</a:t>
+                      </a:r>
+                    </a:p>
+                  </a:txBody>
+                  <a:tcPr/>
+                </a:tc>
+                <a:tc>
+                  <a:txBody>
+                    <a:bodyPr/>
+                    <a:lstStyle/>
+                    <a:p>
+                      <a:r>
+                        <a:rPr lang="en-US" dirty="0"/>
+                        <a:t>Show initial memo structure</a:t>
+                      </a:r>
+                    </a:p>
+                  </a:txBody>
+                  <a:tcPr/>
+                </a:tc>
+                <a:extLst>
+                  <a:ext uri="{0D108BD9-81ED-4DB2-BD59-A6C34878D82A}">
+                    <a16:rowId xmlns:a16="http://schemas.microsoft.com/office/drawing/2014/main" xmlns="" val="1975533996"/>
+                  </a:ext>
+                </a:extLst>
+              </a:tr>
+              <a:tr h="370840">
+                <a:tc>
+                  <a:txBody>
+                    <a:bodyPr/>
+                    <a:lstStyle/>
+                    <a:p>
+                      <a:r>
+                        <a:rPr lang="en-US" dirty="0"/>
+                        <a:t>8609</a:t>
+                      </a:r>
+                    </a:p>
+                  </a:txBody>
+                  <a:tcPr/>
+                </a:tc>
+                <a:tc>
+                  <a:txBody>
+                    <a:bodyPr/>
+                    <a:lstStyle/>
+                    <a:p>
+                      <a:r>
+                        <a:rPr lang="en-US" dirty="0"/>
+                        <a:t>Show task and operation type counts</a:t>
+                      </a:r>
+                    </a:p>
+                  </a:txBody>
+                  <a:tcPr/>
+                </a:tc>
+                <a:extLst>
+                  <a:ext uri="{0D108BD9-81ED-4DB2-BD59-A6C34878D82A}">
+                    <a16:rowId xmlns:a16="http://schemas.microsoft.com/office/drawing/2014/main" xmlns="" val="2759032957"/>
+                  </a:ext>
+                </a:extLst>
+              </a:tr>
+            </a:tbl>
+          </a:graphicData>
+        </a:graphic>
+      </p:graphicFrame>
+    </p:spTree>
+    <p:extLst>
+      <p:ext uri="{BB962C8B-B14F-4D97-AF65-F5344CB8AC3E}">
+        <p14:creationId xmlns:p14="http://schemas.microsoft.com/office/powerpoint/2010/main" val="3312030923"/>
+      </p:ext>
+    </p:extLst>
+  </p:cSld>
+  <p:clrMapOvr>
+    <a:masterClrMapping/>
+  </p:clrMapOvr>
+</p:sld>
+</file>
+
+<file path=ppt/slides/slide59.xml><?xml version="1.0" encoding="utf-8"?>
+<p:sld xmlns:a="http://schemas.openxmlformats.org/drawingml/2006/main" xmlns:r="http://schemas.openxmlformats.org/officeDocument/2006/relationships" xmlns:p="http://schemas.openxmlformats.org/presentationml/2006/main">
+  <p:cSld>
+    <p:spTree>
+      <p:nvGrpSpPr>
+        <p:cNvPr id="1" name=""/>
+        <p:cNvGrpSpPr/>
+        <p:nvPr/>
+      </p:nvGrpSpPr>
+      <p:grpSpPr>
+        <a:xfrm>
+          <a:off x="0" y="0"/>
+          <a:ext cx="0" cy="0"/>
+          <a:chOff x="0" y="0"/>
+          <a:chExt cx="0" cy="0"/>
+        </a:xfrm>
+      </p:grpSpPr>
+      <p:sp>
+        <p:nvSpPr>
+          <p:cNvPr id="2" name="Title 1"/>
+          <p:cNvSpPr>
+            <a:spLocks noGrp="1"/>
+          </p:cNvSpPr>
+          <p:nvPr>
+            <p:ph type="title"/>
+          </p:nvPr>
+        </p:nvSpPr>
+        <p:spPr/>
+        <p:txBody>
+          <a:bodyPr/>
+          <a:lstStyle/>
+          <a:p>
+            <a:r>
+              <a:rPr lang="en-US" dirty="0"/>
+              <a:t>Appendix: Trace Flags, continued</a:t>
+            </a:r>
+          </a:p>
+        </p:txBody>
+      </p:sp>
+      <p:graphicFrame>
+        <p:nvGraphicFramePr>
+          <p:cNvPr id="4" name="Content Placeholder 3"/>
+          <p:cNvGraphicFramePr>
+            <a:graphicFrameLocks noGrp="1"/>
+          </p:cNvGraphicFramePr>
+          <p:nvPr>
+            <p:ph idx="1"/>
+            <p:extLst>
+              <p:ext uri="{D42A27DB-BD31-4B8C-83A1-F6EECF244321}">
+                <p14:modId xmlns:p14="http://schemas.microsoft.com/office/powerpoint/2010/main" val="4213218285"/>
+              </p:ext>
+            </p:extLst>
+          </p:nvPr>
+        </p:nvGraphicFramePr>
+        <p:xfrm>
+          <a:off x="457200" y="1417638"/>
+          <a:ext cx="8229600" cy="4450080"/>
+        </p:xfrm>
+        <a:graphic>
+          <a:graphicData uri="http://schemas.openxmlformats.org/drawingml/2006/table">
+            <a:tbl>
+              <a:tblPr firstRow="1" bandRow="1">
+                <a:tableStyleId>{5C22544A-7EE6-4342-B048-85BDC9FD1C3A}</a:tableStyleId>
+              </a:tblPr>
+              <a:tblGrid>
+                <a:gridCol w="934278">
+                  <a:extLst>
+                    <a:ext uri="{9D8B030D-6E8A-4147-A177-3AD203B41FA5}">
+                      <a16:colId xmlns:a16="http://schemas.microsoft.com/office/drawing/2014/main" xmlns="" val="4198655800"/>
+                    </a:ext>
+                  </a:extLst>
+                </a:gridCol>
+                <a:gridCol w="7295322">
+                  <a:extLst>
+                    <a:ext uri="{9D8B030D-6E8A-4147-A177-3AD203B41FA5}">
+                      <a16:colId xmlns:a16="http://schemas.microsoft.com/office/drawing/2014/main" xmlns="" val="135413862"/>
+                    </a:ext>
+                  </a:extLst>
+                </a:gridCol>
+              </a:tblGrid>
+              <a:tr h="370840">
+                <a:tc>
+                  <a:txBody>
+                    <a:bodyPr/>
+                    <a:lstStyle/>
+                    <a:p>
+                      <a:r>
+                        <a:rPr lang="en-US" dirty="0"/>
+                        <a:t>TF</a:t>
+                      </a:r>
+                    </a:p>
+                  </a:txBody>
+                  <a:tcPr/>
+                </a:tc>
+                <a:tc>
+                  <a:txBody>
+                    <a:bodyPr/>
+                    <a:lstStyle/>
+                    <a:p>
+                      <a:r>
+                        <a:rPr lang="en-US" dirty="0"/>
+                        <a:t>Meaning</a:t>
+                      </a:r>
+                    </a:p>
+                  </a:txBody>
+                  <a:tcPr/>
+                </a:tc>
+                <a:extLst>
+                  <a:ext uri="{0D108BD9-81ED-4DB2-BD59-A6C34878D82A}">
+                    <a16:rowId xmlns:a16="http://schemas.microsoft.com/office/drawing/2014/main" xmlns="" val="3068323444"/>
                   </a:ext>
                 </a:extLst>
               </a:tr>
@@ -40457,7 +40909,7 @@
                 </a:tc>
                 <a:extLst>
                   <a:ext uri="{0D108BD9-81ED-4DB2-BD59-A6C34878D82A}">
-                    <a16:rowId xmlns:a16="http://schemas.microsoft.com/office/drawing/2014/main" val="2484981654"/>
+                    <a16:rowId xmlns:a16="http://schemas.microsoft.com/office/drawing/2014/main" xmlns="" val="2484981654"/>
                   </a:ext>
                 </a:extLst>
               </a:tr>
@@ -40495,7 +40947,7 @@
                 </a:tc>
                 <a:extLst>
                   <a:ext uri="{0D108BD9-81ED-4DB2-BD59-A6C34878D82A}">
-                    <a16:rowId xmlns:a16="http://schemas.microsoft.com/office/drawing/2014/main" val="1377910784"/>
+                    <a16:rowId xmlns:a16="http://schemas.microsoft.com/office/drawing/2014/main" xmlns="" val="1377910784"/>
                   </a:ext>
                 </a:extLst>
               </a:tr>
@@ -40528,7 +40980,7 @@
                 </a:tc>
                 <a:extLst>
                   <a:ext uri="{0D108BD9-81ED-4DB2-BD59-A6C34878D82A}">
-                    <a16:rowId xmlns:a16="http://schemas.microsoft.com/office/drawing/2014/main" val="1387856053"/>
+                    <a16:rowId xmlns:a16="http://schemas.microsoft.com/office/drawing/2014/main" xmlns="" val="1387856053"/>
                   </a:ext>
                 </a:extLst>
               </a:tr>
@@ -40566,7 +41018,7 @@
                 </a:tc>
                 <a:extLst>
                   <a:ext uri="{0D108BD9-81ED-4DB2-BD59-A6C34878D82A}">
-                    <a16:rowId xmlns:a16="http://schemas.microsoft.com/office/drawing/2014/main" val="2599123823"/>
+                    <a16:rowId xmlns:a16="http://schemas.microsoft.com/office/drawing/2014/main" xmlns="" val="2599123823"/>
                   </a:ext>
                 </a:extLst>
               </a:tr>
@@ -40607,7 +41059,7 @@
                 </a:tc>
                 <a:extLst>
                   <a:ext uri="{0D108BD9-81ED-4DB2-BD59-A6C34878D82A}">
-                    <a16:rowId xmlns:a16="http://schemas.microsoft.com/office/drawing/2014/main" val="1232603862"/>
+                    <a16:rowId xmlns:a16="http://schemas.microsoft.com/office/drawing/2014/main" xmlns="" val="1232603862"/>
                   </a:ext>
                 </a:extLst>
               </a:tr>
@@ -40640,7 +41092,7 @@
                 </a:tc>
                 <a:extLst>
                   <a:ext uri="{0D108BD9-81ED-4DB2-BD59-A6C34878D82A}">
-                    <a16:rowId xmlns:a16="http://schemas.microsoft.com/office/drawing/2014/main" val="4145944521"/>
+                    <a16:rowId xmlns:a16="http://schemas.microsoft.com/office/drawing/2014/main" xmlns="" val="4145944521"/>
                   </a:ext>
                 </a:extLst>
               </a:tr>
@@ -40678,7 +41130,7 @@
                 </a:tc>
                 <a:extLst>
                   <a:ext uri="{0D108BD9-81ED-4DB2-BD59-A6C34878D82A}">
-                    <a16:rowId xmlns:a16="http://schemas.microsoft.com/office/drawing/2014/main" val="2954677722"/>
+                    <a16:rowId xmlns:a16="http://schemas.microsoft.com/office/drawing/2014/main" xmlns="" val="2954677722"/>
                   </a:ext>
                 </a:extLst>
               </a:tr>
@@ -40711,7 +41163,7 @@
                 </a:tc>
                 <a:extLst>
                   <a:ext uri="{0D108BD9-81ED-4DB2-BD59-A6C34878D82A}">
-                    <a16:rowId xmlns:a16="http://schemas.microsoft.com/office/drawing/2014/main" val="205903975"/>
+                    <a16:rowId xmlns:a16="http://schemas.microsoft.com/office/drawing/2014/main" xmlns="" val="205903975"/>
                   </a:ext>
                 </a:extLst>
               </a:tr>
@@ -40744,9 +41196,43 @@
                 </a:tc>
                 <a:extLst>
                   <a:ext uri="{0D108BD9-81ED-4DB2-BD59-A6C34878D82A}">
-                    <a16:rowId xmlns:a16="http://schemas.microsoft.com/office/drawing/2014/main" val="2893595017"/>
+                    <a16:rowId xmlns:a16="http://schemas.microsoft.com/office/drawing/2014/main" xmlns="" val="2893595017"/>
                   </a:ext>
                 </a:extLst>
+              </a:tr>
+              <a:tr h="370840">
+                <a:tc>
+                  <a:txBody>
+                    <a:bodyPr/>
+                    <a:lstStyle/>
+                    <a:p>
+                      <a:r>
+                        <a:rPr lang="en-US" dirty="0" smtClean="0"/>
+                        <a:t>8780</a:t>
+                      </a:r>
+                      <a:endParaRPr lang="en-US" dirty="0"/>
+                    </a:p>
+                  </a:txBody>
+                  <a:tcPr/>
+                </a:tc>
+                <a:tc>
+                  <a:txBody>
+                    <a:bodyPr/>
+                    <a:lstStyle/>
+                    <a:p>
+                      <a:r>
+                        <a:rPr lang="en-US" dirty="0" smtClean="0"/>
+                        <a:t>Give query processor more “time” to </a:t>
+                      </a:r>
+                      <a:r>
+                        <a:rPr lang="en-US" smtClean="0"/>
+                        <a:t>optimize query</a:t>
+                      </a:r>
+                      <a:endParaRPr lang="en-US" dirty="0"/>
+                    </a:p>
+                  </a:txBody>
+                  <a:tcPr/>
+                </a:tc>
               </a:tr>
               <a:tr h="370840">
                 <a:tc>
@@ -40775,11 +41261,6 @@
                   </a:txBody>
                   <a:tcPr/>
                 </a:tc>
-                <a:extLst>
-                  <a:ext uri="{0D108BD9-81ED-4DB2-BD59-A6C34878D82A}">
-                    <a16:rowId xmlns:a16="http://schemas.microsoft.com/office/drawing/2014/main" val="2337380595"/>
-                  </a:ext>
-                </a:extLst>
               </a:tr>
             </a:tbl>
           </a:graphicData>
@@ -40818,134 +41299,6 @@
     <p:extLst>
       <p:ext uri="{BB962C8B-B14F-4D97-AF65-F5344CB8AC3E}">
         <p14:creationId xmlns:p14="http://schemas.microsoft.com/office/powerpoint/2010/main" val="2226135712"/>
-      </p:ext>
-    </p:extLst>
-  </p:cSld>
-  <p:clrMapOvr>
-    <a:masterClrMapping/>
-  </p:clrMapOvr>
-</p:sld>
-</file>
-
-<file path=ppt/slides/slide59.xml><?xml version="1.0" encoding="utf-8"?>
-<p:sld xmlns:a="http://schemas.openxmlformats.org/drawingml/2006/main" xmlns:r="http://schemas.openxmlformats.org/officeDocument/2006/relationships" xmlns:p="http://schemas.openxmlformats.org/presentationml/2006/main">
-  <p:cSld>
-    <p:spTree>
-      <p:nvGrpSpPr>
-        <p:cNvPr id="1" name=""/>
-        <p:cNvGrpSpPr/>
-        <p:nvPr/>
-      </p:nvGrpSpPr>
-      <p:grpSpPr>
-        <a:xfrm>
-          <a:off x="0" y="0"/>
-          <a:ext cx="0" cy="0"/>
-          <a:chOff x="0" y="0"/>
-          <a:chExt cx="0" cy="0"/>
-        </a:xfrm>
-      </p:grpSpPr>
-      <p:sp>
-        <p:nvSpPr>
-          <p:cNvPr id="2" name="Title 1"/>
-          <p:cNvSpPr>
-            <a:spLocks noGrp="1"/>
-          </p:cNvSpPr>
-          <p:nvPr>
-            <p:ph type="title"/>
-          </p:nvPr>
-        </p:nvSpPr>
-        <p:spPr/>
-        <p:txBody>
-          <a:bodyPr/>
-          <a:lstStyle/>
-          <a:p>
-            <a:r>
-              <a:rPr lang="en-US" dirty="0"/>
-              <a:t>Appendix: Commands</a:t>
-            </a:r>
-          </a:p>
-        </p:txBody>
-      </p:sp>
-      <p:sp>
-        <p:nvSpPr>
-          <p:cNvPr id="3" name="Content Placeholder 2"/>
-          <p:cNvSpPr>
-            <a:spLocks noGrp="1"/>
-          </p:cNvSpPr>
-          <p:nvPr>
-            <p:ph idx="1"/>
-          </p:nvPr>
-        </p:nvSpPr>
-        <p:spPr/>
-        <p:txBody>
-          <a:bodyPr/>
-          <a:lstStyle/>
-          <a:p>
-            <a:r>
-              <a:rPr lang="en-US" dirty="0"/>
-              <a:t>DBCC TRACEON / TRACEOFF</a:t>
-            </a:r>
-          </a:p>
-          <a:p>
-            <a:r>
-              <a:rPr lang="en-US" dirty="0"/>
-              <a:t>DBCC RULEON / RULEOFF</a:t>
-            </a:r>
-          </a:p>
-          <a:p>
-            <a:r>
-              <a:rPr lang="en-US" dirty="0"/>
-              <a:t>DBCC SHOWONRULES</a:t>
-            </a:r>
-          </a:p>
-          <a:p>
-            <a:r>
-              <a:rPr lang="en-US" dirty="0"/>
-              <a:t>DBCC SHOWOFFRULES</a:t>
-            </a:r>
-          </a:p>
-          <a:p>
-            <a:r>
-              <a:rPr lang="en-US" dirty="0"/>
-              <a:t>option (recompile, </a:t>
-            </a:r>
-            <a:r>
-              <a:rPr lang="en-US" dirty="0" err="1"/>
-              <a:t>querytraceon</a:t>
-            </a:r>
-            <a:r>
-              <a:rPr lang="en-US" dirty="0"/>
-              <a:t> ####, </a:t>
-            </a:r>
-            <a:r>
-              <a:rPr lang="en-US" dirty="0" err="1"/>
-              <a:t>queryruleoff</a:t>
-            </a:r>
-            <a:r>
-              <a:rPr lang="en-US" dirty="0"/>
-              <a:t> ‘xxx’)</a:t>
-            </a:r>
-          </a:p>
-          <a:p>
-            <a:r>
-              <a:rPr lang="en-US" dirty="0" err="1"/>
-              <a:t>sys.dm_exec_query_optimizer_info</a:t>
-            </a:r>
-            <a:endParaRPr lang="en-US" dirty="0"/>
-          </a:p>
-          <a:p>
-            <a:r>
-              <a:rPr lang="en-US" dirty="0" err="1"/>
-              <a:t>sys.dm_exec_query_transformation_stats</a:t>
-            </a:r>
-            <a:endParaRPr lang="en-US" dirty="0"/>
-          </a:p>
-        </p:txBody>
-      </p:sp>
-    </p:spTree>
-    <p:extLst>
-      <p:ext uri="{BB962C8B-B14F-4D97-AF65-F5344CB8AC3E}">
-        <p14:creationId xmlns:p14="http://schemas.microsoft.com/office/powerpoint/2010/main" val="400255049"/>
       </p:ext>
     </p:extLst>
   </p:cSld>
@@ -41090,7 +41443,7 @@
           <a:p>
             <a:r>
               <a:rPr lang="en-US" dirty="0"/>
-              <a:t>Appendix: History of SQL’s Optimizer</a:t>
+              <a:t>Appendix: Commands</a:t>
             </a:r>
           </a:p>
         </p:txBody>
@@ -41112,104 +41465,69 @@
           <a:p>
             <a:r>
               <a:rPr lang="en-US" dirty="0"/>
-              <a:t>Volcano Optimizer (April 1993) (</a:t>
-            </a:r>
-            <a:r>
-              <a:rPr lang="en-US" dirty="0">
-                <a:hlinkClick r:id="rId2"/>
-              </a:rPr>
-              <a:t>PDF</a:t>
-            </a:r>
+              <a:t>DBCC TRACEON / TRACEOFF</a:t>
+            </a:r>
+          </a:p>
+          <a:p>
             <a:r>
               <a:rPr lang="en-US" dirty="0"/>
-              <a:t>)</a:t>
-            </a:r>
-          </a:p>
-          <a:p>
-            <a:pPr lvl="1"/>
+              <a:t>DBCC RULEON / RULEOFF</a:t>
+            </a:r>
+          </a:p>
+          <a:p>
             <a:r>
               <a:rPr lang="en-US" dirty="0"/>
-              <a:t>Goetz </a:t>
+              <a:t>DBCC SHOWONRULES</a:t>
+            </a:r>
+          </a:p>
+          <a:p>
+            <a:r>
+              <a:rPr lang="en-US" dirty="0"/>
+              <a:t>DBCC SHOWOFFRULES</a:t>
+            </a:r>
+          </a:p>
+          <a:p>
+            <a:r>
+              <a:rPr lang="en-US" dirty="0"/>
+              <a:t>option (recompile, </a:t>
             </a:r>
             <a:r>
               <a:rPr lang="en-US" dirty="0" err="1"/>
-              <a:t>Graefe</a:t>
+              <a:t>querytraceon</a:t>
             </a:r>
             <a:r>
               <a:rPr lang="en-US" dirty="0"/>
-              <a:t>, William J. McKenna</a:t>
-            </a:r>
-          </a:p>
-          <a:p>
-            <a:pPr lvl="1"/>
+              <a:t> ####, </a:t>
+            </a:r>
+            <a:r>
+              <a:rPr lang="en-US" dirty="0" err="1"/>
+              <a:t>queryruleoff</a:t>
+            </a:r>
             <a:r>
               <a:rPr lang="en-US" dirty="0"/>
-              <a:t>Based on </a:t>
-            </a:r>
+              <a:t> ‘xxx’)</a:t>
+            </a:r>
+          </a:p>
+          <a:p>
             <a:r>
               <a:rPr lang="en-US" dirty="0" err="1"/>
-              <a:t>Graefe’s</a:t>
-            </a:r>
-            <a:r>
-              <a:rPr lang="en-US" dirty="0"/>
-              <a:t> earlier Exodus Optimizer</a:t>
-            </a:r>
-          </a:p>
-          <a:p>
-            <a:r>
-              <a:rPr lang="en-US" dirty="0"/>
-              <a:t>Cascades Framework (1995) (</a:t>
-            </a:r>
-            <a:r>
-              <a:rPr lang="en-US" dirty="0">
-                <a:hlinkClick r:id="rId3"/>
-              </a:rPr>
-              <a:t>PDF</a:t>
-            </a:r>
-            <a:r>
-              <a:rPr lang="en-US" dirty="0"/>
-              <a:t>)</a:t>
-            </a:r>
-          </a:p>
-          <a:p>
-            <a:pPr lvl="1"/>
-            <a:r>
-              <a:rPr lang="en-US" dirty="0"/>
-              <a:t>Goetz </a:t>
-            </a:r>
+              <a:t>sys.dm_exec_query_optimizer_info</a:t>
+            </a:r>
+            <a:endParaRPr lang="en-US" dirty="0"/>
+          </a:p>
+          <a:p>
             <a:r>
               <a:rPr lang="en-US" dirty="0" err="1"/>
-              <a:t>Graefe</a:t>
+              <a:t>sys.dm_exec_query_transformation_stats</a:t>
             </a:r>
             <a:endParaRPr lang="en-US" dirty="0"/>
-          </a:p>
-          <a:p>
-            <a:pPr lvl="1"/>
-            <a:r>
-              <a:rPr lang="en-US" dirty="0"/>
-              <a:t>Refinement of the Volcano Optimizer</a:t>
-            </a:r>
-          </a:p>
-          <a:p>
-            <a:pPr lvl="1"/>
-            <a:r>
-              <a:rPr lang="en-US" dirty="0"/>
-              <a:t>Basis for rewritten optimizer in SQL Server 7.0</a:t>
-            </a:r>
-          </a:p>
-          <a:p>
-            <a:pPr lvl="1"/>
-            <a:r>
-              <a:rPr lang="en-US" dirty="0"/>
-              <a:t>Major innovation: the memo structure</a:t>
-            </a:r>
           </a:p>
         </p:txBody>
       </p:sp>
     </p:spTree>
     <p:extLst>
       <p:ext uri="{BB962C8B-B14F-4D97-AF65-F5344CB8AC3E}">
-        <p14:creationId xmlns:p14="http://schemas.microsoft.com/office/powerpoint/2010/main" val="4044722762"/>
+        <p14:creationId xmlns:p14="http://schemas.microsoft.com/office/powerpoint/2010/main" val="400255049"/>
       </p:ext>
     </p:extLst>
   </p:cSld>
@@ -41253,6 +41571,169 @@
           <a:p>
             <a:r>
               <a:rPr lang="en-US" dirty="0"/>
+              <a:t>Appendix: History of SQL’s Optimizer</a:t>
+            </a:r>
+          </a:p>
+        </p:txBody>
+      </p:sp>
+      <p:sp>
+        <p:nvSpPr>
+          <p:cNvPr id="3" name="Content Placeholder 2"/>
+          <p:cNvSpPr>
+            <a:spLocks noGrp="1"/>
+          </p:cNvSpPr>
+          <p:nvPr>
+            <p:ph idx="1"/>
+          </p:nvPr>
+        </p:nvSpPr>
+        <p:spPr/>
+        <p:txBody>
+          <a:bodyPr/>
+          <a:lstStyle/>
+          <a:p>
+            <a:r>
+              <a:rPr lang="en-US" dirty="0"/>
+              <a:t>Volcano Optimizer (April 1993) (</a:t>
+            </a:r>
+            <a:r>
+              <a:rPr lang="en-US" dirty="0">
+                <a:hlinkClick r:id="rId2"/>
+              </a:rPr>
+              <a:t>PDF</a:t>
+            </a:r>
+            <a:r>
+              <a:rPr lang="en-US" dirty="0"/>
+              <a:t>)</a:t>
+            </a:r>
+          </a:p>
+          <a:p>
+            <a:pPr lvl="1"/>
+            <a:r>
+              <a:rPr lang="en-US" dirty="0"/>
+              <a:t>Goetz </a:t>
+            </a:r>
+            <a:r>
+              <a:rPr lang="en-US" dirty="0" err="1"/>
+              <a:t>Graefe</a:t>
+            </a:r>
+            <a:r>
+              <a:rPr lang="en-US" dirty="0"/>
+              <a:t>, William J. McKenna</a:t>
+            </a:r>
+          </a:p>
+          <a:p>
+            <a:pPr lvl="1"/>
+            <a:r>
+              <a:rPr lang="en-US" dirty="0"/>
+              <a:t>Based on </a:t>
+            </a:r>
+            <a:r>
+              <a:rPr lang="en-US" dirty="0" err="1"/>
+              <a:t>Graefe’s</a:t>
+            </a:r>
+            <a:r>
+              <a:rPr lang="en-US" dirty="0"/>
+              <a:t> earlier Exodus Optimizer</a:t>
+            </a:r>
+          </a:p>
+          <a:p>
+            <a:r>
+              <a:rPr lang="en-US" dirty="0"/>
+              <a:t>Cascades Framework (1995) (</a:t>
+            </a:r>
+            <a:r>
+              <a:rPr lang="en-US" dirty="0">
+                <a:hlinkClick r:id="rId3"/>
+              </a:rPr>
+              <a:t>PDF</a:t>
+            </a:r>
+            <a:r>
+              <a:rPr lang="en-US" dirty="0"/>
+              <a:t>)</a:t>
+            </a:r>
+          </a:p>
+          <a:p>
+            <a:pPr lvl="1"/>
+            <a:r>
+              <a:rPr lang="en-US" dirty="0"/>
+              <a:t>Goetz </a:t>
+            </a:r>
+            <a:r>
+              <a:rPr lang="en-US" dirty="0" err="1"/>
+              <a:t>Graefe</a:t>
+            </a:r>
+            <a:endParaRPr lang="en-US" dirty="0"/>
+          </a:p>
+          <a:p>
+            <a:pPr lvl="1"/>
+            <a:r>
+              <a:rPr lang="en-US" dirty="0"/>
+              <a:t>Refinement of the Volcano Optimizer</a:t>
+            </a:r>
+          </a:p>
+          <a:p>
+            <a:pPr lvl="1"/>
+            <a:r>
+              <a:rPr lang="en-US" dirty="0"/>
+              <a:t>Basis for rewritten optimizer in SQL Server 7.0</a:t>
+            </a:r>
+          </a:p>
+          <a:p>
+            <a:pPr lvl="1"/>
+            <a:r>
+              <a:rPr lang="en-US" dirty="0"/>
+              <a:t>Major innovation: the memo structure</a:t>
+            </a:r>
+          </a:p>
+        </p:txBody>
+      </p:sp>
+    </p:spTree>
+    <p:extLst>
+      <p:ext uri="{BB962C8B-B14F-4D97-AF65-F5344CB8AC3E}">
+        <p14:creationId xmlns:p14="http://schemas.microsoft.com/office/powerpoint/2010/main" val="4044722762"/>
+      </p:ext>
+    </p:extLst>
+  </p:cSld>
+  <p:clrMapOvr>
+    <a:masterClrMapping/>
+  </p:clrMapOvr>
+</p:sld>
+</file>
+
+<file path=ppt/slides/slide62.xml><?xml version="1.0" encoding="utf-8"?>
+<p:sld xmlns:a="http://schemas.openxmlformats.org/drawingml/2006/main" xmlns:r="http://schemas.openxmlformats.org/officeDocument/2006/relationships" xmlns:p="http://schemas.openxmlformats.org/presentationml/2006/main">
+  <p:cSld>
+    <p:spTree>
+      <p:nvGrpSpPr>
+        <p:cNvPr id="1" name=""/>
+        <p:cNvGrpSpPr/>
+        <p:nvPr/>
+      </p:nvGrpSpPr>
+      <p:grpSpPr>
+        <a:xfrm>
+          <a:off x="0" y="0"/>
+          <a:ext cx="0" cy="0"/>
+          <a:chOff x="0" y="0"/>
+          <a:chExt cx="0" cy="0"/>
+        </a:xfrm>
+      </p:grpSpPr>
+      <p:sp>
+        <p:nvSpPr>
+          <p:cNvPr id="2" name="Title 1"/>
+          <p:cNvSpPr>
+            <a:spLocks noGrp="1"/>
+          </p:cNvSpPr>
+          <p:nvPr>
+            <p:ph type="title"/>
+          </p:nvPr>
+        </p:nvSpPr>
+        <p:spPr/>
+        <p:txBody>
+          <a:bodyPr/>
+          <a:lstStyle/>
+          <a:p>
+            <a:r>
+              <a:rPr lang="en-US" dirty="0"/>
               <a:t>References</a:t>
             </a:r>
           </a:p>
@@ -41386,7 +41867,7 @@
 </p:sld>
 </file>
 
-<file path=ppt/slides/slide62.xml><?xml version="1.0" encoding="utf-8"?>
+<file path=ppt/slides/slide63.xml><?xml version="1.0" encoding="utf-8"?>
 <p:sld xmlns:a="http://schemas.openxmlformats.org/drawingml/2006/main" xmlns:r="http://schemas.openxmlformats.org/officeDocument/2006/relationships" xmlns:p="http://schemas.openxmlformats.org/presentationml/2006/main">
   <p:cSld>
     <p:spTree>
@@ -42944,21 +43425,21 @@
                 <a:gridCol w="2764301">
                   <a:extLst>
                     <a:ext uri="{9D8B030D-6E8A-4147-A177-3AD203B41FA5}">
-                      <a16:colId xmlns:a16="http://schemas.microsoft.com/office/drawing/2014/main" val="234227049"/>
+                      <a16:colId xmlns:a16="http://schemas.microsoft.com/office/drawing/2014/main" xmlns="" val="234227049"/>
                     </a:ext>
                   </a:extLst>
                 </a:gridCol>
                 <a:gridCol w="2764301">
                   <a:extLst>
                     <a:ext uri="{9D8B030D-6E8A-4147-A177-3AD203B41FA5}">
-                      <a16:colId xmlns:a16="http://schemas.microsoft.com/office/drawing/2014/main" val="4053135350"/>
+                      <a16:colId xmlns:a16="http://schemas.microsoft.com/office/drawing/2014/main" xmlns="" val="4053135350"/>
                     </a:ext>
                   </a:extLst>
                 </a:gridCol>
                 <a:gridCol w="2764301">
                   <a:extLst>
                     <a:ext uri="{9D8B030D-6E8A-4147-A177-3AD203B41FA5}">
-                      <a16:colId xmlns:a16="http://schemas.microsoft.com/office/drawing/2014/main" val="672378647"/>
+                      <a16:colId xmlns:a16="http://schemas.microsoft.com/office/drawing/2014/main" xmlns="" val="672378647"/>
                     </a:ext>
                   </a:extLst>
                 </a:gridCol>
@@ -43008,7 +43489,7 @@
                 </a:tc>
                 <a:extLst>
                   <a:ext uri="{0D108BD9-81ED-4DB2-BD59-A6C34878D82A}">
-                    <a16:rowId xmlns:a16="http://schemas.microsoft.com/office/drawing/2014/main" val="2843053056"/>
+                    <a16:rowId xmlns:a16="http://schemas.microsoft.com/office/drawing/2014/main" xmlns="" val="2843053056"/>
                   </a:ext>
                 </a:extLst>
               </a:tr>
@@ -43058,7 +43539,7 @@
                 </a:tc>
                 <a:extLst>
                   <a:ext uri="{0D108BD9-81ED-4DB2-BD59-A6C34878D82A}">
-                    <a16:rowId xmlns:a16="http://schemas.microsoft.com/office/drawing/2014/main" val="3055328934"/>
+                    <a16:rowId xmlns:a16="http://schemas.microsoft.com/office/drawing/2014/main" xmlns="" val="3055328934"/>
                   </a:ext>
                 </a:extLst>
               </a:tr>
@@ -43108,7 +43589,7 @@
                 </a:tc>
                 <a:extLst>
                   <a:ext uri="{0D108BD9-81ED-4DB2-BD59-A6C34878D82A}">
-                    <a16:rowId xmlns:a16="http://schemas.microsoft.com/office/drawing/2014/main" val="1144851549"/>
+                    <a16:rowId xmlns:a16="http://schemas.microsoft.com/office/drawing/2014/main" xmlns="" val="1144851549"/>
                   </a:ext>
                 </a:extLst>
               </a:tr>
@@ -43157,7 +43638,7 @@
                 </a:tc>
                 <a:extLst>
                   <a:ext uri="{0D108BD9-81ED-4DB2-BD59-A6C34878D82A}">
-                    <a16:rowId xmlns:a16="http://schemas.microsoft.com/office/drawing/2014/main" val="4258932578"/>
+                    <a16:rowId xmlns:a16="http://schemas.microsoft.com/office/drawing/2014/main" xmlns="" val="4258932578"/>
                   </a:ext>
                 </a:extLst>
               </a:tr>
@@ -44503,6 +44984,14 @@
   <p:clrMapOvr>
     <a:masterClrMapping/>
   </p:clrMapOvr>
+  <mc:AlternateContent xmlns:mc="http://schemas.openxmlformats.org/markup-compatibility/2006">
+    <mc:Choice xmlns:p14="http://schemas.microsoft.com/office/powerpoint/2010/main" Requires="p14">
+      <p:transition spd="slow" p14:dur="2000"/>
+    </mc:Choice>
+    <mc:Fallback>
+      <p:transition spd="slow"/>
+    </mc:Fallback>
+  </mc:AlternateContent>
 </p:sld>
 </file>
 

</xml_diff>

<commit_message>
More trace flags in appendix.
</commit_message>
<xml_diff>
--- a/Optimizer.pptx
+++ b/Optimizer.pptx
@@ -5,7 +5,7 @@
     <p:sldMasterId id="2147483648" r:id="rId1"/>
   </p:sldMasterIdLst>
   <p:notesMasterIdLst>
-    <p:notesMasterId r:id="rId65"/>
+    <p:notesMasterId r:id="rId66"/>
   </p:notesMasterIdLst>
   <p:sldIdLst>
     <p:sldId id="328" r:id="rId2"/>
@@ -67,10 +67,11 @@
     <p:sldId id="301" r:id="rId58"/>
     <p:sldId id="305" r:id="rId59"/>
     <p:sldId id="308" r:id="rId60"/>
-    <p:sldId id="306" r:id="rId61"/>
-    <p:sldId id="279" r:id="rId62"/>
-    <p:sldId id="302" r:id="rId63"/>
-    <p:sldId id="303" r:id="rId64"/>
+    <p:sldId id="342" r:id="rId61"/>
+    <p:sldId id="306" r:id="rId62"/>
+    <p:sldId id="279" r:id="rId63"/>
+    <p:sldId id="302" r:id="rId64"/>
+    <p:sldId id="303" r:id="rId65"/>
   </p:sldIdLst>
   <p:sldSz cx="9144000" cy="6858000" type="screen4x3"/>
   <p:notesSz cx="6858000" cy="9144000"/>
@@ -270,7 +271,7 @@
           <a:p>
             <a:fld id="{2EDCB34D-5EC2-4739-9693-E425457AC201}" type="datetimeFigureOut">
               <a:rPr lang="en-US" smtClean="0"/>
-              <a:t>03/14/2017</a:t>
+              <a:t>03/16/2017</a:t>
             </a:fld>
             <a:endParaRPr lang="en-US"/>
           </a:p>
@@ -2171,7 +2172,7 @@
           <a:p>
             <a:fld id="{ADDBA41D-AE03-4F1C-B074-B56312AFAE46}" type="slidenum">
               <a:rPr lang="en-US" smtClean="0"/>
-              <a:t>60</a:t>
+              <a:t>61</a:t>
             </a:fld>
             <a:endParaRPr lang="en-US"/>
           </a:p>
@@ -3061,7 +3062,7 @@
             <a:fld id="{5942B21B-2ADA-A040-A652-A7305E1B99FE}" type="datetimeFigureOut">
               <a:rPr lang="en-US" smtClean="0"/>
               <a:pPr/>
-              <a:t>03/14/2017</a:t>
+              <a:t>03/16/2017</a:t>
             </a:fld>
             <a:endParaRPr lang="en-US" dirty="0"/>
           </a:p>
@@ -3251,7 +3252,7 @@
           <a:p>
             <a:fld id="{5942B21B-2ADA-A040-A652-A7305E1B99FE}" type="datetimeFigureOut">
               <a:rPr lang="en-US" smtClean="0"/>
-              <a:t>03/14/2017</a:t>
+              <a:t>03/16/2017</a:t>
             </a:fld>
             <a:endParaRPr lang="en-US"/>
           </a:p>
@@ -3375,7 +3376,7 @@
             <a:fld id="{5942B21B-2ADA-A040-A652-A7305E1B99FE}" type="datetimeFigureOut">
               <a:rPr lang="en-US" smtClean="0"/>
               <a:pPr/>
-              <a:t>03/14/2017</a:t>
+              <a:t>03/16/2017</a:t>
             </a:fld>
             <a:r>
               <a:rPr lang="en-US"/>
@@ -3646,7 +3647,7 @@
             <a:fld id="{5942B21B-2ADA-A040-A652-A7305E1B99FE}" type="datetimeFigureOut">
               <a:rPr lang="en-US" smtClean="0"/>
               <a:pPr/>
-              <a:t>03/14/2017</a:t>
+              <a:t>03/16/2017</a:t>
             </a:fld>
             <a:r>
               <a:rPr lang="en-US" dirty="0"/>
@@ -3916,7 +3917,7 @@
             <a:fld id="{5942B21B-2ADA-A040-A652-A7305E1B99FE}" type="datetimeFigureOut">
               <a:rPr lang="en-US" smtClean="0"/>
               <a:pPr/>
-              <a:t>03/14/2017</a:t>
+              <a:t>03/16/2017</a:t>
             </a:fld>
             <a:r>
               <a:rPr lang="en-US" dirty="0"/>
@@ -4256,7 +4257,7 @@
             <a:fld id="{5942B21B-2ADA-A040-A652-A7305E1B99FE}" type="datetimeFigureOut">
               <a:rPr lang="en-US" smtClean="0"/>
               <a:pPr/>
-              <a:t>03/14/2017</a:t>
+              <a:t>03/16/2017</a:t>
             </a:fld>
             <a:r>
               <a:rPr lang="en-US" dirty="0"/>
@@ -4597,7 +4598,7 @@
             <a:fld id="{5942B21B-2ADA-A040-A652-A7305E1B99FE}" type="datetimeFigureOut">
               <a:rPr lang="en-US" smtClean="0"/>
               <a:pPr/>
-              <a:t>03/14/2017</a:t>
+              <a:t>03/16/2017</a:t>
             </a:fld>
             <a:r>
               <a:rPr lang="en-US" dirty="0"/>
@@ -5112,7 +5113,7 @@
             <a:fld id="{5942B21B-2ADA-A040-A652-A7305E1B99FE}" type="datetimeFigureOut">
               <a:rPr lang="en-US" smtClean="0"/>
               <a:pPr/>
-              <a:t>03/14/2017</a:t>
+              <a:t>03/16/2017</a:t>
             </a:fld>
             <a:r>
               <a:rPr lang="en-US" dirty="0"/>
@@ -5321,7 +5322,7 @@
             <a:fld id="{5942B21B-2ADA-A040-A652-A7305E1B99FE}" type="datetimeFigureOut">
               <a:rPr lang="en-US" smtClean="0"/>
               <a:pPr/>
-              <a:t>03/14/2017</a:t>
+              <a:t>03/16/2017</a:t>
             </a:fld>
             <a:r>
               <a:rPr lang="en-US" dirty="0"/>
@@ -5508,7 +5509,7 @@
             <a:fld id="{5942B21B-2ADA-A040-A652-A7305E1B99FE}" type="datetimeFigureOut">
               <a:rPr lang="en-US" smtClean="0"/>
               <a:pPr/>
-              <a:t>03/14/2017</a:t>
+              <a:t>03/16/2017</a:t>
             </a:fld>
             <a:r>
               <a:rPr lang="en-US" dirty="0"/>
@@ -5839,7 +5840,7 @@
             <a:fld id="{5942B21B-2ADA-A040-A652-A7305E1B99FE}" type="datetimeFigureOut">
               <a:rPr lang="en-US" smtClean="0"/>
               <a:pPr/>
-              <a:t>03/14/2017</a:t>
+              <a:t>03/16/2017</a:t>
             </a:fld>
             <a:r>
               <a:rPr lang="en-US" dirty="0"/>
@@ -6147,7 +6148,7 @@
             <a:fld id="{5942B21B-2ADA-A040-A652-A7305E1B99FE}" type="datetimeFigureOut">
               <a:rPr lang="en-US" smtClean="0"/>
               <a:pPr/>
-              <a:t>03/14/2017</a:t>
+              <a:t>03/16/2017</a:t>
             </a:fld>
             <a:r>
               <a:rPr lang="en-US" dirty="0"/>
@@ -6426,7 +6427,7 @@
             <a:fld id="{5942B21B-2ADA-A040-A652-A7305E1B99FE}" type="datetimeFigureOut">
               <a:rPr lang="en-US" smtClean="0"/>
               <a:pPr/>
-              <a:t>03/14/2017</a:t>
+              <a:t>03/16/2017</a:t>
             </a:fld>
             <a:r>
               <a:rPr lang="en-US" dirty="0"/>
@@ -8300,11 +8301,11 @@
   <p:clrMapOvr>
     <a:masterClrMapping/>
   </p:clrMapOvr>
-  <mc:AlternateContent xmlns:mc="http://schemas.openxmlformats.org/markup-compatibility/2006">
-    <mc:Choice xmlns:p14="http://schemas.microsoft.com/office/powerpoint/2010/main" Requires="p14">
+  <mc:AlternateContent xmlns:mc="http://schemas.openxmlformats.org/markup-compatibility/2006" xmlns:p14="http://schemas.microsoft.com/office/powerpoint/2010/main">
+    <mc:Choice Requires="p14">
       <p:transition spd="slow" p14:dur="2000"/>
     </mc:Choice>
-    <mc:Fallback>
+    <mc:Fallback xmlns="">
       <p:transition spd="slow"/>
     </mc:Fallback>
   </mc:AlternateContent>
@@ -9519,11 +9520,11 @@
   <p:clrMapOvr>
     <a:masterClrMapping/>
   </p:clrMapOvr>
-  <mc:AlternateContent xmlns:mc="http://schemas.openxmlformats.org/markup-compatibility/2006">
-    <mc:Choice xmlns:p14="http://schemas.microsoft.com/office/powerpoint/2010/main" Requires="p14">
+  <mc:AlternateContent xmlns:mc="http://schemas.openxmlformats.org/markup-compatibility/2006" xmlns:p14="http://schemas.microsoft.com/office/powerpoint/2010/main">
+    <mc:Choice Requires="p14">
       <p:transition spd="slow" p14:dur="2000"/>
     </mc:Choice>
-    <mc:Fallback>
+    <mc:Fallback xmlns="">
       <p:transition spd="slow"/>
     </mc:Fallback>
   </mc:AlternateContent>
@@ -10738,11 +10739,11 @@
   <p:clrMapOvr>
     <a:masterClrMapping/>
   </p:clrMapOvr>
-  <mc:AlternateContent xmlns:mc="http://schemas.openxmlformats.org/markup-compatibility/2006">
-    <mc:Choice xmlns:p14="http://schemas.microsoft.com/office/powerpoint/2010/main" Requires="p14">
+  <mc:AlternateContent xmlns:mc="http://schemas.openxmlformats.org/markup-compatibility/2006" xmlns:p14="http://schemas.microsoft.com/office/powerpoint/2010/main">
+    <mc:Choice Requires="p14">
       <p:transition spd="slow" p14:dur="2000"/>
     </mc:Choice>
-    <mc:Fallback>
+    <mc:Fallback xmlns="">
       <p:transition spd="slow"/>
     </mc:Fallback>
   </mc:AlternateContent>
@@ -11941,11 +11942,11 @@
   <p:clrMapOvr>
     <a:masterClrMapping/>
   </p:clrMapOvr>
-  <mc:AlternateContent xmlns:mc="http://schemas.openxmlformats.org/markup-compatibility/2006">
-    <mc:Choice xmlns:p14="http://schemas.microsoft.com/office/powerpoint/2010/main" Requires="p14">
+  <mc:AlternateContent xmlns:mc="http://schemas.openxmlformats.org/markup-compatibility/2006" xmlns:p14="http://schemas.microsoft.com/office/powerpoint/2010/main">
+    <mc:Choice Requires="p14">
       <p:transition spd="slow" p14:dur="2000"/>
     </mc:Choice>
-    <mc:Fallback>
+    <mc:Fallback xmlns="">
       <p:transition spd="slow"/>
     </mc:Fallback>
   </mc:AlternateContent>
@@ -13197,11 +13198,11 @@
   <p:clrMapOvr>
     <a:masterClrMapping/>
   </p:clrMapOvr>
-  <mc:AlternateContent xmlns:mc="http://schemas.openxmlformats.org/markup-compatibility/2006">
-    <mc:Choice xmlns:p14="http://schemas.microsoft.com/office/powerpoint/2010/main" Requires="p14">
+  <mc:AlternateContent xmlns:mc="http://schemas.openxmlformats.org/markup-compatibility/2006" xmlns:p14="http://schemas.microsoft.com/office/powerpoint/2010/main">
+    <mc:Choice Requires="p14">
       <p:transition spd="slow" p14:dur="2000"/>
     </mc:Choice>
-    <mc:Fallback>
+    <mc:Fallback xmlns="">
       <p:transition spd="slow"/>
     </mc:Fallback>
   </mc:AlternateContent>
@@ -14379,11 +14380,11 @@
   <p:clrMapOvr>
     <a:masterClrMapping/>
   </p:clrMapOvr>
-  <mc:AlternateContent xmlns:mc="http://schemas.openxmlformats.org/markup-compatibility/2006">
-    <mc:Choice xmlns:p14="http://schemas.microsoft.com/office/powerpoint/2010/main" Requires="p14">
+  <mc:AlternateContent xmlns:mc="http://schemas.openxmlformats.org/markup-compatibility/2006" xmlns:p14="http://schemas.microsoft.com/office/powerpoint/2010/main">
+    <mc:Choice Requires="p14">
       <p:transition spd="slow" p14:dur="2000"/>
     </mc:Choice>
-    <mc:Fallback>
+    <mc:Fallback xmlns="">
       <p:transition spd="slow"/>
     </mc:Fallback>
   </mc:AlternateContent>
@@ -15607,11 +15608,11 @@
   <p:clrMapOvr>
     <a:masterClrMapping/>
   </p:clrMapOvr>
-  <mc:AlternateContent xmlns:mc="http://schemas.openxmlformats.org/markup-compatibility/2006">
-    <mc:Choice xmlns:p14="http://schemas.microsoft.com/office/powerpoint/2010/main" Requires="p14">
+  <mc:AlternateContent xmlns:mc="http://schemas.openxmlformats.org/markup-compatibility/2006" xmlns:p14="http://schemas.microsoft.com/office/powerpoint/2010/main">
+    <mc:Choice Requires="p14">
       <p:transition spd="slow" p14:dur="2000"/>
     </mc:Choice>
-    <mc:Fallback>
+    <mc:Fallback xmlns="">
       <p:transition spd="slow"/>
     </mc:Fallback>
   </mc:AlternateContent>
@@ -16826,11 +16827,11 @@
   <p:clrMapOvr>
     <a:masterClrMapping/>
   </p:clrMapOvr>
-  <mc:AlternateContent xmlns:mc="http://schemas.openxmlformats.org/markup-compatibility/2006">
-    <mc:Choice xmlns:p14="http://schemas.microsoft.com/office/powerpoint/2010/main" Requires="p14">
+  <mc:AlternateContent xmlns:mc="http://schemas.openxmlformats.org/markup-compatibility/2006" xmlns:p14="http://schemas.microsoft.com/office/powerpoint/2010/main">
+    <mc:Choice Requires="p14">
       <p:transition spd="slow" p14:dur="2000"/>
     </mc:Choice>
-    <mc:Fallback>
+    <mc:Fallback xmlns="">
       <p:transition spd="slow"/>
     </mc:Fallback>
   </mc:AlternateContent>
@@ -18098,11 +18099,11 @@
   <p:clrMapOvr>
     <a:masterClrMapping/>
   </p:clrMapOvr>
-  <mc:AlternateContent xmlns:mc="http://schemas.openxmlformats.org/markup-compatibility/2006">
-    <mc:Choice xmlns:p14="http://schemas.microsoft.com/office/powerpoint/2010/main" Requires="p14">
+  <mc:AlternateContent xmlns:mc="http://schemas.openxmlformats.org/markup-compatibility/2006" xmlns:p14="http://schemas.microsoft.com/office/powerpoint/2010/main">
+    <mc:Choice Requires="p14">
       <p:transition spd="slow" p14:dur="2000"/>
     </mc:Choice>
-    <mc:Fallback>
+    <mc:Fallback xmlns="">
       <p:transition spd="slow"/>
     </mc:Fallback>
   </mc:AlternateContent>
@@ -20850,28 +20851,28 @@
                 <a:gridCol w="1638752">
                   <a:extLst>
                     <a:ext uri="{9D8B030D-6E8A-4147-A177-3AD203B41FA5}">
-                      <a16:colId xmlns:a16="http://schemas.microsoft.com/office/drawing/2014/main" xmlns="" val="20000"/>
+                      <a16:colId xmlns="" xmlns:a16="http://schemas.microsoft.com/office/drawing/2014/main" val="20000"/>
                     </a:ext>
                   </a:extLst>
                 </a:gridCol>
                 <a:gridCol w="4787153">
                   <a:extLst>
                     <a:ext uri="{9D8B030D-6E8A-4147-A177-3AD203B41FA5}">
-                      <a16:colId xmlns:a16="http://schemas.microsoft.com/office/drawing/2014/main" xmlns="" val="20001"/>
+                      <a16:colId xmlns="" xmlns:a16="http://schemas.microsoft.com/office/drawing/2014/main" val="20001"/>
                     </a:ext>
                   </a:extLst>
                 </a:gridCol>
                 <a:gridCol w="851647">
                   <a:extLst>
                     <a:ext uri="{9D8B030D-6E8A-4147-A177-3AD203B41FA5}">
-                      <a16:colId xmlns:a16="http://schemas.microsoft.com/office/drawing/2014/main" xmlns="" val="20002"/>
+                      <a16:colId xmlns="" xmlns:a16="http://schemas.microsoft.com/office/drawing/2014/main" val="20002"/>
                     </a:ext>
                   </a:extLst>
                 </a:gridCol>
                 <a:gridCol w="779930">
                   <a:extLst>
                     <a:ext uri="{9D8B030D-6E8A-4147-A177-3AD203B41FA5}">
-                      <a16:colId xmlns:a16="http://schemas.microsoft.com/office/drawing/2014/main" xmlns="" val="20003"/>
+                      <a16:colId xmlns="" xmlns:a16="http://schemas.microsoft.com/office/drawing/2014/main" val="20003"/>
                     </a:ext>
                   </a:extLst>
                 </a:gridCol>
@@ -20931,7 +20932,7 @@
                 </a:tc>
                 <a:extLst>
                   <a:ext uri="{0D108BD9-81ED-4DB2-BD59-A6C34878D82A}">
-                    <a16:rowId xmlns:a16="http://schemas.microsoft.com/office/drawing/2014/main" xmlns="" val="10000"/>
+                    <a16:rowId xmlns="" xmlns:a16="http://schemas.microsoft.com/office/drawing/2014/main" val="10000"/>
                   </a:ext>
                 </a:extLst>
               </a:tr>
@@ -20996,7 +20997,7 @@
                 </a:tc>
                 <a:extLst>
                   <a:ext uri="{0D108BD9-81ED-4DB2-BD59-A6C34878D82A}">
-                    <a16:rowId xmlns:a16="http://schemas.microsoft.com/office/drawing/2014/main" xmlns="" val="10001"/>
+                    <a16:rowId xmlns="" xmlns:a16="http://schemas.microsoft.com/office/drawing/2014/main" val="10001"/>
                   </a:ext>
                 </a:extLst>
               </a:tr>
@@ -21073,7 +21074,7 @@
                 </a:tc>
                 <a:extLst>
                   <a:ext uri="{0D108BD9-81ED-4DB2-BD59-A6C34878D82A}">
-                    <a16:rowId xmlns:a16="http://schemas.microsoft.com/office/drawing/2014/main" xmlns="" val="10002"/>
+                    <a16:rowId xmlns="" xmlns:a16="http://schemas.microsoft.com/office/drawing/2014/main" val="10002"/>
                   </a:ext>
                 </a:extLst>
               </a:tr>
@@ -21139,7 +21140,7 @@
                 </a:tc>
                 <a:extLst>
                   <a:ext uri="{0D108BD9-81ED-4DB2-BD59-A6C34878D82A}">
-                    <a16:rowId xmlns:a16="http://schemas.microsoft.com/office/drawing/2014/main" xmlns="" val="10003"/>
+                    <a16:rowId xmlns="" xmlns:a16="http://schemas.microsoft.com/office/drawing/2014/main" val="10003"/>
                   </a:ext>
                 </a:extLst>
               </a:tr>
@@ -21228,7 +21229,7 @@
                 </a:tc>
                 <a:extLst>
                   <a:ext uri="{0D108BD9-81ED-4DB2-BD59-A6C34878D82A}">
-                    <a16:rowId xmlns:a16="http://schemas.microsoft.com/office/drawing/2014/main" xmlns="" val="10004"/>
+                    <a16:rowId xmlns="" xmlns:a16="http://schemas.microsoft.com/office/drawing/2014/main" val="10004"/>
                   </a:ext>
                 </a:extLst>
               </a:tr>
@@ -21299,7 +21300,7 @@
                 </a:tc>
                 <a:extLst>
                   <a:ext uri="{0D108BD9-81ED-4DB2-BD59-A6C34878D82A}">
-                    <a16:rowId xmlns:a16="http://schemas.microsoft.com/office/drawing/2014/main" xmlns="" val="10005"/>
+                    <a16:rowId xmlns="" xmlns:a16="http://schemas.microsoft.com/office/drawing/2014/main" val="10005"/>
                   </a:ext>
                 </a:extLst>
               </a:tr>
@@ -21365,7 +21366,7 @@
                 </a:tc>
                 <a:extLst>
                   <a:ext uri="{0D108BD9-81ED-4DB2-BD59-A6C34878D82A}">
-                    <a16:rowId xmlns:a16="http://schemas.microsoft.com/office/drawing/2014/main" xmlns="" val="10006"/>
+                    <a16:rowId xmlns="" xmlns:a16="http://schemas.microsoft.com/office/drawing/2014/main" val="10006"/>
                   </a:ext>
                 </a:extLst>
               </a:tr>
@@ -25895,11 +25896,11 @@
   <p:clrMapOvr>
     <a:masterClrMapping/>
   </p:clrMapOvr>
-  <mc:AlternateContent xmlns:mc="http://schemas.openxmlformats.org/markup-compatibility/2006">
-    <mc:Choice xmlns:p14="http://schemas.microsoft.com/office/powerpoint/2010/main" Requires="p14">
+  <mc:AlternateContent xmlns:mc="http://schemas.openxmlformats.org/markup-compatibility/2006" xmlns:p14="http://schemas.microsoft.com/office/powerpoint/2010/main">
+    <mc:Choice Requires="p14">
       <p:transition spd="slow" p14:dur="2000"/>
     </mc:Choice>
-    <mc:Fallback>
+    <mc:Fallback xmlns="">
       <p:transition spd="slow"/>
     </mc:Fallback>
   </mc:AlternateContent>
@@ -29709,11 +29710,11 @@
   <p:clrMapOvr>
     <a:masterClrMapping/>
   </p:clrMapOvr>
-  <mc:AlternateContent xmlns:mc="http://schemas.openxmlformats.org/markup-compatibility/2006">
-    <mc:Choice xmlns:p14="http://schemas.microsoft.com/office/powerpoint/2010/main" Requires="p14">
+  <mc:AlternateContent xmlns:mc="http://schemas.openxmlformats.org/markup-compatibility/2006" xmlns:p14="http://schemas.microsoft.com/office/powerpoint/2010/main">
+    <mc:Choice Requires="p14">
       <p:transition spd="slow" p14:dur="2000"/>
     </mc:Choice>
-    <mc:Fallback>
+    <mc:Fallback xmlns="">
       <p:transition spd="slow"/>
     </mc:Fallback>
   </mc:AlternateContent>
@@ -30069,14 +30070,14 @@
                 <a:gridCol w="7632835">
                   <a:extLst>
                     <a:ext uri="{9D8B030D-6E8A-4147-A177-3AD203B41FA5}">
-                      <a16:colId xmlns:a16="http://schemas.microsoft.com/office/drawing/2014/main" xmlns="" val="3644048045"/>
+                      <a16:colId xmlns="" xmlns:a16="http://schemas.microsoft.com/office/drawing/2014/main" val="3644048045"/>
                     </a:ext>
                   </a:extLst>
                 </a:gridCol>
                 <a:gridCol w="606393">
                   <a:extLst>
                     <a:ext uri="{9D8B030D-6E8A-4147-A177-3AD203B41FA5}">
-                      <a16:colId xmlns:a16="http://schemas.microsoft.com/office/drawing/2014/main" xmlns="" val="2034254753"/>
+                      <a16:colId xmlns="" xmlns:a16="http://schemas.microsoft.com/office/drawing/2014/main" val="2034254753"/>
                     </a:ext>
                   </a:extLst>
                 </a:gridCol>
@@ -30107,7 +30108,7 @@
                 </a:tc>
                 <a:extLst>
                   <a:ext uri="{0D108BD9-81ED-4DB2-BD59-A6C34878D82A}">
-                    <a16:rowId xmlns:a16="http://schemas.microsoft.com/office/drawing/2014/main" xmlns="" val="2708275910"/>
+                    <a16:rowId xmlns="" xmlns:a16="http://schemas.microsoft.com/office/drawing/2014/main" val="2708275910"/>
                   </a:ext>
                 </a:extLst>
               </a:tr>
@@ -30141,7 +30142,7 @@
                 </a:tc>
                 <a:extLst>
                   <a:ext uri="{0D108BD9-81ED-4DB2-BD59-A6C34878D82A}">
-                    <a16:rowId xmlns:a16="http://schemas.microsoft.com/office/drawing/2014/main" xmlns="" val="2161984115"/>
+                    <a16:rowId xmlns="" xmlns:a16="http://schemas.microsoft.com/office/drawing/2014/main" val="2161984115"/>
                   </a:ext>
                 </a:extLst>
               </a:tr>
@@ -30188,7 +30189,7 @@
                 </a:tc>
                 <a:extLst>
                   <a:ext uri="{0D108BD9-81ED-4DB2-BD59-A6C34878D82A}">
-                    <a16:rowId xmlns:a16="http://schemas.microsoft.com/office/drawing/2014/main" xmlns="" val="2841678841"/>
+                    <a16:rowId xmlns="" xmlns:a16="http://schemas.microsoft.com/office/drawing/2014/main" val="2841678841"/>
                   </a:ext>
                 </a:extLst>
               </a:tr>
@@ -30222,7 +30223,7 @@
                 </a:tc>
                 <a:extLst>
                   <a:ext uri="{0D108BD9-81ED-4DB2-BD59-A6C34878D82A}">
-                    <a16:rowId xmlns:a16="http://schemas.microsoft.com/office/drawing/2014/main" xmlns="" val="3144998627"/>
+                    <a16:rowId xmlns="" xmlns:a16="http://schemas.microsoft.com/office/drawing/2014/main" val="3144998627"/>
                   </a:ext>
                 </a:extLst>
               </a:tr>
@@ -30264,7 +30265,7 @@
                 </a:tc>
                 <a:extLst>
                   <a:ext uri="{0D108BD9-81ED-4DB2-BD59-A6C34878D82A}">
-                    <a16:rowId xmlns:a16="http://schemas.microsoft.com/office/drawing/2014/main" xmlns="" val="1419261869"/>
+                    <a16:rowId xmlns="" xmlns:a16="http://schemas.microsoft.com/office/drawing/2014/main" val="1419261869"/>
                   </a:ext>
                 </a:extLst>
               </a:tr>
@@ -30302,7 +30303,7 @@
                 </a:tc>
                 <a:extLst>
                   <a:ext uri="{0D108BD9-81ED-4DB2-BD59-A6C34878D82A}">
-                    <a16:rowId xmlns:a16="http://schemas.microsoft.com/office/drawing/2014/main" xmlns="" val="1427391072"/>
+                    <a16:rowId xmlns="" xmlns:a16="http://schemas.microsoft.com/office/drawing/2014/main" val="1427391072"/>
                   </a:ext>
                 </a:extLst>
               </a:tr>
@@ -30349,7 +30350,7 @@
                 </a:tc>
                 <a:extLst>
                   <a:ext uri="{0D108BD9-81ED-4DB2-BD59-A6C34878D82A}">
-                    <a16:rowId xmlns:a16="http://schemas.microsoft.com/office/drawing/2014/main" xmlns="" val="2346539918"/>
+                    <a16:rowId xmlns="" xmlns:a16="http://schemas.microsoft.com/office/drawing/2014/main" val="2346539918"/>
                   </a:ext>
                 </a:extLst>
               </a:tr>
@@ -30388,7 +30389,7 @@
                 </a:tc>
                 <a:extLst>
                   <a:ext uri="{0D108BD9-81ED-4DB2-BD59-A6C34878D82A}">
-                    <a16:rowId xmlns:a16="http://schemas.microsoft.com/office/drawing/2014/main" xmlns="" val="2275483042"/>
+                    <a16:rowId xmlns="" xmlns:a16="http://schemas.microsoft.com/office/drawing/2014/main" val="2275483042"/>
                   </a:ext>
                 </a:extLst>
               </a:tr>
@@ -30426,7 +30427,7 @@
                 </a:tc>
                 <a:extLst>
                   <a:ext uri="{0D108BD9-81ED-4DB2-BD59-A6C34878D82A}">
-                    <a16:rowId xmlns:a16="http://schemas.microsoft.com/office/drawing/2014/main" xmlns="" val="4202569347"/>
+                    <a16:rowId xmlns="" xmlns:a16="http://schemas.microsoft.com/office/drawing/2014/main" val="4202569347"/>
                   </a:ext>
                 </a:extLst>
               </a:tr>
@@ -30460,7 +30461,7 @@
                 </a:tc>
                 <a:extLst>
                   <a:ext uri="{0D108BD9-81ED-4DB2-BD59-A6C34878D82A}">
-                    <a16:rowId xmlns:a16="http://schemas.microsoft.com/office/drawing/2014/main" xmlns="" val="2989839269"/>
+                    <a16:rowId xmlns="" xmlns:a16="http://schemas.microsoft.com/office/drawing/2014/main" val="2989839269"/>
                   </a:ext>
                 </a:extLst>
               </a:tr>
@@ -30494,7 +30495,7 @@
                 </a:tc>
                 <a:extLst>
                   <a:ext uri="{0D108BD9-81ED-4DB2-BD59-A6C34878D82A}">
-                    <a16:rowId xmlns:a16="http://schemas.microsoft.com/office/drawing/2014/main" xmlns="" val="2130545569"/>
+                    <a16:rowId xmlns="" xmlns:a16="http://schemas.microsoft.com/office/drawing/2014/main" val="2130545569"/>
                   </a:ext>
                 </a:extLst>
               </a:tr>
@@ -30550,7 +30551,7 @@
                 </a:tc>
                 <a:extLst>
                   <a:ext uri="{0D108BD9-81ED-4DB2-BD59-A6C34878D82A}">
-                    <a16:rowId xmlns:a16="http://schemas.microsoft.com/office/drawing/2014/main" xmlns="" val="1848127216"/>
+                    <a16:rowId xmlns="" xmlns:a16="http://schemas.microsoft.com/office/drawing/2014/main" val="1848127216"/>
                   </a:ext>
                 </a:extLst>
               </a:tr>
@@ -30644,11 +30645,11 @@
   <p:clrMapOvr>
     <a:masterClrMapping/>
   </p:clrMapOvr>
-  <mc:AlternateContent xmlns:mc="http://schemas.openxmlformats.org/markup-compatibility/2006">
-    <mc:Choice xmlns:p14="http://schemas.microsoft.com/office/powerpoint/2010/main" Requires="p14">
+  <mc:AlternateContent xmlns:mc="http://schemas.openxmlformats.org/markup-compatibility/2006" xmlns:p14="http://schemas.microsoft.com/office/powerpoint/2010/main">
+    <mc:Choice Requires="p14">
       <p:transition spd="slow" p14:dur="2000"/>
     </mc:Choice>
-    <mc:Fallback>
+    <mc:Fallback xmlns="">
       <p:transition spd="slow"/>
     </mc:Fallback>
   </mc:AlternateContent>
@@ -31004,14 +31005,14 @@
                 <a:gridCol w="4119615">
                   <a:extLst>
                     <a:ext uri="{9D8B030D-6E8A-4147-A177-3AD203B41FA5}">
-                      <a16:colId xmlns:a16="http://schemas.microsoft.com/office/drawing/2014/main" xmlns="" val="3644048045"/>
+                      <a16:colId xmlns="" xmlns:a16="http://schemas.microsoft.com/office/drawing/2014/main" val="3644048045"/>
                     </a:ext>
                   </a:extLst>
                 </a:gridCol>
                 <a:gridCol w="4119613">
                   <a:extLst>
                     <a:ext uri="{9D8B030D-6E8A-4147-A177-3AD203B41FA5}">
-                      <a16:colId xmlns:a16="http://schemas.microsoft.com/office/drawing/2014/main" xmlns="" val="2034254753"/>
+                      <a16:colId xmlns="" xmlns:a16="http://schemas.microsoft.com/office/drawing/2014/main" val="2034254753"/>
                     </a:ext>
                   </a:extLst>
                 </a:gridCol>
@@ -31047,7 +31048,7 @@
                 </a:tc>
                 <a:extLst>
                   <a:ext uri="{0D108BD9-81ED-4DB2-BD59-A6C34878D82A}">
-                    <a16:rowId xmlns:a16="http://schemas.microsoft.com/office/drawing/2014/main" xmlns="" val="2708275910"/>
+                    <a16:rowId xmlns="" xmlns:a16="http://schemas.microsoft.com/office/drawing/2014/main" val="2708275910"/>
                   </a:ext>
                 </a:extLst>
               </a:tr>
@@ -31247,7 +31248,7 @@
                 </a:tc>
                 <a:extLst>
                   <a:ext uri="{0D108BD9-81ED-4DB2-BD59-A6C34878D82A}">
-                    <a16:rowId xmlns:a16="http://schemas.microsoft.com/office/drawing/2014/main" xmlns="" val="2161984115"/>
+                    <a16:rowId xmlns="" xmlns:a16="http://schemas.microsoft.com/office/drawing/2014/main" val="2161984115"/>
                   </a:ext>
                 </a:extLst>
               </a:tr>
@@ -31447,7 +31448,7 @@
                 </a:tc>
                 <a:extLst>
                   <a:ext uri="{0D108BD9-81ED-4DB2-BD59-A6C34878D82A}">
-                    <a16:rowId xmlns:a16="http://schemas.microsoft.com/office/drawing/2014/main" xmlns="" val="2841678841"/>
+                    <a16:rowId xmlns="" xmlns:a16="http://schemas.microsoft.com/office/drawing/2014/main" val="2841678841"/>
                   </a:ext>
                 </a:extLst>
               </a:tr>
@@ -31647,7 +31648,7 @@
                 </a:tc>
                 <a:extLst>
                   <a:ext uri="{0D108BD9-81ED-4DB2-BD59-A6C34878D82A}">
-                    <a16:rowId xmlns:a16="http://schemas.microsoft.com/office/drawing/2014/main" xmlns="" val="3144998627"/>
+                    <a16:rowId xmlns="" xmlns:a16="http://schemas.microsoft.com/office/drawing/2014/main" val="3144998627"/>
                   </a:ext>
                 </a:extLst>
               </a:tr>
@@ -31847,7 +31848,7 @@
                 </a:tc>
                 <a:extLst>
                   <a:ext uri="{0D108BD9-81ED-4DB2-BD59-A6C34878D82A}">
-                    <a16:rowId xmlns:a16="http://schemas.microsoft.com/office/drawing/2014/main" xmlns="" val="1419261869"/>
+                    <a16:rowId xmlns="" xmlns:a16="http://schemas.microsoft.com/office/drawing/2014/main" val="1419261869"/>
                   </a:ext>
                 </a:extLst>
               </a:tr>
@@ -32047,7 +32048,7 @@
                 </a:tc>
                 <a:extLst>
                   <a:ext uri="{0D108BD9-81ED-4DB2-BD59-A6C34878D82A}">
-                    <a16:rowId xmlns:a16="http://schemas.microsoft.com/office/drawing/2014/main" xmlns="" val="1427391072"/>
+                    <a16:rowId xmlns="" xmlns:a16="http://schemas.microsoft.com/office/drawing/2014/main" val="1427391072"/>
                   </a:ext>
                 </a:extLst>
               </a:tr>
@@ -32247,7 +32248,7 @@
                 </a:tc>
                 <a:extLst>
                   <a:ext uri="{0D108BD9-81ED-4DB2-BD59-A6C34878D82A}">
-                    <a16:rowId xmlns:a16="http://schemas.microsoft.com/office/drawing/2014/main" xmlns="" val="2346539918"/>
+                    <a16:rowId xmlns="" xmlns:a16="http://schemas.microsoft.com/office/drawing/2014/main" val="2346539918"/>
                   </a:ext>
                 </a:extLst>
               </a:tr>
@@ -32456,7 +32457,7 @@
                 </a:tc>
                 <a:extLst>
                   <a:ext uri="{0D108BD9-81ED-4DB2-BD59-A6C34878D82A}">
-                    <a16:rowId xmlns:a16="http://schemas.microsoft.com/office/drawing/2014/main" xmlns="" val="2275483042"/>
+                    <a16:rowId xmlns="" xmlns:a16="http://schemas.microsoft.com/office/drawing/2014/main" val="2275483042"/>
                   </a:ext>
                 </a:extLst>
               </a:tr>
@@ -32665,7 +32666,7 @@
                 </a:tc>
                 <a:extLst>
                   <a:ext uri="{0D108BD9-81ED-4DB2-BD59-A6C34878D82A}">
-                    <a16:rowId xmlns:a16="http://schemas.microsoft.com/office/drawing/2014/main" xmlns="" val="4202569347"/>
+                    <a16:rowId xmlns="" xmlns:a16="http://schemas.microsoft.com/office/drawing/2014/main" val="4202569347"/>
                   </a:ext>
                 </a:extLst>
               </a:tr>
@@ -32874,7 +32875,7 @@
                 </a:tc>
                 <a:extLst>
                   <a:ext uri="{0D108BD9-81ED-4DB2-BD59-A6C34878D82A}">
-                    <a16:rowId xmlns:a16="http://schemas.microsoft.com/office/drawing/2014/main" xmlns="" val="2989839269"/>
+                    <a16:rowId xmlns="" xmlns:a16="http://schemas.microsoft.com/office/drawing/2014/main" val="2989839269"/>
                   </a:ext>
                 </a:extLst>
               </a:tr>
@@ -33083,7 +33084,7 @@
                 </a:tc>
                 <a:extLst>
                   <a:ext uri="{0D108BD9-81ED-4DB2-BD59-A6C34878D82A}">
-                    <a16:rowId xmlns:a16="http://schemas.microsoft.com/office/drawing/2014/main" xmlns="" val="2130545569"/>
+                    <a16:rowId xmlns="" xmlns:a16="http://schemas.microsoft.com/office/drawing/2014/main" val="2130545569"/>
                   </a:ext>
                 </a:extLst>
               </a:tr>
@@ -33292,7 +33293,7 @@
                 </a:tc>
                 <a:extLst>
                   <a:ext uri="{0D108BD9-81ED-4DB2-BD59-A6C34878D82A}">
-                    <a16:rowId xmlns:a16="http://schemas.microsoft.com/office/drawing/2014/main" xmlns="" val="3045796785"/>
+                    <a16:rowId xmlns="" xmlns:a16="http://schemas.microsoft.com/office/drawing/2014/main" val="3045796785"/>
                   </a:ext>
                 </a:extLst>
               </a:tr>
@@ -33501,7 +33502,7 @@
                 </a:tc>
                 <a:extLst>
                   <a:ext uri="{0D108BD9-81ED-4DB2-BD59-A6C34878D82A}">
-                    <a16:rowId xmlns:a16="http://schemas.microsoft.com/office/drawing/2014/main" xmlns="" val="1091494175"/>
+                    <a16:rowId xmlns="" xmlns:a16="http://schemas.microsoft.com/office/drawing/2014/main" val="1091494175"/>
                   </a:ext>
                 </a:extLst>
               </a:tr>
@@ -33519,11 +33520,11 @@
   <p:clrMapOvr>
     <a:masterClrMapping/>
   </p:clrMapOvr>
-  <mc:AlternateContent xmlns:mc="http://schemas.openxmlformats.org/markup-compatibility/2006">
-    <mc:Choice xmlns:p14="http://schemas.microsoft.com/office/powerpoint/2010/main" Requires="p14">
+  <mc:AlternateContent xmlns:mc="http://schemas.openxmlformats.org/markup-compatibility/2006" xmlns:p14="http://schemas.microsoft.com/office/powerpoint/2010/main">
+    <mc:Choice Requires="p14">
       <p:transition spd="slow" p14:dur="2000"/>
     </mc:Choice>
-    <mc:Fallback>
+    <mc:Fallback xmlns="">
       <p:transition spd="slow"/>
     </mc:Fallback>
   </mc:AlternateContent>
@@ -33639,11 +33640,11 @@
   <p:clrMapOvr>
     <a:masterClrMapping/>
   </p:clrMapOvr>
-  <mc:AlternateContent xmlns:mc="http://schemas.openxmlformats.org/markup-compatibility/2006">
-    <mc:Choice xmlns:p14="http://schemas.microsoft.com/office/powerpoint/2010/main" Requires="p14">
+  <mc:AlternateContent xmlns:mc="http://schemas.openxmlformats.org/markup-compatibility/2006" xmlns:p14="http://schemas.microsoft.com/office/powerpoint/2010/main">
+    <mc:Choice Requires="p14">
       <p:transition spd="slow" p14:dur="2000"/>
     </mc:Choice>
-    <mc:Fallback>
+    <mc:Fallback xmlns="">
       <p:transition spd="slow"/>
     </mc:Fallback>
   </mc:AlternateContent>
@@ -33930,11 +33931,11 @@
   <p:clrMapOvr>
     <a:masterClrMapping/>
   </p:clrMapOvr>
-  <mc:AlternateContent xmlns:mc="http://schemas.openxmlformats.org/markup-compatibility/2006">
-    <mc:Choice xmlns:p14="http://schemas.microsoft.com/office/powerpoint/2010/main" Requires="p14">
+  <mc:AlternateContent xmlns:mc="http://schemas.openxmlformats.org/markup-compatibility/2006" xmlns:p14="http://schemas.microsoft.com/office/powerpoint/2010/main">
+    <mc:Choice Requires="p14">
       <p:transition spd="slow" p14:dur="2000"/>
     </mc:Choice>
-    <mc:Fallback>
+    <mc:Fallback xmlns="">
       <p:transition spd="slow"/>
     </mc:Fallback>
   </mc:AlternateContent>
@@ -34634,11 +34635,11 @@
   <p:clrMapOvr>
     <a:masterClrMapping/>
   </p:clrMapOvr>
-  <mc:AlternateContent xmlns:mc="http://schemas.openxmlformats.org/markup-compatibility/2006">
-    <mc:Choice xmlns:p14="http://schemas.microsoft.com/office/powerpoint/2010/main" Requires="p14">
+  <mc:AlternateContent xmlns:mc="http://schemas.openxmlformats.org/markup-compatibility/2006" xmlns:p14="http://schemas.microsoft.com/office/powerpoint/2010/main">
+    <mc:Choice Requires="p14">
       <p:transition spd="slow" p14:dur="2000"/>
     </mc:Choice>
-    <mc:Fallback>
+    <mc:Fallback xmlns="">
       <p:transition spd="slow"/>
     </mc:Fallback>
   </mc:AlternateContent>
@@ -35526,11 +35527,11 @@
   <p:clrMapOvr>
     <a:masterClrMapping/>
   </p:clrMapOvr>
-  <mc:AlternateContent xmlns:mc="http://schemas.openxmlformats.org/markup-compatibility/2006">
-    <mc:Choice xmlns:p14="http://schemas.microsoft.com/office/powerpoint/2010/main" Requires="p14">
+  <mc:AlternateContent xmlns:mc="http://schemas.openxmlformats.org/markup-compatibility/2006" xmlns:p14="http://schemas.microsoft.com/office/powerpoint/2010/main">
+    <mc:Choice Requires="p14">
       <p:transition spd="slow" p14:dur="2000"/>
     </mc:Choice>
-    <mc:Fallback>
+    <mc:Fallback xmlns="">
       <p:transition spd="slow"/>
     </mc:Fallback>
   </mc:AlternateContent>
@@ -36465,11 +36466,11 @@
   <p:clrMapOvr>
     <a:masterClrMapping/>
   </p:clrMapOvr>
-  <mc:AlternateContent xmlns:mc="http://schemas.openxmlformats.org/markup-compatibility/2006">
-    <mc:Choice xmlns:p14="http://schemas.microsoft.com/office/powerpoint/2010/main" Requires="p14">
+  <mc:AlternateContent xmlns:mc="http://schemas.openxmlformats.org/markup-compatibility/2006" xmlns:p14="http://schemas.microsoft.com/office/powerpoint/2010/main">
+    <mc:Choice Requires="p14">
       <p:transition spd="slow" p14:dur="2000"/>
     </mc:Choice>
-    <mc:Fallback>
+    <mc:Fallback xmlns="">
       <p:transition spd="slow"/>
     </mc:Fallback>
   </mc:AlternateContent>
@@ -37264,14 +37265,14 @@
                 <a:gridCol w="957714">
                   <a:extLst>
                     <a:ext uri="{9D8B030D-6E8A-4147-A177-3AD203B41FA5}">
-                      <a16:colId xmlns:a16="http://schemas.microsoft.com/office/drawing/2014/main" xmlns="" val="3940544257"/>
+                      <a16:colId xmlns="" xmlns:a16="http://schemas.microsoft.com/office/drawing/2014/main" val="3940544257"/>
                     </a:ext>
                   </a:extLst>
                 </a:gridCol>
                 <a:gridCol w="2464067">
                   <a:extLst>
                     <a:ext uri="{9D8B030D-6E8A-4147-A177-3AD203B41FA5}">
-                      <a16:colId xmlns:a16="http://schemas.microsoft.com/office/drawing/2014/main" xmlns="" val="3658567973"/>
+                      <a16:colId xmlns="" xmlns:a16="http://schemas.microsoft.com/office/drawing/2014/main" val="3658567973"/>
                     </a:ext>
                   </a:extLst>
                 </a:gridCol>
@@ -37305,7 +37306,7 @@
                 </a:tc>
                 <a:extLst>
                   <a:ext uri="{0D108BD9-81ED-4DB2-BD59-A6C34878D82A}">
-                    <a16:rowId xmlns:a16="http://schemas.microsoft.com/office/drawing/2014/main" xmlns="" val="1032275335"/>
+                    <a16:rowId xmlns="" xmlns:a16="http://schemas.microsoft.com/office/drawing/2014/main" val="1032275335"/>
                   </a:ext>
                 </a:extLst>
               </a:tr>
@@ -37435,7 +37436,7 @@
                 </a:tc>
                 <a:extLst>
                   <a:ext uri="{0D108BD9-81ED-4DB2-BD59-A6C34878D82A}">
-                    <a16:rowId xmlns:a16="http://schemas.microsoft.com/office/drawing/2014/main" xmlns="" val="4191484087"/>
+                    <a16:rowId xmlns="" xmlns:a16="http://schemas.microsoft.com/office/drawing/2014/main" val="4191484087"/>
                   </a:ext>
                 </a:extLst>
               </a:tr>
@@ -37509,7 +37510,7 @@
                 </a:tc>
                 <a:extLst>
                   <a:ext uri="{0D108BD9-81ED-4DB2-BD59-A6C34878D82A}">
-                    <a16:rowId xmlns:a16="http://schemas.microsoft.com/office/drawing/2014/main" xmlns="" val="1864588626"/>
+                    <a16:rowId xmlns="" xmlns:a16="http://schemas.microsoft.com/office/drawing/2014/main" val="1864588626"/>
                   </a:ext>
                 </a:extLst>
               </a:tr>
@@ -37631,7 +37632,7 @@
                 </a:tc>
                 <a:extLst>
                   <a:ext uri="{0D108BD9-81ED-4DB2-BD59-A6C34878D82A}">
-                    <a16:rowId xmlns:a16="http://schemas.microsoft.com/office/drawing/2014/main" xmlns="" val="3035259714"/>
+                    <a16:rowId xmlns="" xmlns:a16="http://schemas.microsoft.com/office/drawing/2014/main" val="3035259714"/>
                   </a:ext>
                 </a:extLst>
               </a:tr>
@@ -37720,7 +37721,7 @@
                 </a:tc>
                 <a:extLst>
                   <a:ext uri="{0D108BD9-81ED-4DB2-BD59-A6C34878D82A}">
-                    <a16:rowId xmlns:a16="http://schemas.microsoft.com/office/drawing/2014/main" xmlns="" val="2023621082"/>
+                    <a16:rowId xmlns="" xmlns:a16="http://schemas.microsoft.com/office/drawing/2014/main" val="2023621082"/>
                   </a:ext>
                 </a:extLst>
               </a:tr>
@@ -37809,7 +37810,7 @@
                 </a:tc>
                 <a:extLst>
                   <a:ext uri="{0D108BD9-81ED-4DB2-BD59-A6C34878D82A}">
-                    <a16:rowId xmlns:a16="http://schemas.microsoft.com/office/drawing/2014/main" xmlns="" val="120016333"/>
+                    <a16:rowId xmlns="" xmlns:a16="http://schemas.microsoft.com/office/drawing/2014/main" val="120016333"/>
                   </a:ext>
                 </a:extLst>
               </a:tr>
@@ -37954,21 +37955,21 @@
                 <a:gridCol w="960120">
                   <a:extLst>
                     <a:ext uri="{9D8B030D-6E8A-4147-A177-3AD203B41FA5}">
-                      <a16:colId xmlns:a16="http://schemas.microsoft.com/office/drawing/2014/main" xmlns="" val="392696932"/>
+                      <a16:colId xmlns="" xmlns:a16="http://schemas.microsoft.com/office/drawing/2014/main" val="392696932"/>
                     </a:ext>
                   </a:extLst>
                 </a:gridCol>
                 <a:gridCol w="2468880">
                   <a:extLst>
                     <a:ext uri="{9D8B030D-6E8A-4147-A177-3AD203B41FA5}">
-                      <a16:colId xmlns:a16="http://schemas.microsoft.com/office/drawing/2014/main" xmlns="" val="2769969192"/>
+                      <a16:colId xmlns="" xmlns:a16="http://schemas.microsoft.com/office/drawing/2014/main" val="2769969192"/>
                     </a:ext>
                   </a:extLst>
                 </a:gridCol>
                 <a:gridCol w="2468880">
                   <a:extLst>
                     <a:ext uri="{9D8B030D-6E8A-4147-A177-3AD203B41FA5}">
-                      <a16:colId xmlns:a16="http://schemas.microsoft.com/office/drawing/2014/main" xmlns="" val="2022610816"/>
+                      <a16:colId xmlns="" xmlns:a16="http://schemas.microsoft.com/office/drawing/2014/main" val="2022610816"/>
                     </a:ext>
                   </a:extLst>
                 </a:gridCol>
@@ -38020,7 +38021,7 @@
                 </a:tc>
                 <a:extLst>
                   <a:ext uri="{0D108BD9-81ED-4DB2-BD59-A6C34878D82A}">
-                    <a16:rowId xmlns:a16="http://schemas.microsoft.com/office/drawing/2014/main" xmlns="" val="2344937666"/>
+                    <a16:rowId xmlns="" xmlns:a16="http://schemas.microsoft.com/office/drawing/2014/main" val="2344937666"/>
                   </a:ext>
                 </a:extLst>
               </a:tr>
@@ -38153,7 +38154,7 @@
                 </a:tc>
                 <a:extLst>
                   <a:ext uri="{0D108BD9-81ED-4DB2-BD59-A6C34878D82A}">
-                    <a16:rowId xmlns:a16="http://schemas.microsoft.com/office/drawing/2014/main" xmlns="" val="1917341330"/>
+                    <a16:rowId xmlns="" xmlns:a16="http://schemas.microsoft.com/office/drawing/2014/main" val="1917341330"/>
                   </a:ext>
                 </a:extLst>
               </a:tr>
@@ -38370,7 +38371,7 @@
                 </a:tc>
                 <a:extLst>
                   <a:ext uri="{0D108BD9-81ED-4DB2-BD59-A6C34878D82A}">
-                    <a16:rowId xmlns:a16="http://schemas.microsoft.com/office/drawing/2014/main" xmlns="" val="3088042860"/>
+                    <a16:rowId xmlns="" xmlns:a16="http://schemas.microsoft.com/office/drawing/2014/main" val="3088042860"/>
                   </a:ext>
                 </a:extLst>
               </a:tr>
@@ -38454,7 +38455,7 @@
                 </a:tc>
                 <a:extLst>
                   <a:ext uri="{0D108BD9-81ED-4DB2-BD59-A6C34878D82A}">
-                    <a16:rowId xmlns:a16="http://schemas.microsoft.com/office/drawing/2014/main" xmlns="" val="2658530722"/>
+                    <a16:rowId xmlns="" xmlns:a16="http://schemas.microsoft.com/office/drawing/2014/main" val="2658530722"/>
                   </a:ext>
                 </a:extLst>
               </a:tr>
@@ -38586,7 +38587,7 @@
                 </a:tc>
                 <a:extLst>
                   <a:ext uri="{0D108BD9-81ED-4DB2-BD59-A6C34878D82A}">
-                    <a16:rowId xmlns:a16="http://schemas.microsoft.com/office/drawing/2014/main" xmlns="" val="1481886367"/>
+                    <a16:rowId xmlns="" xmlns:a16="http://schemas.microsoft.com/office/drawing/2014/main" val="1481886367"/>
                   </a:ext>
                 </a:extLst>
               </a:tr>
@@ -38685,7 +38686,7 @@
                 </a:tc>
                 <a:extLst>
                   <a:ext uri="{0D108BD9-81ED-4DB2-BD59-A6C34878D82A}">
-                    <a16:rowId xmlns:a16="http://schemas.microsoft.com/office/drawing/2014/main" xmlns="" val="4248384778"/>
+                    <a16:rowId xmlns="" xmlns:a16="http://schemas.microsoft.com/office/drawing/2014/main" val="4248384778"/>
                   </a:ext>
                 </a:extLst>
               </a:tr>
@@ -38784,7 +38785,7 @@
                 </a:tc>
                 <a:extLst>
                   <a:ext uri="{0D108BD9-81ED-4DB2-BD59-A6C34878D82A}">
-                    <a16:rowId xmlns:a16="http://schemas.microsoft.com/office/drawing/2014/main" xmlns="" val="1670483340"/>
+                    <a16:rowId xmlns="" xmlns:a16="http://schemas.microsoft.com/office/drawing/2014/main" val="1670483340"/>
                   </a:ext>
                 </a:extLst>
               </a:tr>
@@ -38929,28 +38930,28 @@
                 <a:gridCol w="960120">
                   <a:extLst>
                     <a:ext uri="{9D8B030D-6E8A-4147-A177-3AD203B41FA5}">
-                      <a16:colId xmlns:a16="http://schemas.microsoft.com/office/drawing/2014/main" xmlns="" val="392696932"/>
+                      <a16:colId xmlns="" xmlns:a16="http://schemas.microsoft.com/office/drawing/2014/main" val="392696932"/>
                     </a:ext>
                   </a:extLst>
                 </a:gridCol>
                 <a:gridCol w="2468880">
                   <a:extLst>
                     <a:ext uri="{9D8B030D-6E8A-4147-A177-3AD203B41FA5}">
-                      <a16:colId xmlns:a16="http://schemas.microsoft.com/office/drawing/2014/main" xmlns="" val="2769969192"/>
+                      <a16:colId xmlns="" xmlns:a16="http://schemas.microsoft.com/office/drawing/2014/main" val="2769969192"/>
                     </a:ext>
                   </a:extLst>
                 </a:gridCol>
                 <a:gridCol w="2468880">
                   <a:extLst>
                     <a:ext uri="{9D8B030D-6E8A-4147-A177-3AD203B41FA5}">
-                      <a16:colId xmlns:a16="http://schemas.microsoft.com/office/drawing/2014/main" xmlns="" val="2022610816"/>
+                      <a16:colId xmlns="" xmlns:a16="http://schemas.microsoft.com/office/drawing/2014/main" val="2022610816"/>
                     </a:ext>
                   </a:extLst>
                 </a:gridCol>
                 <a:gridCol w="2468880">
                   <a:extLst>
                     <a:ext uri="{9D8B030D-6E8A-4147-A177-3AD203B41FA5}">
-                      <a16:colId xmlns:a16="http://schemas.microsoft.com/office/drawing/2014/main" xmlns="" val="102813283"/>
+                      <a16:colId xmlns="" xmlns:a16="http://schemas.microsoft.com/office/drawing/2014/main" val="102813283"/>
                     </a:ext>
                   </a:extLst>
                 </a:gridCol>
@@ -39015,7 +39016,7 @@
                 </a:tc>
                 <a:extLst>
                   <a:ext uri="{0D108BD9-81ED-4DB2-BD59-A6C34878D82A}">
-                    <a16:rowId xmlns:a16="http://schemas.microsoft.com/office/drawing/2014/main" xmlns="" val="2344937666"/>
+                    <a16:rowId xmlns="" xmlns:a16="http://schemas.microsoft.com/office/drawing/2014/main" val="2344937666"/>
                   </a:ext>
                 </a:extLst>
               </a:tr>
@@ -39175,7 +39176,7 @@
                 </a:tc>
                 <a:extLst>
                   <a:ext uri="{0D108BD9-81ED-4DB2-BD59-A6C34878D82A}">
-                    <a16:rowId xmlns:a16="http://schemas.microsoft.com/office/drawing/2014/main" xmlns="" val="1917341330"/>
+                    <a16:rowId xmlns="" xmlns:a16="http://schemas.microsoft.com/office/drawing/2014/main" val="1917341330"/>
                   </a:ext>
                 </a:extLst>
               </a:tr>
@@ -39479,7 +39480,7 @@
                 </a:tc>
                 <a:extLst>
                   <a:ext uri="{0D108BD9-81ED-4DB2-BD59-A6C34878D82A}">
-                    <a16:rowId xmlns:a16="http://schemas.microsoft.com/office/drawing/2014/main" xmlns="" val="3088042860"/>
+                    <a16:rowId xmlns="" xmlns:a16="http://schemas.microsoft.com/office/drawing/2014/main" val="3088042860"/>
                   </a:ext>
                 </a:extLst>
               </a:tr>
@@ -39573,7 +39574,7 @@
                 </a:tc>
                 <a:extLst>
                   <a:ext uri="{0D108BD9-81ED-4DB2-BD59-A6C34878D82A}">
-                    <a16:rowId xmlns:a16="http://schemas.microsoft.com/office/drawing/2014/main" xmlns="" val="2658530722"/>
+                    <a16:rowId xmlns="" xmlns:a16="http://schemas.microsoft.com/office/drawing/2014/main" val="2658530722"/>
                   </a:ext>
                 </a:extLst>
               </a:tr>
@@ -39766,7 +39767,7 @@
                 </a:tc>
                 <a:extLst>
                   <a:ext uri="{0D108BD9-81ED-4DB2-BD59-A6C34878D82A}">
-                    <a16:rowId xmlns:a16="http://schemas.microsoft.com/office/drawing/2014/main" xmlns="" val="1481886367"/>
+                    <a16:rowId xmlns="" xmlns:a16="http://schemas.microsoft.com/office/drawing/2014/main" val="1481886367"/>
                   </a:ext>
                 </a:extLst>
               </a:tr>
@@ -39875,7 +39876,7 @@
                 </a:tc>
                 <a:extLst>
                   <a:ext uri="{0D108BD9-81ED-4DB2-BD59-A6C34878D82A}">
-                    <a16:rowId xmlns:a16="http://schemas.microsoft.com/office/drawing/2014/main" xmlns="" val="4248384778"/>
+                    <a16:rowId xmlns="" xmlns:a16="http://schemas.microsoft.com/office/drawing/2014/main" val="4248384778"/>
                   </a:ext>
                 </a:extLst>
               </a:tr>
@@ -39984,7 +39985,7 @@
                 </a:tc>
                 <a:extLst>
                   <a:ext uri="{0D108BD9-81ED-4DB2-BD59-A6C34878D82A}">
-                    <a16:rowId xmlns:a16="http://schemas.microsoft.com/office/drawing/2014/main" xmlns="" val="1670483340"/>
+                    <a16:rowId xmlns="" xmlns:a16="http://schemas.microsoft.com/office/drawing/2014/main" val="1670483340"/>
                   </a:ext>
                 </a:extLst>
               </a:tr>
@@ -40369,14 +40370,14 @@
             <p:ph idx="1"/>
             <p:extLst>
               <p:ext uri="{D42A27DB-BD31-4B8C-83A1-F6EECF244321}">
-                <p14:modId xmlns:p14="http://schemas.microsoft.com/office/powerpoint/2010/main" val="2106636005"/>
+                <p14:modId xmlns:p14="http://schemas.microsoft.com/office/powerpoint/2010/main" val="1612175307"/>
               </p:ext>
             </p:extLst>
           </p:nvPr>
         </p:nvGraphicFramePr>
         <p:xfrm>
           <a:off x="457200" y="1417638"/>
-          <a:ext cx="8229600" cy="3977640"/>
+          <a:ext cx="8229600" cy="4246880"/>
         </p:xfrm>
         <a:graphic>
           <a:graphicData uri="http://schemas.openxmlformats.org/drawingml/2006/table">
@@ -40388,14 +40389,14 @@
                 <a:gridCol w="934278">
                   <a:extLst>
                     <a:ext uri="{9D8B030D-6E8A-4147-A177-3AD203B41FA5}">
-                      <a16:colId xmlns:a16="http://schemas.microsoft.com/office/drawing/2014/main" xmlns="" val="4198655800"/>
+                      <a16:colId xmlns="" xmlns:a16="http://schemas.microsoft.com/office/drawing/2014/main" val="4198655800"/>
                     </a:ext>
                   </a:extLst>
                 </a:gridCol>
                 <a:gridCol w="7295322">
                   <a:extLst>
                     <a:ext uri="{9D8B030D-6E8A-4147-A177-3AD203B41FA5}">
-                      <a16:colId xmlns:a16="http://schemas.microsoft.com/office/drawing/2014/main" xmlns="" val="135413862"/>
+                      <a16:colId xmlns="" xmlns:a16="http://schemas.microsoft.com/office/drawing/2014/main" val="135413862"/>
                     </a:ext>
                   </a:extLst>
                 </a:gridCol>
@@ -40429,7 +40430,71 @@
                 </a:tc>
                 <a:extLst>
                   <a:ext uri="{0D108BD9-81ED-4DB2-BD59-A6C34878D82A}">
-                    <a16:rowId xmlns:a16="http://schemas.microsoft.com/office/drawing/2014/main" xmlns="" val="3068323444"/>
+                    <a16:rowId xmlns="" xmlns:a16="http://schemas.microsoft.com/office/drawing/2014/main" val="3068323444"/>
+                  </a:ext>
+                </a:extLst>
+              </a:tr>
+              <a:tr h="370840">
+                <a:tc>
+                  <a:txBody>
+                    <a:bodyPr/>
+                    <a:lstStyle/>
+                    <a:p>
+                      <a:r>
+                        <a:rPr lang="en-US" dirty="0" smtClean="0"/>
+                        <a:t>2362</a:t>
+                      </a:r>
+                      <a:endParaRPr lang="en-US" dirty="0"/>
+                    </a:p>
+                  </a:txBody>
+                  <a:tcPr/>
+                </a:tc>
+                <a:tc>
+                  <a:txBody>
+                    <a:bodyPr/>
+                    <a:lstStyle/>
+                    <a:p>
+                      <a:pPr marL="0" marR="0" lvl="0" indent="0" algn="l" defTabSz="457200" rtl="0" eaLnBrk="1" fontAlgn="auto" latinLnBrk="0" hangingPunct="1">
+                        <a:lnSpc>
+                          <a:spcPct val="100000"/>
+                        </a:lnSpc>
+                        <a:spcBef>
+                          <a:spcPts val="0"/>
+                        </a:spcBef>
+                        <a:spcAft>
+                          <a:spcPts val="0"/>
+                        </a:spcAft>
+                        <a:buClrTx/>
+                        <a:buSzTx/>
+                        <a:buFontTx/>
+                        <a:buNone/>
+                        <a:tabLst/>
+                        <a:defRPr/>
+                      </a:pPr>
+                      <a:r>
+                        <a:rPr lang="en-US" dirty="0" smtClean="0"/>
+                        <a:t>Show statistics</a:t>
+                      </a:r>
+                      <a:r>
+                        <a:rPr lang="en-US" baseline="0" dirty="0" smtClean="0"/>
+                        <a:t> used by optimizer (SQL 2014 CE) and </a:t>
+                      </a:r>
+                      <a:r>
+                        <a:rPr lang="en-US" i="1" baseline="0" dirty="0" smtClean="0"/>
+                        <a:t>lots</a:t>
+                      </a:r>
+                      <a:r>
+                        <a:rPr lang="en-US" i="0" baseline="0" dirty="0" smtClean="0"/>
+                        <a:t> of other info</a:t>
+                      </a:r>
+                      <a:endParaRPr lang="en-US" dirty="0" smtClean="0"/>
+                    </a:p>
+                  </a:txBody>
+                  <a:tcPr/>
+                </a:tc>
+                <a:extLst>
+                  <a:ext uri="{0D108BD9-81ED-4DB2-BD59-A6C34878D82A}">
+                    <a16:rowId xmlns="" xmlns:a16="http://schemas.microsoft.com/office/drawing/2014/main" val="1586961909"/>
                   </a:ext>
                 </a:extLst>
               </a:tr>
@@ -40462,7 +40527,7 @@
                 </a:tc>
                 <a:extLst>
                   <a:ext uri="{0D108BD9-81ED-4DB2-BD59-A6C34878D82A}">
-                    <a16:rowId xmlns:a16="http://schemas.microsoft.com/office/drawing/2014/main" xmlns="" val="1586961909"/>
+                    <a16:rowId xmlns="" xmlns:a16="http://schemas.microsoft.com/office/drawing/2014/main" val="2280300197"/>
                   </a:ext>
                 </a:extLst>
               </a:tr>
@@ -40500,7 +40565,7 @@
                 </a:tc>
                 <a:extLst>
                   <a:ext uri="{0D108BD9-81ED-4DB2-BD59-A6C34878D82A}">
-                    <a16:rowId xmlns:a16="http://schemas.microsoft.com/office/drawing/2014/main" xmlns="" val="2280300197"/>
+                    <a16:rowId xmlns="" xmlns:a16="http://schemas.microsoft.com/office/drawing/2014/main" val="1192843310"/>
                   </a:ext>
                 </a:extLst>
               </a:tr>
@@ -40538,7 +40603,7 @@
                 </a:tc>
                 <a:extLst>
                   <a:ext uri="{0D108BD9-81ED-4DB2-BD59-A6C34878D82A}">
-                    <a16:rowId xmlns:a16="http://schemas.microsoft.com/office/drawing/2014/main" xmlns="" val="1192843310"/>
+                    <a16:rowId xmlns="" xmlns:a16="http://schemas.microsoft.com/office/drawing/2014/main" val="2620585158"/>
                   </a:ext>
                 </a:extLst>
               </a:tr>
@@ -40576,7 +40641,7 @@
                 </a:tc>
                 <a:extLst>
                   <a:ext uri="{0D108BD9-81ED-4DB2-BD59-A6C34878D82A}">
-                    <a16:rowId xmlns:a16="http://schemas.microsoft.com/office/drawing/2014/main" xmlns="" val="2620585158"/>
+                    <a16:rowId xmlns="" xmlns:a16="http://schemas.microsoft.com/office/drawing/2014/main" val="1697738616"/>
                   </a:ext>
                 </a:extLst>
               </a:tr>
@@ -40609,7 +40674,7 @@
                 </a:tc>
                 <a:extLst>
                   <a:ext uri="{0D108BD9-81ED-4DB2-BD59-A6C34878D82A}">
-                    <a16:rowId xmlns:a16="http://schemas.microsoft.com/office/drawing/2014/main" xmlns="" val="1697738616"/>
+                    <a16:rowId xmlns="" xmlns:a16="http://schemas.microsoft.com/office/drawing/2014/main" val="316611556"/>
                   </a:ext>
                 </a:extLst>
               </a:tr>
@@ -40647,7 +40712,7 @@
                 </a:tc>
                 <a:extLst>
                   <a:ext uri="{0D108BD9-81ED-4DB2-BD59-A6C34878D82A}">
-                    <a16:rowId xmlns:a16="http://schemas.microsoft.com/office/drawing/2014/main" xmlns="" val="316611556"/>
+                    <a16:rowId xmlns="" xmlns:a16="http://schemas.microsoft.com/office/drawing/2014/main" val="1312814102"/>
                   </a:ext>
                 </a:extLst>
               </a:tr>
@@ -40680,7 +40745,7 @@
                 </a:tc>
                 <a:extLst>
                   <a:ext uri="{0D108BD9-81ED-4DB2-BD59-A6C34878D82A}">
-                    <a16:rowId xmlns:a16="http://schemas.microsoft.com/office/drawing/2014/main" xmlns="" val="1312814102"/>
+                    <a16:rowId xmlns="" xmlns:a16="http://schemas.microsoft.com/office/drawing/2014/main" val="1975533996"/>
                   </a:ext>
                 </a:extLst>
               </a:tr>
@@ -40713,40 +40778,7 @@
                 </a:tc>
                 <a:extLst>
                   <a:ext uri="{0D108BD9-81ED-4DB2-BD59-A6C34878D82A}">
-                    <a16:rowId xmlns:a16="http://schemas.microsoft.com/office/drawing/2014/main" xmlns="" val="1975533996"/>
-                  </a:ext>
-                </a:extLst>
-              </a:tr>
-              <a:tr h="370840">
-                <a:tc>
-                  <a:txBody>
-                    <a:bodyPr/>
-                    <a:lstStyle/>
-                    <a:p>
-                      <a:r>
-                        <a:rPr lang="en-US" dirty="0"/>
-                        <a:t>8609</a:t>
-                      </a:r>
-                    </a:p>
-                  </a:txBody>
-                  <a:tcPr/>
-                </a:tc>
-                <a:tc>
-                  <a:txBody>
-                    <a:bodyPr/>
-                    <a:lstStyle/>
-                    <a:p>
-                      <a:r>
-                        <a:rPr lang="en-US" dirty="0"/>
-                        <a:t>Show task and operation type counts</a:t>
-                      </a:r>
-                    </a:p>
-                  </a:txBody>
-                  <a:tcPr/>
-                </a:tc>
-                <a:extLst>
-                  <a:ext uri="{0D108BD9-81ED-4DB2-BD59-A6C34878D82A}">
-                    <a16:rowId xmlns:a16="http://schemas.microsoft.com/office/drawing/2014/main" xmlns="" val="2759032957"/>
+                    <a16:rowId xmlns="" xmlns:a16="http://schemas.microsoft.com/office/drawing/2014/main" val="2759032957"/>
                   </a:ext>
                 </a:extLst>
               </a:tr>
@@ -40816,14 +40848,14 @@
             <p:ph idx="1"/>
             <p:extLst>
               <p:ext uri="{D42A27DB-BD31-4B8C-83A1-F6EECF244321}">
-                <p14:modId xmlns:p14="http://schemas.microsoft.com/office/powerpoint/2010/main" val="4213218285"/>
+                <p14:modId xmlns:p14="http://schemas.microsoft.com/office/powerpoint/2010/main" val="455997283"/>
               </p:ext>
             </p:extLst>
           </p:nvPr>
         </p:nvGraphicFramePr>
         <p:xfrm>
           <a:off x="457200" y="1417638"/>
-          <a:ext cx="8229600" cy="4450080"/>
+          <a:ext cx="8229600" cy="4079240"/>
         </p:xfrm>
         <a:graphic>
           <a:graphicData uri="http://schemas.openxmlformats.org/drawingml/2006/table">
@@ -40835,14 +40867,14 @@
                 <a:gridCol w="934278">
                   <a:extLst>
                     <a:ext uri="{9D8B030D-6E8A-4147-A177-3AD203B41FA5}">
-                      <a16:colId xmlns:a16="http://schemas.microsoft.com/office/drawing/2014/main" xmlns="" val="4198655800"/>
+                      <a16:colId xmlns="" xmlns:a16="http://schemas.microsoft.com/office/drawing/2014/main" val="4198655800"/>
                     </a:ext>
                   </a:extLst>
                 </a:gridCol>
                 <a:gridCol w="7295322">
                   <a:extLst>
                     <a:ext uri="{9D8B030D-6E8A-4147-A177-3AD203B41FA5}">
-                      <a16:colId xmlns:a16="http://schemas.microsoft.com/office/drawing/2014/main" xmlns="" val="135413862"/>
+                      <a16:colId xmlns="" xmlns:a16="http://schemas.microsoft.com/office/drawing/2014/main" val="135413862"/>
                     </a:ext>
                   </a:extLst>
                 </a:gridCol>
@@ -40876,7 +40908,40 @@
                 </a:tc>
                 <a:extLst>
                   <a:ext uri="{0D108BD9-81ED-4DB2-BD59-A6C34878D82A}">
-                    <a16:rowId xmlns:a16="http://schemas.microsoft.com/office/drawing/2014/main" xmlns="" val="3068323444"/>
+                    <a16:rowId xmlns="" xmlns:a16="http://schemas.microsoft.com/office/drawing/2014/main" val="3068323444"/>
+                  </a:ext>
+                </a:extLst>
+              </a:tr>
+              <a:tr h="370840">
+                <a:tc>
+                  <a:txBody>
+                    <a:bodyPr/>
+                    <a:lstStyle/>
+                    <a:p>
+                      <a:r>
+                        <a:rPr lang="en-US" dirty="0"/>
+                        <a:t>8609</a:t>
+                      </a:r>
+                    </a:p>
+                  </a:txBody>
+                  <a:tcPr/>
+                </a:tc>
+                <a:tc>
+                  <a:txBody>
+                    <a:bodyPr/>
+                    <a:lstStyle/>
+                    <a:p>
+                      <a:r>
+                        <a:rPr lang="en-US" dirty="0"/>
+                        <a:t>Show task and operation type counts</a:t>
+                      </a:r>
+                    </a:p>
+                  </a:txBody>
+                  <a:tcPr/>
+                </a:tc>
+                <a:extLst>
+                  <a:ext uri="{0D108BD9-81ED-4DB2-BD59-A6C34878D82A}">
+                    <a16:rowId xmlns="" xmlns:a16="http://schemas.microsoft.com/office/drawing/2014/main" val="2484981654"/>
                   </a:ext>
                 </a:extLst>
               </a:tr>
@@ -40909,7 +40974,7 @@
                 </a:tc>
                 <a:extLst>
                   <a:ext uri="{0D108BD9-81ED-4DB2-BD59-A6C34878D82A}">
-                    <a16:rowId xmlns:a16="http://schemas.microsoft.com/office/drawing/2014/main" xmlns="" val="2484981654"/>
+                    <a16:rowId xmlns="" xmlns:a16="http://schemas.microsoft.com/office/drawing/2014/main" val="1377910784"/>
                   </a:ext>
                 </a:extLst>
               </a:tr>
@@ -40947,7 +41012,7 @@
                 </a:tc>
                 <a:extLst>
                   <a:ext uri="{0D108BD9-81ED-4DB2-BD59-A6C34878D82A}">
-                    <a16:rowId xmlns:a16="http://schemas.microsoft.com/office/drawing/2014/main" xmlns="" val="1377910784"/>
+                    <a16:rowId xmlns="" xmlns:a16="http://schemas.microsoft.com/office/drawing/2014/main" val="1387856053"/>
                   </a:ext>
                 </a:extLst>
               </a:tr>
@@ -40980,7 +41045,7 @@
                 </a:tc>
                 <a:extLst>
                   <a:ext uri="{0D108BD9-81ED-4DB2-BD59-A6C34878D82A}">
-                    <a16:rowId xmlns:a16="http://schemas.microsoft.com/office/drawing/2014/main" xmlns="" val="1387856053"/>
+                    <a16:rowId xmlns="" xmlns:a16="http://schemas.microsoft.com/office/drawing/2014/main" val="2599123823"/>
                   </a:ext>
                 </a:extLst>
               </a:tr>
@@ -41018,7 +41083,7 @@
                 </a:tc>
                 <a:extLst>
                   <a:ext uri="{0D108BD9-81ED-4DB2-BD59-A6C34878D82A}">
-                    <a16:rowId xmlns:a16="http://schemas.microsoft.com/office/drawing/2014/main" xmlns="" val="2599123823"/>
+                    <a16:rowId xmlns="" xmlns:a16="http://schemas.microsoft.com/office/drawing/2014/main" val="1232603862"/>
                   </a:ext>
                 </a:extLst>
               </a:tr>
@@ -41059,7 +41124,7 @@
                 </a:tc>
                 <a:extLst>
                   <a:ext uri="{0D108BD9-81ED-4DB2-BD59-A6C34878D82A}">
-                    <a16:rowId xmlns:a16="http://schemas.microsoft.com/office/drawing/2014/main" xmlns="" val="1232603862"/>
+                    <a16:rowId xmlns="" xmlns:a16="http://schemas.microsoft.com/office/drawing/2014/main" val="4145944521"/>
                   </a:ext>
                 </a:extLst>
               </a:tr>
@@ -41092,7 +41157,7 @@
                 </a:tc>
                 <a:extLst>
                   <a:ext uri="{0D108BD9-81ED-4DB2-BD59-A6C34878D82A}">
-                    <a16:rowId xmlns:a16="http://schemas.microsoft.com/office/drawing/2014/main" xmlns="" val="4145944521"/>
+                    <a16:rowId xmlns="" xmlns:a16="http://schemas.microsoft.com/office/drawing/2014/main" val="2954677722"/>
                   </a:ext>
                 </a:extLst>
               </a:tr>
@@ -41130,7 +41195,7 @@
                 </a:tc>
                 <a:extLst>
                   <a:ext uri="{0D108BD9-81ED-4DB2-BD59-A6C34878D82A}">
-                    <a16:rowId xmlns:a16="http://schemas.microsoft.com/office/drawing/2014/main" xmlns="" val="2954677722"/>
+                    <a16:rowId xmlns="" xmlns:a16="http://schemas.microsoft.com/office/drawing/2014/main" val="205903975"/>
                   </a:ext>
                 </a:extLst>
               </a:tr>
@@ -41163,7 +41228,7 @@
                 </a:tc>
                 <a:extLst>
                   <a:ext uri="{0D108BD9-81ED-4DB2-BD59-A6C34878D82A}">
-                    <a16:rowId xmlns:a16="http://schemas.microsoft.com/office/drawing/2014/main" xmlns="" val="205903975"/>
+                    <a16:rowId xmlns="" xmlns:a16="http://schemas.microsoft.com/office/drawing/2014/main" val="2893595017"/>
                   </a:ext>
                 </a:extLst>
               </a:tr>
@@ -41194,9 +41259,235 @@
                   </a:txBody>
                   <a:tcPr/>
                 </a:tc>
+              </a:tr>
+            </a:tbl>
+          </a:graphicData>
+        </a:graphic>
+      </p:graphicFrame>
+    </p:spTree>
+    <p:extLst>
+      <p:ext uri="{BB962C8B-B14F-4D97-AF65-F5344CB8AC3E}">
+        <p14:creationId xmlns:p14="http://schemas.microsoft.com/office/powerpoint/2010/main" val="2226135712"/>
+      </p:ext>
+    </p:extLst>
+  </p:cSld>
+  <p:clrMapOvr>
+    <a:masterClrMapping/>
+  </p:clrMapOvr>
+</p:sld>
+</file>
+
+<file path=ppt/slides/slide6.xml><?xml version="1.0" encoding="utf-8"?>
+<p:sld xmlns:a="http://schemas.openxmlformats.org/drawingml/2006/main" xmlns:r="http://schemas.openxmlformats.org/officeDocument/2006/relationships" xmlns:p="http://schemas.openxmlformats.org/presentationml/2006/main">
+  <p:cSld>
+    <p:spTree>
+      <p:nvGrpSpPr>
+        <p:cNvPr id="1" name=""/>
+        <p:cNvGrpSpPr/>
+        <p:nvPr/>
+      </p:nvGrpSpPr>
+      <p:grpSpPr>
+        <a:xfrm>
+          <a:off x="0" y="0"/>
+          <a:ext cx="0" cy="0"/>
+          <a:chOff x="0" y="0"/>
+          <a:chExt cx="0" cy="0"/>
+        </a:xfrm>
+      </p:grpSpPr>
+      <p:sp>
+        <p:nvSpPr>
+          <p:cNvPr id="2" name="Title 1"/>
+          <p:cNvSpPr>
+            <a:spLocks noGrp="1"/>
+          </p:cNvSpPr>
+          <p:nvPr>
+            <p:ph type="title"/>
+          </p:nvPr>
+        </p:nvSpPr>
+        <p:spPr/>
+        <p:txBody>
+          <a:bodyPr/>
+          <a:lstStyle/>
+          <a:p>
+            <a:r>
+              <a:rPr lang="en-US" dirty="0"/>
+              <a:t>Logical Processing Order</a:t>
+            </a:r>
+          </a:p>
+        </p:txBody>
+      </p:sp>
+      <p:sp>
+        <p:nvSpPr>
+          <p:cNvPr id="3" name="Content Placeholder 2"/>
+          <p:cNvSpPr>
+            <a:spLocks noGrp="1"/>
+          </p:cNvSpPr>
+          <p:nvPr>
+            <p:ph idx="1"/>
+          </p:nvPr>
+        </p:nvSpPr>
+        <p:spPr/>
+        <p:txBody>
+          <a:bodyPr>
+            <a:normAutofit/>
+          </a:bodyPr>
+          <a:lstStyle/>
+          <a:p>
+            <a:r>
+              <a:rPr lang="en-US" dirty="0"/>
+              <a:t>Defines the sequence in which SQL elements are logically processed</a:t>
+            </a:r>
+          </a:p>
+          <a:p>
+            <a:r>
+              <a:rPr lang="en-US" dirty="0"/>
+              <a:t>Forms the starting basis for parsing the submitted query</a:t>
+            </a:r>
+          </a:p>
+          <a:p>
+            <a:r>
+              <a:rPr lang="en-US" dirty="0"/>
+              <a:t>Usually discussed from the perspective of a SELECT query; similar for UPDATE / DELETE / INSERT / MERGE</a:t>
+            </a:r>
+          </a:p>
+          <a:p>
+            <a:r>
+              <a:rPr lang="en-US" dirty="0"/>
+              <a:t>Declarative vs procedural programming</a:t>
+            </a:r>
+          </a:p>
+          <a:p>
+            <a:pPr lvl="1"/>
+            <a:r>
+              <a:rPr lang="en-US" dirty="0"/>
+              <a:t>“What” vs “How”</a:t>
+            </a:r>
+          </a:p>
+        </p:txBody>
+      </p:sp>
+    </p:spTree>
+    <p:extLst>
+      <p:ext uri="{BB962C8B-B14F-4D97-AF65-F5344CB8AC3E}">
+        <p14:creationId xmlns:p14="http://schemas.microsoft.com/office/powerpoint/2010/main" val="782615263"/>
+      </p:ext>
+    </p:extLst>
+  </p:cSld>
+  <p:clrMapOvr>
+    <a:masterClrMapping/>
+  </p:clrMapOvr>
+</p:sld>
+</file>
+
+<file path=ppt/slides/slide60.xml><?xml version="1.0" encoding="utf-8"?>
+<p:sld xmlns:a="http://schemas.openxmlformats.org/drawingml/2006/main" xmlns:r="http://schemas.openxmlformats.org/officeDocument/2006/relationships" xmlns:p="http://schemas.openxmlformats.org/presentationml/2006/main">
+  <p:cSld>
+    <p:spTree>
+      <p:nvGrpSpPr>
+        <p:cNvPr id="1" name=""/>
+        <p:cNvGrpSpPr/>
+        <p:nvPr/>
+      </p:nvGrpSpPr>
+      <p:grpSpPr>
+        <a:xfrm>
+          <a:off x="0" y="0"/>
+          <a:ext cx="0" cy="0"/>
+          <a:chOff x="0" y="0"/>
+          <a:chExt cx="0" cy="0"/>
+        </a:xfrm>
+      </p:grpSpPr>
+      <p:sp>
+        <p:nvSpPr>
+          <p:cNvPr id="2" name="Title 1"/>
+          <p:cNvSpPr>
+            <a:spLocks noGrp="1"/>
+          </p:cNvSpPr>
+          <p:nvPr>
+            <p:ph type="title"/>
+          </p:nvPr>
+        </p:nvSpPr>
+        <p:spPr/>
+        <p:txBody>
+          <a:bodyPr/>
+          <a:lstStyle/>
+          <a:p>
+            <a:r>
+              <a:rPr lang="en-US" dirty="0"/>
+              <a:t>Appendix: Trace Flags, continued</a:t>
+            </a:r>
+          </a:p>
+        </p:txBody>
+      </p:sp>
+      <p:graphicFrame>
+        <p:nvGraphicFramePr>
+          <p:cNvPr id="4" name="Content Placeholder 3"/>
+          <p:cNvGraphicFramePr>
+            <a:graphicFrameLocks noGrp="1"/>
+          </p:cNvGraphicFramePr>
+          <p:nvPr>
+            <p:ph idx="1"/>
+            <p:extLst>
+              <p:ext uri="{D42A27DB-BD31-4B8C-83A1-F6EECF244321}">
+                <p14:modId xmlns:p14="http://schemas.microsoft.com/office/powerpoint/2010/main" val="2723114824"/>
+              </p:ext>
+            </p:extLst>
+          </p:nvPr>
+        </p:nvGraphicFramePr>
+        <p:xfrm>
+          <a:off x="457200" y="1417638"/>
+          <a:ext cx="8229600" cy="1854200"/>
+        </p:xfrm>
+        <a:graphic>
+          <a:graphicData uri="http://schemas.openxmlformats.org/drawingml/2006/table">
+            <a:tbl>
+              <a:tblPr firstRow="1" bandRow="1">
+                <a:tableStyleId>{5C22544A-7EE6-4342-B048-85BDC9FD1C3A}</a:tableStyleId>
+              </a:tblPr>
+              <a:tblGrid>
+                <a:gridCol w="934278">
+                  <a:extLst>
+                    <a:ext uri="{9D8B030D-6E8A-4147-A177-3AD203B41FA5}">
+                      <a16:colId xmlns="" xmlns:a16="http://schemas.microsoft.com/office/drawing/2014/main" val="4198655800"/>
+                    </a:ext>
+                  </a:extLst>
+                </a:gridCol>
+                <a:gridCol w="7295322">
+                  <a:extLst>
+                    <a:ext uri="{9D8B030D-6E8A-4147-A177-3AD203B41FA5}">
+                      <a16:colId xmlns="" xmlns:a16="http://schemas.microsoft.com/office/drawing/2014/main" val="135413862"/>
+                    </a:ext>
+                  </a:extLst>
+                </a:gridCol>
+              </a:tblGrid>
+              <a:tr h="370840">
+                <a:tc>
+                  <a:txBody>
+                    <a:bodyPr/>
+                    <a:lstStyle/>
+                    <a:p>
+                      <a:r>
+                        <a:rPr lang="en-US" dirty="0"/>
+                        <a:t>TF</a:t>
+                      </a:r>
+                    </a:p>
+                  </a:txBody>
+                  <a:tcPr/>
+                </a:tc>
+                <a:tc>
+                  <a:txBody>
+                    <a:bodyPr/>
+                    <a:lstStyle/>
+                    <a:p>
+                      <a:r>
+                        <a:rPr lang="en-US" dirty="0"/>
+                        <a:t>Meaning</a:t>
+                      </a:r>
+                    </a:p>
+                  </a:txBody>
+                  <a:tcPr/>
+                </a:tc>
                 <a:extLst>
                   <a:ext uri="{0D108BD9-81ED-4DB2-BD59-A6C34878D82A}">
-                    <a16:rowId xmlns:a16="http://schemas.microsoft.com/office/drawing/2014/main" xmlns="" val="2893595017"/>
+                    <a16:rowId xmlns="" xmlns:a16="http://schemas.microsoft.com/office/drawing/2014/main" val="3068323444"/>
                   </a:ext>
                 </a:extLst>
               </a:tr>
@@ -41262,6 +41553,91 @@
                   <a:tcPr/>
                 </a:tc>
               </a:tr>
+              <a:tr h="370840">
+                <a:tc>
+                  <a:txBody>
+                    <a:bodyPr/>
+                    <a:lstStyle/>
+                    <a:p>
+                      <a:r>
+                        <a:rPr lang="en-US" dirty="0" smtClean="0"/>
+                        <a:t>9204</a:t>
+                      </a:r>
+                      <a:endParaRPr lang="en-US" dirty="0"/>
+                    </a:p>
+                  </a:txBody>
+                  <a:tcPr/>
+                </a:tc>
+                <a:tc>
+                  <a:txBody>
+                    <a:bodyPr/>
+                    <a:lstStyle/>
+                    <a:p>
+                      <a:pPr marL="0" marR="0" lvl="0" indent="0" algn="l" defTabSz="457200" rtl="0" eaLnBrk="1" fontAlgn="auto" latinLnBrk="0" hangingPunct="1">
+                        <a:lnSpc>
+                          <a:spcPct val="100000"/>
+                        </a:lnSpc>
+                        <a:spcBef>
+                          <a:spcPts val="0"/>
+                        </a:spcBef>
+                        <a:spcAft>
+                          <a:spcPts val="0"/>
+                        </a:spcAft>
+                        <a:buClrTx/>
+                        <a:buSzTx/>
+                        <a:buFontTx/>
+                        <a:buNone/>
+                        <a:tabLst/>
+                        <a:defRPr/>
+                      </a:pPr>
+                      <a:r>
+                        <a:rPr lang="en-US" dirty="0" smtClean="0"/>
+                        <a:t>Show statistics</a:t>
+                      </a:r>
+                      <a:r>
+                        <a:rPr lang="en-US" baseline="0" dirty="0" smtClean="0"/>
+                        <a:t> used by optimizer (fully loaded) (SQL 7 CE only)</a:t>
+                      </a:r>
+                      <a:endParaRPr lang="en-US" dirty="0" smtClean="0"/>
+                    </a:p>
+                  </a:txBody>
+                  <a:tcPr/>
+                </a:tc>
+              </a:tr>
+              <a:tr h="370840">
+                <a:tc>
+                  <a:txBody>
+                    <a:bodyPr/>
+                    <a:lstStyle/>
+                    <a:p>
+                      <a:r>
+                        <a:rPr lang="en-US" dirty="0" smtClean="0"/>
+                        <a:t>9292</a:t>
+                      </a:r>
+                      <a:endParaRPr lang="en-US" dirty="0"/>
+                    </a:p>
+                  </a:txBody>
+                  <a:tcPr/>
+                </a:tc>
+                <a:tc>
+                  <a:txBody>
+                    <a:bodyPr/>
+                    <a:lstStyle/>
+                    <a:p>
+                      <a:r>
+                        <a:rPr lang="en-US" dirty="0" smtClean="0"/>
+                        <a:t>Show statistics</a:t>
+                      </a:r>
+                      <a:r>
+                        <a:rPr lang="en-US" baseline="0" dirty="0" smtClean="0"/>
+                        <a:t> used by optimizer (header only) (SQL 7 CE only)</a:t>
+                      </a:r>
+                      <a:endParaRPr lang="en-US" dirty="0"/>
+                    </a:p>
+                  </a:txBody>
+                  <a:tcPr/>
+                </a:tc>
+              </a:tr>
             </a:tbl>
           </a:graphicData>
         </a:graphic>
@@ -41298,236 +41674,7 @@
     </p:spTree>
     <p:extLst>
       <p:ext uri="{BB962C8B-B14F-4D97-AF65-F5344CB8AC3E}">
-        <p14:creationId xmlns:p14="http://schemas.microsoft.com/office/powerpoint/2010/main" val="2226135712"/>
-      </p:ext>
-    </p:extLst>
-  </p:cSld>
-  <p:clrMapOvr>
-    <a:masterClrMapping/>
-  </p:clrMapOvr>
-</p:sld>
-</file>
-
-<file path=ppt/slides/slide6.xml><?xml version="1.0" encoding="utf-8"?>
-<p:sld xmlns:a="http://schemas.openxmlformats.org/drawingml/2006/main" xmlns:r="http://schemas.openxmlformats.org/officeDocument/2006/relationships" xmlns:p="http://schemas.openxmlformats.org/presentationml/2006/main">
-  <p:cSld>
-    <p:spTree>
-      <p:nvGrpSpPr>
-        <p:cNvPr id="1" name=""/>
-        <p:cNvGrpSpPr/>
-        <p:nvPr/>
-      </p:nvGrpSpPr>
-      <p:grpSpPr>
-        <a:xfrm>
-          <a:off x="0" y="0"/>
-          <a:ext cx="0" cy="0"/>
-          <a:chOff x="0" y="0"/>
-          <a:chExt cx="0" cy="0"/>
-        </a:xfrm>
-      </p:grpSpPr>
-      <p:sp>
-        <p:nvSpPr>
-          <p:cNvPr id="2" name="Title 1"/>
-          <p:cNvSpPr>
-            <a:spLocks noGrp="1"/>
-          </p:cNvSpPr>
-          <p:nvPr>
-            <p:ph type="title"/>
-          </p:nvPr>
-        </p:nvSpPr>
-        <p:spPr/>
-        <p:txBody>
-          <a:bodyPr/>
-          <a:lstStyle/>
-          <a:p>
-            <a:r>
-              <a:rPr lang="en-US" dirty="0"/>
-              <a:t>Logical Processing Order</a:t>
-            </a:r>
-          </a:p>
-        </p:txBody>
-      </p:sp>
-      <p:sp>
-        <p:nvSpPr>
-          <p:cNvPr id="3" name="Content Placeholder 2"/>
-          <p:cNvSpPr>
-            <a:spLocks noGrp="1"/>
-          </p:cNvSpPr>
-          <p:nvPr>
-            <p:ph idx="1"/>
-          </p:nvPr>
-        </p:nvSpPr>
-        <p:spPr/>
-        <p:txBody>
-          <a:bodyPr>
-            <a:normAutofit/>
-          </a:bodyPr>
-          <a:lstStyle/>
-          <a:p>
-            <a:r>
-              <a:rPr lang="en-US" dirty="0"/>
-              <a:t>Defines the sequence in which SQL elements are logically processed</a:t>
-            </a:r>
-          </a:p>
-          <a:p>
-            <a:r>
-              <a:rPr lang="en-US" dirty="0"/>
-              <a:t>Forms the starting basis for parsing the submitted query</a:t>
-            </a:r>
-          </a:p>
-          <a:p>
-            <a:r>
-              <a:rPr lang="en-US" dirty="0"/>
-              <a:t>Usually discussed from the perspective of a SELECT query; similar for UPDATE / DELETE / INSERT / MERGE</a:t>
-            </a:r>
-          </a:p>
-          <a:p>
-            <a:r>
-              <a:rPr lang="en-US" dirty="0"/>
-              <a:t>Declarative vs procedural programming</a:t>
-            </a:r>
-          </a:p>
-          <a:p>
-            <a:pPr lvl="1"/>
-            <a:r>
-              <a:rPr lang="en-US" dirty="0"/>
-              <a:t>“What” vs “How”</a:t>
-            </a:r>
-          </a:p>
-        </p:txBody>
-      </p:sp>
-    </p:spTree>
-    <p:extLst>
-      <p:ext uri="{BB962C8B-B14F-4D97-AF65-F5344CB8AC3E}">
-        <p14:creationId xmlns:p14="http://schemas.microsoft.com/office/powerpoint/2010/main" val="782615263"/>
-      </p:ext>
-    </p:extLst>
-  </p:cSld>
-  <p:clrMapOvr>
-    <a:masterClrMapping/>
-  </p:clrMapOvr>
-</p:sld>
-</file>
-
-<file path=ppt/slides/slide60.xml><?xml version="1.0" encoding="utf-8"?>
-<p:sld xmlns:a="http://schemas.openxmlformats.org/drawingml/2006/main" xmlns:r="http://schemas.openxmlformats.org/officeDocument/2006/relationships" xmlns:p="http://schemas.openxmlformats.org/presentationml/2006/main">
-  <p:cSld>
-    <p:spTree>
-      <p:nvGrpSpPr>
-        <p:cNvPr id="1" name=""/>
-        <p:cNvGrpSpPr/>
-        <p:nvPr/>
-      </p:nvGrpSpPr>
-      <p:grpSpPr>
-        <a:xfrm>
-          <a:off x="0" y="0"/>
-          <a:ext cx="0" cy="0"/>
-          <a:chOff x="0" y="0"/>
-          <a:chExt cx="0" cy="0"/>
-        </a:xfrm>
-      </p:grpSpPr>
-      <p:sp>
-        <p:nvSpPr>
-          <p:cNvPr id="2" name="Title 1"/>
-          <p:cNvSpPr>
-            <a:spLocks noGrp="1"/>
-          </p:cNvSpPr>
-          <p:nvPr>
-            <p:ph type="title"/>
-          </p:nvPr>
-        </p:nvSpPr>
-        <p:spPr/>
-        <p:txBody>
-          <a:bodyPr/>
-          <a:lstStyle/>
-          <a:p>
-            <a:r>
-              <a:rPr lang="en-US" dirty="0"/>
-              <a:t>Appendix: Commands</a:t>
-            </a:r>
-          </a:p>
-        </p:txBody>
-      </p:sp>
-      <p:sp>
-        <p:nvSpPr>
-          <p:cNvPr id="3" name="Content Placeholder 2"/>
-          <p:cNvSpPr>
-            <a:spLocks noGrp="1"/>
-          </p:cNvSpPr>
-          <p:nvPr>
-            <p:ph idx="1"/>
-          </p:nvPr>
-        </p:nvSpPr>
-        <p:spPr/>
-        <p:txBody>
-          <a:bodyPr/>
-          <a:lstStyle/>
-          <a:p>
-            <a:r>
-              <a:rPr lang="en-US" dirty="0"/>
-              <a:t>DBCC TRACEON / TRACEOFF</a:t>
-            </a:r>
-          </a:p>
-          <a:p>
-            <a:r>
-              <a:rPr lang="en-US" dirty="0"/>
-              <a:t>DBCC RULEON / RULEOFF</a:t>
-            </a:r>
-          </a:p>
-          <a:p>
-            <a:r>
-              <a:rPr lang="en-US" dirty="0"/>
-              <a:t>DBCC SHOWONRULES</a:t>
-            </a:r>
-          </a:p>
-          <a:p>
-            <a:r>
-              <a:rPr lang="en-US" dirty="0"/>
-              <a:t>DBCC SHOWOFFRULES</a:t>
-            </a:r>
-          </a:p>
-          <a:p>
-            <a:r>
-              <a:rPr lang="en-US" dirty="0"/>
-              <a:t>option (recompile, </a:t>
-            </a:r>
-            <a:r>
-              <a:rPr lang="en-US" dirty="0" err="1"/>
-              <a:t>querytraceon</a:t>
-            </a:r>
-            <a:r>
-              <a:rPr lang="en-US" dirty="0"/>
-              <a:t> ####, </a:t>
-            </a:r>
-            <a:r>
-              <a:rPr lang="en-US" dirty="0" err="1"/>
-              <a:t>queryruleoff</a:t>
-            </a:r>
-            <a:r>
-              <a:rPr lang="en-US" dirty="0"/>
-              <a:t> ‘xxx’)</a:t>
-            </a:r>
-          </a:p>
-          <a:p>
-            <a:r>
-              <a:rPr lang="en-US" dirty="0" err="1"/>
-              <a:t>sys.dm_exec_query_optimizer_info</a:t>
-            </a:r>
-            <a:endParaRPr lang="en-US" dirty="0"/>
-          </a:p>
-          <a:p>
-            <a:r>
-              <a:rPr lang="en-US" dirty="0" err="1"/>
-              <a:t>sys.dm_exec_query_transformation_stats</a:t>
-            </a:r>
-            <a:endParaRPr lang="en-US" dirty="0"/>
-          </a:p>
-        </p:txBody>
-      </p:sp>
-    </p:spTree>
-    <p:extLst>
-      <p:ext uri="{BB962C8B-B14F-4D97-AF65-F5344CB8AC3E}">
-        <p14:creationId xmlns:p14="http://schemas.microsoft.com/office/powerpoint/2010/main" val="400255049"/>
+        <p14:creationId xmlns:p14="http://schemas.microsoft.com/office/powerpoint/2010/main" val="583827231"/>
       </p:ext>
     </p:extLst>
   </p:cSld>
@@ -41571,7 +41718,7 @@
           <a:p>
             <a:r>
               <a:rPr lang="en-US" dirty="0"/>
-              <a:t>Appendix: History of SQL’s Optimizer</a:t>
+              <a:t>Appendix: Commands</a:t>
             </a:r>
           </a:p>
         </p:txBody>
@@ -41593,104 +41740,69 @@
           <a:p>
             <a:r>
               <a:rPr lang="en-US" dirty="0"/>
-              <a:t>Volcano Optimizer (April 1993) (</a:t>
-            </a:r>
-            <a:r>
-              <a:rPr lang="en-US" dirty="0">
-                <a:hlinkClick r:id="rId2"/>
-              </a:rPr>
-              <a:t>PDF</a:t>
-            </a:r>
+              <a:t>DBCC TRACEON / TRACEOFF</a:t>
+            </a:r>
+          </a:p>
+          <a:p>
             <a:r>
               <a:rPr lang="en-US" dirty="0"/>
-              <a:t>)</a:t>
-            </a:r>
-          </a:p>
-          <a:p>
-            <a:pPr lvl="1"/>
+              <a:t>DBCC RULEON / RULEOFF</a:t>
+            </a:r>
+          </a:p>
+          <a:p>
             <a:r>
               <a:rPr lang="en-US" dirty="0"/>
-              <a:t>Goetz </a:t>
+              <a:t>DBCC SHOWONRULES</a:t>
+            </a:r>
+          </a:p>
+          <a:p>
+            <a:r>
+              <a:rPr lang="en-US" dirty="0"/>
+              <a:t>DBCC SHOWOFFRULES</a:t>
+            </a:r>
+          </a:p>
+          <a:p>
+            <a:r>
+              <a:rPr lang="en-US" dirty="0"/>
+              <a:t>option (recompile, </a:t>
             </a:r>
             <a:r>
               <a:rPr lang="en-US" dirty="0" err="1"/>
-              <a:t>Graefe</a:t>
+              <a:t>querytraceon</a:t>
             </a:r>
             <a:r>
               <a:rPr lang="en-US" dirty="0"/>
-              <a:t>, William J. McKenna</a:t>
-            </a:r>
-          </a:p>
-          <a:p>
-            <a:pPr lvl="1"/>
+              <a:t> ####, </a:t>
+            </a:r>
+            <a:r>
+              <a:rPr lang="en-US" dirty="0" err="1"/>
+              <a:t>queryruleoff</a:t>
+            </a:r>
             <a:r>
               <a:rPr lang="en-US" dirty="0"/>
-              <a:t>Based on </a:t>
-            </a:r>
+              <a:t> ‘xxx’)</a:t>
+            </a:r>
+          </a:p>
+          <a:p>
             <a:r>
               <a:rPr lang="en-US" dirty="0" err="1"/>
-              <a:t>Graefe’s</a:t>
-            </a:r>
-            <a:r>
-              <a:rPr lang="en-US" dirty="0"/>
-              <a:t> earlier Exodus Optimizer</a:t>
-            </a:r>
-          </a:p>
-          <a:p>
-            <a:r>
-              <a:rPr lang="en-US" dirty="0"/>
-              <a:t>Cascades Framework (1995) (</a:t>
-            </a:r>
-            <a:r>
-              <a:rPr lang="en-US" dirty="0">
-                <a:hlinkClick r:id="rId3"/>
-              </a:rPr>
-              <a:t>PDF</a:t>
-            </a:r>
-            <a:r>
-              <a:rPr lang="en-US" dirty="0"/>
-              <a:t>)</a:t>
-            </a:r>
-          </a:p>
-          <a:p>
-            <a:pPr lvl="1"/>
-            <a:r>
-              <a:rPr lang="en-US" dirty="0"/>
-              <a:t>Goetz </a:t>
-            </a:r>
+              <a:t>sys.dm_exec_query_optimizer_info</a:t>
+            </a:r>
+            <a:endParaRPr lang="en-US" dirty="0"/>
+          </a:p>
+          <a:p>
             <a:r>
               <a:rPr lang="en-US" dirty="0" err="1"/>
-              <a:t>Graefe</a:t>
+              <a:t>sys.dm_exec_query_transformation_stats</a:t>
             </a:r>
             <a:endParaRPr lang="en-US" dirty="0"/>
-          </a:p>
-          <a:p>
-            <a:pPr lvl="1"/>
-            <a:r>
-              <a:rPr lang="en-US" dirty="0"/>
-              <a:t>Refinement of the Volcano Optimizer</a:t>
-            </a:r>
-          </a:p>
-          <a:p>
-            <a:pPr lvl="1"/>
-            <a:r>
-              <a:rPr lang="en-US" dirty="0"/>
-              <a:t>Basis for rewritten optimizer in SQL Server 7.0</a:t>
-            </a:r>
-          </a:p>
-          <a:p>
-            <a:pPr lvl="1"/>
-            <a:r>
-              <a:rPr lang="en-US" dirty="0"/>
-              <a:t>Major innovation: the memo structure</a:t>
-            </a:r>
           </a:p>
         </p:txBody>
       </p:sp>
     </p:spTree>
     <p:extLst>
       <p:ext uri="{BB962C8B-B14F-4D97-AF65-F5344CB8AC3E}">
-        <p14:creationId xmlns:p14="http://schemas.microsoft.com/office/powerpoint/2010/main" val="4044722762"/>
+        <p14:creationId xmlns:p14="http://schemas.microsoft.com/office/powerpoint/2010/main" val="400255049"/>
       </p:ext>
     </p:extLst>
   </p:cSld>
@@ -41734,6 +41846,169 @@
           <a:p>
             <a:r>
               <a:rPr lang="en-US" dirty="0"/>
+              <a:t>Appendix: History of SQL’s Optimizer</a:t>
+            </a:r>
+          </a:p>
+        </p:txBody>
+      </p:sp>
+      <p:sp>
+        <p:nvSpPr>
+          <p:cNvPr id="3" name="Content Placeholder 2"/>
+          <p:cNvSpPr>
+            <a:spLocks noGrp="1"/>
+          </p:cNvSpPr>
+          <p:nvPr>
+            <p:ph idx="1"/>
+          </p:nvPr>
+        </p:nvSpPr>
+        <p:spPr/>
+        <p:txBody>
+          <a:bodyPr/>
+          <a:lstStyle/>
+          <a:p>
+            <a:r>
+              <a:rPr lang="en-US" dirty="0"/>
+              <a:t>Volcano Optimizer (April 1993) (</a:t>
+            </a:r>
+            <a:r>
+              <a:rPr lang="en-US" dirty="0">
+                <a:hlinkClick r:id="rId2"/>
+              </a:rPr>
+              <a:t>PDF</a:t>
+            </a:r>
+            <a:r>
+              <a:rPr lang="en-US" dirty="0"/>
+              <a:t>)</a:t>
+            </a:r>
+          </a:p>
+          <a:p>
+            <a:pPr lvl="1"/>
+            <a:r>
+              <a:rPr lang="en-US" dirty="0"/>
+              <a:t>Goetz </a:t>
+            </a:r>
+            <a:r>
+              <a:rPr lang="en-US" dirty="0" err="1"/>
+              <a:t>Graefe</a:t>
+            </a:r>
+            <a:r>
+              <a:rPr lang="en-US" dirty="0"/>
+              <a:t>, William J. McKenna</a:t>
+            </a:r>
+          </a:p>
+          <a:p>
+            <a:pPr lvl="1"/>
+            <a:r>
+              <a:rPr lang="en-US" dirty="0"/>
+              <a:t>Based on </a:t>
+            </a:r>
+            <a:r>
+              <a:rPr lang="en-US" dirty="0" err="1"/>
+              <a:t>Graefe’s</a:t>
+            </a:r>
+            <a:r>
+              <a:rPr lang="en-US" dirty="0"/>
+              <a:t> earlier Exodus Optimizer</a:t>
+            </a:r>
+          </a:p>
+          <a:p>
+            <a:r>
+              <a:rPr lang="en-US" dirty="0"/>
+              <a:t>Cascades Framework (1995) (</a:t>
+            </a:r>
+            <a:r>
+              <a:rPr lang="en-US" dirty="0">
+                <a:hlinkClick r:id="rId3"/>
+              </a:rPr>
+              <a:t>PDF</a:t>
+            </a:r>
+            <a:r>
+              <a:rPr lang="en-US" dirty="0"/>
+              <a:t>)</a:t>
+            </a:r>
+          </a:p>
+          <a:p>
+            <a:pPr lvl="1"/>
+            <a:r>
+              <a:rPr lang="en-US" dirty="0"/>
+              <a:t>Goetz </a:t>
+            </a:r>
+            <a:r>
+              <a:rPr lang="en-US" dirty="0" err="1"/>
+              <a:t>Graefe</a:t>
+            </a:r>
+            <a:endParaRPr lang="en-US" dirty="0"/>
+          </a:p>
+          <a:p>
+            <a:pPr lvl="1"/>
+            <a:r>
+              <a:rPr lang="en-US" dirty="0"/>
+              <a:t>Refinement of the Volcano Optimizer</a:t>
+            </a:r>
+          </a:p>
+          <a:p>
+            <a:pPr lvl="1"/>
+            <a:r>
+              <a:rPr lang="en-US" dirty="0"/>
+              <a:t>Basis for rewritten optimizer in SQL Server 7.0</a:t>
+            </a:r>
+          </a:p>
+          <a:p>
+            <a:pPr lvl="1"/>
+            <a:r>
+              <a:rPr lang="en-US" dirty="0"/>
+              <a:t>Major innovation: the memo structure</a:t>
+            </a:r>
+          </a:p>
+        </p:txBody>
+      </p:sp>
+    </p:spTree>
+    <p:extLst>
+      <p:ext uri="{BB962C8B-B14F-4D97-AF65-F5344CB8AC3E}">
+        <p14:creationId xmlns:p14="http://schemas.microsoft.com/office/powerpoint/2010/main" val="4044722762"/>
+      </p:ext>
+    </p:extLst>
+  </p:cSld>
+  <p:clrMapOvr>
+    <a:masterClrMapping/>
+  </p:clrMapOvr>
+</p:sld>
+</file>
+
+<file path=ppt/slides/slide63.xml><?xml version="1.0" encoding="utf-8"?>
+<p:sld xmlns:a="http://schemas.openxmlformats.org/drawingml/2006/main" xmlns:r="http://schemas.openxmlformats.org/officeDocument/2006/relationships" xmlns:p="http://schemas.openxmlformats.org/presentationml/2006/main">
+  <p:cSld>
+    <p:spTree>
+      <p:nvGrpSpPr>
+        <p:cNvPr id="1" name=""/>
+        <p:cNvGrpSpPr/>
+        <p:nvPr/>
+      </p:nvGrpSpPr>
+      <p:grpSpPr>
+        <a:xfrm>
+          <a:off x="0" y="0"/>
+          <a:ext cx="0" cy="0"/>
+          <a:chOff x="0" y="0"/>
+          <a:chExt cx="0" cy="0"/>
+        </a:xfrm>
+      </p:grpSpPr>
+      <p:sp>
+        <p:nvSpPr>
+          <p:cNvPr id="2" name="Title 1"/>
+          <p:cNvSpPr>
+            <a:spLocks noGrp="1"/>
+          </p:cNvSpPr>
+          <p:nvPr>
+            <p:ph type="title"/>
+          </p:nvPr>
+        </p:nvSpPr>
+        <p:spPr/>
+        <p:txBody>
+          <a:bodyPr/>
+          <a:lstStyle/>
+          <a:p>
+            <a:r>
+              <a:rPr lang="en-US" dirty="0"/>
               <a:t>References</a:t>
             </a:r>
           </a:p>
@@ -41867,7 +42142,7 @@
 </p:sld>
 </file>
 
-<file path=ppt/slides/slide63.xml><?xml version="1.0" encoding="utf-8"?>
+<file path=ppt/slides/slide64.xml><?xml version="1.0" encoding="utf-8"?>
 <p:sld xmlns:a="http://schemas.openxmlformats.org/drawingml/2006/main" xmlns:r="http://schemas.openxmlformats.org/officeDocument/2006/relationships" xmlns:p="http://schemas.openxmlformats.org/presentationml/2006/main">
   <p:cSld>
     <p:spTree>
@@ -43425,21 +43700,21 @@
                 <a:gridCol w="2764301">
                   <a:extLst>
                     <a:ext uri="{9D8B030D-6E8A-4147-A177-3AD203B41FA5}">
-                      <a16:colId xmlns:a16="http://schemas.microsoft.com/office/drawing/2014/main" xmlns="" val="234227049"/>
+                      <a16:colId xmlns="" xmlns:a16="http://schemas.microsoft.com/office/drawing/2014/main" val="234227049"/>
                     </a:ext>
                   </a:extLst>
                 </a:gridCol>
                 <a:gridCol w="2764301">
                   <a:extLst>
                     <a:ext uri="{9D8B030D-6E8A-4147-A177-3AD203B41FA5}">
-                      <a16:colId xmlns:a16="http://schemas.microsoft.com/office/drawing/2014/main" xmlns="" val="4053135350"/>
+                      <a16:colId xmlns="" xmlns:a16="http://schemas.microsoft.com/office/drawing/2014/main" val="4053135350"/>
                     </a:ext>
                   </a:extLst>
                 </a:gridCol>
                 <a:gridCol w="2764301">
                   <a:extLst>
                     <a:ext uri="{9D8B030D-6E8A-4147-A177-3AD203B41FA5}">
-                      <a16:colId xmlns:a16="http://schemas.microsoft.com/office/drawing/2014/main" xmlns="" val="672378647"/>
+                      <a16:colId xmlns="" xmlns:a16="http://schemas.microsoft.com/office/drawing/2014/main" val="672378647"/>
                     </a:ext>
                   </a:extLst>
                 </a:gridCol>
@@ -43489,7 +43764,7 @@
                 </a:tc>
                 <a:extLst>
                   <a:ext uri="{0D108BD9-81ED-4DB2-BD59-A6C34878D82A}">
-                    <a16:rowId xmlns:a16="http://schemas.microsoft.com/office/drawing/2014/main" xmlns="" val="2843053056"/>
+                    <a16:rowId xmlns="" xmlns:a16="http://schemas.microsoft.com/office/drawing/2014/main" val="2843053056"/>
                   </a:ext>
                 </a:extLst>
               </a:tr>
@@ -43539,7 +43814,7 @@
                 </a:tc>
                 <a:extLst>
                   <a:ext uri="{0D108BD9-81ED-4DB2-BD59-A6C34878D82A}">
-                    <a16:rowId xmlns:a16="http://schemas.microsoft.com/office/drawing/2014/main" xmlns="" val="3055328934"/>
+                    <a16:rowId xmlns="" xmlns:a16="http://schemas.microsoft.com/office/drawing/2014/main" val="3055328934"/>
                   </a:ext>
                 </a:extLst>
               </a:tr>
@@ -43589,7 +43864,7 @@
                 </a:tc>
                 <a:extLst>
                   <a:ext uri="{0D108BD9-81ED-4DB2-BD59-A6C34878D82A}">
-                    <a16:rowId xmlns:a16="http://schemas.microsoft.com/office/drawing/2014/main" xmlns="" val="1144851549"/>
+                    <a16:rowId xmlns="" xmlns:a16="http://schemas.microsoft.com/office/drawing/2014/main" val="1144851549"/>
                   </a:ext>
                 </a:extLst>
               </a:tr>
@@ -43638,7 +43913,7 @@
                 </a:tc>
                 <a:extLst>
                   <a:ext uri="{0D108BD9-81ED-4DB2-BD59-A6C34878D82A}">
-                    <a16:rowId xmlns:a16="http://schemas.microsoft.com/office/drawing/2014/main" xmlns="" val="4258932578"/>
+                    <a16:rowId xmlns="" xmlns:a16="http://schemas.microsoft.com/office/drawing/2014/main" val="4258932578"/>
                   </a:ext>
                 </a:extLst>
               </a:tr>
@@ -44984,11 +45259,11 @@
   <p:clrMapOvr>
     <a:masterClrMapping/>
   </p:clrMapOvr>
-  <mc:AlternateContent xmlns:mc="http://schemas.openxmlformats.org/markup-compatibility/2006">
-    <mc:Choice xmlns:p14="http://schemas.microsoft.com/office/powerpoint/2010/main" Requires="p14">
+  <mc:AlternateContent xmlns:mc="http://schemas.openxmlformats.org/markup-compatibility/2006" xmlns:p14="http://schemas.microsoft.com/office/powerpoint/2010/main">
+    <mc:Choice Requires="p14">
       <p:transition spd="slow" p14:dur="2000"/>
     </mc:Choice>
-    <mc:Fallback>
+    <mc:Fallback xmlns="">
       <p:transition spd="slow"/>
     </mc:Fallback>
   </mc:AlternateContent>

</xml_diff>

<commit_message>
Additional details on optimization from Conor Cunningham.
</commit_message>
<xml_diff>
--- a/Optimizer.pptx
+++ b/Optimizer.pptx
@@ -20851,28 +20851,28 @@
                 <a:gridCol w="1638752">
                   <a:extLst>
                     <a:ext uri="{9D8B030D-6E8A-4147-A177-3AD203B41FA5}">
-                      <a16:colId xmlns="" xmlns:a16="http://schemas.microsoft.com/office/drawing/2014/main" val="20000"/>
+                      <a16:colId xmlns:a16="http://schemas.microsoft.com/office/drawing/2014/main" xmlns="" val="20000"/>
                     </a:ext>
                   </a:extLst>
                 </a:gridCol>
                 <a:gridCol w="4787153">
                   <a:extLst>
                     <a:ext uri="{9D8B030D-6E8A-4147-A177-3AD203B41FA5}">
-                      <a16:colId xmlns="" xmlns:a16="http://schemas.microsoft.com/office/drawing/2014/main" val="20001"/>
+                      <a16:colId xmlns:a16="http://schemas.microsoft.com/office/drawing/2014/main" xmlns="" val="20001"/>
                     </a:ext>
                   </a:extLst>
                 </a:gridCol>
                 <a:gridCol w="851647">
                   <a:extLst>
                     <a:ext uri="{9D8B030D-6E8A-4147-A177-3AD203B41FA5}">
-                      <a16:colId xmlns="" xmlns:a16="http://schemas.microsoft.com/office/drawing/2014/main" val="20002"/>
+                      <a16:colId xmlns:a16="http://schemas.microsoft.com/office/drawing/2014/main" xmlns="" val="20002"/>
                     </a:ext>
                   </a:extLst>
                 </a:gridCol>
                 <a:gridCol w="779930">
                   <a:extLst>
                     <a:ext uri="{9D8B030D-6E8A-4147-A177-3AD203B41FA5}">
-                      <a16:colId xmlns="" xmlns:a16="http://schemas.microsoft.com/office/drawing/2014/main" val="20003"/>
+                      <a16:colId xmlns:a16="http://schemas.microsoft.com/office/drawing/2014/main" xmlns="" val="20003"/>
                     </a:ext>
                   </a:extLst>
                 </a:gridCol>
@@ -20932,7 +20932,7 @@
                 </a:tc>
                 <a:extLst>
                   <a:ext uri="{0D108BD9-81ED-4DB2-BD59-A6C34878D82A}">
-                    <a16:rowId xmlns="" xmlns:a16="http://schemas.microsoft.com/office/drawing/2014/main" val="10000"/>
+                    <a16:rowId xmlns:a16="http://schemas.microsoft.com/office/drawing/2014/main" xmlns="" val="10000"/>
                   </a:ext>
                 </a:extLst>
               </a:tr>
@@ -20997,7 +20997,7 @@
                 </a:tc>
                 <a:extLst>
                   <a:ext uri="{0D108BD9-81ED-4DB2-BD59-A6C34878D82A}">
-                    <a16:rowId xmlns="" xmlns:a16="http://schemas.microsoft.com/office/drawing/2014/main" val="10001"/>
+                    <a16:rowId xmlns:a16="http://schemas.microsoft.com/office/drawing/2014/main" xmlns="" val="10001"/>
                   </a:ext>
                 </a:extLst>
               </a:tr>
@@ -21074,7 +21074,7 @@
                 </a:tc>
                 <a:extLst>
                   <a:ext uri="{0D108BD9-81ED-4DB2-BD59-A6C34878D82A}">
-                    <a16:rowId xmlns="" xmlns:a16="http://schemas.microsoft.com/office/drawing/2014/main" val="10002"/>
+                    <a16:rowId xmlns:a16="http://schemas.microsoft.com/office/drawing/2014/main" xmlns="" val="10002"/>
                   </a:ext>
                 </a:extLst>
               </a:tr>
@@ -21140,7 +21140,7 @@
                 </a:tc>
                 <a:extLst>
                   <a:ext uri="{0D108BD9-81ED-4DB2-BD59-A6C34878D82A}">
-                    <a16:rowId xmlns="" xmlns:a16="http://schemas.microsoft.com/office/drawing/2014/main" val="10003"/>
+                    <a16:rowId xmlns:a16="http://schemas.microsoft.com/office/drawing/2014/main" xmlns="" val="10003"/>
                   </a:ext>
                 </a:extLst>
               </a:tr>
@@ -21229,7 +21229,7 @@
                 </a:tc>
                 <a:extLst>
                   <a:ext uri="{0D108BD9-81ED-4DB2-BD59-A6C34878D82A}">
-                    <a16:rowId xmlns="" xmlns:a16="http://schemas.microsoft.com/office/drawing/2014/main" val="10004"/>
+                    <a16:rowId xmlns:a16="http://schemas.microsoft.com/office/drawing/2014/main" xmlns="" val="10004"/>
                   </a:ext>
                 </a:extLst>
               </a:tr>
@@ -21300,7 +21300,7 @@
                 </a:tc>
                 <a:extLst>
                   <a:ext uri="{0D108BD9-81ED-4DB2-BD59-A6C34878D82A}">
-                    <a16:rowId xmlns="" xmlns:a16="http://schemas.microsoft.com/office/drawing/2014/main" val="10005"/>
+                    <a16:rowId xmlns:a16="http://schemas.microsoft.com/office/drawing/2014/main" xmlns="" val="10005"/>
                   </a:ext>
                 </a:extLst>
               </a:tr>
@@ -21366,7 +21366,7 @@
                 </a:tc>
                 <a:extLst>
                   <a:ext uri="{0D108BD9-81ED-4DB2-BD59-A6C34878D82A}">
-                    <a16:rowId xmlns="" xmlns:a16="http://schemas.microsoft.com/office/drawing/2014/main" val="10006"/>
+                    <a16:rowId xmlns:a16="http://schemas.microsoft.com/office/drawing/2014/main" xmlns="" val="10006"/>
                   </a:ext>
                 </a:extLst>
               </a:tr>
@@ -28760,9 +28760,10 @@
           <a:lstStyle/>
           <a:p>
             <a:r>
-              <a:rPr lang="en-US" dirty="0"/>
-              <a:t>Simplification*</a:t>
-            </a:r>
+              <a:rPr lang="en-US" dirty="0" smtClean="0"/>
+              <a:t>Simplification (heuristic rewrites, not cost-based)</a:t>
+            </a:r>
+            <a:endParaRPr lang="en-US" dirty="0"/>
           </a:p>
           <a:p>
             <a:pPr lvl="1"/>
@@ -28794,6 +28795,49 @@
           </a:p>
           <a:p>
             <a:r>
+              <a:rPr lang="en-US" dirty="0" smtClean="0"/>
+              <a:t>Retrieve </a:t>
+            </a:r>
+            <a:r>
+              <a:rPr lang="en-US" dirty="0"/>
+              <a:t>statistics; do cardinality estimation</a:t>
+            </a:r>
+          </a:p>
+          <a:p>
+            <a:pPr lvl="1"/>
+            <a:r>
+              <a:rPr lang="en-US" dirty="0"/>
+              <a:t>Create / update auto stats</a:t>
+            </a:r>
+          </a:p>
+          <a:p>
+            <a:pPr lvl="1"/>
+            <a:r>
+              <a:rPr lang="en-US" dirty="0"/>
+              <a:t>SQL Server 7 vs 2014 CE engine</a:t>
+            </a:r>
+          </a:p>
+          <a:p>
+            <a:pPr lvl="1"/>
+            <a:r>
+              <a:rPr lang="en-US" dirty="0"/>
+              <a:t>Other physical properties </a:t>
+            </a:r>
+            <a:r>
+              <a:rPr lang="en-US" sz="2400" dirty="0" smtClean="0"/>
+              <a:t>(keys, </a:t>
+            </a:r>
+            <a:r>
+              <a:rPr lang="en-US" sz="2400" dirty="0" err="1" smtClean="0"/>
+              <a:t>nullability</a:t>
+            </a:r>
+            <a:r>
+              <a:rPr lang="en-US" sz="2400" dirty="0"/>
+              <a:t>, constraints)</a:t>
+            </a:r>
+          </a:p>
+          <a:p>
+            <a:r>
               <a:rPr lang="en-US" dirty="0"/>
               <a:t>Trivial plan</a:t>
             </a:r>
@@ -28806,46 +28850,9 @@
             </a:r>
           </a:p>
           <a:p>
-            <a:r>
-              <a:rPr lang="en-US" dirty="0"/>
-              <a:t>Retrieve statistics; do cardinality estimation</a:t>
-            </a:r>
-          </a:p>
-          <a:p>
-            <a:pPr lvl="1"/>
-            <a:r>
-              <a:rPr lang="en-US" dirty="0"/>
-              <a:t>Create / update auto stats</a:t>
-            </a:r>
-          </a:p>
-          <a:p>
-            <a:pPr lvl="1"/>
-            <a:r>
-              <a:rPr lang="en-US" dirty="0"/>
-              <a:t>SQL Server 7 vs 2014 CE engine</a:t>
-            </a:r>
-          </a:p>
-          <a:p>
-            <a:pPr lvl="1"/>
-            <a:r>
-              <a:rPr lang="en-US" dirty="0"/>
-              <a:t>Other physical properties (</a:t>
-            </a:r>
-            <a:r>
-              <a:rPr lang="en-US" dirty="0" err="1"/>
-              <a:t>nullability</a:t>
-            </a:r>
-            <a:r>
-              <a:rPr lang="en-US"/>
-              <a:t>, constraints</a:t>
-            </a:r>
-            <a:r>
-              <a:rPr lang="en-US" dirty="0"/>
-              <a:t>)</a:t>
-            </a:r>
-          </a:p>
-          <a:p>
-            <a:pPr lvl="1"/>
+            <a:pPr marL="0" indent="0">
+              <a:buNone/>
+            </a:pPr>
             <a:endParaRPr lang="en-US" dirty="0"/>
           </a:p>
         </p:txBody>
@@ -28893,42 +28900,13 @@
       </p:sp>
       <p:sp>
         <p:nvSpPr>
-          <p:cNvPr id="7" name="TextBox 6"/>
-          <p:cNvSpPr txBox="1"/>
-          <p:nvPr/>
-        </p:nvSpPr>
-        <p:spPr>
-          <a:xfrm>
-            <a:off x="457200" y="6129926"/>
-            <a:ext cx="7084194" cy="646331"/>
-          </a:xfrm>
-          <a:prstGeom prst="rect">
-            <a:avLst/>
-          </a:prstGeom>
-          <a:noFill/>
-        </p:spPr>
-        <p:txBody>
-          <a:bodyPr wrap="square" rtlCol="0">
-            <a:spAutoFit/>
-          </a:bodyPr>
-          <a:lstStyle/>
-          <a:p>
-            <a:r>
-              <a:rPr lang="en-US" dirty="0"/>
-              <a:t>* A somewhat overloaded term.  Some simplification activities happen earlier in the process than others.</a:t>
-            </a:r>
-          </a:p>
-        </p:txBody>
-      </p:sp>
-      <p:sp>
-        <p:nvSpPr>
           <p:cNvPr id="8" name="Oval 7"/>
           <p:cNvSpPr/>
           <p:nvPr/>
         </p:nvSpPr>
         <p:spPr>
           <a:xfrm>
-            <a:off x="8316227" y="1542009"/>
+            <a:off x="8316227" y="2065114"/>
             <a:ext cx="616016" cy="606391"/>
           </a:xfrm>
           <a:prstGeom prst="ellipse">
@@ -30070,14 +30048,14 @@
                 <a:gridCol w="7632835">
                   <a:extLst>
                     <a:ext uri="{9D8B030D-6E8A-4147-A177-3AD203B41FA5}">
-                      <a16:colId xmlns="" xmlns:a16="http://schemas.microsoft.com/office/drawing/2014/main" val="3644048045"/>
+                      <a16:colId xmlns:a16="http://schemas.microsoft.com/office/drawing/2014/main" xmlns="" val="3644048045"/>
                     </a:ext>
                   </a:extLst>
                 </a:gridCol>
                 <a:gridCol w="606393">
                   <a:extLst>
                     <a:ext uri="{9D8B030D-6E8A-4147-A177-3AD203B41FA5}">
-                      <a16:colId xmlns="" xmlns:a16="http://schemas.microsoft.com/office/drawing/2014/main" val="2034254753"/>
+                      <a16:colId xmlns:a16="http://schemas.microsoft.com/office/drawing/2014/main" xmlns="" val="2034254753"/>
                     </a:ext>
                   </a:extLst>
                 </a:gridCol>
@@ -30108,7 +30086,7 @@
                 </a:tc>
                 <a:extLst>
                   <a:ext uri="{0D108BD9-81ED-4DB2-BD59-A6C34878D82A}">
-                    <a16:rowId xmlns="" xmlns:a16="http://schemas.microsoft.com/office/drawing/2014/main" val="2708275910"/>
+                    <a16:rowId xmlns:a16="http://schemas.microsoft.com/office/drawing/2014/main" xmlns="" val="2708275910"/>
                   </a:ext>
                 </a:extLst>
               </a:tr>
@@ -30142,7 +30120,7 @@
                 </a:tc>
                 <a:extLst>
                   <a:ext uri="{0D108BD9-81ED-4DB2-BD59-A6C34878D82A}">
-                    <a16:rowId xmlns="" xmlns:a16="http://schemas.microsoft.com/office/drawing/2014/main" val="2161984115"/>
+                    <a16:rowId xmlns:a16="http://schemas.microsoft.com/office/drawing/2014/main" xmlns="" val="2161984115"/>
                   </a:ext>
                 </a:extLst>
               </a:tr>
@@ -30189,7 +30167,7 @@
                 </a:tc>
                 <a:extLst>
                   <a:ext uri="{0D108BD9-81ED-4DB2-BD59-A6C34878D82A}">
-                    <a16:rowId xmlns="" xmlns:a16="http://schemas.microsoft.com/office/drawing/2014/main" val="2841678841"/>
+                    <a16:rowId xmlns:a16="http://schemas.microsoft.com/office/drawing/2014/main" xmlns="" val="2841678841"/>
                   </a:ext>
                 </a:extLst>
               </a:tr>
@@ -30223,7 +30201,7 @@
                 </a:tc>
                 <a:extLst>
                   <a:ext uri="{0D108BD9-81ED-4DB2-BD59-A6C34878D82A}">
-                    <a16:rowId xmlns="" xmlns:a16="http://schemas.microsoft.com/office/drawing/2014/main" val="3144998627"/>
+                    <a16:rowId xmlns:a16="http://schemas.microsoft.com/office/drawing/2014/main" xmlns="" val="3144998627"/>
                   </a:ext>
                 </a:extLst>
               </a:tr>
@@ -30265,7 +30243,7 @@
                 </a:tc>
                 <a:extLst>
                   <a:ext uri="{0D108BD9-81ED-4DB2-BD59-A6C34878D82A}">
-                    <a16:rowId xmlns="" xmlns:a16="http://schemas.microsoft.com/office/drawing/2014/main" val="1419261869"/>
+                    <a16:rowId xmlns:a16="http://schemas.microsoft.com/office/drawing/2014/main" xmlns="" val="1419261869"/>
                   </a:ext>
                 </a:extLst>
               </a:tr>
@@ -30303,7 +30281,7 @@
                 </a:tc>
                 <a:extLst>
                   <a:ext uri="{0D108BD9-81ED-4DB2-BD59-A6C34878D82A}">
-                    <a16:rowId xmlns="" xmlns:a16="http://schemas.microsoft.com/office/drawing/2014/main" val="1427391072"/>
+                    <a16:rowId xmlns:a16="http://schemas.microsoft.com/office/drawing/2014/main" xmlns="" val="1427391072"/>
                   </a:ext>
                 </a:extLst>
               </a:tr>
@@ -30350,7 +30328,7 @@
                 </a:tc>
                 <a:extLst>
                   <a:ext uri="{0D108BD9-81ED-4DB2-BD59-A6C34878D82A}">
-                    <a16:rowId xmlns="" xmlns:a16="http://schemas.microsoft.com/office/drawing/2014/main" val="2346539918"/>
+                    <a16:rowId xmlns:a16="http://schemas.microsoft.com/office/drawing/2014/main" xmlns="" val="2346539918"/>
                   </a:ext>
                 </a:extLst>
               </a:tr>
@@ -30389,7 +30367,7 @@
                 </a:tc>
                 <a:extLst>
                   <a:ext uri="{0D108BD9-81ED-4DB2-BD59-A6C34878D82A}">
-                    <a16:rowId xmlns="" xmlns:a16="http://schemas.microsoft.com/office/drawing/2014/main" val="2275483042"/>
+                    <a16:rowId xmlns:a16="http://schemas.microsoft.com/office/drawing/2014/main" xmlns="" val="2275483042"/>
                   </a:ext>
                 </a:extLst>
               </a:tr>
@@ -30427,7 +30405,7 @@
                 </a:tc>
                 <a:extLst>
                   <a:ext uri="{0D108BD9-81ED-4DB2-BD59-A6C34878D82A}">
-                    <a16:rowId xmlns="" xmlns:a16="http://schemas.microsoft.com/office/drawing/2014/main" val="4202569347"/>
+                    <a16:rowId xmlns:a16="http://schemas.microsoft.com/office/drawing/2014/main" xmlns="" val="4202569347"/>
                   </a:ext>
                 </a:extLst>
               </a:tr>
@@ -30461,7 +30439,7 @@
                 </a:tc>
                 <a:extLst>
                   <a:ext uri="{0D108BD9-81ED-4DB2-BD59-A6C34878D82A}">
-                    <a16:rowId xmlns="" xmlns:a16="http://schemas.microsoft.com/office/drawing/2014/main" val="2989839269"/>
+                    <a16:rowId xmlns:a16="http://schemas.microsoft.com/office/drawing/2014/main" xmlns="" val="2989839269"/>
                   </a:ext>
                 </a:extLst>
               </a:tr>
@@ -30495,7 +30473,7 @@
                 </a:tc>
                 <a:extLst>
                   <a:ext uri="{0D108BD9-81ED-4DB2-BD59-A6C34878D82A}">
-                    <a16:rowId xmlns="" xmlns:a16="http://schemas.microsoft.com/office/drawing/2014/main" val="2130545569"/>
+                    <a16:rowId xmlns:a16="http://schemas.microsoft.com/office/drawing/2014/main" xmlns="" val="2130545569"/>
                   </a:ext>
                 </a:extLst>
               </a:tr>
@@ -30551,7 +30529,7 @@
                 </a:tc>
                 <a:extLst>
                   <a:ext uri="{0D108BD9-81ED-4DB2-BD59-A6C34878D82A}">
-                    <a16:rowId xmlns="" xmlns:a16="http://schemas.microsoft.com/office/drawing/2014/main" val="1848127216"/>
+                    <a16:rowId xmlns:a16="http://schemas.microsoft.com/office/drawing/2014/main" xmlns="" val="1848127216"/>
                   </a:ext>
                 </a:extLst>
               </a:tr>
@@ -31005,14 +30983,14 @@
                 <a:gridCol w="4119615">
                   <a:extLst>
                     <a:ext uri="{9D8B030D-6E8A-4147-A177-3AD203B41FA5}">
-                      <a16:colId xmlns="" xmlns:a16="http://schemas.microsoft.com/office/drawing/2014/main" val="3644048045"/>
+                      <a16:colId xmlns:a16="http://schemas.microsoft.com/office/drawing/2014/main" xmlns="" val="3644048045"/>
                     </a:ext>
                   </a:extLst>
                 </a:gridCol>
                 <a:gridCol w="4119613">
                   <a:extLst>
                     <a:ext uri="{9D8B030D-6E8A-4147-A177-3AD203B41FA5}">
-                      <a16:colId xmlns="" xmlns:a16="http://schemas.microsoft.com/office/drawing/2014/main" val="2034254753"/>
+                      <a16:colId xmlns:a16="http://schemas.microsoft.com/office/drawing/2014/main" xmlns="" val="2034254753"/>
                     </a:ext>
                   </a:extLst>
                 </a:gridCol>
@@ -31048,7 +31026,7 @@
                 </a:tc>
                 <a:extLst>
                   <a:ext uri="{0D108BD9-81ED-4DB2-BD59-A6C34878D82A}">
-                    <a16:rowId xmlns="" xmlns:a16="http://schemas.microsoft.com/office/drawing/2014/main" val="2708275910"/>
+                    <a16:rowId xmlns:a16="http://schemas.microsoft.com/office/drawing/2014/main" xmlns="" val="2708275910"/>
                   </a:ext>
                 </a:extLst>
               </a:tr>
@@ -31248,7 +31226,7 @@
                 </a:tc>
                 <a:extLst>
                   <a:ext uri="{0D108BD9-81ED-4DB2-BD59-A6C34878D82A}">
-                    <a16:rowId xmlns="" xmlns:a16="http://schemas.microsoft.com/office/drawing/2014/main" val="2161984115"/>
+                    <a16:rowId xmlns:a16="http://schemas.microsoft.com/office/drawing/2014/main" xmlns="" val="2161984115"/>
                   </a:ext>
                 </a:extLst>
               </a:tr>
@@ -31448,7 +31426,7 @@
                 </a:tc>
                 <a:extLst>
                   <a:ext uri="{0D108BD9-81ED-4DB2-BD59-A6C34878D82A}">
-                    <a16:rowId xmlns="" xmlns:a16="http://schemas.microsoft.com/office/drawing/2014/main" val="2841678841"/>
+                    <a16:rowId xmlns:a16="http://schemas.microsoft.com/office/drawing/2014/main" xmlns="" val="2841678841"/>
                   </a:ext>
                 </a:extLst>
               </a:tr>
@@ -31648,7 +31626,7 @@
                 </a:tc>
                 <a:extLst>
                   <a:ext uri="{0D108BD9-81ED-4DB2-BD59-A6C34878D82A}">
-                    <a16:rowId xmlns="" xmlns:a16="http://schemas.microsoft.com/office/drawing/2014/main" val="3144998627"/>
+                    <a16:rowId xmlns:a16="http://schemas.microsoft.com/office/drawing/2014/main" xmlns="" val="3144998627"/>
                   </a:ext>
                 </a:extLst>
               </a:tr>
@@ -31848,7 +31826,7 @@
                 </a:tc>
                 <a:extLst>
                   <a:ext uri="{0D108BD9-81ED-4DB2-BD59-A6C34878D82A}">
-                    <a16:rowId xmlns="" xmlns:a16="http://schemas.microsoft.com/office/drawing/2014/main" val="1419261869"/>
+                    <a16:rowId xmlns:a16="http://schemas.microsoft.com/office/drawing/2014/main" xmlns="" val="1419261869"/>
                   </a:ext>
                 </a:extLst>
               </a:tr>
@@ -32048,7 +32026,7 @@
                 </a:tc>
                 <a:extLst>
                   <a:ext uri="{0D108BD9-81ED-4DB2-BD59-A6C34878D82A}">
-                    <a16:rowId xmlns="" xmlns:a16="http://schemas.microsoft.com/office/drawing/2014/main" val="1427391072"/>
+                    <a16:rowId xmlns:a16="http://schemas.microsoft.com/office/drawing/2014/main" xmlns="" val="1427391072"/>
                   </a:ext>
                 </a:extLst>
               </a:tr>
@@ -32248,7 +32226,7 @@
                 </a:tc>
                 <a:extLst>
                   <a:ext uri="{0D108BD9-81ED-4DB2-BD59-A6C34878D82A}">
-                    <a16:rowId xmlns="" xmlns:a16="http://schemas.microsoft.com/office/drawing/2014/main" val="2346539918"/>
+                    <a16:rowId xmlns:a16="http://schemas.microsoft.com/office/drawing/2014/main" xmlns="" val="2346539918"/>
                   </a:ext>
                 </a:extLst>
               </a:tr>
@@ -32457,7 +32435,7 @@
                 </a:tc>
                 <a:extLst>
                   <a:ext uri="{0D108BD9-81ED-4DB2-BD59-A6C34878D82A}">
-                    <a16:rowId xmlns="" xmlns:a16="http://schemas.microsoft.com/office/drawing/2014/main" val="2275483042"/>
+                    <a16:rowId xmlns:a16="http://schemas.microsoft.com/office/drawing/2014/main" xmlns="" val="2275483042"/>
                   </a:ext>
                 </a:extLst>
               </a:tr>
@@ -32666,7 +32644,7 @@
                 </a:tc>
                 <a:extLst>
                   <a:ext uri="{0D108BD9-81ED-4DB2-BD59-A6C34878D82A}">
-                    <a16:rowId xmlns="" xmlns:a16="http://schemas.microsoft.com/office/drawing/2014/main" val="4202569347"/>
+                    <a16:rowId xmlns:a16="http://schemas.microsoft.com/office/drawing/2014/main" xmlns="" val="4202569347"/>
                   </a:ext>
                 </a:extLst>
               </a:tr>
@@ -32875,7 +32853,7 @@
                 </a:tc>
                 <a:extLst>
                   <a:ext uri="{0D108BD9-81ED-4DB2-BD59-A6C34878D82A}">
-                    <a16:rowId xmlns="" xmlns:a16="http://schemas.microsoft.com/office/drawing/2014/main" val="2989839269"/>
+                    <a16:rowId xmlns:a16="http://schemas.microsoft.com/office/drawing/2014/main" xmlns="" val="2989839269"/>
                   </a:ext>
                 </a:extLst>
               </a:tr>
@@ -33084,7 +33062,7 @@
                 </a:tc>
                 <a:extLst>
                   <a:ext uri="{0D108BD9-81ED-4DB2-BD59-A6C34878D82A}">
-                    <a16:rowId xmlns="" xmlns:a16="http://schemas.microsoft.com/office/drawing/2014/main" val="2130545569"/>
+                    <a16:rowId xmlns:a16="http://schemas.microsoft.com/office/drawing/2014/main" xmlns="" val="2130545569"/>
                   </a:ext>
                 </a:extLst>
               </a:tr>
@@ -33293,7 +33271,7 @@
                 </a:tc>
                 <a:extLst>
                   <a:ext uri="{0D108BD9-81ED-4DB2-BD59-A6C34878D82A}">
-                    <a16:rowId xmlns="" xmlns:a16="http://schemas.microsoft.com/office/drawing/2014/main" val="3045796785"/>
+                    <a16:rowId xmlns:a16="http://schemas.microsoft.com/office/drawing/2014/main" xmlns="" val="3045796785"/>
                   </a:ext>
                 </a:extLst>
               </a:tr>
@@ -33502,7 +33480,7 @@
                 </a:tc>
                 <a:extLst>
                   <a:ext uri="{0D108BD9-81ED-4DB2-BD59-A6C34878D82A}">
-                    <a16:rowId xmlns="" xmlns:a16="http://schemas.microsoft.com/office/drawing/2014/main" val="1091494175"/>
+                    <a16:rowId xmlns:a16="http://schemas.microsoft.com/office/drawing/2014/main" xmlns="" val="1091494175"/>
                   </a:ext>
                 </a:extLst>
               </a:tr>
@@ -37265,14 +37243,14 @@
                 <a:gridCol w="957714">
                   <a:extLst>
                     <a:ext uri="{9D8B030D-6E8A-4147-A177-3AD203B41FA5}">
-                      <a16:colId xmlns="" xmlns:a16="http://schemas.microsoft.com/office/drawing/2014/main" val="3940544257"/>
+                      <a16:colId xmlns:a16="http://schemas.microsoft.com/office/drawing/2014/main" xmlns="" val="3940544257"/>
                     </a:ext>
                   </a:extLst>
                 </a:gridCol>
                 <a:gridCol w="2464067">
                   <a:extLst>
                     <a:ext uri="{9D8B030D-6E8A-4147-A177-3AD203B41FA5}">
-                      <a16:colId xmlns="" xmlns:a16="http://schemas.microsoft.com/office/drawing/2014/main" val="3658567973"/>
+                      <a16:colId xmlns:a16="http://schemas.microsoft.com/office/drawing/2014/main" xmlns="" val="3658567973"/>
                     </a:ext>
                   </a:extLst>
                 </a:gridCol>
@@ -37306,7 +37284,7 @@
                 </a:tc>
                 <a:extLst>
                   <a:ext uri="{0D108BD9-81ED-4DB2-BD59-A6C34878D82A}">
-                    <a16:rowId xmlns="" xmlns:a16="http://schemas.microsoft.com/office/drawing/2014/main" val="1032275335"/>
+                    <a16:rowId xmlns:a16="http://schemas.microsoft.com/office/drawing/2014/main" xmlns="" val="1032275335"/>
                   </a:ext>
                 </a:extLst>
               </a:tr>
@@ -37436,7 +37414,7 @@
                 </a:tc>
                 <a:extLst>
                   <a:ext uri="{0D108BD9-81ED-4DB2-BD59-A6C34878D82A}">
-                    <a16:rowId xmlns="" xmlns:a16="http://schemas.microsoft.com/office/drawing/2014/main" val="4191484087"/>
+                    <a16:rowId xmlns:a16="http://schemas.microsoft.com/office/drawing/2014/main" xmlns="" val="4191484087"/>
                   </a:ext>
                 </a:extLst>
               </a:tr>
@@ -37510,7 +37488,7 @@
                 </a:tc>
                 <a:extLst>
                   <a:ext uri="{0D108BD9-81ED-4DB2-BD59-A6C34878D82A}">
-                    <a16:rowId xmlns="" xmlns:a16="http://schemas.microsoft.com/office/drawing/2014/main" val="1864588626"/>
+                    <a16:rowId xmlns:a16="http://schemas.microsoft.com/office/drawing/2014/main" xmlns="" val="1864588626"/>
                   </a:ext>
                 </a:extLst>
               </a:tr>
@@ -37632,7 +37610,7 @@
                 </a:tc>
                 <a:extLst>
                   <a:ext uri="{0D108BD9-81ED-4DB2-BD59-A6C34878D82A}">
-                    <a16:rowId xmlns="" xmlns:a16="http://schemas.microsoft.com/office/drawing/2014/main" val="3035259714"/>
+                    <a16:rowId xmlns:a16="http://schemas.microsoft.com/office/drawing/2014/main" xmlns="" val="3035259714"/>
                   </a:ext>
                 </a:extLst>
               </a:tr>
@@ -37721,7 +37699,7 @@
                 </a:tc>
                 <a:extLst>
                   <a:ext uri="{0D108BD9-81ED-4DB2-BD59-A6C34878D82A}">
-                    <a16:rowId xmlns="" xmlns:a16="http://schemas.microsoft.com/office/drawing/2014/main" val="2023621082"/>
+                    <a16:rowId xmlns:a16="http://schemas.microsoft.com/office/drawing/2014/main" xmlns="" val="2023621082"/>
                   </a:ext>
                 </a:extLst>
               </a:tr>
@@ -37810,7 +37788,7 @@
                 </a:tc>
                 <a:extLst>
                   <a:ext uri="{0D108BD9-81ED-4DB2-BD59-A6C34878D82A}">
-                    <a16:rowId xmlns="" xmlns:a16="http://schemas.microsoft.com/office/drawing/2014/main" val="120016333"/>
+                    <a16:rowId xmlns:a16="http://schemas.microsoft.com/office/drawing/2014/main" xmlns="" val="120016333"/>
                   </a:ext>
                 </a:extLst>
               </a:tr>
@@ -37955,21 +37933,21 @@
                 <a:gridCol w="960120">
                   <a:extLst>
                     <a:ext uri="{9D8B030D-6E8A-4147-A177-3AD203B41FA5}">
-                      <a16:colId xmlns="" xmlns:a16="http://schemas.microsoft.com/office/drawing/2014/main" val="392696932"/>
+                      <a16:colId xmlns:a16="http://schemas.microsoft.com/office/drawing/2014/main" xmlns="" val="392696932"/>
                     </a:ext>
                   </a:extLst>
                 </a:gridCol>
                 <a:gridCol w="2468880">
                   <a:extLst>
                     <a:ext uri="{9D8B030D-6E8A-4147-A177-3AD203B41FA5}">
-                      <a16:colId xmlns="" xmlns:a16="http://schemas.microsoft.com/office/drawing/2014/main" val="2769969192"/>
+                      <a16:colId xmlns:a16="http://schemas.microsoft.com/office/drawing/2014/main" xmlns="" val="2769969192"/>
                     </a:ext>
                   </a:extLst>
                 </a:gridCol>
                 <a:gridCol w="2468880">
                   <a:extLst>
                     <a:ext uri="{9D8B030D-6E8A-4147-A177-3AD203B41FA5}">
-                      <a16:colId xmlns="" xmlns:a16="http://schemas.microsoft.com/office/drawing/2014/main" val="2022610816"/>
+                      <a16:colId xmlns:a16="http://schemas.microsoft.com/office/drawing/2014/main" xmlns="" val="2022610816"/>
                     </a:ext>
                   </a:extLst>
                 </a:gridCol>
@@ -38021,7 +37999,7 @@
                 </a:tc>
                 <a:extLst>
                   <a:ext uri="{0D108BD9-81ED-4DB2-BD59-A6C34878D82A}">
-                    <a16:rowId xmlns="" xmlns:a16="http://schemas.microsoft.com/office/drawing/2014/main" val="2344937666"/>
+                    <a16:rowId xmlns:a16="http://schemas.microsoft.com/office/drawing/2014/main" xmlns="" val="2344937666"/>
                   </a:ext>
                 </a:extLst>
               </a:tr>
@@ -38154,7 +38132,7 @@
                 </a:tc>
                 <a:extLst>
                   <a:ext uri="{0D108BD9-81ED-4DB2-BD59-A6C34878D82A}">
-                    <a16:rowId xmlns="" xmlns:a16="http://schemas.microsoft.com/office/drawing/2014/main" val="1917341330"/>
+                    <a16:rowId xmlns:a16="http://schemas.microsoft.com/office/drawing/2014/main" xmlns="" val="1917341330"/>
                   </a:ext>
                 </a:extLst>
               </a:tr>
@@ -38371,7 +38349,7 @@
                 </a:tc>
                 <a:extLst>
                   <a:ext uri="{0D108BD9-81ED-4DB2-BD59-A6C34878D82A}">
-                    <a16:rowId xmlns="" xmlns:a16="http://schemas.microsoft.com/office/drawing/2014/main" val="3088042860"/>
+                    <a16:rowId xmlns:a16="http://schemas.microsoft.com/office/drawing/2014/main" xmlns="" val="3088042860"/>
                   </a:ext>
                 </a:extLst>
               </a:tr>
@@ -38455,7 +38433,7 @@
                 </a:tc>
                 <a:extLst>
                   <a:ext uri="{0D108BD9-81ED-4DB2-BD59-A6C34878D82A}">
-                    <a16:rowId xmlns="" xmlns:a16="http://schemas.microsoft.com/office/drawing/2014/main" val="2658530722"/>
+                    <a16:rowId xmlns:a16="http://schemas.microsoft.com/office/drawing/2014/main" xmlns="" val="2658530722"/>
                   </a:ext>
                 </a:extLst>
               </a:tr>
@@ -38587,7 +38565,7 @@
                 </a:tc>
                 <a:extLst>
                   <a:ext uri="{0D108BD9-81ED-4DB2-BD59-A6C34878D82A}">
-                    <a16:rowId xmlns="" xmlns:a16="http://schemas.microsoft.com/office/drawing/2014/main" val="1481886367"/>
+                    <a16:rowId xmlns:a16="http://schemas.microsoft.com/office/drawing/2014/main" xmlns="" val="1481886367"/>
                   </a:ext>
                 </a:extLst>
               </a:tr>
@@ -38686,7 +38664,7 @@
                 </a:tc>
                 <a:extLst>
                   <a:ext uri="{0D108BD9-81ED-4DB2-BD59-A6C34878D82A}">
-                    <a16:rowId xmlns="" xmlns:a16="http://schemas.microsoft.com/office/drawing/2014/main" val="4248384778"/>
+                    <a16:rowId xmlns:a16="http://schemas.microsoft.com/office/drawing/2014/main" xmlns="" val="4248384778"/>
                   </a:ext>
                 </a:extLst>
               </a:tr>
@@ -38785,7 +38763,7 @@
                 </a:tc>
                 <a:extLst>
                   <a:ext uri="{0D108BD9-81ED-4DB2-BD59-A6C34878D82A}">
-                    <a16:rowId xmlns="" xmlns:a16="http://schemas.microsoft.com/office/drawing/2014/main" val="1670483340"/>
+                    <a16:rowId xmlns:a16="http://schemas.microsoft.com/office/drawing/2014/main" xmlns="" val="1670483340"/>
                   </a:ext>
                 </a:extLst>
               </a:tr>
@@ -38930,28 +38908,28 @@
                 <a:gridCol w="960120">
                   <a:extLst>
                     <a:ext uri="{9D8B030D-6E8A-4147-A177-3AD203B41FA5}">
-                      <a16:colId xmlns="" xmlns:a16="http://schemas.microsoft.com/office/drawing/2014/main" val="392696932"/>
+                      <a16:colId xmlns:a16="http://schemas.microsoft.com/office/drawing/2014/main" xmlns="" val="392696932"/>
                     </a:ext>
                   </a:extLst>
                 </a:gridCol>
                 <a:gridCol w="2468880">
                   <a:extLst>
                     <a:ext uri="{9D8B030D-6E8A-4147-A177-3AD203B41FA5}">
-                      <a16:colId xmlns="" xmlns:a16="http://schemas.microsoft.com/office/drawing/2014/main" val="2769969192"/>
+                      <a16:colId xmlns:a16="http://schemas.microsoft.com/office/drawing/2014/main" xmlns="" val="2769969192"/>
                     </a:ext>
                   </a:extLst>
                 </a:gridCol>
                 <a:gridCol w="2468880">
                   <a:extLst>
                     <a:ext uri="{9D8B030D-6E8A-4147-A177-3AD203B41FA5}">
-                      <a16:colId xmlns="" xmlns:a16="http://schemas.microsoft.com/office/drawing/2014/main" val="2022610816"/>
+                      <a16:colId xmlns:a16="http://schemas.microsoft.com/office/drawing/2014/main" xmlns="" val="2022610816"/>
                     </a:ext>
                   </a:extLst>
                 </a:gridCol>
                 <a:gridCol w="2468880">
                   <a:extLst>
                     <a:ext uri="{9D8B030D-6E8A-4147-A177-3AD203B41FA5}">
-                      <a16:colId xmlns="" xmlns:a16="http://schemas.microsoft.com/office/drawing/2014/main" val="102813283"/>
+                      <a16:colId xmlns:a16="http://schemas.microsoft.com/office/drawing/2014/main" xmlns="" val="102813283"/>
                     </a:ext>
                   </a:extLst>
                 </a:gridCol>
@@ -39016,7 +38994,7 @@
                 </a:tc>
                 <a:extLst>
                   <a:ext uri="{0D108BD9-81ED-4DB2-BD59-A6C34878D82A}">
-                    <a16:rowId xmlns="" xmlns:a16="http://schemas.microsoft.com/office/drawing/2014/main" val="2344937666"/>
+                    <a16:rowId xmlns:a16="http://schemas.microsoft.com/office/drawing/2014/main" xmlns="" val="2344937666"/>
                   </a:ext>
                 </a:extLst>
               </a:tr>
@@ -39176,7 +39154,7 @@
                 </a:tc>
                 <a:extLst>
                   <a:ext uri="{0D108BD9-81ED-4DB2-BD59-A6C34878D82A}">
-                    <a16:rowId xmlns="" xmlns:a16="http://schemas.microsoft.com/office/drawing/2014/main" val="1917341330"/>
+                    <a16:rowId xmlns:a16="http://schemas.microsoft.com/office/drawing/2014/main" xmlns="" val="1917341330"/>
                   </a:ext>
                 </a:extLst>
               </a:tr>
@@ -39480,7 +39458,7 @@
                 </a:tc>
                 <a:extLst>
                   <a:ext uri="{0D108BD9-81ED-4DB2-BD59-A6C34878D82A}">
-                    <a16:rowId xmlns="" xmlns:a16="http://schemas.microsoft.com/office/drawing/2014/main" val="3088042860"/>
+                    <a16:rowId xmlns:a16="http://schemas.microsoft.com/office/drawing/2014/main" xmlns="" val="3088042860"/>
                   </a:ext>
                 </a:extLst>
               </a:tr>
@@ -39574,7 +39552,7 @@
                 </a:tc>
                 <a:extLst>
                   <a:ext uri="{0D108BD9-81ED-4DB2-BD59-A6C34878D82A}">
-                    <a16:rowId xmlns="" xmlns:a16="http://schemas.microsoft.com/office/drawing/2014/main" val="2658530722"/>
+                    <a16:rowId xmlns:a16="http://schemas.microsoft.com/office/drawing/2014/main" xmlns="" val="2658530722"/>
                   </a:ext>
                 </a:extLst>
               </a:tr>
@@ -39767,7 +39745,7 @@
                 </a:tc>
                 <a:extLst>
                   <a:ext uri="{0D108BD9-81ED-4DB2-BD59-A6C34878D82A}">
-                    <a16:rowId xmlns="" xmlns:a16="http://schemas.microsoft.com/office/drawing/2014/main" val="1481886367"/>
+                    <a16:rowId xmlns:a16="http://schemas.microsoft.com/office/drawing/2014/main" xmlns="" val="1481886367"/>
                   </a:ext>
                 </a:extLst>
               </a:tr>
@@ -39876,7 +39854,7 @@
                 </a:tc>
                 <a:extLst>
                   <a:ext uri="{0D108BD9-81ED-4DB2-BD59-A6C34878D82A}">
-                    <a16:rowId xmlns="" xmlns:a16="http://schemas.microsoft.com/office/drawing/2014/main" val="4248384778"/>
+                    <a16:rowId xmlns:a16="http://schemas.microsoft.com/office/drawing/2014/main" xmlns="" val="4248384778"/>
                   </a:ext>
                 </a:extLst>
               </a:tr>
@@ -39985,7 +39963,7 @@
                 </a:tc>
                 <a:extLst>
                   <a:ext uri="{0D108BD9-81ED-4DB2-BD59-A6C34878D82A}">
-                    <a16:rowId xmlns="" xmlns:a16="http://schemas.microsoft.com/office/drawing/2014/main" val="1670483340"/>
+                    <a16:rowId xmlns:a16="http://schemas.microsoft.com/office/drawing/2014/main" xmlns="" val="1670483340"/>
                   </a:ext>
                 </a:extLst>
               </a:tr>
@@ -40389,14 +40367,14 @@
                 <a:gridCol w="934278">
                   <a:extLst>
                     <a:ext uri="{9D8B030D-6E8A-4147-A177-3AD203B41FA5}">
-                      <a16:colId xmlns="" xmlns:a16="http://schemas.microsoft.com/office/drawing/2014/main" val="4198655800"/>
+                      <a16:colId xmlns:a16="http://schemas.microsoft.com/office/drawing/2014/main" xmlns="" val="4198655800"/>
                     </a:ext>
                   </a:extLst>
                 </a:gridCol>
                 <a:gridCol w="7295322">
                   <a:extLst>
                     <a:ext uri="{9D8B030D-6E8A-4147-A177-3AD203B41FA5}">
-                      <a16:colId xmlns="" xmlns:a16="http://schemas.microsoft.com/office/drawing/2014/main" val="135413862"/>
+                      <a16:colId xmlns:a16="http://schemas.microsoft.com/office/drawing/2014/main" xmlns="" val="135413862"/>
                     </a:ext>
                   </a:extLst>
                 </a:gridCol>
@@ -40430,7 +40408,7 @@
                 </a:tc>
                 <a:extLst>
                   <a:ext uri="{0D108BD9-81ED-4DB2-BD59-A6C34878D82A}">
-                    <a16:rowId xmlns="" xmlns:a16="http://schemas.microsoft.com/office/drawing/2014/main" val="3068323444"/>
+                    <a16:rowId xmlns:a16="http://schemas.microsoft.com/office/drawing/2014/main" xmlns="" val="3068323444"/>
                   </a:ext>
                 </a:extLst>
               </a:tr>
@@ -40494,7 +40472,7 @@
                 </a:tc>
                 <a:extLst>
                   <a:ext uri="{0D108BD9-81ED-4DB2-BD59-A6C34878D82A}">
-                    <a16:rowId xmlns="" xmlns:a16="http://schemas.microsoft.com/office/drawing/2014/main" val="1586961909"/>
+                    <a16:rowId xmlns:a16="http://schemas.microsoft.com/office/drawing/2014/main" xmlns="" val="1586961909"/>
                   </a:ext>
                 </a:extLst>
               </a:tr>
@@ -40527,7 +40505,7 @@
                 </a:tc>
                 <a:extLst>
                   <a:ext uri="{0D108BD9-81ED-4DB2-BD59-A6C34878D82A}">
-                    <a16:rowId xmlns="" xmlns:a16="http://schemas.microsoft.com/office/drawing/2014/main" val="2280300197"/>
+                    <a16:rowId xmlns:a16="http://schemas.microsoft.com/office/drawing/2014/main" xmlns="" val="2280300197"/>
                   </a:ext>
                 </a:extLst>
               </a:tr>
@@ -40565,7 +40543,7 @@
                 </a:tc>
                 <a:extLst>
                   <a:ext uri="{0D108BD9-81ED-4DB2-BD59-A6C34878D82A}">
-                    <a16:rowId xmlns="" xmlns:a16="http://schemas.microsoft.com/office/drawing/2014/main" val="1192843310"/>
+                    <a16:rowId xmlns:a16="http://schemas.microsoft.com/office/drawing/2014/main" xmlns="" val="1192843310"/>
                   </a:ext>
                 </a:extLst>
               </a:tr>
@@ -40603,7 +40581,7 @@
                 </a:tc>
                 <a:extLst>
                   <a:ext uri="{0D108BD9-81ED-4DB2-BD59-A6C34878D82A}">
-                    <a16:rowId xmlns="" xmlns:a16="http://schemas.microsoft.com/office/drawing/2014/main" val="2620585158"/>
+                    <a16:rowId xmlns:a16="http://schemas.microsoft.com/office/drawing/2014/main" xmlns="" val="2620585158"/>
                   </a:ext>
                 </a:extLst>
               </a:tr>
@@ -40641,7 +40619,7 @@
                 </a:tc>
                 <a:extLst>
                   <a:ext uri="{0D108BD9-81ED-4DB2-BD59-A6C34878D82A}">
-                    <a16:rowId xmlns="" xmlns:a16="http://schemas.microsoft.com/office/drawing/2014/main" val="1697738616"/>
+                    <a16:rowId xmlns:a16="http://schemas.microsoft.com/office/drawing/2014/main" xmlns="" val="1697738616"/>
                   </a:ext>
                 </a:extLst>
               </a:tr>
@@ -40674,7 +40652,7 @@
                 </a:tc>
                 <a:extLst>
                   <a:ext uri="{0D108BD9-81ED-4DB2-BD59-A6C34878D82A}">
-                    <a16:rowId xmlns="" xmlns:a16="http://schemas.microsoft.com/office/drawing/2014/main" val="316611556"/>
+                    <a16:rowId xmlns:a16="http://schemas.microsoft.com/office/drawing/2014/main" xmlns="" val="316611556"/>
                   </a:ext>
                 </a:extLst>
               </a:tr>
@@ -40712,7 +40690,7 @@
                 </a:tc>
                 <a:extLst>
                   <a:ext uri="{0D108BD9-81ED-4DB2-BD59-A6C34878D82A}">
-                    <a16:rowId xmlns="" xmlns:a16="http://schemas.microsoft.com/office/drawing/2014/main" val="1312814102"/>
+                    <a16:rowId xmlns:a16="http://schemas.microsoft.com/office/drawing/2014/main" xmlns="" val="1312814102"/>
                   </a:ext>
                 </a:extLst>
               </a:tr>
@@ -40745,7 +40723,7 @@
                 </a:tc>
                 <a:extLst>
                   <a:ext uri="{0D108BD9-81ED-4DB2-BD59-A6C34878D82A}">
-                    <a16:rowId xmlns="" xmlns:a16="http://schemas.microsoft.com/office/drawing/2014/main" val="1975533996"/>
+                    <a16:rowId xmlns:a16="http://schemas.microsoft.com/office/drawing/2014/main" xmlns="" val="1975533996"/>
                   </a:ext>
                 </a:extLst>
               </a:tr>
@@ -40778,7 +40756,7 @@
                 </a:tc>
                 <a:extLst>
                   <a:ext uri="{0D108BD9-81ED-4DB2-BD59-A6C34878D82A}">
-                    <a16:rowId xmlns="" xmlns:a16="http://schemas.microsoft.com/office/drawing/2014/main" val="2759032957"/>
+                    <a16:rowId xmlns:a16="http://schemas.microsoft.com/office/drawing/2014/main" xmlns="" val="2759032957"/>
                   </a:ext>
                 </a:extLst>
               </a:tr>
@@ -40867,14 +40845,14 @@
                 <a:gridCol w="934278">
                   <a:extLst>
                     <a:ext uri="{9D8B030D-6E8A-4147-A177-3AD203B41FA5}">
-                      <a16:colId xmlns="" xmlns:a16="http://schemas.microsoft.com/office/drawing/2014/main" val="4198655800"/>
+                      <a16:colId xmlns:a16="http://schemas.microsoft.com/office/drawing/2014/main" xmlns="" val="4198655800"/>
                     </a:ext>
                   </a:extLst>
                 </a:gridCol>
                 <a:gridCol w="7295322">
                   <a:extLst>
                     <a:ext uri="{9D8B030D-6E8A-4147-A177-3AD203B41FA5}">
-                      <a16:colId xmlns="" xmlns:a16="http://schemas.microsoft.com/office/drawing/2014/main" val="135413862"/>
+                      <a16:colId xmlns:a16="http://schemas.microsoft.com/office/drawing/2014/main" xmlns="" val="135413862"/>
                     </a:ext>
                   </a:extLst>
                 </a:gridCol>
@@ -40908,7 +40886,7 @@
                 </a:tc>
                 <a:extLst>
                   <a:ext uri="{0D108BD9-81ED-4DB2-BD59-A6C34878D82A}">
-                    <a16:rowId xmlns="" xmlns:a16="http://schemas.microsoft.com/office/drawing/2014/main" val="3068323444"/>
+                    <a16:rowId xmlns:a16="http://schemas.microsoft.com/office/drawing/2014/main" xmlns="" val="3068323444"/>
                   </a:ext>
                 </a:extLst>
               </a:tr>
@@ -40941,7 +40919,7 @@
                 </a:tc>
                 <a:extLst>
                   <a:ext uri="{0D108BD9-81ED-4DB2-BD59-A6C34878D82A}">
-                    <a16:rowId xmlns="" xmlns:a16="http://schemas.microsoft.com/office/drawing/2014/main" val="2484981654"/>
+                    <a16:rowId xmlns:a16="http://schemas.microsoft.com/office/drawing/2014/main" xmlns="" val="2484981654"/>
                   </a:ext>
                 </a:extLst>
               </a:tr>
@@ -40974,7 +40952,7 @@
                 </a:tc>
                 <a:extLst>
                   <a:ext uri="{0D108BD9-81ED-4DB2-BD59-A6C34878D82A}">
-                    <a16:rowId xmlns="" xmlns:a16="http://schemas.microsoft.com/office/drawing/2014/main" val="1377910784"/>
+                    <a16:rowId xmlns:a16="http://schemas.microsoft.com/office/drawing/2014/main" xmlns="" val="1377910784"/>
                   </a:ext>
                 </a:extLst>
               </a:tr>
@@ -41012,7 +40990,7 @@
                 </a:tc>
                 <a:extLst>
                   <a:ext uri="{0D108BD9-81ED-4DB2-BD59-A6C34878D82A}">
-                    <a16:rowId xmlns="" xmlns:a16="http://schemas.microsoft.com/office/drawing/2014/main" val="1387856053"/>
+                    <a16:rowId xmlns:a16="http://schemas.microsoft.com/office/drawing/2014/main" xmlns="" val="1387856053"/>
                   </a:ext>
                 </a:extLst>
               </a:tr>
@@ -41045,7 +41023,7 @@
                 </a:tc>
                 <a:extLst>
                   <a:ext uri="{0D108BD9-81ED-4DB2-BD59-A6C34878D82A}">
-                    <a16:rowId xmlns="" xmlns:a16="http://schemas.microsoft.com/office/drawing/2014/main" val="2599123823"/>
+                    <a16:rowId xmlns:a16="http://schemas.microsoft.com/office/drawing/2014/main" xmlns="" val="2599123823"/>
                   </a:ext>
                 </a:extLst>
               </a:tr>
@@ -41083,7 +41061,7 @@
                 </a:tc>
                 <a:extLst>
                   <a:ext uri="{0D108BD9-81ED-4DB2-BD59-A6C34878D82A}">
-                    <a16:rowId xmlns="" xmlns:a16="http://schemas.microsoft.com/office/drawing/2014/main" val="1232603862"/>
+                    <a16:rowId xmlns:a16="http://schemas.microsoft.com/office/drawing/2014/main" xmlns="" val="1232603862"/>
                   </a:ext>
                 </a:extLst>
               </a:tr>
@@ -41124,7 +41102,7 @@
                 </a:tc>
                 <a:extLst>
                   <a:ext uri="{0D108BD9-81ED-4DB2-BD59-A6C34878D82A}">
-                    <a16:rowId xmlns="" xmlns:a16="http://schemas.microsoft.com/office/drawing/2014/main" val="4145944521"/>
+                    <a16:rowId xmlns:a16="http://schemas.microsoft.com/office/drawing/2014/main" xmlns="" val="4145944521"/>
                   </a:ext>
                 </a:extLst>
               </a:tr>
@@ -41157,7 +41135,7 @@
                 </a:tc>
                 <a:extLst>
                   <a:ext uri="{0D108BD9-81ED-4DB2-BD59-A6C34878D82A}">
-                    <a16:rowId xmlns="" xmlns:a16="http://schemas.microsoft.com/office/drawing/2014/main" val="2954677722"/>
+                    <a16:rowId xmlns:a16="http://schemas.microsoft.com/office/drawing/2014/main" xmlns="" val="2954677722"/>
                   </a:ext>
                 </a:extLst>
               </a:tr>
@@ -41195,7 +41173,7 @@
                 </a:tc>
                 <a:extLst>
                   <a:ext uri="{0D108BD9-81ED-4DB2-BD59-A6C34878D82A}">
-                    <a16:rowId xmlns="" xmlns:a16="http://schemas.microsoft.com/office/drawing/2014/main" val="205903975"/>
+                    <a16:rowId xmlns:a16="http://schemas.microsoft.com/office/drawing/2014/main" xmlns="" val="205903975"/>
                   </a:ext>
                 </a:extLst>
               </a:tr>
@@ -41228,7 +41206,7 @@
                 </a:tc>
                 <a:extLst>
                   <a:ext uri="{0D108BD9-81ED-4DB2-BD59-A6C34878D82A}">
-                    <a16:rowId xmlns="" xmlns:a16="http://schemas.microsoft.com/office/drawing/2014/main" val="2893595017"/>
+                    <a16:rowId xmlns:a16="http://schemas.microsoft.com/office/drawing/2014/main" xmlns="" val="2893595017"/>
                   </a:ext>
                 </a:extLst>
               </a:tr>
@@ -41446,14 +41424,14 @@
                 <a:gridCol w="934278">
                   <a:extLst>
                     <a:ext uri="{9D8B030D-6E8A-4147-A177-3AD203B41FA5}">
-                      <a16:colId xmlns="" xmlns:a16="http://schemas.microsoft.com/office/drawing/2014/main" val="4198655800"/>
+                      <a16:colId xmlns:a16="http://schemas.microsoft.com/office/drawing/2014/main" xmlns="" val="4198655800"/>
                     </a:ext>
                   </a:extLst>
                 </a:gridCol>
                 <a:gridCol w="7295322">
                   <a:extLst>
                     <a:ext uri="{9D8B030D-6E8A-4147-A177-3AD203B41FA5}">
-                      <a16:colId xmlns="" xmlns:a16="http://schemas.microsoft.com/office/drawing/2014/main" val="135413862"/>
+                      <a16:colId xmlns:a16="http://schemas.microsoft.com/office/drawing/2014/main" xmlns="" val="135413862"/>
                     </a:ext>
                   </a:extLst>
                 </a:gridCol>
@@ -41487,7 +41465,7 @@
                 </a:tc>
                 <a:extLst>
                   <a:ext uri="{0D108BD9-81ED-4DB2-BD59-A6C34878D82A}">
-                    <a16:rowId xmlns="" xmlns:a16="http://schemas.microsoft.com/office/drawing/2014/main" val="3068323444"/>
+                    <a16:rowId xmlns:a16="http://schemas.microsoft.com/office/drawing/2014/main" xmlns="" val="3068323444"/>
                   </a:ext>
                 </a:extLst>
               </a:tr>
@@ -42123,9 +42101,34 @@
             </a:r>
             <a:r>
               <a:rPr lang="en-US" dirty="0"/>
-              <a:t> (Kalen Delaney, editor), chapter 11</a:t>
-            </a:r>
-            <a:endParaRPr lang="en-US" i="1" dirty="0"/>
+              <a:t> (Kalen Delaney, editor), chapter </a:t>
+            </a:r>
+            <a:r>
+              <a:rPr lang="en-US" dirty="0" smtClean="0"/>
+              <a:t>11</a:t>
+            </a:r>
+          </a:p>
+          <a:p>
+            <a:pPr lvl="1"/>
+            <a:r>
+              <a:rPr lang="en-US" dirty="0" err="1" smtClean="0">
+                <a:hlinkClick r:id="rId8"/>
+              </a:rPr>
+              <a:t>SQLBits</a:t>
+            </a:r>
+            <a:r>
+              <a:rPr lang="en-US" smtClean="0">
+                <a:hlinkClick r:id="rId8"/>
+              </a:rPr>
+              <a:t> </a:t>
+            </a:r>
+            <a:r>
+              <a:rPr lang="en-US" dirty="0" smtClean="0">
+                <a:hlinkClick r:id="rId8"/>
+              </a:rPr>
+              <a:t>Session</a:t>
+            </a:r>
+            <a:endParaRPr lang="en-US" dirty="0"/>
           </a:p>
         </p:txBody>
       </p:sp>
@@ -43700,21 +43703,21 @@
                 <a:gridCol w="2764301">
                   <a:extLst>
                     <a:ext uri="{9D8B030D-6E8A-4147-A177-3AD203B41FA5}">
-                      <a16:colId xmlns="" xmlns:a16="http://schemas.microsoft.com/office/drawing/2014/main" val="234227049"/>
+                      <a16:colId xmlns:a16="http://schemas.microsoft.com/office/drawing/2014/main" xmlns="" val="234227049"/>
                     </a:ext>
                   </a:extLst>
                 </a:gridCol>
                 <a:gridCol w="2764301">
                   <a:extLst>
                     <a:ext uri="{9D8B030D-6E8A-4147-A177-3AD203B41FA5}">
-                      <a16:colId xmlns="" xmlns:a16="http://schemas.microsoft.com/office/drawing/2014/main" val="4053135350"/>
+                      <a16:colId xmlns:a16="http://schemas.microsoft.com/office/drawing/2014/main" xmlns="" val="4053135350"/>
                     </a:ext>
                   </a:extLst>
                 </a:gridCol>
                 <a:gridCol w="2764301">
                   <a:extLst>
                     <a:ext uri="{9D8B030D-6E8A-4147-A177-3AD203B41FA5}">
-                      <a16:colId xmlns="" xmlns:a16="http://schemas.microsoft.com/office/drawing/2014/main" val="672378647"/>
+                      <a16:colId xmlns:a16="http://schemas.microsoft.com/office/drawing/2014/main" xmlns="" val="672378647"/>
                     </a:ext>
                   </a:extLst>
                 </a:gridCol>
@@ -43764,7 +43767,7 @@
                 </a:tc>
                 <a:extLst>
                   <a:ext uri="{0D108BD9-81ED-4DB2-BD59-A6C34878D82A}">
-                    <a16:rowId xmlns="" xmlns:a16="http://schemas.microsoft.com/office/drawing/2014/main" val="2843053056"/>
+                    <a16:rowId xmlns:a16="http://schemas.microsoft.com/office/drawing/2014/main" xmlns="" val="2843053056"/>
                   </a:ext>
                 </a:extLst>
               </a:tr>
@@ -43814,7 +43817,7 @@
                 </a:tc>
                 <a:extLst>
                   <a:ext uri="{0D108BD9-81ED-4DB2-BD59-A6C34878D82A}">
-                    <a16:rowId xmlns="" xmlns:a16="http://schemas.microsoft.com/office/drawing/2014/main" val="3055328934"/>
+                    <a16:rowId xmlns:a16="http://schemas.microsoft.com/office/drawing/2014/main" xmlns="" val="3055328934"/>
                   </a:ext>
                 </a:extLst>
               </a:tr>
@@ -43864,7 +43867,7 @@
                 </a:tc>
                 <a:extLst>
                   <a:ext uri="{0D108BD9-81ED-4DB2-BD59-A6C34878D82A}">
-                    <a16:rowId xmlns="" xmlns:a16="http://schemas.microsoft.com/office/drawing/2014/main" val="1144851549"/>
+                    <a16:rowId xmlns:a16="http://schemas.microsoft.com/office/drawing/2014/main" xmlns="" val="1144851549"/>
                   </a:ext>
                 </a:extLst>
               </a:tr>
@@ -43913,7 +43916,7 @@
                 </a:tc>
                 <a:extLst>
                   <a:ext uri="{0D108BD9-81ED-4DB2-BD59-A6C34878D82A}">
-                    <a16:rowId xmlns="" xmlns:a16="http://schemas.microsoft.com/office/drawing/2014/main" val="4258932578"/>
+                    <a16:rowId xmlns:a16="http://schemas.microsoft.com/office/drawing/2014/main" xmlns="" val="4258932578"/>
                   </a:ext>
                 </a:extLst>
               </a:tr>

</xml_diff>

<commit_message>
Change slide queries from NE to WI.
</commit_message>
<xml_diff>
--- a/Optimizer.pptx
+++ b/Optimizer.pptx
@@ -271,7 +271,7 @@
           <a:p>
             <a:fld id="{2EDCB34D-5EC2-4739-9693-E425457AC201}" type="datetimeFigureOut">
               <a:rPr lang="en-US" smtClean="0"/>
-              <a:t>03/16/2017</a:t>
+              <a:t>03/27/2017</a:t>
             </a:fld>
             <a:endParaRPr lang="en-US"/>
           </a:p>
@@ -3062,7 +3062,7 @@
             <a:fld id="{5942B21B-2ADA-A040-A652-A7305E1B99FE}" type="datetimeFigureOut">
               <a:rPr lang="en-US" smtClean="0"/>
               <a:pPr/>
-              <a:t>03/16/2017</a:t>
+              <a:t>03/27/2017</a:t>
             </a:fld>
             <a:endParaRPr lang="en-US" dirty="0"/>
           </a:p>
@@ -3252,7 +3252,7 @@
           <a:p>
             <a:fld id="{5942B21B-2ADA-A040-A652-A7305E1B99FE}" type="datetimeFigureOut">
               <a:rPr lang="en-US" smtClean="0"/>
-              <a:t>03/16/2017</a:t>
+              <a:t>03/27/2017</a:t>
             </a:fld>
             <a:endParaRPr lang="en-US"/>
           </a:p>
@@ -3376,7 +3376,7 @@
             <a:fld id="{5942B21B-2ADA-A040-A652-A7305E1B99FE}" type="datetimeFigureOut">
               <a:rPr lang="en-US" smtClean="0"/>
               <a:pPr/>
-              <a:t>03/16/2017</a:t>
+              <a:t>03/27/2017</a:t>
             </a:fld>
             <a:r>
               <a:rPr lang="en-US"/>
@@ -3647,7 +3647,7 @@
             <a:fld id="{5942B21B-2ADA-A040-A652-A7305E1B99FE}" type="datetimeFigureOut">
               <a:rPr lang="en-US" smtClean="0"/>
               <a:pPr/>
-              <a:t>03/16/2017</a:t>
+              <a:t>03/27/2017</a:t>
             </a:fld>
             <a:r>
               <a:rPr lang="en-US" dirty="0"/>
@@ -3917,7 +3917,7 @@
             <a:fld id="{5942B21B-2ADA-A040-A652-A7305E1B99FE}" type="datetimeFigureOut">
               <a:rPr lang="en-US" smtClean="0"/>
               <a:pPr/>
-              <a:t>03/16/2017</a:t>
+              <a:t>03/27/2017</a:t>
             </a:fld>
             <a:r>
               <a:rPr lang="en-US" dirty="0"/>
@@ -4257,7 +4257,7 @@
             <a:fld id="{5942B21B-2ADA-A040-A652-A7305E1B99FE}" type="datetimeFigureOut">
               <a:rPr lang="en-US" smtClean="0"/>
               <a:pPr/>
-              <a:t>03/16/2017</a:t>
+              <a:t>03/27/2017</a:t>
             </a:fld>
             <a:r>
               <a:rPr lang="en-US" dirty="0"/>
@@ -4598,7 +4598,7 @@
             <a:fld id="{5942B21B-2ADA-A040-A652-A7305E1B99FE}" type="datetimeFigureOut">
               <a:rPr lang="en-US" smtClean="0"/>
               <a:pPr/>
-              <a:t>03/16/2017</a:t>
+              <a:t>03/27/2017</a:t>
             </a:fld>
             <a:r>
               <a:rPr lang="en-US" dirty="0"/>
@@ -5113,7 +5113,7 @@
             <a:fld id="{5942B21B-2ADA-A040-A652-A7305E1B99FE}" type="datetimeFigureOut">
               <a:rPr lang="en-US" smtClean="0"/>
               <a:pPr/>
-              <a:t>03/16/2017</a:t>
+              <a:t>03/27/2017</a:t>
             </a:fld>
             <a:r>
               <a:rPr lang="en-US" dirty="0"/>
@@ -5322,7 +5322,7 @@
             <a:fld id="{5942B21B-2ADA-A040-A652-A7305E1B99FE}" type="datetimeFigureOut">
               <a:rPr lang="en-US" smtClean="0"/>
               <a:pPr/>
-              <a:t>03/16/2017</a:t>
+              <a:t>03/27/2017</a:t>
             </a:fld>
             <a:r>
               <a:rPr lang="en-US" dirty="0"/>
@@ -5509,7 +5509,7 @@
             <a:fld id="{5942B21B-2ADA-A040-A652-A7305E1B99FE}" type="datetimeFigureOut">
               <a:rPr lang="en-US" smtClean="0"/>
               <a:pPr/>
-              <a:t>03/16/2017</a:t>
+              <a:t>03/27/2017</a:t>
             </a:fld>
             <a:r>
               <a:rPr lang="en-US" dirty="0"/>
@@ -5840,7 +5840,7 @@
             <a:fld id="{5942B21B-2ADA-A040-A652-A7305E1B99FE}" type="datetimeFigureOut">
               <a:rPr lang="en-US" smtClean="0"/>
               <a:pPr/>
-              <a:t>03/16/2017</a:t>
+              <a:t>03/27/2017</a:t>
             </a:fld>
             <a:r>
               <a:rPr lang="en-US" dirty="0"/>
@@ -6148,7 +6148,7 @@
             <a:fld id="{5942B21B-2ADA-A040-A652-A7305E1B99FE}" type="datetimeFigureOut">
               <a:rPr lang="en-US" smtClean="0"/>
               <a:pPr/>
-              <a:t>03/16/2017</a:t>
+              <a:t>03/27/2017</a:t>
             </a:fld>
             <a:r>
               <a:rPr lang="en-US" dirty="0"/>
@@ -6427,7 +6427,7 @@
             <a:fld id="{5942B21B-2ADA-A040-A652-A7305E1B99FE}" type="datetimeFigureOut">
               <a:rPr lang="en-US" smtClean="0"/>
               <a:pPr/>
-              <a:t>03/16/2017</a:t>
+              <a:t>03/27/2017</a:t>
             </a:fld>
             <a:r>
               <a:rPr lang="en-US" dirty="0"/>
@@ -7912,7 +7912,7 @@
               <a:t> </a:t>
             </a:r>
             <a:r>
-              <a:rPr lang="en-US" dirty="0">
+              <a:rPr lang="en-US" dirty="0" smtClean="0">
                 <a:solidFill>
                   <a:srgbClr val="FF0000"/>
                 </a:solidFill>
@@ -7920,7 +7920,18 @@
                 <a:ea typeface="Calibri" panose="020F0502020204030204" pitchFamily="34" charset="0"/>
                 <a:cs typeface="Times New Roman" panose="02020603050405020304" pitchFamily="18" charset="0"/>
               </a:rPr>
-              <a:t>'NE'</a:t>
+              <a:t>'WI</a:t>
+            </a:r>
+            <a:r>
+              <a:rPr lang="en-US" dirty="0" smtClean="0">
+                <a:solidFill>
+                  <a:srgbClr val="FF0000"/>
+                </a:solidFill>
+                <a:latin typeface="Consolas" panose="020B0609020204030204" pitchFamily="49" charset="0"/>
+                <a:ea typeface="Calibri" panose="020F0502020204030204" pitchFamily="34" charset="0"/>
+                <a:cs typeface="Times New Roman" panose="02020603050405020304" pitchFamily="18" charset="0"/>
+              </a:rPr>
+              <a:t>'</a:t>
             </a:r>
             <a:endParaRPr lang="en-US" dirty="0">
               <a:latin typeface="Consolas" panose="020B0609020204030204" pitchFamily="49" charset="0"/>
@@ -9118,7 +9129,7 @@
               <a:t> </a:t>
             </a:r>
             <a:r>
-              <a:rPr lang="en-US" dirty="0">
+              <a:rPr lang="en-US" dirty="0" smtClean="0">
                 <a:solidFill>
                   <a:srgbClr val="FF0000"/>
                 </a:solidFill>
@@ -9126,7 +9137,18 @@
                 <a:ea typeface="Calibri" panose="020F0502020204030204" pitchFamily="34" charset="0"/>
                 <a:cs typeface="Times New Roman" panose="02020603050405020304" pitchFamily="18" charset="0"/>
               </a:rPr>
-              <a:t>'NE'</a:t>
+              <a:t>'WI</a:t>
+            </a:r>
+            <a:r>
+              <a:rPr lang="en-US" dirty="0" smtClean="0">
+                <a:solidFill>
+                  <a:srgbClr val="FF0000"/>
+                </a:solidFill>
+                <a:latin typeface="Consolas" panose="020B0609020204030204" pitchFamily="49" charset="0"/>
+                <a:ea typeface="Calibri" panose="020F0502020204030204" pitchFamily="34" charset="0"/>
+                <a:cs typeface="Times New Roman" panose="02020603050405020304" pitchFamily="18" charset="0"/>
+              </a:rPr>
+              <a:t>'</a:t>
             </a:r>
             <a:endParaRPr lang="en-US" sz="2400" dirty="0">
               <a:latin typeface="Calibri" panose="020F0502020204030204" pitchFamily="34" charset="0"/>
@@ -10337,7 +10359,7 @@
               <a:t> </a:t>
             </a:r>
             <a:r>
-              <a:rPr lang="en-US" dirty="0">
+              <a:rPr lang="en-US" dirty="0" smtClean="0">
                 <a:solidFill>
                   <a:srgbClr val="FF0000"/>
                 </a:solidFill>
@@ -10345,7 +10367,18 @@
                 <a:ea typeface="Calibri" panose="020F0502020204030204" pitchFamily="34" charset="0"/>
                 <a:cs typeface="Times New Roman" panose="02020603050405020304" pitchFamily="18" charset="0"/>
               </a:rPr>
-              <a:t>'NE'</a:t>
+              <a:t>'WI</a:t>
+            </a:r>
+            <a:r>
+              <a:rPr lang="en-US" dirty="0" smtClean="0">
+                <a:solidFill>
+                  <a:srgbClr val="FF0000"/>
+                </a:solidFill>
+                <a:latin typeface="Consolas" panose="020B0609020204030204" pitchFamily="49" charset="0"/>
+                <a:ea typeface="Calibri" panose="020F0502020204030204" pitchFamily="34" charset="0"/>
+                <a:cs typeface="Times New Roman" panose="02020603050405020304" pitchFamily="18" charset="0"/>
+              </a:rPr>
+              <a:t>'</a:t>
             </a:r>
             <a:endParaRPr lang="en-US" sz="2400" dirty="0">
               <a:latin typeface="Calibri" panose="020F0502020204030204" pitchFamily="34" charset="0"/>
@@ -11566,8 +11599,33 @@
                 <a:ea typeface="Calibri" panose="020F0502020204030204" pitchFamily="34" charset="0"/>
                 <a:cs typeface="Times New Roman" panose="02020603050405020304" pitchFamily="18" charset="0"/>
               </a:rPr>
-              <a:t> = 'NE'</a:t>
-            </a:r>
+              <a:t> = </a:t>
+            </a:r>
+            <a:r>
+              <a:rPr lang="en-US" dirty="0" smtClean="0">
+                <a:solidFill>
+                  <a:srgbClr val="008080"/>
+                </a:solidFill>
+                <a:highlight>
+                  <a:srgbClr val="FFFF00"/>
+                </a:highlight>
+                <a:latin typeface="Consolas" panose="020B0609020204030204" pitchFamily="49" charset="0"/>
+                <a:ea typeface="Calibri" panose="020F0502020204030204" pitchFamily="34" charset="0"/>
+                <a:cs typeface="Times New Roman" panose="02020603050405020304" pitchFamily="18" charset="0"/>
+              </a:rPr>
+              <a:t>'WI'</a:t>
+            </a:r>
+            <a:endParaRPr lang="en-US" dirty="0">
+              <a:solidFill>
+                <a:srgbClr val="008080"/>
+              </a:solidFill>
+              <a:highlight>
+                <a:srgbClr val="FFFF00"/>
+              </a:highlight>
+              <a:latin typeface="Consolas" panose="020B0609020204030204" pitchFamily="49" charset="0"/>
+              <a:ea typeface="Calibri" panose="020F0502020204030204" pitchFamily="34" charset="0"/>
+              <a:cs typeface="Times New Roman" panose="02020603050405020304" pitchFamily="18" charset="0"/>
+            </a:endParaRPr>
           </a:p>
           <a:p>
             <a:pPr>
@@ -11907,8 +11965,13 @@
             </a:pPr>
             <a:r>
               <a:rPr lang="en-US" sz="3000" dirty="0"/>
-              <a:t>Find rows in R4 where State = 'NE'</a:t>
-            </a:r>
+              <a:t>Find rows in R4 where State = </a:t>
+            </a:r>
+            <a:r>
+              <a:rPr lang="en-US" sz="3000" dirty="0" smtClean="0"/>
+              <a:t>'WI'</a:t>
+            </a:r>
+            <a:endParaRPr lang="en-US" sz="3000" dirty="0"/>
           </a:p>
           <a:p>
             <a:pPr marL="457200" indent="-457200">
@@ -11917,7 +11980,15 @@
             </a:pPr>
             <a:r>
               <a:rPr lang="en-US" sz="3000" dirty="0"/>
-              <a:t>Result is 13,270 rows / 14 columns</a:t>
+              <a:t>Result is </a:t>
+            </a:r>
+            <a:r>
+              <a:rPr lang="en-US" sz="3000" dirty="0" smtClean="0"/>
+              <a:t>5,509 </a:t>
+            </a:r>
+            <a:r>
+              <a:rPr lang="en-US" sz="3000" dirty="0"/>
+              <a:t>rows / 14 columns</a:t>
             </a:r>
           </a:p>
           <a:p>
@@ -12809,7 +12880,7 @@
               <a:t> </a:t>
             </a:r>
             <a:r>
-              <a:rPr lang="en-US" dirty="0">
+              <a:rPr lang="en-US" dirty="0" smtClean="0">
                 <a:solidFill>
                   <a:srgbClr val="FF0000"/>
                 </a:solidFill>
@@ -12817,7 +12888,18 @@
                 <a:ea typeface="Calibri" panose="020F0502020204030204" pitchFamily="34" charset="0"/>
                 <a:cs typeface="Times New Roman" panose="02020603050405020304" pitchFamily="18" charset="0"/>
               </a:rPr>
-              <a:t>'NE'</a:t>
+              <a:t>'WI</a:t>
+            </a:r>
+            <a:r>
+              <a:rPr lang="en-US" dirty="0" smtClean="0">
+                <a:solidFill>
+                  <a:srgbClr val="FF0000"/>
+                </a:solidFill>
+                <a:latin typeface="Consolas" panose="020B0609020204030204" pitchFamily="49" charset="0"/>
+                <a:ea typeface="Calibri" panose="020F0502020204030204" pitchFamily="34" charset="0"/>
+                <a:cs typeface="Times New Roman" panose="02020603050405020304" pitchFamily="18" charset="0"/>
+              </a:rPr>
+              <a:t>'</a:t>
             </a:r>
             <a:endParaRPr lang="en-US" sz="2400" dirty="0">
               <a:latin typeface="Calibri" panose="020F0502020204030204" pitchFamily="34" charset="0"/>
@@ -13151,7 +13233,15 @@
             </a:pPr>
             <a:r>
               <a:rPr lang="en-US" sz="3000" dirty="0"/>
-              <a:t>Result is 5,563 rows / 2 columns</a:t>
+              <a:t>Result is </a:t>
+            </a:r>
+            <a:r>
+              <a:rPr lang="en-US" sz="3000" dirty="0" smtClean="0"/>
+              <a:t>5,509 </a:t>
+            </a:r>
+            <a:r>
+              <a:rPr lang="en-US" sz="3000" dirty="0"/>
+              <a:t>rows / 2 columns</a:t>
             </a:r>
           </a:p>
           <a:p>
@@ -14065,7 +14155,7 @@
               <a:t> </a:t>
             </a:r>
             <a:r>
-              <a:rPr lang="en-US" dirty="0">
+              <a:rPr lang="en-US" dirty="0" smtClean="0">
                 <a:solidFill>
                   <a:srgbClr val="FF0000"/>
                 </a:solidFill>
@@ -14073,7 +14163,18 @@
                 <a:ea typeface="Calibri" panose="020F0502020204030204" pitchFamily="34" charset="0"/>
                 <a:cs typeface="Times New Roman" panose="02020603050405020304" pitchFamily="18" charset="0"/>
               </a:rPr>
-              <a:t>'NE'</a:t>
+              <a:t>'WI</a:t>
+            </a:r>
+            <a:r>
+              <a:rPr lang="en-US" dirty="0" smtClean="0">
+                <a:solidFill>
+                  <a:srgbClr val="FF0000"/>
+                </a:solidFill>
+                <a:latin typeface="Consolas" panose="020B0609020204030204" pitchFamily="49" charset="0"/>
+                <a:ea typeface="Calibri" panose="020F0502020204030204" pitchFamily="34" charset="0"/>
+                <a:cs typeface="Times New Roman" panose="02020603050405020304" pitchFamily="18" charset="0"/>
+              </a:rPr>
+              <a:t>'</a:t>
             </a:r>
             <a:endParaRPr lang="en-US" sz="2400" dirty="0">
               <a:latin typeface="Calibri" panose="020F0502020204030204" pitchFamily="34" charset="0"/>
@@ -14354,7 +14455,15 @@
             </a:pPr>
             <a:r>
               <a:rPr lang="en-US" sz="3000" dirty="0"/>
-              <a:t>Result is 68 rows / 2 columns</a:t>
+              <a:t>Result is </a:t>
+            </a:r>
+            <a:r>
+              <a:rPr lang="en-US" sz="3000" dirty="0" smtClean="0"/>
+              <a:t>67 </a:t>
+            </a:r>
+            <a:r>
+              <a:rPr lang="en-US" sz="3000" dirty="0"/>
+              <a:t>rows / 2 columns</a:t>
             </a:r>
           </a:p>
           <a:p>
@@ -15170,7 +15279,7 @@
               <a:t> </a:t>
             </a:r>
             <a:r>
-              <a:rPr lang="en-US" dirty="0">
+              <a:rPr lang="en-US" dirty="0" smtClean="0">
                 <a:solidFill>
                   <a:srgbClr val="FF0000"/>
                 </a:solidFill>
@@ -15178,7 +15287,18 @@
                 <a:ea typeface="Calibri" panose="020F0502020204030204" pitchFamily="34" charset="0"/>
                 <a:cs typeface="Times New Roman" panose="02020603050405020304" pitchFamily="18" charset="0"/>
               </a:rPr>
-              <a:t>'NE'</a:t>
+              <a:t>'WI</a:t>
+            </a:r>
+            <a:r>
+              <a:rPr lang="en-US" dirty="0" smtClean="0">
+                <a:solidFill>
+                  <a:srgbClr val="FF0000"/>
+                </a:solidFill>
+                <a:latin typeface="Consolas" panose="020B0609020204030204" pitchFamily="49" charset="0"/>
+                <a:ea typeface="Calibri" panose="020F0502020204030204" pitchFamily="34" charset="0"/>
+                <a:cs typeface="Times New Roman" panose="02020603050405020304" pitchFamily="18" charset="0"/>
+              </a:rPr>
+              <a:t>'</a:t>
             </a:r>
             <a:endParaRPr lang="en-US" sz="2400" dirty="0">
               <a:latin typeface="Calibri" panose="020F0502020204030204" pitchFamily="34" charset="0"/>
@@ -15582,7 +15702,15 @@
             </a:pPr>
             <a:r>
               <a:rPr lang="en-US" sz="3000" dirty="0"/>
-              <a:t>Result is 68 rows / 2 columns</a:t>
+              <a:t>Result is </a:t>
+            </a:r>
+            <a:r>
+              <a:rPr lang="en-US" sz="3000" dirty="0" smtClean="0"/>
+              <a:t>67 </a:t>
+            </a:r>
+            <a:r>
+              <a:rPr lang="en-US" sz="3000" dirty="0"/>
+              <a:t>rows / 2 columns</a:t>
             </a:r>
           </a:p>
           <a:p>
@@ -16475,7 +16603,7 @@
               <a:t> </a:t>
             </a:r>
             <a:r>
-              <a:rPr lang="en-US" dirty="0">
+              <a:rPr lang="en-US" dirty="0" smtClean="0">
                 <a:solidFill>
                   <a:srgbClr val="FF0000"/>
                 </a:solidFill>
@@ -16483,7 +16611,7 @@
                 <a:ea typeface="Calibri" panose="020F0502020204030204" pitchFamily="34" charset="0"/>
                 <a:cs typeface="Times New Roman" panose="02020603050405020304" pitchFamily="18" charset="0"/>
               </a:rPr>
-              <a:t>'NE'</a:t>
+              <a:t>'WI'</a:t>
             </a:r>
             <a:endParaRPr lang="en-US" sz="2400" dirty="0">
               <a:latin typeface="Calibri" panose="020F0502020204030204" pitchFamily="34" charset="0"/>
@@ -17689,7 +17817,7 @@
               <a:t>= </a:t>
             </a:r>
             <a:r>
-              <a:rPr lang="en-US" dirty="0">
+              <a:rPr lang="en-US" dirty="0" smtClean="0">
                 <a:solidFill>
                   <a:srgbClr val="FF0000"/>
                 </a:solidFill>
@@ -17697,7 +17825,18 @@
                 <a:ea typeface="Calibri" panose="020F0502020204030204" pitchFamily="34" charset="0"/>
                 <a:cs typeface="Times New Roman" panose="02020603050405020304" pitchFamily="18" charset="0"/>
               </a:rPr>
-              <a:t>'NE'</a:t>
+              <a:t>'WI</a:t>
+            </a:r>
+            <a:r>
+              <a:rPr lang="en-US" dirty="0" smtClean="0">
+                <a:solidFill>
+                  <a:srgbClr val="FF0000"/>
+                </a:solidFill>
+                <a:latin typeface="Consolas" panose="020B0609020204030204" pitchFamily="49" charset="0"/>
+                <a:ea typeface="Calibri" panose="020F0502020204030204" pitchFamily="34" charset="0"/>
+                <a:cs typeface="Times New Roman" panose="02020603050405020304" pitchFamily="18" charset="0"/>
+              </a:rPr>
+              <a:t>'</a:t>
             </a:r>
             <a:endParaRPr lang="en-US" sz="2400" dirty="0">
               <a:latin typeface="Calibri" panose="020F0502020204030204" pitchFamily="34" charset="0"/>
@@ -18792,7 +18931,7 @@
               <a:t> </a:t>
             </a:r>
             <a:r>
-              <a:rPr lang="en-US" dirty="0">
+              <a:rPr lang="en-US" dirty="0" smtClean="0">
                 <a:solidFill>
                   <a:srgbClr val="FF0000"/>
                 </a:solidFill>
@@ -18800,7 +18939,18 @@
                 <a:ea typeface="Calibri" panose="020F0502020204030204" pitchFamily="34" charset="0"/>
                 <a:cs typeface="Times New Roman" panose="02020603050405020304" pitchFamily="18" charset="0"/>
               </a:rPr>
-              <a:t>'NE'</a:t>
+              <a:t>'WI</a:t>
+            </a:r>
+            <a:r>
+              <a:rPr lang="en-US" dirty="0" smtClean="0">
+                <a:solidFill>
+                  <a:srgbClr val="FF0000"/>
+                </a:solidFill>
+                <a:latin typeface="Consolas" panose="020B0609020204030204" pitchFamily="49" charset="0"/>
+                <a:ea typeface="Calibri" panose="020F0502020204030204" pitchFamily="34" charset="0"/>
+                <a:cs typeface="Times New Roman" panose="02020603050405020304" pitchFamily="18" charset="0"/>
+              </a:rPr>
+              <a:t>'</a:t>
             </a:r>
             <a:endParaRPr lang="en-US" sz="2400" dirty="0">
               <a:latin typeface="Calibri" panose="020F0502020204030204" pitchFamily="34" charset="0"/>
@@ -20851,28 +21001,28 @@
                 <a:gridCol w="1638752">
                   <a:extLst>
                     <a:ext uri="{9D8B030D-6E8A-4147-A177-3AD203B41FA5}">
-                      <a16:colId xmlns:a16="http://schemas.microsoft.com/office/drawing/2014/main" xmlns="" val="20000"/>
+                      <a16:colId xmlns="" xmlns:a16="http://schemas.microsoft.com/office/drawing/2014/main" val="20000"/>
                     </a:ext>
                   </a:extLst>
                 </a:gridCol>
                 <a:gridCol w="4787153">
                   <a:extLst>
                     <a:ext uri="{9D8B030D-6E8A-4147-A177-3AD203B41FA5}">
-                      <a16:colId xmlns:a16="http://schemas.microsoft.com/office/drawing/2014/main" xmlns="" val="20001"/>
+                      <a16:colId xmlns="" xmlns:a16="http://schemas.microsoft.com/office/drawing/2014/main" val="20001"/>
                     </a:ext>
                   </a:extLst>
                 </a:gridCol>
                 <a:gridCol w="851647">
                   <a:extLst>
                     <a:ext uri="{9D8B030D-6E8A-4147-A177-3AD203B41FA5}">
-                      <a16:colId xmlns:a16="http://schemas.microsoft.com/office/drawing/2014/main" xmlns="" val="20002"/>
+                      <a16:colId xmlns="" xmlns:a16="http://schemas.microsoft.com/office/drawing/2014/main" val="20002"/>
                     </a:ext>
                   </a:extLst>
                 </a:gridCol>
                 <a:gridCol w="779930">
                   <a:extLst>
                     <a:ext uri="{9D8B030D-6E8A-4147-A177-3AD203B41FA5}">
-                      <a16:colId xmlns:a16="http://schemas.microsoft.com/office/drawing/2014/main" xmlns="" val="20003"/>
+                      <a16:colId xmlns="" xmlns:a16="http://schemas.microsoft.com/office/drawing/2014/main" val="20003"/>
                     </a:ext>
                   </a:extLst>
                 </a:gridCol>
@@ -20932,7 +21082,7 @@
                 </a:tc>
                 <a:extLst>
                   <a:ext uri="{0D108BD9-81ED-4DB2-BD59-A6C34878D82A}">
-                    <a16:rowId xmlns:a16="http://schemas.microsoft.com/office/drawing/2014/main" xmlns="" val="10000"/>
+                    <a16:rowId xmlns="" xmlns:a16="http://schemas.microsoft.com/office/drawing/2014/main" val="10000"/>
                   </a:ext>
                 </a:extLst>
               </a:tr>
@@ -20997,7 +21147,7 @@
                 </a:tc>
                 <a:extLst>
                   <a:ext uri="{0D108BD9-81ED-4DB2-BD59-A6C34878D82A}">
-                    <a16:rowId xmlns:a16="http://schemas.microsoft.com/office/drawing/2014/main" xmlns="" val="10001"/>
+                    <a16:rowId xmlns="" xmlns:a16="http://schemas.microsoft.com/office/drawing/2014/main" val="10001"/>
                   </a:ext>
                 </a:extLst>
               </a:tr>
@@ -21074,7 +21224,7 @@
                 </a:tc>
                 <a:extLst>
                   <a:ext uri="{0D108BD9-81ED-4DB2-BD59-A6C34878D82A}">
-                    <a16:rowId xmlns:a16="http://schemas.microsoft.com/office/drawing/2014/main" xmlns="" val="10002"/>
+                    <a16:rowId xmlns="" xmlns:a16="http://schemas.microsoft.com/office/drawing/2014/main" val="10002"/>
                   </a:ext>
                 </a:extLst>
               </a:tr>
@@ -21140,7 +21290,7 @@
                 </a:tc>
                 <a:extLst>
                   <a:ext uri="{0D108BD9-81ED-4DB2-BD59-A6C34878D82A}">
-                    <a16:rowId xmlns:a16="http://schemas.microsoft.com/office/drawing/2014/main" xmlns="" val="10003"/>
+                    <a16:rowId xmlns="" xmlns:a16="http://schemas.microsoft.com/office/drawing/2014/main" val="10003"/>
                   </a:ext>
                 </a:extLst>
               </a:tr>
@@ -21229,7 +21379,7 @@
                 </a:tc>
                 <a:extLst>
                   <a:ext uri="{0D108BD9-81ED-4DB2-BD59-A6C34878D82A}">
-                    <a16:rowId xmlns:a16="http://schemas.microsoft.com/office/drawing/2014/main" xmlns="" val="10004"/>
+                    <a16:rowId xmlns="" xmlns:a16="http://schemas.microsoft.com/office/drawing/2014/main" val="10004"/>
                   </a:ext>
                 </a:extLst>
               </a:tr>
@@ -21300,7 +21450,7 @@
                 </a:tc>
                 <a:extLst>
                   <a:ext uri="{0D108BD9-81ED-4DB2-BD59-A6C34878D82A}">
-                    <a16:rowId xmlns:a16="http://schemas.microsoft.com/office/drawing/2014/main" xmlns="" val="10005"/>
+                    <a16:rowId xmlns="" xmlns:a16="http://schemas.microsoft.com/office/drawing/2014/main" val="10005"/>
                   </a:ext>
                 </a:extLst>
               </a:tr>
@@ -21366,7 +21516,7 @@
                 </a:tc>
                 <a:extLst>
                   <a:ext uri="{0D108BD9-81ED-4DB2-BD59-A6C34878D82A}">
-                    <a16:rowId xmlns:a16="http://schemas.microsoft.com/office/drawing/2014/main" xmlns="" val="10006"/>
+                    <a16:rowId xmlns="" xmlns:a16="http://schemas.microsoft.com/office/drawing/2014/main" val="10006"/>
                   </a:ext>
                 </a:extLst>
               </a:tr>
@@ -22045,7 +22195,7 @@
       </p:sp>
       <p:pic>
         <p:nvPicPr>
-          <p:cNvPr id="5" name="Picture 4"/>
+          <p:cNvPr id="4" name="Picture 3"/>
           <p:cNvPicPr>
             <a:picLocks noChangeAspect="1"/>
           </p:cNvPicPr>
@@ -22059,8 +22209,8 @@
         </p:blipFill>
         <p:spPr>
           <a:xfrm>
-            <a:off x="420329" y="1417638"/>
-            <a:ext cx="8303342" cy="4289163"/>
+            <a:off x="420624" y="1417320"/>
+            <a:ext cx="8302752" cy="4132384"/>
           </a:xfrm>
           <a:prstGeom prst="rect">
             <a:avLst/>
@@ -24472,7 +24622,7 @@
               <a:t> </a:t>
             </a:r>
             <a:r>
-              <a:rPr lang="en-US" sz="1600" dirty="0">
+              <a:rPr lang="en-US" sz="1600" dirty="0" smtClean="0">
                 <a:solidFill>
                   <a:srgbClr val="FF0000"/>
                 </a:solidFill>
@@ -24480,10 +24630,10 @@
                 <a:ea typeface="Calibri" panose="020F0502020204030204" pitchFamily="34" charset="0"/>
                 <a:cs typeface="Times New Roman" panose="02020603050405020304" pitchFamily="18" charset="0"/>
               </a:rPr>
-              <a:t>'NE'</a:t>
-            </a:r>
-            <a:r>
-              <a:rPr lang="en-US" sz="1600" dirty="0">
+              <a:t>'WI'</a:t>
+            </a:r>
+            <a:r>
+              <a:rPr lang="en-US" sz="1600" dirty="0" smtClean="0">
                 <a:latin typeface="Consolas" panose="020B0609020204030204" pitchFamily="49" charset="0"/>
                 <a:ea typeface="Calibri" panose="020F0502020204030204" pitchFamily="34" charset="0"/>
                 <a:cs typeface="Times New Roman" panose="02020603050405020304" pitchFamily="18" charset="0"/>
@@ -26987,7 +27137,7 @@
               <a:t>= </a:t>
             </a:r>
             <a:r>
-              <a:rPr lang="en-US" sz="1400" dirty="0">
+              <a:rPr lang="en-US" sz="1400" dirty="0" smtClean="0">
                 <a:solidFill>
                   <a:srgbClr val="FF0000"/>
                 </a:solidFill>
@@ -26995,7 +27145,7 @@
                 <a:ea typeface="Calibri" panose="020F0502020204030204" pitchFamily="34" charset="0"/>
                 <a:cs typeface="Times New Roman" panose="02020603050405020304" pitchFamily="18" charset="0"/>
               </a:rPr>
-              <a:t>'NE'</a:t>
+              <a:t>'WI'</a:t>
             </a:r>
             <a:endParaRPr lang="en-US" sz="1400" dirty="0">
               <a:solidFill>
@@ -27968,7 +28118,7 @@
               <a:t>= </a:t>
             </a:r>
             <a:r>
-              <a:rPr lang="en-US" sz="1400" dirty="0">
+              <a:rPr lang="en-US" sz="1400" dirty="0" smtClean="0">
                 <a:solidFill>
                   <a:srgbClr val="FF0000"/>
                 </a:solidFill>
@@ -27976,7 +28126,7 @@
                 <a:ea typeface="Calibri" panose="020F0502020204030204" pitchFamily="34" charset="0"/>
                 <a:cs typeface="Times New Roman" panose="02020603050405020304" pitchFamily="18" charset="0"/>
               </a:rPr>
-              <a:t>'NE'</a:t>
+              <a:t>'WI'</a:t>
             </a:r>
             <a:endParaRPr lang="en-US" dirty="0">
               <a:latin typeface="Calibri" panose="020F0502020204030204" pitchFamily="34" charset="0"/>
@@ -30048,14 +30198,14 @@
                 <a:gridCol w="7632835">
                   <a:extLst>
                     <a:ext uri="{9D8B030D-6E8A-4147-A177-3AD203B41FA5}">
-                      <a16:colId xmlns:a16="http://schemas.microsoft.com/office/drawing/2014/main" xmlns="" val="3644048045"/>
+                      <a16:colId xmlns="" xmlns:a16="http://schemas.microsoft.com/office/drawing/2014/main" val="3644048045"/>
                     </a:ext>
                   </a:extLst>
                 </a:gridCol>
                 <a:gridCol w="606393">
                   <a:extLst>
                     <a:ext uri="{9D8B030D-6E8A-4147-A177-3AD203B41FA5}">
-                      <a16:colId xmlns:a16="http://schemas.microsoft.com/office/drawing/2014/main" xmlns="" val="2034254753"/>
+                      <a16:colId xmlns="" xmlns:a16="http://schemas.microsoft.com/office/drawing/2014/main" val="2034254753"/>
                     </a:ext>
                   </a:extLst>
                 </a:gridCol>
@@ -30086,7 +30236,7 @@
                 </a:tc>
                 <a:extLst>
                   <a:ext uri="{0D108BD9-81ED-4DB2-BD59-A6C34878D82A}">
-                    <a16:rowId xmlns:a16="http://schemas.microsoft.com/office/drawing/2014/main" xmlns="" val="2708275910"/>
+                    <a16:rowId xmlns="" xmlns:a16="http://schemas.microsoft.com/office/drawing/2014/main" val="2708275910"/>
                   </a:ext>
                 </a:extLst>
               </a:tr>
@@ -30120,7 +30270,7 @@
                 </a:tc>
                 <a:extLst>
                   <a:ext uri="{0D108BD9-81ED-4DB2-BD59-A6C34878D82A}">
-                    <a16:rowId xmlns:a16="http://schemas.microsoft.com/office/drawing/2014/main" xmlns="" val="2161984115"/>
+                    <a16:rowId xmlns="" xmlns:a16="http://schemas.microsoft.com/office/drawing/2014/main" val="2161984115"/>
                   </a:ext>
                 </a:extLst>
               </a:tr>
@@ -30167,7 +30317,7 @@
                 </a:tc>
                 <a:extLst>
                   <a:ext uri="{0D108BD9-81ED-4DB2-BD59-A6C34878D82A}">
-                    <a16:rowId xmlns:a16="http://schemas.microsoft.com/office/drawing/2014/main" xmlns="" val="2841678841"/>
+                    <a16:rowId xmlns="" xmlns:a16="http://schemas.microsoft.com/office/drawing/2014/main" val="2841678841"/>
                   </a:ext>
                 </a:extLst>
               </a:tr>
@@ -30201,7 +30351,7 @@
                 </a:tc>
                 <a:extLst>
                   <a:ext uri="{0D108BD9-81ED-4DB2-BD59-A6C34878D82A}">
-                    <a16:rowId xmlns:a16="http://schemas.microsoft.com/office/drawing/2014/main" xmlns="" val="3144998627"/>
+                    <a16:rowId xmlns="" xmlns:a16="http://schemas.microsoft.com/office/drawing/2014/main" val="3144998627"/>
                   </a:ext>
                 </a:extLst>
               </a:tr>
@@ -30243,7 +30393,7 @@
                 </a:tc>
                 <a:extLst>
                   <a:ext uri="{0D108BD9-81ED-4DB2-BD59-A6C34878D82A}">
-                    <a16:rowId xmlns:a16="http://schemas.microsoft.com/office/drawing/2014/main" xmlns="" val="1419261869"/>
+                    <a16:rowId xmlns="" xmlns:a16="http://schemas.microsoft.com/office/drawing/2014/main" val="1419261869"/>
                   </a:ext>
                 </a:extLst>
               </a:tr>
@@ -30281,7 +30431,7 @@
                 </a:tc>
                 <a:extLst>
                   <a:ext uri="{0D108BD9-81ED-4DB2-BD59-A6C34878D82A}">
-                    <a16:rowId xmlns:a16="http://schemas.microsoft.com/office/drawing/2014/main" xmlns="" val="1427391072"/>
+                    <a16:rowId xmlns="" xmlns:a16="http://schemas.microsoft.com/office/drawing/2014/main" val="1427391072"/>
                   </a:ext>
                 </a:extLst>
               </a:tr>
@@ -30328,7 +30478,7 @@
                 </a:tc>
                 <a:extLst>
                   <a:ext uri="{0D108BD9-81ED-4DB2-BD59-A6C34878D82A}">
-                    <a16:rowId xmlns:a16="http://schemas.microsoft.com/office/drawing/2014/main" xmlns="" val="2346539918"/>
+                    <a16:rowId xmlns="" xmlns:a16="http://schemas.microsoft.com/office/drawing/2014/main" val="2346539918"/>
                   </a:ext>
                 </a:extLst>
               </a:tr>
@@ -30367,7 +30517,7 @@
                 </a:tc>
                 <a:extLst>
                   <a:ext uri="{0D108BD9-81ED-4DB2-BD59-A6C34878D82A}">
-                    <a16:rowId xmlns:a16="http://schemas.microsoft.com/office/drawing/2014/main" xmlns="" val="2275483042"/>
+                    <a16:rowId xmlns="" xmlns:a16="http://schemas.microsoft.com/office/drawing/2014/main" val="2275483042"/>
                   </a:ext>
                 </a:extLst>
               </a:tr>
@@ -30405,7 +30555,7 @@
                 </a:tc>
                 <a:extLst>
                   <a:ext uri="{0D108BD9-81ED-4DB2-BD59-A6C34878D82A}">
-                    <a16:rowId xmlns:a16="http://schemas.microsoft.com/office/drawing/2014/main" xmlns="" val="4202569347"/>
+                    <a16:rowId xmlns="" xmlns:a16="http://schemas.microsoft.com/office/drawing/2014/main" val="4202569347"/>
                   </a:ext>
                 </a:extLst>
               </a:tr>
@@ -30439,7 +30589,7 @@
                 </a:tc>
                 <a:extLst>
                   <a:ext uri="{0D108BD9-81ED-4DB2-BD59-A6C34878D82A}">
-                    <a16:rowId xmlns:a16="http://schemas.microsoft.com/office/drawing/2014/main" xmlns="" val="2989839269"/>
+                    <a16:rowId xmlns="" xmlns:a16="http://schemas.microsoft.com/office/drawing/2014/main" val="2989839269"/>
                   </a:ext>
                 </a:extLst>
               </a:tr>
@@ -30473,7 +30623,7 @@
                 </a:tc>
                 <a:extLst>
                   <a:ext uri="{0D108BD9-81ED-4DB2-BD59-A6C34878D82A}">
-                    <a16:rowId xmlns:a16="http://schemas.microsoft.com/office/drawing/2014/main" xmlns="" val="2130545569"/>
+                    <a16:rowId xmlns="" xmlns:a16="http://schemas.microsoft.com/office/drawing/2014/main" val="2130545569"/>
                   </a:ext>
                 </a:extLst>
               </a:tr>
@@ -30529,7 +30679,7 @@
                 </a:tc>
                 <a:extLst>
                   <a:ext uri="{0D108BD9-81ED-4DB2-BD59-A6C34878D82A}">
-                    <a16:rowId xmlns:a16="http://schemas.microsoft.com/office/drawing/2014/main" xmlns="" val="1848127216"/>
+                    <a16:rowId xmlns="" xmlns:a16="http://schemas.microsoft.com/office/drawing/2014/main" val="1848127216"/>
                   </a:ext>
                 </a:extLst>
               </a:tr>
@@ -30983,14 +31133,14 @@
                 <a:gridCol w="4119615">
                   <a:extLst>
                     <a:ext uri="{9D8B030D-6E8A-4147-A177-3AD203B41FA5}">
-                      <a16:colId xmlns:a16="http://schemas.microsoft.com/office/drawing/2014/main" xmlns="" val="3644048045"/>
+                      <a16:colId xmlns="" xmlns:a16="http://schemas.microsoft.com/office/drawing/2014/main" val="3644048045"/>
                     </a:ext>
                   </a:extLst>
                 </a:gridCol>
                 <a:gridCol w="4119613">
                   <a:extLst>
                     <a:ext uri="{9D8B030D-6E8A-4147-A177-3AD203B41FA5}">
-                      <a16:colId xmlns:a16="http://schemas.microsoft.com/office/drawing/2014/main" xmlns="" val="2034254753"/>
+                      <a16:colId xmlns="" xmlns:a16="http://schemas.microsoft.com/office/drawing/2014/main" val="2034254753"/>
                     </a:ext>
                   </a:extLst>
                 </a:gridCol>
@@ -31026,7 +31176,7 @@
                 </a:tc>
                 <a:extLst>
                   <a:ext uri="{0D108BD9-81ED-4DB2-BD59-A6C34878D82A}">
-                    <a16:rowId xmlns:a16="http://schemas.microsoft.com/office/drawing/2014/main" xmlns="" val="2708275910"/>
+                    <a16:rowId xmlns="" xmlns:a16="http://schemas.microsoft.com/office/drawing/2014/main" val="2708275910"/>
                   </a:ext>
                 </a:extLst>
               </a:tr>
@@ -31226,7 +31376,7 @@
                 </a:tc>
                 <a:extLst>
                   <a:ext uri="{0D108BD9-81ED-4DB2-BD59-A6C34878D82A}">
-                    <a16:rowId xmlns:a16="http://schemas.microsoft.com/office/drawing/2014/main" xmlns="" val="2161984115"/>
+                    <a16:rowId xmlns="" xmlns:a16="http://schemas.microsoft.com/office/drawing/2014/main" val="2161984115"/>
                   </a:ext>
                 </a:extLst>
               </a:tr>
@@ -31426,7 +31576,7 @@
                 </a:tc>
                 <a:extLst>
                   <a:ext uri="{0D108BD9-81ED-4DB2-BD59-A6C34878D82A}">
-                    <a16:rowId xmlns:a16="http://schemas.microsoft.com/office/drawing/2014/main" xmlns="" val="2841678841"/>
+                    <a16:rowId xmlns="" xmlns:a16="http://schemas.microsoft.com/office/drawing/2014/main" val="2841678841"/>
                   </a:ext>
                 </a:extLst>
               </a:tr>
@@ -31626,7 +31776,7 @@
                 </a:tc>
                 <a:extLst>
                   <a:ext uri="{0D108BD9-81ED-4DB2-BD59-A6C34878D82A}">
-                    <a16:rowId xmlns:a16="http://schemas.microsoft.com/office/drawing/2014/main" xmlns="" val="3144998627"/>
+                    <a16:rowId xmlns="" xmlns:a16="http://schemas.microsoft.com/office/drawing/2014/main" val="3144998627"/>
                   </a:ext>
                 </a:extLst>
               </a:tr>
@@ -31826,7 +31976,7 @@
                 </a:tc>
                 <a:extLst>
                   <a:ext uri="{0D108BD9-81ED-4DB2-BD59-A6C34878D82A}">
-                    <a16:rowId xmlns:a16="http://schemas.microsoft.com/office/drawing/2014/main" xmlns="" val="1419261869"/>
+                    <a16:rowId xmlns="" xmlns:a16="http://schemas.microsoft.com/office/drawing/2014/main" val="1419261869"/>
                   </a:ext>
                 </a:extLst>
               </a:tr>
@@ -32026,7 +32176,7 @@
                 </a:tc>
                 <a:extLst>
                   <a:ext uri="{0D108BD9-81ED-4DB2-BD59-A6C34878D82A}">
-                    <a16:rowId xmlns:a16="http://schemas.microsoft.com/office/drawing/2014/main" xmlns="" val="1427391072"/>
+                    <a16:rowId xmlns="" xmlns:a16="http://schemas.microsoft.com/office/drawing/2014/main" val="1427391072"/>
                   </a:ext>
                 </a:extLst>
               </a:tr>
@@ -32226,7 +32376,7 @@
                 </a:tc>
                 <a:extLst>
                   <a:ext uri="{0D108BD9-81ED-4DB2-BD59-A6C34878D82A}">
-                    <a16:rowId xmlns:a16="http://schemas.microsoft.com/office/drawing/2014/main" xmlns="" val="2346539918"/>
+                    <a16:rowId xmlns="" xmlns:a16="http://schemas.microsoft.com/office/drawing/2014/main" val="2346539918"/>
                   </a:ext>
                 </a:extLst>
               </a:tr>
@@ -32435,7 +32585,7 @@
                 </a:tc>
                 <a:extLst>
                   <a:ext uri="{0D108BD9-81ED-4DB2-BD59-A6C34878D82A}">
-                    <a16:rowId xmlns:a16="http://schemas.microsoft.com/office/drawing/2014/main" xmlns="" val="2275483042"/>
+                    <a16:rowId xmlns="" xmlns:a16="http://schemas.microsoft.com/office/drawing/2014/main" val="2275483042"/>
                   </a:ext>
                 </a:extLst>
               </a:tr>
@@ -32644,7 +32794,7 @@
                 </a:tc>
                 <a:extLst>
                   <a:ext uri="{0D108BD9-81ED-4DB2-BD59-A6C34878D82A}">
-                    <a16:rowId xmlns:a16="http://schemas.microsoft.com/office/drawing/2014/main" xmlns="" val="4202569347"/>
+                    <a16:rowId xmlns="" xmlns:a16="http://schemas.microsoft.com/office/drawing/2014/main" val="4202569347"/>
                   </a:ext>
                 </a:extLst>
               </a:tr>
@@ -32853,7 +33003,7 @@
                 </a:tc>
                 <a:extLst>
                   <a:ext uri="{0D108BD9-81ED-4DB2-BD59-A6C34878D82A}">
-                    <a16:rowId xmlns:a16="http://schemas.microsoft.com/office/drawing/2014/main" xmlns="" val="2989839269"/>
+                    <a16:rowId xmlns="" xmlns:a16="http://schemas.microsoft.com/office/drawing/2014/main" val="2989839269"/>
                   </a:ext>
                 </a:extLst>
               </a:tr>
@@ -33062,7 +33212,7 @@
                 </a:tc>
                 <a:extLst>
                   <a:ext uri="{0D108BD9-81ED-4DB2-BD59-A6C34878D82A}">
-                    <a16:rowId xmlns:a16="http://schemas.microsoft.com/office/drawing/2014/main" xmlns="" val="2130545569"/>
+                    <a16:rowId xmlns="" xmlns:a16="http://schemas.microsoft.com/office/drawing/2014/main" val="2130545569"/>
                   </a:ext>
                 </a:extLst>
               </a:tr>
@@ -33271,7 +33421,7 @@
                 </a:tc>
                 <a:extLst>
                   <a:ext uri="{0D108BD9-81ED-4DB2-BD59-A6C34878D82A}">
-                    <a16:rowId xmlns:a16="http://schemas.microsoft.com/office/drawing/2014/main" xmlns="" val="3045796785"/>
+                    <a16:rowId xmlns="" xmlns:a16="http://schemas.microsoft.com/office/drawing/2014/main" val="3045796785"/>
                   </a:ext>
                 </a:extLst>
               </a:tr>
@@ -33480,7 +33630,7 @@
                 </a:tc>
                 <a:extLst>
                   <a:ext uri="{0D108BD9-81ED-4DB2-BD59-A6C34878D82A}">
-                    <a16:rowId xmlns:a16="http://schemas.microsoft.com/office/drawing/2014/main" xmlns="" val="1091494175"/>
+                    <a16:rowId xmlns="" xmlns:a16="http://schemas.microsoft.com/office/drawing/2014/main" val="1091494175"/>
                   </a:ext>
                 </a:extLst>
               </a:tr>
@@ -37243,14 +37393,14 @@
                 <a:gridCol w="957714">
                   <a:extLst>
                     <a:ext uri="{9D8B030D-6E8A-4147-A177-3AD203B41FA5}">
-                      <a16:colId xmlns:a16="http://schemas.microsoft.com/office/drawing/2014/main" xmlns="" val="3940544257"/>
+                      <a16:colId xmlns="" xmlns:a16="http://schemas.microsoft.com/office/drawing/2014/main" val="3940544257"/>
                     </a:ext>
                   </a:extLst>
                 </a:gridCol>
                 <a:gridCol w="2464067">
                   <a:extLst>
                     <a:ext uri="{9D8B030D-6E8A-4147-A177-3AD203B41FA5}">
-                      <a16:colId xmlns:a16="http://schemas.microsoft.com/office/drawing/2014/main" xmlns="" val="3658567973"/>
+                      <a16:colId xmlns="" xmlns:a16="http://schemas.microsoft.com/office/drawing/2014/main" val="3658567973"/>
                     </a:ext>
                   </a:extLst>
                 </a:gridCol>
@@ -37284,7 +37434,7 @@
                 </a:tc>
                 <a:extLst>
                   <a:ext uri="{0D108BD9-81ED-4DB2-BD59-A6C34878D82A}">
-                    <a16:rowId xmlns:a16="http://schemas.microsoft.com/office/drawing/2014/main" xmlns="" val="1032275335"/>
+                    <a16:rowId xmlns="" xmlns:a16="http://schemas.microsoft.com/office/drawing/2014/main" val="1032275335"/>
                   </a:ext>
                 </a:extLst>
               </a:tr>
@@ -37414,7 +37564,7 @@
                 </a:tc>
                 <a:extLst>
                   <a:ext uri="{0D108BD9-81ED-4DB2-BD59-A6C34878D82A}">
-                    <a16:rowId xmlns:a16="http://schemas.microsoft.com/office/drawing/2014/main" xmlns="" val="4191484087"/>
+                    <a16:rowId xmlns="" xmlns:a16="http://schemas.microsoft.com/office/drawing/2014/main" val="4191484087"/>
                   </a:ext>
                 </a:extLst>
               </a:tr>
@@ -37488,7 +37638,7 @@
                 </a:tc>
                 <a:extLst>
                   <a:ext uri="{0D108BD9-81ED-4DB2-BD59-A6C34878D82A}">
-                    <a16:rowId xmlns:a16="http://schemas.microsoft.com/office/drawing/2014/main" xmlns="" val="1864588626"/>
+                    <a16:rowId xmlns="" xmlns:a16="http://schemas.microsoft.com/office/drawing/2014/main" val="1864588626"/>
                   </a:ext>
                 </a:extLst>
               </a:tr>
@@ -37610,7 +37760,7 @@
                 </a:tc>
                 <a:extLst>
                   <a:ext uri="{0D108BD9-81ED-4DB2-BD59-A6C34878D82A}">
-                    <a16:rowId xmlns:a16="http://schemas.microsoft.com/office/drawing/2014/main" xmlns="" val="3035259714"/>
+                    <a16:rowId xmlns="" xmlns:a16="http://schemas.microsoft.com/office/drawing/2014/main" val="3035259714"/>
                   </a:ext>
                 </a:extLst>
               </a:tr>
@@ -37699,7 +37849,7 @@
                 </a:tc>
                 <a:extLst>
                   <a:ext uri="{0D108BD9-81ED-4DB2-BD59-A6C34878D82A}">
-                    <a16:rowId xmlns:a16="http://schemas.microsoft.com/office/drawing/2014/main" xmlns="" val="2023621082"/>
+                    <a16:rowId xmlns="" xmlns:a16="http://schemas.microsoft.com/office/drawing/2014/main" val="2023621082"/>
                   </a:ext>
                 </a:extLst>
               </a:tr>
@@ -37788,7 +37938,7 @@
                 </a:tc>
                 <a:extLst>
                   <a:ext uri="{0D108BD9-81ED-4DB2-BD59-A6C34878D82A}">
-                    <a16:rowId xmlns:a16="http://schemas.microsoft.com/office/drawing/2014/main" xmlns="" val="120016333"/>
+                    <a16:rowId xmlns="" xmlns:a16="http://schemas.microsoft.com/office/drawing/2014/main" val="120016333"/>
                   </a:ext>
                 </a:extLst>
               </a:tr>
@@ -37933,21 +38083,21 @@
                 <a:gridCol w="960120">
                   <a:extLst>
                     <a:ext uri="{9D8B030D-6E8A-4147-A177-3AD203B41FA5}">
-                      <a16:colId xmlns:a16="http://schemas.microsoft.com/office/drawing/2014/main" xmlns="" val="392696932"/>
+                      <a16:colId xmlns="" xmlns:a16="http://schemas.microsoft.com/office/drawing/2014/main" val="392696932"/>
                     </a:ext>
                   </a:extLst>
                 </a:gridCol>
                 <a:gridCol w="2468880">
                   <a:extLst>
                     <a:ext uri="{9D8B030D-6E8A-4147-A177-3AD203B41FA5}">
-                      <a16:colId xmlns:a16="http://schemas.microsoft.com/office/drawing/2014/main" xmlns="" val="2769969192"/>
+                      <a16:colId xmlns="" xmlns:a16="http://schemas.microsoft.com/office/drawing/2014/main" val="2769969192"/>
                     </a:ext>
                   </a:extLst>
                 </a:gridCol>
                 <a:gridCol w="2468880">
                   <a:extLst>
                     <a:ext uri="{9D8B030D-6E8A-4147-A177-3AD203B41FA5}">
-                      <a16:colId xmlns:a16="http://schemas.microsoft.com/office/drawing/2014/main" xmlns="" val="2022610816"/>
+                      <a16:colId xmlns="" xmlns:a16="http://schemas.microsoft.com/office/drawing/2014/main" val="2022610816"/>
                     </a:ext>
                   </a:extLst>
                 </a:gridCol>
@@ -37999,7 +38149,7 @@
                 </a:tc>
                 <a:extLst>
                   <a:ext uri="{0D108BD9-81ED-4DB2-BD59-A6C34878D82A}">
-                    <a16:rowId xmlns:a16="http://schemas.microsoft.com/office/drawing/2014/main" xmlns="" val="2344937666"/>
+                    <a16:rowId xmlns="" xmlns:a16="http://schemas.microsoft.com/office/drawing/2014/main" val="2344937666"/>
                   </a:ext>
                 </a:extLst>
               </a:tr>
@@ -38132,7 +38282,7 @@
                 </a:tc>
                 <a:extLst>
                   <a:ext uri="{0D108BD9-81ED-4DB2-BD59-A6C34878D82A}">
-                    <a16:rowId xmlns:a16="http://schemas.microsoft.com/office/drawing/2014/main" xmlns="" val="1917341330"/>
+                    <a16:rowId xmlns="" xmlns:a16="http://schemas.microsoft.com/office/drawing/2014/main" val="1917341330"/>
                   </a:ext>
                 </a:extLst>
               </a:tr>
@@ -38349,7 +38499,7 @@
                 </a:tc>
                 <a:extLst>
                   <a:ext uri="{0D108BD9-81ED-4DB2-BD59-A6C34878D82A}">
-                    <a16:rowId xmlns:a16="http://schemas.microsoft.com/office/drawing/2014/main" xmlns="" val="3088042860"/>
+                    <a16:rowId xmlns="" xmlns:a16="http://schemas.microsoft.com/office/drawing/2014/main" val="3088042860"/>
                   </a:ext>
                 </a:extLst>
               </a:tr>
@@ -38433,7 +38583,7 @@
                 </a:tc>
                 <a:extLst>
                   <a:ext uri="{0D108BD9-81ED-4DB2-BD59-A6C34878D82A}">
-                    <a16:rowId xmlns:a16="http://schemas.microsoft.com/office/drawing/2014/main" xmlns="" val="2658530722"/>
+                    <a16:rowId xmlns="" xmlns:a16="http://schemas.microsoft.com/office/drawing/2014/main" val="2658530722"/>
                   </a:ext>
                 </a:extLst>
               </a:tr>
@@ -38565,7 +38715,7 @@
                 </a:tc>
                 <a:extLst>
                   <a:ext uri="{0D108BD9-81ED-4DB2-BD59-A6C34878D82A}">
-                    <a16:rowId xmlns:a16="http://schemas.microsoft.com/office/drawing/2014/main" xmlns="" val="1481886367"/>
+                    <a16:rowId xmlns="" xmlns:a16="http://schemas.microsoft.com/office/drawing/2014/main" val="1481886367"/>
                   </a:ext>
                 </a:extLst>
               </a:tr>
@@ -38664,7 +38814,7 @@
                 </a:tc>
                 <a:extLst>
                   <a:ext uri="{0D108BD9-81ED-4DB2-BD59-A6C34878D82A}">
-                    <a16:rowId xmlns:a16="http://schemas.microsoft.com/office/drawing/2014/main" xmlns="" val="4248384778"/>
+                    <a16:rowId xmlns="" xmlns:a16="http://schemas.microsoft.com/office/drawing/2014/main" val="4248384778"/>
                   </a:ext>
                 </a:extLst>
               </a:tr>
@@ -38763,7 +38913,7 @@
                 </a:tc>
                 <a:extLst>
                   <a:ext uri="{0D108BD9-81ED-4DB2-BD59-A6C34878D82A}">
-                    <a16:rowId xmlns:a16="http://schemas.microsoft.com/office/drawing/2014/main" xmlns="" val="1670483340"/>
+                    <a16:rowId xmlns="" xmlns:a16="http://schemas.microsoft.com/office/drawing/2014/main" val="1670483340"/>
                   </a:ext>
                 </a:extLst>
               </a:tr>
@@ -38908,28 +39058,28 @@
                 <a:gridCol w="960120">
                   <a:extLst>
                     <a:ext uri="{9D8B030D-6E8A-4147-A177-3AD203B41FA5}">
-                      <a16:colId xmlns:a16="http://schemas.microsoft.com/office/drawing/2014/main" xmlns="" val="392696932"/>
+                      <a16:colId xmlns="" xmlns:a16="http://schemas.microsoft.com/office/drawing/2014/main" val="392696932"/>
                     </a:ext>
                   </a:extLst>
                 </a:gridCol>
                 <a:gridCol w="2468880">
                   <a:extLst>
                     <a:ext uri="{9D8B030D-6E8A-4147-A177-3AD203B41FA5}">
-                      <a16:colId xmlns:a16="http://schemas.microsoft.com/office/drawing/2014/main" xmlns="" val="2769969192"/>
+                      <a16:colId xmlns="" xmlns:a16="http://schemas.microsoft.com/office/drawing/2014/main" val="2769969192"/>
                     </a:ext>
                   </a:extLst>
                 </a:gridCol>
                 <a:gridCol w="2468880">
                   <a:extLst>
                     <a:ext uri="{9D8B030D-6E8A-4147-A177-3AD203B41FA5}">
-                      <a16:colId xmlns:a16="http://schemas.microsoft.com/office/drawing/2014/main" xmlns="" val="2022610816"/>
+                      <a16:colId xmlns="" xmlns:a16="http://schemas.microsoft.com/office/drawing/2014/main" val="2022610816"/>
                     </a:ext>
                   </a:extLst>
                 </a:gridCol>
                 <a:gridCol w="2468880">
                   <a:extLst>
                     <a:ext uri="{9D8B030D-6E8A-4147-A177-3AD203B41FA5}">
-                      <a16:colId xmlns:a16="http://schemas.microsoft.com/office/drawing/2014/main" xmlns="" val="102813283"/>
+                      <a16:colId xmlns="" xmlns:a16="http://schemas.microsoft.com/office/drawing/2014/main" val="102813283"/>
                     </a:ext>
                   </a:extLst>
                 </a:gridCol>
@@ -38994,7 +39144,7 @@
                 </a:tc>
                 <a:extLst>
                   <a:ext uri="{0D108BD9-81ED-4DB2-BD59-A6C34878D82A}">
-                    <a16:rowId xmlns:a16="http://schemas.microsoft.com/office/drawing/2014/main" xmlns="" val="2344937666"/>
+                    <a16:rowId xmlns="" xmlns:a16="http://schemas.microsoft.com/office/drawing/2014/main" val="2344937666"/>
                   </a:ext>
                 </a:extLst>
               </a:tr>
@@ -39154,7 +39304,7 @@
                 </a:tc>
                 <a:extLst>
                   <a:ext uri="{0D108BD9-81ED-4DB2-BD59-A6C34878D82A}">
-                    <a16:rowId xmlns:a16="http://schemas.microsoft.com/office/drawing/2014/main" xmlns="" val="1917341330"/>
+                    <a16:rowId xmlns="" xmlns:a16="http://schemas.microsoft.com/office/drawing/2014/main" val="1917341330"/>
                   </a:ext>
                 </a:extLst>
               </a:tr>
@@ -39458,7 +39608,7 @@
                 </a:tc>
                 <a:extLst>
                   <a:ext uri="{0D108BD9-81ED-4DB2-BD59-A6C34878D82A}">
-                    <a16:rowId xmlns:a16="http://schemas.microsoft.com/office/drawing/2014/main" xmlns="" val="3088042860"/>
+                    <a16:rowId xmlns="" xmlns:a16="http://schemas.microsoft.com/office/drawing/2014/main" val="3088042860"/>
                   </a:ext>
                 </a:extLst>
               </a:tr>
@@ -39552,7 +39702,7 @@
                 </a:tc>
                 <a:extLst>
                   <a:ext uri="{0D108BD9-81ED-4DB2-BD59-A6C34878D82A}">
-                    <a16:rowId xmlns:a16="http://schemas.microsoft.com/office/drawing/2014/main" xmlns="" val="2658530722"/>
+                    <a16:rowId xmlns="" xmlns:a16="http://schemas.microsoft.com/office/drawing/2014/main" val="2658530722"/>
                   </a:ext>
                 </a:extLst>
               </a:tr>
@@ -39745,7 +39895,7 @@
                 </a:tc>
                 <a:extLst>
                   <a:ext uri="{0D108BD9-81ED-4DB2-BD59-A6C34878D82A}">
-                    <a16:rowId xmlns:a16="http://schemas.microsoft.com/office/drawing/2014/main" xmlns="" val="1481886367"/>
+                    <a16:rowId xmlns="" xmlns:a16="http://schemas.microsoft.com/office/drawing/2014/main" val="1481886367"/>
                   </a:ext>
                 </a:extLst>
               </a:tr>
@@ -39854,7 +40004,7 @@
                 </a:tc>
                 <a:extLst>
                   <a:ext uri="{0D108BD9-81ED-4DB2-BD59-A6C34878D82A}">
-                    <a16:rowId xmlns:a16="http://schemas.microsoft.com/office/drawing/2014/main" xmlns="" val="4248384778"/>
+                    <a16:rowId xmlns="" xmlns:a16="http://schemas.microsoft.com/office/drawing/2014/main" val="4248384778"/>
                   </a:ext>
                 </a:extLst>
               </a:tr>
@@ -39963,7 +40113,7 @@
                 </a:tc>
                 <a:extLst>
                   <a:ext uri="{0D108BD9-81ED-4DB2-BD59-A6C34878D82A}">
-                    <a16:rowId xmlns:a16="http://schemas.microsoft.com/office/drawing/2014/main" xmlns="" val="1670483340"/>
+                    <a16:rowId xmlns="" xmlns:a16="http://schemas.microsoft.com/office/drawing/2014/main" val="1670483340"/>
                   </a:ext>
                 </a:extLst>
               </a:tr>
@@ -40367,14 +40517,14 @@
                 <a:gridCol w="934278">
                   <a:extLst>
                     <a:ext uri="{9D8B030D-6E8A-4147-A177-3AD203B41FA5}">
-                      <a16:colId xmlns:a16="http://schemas.microsoft.com/office/drawing/2014/main" xmlns="" val="4198655800"/>
+                      <a16:colId xmlns="" xmlns:a16="http://schemas.microsoft.com/office/drawing/2014/main" val="4198655800"/>
                     </a:ext>
                   </a:extLst>
                 </a:gridCol>
                 <a:gridCol w="7295322">
                   <a:extLst>
                     <a:ext uri="{9D8B030D-6E8A-4147-A177-3AD203B41FA5}">
-                      <a16:colId xmlns:a16="http://schemas.microsoft.com/office/drawing/2014/main" xmlns="" val="135413862"/>
+                      <a16:colId xmlns="" xmlns:a16="http://schemas.microsoft.com/office/drawing/2014/main" val="135413862"/>
                     </a:ext>
                   </a:extLst>
                 </a:gridCol>
@@ -40408,7 +40558,7 @@
                 </a:tc>
                 <a:extLst>
                   <a:ext uri="{0D108BD9-81ED-4DB2-BD59-A6C34878D82A}">
-                    <a16:rowId xmlns:a16="http://schemas.microsoft.com/office/drawing/2014/main" xmlns="" val="3068323444"/>
+                    <a16:rowId xmlns="" xmlns:a16="http://schemas.microsoft.com/office/drawing/2014/main" val="3068323444"/>
                   </a:ext>
                 </a:extLst>
               </a:tr>
@@ -40472,7 +40622,7 @@
                 </a:tc>
                 <a:extLst>
                   <a:ext uri="{0D108BD9-81ED-4DB2-BD59-A6C34878D82A}">
-                    <a16:rowId xmlns:a16="http://schemas.microsoft.com/office/drawing/2014/main" xmlns="" val="1586961909"/>
+                    <a16:rowId xmlns="" xmlns:a16="http://schemas.microsoft.com/office/drawing/2014/main" val="1586961909"/>
                   </a:ext>
                 </a:extLst>
               </a:tr>
@@ -40505,7 +40655,7 @@
                 </a:tc>
                 <a:extLst>
                   <a:ext uri="{0D108BD9-81ED-4DB2-BD59-A6C34878D82A}">
-                    <a16:rowId xmlns:a16="http://schemas.microsoft.com/office/drawing/2014/main" xmlns="" val="2280300197"/>
+                    <a16:rowId xmlns="" xmlns:a16="http://schemas.microsoft.com/office/drawing/2014/main" val="2280300197"/>
                   </a:ext>
                 </a:extLst>
               </a:tr>
@@ -40543,7 +40693,7 @@
                 </a:tc>
                 <a:extLst>
                   <a:ext uri="{0D108BD9-81ED-4DB2-BD59-A6C34878D82A}">
-                    <a16:rowId xmlns:a16="http://schemas.microsoft.com/office/drawing/2014/main" xmlns="" val="1192843310"/>
+                    <a16:rowId xmlns="" xmlns:a16="http://schemas.microsoft.com/office/drawing/2014/main" val="1192843310"/>
                   </a:ext>
                 </a:extLst>
               </a:tr>
@@ -40581,7 +40731,7 @@
                 </a:tc>
                 <a:extLst>
                   <a:ext uri="{0D108BD9-81ED-4DB2-BD59-A6C34878D82A}">
-                    <a16:rowId xmlns:a16="http://schemas.microsoft.com/office/drawing/2014/main" xmlns="" val="2620585158"/>
+                    <a16:rowId xmlns="" xmlns:a16="http://schemas.microsoft.com/office/drawing/2014/main" val="2620585158"/>
                   </a:ext>
                 </a:extLst>
               </a:tr>
@@ -40619,7 +40769,7 @@
                 </a:tc>
                 <a:extLst>
                   <a:ext uri="{0D108BD9-81ED-4DB2-BD59-A6C34878D82A}">
-                    <a16:rowId xmlns:a16="http://schemas.microsoft.com/office/drawing/2014/main" xmlns="" val="1697738616"/>
+                    <a16:rowId xmlns="" xmlns:a16="http://schemas.microsoft.com/office/drawing/2014/main" val="1697738616"/>
                   </a:ext>
                 </a:extLst>
               </a:tr>
@@ -40652,7 +40802,7 @@
                 </a:tc>
                 <a:extLst>
                   <a:ext uri="{0D108BD9-81ED-4DB2-BD59-A6C34878D82A}">
-                    <a16:rowId xmlns:a16="http://schemas.microsoft.com/office/drawing/2014/main" xmlns="" val="316611556"/>
+                    <a16:rowId xmlns="" xmlns:a16="http://schemas.microsoft.com/office/drawing/2014/main" val="316611556"/>
                   </a:ext>
                 </a:extLst>
               </a:tr>
@@ -40690,7 +40840,7 @@
                 </a:tc>
                 <a:extLst>
                   <a:ext uri="{0D108BD9-81ED-4DB2-BD59-A6C34878D82A}">
-                    <a16:rowId xmlns:a16="http://schemas.microsoft.com/office/drawing/2014/main" xmlns="" val="1312814102"/>
+                    <a16:rowId xmlns="" xmlns:a16="http://schemas.microsoft.com/office/drawing/2014/main" val="1312814102"/>
                   </a:ext>
                 </a:extLst>
               </a:tr>
@@ -40723,7 +40873,7 @@
                 </a:tc>
                 <a:extLst>
                   <a:ext uri="{0D108BD9-81ED-4DB2-BD59-A6C34878D82A}">
-                    <a16:rowId xmlns:a16="http://schemas.microsoft.com/office/drawing/2014/main" xmlns="" val="1975533996"/>
+                    <a16:rowId xmlns="" xmlns:a16="http://schemas.microsoft.com/office/drawing/2014/main" val="1975533996"/>
                   </a:ext>
                 </a:extLst>
               </a:tr>
@@ -40756,7 +40906,7 @@
                 </a:tc>
                 <a:extLst>
                   <a:ext uri="{0D108BD9-81ED-4DB2-BD59-A6C34878D82A}">
-                    <a16:rowId xmlns:a16="http://schemas.microsoft.com/office/drawing/2014/main" xmlns="" val="2759032957"/>
+                    <a16:rowId xmlns="" xmlns:a16="http://schemas.microsoft.com/office/drawing/2014/main" val="2759032957"/>
                   </a:ext>
                 </a:extLst>
               </a:tr>
@@ -40845,14 +40995,14 @@
                 <a:gridCol w="934278">
                   <a:extLst>
                     <a:ext uri="{9D8B030D-6E8A-4147-A177-3AD203B41FA5}">
-                      <a16:colId xmlns:a16="http://schemas.microsoft.com/office/drawing/2014/main" xmlns="" val="4198655800"/>
+                      <a16:colId xmlns="" xmlns:a16="http://schemas.microsoft.com/office/drawing/2014/main" val="4198655800"/>
                     </a:ext>
                   </a:extLst>
                 </a:gridCol>
                 <a:gridCol w="7295322">
                   <a:extLst>
                     <a:ext uri="{9D8B030D-6E8A-4147-A177-3AD203B41FA5}">
-                      <a16:colId xmlns:a16="http://schemas.microsoft.com/office/drawing/2014/main" xmlns="" val="135413862"/>
+                      <a16:colId xmlns="" xmlns:a16="http://schemas.microsoft.com/office/drawing/2014/main" val="135413862"/>
                     </a:ext>
                   </a:extLst>
                 </a:gridCol>
@@ -40886,7 +41036,7 @@
                 </a:tc>
                 <a:extLst>
                   <a:ext uri="{0D108BD9-81ED-4DB2-BD59-A6C34878D82A}">
-                    <a16:rowId xmlns:a16="http://schemas.microsoft.com/office/drawing/2014/main" xmlns="" val="3068323444"/>
+                    <a16:rowId xmlns="" xmlns:a16="http://schemas.microsoft.com/office/drawing/2014/main" val="3068323444"/>
                   </a:ext>
                 </a:extLst>
               </a:tr>
@@ -40919,7 +41069,7 @@
                 </a:tc>
                 <a:extLst>
                   <a:ext uri="{0D108BD9-81ED-4DB2-BD59-A6C34878D82A}">
-                    <a16:rowId xmlns:a16="http://schemas.microsoft.com/office/drawing/2014/main" xmlns="" val="2484981654"/>
+                    <a16:rowId xmlns="" xmlns:a16="http://schemas.microsoft.com/office/drawing/2014/main" val="2484981654"/>
                   </a:ext>
                 </a:extLst>
               </a:tr>
@@ -40952,7 +41102,7 @@
                 </a:tc>
                 <a:extLst>
                   <a:ext uri="{0D108BD9-81ED-4DB2-BD59-A6C34878D82A}">
-                    <a16:rowId xmlns:a16="http://schemas.microsoft.com/office/drawing/2014/main" xmlns="" val="1377910784"/>
+                    <a16:rowId xmlns="" xmlns:a16="http://schemas.microsoft.com/office/drawing/2014/main" val="1377910784"/>
                   </a:ext>
                 </a:extLst>
               </a:tr>
@@ -40990,7 +41140,7 @@
                 </a:tc>
                 <a:extLst>
                   <a:ext uri="{0D108BD9-81ED-4DB2-BD59-A6C34878D82A}">
-                    <a16:rowId xmlns:a16="http://schemas.microsoft.com/office/drawing/2014/main" xmlns="" val="1387856053"/>
+                    <a16:rowId xmlns="" xmlns:a16="http://schemas.microsoft.com/office/drawing/2014/main" val="1387856053"/>
                   </a:ext>
                 </a:extLst>
               </a:tr>
@@ -41023,7 +41173,7 @@
                 </a:tc>
                 <a:extLst>
                   <a:ext uri="{0D108BD9-81ED-4DB2-BD59-A6C34878D82A}">
-                    <a16:rowId xmlns:a16="http://schemas.microsoft.com/office/drawing/2014/main" xmlns="" val="2599123823"/>
+                    <a16:rowId xmlns="" xmlns:a16="http://schemas.microsoft.com/office/drawing/2014/main" val="2599123823"/>
                   </a:ext>
                 </a:extLst>
               </a:tr>
@@ -41061,7 +41211,7 @@
                 </a:tc>
                 <a:extLst>
                   <a:ext uri="{0D108BD9-81ED-4DB2-BD59-A6C34878D82A}">
-                    <a16:rowId xmlns:a16="http://schemas.microsoft.com/office/drawing/2014/main" xmlns="" val="1232603862"/>
+                    <a16:rowId xmlns="" xmlns:a16="http://schemas.microsoft.com/office/drawing/2014/main" val="1232603862"/>
                   </a:ext>
                 </a:extLst>
               </a:tr>
@@ -41102,7 +41252,7 @@
                 </a:tc>
                 <a:extLst>
                   <a:ext uri="{0D108BD9-81ED-4DB2-BD59-A6C34878D82A}">
-                    <a16:rowId xmlns:a16="http://schemas.microsoft.com/office/drawing/2014/main" xmlns="" val="4145944521"/>
+                    <a16:rowId xmlns="" xmlns:a16="http://schemas.microsoft.com/office/drawing/2014/main" val="4145944521"/>
                   </a:ext>
                 </a:extLst>
               </a:tr>
@@ -41135,7 +41285,7 @@
                 </a:tc>
                 <a:extLst>
                   <a:ext uri="{0D108BD9-81ED-4DB2-BD59-A6C34878D82A}">
-                    <a16:rowId xmlns:a16="http://schemas.microsoft.com/office/drawing/2014/main" xmlns="" val="2954677722"/>
+                    <a16:rowId xmlns="" xmlns:a16="http://schemas.microsoft.com/office/drawing/2014/main" val="2954677722"/>
                   </a:ext>
                 </a:extLst>
               </a:tr>
@@ -41173,7 +41323,7 @@
                 </a:tc>
                 <a:extLst>
                   <a:ext uri="{0D108BD9-81ED-4DB2-BD59-A6C34878D82A}">
-                    <a16:rowId xmlns:a16="http://schemas.microsoft.com/office/drawing/2014/main" xmlns="" val="205903975"/>
+                    <a16:rowId xmlns="" xmlns:a16="http://schemas.microsoft.com/office/drawing/2014/main" val="205903975"/>
                   </a:ext>
                 </a:extLst>
               </a:tr>
@@ -41206,7 +41356,7 @@
                 </a:tc>
                 <a:extLst>
                   <a:ext uri="{0D108BD9-81ED-4DB2-BD59-A6C34878D82A}">
-                    <a16:rowId xmlns:a16="http://schemas.microsoft.com/office/drawing/2014/main" xmlns="" val="2893595017"/>
+                    <a16:rowId xmlns="" xmlns:a16="http://schemas.microsoft.com/office/drawing/2014/main" val="2893595017"/>
                   </a:ext>
                 </a:extLst>
               </a:tr>
@@ -41424,14 +41574,14 @@
                 <a:gridCol w="934278">
                   <a:extLst>
                     <a:ext uri="{9D8B030D-6E8A-4147-A177-3AD203B41FA5}">
-                      <a16:colId xmlns:a16="http://schemas.microsoft.com/office/drawing/2014/main" xmlns="" val="4198655800"/>
+                      <a16:colId xmlns="" xmlns:a16="http://schemas.microsoft.com/office/drawing/2014/main" val="4198655800"/>
                     </a:ext>
                   </a:extLst>
                 </a:gridCol>
                 <a:gridCol w="7295322">
                   <a:extLst>
                     <a:ext uri="{9D8B030D-6E8A-4147-A177-3AD203B41FA5}">
-                      <a16:colId xmlns:a16="http://schemas.microsoft.com/office/drawing/2014/main" xmlns="" val="135413862"/>
+                      <a16:colId xmlns="" xmlns:a16="http://schemas.microsoft.com/office/drawing/2014/main" val="135413862"/>
                     </a:ext>
                   </a:extLst>
                 </a:gridCol>
@@ -41465,7 +41615,7 @@
                 </a:tc>
                 <a:extLst>
                   <a:ext uri="{0D108BD9-81ED-4DB2-BD59-A6C34878D82A}">
-                    <a16:rowId xmlns:a16="http://schemas.microsoft.com/office/drawing/2014/main" xmlns="" val="3068323444"/>
+                    <a16:rowId xmlns="" xmlns:a16="http://schemas.microsoft.com/office/drawing/2014/main" val="3068323444"/>
                   </a:ext>
                 </a:extLst>
               </a:tr>
@@ -43355,7 +43505,7 @@
               <a:t> </a:t>
             </a:r>
             <a:r>
-              <a:rPr lang="en-US" dirty="0">
+              <a:rPr lang="en-US" dirty="0" smtClean="0">
                 <a:solidFill>
                   <a:srgbClr val="FF0000"/>
                 </a:solidFill>
@@ -43363,7 +43513,7 @@
                 <a:ea typeface="Calibri" panose="020F0502020204030204" pitchFamily="34" charset="0"/>
                 <a:cs typeface="Times New Roman" panose="02020603050405020304" pitchFamily="18" charset="0"/>
               </a:rPr>
-              <a:t>'NE'</a:t>
+              <a:t>'WI'</a:t>
             </a:r>
             <a:endParaRPr lang="en-US" sz="2400" dirty="0">
               <a:latin typeface="Calibri" panose="020F0502020204030204" pitchFamily="34" charset="0"/>
@@ -43703,21 +43853,21 @@
                 <a:gridCol w="2764301">
                   <a:extLst>
                     <a:ext uri="{9D8B030D-6E8A-4147-A177-3AD203B41FA5}">
-                      <a16:colId xmlns:a16="http://schemas.microsoft.com/office/drawing/2014/main" xmlns="" val="234227049"/>
+                      <a16:colId xmlns="" xmlns:a16="http://schemas.microsoft.com/office/drawing/2014/main" val="234227049"/>
                     </a:ext>
                   </a:extLst>
                 </a:gridCol>
                 <a:gridCol w="2764301">
                   <a:extLst>
                     <a:ext uri="{9D8B030D-6E8A-4147-A177-3AD203B41FA5}">
-                      <a16:colId xmlns:a16="http://schemas.microsoft.com/office/drawing/2014/main" xmlns="" val="4053135350"/>
+                      <a16:colId xmlns="" xmlns:a16="http://schemas.microsoft.com/office/drawing/2014/main" val="4053135350"/>
                     </a:ext>
                   </a:extLst>
                 </a:gridCol>
                 <a:gridCol w="2764301">
                   <a:extLst>
                     <a:ext uri="{9D8B030D-6E8A-4147-A177-3AD203B41FA5}">
-                      <a16:colId xmlns:a16="http://schemas.microsoft.com/office/drawing/2014/main" xmlns="" val="672378647"/>
+                      <a16:colId xmlns="" xmlns:a16="http://schemas.microsoft.com/office/drawing/2014/main" val="672378647"/>
                     </a:ext>
                   </a:extLst>
                 </a:gridCol>
@@ -43767,7 +43917,7 @@
                 </a:tc>
                 <a:extLst>
                   <a:ext uri="{0D108BD9-81ED-4DB2-BD59-A6C34878D82A}">
-                    <a16:rowId xmlns:a16="http://schemas.microsoft.com/office/drawing/2014/main" xmlns="" val="2843053056"/>
+                    <a16:rowId xmlns="" xmlns:a16="http://schemas.microsoft.com/office/drawing/2014/main" val="2843053056"/>
                   </a:ext>
                 </a:extLst>
               </a:tr>
@@ -43817,7 +43967,7 @@
                 </a:tc>
                 <a:extLst>
                   <a:ext uri="{0D108BD9-81ED-4DB2-BD59-A6C34878D82A}">
-                    <a16:rowId xmlns:a16="http://schemas.microsoft.com/office/drawing/2014/main" xmlns="" val="3055328934"/>
+                    <a16:rowId xmlns="" xmlns:a16="http://schemas.microsoft.com/office/drawing/2014/main" val="3055328934"/>
                   </a:ext>
                 </a:extLst>
               </a:tr>
@@ -43867,7 +44017,7 @@
                 </a:tc>
                 <a:extLst>
                   <a:ext uri="{0D108BD9-81ED-4DB2-BD59-A6C34878D82A}">
-                    <a16:rowId xmlns:a16="http://schemas.microsoft.com/office/drawing/2014/main" xmlns="" val="1144851549"/>
+                    <a16:rowId xmlns="" xmlns:a16="http://schemas.microsoft.com/office/drawing/2014/main" val="1144851549"/>
                   </a:ext>
                 </a:extLst>
               </a:tr>
@@ -43916,7 +44066,7 @@
                 </a:tc>
                 <a:extLst>
                   <a:ext uri="{0D108BD9-81ED-4DB2-BD59-A6C34878D82A}">
-                    <a16:rowId xmlns:a16="http://schemas.microsoft.com/office/drawing/2014/main" xmlns="" val="4258932578"/>
+                    <a16:rowId xmlns="" xmlns:a16="http://schemas.microsoft.com/office/drawing/2014/main" val="4258932578"/>
                   </a:ext>
                 </a:extLst>
               </a:tr>
@@ -44854,7 +45004,7 @@
               <a:t> </a:t>
             </a:r>
             <a:r>
-              <a:rPr lang="en-US" dirty="0">
+              <a:rPr lang="en-US" dirty="0" smtClean="0">
                 <a:solidFill>
                   <a:srgbClr val="FF0000"/>
                 </a:solidFill>
@@ -44862,7 +45012,18 @@
                 <a:ea typeface="Calibri" panose="020F0502020204030204" pitchFamily="34" charset="0"/>
                 <a:cs typeface="Times New Roman" panose="02020603050405020304" pitchFamily="18" charset="0"/>
               </a:rPr>
-              <a:t>'NE'</a:t>
+              <a:t>'WI</a:t>
+            </a:r>
+            <a:r>
+              <a:rPr lang="en-US" dirty="0" smtClean="0">
+                <a:solidFill>
+                  <a:srgbClr val="FF0000"/>
+                </a:solidFill>
+                <a:latin typeface="Consolas" panose="020B0609020204030204" pitchFamily="49" charset="0"/>
+                <a:ea typeface="Calibri" panose="020F0502020204030204" pitchFamily="34" charset="0"/>
+                <a:cs typeface="Times New Roman" panose="02020603050405020304" pitchFamily="18" charset="0"/>
+              </a:rPr>
+              <a:t>'</a:t>
             </a:r>
             <a:endParaRPr lang="en-US" sz="2400" dirty="0">
               <a:latin typeface="Calibri" panose="020F0502020204030204" pitchFamily="34" charset="0"/>

</xml_diff>

<commit_message>
Correct TF number (2363) in appendix.
</commit_message>
<xml_diff>
--- a/Optimizer.pptx
+++ b/Optimizer.pptx
@@ -271,7 +271,7 @@
           <a:p>
             <a:fld id="{2EDCB34D-5EC2-4739-9693-E425457AC201}" type="datetimeFigureOut">
               <a:rPr lang="en-US" smtClean="0"/>
-              <a:t>03/27/2017</a:t>
+              <a:t>04/05/2017</a:t>
             </a:fld>
             <a:endParaRPr lang="en-US"/>
           </a:p>
@@ -3062,7 +3062,7 @@
             <a:fld id="{5942B21B-2ADA-A040-A652-A7305E1B99FE}" type="datetimeFigureOut">
               <a:rPr lang="en-US" smtClean="0"/>
               <a:pPr/>
-              <a:t>03/27/2017</a:t>
+              <a:t>04/05/2017</a:t>
             </a:fld>
             <a:endParaRPr lang="en-US" dirty="0"/>
           </a:p>
@@ -3252,7 +3252,7 @@
           <a:p>
             <a:fld id="{5942B21B-2ADA-A040-A652-A7305E1B99FE}" type="datetimeFigureOut">
               <a:rPr lang="en-US" smtClean="0"/>
-              <a:t>03/27/2017</a:t>
+              <a:t>04/05/2017</a:t>
             </a:fld>
             <a:endParaRPr lang="en-US"/>
           </a:p>
@@ -3376,7 +3376,7 @@
             <a:fld id="{5942B21B-2ADA-A040-A652-A7305E1B99FE}" type="datetimeFigureOut">
               <a:rPr lang="en-US" smtClean="0"/>
               <a:pPr/>
-              <a:t>03/27/2017</a:t>
+              <a:t>04/05/2017</a:t>
             </a:fld>
             <a:r>
               <a:rPr lang="en-US"/>
@@ -3647,7 +3647,7 @@
             <a:fld id="{5942B21B-2ADA-A040-A652-A7305E1B99FE}" type="datetimeFigureOut">
               <a:rPr lang="en-US" smtClean="0"/>
               <a:pPr/>
-              <a:t>03/27/2017</a:t>
+              <a:t>04/05/2017</a:t>
             </a:fld>
             <a:r>
               <a:rPr lang="en-US" dirty="0"/>
@@ -3917,7 +3917,7 @@
             <a:fld id="{5942B21B-2ADA-A040-A652-A7305E1B99FE}" type="datetimeFigureOut">
               <a:rPr lang="en-US" smtClean="0"/>
               <a:pPr/>
-              <a:t>03/27/2017</a:t>
+              <a:t>04/05/2017</a:t>
             </a:fld>
             <a:r>
               <a:rPr lang="en-US" dirty="0"/>
@@ -4257,7 +4257,7 @@
             <a:fld id="{5942B21B-2ADA-A040-A652-A7305E1B99FE}" type="datetimeFigureOut">
               <a:rPr lang="en-US" smtClean="0"/>
               <a:pPr/>
-              <a:t>03/27/2017</a:t>
+              <a:t>04/05/2017</a:t>
             </a:fld>
             <a:r>
               <a:rPr lang="en-US" dirty="0"/>
@@ -4598,7 +4598,7 @@
             <a:fld id="{5942B21B-2ADA-A040-A652-A7305E1B99FE}" type="datetimeFigureOut">
               <a:rPr lang="en-US" smtClean="0"/>
               <a:pPr/>
-              <a:t>03/27/2017</a:t>
+              <a:t>04/05/2017</a:t>
             </a:fld>
             <a:r>
               <a:rPr lang="en-US" dirty="0"/>
@@ -5113,7 +5113,7 @@
             <a:fld id="{5942B21B-2ADA-A040-A652-A7305E1B99FE}" type="datetimeFigureOut">
               <a:rPr lang="en-US" smtClean="0"/>
               <a:pPr/>
-              <a:t>03/27/2017</a:t>
+              <a:t>04/05/2017</a:t>
             </a:fld>
             <a:r>
               <a:rPr lang="en-US" dirty="0"/>
@@ -5322,7 +5322,7 @@
             <a:fld id="{5942B21B-2ADA-A040-A652-A7305E1B99FE}" type="datetimeFigureOut">
               <a:rPr lang="en-US" smtClean="0"/>
               <a:pPr/>
-              <a:t>03/27/2017</a:t>
+              <a:t>04/05/2017</a:t>
             </a:fld>
             <a:r>
               <a:rPr lang="en-US" dirty="0"/>
@@ -5509,7 +5509,7 @@
             <a:fld id="{5942B21B-2ADA-A040-A652-A7305E1B99FE}" type="datetimeFigureOut">
               <a:rPr lang="en-US" smtClean="0"/>
               <a:pPr/>
-              <a:t>03/27/2017</a:t>
+              <a:t>04/05/2017</a:t>
             </a:fld>
             <a:r>
               <a:rPr lang="en-US" dirty="0"/>
@@ -5840,7 +5840,7 @@
             <a:fld id="{5942B21B-2ADA-A040-A652-A7305E1B99FE}" type="datetimeFigureOut">
               <a:rPr lang="en-US" smtClean="0"/>
               <a:pPr/>
-              <a:t>03/27/2017</a:t>
+              <a:t>04/05/2017</a:t>
             </a:fld>
             <a:r>
               <a:rPr lang="en-US" dirty="0"/>
@@ -6148,7 +6148,7 @@
             <a:fld id="{5942B21B-2ADA-A040-A652-A7305E1B99FE}" type="datetimeFigureOut">
               <a:rPr lang="en-US" smtClean="0"/>
               <a:pPr/>
-              <a:t>03/27/2017</a:t>
+              <a:t>04/05/2017</a:t>
             </a:fld>
             <a:r>
               <a:rPr lang="en-US" dirty="0"/>
@@ -6427,7 +6427,7 @@
             <a:fld id="{5942B21B-2ADA-A040-A652-A7305E1B99FE}" type="datetimeFigureOut">
               <a:rPr lang="en-US" smtClean="0"/>
               <a:pPr/>
-              <a:t>03/27/2017</a:t>
+              <a:t>04/05/2017</a:t>
             </a:fld>
             <a:r>
               <a:rPr lang="en-US" dirty="0"/>
@@ -7920,18 +7920,7 @@
                 <a:ea typeface="Calibri" panose="020F0502020204030204" pitchFamily="34" charset="0"/>
                 <a:cs typeface="Times New Roman" panose="02020603050405020304" pitchFamily="18" charset="0"/>
               </a:rPr>
-              <a:t>'WI</a:t>
-            </a:r>
-            <a:r>
-              <a:rPr lang="en-US" dirty="0" smtClean="0">
-                <a:solidFill>
-                  <a:srgbClr val="FF0000"/>
-                </a:solidFill>
-                <a:latin typeface="Consolas" panose="020B0609020204030204" pitchFamily="49" charset="0"/>
-                <a:ea typeface="Calibri" panose="020F0502020204030204" pitchFamily="34" charset="0"/>
-                <a:cs typeface="Times New Roman" panose="02020603050405020304" pitchFamily="18" charset="0"/>
-              </a:rPr>
-              <a:t>'</a:t>
+              <a:t>'WI'</a:t>
             </a:r>
             <a:endParaRPr lang="en-US" dirty="0">
               <a:latin typeface="Consolas" panose="020B0609020204030204" pitchFamily="49" charset="0"/>
@@ -9137,18 +9126,7 @@
                 <a:ea typeface="Calibri" panose="020F0502020204030204" pitchFamily="34" charset="0"/>
                 <a:cs typeface="Times New Roman" panose="02020603050405020304" pitchFamily="18" charset="0"/>
               </a:rPr>
-              <a:t>'WI</a:t>
-            </a:r>
-            <a:r>
-              <a:rPr lang="en-US" dirty="0" smtClean="0">
-                <a:solidFill>
-                  <a:srgbClr val="FF0000"/>
-                </a:solidFill>
-                <a:latin typeface="Consolas" panose="020B0609020204030204" pitchFamily="49" charset="0"/>
-                <a:ea typeface="Calibri" panose="020F0502020204030204" pitchFamily="34" charset="0"/>
-                <a:cs typeface="Times New Roman" panose="02020603050405020304" pitchFamily="18" charset="0"/>
-              </a:rPr>
-              <a:t>'</a:t>
+              <a:t>'WI'</a:t>
             </a:r>
             <a:endParaRPr lang="en-US" sz="2400" dirty="0">
               <a:latin typeface="Calibri" panose="020F0502020204030204" pitchFamily="34" charset="0"/>
@@ -10367,18 +10345,7 @@
                 <a:ea typeface="Calibri" panose="020F0502020204030204" pitchFamily="34" charset="0"/>
                 <a:cs typeface="Times New Roman" panose="02020603050405020304" pitchFamily="18" charset="0"/>
               </a:rPr>
-              <a:t>'WI</a:t>
-            </a:r>
-            <a:r>
-              <a:rPr lang="en-US" dirty="0" smtClean="0">
-                <a:solidFill>
-                  <a:srgbClr val="FF0000"/>
-                </a:solidFill>
-                <a:latin typeface="Consolas" panose="020B0609020204030204" pitchFamily="49" charset="0"/>
-                <a:ea typeface="Calibri" panose="020F0502020204030204" pitchFamily="34" charset="0"/>
-                <a:cs typeface="Times New Roman" panose="02020603050405020304" pitchFamily="18" charset="0"/>
-              </a:rPr>
-              <a:t>'</a:t>
+              <a:t>'WI'</a:t>
             </a:r>
             <a:endParaRPr lang="en-US" sz="2400" dirty="0">
               <a:latin typeface="Calibri" panose="020F0502020204030204" pitchFamily="34" charset="0"/>
@@ -12888,18 +12855,7 @@
                 <a:ea typeface="Calibri" panose="020F0502020204030204" pitchFamily="34" charset="0"/>
                 <a:cs typeface="Times New Roman" panose="02020603050405020304" pitchFamily="18" charset="0"/>
               </a:rPr>
-              <a:t>'WI</a:t>
-            </a:r>
-            <a:r>
-              <a:rPr lang="en-US" dirty="0" smtClean="0">
-                <a:solidFill>
-                  <a:srgbClr val="FF0000"/>
-                </a:solidFill>
-                <a:latin typeface="Consolas" panose="020B0609020204030204" pitchFamily="49" charset="0"/>
-                <a:ea typeface="Calibri" panose="020F0502020204030204" pitchFamily="34" charset="0"/>
-                <a:cs typeface="Times New Roman" panose="02020603050405020304" pitchFamily="18" charset="0"/>
-              </a:rPr>
-              <a:t>'</a:t>
+              <a:t>'WI'</a:t>
             </a:r>
             <a:endParaRPr lang="en-US" sz="2400" dirty="0">
               <a:latin typeface="Calibri" panose="020F0502020204030204" pitchFamily="34" charset="0"/>
@@ -14163,18 +14119,7 @@
                 <a:ea typeface="Calibri" panose="020F0502020204030204" pitchFamily="34" charset="0"/>
                 <a:cs typeface="Times New Roman" panose="02020603050405020304" pitchFamily="18" charset="0"/>
               </a:rPr>
-              <a:t>'WI</a:t>
-            </a:r>
-            <a:r>
-              <a:rPr lang="en-US" dirty="0" smtClean="0">
-                <a:solidFill>
-                  <a:srgbClr val="FF0000"/>
-                </a:solidFill>
-                <a:latin typeface="Consolas" panose="020B0609020204030204" pitchFamily="49" charset="0"/>
-                <a:ea typeface="Calibri" panose="020F0502020204030204" pitchFamily="34" charset="0"/>
-                <a:cs typeface="Times New Roman" panose="02020603050405020304" pitchFamily="18" charset="0"/>
-              </a:rPr>
-              <a:t>'</a:t>
+              <a:t>'WI'</a:t>
             </a:r>
             <a:endParaRPr lang="en-US" sz="2400" dirty="0">
               <a:latin typeface="Calibri" panose="020F0502020204030204" pitchFamily="34" charset="0"/>
@@ -15287,18 +15232,7 @@
                 <a:ea typeface="Calibri" panose="020F0502020204030204" pitchFamily="34" charset="0"/>
                 <a:cs typeface="Times New Roman" panose="02020603050405020304" pitchFamily="18" charset="0"/>
               </a:rPr>
-              <a:t>'WI</a:t>
-            </a:r>
-            <a:r>
-              <a:rPr lang="en-US" dirty="0" smtClean="0">
-                <a:solidFill>
-                  <a:srgbClr val="FF0000"/>
-                </a:solidFill>
-                <a:latin typeface="Consolas" panose="020B0609020204030204" pitchFamily="49" charset="0"/>
-                <a:ea typeface="Calibri" panose="020F0502020204030204" pitchFamily="34" charset="0"/>
-                <a:cs typeface="Times New Roman" panose="02020603050405020304" pitchFamily="18" charset="0"/>
-              </a:rPr>
-              <a:t>'</a:t>
+              <a:t>'WI'</a:t>
             </a:r>
             <a:endParaRPr lang="en-US" sz="2400" dirty="0">
               <a:latin typeface="Calibri" panose="020F0502020204030204" pitchFamily="34" charset="0"/>
@@ -17825,18 +17759,7 @@
                 <a:ea typeface="Calibri" panose="020F0502020204030204" pitchFamily="34" charset="0"/>
                 <a:cs typeface="Times New Roman" panose="02020603050405020304" pitchFamily="18" charset="0"/>
               </a:rPr>
-              <a:t>'WI</a:t>
-            </a:r>
-            <a:r>
-              <a:rPr lang="en-US" dirty="0" smtClean="0">
-                <a:solidFill>
-                  <a:srgbClr val="FF0000"/>
-                </a:solidFill>
-                <a:latin typeface="Consolas" panose="020B0609020204030204" pitchFamily="49" charset="0"/>
-                <a:ea typeface="Calibri" panose="020F0502020204030204" pitchFamily="34" charset="0"/>
-                <a:cs typeface="Times New Roman" panose="02020603050405020304" pitchFamily="18" charset="0"/>
-              </a:rPr>
-              <a:t>'</a:t>
+              <a:t>'WI'</a:t>
             </a:r>
             <a:endParaRPr lang="en-US" sz="2400" dirty="0">
               <a:latin typeface="Calibri" panose="020F0502020204030204" pitchFamily="34" charset="0"/>
@@ -18939,18 +18862,7 @@
                 <a:ea typeface="Calibri" panose="020F0502020204030204" pitchFamily="34" charset="0"/>
                 <a:cs typeface="Times New Roman" panose="02020603050405020304" pitchFamily="18" charset="0"/>
               </a:rPr>
-              <a:t>'WI</a:t>
-            </a:r>
-            <a:r>
-              <a:rPr lang="en-US" dirty="0" smtClean="0">
-                <a:solidFill>
-                  <a:srgbClr val="FF0000"/>
-                </a:solidFill>
-                <a:latin typeface="Consolas" panose="020B0609020204030204" pitchFamily="49" charset="0"/>
-                <a:ea typeface="Calibri" panose="020F0502020204030204" pitchFamily="34" charset="0"/>
-                <a:cs typeface="Times New Roman" panose="02020603050405020304" pitchFamily="18" charset="0"/>
-              </a:rPr>
-              <a:t>'</a:t>
+              <a:t>'WI'</a:t>
             </a:r>
             <a:endParaRPr lang="en-US" sz="2400" dirty="0">
               <a:latin typeface="Calibri" panose="020F0502020204030204" pitchFamily="34" charset="0"/>
@@ -21001,28 +20913,28 @@
                 <a:gridCol w="1638752">
                   <a:extLst>
                     <a:ext uri="{9D8B030D-6E8A-4147-A177-3AD203B41FA5}">
-                      <a16:colId xmlns="" xmlns:a16="http://schemas.microsoft.com/office/drawing/2014/main" val="20000"/>
+                      <a16:colId xmlns:a16="http://schemas.microsoft.com/office/drawing/2014/main" xmlns="" val="20000"/>
                     </a:ext>
                   </a:extLst>
                 </a:gridCol>
                 <a:gridCol w="4787153">
                   <a:extLst>
                     <a:ext uri="{9D8B030D-6E8A-4147-A177-3AD203B41FA5}">
-                      <a16:colId xmlns="" xmlns:a16="http://schemas.microsoft.com/office/drawing/2014/main" val="20001"/>
+                      <a16:colId xmlns:a16="http://schemas.microsoft.com/office/drawing/2014/main" xmlns="" val="20001"/>
                     </a:ext>
                   </a:extLst>
                 </a:gridCol>
                 <a:gridCol w="851647">
                   <a:extLst>
                     <a:ext uri="{9D8B030D-6E8A-4147-A177-3AD203B41FA5}">
-                      <a16:colId xmlns="" xmlns:a16="http://schemas.microsoft.com/office/drawing/2014/main" val="20002"/>
+                      <a16:colId xmlns:a16="http://schemas.microsoft.com/office/drawing/2014/main" xmlns="" val="20002"/>
                     </a:ext>
                   </a:extLst>
                 </a:gridCol>
                 <a:gridCol w="779930">
                   <a:extLst>
                     <a:ext uri="{9D8B030D-6E8A-4147-A177-3AD203B41FA5}">
-                      <a16:colId xmlns="" xmlns:a16="http://schemas.microsoft.com/office/drawing/2014/main" val="20003"/>
+                      <a16:colId xmlns:a16="http://schemas.microsoft.com/office/drawing/2014/main" xmlns="" val="20003"/>
                     </a:ext>
                   </a:extLst>
                 </a:gridCol>
@@ -21082,7 +20994,7 @@
                 </a:tc>
                 <a:extLst>
                   <a:ext uri="{0D108BD9-81ED-4DB2-BD59-A6C34878D82A}">
-                    <a16:rowId xmlns="" xmlns:a16="http://schemas.microsoft.com/office/drawing/2014/main" val="10000"/>
+                    <a16:rowId xmlns:a16="http://schemas.microsoft.com/office/drawing/2014/main" xmlns="" val="10000"/>
                   </a:ext>
                 </a:extLst>
               </a:tr>
@@ -21147,7 +21059,7 @@
                 </a:tc>
                 <a:extLst>
                   <a:ext uri="{0D108BD9-81ED-4DB2-BD59-A6C34878D82A}">
-                    <a16:rowId xmlns="" xmlns:a16="http://schemas.microsoft.com/office/drawing/2014/main" val="10001"/>
+                    <a16:rowId xmlns:a16="http://schemas.microsoft.com/office/drawing/2014/main" xmlns="" val="10001"/>
                   </a:ext>
                 </a:extLst>
               </a:tr>
@@ -21224,7 +21136,7 @@
                 </a:tc>
                 <a:extLst>
                   <a:ext uri="{0D108BD9-81ED-4DB2-BD59-A6C34878D82A}">
-                    <a16:rowId xmlns="" xmlns:a16="http://schemas.microsoft.com/office/drawing/2014/main" val="10002"/>
+                    <a16:rowId xmlns:a16="http://schemas.microsoft.com/office/drawing/2014/main" xmlns="" val="10002"/>
                   </a:ext>
                 </a:extLst>
               </a:tr>
@@ -21290,7 +21202,7 @@
                 </a:tc>
                 <a:extLst>
                   <a:ext uri="{0D108BD9-81ED-4DB2-BD59-A6C34878D82A}">
-                    <a16:rowId xmlns="" xmlns:a16="http://schemas.microsoft.com/office/drawing/2014/main" val="10003"/>
+                    <a16:rowId xmlns:a16="http://schemas.microsoft.com/office/drawing/2014/main" xmlns="" val="10003"/>
                   </a:ext>
                 </a:extLst>
               </a:tr>
@@ -21379,7 +21291,7 @@
                 </a:tc>
                 <a:extLst>
                   <a:ext uri="{0D108BD9-81ED-4DB2-BD59-A6C34878D82A}">
-                    <a16:rowId xmlns="" xmlns:a16="http://schemas.microsoft.com/office/drawing/2014/main" val="10004"/>
+                    <a16:rowId xmlns:a16="http://schemas.microsoft.com/office/drawing/2014/main" xmlns="" val="10004"/>
                   </a:ext>
                 </a:extLst>
               </a:tr>
@@ -21450,7 +21362,7 @@
                 </a:tc>
                 <a:extLst>
                   <a:ext uri="{0D108BD9-81ED-4DB2-BD59-A6C34878D82A}">
-                    <a16:rowId xmlns="" xmlns:a16="http://schemas.microsoft.com/office/drawing/2014/main" val="10005"/>
+                    <a16:rowId xmlns:a16="http://schemas.microsoft.com/office/drawing/2014/main" xmlns="" val="10005"/>
                   </a:ext>
                 </a:extLst>
               </a:tr>
@@ -21516,7 +21428,7 @@
                 </a:tc>
                 <a:extLst>
                   <a:ext uri="{0D108BD9-81ED-4DB2-BD59-A6C34878D82A}">
-                    <a16:rowId xmlns="" xmlns:a16="http://schemas.microsoft.com/office/drawing/2014/main" val="10006"/>
+                    <a16:rowId xmlns:a16="http://schemas.microsoft.com/office/drawing/2014/main" xmlns="" val="10006"/>
                   </a:ext>
                 </a:extLst>
               </a:tr>
@@ -30198,14 +30110,14 @@
                 <a:gridCol w="7632835">
                   <a:extLst>
                     <a:ext uri="{9D8B030D-6E8A-4147-A177-3AD203B41FA5}">
-                      <a16:colId xmlns="" xmlns:a16="http://schemas.microsoft.com/office/drawing/2014/main" val="3644048045"/>
+                      <a16:colId xmlns:a16="http://schemas.microsoft.com/office/drawing/2014/main" xmlns="" val="3644048045"/>
                     </a:ext>
                   </a:extLst>
                 </a:gridCol>
                 <a:gridCol w="606393">
                   <a:extLst>
                     <a:ext uri="{9D8B030D-6E8A-4147-A177-3AD203B41FA5}">
-                      <a16:colId xmlns="" xmlns:a16="http://schemas.microsoft.com/office/drawing/2014/main" val="2034254753"/>
+                      <a16:colId xmlns:a16="http://schemas.microsoft.com/office/drawing/2014/main" xmlns="" val="2034254753"/>
                     </a:ext>
                   </a:extLst>
                 </a:gridCol>
@@ -30236,7 +30148,7 @@
                 </a:tc>
                 <a:extLst>
                   <a:ext uri="{0D108BD9-81ED-4DB2-BD59-A6C34878D82A}">
-                    <a16:rowId xmlns="" xmlns:a16="http://schemas.microsoft.com/office/drawing/2014/main" val="2708275910"/>
+                    <a16:rowId xmlns:a16="http://schemas.microsoft.com/office/drawing/2014/main" xmlns="" val="2708275910"/>
                   </a:ext>
                 </a:extLst>
               </a:tr>
@@ -30270,7 +30182,7 @@
                 </a:tc>
                 <a:extLst>
                   <a:ext uri="{0D108BD9-81ED-4DB2-BD59-A6C34878D82A}">
-                    <a16:rowId xmlns="" xmlns:a16="http://schemas.microsoft.com/office/drawing/2014/main" val="2161984115"/>
+                    <a16:rowId xmlns:a16="http://schemas.microsoft.com/office/drawing/2014/main" xmlns="" val="2161984115"/>
                   </a:ext>
                 </a:extLst>
               </a:tr>
@@ -30317,7 +30229,7 @@
                 </a:tc>
                 <a:extLst>
                   <a:ext uri="{0D108BD9-81ED-4DB2-BD59-A6C34878D82A}">
-                    <a16:rowId xmlns="" xmlns:a16="http://schemas.microsoft.com/office/drawing/2014/main" val="2841678841"/>
+                    <a16:rowId xmlns:a16="http://schemas.microsoft.com/office/drawing/2014/main" xmlns="" val="2841678841"/>
                   </a:ext>
                 </a:extLst>
               </a:tr>
@@ -30351,7 +30263,7 @@
                 </a:tc>
                 <a:extLst>
                   <a:ext uri="{0D108BD9-81ED-4DB2-BD59-A6C34878D82A}">
-                    <a16:rowId xmlns="" xmlns:a16="http://schemas.microsoft.com/office/drawing/2014/main" val="3144998627"/>
+                    <a16:rowId xmlns:a16="http://schemas.microsoft.com/office/drawing/2014/main" xmlns="" val="3144998627"/>
                   </a:ext>
                 </a:extLst>
               </a:tr>
@@ -30393,7 +30305,7 @@
                 </a:tc>
                 <a:extLst>
                   <a:ext uri="{0D108BD9-81ED-4DB2-BD59-A6C34878D82A}">
-                    <a16:rowId xmlns="" xmlns:a16="http://schemas.microsoft.com/office/drawing/2014/main" val="1419261869"/>
+                    <a16:rowId xmlns:a16="http://schemas.microsoft.com/office/drawing/2014/main" xmlns="" val="1419261869"/>
                   </a:ext>
                 </a:extLst>
               </a:tr>
@@ -30431,7 +30343,7 @@
                 </a:tc>
                 <a:extLst>
                   <a:ext uri="{0D108BD9-81ED-4DB2-BD59-A6C34878D82A}">
-                    <a16:rowId xmlns="" xmlns:a16="http://schemas.microsoft.com/office/drawing/2014/main" val="1427391072"/>
+                    <a16:rowId xmlns:a16="http://schemas.microsoft.com/office/drawing/2014/main" xmlns="" val="1427391072"/>
                   </a:ext>
                 </a:extLst>
               </a:tr>
@@ -30478,7 +30390,7 @@
                 </a:tc>
                 <a:extLst>
                   <a:ext uri="{0D108BD9-81ED-4DB2-BD59-A6C34878D82A}">
-                    <a16:rowId xmlns="" xmlns:a16="http://schemas.microsoft.com/office/drawing/2014/main" val="2346539918"/>
+                    <a16:rowId xmlns:a16="http://schemas.microsoft.com/office/drawing/2014/main" xmlns="" val="2346539918"/>
                   </a:ext>
                 </a:extLst>
               </a:tr>
@@ -30517,7 +30429,7 @@
                 </a:tc>
                 <a:extLst>
                   <a:ext uri="{0D108BD9-81ED-4DB2-BD59-A6C34878D82A}">
-                    <a16:rowId xmlns="" xmlns:a16="http://schemas.microsoft.com/office/drawing/2014/main" val="2275483042"/>
+                    <a16:rowId xmlns:a16="http://schemas.microsoft.com/office/drawing/2014/main" xmlns="" val="2275483042"/>
                   </a:ext>
                 </a:extLst>
               </a:tr>
@@ -30555,7 +30467,7 @@
                 </a:tc>
                 <a:extLst>
                   <a:ext uri="{0D108BD9-81ED-4DB2-BD59-A6C34878D82A}">
-                    <a16:rowId xmlns="" xmlns:a16="http://schemas.microsoft.com/office/drawing/2014/main" val="4202569347"/>
+                    <a16:rowId xmlns:a16="http://schemas.microsoft.com/office/drawing/2014/main" xmlns="" val="4202569347"/>
                   </a:ext>
                 </a:extLst>
               </a:tr>
@@ -30589,7 +30501,7 @@
                 </a:tc>
                 <a:extLst>
                   <a:ext uri="{0D108BD9-81ED-4DB2-BD59-A6C34878D82A}">
-                    <a16:rowId xmlns="" xmlns:a16="http://schemas.microsoft.com/office/drawing/2014/main" val="2989839269"/>
+                    <a16:rowId xmlns:a16="http://schemas.microsoft.com/office/drawing/2014/main" xmlns="" val="2989839269"/>
                   </a:ext>
                 </a:extLst>
               </a:tr>
@@ -30623,7 +30535,7 @@
                 </a:tc>
                 <a:extLst>
                   <a:ext uri="{0D108BD9-81ED-4DB2-BD59-A6C34878D82A}">
-                    <a16:rowId xmlns="" xmlns:a16="http://schemas.microsoft.com/office/drawing/2014/main" val="2130545569"/>
+                    <a16:rowId xmlns:a16="http://schemas.microsoft.com/office/drawing/2014/main" xmlns="" val="2130545569"/>
                   </a:ext>
                 </a:extLst>
               </a:tr>
@@ -30679,7 +30591,7 @@
                 </a:tc>
                 <a:extLst>
                   <a:ext uri="{0D108BD9-81ED-4DB2-BD59-A6C34878D82A}">
-                    <a16:rowId xmlns="" xmlns:a16="http://schemas.microsoft.com/office/drawing/2014/main" val="1848127216"/>
+                    <a16:rowId xmlns:a16="http://schemas.microsoft.com/office/drawing/2014/main" xmlns="" val="1848127216"/>
                   </a:ext>
                 </a:extLst>
               </a:tr>
@@ -31133,14 +31045,14 @@
                 <a:gridCol w="4119615">
                   <a:extLst>
                     <a:ext uri="{9D8B030D-6E8A-4147-A177-3AD203B41FA5}">
-                      <a16:colId xmlns="" xmlns:a16="http://schemas.microsoft.com/office/drawing/2014/main" val="3644048045"/>
+                      <a16:colId xmlns:a16="http://schemas.microsoft.com/office/drawing/2014/main" xmlns="" val="3644048045"/>
                     </a:ext>
                   </a:extLst>
                 </a:gridCol>
                 <a:gridCol w="4119613">
                   <a:extLst>
                     <a:ext uri="{9D8B030D-6E8A-4147-A177-3AD203B41FA5}">
-                      <a16:colId xmlns="" xmlns:a16="http://schemas.microsoft.com/office/drawing/2014/main" val="2034254753"/>
+                      <a16:colId xmlns:a16="http://schemas.microsoft.com/office/drawing/2014/main" xmlns="" val="2034254753"/>
                     </a:ext>
                   </a:extLst>
                 </a:gridCol>
@@ -31176,7 +31088,7 @@
                 </a:tc>
                 <a:extLst>
                   <a:ext uri="{0D108BD9-81ED-4DB2-BD59-A6C34878D82A}">
-                    <a16:rowId xmlns="" xmlns:a16="http://schemas.microsoft.com/office/drawing/2014/main" val="2708275910"/>
+                    <a16:rowId xmlns:a16="http://schemas.microsoft.com/office/drawing/2014/main" xmlns="" val="2708275910"/>
                   </a:ext>
                 </a:extLst>
               </a:tr>
@@ -31376,7 +31288,7 @@
                 </a:tc>
                 <a:extLst>
                   <a:ext uri="{0D108BD9-81ED-4DB2-BD59-A6C34878D82A}">
-                    <a16:rowId xmlns="" xmlns:a16="http://schemas.microsoft.com/office/drawing/2014/main" val="2161984115"/>
+                    <a16:rowId xmlns:a16="http://schemas.microsoft.com/office/drawing/2014/main" xmlns="" val="2161984115"/>
                   </a:ext>
                 </a:extLst>
               </a:tr>
@@ -31576,7 +31488,7 @@
                 </a:tc>
                 <a:extLst>
                   <a:ext uri="{0D108BD9-81ED-4DB2-BD59-A6C34878D82A}">
-                    <a16:rowId xmlns="" xmlns:a16="http://schemas.microsoft.com/office/drawing/2014/main" val="2841678841"/>
+                    <a16:rowId xmlns:a16="http://schemas.microsoft.com/office/drawing/2014/main" xmlns="" val="2841678841"/>
                   </a:ext>
                 </a:extLst>
               </a:tr>
@@ -31776,7 +31688,7 @@
                 </a:tc>
                 <a:extLst>
                   <a:ext uri="{0D108BD9-81ED-4DB2-BD59-A6C34878D82A}">
-                    <a16:rowId xmlns="" xmlns:a16="http://schemas.microsoft.com/office/drawing/2014/main" val="3144998627"/>
+                    <a16:rowId xmlns:a16="http://schemas.microsoft.com/office/drawing/2014/main" xmlns="" val="3144998627"/>
                   </a:ext>
                 </a:extLst>
               </a:tr>
@@ -31976,7 +31888,7 @@
                 </a:tc>
                 <a:extLst>
                   <a:ext uri="{0D108BD9-81ED-4DB2-BD59-A6C34878D82A}">
-                    <a16:rowId xmlns="" xmlns:a16="http://schemas.microsoft.com/office/drawing/2014/main" val="1419261869"/>
+                    <a16:rowId xmlns:a16="http://schemas.microsoft.com/office/drawing/2014/main" xmlns="" val="1419261869"/>
                   </a:ext>
                 </a:extLst>
               </a:tr>
@@ -32176,7 +32088,7 @@
                 </a:tc>
                 <a:extLst>
                   <a:ext uri="{0D108BD9-81ED-4DB2-BD59-A6C34878D82A}">
-                    <a16:rowId xmlns="" xmlns:a16="http://schemas.microsoft.com/office/drawing/2014/main" val="1427391072"/>
+                    <a16:rowId xmlns:a16="http://schemas.microsoft.com/office/drawing/2014/main" xmlns="" val="1427391072"/>
                   </a:ext>
                 </a:extLst>
               </a:tr>
@@ -32376,7 +32288,7 @@
                 </a:tc>
                 <a:extLst>
                   <a:ext uri="{0D108BD9-81ED-4DB2-BD59-A6C34878D82A}">
-                    <a16:rowId xmlns="" xmlns:a16="http://schemas.microsoft.com/office/drawing/2014/main" val="2346539918"/>
+                    <a16:rowId xmlns:a16="http://schemas.microsoft.com/office/drawing/2014/main" xmlns="" val="2346539918"/>
                   </a:ext>
                 </a:extLst>
               </a:tr>
@@ -32585,7 +32497,7 @@
                 </a:tc>
                 <a:extLst>
                   <a:ext uri="{0D108BD9-81ED-4DB2-BD59-A6C34878D82A}">
-                    <a16:rowId xmlns="" xmlns:a16="http://schemas.microsoft.com/office/drawing/2014/main" val="2275483042"/>
+                    <a16:rowId xmlns:a16="http://schemas.microsoft.com/office/drawing/2014/main" xmlns="" val="2275483042"/>
                   </a:ext>
                 </a:extLst>
               </a:tr>
@@ -32794,7 +32706,7 @@
                 </a:tc>
                 <a:extLst>
                   <a:ext uri="{0D108BD9-81ED-4DB2-BD59-A6C34878D82A}">
-                    <a16:rowId xmlns="" xmlns:a16="http://schemas.microsoft.com/office/drawing/2014/main" val="4202569347"/>
+                    <a16:rowId xmlns:a16="http://schemas.microsoft.com/office/drawing/2014/main" xmlns="" val="4202569347"/>
                   </a:ext>
                 </a:extLst>
               </a:tr>
@@ -33003,7 +32915,7 @@
                 </a:tc>
                 <a:extLst>
                   <a:ext uri="{0D108BD9-81ED-4DB2-BD59-A6C34878D82A}">
-                    <a16:rowId xmlns="" xmlns:a16="http://schemas.microsoft.com/office/drawing/2014/main" val="2989839269"/>
+                    <a16:rowId xmlns:a16="http://schemas.microsoft.com/office/drawing/2014/main" xmlns="" val="2989839269"/>
                   </a:ext>
                 </a:extLst>
               </a:tr>
@@ -33212,7 +33124,7 @@
                 </a:tc>
                 <a:extLst>
                   <a:ext uri="{0D108BD9-81ED-4DB2-BD59-A6C34878D82A}">
-                    <a16:rowId xmlns="" xmlns:a16="http://schemas.microsoft.com/office/drawing/2014/main" val="2130545569"/>
+                    <a16:rowId xmlns:a16="http://schemas.microsoft.com/office/drawing/2014/main" xmlns="" val="2130545569"/>
                   </a:ext>
                 </a:extLst>
               </a:tr>
@@ -33421,7 +33333,7 @@
                 </a:tc>
                 <a:extLst>
                   <a:ext uri="{0D108BD9-81ED-4DB2-BD59-A6C34878D82A}">
-                    <a16:rowId xmlns="" xmlns:a16="http://schemas.microsoft.com/office/drawing/2014/main" val="3045796785"/>
+                    <a16:rowId xmlns:a16="http://schemas.microsoft.com/office/drawing/2014/main" xmlns="" val="3045796785"/>
                   </a:ext>
                 </a:extLst>
               </a:tr>
@@ -33630,7 +33542,7 @@
                 </a:tc>
                 <a:extLst>
                   <a:ext uri="{0D108BD9-81ED-4DB2-BD59-A6C34878D82A}">
-                    <a16:rowId xmlns="" xmlns:a16="http://schemas.microsoft.com/office/drawing/2014/main" val="1091494175"/>
+                    <a16:rowId xmlns:a16="http://schemas.microsoft.com/office/drawing/2014/main" xmlns="" val="1091494175"/>
                   </a:ext>
                 </a:extLst>
               </a:tr>
@@ -37393,14 +37305,14 @@
                 <a:gridCol w="957714">
                   <a:extLst>
                     <a:ext uri="{9D8B030D-6E8A-4147-A177-3AD203B41FA5}">
-                      <a16:colId xmlns="" xmlns:a16="http://schemas.microsoft.com/office/drawing/2014/main" val="3940544257"/>
+                      <a16:colId xmlns:a16="http://schemas.microsoft.com/office/drawing/2014/main" xmlns="" val="3940544257"/>
                     </a:ext>
                   </a:extLst>
                 </a:gridCol>
                 <a:gridCol w="2464067">
                   <a:extLst>
                     <a:ext uri="{9D8B030D-6E8A-4147-A177-3AD203B41FA5}">
-                      <a16:colId xmlns="" xmlns:a16="http://schemas.microsoft.com/office/drawing/2014/main" val="3658567973"/>
+                      <a16:colId xmlns:a16="http://schemas.microsoft.com/office/drawing/2014/main" xmlns="" val="3658567973"/>
                     </a:ext>
                   </a:extLst>
                 </a:gridCol>
@@ -37434,7 +37346,7 @@
                 </a:tc>
                 <a:extLst>
                   <a:ext uri="{0D108BD9-81ED-4DB2-BD59-A6C34878D82A}">
-                    <a16:rowId xmlns="" xmlns:a16="http://schemas.microsoft.com/office/drawing/2014/main" val="1032275335"/>
+                    <a16:rowId xmlns:a16="http://schemas.microsoft.com/office/drawing/2014/main" xmlns="" val="1032275335"/>
                   </a:ext>
                 </a:extLst>
               </a:tr>
@@ -37564,7 +37476,7 @@
                 </a:tc>
                 <a:extLst>
                   <a:ext uri="{0D108BD9-81ED-4DB2-BD59-A6C34878D82A}">
-                    <a16:rowId xmlns="" xmlns:a16="http://schemas.microsoft.com/office/drawing/2014/main" val="4191484087"/>
+                    <a16:rowId xmlns:a16="http://schemas.microsoft.com/office/drawing/2014/main" xmlns="" val="4191484087"/>
                   </a:ext>
                 </a:extLst>
               </a:tr>
@@ -37638,7 +37550,7 @@
                 </a:tc>
                 <a:extLst>
                   <a:ext uri="{0D108BD9-81ED-4DB2-BD59-A6C34878D82A}">
-                    <a16:rowId xmlns="" xmlns:a16="http://schemas.microsoft.com/office/drawing/2014/main" val="1864588626"/>
+                    <a16:rowId xmlns:a16="http://schemas.microsoft.com/office/drawing/2014/main" xmlns="" val="1864588626"/>
                   </a:ext>
                 </a:extLst>
               </a:tr>
@@ -37760,7 +37672,7 @@
                 </a:tc>
                 <a:extLst>
                   <a:ext uri="{0D108BD9-81ED-4DB2-BD59-A6C34878D82A}">
-                    <a16:rowId xmlns="" xmlns:a16="http://schemas.microsoft.com/office/drawing/2014/main" val="3035259714"/>
+                    <a16:rowId xmlns:a16="http://schemas.microsoft.com/office/drawing/2014/main" xmlns="" val="3035259714"/>
                   </a:ext>
                 </a:extLst>
               </a:tr>
@@ -37849,7 +37761,7 @@
                 </a:tc>
                 <a:extLst>
                   <a:ext uri="{0D108BD9-81ED-4DB2-BD59-A6C34878D82A}">
-                    <a16:rowId xmlns="" xmlns:a16="http://schemas.microsoft.com/office/drawing/2014/main" val="2023621082"/>
+                    <a16:rowId xmlns:a16="http://schemas.microsoft.com/office/drawing/2014/main" xmlns="" val="2023621082"/>
                   </a:ext>
                 </a:extLst>
               </a:tr>
@@ -37938,7 +37850,7 @@
                 </a:tc>
                 <a:extLst>
                   <a:ext uri="{0D108BD9-81ED-4DB2-BD59-A6C34878D82A}">
-                    <a16:rowId xmlns="" xmlns:a16="http://schemas.microsoft.com/office/drawing/2014/main" val="120016333"/>
+                    <a16:rowId xmlns:a16="http://schemas.microsoft.com/office/drawing/2014/main" xmlns="" val="120016333"/>
                   </a:ext>
                 </a:extLst>
               </a:tr>
@@ -38083,21 +37995,21 @@
                 <a:gridCol w="960120">
                   <a:extLst>
                     <a:ext uri="{9D8B030D-6E8A-4147-A177-3AD203B41FA5}">
-                      <a16:colId xmlns="" xmlns:a16="http://schemas.microsoft.com/office/drawing/2014/main" val="392696932"/>
+                      <a16:colId xmlns:a16="http://schemas.microsoft.com/office/drawing/2014/main" xmlns="" val="392696932"/>
                     </a:ext>
                   </a:extLst>
                 </a:gridCol>
                 <a:gridCol w="2468880">
                   <a:extLst>
                     <a:ext uri="{9D8B030D-6E8A-4147-A177-3AD203B41FA5}">
-                      <a16:colId xmlns="" xmlns:a16="http://schemas.microsoft.com/office/drawing/2014/main" val="2769969192"/>
+                      <a16:colId xmlns:a16="http://schemas.microsoft.com/office/drawing/2014/main" xmlns="" val="2769969192"/>
                     </a:ext>
                   </a:extLst>
                 </a:gridCol>
                 <a:gridCol w="2468880">
                   <a:extLst>
                     <a:ext uri="{9D8B030D-6E8A-4147-A177-3AD203B41FA5}">
-                      <a16:colId xmlns="" xmlns:a16="http://schemas.microsoft.com/office/drawing/2014/main" val="2022610816"/>
+                      <a16:colId xmlns:a16="http://schemas.microsoft.com/office/drawing/2014/main" xmlns="" val="2022610816"/>
                     </a:ext>
                   </a:extLst>
                 </a:gridCol>
@@ -38149,7 +38061,7 @@
                 </a:tc>
                 <a:extLst>
                   <a:ext uri="{0D108BD9-81ED-4DB2-BD59-A6C34878D82A}">
-                    <a16:rowId xmlns="" xmlns:a16="http://schemas.microsoft.com/office/drawing/2014/main" val="2344937666"/>
+                    <a16:rowId xmlns:a16="http://schemas.microsoft.com/office/drawing/2014/main" xmlns="" val="2344937666"/>
                   </a:ext>
                 </a:extLst>
               </a:tr>
@@ -38282,7 +38194,7 @@
                 </a:tc>
                 <a:extLst>
                   <a:ext uri="{0D108BD9-81ED-4DB2-BD59-A6C34878D82A}">
-                    <a16:rowId xmlns="" xmlns:a16="http://schemas.microsoft.com/office/drawing/2014/main" val="1917341330"/>
+                    <a16:rowId xmlns:a16="http://schemas.microsoft.com/office/drawing/2014/main" xmlns="" val="1917341330"/>
                   </a:ext>
                 </a:extLst>
               </a:tr>
@@ -38499,7 +38411,7 @@
                 </a:tc>
                 <a:extLst>
                   <a:ext uri="{0D108BD9-81ED-4DB2-BD59-A6C34878D82A}">
-                    <a16:rowId xmlns="" xmlns:a16="http://schemas.microsoft.com/office/drawing/2014/main" val="3088042860"/>
+                    <a16:rowId xmlns:a16="http://schemas.microsoft.com/office/drawing/2014/main" xmlns="" val="3088042860"/>
                   </a:ext>
                 </a:extLst>
               </a:tr>
@@ -38583,7 +38495,7 @@
                 </a:tc>
                 <a:extLst>
                   <a:ext uri="{0D108BD9-81ED-4DB2-BD59-A6C34878D82A}">
-                    <a16:rowId xmlns="" xmlns:a16="http://schemas.microsoft.com/office/drawing/2014/main" val="2658530722"/>
+                    <a16:rowId xmlns:a16="http://schemas.microsoft.com/office/drawing/2014/main" xmlns="" val="2658530722"/>
                   </a:ext>
                 </a:extLst>
               </a:tr>
@@ -38715,7 +38627,7 @@
                 </a:tc>
                 <a:extLst>
                   <a:ext uri="{0D108BD9-81ED-4DB2-BD59-A6C34878D82A}">
-                    <a16:rowId xmlns="" xmlns:a16="http://schemas.microsoft.com/office/drawing/2014/main" val="1481886367"/>
+                    <a16:rowId xmlns:a16="http://schemas.microsoft.com/office/drawing/2014/main" xmlns="" val="1481886367"/>
                   </a:ext>
                 </a:extLst>
               </a:tr>
@@ -38814,7 +38726,7 @@
                 </a:tc>
                 <a:extLst>
                   <a:ext uri="{0D108BD9-81ED-4DB2-BD59-A6C34878D82A}">
-                    <a16:rowId xmlns="" xmlns:a16="http://schemas.microsoft.com/office/drawing/2014/main" val="4248384778"/>
+                    <a16:rowId xmlns:a16="http://schemas.microsoft.com/office/drawing/2014/main" xmlns="" val="4248384778"/>
                   </a:ext>
                 </a:extLst>
               </a:tr>
@@ -38913,7 +38825,7 @@
                 </a:tc>
                 <a:extLst>
                   <a:ext uri="{0D108BD9-81ED-4DB2-BD59-A6C34878D82A}">
-                    <a16:rowId xmlns="" xmlns:a16="http://schemas.microsoft.com/office/drawing/2014/main" val="1670483340"/>
+                    <a16:rowId xmlns:a16="http://schemas.microsoft.com/office/drawing/2014/main" xmlns="" val="1670483340"/>
                   </a:ext>
                 </a:extLst>
               </a:tr>
@@ -39058,28 +38970,28 @@
                 <a:gridCol w="960120">
                   <a:extLst>
                     <a:ext uri="{9D8B030D-6E8A-4147-A177-3AD203B41FA5}">
-                      <a16:colId xmlns="" xmlns:a16="http://schemas.microsoft.com/office/drawing/2014/main" val="392696932"/>
+                      <a16:colId xmlns:a16="http://schemas.microsoft.com/office/drawing/2014/main" xmlns="" val="392696932"/>
                     </a:ext>
                   </a:extLst>
                 </a:gridCol>
                 <a:gridCol w="2468880">
                   <a:extLst>
                     <a:ext uri="{9D8B030D-6E8A-4147-A177-3AD203B41FA5}">
-                      <a16:colId xmlns="" xmlns:a16="http://schemas.microsoft.com/office/drawing/2014/main" val="2769969192"/>
+                      <a16:colId xmlns:a16="http://schemas.microsoft.com/office/drawing/2014/main" xmlns="" val="2769969192"/>
                     </a:ext>
                   </a:extLst>
                 </a:gridCol>
                 <a:gridCol w="2468880">
                   <a:extLst>
                     <a:ext uri="{9D8B030D-6E8A-4147-A177-3AD203B41FA5}">
-                      <a16:colId xmlns="" xmlns:a16="http://schemas.microsoft.com/office/drawing/2014/main" val="2022610816"/>
+                      <a16:colId xmlns:a16="http://schemas.microsoft.com/office/drawing/2014/main" xmlns="" val="2022610816"/>
                     </a:ext>
                   </a:extLst>
                 </a:gridCol>
                 <a:gridCol w="2468880">
                   <a:extLst>
                     <a:ext uri="{9D8B030D-6E8A-4147-A177-3AD203B41FA5}">
-                      <a16:colId xmlns="" xmlns:a16="http://schemas.microsoft.com/office/drawing/2014/main" val="102813283"/>
+                      <a16:colId xmlns:a16="http://schemas.microsoft.com/office/drawing/2014/main" xmlns="" val="102813283"/>
                     </a:ext>
                   </a:extLst>
                 </a:gridCol>
@@ -39144,7 +39056,7 @@
                 </a:tc>
                 <a:extLst>
                   <a:ext uri="{0D108BD9-81ED-4DB2-BD59-A6C34878D82A}">
-                    <a16:rowId xmlns="" xmlns:a16="http://schemas.microsoft.com/office/drawing/2014/main" val="2344937666"/>
+                    <a16:rowId xmlns:a16="http://schemas.microsoft.com/office/drawing/2014/main" xmlns="" val="2344937666"/>
                   </a:ext>
                 </a:extLst>
               </a:tr>
@@ -39304,7 +39216,7 @@
                 </a:tc>
                 <a:extLst>
                   <a:ext uri="{0D108BD9-81ED-4DB2-BD59-A6C34878D82A}">
-                    <a16:rowId xmlns="" xmlns:a16="http://schemas.microsoft.com/office/drawing/2014/main" val="1917341330"/>
+                    <a16:rowId xmlns:a16="http://schemas.microsoft.com/office/drawing/2014/main" xmlns="" val="1917341330"/>
                   </a:ext>
                 </a:extLst>
               </a:tr>
@@ -39608,7 +39520,7 @@
                 </a:tc>
                 <a:extLst>
                   <a:ext uri="{0D108BD9-81ED-4DB2-BD59-A6C34878D82A}">
-                    <a16:rowId xmlns="" xmlns:a16="http://schemas.microsoft.com/office/drawing/2014/main" val="3088042860"/>
+                    <a16:rowId xmlns:a16="http://schemas.microsoft.com/office/drawing/2014/main" xmlns="" val="3088042860"/>
                   </a:ext>
                 </a:extLst>
               </a:tr>
@@ -39702,7 +39614,7 @@
                 </a:tc>
                 <a:extLst>
                   <a:ext uri="{0D108BD9-81ED-4DB2-BD59-A6C34878D82A}">
-                    <a16:rowId xmlns="" xmlns:a16="http://schemas.microsoft.com/office/drawing/2014/main" val="2658530722"/>
+                    <a16:rowId xmlns:a16="http://schemas.microsoft.com/office/drawing/2014/main" xmlns="" val="2658530722"/>
                   </a:ext>
                 </a:extLst>
               </a:tr>
@@ -39895,7 +39807,7 @@
                 </a:tc>
                 <a:extLst>
                   <a:ext uri="{0D108BD9-81ED-4DB2-BD59-A6C34878D82A}">
-                    <a16:rowId xmlns="" xmlns:a16="http://schemas.microsoft.com/office/drawing/2014/main" val="1481886367"/>
+                    <a16:rowId xmlns:a16="http://schemas.microsoft.com/office/drawing/2014/main" xmlns="" val="1481886367"/>
                   </a:ext>
                 </a:extLst>
               </a:tr>
@@ -40004,7 +39916,7 @@
                 </a:tc>
                 <a:extLst>
                   <a:ext uri="{0D108BD9-81ED-4DB2-BD59-A6C34878D82A}">
-                    <a16:rowId xmlns="" xmlns:a16="http://schemas.microsoft.com/office/drawing/2014/main" val="4248384778"/>
+                    <a16:rowId xmlns:a16="http://schemas.microsoft.com/office/drawing/2014/main" xmlns="" val="4248384778"/>
                   </a:ext>
                 </a:extLst>
               </a:tr>
@@ -40113,7 +40025,7 @@
                 </a:tc>
                 <a:extLst>
                   <a:ext uri="{0D108BD9-81ED-4DB2-BD59-A6C34878D82A}">
-                    <a16:rowId xmlns="" xmlns:a16="http://schemas.microsoft.com/office/drawing/2014/main" val="1670483340"/>
+                    <a16:rowId xmlns:a16="http://schemas.microsoft.com/office/drawing/2014/main" xmlns="" val="1670483340"/>
                   </a:ext>
                 </a:extLst>
               </a:tr>
@@ -40498,7 +40410,7 @@
             <p:ph idx="1"/>
             <p:extLst>
               <p:ext uri="{D42A27DB-BD31-4B8C-83A1-F6EECF244321}">
-                <p14:modId xmlns:p14="http://schemas.microsoft.com/office/powerpoint/2010/main" val="1612175307"/>
+                <p14:modId xmlns:p14="http://schemas.microsoft.com/office/powerpoint/2010/main" val="417830956"/>
               </p:ext>
             </p:extLst>
           </p:nvPr>
@@ -40517,14 +40429,14 @@
                 <a:gridCol w="934278">
                   <a:extLst>
                     <a:ext uri="{9D8B030D-6E8A-4147-A177-3AD203B41FA5}">
-                      <a16:colId xmlns="" xmlns:a16="http://schemas.microsoft.com/office/drawing/2014/main" val="4198655800"/>
+                      <a16:colId xmlns:a16="http://schemas.microsoft.com/office/drawing/2014/main" xmlns="" val="4198655800"/>
                     </a:ext>
                   </a:extLst>
                 </a:gridCol>
                 <a:gridCol w="7295322">
                   <a:extLst>
                     <a:ext uri="{9D8B030D-6E8A-4147-A177-3AD203B41FA5}">
-                      <a16:colId xmlns="" xmlns:a16="http://schemas.microsoft.com/office/drawing/2014/main" val="135413862"/>
+                      <a16:colId xmlns:a16="http://schemas.microsoft.com/office/drawing/2014/main" xmlns="" val="135413862"/>
                     </a:ext>
                   </a:extLst>
                 </a:gridCol>
@@ -40558,7 +40470,7 @@
                 </a:tc>
                 <a:extLst>
                   <a:ext uri="{0D108BD9-81ED-4DB2-BD59-A6C34878D82A}">
-                    <a16:rowId xmlns="" xmlns:a16="http://schemas.microsoft.com/office/drawing/2014/main" val="3068323444"/>
+                    <a16:rowId xmlns:a16="http://schemas.microsoft.com/office/drawing/2014/main" xmlns="" val="3068323444"/>
                   </a:ext>
                 </a:extLst>
               </a:tr>
@@ -40569,8 +40481,8 @@
                     <a:lstStyle/>
                     <a:p>
                       <a:r>
-                        <a:rPr lang="en-US" dirty="0" smtClean="0"/>
-                        <a:t>2362</a:t>
+                        <a:rPr lang="en-US" smtClean="0"/>
+                        <a:t>2363</a:t>
                       </a:r>
                       <a:endParaRPr lang="en-US" dirty="0"/>
                     </a:p>
@@ -40622,7 +40534,7 @@
                 </a:tc>
                 <a:extLst>
                   <a:ext uri="{0D108BD9-81ED-4DB2-BD59-A6C34878D82A}">
-                    <a16:rowId xmlns="" xmlns:a16="http://schemas.microsoft.com/office/drawing/2014/main" val="1586961909"/>
+                    <a16:rowId xmlns:a16="http://schemas.microsoft.com/office/drawing/2014/main" xmlns="" val="1586961909"/>
                   </a:ext>
                 </a:extLst>
               </a:tr>
@@ -40655,7 +40567,7 @@
                 </a:tc>
                 <a:extLst>
                   <a:ext uri="{0D108BD9-81ED-4DB2-BD59-A6C34878D82A}">
-                    <a16:rowId xmlns="" xmlns:a16="http://schemas.microsoft.com/office/drawing/2014/main" val="2280300197"/>
+                    <a16:rowId xmlns:a16="http://schemas.microsoft.com/office/drawing/2014/main" xmlns="" val="2280300197"/>
                   </a:ext>
                 </a:extLst>
               </a:tr>
@@ -40693,7 +40605,7 @@
                 </a:tc>
                 <a:extLst>
                   <a:ext uri="{0D108BD9-81ED-4DB2-BD59-A6C34878D82A}">
-                    <a16:rowId xmlns="" xmlns:a16="http://schemas.microsoft.com/office/drawing/2014/main" val="1192843310"/>
+                    <a16:rowId xmlns:a16="http://schemas.microsoft.com/office/drawing/2014/main" xmlns="" val="1192843310"/>
                   </a:ext>
                 </a:extLst>
               </a:tr>
@@ -40731,7 +40643,7 @@
                 </a:tc>
                 <a:extLst>
                   <a:ext uri="{0D108BD9-81ED-4DB2-BD59-A6C34878D82A}">
-                    <a16:rowId xmlns="" xmlns:a16="http://schemas.microsoft.com/office/drawing/2014/main" val="2620585158"/>
+                    <a16:rowId xmlns:a16="http://schemas.microsoft.com/office/drawing/2014/main" xmlns="" val="2620585158"/>
                   </a:ext>
                 </a:extLst>
               </a:tr>
@@ -40769,7 +40681,7 @@
                 </a:tc>
                 <a:extLst>
                   <a:ext uri="{0D108BD9-81ED-4DB2-BD59-A6C34878D82A}">
-                    <a16:rowId xmlns="" xmlns:a16="http://schemas.microsoft.com/office/drawing/2014/main" val="1697738616"/>
+                    <a16:rowId xmlns:a16="http://schemas.microsoft.com/office/drawing/2014/main" xmlns="" val="1697738616"/>
                   </a:ext>
                 </a:extLst>
               </a:tr>
@@ -40802,7 +40714,7 @@
                 </a:tc>
                 <a:extLst>
                   <a:ext uri="{0D108BD9-81ED-4DB2-BD59-A6C34878D82A}">
-                    <a16:rowId xmlns="" xmlns:a16="http://schemas.microsoft.com/office/drawing/2014/main" val="316611556"/>
+                    <a16:rowId xmlns:a16="http://schemas.microsoft.com/office/drawing/2014/main" xmlns="" val="316611556"/>
                   </a:ext>
                 </a:extLst>
               </a:tr>
@@ -40840,7 +40752,7 @@
                 </a:tc>
                 <a:extLst>
                   <a:ext uri="{0D108BD9-81ED-4DB2-BD59-A6C34878D82A}">
-                    <a16:rowId xmlns="" xmlns:a16="http://schemas.microsoft.com/office/drawing/2014/main" val="1312814102"/>
+                    <a16:rowId xmlns:a16="http://schemas.microsoft.com/office/drawing/2014/main" xmlns="" val="1312814102"/>
                   </a:ext>
                 </a:extLst>
               </a:tr>
@@ -40873,7 +40785,7 @@
                 </a:tc>
                 <a:extLst>
                   <a:ext uri="{0D108BD9-81ED-4DB2-BD59-A6C34878D82A}">
-                    <a16:rowId xmlns="" xmlns:a16="http://schemas.microsoft.com/office/drawing/2014/main" val="1975533996"/>
+                    <a16:rowId xmlns:a16="http://schemas.microsoft.com/office/drawing/2014/main" xmlns="" val="1975533996"/>
                   </a:ext>
                 </a:extLst>
               </a:tr>
@@ -40906,7 +40818,7 @@
                 </a:tc>
                 <a:extLst>
                   <a:ext uri="{0D108BD9-81ED-4DB2-BD59-A6C34878D82A}">
-                    <a16:rowId xmlns="" xmlns:a16="http://schemas.microsoft.com/office/drawing/2014/main" val="2759032957"/>
+                    <a16:rowId xmlns:a16="http://schemas.microsoft.com/office/drawing/2014/main" xmlns="" val="2759032957"/>
                   </a:ext>
                 </a:extLst>
               </a:tr>
@@ -40995,14 +40907,14 @@
                 <a:gridCol w="934278">
                   <a:extLst>
                     <a:ext uri="{9D8B030D-6E8A-4147-A177-3AD203B41FA5}">
-                      <a16:colId xmlns="" xmlns:a16="http://schemas.microsoft.com/office/drawing/2014/main" val="4198655800"/>
+                      <a16:colId xmlns:a16="http://schemas.microsoft.com/office/drawing/2014/main" xmlns="" val="4198655800"/>
                     </a:ext>
                   </a:extLst>
                 </a:gridCol>
                 <a:gridCol w="7295322">
                   <a:extLst>
                     <a:ext uri="{9D8B030D-6E8A-4147-A177-3AD203B41FA5}">
-                      <a16:colId xmlns="" xmlns:a16="http://schemas.microsoft.com/office/drawing/2014/main" val="135413862"/>
+                      <a16:colId xmlns:a16="http://schemas.microsoft.com/office/drawing/2014/main" xmlns="" val="135413862"/>
                     </a:ext>
                   </a:extLst>
                 </a:gridCol>
@@ -41036,7 +40948,7 @@
                 </a:tc>
                 <a:extLst>
                   <a:ext uri="{0D108BD9-81ED-4DB2-BD59-A6C34878D82A}">
-                    <a16:rowId xmlns="" xmlns:a16="http://schemas.microsoft.com/office/drawing/2014/main" val="3068323444"/>
+                    <a16:rowId xmlns:a16="http://schemas.microsoft.com/office/drawing/2014/main" xmlns="" val="3068323444"/>
                   </a:ext>
                 </a:extLst>
               </a:tr>
@@ -41069,7 +40981,7 @@
                 </a:tc>
                 <a:extLst>
                   <a:ext uri="{0D108BD9-81ED-4DB2-BD59-A6C34878D82A}">
-                    <a16:rowId xmlns="" xmlns:a16="http://schemas.microsoft.com/office/drawing/2014/main" val="2484981654"/>
+                    <a16:rowId xmlns:a16="http://schemas.microsoft.com/office/drawing/2014/main" xmlns="" val="2484981654"/>
                   </a:ext>
                 </a:extLst>
               </a:tr>
@@ -41102,7 +41014,7 @@
                 </a:tc>
                 <a:extLst>
                   <a:ext uri="{0D108BD9-81ED-4DB2-BD59-A6C34878D82A}">
-                    <a16:rowId xmlns="" xmlns:a16="http://schemas.microsoft.com/office/drawing/2014/main" val="1377910784"/>
+                    <a16:rowId xmlns:a16="http://schemas.microsoft.com/office/drawing/2014/main" xmlns="" val="1377910784"/>
                   </a:ext>
                 </a:extLst>
               </a:tr>
@@ -41140,7 +41052,7 @@
                 </a:tc>
                 <a:extLst>
                   <a:ext uri="{0D108BD9-81ED-4DB2-BD59-A6C34878D82A}">
-                    <a16:rowId xmlns="" xmlns:a16="http://schemas.microsoft.com/office/drawing/2014/main" val="1387856053"/>
+                    <a16:rowId xmlns:a16="http://schemas.microsoft.com/office/drawing/2014/main" xmlns="" val="1387856053"/>
                   </a:ext>
                 </a:extLst>
               </a:tr>
@@ -41173,7 +41085,7 @@
                 </a:tc>
                 <a:extLst>
                   <a:ext uri="{0D108BD9-81ED-4DB2-BD59-A6C34878D82A}">
-                    <a16:rowId xmlns="" xmlns:a16="http://schemas.microsoft.com/office/drawing/2014/main" val="2599123823"/>
+                    <a16:rowId xmlns:a16="http://schemas.microsoft.com/office/drawing/2014/main" xmlns="" val="2599123823"/>
                   </a:ext>
                 </a:extLst>
               </a:tr>
@@ -41211,7 +41123,7 @@
                 </a:tc>
                 <a:extLst>
                   <a:ext uri="{0D108BD9-81ED-4DB2-BD59-A6C34878D82A}">
-                    <a16:rowId xmlns="" xmlns:a16="http://schemas.microsoft.com/office/drawing/2014/main" val="1232603862"/>
+                    <a16:rowId xmlns:a16="http://schemas.microsoft.com/office/drawing/2014/main" xmlns="" val="1232603862"/>
                   </a:ext>
                 </a:extLst>
               </a:tr>
@@ -41252,7 +41164,7 @@
                 </a:tc>
                 <a:extLst>
                   <a:ext uri="{0D108BD9-81ED-4DB2-BD59-A6C34878D82A}">
-                    <a16:rowId xmlns="" xmlns:a16="http://schemas.microsoft.com/office/drawing/2014/main" val="4145944521"/>
+                    <a16:rowId xmlns:a16="http://schemas.microsoft.com/office/drawing/2014/main" xmlns="" val="4145944521"/>
                   </a:ext>
                 </a:extLst>
               </a:tr>
@@ -41285,7 +41197,7 @@
                 </a:tc>
                 <a:extLst>
                   <a:ext uri="{0D108BD9-81ED-4DB2-BD59-A6C34878D82A}">
-                    <a16:rowId xmlns="" xmlns:a16="http://schemas.microsoft.com/office/drawing/2014/main" val="2954677722"/>
+                    <a16:rowId xmlns:a16="http://schemas.microsoft.com/office/drawing/2014/main" xmlns="" val="2954677722"/>
                   </a:ext>
                 </a:extLst>
               </a:tr>
@@ -41323,7 +41235,7 @@
                 </a:tc>
                 <a:extLst>
                   <a:ext uri="{0D108BD9-81ED-4DB2-BD59-A6C34878D82A}">
-                    <a16:rowId xmlns="" xmlns:a16="http://schemas.microsoft.com/office/drawing/2014/main" val="205903975"/>
+                    <a16:rowId xmlns:a16="http://schemas.microsoft.com/office/drawing/2014/main" xmlns="" val="205903975"/>
                   </a:ext>
                 </a:extLst>
               </a:tr>
@@ -41356,7 +41268,7 @@
                 </a:tc>
                 <a:extLst>
                   <a:ext uri="{0D108BD9-81ED-4DB2-BD59-A6C34878D82A}">
-                    <a16:rowId xmlns="" xmlns:a16="http://schemas.microsoft.com/office/drawing/2014/main" val="2893595017"/>
+                    <a16:rowId xmlns:a16="http://schemas.microsoft.com/office/drawing/2014/main" xmlns="" val="2893595017"/>
                   </a:ext>
                 </a:extLst>
               </a:tr>
@@ -41574,14 +41486,14 @@
                 <a:gridCol w="934278">
                   <a:extLst>
                     <a:ext uri="{9D8B030D-6E8A-4147-A177-3AD203B41FA5}">
-                      <a16:colId xmlns="" xmlns:a16="http://schemas.microsoft.com/office/drawing/2014/main" val="4198655800"/>
+                      <a16:colId xmlns:a16="http://schemas.microsoft.com/office/drawing/2014/main" xmlns="" val="4198655800"/>
                     </a:ext>
                   </a:extLst>
                 </a:gridCol>
                 <a:gridCol w="7295322">
                   <a:extLst>
                     <a:ext uri="{9D8B030D-6E8A-4147-A177-3AD203B41FA5}">
-                      <a16:colId xmlns="" xmlns:a16="http://schemas.microsoft.com/office/drawing/2014/main" val="135413862"/>
+                      <a16:colId xmlns:a16="http://schemas.microsoft.com/office/drawing/2014/main" xmlns="" val="135413862"/>
                     </a:ext>
                   </a:extLst>
                 </a:gridCol>
@@ -41615,7 +41527,7 @@
                 </a:tc>
                 <a:extLst>
                   <a:ext uri="{0D108BD9-81ED-4DB2-BD59-A6C34878D82A}">
-                    <a16:rowId xmlns="" xmlns:a16="http://schemas.microsoft.com/office/drawing/2014/main" val="3068323444"/>
+                    <a16:rowId xmlns:a16="http://schemas.microsoft.com/office/drawing/2014/main" xmlns="" val="3068323444"/>
                   </a:ext>
                 </a:extLst>
               </a:tr>
@@ -43853,21 +43765,21 @@
                 <a:gridCol w="2764301">
                   <a:extLst>
                     <a:ext uri="{9D8B030D-6E8A-4147-A177-3AD203B41FA5}">
-                      <a16:colId xmlns="" xmlns:a16="http://schemas.microsoft.com/office/drawing/2014/main" val="234227049"/>
+                      <a16:colId xmlns:a16="http://schemas.microsoft.com/office/drawing/2014/main" xmlns="" val="234227049"/>
                     </a:ext>
                   </a:extLst>
                 </a:gridCol>
                 <a:gridCol w="2764301">
                   <a:extLst>
                     <a:ext uri="{9D8B030D-6E8A-4147-A177-3AD203B41FA5}">
-                      <a16:colId xmlns="" xmlns:a16="http://schemas.microsoft.com/office/drawing/2014/main" val="4053135350"/>
+                      <a16:colId xmlns:a16="http://schemas.microsoft.com/office/drawing/2014/main" xmlns="" val="4053135350"/>
                     </a:ext>
                   </a:extLst>
                 </a:gridCol>
                 <a:gridCol w="2764301">
                   <a:extLst>
                     <a:ext uri="{9D8B030D-6E8A-4147-A177-3AD203B41FA5}">
-                      <a16:colId xmlns="" xmlns:a16="http://schemas.microsoft.com/office/drawing/2014/main" val="672378647"/>
+                      <a16:colId xmlns:a16="http://schemas.microsoft.com/office/drawing/2014/main" xmlns="" val="672378647"/>
                     </a:ext>
                   </a:extLst>
                 </a:gridCol>
@@ -43917,7 +43829,7 @@
                 </a:tc>
                 <a:extLst>
                   <a:ext uri="{0D108BD9-81ED-4DB2-BD59-A6C34878D82A}">
-                    <a16:rowId xmlns="" xmlns:a16="http://schemas.microsoft.com/office/drawing/2014/main" val="2843053056"/>
+                    <a16:rowId xmlns:a16="http://schemas.microsoft.com/office/drawing/2014/main" xmlns="" val="2843053056"/>
                   </a:ext>
                 </a:extLst>
               </a:tr>
@@ -43967,7 +43879,7 @@
                 </a:tc>
                 <a:extLst>
                   <a:ext uri="{0D108BD9-81ED-4DB2-BD59-A6C34878D82A}">
-                    <a16:rowId xmlns="" xmlns:a16="http://schemas.microsoft.com/office/drawing/2014/main" val="3055328934"/>
+                    <a16:rowId xmlns:a16="http://schemas.microsoft.com/office/drawing/2014/main" xmlns="" val="3055328934"/>
                   </a:ext>
                 </a:extLst>
               </a:tr>
@@ -44017,7 +43929,7 @@
                 </a:tc>
                 <a:extLst>
                   <a:ext uri="{0D108BD9-81ED-4DB2-BD59-A6C34878D82A}">
-                    <a16:rowId xmlns="" xmlns:a16="http://schemas.microsoft.com/office/drawing/2014/main" val="1144851549"/>
+                    <a16:rowId xmlns:a16="http://schemas.microsoft.com/office/drawing/2014/main" xmlns="" val="1144851549"/>
                   </a:ext>
                 </a:extLst>
               </a:tr>
@@ -44066,7 +43978,7 @@
                 </a:tc>
                 <a:extLst>
                   <a:ext uri="{0D108BD9-81ED-4DB2-BD59-A6C34878D82A}">
-                    <a16:rowId xmlns="" xmlns:a16="http://schemas.microsoft.com/office/drawing/2014/main" val="4258932578"/>
+                    <a16:rowId xmlns:a16="http://schemas.microsoft.com/office/drawing/2014/main" xmlns="" val="4258932578"/>
                   </a:ext>
                 </a:extLst>
               </a:tr>
@@ -45012,18 +44924,7 @@
                 <a:ea typeface="Calibri" panose="020F0502020204030204" pitchFamily="34" charset="0"/>
                 <a:cs typeface="Times New Roman" panose="02020603050405020304" pitchFamily="18" charset="0"/>
               </a:rPr>
-              <a:t>'WI</a:t>
-            </a:r>
-            <a:r>
-              <a:rPr lang="en-US" dirty="0" smtClean="0">
-                <a:solidFill>
-                  <a:srgbClr val="FF0000"/>
-                </a:solidFill>
-                <a:latin typeface="Consolas" panose="020B0609020204030204" pitchFamily="49" charset="0"/>
-                <a:ea typeface="Calibri" panose="020F0502020204030204" pitchFamily="34" charset="0"/>
-                <a:cs typeface="Times New Roman" panose="02020603050405020304" pitchFamily="18" charset="0"/>
-              </a:rPr>
-              <a:t>'</a:t>
+              <a:t>'WI'</a:t>
             </a:r>
             <a:endParaRPr lang="en-US" sz="2400" dirty="0">
               <a:latin typeface="Calibri" panose="020F0502020204030204" pitchFamily="34" charset="0"/>

</xml_diff>

<commit_message>
Update title slide for Baton Rouge.
</commit_message>
<xml_diff>
--- a/Optimizer.pptx
+++ b/Optimizer.pptx
@@ -189,6 +189,10 @@
 </p:presentation>
 </file>
 
+<file path=ppt/revisionInfo.xml><?xml version="1.0" encoding="utf-8"?>
+<p1510:revInfo xmlns:a="http://schemas.openxmlformats.org/drawingml/2006/main" xmlns:r="http://schemas.openxmlformats.org/officeDocument/2006/relationships" xmlns:p1510="http://schemas.microsoft.com/office/powerpoint/2015/10/main"/>
+</file>
+
 <file path=ppt/notesMasters/notesMaster1.xml><?xml version="1.0" encoding="utf-8"?>
 <p:notesMaster xmlns:a="http://schemas.openxmlformats.org/drawingml/2006/main" xmlns:r="http://schemas.openxmlformats.org/officeDocument/2006/relationships" xmlns:p="http://schemas.openxmlformats.org/presentationml/2006/main">
   <p:cSld>
@@ -271,7 +275,7 @@
           <a:p>
             <a:fld id="{2EDCB34D-5EC2-4739-9693-E425457AC201}" type="datetimeFigureOut">
               <a:rPr lang="en-US" smtClean="0"/>
-              <a:t>04/05/2017</a:t>
+              <a:t>6/22/2017</a:t>
             </a:fld>
             <a:endParaRPr lang="en-US"/>
           </a:p>
@@ -3062,7 +3066,7 @@
             <a:fld id="{5942B21B-2ADA-A040-A652-A7305E1B99FE}" type="datetimeFigureOut">
               <a:rPr lang="en-US" smtClean="0"/>
               <a:pPr/>
-              <a:t>04/05/2017</a:t>
+              <a:t>6/22/2017</a:t>
             </a:fld>
             <a:endParaRPr lang="en-US" dirty="0"/>
           </a:p>
@@ -3252,7 +3256,7 @@
           <a:p>
             <a:fld id="{5942B21B-2ADA-A040-A652-A7305E1B99FE}" type="datetimeFigureOut">
               <a:rPr lang="en-US" smtClean="0"/>
-              <a:t>04/05/2017</a:t>
+              <a:t>6/22/2017</a:t>
             </a:fld>
             <a:endParaRPr lang="en-US"/>
           </a:p>
@@ -3376,7 +3380,7 @@
             <a:fld id="{5942B21B-2ADA-A040-A652-A7305E1B99FE}" type="datetimeFigureOut">
               <a:rPr lang="en-US" smtClean="0"/>
               <a:pPr/>
-              <a:t>04/05/2017</a:t>
+              <a:t>6/22/2017</a:t>
             </a:fld>
             <a:r>
               <a:rPr lang="en-US"/>
@@ -3647,7 +3651,7 @@
             <a:fld id="{5942B21B-2ADA-A040-A652-A7305E1B99FE}" type="datetimeFigureOut">
               <a:rPr lang="en-US" smtClean="0"/>
               <a:pPr/>
-              <a:t>04/05/2017</a:t>
+              <a:t>6/22/2017</a:t>
             </a:fld>
             <a:r>
               <a:rPr lang="en-US" dirty="0"/>
@@ -3917,7 +3921,7 @@
             <a:fld id="{5942B21B-2ADA-A040-A652-A7305E1B99FE}" type="datetimeFigureOut">
               <a:rPr lang="en-US" smtClean="0"/>
               <a:pPr/>
-              <a:t>04/05/2017</a:t>
+              <a:t>6/22/2017</a:t>
             </a:fld>
             <a:r>
               <a:rPr lang="en-US" dirty="0"/>
@@ -4257,7 +4261,7 @@
             <a:fld id="{5942B21B-2ADA-A040-A652-A7305E1B99FE}" type="datetimeFigureOut">
               <a:rPr lang="en-US" smtClean="0"/>
               <a:pPr/>
-              <a:t>04/05/2017</a:t>
+              <a:t>6/22/2017</a:t>
             </a:fld>
             <a:r>
               <a:rPr lang="en-US" dirty="0"/>
@@ -4598,7 +4602,7 @@
             <a:fld id="{5942B21B-2ADA-A040-A652-A7305E1B99FE}" type="datetimeFigureOut">
               <a:rPr lang="en-US" smtClean="0"/>
               <a:pPr/>
-              <a:t>04/05/2017</a:t>
+              <a:t>6/22/2017</a:t>
             </a:fld>
             <a:r>
               <a:rPr lang="en-US" dirty="0"/>
@@ -5113,7 +5117,7 @@
             <a:fld id="{5942B21B-2ADA-A040-A652-A7305E1B99FE}" type="datetimeFigureOut">
               <a:rPr lang="en-US" smtClean="0"/>
               <a:pPr/>
-              <a:t>04/05/2017</a:t>
+              <a:t>6/22/2017</a:t>
             </a:fld>
             <a:r>
               <a:rPr lang="en-US" dirty="0"/>
@@ -5322,7 +5326,7 @@
             <a:fld id="{5942B21B-2ADA-A040-A652-A7305E1B99FE}" type="datetimeFigureOut">
               <a:rPr lang="en-US" smtClean="0"/>
               <a:pPr/>
-              <a:t>04/05/2017</a:t>
+              <a:t>6/22/2017</a:t>
             </a:fld>
             <a:r>
               <a:rPr lang="en-US" dirty="0"/>
@@ -5509,7 +5513,7 @@
             <a:fld id="{5942B21B-2ADA-A040-A652-A7305E1B99FE}" type="datetimeFigureOut">
               <a:rPr lang="en-US" smtClean="0"/>
               <a:pPr/>
-              <a:t>04/05/2017</a:t>
+              <a:t>6/22/2017</a:t>
             </a:fld>
             <a:r>
               <a:rPr lang="en-US" dirty="0"/>
@@ -5840,7 +5844,7 @@
             <a:fld id="{5942B21B-2ADA-A040-A652-A7305E1B99FE}" type="datetimeFigureOut">
               <a:rPr lang="en-US" smtClean="0"/>
               <a:pPr/>
-              <a:t>04/05/2017</a:t>
+              <a:t>6/22/2017</a:t>
             </a:fld>
             <a:r>
               <a:rPr lang="en-US" dirty="0"/>
@@ -6148,7 +6152,7 @@
             <a:fld id="{5942B21B-2ADA-A040-A652-A7305E1B99FE}" type="datetimeFigureOut">
               <a:rPr lang="en-US" smtClean="0"/>
               <a:pPr/>
-              <a:t>04/05/2017</a:t>
+              <a:t>6/22/2017</a:t>
             </a:fld>
             <a:r>
               <a:rPr lang="en-US" dirty="0"/>
@@ -6427,7 +6431,7 @@
             <a:fld id="{5942B21B-2ADA-A040-A652-A7305E1B99FE}" type="datetimeFigureOut">
               <a:rPr lang="en-US" smtClean="0"/>
               <a:pPr/>
-              <a:t>04/05/2017</a:t>
+              <a:t>6/22/2017</a:t>
             </a:fld>
             <a:r>
               <a:rPr lang="en-US" dirty="0"/>
@@ -7061,13 +7065,16 @@
             </a:pPr>
             <a:r>
               <a:rPr lang="en-US" dirty="0"/>
-              <a:t>Madison, WI – April 8</a:t>
+              <a:t>Baton Rouge, LA </a:t>
             </a:r>
             <a:r>
               <a:rPr lang="en-US"/>
-              <a:t>, 2017</a:t>
-            </a:r>
-            <a:endParaRPr lang="en-US" dirty="0"/>
+              <a:t>– July 29, </a:t>
+            </a:r>
+            <a:r>
+              <a:rPr lang="en-US" dirty="0"/>
+              <a:t>2017</a:t>
+            </a:r>
           </a:p>
         </p:txBody>
       </p:sp>
@@ -7912,7 +7919,7 @@
               <a:t> </a:t>
             </a:r>
             <a:r>
-              <a:rPr lang="en-US" dirty="0" smtClean="0">
+              <a:rPr lang="en-US" dirty="0">
                 <a:solidFill>
                   <a:srgbClr val="FF0000"/>
                 </a:solidFill>
@@ -8301,14 +8308,6 @@
   <p:clrMapOvr>
     <a:masterClrMapping/>
   </p:clrMapOvr>
-  <mc:AlternateContent xmlns:mc="http://schemas.openxmlformats.org/markup-compatibility/2006" xmlns:p14="http://schemas.microsoft.com/office/powerpoint/2010/main">
-    <mc:Choice Requires="p14">
-      <p:transition spd="slow" p14:dur="2000"/>
-    </mc:Choice>
-    <mc:Fallback xmlns="">
-      <p:transition spd="slow"/>
-    </mc:Fallback>
-  </mc:AlternateContent>
 </p:sld>
 </file>
 
@@ -9118,7 +9117,7 @@
               <a:t> </a:t>
             </a:r>
             <a:r>
-              <a:rPr lang="en-US" dirty="0" smtClean="0">
+              <a:rPr lang="en-US" dirty="0">
                 <a:solidFill>
                   <a:srgbClr val="FF0000"/>
                 </a:solidFill>
@@ -9520,14 +9519,6 @@
   <p:clrMapOvr>
     <a:masterClrMapping/>
   </p:clrMapOvr>
-  <mc:AlternateContent xmlns:mc="http://schemas.openxmlformats.org/markup-compatibility/2006" xmlns:p14="http://schemas.microsoft.com/office/powerpoint/2010/main">
-    <mc:Choice Requires="p14">
-      <p:transition spd="slow" p14:dur="2000"/>
-    </mc:Choice>
-    <mc:Fallback xmlns="">
-      <p:transition spd="slow"/>
-    </mc:Fallback>
-  </mc:AlternateContent>
 </p:sld>
 </file>
 
@@ -10337,7 +10328,7 @@
               <a:t> </a:t>
             </a:r>
             <a:r>
-              <a:rPr lang="en-US" dirty="0" smtClean="0">
+              <a:rPr lang="en-US" dirty="0">
                 <a:solidFill>
                   <a:srgbClr val="FF0000"/>
                 </a:solidFill>
@@ -10739,14 +10730,6 @@
   <p:clrMapOvr>
     <a:masterClrMapping/>
   </p:clrMapOvr>
-  <mc:AlternateContent xmlns:mc="http://schemas.openxmlformats.org/markup-compatibility/2006" xmlns:p14="http://schemas.microsoft.com/office/powerpoint/2010/main">
-    <mc:Choice Requires="p14">
-      <p:transition spd="slow" p14:dur="2000"/>
-    </mc:Choice>
-    <mc:Fallback xmlns="">
-      <p:transition spd="slow"/>
-    </mc:Fallback>
-  </mc:AlternateContent>
 </p:sld>
 </file>
 
@@ -11566,33 +11549,8 @@
                 <a:ea typeface="Calibri" panose="020F0502020204030204" pitchFamily="34" charset="0"/>
                 <a:cs typeface="Times New Roman" panose="02020603050405020304" pitchFamily="18" charset="0"/>
               </a:rPr>
-              <a:t> = </a:t>
-            </a:r>
-            <a:r>
-              <a:rPr lang="en-US" dirty="0" smtClean="0">
-                <a:solidFill>
-                  <a:srgbClr val="008080"/>
-                </a:solidFill>
-                <a:highlight>
-                  <a:srgbClr val="FFFF00"/>
-                </a:highlight>
-                <a:latin typeface="Consolas" panose="020B0609020204030204" pitchFamily="49" charset="0"/>
-                <a:ea typeface="Calibri" panose="020F0502020204030204" pitchFamily="34" charset="0"/>
-                <a:cs typeface="Times New Roman" panose="02020603050405020304" pitchFamily="18" charset="0"/>
-              </a:rPr>
-              <a:t>'WI'</a:t>
-            </a:r>
-            <a:endParaRPr lang="en-US" dirty="0">
-              <a:solidFill>
-                <a:srgbClr val="008080"/>
-              </a:solidFill>
-              <a:highlight>
-                <a:srgbClr val="FFFF00"/>
-              </a:highlight>
-              <a:latin typeface="Consolas" panose="020B0609020204030204" pitchFamily="49" charset="0"/>
-              <a:ea typeface="Calibri" panose="020F0502020204030204" pitchFamily="34" charset="0"/>
-              <a:cs typeface="Times New Roman" panose="02020603050405020304" pitchFamily="18" charset="0"/>
-            </a:endParaRPr>
+              <a:t> = 'WI'</a:t>
+            </a:r>
           </a:p>
           <a:p>
             <a:pPr>
@@ -11932,13 +11890,8 @@
             </a:pPr>
             <a:r>
               <a:rPr lang="en-US" sz="3000" dirty="0"/>
-              <a:t>Find rows in R4 where State = </a:t>
-            </a:r>
-            <a:r>
-              <a:rPr lang="en-US" sz="3000" dirty="0" smtClean="0"/>
-              <a:t>'WI'</a:t>
-            </a:r>
-            <a:endParaRPr lang="en-US" sz="3000" dirty="0"/>
+              <a:t>Find rows in R4 where State = 'WI'</a:t>
+            </a:r>
           </a:p>
           <a:p>
             <a:pPr marL="457200" indent="-457200">
@@ -11947,15 +11900,7 @@
             </a:pPr>
             <a:r>
               <a:rPr lang="en-US" sz="3000" dirty="0"/>
-              <a:t>Result is </a:t>
-            </a:r>
-            <a:r>
-              <a:rPr lang="en-US" sz="3000" dirty="0" smtClean="0"/>
-              <a:t>5,509 </a:t>
-            </a:r>
-            <a:r>
-              <a:rPr lang="en-US" sz="3000" dirty="0"/>
-              <a:t>rows / 14 columns</a:t>
+              <a:t>Result is 5,509 rows / 14 columns</a:t>
             </a:r>
           </a:p>
           <a:p>
@@ -11980,14 +11925,6 @@
   <p:clrMapOvr>
     <a:masterClrMapping/>
   </p:clrMapOvr>
-  <mc:AlternateContent xmlns:mc="http://schemas.openxmlformats.org/markup-compatibility/2006" xmlns:p14="http://schemas.microsoft.com/office/powerpoint/2010/main">
-    <mc:Choice Requires="p14">
-      <p:transition spd="slow" p14:dur="2000"/>
-    </mc:Choice>
-    <mc:Fallback xmlns="">
-      <p:transition spd="slow"/>
-    </mc:Fallback>
-  </mc:AlternateContent>
 </p:sld>
 </file>
 
@@ -12847,7 +12784,7 @@
               <a:t> </a:t>
             </a:r>
             <a:r>
-              <a:rPr lang="en-US" dirty="0" smtClean="0">
+              <a:rPr lang="en-US" dirty="0">
                 <a:solidFill>
                   <a:srgbClr val="FF0000"/>
                 </a:solidFill>
@@ -13189,15 +13126,7 @@
             </a:pPr>
             <a:r>
               <a:rPr lang="en-US" sz="3000" dirty="0"/>
-              <a:t>Result is </a:t>
-            </a:r>
-            <a:r>
-              <a:rPr lang="en-US" sz="3000" dirty="0" smtClean="0"/>
-              <a:t>5,509 </a:t>
-            </a:r>
-            <a:r>
-              <a:rPr lang="en-US" sz="3000" dirty="0"/>
-              <a:t>rows / 2 columns</a:t>
+              <a:t>Result is 5,509 rows / 2 columns</a:t>
             </a:r>
           </a:p>
           <a:p>
@@ -13244,14 +13173,6 @@
   <p:clrMapOvr>
     <a:masterClrMapping/>
   </p:clrMapOvr>
-  <mc:AlternateContent xmlns:mc="http://schemas.openxmlformats.org/markup-compatibility/2006" xmlns:p14="http://schemas.microsoft.com/office/powerpoint/2010/main">
-    <mc:Choice Requires="p14">
-      <p:transition spd="slow" p14:dur="2000"/>
-    </mc:Choice>
-    <mc:Fallback xmlns="">
-      <p:transition spd="slow"/>
-    </mc:Fallback>
-  </mc:AlternateContent>
 </p:sld>
 </file>
 
@@ -14111,7 +14032,7 @@
               <a:t> </a:t>
             </a:r>
             <a:r>
-              <a:rPr lang="en-US" dirty="0" smtClean="0">
+              <a:rPr lang="en-US" dirty="0">
                 <a:solidFill>
                   <a:srgbClr val="FF0000"/>
                 </a:solidFill>
@@ -14400,15 +14321,7 @@
             </a:pPr>
             <a:r>
               <a:rPr lang="en-US" sz="3000" dirty="0"/>
-              <a:t>Result is </a:t>
-            </a:r>
-            <a:r>
-              <a:rPr lang="en-US" sz="3000" dirty="0" smtClean="0"/>
-              <a:t>67 </a:t>
-            </a:r>
-            <a:r>
-              <a:rPr lang="en-US" sz="3000" dirty="0"/>
-              <a:t>rows / 2 columns</a:t>
+              <a:t>Result is 67 rows / 2 columns</a:t>
             </a:r>
           </a:p>
           <a:p>
@@ -14434,14 +14347,6 @@
   <p:clrMapOvr>
     <a:masterClrMapping/>
   </p:clrMapOvr>
-  <mc:AlternateContent xmlns:mc="http://schemas.openxmlformats.org/markup-compatibility/2006" xmlns:p14="http://schemas.microsoft.com/office/powerpoint/2010/main">
-    <mc:Choice Requires="p14">
-      <p:transition spd="slow" p14:dur="2000"/>
-    </mc:Choice>
-    <mc:Fallback xmlns="">
-      <p:transition spd="slow"/>
-    </mc:Fallback>
-  </mc:AlternateContent>
 </p:sld>
 </file>
 
@@ -15224,7 +15129,7 @@
               <a:t> </a:t>
             </a:r>
             <a:r>
-              <a:rPr lang="en-US" dirty="0" smtClean="0">
+              <a:rPr lang="en-US" dirty="0">
                 <a:solidFill>
                   <a:srgbClr val="FF0000"/>
                 </a:solidFill>
@@ -15636,15 +15541,7 @@
             </a:pPr>
             <a:r>
               <a:rPr lang="en-US" sz="3000" dirty="0"/>
-              <a:t>Result is </a:t>
-            </a:r>
-            <a:r>
-              <a:rPr lang="en-US" sz="3000" dirty="0" smtClean="0"/>
-              <a:t>67 </a:t>
-            </a:r>
-            <a:r>
-              <a:rPr lang="en-US" sz="3000" dirty="0"/>
-              <a:t>rows / 2 columns</a:t>
+              <a:t>Result is 67 rows / 2 columns</a:t>
             </a:r>
           </a:p>
           <a:p>
@@ -15670,14 +15567,6 @@
   <p:clrMapOvr>
     <a:masterClrMapping/>
   </p:clrMapOvr>
-  <mc:AlternateContent xmlns:mc="http://schemas.openxmlformats.org/markup-compatibility/2006" xmlns:p14="http://schemas.microsoft.com/office/powerpoint/2010/main">
-    <mc:Choice Requires="p14">
-      <p:transition spd="slow" p14:dur="2000"/>
-    </mc:Choice>
-    <mc:Fallback xmlns="">
-      <p:transition spd="slow"/>
-    </mc:Fallback>
-  </mc:AlternateContent>
 </p:sld>
 </file>
 
@@ -16537,7 +16426,7 @@
               <a:t> </a:t>
             </a:r>
             <a:r>
-              <a:rPr lang="en-US" dirty="0" smtClean="0">
+              <a:rPr lang="en-US" dirty="0">
                 <a:solidFill>
                   <a:srgbClr val="FF0000"/>
                 </a:solidFill>
@@ -16889,14 +16778,6 @@
   <p:clrMapOvr>
     <a:masterClrMapping/>
   </p:clrMapOvr>
-  <mc:AlternateContent xmlns:mc="http://schemas.openxmlformats.org/markup-compatibility/2006" xmlns:p14="http://schemas.microsoft.com/office/powerpoint/2010/main">
-    <mc:Choice Requires="p14">
-      <p:transition spd="slow" p14:dur="2000"/>
-    </mc:Choice>
-    <mc:Fallback xmlns="">
-      <p:transition spd="slow"/>
-    </mc:Fallback>
-  </mc:AlternateContent>
 </p:sld>
 </file>
 
@@ -17751,7 +17632,7 @@
               <a:t>= </a:t>
             </a:r>
             <a:r>
-              <a:rPr lang="en-US" dirty="0" smtClean="0">
+              <a:rPr lang="en-US" dirty="0">
                 <a:solidFill>
                   <a:srgbClr val="FF0000"/>
                 </a:solidFill>
@@ -18161,14 +18042,6 @@
   <p:clrMapOvr>
     <a:masterClrMapping/>
   </p:clrMapOvr>
-  <mc:AlternateContent xmlns:mc="http://schemas.openxmlformats.org/markup-compatibility/2006" xmlns:p14="http://schemas.microsoft.com/office/powerpoint/2010/main">
-    <mc:Choice Requires="p14">
-      <p:transition spd="slow" p14:dur="2000"/>
-    </mc:Choice>
-    <mc:Fallback xmlns="">
-      <p:transition spd="slow"/>
-    </mc:Fallback>
-  </mc:AlternateContent>
 </p:sld>
 </file>
 
@@ -18854,7 +18727,7 @@
               <a:t> </a:t>
             </a:r>
             <a:r>
-              <a:rPr lang="en-US" dirty="0" smtClean="0">
+              <a:rPr lang="en-US" dirty="0">
                 <a:solidFill>
                   <a:srgbClr val="FF0000"/>
                 </a:solidFill>
@@ -20913,28 +20786,28 @@
                 <a:gridCol w="1638752">
                   <a:extLst>
                     <a:ext uri="{9D8B030D-6E8A-4147-A177-3AD203B41FA5}">
-                      <a16:colId xmlns:a16="http://schemas.microsoft.com/office/drawing/2014/main" xmlns="" val="20000"/>
+                      <a16:colId xmlns:a16="http://schemas.microsoft.com/office/drawing/2014/main" val="20000"/>
                     </a:ext>
                   </a:extLst>
                 </a:gridCol>
                 <a:gridCol w="4787153">
                   <a:extLst>
                     <a:ext uri="{9D8B030D-6E8A-4147-A177-3AD203B41FA5}">
-                      <a16:colId xmlns:a16="http://schemas.microsoft.com/office/drawing/2014/main" xmlns="" val="20001"/>
+                      <a16:colId xmlns:a16="http://schemas.microsoft.com/office/drawing/2014/main" val="20001"/>
                     </a:ext>
                   </a:extLst>
                 </a:gridCol>
                 <a:gridCol w="851647">
                   <a:extLst>
                     <a:ext uri="{9D8B030D-6E8A-4147-A177-3AD203B41FA5}">
-                      <a16:colId xmlns:a16="http://schemas.microsoft.com/office/drawing/2014/main" xmlns="" val="20002"/>
+                      <a16:colId xmlns:a16="http://schemas.microsoft.com/office/drawing/2014/main" val="20002"/>
                     </a:ext>
                   </a:extLst>
                 </a:gridCol>
                 <a:gridCol w="779930">
                   <a:extLst>
                     <a:ext uri="{9D8B030D-6E8A-4147-A177-3AD203B41FA5}">
-                      <a16:colId xmlns:a16="http://schemas.microsoft.com/office/drawing/2014/main" xmlns="" val="20003"/>
+                      <a16:colId xmlns:a16="http://schemas.microsoft.com/office/drawing/2014/main" val="20003"/>
                     </a:ext>
                   </a:extLst>
                 </a:gridCol>
@@ -20994,7 +20867,7 @@
                 </a:tc>
                 <a:extLst>
                   <a:ext uri="{0D108BD9-81ED-4DB2-BD59-A6C34878D82A}">
-                    <a16:rowId xmlns:a16="http://schemas.microsoft.com/office/drawing/2014/main" xmlns="" val="10000"/>
+                    <a16:rowId xmlns:a16="http://schemas.microsoft.com/office/drawing/2014/main" val="10000"/>
                   </a:ext>
                 </a:extLst>
               </a:tr>
@@ -21059,7 +20932,7 @@
                 </a:tc>
                 <a:extLst>
                   <a:ext uri="{0D108BD9-81ED-4DB2-BD59-A6C34878D82A}">
-                    <a16:rowId xmlns:a16="http://schemas.microsoft.com/office/drawing/2014/main" xmlns="" val="10001"/>
+                    <a16:rowId xmlns:a16="http://schemas.microsoft.com/office/drawing/2014/main" val="10001"/>
                   </a:ext>
                 </a:extLst>
               </a:tr>
@@ -21136,7 +21009,7 @@
                 </a:tc>
                 <a:extLst>
                   <a:ext uri="{0D108BD9-81ED-4DB2-BD59-A6C34878D82A}">
-                    <a16:rowId xmlns:a16="http://schemas.microsoft.com/office/drawing/2014/main" xmlns="" val="10002"/>
+                    <a16:rowId xmlns:a16="http://schemas.microsoft.com/office/drawing/2014/main" val="10002"/>
                   </a:ext>
                 </a:extLst>
               </a:tr>
@@ -21202,7 +21075,7 @@
                 </a:tc>
                 <a:extLst>
                   <a:ext uri="{0D108BD9-81ED-4DB2-BD59-A6C34878D82A}">
-                    <a16:rowId xmlns:a16="http://schemas.microsoft.com/office/drawing/2014/main" xmlns="" val="10003"/>
+                    <a16:rowId xmlns:a16="http://schemas.microsoft.com/office/drawing/2014/main" val="10003"/>
                   </a:ext>
                 </a:extLst>
               </a:tr>
@@ -21291,7 +21164,7 @@
                 </a:tc>
                 <a:extLst>
                   <a:ext uri="{0D108BD9-81ED-4DB2-BD59-A6C34878D82A}">
-                    <a16:rowId xmlns:a16="http://schemas.microsoft.com/office/drawing/2014/main" xmlns="" val="10004"/>
+                    <a16:rowId xmlns:a16="http://schemas.microsoft.com/office/drawing/2014/main" val="10004"/>
                   </a:ext>
                 </a:extLst>
               </a:tr>
@@ -21362,7 +21235,7 @@
                 </a:tc>
                 <a:extLst>
                   <a:ext uri="{0D108BD9-81ED-4DB2-BD59-A6C34878D82A}">
-                    <a16:rowId xmlns:a16="http://schemas.microsoft.com/office/drawing/2014/main" xmlns="" val="10005"/>
+                    <a16:rowId xmlns:a16="http://schemas.microsoft.com/office/drawing/2014/main" val="10005"/>
                   </a:ext>
                 </a:extLst>
               </a:tr>
@@ -21428,7 +21301,7 @@
                 </a:tc>
                 <a:extLst>
                   <a:ext uri="{0D108BD9-81ED-4DB2-BD59-A6C34878D82A}">
-                    <a16:rowId xmlns:a16="http://schemas.microsoft.com/office/drawing/2014/main" xmlns="" val="10006"/>
+                    <a16:rowId xmlns:a16="http://schemas.microsoft.com/office/drawing/2014/main" val="10006"/>
                   </a:ext>
                 </a:extLst>
               </a:tr>
@@ -24534,7 +24407,7 @@
               <a:t> </a:t>
             </a:r>
             <a:r>
-              <a:rPr lang="en-US" sz="1600" dirty="0" smtClean="0">
+              <a:rPr lang="en-US" sz="1600" dirty="0">
                 <a:solidFill>
                   <a:srgbClr val="FF0000"/>
                 </a:solidFill>
@@ -24545,7 +24418,7 @@
               <a:t>'WI'</a:t>
             </a:r>
             <a:r>
-              <a:rPr lang="en-US" sz="1600" dirty="0" smtClean="0">
+              <a:rPr lang="en-US" sz="1600" dirty="0">
                 <a:latin typeface="Consolas" panose="020B0609020204030204" pitchFamily="49" charset="0"/>
                 <a:ea typeface="Calibri" panose="020F0502020204030204" pitchFamily="34" charset="0"/>
                 <a:cs typeface="Times New Roman" panose="02020603050405020304" pitchFamily="18" charset="0"/>
@@ -25958,14 +25831,6 @@
   <p:clrMapOvr>
     <a:masterClrMapping/>
   </p:clrMapOvr>
-  <mc:AlternateContent xmlns:mc="http://schemas.openxmlformats.org/markup-compatibility/2006" xmlns:p14="http://schemas.microsoft.com/office/powerpoint/2010/main">
-    <mc:Choice Requires="p14">
-      <p:transition spd="slow" p14:dur="2000"/>
-    </mc:Choice>
-    <mc:Fallback xmlns="">
-      <p:transition spd="slow"/>
-    </mc:Fallback>
-  </mc:AlternateContent>
 </p:sld>
 </file>
 
@@ -27049,7 +26914,7 @@
               <a:t>= </a:t>
             </a:r>
             <a:r>
-              <a:rPr lang="en-US" sz="1400" dirty="0" smtClean="0">
+              <a:rPr lang="en-US" sz="1400" dirty="0">
                 <a:solidFill>
                   <a:srgbClr val="FF0000"/>
                 </a:solidFill>
@@ -28030,7 +27895,7 @@
               <a:t>= </a:t>
             </a:r>
             <a:r>
-              <a:rPr lang="en-US" sz="1400" dirty="0" smtClean="0">
+              <a:rPr lang="en-US" sz="1400" dirty="0">
                 <a:solidFill>
                   <a:srgbClr val="FF0000"/>
                 </a:solidFill>
@@ -28822,10 +28687,9 @@
           <a:lstStyle/>
           <a:p>
             <a:r>
-              <a:rPr lang="en-US" dirty="0" smtClean="0"/>
+              <a:rPr lang="en-US" dirty="0"/>
               <a:t>Simplification (heuristic rewrites, not cost-based)</a:t>
             </a:r>
-            <a:endParaRPr lang="en-US" dirty="0"/>
           </a:p>
           <a:p>
             <a:pPr lvl="1"/>
@@ -28857,12 +28721,8 @@
           </a:p>
           <a:p>
             <a:r>
-              <a:rPr lang="en-US" dirty="0" smtClean="0"/>
-              <a:t>Retrieve </a:t>
-            </a:r>
-            <a:r>
               <a:rPr lang="en-US" dirty="0"/>
-              <a:t>statistics; do cardinality estimation</a:t>
+              <a:t>Retrieve statistics; do cardinality estimation</a:t>
             </a:r>
           </a:p>
           <a:p>
@@ -28886,11 +28746,11 @@
               <a:t>Other physical properties </a:t>
             </a:r>
             <a:r>
-              <a:rPr lang="en-US" sz="2400" dirty="0" smtClean="0"/>
+              <a:rPr lang="en-US" sz="2400" dirty="0"/>
               <a:t>(keys, </a:t>
             </a:r>
             <a:r>
-              <a:rPr lang="en-US" sz="2400" dirty="0" err="1" smtClean="0"/>
+              <a:rPr lang="en-US" sz="2400" dirty="0" err="1"/>
               <a:t>nullability</a:t>
             </a:r>
             <a:r>
@@ -29750,14 +29610,6 @@
   <p:clrMapOvr>
     <a:masterClrMapping/>
   </p:clrMapOvr>
-  <mc:AlternateContent xmlns:mc="http://schemas.openxmlformats.org/markup-compatibility/2006" xmlns:p14="http://schemas.microsoft.com/office/powerpoint/2010/main">
-    <mc:Choice Requires="p14">
-      <p:transition spd="slow" p14:dur="2000"/>
-    </mc:Choice>
-    <mc:Fallback xmlns="">
-      <p:transition spd="slow"/>
-    </mc:Fallback>
-  </mc:AlternateContent>
 </p:sld>
 </file>
 
@@ -30110,14 +29962,14 @@
                 <a:gridCol w="7632835">
                   <a:extLst>
                     <a:ext uri="{9D8B030D-6E8A-4147-A177-3AD203B41FA5}">
-                      <a16:colId xmlns:a16="http://schemas.microsoft.com/office/drawing/2014/main" xmlns="" val="3644048045"/>
+                      <a16:colId xmlns:a16="http://schemas.microsoft.com/office/drawing/2014/main" val="3644048045"/>
                     </a:ext>
                   </a:extLst>
                 </a:gridCol>
                 <a:gridCol w="606393">
                   <a:extLst>
                     <a:ext uri="{9D8B030D-6E8A-4147-A177-3AD203B41FA5}">
-                      <a16:colId xmlns:a16="http://schemas.microsoft.com/office/drawing/2014/main" xmlns="" val="2034254753"/>
+                      <a16:colId xmlns:a16="http://schemas.microsoft.com/office/drawing/2014/main" val="2034254753"/>
                     </a:ext>
                   </a:extLst>
                 </a:gridCol>
@@ -30148,7 +30000,7 @@
                 </a:tc>
                 <a:extLst>
                   <a:ext uri="{0D108BD9-81ED-4DB2-BD59-A6C34878D82A}">
-                    <a16:rowId xmlns:a16="http://schemas.microsoft.com/office/drawing/2014/main" xmlns="" val="2708275910"/>
+                    <a16:rowId xmlns:a16="http://schemas.microsoft.com/office/drawing/2014/main" val="2708275910"/>
                   </a:ext>
                 </a:extLst>
               </a:tr>
@@ -30182,7 +30034,7 @@
                 </a:tc>
                 <a:extLst>
                   <a:ext uri="{0D108BD9-81ED-4DB2-BD59-A6C34878D82A}">
-                    <a16:rowId xmlns:a16="http://schemas.microsoft.com/office/drawing/2014/main" xmlns="" val="2161984115"/>
+                    <a16:rowId xmlns:a16="http://schemas.microsoft.com/office/drawing/2014/main" val="2161984115"/>
                   </a:ext>
                 </a:extLst>
               </a:tr>
@@ -30229,7 +30081,7 @@
                 </a:tc>
                 <a:extLst>
                   <a:ext uri="{0D108BD9-81ED-4DB2-BD59-A6C34878D82A}">
-                    <a16:rowId xmlns:a16="http://schemas.microsoft.com/office/drawing/2014/main" xmlns="" val="2841678841"/>
+                    <a16:rowId xmlns:a16="http://schemas.microsoft.com/office/drawing/2014/main" val="2841678841"/>
                   </a:ext>
                 </a:extLst>
               </a:tr>
@@ -30263,7 +30115,7 @@
                 </a:tc>
                 <a:extLst>
                   <a:ext uri="{0D108BD9-81ED-4DB2-BD59-A6C34878D82A}">
-                    <a16:rowId xmlns:a16="http://schemas.microsoft.com/office/drawing/2014/main" xmlns="" val="3144998627"/>
+                    <a16:rowId xmlns:a16="http://schemas.microsoft.com/office/drawing/2014/main" val="3144998627"/>
                   </a:ext>
                 </a:extLst>
               </a:tr>
@@ -30305,7 +30157,7 @@
                 </a:tc>
                 <a:extLst>
                   <a:ext uri="{0D108BD9-81ED-4DB2-BD59-A6C34878D82A}">
-                    <a16:rowId xmlns:a16="http://schemas.microsoft.com/office/drawing/2014/main" xmlns="" val="1419261869"/>
+                    <a16:rowId xmlns:a16="http://schemas.microsoft.com/office/drawing/2014/main" val="1419261869"/>
                   </a:ext>
                 </a:extLst>
               </a:tr>
@@ -30343,7 +30195,7 @@
                 </a:tc>
                 <a:extLst>
                   <a:ext uri="{0D108BD9-81ED-4DB2-BD59-A6C34878D82A}">
-                    <a16:rowId xmlns:a16="http://schemas.microsoft.com/office/drawing/2014/main" xmlns="" val="1427391072"/>
+                    <a16:rowId xmlns:a16="http://schemas.microsoft.com/office/drawing/2014/main" val="1427391072"/>
                   </a:ext>
                 </a:extLst>
               </a:tr>
@@ -30390,7 +30242,7 @@
                 </a:tc>
                 <a:extLst>
                   <a:ext uri="{0D108BD9-81ED-4DB2-BD59-A6C34878D82A}">
-                    <a16:rowId xmlns:a16="http://schemas.microsoft.com/office/drawing/2014/main" xmlns="" val="2346539918"/>
+                    <a16:rowId xmlns:a16="http://schemas.microsoft.com/office/drawing/2014/main" val="2346539918"/>
                   </a:ext>
                 </a:extLst>
               </a:tr>
@@ -30429,7 +30281,7 @@
                 </a:tc>
                 <a:extLst>
                   <a:ext uri="{0D108BD9-81ED-4DB2-BD59-A6C34878D82A}">
-                    <a16:rowId xmlns:a16="http://schemas.microsoft.com/office/drawing/2014/main" xmlns="" val="2275483042"/>
+                    <a16:rowId xmlns:a16="http://schemas.microsoft.com/office/drawing/2014/main" val="2275483042"/>
                   </a:ext>
                 </a:extLst>
               </a:tr>
@@ -30467,7 +30319,7 @@
                 </a:tc>
                 <a:extLst>
                   <a:ext uri="{0D108BD9-81ED-4DB2-BD59-A6C34878D82A}">
-                    <a16:rowId xmlns:a16="http://schemas.microsoft.com/office/drawing/2014/main" xmlns="" val="4202569347"/>
+                    <a16:rowId xmlns:a16="http://schemas.microsoft.com/office/drawing/2014/main" val="4202569347"/>
                   </a:ext>
                 </a:extLst>
               </a:tr>
@@ -30501,7 +30353,7 @@
                 </a:tc>
                 <a:extLst>
                   <a:ext uri="{0D108BD9-81ED-4DB2-BD59-A6C34878D82A}">
-                    <a16:rowId xmlns:a16="http://schemas.microsoft.com/office/drawing/2014/main" xmlns="" val="2989839269"/>
+                    <a16:rowId xmlns:a16="http://schemas.microsoft.com/office/drawing/2014/main" val="2989839269"/>
                   </a:ext>
                 </a:extLst>
               </a:tr>
@@ -30535,7 +30387,7 @@
                 </a:tc>
                 <a:extLst>
                   <a:ext uri="{0D108BD9-81ED-4DB2-BD59-A6C34878D82A}">
-                    <a16:rowId xmlns:a16="http://schemas.microsoft.com/office/drawing/2014/main" xmlns="" val="2130545569"/>
+                    <a16:rowId xmlns:a16="http://schemas.microsoft.com/office/drawing/2014/main" val="2130545569"/>
                   </a:ext>
                 </a:extLst>
               </a:tr>
@@ -30591,7 +30443,7 @@
                 </a:tc>
                 <a:extLst>
                   <a:ext uri="{0D108BD9-81ED-4DB2-BD59-A6C34878D82A}">
-                    <a16:rowId xmlns:a16="http://schemas.microsoft.com/office/drawing/2014/main" xmlns="" val="1848127216"/>
+                    <a16:rowId xmlns:a16="http://schemas.microsoft.com/office/drawing/2014/main" val="1848127216"/>
                   </a:ext>
                 </a:extLst>
               </a:tr>
@@ -30685,14 +30537,6 @@
   <p:clrMapOvr>
     <a:masterClrMapping/>
   </p:clrMapOvr>
-  <mc:AlternateContent xmlns:mc="http://schemas.openxmlformats.org/markup-compatibility/2006" xmlns:p14="http://schemas.microsoft.com/office/powerpoint/2010/main">
-    <mc:Choice Requires="p14">
-      <p:transition spd="slow" p14:dur="2000"/>
-    </mc:Choice>
-    <mc:Fallback xmlns="">
-      <p:transition spd="slow"/>
-    </mc:Fallback>
-  </mc:AlternateContent>
 </p:sld>
 </file>
 
@@ -31045,14 +30889,14 @@
                 <a:gridCol w="4119615">
                   <a:extLst>
                     <a:ext uri="{9D8B030D-6E8A-4147-A177-3AD203B41FA5}">
-                      <a16:colId xmlns:a16="http://schemas.microsoft.com/office/drawing/2014/main" xmlns="" val="3644048045"/>
+                      <a16:colId xmlns:a16="http://schemas.microsoft.com/office/drawing/2014/main" val="3644048045"/>
                     </a:ext>
                   </a:extLst>
                 </a:gridCol>
                 <a:gridCol w="4119613">
                   <a:extLst>
                     <a:ext uri="{9D8B030D-6E8A-4147-A177-3AD203B41FA5}">
-                      <a16:colId xmlns:a16="http://schemas.microsoft.com/office/drawing/2014/main" xmlns="" val="2034254753"/>
+                      <a16:colId xmlns:a16="http://schemas.microsoft.com/office/drawing/2014/main" val="2034254753"/>
                     </a:ext>
                   </a:extLst>
                 </a:gridCol>
@@ -31088,7 +30932,7 @@
                 </a:tc>
                 <a:extLst>
                   <a:ext uri="{0D108BD9-81ED-4DB2-BD59-A6C34878D82A}">
-                    <a16:rowId xmlns:a16="http://schemas.microsoft.com/office/drawing/2014/main" xmlns="" val="2708275910"/>
+                    <a16:rowId xmlns:a16="http://schemas.microsoft.com/office/drawing/2014/main" val="2708275910"/>
                   </a:ext>
                 </a:extLst>
               </a:tr>
@@ -31288,7 +31132,7 @@
                 </a:tc>
                 <a:extLst>
                   <a:ext uri="{0D108BD9-81ED-4DB2-BD59-A6C34878D82A}">
-                    <a16:rowId xmlns:a16="http://schemas.microsoft.com/office/drawing/2014/main" xmlns="" val="2161984115"/>
+                    <a16:rowId xmlns:a16="http://schemas.microsoft.com/office/drawing/2014/main" val="2161984115"/>
                   </a:ext>
                 </a:extLst>
               </a:tr>
@@ -31488,7 +31332,7 @@
                 </a:tc>
                 <a:extLst>
                   <a:ext uri="{0D108BD9-81ED-4DB2-BD59-A6C34878D82A}">
-                    <a16:rowId xmlns:a16="http://schemas.microsoft.com/office/drawing/2014/main" xmlns="" val="2841678841"/>
+                    <a16:rowId xmlns:a16="http://schemas.microsoft.com/office/drawing/2014/main" val="2841678841"/>
                   </a:ext>
                 </a:extLst>
               </a:tr>
@@ -31688,7 +31532,7 @@
                 </a:tc>
                 <a:extLst>
                   <a:ext uri="{0D108BD9-81ED-4DB2-BD59-A6C34878D82A}">
-                    <a16:rowId xmlns:a16="http://schemas.microsoft.com/office/drawing/2014/main" xmlns="" val="3144998627"/>
+                    <a16:rowId xmlns:a16="http://schemas.microsoft.com/office/drawing/2014/main" val="3144998627"/>
                   </a:ext>
                 </a:extLst>
               </a:tr>
@@ -31888,7 +31732,7 @@
                 </a:tc>
                 <a:extLst>
                   <a:ext uri="{0D108BD9-81ED-4DB2-BD59-A6C34878D82A}">
-                    <a16:rowId xmlns:a16="http://schemas.microsoft.com/office/drawing/2014/main" xmlns="" val="1419261869"/>
+                    <a16:rowId xmlns:a16="http://schemas.microsoft.com/office/drawing/2014/main" val="1419261869"/>
                   </a:ext>
                 </a:extLst>
               </a:tr>
@@ -32088,7 +31932,7 @@
                 </a:tc>
                 <a:extLst>
                   <a:ext uri="{0D108BD9-81ED-4DB2-BD59-A6C34878D82A}">
-                    <a16:rowId xmlns:a16="http://schemas.microsoft.com/office/drawing/2014/main" xmlns="" val="1427391072"/>
+                    <a16:rowId xmlns:a16="http://schemas.microsoft.com/office/drawing/2014/main" val="1427391072"/>
                   </a:ext>
                 </a:extLst>
               </a:tr>
@@ -32288,7 +32132,7 @@
                 </a:tc>
                 <a:extLst>
                   <a:ext uri="{0D108BD9-81ED-4DB2-BD59-A6C34878D82A}">
-                    <a16:rowId xmlns:a16="http://schemas.microsoft.com/office/drawing/2014/main" xmlns="" val="2346539918"/>
+                    <a16:rowId xmlns:a16="http://schemas.microsoft.com/office/drawing/2014/main" val="2346539918"/>
                   </a:ext>
                 </a:extLst>
               </a:tr>
@@ -32497,7 +32341,7 @@
                 </a:tc>
                 <a:extLst>
                   <a:ext uri="{0D108BD9-81ED-4DB2-BD59-A6C34878D82A}">
-                    <a16:rowId xmlns:a16="http://schemas.microsoft.com/office/drawing/2014/main" xmlns="" val="2275483042"/>
+                    <a16:rowId xmlns:a16="http://schemas.microsoft.com/office/drawing/2014/main" val="2275483042"/>
                   </a:ext>
                 </a:extLst>
               </a:tr>
@@ -32706,7 +32550,7 @@
                 </a:tc>
                 <a:extLst>
                   <a:ext uri="{0D108BD9-81ED-4DB2-BD59-A6C34878D82A}">
-                    <a16:rowId xmlns:a16="http://schemas.microsoft.com/office/drawing/2014/main" xmlns="" val="4202569347"/>
+                    <a16:rowId xmlns:a16="http://schemas.microsoft.com/office/drawing/2014/main" val="4202569347"/>
                   </a:ext>
                 </a:extLst>
               </a:tr>
@@ -32915,7 +32759,7 @@
                 </a:tc>
                 <a:extLst>
                   <a:ext uri="{0D108BD9-81ED-4DB2-BD59-A6C34878D82A}">
-                    <a16:rowId xmlns:a16="http://schemas.microsoft.com/office/drawing/2014/main" xmlns="" val="2989839269"/>
+                    <a16:rowId xmlns:a16="http://schemas.microsoft.com/office/drawing/2014/main" val="2989839269"/>
                   </a:ext>
                 </a:extLst>
               </a:tr>
@@ -33124,7 +32968,7 @@
                 </a:tc>
                 <a:extLst>
                   <a:ext uri="{0D108BD9-81ED-4DB2-BD59-A6C34878D82A}">
-                    <a16:rowId xmlns:a16="http://schemas.microsoft.com/office/drawing/2014/main" xmlns="" val="2130545569"/>
+                    <a16:rowId xmlns:a16="http://schemas.microsoft.com/office/drawing/2014/main" val="2130545569"/>
                   </a:ext>
                 </a:extLst>
               </a:tr>
@@ -33333,7 +33177,7 @@
                 </a:tc>
                 <a:extLst>
                   <a:ext uri="{0D108BD9-81ED-4DB2-BD59-A6C34878D82A}">
-                    <a16:rowId xmlns:a16="http://schemas.microsoft.com/office/drawing/2014/main" xmlns="" val="3045796785"/>
+                    <a16:rowId xmlns:a16="http://schemas.microsoft.com/office/drawing/2014/main" val="3045796785"/>
                   </a:ext>
                 </a:extLst>
               </a:tr>
@@ -33542,7 +33386,7 @@
                 </a:tc>
                 <a:extLst>
                   <a:ext uri="{0D108BD9-81ED-4DB2-BD59-A6C34878D82A}">
-                    <a16:rowId xmlns:a16="http://schemas.microsoft.com/office/drawing/2014/main" xmlns="" val="1091494175"/>
+                    <a16:rowId xmlns:a16="http://schemas.microsoft.com/office/drawing/2014/main" val="1091494175"/>
                   </a:ext>
                 </a:extLst>
               </a:tr>
@@ -33560,14 +33404,6 @@
   <p:clrMapOvr>
     <a:masterClrMapping/>
   </p:clrMapOvr>
-  <mc:AlternateContent xmlns:mc="http://schemas.openxmlformats.org/markup-compatibility/2006" xmlns:p14="http://schemas.microsoft.com/office/powerpoint/2010/main">
-    <mc:Choice Requires="p14">
-      <p:transition spd="slow" p14:dur="2000"/>
-    </mc:Choice>
-    <mc:Fallback xmlns="">
-      <p:transition spd="slow"/>
-    </mc:Fallback>
-  </mc:AlternateContent>
 </p:sld>
 </file>
 
@@ -33680,14 +33516,6 @@
   <p:clrMapOvr>
     <a:masterClrMapping/>
   </p:clrMapOvr>
-  <mc:AlternateContent xmlns:mc="http://schemas.openxmlformats.org/markup-compatibility/2006" xmlns:p14="http://schemas.microsoft.com/office/powerpoint/2010/main">
-    <mc:Choice Requires="p14">
-      <p:transition spd="slow" p14:dur="2000"/>
-    </mc:Choice>
-    <mc:Fallback xmlns="">
-      <p:transition spd="slow"/>
-    </mc:Fallback>
-  </mc:AlternateContent>
 </p:sld>
 </file>
 
@@ -33971,14 +33799,6 @@
   <p:clrMapOvr>
     <a:masterClrMapping/>
   </p:clrMapOvr>
-  <mc:AlternateContent xmlns:mc="http://schemas.openxmlformats.org/markup-compatibility/2006" xmlns:p14="http://schemas.microsoft.com/office/powerpoint/2010/main">
-    <mc:Choice Requires="p14">
-      <p:transition spd="slow" p14:dur="2000"/>
-    </mc:Choice>
-    <mc:Fallback xmlns="">
-      <p:transition spd="slow"/>
-    </mc:Fallback>
-  </mc:AlternateContent>
 </p:sld>
 </file>
 
@@ -34675,14 +34495,6 @@
   <p:clrMapOvr>
     <a:masterClrMapping/>
   </p:clrMapOvr>
-  <mc:AlternateContent xmlns:mc="http://schemas.openxmlformats.org/markup-compatibility/2006" xmlns:p14="http://schemas.microsoft.com/office/powerpoint/2010/main">
-    <mc:Choice Requires="p14">
-      <p:transition spd="slow" p14:dur="2000"/>
-    </mc:Choice>
-    <mc:Fallback xmlns="">
-      <p:transition spd="slow"/>
-    </mc:Fallback>
-  </mc:AlternateContent>
 </p:sld>
 </file>
 
@@ -34996,10 +34808,9 @@
           <a:lstStyle/>
           <a:p>
             <a:r>
-              <a:rPr lang="en-US" dirty="0" smtClean="0"/>
+              <a:rPr lang="en-US" dirty="0"/>
               <a:t>Can the Optimizer Dig a Bit Deeper?</a:t>
             </a:r>
-            <a:endParaRPr lang="en-US" dirty="0"/>
           </a:p>
         </p:txBody>
       </p:sp>
@@ -35026,14 +34837,14 @@
           <a:lstStyle/>
           <a:p>
             <a:r>
-              <a:rPr lang="en-US" dirty="0" smtClean="0"/>
+              <a:rPr lang="en-US" dirty="0"/>
               <a:t>Trace flag 8780:</a:t>
             </a:r>
           </a:p>
           <a:p>
             <a:pPr lvl="1"/>
             <a:r>
-              <a:rPr lang="en-US" dirty="0" smtClean="0"/>
+              <a:rPr lang="en-US" dirty="0"/>
               <a:t>Considerably more attempts in Search 2</a:t>
             </a:r>
           </a:p>
@@ -35200,10 +35011,9 @@
           <a:p>
             <a:pPr lvl="1"/>
             <a:r>
-              <a:rPr lang="en-US" dirty="0" smtClean="0"/>
+              <a:rPr lang="en-US" dirty="0"/>
               <a:t>Very often still won’t come up with a different (or better) plan</a:t>
             </a:r>
-            <a:endParaRPr lang="en-US" dirty="0"/>
           </a:p>
         </p:txBody>
       </p:sp>
@@ -35567,14 +35377,6 @@
   <p:clrMapOvr>
     <a:masterClrMapping/>
   </p:clrMapOvr>
-  <mc:AlternateContent xmlns:mc="http://schemas.openxmlformats.org/markup-compatibility/2006" xmlns:p14="http://schemas.microsoft.com/office/powerpoint/2010/main">
-    <mc:Choice Requires="p14">
-      <p:transition spd="slow" p14:dur="2000"/>
-    </mc:Choice>
-    <mc:Fallback xmlns="">
-      <p:transition spd="slow"/>
-    </mc:Fallback>
-  </mc:AlternateContent>
 </p:sld>
 </file>
 
@@ -36506,14 +36308,6 @@
   <p:clrMapOvr>
     <a:masterClrMapping/>
   </p:clrMapOvr>
-  <mc:AlternateContent xmlns:mc="http://schemas.openxmlformats.org/markup-compatibility/2006" xmlns:p14="http://schemas.microsoft.com/office/powerpoint/2010/main">
-    <mc:Choice Requires="p14">
-      <p:transition spd="slow" p14:dur="2000"/>
-    </mc:Choice>
-    <mc:Fallback xmlns="">
-      <p:transition spd="slow"/>
-    </mc:Fallback>
-  </mc:AlternateContent>
 </p:sld>
 </file>
 
@@ -37305,14 +37099,14 @@
                 <a:gridCol w="957714">
                   <a:extLst>
                     <a:ext uri="{9D8B030D-6E8A-4147-A177-3AD203B41FA5}">
-                      <a16:colId xmlns:a16="http://schemas.microsoft.com/office/drawing/2014/main" xmlns="" val="3940544257"/>
+                      <a16:colId xmlns:a16="http://schemas.microsoft.com/office/drawing/2014/main" val="3940544257"/>
                     </a:ext>
                   </a:extLst>
                 </a:gridCol>
                 <a:gridCol w="2464067">
                   <a:extLst>
                     <a:ext uri="{9D8B030D-6E8A-4147-A177-3AD203B41FA5}">
-                      <a16:colId xmlns:a16="http://schemas.microsoft.com/office/drawing/2014/main" xmlns="" val="3658567973"/>
+                      <a16:colId xmlns:a16="http://schemas.microsoft.com/office/drawing/2014/main" val="3658567973"/>
                     </a:ext>
                   </a:extLst>
                 </a:gridCol>
@@ -37346,7 +37140,7 @@
                 </a:tc>
                 <a:extLst>
                   <a:ext uri="{0D108BD9-81ED-4